<commit_message>
Prepared MockUI layout on powerpoint. Exported MockUI layout to a PNG file in images folder
</commit_message>
<xml_diff>
--- a/docs/diagrams/Diagrams.pptx
+++ b/docs/diagrams/Diagrams.pptx
@@ -5628,11 +5628,7 @@
           <a:p>
             <a:r>
               <a:rPr lang="en-US" sz="1400" dirty="0" smtClean="0"/>
-              <a:t>delete </a:t>
-            </a:r>
-            <a:r>
-              <a:rPr lang="en-US" sz="1400" dirty="0" smtClean="0"/>
-              <a:t>task 1</a:t>
+              <a:t>delete task 1</a:t>
             </a:r>
             <a:endParaRPr lang="en-US" sz="1400" dirty="0"/>
           </a:p>
@@ -5702,23 +5698,7 @@
                   <a:srgbClr val="0070C0"/>
                 </a:solidFill>
               </a:rPr>
-              <a:t>execute(“</a:t>
-            </a:r>
-            <a:r>
-              <a:rPr lang="en-US" sz="1400" dirty="0" smtClean="0">
-                <a:solidFill>
-                  <a:srgbClr val="0070C0"/>
-                </a:solidFill>
-              </a:rPr>
-              <a:t>delete task </a:t>
-            </a:r>
-            <a:r>
-              <a:rPr lang="en-US" sz="1400" dirty="0" smtClean="0">
-                <a:solidFill>
-                  <a:srgbClr val="0070C0"/>
-                </a:solidFill>
-              </a:rPr>
-              <a:t>1”)</a:t>
+              <a:t>execute(“delete task 1”)</a:t>
             </a:r>
             <a:endParaRPr lang="en-US" sz="1400" dirty="0">
               <a:solidFill>
@@ -5850,17 +5830,7 @@
                   </a:schemeClr>
                 </a:solidFill>
               </a:rPr>
-              <a:t>Task</a:t>
-            </a:r>
-            <a:r>
-              <a:rPr lang="en-US" sz="1400" dirty="0" err="1" smtClean="0">
-                <a:solidFill>
-                  <a:schemeClr val="accent5">
-                    <a:lumMod val="75000"/>
-                  </a:schemeClr>
-                </a:solidFill>
-              </a:rPr>
-              <a:t>BookChangedEvent</a:t>
+              <a:t>TaskBookChangedEvent</a:t>
             </a:r>
             <a:r>
               <a:rPr lang="en-US" sz="1400" dirty="0" smtClean="0">
@@ -6434,17 +6404,7 @@
                   </a:schemeClr>
                 </a:solidFill>
               </a:rPr>
-              <a:t>Task</a:t>
-            </a:r>
-            <a:r>
-              <a:rPr lang="en-US" sz="1400" dirty="0" err="1" smtClean="0">
-                <a:solidFill>
-                  <a:schemeClr val="accent5">
-                    <a:lumMod val="75000"/>
-                  </a:schemeClr>
-                </a:solidFill>
-              </a:rPr>
-              <a:t>BookChangedEvent</a:t>
+              <a:t>TaskBookChangedEvent</a:t>
             </a:r>
             <a:r>
               <a:rPr lang="en-US" sz="1400" dirty="0" smtClean="0">
@@ -8200,17 +8160,7 @@
                   </a:schemeClr>
                 </a:solidFill>
               </a:rPr>
-              <a:t>Event</a:t>
-            </a:r>
-            <a:r>
-              <a:rPr lang="en-US" sz="1050" b="1" dirty="0" err="1" smtClean="0">
-                <a:solidFill>
-                  <a:schemeClr val="accent3">
-                    <a:lumMod val="75000"/>
-                  </a:schemeClr>
-                </a:solidFill>
-              </a:rPr>
-              <a:t>ListPanel</a:t>
+              <a:t>EventListPanel</a:t>
             </a:r>
             <a:endParaRPr lang="en-SG" sz="1050" b="1" dirty="0">
               <a:solidFill>
@@ -9920,17 +9870,7 @@
                   </a:schemeClr>
                 </a:solidFill>
               </a:rPr>
-              <a:t>Task</a:t>
-            </a:r>
-            <a:r>
-              <a:rPr lang="en-US" sz="1050" b="1" dirty="0" err="1" smtClean="0">
-                <a:solidFill>
-                  <a:schemeClr val="accent3">
-                    <a:lumMod val="75000"/>
-                  </a:schemeClr>
-                </a:solidFill>
-              </a:rPr>
-              <a:t>Card</a:t>
+              <a:t>TaskCard</a:t>
             </a:r>
             <a:endParaRPr lang="en-SG" sz="1050" b="1" dirty="0">
               <a:solidFill>
@@ -10574,15 +10514,7 @@
                   <a:srgbClr val="0070C0"/>
                 </a:solidFill>
               </a:rPr>
-              <a:t>Save</a:t>
-            </a:r>
-            <a:r>
-              <a:rPr lang="en-US" sz="1050" b="1" dirty="0" err="1" smtClean="0">
-                <a:solidFill>
-                  <a:srgbClr val="0070C0"/>
-                </a:solidFill>
-              </a:rPr>
-              <a:t>Command</a:t>
+              <a:t>SaveCommand</a:t>
             </a:r>
             <a:endParaRPr lang="en-SG" sz="1050" b="1" dirty="0">
               <a:solidFill>
@@ -11913,15 +11845,7 @@
                   <a:srgbClr val="0070C0"/>
                 </a:solidFill>
               </a:rPr>
-              <a:t>Help</a:t>
-            </a:r>
-            <a:r>
-              <a:rPr lang="en-US" sz="1050" b="1" dirty="0" err="1" smtClean="0">
-                <a:solidFill>
-                  <a:srgbClr val="0070C0"/>
-                </a:solidFill>
-              </a:rPr>
-              <a:t>Command</a:t>
+              <a:t>HelpCommand</a:t>
             </a:r>
             <a:endParaRPr lang="en-SG" sz="1050" b="1" dirty="0">
               <a:solidFill>
@@ -12703,15 +12627,7 @@
                     <a:srgbClr val="0070C0"/>
                   </a:solidFill>
                 </a:rPr>
-                <a:t>Edit</a:t>
-              </a:r>
-              <a:r>
-                <a:rPr lang="en-US" sz="950" b="1" dirty="0" err="1" smtClean="0">
-                  <a:solidFill>
-                    <a:srgbClr val="0070C0"/>
-                  </a:solidFill>
-                </a:rPr>
-                <a:t>TaskCommand</a:t>
+                <a:t>EditTaskCommand</a:t>
               </a:r>
               <a:endParaRPr lang="en-SG" sz="950" b="1" dirty="0">
                 <a:solidFill>
@@ -12770,15 +12686,7 @@
                     <a:srgbClr val="0070C0"/>
                   </a:solidFill>
                 </a:rPr>
-                <a:t>Edit</a:t>
-              </a:r>
-              <a:r>
-                <a:rPr lang="en-US" sz="950" b="1" dirty="0" err="1" smtClean="0">
-                  <a:solidFill>
-                    <a:srgbClr val="0070C0"/>
-                  </a:solidFill>
-                </a:rPr>
-                <a:t>EventCommand</a:t>
+                <a:t>EditEventCommand</a:t>
               </a:r>
               <a:endParaRPr lang="en-SG" sz="950" b="1" dirty="0">
                 <a:solidFill>
@@ -13017,15 +12925,7 @@
                     <a:srgbClr val="0070C0"/>
                   </a:solidFill>
                 </a:rPr>
-                <a:t>Delete</a:t>
-              </a:r>
-              <a:r>
-                <a:rPr lang="en-US" sz="950" b="1" dirty="0" err="1" smtClean="0">
-                  <a:solidFill>
-                    <a:srgbClr val="0070C0"/>
-                  </a:solidFill>
-                </a:rPr>
-                <a:t>Event</a:t>
+                <a:t>DeleteEvent</a:t>
               </a:r>
               <a:endParaRPr lang="en-US" sz="950" b="1" dirty="0" smtClean="0">
                 <a:solidFill>
@@ -13205,15 +13105,7 @@
                     <a:srgbClr val="0070C0"/>
                   </a:solidFill>
                 </a:rPr>
-                <a:t>List</a:t>
-              </a:r>
-              <a:r>
-                <a:rPr lang="en-US" sz="950" b="1" dirty="0" err="1" smtClean="0">
-                  <a:solidFill>
-                    <a:srgbClr val="0070C0"/>
-                  </a:solidFill>
-                </a:rPr>
-                <a:t>TaskCommand</a:t>
+                <a:t>ListTaskCommand</a:t>
               </a:r>
               <a:endParaRPr lang="en-SG" sz="950" b="1" dirty="0">
                 <a:solidFill>
@@ -13272,15 +13164,7 @@
                     <a:srgbClr val="0070C0"/>
                   </a:solidFill>
                 </a:rPr>
-                <a:t>List</a:t>
-              </a:r>
-              <a:r>
-                <a:rPr lang="en-US" sz="950" b="1" dirty="0" err="1" smtClean="0">
-                  <a:solidFill>
-                    <a:srgbClr val="0070C0"/>
-                  </a:solidFill>
-                </a:rPr>
-                <a:t>EventCommand</a:t>
+                <a:t>ListEventCommand</a:t>
               </a:r>
               <a:endParaRPr lang="en-SG" sz="950" b="1" dirty="0">
                 <a:solidFill>
@@ -13837,15 +13721,7 @@
                     <a:srgbClr val="0070C0"/>
                   </a:solidFill>
                 </a:rPr>
-                <a:t>Edit</a:t>
-              </a:r>
-              <a:r>
-                <a:rPr lang="en-US" sz="950" b="1" dirty="0" err="1" smtClean="0">
-                  <a:solidFill>
-                    <a:srgbClr val="0070C0"/>
-                  </a:solidFill>
-                </a:rPr>
-                <a:t>TaskParser</a:t>
+                <a:t>EditTaskParser</a:t>
               </a:r>
               <a:endParaRPr lang="en-SG" sz="950" b="1" dirty="0">
                 <a:solidFill>
@@ -13904,15 +13780,7 @@
                     <a:srgbClr val="0070C0"/>
                   </a:solidFill>
                 </a:rPr>
-                <a:t>Edit</a:t>
-              </a:r>
-              <a:r>
-                <a:rPr lang="en-US" sz="950" b="1" dirty="0" err="1" smtClean="0">
-                  <a:solidFill>
-                    <a:srgbClr val="0070C0"/>
-                  </a:solidFill>
-                </a:rPr>
-                <a:t>EventParser</a:t>
+                <a:t>EditEventParser</a:t>
               </a:r>
               <a:endParaRPr lang="en-SG" sz="950" b="1" dirty="0">
                 <a:solidFill>
@@ -14995,15 +14863,7 @@
                   <a:srgbClr val="7030A0"/>
                 </a:solidFill>
               </a:rPr>
-              <a:t>Task</a:t>
-            </a:r>
-            <a:r>
-              <a:rPr lang="en-US" sz="1050" dirty="0" err="1" smtClean="0">
-                <a:solidFill>
-                  <a:srgbClr val="7030A0"/>
-                </a:solidFill>
-              </a:rPr>
-              <a:t>Book</a:t>
+              <a:t>TaskBook</a:t>
             </a:r>
             <a:endParaRPr lang="en-SG" sz="1050" dirty="0">
               <a:solidFill>
@@ -17303,15 +17163,7 @@
                   <a:schemeClr val="bg1"/>
                 </a:solidFill>
               </a:rPr>
-              <a:t>Task</a:t>
-            </a:r>
-            <a:r>
-              <a:rPr lang="en-US" sz="1050" dirty="0" err="1" smtClean="0">
-                <a:solidFill>
-                  <a:schemeClr val="bg1"/>
-                </a:solidFill>
-              </a:rPr>
-              <a:t>BookStorage</a:t>
+              <a:t>TaskBookStorage</a:t>
             </a:r>
             <a:endParaRPr lang="en-SG" sz="1050" dirty="0">
               <a:solidFill>
@@ -18600,6 +18452,1005 @@
           <a:chExt cx="0" cy="0"/>
         </a:xfrm>
       </p:grpSpPr>
+      <p:sp>
+        <p:nvSpPr>
+          <p:cNvPr id="2" name="Rectangle 1"/>
+          <p:cNvSpPr/>
+          <p:nvPr/>
+        </p:nvSpPr>
+        <p:spPr>
+          <a:xfrm>
+            <a:off x="0" y="381000"/>
+            <a:ext cx="9144000" cy="6477000"/>
+          </a:xfrm>
+          <a:prstGeom prst="rect">
+            <a:avLst/>
+          </a:prstGeom>
+          <a:solidFill>
+            <a:schemeClr val="tx1">
+              <a:lumMod val="65000"/>
+              <a:lumOff val="35000"/>
+            </a:schemeClr>
+          </a:solidFill>
+          <a:ln w="57150">
+            <a:solidFill>
+              <a:schemeClr val="accent6">
+                <a:lumMod val="60000"/>
+                <a:lumOff val="40000"/>
+              </a:schemeClr>
+            </a:solidFill>
+          </a:ln>
+        </p:spPr>
+        <p:style>
+          <a:lnRef idx="2">
+            <a:schemeClr val="dk1">
+              <a:shade val="50000"/>
+            </a:schemeClr>
+          </a:lnRef>
+          <a:fillRef idx="1">
+            <a:schemeClr val="dk1"/>
+          </a:fillRef>
+          <a:effectRef idx="0">
+            <a:schemeClr val="dk1"/>
+          </a:effectRef>
+          <a:fontRef idx="minor">
+            <a:schemeClr val="lt1"/>
+          </a:fontRef>
+        </p:style>
+        <p:txBody>
+          <a:bodyPr rtlCol="0" anchor="ctr"/>
+          <a:lstStyle/>
+          <a:p>
+            <a:pPr algn="ctr"/>
+            <a:endParaRPr lang="en-SG" dirty="0"/>
+          </a:p>
+        </p:txBody>
+      </p:sp>
+      <p:sp>
+        <p:nvSpPr>
+          <p:cNvPr id="3" name="Rectangle 2"/>
+          <p:cNvSpPr/>
+          <p:nvPr/>
+        </p:nvSpPr>
+        <p:spPr>
+          <a:xfrm>
+            <a:off x="0" y="0"/>
+            <a:ext cx="9144000" cy="381000"/>
+          </a:xfrm>
+          <a:prstGeom prst="rect">
+            <a:avLst/>
+          </a:prstGeom>
+          <a:solidFill>
+            <a:schemeClr val="accent6">
+              <a:lumMod val="60000"/>
+              <a:lumOff val="40000"/>
+            </a:schemeClr>
+          </a:solidFill>
+          <a:ln w="57150">
+            <a:solidFill>
+              <a:schemeClr val="accent6">
+                <a:lumMod val="60000"/>
+                <a:lumOff val="40000"/>
+              </a:schemeClr>
+            </a:solidFill>
+          </a:ln>
+        </p:spPr>
+        <p:style>
+          <a:lnRef idx="2">
+            <a:schemeClr val="accent1">
+              <a:shade val="50000"/>
+            </a:schemeClr>
+          </a:lnRef>
+          <a:fillRef idx="1">
+            <a:schemeClr val="accent1"/>
+          </a:fillRef>
+          <a:effectRef idx="0">
+            <a:schemeClr val="accent1"/>
+          </a:effectRef>
+          <a:fontRef idx="minor">
+            <a:schemeClr val="lt1"/>
+          </a:fontRef>
+        </p:style>
+        <p:txBody>
+          <a:bodyPr rtlCol="0" anchor="ctr"/>
+          <a:lstStyle/>
+          <a:p>
+            <a:pPr algn="ctr"/>
+            <a:r>
+              <a:rPr lang="en-SG" sz="1600" dirty="0">
+                <a:latin typeface="+mj-lt"/>
+                <a:ea typeface="Adobe Heiti Std R" panose="020B0400000000000000" pitchFamily="34" charset="-128"/>
+              </a:rPr>
+              <a:t>d</a:t>
+            </a:r>
+            <a:r>
+              <a:rPr lang="en-SG" sz="1600" dirty="0" smtClean="0">
+                <a:latin typeface="+mj-lt"/>
+                <a:ea typeface="Adobe Heiti Std R" panose="020B0400000000000000" pitchFamily="34" charset="-128"/>
+              </a:rPr>
+              <a:t>owat!</a:t>
+            </a:r>
+            <a:endParaRPr lang="en-SG" sz="1600" dirty="0">
+              <a:latin typeface="+mj-lt"/>
+              <a:ea typeface="Adobe Heiti Std R" panose="020B0400000000000000" pitchFamily="34" charset="-128"/>
+            </a:endParaRPr>
+          </a:p>
+        </p:txBody>
+      </p:sp>
+      <p:sp>
+        <p:nvSpPr>
+          <p:cNvPr id="4" name="Rectangle 3"/>
+          <p:cNvSpPr/>
+          <p:nvPr/>
+        </p:nvSpPr>
+        <p:spPr>
+          <a:xfrm>
+            <a:off x="8686800" y="0"/>
+            <a:ext cx="381000" cy="381000"/>
+          </a:xfrm>
+          <a:prstGeom prst="rect">
+            <a:avLst/>
+          </a:prstGeom>
+          <a:solidFill>
+            <a:schemeClr val="accent2">
+              <a:lumMod val="75000"/>
+            </a:schemeClr>
+          </a:solidFill>
+          <a:ln>
+            <a:solidFill>
+              <a:schemeClr val="accent2">
+                <a:lumMod val="75000"/>
+              </a:schemeClr>
+            </a:solidFill>
+          </a:ln>
+        </p:spPr>
+        <p:style>
+          <a:lnRef idx="2">
+            <a:schemeClr val="accent1">
+              <a:shade val="50000"/>
+            </a:schemeClr>
+          </a:lnRef>
+          <a:fillRef idx="1">
+            <a:schemeClr val="accent1"/>
+          </a:fillRef>
+          <a:effectRef idx="0">
+            <a:schemeClr val="accent1"/>
+          </a:effectRef>
+          <a:fontRef idx="minor">
+            <a:schemeClr val="lt1"/>
+          </a:fontRef>
+        </p:style>
+        <p:txBody>
+          <a:bodyPr rtlCol="0" anchor="ctr"/>
+          <a:lstStyle/>
+          <a:p>
+            <a:pPr algn="ctr"/>
+            <a:endParaRPr lang="en-SG"/>
+          </a:p>
+        </p:txBody>
+      </p:sp>
+      <p:sp>
+        <p:nvSpPr>
+          <p:cNvPr id="5" name="Multiply 4"/>
+          <p:cNvSpPr/>
+          <p:nvPr/>
+        </p:nvSpPr>
+        <p:spPr>
+          <a:xfrm>
+            <a:off x="8763000" y="76200"/>
+            <a:ext cx="228600" cy="228600"/>
+          </a:xfrm>
+          <a:prstGeom prst="mathMultiply">
+            <a:avLst/>
+          </a:prstGeom>
+          <a:solidFill>
+            <a:schemeClr val="bg1"/>
+          </a:solidFill>
+          <a:ln>
+            <a:solidFill>
+              <a:schemeClr val="bg1"/>
+            </a:solidFill>
+          </a:ln>
+        </p:spPr>
+        <p:style>
+          <a:lnRef idx="2">
+            <a:schemeClr val="accent1">
+              <a:shade val="50000"/>
+            </a:schemeClr>
+          </a:lnRef>
+          <a:fillRef idx="1">
+            <a:schemeClr val="accent1"/>
+          </a:fillRef>
+          <a:effectRef idx="0">
+            <a:schemeClr val="accent1"/>
+          </a:effectRef>
+          <a:fontRef idx="minor">
+            <a:schemeClr val="lt1"/>
+          </a:fontRef>
+        </p:style>
+        <p:txBody>
+          <a:bodyPr rtlCol="0" anchor="ctr"/>
+          <a:lstStyle/>
+          <a:p>
+            <a:pPr algn="ctr"/>
+            <a:endParaRPr lang="en-SG"/>
+          </a:p>
+        </p:txBody>
+      </p:sp>
+      <p:sp>
+        <p:nvSpPr>
+          <p:cNvPr id="6" name="Rectangle 5"/>
+          <p:cNvSpPr/>
+          <p:nvPr/>
+        </p:nvSpPr>
+        <p:spPr>
+          <a:xfrm>
+            <a:off x="8305800" y="76200"/>
+            <a:ext cx="228600" cy="152400"/>
+          </a:xfrm>
+          <a:prstGeom prst="rect">
+            <a:avLst/>
+          </a:prstGeom>
+          <a:noFill/>
+          <a:ln>
+            <a:solidFill>
+              <a:schemeClr val="bg1"/>
+            </a:solidFill>
+          </a:ln>
+        </p:spPr>
+        <p:style>
+          <a:lnRef idx="2">
+            <a:schemeClr val="accent1">
+              <a:shade val="50000"/>
+            </a:schemeClr>
+          </a:lnRef>
+          <a:fillRef idx="1">
+            <a:schemeClr val="accent1"/>
+          </a:fillRef>
+          <a:effectRef idx="0">
+            <a:schemeClr val="accent1"/>
+          </a:effectRef>
+          <a:fontRef idx="minor">
+            <a:schemeClr val="lt1"/>
+          </a:fontRef>
+        </p:style>
+        <p:txBody>
+          <a:bodyPr rtlCol="0" anchor="ctr"/>
+          <a:lstStyle/>
+          <a:p>
+            <a:pPr algn="ctr"/>
+            <a:endParaRPr lang="en-SG"/>
+          </a:p>
+        </p:txBody>
+      </p:sp>
+      <p:sp>
+        <p:nvSpPr>
+          <p:cNvPr id="7" name="Minus 6"/>
+          <p:cNvSpPr/>
+          <p:nvPr/>
+        </p:nvSpPr>
+        <p:spPr>
+          <a:xfrm>
+            <a:off x="8001000" y="152400"/>
+            <a:ext cx="228600" cy="45719"/>
+          </a:xfrm>
+          <a:prstGeom prst="mathMinus">
+            <a:avLst/>
+          </a:prstGeom>
+          <a:solidFill>
+            <a:schemeClr val="bg1"/>
+          </a:solidFill>
+          <a:ln>
+            <a:solidFill>
+              <a:schemeClr val="bg1"/>
+            </a:solidFill>
+          </a:ln>
+        </p:spPr>
+        <p:style>
+          <a:lnRef idx="2">
+            <a:schemeClr val="accent1">
+              <a:shade val="50000"/>
+            </a:schemeClr>
+          </a:lnRef>
+          <a:fillRef idx="1">
+            <a:schemeClr val="accent1"/>
+          </a:fillRef>
+          <a:effectRef idx="0">
+            <a:schemeClr val="accent1"/>
+          </a:effectRef>
+          <a:fontRef idx="minor">
+            <a:schemeClr val="lt1"/>
+          </a:fontRef>
+        </p:style>
+        <p:txBody>
+          <a:bodyPr rtlCol="0" anchor="ctr"/>
+          <a:lstStyle/>
+          <a:p>
+            <a:pPr algn="ctr"/>
+            <a:endParaRPr lang="en-SG"/>
+          </a:p>
+        </p:txBody>
+      </p:sp>
+      <p:sp>
+        <p:nvSpPr>
+          <p:cNvPr id="8" name="TextBox 7"/>
+          <p:cNvSpPr txBox="1"/>
+          <p:nvPr/>
+        </p:nvSpPr>
+        <p:spPr>
+          <a:xfrm>
+            <a:off x="76200" y="381000"/>
+            <a:ext cx="978153" cy="307777"/>
+          </a:xfrm>
+          <a:prstGeom prst="rect">
+            <a:avLst/>
+          </a:prstGeom>
+          <a:noFill/>
+        </p:spPr>
+        <p:txBody>
+          <a:bodyPr wrap="none" rtlCol="0">
+            <a:spAutoFit/>
+          </a:bodyPr>
+          <a:lstStyle/>
+          <a:p>
+            <a:r>
+              <a:rPr lang="en-SG" sz="1400" dirty="0" smtClean="0">
+                <a:solidFill>
+                  <a:schemeClr val="bg1"/>
+                </a:solidFill>
+              </a:rPr>
+              <a:t>File     Help</a:t>
+            </a:r>
+            <a:endParaRPr lang="en-SG" sz="1400" dirty="0">
+              <a:solidFill>
+                <a:schemeClr val="bg1"/>
+              </a:solidFill>
+            </a:endParaRPr>
+          </a:p>
+        </p:txBody>
+      </p:sp>
+      <p:sp>
+        <p:nvSpPr>
+          <p:cNvPr id="9" name="Rectangle 8"/>
+          <p:cNvSpPr/>
+          <p:nvPr/>
+        </p:nvSpPr>
+        <p:spPr>
+          <a:xfrm>
+            <a:off x="76200" y="685800"/>
+            <a:ext cx="8991600" cy="457200"/>
+          </a:xfrm>
+          <a:prstGeom prst="rect">
+            <a:avLst/>
+          </a:prstGeom>
+          <a:solidFill>
+            <a:schemeClr val="bg1"/>
+          </a:solidFill>
+          <a:ln>
+            <a:noFill/>
+          </a:ln>
+        </p:spPr>
+        <p:style>
+          <a:lnRef idx="2">
+            <a:schemeClr val="accent1">
+              <a:shade val="50000"/>
+            </a:schemeClr>
+          </a:lnRef>
+          <a:fillRef idx="1">
+            <a:schemeClr val="accent1"/>
+          </a:fillRef>
+          <a:effectRef idx="0">
+            <a:schemeClr val="accent1"/>
+          </a:effectRef>
+          <a:fontRef idx="minor">
+            <a:schemeClr val="lt1"/>
+          </a:fontRef>
+        </p:style>
+        <p:txBody>
+          <a:bodyPr rtlCol="0" anchor="ctr"/>
+          <a:lstStyle/>
+          <a:p>
+            <a:r>
+              <a:rPr lang="en-SG" sz="1400" dirty="0" smtClean="0">
+                <a:solidFill>
+                  <a:schemeClr val="bg1">
+                    <a:lumMod val="75000"/>
+                  </a:schemeClr>
+                </a:solidFill>
+              </a:rPr>
+              <a:t>Enter command here…</a:t>
+            </a:r>
+            <a:endParaRPr lang="en-SG" sz="1400" dirty="0">
+              <a:solidFill>
+                <a:schemeClr val="bg1">
+                  <a:lumMod val="75000"/>
+                </a:schemeClr>
+              </a:solidFill>
+            </a:endParaRPr>
+          </a:p>
+        </p:txBody>
+      </p:sp>
+      <p:sp>
+        <p:nvSpPr>
+          <p:cNvPr id="10" name="Rectangle 9"/>
+          <p:cNvSpPr/>
+          <p:nvPr/>
+        </p:nvSpPr>
+        <p:spPr>
+          <a:xfrm>
+            <a:off x="76200" y="1219200"/>
+            <a:ext cx="8991600" cy="1143000"/>
+          </a:xfrm>
+          <a:prstGeom prst="rect">
+            <a:avLst/>
+          </a:prstGeom>
+          <a:solidFill>
+            <a:schemeClr val="bg1"/>
+          </a:solidFill>
+          <a:ln>
+            <a:noFill/>
+          </a:ln>
+        </p:spPr>
+        <p:style>
+          <a:lnRef idx="2">
+            <a:schemeClr val="accent1">
+              <a:shade val="50000"/>
+            </a:schemeClr>
+          </a:lnRef>
+          <a:fillRef idx="1">
+            <a:schemeClr val="accent1"/>
+          </a:fillRef>
+          <a:effectRef idx="0">
+            <a:schemeClr val="accent1"/>
+          </a:effectRef>
+          <a:fontRef idx="minor">
+            <a:schemeClr val="lt1"/>
+          </a:fontRef>
+        </p:style>
+        <p:txBody>
+          <a:bodyPr rtlCol="0" anchor="t"/>
+          <a:lstStyle/>
+          <a:p>
+            <a:r>
+              <a:rPr lang="en-SG" sz="1400" dirty="0" smtClean="0">
+                <a:solidFill>
+                  <a:schemeClr val="tx1"/>
+                </a:solidFill>
+              </a:rPr>
+              <a:t>Added </a:t>
+            </a:r>
+            <a:r>
+              <a:rPr lang="en-SG" sz="1400" dirty="0" smtClean="0">
+                <a:solidFill>
+                  <a:srgbClr val="00B0F0"/>
+                </a:solidFill>
+              </a:rPr>
+              <a:t>Task</a:t>
+            </a:r>
+            <a:r>
+              <a:rPr lang="en-SG" sz="1400" dirty="0" smtClean="0">
+                <a:solidFill>
+                  <a:schemeClr val="tx1"/>
+                </a:solidFill>
+              </a:rPr>
+              <a:t>: CS2103 Project </a:t>
+            </a:r>
+            <a:r>
+              <a:rPr lang="en-SG" sz="1400" dirty="0" smtClean="0">
+                <a:solidFill>
+                  <a:srgbClr val="00B0F0"/>
+                </a:solidFill>
+              </a:rPr>
+              <a:t>Desc</a:t>
+            </a:r>
+            <a:r>
+              <a:rPr lang="en-SG" sz="1400" dirty="0" smtClean="0">
+                <a:solidFill>
+                  <a:schemeClr val="tx1"/>
+                </a:solidFill>
+              </a:rPr>
+              <a:t>: Complete v0.0 </a:t>
+            </a:r>
+            <a:r>
+              <a:rPr lang="en-SG" sz="1400" dirty="0" smtClean="0">
+                <a:solidFill>
+                  <a:srgbClr val="00B0F0"/>
+                </a:solidFill>
+              </a:rPr>
+              <a:t>By</a:t>
+            </a:r>
+            <a:r>
+              <a:rPr lang="en-SG" sz="1400" dirty="0" smtClean="0">
+                <a:solidFill>
+                  <a:schemeClr val="tx1"/>
+                </a:solidFill>
+              </a:rPr>
+              <a:t>: 7-10-16</a:t>
+            </a:r>
+            <a:endParaRPr lang="en-SG" sz="1400" dirty="0">
+              <a:solidFill>
+                <a:schemeClr val="tx1"/>
+              </a:solidFill>
+            </a:endParaRPr>
+          </a:p>
+        </p:txBody>
+      </p:sp>
+      <p:sp>
+        <p:nvSpPr>
+          <p:cNvPr id="12" name="Rectangle 11"/>
+          <p:cNvSpPr/>
+          <p:nvPr/>
+        </p:nvSpPr>
+        <p:spPr>
+          <a:xfrm>
+            <a:off x="4648200" y="2438400"/>
+            <a:ext cx="4419600" cy="4343400"/>
+          </a:xfrm>
+          <a:prstGeom prst="rect">
+            <a:avLst/>
+          </a:prstGeom>
+          <a:solidFill>
+            <a:schemeClr val="accent3">
+              <a:lumMod val="40000"/>
+              <a:lumOff val="60000"/>
+            </a:schemeClr>
+          </a:solidFill>
+          <a:ln>
+            <a:noFill/>
+          </a:ln>
+        </p:spPr>
+        <p:style>
+          <a:lnRef idx="2">
+            <a:schemeClr val="accent1">
+              <a:shade val="50000"/>
+            </a:schemeClr>
+          </a:lnRef>
+          <a:fillRef idx="1">
+            <a:schemeClr val="accent1"/>
+          </a:fillRef>
+          <a:effectRef idx="0">
+            <a:schemeClr val="accent1"/>
+          </a:effectRef>
+          <a:fontRef idx="minor">
+            <a:schemeClr val="lt1"/>
+          </a:fontRef>
+        </p:style>
+        <p:txBody>
+          <a:bodyPr rtlCol="0" anchor="t"/>
+          <a:lstStyle/>
+          <a:p>
+            <a:r>
+              <a:rPr lang="en-SG" u="sng" dirty="0" smtClean="0">
+                <a:solidFill>
+                  <a:schemeClr val="accent3">
+                    <a:lumMod val="75000"/>
+                  </a:schemeClr>
+                </a:solidFill>
+              </a:rPr>
+              <a:t>Event </a:t>
+            </a:r>
+            <a:r>
+              <a:rPr lang="en-SG" u="sng" dirty="0">
+                <a:solidFill>
+                  <a:schemeClr val="accent3">
+                    <a:lumMod val="75000"/>
+                  </a:schemeClr>
+                </a:solidFill>
+              </a:rPr>
+              <a:t>List</a:t>
+            </a:r>
+          </a:p>
+        </p:txBody>
+      </p:sp>
+      <p:sp>
+        <p:nvSpPr>
+          <p:cNvPr id="15" name="Rectangle 14"/>
+          <p:cNvSpPr/>
+          <p:nvPr/>
+        </p:nvSpPr>
+        <p:spPr>
+          <a:xfrm>
+            <a:off x="4724400" y="2819400"/>
+            <a:ext cx="4267200" cy="685800"/>
+          </a:xfrm>
+          <a:prstGeom prst="rect">
+            <a:avLst/>
+          </a:prstGeom>
+          <a:noFill/>
+          <a:ln>
+            <a:solidFill>
+              <a:schemeClr val="accent3">
+                <a:lumMod val="75000"/>
+              </a:schemeClr>
+            </a:solidFill>
+          </a:ln>
+        </p:spPr>
+        <p:style>
+          <a:lnRef idx="2">
+            <a:schemeClr val="accent1">
+              <a:shade val="50000"/>
+            </a:schemeClr>
+          </a:lnRef>
+          <a:fillRef idx="1">
+            <a:schemeClr val="accent1"/>
+          </a:fillRef>
+          <a:effectRef idx="0">
+            <a:schemeClr val="accent1"/>
+          </a:effectRef>
+          <a:fontRef idx="minor">
+            <a:schemeClr val="lt1"/>
+          </a:fontRef>
+        </p:style>
+        <p:txBody>
+          <a:bodyPr rtlCol="0" anchor="t"/>
+          <a:lstStyle/>
+          <a:p>
+            <a:pPr marL="342900" indent="-342900">
+              <a:buAutoNum type="arabicPeriod"/>
+            </a:pPr>
+            <a:r>
+              <a:rPr lang="en-SG" sz="1600" dirty="0">
+                <a:solidFill>
+                  <a:schemeClr val="tx1"/>
+                </a:solidFill>
+              </a:rPr>
+              <a:t> </a:t>
+            </a:r>
+            <a:r>
+              <a:rPr lang="en-SG" sz="1600" dirty="0" smtClean="0">
+                <a:solidFill>
+                  <a:schemeClr val="tx1"/>
+                </a:solidFill>
+              </a:rPr>
+              <a:t>High School Gathering</a:t>
+            </a:r>
+            <a:endParaRPr lang="en-SG" sz="1600" dirty="0">
+              <a:solidFill>
+                <a:schemeClr val="tx1"/>
+              </a:solidFill>
+            </a:endParaRPr>
+          </a:p>
+          <a:p>
+            <a:r>
+              <a:rPr lang="en-SG" sz="1100" dirty="0" smtClean="0">
+                <a:solidFill>
+                  <a:schemeClr val="accent3">
+                    <a:lumMod val="75000"/>
+                  </a:schemeClr>
+                </a:solidFill>
+              </a:rPr>
+              <a:t>Desc</a:t>
+            </a:r>
+            <a:r>
+              <a:rPr lang="en-SG" sz="1100" dirty="0" smtClean="0">
+                <a:solidFill>
+                  <a:schemeClr val="tx2">
+                    <a:lumMod val="60000"/>
+                    <a:lumOff val="40000"/>
+                  </a:schemeClr>
+                </a:solidFill>
+              </a:rPr>
+              <a:t>     </a:t>
+            </a:r>
+            <a:r>
+              <a:rPr lang="en-SG" sz="1100" dirty="0" smtClean="0">
+                <a:solidFill>
+                  <a:schemeClr val="tx1"/>
+                </a:solidFill>
+              </a:rPr>
+              <a:t>Bugis Nando’s at 7pm</a:t>
+            </a:r>
+          </a:p>
+          <a:p>
+            <a:r>
+              <a:rPr lang="en-SG" sz="1100" dirty="0" smtClean="0">
+                <a:solidFill>
+                  <a:schemeClr val="accent3">
+                    <a:lumMod val="75000"/>
+                  </a:schemeClr>
+                </a:solidFill>
+              </a:rPr>
+              <a:t>From </a:t>
+            </a:r>
+            <a:r>
+              <a:rPr lang="en-SG" sz="1100" dirty="0" smtClean="0"/>
+              <a:t>   </a:t>
+            </a:r>
+            <a:r>
+              <a:rPr lang="en-SG" sz="1100" dirty="0" smtClean="0">
+                <a:solidFill>
+                  <a:schemeClr val="tx1"/>
+                </a:solidFill>
+              </a:rPr>
+              <a:t>20-10-16      </a:t>
+            </a:r>
+            <a:r>
+              <a:rPr lang="en-SG" sz="1100" dirty="0">
+                <a:solidFill>
+                  <a:schemeClr val="accent3">
+                    <a:lumMod val="75000"/>
+                  </a:schemeClr>
+                </a:solidFill>
+              </a:rPr>
+              <a:t>to</a:t>
+            </a:r>
+            <a:r>
+              <a:rPr lang="en-SG" sz="1100" dirty="0" smtClean="0">
+                <a:solidFill>
+                  <a:schemeClr val="tx1"/>
+                </a:solidFill>
+              </a:rPr>
+              <a:t>       20-10-16</a:t>
+            </a:r>
+            <a:endParaRPr lang="en-SG" sz="1100" dirty="0"/>
+          </a:p>
+        </p:txBody>
+      </p:sp>
+      <p:sp>
+        <p:nvSpPr>
+          <p:cNvPr id="11" name="Rectangle 10"/>
+          <p:cNvSpPr/>
+          <p:nvPr/>
+        </p:nvSpPr>
+        <p:spPr>
+          <a:xfrm>
+            <a:off x="76200" y="2438400"/>
+            <a:ext cx="4495800" cy="4343400"/>
+          </a:xfrm>
+          <a:prstGeom prst="rect">
+            <a:avLst/>
+          </a:prstGeom>
+          <a:solidFill>
+            <a:schemeClr val="accent5">
+              <a:lumMod val="40000"/>
+              <a:lumOff val="60000"/>
+            </a:schemeClr>
+          </a:solidFill>
+          <a:ln>
+            <a:noFill/>
+          </a:ln>
+        </p:spPr>
+        <p:style>
+          <a:lnRef idx="2">
+            <a:schemeClr val="accent1">
+              <a:shade val="50000"/>
+            </a:schemeClr>
+          </a:lnRef>
+          <a:fillRef idx="1">
+            <a:schemeClr val="accent1"/>
+          </a:fillRef>
+          <a:effectRef idx="0">
+            <a:schemeClr val="accent1"/>
+          </a:effectRef>
+          <a:fontRef idx="minor">
+            <a:schemeClr val="lt1"/>
+          </a:fontRef>
+        </p:style>
+        <p:txBody>
+          <a:bodyPr rtlCol="0" anchor="t"/>
+          <a:lstStyle/>
+          <a:p>
+            <a:r>
+              <a:rPr lang="en-SG" u="sng" dirty="0" smtClean="0">
+                <a:solidFill>
+                  <a:schemeClr val="tx2">
+                    <a:lumMod val="60000"/>
+                    <a:lumOff val="40000"/>
+                  </a:schemeClr>
+                </a:solidFill>
+              </a:rPr>
+              <a:t>Task List</a:t>
+            </a:r>
+          </a:p>
+        </p:txBody>
+      </p:sp>
+      <p:sp>
+        <p:nvSpPr>
+          <p:cNvPr id="14" name="Rectangle 13"/>
+          <p:cNvSpPr/>
+          <p:nvPr/>
+        </p:nvSpPr>
+        <p:spPr>
+          <a:xfrm>
+            <a:off x="152400" y="2819400"/>
+            <a:ext cx="4343400" cy="685800"/>
+          </a:xfrm>
+          <a:prstGeom prst="rect">
+            <a:avLst/>
+          </a:prstGeom>
+          <a:noFill/>
+          <a:ln>
+            <a:solidFill>
+              <a:schemeClr val="tx2">
+                <a:lumMod val="60000"/>
+                <a:lumOff val="40000"/>
+              </a:schemeClr>
+            </a:solidFill>
+          </a:ln>
+        </p:spPr>
+        <p:style>
+          <a:lnRef idx="2">
+            <a:schemeClr val="accent1">
+              <a:shade val="50000"/>
+            </a:schemeClr>
+          </a:lnRef>
+          <a:fillRef idx="1">
+            <a:schemeClr val="accent1"/>
+          </a:fillRef>
+          <a:effectRef idx="0">
+            <a:schemeClr val="accent1"/>
+          </a:effectRef>
+          <a:fontRef idx="minor">
+            <a:schemeClr val="lt1"/>
+          </a:fontRef>
+        </p:style>
+        <p:txBody>
+          <a:bodyPr rtlCol="0" anchor="t"/>
+          <a:lstStyle/>
+          <a:p>
+            <a:pPr marL="342900" indent="-342900">
+              <a:buAutoNum type="arabicPeriod"/>
+            </a:pPr>
+            <a:r>
+              <a:rPr lang="en-SG" sz="1600" dirty="0" smtClean="0">
+                <a:solidFill>
+                  <a:schemeClr val="tx1"/>
+                </a:solidFill>
+              </a:rPr>
+              <a:t>  Sociology Essay</a:t>
+            </a:r>
+          </a:p>
+          <a:p>
+            <a:r>
+              <a:rPr lang="en-SG" sz="1100" dirty="0" smtClean="0">
+                <a:solidFill>
+                  <a:schemeClr val="tx2">
+                    <a:lumMod val="60000"/>
+                    <a:lumOff val="40000"/>
+                  </a:schemeClr>
+                </a:solidFill>
+              </a:rPr>
+              <a:t>By</a:t>
+            </a:r>
+            <a:r>
+              <a:rPr lang="en-SG" sz="1100" dirty="0" smtClean="0"/>
+              <a:t>         </a:t>
+            </a:r>
+            <a:r>
+              <a:rPr lang="en-SG" sz="1100" dirty="0" smtClean="0">
+                <a:solidFill>
+                  <a:schemeClr val="tx1"/>
+                </a:solidFill>
+              </a:rPr>
+              <a:t>20-10-16</a:t>
+            </a:r>
+            <a:endParaRPr lang="en-SG" sz="1100" dirty="0">
+              <a:solidFill>
+                <a:schemeClr val="tx1"/>
+              </a:solidFill>
+            </a:endParaRPr>
+          </a:p>
+        </p:txBody>
+      </p:sp>
+      <p:sp>
+        <p:nvSpPr>
+          <p:cNvPr id="17" name="Rectangle 16"/>
+          <p:cNvSpPr/>
+          <p:nvPr/>
+        </p:nvSpPr>
+        <p:spPr>
+          <a:xfrm>
+            <a:off x="152400" y="3581400"/>
+            <a:ext cx="4343400" cy="685800"/>
+          </a:xfrm>
+          <a:prstGeom prst="rect">
+            <a:avLst/>
+          </a:prstGeom>
+          <a:noFill/>
+          <a:ln>
+            <a:solidFill>
+              <a:schemeClr val="tx2">
+                <a:lumMod val="60000"/>
+                <a:lumOff val="40000"/>
+              </a:schemeClr>
+            </a:solidFill>
+          </a:ln>
+        </p:spPr>
+        <p:style>
+          <a:lnRef idx="2">
+            <a:schemeClr val="accent1">
+              <a:shade val="50000"/>
+            </a:schemeClr>
+          </a:lnRef>
+          <a:fillRef idx="1">
+            <a:schemeClr val="accent1"/>
+          </a:fillRef>
+          <a:effectRef idx="0">
+            <a:schemeClr val="accent1"/>
+          </a:effectRef>
+          <a:fontRef idx="minor">
+            <a:schemeClr val="lt1"/>
+          </a:fontRef>
+        </p:style>
+        <p:txBody>
+          <a:bodyPr rtlCol="0" anchor="ctr"/>
+          <a:lstStyle/>
+          <a:p>
+            <a:pPr marL="342900" indent="-342900">
+              <a:buFont typeface="+mj-lt"/>
+              <a:buAutoNum type="arabicPeriod" startAt="2"/>
+            </a:pPr>
+            <a:r>
+              <a:rPr lang="en-SG" sz="1600" dirty="0" smtClean="0">
+                <a:solidFill>
+                  <a:schemeClr val="tx1"/>
+                </a:solidFill>
+              </a:rPr>
+              <a:t>  CS2103 Project</a:t>
+            </a:r>
+            <a:endParaRPr lang="en-SG" sz="1600" dirty="0">
+              <a:solidFill>
+                <a:schemeClr val="tx1"/>
+              </a:solidFill>
+            </a:endParaRPr>
+          </a:p>
+          <a:p>
+            <a:r>
+              <a:rPr lang="en-SG" sz="1100" dirty="0" smtClean="0">
+                <a:solidFill>
+                  <a:schemeClr val="tx2">
+                    <a:lumMod val="60000"/>
+                    <a:lumOff val="40000"/>
+                  </a:schemeClr>
+                </a:solidFill>
+              </a:rPr>
+              <a:t>Desc</a:t>
+            </a:r>
+            <a:r>
+              <a:rPr lang="en-SG" sz="1100" dirty="0" smtClean="0"/>
+              <a:t>     </a:t>
+            </a:r>
+            <a:r>
+              <a:rPr lang="en-SG" sz="1100" dirty="0" smtClean="0">
+                <a:solidFill>
+                  <a:schemeClr val="tx1"/>
+                </a:solidFill>
+              </a:rPr>
+              <a:t>Complete v0.0</a:t>
+            </a:r>
+          </a:p>
+          <a:p>
+            <a:r>
+              <a:rPr lang="en-SG" sz="1100" dirty="0" smtClean="0">
+                <a:solidFill>
+                  <a:schemeClr val="tx2">
+                    <a:lumMod val="60000"/>
+                    <a:lumOff val="40000"/>
+                  </a:schemeClr>
+                </a:solidFill>
+              </a:rPr>
+              <a:t>By</a:t>
+            </a:r>
+            <a:r>
+              <a:rPr lang="en-SG" sz="1100" dirty="0" smtClean="0"/>
+              <a:t>         </a:t>
+            </a:r>
+            <a:r>
+              <a:rPr lang="en-SG" sz="1100" dirty="0" smtClean="0">
+                <a:solidFill>
+                  <a:schemeClr val="tx1"/>
+                </a:solidFill>
+              </a:rPr>
+              <a:t>20-10-16</a:t>
+            </a:r>
+            <a:endParaRPr lang="en-SG" sz="1100" dirty="0">
+              <a:solidFill>
+                <a:schemeClr val="tx1"/>
+              </a:solidFill>
+            </a:endParaRPr>
+          </a:p>
+        </p:txBody>
+      </p:sp>
     </p:spTree>
     <p:extLst>
       <p:ext uri="{BB962C8B-B14F-4D97-AF65-F5344CB8AC3E}">

</xml_diff>

<commit_message>
I've already updated the class diagrams to fit our current program architecture. Btw I think "Reminder" and "DueDate" should be extended from a "Date" class
</commit_message>
<xml_diff>
--- a/docs/diagrams/Diagrams.pptx
+++ b/docs/diagrams/Diagrams.pptx
@@ -200,7 +200,7 @@
           <a:p>
             <a:fld id="{F5CC4B3F-88C1-4FFA-B1B6-F41C21DC6924}" type="datetimeFigureOut">
               <a:rPr lang="en-US" smtClean="0"/>
-              <a:t>9/30/2016</a:t>
+              <a:t>10/6/2016</a:t>
             </a:fld>
             <a:endParaRPr lang="en-US"/>
           </a:p>
@@ -649,7 +649,7 @@
           <a:p>
             <a:fld id="{78C97017-6FC3-485B-9764-EAC9E56C1D49}" type="datetimeFigureOut">
               <a:rPr lang="en-US" smtClean="0"/>
-              <a:t>9/30/2016</a:t>
+              <a:t>10/6/2016</a:t>
             </a:fld>
             <a:endParaRPr lang="en-US"/>
           </a:p>
@@ -819,7 +819,7 @@
           <a:p>
             <a:fld id="{78C97017-6FC3-485B-9764-EAC9E56C1D49}" type="datetimeFigureOut">
               <a:rPr lang="en-US" smtClean="0"/>
-              <a:t>9/30/2016</a:t>
+              <a:t>10/6/2016</a:t>
             </a:fld>
             <a:endParaRPr lang="en-US"/>
           </a:p>
@@ -999,7 +999,7 @@
           <a:p>
             <a:fld id="{78C97017-6FC3-485B-9764-EAC9E56C1D49}" type="datetimeFigureOut">
               <a:rPr lang="en-US" smtClean="0"/>
-              <a:t>9/30/2016</a:t>
+              <a:t>10/6/2016</a:t>
             </a:fld>
             <a:endParaRPr lang="en-US"/>
           </a:p>
@@ -1169,7 +1169,7 @@
           <a:p>
             <a:fld id="{78C97017-6FC3-485B-9764-EAC9E56C1D49}" type="datetimeFigureOut">
               <a:rPr lang="en-US" smtClean="0"/>
-              <a:t>9/30/2016</a:t>
+              <a:t>10/6/2016</a:t>
             </a:fld>
             <a:endParaRPr lang="en-US"/>
           </a:p>
@@ -1415,7 +1415,7 @@
           <a:p>
             <a:fld id="{78C97017-6FC3-485B-9764-EAC9E56C1D49}" type="datetimeFigureOut">
               <a:rPr lang="en-US" smtClean="0"/>
-              <a:t>9/30/2016</a:t>
+              <a:t>10/6/2016</a:t>
             </a:fld>
             <a:endParaRPr lang="en-US"/>
           </a:p>
@@ -1703,7 +1703,7 @@
           <a:p>
             <a:fld id="{78C97017-6FC3-485B-9764-EAC9E56C1D49}" type="datetimeFigureOut">
               <a:rPr lang="en-US" smtClean="0"/>
-              <a:t>9/30/2016</a:t>
+              <a:t>10/6/2016</a:t>
             </a:fld>
             <a:endParaRPr lang="en-US"/>
           </a:p>
@@ -2125,7 +2125,7 @@
           <a:p>
             <a:fld id="{78C97017-6FC3-485B-9764-EAC9E56C1D49}" type="datetimeFigureOut">
               <a:rPr lang="en-US" smtClean="0"/>
-              <a:t>9/30/2016</a:t>
+              <a:t>10/6/2016</a:t>
             </a:fld>
             <a:endParaRPr lang="en-US"/>
           </a:p>
@@ -2243,7 +2243,7 @@
           <a:p>
             <a:fld id="{78C97017-6FC3-485B-9764-EAC9E56C1D49}" type="datetimeFigureOut">
               <a:rPr lang="en-US" smtClean="0"/>
-              <a:t>9/30/2016</a:t>
+              <a:t>10/6/2016</a:t>
             </a:fld>
             <a:endParaRPr lang="en-US"/>
           </a:p>
@@ -2338,7 +2338,7 @@
           <a:p>
             <a:fld id="{78C97017-6FC3-485B-9764-EAC9E56C1D49}" type="datetimeFigureOut">
               <a:rPr lang="en-US" smtClean="0"/>
-              <a:t>9/30/2016</a:t>
+              <a:t>10/6/2016</a:t>
             </a:fld>
             <a:endParaRPr lang="en-US"/>
           </a:p>
@@ -2615,7 +2615,7 @@
           <a:p>
             <a:fld id="{78C97017-6FC3-485B-9764-EAC9E56C1D49}" type="datetimeFigureOut">
               <a:rPr lang="en-US" smtClean="0"/>
-              <a:t>9/30/2016</a:t>
+              <a:t>10/6/2016</a:t>
             </a:fld>
             <a:endParaRPr lang="en-US"/>
           </a:p>
@@ -2868,7 +2868,7 @@
           <a:p>
             <a:fld id="{78C97017-6FC3-485B-9764-EAC9E56C1D49}" type="datetimeFigureOut">
               <a:rPr lang="en-US" smtClean="0"/>
-              <a:t>9/30/2016</a:t>
+              <a:t>10/6/2016</a:t>
             </a:fld>
             <a:endParaRPr lang="en-US"/>
           </a:p>
@@ -3081,7 +3081,7 @@
           <a:p>
             <a:fld id="{78C97017-6FC3-485B-9764-EAC9E56C1D49}" type="datetimeFigureOut">
               <a:rPr lang="en-US" smtClean="0"/>
-              <a:t>9/30/2016</a:t>
+              <a:t>10/6/2016</a:t>
             </a:fld>
             <a:endParaRPr lang="en-US"/>
           </a:p>
@@ -5753,7 +5753,7 @@
                   <a:srgbClr val="7030A0"/>
                 </a:solidFill>
               </a:rPr>
-              <a:t>deletePerson</a:t>
+              <a:t>deleteTask</a:t>
             </a:r>
             <a:r>
               <a:rPr lang="en-US" sz="1400" dirty="0" smtClean="0">
@@ -5761,7 +5761,15 @@
                   <a:srgbClr val="7030A0"/>
                 </a:solidFill>
               </a:rPr>
-              <a:t>(p)</a:t>
+              <a:t>(p</a:t>
+            </a:r>
+            <a:r>
+              <a:rPr lang="en-US" sz="1400" dirty="0" smtClean="0">
+                <a:solidFill>
+                  <a:srgbClr val="7030A0"/>
+                </a:solidFill>
+              </a:rPr>
+              <a:t>)</a:t>
             </a:r>
             <a:endParaRPr lang="en-US" sz="1400" dirty="0">
               <a:solidFill>
@@ -5811,7 +5819,7 @@
                   </a:schemeClr>
                 </a:solidFill>
               </a:rPr>
-              <a:t>AddressBookChangedEvent</a:t>
+              <a:t>LifekeeperChangedEvent</a:t>
             </a:r>
             <a:r>
               <a:rPr lang="en-US" sz="1400" dirty="0" smtClean="0">
@@ -6385,7 +6393,7 @@
                   </a:schemeClr>
                 </a:solidFill>
               </a:rPr>
-              <a:t>AddressBookChangedEvent</a:t>
+              <a:t>LifekeeperChangedEvent</a:t>
             </a:r>
             <a:r>
               <a:rPr lang="en-US" sz="1400" dirty="0" smtClean="0">
@@ -6757,7 +6765,7 @@
                   </a:schemeClr>
                 </a:solidFill>
               </a:rPr>
-              <a:t>handleAddresssBookChangedEvent</a:t>
+              <a:t>handleLifekeeperChangedEvent</a:t>
             </a:r>
             <a:r>
               <a:rPr lang="en-US" sz="1400" dirty="0" smtClean="0">
@@ -7068,7 +7076,7 @@
                   <a:srgbClr val="00B050"/>
                 </a:solidFill>
               </a:rPr>
-              <a:t>handleAddresssBookChangedEvent</a:t>
+              <a:t>handleLifekeeperChangedEvent</a:t>
             </a:r>
             <a:r>
               <a:rPr lang="en-US" sz="1400" dirty="0" smtClean="0">
@@ -8134,14 +8142,14 @@
           <a:p>
             <a:pPr algn="ctr"/>
             <a:r>
-              <a:rPr lang="en-US" sz="1050" b="1" dirty="0" err="1">
+              <a:rPr lang="en-US" sz="1050" b="1" dirty="0" err="1" smtClean="0">
                 <a:solidFill>
                   <a:schemeClr val="accent3">
                     <a:lumMod val="75000"/>
                   </a:schemeClr>
                 </a:solidFill>
               </a:rPr>
-              <a:t>PersonListPanel</a:t>
+              <a:t>TaskListPanel</a:t>
             </a:r>
             <a:endParaRPr lang="en-SG" sz="1050" b="1" dirty="0">
               <a:solidFill>
@@ -12280,7 +12288,6 @@
               <a:rPr lang="en-US" dirty="0"/>
               <a:t>execute()</a:t>
             </a:r>
-            <a:endParaRPr lang="en-US" dirty="0"/>
           </a:p>
         </p:txBody>
       </p:sp>
@@ -12797,7 +12804,7 @@
                   <a:srgbClr val="7030A0"/>
                 </a:solidFill>
               </a:rPr>
-              <a:t>deletePerson</a:t>
+              <a:t>deleteTask</a:t>
             </a:r>
             <a:r>
               <a:rPr lang="en-US" dirty="0" smtClean="0">
@@ -12805,7 +12812,15 @@
                   <a:srgbClr val="7030A0"/>
                 </a:solidFill>
               </a:rPr>
-              <a:t>(p)</a:t>
+              <a:t>(p</a:t>
+            </a:r>
+            <a:r>
+              <a:rPr lang="en-US" dirty="0" smtClean="0">
+                <a:solidFill>
+                  <a:srgbClr val="7030A0"/>
+                </a:solidFill>
+              </a:rPr>
+              <a:t>)</a:t>
             </a:r>
             <a:endParaRPr lang="en-US" dirty="0">
               <a:solidFill>
@@ -13936,7 +13951,15 @@
                   <a:srgbClr val="7030A0"/>
                 </a:solidFill>
               </a:rPr>
-              <a:t>AddressBook</a:t>
+              <a:t>Life</a:t>
+            </a:r>
+            <a:r>
+              <a:rPr lang="en-US" sz="1050" dirty="0" err="1" smtClean="0">
+                <a:solidFill>
+                  <a:srgbClr val="7030A0"/>
+                </a:solidFill>
+              </a:rPr>
+              <a:t>keeper</a:t>
             </a:r>
             <a:endParaRPr lang="en-SG" sz="1050" dirty="0">
               <a:solidFill>
@@ -14078,7 +14101,7 @@
                   <a:srgbClr val="7030A0"/>
                 </a:solidFill>
               </a:rPr>
-              <a:t>UniquePersonList</a:t>
+              <a:t>UniqueTaskList</a:t>
             </a:r>
             <a:endParaRPr lang="en-SG" sz="1050" dirty="0">
               <a:solidFill>
@@ -14321,7 +14344,7 @@
                   <a:srgbClr val="7030A0"/>
                 </a:solidFill>
               </a:rPr>
-              <a:t>Person</a:t>
+              <a:t>Task</a:t>
             </a:r>
             <a:endParaRPr lang="en-SG" sz="1050" dirty="0">
               <a:solidFill>
@@ -14620,7 +14643,7 @@
                   <a:srgbClr val="7030A0"/>
                 </a:solidFill>
               </a:rPr>
-              <a:t>ReadOnlyPerson</a:t>
+              <a:t>ReadOnlyTask</a:t>
             </a:r>
             <a:endParaRPr lang="en-SG" sz="1050" dirty="0">
               <a:solidFill>
@@ -14815,12 +14838,12 @@
           <a:p>
             <a:pPr algn="ctr"/>
             <a:r>
-              <a:rPr lang="en-US" sz="1050" dirty="0" smtClean="0">
+              <a:rPr lang="en-SG" sz="1050" dirty="0" err="1" smtClean="0">
                 <a:solidFill>
                   <a:srgbClr val="7030A0"/>
                 </a:solidFill>
               </a:rPr>
-              <a:t>Phone</a:t>
+              <a:t>DueDate</a:t>
             </a:r>
             <a:endParaRPr lang="en-SG" sz="1050" dirty="0">
               <a:solidFill>
@@ -14912,12 +14935,12 @@
           <a:p>
             <a:pPr algn="ctr"/>
             <a:r>
-              <a:rPr lang="en-US" sz="1050" dirty="0" smtClean="0">
+              <a:rPr lang="en-SG" sz="1050" dirty="0" smtClean="0">
                 <a:solidFill>
                   <a:srgbClr val="7030A0"/>
                 </a:solidFill>
               </a:rPr>
-              <a:t>Email</a:t>
+              <a:t>Priority</a:t>
             </a:r>
             <a:endParaRPr lang="en-SG" sz="1050" dirty="0">
               <a:solidFill>
@@ -15009,14 +15032,14 @@
           <a:p>
             <a:pPr algn="ctr"/>
             <a:r>
-              <a:rPr lang="en-US" sz="1050" dirty="0" smtClean="0">
+              <a:rPr lang="en-SG" sz="1000" dirty="0" smtClean="0">
                 <a:solidFill>
                   <a:srgbClr val="7030A0"/>
                 </a:solidFill>
               </a:rPr>
-              <a:t>Address</a:t>
-            </a:r>
-            <a:endParaRPr lang="en-SG" sz="1050" dirty="0">
+              <a:t>Reminder</a:t>
+            </a:r>
+            <a:endParaRPr lang="en-SG" sz="1000" dirty="0">
               <a:solidFill>
                 <a:srgbClr val="7030A0"/>
               </a:solidFill>
@@ -15217,7 +15240,7 @@
                   <a:srgbClr val="7030A0"/>
                 </a:solidFill>
               </a:rPr>
-              <a:t>ReadOnlyAddressBook</a:t>
+              <a:t>ReadOnlyLifekeeper</a:t>
             </a:r>
             <a:endParaRPr lang="en-SG" sz="1050" dirty="0">
               <a:solidFill>
@@ -16603,7 +16626,7 @@
                   </a:schemeClr>
                 </a:solidFill>
               </a:rPr>
-              <a:t>AddressBook</a:t>
+              <a:t>Lifekeeper</a:t>
             </a:r>
             <a:endParaRPr lang="en-SG" sz="1050" b="1" dirty="0">
               <a:solidFill>
@@ -16756,7 +16779,7 @@
                   </a:schemeClr>
                 </a:solidFill>
               </a:rPr>
-              <a:t>XmlAdaptedPerson</a:t>
+              <a:t>XmlAdaptedTask</a:t>
             </a:r>
             <a:endParaRPr lang="en-SG" sz="1050" b="1" dirty="0">
               <a:solidFill>

</xml_diff>

<commit_message>
Replace Address references with Task references.
</commit_message>
<xml_diff>
--- a/docs/diagrams/Diagrams.pptx
+++ b/docs/diagrams/Diagrams.pptx
@@ -115,6 +115,22 @@
       </a:defRPr>
     </a:lvl9pPr>
   </p:defaultTextStyle>
+  <p:extLst>
+    <p:ext uri="{EFAFB233-063F-42B5-8137-9DF3F51BA10A}">
+      <p15:sldGuideLst xmlns:p15="http://schemas.microsoft.com/office/powerpoint/2012/main">
+        <p15:guide id="1" orient="horz" pos="1488">
+          <p15:clr>
+            <a:srgbClr val="A4A3A4"/>
+          </p15:clr>
+        </p15:guide>
+        <p15:guide id="2" pos="2880">
+          <p15:clr>
+            <a:srgbClr val="A4A3A4"/>
+          </p15:clr>
+        </p15:guide>
+      </p15:sldGuideLst>
+    </p:ext>
+  </p:extLst>
 </p:presentation>
 </file>
 
@@ -200,7 +216,7 @@
           <a:p>
             <a:fld id="{F5CC4B3F-88C1-4FFA-B1B6-F41C21DC6924}" type="datetimeFigureOut">
               <a:rPr lang="en-US" smtClean="0"/>
-              <a:t>9/30/2016</a:t>
+              <a:t>10/6/2016</a:t>
             </a:fld>
             <a:endParaRPr lang="en-US"/>
           </a:p>
@@ -264,38 +280,37 @@
           <a:p>
             <a:pPr lvl="0"/>
             <a:r>
-              <a:rPr lang="en-US" smtClean="0"/>
+              <a:rPr lang="en-US"/>
               <a:t>Click to edit Master text styles</a:t>
             </a:r>
           </a:p>
           <a:p>
             <a:pPr lvl="1"/>
             <a:r>
-              <a:rPr lang="en-US" smtClean="0"/>
+              <a:rPr lang="en-US"/>
               <a:t>Second level</a:t>
             </a:r>
           </a:p>
           <a:p>
             <a:pPr lvl="2"/>
             <a:r>
-              <a:rPr lang="en-US" smtClean="0"/>
+              <a:rPr lang="en-US"/>
               <a:t>Third level</a:t>
             </a:r>
           </a:p>
           <a:p>
             <a:pPr lvl="3"/>
             <a:r>
-              <a:rPr lang="en-US" smtClean="0"/>
+              <a:rPr lang="en-US"/>
               <a:t>Fourth level</a:t>
             </a:r>
           </a:p>
           <a:p>
             <a:pPr lvl="4"/>
             <a:r>
-              <a:rPr lang="en-US" smtClean="0"/>
+              <a:rPr lang="en-US"/>
               <a:t>Fifth level</a:t>
             </a:r>
-            <a:endParaRPr lang="en-US"/>
           </a:p>
         </p:txBody>
       </p:sp>
@@ -506,10 +521,9 @@
           <a:lstStyle/>
           <a:p>
             <a:r>
-              <a:rPr lang="en-US" smtClean="0"/>
+              <a:rPr lang="en-US"/>
               <a:t>Click to edit Master title style</a:t>
             </a:r>
-            <a:endParaRPr lang="en-US"/>
           </a:p>
         </p:txBody>
       </p:sp>
@@ -625,10 +639,9 @@
           </a:lstStyle>
           <a:p>
             <a:r>
-              <a:rPr lang="en-US" smtClean="0"/>
+              <a:rPr lang="en-US"/>
               <a:t>Click to edit Master subtitle style</a:t>
             </a:r>
-            <a:endParaRPr lang="en-US"/>
           </a:p>
         </p:txBody>
       </p:sp>
@@ -649,7 +662,7 @@
           <a:p>
             <a:fld id="{78C97017-6FC3-485B-9764-EAC9E56C1D49}" type="datetimeFigureOut">
               <a:rPr lang="en-US" smtClean="0"/>
-              <a:t>9/30/2016</a:t>
+              <a:t>10/6/2016</a:t>
             </a:fld>
             <a:endParaRPr lang="en-US"/>
           </a:p>
@@ -743,10 +756,9 @@
           <a:lstStyle/>
           <a:p>
             <a:r>
-              <a:rPr lang="en-US" smtClean="0"/>
+              <a:rPr lang="en-US"/>
               <a:t>Click to edit Master title style</a:t>
             </a:r>
-            <a:endParaRPr lang="en-US"/>
           </a:p>
         </p:txBody>
       </p:sp>
@@ -767,38 +779,37 @@
           <a:p>
             <a:pPr lvl="0"/>
             <a:r>
-              <a:rPr lang="en-US" smtClean="0"/>
+              <a:rPr lang="en-US"/>
               <a:t>Click to edit Master text styles</a:t>
             </a:r>
           </a:p>
           <a:p>
             <a:pPr lvl="1"/>
             <a:r>
-              <a:rPr lang="en-US" smtClean="0"/>
+              <a:rPr lang="en-US"/>
               <a:t>Second level</a:t>
             </a:r>
           </a:p>
           <a:p>
             <a:pPr lvl="2"/>
             <a:r>
-              <a:rPr lang="en-US" smtClean="0"/>
+              <a:rPr lang="en-US"/>
               <a:t>Third level</a:t>
             </a:r>
           </a:p>
           <a:p>
             <a:pPr lvl="3"/>
             <a:r>
-              <a:rPr lang="en-US" smtClean="0"/>
+              <a:rPr lang="en-US"/>
               <a:t>Fourth level</a:t>
             </a:r>
           </a:p>
           <a:p>
             <a:pPr lvl="4"/>
             <a:r>
-              <a:rPr lang="en-US" smtClean="0"/>
+              <a:rPr lang="en-US"/>
               <a:t>Fifth level</a:t>
             </a:r>
-            <a:endParaRPr lang="en-US"/>
           </a:p>
         </p:txBody>
       </p:sp>
@@ -819,7 +830,7 @@
           <a:p>
             <a:fld id="{78C97017-6FC3-485B-9764-EAC9E56C1D49}" type="datetimeFigureOut">
               <a:rPr lang="en-US" smtClean="0"/>
-              <a:t>9/30/2016</a:t>
+              <a:t>10/6/2016</a:t>
             </a:fld>
             <a:endParaRPr lang="en-US"/>
           </a:p>
@@ -918,10 +929,9 @@
           <a:lstStyle/>
           <a:p>
             <a:r>
-              <a:rPr lang="en-US" smtClean="0"/>
+              <a:rPr lang="en-US"/>
               <a:t>Click to edit Master title style</a:t>
             </a:r>
-            <a:endParaRPr lang="en-US"/>
           </a:p>
         </p:txBody>
       </p:sp>
@@ -947,38 +957,37 @@
           <a:p>
             <a:pPr lvl="0"/>
             <a:r>
-              <a:rPr lang="en-US" smtClean="0"/>
+              <a:rPr lang="en-US"/>
               <a:t>Click to edit Master text styles</a:t>
             </a:r>
           </a:p>
           <a:p>
             <a:pPr lvl="1"/>
             <a:r>
-              <a:rPr lang="en-US" smtClean="0"/>
+              <a:rPr lang="en-US"/>
               <a:t>Second level</a:t>
             </a:r>
           </a:p>
           <a:p>
             <a:pPr lvl="2"/>
             <a:r>
-              <a:rPr lang="en-US" smtClean="0"/>
+              <a:rPr lang="en-US"/>
               <a:t>Third level</a:t>
             </a:r>
           </a:p>
           <a:p>
             <a:pPr lvl="3"/>
             <a:r>
-              <a:rPr lang="en-US" smtClean="0"/>
+              <a:rPr lang="en-US"/>
               <a:t>Fourth level</a:t>
             </a:r>
           </a:p>
           <a:p>
             <a:pPr lvl="4"/>
             <a:r>
-              <a:rPr lang="en-US" smtClean="0"/>
+              <a:rPr lang="en-US"/>
               <a:t>Fifth level</a:t>
             </a:r>
-            <a:endParaRPr lang="en-US"/>
           </a:p>
         </p:txBody>
       </p:sp>
@@ -999,7 +1008,7 @@
           <a:p>
             <a:fld id="{78C97017-6FC3-485B-9764-EAC9E56C1D49}" type="datetimeFigureOut">
               <a:rPr lang="en-US" smtClean="0"/>
-              <a:t>9/30/2016</a:t>
+              <a:t>10/6/2016</a:t>
             </a:fld>
             <a:endParaRPr lang="en-US"/>
           </a:p>
@@ -1093,10 +1102,9 @@
           <a:lstStyle/>
           <a:p>
             <a:r>
-              <a:rPr lang="en-US" smtClean="0"/>
+              <a:rPr lang="en-US"/>
               <a:t>Click to edit Master title style</a:t>
             </a:r>
-            <a:endParaRPr lang="en-US"/>
           </a:p>
         </p:txBody>
       </p:sp>
@@ -1117,38 +1125,37 @@
           <a:p>
             <a:pPr lvl="0"/>
             <a:r>
-              <a:rPr lang="en-US" smtClean="0"/>
+              <a:rPr lang="en-US"/>
               <a:t>Click to edit Master text styles</a:t>
             </a:r>
           </a:p>
           <a:p>
             <a:pPr lvl="1"/>
             <a:r>
-              <a:rPr lang="en-US" smtClean="0"/>
+              <a:rPr lang="en-US"/>
               <a:t>Second level</a:t>
             </a:r>
           </a:p>
           <a:p>
             <a:pPr lvl="2"/>
             <a:r>
-              <a:rPr lang="en-US" smtClean="0"/>
+              <a:rPr lang="en-US"/>
               <a:t>Third level</a:t>
             </a:r>
           </a:p>
           <a:p>
             <a:pPr lvl="3"/>
             <a:r>
-              <a:rPr lang="en-US" smtClean="0"/>
+              <a:rPr lang="en-US"/>
               <a:t>Fourth level</a:t>
             </a:r>
           </a:p>
           <a:p>
             <a:pPr lvl="4"/>
             <a:r>
-              <a:rPr lang="en-US" smtClean="0"/>
+              <a:rPr lang="en-US"/>
               <a:t>Fifth level</a:t>
             </a:r>
-            <a:endParaRPr lang="en-US"/>
           </a:p>
         </p:txBody>
       </p:sp>
@@ -1169,7 +1176,7 @@
           <a:p>
             <a:fld id="{78C97017-6FC3-485B-9764-EAC9E56C1D49}" type="datetimeFigureOut">
               <a:rPr lang="en-US" smtClean="0"/>
-              <a:t>9/30/2016</a:t>
+              <a:t>10/6/2016</a:t>
             </a:fld>
             <a:endParaRPr lang="en-US"/>
           </a:p>
@@ -1272,10 +1279,9 @@
           </a:lstStyle>
           <a:p>
             <a:r>
-              <a:rPr lang="en-US" smtClean="0"/>
+              <a:rPr lang="en-US"/>
               <a:t>Click to edit Master title style</a:t>
             </a:r>
-            <a:endParaRPr lang="en-US"/>
           </a:p>
         </p:txBody>
       </p:sp>
@@ -1392,7 +1398,7 @@
           <a:p>
             <a:pPr lvl="0"/>
             <a:r>
-              <a:rPr lang="en-US" smtClean="0"/>
+              <a:rPr lang="en-US"/>
               <a:t>Click to edit Master text styles</a:t>
             </a:r>
           </a:p>
@@ -1415,7 +1421,7 @@
           <a:p>
             <a:fld id="{78C97017-6FC3-485B-9764-EAC9E56C1D49}" type="datetimeFigureOut">
               <a:rPr lang="en-US" smtClean="0"/>
-              <a:t>9/30/2016</a:t>
+              <a:t>10/6/2016</a:t>
             </a:fld>
             <a:endParaRPr lang="en-US"/>
           </a:p>
@@ -1509,10 +1515,9 @@
           <a:lstStyle/>
           <a:p>
             <a:r>
-              <a:rPr lang="en-US" smtClean="0"/>
+              <a:rPr lang="en-US"/>
               <a:t>Click to edit Master title style</a:t>
             </a:r>
-            <a:endParaRPr lang="en-US"/>
           </a:p>
         </p:txBody>
       </p:sp>
@@ -1566,38 +1571,37 @@
           <a:p>
             <a:pPr lvl="0"/>
             <a:r>
-              <a:rPr lang="en-US" smtClean="0"/>
+              <a:rPr lang="en-US"/>
               <a:t>Click to edit Master text styles</a:t>
             </a:r>
           </a:p>
           <a:p>
             <a:pPr lvl="1"/>
             <a:r>
-              <a:rPr lang="en-US" smtClean="0"/>
+              <a:rPr lang="en-US"/>
               <a:t>Second level</a:t>
             </a:r>
           </a:p>
           <a:p>
             <a:pPr lvl="2"/>
             <a:r>
-              <a:rPr lang="en-US" smtClean="0"/>
+              <a:rPr lang="en-US"/>
               <a:t>Third level</a:t>
             </a:r>
           </a:p>
           <a:p>
             <a:pPr lvl="3"/>
             <a:r>
-              <a:rPr lang="en-US" smtClean="0"/>
+              <a:rPr lang="en-US"/>
               <a:t>Fourth level</a:t>
             </a:r>
           </a:p>
           <a:p>
             <a:pPr lvl="4"/>
             <a:r>
-              <a:rPr lang="en-US" smtClean="0"/>
+              <a:rPr lang="en-US"/>
               <a:t>Fifth level</a:t>
             </a:r>
-            <a:endParaRPr lang="en-US"/>
           </a:p>
         </p:txBody>
       </p:sp>
@@ -1651,38 +1655,37 @@
           <a:p>
             <a:pPr lvl="0"/>
             <a:r>
-              <a:rPr lang="en-US" smtClean="0"/>
+              <a:rPr lang="en-US"/>
               <a:t>Click to edit Master text styles</a:t>
             </a:r>
           </a:p>
           <a:p>
             <a:pPr lvl="1"/>
             <a:r>
-              <a:rPr lang="en-US" smtClean="0"/>
+              <a:rPr lang="en-US"/>
               <a:t>Second level</a:t>
             </a:r>
           </a:p>
           <a:p>
             <a:pPr lvl="2"/>
             <a:r>
-              <a:rPr lang="en-US" smtClean="0"/>
+              <a:rPr lang="en-US"/>
               <a:t>Third level</a:t>
             </a:r>
           </a:p>
           <a:p>
             <a:pPr lvl="3"/>
             <a:r>
-              <a:rPr lang="en-US" smtClean="0"/>
+              <a:rPr lang="en-US"/>
               <a:t>Fourth level</a:t>
             </a:r>
           </a:p>
           <a:p>
             <a:pPr lvl="4"/>
             <a:r>
-              <a:rPr lang="en-US" smtClean="0"/>
+              <a:rPr lang="en-US"/>
               <a:t>Fifth level</a:t>
             </a:r>
-            <a:endParaRPr lang="en-US"/>
           </a:p>
         </p:txBody>
       </p:sp>
@@ -1703,7 +1706,7 @@
           <a:p>
             <a:fld id="{78C97017-6FC3-485B-9764-EAC9E56C1D49}" type="datetimeFigureOut">
               <a:rPr lang="en-US" smtClean="0"/>
-              <a:t>9/30/2016</a:t>
+              <a:t>10/6/2016</a:t>
             </a:fld>
             <a:endParaRPr lang="en-US"/>
           </a:p>
@@ -1801,10 +1804,9 @@
           </a:lstStyle>
           <a:p>
             <a:r>
-              <a:rPr lang="en-US" smtClean="0"/>
+              <a:rPr lang="en-US"/>
               <a:t>Click to edit Master title style</a:t>
             </a:r>
-            <a:endParaRPr lang="en-US"/>
           </a:p>
         </p:txBody>
       </p:sp>
@@ -1867,7 +1869,7 @@
           <a:p>
             <a:pPr lvl="0"/>
             <a:r>
-              <a:rPr lang="en-US" smtClean="0"/>
+              <a:rPr lang="en-US"/>
               <a:t>Click to edit Master text styles</a:t>
             </a:r>
           </a:p>
@@ -1923,38 +1925,37 @@
           <a:p>
             <a:pPr lvl="0"/>
             <a:r>
-              <a:rPr lang="en-US" smtClean="0"/>
+              <a:rPr lang="en-US"/>
               <a:t>Click to edit Master text styles</a:t>
             </a:r>
           </a:p>
           <a:p>
             <a:pPr lvl="1"/>
             <a:r>
-              <a:rPr lang="en-US" smtClean="0"/>
+              <a:rPr lang="en-US"/>
               <a:t>Second level</a:t>
             </a:r>
           </a:p>
           <a:p>
             <a:pPr lvl="2"/>
             <a:r>
-              <a:rPr lang="en-US" smtClean="0"/>
+              <a:rPr lang="en-US"/>
               <a:t>Third level</a:t>
             </a:r>
           </a:p>
           <a:p>
             <a:pPr lvl="3"/>
             <a:r>
-              <a:rPr lang="en-US" smtClean="0"/>
+              <a:rPr lang="en-US"/>
               <a:t>Fourth level</a:t>
             </a:r>
           </a:p>
           <a:p>
             <a:pPr lvl="4"/>
             <a:r>
-              <a:rPr lang="en-US" smtClean="0"/>
+              <a:rPr lang="en-US"/>
               <a:t>Fifth level</a:t>
             </a:r>
-            <a:endParaRPr lang="en-US"/>
           </a:p>
         </p:txBody>
       </p:sp>
@@ -2017,7 +2018,7 @@
           <a:p>
             <a:pPr lvl="0"/>
             <a:r>
-              <a:rPr lang="en-US" smtClean="0"/>
+              <a:rPr lang="en-US"/>
               <a:t>Click to edit Master text styles</a:t>
             </a:r>
           </a:p>
@@ -2073,38 +2074,37 @@
           <a:p>
             <a:pPr lvl="0"/>
             <a:r>
-              <a:rPr lang="en-US" smtClean="0"/>
+              <a:rPr lang="en-US"/>
               <a:t>Click to edit Master text styles</a:t>
             </a:r>
           </a:p>
           <a:p>
             <a:pPr lvl="1"/>
             <a:r>
-              <a:rPr lang="en-US" smtClean="0"/>
+              <a:rPr lang="en-US"/>
               <a:t>Second level</a:t>
             </a:r>
           </a:p>
           <a:p>
             <a:pPr lvl="2"/>
             <a:r>
-              <a:rPr lang="en-US" smtClean="0"/>
+              <a:rPr lang="en-US"/>
               <a:t>Third level</a:t>
             </a:r>
           </a:p>
           <a:p>
             <a:pPr lvl="3"/>
             <a:r>
-              <a:rPr lang="en-US" smtClean="0"/>
+              <a:rPr lang="en-US"/>
               <a:t>Fourth level</a:t>
             </a:r>
           </a:p>
           <a:p>
             <a:pPr lvl="4"/>
             <a:r>
-              <a:rPr lang="en-US" smtClean="0"/>
+              <a:rPr lang="en-US"/>
               <a:t>Fifth level</a:t>
             </a:r>
-            <a:endParaRPr lang="en-US"/>
           </a:p>
         </p:txBody>
       </p:sp>
@@ -2125,7 +2125,7 @@
           <a:p>
             <a:fld id="{78C97017-6FC3-485B-9764-EAC9E56C1D49}" type="datetimeFigureOut">
               <a:rPr lang="en-US" smtClean="0"/>
-              <a:t>9/30/2016</a:t>
+              <a:t>10/6/2016</a:t>
             </a:fld>
             <a:endParaRPr lang="en-US"/>
           </a:p>
@@ -2219,10 +2219,9 @@
           <a:lstStyle/>
           <a:p>
             <a:r>
-              <a:rPr lang="en-US" smtClean="0"/>
+              <a:rPr lang="en-US"/>
               <a:t>Click to edit Master title style</a:t>
             </a:r>
-            <a:endParaRPr lang="en-US"/>
           </a:p>
         </p:txBody>
       </p:sp>
@@ -2243,7 +2242,7 @@
           <a:p>
             <a:fld id="{78C97017-6FC3-485B-9764-EAC9E56C1D49}" type="datetimeFigureOut">
               <a:rPr lang="en-US" smtClean="0"/>
-              <a:t>9/30/2016</a:t>
+              <a:t>10/6/2016</a:t>
             </a:fld>
             <a:endParaRPr lang="en-US"/>
           </a:p>
@@ -2338,7 +2337,7 @@
           <a:p>
             <a:fld id="{78C97017-6FC3-485B-9764-EAC9E56C1D49}" type="datetimeFigureOut">
               <a:rPr lang="en-US" smtClean="0"/>
-              <a:t>9/30/2016</a:t>
+              <a:t>10/6/2016</a:t>
             </a:fld>
             <a:endParaRPr lang="en-US"/>
           </a:p>
@@ -2441,10 +2440,9 @@
           </a:lstStyle>
           <a:p>
             <a:r>
-              <a:rPr lang="en-US" smtClean="0"/>
+              <a:rPr lang="en-US"/>
               <a:t>Click to edit Master title style</a:t>
             </a:r>
-            <a:endParaRPr lang="en-US"/>
           </a:p>
         </p:txBody>
       </p:sp>
@@ -2498,38 +2496,37 @@
           <a:p>
             <a:pPr lvl="0"/>
             <a:r>
-              <a:rPr lang="en-US" smtClean="0"/>
+              <a:rPr lang="en-US"/>
               <a:t>Click to edit Master text styles</a:t>
             </a:r>
           </a:p>
           <a:p>
             <a:pPr lvl="1"/>
             <a:r>
-              <a:rPr lang="en-US" smtClean="0"/>
+              <a:rPr lang="en-US"/>
               <a:t>Second level</a:t>
             </a:r>
           </a:p>
           <a:p>
             <a:pPr lvl="2"/>
             <a:r>
-              <a:rPr lang="en-US" smtClean="0"/>
+              <a:rPr lang="en-US"/>
               <a:t>Third level</a:t>
             </a:r>
           </a:p>
           <a:p>
             <a:pPr lvl="3"/>
             <a:r>
-              <a:rPr lang="en-US" smtClean="0"/>
+              <a:rPr lang="en-US"/>
               <a:t>Fourth level</a:t>
             </a:r>
           </a:p>
           <a:p>
             <a:pPr lvl="4"/>
             <a:r>
-              <a:rPr lang="en-US" smtClean="0"/>
+              <a:rPr lang="en-US"/>
               <a:t>Fifth level</a:t>
             </a:r>
-            <a:endParaRPr lang="en-US"/>
           </a:p>
         </p:txBody>
       </p:sp>
@@ -2592,7 +2589,7 @@
           <a:p>
             <a:pPr lvl="0"/>
             <a:r>
-              <a:rPr lang="en-US" smtClean="0"/>
+              <a:rPr lang="en-US"/>
               <a:t>Click to edit Master text styles</a:t>
             </a:r>
           </a:p>
@@ -2615,7 +2612,7 @@
           <a:p>
             <a:fld id="{78C97017-6FC3-485B-9764-EAC9E56C1D49}" type="datetimeFigureOut">
               <a:rPr lang="en-US" smtClean="0"/>
-              <a:t>9/30/2016</a:t>
+              <a:t>10/6/2016</a:t>
             </a:fld>
             <a:endParaRPr lang="en-US"/>
           </a:p>
@@ -2718,10 +2715,9 @@
           </a:lstStyle>
           <a:p>
             <a:r>
-              <a:rPr lang="en-US" smtClean="0"/>
+              <a:rPr lang="en-US"/>
               <a:t>Click to edit Master title style</a:t>
             </a:r>
-            <a:endParaRPr lang="en-US"/>
           </a:p>
         </p:txBody>
       </p:sp>
@@ -2845,7 +2841,7 @@
           <a:p>
             <a:pPr lvl="0"/>
             <a:r>
-              <a:rPr lang="en-US" smtClean="0"/>
+              <a:rPr lang="en-US"/>
               <a:t>Click to edit Master text styles</a:t>
             </a:r>
           </a:p>
@@ -2868,7 +2864,7 @@
           <a:p>
             <a:fld id="{78C97017-6FC3-485B-9764-EAC9E56C1D49}" type="datetimeFigureOut">
               <a:rPr lang="en-US" smtClean="0"/>
-              <a:t>9/30/2016</a:t>
+              <a:t>10/6/2016</a:t>
             </a:fld>
             <a:endParaRPr lang="en-US"/>
           </a:p>
@@ -2977,10 +2973,9 @@
           <a:lstStyle/>
           <a:p>
             <a:r>
-              <a:rPr lang="en-US" smtClean="0"/>
+              <a:rPr lang="en-US"/>
               <a:t>Click to edit Master title style</a:t>
             </a:r>
-            <a:endParaRPr lang="en-US"/>
           </a:p>
         </p:txBody>
       </p:sp>
@@ -3011,38 +3006,37 @@
           <a:p>
             <a:pPr lvl="0"/>
             <a:r>
-              <a:rPr lang="en-US" smtClean="0"/>
+              <a:rPr lang="en-US"/>
               <a:t>Click to edit Master text styles</a:t>
             </a:r>
           </a:p>
           <a:p>
             <a:pPr lvl="1"/>
             <a:r>
-              <a:rPr lang="en-US" smtClean="0"/>
+              <a:rPr lang="en-US"/>
               <a:t>Second level</a:t>
             </a:r>
           </a:p>
           <a:p>
             <a:pPr lvl="2"/>
             <a:r>
-              <a:rPr lang="en-US" smtClean="0"/>
+              <a:rPr lang="en-US"/>
               <a:t>Third level</a:t>
             </a:r>
           </a:p>
           <a:p>
             <a:pPr lvl="3"/>
             <a:r>
-              <a:rPr lang="en-US" smtClean="0"/>
+              <a:rPr lang="en-US"/>
               <a:t>Fourth level</a:t>
             </a:r>
           </a:p>
           <a:p>
             <a:pPr lvl="4"/>
             <a:r>
-              <a:rPr lang="en-US" smtClean="0"/>
+              <a:rPr lang="en-US"/>
               <a:t>Fifth level</a:t>
             </a:r>
-            <a:endParaRPr lang="en-US"/>
           </a:p>
         </p:txBody>
       </p:sp>
@@ -3081,7 +3075,7 @@
           <a:p>
             <a:fld id="{78C97017-6FC3-485B-9764-EAC9E56C1D49}" type="datetimeFigureOut">
               <a:rPr lang="en-US" smtClean="0"/>
-              <a:t>9/30/2016</a:t>
+              <a:t>10/6/2016</a:t>
             </a:fld>
             <a:endParaRPr lang="en-US"/>
           </a:p>
@@ -3472,14 +3466,13 @@
           <a:lstStyle/>
           <a:p>
             <a:r>
-              <a:rPr lang="en-US" dirty="0" err="1" smtClean="0"/>
+              <a:rPr lang="en-US" dirty="0" err="1"/>
               <a:t>AddressBook</a:t>
             </a:r>
             <a:r>
-              <a:rPr lang="en-US" dirty="0" smtClean="0"/>
+              <a:rPr lang="en-US" dirty="0"/>
               <a:t> – Level 4</a:t>
             </a:r>
-            <a:endParaRPr lang="en-US" dirty="0"/>
           </a:p>
         </p:txBody>
       </p:sp>
@@ -3499,10 +3492,9 @@
           <a:lstStyle/>
           <a:p>
             <a:r>
-              <a:rPr lang="en-US" dirty="0" smtClean="0"/>
+              <a:rPr lang="en-US" dirty="0"/>
               <a:t>Diagrams</a:t>
             </a:r>
-            <a:endParaRPr lang="en-US" dirty="0"/>
           </a:p>
         </p:txBody>
       </p:sp>
@@ -3634,7 +3626,7 @@
           <a:p>
             <a:pPr algn="ctr"/>
             <a:r>
-              <a:rPr lang="en-US" sz="1600" dirty="0" smtClean="0">
+              <a:rPr lang="en-US" sz="1600" dirty="0">
                 <a:solidFill>
                   <a:schemeClr val="bg1"/>
                 </a:solidFill>
@@ -3693,7 +3685,7 @@
           <a:p>
             <a:pPr algn="ctr"/>
             <a:r>
-              <a:rPr lang="en-US" sz="1600" dirty="0" smtClean="0">
+              <a:rPr lang="en-US" sz="1600" dirty="0">
                 <a:solidFill>
                   <a:schemeClr val="bg1"/>
                 </a:solidFill>
@@ -3756,7 +3748,7 @@
           <a:p>
             <a:pPr algn="ctr"/>
             <a:r>
-              <a:rPr lang="en-US" sz="1600" dirty="0" smtClean="0">
+              <a:rPr lang="en-US" sz="1600" dirty="0">
                 <a:solidFill>
                   <a:schemeClr val="bg1"/>
                 </a:solidFill>
@@ -3815,7 +3807,7 @@
           <a:p>
             <a:pPr algn="ctr"/>
             <a:r>
-              <a:rPr lang="en-US" sz="1600" dirty="0" smtClean="0">
+              <a:rPr lang="en-US" sz="1600" dirty="0">
                 <a:solidFill>
                   <a:schemeClr val="bg1"/>
                 </a:solidFill>
@@ -4401,7 +4393,7 @@
           <a:p>
             <a:pPr algn="ctr"/>
             <a:r>
-              <a:rPr lang="en-US" sz="1600" dirty="0" smtClean="0">
+              <a:rPr lang="en-US" sz="1600" dirty="0">
                 <a:solidFill>
                   <a:schemeClr val="bg1"/>
                 </a:solidFill>
@@ -4752,7 +4744,7 @@
           <a:p>
             <a:pPr algn="ctr"/>
             <a:r>
-              <a:rPr lang="en-US" sz="1600" dirty="0" smtClean="0">
+              <a:rPr lang="en-US" sz="1600" dirty="0">
                 <a:solidFill>
                   <a:schemeClr val="bg1"/>
                 </a:solidFill>
@@ -4760,25 +4752,20 @@
               <a:t>Logs</a:t>
             </a:r>
             <a:br>
-              <a:rPr lang="en-US" sz="1600" dirty="0" smtClean="0">
+              <a:rPr lang="en-US" sz="1600" dirty="0">
                 <a:solidFill>
                   <a:schemeClr val="bg1"/>
                 </a:solidFill>
               </a:rPr>
             </a:br>
             <a:r>
-              <a:rPr lang="en-US" sz="1600" dirty="0" smtClean="0">
+              <a:rPr lang="en-US" sz="1600" dirty="0">
                 <a:solidFill>
                   <a:schemeClr val="bg1"/>
                 </a:solidFill>
               </a:rPr>
               <a:t>Center</a:t>
             </a:r>
-            <a:endParaRPr lang="en-US" sz="1600" dirty="0">
-              <a:solidFill>
-                <a:schemeClr val="bg1"/>
-              </a:solidFill>
-            </a:endParaRPr>
           </a:p>
         </p:txBody>
       </p:sp>
@@ -4935,7 +4922,7 @@
           <a:p>
             <a:pPr algn="ctr"/>
             <a:r>
-              <a:rPr lang="en-US" sz="1600" dirty="0" smtClean="0">
+              <a:rPr lang="en-US" sz="1600" dirty="0">
                 <a:solidFill>
                   <a:schemeClr val="bg1"/>
                 </a:solidFill>
@@ -5299,7 +5286,7 @@
           <a:p>
             <a:pPr algn="ctr"/>
             <a:r>
-              <a:rPr lang="en-US" sz="1600" dirty="0" smtClean="0">
+              <a:rPr lang="en-US" sz="1600" dirty="0">
                 <a:solidFill>
                   <a:schemeClr val="bg1"/>
                 </a:solidFill>
@@ -5446,7 +5433,7 @@
           <a:p>
             <a:pPr algn="ctr"/>
             <a:r>
-              <a:rPr lang="en-US" sz="1600" dirty="0" smtClean="0">
+              <a:rPr lang="en-US" sz="1600" dirty="0">
                 <a:solidFill>
                   <a:schemeClr val="bg1"/>
                 </a:solidFill>
@@ -5608,10 +5595,9 @@
           <a:lstStyle/>
           <a:p>
             <a:r>
-              <a:rPr lang="en-US" sz="1400" dirty="0" smtClean="0"/>
+              <a:rPr lang="en-US" sz="1400" dirty="0"/>
               <a:t>delete 1</a:t>
             </a:r>
-            <a:endParaRPr lang="en-US" sz="1400" dirty="0"/>
           </a:p>
         </p:txBody>
       </p:sp>
@@ -5674,18 +5660,13 @@
           <a:lstStyle/>
           <a:p>
             <a:r>
-              <a:rPr lang="en-US" sz="1400" dirty="0" smtClean="0">
+              <a:rPr lang="en-US" sz="1400" dirty="0">
                 <a:solidFill>
                   <a:srgbClr val="0070C0"/>
                 </a:solidFill>
               </a:rPr>
               <a:t>execute(“delete 1”)</a:t>
             </a:r>
-            <a:endParaRPr lang="en-US" sz="1400" dirty="0">
-              <a:solidFill>
-                <a:srgbClr val="0070C0"/>
-              </a:solidFill>
-            </a:endParaRPr>
           </a:p>
         </p:txBody>
       </p:sp>
@@ -5748,26 +5729,21 @@
           <a:lstStyle/>
           <a:p>
             <a:r>
-              <a:rPr lang="en-US" sz="1400" dirty="0" err="1" smtClean="0">
+              <a:rPr lang="en-US" sz="1400" dirty="0" err="1">
                 <a:solidFill>
                   <a:srgbClr val="7030A0"/>
                 </a:solidFill>
               </a:rPr>
-              <a:t>deletePerson</a:t>
-            </a:r>
-            <a:r>
-              <a:rPr lang="en-US" sz="1400" dirty="0" smtClean="0">
+              <a:t>deleteTask</a:t>
+            </a:r>
+            <a:r>
+              <a:rPr lang="en-US" sz="1400" dirty="0">
                 <a:solidFill>
                   <a:srgbClr val="7030A0"/>
                 </a:solidFill>
               </a:rPr>
               <a:t>(p)</a:t>
             </a:r>
-            <a:endParaRPr lang="en-US" sz="1400" dirty="0">
-              <a:solidFill>
-                <a:srgbClr val="7030A0"/>
-              </a:solidFill>
-            </a:endParaRPr>
           </a:p>
         </p:txBody>
       </p:sp>
@@ -5794,7 +5770,7 @@
           <a:lstStyle/>
           <a:p>
             <a:r>
-              <a:rPr lang="en-US" sz="1400" dirty="0" smtClean="0">
+              <a:rPr lang="en-US" sz="1400" dirty="0">
                 <a:solidFill>
                   <a:schemeClr val="accent5">
                     <a:lumMod val="75000"/>
@@ -5804,17 +5780,17 @@
               <a:t>post(</a:t>
             </a:r>
             <a:r>
-              <a:rPr lang="en-US" sz="1400" dirty="0" err="1" smtClean="0">
+              <a:rPr lang="en-US" sz="1400" dirty="0" err="1">
                 <a:solidFill>
                   <a:schemeClr val="accent5">
                     <a:lumMod val="75000"/>
                   </a:schemeClr>
                 </a:solidFill>
               </a:rPr>
-              <a:t>AddressBookChangedEvent</a:t>
-            </a:r>
-            <a:r>
-              <a:rPr lang="en-US" sz="1400" dirty="0" smtClean="0">
+              <a:t>TaskManChangedEvent</a:t>
+            </a:r>
+            <a:r>
+              <a:rPr lang="en-US" sz="1400" dirty="0">
                 <a:solidFill>
                   <a:schemeClr val="accent5">
                     <a:lumMod val="75000"/>
@@ -5823,13 +5799,6 @@
               </a:rPr>
               <a:t>)</a:t>
             </a:r>
-            <a:endParaRPr lang="en-US" sz="1400" dirty="0">
-              <a:solidFill>
-                <a:schemeClr val="accent5">
-                  <a:lumMod val="75000"/>
-                </a:schemeClr>
-              </a:solidFill>
-            </a:endParaRPr>
           </a:p>
         </p:txBody>
       </p:sp>
@@ -5995,7 +5964,7 @@
           <a:p>
             <a:pPr algn="ctr"/>
             <a:r>
-              <a:rPr lang="en-US" sz="1600" dirty="0" smtClean="0">
+              <a:rPr lang="en-US" sz="1600" dirty="0">
                 <a:solidFill>
                   <a:schemeClr val="bg1"/>
                 </a:solidFill>
@@ -6003,7 +5972,7 @@
               <a:t>:</a:t>
             </a:r>
             <a:r>
-              <a:rPr lang="en-US" sz="1600" dirty="0" err="1" smtClean="0">
+              <a:rPr lang="en-US" sz="1600" dirty="0" err="1">
                 <a:solidFill>
                   <a:schemeClr val="bg1"/>
                 </a:solidFill>
@@ -6236,7 +6205,7 @@
           <a:p>
             <a:pPr algn="ctr"/>
             <a:r>
-              <a:rPr lang="en-US" sz="1600" dirty="0" smtClean="0">
+              <a:rPr lang="en-US" sz="1600" dirty="0">
                 <a:solidFill>
                   <a:schemeClr val="bg1"/>
                 </a:solidFill>
@@ -6368,7 +6337,7 @@
           <a:lstStyle/>
           <a:p>
             <a:r>
-              <a:rPr lang="en-US" sz="1400" dirty="0" smtClean="0">
+              <a:rPr lang="en-US" sz="1400" dirty="0">
                 <a:solidFill>
                   <a:schemeClr val="accent5">
                     <a:lumMod val="75000"/>
@@ -6378,17 +6347,17 @@
               <a:t>post(</a:t>
             </a:r>
             <a:r>
-              <a:rPr lang="en-US" sz="1400" dirty="0" err="1" smtClean="0">
+              <a:rPr lang="en-US" sz="1400" dirty="0" err="1">
                 <a:solidFill>
                   <a:schemeClr val="accent5">
                     <a:lumMod val="75000"/>
                   </a:schemeClr>
                 </a:solidFill>
               </a:rPr>
-              <a:t>AddressBookChangedEvent</a:t>
-            </a:r>
-            <a:r>
-              <a:rPr lang="en-US" sz="1400" dirty="0" smtClean="0">
+              <a:t>TaskManChangedEvent</a:t>
+            </a:r>
+            <a:r>
+              <a:rPr lang="en-US" sz="1400" dirty="0">
                 <a:solidFill>
                   <a:schemeClr val="accent5">
                     <a:lumMod val="75000"/>
@@ -6397,13 +6366,6 @@
               </a:rPr>
               <a:t>)</a:t>
             </a:r>
-            <a:endParaRPr lang="en-US" sz="1400" dirty="0">
-              <a:solidFill>
-                <a:schemeClr val="accent5">
-                  <a:lumMod val="75000"/>
-                </a:schemeClr>
-              </a:solidFill>
-            </a:endParaRPr>
           </a:p>
         </p:txBody>
       </p:sp>
@@ -6495,7 +6457,7 @@
           <a:p>
             <a:pPr algn="ctr"/>
             <a:r>
-              <a:rPr lang="en-US" sz="1600" dirty="0" smtClean="0">
+              <a:rPr lang="en-US" sz="1600" dirty="0">
                 <a:solidFill>
                   <a:schemeClr val="bg1"/>
                 </a:solidFill>
@@ -6503,7 +6465,7 @@
               <a:t>:</a:t>
             </a:r>
             <a:r>
-              <a:rPr lang="en-US" sz="1600" dirty="0" err="1" smtClean="0">
+              <a:rPr lang="en-US" sz="1600" dirty="0" err="1">
                 <a:solidFill>
                   <a:schemeClr val="bg1"/>
                 </a:solidFill>
@@ -6750,17 +6712,17 @@
           <a:lstStyle/>
           <a:p>
             <a:r>
-              <a:rPr lang="en-US" sz="1400" dirty="0" err="1" smtClean="0">
+              <a:rPr lang="en-US" sz="1400" dirty="0" err="1">
                 <a:solidFill>
                   <a:schemeClr val="accent6">
                     <a:lumMod val="75000"/>
                   </a:schemeClr>
                 </a:solidFill>
               </a:rPr>
-              <a:t>handleAddresssBookChangedEvent</a:t>
-            </a:r>
-            <a:r>
-              <a:rPr lang="en-US" sz="1400" dirty="0" smtClean="0">
+              <a:t>handleTaskManChangedEvent</a:t>
+            </a:r>
+            <a:r>
+              <a:rPr lang="en-US" sz="1400" dirty="0">
                 <a:solidFill>
                   <a:schemeClr val="accent6">
                     <a:lumMod val="75000"/>
@@ -6769,13 +6731,6 @@
               </a:rPr>
               <a:t>()</a:t>
             </a:r>
-            <a:endParaRPr lang="en-US" sz="1400" dirty="0">
-              <a:solidFill>
-                <a:schemeClr val="accent6">
-                  <a:lumMod val="75000"/>
-                </a:schemeClr>
-              </a:solidFill>
-            </a:endParaRPr>
           </a:p>
         </p:txBody>
       </p:sp>
@@ -6860,7 +6815,7 @@
           <a:p>
             <a:pPr algn="ctr"/>
             <a:r>
-              <a:rPr lang="en-US" sz="1600" dirty="0" smtClean="0">
+              <a:rPr lang="en-US" sz="1600" dirty="0">
                 <a:solidFill>
                   <a:schemeClr val="bg1"/>
                 </a:solidFill>
@@ -7063,26 +7018,21 @@
           <a:lstStyle/>
           <a:p>
             <a:r>
-              <a:rPr lang="en-US" sz="1400" dirty="0" err="1" smtClean="0">
+              <a:rPr lang="en-US" sz="1400" dirty="0" err="1">
                 <a:solidFill>
                   <a:srgbClr val="00B050"/>
                 </a:solidFill>
               </a:rPr>
-              <a:t>handleAddresssBookChangedEvent</a:t>
-            </a:r>
-            <a:r>
-              <a:rPr lang="en-US" sz="1400" dirty="0" smtClean="0">
+              <a:t>handleTaskManChangedEvent</a:t>
+            </a:r>
+            <a:r>
+              <a:rPr lang="en-US" sz="1400" dirty="0">
                 <a:solidFill>
                   <a:srgbClr val="00B050"/>
                 </a:solidFill>
               </a:rPr>
               <a:t>()</a:t>
             </a:r>
-            <a:endParaRPr lang="en-US" sz="1400" dirty="0">
-              <a:solidFill>
-                <a:srgbClr val="00B050"/>
-              </a:solidFill>
-            </a:endParaRPr>
           </a:p>
         </p:txBody>
       </p:sp>
@@ -7269,18 +7219,13 @@
           <a:p>
             <a:pPr algn="r"/>
             <a:r>
-              <a:rPr lang="en-US" sz="1400" dirty="0" smtClean="0">
+              <a:rPr lang="en-US" sz="1400" dirty="0">
                 <a:solidFill>
                   <a:srgbClr val="00B050"/>
                 </a:solidFill>
               </a:rPr>
               <a:t>Update status bar</a:t>
             </a:r>
-            <a:endParaRPr lang="en-US" sz="1400" dirty="0">
-              <a:solidFill>
-                <a:srgbClr val="00B050"/>
-              </a:solidFill>
-            </a:endParaRPr>
           </a:p>
         </p:txBody>
       </p:sp>
@@ -7470,7 +7415,7 @@
           <a:lstStyle/>
           <a:p>
             <a:r>
-              <a:rPr lang="en-US" sz="1400" dirty="0" smtClean="0">
+              <a:rPr lang="en-US" sz="1400" dirty="0">
                 <a:solidFill>
                   <a:schemeClr val="accent6">
                     <a:lumMod val="75000"/>
@@ -7480,7 +7425,7 @@
               <a:t>Save </a:t>
             </a:r>
             <a:br>
-              <a:rPr lang="en-US" sz="1400" dirty="0" smtClean="0">
+              <a:rPr lang="en-US" sz="1400" dirty="0">
                 <a:solidFill>
                   <a:schemeClr val="accent6">
                     <a:lumMod val="75000"/>
@@ -7489,7 +7434,7 @@
               </a:rPr>
             </a:br>
             <a:r>
-              <a:rPr lang="en-US" sz="1400" dirty="0" smtClean="0">
+              <a:rPr lang="en-US" sz="1400" dirty="0">
                 <a:solidFill>
                   <a:schemeClr val="accent6">
                     <a:lumMod val="75000"/>
@@ -7498,13 +7443,6 @@
               </a:rPr>
               <a:t>to file</a:t>
             </a:r>
-            <a:endParaRPr lang="en-US" sz="1400" dirty="0">
-              <a:solidFill>
-                <a:schemeClr val="accent6">
-                  <a:lumMod val="75000"/>
-                </a:schemeClr>
-              </a:solidFill>
-            </a:endParaRPr>
           </a:p>
         </p:txBody>
       </p:sp>
@@ -7581,7 +7519,7 @@
           <a:lstStyle/>
           <a:p>
             <a:r>
-              <a:rPr lang="en-US" sz="1200" b="1" dirty="0" smtClean="0">
+              <a:rPr lang="en-US" sz="1200" b="1" dirty="0">
                 <a:solidFill>
                   <a:schemeClr val="accent3">
                     <a:lumMod val="75000"/>
@@ -7764,7 +7702,7 @@
           <a:p>
             <a:pPr algn="ctr"/>
             <a:r>
-              <a:rPr lang="en-US" sz="1050" dirty="0" err="1" smtClean="0">
+              <a:rPr lang="en-US" sz="1050" dirty="0" err="1">
                 <a:solidFill>
                   <a:schemeClr val="bg1"/>
                 </a:solidFill>
@@ -8141,7 +8079,7 @@
                   </a:schemeClr>
                 </a:solidFill>
               </a:rPr>
-              <a:t>PersonListPanel</a:t>
+              <a:t>TaskListPanel</a:t>
             </a:r>
             <a:endParaRPr lang="en-SG" sz="1050" b="1" dirty="0">
               <a:solidFill>
@@ -8626,7 +8564,7 @@
           <a:p>
             <a:pPr algn="ctr"/>
             <a:r>
-              <a:rPr lang="en-US" sz="1050" b="1" dirty="0" smtClean="0">
+              <a:rPr lang="en-US" sz="1050" b="1" dirty="0">
                 <a:solidFill>
                   <a:schemeClr val="accent3">
                     <a:lumMod val="75000"/>
@@ -8636,7 +8574,7 @@
               <a:t>{abstract}</a:t>
             </a:r>
             <a:br>
-              <a:rPr lang="en-US" sz="1050" b="1" dirty="0" smtClean="0">
+              <a:rPr lang="en-US" sz="1050" b="1" dirty="0">
                 <a:solidFill>
                   <a:schemeClr val="accent3">
                     <a:lumMod val="75000"/>
@@ -8645,7 +8583,7 @@
               </a:rPr>
             </a:br>
             <a:r>
-              <a:rPr lang="en-US" sz="1050" b="1" dirty="0" err="1" smtClean="0">
+              <a:rPr lang="en-US" sz="1050" b="1" dirty="0" err="1">
                 <a:solidFill>
                   <a:schemeClr val="accent3">
                     <a:lumMod val="75000"/>
@@ -9134,7 +9072,7 @@
           <a:p>
             <a:pPr algn="ctr"/>
             <a:r>
-              <a:rPr lang="en-US" sz="1100" b="1" dirty="0" smtClean="0">
+              <a:rPr lang="en-US" sz="1100" b="1" dirty="0">
                 <a:solidFill>
                   <a:schemeClr val="bg1"/>
                 </a:solidFill>
@@ -9193,7 +9131,7 @@
           <a:p>
             <a:pPr algn="ctr"/>
             <a:r>
-              <a:rPr lang="en-US" sz="1050" dirty="0" smtClean="0">
+              <a:rPr lang="en-US" sz="1050" dirty="0">
                 <a:solidFill>
                   <a:schemeClr val="bg1"/>
                 </a:solidFill>
@@ -9204,7 +9142,7 @@
           <a:p>
             <a:pPr algn="ctr"/>
             <a:r>
-              <a:rPr lang="en-US" sz="1050" dirty="0" err="1" smtClean="0">
+              <a:rPr lang="en-US" sz="1050" dirty="0" err="1">
                 <a:solidFill>
                   <a:schemeClr val="bg1"/>
                 </a:solidFill>
@@ -9753,13 +9691,6 @@
   <p:clrMapOvr>
     <a:masterClrMapping/>
   </p:clrMapOvr>
-  <p:timing>
-    <p:tnLst>
-      <p:par>
-        <p:cTn id="1" dur="indefinite" restart="never" nodeType="tmRoot"/>
-      </p:par>
-    </p:tnLst>
-  </p:timing>
 </p:sld>
 </file>
 
@@ -9826,7 +9757,7 @@
           <a:lstStyle/>
           <a:p>
             <a:r>
-              <a:rPr lang="en-US" sz="1200" b="1" dirty="0" smtClean="0">
+              <a:rPr lang="en-US" sz="1200" b="1" dirty="0">
                 <a:solidFill>
                   <a:srgbClr val="0070C0"/>
                 </a:solidFill>
@@ -10000,7 +9931,7 @@
           <a:p>
             <a:pPr algn="ctr"/>
             <a:r>
-              <a:rPr lang="en-US" sz="1050" dirty="0" err="1" smtClean="0">
+              <a:rPr lang="en-US" sz="1050" dirty="0" err="1">
                 <a:solidFill>
                   <a:schemeClr val="bg1"/>
                 </a:solidFill>
@@ -10362,7 +10293,7 @@
           <a:p>
             <a:pPr algn="ctr"/>
             <a:r>
-              <a:rPr lang="en-US" sz="1050" b="1" dirty="0" smtClean="0">
+              <a:rPr lang="en-US" sz="1050" b="1" dirty="0">
                 <a:solidFill>
                   <a:srgbClr val="0070C0"/>
                 </a:solidFill>
@@ -10370,14 +10301,14 @@
               <a:t>{abstract}</a:t>
             </a:r>
             <a:br>
-              <a:rPr lang="en-US" sz="1050" b="1" dirty="0" smtClean="0">
+              <a:rPr lang="en-US" sz="1050" b="1" dirty="0">
                 <a:solidFill>
                   <a:srgbClr val="0070C0"/>
                 </a:solidFill>
               </a:rPr>
             </a:br>
             <a:r>
-              <a:rPr lang="en-US" sz="1050" b="1" dirty="0" smtClean="0">
+              <a:rPr lang="en-US" sz="1050" b="1" dirty="0">
                 <a:solidFill>
                   <a:srgbClr val="0070C0"/>
                 </a:solidFill>
@@ -11038,7 +10969,7 @@
             <a:p>
               <a:pPr algn="r"/>
               <a:r>
-                <a:rPr lang="en-US" sz="1100" dirty="0" smtClean="0">
+                <a:rPr lang="en-US" sz="1100" dirty="0">
                   <a:solidFill>
                     <a:srgbClr val="0070C0"/>
                   </a:solidFill>
@@ -11137,7 +11068,7 @@
             <a:lstStyle/>
             <a:p>
               <a:r>
-                <a:rPr lang="en-US" sz="1100" dirty="0" smtClean="0">
+                <a:rPr lang="en-US" sz="1100" dirty="0">
                   <a:solidFill>
                     <a:srgbClr val="0070C0"/>
                   </a:solidFill>
@@ -11223,7 +11154,7 @@
           <a:p>
             <a:pPr algn="r"/>
             <a:r>
-              <a:rPr lang="en-US" sz="1100" dirty="0" smtClean="0">
+              <a:rPr lang="en-US" sz="1100" dirty="0">
                 <a:solidFill>
                   <a:srgbClr val="0070C0"/>
                 </a:solidFill>
@@ -11262,7 +11193,7 @@
           <a:p>
             <a:pPr algn="r"/>
             <a:r>
-              <a:rPr lang="en-US" sz="1100" dirty="0" smtClean="0">
+              <a:rPr lang="en-US" sz="1100" dirty="0">
                 <a:solidFill>
                   <a:srgbClr val="0070C0"/>
                 </a:solidFill>
@@ -11315,7 +11246,7 @@
             <a:p>
               <a:pPr algn="r"/>
               <a:r>
-                <a:rPr lang="en-US" sz="1100" dirty="0" smtClean="0">
+                <a:rPr lang="en-US" sz="1100" dirty="0">
                   <a:solidFill>
                     <a:srgbClr val="0070C0"/>
                   </a:solidFill>
@@ -11418,7 +11349,7 @@
           <a:p>
             <a:pPr algn="ctr"/>
             <a:r>
-              <a:rPr lang="en-US" sz="1050" b="1" dirty="0" smtClean="0">
+              <a:rPr lang="en-US" sz="1050" b="1" dirty="0">
                 <a:solidFill>
                   <a:srgbClr val="0070C0"/>
                 </a:solidFill>
@@ -11426,14 +11357,14 @@
               <a:t>Incorrect</a:t>
             </a:r>
             <a:br>
-              <a:rPr lang="en-US" sz="1050" b="1" dirty="0" smtClean="0">
+              <a:rPr lang="en-US" sz="1050" b="1" dirty="0">
                 <a:solidFill>
                   <a:srgbClr val="0070C0"/>
                 </a:solidFill>
               </a:rPr>
             </a:br>
             <a:r>
-              <a:rPr lang="en-US" sz="1050" b="1" dirty="0" smtClean="0">
+              <a:rPr lang="en-US" sz="1050" b="1" dirty="0">
                 <a:solidFill>
                   <a:srgbClr val="0070C0"/>
                 </a:solidFill>
@@ -11542,13 +11473,6 @@
   <p:clrMapOvr>
     <a:masterClrMapping/>
   </p:clrMapOvr>
-  <p:timing>
-    <p:tnLst>
-      <p:par>
-        <p:cTn id="1" dur="indefinite" restart="never" nodeType="tmRoot"/>
-      </p:par>
-    </p:tnLst>
-  </p:timing>
 </p:sld>
 </file>
 
@@ -11615,7 +11539,7 @@
           <a:lstStyle/>
           <a:p>
             <a:r>
-              <a:rPr lang="en-US" sz="1200" b="1" dirty="0" smtClean="0">
+              <a:rPr lang="en-US" sz="1200" b="1" dirty="0">
                 <a:solidFill>
                   <a:srgbClr val="0070C0"/>
                 </a:solidFill>
@@ -11825,7 +11749,7 @@
           <a:p>
             <a:pPr algn="ctr"/>
             <a:r>
-              <a:rPr lang="en-US" sz="1600" dirty="0" smtClean="0">
+              <a:rPr lang="en-US" sz="1600" dirty="0">
                 <a:solidFill>
                   <a:schemeClr val="bg1"/>
                 </a:solidFill>
@@ -11972,20 +11896,12 @@
           <a:p>
             <a:pPr algn="ctr"/>
             <a:r>
-              <a:rPr lang="en-US" sz="1600" dirty="0" smtClean="0">
+              <a:rPr lang="en-US" sz="1600" dirty="0">
                 <a:solidFill>
                   <a:schemeClr val="bg1"/>
                 </a:solidFill>
               </a:rPr>
               <a:t>d:Delete</a:t>
-            </a:r>
-            <a:r>
-              <a:rPr lang="en-US" sz="1600" dirty="0">
-                <a:solidFill>
-                  <a:schemeClr val="bg1"/>
-                </a:solidFill>
-              </a:rPr>
-              <a:t/>
             </a:r>
             <a:br>
               <a:rPr lang="en-US" sz="1600" dirty="0">
@@ -12190,18 +12106,13 @@
           <a:p>
             <a:pPr algn="r"/>
             <a:r>
-              <a:rPr lang="en-US" sz="1400" dirty="0" smtClean="0">
+              <a:rPr lang="en-US" sz="1400" dirty="0">
                 <a:solidFill>
                   <a:srgbClr val="0070C0"/>
                 </a:solidFill>
               </a:rPr>
               <a:t>execute(“delete 1”)</a:t>
             </a:r>
-            <a:endParaRPr lang="en-US" sz="1400" dirty="0">
-              <a:solidFill>
-                <a:srgbClr val="0070C0"/>
-              </a:solidFill>
-            </a:endParaRPr>
           </a:p>
         </p:txBody>
       </p:sp>
@@ -12280,7 +12191,6 @@
               <a:rPr lang="en-US" dirty="0"/>
               <a:t>execute()</a:t>
             </a:r>
-            <a:endParaRPr lang="en-US" dirty="0"/>
           </a:p>
         </p:txBody>
       </p:sp>
@@ -12792,26 +12702,21 @@
           </a:lstStyle>
           <a:p>
             <a:r>
-              <a:rPr lang="en-US" dirty="0" err="1" smtClean="0">
+              <a:rPr lang="en-US" dirty="0" err="1">
                 <a:solidFill>
                   <a:srgbClr val="7030A0"/>
                 </a:solidFill>
               </a:rPr>
-              <a:t>deletePerson</a:t>
-            </a:r>
-            <a:r>
-              <a:rPr lang="en-US" dirty="0" smtClean="0">
+              <a:t>deleteTask</a:t>
+            </a:r>
+            <a:r>
+              <a:rPr lang="en-US" dirty="0">
                 <a:solidFill>
                   <a:srgbClr val="7030A0"/>
                 </a:solidFill>
               </a:rPr>
               <a:t>(p)</a:t>
             </a:r>
-            <a:endParaRPr lang="en-US" dirty="0">
-              <a:solidFill>
-                <a:srgbClr val="7030A0"/>
-              </a:solidFill>
-            </a:endParaRPr>
           </a:p>
         </p:txBody>
       </p:sp>
@@ -12849,10 +12754,9 @@
           </a:lstStyle>
           <a:p>
             <a:r>
-              <a:rPr lang="en-US" dirty="0" smtClean="0"/>
+              <a:rPr lang="en-US" dirty="0"/>
               <a:t>create()</a:t>
             </a:r>
-            <a:endParaRPr lang="en-US" dirty="0"/>
           </a:p>
         </p:txBody>
       </p:sp>
@@ -12890,10 +12794,9 @@
           </a:lstStyle>
           <a:p>
             <a:r>
-              <a:rPr lang="en-US" dirty="0" smtClean="0"/>
+              <a:rPr lang="en-US" dirty="0"/>
               <a:t>parse(“delete 1”)</a:t>
             </a:r>
-            <a:endParaRPr lang="en-US" dirty="0"/>
           </a:p>
         </p:txBody>
       </p:sp>
@@ -12931,10 +12834,9 @@
           </a:lstStyle>
           <a:p>
             <a:r>
-              <a:rPr lang="en-US" dirty="0" smtClean="0"/>
+              <a:rPr lang="en-US" dirty="0"/>
               <a:t>result</a:t>
             </a:r>
-            <a:endParaRPr lang="en-US" dirty="0"/>
           </a:p>
         </p:txBody>
       </p:sp>
@@ -12972,10 +12874,9 @@
           </a:lstStyle>
           <a:p>
             <a:r>
-              <a:rPr lang="en-US" dirty="0" smtClean="0"/>
+              <a:rPr lang="en-US" dirty="0"/>
               <a:t>result</a:t>
             </a:r>
-            <a:endParaRPr lang="en-US" dirty="0"/>
           </a:p>
         </p:txBody>
       </p:sp>
@@ -13023,7 +12924,7 @@
           <a:p>
             <a:pPr algn="ctr"/>
             <a:r>
-              <a:rPr lang="en-US" sz="1600" dirty="0" smtClean="0">
+              <a:rPr lang="en-US" sz="1600" dirty="0">
                 <a:solidFill>
                   <a:schemeClr val="bg1"/>
                 </a:solidFill>
@@ -13031,14 +12932,14 @@
               <a:t>result:</a:t>
             </a:r>
             <a:br>
-              <a:rPr lang="en-US" sz="1600" dirty="0" smtClean="0">
+              <a:rPr lang="en-US" sz="1600" dirty="0">
                 <a:solidFill>
                   <a:schemeClr val="bg1"/>
                 </a:solidFill>
               </a:rPr>
             </a:br>
             <a:r>
-              <a:rPr lang="en-US" sz="1600" dirty="0" err="1" smtClean="0">
+              <a:rPr lang="en-US" sz="1600" dirty="0" err="1">
                 <a:solidFill>
                   <a:schemeClr val="bg1"/>
                 </a:solidFill>
@@ -13208,10 +13109,9 @@
           </a:lstStyle>
           <a:p>
             <a:r>
-              <a:rPr lang="en-US" dirty="0" smtClean="0"/>
+              <a:rPr lang="en-US" dirty="0"/>
               <a:t>d</a:t>
             </a:r>
-            <a:endParaRPr lang="en-US" dirty="0"/>
           </a:p>
         </p:txBody>
       </p:sp>
@@ -13291,7 +13191,7 @@
           <a:lstStyle/>
           <a:p>
             <a:r>
-              <a:rPr lang="en-US" sz="1200" b="1" dirty="0" smtClean="0">
+              <a:rPr lang="en-US" sz="1200" b="1" dirty="0">
                 <a:solidFill>
                   <a:srgbClr val="7030A0"/>
                 </a:solidFill>
@@ -13350,7 +13250,7 @@
           <a:p>
             <a:pPr algn="ctr"/>
             <a:r>
-              <a:rPr lang="en-US" sz="1050" dirty="0" err="1" smtClean="0">
+              <a:rPr lang="en-US" sz="1050" dirty="0" err="1">
                 <a:solidFill>
                   <a:schemeClr val="bg1"/>
                 </a:solidFill>
@@ -13409,7 +13309,7 @@
           <a:p>
             <a:pPr algn="ctr"/>
             <a:r>
-              <a:rPr lang="en-US" sz="1050" dirty="0" err="1" smtClean="0">
+              <a:rPr lang="en-US" sz="1050" dirty="0" err="1">
                 <a:solidFill>
                   <a:schemeClr val="bg1"/>
                 </a:solidFill>
@@ -13565,7 +13465,7 @@
           <a:p>
             <a:pPr algn="ctr"/>
             <a:r>
-              <a:rPr lang="en-US" sz="1050" dirty="0" smtClean="0">
+              <a:rPr lang="en-US" sz="1050" dirty="0">
                 <a:solidFill>
                   <a:schemeClr val="bg1"/>
                 </a:solidFill>
@@ -13931,12 +13831,12 @@
           <a:p>
             <a:pPr algn="ctr"/>
             <a:r>
-              <a:rPr lang="en-US" sz="1050" dirty="0" err="1" smtClean="0">
+              <a:rPr lang="en-US" sz="1050" dirty="0" err="1">
                 <a:solidFill>
                   <a:srgbClr val="7030A0"/>
                 </a:solidFill>
               </a:rPr>
-              <a:t>AddressBook</a:t>
+              <a:t>TaskMan</a:t>
             </a:r>
             <a:endParaRPr lang="en-SG" sz="1050" dirty="0">
               <a:solidFill>
@@ -14073,7 +13973,7 @@
           <a:p>
             <a:pPr algn="ctr"/>
             <a:r>
-              <a:rPr lang="en-US" sz="1050" dirty="0" err="1" smtClean="0">
+              <a:rPr lang="en-US" sz="1050" dirty="0" err="1">
                 <a:solidFill>
                   <a:srgbClr val="7030A0"/>
                 </a:solidFill>
@@ -14217,7 +14117,7 @@
           <a:p>
             <a:pPr algn="ctr"/>
             <a:r>
-              <a:rPr lang="en-US" sz="1050" dirty="0" err="1" smtClean="0">
+              <a:rPr lang="en-US" sz="1050" dirty="0" err="1">
                 <a:solidFill>
                   <a:srgbClr val="7030A0"/>
                 </a:solidFill>
@@ -14316,12 +14216,12 @@
           <a:p>
             <a:pPr algn="ctr"/>
             <a:r>
-              <a:rPr lang="en-US" sz="1050" dirty="0" smtClean="0">
+              <a:rPr lang="en-US" sz="1050" dirty="0">
                 <a:solidFill>
                   <a:srgbClr val="7030A0"/>
                 </a:solidFill>
               </a:rPr>
-              <a:t>Person</a:t>
+              <a:t>Task</a:t>
             </a:r>
             <a:endParaRPr lang="en-SG" sz="1050" dirty="0">
               <a:solidFill>
@@ -14458,7 +14358,7 @@
           <a:p>
             <a:pPr algn="ctr"/>
             <a:r>
-              <a:rPr lang="en-US" sz="1050" dirty="0" smtClean="0">
+              <a:rPr lang="en-US" sz="1050" dirty="0">
                 <a:solidFill>
                   <a:srgbClr val="7030A0"/>
                 </a:solidFill>
@@ -14600,7 +14500,7 @@
           <a:p>
             <a:pPr algn="ctr"/>
             <a:r>
-              <a:rPr lang="en-US" sz="1050" dirty="0" smtClean="0">
+              <a:rPr lang="en-US" sz="1050" dirty="0">
                 <a:solidFill>
                   <a:srgbClr val="7030A0"/>
                 </a:solidFill>
@@ -14608,19 +14508,19 @@
               <a:t>&lt;&lt;interface&gt;&gt;</a:t>
             </a:r>
             <a:br>
-              <a:rPr lang="en-US" sz="1050" dirty="0" smtClean="0">
+              <a:rPr lang="en-US" sz="1050" dirty="0">
                 <a:solidFill>
                   <a:srgbClr val="7030A0"/>
                 </a:solidFill>
               </a:rPr>
             </a:br>
             <a:r>
-              <a:rPr lang="en-US" sz="1050" dirty="0" err="1" smtClean="0">
+              <a:rPr lang="en-US" sz="1050" dirty="0" err="1">
                 <a:solidFill>
                   <a:srgbClr val="7030A0"/>
                 </a:solidFill>
               </a:rPr>
-              <a:t>ReadOnlyPerson</a:t>
+              <a:t>ReadOnlyTask</a:t>
             </a:r>
             <a:endParaRPr lang="en-SG" sz="1050" dirty="0">
               <a:solidFill>
@@ -14671,12 +14571,12 @@
           <a:p>
             <a:pPr algn="ctr"/>
             <a:r>
-              <a:rPr lang="en-US" sz="1050" dirty="0" smtClean="0">
+              <a:rPr lang="en-US" sz="1050" dirty="0">
                 <a:solidFill>
                   <a:srgbClr val="7030A0"/>
                 </a:solidFill>
               </a:rPr>
-              <a:t>Name</a:t>
+              <a:t>Title</a:t>
             </a:r>
             <a:endParaRPr lang="en-SG" sz="1050" dirty="0">
               <a:solidFill>
@@ -14815,12 +14715,12 @@
           <a:p>
             <a:pPr algn="ctr"/>
             <a:r>
-              <a:rPr lang="en-US" sz="1050" dirty="0" smtClean="0">
+              <a:rPr lang="en-US" sz="1050" dirty="0">
                 <a:solidFill>
                   <a:srgbClr val="7030A0"/>
                 </a:solidFill>
               </a:rPr>
-              <a:t>Phone</a:t>
+              <a:t>Deadline</a:t>
             </a:r>
             <a:endParaRPr lang="en-SG" sz="1050" dirty="0">
               <a:solidFill>
@@ -14912,12 +14812,12 @@
           <a:p>
             <a:pPr algn="ctr"/>
             <a:r>
-              <a:rPr lang="en-US" sz="1050" dirty="0" smtClean="0">
+              <a:rPr lang="en-US" sz="1050" dirty="0">
                 <a:solidFill>
                   <a:srgbClr val="7030A0"/>
                 </a:solidFill>
               </a:rPr>
-              <a:t>Email</a:t>
+              <a:t>-</a:t>
             </a:r>
             <a:endParaRPr lang="en-SG" sz="1050" dirty="0">
               <a:solidFill>
@@ -14976,7 +14876,7 @@
         </p:nvSpPr>
         <p:spPr>
           <a:xfrm>
-            <a:off x="7712397" y="3533171"/>
+            <a:off x="7712397" y="3581399"/>
             <a:ext cx="708186" cy="285783"/>
           </a:xfrm>
           <a:prstGeom prst="rect">
@@ -15009,12 +14909,12 @@
           <a:p>
             <a:pPr algn="ctr"/>
             <a:r>
-              <a:rPr lang="en-US" sz="1050" dirty="0" smtClean="0">
+              <a:rPr lang="en-US" sz="1050" dirty="0">
                 <a:solidFill>
                   <a:srgbClr val="7030A0"/>
                 </a:solidFill>
               </a:rPr>
-              <a:t>Address</a:t>
+              <a:t>-</a:t>
             </a:r>
             <a:endParaRPr lang="en-SG" sz="1050" dirty="0">
               <a:solidFill>
@@ -15036,7 +14936,7 @@
         <p:spPr>
           <a:xfrm>
             <a:off x="7277995" y="3034891"/>
-            <a:ext cx="434402" cy="641172"/>
+            <a:ext cx="434402" cy="689400"/>
           </a:xfrm>
           <a:prstGeom prst="bentConnector3">
             <a:avLst/>
@@ -15197,130 +15097,12 @@
           <a:p>
             <a:pPr algn="ctr"/>
             <a:r>
-              <a:rPr lang="en-US" sz="1050" dirty="0" smtClean="0">
+              <a:rPr lang="en-US" sz="1050" dirty="0">
                 <a:solidFill>
                   <a:srgbClr val="7030A0"/>
                 </a:solidFill>
               </a:rPr>
               <a:t>&lt;&lt;interface&gt;&gt;</a:t>
-            </a:r>
-            <a:br>
-              <a:rPr lang="en-US" sz="1050" dirty="0" smtClean="0">
-                <a:solidFill>
-                  <a:srgbClr val="7030A0"/>
-                </a:solidFill>
-              </a:rPr>
-            </a:br>
-            <a:r>
-              <a:rPr lang="en-US" sz="1050" dirty="0" err="1" smtClean="0">
-                <a:solidFill>
-                  <a:srgbClr val="7030A0"/>
-                </a:solidFill>
-              </a:rPr>
-              <a:t>ReadOnlyAddressBook</a:t>
-            </a:r>
-            <a:endParaRPr lang="en-SG" sz="1050" dirty="0">
-              <a:solidFill>
-                <a:srgbClr val="7030A0"/>
-              </a:solidFill>
-            </a:endParaRPr>
-          </a:p>
-        </p:txBody>
-      </p:sp>
-      <p:sp>
-        <p:nvSpPr>
-          <p:cNvPr id="114" name="TextBox 113"/>
-          <p:cNvSpPr txBox="1"/>
-          <p:nvPr/>
-        </p:nvSpPr>
-        <p:spPr>
-          <a:xfrm rot="16200000">
-            <a:off x="6581354" y="3514530"/>
-            <a:ext cx="881018" cy="261610"/>
-          </a:xfrm>
-          <a:prstGeom prst="rect">
-            <a:avLst/>
-          </a:prstGeom>
-          <a:noFill/>
-        </p:spPr>
-        <p:txBody>
-          <a:bodyPr wrap="square" rtlCol="0">
-            <a:spAutoFit/>
-          </a:bodyPr>
-          <a:lstStyle/>
-          <a:p>
-            <a:pPr algn="r"/>
-            <a:r>
-              <a:rPr lang="en-US" sz="1100" dirty="0" smtClean="0">
-                <a:solidFill>
-                  <a:srgbClr val="7030A0"/>
-                </a:solidFill>
-              </a:rPr>
-              <a:t>filtered list</a:t>
-            </a:r>
-            <a:endParaRPr lang="en-SG" sz="1100" dirty="0">
-              <a:solidFill>
-                <a:srgbClr val="7030A0"/>
-              </a:solidFill>
-            </a:endParaRPr>
-          </a:p>
-        </p:txBody>
-      </p:sp>
-      <p:sp>
-        <p:nvSpPr>
-          <p:cNvPr id="122" name="Rectangle 8"/>
-          <p:cNvSpPr/>
-          <p:nvPr/>
-        </p:nvSpPr>
-        <p:spPr>
-          <a:xfrm>
-            <a:off x="2057400" y="4239491"/>
-            <a:ext cx="1775949" cy="346760"/>
-          </a:xfrm>
-          <a:prstGeom prst="rect">
-            <a:avLst/>
-          </a:prstGeom>
-          <a:ln w="19050">
-            <a:solidFill>
-              <a:srgbClr val="7030A0"/>
-            </a:solidFill>
-          </a:ln>
-          <a:effectLst/>
-        </p:spPr>
-        <p:style>
-          <a:lnRef idx="1">
-            <a:schemeClr val="accent4"/>
-          </a:lnRef>
-          <a:fillRef idx="2">
-            <a:schemeClr val="accent4"/>
-          </a:fillRef>
-          <a:effectRef idx="1">
-            <a:schemeClr val="accent4"/>
-          </a:effectRef>
-          <a:fontRef idx="minor">
-            <a:schemeClr val="dk1"/>
-          </a:fontRef>
-        </p:style>
-        <p:txBody>
-          <a:bodyPr rtlCol="0" anchor="ctr"/>
-          <a:lstStyle/>
-          <a:p>
-            <a:pPr algn="ctr"/>
-            <a:r>
-              <a:rPr lang="en-US" sz="1050" dirty="0" smtClean="0">
-                <a:solidFill>
-                  <a:srgbClr val="7030A0"/>
-                </a:solidFill>
-              </a:rPr>
-              <a:t>&lt;&lt;interface&gt;&gt;</a:t>
-            </a:r>
-            <a:r>
-              <a:rPr lang="en-US" sz="1050" dirty="0">
-                <a:solidFill>
-                  <a:srgbClr val="7030A0"/>
-                </a:solidFill>
-              </a:rPr>
-              <a:t/>
             </a:r>
             <a:br>
               <a:rPr lang="en-US" sz="1050" dirty="0">
@@ -15330,7 +15112,117 @@
               </a:rPr>
             </a:br>
             <a:r>
-              <a:rPr lang="en-US" sz="1050" dirty="0" err="1" smtClean="0">
+              <a:rPr lang="en-US" sz="1050" dirty="0" err="1">
+                <a:solidFill>
+                  <a:srgbClr val="7030A0"/>
+                </a:solidFill>
+              </a:rPr>
+              <a:t>ReadOnlyTaskMan</a:t>
+            </a:r>
+            <a:endParaRPr lang="en-SG" sz="1050" dirty="0">
+              <a:solidFill>
+                <a:srgbClr val="7030A0"/>
+              </a:solidFill>
+            </a:endParaRPr>
+          </a:p>
+        </p:txBody>
+      </p:sp>
+      <p:sp>
+        <p:nvSpPr>
+          <p:cNvPr id="114" name="TextBox 113"/>
+          <p:cNvSpPr txBox="1"/>
+          <p:nvPr/>
+        </p:nvSpPr>
+        <p:spPr>
+          <a:xfrm rot="16200000">
+            <a:off x="6581354" y="3514530"/>
+            <a:ext cx="881018" cy="261610"/>
+          </a:xfrm>
+          <a:prstGeom prst="rect">
+            <a:avLst/>
+          </a:prstGeom>
+          <a:noFill/>
+        </p:spPr>
+        <p:txBody>
+          <a:bodyPr wrap="square" rtlCol="0">
+            <a:spAutoFit/>
+          </a:bodyPr>
+          <a:lstStyle/>
+          <a:p>
+            <a:pPr algn="r"/>
+            <a:r>
+              <a:rPr lang="en-US" sz="1100" dirty="0">
+                <a:solidFill>
+                  <a:srgbClr val="7030A0"/>
+                </a:solidFill>
+              </a:rPr>
+              <a:t>filtered list</a:t>
+            </a:r>
+            <a:endParaRPr lang="en-SG" sz="1100" dirty="0">
+              <a:solidFill>
+                <a:srgbClr val="7030A0"/>
+              </a:solidFill>
+            </a:endParaRPr>
+          </a:p>
+        </p:txBody>
+      </p:sp>
+      <p:sp>
+        <p:nvSpPr>
+          <p:cNvPr id="122" name="Rectangle 8"/>
+          <p:cNvSpPr/>
+          <p:nvPr/>
+        </p:nvSpPr>
+        <p:spPr>
+          <a:xfrm>
+            <a:off x="2057400" y="4239491"/>
+            <a:ext cx="1775949" cy="346760"/>
+          </a:xfrm>
+          <a:prstGeom prst="rect">
+            <a:avLst/>
+          </a:prstGeom>
+          <a:ln w="19050">
+            <a:solidFill>
+              <a:srgbClr val="7030A0"/>
+            </a:solidFill>
+          </a:ln>
+          <a:effectLst/>
+        </p:spPr>
+        <p:style>
+          <a:lnRef idx="1">
+            <a:schemeClr val="accent4"/>
+          </a:lnRef>
+          <a:fillRef idx="2">
+            <a:schemeClr val="accent4"/>
+          </a:fillRef>
+          <a:effectRef idx="1">
+            <a:schemeClr val="accent4"/>
+          </a:effectRef>
+          <a:fontRef idx="minor">
+            <a:schemeClr val="dk1"/>
+          </a:fontRef>
+        </p:style>
+        <p:txBody>
+          <a:bodyPr rtlCol="0" anchor="ctr"/>
+          <a:lstStyle/>
+          <a:p>
+            <a:pPr algn="ctr"/>
+            <a:r>
+              <a:rPr lang="en-US" sz="1050" dirty="0">
+                <a:solidFill>
+                  <a:srgbClr val="7030A0"/>
+                </a:solidFill>
+              </a:rPr>
+              <a:t>&lt;&lt;interface&gt;&gt;</a:t>
+            </a:r>
+            <a:br>
+              <a:rPr lang="en-US" sz="1050" dirty="0">
+                <a:solidFill>
+                  <a:srgbClr val="7030A0"/>
+                </a:solidFill>
+              </a:rPr>
+            </a:br>
+            <a:r>
+              <a:rPr lang="en-US" sz="1050" dirty="0" err="1">
                 <a:solidFill>
                   <a:srgbClr val="7030A0"/>
                 </a:solidFill>
@@ -15397,13 +15289,6 @@
   <p:clrMapOvr>
     <a:masterClrMapping/>
   </p:clrMapOvr>
-  <p:timing>
-    <p:tnLst>
-      <p:par>
-        <p:cTn id="1" dur="indefinite" restart="never" nodeType="tmRoot"/>
-      </p:par>
-    </p:tnLst>
-  </p:timing>
 </p:sld>
 </file>
 
@@ -15470,7 +15355,7 @@
           <a:lstStyle/>
           <a:p>
             <a:r>
-              <a:rPr lang="en-US" sz="1200" b="1" dirty="0" smtClean="0">
+              <a:rPr lang="en-US" sz="1200" b="1" dirty="0">
                 <a:solidFill>
                   <a:schemeClr val="accent6">
                     <a:lumMod val="75000"/>
@@ -15537,147 +15422,6 @@
           <a:p>
             <a:pPr algn="ctr"/>
             <a:r>
-              <a:rPr lang="en-US" sz="1050" dirty="0" smtClean="0">
-                <a:solidFill>
-                  <a:schemeClr val="bg1"/>
-                </a:solidFill>
-              </a:rPr>
-              <a:t>&lt;&lt;interface&gt;&gt;</a:t>
-            </a:r>
-            <a:br>
-              <a:rPr lang="en-US" sz="1050" dirty="0" smtClean="0">
-                <a:solidFill>
-                  <a:schemeClr val="bg1"/>
-                </a:solidFill>
-              </a:rPr>
-            </a:br>
-            <a:r>
-              <a:rPr lang="en-US" sz="1050" dirty="0" err="1" smtClean="0">
-                <a:solidFill>
-                  <a:schemeClr val="bg1"/>
-                </a:solidFill>
-              </a:rPr>
-              <a:t>AddressBookStorage</a:t>
-            </a:r>
-            <a:endParaRPr lang="en-SG" sz="1050" dirty="0">
-              <a:solidFill>
-                <a:schemeClr val="bg1"/>
-              </a:solidFill>
-            </a:endParaRPr>
-          </a:p>
-        </p:txBody>
-      </p:sp>
-      <p:sp>
-        <p:nvSpPr>
-          <p:cNvPr id="9" name="Rectangle 62"/>
-          <p:cNvSpPr/>
-          <p:nvPr/>
-        </p:nvSpPr>
-        <p:spPr>
-          <a:xfrm rot="16200000">
-            <a:off x="1683963" y="2868687"/>
-            <a:ext cx="1093635" cy="346760"/>
-          </a:xfrm>
-          <a:prstGeom prst="rect">
-            <a:avLst/>
-          </a:prstGeom>
-          <a:solidFill>
-            <a:schemeClr val="accent6">
-              <a:lumMod val="75000"/>
-            </a:schemeClr>
-          </a:solidFill>
-          <a:ln w="19050">
-            <a:solidFill>
-              <a:schemeClr val="accent6">
-                <a:lumMod val="75000"/>
-              </a:schemeClr>
-            </a:solidFill>
-          </a:ln>
-          <a:effectLst/>
-        </p:spPr>
-        <p:style>
-          <a:lnRef idx="1">
-            <a:schemeClr val="accent2"/>
-          </a:lnRef>
-          <a:fillRef idx="2">
-            <a:schemeClr val="accent2"/>
-          </a:fillRef>
-          <a:effectRef idx="1">
-            <a:schemeClr val="accent2"/>
-          </a:effectRef>
-          <a:fontRef idx="minor">
-            <a:schemeClr val="dk1"/>
-          </a:fontRef>
-        </p:style>
-        <p:txBody>
-          <a:bodyPr rtlCol="0" anchor="ctr"/>
-          <a:lstStyle/>
-          <a:p>
-            <a:pPr algn="ctr"/>
-            <a:r>
-              <a:rPr lang="en-US" sz="1050" dirty="0" err="1" smtClean="0">
-                <a:solidFill>
-                  <a:schemeClr val="bg1"/>
-                </a:solidFill>
-              </a:rPr>
-              <a:t>StorageManager</a:t>
-            </a:r>
-            <a:endParaRPr lang="en-SG" sz="1050" dirty="0">
-              <a:solidFill>
-                <a:schemeClr val="bg1"/>
-              </a:solidFill>
-            </a:endParaRPr>
-          </a:p>
-        </p:txBody>
-      </p:sp>
-      <p:sp>
-        <p:nvSpPr>
-          <p:cNvPr id="119" name="Rectangle 62"/>
-          <p:cNvSpPr/>
-          <p:nvPr/>
-        </p:nvSpPr>
-        <p:spPr>
-          <a:xfrm rot="16200000">
-            <a:off x="956202" y="2861202"/>
-            <a:ext cx="1093635" cy="346760"/>
-          </a:xfrm>
-          <a:prstGeom prst="rect">
-            <a:avLst/>
-          </a:prstGeom>
-          <a:solidFill>
-            <a:schemeClr val="accent6">
-              <a:lumMod val="75000"/>
-            </a:schemeClr>
-          </a:solidFill>
-          <a:ln w="19050">
-            <a:solidFill>
-              <a:schemeClr val="accent6">
-                <a:lumMod val="75000"/>
-              </a:schemeClr>
-            </a:solidFill>
-          </a:ln>
-          <a:effectLst/>
-        </p:spPr>
-        <p:style>
-          <a:lnRef idx="1">
-            <a:schemeClr val="accent2"/>
-          </a:lnRef>
-          <a:fillRef idx="2">
-            <a:schemeClr val="accent2"/>
-          </a:fillRef>
-          <a:effectRef idx="1">
-            <a:schemeClr val="accent2"/>
-          </a:effectRef>
-          <a:fontRef idx="minor">
-            <a:schemeClr val="dk1"/>
-          </a:fontRef>
-        </p:style>
-        <p:txBody>
-          <a:bodyPr rtlCol="0" anchor="ctr"/>
-          <a:lstStyle/>
-          <a:p>
-            <a:pPr algn="ctr"/>
-            <a:r>
               <a:rPr lang="en-US" sz="1050" dirty="0">
                 <a:solidFill>
                   <a:schemeClr val="bg1"/>
@@ -15685,11 +15429,152 @@
               </a:rPr>
               <a:t>&lt;&lt;interface&gt;&gt;</a:t>
             </a:r>
-          </a:p>
+            <a:br>
+              <a:rPr lang="en-US" sz="1050" dirty="0">
+                <a:solidFill>
+                  <a:schemeClr val="bg1"/>
+                </a:solidFill>
+              </a:rPr>
+            </a:br>
+            <a:r>
+              <a:rPr lang="en-US" sz="1050" dirty="0" err="1">
+                <a:solidFill>
+                  <a:schemeClr val="bg1"/>
+                </a:solidFill>
+              </a:rPr>
+              <a:t>TaskManStorage</a:t>
+            </a:r>
+            <a:endParaRPr lang="en-SG" sz="1050" dirty="0">
+              <a:solidFill>
+                <a:schemeClr val="bg1"/>
+              </a:solidFill>
+            </a:endParaRPr>
+          </a:p>
+        </p:txBody>
+      </p:sp>
+      <p:sp>
+        <p:nvSpPr>
+          <p:cNvPr id="9" name="Rectangle 62"/>
+          <p:cNvSpPr/>
+          <p:nvPr/>
+        </p:nvSpPr>
+        <p:spPr>
+          <a:xfrm rot="16200000">
+            <a:off x="1683963" y="2868687"/>
+            <a:ext cx="1093635" cy="346760"/>
+          </a:xfrm>
+          <a:prstGeom prst="rect">
+            <a:avLst/>
+          </a:prstGeom>
+          <a:solidFill>
+            <a:schemeClr val="accent6">
+              <a:lumMod val="75000"/>
+            </a:schemeClr>
+          </a:solidFill>
+          <a:ln w="19050">
+            <a:solidFill>
+              <a:schemeClr val="accent6">
+                <a:lumMod val="75000"/>
+              </a:schemeClr>
+            </a:solidFill>
+          </a:ln>
+          <a:effectLst/>
+        </p:spPr>
+        <p:style>
+          <a:lnRef idx="1">
+            <a:schemeClr val="accent2"/>
+          </a:lnRef>
+          <a:fillRef idx="2">
+            <a:schemeClr val="accent2"/>
+          </a:fillRef>
+          <a:effectRef idx="1">
+            <a:schemeClr val="accent2"/>
+          </a:effectRef>
+          <a:fontRef idx="minor">
+            <a:schemeClr val="dk1"/>
+          </a:fontRef>
+        </p:style>
+        <p:txBody>
+          <a:bodyPr rtlCol="0" anchor="ctr"/>
+          <a:lstStyle/>
           <a:p>
             <a:pPr algn="ctr"/>
             <a:r>
-              <a:rPr lang="en-US" sz="1050" dirty="0" smtClean="0">
+              <a:rPr lang="en-US" sz="1050" dirty="0" err="1">
+                <a:solidFill>
+                  <a:schemeClr val="bg1"/>
+                </a:solidFill>
+              </a:rPr>
+              <a:t>StorageManager</a:t>
+            </a:r>
+            <a:endParaRPr lang="en-SG" sz="1050" dirty="0">
+              <a:solidFill>
+                <a:schemeClr val="bg1"/>
+              </a:solidFill>
+            </a:endParaRPr>
+          </a:p>
+        </p:txBody>
+      </p:sp>
+      <p:sp>
+        <p:nvSpPr>
+          <p:cNvPr id="119" name="Rectangle 62"/>
+          <p:cNvSpPr/>
+          <p:nvPr/>
+        </p:nvSpPr>
+        <p:spPr>
+          <a:xfrm rot="16200000">
+            <a:off x="956202" y="2861202"/>
+            <a:ext cx="1093635" cy="346760"/>
+          </a:xfrm>
+          <a:prstGeom prst="rect">
+            <a:avLst/>
+          </a:prstGeom>
+          <a:solidFill>
+            <a:schemeClr val="accent6">
+              <a:lumMod val="75000"/>
+            </a:schemeClr>
+          </a:solidFill>
+          <a:ln w="19050">
+            <a:solidFill>
+              <a:schemeClr val="accent6">
+                <a:lumMod val="75000"/>
+              </a:schemeClr>
+            </a:solidFill>
+          </a:ln>
+          <a:effectLst/>
+        </p:spPr>
+        <p:style>
+          <a:lnRef idx="1">
+            <a:schemeClr val="accent2"/>
+          </a:lnRef>
+          <a:fillRef idx="2">
+            <a:schemeClr val="accent2"/>
+          </a:fillRef>
+          <a:effectRef idx="1">
+            <a:schemeClr val="accent2"/>
+          </a:effectRef>
+          <a:fontRef idx="minor">
+            <a:schemeClr val="dk1"/>
+          </a:fontRef>
+        </p:style>
+        <p:txBody>
+          <a:bodyPr rtlCol="0" anchor="ctr"/>
+          <a:lstStyle/>
+          <a:p>
+            <a:pPr algn="ctr"/>
+            <a:r>
+              <a:rPr lang="en-US" sz="1050" dirty="0">
+                <a:solidFill>
+                  <a:schemeClr val="bg1"/>
+                </a:solidFill>
+              </a:rPr>
+              <a:t>&lt;&lt;interface&gt;&gt;</a:t>
+            </a:r>
+          </a:p>
+          <a:p>
+            <a:pPr algn="ctr"/>
+            <a:r>
+              <a:rPr lang="en-US" sz="1050" dirty="0">
                 <a:solidFill>
                   <a:schemeClr val="bg1"/>
                 </a:solidFill>
@@ -16123,27 +16008,17 @@
           <a:p>
             <a:pPr algn="ctr"/>
             <a:r>
-              <a:rPr lang="en-US" sz="1050" b="1" dirty="0" err="1" smtClean="0">
+              <a:rPr lang="en-US" sz="1050" b="1" dirty="0" err="1">
                 <a:solidFill>
                   <a:schemeClr val="accent6">
                     <a:lumMod val="75000"/>
                   </a:schemeClr>
                 </a:solidFill>
               </a:rPr>
-              <a:t>XmlAddressBook</a:t>
-            </a:r>
-            <a:r>
-              <a:rPr lang="en-US" sz="1050" b="1" dirty="0" smtClean="0">
-                <a:solidFill>
-                  <a:schemeClr val="accent6">
-                    <a:lumMod val="75000"/>
-                  </a:schemeClr>
-                </a:solidFill>
-              </a:rPr>
-              <a:t/>
+              <a:t>XmlTaskMan</a:t>
             </a:r>
             <a:br>
-              <a:rPr lang="en-US" sz="1050" b="1" dirty="0" smtClean="0">
+              <a:rPr lang="en-US" sz="1050" b="1" dirty="0">
                 <a:solidFill>
                   <a:schemeClr val="accent6">
                     <a:lumMod val="75000"/>
@@ -16152,7 +16027,7 @@
               </a:rPr>
             </a:br>
             <a:r>
-              <a:rPr lang="en-US" sz="1050" b="1" dirty="0" smtClean="0">
+              <a:rPr lang="en-US" sz="1050" b="1" dirty="0">
                 <a:solidFill>
                   <a:schemeClr val="accent6">
                     <a:lumMod val="75000"/>
@@ -16219,7 +16094,7 @@
           <a:p>
             <a:pPr algn="ctr"/>
             <a:r>
-              <a:rPr lang="en-US" sz="1050" dirty="0" smtClean="0">
+              <a:rPr lang="en-US" sz="1050" dirty="0">
                 <a:solidFill>
                   <a:schemeClr val="bg1"/>
                 </a:solidFill>
@@ -16227,14 +16102,14 @@
               <a:t>&lt;&lt;interface&gt;&gt;</a:t>
             </a:r>
             <a:br>
-              <a:rPr lang="en-US" sz="1050" dirty="0" smtClean="0">
+              <a:rPr lang="en-US" sz="1050" dirty="0">
                 <a:solidFill>
                   <a:schemeClr val="bg1"/>
                 </a:solidFill>
               </a:rPr>
             </a:br>
             <a:r>
-              <a:rPr lang="en-US" sz="1050" dirty="0" err="1" smtClean="0">
+              <a:rPr lang="en-US" sz="1050" dirty="0" err="1">
                 <a:solidFill>
                   <a:schemeClr val="bg1"/>
                 </a:solidFill>
@@ -16492,30 +16367,22 @@
           <a:p>
             <a:pPr algn="ctr"/>
             <a:r>
-              <a:rPr lang="en-US" sz="1050" dirty="0" err="1" smtClean="0">
+              <a:rPr lang="en-US" sz="1050" dirty="0" err="1">
                 <a:solidFill>
                   <a:schemeClr val="bg1"/>
                 </a:solidFill>
               </a:rPr>
               <a:t>JsonUserPrefs</a:t>
             </a:r>
-            <a:r>
-              <a:rPr lang="en-US" sz="1050" dirty="0" smtClean="0">
-                <a:solidFill>
-                  <a:schemeClr val="bg1"/>
-                </a:solidFill>
-              </a:rPr>
-              <a:t/>
-            </a:r>
             <a:br>
-              <a:rPr lang="en-US" sz="1050" dirty="0" smtClean="0">
+              <a:rPr lang="en-US" sz="1050" dirty="0">
                 <a:solidFill>
                   <a:schemeClr val="bg1"/>
                 </a:solidFill>
               </a:rPr>
             </a:br>
             <a:r>
-              <a:rPr lang="en-US" sz="1050" dirty="0" smtClean="0">
+              <a:rPr lang="en-US" sz="1050" dirty="0">
                 <a:solidFill>
                   <a:schemeClr val="bg1"/>
                 </a:solidFill>
@@ -16567,7 +16434,7 @@
           <a:p>
             <a:pPr algn="ctr"/>
             <a:r>
-              <a:rPr lang="en-US" sz="1050" b="1" dirty="0" err="1" smtClean="0">
+              <a:rPr lang="en-US" sz="1050" b="1" dirty="0" err="1">
                 <a:solidFill>
                   <a:schemeClr val="accent6">
                     <a:lumMod val="75000"/>
@@ -16576,18 +16443,8 @@
               </a:rPr>
               <a:t>XmlSerializable</a:t>
             </a:r>
-            <a:r>
-              <a:rPr lang="en-US" sz="1050" b="1" dirty="0" smtClean="0">
-                <a:solidFill>
-                  <a:schemeClr val="accent6">
-                    <a:lumMod val="75000"/>
-                  </a:schemeClr>
-                </a:solidFill>
-              </a:rPr>
-              <a:t/>
-            </a:r>
             <a:br>
-              <a:rPr lang="en-US" sz="1050" b="1" dirty="0" smtClean="0">
+              <a:rPr lang="en-US" sz="1050" b="1" dirty="0">
                 <a:solidFill>
                   <a:schemeClr val="accent6">
                     <a:lumMod val="75000"/>
@@ -16596,14 +16453,14 @@
               </a:rPr>
             </a:br>
             <a:r>
-              <a:rPr lang="en-US" sz="1050" b="1" dirty="0" err="1" smtClean="0">
+              <a:rPr lang="en-US" sz="1050" b="1" dirty="0" err="1">
                 <a:solidFill>
                   <a:schemeClr val="accent6">
                     <a:lumMod val="75000"/>
                   </a:schemeClr>
                 </a:solidFill>
               </a:rPr>
-              <a:t>AddressBook</a:t>
+              <a:t>TaskMan</a:t>
             </a:r>
             <a:endParaRPr lang="en-SG" sz="1050" b="1" dirty="0">
               <a:solidFill>
@@ -16693,7 +16550,7 @@
           <a:p>
             <a:pPr algn="ctr"/>
             <a:r>
-              <a:rPr lang="en-US" sz="1050" b="1" dirty="0" err="1" smtClean="0">
+              <a:rPr lang="en-US" sz="1050" b="1" dirty="0" err="1">
                 <a:solidFill>
                   <a:schemeClr val="accent6">
                     <a:lumMod val="75000"/>
@@ -16749,14 +16606,14 @@
           <a:p>
             <a:pPr algn="ctr"/>
             <a:r>
-              <a:rPr lang="en-US" sz="1050" b="1" dirty="0" err="1" smtClean="0">
+              <a:rPr lang="en-US" sz="1050" b="1" dirty="0" err="1">
                 <a:solidFill>
                   <a:schemeClr val="accent6">
                     <a:lumMod val="75000"/>
                   </a:schemeClr>
                 </a:solidFill>
               </a:rPr>
-              <a:t>XmlAdaptedPerson</a:t>
+              <a:t>XmlAdaptedTask</a:t>
             </a:r>
             <a:endParaRPr lang="en-SG" sz="1050" b="1" dirty="0">
               <a:solidFill>
@@ -16819,13 +16676,6 @@
   <p:clrMapOvr>
     <a:masterClrMapping/>
   </p:clrMapOvr>
-  <p:timing>
-    <p:tnLst>
-      <p:par>
-        <p:cTn id="1" dur="indefinite" restart="never" nodeType="tmRoot"/>
-      </p:par>
-    </p:tnLst>
-  </p:timing>
 </p:sld>
 </file>
 

</xml_diff>

<commit_message>
Edited design architecture diagram
</commit_message>
<xml_diff>
--- a/docs/diagrams/Diagrams.pptx
+++ b/docs/diagrams/Diagrams.pptx
@@ -215,7 +215,7 @@
           <a:p>
             <a:fld id="{F5CC4B3F-88C1-4FFA-B1B6-F41C21DC6924}" type="datetimeFigureOut">
               <a:rPr lang="en-US" smtClean="0"/>
-              <a:t>10/4/2016</a:t>
+              <a:t>10/7/2016</a:t>
             </a:fld>
             <a:endParaRPr lang="en-US"/>
           </a:p>
@@ -664,7 +664,7 @@
           <a:p>
             <a:fld id="{78C97017-6FC3-485B-9764-EAC9E56C1D49}" type="datetimeFigureOut">
               <a:rPr lang="en-US" smtClean="0"/>
-              <a:t>10/4/2016</a:t>
+              <a:t>10/7/2016</a:t>
             </a:fld>
             <a:endParaRPr lang="en-US"/>
           </a:p>
@@ -834,7 +834,7 @@
           <a:p>
             <a:fld id="{78C97017-6FC3-485B-9764-EAC9E56C1D49}" type="datetimeFigureOut">
               <a:rPr lang="en-US" smtClean="0"/>
-              <a:t>10/4/2016</a:t>
+              <a:t>10/7/2016</a:t>
             </a:fld>
             <a:endParaRPr lang="en-US"/>
           </a:p>
@@ -1014,7 +1014,7 @@
           <a:p>
             <a:fld id="{78C97017-6FC3-485B-9764-EAC9E56C1D49}" type="datetimeFigureOut">
               <a:rPr lang="en-US" smtClean="0"/>
-              <a:t>10/4/2016</a:t>
+              <a:t>10/7/2016</a:t>
             </a:fld>
             <a:endParaRPr lang="en-US"/>
           </a:p>
@@ -1184,7 +1184,7 @@
           <a:p>
             <a:fld id="{78C97017-6FC3-485B-9764-EAC9E56C1D49}" type="datetimeFigureOut">
               <a:rPr lang="en-US" smtClean="0"/>
-              <a:t>10/4/2016</a:t>
+              <a:t>10/7/2016</a:t>
             </a:fld>
             <a:endParaRPr lang="en-US"/>
           </a:p>
@@ -1430,7 +1430,7 @@
           <a:p>
             <a:fld id="{78C97017-6FC3-485B-9764-EAC9E56C1D49}" type="datetimeFigureOut">
               <a:rPr lang="en-US" smtClean="0"/>
-              <a:t>10/4/2016</a:t>
+              <a:t>10/7/2016</a:t>
             </a:fld>
             <a:endParaRPr lang="en-US"/>
           </a:p>
@@ -1718,7 +1718,7 @@
           <a:p>
             <a:fld id="{78C97017-6FC3-485B-9764-EAC9E56C1D49}" type="datetimeFigureOut">
               <a:rPr lang="en-US" smtClean="0"/>
-              <a:t>10/4/2016</a:t>
+              <a:t>10/7/2016</a:t>
             </a:fld>
             <a:endParaRPr lang="en-US"/>
           </a:p>
@@ -2140,7 +2140,7 @@
           <a:p>
             <a:fld id="{78C97017-6FC3-485B-9764-EAC9E56C1D49}" type="datetimeFigureOut">
               <a:rPr lang="en-US" smtClean="0"/>
-              <a:t>10/4/2016</a:t>
+              <a:t>10/7/2016</a:t>
             </a:fld>
             <a:endParaRPr lang="en-US"/>
           </a:p>
@@ -2258,7 +2258,7 @@
           <a:p>
             <a:fld id="{78C97017-6FC3-485B-9764-EAC9E56C1D49}" type="datetimeFigureOut">
               <a:rPr lang="en-US" smtClean="0"/>
-              <a:t>10/4/2016</a:t>
+              <a:t>10/7/2016</a:t>
             </a:fld>
             <a:endParaRPr lang="en-US"/>
           </a:p>
@@ -2353,7 +2353,7 @@
           <a:p>
             <a:fld id="{78C97017-6FC3-485B-9764-EAC9E56C1D49}" type="datetimeFigureOut">
               <a:rPr lang="en-US" smtClean="0"/>
-              <a:t>10/4/2016</a:t>
+              <a:t>10/7/2016</a:t>
             </a:fld>
             <a:endParaRPr lang="en-US"/>
           </a:p>
@@ -2630,7 +2630,7 @@
           <a:p>
             <a:fld id="{78C97017-6FC3-485B-9764-EAC9E56C1D49}" type="datetimeFigureOut">
               <a:rPr lang="en-US" smtClean="0"/>
-              <a:t>10/4/2016</a:t>
+              <a:t>10/7/2016</a:t>
             </a:fld>
             <a:endParaRPr lang="en-US"/>
           </a:p>
@@ -2883,7 +2883,7 @@
           <a:p>
             <a:fld id="{78C97017-6FC3-485B-9764-EAC9E56C1D49}" type="datetimeFigureOut">
               <a:rPr lang="en-US" smtClean="0"/>
-              <a:t>10/4/2016</a:t>
+              <a:t>10/7/2016</a:t>
             </a:fld>
             <a:endParaRPr lang="en-US"/>
           </a:p>
@@ -3096,7 +3096,7 @@
           <a:p>
             <a:fld id="{78C97017-6FC3-485B-9764-EAC9E56C1D49}" type="datetimeFigureOut">
               <a:rPr lang="en-US" smtClean="0"/>
-              <a:t>10/4/2016</a:t>
+              <a:t>10/7/2016</a:t>
             </a:fld>
             <a:endParaRPr lang="en-US"/>
           </a:p>
@@ -7565,8 +7565,8 @@
         </p:nvSpPr>
         <p:spPr>
           <a:xfrm>
-            <a:off x="1217465" y="1447800"/>
-            <a:ext cx="4917083" cy="4648200"/>
+            <a:off x="1219200" y="1295400"/>
+            <a:ext cx="5791200" cy="4648200"/>
           </a:xfrm>
           <a:prstGeom prst="roundRect">
             <a:avLst>
@@ -7627,7 +7627,7 @@
         </p:nvSpPr>
         <p:spPr>
           <a:xfrm>
-            <a:off x="2095948" y="2341220"/>
+            <a:off x="2289105" y="2246696"/>
             <a:ext cx="1093635" cy="346760"/>
           </a:xfrm>
           <a:prstGeom prst="rect">
@@ -7687,7 +7687,7 @@
         </p:nvSpPr>
         <p:spPr>
           <a:xfrm>
-            <a:off x="2592528" y="3179160"/>
+            <a:off x="2819399" y="3048000"/>
             <a:ext cx="1093635" cy="236841"/>
           </a:xfrm>
           <a:prstGeom prst="rect">
@@ -7747,7 +7747,7 @@
         </p:nvSpPr>
         <p:spPr>
           <a:xfrm>
-            <a:off x="2092842" y="1770924"/>
+            <a:off x="2285999" y="1600200"/>
             <a:ext cx="1093635" cy="346760"/>
           </a:xfrm>
           <a:prstGeom prst="rect">
@@ -7809,8 +7809,8 @@
         </p:nvCxnSpPr>
         <p:spPr>
           <a:xfrm rot="16200000" flipH="1">
-            <a:off x="2529445" y="2227899"/>
-            <a:ext cx="223536" cy="3106"/>
+            <a:off x="2684502" y="2095275"/>
+            <a:ext cx="299736" cy="3106"/>
           </a:xfrm>
           <a:prstGeom prst="bentConnector3">
             <a:avLst>
@@ -7849,7 +7849,7 @@
         </p:nvSpPr>
         <p:spPr>
           <a:xfrm rot="10800000" flipV="1">
-            <a:off x="5394717" y="2110477"/>
+            <a:off x="6461516" y="1958077"/>
             <a:ext cx="270504" cy="175523"/>
           </a:xfrm>
           <a:prstGeom prst="triangle">
@@ -7897,7 +7897,7 @@
         </p:nvCxnSpPr>
         <p:spPr>
           <a:xfrm flipV="1">
-            <a:off x="644735" y="2991937"/>
+            <a:off x="609599" y="2839537"/>
             <a:ext cx="684904" cy="1"/>
           </a:xfrm>
           <a:prstGeom prst="bentConnector3">
@@ -7940,7 +7940,7 @@
         </p:nvSpPr>
         <p:spPr>
           <a:xfrm rot="16200000">
-            <a:off x="5703829" y="2464877"/>
+            <a:off x="6107867" y="2312477"/>
             <a:ext cx="2362201" cy="328045"/>
           </a:xfrm>
           <a:prstGeom prst="roundRect">
@@ -8000,7 +8000,7 @@
         </p:nvSpPr>
         <p:spPr>
           <a:xfrm>
-            <a:off x="2592528" y="3649359"/>
+            <a:off x="2819399" y="3496959"/>
             <a:ext cx="1093635" cy="236841"/>
           </a:xfrm>
           <a:prstGeom prst="rect">
@@ -8060,7 +8060,7 @@
         </p:nvSpPr>
         <p:spPr>
           <a:xfrm>
-            <a:off x="2590800" y="5105400"/>
+            <a:off x="2819399" y="4953000"/>
             <a:ext cx="1093635" cy="236841"/>
           </a:xfrm>
           <a:prstGeom prst="rect">
@@ -8120,8 +8120,8 @@
         </p:nvSpPr>
         <p:spPr>
           <a:xfrm>
-            <a:off x="2592526" y="3991960"/>
-            <a:ext cx="1093635" cy="236841"/>
+            <a:off x="3809999" y="3839561"/>
+            <a:ext cx="1093635" cy="275239"/>
           </a:xfrm>
           <a:prstGeom prst="rect">
             <a:avLst/>
@@ -8180,7 +8180,7 @@
         </p:nvSpPr>
         <p:spPr>
           <a:xfrm>
-            <a:off x="3839323" y="4228801"/>
+            <a:off x="5410199" y="4038600"/>
             <a:ext cx="1040906" cy="236841"/>
           </a:xfrm>
           <a:prstGeom prst="rect">
@@ -8240,7 +8240,7 @@
         </p:nvSpPr>
         <p:spPr>
           <a:xfrm>
-            <a:off x="2590800" y="5562600"/>
+            <a:off x="2819399" y="5410200"/>
             <a:ext cx="1093635" cy="236841"/>
           </a:xfrm>
           <a:prstGeom prst="rect">
@@ -8300,7 +8300,7 @@
         </p:nvSpPr>
         <p:spPr>
           <a:xfrm>
-            <a:off x="2324548" y="2706452"/>
+            <a:off x="2517705" y="2611928"/>
             <a:ext cx="183156" cy="161573"/>
           </a:xfrm>
           <a:prstGeom prst="flowChartDecision">
@@ -8351,8 +8351,8 @@
         </p:nvCxnSpPr>
         <p:spPr>
           <a:xfrm rot="16200000" flipH="1">
-            <a:off x="2289549" y="2994602"/>
-            <a:ext cx="429556" cy="176402"/>
+            <a:off x="2517881" y="2864903"/>
+            <a:ext cx="392920" cy="210116"/>
           </a:xfrm>
           <a:prstGeom prst="bentConnector2">
             <a:avLst/>
@@ -8389,7 +8389,7 @@
         </p:nvSpPr>
         <p:spPr>
           <a:xfrm>
-            <a:off x="3759694" y="3416961"/>
+            <a:off x="4445493" y="3264561"/>
             <a:ext cx="1040906" cy="236841"/>
           </a:xfrm>
           <a:prstGeom prst="rect">
@@ -8452,8 +8452,8 @@
         </p:nvCxnSpPr>
         <p:spPr>
           <a:xfrm rot="16200000" flipH="1">
-            <a:off x="2054450" y="3229701"/>
-            <a:ext cx="899755" cy="176402"/>
+            <a:off x="2293402" y="3089382"/>
+            <a:ext cx="841879" cy="210116"/>
           </a:xfrm>
           <a:prstGeom prst="bentConnector2">
             <a:avLst/>
@@ -8487,14 +8487,14 @@
           <p:cNvPr id="47" name="Elbow Connector 63"/>
           <p:cNvCxnSpPr>
             <a:stCxn id="39" idx="2"/>
-            <a:endCxn id="36" idx="1"/>
+            <a:endCxn id="68" idx="1"/>
           </p:cNvCxnSpPr>
           <p:nvPr/>
         </p:nvCxnSpPr>
         <p:spPr>
           <a:xfrm rot="16200000" flipH="1">
-            <a:off x="1883148" y="3401003"/>
-            <a:ext cx="1242356" cy="176400"/>
+            <a:off x="2024642" y="3358142"/>
+            <a:ext cx="1379399" cy="210116"/>
           </a:xfrm>
           <a:prstGeom prst="bentConnector2">
             <a:avLst/>
@@ -8534,8 +8534,8 @@
         </p:nvCxnSpPr>
         <p:spPr>
           <a:xfrm rot="16200000" flipH="1">
-            <a:off x="1325565" y="3958586"/>
-            <a:ext cx="2355796" cy="174674"/>
+            <a:off x="1565381" y="3817403"/>
+            <a:ext cx="2297920" cy="210116"/>
           </a:xfrm>
           <a:prstGeom prst="bentConnector2">
             <a:avLst/>
@@ -8574,8 +8574,8 @@
         </p:nvCxnSpPr>
         <p:spPr>
           <a:xfrm rot="16200000" flipH="1">
-            <a:off x="893291" y="3983511"/>
-            <a:ext cx="3014019" cy="381000"/>
+            <a:off x="1133106" y="3842328"/>
+            <a:ext cx="2956144" cy="416441"/>
           </a:xfrm>
           <a:prstGeom prst="bentConnector2">
             <a:avLst/>
@@ -8612,7 +8612,7 @@
         </p:nvSpPr>
         <p:spPr>
           <a:xfrm>
-            <a:off x="5143948" y="1770924"/>
+            <a:off x="6172199" y="1600200"/>
             <a:ext cx="772043" cy="346760"/>
           </a:xfrm>
           <a:prstGeom prst="rect">
@@ -8694,8 +8694,8 @@
         </p:nvCxnSpPr>
         <p:spPr>
           <a:xfrm flipV="1">
-            <a:off x="4800600" y="2286000"/>
-            <a:ext cx="729369" cy="1249382"/>
+            <a:off x="5486399" y="2133600"/>
+            <a:ext cx="1110369" cy="1249382"/>
           </a:xfrm>
           <a:prstGeom prst="bentConnector2">
             <a:avLst/>
@@ -8735,8 +8735,8 @@
         </p:nvCxnSpPr>
         <p:spPr>
           <a:xfrm rot="5400000">
-            <a:off x="4174488" y="2991741"/>
-            <a:ext cx="2061222" cy="649740"/>
+            <a:off x="5512227" y="3072479"/>
+            <a:ext cx="2023421" cy="145663"/>
           </a:xfrm>
           <a:prstGeom prst="bentConnector2">
             <a:avLst/>
@@ -8776,8 +8776,8 @@
         </p:nvCxnSpPr>
         <p:spPr>
           <a:xfrm rot="5400000">
-            <a:off x="3867176" y="2104987"/>
-            <a:ext cx="1481780" cy="1843806"/>
+            <a:off x="4514011" y="1532623"/>
+            <a:ext cx="1481780" cy="2683734"/>
           </a:xfrm>
           <a:prstGeom prst="bentConnector2">
             <a:avLst/>
@@ -8817,8 +8817,8 @@
         </p:nvCxnSpPr>
         <p:spPr>
           <a:xfrm flipV="1">
-            <a:off x="3189583" y="2286000"/>
-            <a:ext cx="2340386" cy="228600"/>
+            <a:off x="3382740" y="2133600"/>
+            <a:ext cx="3214028" cy="286476"/>
           </a:xfrm>
           <a:prstGeom prst="bentConnector2">
             <a:avLst/>
@@ -8858,8 +8858,8 @@
         </p:nvCxnSpPr>
         <p:spPr>
           <a:xfrm rot="5400000">
-            <a:off x="3138292" y="2832143"/>
-            <a:ext cx="2937821" cy="1845534"/>
+            <a:off x="3785991" y="2260643"/>
+            <a:ext cx="2937821" cy="2683734"/>
           </a:xfrm>
           <a:prstGeom prst="bentConnector2">
             <a:avLst/>
@@ -8899,8 +8899,8 @@
         </p:nvCxnSpPr>
         <p:spPr>
           <a:xfrm rot="5400000">
-            <a:off x="2909692" y="3060743"/>
-            <a:ext cx="3395021" cy="1845534"/>
+            <a:off x="3557391" y="2489243"/>
+            <a:ext cx="3395021" cy="2683734"/>
           </a:xfrm>
           <a:prstGeom prst="bentConnector2">
             <a:avLst/>
@@ -8937,7 +8937,7 @@
         </p:nvSpPr>
         <p:spPr>
           <a:xfrm>
-            <a:off x="3657600" y="1770924"/>
+            <a:off x="4114799" y="1600200"/>
             <a:ext cx="1031399" cy="346760"/>
           </a:xfrm>
           <a:prstGeom prst="rect">
@@ -8998,8 +8998,8 @@
         </p:nvCxnSpPr>
         <p:spPr>
           <a:xfrm rot="5400000" flipH="1" flipV="1">
-            <a:off x="4594921" y="-355061"/>
-            <a:ext cx="170724" cy="4081246"/>
+            <a:off x="4921608" y="-640991"/>
+            <a:ext cx="152400" cy="4329982"/>
           </a:xfrm>
           <a:prstGeom prst="bentConnector2">
             <a:avLst/>
@@ -9032,13 +9032,16 @@
       <p:cxnSp>
         <p:nvCxnSpPr>
           <p:cNvPr id="110" name="Straight Arrow Connector 109"/>
-          <p:cNvCxnSpPr/>
+          <p:cNvCxnSpPr>
+            <a:stCxn id="9" idx="3"/>
+            <a:endCxn id="98" idx="1"/>
+          </p:cNvCxnSpPr>
           <p:nvPr/>
         </p:nvCxnSpPr>
         <p:spPr>
-          <a:xfrm flipV="1">
-            <a:off x="3198609" y="1944304"/>
-            <a:ext cx="484448" cy="2308"/>
+          <a:xfrm>
+            <a:off x="3379634" y="1773580"/>
+            <a:ext cx="735165" cy="0"/>
           </a:xfrm>
           <a:prstGeom prst="straightConnector1">
             <a:avLst/>
@@ -9071,14 +9074,15 @@
         <p:nvCxnSpPr>
           <p:cNvPr id="111" name="Straight Arrow Connector 110"/>
           <p:cNvCxnSpPr>
+            <a:stCxn id="98" idx="3"/>
             <a:endCxn id="73" idx="1"/>
           </p:cNvCxnSpPr>
           <p:nvPr/>
         </p:nvCxnSpPr>
         <p:spPr>
-          <a:xfrm flipV="1">
-            <a:off x="4714456" y="1944304"/>
-            <a:ext cx="429492" cy="2308"/>
+          <a:xfrm>
+            <a:off x="5146198" y="1773580"/>
+            <a:ext cx="1026001" cy="0"/>
           </a:xfrm>
           <a:prstGeom prst="straightConnector1">
             <a:avLst/>
@@ -9116,7 +9120,7 @@
         </p:nvSpPr>
         <p:spPr>
           <a:xfrm rot="16200000">
-            <a:off x="5947038" y="4827076"/>
+            <a:off x="6351076" y="4674676"/>
             <a:ext cx="1905001" cy="328045"/>
           </a:xfrm>
           <a:prstGeom prst="roundRect">
@@ -9176,7 +9180,7 @@
         </p:nvSpPr>
         <p:spPr>
           <a:xfrm rot="16200000">
-            <a:off x="956202" y="2861202"/>
+            <a:off x="921066" y="2708802"/>
             <a:ext cx="1093635" cy="346760"/>
           </a:xfrm>
           <a:prstGeom prst="rect">
@@ -9246,7 +9250,7 @@
         </p:nvSpPr>
         <p:spPr>
           <a:xfrm flipV="1">
-            <a:off x="1367767" y="2286001"/>
+            <a:off x="1329695" y="2133600"/>
             <a:ext cx="270504" cy="175523"/>
           </a:xfrm>
           <a:prstGeom prst="triangle">
@@ -9297,8 +9301,8 @@
         </p:nvCxnSpPr>
         <p:spPr>
           <a:xfrm rot="10800000" flipV="1">
-            <a:off x="1503020" y="1944303"/>
-            <a:ext cx="589823" cy="341697"/>
+            <a:off x="1464947" y="1773580"/>
+            <a:ext cx="821052" cy="360020"/>
           </a:xfrm>
           <a:prstGeom prst="bentConnector2">
             <a:avLst/>
@@ -9339,8 +9343,8 @@
         </p:nvCxnSpPr>
         <p:spPr>
           <a:xfrm rot="16200000" flipH="1">
-            <a:off x="3389830" y="3165517"/>
-            <a:ext cx="119381" cy="620348"/>
+            <a:off x="3856785" y="2794273"/>
+            <a:ext cx="98141" cy="1079276"/>
           </a:xfrm>
           <a:prstGeom prst="bentConnector2">
             <a:avLst/>
@@ -9380,8 +9384,8 @@
         </p:nvCxnSpPr>
         <p:spPr>
           <a:xfrm rot="5400000">
-            <a:off x="4102276" y="1869887"/>
-            <a:ext cx="1011581" cy="1843806"/>
+            <a:off x="4738491" y="1308143"/>
+            <a:ext cx="1032821" cy="2683734"/>
           </a:xfrm>
           <a:prstGeom prst="bentConnector2">
             <a:avLst/>
@@ -9421,8 +9425,8 @@
         </p:nvCxnSpPr>
         <p:spPr>
           <a:xfrm rot="16200000" flipH="1">
-            <a:off x="3430123" y="3938021"/>
-            <a:ext cx="118421" cy="699979"/>
+            <a:off x="4862398" y="3609219"/>
+            <a:ext cx="42221" cy="1053382"/>
           </a:xfrm>
           <a:prstGeom prst="bentConnector2">
             <a:avLst/>
@@ -9462,8 +9466,8 @@
         </p:nvCxnSpPr>
         <p:spPr>
           <a:xfrm rot="5400000">
-            <a:off x="3695875" y="2276286"/>
-            <a:ext cx="1824381" cy="1843808"/>
+            <a:off x="4828411" y="2208823"/>
+            <a:ext cx="1843581" cy="1693134"/>
           </a:xfrm>
           <a:prstGeom prst="bentConnector2">
             <a:avLst/>
@@ -9500,7 +9504,7 @@
         </p:nvSpPr>
         <p:spPr>
           <a:xfrm>
-            <a:off x="5435896" y="2895600"/>
+            <a:off x="6502695" y="2743200"/>
             <a:ext cx="229325" cy="166560"/>
           </a:xfrm>
           <a:prstGeom prst="rect">
@@ -9553,8 +9557,8 @@
         </p:nvSpPr>
         <p:spPr>
           <a:xfrm>
-            <a:off x="3687515" y="2981202"/>
-            <a:ext cx="3048000" cy="203200"/>
+            <a:off x="3276600" y="2819400"/>
+            <a:ext cx="3886200" cy="228600"/>
           </a:xfrm>
           <a:custGeom>
             <a:avLst/>
@@ -9635,7 +9639,7 @@
         </p:nvSpPr>
         <p:spPr>
           <a:xfrm>
-            <a:off x="5431573" y="4488138"/>
+            <a:off x="6498372" y="4335738"/>
             <a:ext cx="229325" cy="160062"/>
           </a:xfrm>
           <a:prstGeom prst="rect">
@@ -9688,8 +9692,8 @@
         </p:nvSpPr>
         <p:spPr>
           <a:xfrm flipV="1">
-            <a:off x="4114799" y="4472708"/>
-            <a:ext cx="2642195" cy="101600"/>
+            <a:off x="5943599" y="4267200"/>
+            <a:ext cx="1219200" cy="76200"/>
           </a:xfrm>
           <a:custGeom>
             <a:avLst/>
@@ -9770,8 +9774,8 @@
         </p:nvSpPr>
         <p:spPr>
           <a:xfrm>
-            <a:off x="2590800" y="4495800"/>
-            <a:ext cx="1093635" cy="236841"/>
+            <a:off x="3809999" y="4267200"/>
+            <a:ext cx="1093635" cy="304799"/>
           </a:xfrm>
           <a:prstGeom prst="rect">
             <a:avLst/>
@@ -9830,7 +9834,7 @@
         </p:nvSpPr>
         <p:spPr>
           <a:xfrm>
-            <a:off x="3837597" y="4732641"/>
+            <a:off x="5410199" y="4495800"/>
             <a:ext cx="1040906" cy="236841"/>
           </a:xfrm>
           <a:prstGeom prst="rect">
@@ -9885,13 +9889,16 @@
       <p:cxnSp>
         <p:nvCxnSpPr>
           <p:cNvPr id="56" name="Elbow Connector 55"/>
-          <p:cNvCxnSpPr/>
+          <p:cNvCxnSpPr>
+            <a:stCxn id="54" idx="2"/>
+            <a:endCxn id="55" idx="1"/>
+          </p:cNvCxnSpPr>
           <p:nvPr/>
         </p:nvCxnSpPr>
         <p:spPr>
           <a:xfrm rot="16200000" flipH="1">
-            <a:off x="3414979" y="4433621"/>
-            <a:ext cx="118421" cy="699979"/>
+            <a:off x="4862397" y="4066419"/>
+            <a:ext cx="42222" cy="1053382"/>
           </a:xfrm>
           <a:prstGeom prst="bentConnector2">
             <a:avLst/>
@@ -9928,8 +9935,8 @@
         </p:nvSpPr>
         <p:spPr>
           <a:xfrm flipV="1">
-            <a:off x="4038600" y="4953000"/>
-            <a:ext cx="2743200" cy="152400"/>
+            <a:off x="5943599" y="4724400"/>
+            <a:ext cx="1219200" cy="152400"/>
           </a:xfrm>
           <a:custGeom>
             <a:avLst/>
@@ -10002,6 +10009,189 @@
           </a:p>
         </p:txBody>
       </p:sp>
+      <p:sp>
+        <p:nvSpPr>
+          <p:cNvPr id="68" name="Rectangle 11"/>
+          <p:cNvSpPr/>
+          <p:nvPr/>
+        </p:nvSpPr>
+        <p:spPr>
+          <a:xfrm>
+            <a:off x="2819399" y="4038600"/>
+            <a:ext cx="685800" cy="228600"/>
+          </a:xfrm>
+          <a:prstGeom prst="rect">
+            <a:avLst/>
+          </a:prstGeom>
+          <a:ln w="19050">
+            <a:solidFill>
+              <a:schemeClr val="accent3"/>
+            </a:solidFill>
+          </a:ln>
+          <a:effectLst/>
+        </p:spPr>
+        <p:style>
+          <a:lnRef idx="1">
+            <a:schemeClr val="accent3"/>
+          </a:lnRef>
+          <a:fillRef idx="2">
+            <a:schemeClr val="accent3"/>
+          </a:fillRef>
+          <a:effectRef idx="1">
+            <a:schemeClr val="accent3"/>
+          </a:effectRef>
+          <a:fontRef idx="minor">
+            <a:schemeClr val="dk1"/>
+          </a:fontRef>
+        </p:style>
+        <p:txBody>
+          <a:bodyPr rtlCol="0" anchor="ctr"/>
+          <a:lstStyle/>
+          <a:p>
+            <a:pPr algn="ctr"/>
+            <a:r>
+              <a:rPr lang="en-US" sz="1050" b="1" dirty="0" err="1" smtClean="0">
+                <a:solidFill>
+                  <a:schemeClr val="accent3">
+                    <a:lumMod val="75000"/>
+                  </a:schemeClr>
+                </a:solidFill>
+              </a:rPr>
+              <a:t>ListPanel</a:t>
+            </a:r>
+            <a:endParaRPr lang="en-SG" sz="1050" b="1" dirty="0">
+              <a:solidFill>
+                <a:schemeClr val="accent3">
+                  <a:lumMod val="75000"/>
+                </a:schemeClr>
+              </a:solidFill>
+            </a:endParaRPr>
+          </a:p>
+        </p:txBody>
+      </p:sp>
+      <p:cxnSp>
+        <p:nvCxnSpPr>
+          <p:cNvPr id="81" name="Elbow Connector 63"/>
+          <p:cNvCxnSpPr>
+            <a:stCxn id="16" idx="3"/>
+            <a:endCxn id="55" idx="3"/>
+          </p:cNvCxnSpPr>
+          <p:nvPr/>
+        </p:nvCxnSpPr>
+        <p:spPr>
+          <a:xfrm rot="5400000">
+            <a:off x="5283627" y="3301079"/>
+            <a:ext cx="2480621" cy="145663"/>
+          </a:xfrm>
+          <a:prstGeom prst="bentConnector2">
+            <a:avLst/>
+          </a:prstGeom>
+          <a:ln w="6350">
+            <a:solidFill>
+              <a:schemeClr val="accent3"/>
+            </a:solidFill>
+            <a:headEnd type="none" w="med" len="med"/>
+            <a:tailEnd type="none" w="med" len="med"/>
+          </a:ln>
+          <a:effectLst/>
+        </p:spPr>
+        <p:style>
+          <a:lnRef idx="1">
+            <a:schemeClr val="accent2"/>
+          </a:lnRef>
+          <a:fillRef idx="2">
+            <a:schemeClr val="accent2"/>
+          </a:fillRef>
+          <a:effectRef idx="1">
+            <a:schemeClr val="accent2"/>
+          </a:effectRef>
+          <a:fontRef idx="minor">
+            <a:schemeClr val="dk1"/>
+          </a:fontRef>
+        </p:style>
+      </p:cxnSp>
+      <p:cxnSp>
+        <p:nvCxnSpPr>
+          <p:cNvPr id="85" name="Elbow Connector 84"/>
+          <p:cNvCxnSpPr>
+            <a:stCxn id="68" idx="3"/>
+            <a:endCxn id="54" idx="1"/>
+          </p:cNvCxnSpPr>
+          <p:nvPr/>
+        </p:nvCxnSpPr>
+        <p:spPr>
+          <a:xfrm>
+            <a:off x="3505199" y="4152900"/>
+            <a:ext cx="304800" cy="266700"/>
+          </a:xfrm>
+          <a:prstGeom prst="bentConnector3">
+            <a:avLst/>
+          </a:prstGeom>
+          <a:ln w="19050">
+            <a:solidFill>
+              <a:schemeClr val="accent3"/>
+            </a:solidFill>
+            <a:headEnd type="none" w="med" len="med"/>
+            <a:tailEnd type="arrow" w="med" len="med"/>
+          </a:ln>
+          <a:effectLst/>
+        </p:spPr>
+        <p:style>
+          <a:lnRef idx="1">
+            <a:schemeClr val="accent2"/>
+          </a:lnRef>
+          <a:fillRef idx="2">
+            <a:schemeClr val="accent2"/>
+          </a:fillRef>
+          <a:effectRef idx="1">
+            <a:schemeClr val="accent2"/>
+          </a:effectRef>
+          <a:fontRef idx="minor">
+            <a:schemeClr val="dk1"/>
+          </a:fontRef>
+        </p:style>
+      </p:cxnSp>
+      <p:cxnSp>
+        <p:nvCxnSpPr>
+          <p:cNvPr id="105" name="Elbow Connector 104"/>
+          <p:cNvCxnSpPr>
+            <a:stCxn id="68" idx="3"/>
+            <a:endCxn id="36" idx="1"/>
+          </p:cNvCxnSpPr>
+          <p:nvPr/>
+        </p:nvCxnSpPr>
+        <p:spPr>
+          <a:xfrm flipV="1">
+            <a:off x="3505199" y="3977181"/>
+            <a:ext cx="304800" cy="175719"/>
+          </a:xfrm>
+          <a:prstGeom prst="bentConnector3">
+            <a:avLst/>
+          </a:prstGeom>
+          <a:ln w="19050">
+            <a:solidFill>
+              <a:schemeClr val="accent3"/>
+            </a:solidFill>
+            <a:headEnd type="none" w="med" len="med"/>
+            <a:tailEnd type="arrow" w="med" len="med"/>
+          </a:ln>
+          <a:effectLst/>
+        </p:spPr>
+        <p:style>
+          <a:lnRef idx="1">
+            <a:schemeClr val="accent2"/>
+          </a:lnRef>
+          <a:fillRef idx="2">
+            <a:schemeClr val="accent2"/>
+          </a:fillRef>
+          <a:effectRef idx="1">
+            <a:schemeClr val="accent2"/>
+          </a:effectRef>
+          <a:fontRef idx="minor">
+            <a:schemeClr val="dk1"/>
+          </a:fontRef>
+        </p:style>
+      </p:cxnSp>
     </p:spTree>
     <p:extLst>
       <p:ext uri="{BB962C8B-B14F-4D97-AF65-F5344CB8AC3E}">
@@ -10161,62 +10351,6 @@
       </p:sp>
       <p:sp>
         <p:nvSpPr>
-          <p:cNvPr id="5" name="Rectangle 11"/>
-          <p:cNvSpPr/>
-          <p:nvPr/>
-        </p:nvSpPr>
-        <p:spPr>
-          <a:xfrm flipH="1">
-            <a:off x="5820680" y="2250968"/>
-            <a:ext cx="1186398" cy="346760"/>
-          </a:xfrm>
-          <a:prstGeom prst="rect">
-            <a:avLst/>
-          </a:prstGeom>
-          <a:ln w="19050">
-            <a:solidFill>
-              <a:srgbClr val="0070C0"/>
-            </a:solidFill>
-          </a:ln>
-          <a:effectLst/>
-        </p:spPr>
-        <p:style>
-          <a:lnRef idx="1">
-            <a:schemeClr val="accent1"/>
-          </a:lnRef>
-          <a:fillRef idx="2">
-            <a:schemeClr val="accent1"/>
-          </a:fillRef>
-          <a:effectRef idx="1">
-            <a:schemeClr val="accent1"/>
-          </a:effectRef>
-          <a:fontRef idx="minor">
-            <a:schemeClr val="dk1"/>
-          </a:fontRef>
-        </p:style>
-        <p:txBody>
-          <a:bodyPr rtlCol="0" anchor="ctr"/>
-          <a:lstStyle/>
-          <a:p>
-            <a:pPr algn="ctr"/>
-            <a:r>
-              <a:rPr lang="en-US" sz="1050" b="1" dirty="0" err="1" smtClean="0">
-                <a:solidFill>
-                  <a:srgbClr val="0070C0"/>
-                </a:solidFill>
-              </a:rPr>
-              <a:t>MarkCommand</a:t>
-            </a:r>
-            <a:endParaRPr lang="en-SG" sz="1050" b="1" dirty="0">
-              <a:solidFill>
-                <a:srgbClr val="0070C0"/>
-              </a:solidFill>
-            </a:endParaRPr>
-          </a:p>
-        </p:txBody>
-      </p:sp>
-      <p:sp>
-        <p:nvSpPr>
           <p:cNvPr id="6" name="Rectangle 62"/>
           <p:cNvSpPr/>
           <p:nvPr/>
@@ -10317,54 +10451,6 @@
           </a:fontRef>
         </p:style>
       </p:cxnSp>
-      <p:sp>
-        <p:nvSpPr>
-          <p:cNvPr id="8" name="Isosceles Triangle 102"/>
-          <p:cNvSpPr/>
-          <p:nvPr/>
-        </p:nvSpPr>
-        <p:spPr>
-          <a:xfrm rot="5400000" flipV="1">
-            <a:off x="5134110" y="2714491"/>
-            <a:ext cx="270504" cy="175523"/>
-          </a:xfrm>
-          <a:prstGeom prst="triangle">
-            <a:avLst/>
-          </a:prstGeom>
-          <a:ln w="19050">
-            <a:solidFill>
-              <a:srgbClr val="0070C0"/>
-            </a:solidFill>
-          </a:ln>
-          <a:effectLst/>
-        </p:spPr>
-        <p:style>
-          <a:lnRef idx="1">
-            <a:schemeClr val="accent1"/>
-          </a:lnRef>
-          <a:fillRef idx="2">
-            <a:schemeClr val="accent1"/>
-          </a:fillRef>
-          <a:effectRef idx="1">
-            <a:schemeClr val="accent1"/>
-          </a:effectRef>
-          <a:fontRef idx="minor">
-            <a:schemeClr val="dk1"/>
-          </a:fontRef>
-        </p:style>
-        <p:txBody>
-          <a:bodyPr rtlCol="0" anchor="ctr"/>
-          <a:lstStyle/>
-          <a:p>
-            <a:pPr algn="ctr"/>
-            <a:endParaRPr lang="en-SG" sz="1050" b="1">
-              <a:solidFill>
-                <a:srgbClr val="92D050"/>
-              </a:solidFill>
-            </a:endParaRPr>
-          </a:p>
-        </p:txBody>
-      </p:sp>
       <p:cxnSp>
         <p:nvCxnSpPr>
           <p:cNvPr id="9" name="Elbow Connector 122"/>
@@ -10470,14 +10556,14 @@
       </p:sp>
       <p:sp>
         <p:nvSpPr>
-          <p:cNvPr id="11" name="Rectangle 11"/>
+          <p:cNvPr id="14" name="Rectangle 62"/>
           <p:cNvSpPr/>
           <p:nvPr/>
         </p:nvSpPr>
         <p:spPr>
-          <a:xfrm flipH="1">
-            <a:off x="5820680" y="2657368"/>
-            <a:ext cx="1186398" cy="346760"/>
+          <a:xfrm>
+            <a:off x="4379574" y="2606161"/>
+            <a:ext cx="772043" cy="346760"/>
           </a:xfrm>
           <a:prstGeom prst="rect">
             <a:avLst/>
@@ -10509,12 +10595,27 @@
           <a:p>
             <a:pPr algn="ctr"/>
             <a:r>
-              <a:rPr lang="en-US" sz="1050" b="1" dirty="0" err="1" smtClean="0">
+              <a:rPr lang="en-US" sz="1050" b="1" dirty="0" smtClean="0">
                 <a:solidFill>
                   <a:srgbClr val="0070C0"/>
                 </a:solidFill>
               </a:rPr>
-              <a:t>SaveCommand</a:t>
+              <a:t>{abstract}</a:t>
+            </a:r>
+            <a:br>
+              <a:rPr lang="en-US" sz="1050" b="1" dirty="0" smtClean="0">
+                <a:solidFill>
+                  <a:srgbClr val="0070C0"/>
+                </a:solidFill>
+              </a:rPr>
+            </a:br>
+            <a:r>
+              <a:rPr lang="en-US" sz="1050" b="1" dirty="0" smtClean="0">
+                <a:solidFill>
+                  <a:srgbClr val="0070C0"/>
+                </a:solidFill>
+              </a:rPr>
+              <a:t>Command</a:t>
             </a:r>
             <a:endParaRPr lang="en-SG" sz="1050" b="1" dirty="0">
               <a:solidFill>
@@ -10524,262 +10625,6 @@
           </a:p>
         </p:txBody>
       </p:sp>
-      <p:sp>
-        <p:nvSpPr>
-          <p:cNvPr id="12" name="Rectangle 11"/>
-          <p:cNvSpPr/>
-          <p:nvPr/>
-        </p:nvSpPr>
-        <p:spPr>
-          <a:xfrm flipH="1">
-            <a:off x="5820678" y="3463240"/>
-            <a:ext cx="1186398" cy="346760"/>
-          </a:xfrm>
-          <a:prstGeom prst="rect">
-            <a:avLst/>
-          </a:prstGeom>
-          <a:ln w="19050">
-            <a:solidFill>
-              <a:srgbClr val="0070C0"/>
-            </a:solidFill>
-          </a:ln>
-          <a:effectLst/>
-        </p:spPr>
-        <p:style>
-          <a:lnRef idx="1">
-            <a:schemeClr val="accent1"/>
-          </a:lnRef>
-          <a:fillRef idx="2">
-            <a:schemeClr val="accent1"/>
-          </a:fillRef>
-          <a:effectRef idx="1">
-            <a:schemeClr val="accent1"/>
-          </a:effectRef>
-          <a:fontRef idx="minor">
-            <a:schemeClr val="dk1"/>
-          </a:fontRef>
-        </p:style>
-        <p:txBody>
-          <a:bodyPr rtlCol="0" anchor="ctr"/>
-          <a:lstStyle/>
-          <a:p>
-            <a:pPr algn="ctr"/>
-            <a:r>
-              <a:rPr lang="en-US" sz="1050" b="1" dirty="0" err="1" smtClean="0">
-                <a:solidFill>
-                  <a:srgbClr val="0070C0"/>
-                </a:solidFill>
-              </a:rPr>
-              <a:t>SearchCommand</a:t>
-            </a:r>
-            <a:endParaRPr lang="en-SG" sz="1050" b="1" dirty="0">
-              <a:solidFill>
-                <a:srgbClr val="0070C0"/>
-              </a:solidFill>
-            </a:endParaRPr>
-          </a:p>
-        </p:txBody>
-      </p:sp>
-      <p:sp>
-        <p:nvSpPr>
-          <p:cNvPr id="14" name="Rectangle 62"/>
-          <p:cNvSpPr/>
-          <p:nvPr/>
-        </p:nvSpPr>
-        <p:spPr>
-          <a:xfrm>
-            <a:off x="4379574" y="2606161"/>
-            <a:ext cx="772043" cy="346760"/>
-          </a:xfrm>
-          <a:prstGeom prst="rect">
-            <a:avLst/>
-          </a:prstGeom>
-          <a:ln w="19050">
-            <a:solidFill>
-              <a:srgbClr val="0070C0"/>
-            </a:solidFill>
-          </a:ln>
-          <a:effectLst/>
-        </p:spPr>
-        <p:style>
-          <a:lnRef idx="1">
-            <a:schemeClr val="accent1"/>
-          </a:lnRef>
-          <a:fillRef idx="2">
-            <a:schemeClr val="accent1"/>
-          </a:fillRef>
-          <a:effectRef idx="1">
-            <a:schemeClr val="accent1"/>
-          </a:effectRef>
-          <a:fontRef idx="minor">
-            <a:schemeClr val="dk1"/>
-          </a:fontRef>
-        </p:style>
-        <p:txBody>
-          <a:bodyPr rtlCol="0" anchor="ctr"/>
-          <a:lstStyle/>
-          <a:p>
-            <a:pPr algn="ctr"/>
-            <a:r>
-              <a:rPr lang="en-US" sz="1050" b="1" dirty="0" smtClean="0">
-                <a:solidFill>
-                  <a:srgbClr val="0070C0"/>
-                </a:solidFill>
-              </a:rPr>
-              <a:t>{abstract}</a:t>
-            </a:r>
-            <a:br>
-              <a:rPr lang="en-US" sz="1050" b="1" dirty="0" smtClean="0">
-                <a:solidFill>
-                  <a:srgbClr val="0070C0"/>
-                </a:solidFill>
-              </a:rPr>
-            </a:br>
-            <a:r>
-              <a:rPr lang="en-US" sz="1050" b="1" dirty="0" smtClean="0">
-                <a:solidFill>
-                  <a:srgbClr val="0070C0"/>
-                </a:solidFill>
-              </a:rPr>
-              <a:t>Command</a:t>
-            </a:r>
-            <a:endParaRPr lang="en-SG" sz="1050" b="1" dirty="0">
-              <a:solidFill>
-                <a:srgbClr val="0070C0"/>
-              </a:solidFill>
-            </a:endParaRPr>
-          </a:p>
-        </p:txBody>
-      </p:sp>
-      <p:cxnSp>
-        <p:nvCxnSpPr>
-          <p:cNvPr id="15" name="Elbow Connector 63"/>
-          <p:cNvCxnSpPr>
-            <a:stCxn id="5" idx="3"/>
-            <a:endCxn id="8" idx="3"/>
-          </p:cNvCxnSpPr>
-          <p:nvPr/>
-        </p:nvCxnSpPr>
-        <p:spPr>
-          <a:xfrm rot="10800000" flipV="1">
-            <a:off x="5357124" y="2424347"/>
-            <a:ext cx="463556" cy="377905"/>
-          </a:xfrm>
-          <a:prstGeom prst="bentConnector3">
-            <a:avLst>
-              <a:gd name="adj1" fmla="val 50000"/>
-            </a:avLst>
-          </a:prstGeom>
-          <a:ln w="19050">
-            <a:solidFill>
-              <a:srgbClr val="0070C0"/>
-            </a:solidFill>
-            <a:headEnd type="none" w="med" len="med"/>
-            <a:tailEnd type="none" w="med" len="med"/>
-          </a:ln>
-          <a:effectLst/>
-        </p:spPr>
-        <p:style>
-          <a:lnRef idx="1">
-            <a:schemeClr val="accent2"/>
-          </a:lnRef>
-          <a:fillRef idx="2">
-            <a:schemeClr val="accent2"/>
-          </a:fillRef>
-          <a:effectRef idx="1">
-            <a:schemeClr val="accent2"/>
-          </a:effectRef>
-          <a:fontRef idx="minor">
-            <a:schemeClr val="dk1"/>
-          </a:fontRef>
-        </p:style>
-      </p:cxnSp>
-      <p:cxnSp>
-        <p:nvCxnSpPr>
-          <p:cNvPr id="16" name="Elbow Connector 63"/>
-          <p:cNvCxnSpPr>
-            <a:stCxn id="8" idx="3"/>
-            <a:endCxn id="12" idx="3"/>
-          </p:cNvCxnSpPr>
-          <p:nvPr/>
-        </p:nvCxnSpPr>
-        <p:spPr>
-          <a:xfrm>
-            <a:off x="5357124" y="2802253"/>
-            <a:ext cx="463554" cy="834367"/>
-          </a:xfrm>
-          <a:prstGeom prst="bentConnector3">
-            <a:avLst>
-              <a:gd name="adj1" fmla="val 50000"/>
-            </a:avLst>
-          </a:prstGeom>
-          <a:ln w="19050">
-            <a:solidFill>
-              <a:srgbClr val="0070C0"/>
-            </a:solidFill>
-            <a:headEnd type="none" w="med" len="med"/>
-            <a:tailEnd type="none" w="med" len="med"/>
-          </a:ln>
-          <a:effectLst/>
-        </p:spPr>
-        <p:style>
-          <a:lnRef idx="1">
-            <a:schemeClr val="accent2"/>
-          </a:lnRef>
-          <a:fillRef idx="2">
-            <a:schemeClr val="accent2"/>
-          </a:fillRef>
-          <a:effectRef idx="1">
-            <a:schemeClr val="accent2"/>
-          </a:effectRef>
-          <a:fontRef idx="minor">
-            <a:schemeClr val="dk1"/>
-          </a:fontRef>
-        </p:style>
-      </p:cxnSp>
-      <p:cxnSp>
-        <p:nvCxnSpPr>
-          <p:cNvPr id="17" name="Elbow Connector 63"/>
-          <p:cNvCxnSpPr>
-            <a:stCxn id="8" idx="3"/>
-            <a:endCxn id="11" idx="3"/>
-          </p:cNvCxnSpPr>
-          <p:nvPr/>
-        </p:nvCxnSpPr>
-        <p:spPr>
-          <a:xfrm>
-            <a:off x="5357124" y="2802253"/>
-            <a:ext cx="463556" cy="28495"/>
-          </a:xfrm>
-          <a:prstGeom prst="bentConnector3">
-            <a:avLst>
-              <a:gd name="adj1" fmla="val 50000"/>
-            </a:avLst>
-          </a:prstGeom>
-          <a:ln w="19050">
-            <a:solidFill>
-              <a:srgbClr val="0070C0"/>
-            </a:solidFill>
-            <a:headEnd type="none" w="med" len="med"/>
-            <a:tailEnd type="none" w="med" len="med"/>
-          </a:ln>
-          <a:effectLst/>
-        </p:spPr>
-        <p:style>
-          <a:lnRef idx="1">
-            <a:schemeClr val="accent2"/>
-          </a:lnRef>
-          <a:fillRef idx="2">
-            <a:schemeClr val="accent2"/>
-          </a:fillRef>
-          <a:effectRef idx="1">
-            <a:schemeClr val="accent2"/>
-          </a:effectRef>
-          <a:fontRef idx="minor">
-            <a:schemeClr val="dk1"/>
-          </a:fontRef>
-        </p:style>
-      </p:cxnSp>
       <p:sp>
         <p:nvSpPr>
           <p:cNvPr id="18" name="Rectangle 62"/>
@@ -11646,13 +11491,13 @@
       </p:grpSp>
       <p:sp>
         <p:nvSpPr>
-          <p:cNvPr id="44" name="Rectangle 11"/>
+          <p:cNvPr id="144" name="Rectangle 11"/>
           <p:cNvSpPr/>
           <p:nvPr/>
         </p:nvSpPr>
         <p:spPr>
           <a:xfrm flipH="1">
-            <a:off x="5825478" y="3060538"/>
+            <a:off x="1970602" y="4419600"/>
             <a:ext cx="1186398" cy="346760"/>
           </a:xfrm>
           <a:prstGeom prst="rect">
@@ -11690,7 +11535,7 @@
                   <a:srgbClr val="0070C0"/>
                 </a:solidFill>
               </a:rPr>
-              <a:t>DeleteCommand</a:t>
+              <a:t>EditTaskParser</a:t>
             </a:r>
             <a:endParaRPr lang="en-SG" sz="1050" b="1" dirty="0">
               <a:solidFill>
@@ -11700,67 +11545,24 @@
           </a:p>
         </p:txBody>
       </p:sp>
-      <p:cxnSp>
-        <p:nvCxnSpPr>
-          <p:cNvPr id="45" name="Elbow Connector 63"/>
-          <p:cNvCxnSpPr>
-            <a:stCxn id="8" idx="3"/>
-            <a:endCxn id="44" idx="3"/>
-          </p:cNvCxnSpPr>
-          <p:nvPr/>
-        </p:nvCxnSpPr>
-        <p:spPr>
-          <a:xfrm>
-            <a:off x="5357124" y="2802253"/>
-            <a:ext cx="468354" cy="431665"/>
-          </a:xfrm>
-          <a:prstGeom prst="bentConnector3">
-            <a:avLst>
-              <a:gd name="adj1" fmla="val 50000"/>
-            </a:avLst>
+      <p:sp>
+        <p:nvSpPr>
+          <p:cNvPr id="145" name="Rectangle 11"/>
+          <p:cNvSpPr/>
+          <p:nvPr/>
+        </p:nvSpPr>
+        <p:spPr>
+          <a:xfrm flipH="1">
+            <a:off x="1967281" y="4003568"/>
+            <a:ext cx="1186398" cy="346760"/>
+          </a:xfrm>
+          <a:prstGeom prst="rect">
+            <a:avLst/>
           </a:prstGeom>
           <a:ln w="19050">
             <a:solidFill>
               <a:srgbClr val="0070C0"/>
             </a:solidFill>
-            <a:headEnd type="none" w="med" len="med"/>
-            <a:tailEnd type="none" w="med" len="med"/>
-          </a:ln>
-          <a:effectLst/>
-        </p:spPr>
-        <p:style>
-          <a:lnRef idx="1">
-            <a:schemeClr val="accent2"/>
-          </a:lnRef>
-          <a:fillRef idx="2">
-            <a:schemeClr val="accent2"/>
-          </a:fillRef>
-          <a:effectRef idx="1">
-            <a:schemeClr val="accent2"/>
-          </a:effectRef>
-          <a:fontRef idx="minor">
-            <a:schemeClr val="dk1"/>
-          </a:fontRef>
-        </p:style>
-      </p:cxnSp>
-      <p:sp>
-        <p:nvSpPr>
-          <p:cNvPr id="46" name="Rectangle 11"/>
-          <p:cNvSpPr/>
-          <p:nvPr/>
-        </p:nvSpPr>
-        <p:spPr>
-          <a:xfrm flipH="1">
-            <a:off x="5824001" y="1828800"/>
-            <a:ext cx="1186398" cy="346760"/>
-          </a:xfrm>
-          <a:prstGeom prst="rect">
-            <a:avLst/>
-          </a:prstGeom>
-          <a:ln w="19050">
-            <a:solidFill>
-              <a:srgbClr val="0070C0"/>
-            </a:solidFill>
           </a:ln>
           <a:effectLst/>
         </p:spPr>
@@ -11789,7 +11591,7 @@
                   <a:srgbClr val="0070C0"/>
                 </a:solidFill>
               </a:rPr>
-              <a:t>EditCommand</a:t>
+              <a:t>AddEventParser</a:t>
             </a:r>
             <a:endParaRPr lang="en-SG" sz="1050" b="1" dirty="0">
               <a:solidFill>
@@ -11801,13 +11603,13 @@
       </p:sp>
       <p:sp>
         <p:nvSpPr>
-          <p:cNvPr id="47" name="Rectangle 11"/>
+          <p:cNvPr id="146" name="Rectangle 11"/>
           <p:cNvSpPr/>
           <p:nvPr/>
         </p:nvSpPr>
         <p:spPr>
           <a:xfrm flipH="1">
-            <a:off x="5820680" y="1412768"/>
+            <a:off x="1970602" y="3581400"/>
             <a:ext cx="1186398" cy="346760"/>
           </a:xfrm>
           <a:prstGeom prst="rect">
@@ -11845,7 +11647,7 @@
                   <a:srgbClr val="0070C0"/>
                 </a:solidFill>
               </a:rPr>
-              <a:t>HelpCommand</a:t>
+              <a:t>AddTaskParser</a:t>
             </a:r>
             <a:endParaRPr lang="en-SG" sz="1050" b="1" dirty="0">
               <a:solidFill>
@@ -11855,2026 +11657,6 @@
           </a:p>
         </p:txBody>
       </p:sp>
-      <p:sp>
-        <p:nvSpPr>
-          <p:cNvPr id="48" name="Rectangle 11"/>
-          <p:cNvSpPr/>
-          <p:nvPr/>
-        </p:nvSpPr>
-        <p:spPr>
-          <a:xfrm flipH="1">
-            <a:off x="5824001" y="990600"/>
-            <a:ext cx="1186398" cy="346760"/>
-          </a:xfrm>
-          <a:prstGeom prst="rect">
-            <a:avLst/>
-          </a:prstGeom>
-          <a:ln w="19050">
-            <a:solidFill>
-              <a:srgbClr val="0070C0"/>
-            </a:solidFill>
-          </a:ln>
-          <a:effectLst/>
-        </p:spPr>
-        <p:style>
-          <a:lnRef idx="1">
-            <a:schemeClr val="accent1"/>
-          </a:lnRef>
-          <a:fillRef idx="2">
-            <a:schemeClr val="accent1"/>
-          </a:fillRef>
-          <a:effectRef idx="1">
-            <a:schemeClr val="accent1"/>
-          </a:effectRef>
-          <a:fontRef idx="minor">
-            <a:schemeClr val="dk1"/>
-          </a:fontRef>
-        </p:style>
-        <p:txBody>
-          <a:bodyPr rtlCol="0" anchor="ctr"/>
-          <a:lstStyle/>
-          <a:p>
-            <a:pPr algn="ctr"/>
-            <a:r>
-              <a:rPr lang="en-US" sz="1050" b="1" dirty="0" err="1">
-                <a:solidFill>
-                  <a:srgbClr val="0070C0"/>
-                </a:solidFill>
-              </a:rPr>
-              <a:t>AddCommand</a:t>
-            </a:r>
-            <a:endParaRPr lang="en-SG" sz="1050" b="1" dirty="0">
-              <a:solidFill>
-                <a:srgbClr val="0070C0"/>
-              </a:solidFill>
-            </a:endParaRPr>
-          </a:p>
-        </p:txBody>
-      </p:sp>
-      <p:sp>
-        <p:nvSpPr>
-          <p:cNvPr id="49" name="Rectangle 48"/>
-          <p:cNvSpPr/>
-          <p:nvPr/>
-        </p:nvSpPr>
-        <p:spPr>
-          <a:xfrm flipH="1">
-            <a:off x="5819201" y="4288902"/>
-            <a:ext cx="1186398" cy="346760"/>
-          </a:xfrm>
-          <a:prstGeom prst="rect">
-            <a:avLst/>
-          </a:prstGeom>
-          <a:ln w="19050">
-            <a:solidFill>
-              <a:srgbClr val="0070C0"/>
-            </a:solidFill>
-          </a:ln>
-          <a:effectLst/>
-        </p:spPr>
-        <p:style>
-          <a:lnRef idx="1">
-            <a:schemeClr val="accent1"/>
-          </a:lnRef>
-          <a:fillRef idx="2">
-            <a:schemeClr val="accent1"/>
-          </a:fillRef>
-          <a:effectRef idx="1">
-            <a:schemeClr val="accent1"/>
-          </a:effectRef>
-          <a:fontRef idx="minor">
-            <a:schemeClr val="dk1"/>
-          </a:fontRef>
-        </p:style>
-        <p:txBody>
-          <a:bodyPr rtlCol="0" anchor="ctr"/>
-          <a:lstStyle/>
-          <a:p>
-            <a:pPr algn="ctr"/>
-            <a:r>
-              <a:rPr lang="en-US" sz="1050" b="1" dirty="0" err="1" smtClean="0">
-                <a:solidFill>
-                  <a:srgbClr val="0070C0"/>
-                </a:solidFill>
-              </a:rPr>
-              <a:t>ListCommand</a:t>
-            </a:r>
-            <a:endParaRPr lang="en-SG" sz="1050" b="1" dirty="0">
-              <a:solidFill>
-                <a:srgbClr val="0070C0"/>
-              </a:solidFill>
-            </a:endParaRPr>
-          </a:p>
-        </p:txBody>
-      </p:sp>
-      <p:sp>
-        <p:nvSpPr>
-          <p:cNvPr id="50" name="Rectangle 11"/>
-          <p:cNvSpPr/>
-          <p:nvPr/>
-        </p:nvSpPr>
-        <p:spPr>
-          <a:xfrm flipH="1">
-            <a:off x="5824001" y="3886200"/>
-            <a:ext cx="1186398" cy="346760"/>
-          </a:xfrm>
-          <a:prstGeom prst="rect">
-            <a:avLst/>
-          </a:prstGeom>
-          <a:ln w="19050">
-            <a:solidFill>
-              <a:srgbClr val="0070C0"/>
-            </a:solidFill>
-          </a:ln>
-          <a:effectLst/>
-        </p:spPr>
-        <p:style>
-          <a:lnRef idx="1">
-            <a:schemeClr val="accent1"/>
-          </a:lnRef>
-          <a:fillRef idx="2">
-            <a:schemeClr val="accent1"/>
-          </a:fillRef>
-          <a:effectRef idx="1">
-            <a:schemeClr val="accent1"/>
-          </a:effectRef>
-          <a:fontRef idx="minor">
-            <a:schemeClr val="dk1"/>
-          </a:fontRef>
-        </p:style>
-        <p:txBody>
-          <a:bodyPr rtlCol="0" anchor="ctr"/>
-          <a:lstStyle/>
-          <a:p>
-            <a:pPr algn="ctr"/>
-            <a:r>
-              <a:rPr lang="en-US" sz="1050" b="1" dirty="0" err="1" smtClean="0">
-                <a:solidFill>
-                  <a:srgbClr val="0070C0"/>
-                </a:solidFill>
-              </a:rPr>
-              <a:t>UndoCommand</a:t>
-            </a:r>
-            <a:endParaRPr lang="en-SG" sz="1050" b="1" dirty="0">
-              <a:solidFill>
-                <a:srgbClr val="0070C0"/>
-              </a:solidFill>
-            </a:endParaRPr>
-          </a:p>
-        </p:txBody>
-      </p:sp>
-      <p:cxnSp>
-        <p:nvCxnSpPr>
-          <p:cNvPr id="31" name="Elbow Connector 30"/>
-          <p:cNvCxnSpPr>
-            <a:stCxn id="48" idx="3"/>
-            <a:endCxn id="8" idx="3"/>
-          </p:cNvCxnSpPr>
-          <p:nvPr/>
-        </p:nvCxnSpPr>
-        <p:spPr>
-          <a:xfrm rot="10800000" flipV="1">
-            <a:off x="5357125" y="1163979"/>
-            <a:ext cx="466877" cy="1638273"/>
-          </a:xfrm>
-          <a:prstGeom prst="bentConnector3">
-            <a:avLst>
-              <a:gd name="adj1" fmla="val 50000"/>
-            </a:avLst>
-          </a:prstGeom>
-          <a:ln w="19050">
-            <a:solidFill>
-              <a:srgbClr val="0070C0"/>
-            </a:solidFill>
-            <a:headEnd type="none" w="med" len="med"/>
-            <a:tailEnd type="none" w="med" len="med"/>
-          </a:ln>
-          <a:effectLst/>
-        </p:spPr>
-        <p:style>
-          <a:lnRef idx="1">
-            <a:schemeClr val="accent2"/>
-          </a:lnRef>
-          <a:fillRef idx="2">
-            <a:schemeClr val="accent2"/>
-          </a:fillRef>
-          <a:effectRef idx="1">
-            <a:schemeClr val="accent2"/>
-          </a:effectRef>
-          <a:fontRef idx="minor">
-            <a:schemeClr val="dk1"/>
-          </a:fontRef>
-        </p:style>
-      </p:cxnSp>
-      <p:sp>
-        <p:nvSpPr>
-          <p:cNvPr id="64" name="Rectangle 63"/>
-          <p:cNvSpPr/>
-          <p:nvPr/>
-        </p:nvSpPr>
-        <p:spPr>
-          <a:xfrm flipH="1">
-            <a:off x="5824002" y="4682440"/>
-            <a:ext cx="1186398" cy="346760"/>
-          </a:xfrm>
-          <a:prstGeom prst="rect">
-            <a:avLst/>
-          </a:prstGeom>
-          <a:ln w="19050">
-            <a:solidFill>
-              <a:srgbClr val="0070C0"/>
-            </a:solidFill>
-          </a:ln>
-          <a:effectLst/>
-        </p:spPr>
-        <p:style>
-          <a:lnRef idx="1">
-            <a:schemeClr val="accent1"/>
-          </a:lnRef>
-          <a:fillRef idx="2">
-            <a:schemeClr val="accent1"/>
-          </a:fillRef>
-          <a:effectRef idx="1">
-            <a:schemeClr val="accent1"/>
-          </a:effectRef>
-          <a:fontRef idx="minor">
-            <a:schemeClr val="dk1"/>
-          </a:fontRef>
-        </p:style>
-        <p:txBody>
-          <a:bodyPr rtlCol="0" anchor="ctr"/>
-          <a:lstStyle/>
-          <a:p>
-            <a:pPr algn="ctr"/>
-            <a:r>
-              <a:rPr lang="en-US" sz="1050" b="1" dirty="0" err="1" smtClean="0">
-                <a:solidFill>
-                  <a:srgbClr val="0070C0"/>
-                </a:solidFill>
-              </a:rPr>
-              <a:t>ExitCommand</a:t>
-            </a:r>
-            <a:endParaRPr lang="en-SG" sz="1050" b="1" dirty="0">
-              <a:solidFill>
-                <a:srgbClr val="0070C0"/>
-              </a:solidFill>
-            </a:endParaRPr>
-          </a:p>
-        </p:txBody>
-      </p:sp>
-      <p:cxnSp>
-        <p:nvCxnSpPr>
-          <p:cNvPr id="66" name="Elbow Connector 65"/>
-          <p:cNvCxnSpPr>
-            <a:stCxn id="8" idx="3"/>
-            <a:endCxn id="64" idx="3"/>
-          </p:cNvCxnSpPr>
-          <p:nvPr/>
-        </p:nvCxnSpPr>
-        <p:spPr>
-          <a:xfrm>
-            <a:off x="5357124" y="2802253"/>
-            <a:ext cx="466878" cy="2053567"/>
-          </a:xfrm>
-          <a:prstGeom prst="bentConnector3">
-            <a:avLst>
-              <a:gd name="adj1" fmla="val 50000"/>
-            </a:avLst>
-          </a:prstGeom>
-          <a:ln w="19050">
-            <a:solidFill>
-              <a:srgbClr val="0070C0"/>
-            </a:solidFill>
-            <a:headEnd type="none" w="med" len="med"/>
-            <a:tailEnd type="none" w="med" len="med"/>
-          </a:ln>
-          <a:effectLst/>
-        </p:spPr>
-        <p:style>
-          <a:lnRef idx="1">
-            <a:schemeClr val="accent2"/>
-          </a:lnRef>
-          <a:fillRef idx="2">
-            <a:schemeClr val="accent2"/>
-          </a:fillRef>
-          <a:effectRef idx="1">
-            <a:schemeClr val="accent2"/>
-          </a:effectRef>
-          <a:fontRef idx="minor">
-            <a:schemeClr val="dk1"/>
-          </a:fontRef>
-        </p:style>
-      </p:cxnSp>
-      <p:cxnSp>
-        <p:nvCxnSpPr>
-          <p:cNvPr id="69" name="Elbow Connector 68"/>
-          <p:cNvCxnSpPr>
-            <a:stCxn id="8" idx="3"/>
-            <a:endCxn id="47" idx="3"/>
-          </p:cNvCxnSpPr>
-          <p:nvPr/>
-        </p:nvCxnSpPr>
-        <p:spPr>
-          <a:xfrm flipV="1">
-            <a:off x="5357124" y="1586148"/>
-            <a:ext cx="463556" cy="1216105"/>
-          </a:xfrm>
-          <a:prstGeom prst="bentConnector3">
-            <a:avLst/>
-          </a:prstGeom>
-          <a:ln w="19050">
-            <a:solidFill>
-              <a:srgbClr val="0070C0"/>
-            </a:solidFill>
-            <a:headEnd type="none" w="med" len="med"/>
-            <a:tailEnd type="none" w="med" len="med"/>
-          </a:ln>
-          <a:effectLst/>
-        </p:spPr>
-        <p:style>
-          <a:lnRef idx="1">
-            <a:schemeClr val="accent2"/>
-          </a:lnRef>
-          <a:fillRef idx="2">
-            <a:schemeClr val="accent2"/>
-          </a:fillRef>
-          <a:effectRef idx="1">
-            <a:schemeClr val="accent2"/>
-          </a:effectRef>
-          <a:fontRef idx="minor">
-            <a:schemeClr val="dk1"/>
-          </a:fontRef>
-        </p:style>
-      </p:cxnSp>
-      <p:cxnSp>
-        <p:nvCxnSpPr>
-          <p:cNvPr id="71" name="Elbow Connector 70"/>
-          <p:cNvCxnSpPr>
-            <a:stCxn id="8" idx="3"/>
-            <a:endCxn id="46" idx="3"/>
-          </p:cNvCxnSpPr>
-          <p:nvPr/>
-        </p:nvCxnSpPr>
-        <p:spPr>
-          <a:xfrm flipV="1">
-            <a:off x="5357124" y="2002180"/>
-            <a:ext cx="466877" cy="800073"/>
-          </a:xfrm>
-          <a:prstGeom prst="bentConnector3">
-            <a:avLst>
-              <a:gd name="adj1" fmla="val 50000"/>
-            </a:avLst>
-          </a:prstGeom>
-          <a:ln w="19050">
-            <a:solidFill>
-              <a:srgbClr val="0070C0"/>
-            </a:solidFill>
-            <a:headEnd type="none" w="med" len="med"/>
-            <a:tailEnd type="none" w="med" len="med"/>
-          </a:ln>
-          <a:effectLst/>
-        </p:spPr>
-        <p:style>
-          <a:lnRef idx="1">
-            <a:schemeClr val="accent2"/>
-          </a:lnRef>
-          <a:fillRef idx="2">
-            <a:schemeClr val="accent2"/>
-          </a:fillRef>
-          <a:effectRef idx="1">
-            <a:schemeClr val="accent2"/>
-          </a:effectRef>
-          <a:fontRef idx="minor">
-            <a:schemeClr val="dk1"/>
-          </a:fontRef>
-        </p:style>
-      </p:cxnSp>
-      <p:cxnSp>
-        <p:nvCxnSpPr>
-          <p:cNvPr id="74" name="Elbow Connector 73"/>
-          <p:cNvCxnSpPr>
-            <a:stCxn id="8" idx="3"/>
-            <a:endCxn id="49" idx="3"/>
-          </p:cNvCxnSpPr>
-          <p:nvPr/>
-        </p:nvCxnSpPr>
-        <p:spPr>
-          <a:xfrm>
-            <a:off x="5357124" y="2802253"/>
-            <a:ext cx="462077" cy="1660029"/>
-          </a:xfrm>
-          <a:prstGeom prst="bentConnector3">
-            <a:avLst/>
-          </a:prstGeom>
-          <a:ln w="19050">
-            <a:solidFill>
-              <a:srgbClr val="0070C0"/>
-            </a:solidFill>
-            <a:headEnd type="none" w="med" len="med"/>
-            <a:tailEnd type="none" w="med" len="med"/>
-          </a:ln>
-          <a:effectLst/>
-        </p:spPr>
-        <p:style>
-          <a:lnRef idx="1">
-            <a:schemeClr val="accent2"/>
-          </a:lnRef>
-          <a:fillRef idx="2">
-            <a:schemeClr val="accent2"/>
-          </a:fillRef>
-          <a:effectRef idx="1">
-            <a:schemeClr val="accent2"/>
-          </a:effectRef>
-          <a:fontRef idx="minor">
-            <a:schemeClr val="dk1"/>
-          </a:fontRef>
-        </p:style>
-      </p:cxnSp>
-      <p:cxnSp>
-        <p:nvCxnSpPr>
-          <p:cNvPr id="76" name="Elbow Connector 75"/>
-          <p:cNvCxnSpPr>
-            <a:stCxn id="50" idx="3"/>
-            <a:endCxn id="8" idx="3"/>
-          </p:cNvCxnSpPr>
-          <p:nvPr/>
-        </p:nvCxnSpPr>
-        <p:spPr>
-          <a:xfrm rot="10800000">
-            <a:off x="5357125" y="2802254"/>
-            <a:ext cx="466877" cy="1257327"/>
-          </a:xfrm>
-          <a:prstGeom prst="bentConnector3">
-            <a:avLst>
-              <a:gd name="adj1" fmla="val 50000"/>
-            </a:avLst>
-          </a:prstGeom>
-          <a:ln w="19050">
-            <a:solidFill>
-              <a:srgbClr val="0070C0"/>
-            </a:solidFill>
-            <a:headEnd type="none" w="med" len="med"/>
-            <a:tailEnd type="none" w="med" len="med"/>
-          </a:ln>
-          <a:effectLst/>
-        </p:spPr>
-        <p:style>
-          <a:lnRef idx="1">
-            <a:schemeClr val="accent2"/>
-          </a:lnRef>
-          <a:fillRef idx="2">
-            <a:schemeClr val="accent2"/>
-          </a:fillRef>
-          <a:effectRef idx="1">
-            <a:schemeClr val="accent2"/>
-          </a:effectRef>
-          <a:fontRef idx="minor">
-            <a:schemeClr val="dk1"/>
-          </a:fontRef>
-        </p:style>
-      </p:cxnSp>
-      <p:grpSp>
-        <p:nvGrpSpPr>
-          <p:cNvPr id="88" name="Group 87"/>
-          <p:cNvGrpSpPr/>
-          <p:nvPr/>
-        </p:nvGrpSpPr>
-        <p:grpSpPr>
-          <a:xfrm>
-            <a:off x="7010399" y="762000"/>
-            <a:ext cx="1414999" cy="803960"/>
-            <a:chOff x="7010399" y="762000"/>
-            <a:chExt cx="1414999" cy="803960"/>
-          </a:xfrm>
-          <a:solidFill>
-            <a:schemeClr val="tx2">
-              <a:lumMod val="20000"/>
-              <a:lumOff val="80000"/>
-            </a:schemeClr>
-          </a:solidFill>
-        </p:grpSpPr>
-        <p:sp>
-          <p:nvSpPr>
-            <p:cNvPr id="78" name="Rectangle 11"/>
-            <p:cNvSpPr/>
-            <p:nvPr/>
-          </p:nvSpPr>
-          <p:spPr>
-            <a:xfrm flipH="1">
-              <a:off x="7239000" y="762000"/>
-              <a:ext cx="1186398" cy="346760"/>
-            </a:xfrm>
-            <a:prstGeom prst="rect">
-              <a:avLst/>
-            </a:prstGeom>
-            <a:grpFill/>
-            <a:ln w="19050">
-              <a:solidFill>
-                <a:srgbClr val="0070C0"/>
-              </a:solidFill>
-              <a:headEnd type="none" w="med" len="med"/>
-              <a:tailEnd type="none" w="med" len="med"/>
-            </a:ln>
-            <a:effectLst/>
-          </p:spPr>
-          <p:style>
-            <a:lnRef idx="1">
-              <a:schemeClr val="accent2"/>
-            </a:lnRef>
-            <a:fillRef idx="2">
-              <a:schemeClr val="accent2"/>
-            </a:fillRef>
-            <a:effectRef idx="1">
-              <a:schemeClr val="accent2"/>
-            </a:effectRef>
-            <a:fontRef idx="minor">
-              <a:schemeClr val="dk1"/>
-            </a:fontRef>
-          </p:style>
-          <p:txBody>
-            <a:bodyPr rtlCol="0" anchor="ctr"/>
-            <a:lstStyle/>
-            <a:p>
-              <a:pPr algn="ctr"/>
-              <a:r>
-                <a:rPr lang="en-US" sz="950" b="1" dirty="0" err="1" smtClean="0">
-                  <a:solidFill>
-                    <a:srgbClr val="0070C0"/>
-                  </a:solidFill>
-                </a:rPr>
-                <a:t>AddTaskCommand</a:t>
-              </a:r>
-              <a:endParaRPr lang="en-SG" sz="950" b="1" dirty="0">
-                <a:solidFill>
-                  <a:srgbClr val="0070C0"/>
-                </a:solidFill>
-              </a:endParaRPr>
-            </a:p>
-          </p:txBody>
-        </p:sp>
-        <p:sp>
-          <p:nvSpPr>
-            <p:cNvPr id="79" name="Rectangle 11"/>
-            <p:cNvSpPr/>
-            <p:nvPr/>
-          </p:nvSpPr>
-          <p:spPr>
-            <a:xfrm flipH="1">
-              <a:off x="7239000" y="1219200"/>
-              <a:ext cx="1186398" cy="346760"/>
-            </a:xfrm>
-            <a:prstGeom prst="rect">
-              <a:avLst/>
-            </a:prstGeom>
-            <a:grpFill/>
-            <a:ln w="19050">
-              <a:solidFill>
-                <a:srgbClr val="0070C0"/>
-              </a:solidFill>
-              <a:headEnd type="none" w="med" len="med"/>
-              <a:tailEnd type="none" w="med" len="med"/>
-            </a:ln>
-            <a:effectLst/>
-          </p:spPr>
-          <p:style>
-            <a:lnRef idx="1">
-              <a:schemeClr val="accent2"/>
-            </a:lnRef>
-            <a:fillRef idx="2">
-              <a:schemeClr val="accent2"/>
-            </a:fillRef>
-            <a:effectRef idx="1">
-              <a:schemeClr val="accent2"/>
-            </a:effectRef>
-            <a:fontRef idx="minor">
-              <a:schemeClr val="dk1"/>
-            </a:fontRef>
-          </p:style>
-          <p:txBody>
-            <a:bodyPr rtlCol="0" anchor="ctr"/>
-            <a:lstStyle/>
-            <a:p>
-              <a:pPr algn="ctr"/>
-              <a:r>
-                <a:rPr lang="en-US" sz="950" b="1" dirty="0" err="1" smtClean="0">
-                  <a:solidFill>
-                    <a:srgbClr val="0070C0"/>
-                  </a:solidFill>
-                </a:rPr>
-                <a:t>AddEventCommand</a:t>
-              </a:r>
-              <a:endParaRPr lang="en-SG" sz="950" b="1" dirty="0">
-                <a:solidFill>
-                  <a:srgbClr val="0070C0"/>
-                </a:solidFill>
-              </a:endParaRPr>
-            </a:p>
-          </p:txBody>
-        </p:sp>
-        <p:cxnSp>
-          <p:nvCxnSpPr>
-            <p:cNvPr id="81" name="Elbow Connector 80"/>
-            <p:cNvCxnSpPr>
-              <a:stCxn id="48" idx="1"/>
-              <a:endCxn id="78" idx="3"/>
-            </p:cNvCxnSpPr>
-            <p:nvPr/>
-          </p:nvCxnSpPr>
-          <p:spPr>
-            <a:xfrm flipV="1">
-              <a:off x="7010399" y="935380"/>
-              <a:ext cx="228601" cy="228600"/>
-            </a:xfrm>
-            <a:prstGeom prst="bentConnector3">
-              <a:avLst/>
-            </a:prstGeom>
-            <a:grpFill/>
-            <a:ln w="19050">
-              <a:solidFill>
-                <a:srgbClr val="0070C0"/>
-              </a:solidFill>
-              <a:headEnd type="none" w="med" len="med"/>
-              <a:tailEnd type="none" w="med" len="med"/>
-            </a:ln>
-            <a:effectLst/>
-          </p:spPr>
-          <p:style>
-            <a:lnRef idx="1">
-              <a:schemeClr val="accent2"/>
-            </a:lnRef>
-            <a:fillRef idx="2">
-              <a:schemeClr val="accent2"/>
-            </a:fillRef>
-            <a:effectRef idx="1">
-              <a:schemeClr val="accent2"/>
-            </a:effectRef>
-            <a:fontRef idx="minor">
-              <a:schemeClr val="dk1"/>
-            </a:fontRef>
-          </p:style>
-        </p:cxnSp>
-        <p:cxnSp>
-          <p:nvCxnSpPr>
-            <p:cNvPr id="83" name="Elbow Connector 82"/>
-            <p:cNvCxnSpPr>
-              <a:stCxn id="48" idx="1"/>
-              <a:endCxn id="79" idx="3"/>
-            </p:cNvCxnSpPr>
-            <p:nvPr/>
-          </p:nvCxnSpPr>
-          <p:spPr>
-            <a:xfrm>
-              <a:off x="7010399" y="1163980"/>
-              <a:ext cx="228601" cy="228600"/>
-            </a:xfrm>
-            <a:prstGeom prst="bentConnector3">
-              <a:avLst>
-                <a:gd name="adj1" fmla="val 50000"/>
-              </a:avLst>
-            </a:prstGeom>
-            <a:grpFill/>
-            <a:ln w="19050">
-              <a:solidFill>
-                <a:srgbClr val="0070C0"/>
-              </a:solidFill>
-              <a:headEnd type="none" w="med" len="med"/>
-              <a:tailEnd type="none" w="med" len="med"/>
-            </a:ln>
-            <a:effectLst/>
-          </p:spPr>
-          <p:style>
-            <a:lnRef idx="1">
-              <a:schemeClr val="accent2"/>
-            </a:lnRef>
-            <a:fillRef idx="2">
-              <a:schemeClr val="accent2"/>
-            </a:fillRef>
-            <a:effectRef idx="1">
-              <a:schemeClr val="accent2"/>
-            </a:effectRef>
-            <a:fontRef idx="minor">
-              <a:schemeClr val="dk1"/>
-            </a:fontRef>
-          </p:style>
-        </p:cxnSp>
-      </p:grpSp>
-      <p:grpSp>
-        <p:nvGrpSpPr>
-          <p:cNvPr id="89" name="Group 88"/>
-          <p:cNvGrpSpPr/>
-          <p:nvPr/>
-        </p:nvGrpSpPr>
-        <p:grpSpPr>
-          <a:xfrm>
-            <a:off x="7010400" y="1634440"/>
-            <a:ext cx="1414999" cy="803960"/>
-            <a:chOff x="7010399" y="762000"/>
-            <a:chExt cx="1414999" cy="803960"/>
-          </a:xfrm>
-          <a:solidFill>
-            <a:schemeClr val="tx2">
-              <a:lumMod val="20000"/>
-              <a:lumOff val="80000"/>
-            </a:schemeClr>
-          </a:solidFill>
-        </p:grpSpPr>
-        <p:sp>
-          <p:nvSpPr>
-            <p:cNvPr id="90" name="Rectangle 11"/>
-            <p:cNvSpPr/>
-            <p:nvPr/>
-          </p:nvSpPr>
-          <p:spPr>
-            <a:xfrm flipH="1">
-              <a:off x="7239000" y="762000"/>
-              <a:ext cx="1186398" cy="346760"/>
-            </a:xfrm>
-            <a:prstGeom prst="rect">
-              <a:avLst/>
-            </a:prstGeom>
-            <a:grpFill/>
-            <a:ln w="19050">
-              <a:solidFill>
-                <a:srgbClr val="0070C0"/>
-              </a:solidFill>
-              <a:headEnd type="none" w="med" len="med"/>
-              <a:tailEnd type="none" w="med" len="med"/>
-            </a:ln>
-            <a:effectLst/>
-          </p:spPr>
-          <p:style>
-            <a:lnRef idx="1">
-              <a:schemeClr val="accent2"/>
-            </a:lnRef>
-            <a:fillRef idx="2">
-              <a:schemeClr val="accent2"/>
-            </a:fillRef>
-            <a:effectRef idx="1">
-              <a:schemeClr val="accent2"/>
-            </a:effectRef>
-            <a:fontRef idx="minor">
-              <a:schemeClr val="dk1"/>
-            </a:fontRef>
-          </p:style>
-          <p:txBody>
-            <a:bodyPr rtlCol="0" anchor="ctr"/>
-            <a:lstStyle/>
-            <a:p>
-              <a:pPr algn="ctr"/>
-              <a:r>
-                <a:rPr lang="en-US" sz="950" b="1" dirty="0" err="1" smtClean="0">
-                  <a:solidFill>
-                    <a:srgbClr val="0070C0"/>
-                  </a:solidFill>
-                </a:rPr>
-                <a:t>EditTaskCommand</a:t>
-              </a:r>
-              <a:endParaRPr lang="en-SG" sz="950" b="1" dirty="0">
-                <a:solidFill>
-                  <a:srgbClr val="0070C0"/>
-                </a:solidFill>
-              </a:endParaRPr>
-            </a:p>
-          </p:txBody>
-        </p:sp>
-        <p:sp>
-          <p:nvSpPr>
-            <p:cNvPr id="91" name="Rectangle 11"/>
-            <p:cNvSpPr/>
-            <p:nvPr/>
-          </p:nvSpPr>
-          <p:spPr>
-            <a:xfrm flipH="1">
-              <a:off x="7239000" y="1219200"/>
-              <a:ext cx="1186398" cy="346760"/>
-            </a:xfrm>
-            <a:prstGeom prst="rect">
-              <a:avLst/>
-            </a:prstGeom>
-            <a:grpFill/>
-            <a:ln w="19050">
-              <a:solidFill>
-                <a:srgbClr val="0070C0"/>
-              </a:solidFill>
-              <a:headEnd type="none" w="med" len="med"/>
-              <a:tailEnd type="none" w="med" len="med"/>
-            </a:ln>
-            <a:effectLst/>
-          </p:spPr>
-          <p:style>
-            <a:lnRef idx="1">
-              <a:schemeClr val="accent2"/>
-            </a:lnRef>
-            <a:fillRef idx="2">
-              <a:schemeClr val="accent2"/>
-            </a:fillRef>
-            <a:effectRef idx="1">
-              <a:schemeClr val="accent2"/>
-            </a:effectRef>
-            <a:fontRef idx="minor">
-              <a:schemeClr val="dk1"/>
-            </a:fontRef>
-          </p:style>
-          <p:txBody>
-            <a:bodyPr rtlCol="0" anchor="ctr"/>
-            <a:lstStyle/>
-            <a:p>
-              <a:pPr algn="ctr"/>
-              <a:r>
-                <a:rPr lang="en-US" sz="950" b="1" dirty="0" err="1" smtClean="0">
-                  <a:solidFill>
-                    <a:srgbClr val="0070C0"/>
-                  </a:solidFill>
-                </a:rPr>
-                <a:t>EditEventCommand</a:t>
-              </a:r>
-              <a:endParaRPr lang="en-SG" sz="950" b="1" dirty="0">
-                <a:solidFill>
-                  <a:srgbClr val="0070C0"/>
-                </a:solidFill>
-              </a:endParaRPr>
-            </a:p>
-          </p:txBody>
-        </p:sp>
-        <p:cxnSp>
-          <p:nvCxnSpPr>
-            <p:cNvPr id="92" name="Elbow Connector 91"/>
-            <p:cNvCxnSpPr>
-              <a:endCxn id="90" idx="3"/>
-            </p:cNvCxnSpPr>
-            <p:nvPr/>
-          </p:nvCxnSpPr>
-          <p:spPr>
-            <a:xfrm flipV="1">
-              <a:off x="7010399" y="935380"/>
-              <a:ext cx="228601" cy="228600"/>
-            </a:xfrm>
-            <a:prstGeom prst="bentConnector3">
-              <a:avLst/>
-            </a:prstGeom>
-            <a:grpFill/>
-            <a:ln w="19050">
-              <a:solidFill>
-                <a:srgbClr val="0070C0"/>
-              </a:solidFill>
-              <a:headEnd type="none" w="med" len="med"/>
-              <a:tailEnd type="none" w="med" len="med"/>
-            </a:ln>
-            <a:effectLst/>
-          </p:spPr>
-          <p:style>
-            <a:lnRef idx="1">
-              <a:schemeClr val="accent2"/>
-            </a:lnRef>
-            <a:fillRef idx="2">
-              <a:schemeClr val="accent2"/>
-            </a:fillRef>
-            <a:effectRef idx="1">
-              <a:schemeClr val="accent2"/>
-            </a:effectRef>
-            <a:fontRef idx="minor">
-              <a:schemeClr val="dk1"/>
-            </a:fontRef>
-          </p:style>
-        </p:cxnSp>
-        <p:cxnSp>
-          <p:nvCxnSpPr>
-            <p:cNvPr id="93" name="Elbow Connector 92"/>
-            <p:cNvCxnSpPr>
-              <a:endCxn id="91" idx="3"/>
-            </p:cNvCxnSpPr>
-            <p:nvPr/>
-          </p:nvCxnSpPr>
-          <p:spPr>
-            <a:xfrm>
-              <a:off x="7010399" y="1163980"/>
-              <a:ext cx="228601" cy="228600"/>
-            </a:xfrm>
-            <a:prstGeom prst="bentConnector3">
-              <a:avLst>
-                <a:gd name="adj1" fmla="val 50000"/>
-              </a:avLst>
-            </a:prstGeom>
-            <a:grpFill/>
-            <a:ln w="19050">
-              <a:solidFill>
-                <a:srgbClr val="0070C0"/>
-              </a:solidFill>
-              <a:headEnd type="none" w="med" len="med"/>
-              <a:tailEnd type="none" w="med" len="med"/>
-            </a:ln>
-            <a:effectLst/>
-          </p:spPr>
-          <p:style>
-            <a:lnRef idx="1">
-              <a:schemeClr val="accent2"/>
-            </a:lnRef>
-            <a:fillRef idx="2">
-              <a:schemeClr val="accent2"/>
-            </a:fillRef>
-            <a:effectRef idx="1">
-              <a:schemeClr val="accent2"/>
-            </a:effectRef>
-            <a:fontRef idx="minor">
-              <a:schemeClr val="dk1"/>
-            </a:fontRef>
-          </p:style>
-        </p:cxnSp>
-      </p:grpSp>
-      <p:grpSp>
-        <p:nvGrpSpPr>
-          <p:cNvPr id="94" name="Group 93"/>
-          <p:cNvGrpSpPr/>
-          <p:nvPr/>
-        </p:nvGrpSpPr>
-        <p:grpSpPr>
-          <a:xfrm>
-            <a:off x="7010400" y="2819400"/>
-            <a:ext cx="1414999" cy="803960"/>
-            <a:chOff x="7010399" y="762000"/>
-            <a:chExt cx="1414999" cy="803960"/>
-          </a:xfrm>
-          <a:solidFill>
-            <a:schemeClr val="tx2">
-              <a:lumMod val="20000"/>
-              <a:lumOff val="80000"/>
-            </a:schemeClr>
-          </a:solidFill>
-        </p:grpSpPr>
-        <p:sp>
-          <p:nvSpPr>
-            <p:cNvPr id="95" name="Rectangle 11"/>
-            <p:cNvSpPr/>
-            <p:nvPr/>
-          </p:nvSpPr>
-          <p:spPr>
-            <a:xfrm flipH="1">
-              <a:off x="7239000" y="762000"/>
-              <a:ext cx="1186398" cy="346760"/>
-            </a:xfrm>
-            <a:prstGeom prst="rect">
-              <a:avLst/>
-            </a:prstGeom>
-            <a:grpFill/>
-            <a:ln w="19050">
-              <a:solidFill>
-                <a:srgbClr val="0070C0"/>
-              </a:solidFill>
-              <a:headEnd type="none" w="med" len="med"/>
-              <a:tailEnd type="none" w="med" len="med"/>
-            </a:ln>
-            <a:effectLst/>
-          </p:spPr>
-          <p:style>
-            <a:lnRef idx="1">
-              <a:schemeClr val="accent2"/>
-            </a:lnRef>
-            <a:fillRef idx="2">
-              <a:schemeClr val="accent2"/>
-            </a:fillRef>
-            <a:effectRef idx="1">
-              <a:schemeClr val="accent2"/>
-            </a:effectRef>
-            <a:fontRef idx="minor">
-              <a:schemeClr val="dk1"/>
-            </a:fontRef>
-          </p:style>
-          <p:txBody>
-            <a:bodyPr rtlCol="0" anchor="ctr"/>
-            <a:lstStyle/>
-            <a:p>
-              <a:pPr algn="ctr"/>
-              <a:r>
-                <a:rPr lang="en-US" sz="950" b="1" dirty="0" err="1" smtClean="0">
-                  <a:solidFill>
-                    <a:srgbClr val="0070C0"/>
-                  </a:solidFill>
-                </a:rPr>
-                <a:t>DeleteTask</a:t>
-              </a:r>
-              <a:endParaRPr lang="en-US" sz="950" b="1" dirty="0" smtClean="0">
-                <a:solidFill>
-                  <a:srgbClr val="0070C0"/>
-                </a:solidFill>
-              </a:endParaRPr>
-            </a:p>
-            <a:p>
-              <a:pPr algn="ctr"/>
-              <a:r>
-                <a:rPr lang="en-US" sz="950" b="1" dirty="0" smtClean="0">
-                  <a:solidFill>
-                    <a:srgbClr val="0070C0"/>
-                  </a:solidFill>
-                </a:rPr>
-                <a:t>Command</a:t>
-              </a:r>
-              <a:endParaRPr lang="en-SG" sz="950" b="1" dirty="0">
-                <a:solidFill>
-                  <a:srgbClr val="0070C0"/>
-                </a:solidFill>
-              </a:endParaRPr>
-            </a:p>
-          </p:txBody>
-        </p:sp>
-        <p:sp>
-          <p:nvSpPr>
-            <p:cNvPr id="96" name="Rectangle 11"/>
-            <p:cNvSpPr/>
-            <p:nvPr/>
-          </p:nvSpPr>
-          <p:spPr>
-            <a:xfrm flipH="1">
-              <a:off x="7239000" y="1219200"/>
-              <a:ext cx="1186398" cy="346760"/>
-            </a:xfrm>
-            <a:prstGeom prst="rect">
-              <a:avLst/>
-            </a:prstGeom>
-            <a:grpFill/>
-            <a:ln w="19050">
-              <a:solidFill>
-                <a:srgbClr val="0070C0"/>
-              </a:solidFill>
-              <a:headEnd type="none" w="med" len="med"/>
-              <a:tailEnd type="none" w="med" len="med"/>
-            </a:ln>
-            <a:effectLst/>
-          </p:spPr>
-          <p:style>
-            <a:lnRef idx="1">
-              <a:schemeClr val="accent2"/>
-            </a:lnRef>
-            <a:fillRef idx="2">
-              <a:schemeClr val="accent2"/>
-            </a:fillRef>
-            <a:effectRef idx="1">
-              <a:schemeClr val="accent2"/>
-            </a:effectRef>
-            <a:fontRef idx="minor">
-              <a:schemeClr val="dk1"/>
-            </a:fontRef>
-          </p:style>
-          <p:txBody>
-            <a:bodyPr rtlCol="0" anchor="ctr"/>
-            <a:lstStyle/>
-            <a:p>
-              <a:pPr algn="ctr"/>
-              <a:r>
-                <a:rPr lang="en-US" sz="950" b="1" dirty="0" err="1" smtClean="0">
-                  <a:solidFill>
-                    <a:srgbClr val="0070C0"/>
-                  </a:solidFill>
-                </a:rPr>
-                <a:t>DeleteEvent</a:t>
-              </a:r>
-              <a:endParaRPr lang="en-US" sz="950" b="1" dirty="0" smtClean="0">
-                <a:solidFill>
-                  <a:srgbClr val="0070C0"/>
-                </a:solidFill>
-              </a:endParaRPr>
-            </a:p>
-            <a:p>
-              <a:pPr algn="ctr"/>
-              <a:r>
-                <a:rPr lang="en-US" sz="950" b="1" dirty="0" smtClean="0">
-                  <a:solidFill>
-                    <a:srgbClr val="0070C0"/>
-                  </a:solidFill>
-                </a:rPr>
-                <a:t>Command</a:t>
-              </a:r>
-              <a:endParaRPr lang="en-SG" sz="950" b="1" dirty="0">
-                <a:solidFill>
-                  <a:srgbClr val="0070C0"/>
-                </a:solidFill>
-              </a:endParaRPr>
-            </a:p>
-          </p:txBody>
-        </p:sp>
-        <p:cxnSp>
-          <p:nvCxnSpPr>
-            <p:cNvPr id="97" name="Elbow Connector 96"/>
-            <p:cNvCxnSpPr>
-              <a:endCxn id="95" idx="3"/>
-            </p:cNvCxnSpPr>
-            <p:nvPr/>
-          </p:nvCxnSpPr>
-          <p:spPr>
-            <a:xfrm flipV="1">
-              <a:off x="7010399" y="935380"/>
-              <a:ext cx="228601" cy="228600"/>
-            </a:xfrm>
-            <a:prstGeom prst="bentConnector3">
-              <a:avLst/>
-            </a:prstGeom>
-            <a:grpFill/>
-            <a:ln w="19050">
-              <a:solidFill>
-                <a:srgbClr val="0070C0"/>
-              </a:solidFill>
-              <a:headEnd type="none" w="med" len="med"/>
-              <a:tailEnd type="none" w="med" len="med"/>
-            </a:ln>
-            <a:effectLst/>
-          </p:spPr>
-          <p:style>
-            <a:lnRef idx="1">
-              <a:schemeClr val="accent2"/>
-            </a:lnRef>
-            <a:fillRef idx="2">
-              <a:schemeClr val="accent2"/>
-            </a:fillRef>
-            <a:effectRef idx="1">
-              <a:schemeClr val="accent2"/>
-            </a:effectRef>
-            <a:fontRef idx="minor">
-              <a:schemeClr val="dk1"/>
-            </a:fontRef>
-          </p:style>
-        </p:cxnSp>
-        <p:cxnSp>
-          <p:nvCxnSpPr>
-            <p:cNvPr id="98" name="Elbow Connector 97"/>
-            <p:cNvCxnSpPr>
-              <a:endCxn id="96" idx="3"/>
-            </p:cNvCxnSpPr>
-            <p:nvPr/>
-          </p:nvCxnSpPr>
-          <p:spPr>
-            <a:xfrm>
-              <a:off x="7010399" y="1163980"/>
-              <a:ext cx="228601" cy="228600"/>
-            </a:xfrm>
-            <a:prstGeom prst="bentConnector3">
-              <a:avLst>
-                <a:gd name="adj1" fmla="val 50000"/>
-              </a:avLst>
-            </a:prstGeom>
-            <a:grpFill/>
-            <a:ln w="19050">
-              <a:solidFill>
-                <a:srgbClr val="0070C0"/>
-              </a:solidFill>
-              <a:headEnd type="none" w="med" len="med"/>
-              <a:tailEnd type="none" w="med" len="med"/>
-            </a:ln>
-            <a:effectLst/>
-          </p:spPr>
-          <p:style>
-            <a:lnRef idx="1">
-              <a:schemeClr val="accent2"/>
-            </a:lnRef>
-            <a:fillRef idx="2">
-              <a:schemeClr val="accent2"/>
-            </a:fillRef>
-            <a:effectRef idx="1">
-              <a:schemeClr val="accent2"/>
-            </a:effectRef>
-            <a:fontRef idx="minor">
-              <a:schemeClr val="dk1"/>
-            </a:fontRef>
-          </p:style>
-        </p:cxnSp>
-      </p:grpSp>
-      <p:grpSp>
-        <p:nvGrpSpPr>
-          <p:cNvPr id="99" name="Group 98"/>
-          <p:cNvGrpSpPr/>
-          <p:nvPr/>
-        </p:nvGrpSpPr>
-        <p:grpSpPr>
-          <a:xfrm>
-            <a:off x="7010400" y="4038600"/>
-            <a:ext cx="1414999" cy="803960"/>
-            <a:chOff x="7010399" y="762000"/>
-            <a:chExt cx="1414999" cy="803960"/>
-          </a:xfrm>
-          <a:solidFill>
-            <a:schemeClr val="tx2">
-              <a:lumMod val="20000"/>
-              <a:lumOff val="80000"/>
-            </a:schemeClr>
-          </a:solidFill>
-        </p:grpSpPr>
-        <p:sp>
-          <p:nvSpPr>
-            <p:cNvPr id="100" name="Rectangle 11"/>
-            <p:cNvSpPr/>
-            <p:nvPr/>
-          </p:nvSpPr>
-          <p:spPr>
-            <a:xfrm flipH="1">
-              <a:off x="7239000" y="762000"/>
-              <a:ext cx="1186398" cy="346760"/>
-            </a:xfrm>
-            <a:prstGeom prst="rect">
-              <a:avLst/>
-            </a:prstGeom>
-            <a:grpFill/>
-            <a:ln w="19050">
-              <a:solidFill>
-                <a:srgbClr val="0070C0"/>
-              </a:solidFill>
-              <a:headEnd type="none" w="med" len="med"/>
-              <a:tailEnd type="none" w="med" len="med"/>
-            </a:ln>
-            <a:effectLst/>
-          </p:spPr>
-          <p:style>
-            <a:lnRef idx="1">
-              <a:schemeClr val="accent2"/>
-            </a:lnRef>
-            <a:fillRef idx="2">
-              <a:schemeClr val="accent2"/>
-            </a:fillRef>
-            <a:effectRef idx="1">
-              <a:schemeClr val="accent2"/>
-            </a:effectRef>
-            <a:fontRef idx="minor">
-              <a:schemeClr val="dk1"/>
-            </a:fontRef>
-          </p:style>
-          <p:txBody>
-            <a:bodyPr rtlCol="0" anchor="ctr"/>
-            <a:lstStyle/>
-            <a:p>
-              <a:pPr algn="ctr"/>
-              <a:r>
-                <a:rPr lang="en-US" sz="950" b="1" dirty="0" err="1" smtClean="0">
-                  <a:solidFill>
-                    <a:srgbClr val="0070C0"/>
-                  </a:solidFill>
-                </a:rPr>
-                <a:t>ListTaskCommand</a:t>
-              </a:r>
-              <a:endParaRPr lang="en-SG" sz="950" b="1" dirty="0">
-                <a:solidFill>
-                  <a:srgbClr val="0070C0"/>
-                </a:solidFill>
-              </a:endParaRPr>
-            </a:p>
-          </p:txBody>
-        </p:sp>
-        <p:sp>
-          <p:nvSpPr>
-            <p:cNvPr id="101" name="Rectangle 11"/>
-            <p:cNvSpPr/>
-            <p:nvPr/>
-          </p:nvSpPr>
-          <p:spPr>
-            <a:xfrm flipH="1">
-              <a:off x="7239000" y="1219200"/>
-              <a:ext cx="1186398" cy="346760"/>
-            </a:xfrm>
-            <a:prstGeom prst="rect">
-              <a:avLst/>
-            </a:prstGeom>
-            <a:grpFill/>
-            <a:ln w="19050">
-              <a:solidFill>
-                <a:srgbClr val="0070C0"/>
-              </a:solidFill>
-              <a:headEnd type="none" w="med" len="med"/>
-              <a:tailEnd type="none" w="med" len="med"/>
-            </a:ln>
-            <a:effectLst/>
-          </p:spPr>
-          <p:style>
-            <a:lnRef idx="1">
-              <a:schemeClr val="accent2"/>
-            </a:lnRef>
-            <a:fillRef idx="2">
-              <a:schemeClr val="accent2"/>
-            </a:fillRef>
-            <a:effectRef idx="1">
-              <a:schemeClr val="accent2"/>
-            </a:effectRef>
-            <a:fontRef idx="minor">
-              <a:schemeClr val="dk1"/>
-            </a:fontRef>
-          </p:style>
-          <p:txBody>
-            <a:bodyPr rtlCol="0" anchor="ctr"/>
-            <a:lstStyle/>
-            <a:p>
-              <a:pPr algn="ctr"/>
-              <a:r>
-                <a:rPr lang="en-US" sz="950" b="1" dirty="0" err="1" smtClean="0">
-                  <a:solidFill>
-                    <a:srgbClr val="0070C0"/>
-                  </a:solidFill>
-                </a:rPr>
-                <a:t>ListEventCommand</a:t>
-              </a:r>
-              <a:endParaRPr lang="en-SG" sz="950" b="1" dirty="0">
-                <a:solidFill>
-                  <a:srgbClr val="0070C0"/>
-                </a:solidFill>
-              </a:endParaRPr>
-            </a:p>
-          </p:txBody>
-        </p:sp>
-        <p:cxnSp>
-          <p:nvCxnSpPr>
-            <p:cNvPr id="102" name="Elbow Connector 101"/>
-            <p:cNvCxnSpPr>
-              <a:endCxn id="100" idx="3"/>
-            </p:cNvCxnSpPr>
-            <p:nvPr/>
-          </p:nvCxnSpPr>
-          <p:spPr>
-            <a:xfrm flipV="1">
-              <a:off x="7010399" y="935380"/>
-              <a:ext cx="228601" cy="228600"/>
-            </a:xfrm>
-            <a:prstGeom prst="bentConnector3">
-              <a:avLst/>
-            </a:prstGeom>
-            <a:grpFill/>
-            <a:ln w="19050">
-              <a:solidFill>
-                <a:srgbClr val="0070C0"/>
-              </a:solidFill>
-              <a:headEnd type="none" w="med" len="med"/>
-              <a:tailEnd type="none" w="med" len="med"/>
-            </a:ln>
-            <a:effectLst/>
-          </p:spPr>
-          <p:style>
-            <a:lnRef idx="1">
-              <a:schemeClr val="accent2"/>
-            </a:lnRef>
-            <a:fillRef idx="2">
-              <a:schemeClr val="accent2"/>
-            </a:fillRef>
-            <a:effectRef idx="1">
-              <a:schemeClr val="accent2"/>
-            </a:effectRef>
-            <a:fontRef idx="minor">
-              <a:schemeClr val="dk1"/>
-            </a:fontRef>
-          </p:style>
-        </p:cxnSp>
-        <p:cxnSp>
-          <p:nvCxnSpPr>
-            <p:cNvPr id="103" name="Elbow Connector 102"/>
-            <p:cNvCxnSpPr>
-              <a:endCxn id="101" idx="3"/>
-            </p:cNvCxnSpPr>
-            <p:nvPr/>
-          </p:nvCxnSpPr>
-          <p:spPr>
-            <a:xfrm>
-              <a:off x="7010399" y="1163980"/>
-              <a:ext cx="228601" cy="228600"/>
-            </a:xfrm>
-            <a:prstGeom prst="bentConnector3">
-              <a:avLst>
-                <a:gd name="adj1" fmla="val 50000"/>
-              </a:avLst>
-            </a:prstGeom>
-            <a:grpFill/>
-            <a:ln w="19050">
-              <a:solidFill>
-                <a:srgbClr val="0070C0"/>
-              </a:solidFill>
-              <a:headEnd type="none" w="med" len="med"/>
-              <a:tailEnd type="none" w="med" len="med"/>
-            </a:ln>
-            <a:effectLst/>
-          </p:spPr>
-          <p:style>
-            <a:lnRef idx="1">
-              <a:schemeClr val="accent2"/>
-            </a:lnRef>
-            <a:fillRef idx="2">
-              <a:schemeClr val="accent2"/>
-            </a:fillRef>
-            <a:effectRef idx="1">
-              <a:schemeClr val="accent2"/>
-            </a:effectRef>
-            <a:fontRef idx="minor">
-              <a:schemeClr val="dk1"/>
-            </a:fontRef>
-          </p:style>
-        </p:cxnSp>
-      </p:grpSp>
-      <p:sp>
-        <p:nvSpPr>
-          <p:cNvPr id="144" name="Rectangle 11"/>
-          <p:cNvSpPr/>
-          <p:nvPr/>
-        </p:nvSpPr>
-        <p:spPr>
-          <a:xfrm flipH="1">
-            <a:off x="1970602" y="4419600"/>
-            <a:ext cx="1186398" cy="346760"/>
-          </a:xfrm>
-          <a:prstGeom prst="rect">
-            <a:avLst/>
-          </a:prstGeom>
-          <a:ln w="19050">
-            <a:solidFill>
-              <a:srgbClr val="0070C0"/>
-            </a:solidFill>
-          </a:ln>
-          <a:effectLst/>
-        </p:spPr>
-        <p:style>
-          <a:lnRef idx="1">
-            <a:schemeClr val="accent1"/>
-          </a:lnRef>
-          <a:fillRef idx="2">
-            <a:schemeClr val="accent1"/>
-          </a:fillRef>
-          <a:effectRef idx="1">
-            <a:schemeClr val="accent1"/>
-          </a:effectRef>
-          <a:fontRef idx="minor">
-            <a:schemeClr val="dk1"/>
-          </a:fontRef>
-        </p:style>
-        <p:txBody>
-          <a:bodyPr rtlCol="0" anchor="ctr"/>
-          <a:lstStyle/>
-          <a:p>
-            <a:pPr algn="ctr"/>
-            <a:r>
-              <a:rPr lang="en-US" sz="1050" b="1" dirty="0" err="1" smtClean="0">
-                <a:solidFill>
-                  <a:srgbClr val="0070C0"/>
-                </a:solidFill>
-              </a:rPr>
-              <a:t>EditParser</a:t>
-            </a:r>
-            <a:endParaRPr lang="en-SG" sz="1050" b="1" dirty="0">
-              <a:solidFill>
-                <a:srgbClr val="0070C0"/>
-              </a:solidFill>
-            </a:endParaRPr>
-          </a:p>
-        </p:txBody>
-      </p:sp>
-      <p:sp>
-        <p:nvSpPr>
-          <p:cNvPr id="145" name="Rectangle 11"/>
-          <p:cNvSpPr/>
-          <p:nvPr/>
-        </p:nvSpPr>
-        <p:spPr>
-          <a:xfrm flipH="1">
-            <a:off x="1967281" y="4003568"/>
-            <a:ext cx="1186398" cy="346760"/>
-          </a:xfrm>
-          <a:prstGeom prst="rect">
-            <a:avLst/>
-          </a:prstGeom>
-          <a:ln w="19050">
-            <a:solidFill>
-              <a:srgbClr val="0070C0"/>
-            </a:solidFill>
-          </a:ln>
-          <a:effectLst/>
-        </p:spPr>
-        <p:style>
-          <a:lnRef idx="1">
-            <a:schemeClr val="accent1"/>
-          </a:lnRef>
-          <a:fillRef idx="2">
-            <a:schemeClr val="accent1"/>
-          </a:fillRef>
-          <a:effectRef idx="1">
-            <a:schemeClr val="accent1"/>
-          </a:effectRef>
-          <a:fontRef idx="minor">
-            <a:schemeClr val="dk1"/>
-          </a:fontRef>
-        </p:style>
-        <p:txBody>
-          <a:bodyPr rtlCol="0" anchor="ctr"/>
-          <a:lstStyle/>
-          <a:p>
-            <a:pPr algn="ctr"/>
-            <a:r>
-              <a:rPr lang="en-US" sz="1050" b="1" dirty="0" err="1" smtClean="0">
-                <a:solidFill>
-                  <a:srgbClr val="0070C0"/>
-                </a:solidFill>
-              </a:rPr>
-              <a:t>HelpParser</a:t>
-            </a:r>
-            <a:endParaRPr lang="en-SG" sz="1050" b="1" dirty="0">
-              <a:solidFill>
-                <a:srgbClr val="0070C0"/>
-              </a:solidFill>
-            </a:endParaRPr>
-          </a:p>
-        </p:txBody>
-      </p:sp>
-      <p:sp>
-        <p:nvSpPr>
-          <p:cNvPr id="146" name="Rectangle 11"/>
-          <p:cNvSpPr/>
-          <p:nvPr/>
-        </p:nvSpPr>
-        <p:spPr>
-          <a:xfrm flipH="1">
-            <a:off x="1970602" y="3581400"/>
-            <a:ext cx="1186398" cy="346760"/>
-          </a:xfrm>
-          <a:prstGeom prst="rect">
-            <a:avLst/>
-          </a:prstGeom>
-          <a:ln w="19050">
-            <a:solidFill>
-              <a:srgbClr val="0070C0"/>
-            </a:solidFill>
-          </a:ln>
-          <a:effectLst/>
-        </p:spPr>
-        <p:style>
-          <a:lnRef idx="1">
-            <a:schemeClr val="accent1"/>
-          </a:lnRef>
-          <a:fillRef idx="2">
-            <a:schemeClr val="accent1"/>
-          </a:fillRef>
-          <a:effectRef idx="1">
-            <a:schemeClr val="accent1"/>
-          </a:effectRef>
-          <a:fontRef idx="minor">
-            <a:schemeClr val="dk1"/>
-          </a:fontRef>
-        </p:style>
-        <p:txBody>
-          <a:bodyPr rtlCol="0" anchor="ctr"/>
-          <a:lstStyle/>
-          <a:p>
-            <a:pPr algn="ctr"/>
-            <a:r>
-              <a:rPr lang="en-US" sz="1050" b="1" dirty="0" err="1" smtClean="0">
-                <a:solidFill>
-                  <a:srgbClr val="0070C0"/>
-                </a:solidFill>
-              </a:rPr>
-              <a:t>AddParser</a:t>
-            </a:r>
-            <a:endParaRPr lang="en-SG" sz="1050" b="1" dirty="0">
-              <a:solidFill>
-                <a:srgbClr val="0070C0"/>
-              </a:solidFill>
-            </a:endParaRPr>
-          </a:p>
-        </p:txBody>
-      </p:sp>
-      <p:grpSp>
-        <p:nvGrpSpPr>
-          <p:cNvPr id="147" name="Group 146"/>
-          <p:cNvGrpSpPr/>
-          <p:nvPr/>
-        </p:nvGrpSpPr>
-        <p:grpSpPr>
-          <a:xfrm>
-            <a:off x="3157000" y="3352800"/>
-            <a:ext cx="1414999" cy="803960"/>
-            <a:chOff x="7010399" y="762000"/>
-            <a:chExt cx="1414999" cy="803960"/>
-          </a:xfrm>
-          <a:solidFill>
-            <a:schemeClr val="tx2">
-              <a:lumMod val="20000"/>
-              <a:lumOff val="80000"/>
-            </a:schemeClr>
-          </a:solidFill>
-        </p:grpSpPr>
-        <p:sp>
-          <p:nvSpPr>
-            <p:cNvPr id="148" name="Rectangle 11"/>
-            <p:cNvSpPr/>
-            <p:nvPr/>
-          </p:nvSpPr>
-          <p:spPr>
-            <a:xfrm flipH="1">
-              <a:off x="7239000" y="762000"/>
-              <a:ext cx="1186398" cy="346760"/>
-            </a:xfrm>
-            <a:prstGeom prst="rect">
-              <a:avLst/>
-            </a:prstGeom>
-            <a:grpFill/>
-            <a:ln w="19050">
-              <a:solidFill>
-                <a:srgbClr val="0070C0"/>
-              </a:solidFill>
-              <a:headEnd type="none" w="med" len="med"/>
-              <a:tailEnd type="none" w="med" len="med"/>
-            </a:ln>
-            <a:effectLst/>
-          </p:spPr>
-          <p:style>
-            <a:lnRef idx="1">
-              <a:schemeClr val="accent2"/>
-            </a:lnRef>
-            <a:fillRef idx="2">
-              <a:schemeClr val="accent2"/>
-            </a:fillRef>
-            <a:effectRef idx="1">
-              <a:schemeClr val="accent2"/>
-            </a:effectRef>
-            <a:fontRef idx="minor">
-              <a:schemeClr val="dk1"/>
-            </a:fontRef>
-          </p:style>
-          <p:txBody>
-            <a:bodyPr rtlCol="0" anchor="ctr"/>
-            <a:lstStyle/>
-            <a:p>
-              <a:pPr algn="ctr"/>
-              <a:r>
-                <a:rPr lang="en-US" sz="950" b="1" dirty="0" err="1" smtClean="0">
-                  <a:solidFill>
-                    <a:srgbClr val="0070C0"/>
-                  </a:solidFill>
-                </a:rPr>
-                <a:t>AddTaskParser</a:t>
-              </a:r>
-              <a:endParaRPr lang="en-SG" sz="950" b="1" dirty="0">
-                <a:solidFill>
-                  <a:srgbClr val="0070C0"/>
-                </a:solidFill>
-              </a:endParaRPr>
-            </a:p>
-          </p:txBody>
-        </p:sp>
-        <p:sp>
-          <p:nvSpPr>
-            <p:cNvPr id="149" name="Rectangle 11"/>
-            <p:cNvSpPr/>
-            <p:nvPr/>
-          </p:nvSpPr>
-          <p:spPr>
-            <a:xfrm flipH="1">
-              <a:off x="7239000" y="1219200"/>
-              <a:ext cx="1186398" cy="346760"/>
-            </a:xfrm>
-            <a:prstGeom prst="rect">
-              <a:avLst/>
-            </a:prstGeom>
-            <a:grpFill/>
-            <a:ln w="19050">
-              <a:solidFill>
-                <a:srgbClr val="0070C0"/>
-              </a:solidFill>
-              <a:headEnd type="none" w="med" len="med"/>
-              <a:tailEnd type="none" w="med" len="med"/>
-            </a:ln>
-            <a:effectLst/>
-          </p:spPr>
-          <p:style>
-            <a:lnRef idx="1">
-              <a:schemeClr val="accent2"/>
-            </a:lnRef>
-            <a:fillRef idx="2">
-              <a:schemeClr val="accent2"/>
-            </a:fillRef>
-            <a:effectRef idx="1">
-              <a:schemeClr val="accent2"/>
-            </a:effectRef>
-            <a:fontRef idx="minor">
-              <a:schemeClr val="dk1"/>
-            </a:fontRef>
-          </p:style>
-          <p:txBody>
-            <a:bodyPr rtlCol="0" anchor="ctr"/>
-            <a:lstStyle/>
-            <a:p>
-              <a:pPr algn="ctr"/>
-              <a:r>
-                <a:rPr lang="en-US" sz="950" b="1" dirty="0" err="1" smtClean="0">
-                  <a:solidFill>
-                    <a:srgbClr val="0070C0"/>
-                  </a:solidFill>
-                </a:rPr>
-                <a:t>AddEventParser</a:t>
-              </a:r>
-              <a:endParaRPr lang="en-SG" sz="950" b="1" dirty="0">
-                <a:solidFill>
-                  <a:srgbClr val="0070C0"/>
-                </a:solidFill>
-              </a:endParaRPr>
-            </a:p>
-          </p:txBody>
-        </p:sp>
-        <p:cxnSp>
-          <p:nvCxnSpPr>
-            <p:cNvPr id="150" name="Elbow Connector 149"/>
-            <p:cNvCxnSpPr>
-              <a:stCxn id="146" idx="1"/>
-              <a:endCxn id="148" idx="3"/>
-            </p:cNvCxnSpPr>
-            <p:nvPr/>
-          </p:nvCxnSpPr>
-          <p:spPr>
-            <a:xfrm flipV="1">
-              <a:off x="7010399" y="935380"/>
-              <a:ext cx="228601" cy="152400"/>
-            </a:xfrm>
-            <a:prstGeom prst="bentConnector3">
-              <a:avLst/>
-            </a:prstGeom>
-            <a:grpFill/>
-            <a:ln w="19050">
-              <a:solidFill>
-                <a:srgbClr val="0070C0"/>
-              </a:solidFill>
-              <a:headEnd type="none" w="med" len="med"/>
-              <a:tailEnd type="none" w="med" len="med"/>
-            </a:ln>
-            <a:effectLst/>
-          </p:spPr>
-          <p:style>
-            <a:lnRef idx="1">
-              <a:schemeClr val="accent2"/>
-            </a:lnRef>
-            <a:fillRef idx="2">
-              <a:schemeClr val="accent2"/>
-            </a:fillRef>
-            <a:effectRef idx="1">
-              <a:schemeClr val="accent2"/>
-            </a:effectRef>
-            <a:fontRef idx="minor">
-              <a:schemeClr val="dk1"/>
-            </a:fontRef>
-          </p:style>
-        </p:cxnSp>
-        <p:cxnSp>
-          <p:nvCxnSpPr>
-            <p:cNvPr id="151" name="Elbow Connector 150"/>
-            <p:cNvCxnSpPr>
-              <a:stCxn id="146" idx="1"/>
-              <a:endCxn id="149" idx="3"/>
-            </p:cNvCxnSpPr>
-            <p:nvPr/>
-          </p:nvCxnSpPr>
-          <p:spPr>
-            <a:xfrm>
-              <a:off x="7010399" y="1087780"/>
-              <a:ext cx="228601" cy="304800"/>
-            </a:xfrm>
-            <a:prstGeom prst="bentConnector3">
-              <a:avLst>
-                <a:gd name="adj1" fmla="val 50000"/>
-              </a:avLst>
-            </a:prstGeom>
-            <a:grpFill/>
-            <a:ln w="19050">
-              <a:solidFill>
-                <a:srgbClr val="0070C0"/>
-              </a:solidFill>
-              <a:headEnd type="none" w="med" len="med"/>
-              <a:tailEnd type="none" w="med" len="med"/>
-            </a:ln>
-            <a:effectLst/>
-          </p:spPr>
-          <p:style>
-            <a:lnRef idx="1">
-              <a:schemeClr val="accent2"/>
-            </a:lnRef>
-            <a:fillRef idx="2">
-              <a:schemeClr val="accent2"/>
-            </a:fillRef>
-            <a:effectRef idx="1">
-              <a:schemeClr val="accent2"/>
-            </a:effectRef>
-            <a:fontRef idx="minor">
-              <a:schemeClr val="dk1"/>
-            </a:fontRef>
-          </p:style>
-        </p:cxnSp>
-      </p:grpSp>
-      <p:grpSp>
-        <p:nvGrpSpPr>
-          <p:cNvPr id="152" name="Group 151"/>
-          <p:cNvGrpSpPr/>
-          <p:nvPr/>
-        </p:nvGrpSpPr>
-        <p:grpSpPr>
-          <a:xfrm>
-            <a:off x="3157001" y="4225240"/>
-            <a:ext cx="1414999" cy="803960"/>
-            <a:chOff x="7010399" y="762000"/>
-            <a:chExt cx="1414999" cy="803960"/>
-          </a:xfrm>
-          <a:solidFill>
-            <a:schemeClr val="tx2">
-              <a:lumMod val="20000"/>
-              <a:lumOff val="80000"/>
-            </a:schemeClr>
-          </a:solidFill>
-        </p:grpSpPr>
-        <p:sp>
-          <p:nvSpPr>
-            <p:cNvPr id="153" name="Rectangle 11"/>
-            <p:cNvSpPr/>
-            <p:nvPr/>
-          </p:nvSpPr>
-          <p:spPr>
-            <a:xfrm flipH="1">
-              <a:off x="7239000" y="762000"/>
-              <a:ext cx="1186398" cy="346760"/>
-            </a:xfrm>
-            <a:prstGeom prst="rect">
-              <a:avLst/>
-            </a:prstGeom>
-            <a:grpFill/>
-            <a:ln w="19050">
-              <a:solidFill>
-                <a:srgbClr val="0070C0"/>
-              </a:solidFill>
-              <a:headEnd type="none" w="med" len="med"/>
-              <a:tailEnd type="none" w="med" len="med"/>
-            </a:ln>
-            <a:effectLst/>
-          </p:spPr>
-          <p:style>
-            <a:lnRef idx="1">
-              <a:schemeClr val="accent2"/>
-            </a:lnRef>
-            <a:fillRef idx="2">
-              <a:schemeClr val="accent2"/>
-            </a:fillRef>
-            <a:effectRef idx="1">
-              <a:schemeClr val="accent2"/>
-            </a:effectRef>
-            <a:fontRef idx="minor">
-              <a:schemeClr val="dk1"/>
-            </a:fontRef>
-          </p:style>
-          <p:txBody>
-            <a:bodyPr rtlCol="0" anchor="ctr"/>
-            <a:lstStyle/>
-            <a:p>
-              <a:pPr algn="ctr"/>
-              <a:r>
-                <a:rPr lang="en-US" sz="950" b="1" dirty="0" err="1" smtClean="0">
-                  <a:solidFill>
-                    <a:srgbClr val="0070C0"/>
-                  </a:solidFill>
-                </a:rPr>
-                <a:t>EditTaskParser</a:t>
-              </a:r>
-              <a:endParaRPr lang="en-SG" sz="950" b="1" dirty="0">
-                <a:solidFill>
-                  <a:srgbClr val="0070C0"/>
-                </a:solidFill>
-              </a:endParaRPr>
-            </a:p>
-          </p:txBody>
-        </p:sp>
-        <p:sp>
-          <p:nvSpPr>
-            <p:cNvPr id="154" name="Rectangle 11"/>
-            <p:cNvSpPr/>
-            <p:nvPr/>
-          </p:nvSpPr>
-          <p:spPr>
-            <a:xfrm flipH="1">
-              <a:off x="7239000" y="1219200"/>
-              <a:ext cx="1186398" cy="346760"/>
-            </a:xfrm>
-            <a:prstGeom prst="rect">
-              <a:avLst/>
-            </a:prstGeom>
-            <a:grpFill/>
-            <a:ln w="19050">
-              <a:solidFill>
-                <a:srgbClr val="0070C0"/>
-              </a:solidFill>
-              <a:headEnd type="none" w="med" len="med"/>
-              <a:tailEnd type="none" w="med" len="med"/>
-            </a:ln>
-            <a:effectLst/>
-          </p:spPr>
-          <p:style>
-            <a:lnRef idx="1">
-              <a:schemeClr val="accent2"/>
-            </a:lnRef>
-            <a:fillRef idx="2">
-              <a:schemeClr val="accent2"/>
-            </a:fillRef>
-            <a:effectRef idx="1">
-              <a:schemeClr val="accent2"/>
-            </a:effectRef>
-            <a:fontRef idx="minor">
-              <a:schemeClr val="dk1"/>
-            </a:fontRef>
-          </p:style>
-          <p:txBody>
-            <a:bodyPr rtlCol="0" anchor="ctr"/>
-            <a:lstStyle/>
-            <a:p>
-              <a:pPr algn="ctr"/>
-              <a:r>
-                <a:rPr lang="en-US" sz="950" b="1" dirty="0" err="1" smtClean="0">
-                  <a:solidFill>
-                    <a:srgbClr val="0070C0"/>
-                  </a:solidFill>
-                </a:rPr>
-                <a:t>EditEventParser</a:t>
-              </a:r>
-              <a:endParaRPr lang="en-SG" sz="950" b="1" dirty="0">
-                <a:solidFill>
-                  <a:srgbClr val="0070C0"/>
-                </a:solidFill>
-              </a:endParaRPr>
-            </a:p>
-          </p:txBody>
-        </p:sp>
-        <p:cxnSp>
-          <p:nvCxnSpPr>
-            <p:cNvPr id="155" name="Elbow Connector 154"/>
-            <p:cNvCxnSpPr>
-              <a:endCxn id="153" idx="3"/>
-            </p:cNvCxnSpPr>
-            <p:nvPr/>
-          </p:nvCxnSpPr>
-          <p:spPr>
-            <a:xfrm flipV="1">
-              <a:off x="7010399" y="935380"/>
-              <a:ext cx="228601" cy="228600"/>
-            </a:xfrm>
-            <a:prstGeom prst="bentConnector3">
-              <a:avLst/>
-            </a:prstGeom>
-            <a:grpFill/>
-            <a:ln w="19050">
-              <a:solidFill>
-                <a:srgbClr val="0070C0"/>
-              </a:solidFill>
-              <a:headEnd type="none" w="med" len="med"/>
-              <a:tailEnd type="none" w="med" len="med"/>
-            </a:ln>
-            <a:effectLst/>
-          </p:spPr>
-          <p:style>
-            <a:lnRef idx="1">
-              <a:schemeClr val="accent2"/>
-            </a:lnRef>
-            <a:fillRef idx="2">
-              <a:schemeClr val="accent2"/>
-            </a:fillRef>
-            <a:effectRef idx="1">
-              <a:schemeClr val="accent2"/>
-            </a:effectRef>
-            <a:fontRef idx="minor">
-              <a:schemeClr val="dk1"/>
-            </a:fontRef>
-          </p:style>
-        </p:cxnSp>
-        <p:cxnSp>
-          <p:nvCxnSpPr>
-            <p:cNvPr id="156" name="Elbow Connector 155"/>
-            <p:cNvCxnSpPr>
-              <a:endCxn id="154" idx="3"/>
-            </p:cNvCxnSpPr>
-            <p:nvPr/>
-          </p:nvCxnSpPr>
-          <p:spPr>
-            <a:xfrm>
-              <a:off x="7010399" y="1163980"/>
-              <a:ext cx="228601" cy="228600"/>
-            </a:xfrm>
-            <a:prstGeom prst="bentConnector3">
-              <a:avLst>
-                <a:gd name="adj1" fmla="val 50000"/>
-              </a:avLst>
-            </a:prstGeom>
-            <a:grpFill/>
-            <a:ln w="19050">
-              <a:solidFill>
-                <a:srgbClr val="0070C0"/>
-              </a:solidFill>
-              <a:headEnd type="none" w="med" len="med"/>
-              <a:tailEnd type="none" w="med" len="med"/>
-            </a:ln>
-            <a:effectLst/>
-          </p:spPr>
-          <p:style>
-            <a:lnRef idx="1">
-              <a:schemeClr val="accent2"/>
-            </a:lnRef>
-            <a:fillRef idx="2">
-              <a:schemeClr val="accent2"/>
-            </a:fillRef>
-            <a:effectRef idx="1">
-              <a:schemeClr val="accent2"/>
-            </a:effectRef>
-            <a:fontRef idx="minor">
-              <a:schemeClr val="dk1"/>
-            </a:fontRef>
-          </p:style>
-        </p:cxnSp>
-      </p:grpSp>
       <p:sp>
         <p:nvSpPr>
           <p:cNvPr id="171" name="Rectangle 11"/>
@@ -14177,6 +11959,1436 @@
           </a:p>
         </p:txBody>
       </p:sp>
+      <p:sp>
+        <p:nvSpPr>
+          <p:cNvPr id="104" name="Rectangle 11"/>
+          <p:cNvSpPr/>
+          <p:nvPr/>
+        </p:nvSpPr>
+        <p:spPr>
+          <a:xfrm flipH="1">
+            <a:off x="5820675" y="2057400"/>
+            <a:ext cx="1343602" cy="270560"/>
+          </a:xfrm>
+          <a:prstGeom prst="rect">
+            <a:avLst/>
+          </a:prstGeom>
+          <a:ln w="19050">
+            <a:solidFill>
+              <a:srgbClr val="0070C0"/>
+            </a:solidFill>
+          </a:ln>
+          <a:effectLst/>
+        </p:spPr>
+        <p:style>
+          <a:lnRef idx="1">
+            <a:schemeClr val="accent1"/>
+          </a:lnRef>
+          <a:fillRef idx="2">
+            <a:schemeClr val="accent1"/>
+          </a:fillRef>
+          <a:effectRef idx="1">
+            <a:schemeClr val="accent1"/>
+          </a:effectRef>
+          <a:fontRef idx="minor">
+            <a:schemeClr val="dk1"/>
+          </a:fontRef>
+        </p:style>
+        <p:txBody>
+          <a:bodyPr rtlCol="0" anchor="ctr"/>
+          <a:lstStyle/>
+          <a:p>
+            <a:pPr algn="ctr"/>
+            <a:r>
+              <a:rPr lang="en-US" sz="900" b="1" dirty="0" err="1" smtClean="0">
+                <a:solidFill>
+                  <a:srgbClr val="0070C0"/>
+                </a:solidFill>
+              </a:rPr>
+              <a:t>EditEventCommand</a:t>
+            </a:r>
+            <a:endParaRPr lang="en-SG" sz="900" b="1" dirty="0">
+              <a:solidFill>
+                <a:srgbClr val="0070C0"/>
+              </a:solidFill>
+            </a:endParaRPr>
+          </a:p>
+        </p:txBody>
+      </p:sp>
+      <p:sp>
+        <p:nvSpPr>
+          <p:cNvPr id="105" name="Isosceles Triangle 102"/>
+          <p:cNvSpPr/>
+          <p:nvPr/>
+        </p:nvSpPr>
+        <p:spPr>
+          <a:xfrm rot="5400000" flipV="1">
+            <a:off x="5134110" y="2714491"/>
+            <a:ext cx="270504" cy="175523"/>
+          </a:xfrm>
+          <a:prstGeom prst="triangle">
+            <a:avLst/>
+          </a:prstGeom>
+          <a:ln w="19050">
+            <a:solidFill>
+              <a:srgbClr val="0070C0"/>
+            </a:solidFill>
+          </a:ln>
+          <a:effectLst/>
+        </p:spPr>
+        <p:style>
+          <a:lnRef idx="1">
+            <a:schemeClr val="accent1"/>
+          </a:lnRef>
+          <a:fillRef idx="2">
+            <a:schemeClr val="accent1"/>
+          </a:fillRef>
+          <a:effectRef idx="1">
+            <a:schemeClr val="accent1"/>
+          </a:effectRef>
+          <a:fontRef idx="minor">
+            <a:schemeClr val="dk1"/>
+          </a:fontRef>
+        </p:style>
+        <p:txBody>
+          <a:bodyPr rtlCol="0" anchor="ctr"/>
+          <a:lstStyle/>
+          <a:p>
+            <a:pPr algn="ctr"/>
+            <a:endParaRPr lang="en-SG" sz="1050" b="1">
+              <a:solidFill>
+                <a:srgbClr val="92D050"/>
+              </a:solidFill>
+            </a:endParaRPr>
+          </a:p>
+        </p:txBody>
+      </p:sp>
+      <p:sp>
+        <p:nvSpPr>
+          <p:cNvPr id="106" name="Rectangle 11"/>
+          <p:cNvSpPr/>
+          <p:nvPr/>
+        </p:nvSpPr>
+        <p:spPr>
+          <a:xfrm flipH="1">
+            <a:off x="5820675" y="2396440"/>
+            <a:ext cx="1343602" cy="270560"/>
+          </a:xfrm>
+          <a:prstGeom prst="rect">
+            <a:avLst/>
+          </a:prstGeom>
+          <a:ln w="19050">
+            <a:solidFill>
+              <a:srgbClr val="0070C0"/>
+            </a:solidFill>
+          </a:ln>
+          <a:effectLst/>
+        </p:spPr>
+        <p:style>
+          <a:lnRef idx="1">
+            <a:schemeClr val="accent1"/>
+          </a:lnRef>
+          <a:fillRef idx="2">
+            <a:schemeClr val="accent1"/>
+          </a:fillRef>
+          <a:effectRef idx="1">
+            <a:schemeClr val="accent1"/>
+          </a:effectRef>
+          <a:fontRef idx="minor">
+            <a:schemeClr val="dk1"/>
+          </a:fontRef>
+        </p:style>
+        <p:txBody>
+          <a:bodyPr rtlCol="0" anchor="ctr"/>
+          <a:lstStyle/>
+          <a:p>
+            <a:pPr algn="ctr"/>
+            <a:r>
+              <a:rPr lang="en-US" sz="900" b="1" dirty="0" err="1" smtClean="0">
+                <a:solidFill>
+                  <a:srgbClr val="0070C0"/>
+                </a:solidFill>
+              </a:rPr>
+              <a:t>SaveCommand</a:t>
+            </a:r>
+            <a:endParaRPr lang="en-SG" sz="900" b="1" dirty="0">
+              <a:solidFill>
+                <a:srgbClr val="0070C0"/>
+              </a:solidFill>
+            </a:endParaRPr>
+          </a:p>
+        </p:txBody>
+      </p:sp>
+      <p:sp>
+        <p:nvSpPr>
+          <p:cNvPr id="107" name="Rectangle 106"/>
+          <p:cNvSpPr/>
+          <p:nvPr/>
+        </p:nvSpPr>
+        <p:spPr>
+          <a:xfrm flipH="1">
+            <a:off x="5820673" y="3082240"/>
+            <a:ext cx="1343602" cy="270560"/>
+          </a:xfrm>
+          <a:prstGeom prst="rect">
+            <a:avLst/>
+          </a:prstGeom>
+          <a:ln w="19050">
+            <a:solidFill>
+              <a:srgbClr val="0070C0"/>
+            </a:solidFill>
+          </a:ln>
+          <a:effectLst/>
+        </p:spPr>
+        <p:style>
+          <a:lnRef idx="1">
+            <a:schemeClr val="accent1"/>
+          </a:lnRef>
+          <a:fillRef idx="2">
+            <a:schemeClr val="accent1"/>
+          </a:fillRef>
+          <a:effectRef idx="1">
+            <a:schemeClr val="accent1"/>
+          </a:effectRef>
+          <a:fontRef idx="minor">
+            <a:schemeClr val="dk1"/>
+          </a:fontRef>
+        </p:style>
+        <p:txBody>
+          <a:bodyPr rtlCol="0" anchor="ctr"/>
+          <a:lstStyle/>
+          <a:p>
+            <a:pPr algn="ctr"/>
+            <a:r>
+              <a:rPr lang="en-US" sz="900" b="1" dirty="0" err="1" smtClean="0">
+                <a:solidFill>
+                  <a:srgbClr val="0070C0"/>
+                </a:solidFill>
+              </a:rPr>
+              <a:t>DeleteEventCommand</a:t>
+            </a:r>
+            <a:endParaRPr lang="en-SG" sz="900" b="1" dirty="0">
+              <a:solidFill>
+                <a:srgbClr val="0070C0"/>
+              </a:solidFill>
+            </a:endParaRPr>
+          </a:p>
+        </p:txBody>
+      </p:sp>
+      <p:cxnSp>
+        <p:nvCxnSpPr>
+          <p:cNvPr id="108" name="Elbow Connector 63"/>
+          <p:cNvCxnSpPr>
+            <a:stCxn id="104" idx="3"/>
+            <a:endCxn id="105" idx="3"/>
+          </p:cNvCxnSpPr>
+          <p:nvPr/>
+        </p:nvCxnSpPr>
+        <p:spPr>
+          <a:xfrm rot="10800000" flipV="1">
+            <a:off x="5357125" y="2192679"/>
+            <a:ext cx="463551" cy="609573"/>
+          </a:xfrm>
+          <a:prstGeom prst="bentConnector3">
+            <a:avLst>
+              <a:gd name="adj1" fmla="val 50000"/>
+            </a:avLst>
+          </a:prstGeom>
+          <a:ln w="19050">
+            <a:solidFill>
+              <a:srgbClr val="0070C0"/>
+            </a:solidFill>
+            <a:headEnd type="none" w="med" len="med"/>
+            <a:tailEnd type="none" w="med" len="med"/>
+          </a:ln>
+          <a:effectLst/>
+        </p:spPr>
+        <p:style>
+          <a:lnRef idx="1">
+            <a:schemeClr val="accent2"/>
+          </a:lnRef>
+          <a:fillRef idx="2">
+            <a:schemeClr val="accent2"/>
+          </a:fillRef>
+          <a:effectRef idx="1">
+            <a:schemeClr val="accent2"/>
+          </a:effectRef>
+          <a:fontRef idx="minor">
+            <a:schemeClr val="dk1"/>
+          </a:fontRef>
+        </p:style>
+      </p:cxnSp>
+      <p:cxnSp>
+        <p:nvCxnSpPr>
+          <p:cNvPr id="109" name="Elbow Connector 63"/>
+          <p:cNvCxnSpPr>
+            <a:stCxn id="105" idx="3"/>
+            <a:endCxn id="107" idx="3"/>
+          </p:cNvCxnSpPr>
+          <p:nvPr/>
+        </p:nvCxnSpPr>
+        <p:spPr>
+          <a:xfrm>
+            <a:off x="5357124" y="2802253"/>
+            <a:ext cx="463549" cy="415267"/>
+          </a:xfrm>
+          <a:prstGeom prst="bentConnector3">
+            <a:avLst>
+              <a:gd name="adj1" fmla="val 50000"/>
+            </a:avLst>
+          </a:prstGeom>
+          <a:ln w="19050">
+            <a:solidFill>
+              <a:srgbClr val="0070C0"/>
+            </a:solidFill>
+            <a:headEnd type="none" w="med" len="med"/>
+            <a:tailEnd type="none" w="med" len="med"/>
+          </a:ln>
+          <a:effectLst/>
+        </p:spPr>
+        <p:style>
+          <a:lnRef idx="1">
+            <a:schemeClr val="accent2"/>
+          </a:lnRef>
+          <a:fillRef idx="2">
+            <a:schemeClr val="accent2"/>
+          </a:fillRef>
+          <a:effectRef idx="1">
+            <a:schemeClr val="accent2"/>
+          </a:effectRef>
+          <a:fontRef idx="minor">
+            <a:schemeClr val="dk1"/>
+          </a:fontRef>
+        </p:style>
+      </p:cxnSp>
+      <p:cxnSp>
+        <p:nvCxnSpPr>
+          <p:cNvPr id="110" name="Elbow Connector 63"/>
+          <p:cNvCxnSpPr>
+            <a:stCxn id="105" idx="3"/>
+            <a:endCxn id="106" idx="3"/>
+          </p:cNvCxnSpPr>
+          <p:nvPr/>
+        </p:nvCxnSpPr>
+        <p:spPr>
+          <a:xfrm flipV="1">
+            <a:off x="5357124" y="2531720"/>
+            <a:ext cx="463551" cy="270533"/>
+          </a:xfrm>
+          <a:prstGeom prst="bentConnector3">
+            <a:avLst>
+              <a:gd name="adj1" fmla="val 50000"/>
+            </a:avLst>
+          </a:prstGeom>
+          <a:ln w="19050">
+            <a:solidFill>
+              <a:srgbClr val="0070C0"/>
+            </a:solidFill>
+            <a:headEnd type="none" w="med" len="med"/>
+            <a:tailEnd type="none" w="med" len="med"/>
+          </a:ln>
+          <a:effectLst/>
+        </p:spPr>
+        <p:style>
+          <a:lnRef idx="1">
+            <a:schemeClr val="accent2"/>
+          </a:lnRef>
+          <a:fillRef idx="2">
+            <a:schemeClr val="accent2"/>
+          </a:fillRef>
+          <a:effectRef idx="1">
+            <a:schemeClr val="accent2"/>
+          </a:effectRef>
+          <a:fontRef idx="minor">
+            <a:schemeClr val="dk1"/>
+          </a:fontRef>
+        </p:style>
+      </p:cxnSp>
+      <p:sp>
+        <p:nvSpPr>
+          <p:cNvPr id="111" name="Rectangle 11"/>
+          <p:cNvSpPr/>
+          <p:nvPr/>
+        </p:nvSpPr>
+        <p:spPr>
+          <a:xfrm flipH="1">
+            <a:off x="5825473" y="2743200"/>
+            <a:ext cx="1343602" cy="270560"/>
+          </a:xfrm>
+          <a:prstGeom prst="rect">
+            <a:avLst/>
+          </a:prstGeom>
+          <a:ln w="19050">
+            <a:solidFill>
+              <a:srgbClr val="0070C0"/>
+            </a:solidFill>
+          </a:ln>
+          <a:effectLst/>
+        </p:spPr>
+        <p:style>
+          <a:lnRef idx="1">
+            <a:schemeClr val="accent1"/>
+          </a:lnRef>
+          <a:fillRef idx="2">
+            <a:schemeClr val="accent1"/>
+          </a:fillRef>
+          <a:effectRef idx="1">
+            <a:schemeClr val="accent1"/>
+          </a:effectRef>
+          <a:fontRef idx="minor">
+            <a:schemeClr val="dk1"/>
+          </a:fontRef>
+        </p:style>
+        <p:txBody>
+          <a:bodyPr rtlCol="0" anchor="ctr"/>
+          <a:lstStyle/>
+          <a:p>
+            <a:pPr algn="ctr"/>
+            <a:r>
+              <a:rPr lang="en-US" sz="900" b="1" dirty="0" err="1" smtClean="0">
+                <a:solidFill>
+                  <a:srgbClr val="0070C0"/>
+                </a:solidFill>
+              </a:rPr>
+              <a:t>DeleteTaskCommand</a:t>
+            </a:r>
+            <a:endParaRPr lang="en-SG" sz="900" b="1" dirty="0">
+              <a:solidFill>
+                <a:srgbClr val="0070C0"/>
+              </a:solidFill>
+            </a:endParaRPr>
+          </a:p>
+        </p:txBody>
+      </p:sp>
+      <p:cxnSp>
+        <p:nvCxnSpPr>
+          <p:cNvPr id="112" name="Elbow Connector 63"/>
+          <p:cNvCxnSpPr>
+            <a:stCxn id="105" idx="3"/>
+            <a:endCxn id="111" idx="3"/>
+          </p:cNvCxnSpPr>
+          <p:nvPr/>
+        </p:nvCxnSpPr>
+        <p:spPr>
+          <a:xfrm>
+            <a:off x="5357124" y="2802253"/>
+            <a:ext cx="468349" cy="76227"/>
+          </a:xfrm>
+          <a:prstGeom prst="bentConnector3">
+            <a:avLst>
+              <a:gd name="adj1" fmla="val 50000"/>
+            </a:avLst>
+          </a:prstGeom>
+          <a:ln w="19050">
+            <a:solidFill>
+              <a:srgbClr val="0070C0"/>
+            </a:solidFill>
+            <a:headEnd type="none" w="med" len="med"/>
+            <a:tailEnd type="none" w="med" len="med"/>
+          </a:ln>
+          <a:effectLst/>
+        </p:spPr>
+        <p:style>
+          <a:lnRef idx="1">
+            <a:schemeClr val="accent2"/>
+          </a:lnRef>
+          <a:fillRef idx="2">
+            <a:schemeClr val="accent2"/>
+          </a:fillRef>
+          <a:effectRef idx="1">
+            <a:schemeClr val="accent2"/>
+          </a:effectRef>
+          <a:fontRef idx="minor">
+            <a:schemeClr val="dk1"/>
+          </a:fontRef>
+        </p:style>
+      </p:cxnSp>
+      <p:sp>
+        <p:nvSpPr>
+          <p:cNvPr id="113" name="Rectangle 11"/>
+          <p:cNvSpPr/>
+          <p:nvPr/>
+        </p:nvSpPr>
+        <p:spPr>
+          <a:xfrm flipH="1">
+            <a:off x="5823996" y="1752600"/>
+            <a:ext cx="1343602" cy="228600"/>
+          </a:xfrm>
+          <a:prstGeom prst="rect">
+            <a:avLst/>
+          </a:prstGeom>
+          <a:ln w="19050">
+            <a:solidFill>
+              <a:srgbClr val="0070C0"/>
+            </a:solidFill>
+          </a:ln>
+          <a:effectLst/>
+        </p:spPr>
+        <p:style>
+          <a:lnRef idx="1">
+            <a:schemeClr val="accent1"/>
+          </a:lnRef>
+          <a:fillRef idx="2">
+            <a:schemeClr val="accent1"/>
+          </a:fillRef>
+          <a:effectRef idx="1">
+            <a:schemeClr val="accent1"/>
+          </a:effectRef>
+          <a:fontRef idx="minor">
+            <a:schemeClr val="dk1"/>
+          </a:fontRef>
+        </p:style>
+        <p:txBody>
+          <a:bodyPr rtlCol="0" anchor="ctr"/>
+          <a:lstStyle/>
+          <a:p>
+            <a:pPr algn="ctr"/>
+            <a:r>
+              <a:rPr lang="en-US" sz="900" b="1" dirty="0" err="1" smtClean="0">
+                <a:solidFill>
+                  <a:srgbClr val="0070C0"/>
+                </a:solidFill>
+              </a:rPr>
+              <a:t>EditTaskCommand</a:t>
+            </a:r>
+            <a:endParaRPr lang="en-SG" sz="900" b="1" dirty="0">
+              <a:solidFill>
+                <a:srgbClr val="0070C0"/>
+              </a:solidFill>
+            </a:endParaRPr>
+          </a:p>
+        </p:txBody>
+      </p:sp>
+      <p:sp>
+        <p:nvSpPr>
+          <p:cNvPr id="114" name="Rectangle 11"/>
+          <p:cNvSpPr/>
+          <p:nvPr/>
+        </p:nvSpPr>
+        <p:spPr>
+          <a:xfrm flipH="1">
+            <a:off x="5820675" y="1412768"/>
+            <a:ext cx="1343602" cy="263632"/>
+          </a:xfrm>
+          <a:prstGeom prst="rect">
+            <a:avLst/>
+          </a:prstGeom>
+          <a:ln w="19050">
+            <a:solidFill>
+              <a:srgbClr val="0070C0"/>
+            </a:solidFill>
+          </a:ln>
+          <a:effectLst/>
+        </p:spPr>
+        <p:style>
+          <a:lnRef idx="1">
+            <a:schemeClr val="accent1"/>
+          </a:lnRef>
+          <a:fillRef idx="2">
+            <a:schemeClr val="accent1"/>
+          </a:fillRef>
+          <a:effectRef idx="1">
+            <a:schemeClr val="accent1"/>
+          </a:effectRef>
+          <a:fontRef idx="minor">
+            <a:schemeClr val="dk1"/>
+          </a:fontRef>
+        </p:style>
+        <p:txBody>
+          <a:bodyPr rtlCol="0" anchor="ctr"/>
+          <a:lstStyle/>
+          <a:p>
+            <a:pPr algn="ctr"/>
+            <a:r>
+              <a:rPr lang="en-US" sz="900" b="1" dirty="0" err="1" smtClean="0">
+                <a:solidFill>
+                  <a:srgbClr val="0070C0"/>
+                </a:solidFill>
+              </a:rPr>
+              <a:t>AddEventCommand</a:t>
+            </a:r>
+            <a:endParaRPr lang="en-SG" sz="900" b="1" dirty="0">
+              <a:solidFill>
+                <a:srgbClr val="0070C0"/>
+              </a:solidFill>
+            </a:endParaRPr>
+          </a:p>
+        </p:txBody>
+      </p:sp>
+      <p:sp>
+        <p:nvSpPr>
+          <p:cNvPr id="115" name="Rectangle 114"/>
+          <p:cNvSpPr/>
+          <p:nvPr/>
+        </p:nvSpPr>
+        <p:spPr>
+          <a:xfrm flipH="1">
+            <a:off x="5819196" y="3733800"/>
+            <a:ext cx="1343602" cy="228600"/>
+          </a:xfrm>
+          <a:prstGeom prst="rect">
+            <a:avLst/>
+          </a:prstGeom>
+          <a:ln w="19050">
+            <a:solidFill>
+              <a:srgbClr val="0070C0"/>
+            </a:solidFill>
+          </a:ln>
+          <a:effectLst/>
+        </p:spPr>
+        <p:style>
+          <a:lnRef idx="1">
+            <a:schemeClr val="accent1"/>
+          </a:lnRef>
+          <a:fillRef idx="2">
+            <a:schemeClr val="accent1"/>
+          </a:fillRef>
+          <a:effectRef idx="1">
+            <a:schemeClr val="accent1"/>
+          </a:effectRef>
+          <a:fontRef idx="minor">
+            <a:schemeClr val="dk1"/>
+          </a:fontRef>
+        </p:style>
+        <p:txBody>
+          <a:bodyPr rtlCol="0" anchor="ctr"/>
+          <a:lstStyle/>
+          <a:p>
+            <a:pPr algn="ctr"/>
+            <a:r>
+              <a:rPr lang="en-US" sz="900" b="1" dirty="0" err="1" smtClean="0">
+                <a:solidFill>
+                  <a:srgbClr val="0070C0"/>
+                </a:solidFill>
+              </a:rPr>
+              <a:t>ListTaskCommand</a:t>
+            </a:r>
+            <a:endParaRPr lang="en-SG" sz="900" b="1" dirty="0">
+              <a:solidFill>
+                <a:srgbClr val="0070C0"/>
+              </a:solidFill>
+            </a:endParaRPr>
+          </a:p>
+        </p:txBody>
+      </p:sp>
+      <p:sp>
+        <p:nvSpPr>
+          <p:cNvPr id="116" name="Rectangle 11"/>
+          <p:cNvSpPr/>
+          <p:nvPr/>
+        </p:nvSpPr>
+        <p:spPr>
+          <a:xfrm flipH="1">
+            <a:off x="5823996" y="3429000"/>
+            <a:ext cx="1343602" cy="228600"/>
+          </a:xfrm>
+          <a:prstGeom prst="rect">
+            <a:avLst/>
+          </a:prstGeom>
+          <a:ln w="19050">
+            <a:solidFill>
+              <a:srgbClr val="0070C0"/>
+            </a:solidFill>
+          </a:ln>
+          <a:effectLst/>
+        </p:spPr>
+        <p:style>
+          <a:lnRef idx="1">
+            <a:schemeClr val="accent1"/>
+          </a:lnRef>
+          <a:fillRef idx="2">
+            <a:schemeClr val="accent1"/>
+          </a:fillRef>
+          <a:effectRef idx="1">
+            <a:schemeClr val="accent1"/>
+          </a:effectRef>
+          <a:fontRef idx="minor">
+            <a:schemeClr val="dk1"/>
+          </a:fontRef>
+        </p:style>
+        <p:txBody>
+          <a:bodyPr rtlCol="0" anchor="ctr"/>
+          <a:lstStyle/>
+          <a:p>
+            <a:pPr algn="ctr"/>
+            <a:r>
+              <a:rPr lang="en-US" sz="900" b="1" dirty="0" err="1" smtClean="0">
+                <a:solidFill>
+                  <a:srgbClr val="0070C0"/>
+                </a:solidFill>
+              </a:rPr>
+              <a:t>UndoCommand</a:t>
+            </a:r>
+            <a:endParaRPr lang="en-SG" sz="900" b="1" dirty="0">
+              <a:solidFill>
+                <a:srgbClr val="0070C0"/>
+              </a:solidFill>
+            </a:endParaRPr>
+          </a:p>
+        </p:txBody>
+      </p:sp>
+      <p:cxnSp>
+        <p:nvCxnSpPr>
+          <p:cNvPr id="117" name="Elbow Connector 116"/>
+          <p:cNvCxnSpPr>
+            <a:stCxn id="128" idx="3"/>
+            <a:endCxn id="105" idx="3"/>
+          </p:cNvCxnSpPr>
+          <p:nvPr/>
+        </p:nvCxnSpPr>
+        <p:spPr>
+          <a:xfrm rot="10800000" flipV="1">
+            <a:off x="5357124" y="1239783"/>
+            <a:ext cx="462074" cy="1562469"/>
+          </a:xfrm>
+          <a:prstGeom prst="bentConnector3">
+            <a:avLst>
+              <a:gd name="adj1" fmla="val 50000"/>
+            </a:avLst>
+          </a:prstGeom>
+          <a:ln w="19050">
+            <a:solidFill>
+              <a:srgbClr val="0070C0"/>
+            </a:solidFill>
+            <a:headEnd type="none" w="med" len="med"/>
+            <a:tailEnd type="none" w="med" len="med"/>
+          </a:ln>
+          <a:effectLst/>
+        </p:spPr>
+        <p:style>
+          <a:lnRef idx="1">
+            <a:schemeClr val="accent2"/>
+          </a:lnRef>
+          <a:fillRef idx="2">
+            <a:schemeClr val="accent2"/>
+          </a:fillRef>
+          <a:effectRef idx="1">
+            <a:schemeClr val="accent2"/>
+          </a:effectRef>
+          <a:fontRef idx="minor">
+            <a:schemeClr val="dk1"/>
+          </a:fontRef>
+        </p:style>
+      </p:cxnSp>
+      <p:sp>
+        <p:nvSpPr>
+          <p:cNvPr id="118" name="Rectangle 117"/>
+          <p:cNvSpPr/>
+          <p:nvPr/>
+        </p:nvSpPr>
+        <p:spPr>
+          <a:xfrm flipH="1">
+            <a:off x="5823997" y="4038600"/>
+            <a:ext cx="1343602" cy="228600"/>
+          </a:xfrm>
+          <a:prstGeom prst="rect">
+            <a:avLst/>
+          </a:prstGeom>
+          <a:ln w="19050">
+            <a:solidFill>
+              <a:srgbClr val="0070C0"/>
+            </a:solidFill>
+          </a:ln>
+          <a:effectLst/>
+        </p:spPr>
+        <p:style>
+          <a:lnRef idx="1">
+            <a:schemeClr val="accent1"/>
+          </a:lnRef>
+          <a:fillRef idx="2">
+            <a:schemeClr val="accent1"/>
+          </a:fillRef>
+          <a:effectRef idx="1">
+            <a:schemeClr val="accent1"/>
+          </a:effectRef>
+          <a:fontRef idx="minor">
+            <a:schemeClr val="dk1"/>
+          </a:fontRef>
+        </p:style>
+        <p:txBody>
+          <a:bodyPr rtlCol="0" anchor="ctr"/>
+          <a:lstStyle/>
+          <a:p>
+            <a:pPr algn="ctr"/>
+            <a:r>
+              <a:rPr lang="en-US" sz="900" b="1" dirty="0" err="1" smtClean="0">
+                <a:solidFill>
+                  <a:srgbClr val="0070C0"/>
+                </a:solidFill>
+              </a:rPr>
+              <a:t>ListEventCommand</a:t>
+            </a:r>
+            <a:endParaRPr lang="en-SG" sz="900" b="1" dirty="0">
+              <a:solidFill>
+                <a:srgbClr val="0070C0"/>
+              </a:solidFill>
+            </a:endParaRPr>
+          </a:p>
+        </p:txBody>
+      </p:sp>
+      <p:cxnSp>
+        <p:nvCxnSpPr>
+          <p:cNvPr id="119" name="Elbow Connector 118"/>
+          <p:cNvCxnSpPr>
+            <a:stCxn id="105" idx="3"/>
+            <a:endCxn id="118" idx="3"/>
+          </p:cNvCxnSpPr>
+          <p:nvPr/>
+        </p:nvCxnSpPr>
+        <p:spPr>
+          <a:xfrm>
+            <a:off x="5357124" y="2802253"/>
+            <a:ext cx="466873" cy="1350647"/>
+          </a:xfrm>
+          <a:prstGeom prst="bentConnector3">
+            <a:avLst>
+              <a:gd name="adj1" fmla="val 50000"/>
+            </a:avLst>
+          </a:prstGeom>
+          <a:ln w="19050">
+            <a:solidFill>
+              <a:srgbClr val="0070C0"/>
+            </a:solidFill>
+            <a:headEnd type="none" w="med" len="med"/>
+            <a:tailEnd type="none" w="med" len="med"/>
+          </a:ln>
+          <a:effectLst/>
+        </p:spPr>
+        <p:style>
+          <a:lnRef idx="1">
+            <a:schemeClr val="accent2"/>
+          </a:lnRef>
+          <a:fillRef idx="2">
+            <a:schemeClr val="accent2"/>
+          </a:fillRef>
+          <a:effectRef idx="1">
+            <a:schemeClr val="accent2"/>
+          </a:effectRef>
+          <a:fontRef idx="minor">
+            <a:schemeClr val="dk1"/>
+          </a:fontRef>
+        </p:style>
+      </p:cxnSp>
+      <p:cxnSp>
+        <p:nvCxnSpPr>
+          <p:cNvPr id="120" name="Elbow Connector 119"/>
+          <p:cNvCxnSpPr>
+            <a:stCxn id="105" idx="3"/>
+            <a:endCxn id="114" idx="3"/>
+          </p:cNvCxnSpPr>
+          <p:nvPr/>
+        </p:nvCxnSpPr>
+        <p:spPr>
+          <a:xfrm flipV="1">
+            <a:off x="5357124" y="1544584"/>
+            <a:ext cx="463551" cy="1257669"/>
+          </a:xfrm>
+          <a:prstGeom prst="bentConnector3">
+            <a:avLst/>
+          </a:prstGeom>
+          <a:ln w="19050">
+            <a:solidFill>
+              <a:srgbClr val="0070C0"/>
+            </a:solidFill>
+            <a:headEnd type="none" w="med" len="med"/>
+            <a:tailEnd type="none" w="med" len="med"/>
+          </a:ln>
+          <a:effectLst/>
+        </p:spPr>
+        <p:style>
+          <a:lnRef idx="1">
+            <a:schemeClr val="accent2"/>
+          </a:lnRef>
+          <a:fillRef idx="2">
+            <a:schemeClr val="accent2"/>
+          </a:fillRef>
+          <a:effectRef idx="1">
+            <a:schemeClr val="accent2"/>
+          </a:effectRef>
+          <a:fontRef idx="minor">
+            <a:schemeClr val="dk1"/>
+          </a:fontRef>
+        </p:style>
+      </p:cxnSp>
+      <p:cxnSp>
+        <p:nvCxnSpPr>
+          <p:cNvPr id="121" name="Elbow Connector 120"/>
+          <p:cNvCxnSpPr>
+            <a:stCxn id="105" idx="3"/>
+            <a:endCxn id="113" idx="3"/>
+          </p:cNvCxnSpPr>
+          <p:nvPr/>
+        </p:nvCxnSpPr>
+        <p:spPr>
+          <a:xfrm flipV="1">
+            <a:off x="5357124" y="1866900"/>
+            <a:ext cx="466872" cy="935353"/>
+          </a:xfrm>
+          <a:prstGeom prst="bentConnector3">
+            <a:avLst>
+              <a:gd name="adj1" fmla="val 50000"/>
+            </a:avLst>
+          </a:prstGeom>
+          <a:ln w="19050">
+            <a:solidFill>
+              <a:srgbClr val="0070C0"/>
+            </a:solidFill>
+            <a:headEnd type="none" w="med" len="med"/>
+            <a:tailEnd type="none" w="med" len="med"/>
+          </a:ln>
+          <a:effectLst/>
+        </p:spPr>
+        <p:style>
+          <a:lnRef idx="1">
+            <a:schemeClr val="accent2"/>
+          </a:lnRef>
+          <a:fillRef idx="2">
+            <a:schemeClr val="accent2"/>
+          </a:fillRef>
+          <a:effectRef idx="1">
+            <a:schemeClr val="accent2"/>
+          </a:effectRef>
+          <a:fontRef idx="minor">
+            <a:schemeClr val="dk1"/>
+          </a:fontRef>
+        </p:style>
+      </p:cxnSp>
+      <p:cxnSp>
+        <p:nvCxnSpPr>
+          <p:cNvPr id="122" name="Elbow Connector 121"/>
+          <p:cNvCxnSpPr>
+            <a:stCxn id="105" idx="3"/>
+            <a:endCxn id="115" idx="3"/>
+          </p:cNvCxnSpPr>
+          <p:nvPr/>
+        </p:nvCxnSpPr>
+        <p:spPr>
+          <a:xfrm>
+            <a:off x="5357124" y="2802253"/>
+            <a:ext cx="462072" cy="1045847"/>
+          </a:xfrm>
+          <a:prstGeom prst="bentConnector3">
+            <a:avLst/>
+          </a:prstGeom>
+          <a:ln w="19050">
+            <a:solidFill>
+              <a:srgbClr val="0070C0"/>
+            </a:solidFill>
+            <a:headEnd type="none" w="med" len="med"/>
+            <a:tailEnd type="none" w="med" len="med"/>
+          </a:ln>
+          <a:effectLst/>
+        </p:spPr>
+        <p:style>
+          <a:lnRef idx="1">
+            <a:schemeClr val="accent2"/>
+          </a:lnRef>
+          <a:fillRef idx="2">
+            <a:schemeClr val="accent2"/>
+          </a:fillRef>
+          <a:effectRef idx="1">
+            <a:schemeClr val="accent2"/>
+          </a:effectRef>
+          <a:fontRef idx="minor">
+            <a:schemeClr val="dk1"/>
+          </a:fontRef>
+        </p:style>
+      </p:cxnSp>
+      <p:cxnSp>
+        <p:nvCxnSpPr>
+          <p:cNvPr id="123" name="Elbow Connector 122"/>
+          <p:cNvCxnSpPr>
+            <a:stCxn id="116" idx="3"/>
+            <a:endCxn id="105" idx="3"/>
+          </p:cNvCxnSpPr>
+          <p:nvPr/>
+        </p:nvCxnSpPr>
+        <p:spPr>
+          <a:xfrm rot="10800000">
+            <a:off x="5357124" y="2802254"/>
+            <a:ext cx="466872" cy="741047"/>
+          </a:xfrm>
+          <a:prstGeom prst="bentConnector3">
+            <a:avLst>
+              <a:gd name="adj1" fmla="val 50000"/>
+            </a:avLst>
+          </a:prstGeom>
+          <a:ln w="19050">
+            <a:solidFill>
+              <a:srgbClr val="0070C0"/>
+            </a:solidFill>
+            <a:headEnd type="none" w="med" len="med"/>
+            <a:tailEnd type="none" w="med" len="med"/>
+          </a:ln>
+          <a:effectLst/>
+        </p:spPr>
+        <p:style>
+          <a:lnRef idx="1">
+            <a:schemeClr val="accent2"/>
+          </a:lnRef>
+          <a:fillRef idx="2">
+            <a:schemeClr val="accent2"/>
+          </a:fillRef>
+          <a:effectRef idx="1">
+            <a:schemeClr val="accent2"/>
+          </a:effectRef>
+          <a:fontRef idx="minor">
+            <a:schemeClr val="dk1"/>
+          </a:fontRef>
+        </p:style>
+      </p:cxnSp>
+      <p:sp>
+        <p:nvSpPr>
+          <p:cNvPr id="124" name="Rectangle 123"/>
+          <p:cNvSpPr/>
+          <p:nvPr/>
+        </p:nvSpPr>
+        <p:spPr>
+          <a:xfrm flipH="1">
+            <a:off x="5814396" y="4648200"/>
+            <a:ext cx="1343602" cy="228600"/>
+          </a:xfrm>
+          <a:prstGeom prst="rect">
+            <a:avLst/>
+          </a:prstGeom>
+          <a:ln w="19050">
+            <a:solidFill>
+              <a:srgbClr val="0070C0"/>
+            </a:solidFill>
+          </a:ln>
+          <a:effectLst/>
+        </p:spPr>
+        <p:style>
+          <a:lnRef idx="1">
+            <a:schemeClr val="accent1"/>
+          </a:lnRef>
+          <a:fillRef idx="2">
+            <a:schemeClr val="accent1"/>
+          </a:fillRef>
+          <a:effectRef idx="1">
+            <a:schemeClr val="accent1"/>
+          </a:effectRef>
+          <a:fontRef idx="minor">
+            <a:schemeClr val="dk1"/>
+          </a:fontRef>
+        </p:style>
+        <p:txBody>
+          <a:bodyPr rtlCol="0" anchor="ctr"/>
+          <a:lstStyle/>
+          <a:p>
+            <a:pPr algn="ctr"/>
+            <a:r>
+              <a:rPr lang="en-US" sz="900" b="1" dirty="0" err="1" smtClean="0">
+                <a:solidFill>
+                  <a:srgbClr val="0070C0"/>
+                </a:solidFill>
+              </a:rPr>
+              <a:t>MarkCommand</a:t>
+            </a:r>
+            <a:endParaRPr lang="en-SG" sz="900" b="1" dirty="0">
+              <a:solidFill>
+                <a:srgbClr val="0070C0"/>
+              </a:solidFill>
+            </a:endParaRPr>
+          </a:p>
+        </p:txBody>
+      </p:sp>
+      <p:sp>
+        <p:nvSpPr>
+          <p:cNvPr id="125" name="Rectangle 11"/>
+          <p:cNvSpPr/>
+          <p:nvPr/>
+        </p:nvSpPr>
+        <p:spPr>
+          <a:xfrm flipH="1">
+            <a:off x="5819196" y="4343400"/>
+            <a:ext cx="1343602" cy="228600"/>
+          </a:xfrm>
+          <a:prstGeom prst="rect">
+            <a:avLst/>
+          </a:prstGeom>
+          <a:ln w="19050">
+            <a:solidFill>
+              <a:srgbClr val="0070C0"/>
+            </a:solidFill>
+          </a:ln>
+          <a:effectLst/>
+        </p:spPr>
+        <p:style>
+          <a:lnRef idx="1">
+            <a:schemeClr val="accent1"/>
+          </a:lnRef>
+          <a:fillRef idx="2">
+            <a:schemeClr val="accent1"/>
+          </a:fillRef>
+          <a:effectRef idx="1">
+            <a:schemeClr val="accent1"/>
+          </a:effectRef>
+          <a:fontRef idx="minor">
+            <a:schemeClr val="dk1"/>
+          </a:fontRef>
+        </p:style>
+        <p:txBody>
+          <a:bodyPr rtlCol="0" anchor="ctr"/>
+          <a:lstStyle/>
+          <a:p>
+            <a:pPr algn="ctr"/>
+            <a:r>
+              <a:rPr lang="en-US" sz="900" b="1" dirty="0" err="1" smtClean="0">
+                <a:solidFill>
+                  <a:srgbClr val="0070C0"/>
+                </a:solidFill>
+              </a:rPr>
+              <a:t>HelpCommand</a:t>
+            </a:r>
+            <a:endParaRPr lang="en-SG" sz="900" b="1" dirty="0">
+              <a:solidFill>
+                <a:srgbClr val="0070C0"/>
+              </a:solidFill>
+            </a:endParaRPr>
+          </a:p>
+        </p:txBody>
+      </p:sp>
+      <p:sp>
+        <p:nvSpPr>
+          <p:cNvPr id="126" name="Rectangle 125"/>
+          <p:cNvSpPr/>
+          <p:nvPr/>
+        </p:nvSpPr>
+        <p:spPr>
+          <a:xfrm flipH="1">
+            <a:off x="5819197" y="4953000"/>
+            <a:ext cx="1343602" cy="228600"/>
+          </a:xfrm>
+          <a:prstGeom prst="rect">
+            <a:avLst/>
+          </a:prstGeom>
+          <a:ln w="19050">
+            <a:solidFill>
+              <a:srgbClr val="0070C0"/>
+            </a:solidFill>
+          </a:ln>
+          <a:effectLst/>
+        </p:spPr>
+        <p:style>
+          <a:lnRef idx="1">
+            <a:schemeClr val="accent1"/>
+          </a:lnRef>
+          <a:fillRef idx="2">
+            <a:schemeClr val="accent1"/>
+          </a:fillRef>
+          <a:effectRef idx="1">
+            <a:schemeClr val="accent1"/>
+          </a:effectRef>
+          <a:fontRef idx="minor">
+            <a:schemeClr val="dk1"/>
+          </a:fontRef>
+        </p:style>
+        <p:txBody>
+          <a:bodyPr rtlCol="0" anchor="ctr"/>
+          <a:lstStyle/>
+          <a:p>
+            <a:pPr algn="ctr"/>
+            <a:r>
+              <a:rPr lang="en-US" sz="900" b="1" dirty="0" err="1" smtClean="0">
+                <a:solidFill>
+                  <a:srgbClr val="0070C0"/>
+                </a:solidFill>
+              </a:rPr>
+              <a:t>SearchCommand</a:t>
+            </a:r>
+            <a:endParaRPr lang="en-SG" sz="900" b="1" dirty="0">
+              <a:solidFill>
+                <a:srgbClr val="0070C0"/>
+              </a:solidFill>
+            </a:endParaRPr>
+          </a:p>
+        </p:txBody>
+      </p:sp>
+      <p:sp>
+        <p:nvSpPr>
+          <p:cNvPr id="127" name="Rectangle 126"/>
+          <p:cNvSpPr/>
+          <p:nvPr/>
+        </p:nvSpPr>
+        <p:spPr>
+          <a:xfrm flipH="1">
+            <a:off x="5819198" y="5257800"/>
+            <a:ext cx="1343602" cy="228600"/>
+          </a:xfrm>
+          <a:prstGeom prst="rect">
+            <a:avLst/>
+          </a:prstGeom>
+          <a:ln w="19050">
+            <a:solidFill>
+              <a:srgbClr val="0070C0"/>
+            </a:solidFill>
+          </a:ln>
+          <a:effectLst/>
+        </p:spPr>
+        <p:style>
+          <a:lnRef idx="1">
+            <a:schemeClr val="accent1"/>
+          </a:lnRef>
+          <a:fillRef idx="2">
+            <a:schemeClr val="accent1"/>
+          </a:fillRef>
+          <a:effectRef idx="1">
+            <a:schemeClr val="accent1"/>
+          </a:effectRef>
+          <a:fontRef idx="minor">
+            <a:schemeClr val="dk1"/>
+          </a:fontRef>
+        </p:style>
+        <p:txBody>
+          <a:bodyPr rtlCol="0" anchor="ctr"/>
+          <a:lstStyle/>
+          <a:p>
+            <a:pPr algn="ctr"/>
+            <a:r>
+              <a:rPr lang="en-US" sz="900" b="1" dirty="0" err="1" smtClean="0">
+                <a:solidFill>
+                  <a:srgbClr val="0070C0"/>
+                </a:solidFill>
+              </a:rPr>
+              <a:t>ExitCommand</a:t>
+            </a:r>
+            <a:endParaRPr lang="en-SG" sz="900" b="1" dirty="0">
+              <a:solidFill>
+                <a:srgbClr val="0070C0"/>
+              </a:solidFill>
+            </a:endParaRPr>
+          </a:p>
+        </p:txBody>
+      </p:sp>
+      <p:sp>
+        <p:nvSpPr>
+          <p:cNvPr id="128" name="Rectangle 11"/>
+          <p:cNvSpPr/>
+          <p:nvPr/>
+        </p:nvSpPr>
+        <p:spPr>
+          <a:xfrm flipH="1">
+            <a:off x="5819198" y="1107968"/>
+            <a:ext cx="1343602" cy="263632"/>
+          </a:xfrm>
+          <a:prstGeom prst="rect">
+            <a:avLst/>
+          </a:prstGeom>
+          <a:ln w="19050">
+            <a:solidFill>
+              <a:srgbClr val="0070C0"/>
+            </a:solidFill>
+          </a:ln>
+          <a:effectLst/>
+        </p:spPr>
+        <p:style>
+          <a:lnRef idx="1">
+            <a:schemeClr val="accent1"/>
+          </a:lnRef>
+          <a:fillRef idx="2">
+            <a:schemeClr val="accent1"/>
+          </a:fillRef>
+          <a:effectRef idx="1">
+            <a:schemeClr val="accent1"/>
+          </a:effectRef>
+          <a:fontRef idx="minor">
+            <a:schemeClr val="dk1"/>
+          </a:fontRef>
+        </p:style>
+        <p:txBody>
+          <a:bodyPr rtlCol="0" anchor="ctr"/>
+          <a:lstStyle/>
+          <a:p>
+            <a:pPr algn="ctr"/>
+            <a:r>
+              <a:rPr lang="en-US" sz="900" b="1" dirty="0" err="1" smtClean="0">
+                <a:solidFill>
+                  <a:srgbClr val="0070C0"/>
+                </a:solidFill>
+              </a:rPr>
+              <a:t>AddTaskCommand</a:t>
+            </a:r>
+            <a:endParaRPr lang="en-SG" sz="900" b="1" dirty="0">
+              <a:solidFill>
+                <a:srgbClr val="0070C0"/>
+              </a:solidFill>
+            </a:endParaRPr>
+          </a:p>
+        </p:txBody>
+      </p:sp>
+      <p:cxnSp>
+        <p:nvCxnSpPr>
+          <p:cNvPr id="129" name="Elbow Connector 128"/>
+          <p:cNvCxnSpPr>
+            <a:stCxn id="105" idx="3"/>
+            <a:endCxn id="125" idx="3"/>
+          </p:cNvCxnSpPr>
+          <p:nvPr/>
+        </p:nvCxnSpPr>
+        <p:spPr>
+          <a:xfrm>
+            <a:off x="5357124" y="2802253"/>
+            <a:ext cx="462072" cy="1655447"/>
+          </a:xfrm>
+          <a:prstGeom prst="bentConnector3">
+            <a:avLst>
+              <a:gd name="adj1" fmla="val 50000"/>
+            </a:avLst>
+          </a:prstGeom>
+          <a:ln w="19050">
+            <a:solidFill>
+              <a:srgbClr val="0070C0"/>
+            </a:solidFill>
+            <a:headEnd type="none" w="med" len="med"/>
+            <a:tailEnd type="none" w="med" len="med"/>
+          </a:ln>
+          <a:effectLst/>
+        </p:spPr>
+        <p:style>
+          <a:lnRef idx="1">
+            <a:schemeClr val="accent2"/>
+          </a:lnRef>
+          <a:fillRef idx="2">
+            <a:schemeClr val="accent2"/>
+          </a:fillRef>
+          <a:effectRef idx="1">
+            <a:schemeClr val="accent2"/>
+          </a:effectRef>
+          <a:fontRef idx="minor">
+            <a:schemeClr val="dk1"/>
+          </a:fontRef>
+        </p:style>
+      </p:cxnSp>
+      <p:cxnSp>
+        <p:nvCxnSpPr>
+          <p:cNvPr id="130" name="Elbow Connector 129"/>
+          <p:cNvCxnSpPr>
+            <a:stCxn id="105" idx="3"/>
+            <a:endCxn id="124" idx="3"/>
+          </p:cNvCxnSpPr>
+          <p:nvPr/>
+        </p:nvCxnSpPr>
+        <p:spPr>
+          <a:xfrm>
+            <a:off x="5357124" y="2802253"/>
+            <a:ext cx="457272" cy="1960247"/>
+          </a:xfrm>
+          <a:prstGeom prst="bentConnector3">
+            <a:avLst>
+              <a:gd name="adj1" fmla="val 50000"/>
+            </a:avLst>
+          </a:prstGeom>
+          <a:ln w="19050">
+            <a:solidFill>
+              <a:srgbClr val="0070C0"/>
+            </a:solidFill>
+            <a:headEnd type="none" w="med" len="med"/>
+            <a:tailEnd type="none" w="med" len="med"/>
+          </a:ln>
+          <a:effectLst/>
+        </p:spPr>
+        <p:style>
+          <a:lnRef idx="1">
+            <a:schemeClr val="accent2"/>
+          </a:lnRef>
+          <a:fillRef idx="2">
+            <a:schemeClr val="accent2"/>
+          </a:fillRef>
+          <a:effectRef idx="1">
+            <a:schemeClr val="accent2"/>
+          </a:effectRef>
+          <a:fontRef idx="minor">
+            <a:schemeClr val="dk1"/>
+          </a:fontRef>
+        </p:style>
+      </p:cxnSp>
+      <p:cxnSp>
+        <p:nvCxnSpPr>
+          <p:cNvPr id="131" name="Elbow Connector 130"/>
+          <p:cNvCxnSpPr>
+            <a:stCxn id="105" idx="3"/>
+            <a:endCxn id="126" idx="3"/>
+          </p:cNvCxnSpPr>
+          <p:nvPr/>
+        </p:nvCxnSpPr>
+        <p:spPr>
+          <a:xfrm>
+            <a:off x="5357124" y="2802253"/>
+            <a:ext cx="462073" cy="2265047"/>
+          </a:xfrm>
+          <a:prstGeom prst="bentConnector3">
+            <a:avLst>
+              <a:gd name="adj1" fmla="val 50000"/>
+            </a:avLst>
+          </a:prstGeom>
+          <a:ln w="19050">
+            <a:solidFill>
+              <a:srgbClr val="0070C0"/>
+            </a:solidFill>
+            <a:headEnd type="none" w="med" len="med"/>
+            <a:tailEnd type="none" w="med" len="med"/>
+          </a:ln>
+          <a:effectLst/>
+        </p:spPr>
+        <p:style>
+          <a:lnRef idx="1">
+            <a:schemeClr val="accent2"/>
+          </a:lnRef>
+          <a:fillRef idx="2">
+            <a:schemeClr val="accent2"/>
+          </a:fillRef>
+          <a:effectRef idx="1">
+            <a:schemeClr val="accent2"/>
+          </a:effectRef>
+          <a:fontRef idx="minor">
+            <a:schemeClr val="dk1"/>
+          </a:fontRef>
+        </p:style>
+      </p:cxnSp>
+      <p:cxnSp>
+        <p:nvCxnSpPr>
+          <p:cNvPr id="132" name="Elbow Connector 131"/>
+          <p:cNvCxnSpPr>
+            <a:stCxn id="127" idx="3"/>
+            <a:endCxn id="105" idx="3"/>
+          </p:cNvCxnSpPr>
+          <p:nvPr/>
+        </p:nvCxnSpPr>
+        <p:spPr>
+          <a:xfrm rot="10800000">
+            <a:off x="5357124" y="2802254"/>
+            <a:ext cx="462074" cy="2569847"/>
+          </a:xfrm>
+          <a:prstGeom prst="bentConnector3">
+            <a:avLst>
+              <a:gd name="adj1" fmla="val 50000"/>
+            </a:avLst>
+          </a:prstGeom>
+          <a:ln w="19050">
+            <a:solidFill>
+              <a:srgbClr val="0070C0"/>
+            </a:solidFill>
+            <a:headEnd type="none" w="med" len="med"/>
+            <a:tailEnd type="none" w="med" len="med"/>
+          </a:ln>
+          <a:effectLst/>
+        </p:spPr>
+        <p:style>
+          <a:lnRef idx="1">
+            <a:schemeClr val="accent2"/>
+          </a:lnRef>
+          <a:fillRef idx="2">
+            <a:schemeClr val="accent2"/>
+          </a:fillRef>
+          <a:effectRef idx="1">
+            <a:schemeClr val="accent2"/>
+          </a:effectRef>
+          <a:fontRef idx="minor">
+            <a:schemeClr val="dk1"/>
+          </a:fontRef>
+        </p:style>
+      </p:cxnSp>
     </p:spTree>
     <p:extLst>
       <p:ext uri="{BB962C8B-B14F-4D97-AF65-F5344CB8AC3E}">

</xml_diff>

<commit_message>
fix some class names
</commit_message>
<xml_diff>
--- a/docs/diagrams/Diagrams.pptx
+++ b/docs/diagrams/Diagrams.pptx
@@ -9745,9 +9745,9 @@
             </a:avLst>
           </a:prstGeom>
           <a:solidFill>
-            <a:schemeClr val="accent1">
-              <a:lumMod val="20000"/>
-              <a:lumOff val="80000"/>
+            <a:schemeClr val="accent4">
+              <a:lumMod val="40000"/>
+              <a:lumOff val="60000"/>
             </a:schemeClr>
           </a:solidFill>
           <a:ln w="19050">
@@ -9862,6 +9862,12 @@
           <a:prstGeom prst="rect">
             <a:avLst/>
           </a:prstGeom>
+          <a:solidFill>
+            <a:schemeClr val="accent3">
+              <a:lumMod val="40000"/>
+              <a:lumOff val="60000"/>
+            </a:schemeClr>
+          </a:solidFill>
           <a:ln w="19050">
             <a:solidFill>
               <a:srgbClr val="0070C0"/>
@@ -10020,6 +10026,12 @@
           <a:prstGeom prst="triangle">
             <a:avLst/>
           </a:prstGeom>
+          <a:solidFill>
+            <a:schemeClr val="accent3">
+              <a:lumMod val="40000"/>
+              <a:lumOff val="60000"/>
+            </a:schemeClr>
+          </a:solidFill>
           <a:ln w="19050">
             <a:solidFill>
               <a:srgbClr val="0070C0"/>
@@ -10171,6 +10183,12 @@
           <a:prstGeom prst="rect">
             <a:avLst/>
           </a:prstGeom>
+          <a:solidFill>
+            <a:schemeClr val="accent3">
+              <a:lumMod val="40000"/>
+              <a:lumOff val="60000"/>
+            </a:schemeClr>
+          </a:solidFill>
           <a:ln w="19050">
             <a:solidFill>
               <a:srgbClr val="0070C0"/>
@@ -10227,6 +10245,12 @@
           <a:prstGeom prst="rect">
             <a:avLst/>
           </a:prstGeom>
+          <a:solidFill>
+            <a:schemeClr val="accent3">
+              <a:lumMod val="40000"/>
+              <a:lumOff val="60000"/>
+            </a:schemeClr>
+          </a:solidFill>
           <a:ln w="19050">
             <a:solidFill>
               <a:srgbClr val="0070C0"/>
@@ -10283,6 +10307,12 @@
           <a:prstGeom prst="rect">
             <a:avLst/>
           </a:prstGeom>
+          <a:solidFill>
+            <a:schemeClr val="accent3">
+              <a:lumMod val="40000"/>
+              <a:lumOff val="60000"/>
+            </a:schemeClr>
+          </a:solidFill>
           <a:ln w="19050">
             <a:solidFill>
               <a:srgbClr val="0070C0"/>
@@ -11339,6 +11369,12 @@
           <a:prstGeom prst="rect">
             <a:avLst/>
           </a:prstGeom>
+          <a:solidFill>
+            <a:schemeClr val="accent3">
+              <a:lumMod val="40000"/>
+              <a:lumOff val="60000"/>
+            </a:schemeClr>
+          </a:solidFill>
           <a:ln w="19050">
             <a:solidFill>
               <a:srgbClr val="0070C0"/>
@@ -11534,7 +11570,7 @@
             </a:avLst>
           </a:prstGeom>
           <a:solidFill>
-            <a:schemeClr val="accent1">
+            <a:schemeClr val="accent4">
               <a:lumMod val="20000"/>
               <a:lumOff val="80000"/>
             </a:schemeClr>
@@ -12050,8 +12086,8 @@
         </p:nvCxnSpPr>
         <p:spPr>
           <a:xfrm>
-            <a:off x="543018" y="3014599"/>
-            <a:ext cx="1119851" cy="0"/>
+            <a:off x="152400" y="3010911"/>
+            <a:ext cx="1510469" cy="3688"/>
           </a:xfrm>
           <a:prstGeom prst="straightConnector1">
             <a:avLst/>
@@ -12360,10 +12396,7 @@
             <a:avLst/>
           </a:prstGeom>
           <a:solidFill>
-            <a:schemeClr val="accent4">
-              <a:lumMod val="60000"/>
-              <a:lumOff val="40000"/>
-            </a:schemeClr>
+            <a:srgbClr val="7030A0"/>
           </a:solidFill>
           <a:ln w="19050">
             <a:solidFill>
@@ -12509,10 +12542,7 @@
           </a:prstGeom>
           <a:ln w="19050">
             <a:solidFill>
-              <a:schemeClr val="accent4">
-                <a:lumMod val="60000"/>
-                <a:lumOff val="40000"/>
-              </a:schemeClr>
+              <a:srgbClr val="7030A0"/>
             </a:solidFill>
             <a:prstDash val="sysDash"/>
           </a:ln>
@@ -12548,10 +12578,7 @@
             <a:avLst/>
           </a:prstGeom>
           <a:solidFill>
-            <a:schemeClr val="accent4">
-              <a:lumMod val="60000"/>
-              <a:lumOff val="40000"/>
-            </a:schemeClr>
+            <a:srgbClr val="7030A0"/>
           </a:solidFill>
           <a:ln>
             <a:solidFill>
@@ -12642,10 +12669,7 @@
           </a:prstGeom>
           <a:ln w="19050">
             <a:solidFill>
-              <a:schemeClr val="accent4">
-                <a:lumMod val="60000"/>
-                <a:lumOff val="40000"/>
-              </a:schemeClr>
+              <a:srgbClr val="7030A0"/>
             </a:solidFill>
             <a:prstDash val="sysDash"/>
             <a:headEnd type="arrow" w="med" len="med"/>
@@ -14961,7 +14985,7 @@
                   <a:srgbClr val="7030A0"/>
                 </a:solidFill>
               </a:rPr>
-              <a:t>Task</a:t>
+              <a:t>Task Name</a:t>
             </a:r>
             <a:endParaRPr lang="en-SG" sz="1050" dirty="0">
               <a:solidFill>

</xml_diff>

<commit_message>
Update diagram for Model in developer guide
</commit_message>
<xml_diff>
--- a/docs/diagrams/Diagrams.pptx
+++ b/docs/diagrams/Diagrams.pptx
@@ -115,6 +115,22 @@
       </a:defRPr>
     </a:lvl9pPr>
   </p:defaultTextStyle>
+  <p:extLst>
+    <p:ext uri="{EFAFB233-063F-42B5-8137-9DF3F51BA10A}">
+      <p15:sldGuideLst xmlns:p15="http://schemas.microsoft.com/office/powerpoint/2012/main">
+        <p15:guide id="1" orient="horz" pos="1488">
+          <p15:clr>
+            <a:srgbClr val="A4A3A4"/>
+          </p15:clr>
+        </p15:guide>
+        <p15:guide id="2" pos="2880">
+          <p15:clr>
+            <a:srgbClr val="A4A3A4"/>
+          </p15:clr>
+        </p15:guide>
+      </p15:sldGuideLst>
+    </p:ext>
+  </p:extLst>
 </p:presentation>
 </file>
 
@@ -200,7 +216,7 @@
           <a:p>
             <a:fld id="{F5CC4B3F-88C1-4FFA-B1B6-F41C21DC6924}" type="datetimeFigureOut">
               <a:rPr lang="en-US" smtClean="0"/>
-              <a:t>9/30/2016</a:t>
+              <a:t>10/10/2016</a:t>
             </a:fld>
             <a:endParaRPr lang="en-US"/>
           </a:p>
@@ -264,38 +280,37 @@
           <a:p>
             <a:pPr lvl="0"/>
             <a:r>
-              <a:rPr lang="en-US" smtClean="0"/>
+              <a:rPr lang="en-US"/>
               <a:t>Click to edit Master text styles</a:t>
             </a:r>
           </a:p>
           <a:p>
             <a:pPr lvl="1"/>
             <a:r>
-              <a:rPr lang="en-US" smtClean="0"/>
+              <a:rPr lang="en-US"/>
               <a:t>Second level</a:t>
             </a:r>
           </a:p>
           <a:p>
             <a:pPr lvl="2"/>
             <a:r>
-              <a:rPr lang="en-US" smtClean="0"/>
+              <a:rPr lang="en-US"/>
               <a:t>Third level</a:t>
             </a:r>
           </a:p>
           <a:p>
             <a:pPr lvl="3"/>
             <a:r>
-              <a:rPr lang="en-US" smtClean="0"/>
+              <a:rPr lang="en-US"/>
               <a:t>Fourth level</a:t>
             </a:r>
           </a:p>
           <a:p>
             <a:pPr lvl="4"/>
             <a:r>
-              <a:rPr lang="en-US" smtClean="0"/>
+              <a:rPr lang="en-US"/>
               <a:t>Fifth level</a:t>
             </a:r>
-            <a:endParaRPr lang="en-US"/>
           </a:p>
         </p:txBody>
       </p:sp>
@@ -506,10 +521,9 @@
           <a:lstStyle/>
           <a:p>
             <a:r>
-              <a:rPr lang="en-US" smtClean="0"/>
+              <a:rPr lang="en-US"/>
               <a:t>Click to edit Master title style</a:t>
             </a:r>
-            <a:endParaRPr lang="en-US"/>
           </a:p>
         </p:txBody>
       </p:sp>
@@ -625,10 +639,9 @@
           </a:lstStyle>
           <a:p>
             <a:r>
-              <a:rPr lang="en-US" smtClean="0"/>
+              <a:rPr lang="en-US"/>
               <a:t>Click to edit Master subtitle style</a:t>
             </a:r>
-            <a:endParaRPr lang="en-US"/>
           </a:p>
         </p:txBody>
       </p:sp>
@@ -649,7 +662,7 @@
           <a:p>
             <a:fld id="{78C97017-6FC3-485B-9764-EAC9E56C1D49}" type="datetimeFigureOut">
               <a:rPr lang="en-US" smtClean="0"/>
-              <a:t>9/30/2016</a:t>
+              <a:t>10/10/2016</a:t>
             </a:fld>
             <a:endParaRPr lang="en-US"/>
           </a:p>
@@ -743,10 +756,9 @@
           <a:lstStyle/>
           <a:p>
             <a:r>
-              <a:rPr lang="en-US" smtClean="0"/>
+              <a:rPr lang="en-US"/>
               <a:t>Click to edit Master title style</a:t>
             </a:r>
-            <a:endParaRPr lang="en-US"/>
           </a:p>
         </p:txBody>
       </p:sp>
@@ -767,38 +779,37 @@
           <a:p>
             <a:pPr lvl="0"/>
             <a:r>
-              <a:rPr lang="en-US" smtClean="0"/>
+              <a:rPr lang="en-US"/>
               <a:t>Click to edit Master text styles</a:t>
             </a:r>
           </a:p>
           <a:p>
             <a:pPr lvl="1"/>
             <a:r>
-              <a:rPr lang="en-US" smtClean="0"/>
+              <a:rPr lang="en-US"/>
               <a:t>Second level</a:t>
             </a:r>
           </a:p>
           <a:p>
             <a:pPr lvl="2"/>
             <a:r>
-              <a:rPr lang="en-US" smtClean="0"/>
+              <a:rPr lang="en-US"/>
               <a:t>Third level</a:t>
             </a:r>
           </a:p>
           <a:p>
             <a:pPr lvl="3"/>
             <a:r>
-              <a:rPr lang="en-US" smtClean="0"/>
+              <a:rPr lang="en-US"/>
               <a:t>Fourth level</a:t>
             </a:r>
           </a:p>
           <a:p>
             <a:pPr lvl="4"/>
             <a:r>
-              <a:rPr lang="en-US" smtClean="0"/>
+              <a:rPr lang="en-US"/>
               <a:t>Fifth level</a:t>
             </a:r>
-            <a:endParaRPr lang="en-US"/>
           </a:p>
         </p:txBody>
       </p:sp>
@@ -819,7 +830,7 @@
           <a:p>
             <a:fld id="{78C97017-6FC3-485B-9764-EAC9E56C1D49}" type="datetimeFigureOut">
               <a:rPr lang="en-US" smtClean="0"/>
-              <a:t>9/30/2016</a:t>
+              <a:t>10/10/2016</a:t>
             </a:fld>
             <a:endParaRPr lang="en-US"/>
           </a:p>
@@ -918,10 +929,9 @@
           <a:lstStyle/>
           <a:p>
             <a:r>
-              <a:rPr lang="en-US" smtClean="0"/>
+              <a:rPr lang="en-US"/>
               <a:t>Click to edit Master title style</a:t>
             </a:r>
-            <a:endParaRPr lang="en-US"/>
           </a:p>
         </p:txBody>
       </p:sp>
@@ -947,38 +957,37 @@
           <a:p>
             <a:pPr lvl="0"/>
             <a:r>
-              <a:rPr lang="en-US" smtClean="0"/>
+              <a:rPr lang="en-US"/>
               <a:t>Click to edit Master text styles</a:t>
             </a:r>
           </a:p>
           <a:p>
             <a:pPr lvl="1"/>
             <a:r>
-              <a:rPr lang="en-US" smtClean="0"/>
+              <a:rPr lang="en-US"/>
               <a:t>Second level</a:t>
             </a:r>
           </a:p>
           <a:p>
             <a:pPr lvl="2"/>
             <a:r>
-              <a:rPr lang="en-US" smtClean="0"/>
+              <a:rPr lang="en-US"/>
               <a:t>Third level</a:t>
             </a:r>
           </a:p>
           <a:p>
             <a:pPr lvl="3"/>
             <a:r>
-              <a:rPr lang="en-US" smtClean="0"/>
+              <a:rPr lang="en-US"/>
               <a:t>Fourth level</a:t>
             </a:r>
           </a:p>
           <a:p>
             <a:pPr lvl="4"/>
             <a:r>
-              <a:rPr lang="en-US" smtClean="0"/>
+              <a:rPr lang="en-US"/>
               <a:t>Fifth level</a:t>
             </a:r>
-            <a:endParaRPr lang="en-US"/>
           </a:p>
         </p:txBody>
       </p:sp>
@@ -999,7 +1008,7 @@
           <a:p>
             <a:fld id="{78C97017-6FC3-485B-9764-EAC9E56C1D49}" type="datetimeFigureOut">
               <a:rPr lang="en-US" smtClean="0"/>
-              <a:t>9/30/2016</a:t>
+              <a:t>10/10/2016</a:t>
             </a:fld>
             <a:endParaRPr lang="en-US"/>
           </a:p>
@@ -1093,10 +1102,9 @@
           <a:lstStyle/>
           <a:p>
             <a:r>
-              <a:rPr lang="en-US" smtClean="0"/>
+              <a:rPr lang="en-US"/>
               <a:t>Click to edit Master title style</a:t>
             </a:r>
-            <a:endParaRPr lang="en-US"/>
           </a:p>
         </p:txBody>
       </p:sp>
@@ -1117,38 +1125,37 @@
           <a:p>
             <a:pPr lvl="0"/>
             <a:r>
-              <a:rPr lang="en-US" smtClean="0"/>
+              <a:rPr lang="en-US"/>
               <a:t>Click to edit Master text styles</a:t>
             </a:r>
           </a:p>
           <a:p>
             <a:pPr lvl="1"/>
             <a:r>
-              <a:rPr lang="en-US" smtClean="0"/>
+              <a:rPr lang="en-US"/>
               <a:t>Second level</a:t>
             </a:r>
           </a:p>
           <a:p>
             <a:pPr lvl="2"/>
             <a:r>
-              <a:rPr lang="en-US" smtClean="0"/>
+              <a:rPr lang="en-US"/>
               <a:t>Third level</a:t>
             </a:r>
           </a:p>
           <a:p>
             <a:pPr lvl="3"/>
             <a:r>
-              <a:rPr lang="en-US" smtClean="0"/>
+              <a:rPr lang="en-US"/>
               <a:t>Fourth level</a:t>
             </a:r>
           </a:p>
           <a:p>
             <a:pPr lvl="4"/>
             <a:r>
-              <a:rPr lang="en-US" smtClean="0"/>
+              <a:rPr lang="en-US"/>
               <a:t>Fifth level</a:t>
             </a:r>
-            <a:endParaRPr lang="en-US"/>
           </a:p>
         </p:txBody>
       </p:sp>
@@ -1169,7 +1176,7 @@
           <a:p>
             <a:fld id="{78C97017-6FC3-485B-9764-EAC9E56C1D49}" type="datetimeFigureOut">
               <a:rPr lang="en-US" smtClean="0"/>
-              <a:t>9/30/2016</a:t>
+              <a:t>10/10/2016</a:t>
             </a:fld>
             <a:endParaRPr lang="en-US"/>
           </a:p>
@@ -1272,10 +1279,9 @@
           </a:lstStyle>
           <a:p>
             <a:r>
-              <a:rPr lang="en-US" smtClean="0"/>
+              <a:rPr lang="en-US"/>
               <a:t>Click to edit Master title style</a:t>
             </a:r>
-            <a:endParaRPr lang="en-US"/>
           </a:p>
         </p:txBody>
       </p:sp>
@@ -1392,7 +1398,7 @@
           <a:p>
             <a:pPr lvl="0"/>
             <a:r>
-              <a:rPr lang="en-US" smtClean="0"/>
+              <a:rPr lang="en-US"/>
               <a:t>Click to edit Master text styles</a:t>
             </a:r>
           </a:p>
@@ -1415,7 +1421,7 @@
           <a:p>
             <a:fld id="{78C97017-6FC3-485B-9764-EAC9E56C1D49}" type="datetimeFigureOut">
               <a:rPr lang="en-US" smtClean="0"/>
-              <a:t>9/30/2016</a:t>
+              <a:t>10/10/2016</a:t>
             </a:fld>
             <a:endParaRPr lang="en-US"/>
           </a:p>
@@ -1509,10 +1515,9 @@
           <a:lstStyle/>
           <a:p>
             <a:r>
-              <a:rPr lang="en-US" smtClean="0"/>
+              <a:rPr lang="en-US"/>
               <a:t>Click to edit Master title style</a:t>
             </a:r>
-            <a:endParaRPr lang="en-US"/>
           </a:p>
         </p:txBody>
       </p:sp>
@@ -1566,38 +1571,37 @@
           <a:p>
             <a:pPr lvl="0"/>
             <a:r>
-              <a:rPr lang="en-US" smtClean="0"/>
+              <a:rPr lang="en-US"/>
               <a:t>Click to edit Master text styles</a:t>
             </a:r>
           </a:p>
           <a:p>
             <a:pPr lvl="1"/>
             <a:r>
-              <a:rPr lang="en-US" smtClean="0"/>
+              <a:rPr lang="en-US"/>
               <a:t>Second level</a:t>
             </a:r>
           </a:p>
           <a:p>
             <a:pPr lvl="2"/>
             <a:r>
-              <a:rPr lang="en-US" smtClean="0"/>
+              <a:rPr lang="en-US"/>
               <a:t>Third level</a:t>
             </a:r>
           </a:p>
           <a:p>
             <a:pPr lvl="3"/>
             <a:r>
-              <a:rPr lang="en-US" smtClean="0"/>
+              <a:rPr lang="en-US"/>
               <a:t>Fourth level</a:t>
             </a:r>
           </a:p>
           <a:p>
             <a:pPr lvl="4"/>
             <a:r>
-              <a:rPr lang="en-US" smtClean="0"/>
+              <a:rPr lang="en-US"/>
               <a:t>Fifth level</a:t>
             </a:r>
-            <a:endParaRPr lang="en-US"/>
           </a:p>
         </p:txBody>
       </p:sp>
@@ -1651,38 +1655,37 @@
           <a:p>
             <a:pPr lvl="0"/>
             <a:r>
-              <a:rPr lang="en-US" smtClean="0"/>
+              <a:rPr lang="en-US"/>
               <a:t>Click to edit Master text styles</a:t>
             </a:r>
           </a:p>
           <a:p>
             <a:pPr lvl="1"/>
             <a:r>
-              <a:rPr lang="en-US" smtClean="0"/>
+              <a:rPr lang="en-US"/>
               <a:t>Second level</a:t>
             </a:r>
           </a:p>
           <a:p>
             <a:pPr lvl="2"/>
             <a:r>
-              <a:rPr lang="en-US" smtClean="0"/>
+              <a:rPr lang="en-US"/>
               <a:t>Third level</a:t>
             </a:r>
           </a:p>
           <a:p>
             <a:pPr lvl="3"/>
             <a:r>
-              <a:rPr lang="en-US" smtClean="0"/>
+              <a:rPr lang="en-US"/>
               <a:t>Fourth level</a:t>
             </a:r>
           </a:p>
           <a:p>
             <a:pPr lvl="4"/>
             <a:r>
-              <a:rPr lang="en-US" smtClean="0"/>
+              <a:rPr lang="en-US"/>
               <a:t>Fifth level</a:t>
             </a:r>
-            <a:endParaRPr lang="en-US"/>
           </a:p>
         </p:txBody>
       </p:sp>
@@ -1703,7 +1706,7 @@
           <a:p>
             <a:fld id="{78C97017-6FC3-485B-9764-EAC9E56C1D49}" type="datetimeFigureOut">
               <a:rPr lang="en-US" smtClean="0"/>
-              <a:t>9/30/2016</a:t>
+              <a:t>10/10/2016</a:t>
             </a:fld>
             <a:endParaRPr lang="en-US"/>
           </a:p>
@@ -1801,10 +1804,9 @@
           </a:lstStyle>
           <a:p>
             <a:r>
-              <a:rPr lang="en-US" smtClean="0"/>
+              <a:rPr lang="en-US"/>
               <a:t>Click to edit Master title style</a:t>
             </a:r>
-            <a:endParaRPr lang="en-US"/>
           </a:p>
         </p:txBody>
       </p:sp>
@@ -1867,7 +1869,7 @@
           <a:p>
             <a:pPr lvl="0"/>
             <a:r>
-              <a:rPr lang="en-US" smtClean="0"/>
+              <a:rPr lang="en-US"/>
               <a:t>Click to edit Master text styles</a:t>
             </a:r>
           </a:p>
@@ -1923,38 +1925,37 @@
           <a:p>
             <a:pPr lvl="0"/>
             <a:r>
-              <a:rPr lang="en-US" smtClean="0"/>
+              <a:rPr lang="en-US"/>
               <a:t>Click to edit Master text styles</a:t>
             </a:r>
           </a:p>
           <a:p>
             <a:pPr lvl="1"/>
             <a:r>
-              <a:rPr lang="en-US" smtClean="0"/>
+              <a:rPr lang="en-US"/>
               <a:t>Second level</a:t>
             </a:r>
           </a:p>
           <a:p>
             <a:pPr lvl="2"/>
             <a:r>
-              <a:rPr lang="en-US" smtClean="0"/>
+              <a:rPr lang="en-US"/>
               <a:t>Third level</a:t>
             </a:r>
           </a:p>
           <a:p>
             <a:pPr lvl="3"/>
             <a:r>
-              <a:rPr lang="en-US" smtClean="0"/>
+              <a:rPr lang="en-US"/>
               <a:t>Fourth level</a:t>
             </a:r>
           </a:p>
           <a:p>
             <a:pPr lvl="4"/>
             <a:r>
-              <a:rPr lang="en-US" smtClean="0"/>
+              <a:rPr lang="en-US"/>
               <a:t>Fifth level</a:t>
             </a:r>
-            <a:endParaRPr lang="en-US"/>
           </a:p>
         </p:txBody>
       </p:sp>
@@ -2017,7 +2018,7 @@
           <a:p>
             <a:pPr lvl="0"/>
             <a:r>
-              <a:rPr lang="en-US" smtClean="0"/>
+              <a:rPr lang="en-US"/>
               <a:t>Click to edit Master text styles</a:t>
             </a:r>
           </a:p>
@@ -2073,38 +2074,37 @@
           <a:p>
             <a:pPr lvl="0"/>
             <a:r>
-              <a:rPr lang="en-US" smtClean="0"/>
+              <a:rPr lang="en-US"/>
               <a:t>Click to edit Master text styles</a:t>
             </a:r>
           </a:p>
           <a:p>
             <a:pPr lvl="1"/>
             <a:r>
-              <a:rPr lang="en-US" smtClean="0"/>
+              <a:rPr lang="en-US"/>
               <a:t>Second level</a:t>
             </a:r>
           </a:p>
           <a:p>
             <a:pPr lvl="2"/>
             <a:r>
-              <a:rPr lang="en-US" smtClean="0"/>
+              <a:rPr lang="en-US"/>
               <a:t>Third level</a:t>
             </a:r>
           </a:p>
           <a:p>
             <a:pPr lvl="3"/>
             <a:r>
-              <a:rPr lang="en-US" smtClean="0"/>
+              <a:rPr lang="en-US"/>
               <a:t>Fourth level</a:t>
             </a:r>
           </a:p>
           <a:p>
             <a:pPr lvl="4"/>
             <a:r>
-              <a:rPr lang="en-US" smtClean="0"/>
+              <a:rPr lang="en-US"/>
               <a:t>Fifth level</a:t>
             </a:r>
-            <a:endParaRPr lang="en-US"/>
           </a:p>
         </p:txBody>
       </p:sp>
@@ -2125,7 +2125,7 @@
           <a:p>
             <a:fld id="{78C97017-6FC3-485B-9764-EAC9E56C1D49}" type="datetimeFigureOut">
               <a:rPr lang="en-US" smtClean="0"/>
-              <a:t>9/30/2016</a:t>
+              <a:t>10/10/2016</a:t>
             </a:fld>
             <a:endParaRPr lang="en-US"/>
           </a:p>
@@ -2219,10 +2219,9 @@
           <a:lstStyle/>
           <a:p>
             <a:r>
-              <a:rPr lang="en-US" smtClean="0"/>
+              <a:rPr lang="en-US"/>
               <a:t>Click to edit Master title style</a:t>
             </a:r>
-            <a:endParaRPr lang="en-US"/>
           </a:p>
         </p:txBody>
       </p:sp>
@@ -2243,7 +2242,7 @@
           <a:p>
             <a:fld id="{78C97017-6FC3-485B-9764-EAC9E56C1D49}" type="datetimeFigureOut">
               <a:rPr lang="en-US" smtClean="0"/>
-              <a:t>9/30/2016</a:t>
+              <a:t>10/10/2016</a:t>
             </a:fld>
             <a:endParaRPr lang="en-US"/>
           </a:p>
@@ -2338,7 +2337,7 @@
           <a:p>
             <a:fld id="{78C97017-6FC3-485B-9764-EAC9E56C1D49}" type="datetimeFigureOut">
               <a:rPr lang="en-US" smtClean="0"/>
-              <a:t>9/30/2016</a:t>
+              <a:t>10/10/2016</a:t>
             </a:fld>
             <a:endParaRPr lang="en-US"/>
           </a:p>
@@ -2441,10 +2440,9 @@
           </a:lstStyle>
           <a:p>
             <a:r>
-              <a:rPr lang="en-US" smtClean="0"/>
+              <a:rPr lang="en-US"/>
               <a:t>Click to edit Master title style</a:t>
             </a:r>
-            <a:endParaRPr lang="en-US"/>
           </a:p>
         </p:txBody>
       </p:sp>
@@ -2498,38 +2496,37 @@
           <a:p>
             <a:pPr lvl="0"/>
             <a:r>
-              <a:rPr lang="en-US" smtClean="0"/>
+              <a:rPr lang="en-US"/>
               <a:t>Click to edit Master text styles</a:t>
             </a:r>
           </a:p>
           <a:p>
             <a:pPr lvl="1"/>
             <a:r>
-              <a:rPr lang="en-US" smtClean="0"/>
+              <a:rPr lang="en-US"/>
               <a:t>Second level</a:t>
             </a:r>
           </a:p>
           <a:p>
             <a:pPr lvl="2"/>
             <a:r>
-              <a:rPr lang="en-US" smtClean="0"/>
+              <a:rPr lang="en-US"/>
               <a:t>Third level</a:t>
             </a:r>
           </a:p>
           <a:p>
             <a:pPr lvl="3"/>
             <a:r>
-              <a:rPr lang="en-US" smtClean="0"/>
+              <a:rPr lang="en-US"/>
               <a:t>Fourth level</a:t>
             </a:r>
           </a:p>
           <a:p>
             <a:pPr lvl="4"/>
             <a:r>
-              <a:rPr lang="en-US" smtClean="0"/>
+              <a:rPr lang="en-US"/>
               <a:t>Fifth level</a:t>
             </a:r>
-            <a:endParaRPr lang="en-US"/>
           </a:p>
         </p:txBody>
       </p:sp>
@@ -2592,7 +2589,7 @@
           <a:p>
             <a:pPr lvl="0"/>
             <a:r>
-              <a:rPr lang="en-US" smtClean="0"/>
+              <a:rPr lang="en-US"/>
               <a:t>Click to edit Master text styles</a:t>
             </a:r>
           </a:p>
@@ -2615,7 +2612,7 @@
           <a:p>
             <a:fld id="{78C97017-6FC3-485B-9764-EAC9E56C1D49}" type="datetimeFigureOut">
               <a:rPr lang="en-US" smtClean="0"/>
-              <a:t>9/30/2016</a:t>
+              <a:t>10/10/2016</a:t>
             </a:fld>
             <a:endParaRPr lang="en-US"/>
           </a:p>
@@ -2718,10 +2715,9 @@
           </a:lstStyle>
           <a:p>
             <a:r>
-              <a:rPr lang="en-US" smtClean="0"/>
+              <a:rPr lang="en-US"/>
               <a:t>Click to edit Master title style</a:t>
             </a:r>
-            <a:endParaRPr lang="en-US"/>
           </a:p>
         </p:txBody>
       </p:sp>
@@ -2845,7 +2841,7 @@
           <a:p>
             <a:pPr lvl="0"/>
             <a:r>
-              <a:rPr lang="en-US" smtClean="0"/>
+              <a:rPr lang="en-US"/>
               <a:t>Click to edit Master text styles</a:t>
             </a:r>
           </a:p>
@@ -2868,7 +2864,7 @@
           <a:p>
             <a:fld id="{78C97017-6FC3-485B-9764-EAC9E56C1D49}" type="datetimeFigureOut">
               <a:rPr lang="en-US" smtClean="0"/>
-              <a:t>9/30/2016</a:t>
+              <a:t>10/10/2016</a:t>
             </a:fld>
             <a:endParaRPr lang="en-US"/>
           </a:p>
@@ -2977,10 +2973,9 @@
           <a:lstStyle/>
           <a:p>
             <a:r>
-              <a:rPr lang="en-US" smtClean="0"/>
+              <a:rPr lang="en-US"/>
               <a:t>Click to edit Master title style</a:t>
             </a:r>
-            <a:endParaRPr lang="en-US"/>
           </a:p>
         </p:txBody>
       </p:sp>
@@ -3011,38 +3006,37 @@
           <a:p>
             <a:pPr lvl="0"/>
             <a:r>
-              <a:rPr lang="en-US" smtClean="0"/>
+              <a:rPr lang="en-US"/>
               <a:t>Click to edit Master text styles</a:t>
             </a:r>
           </a:p>
           <a:p>
             <a:pPr lvl="1"/>
             <a:r>
-              <a:rPr lang="en-US" smtClean="0"/>
+              <a:rPr lang="en-US"/>
               <a:t>Second level</a:t>
             </a:r>
           </a:p>
           <a:p>
             <a:pPr lvl="2"/>
             <a:r>
-              <a:rPr lang="en-US" smtClean="0"/>
+              <a:rPr lang="en-US"/>
               <a:t>Third level</a:t>
             </a:r>
           </a:p>
           <a:p>
             <a:pPr lvl="3"/>
             <a:r>
-              <a:rPr lang="en-US" smtClean="0"/>
+              <a:rPr lang="en-US"/>
               <a:t>Fourth level</a:t>
             </a:r>
           </a:p>
           <a:p>
             <a:pPr lvl="4"/>
             <a:r>
-              <a:rPr lang="en-US" smtClean="0"/>
+              <a:rPr lang="en-US"/>
               <a:t>Fifth level</a:t>
             </a:r>
-            <a:endParaRPr lang="en-US"/>
           </a:p>
         </p:txBody>
       </p:sp>
@@ -3081,7 +3075,7 @@
           <a:p>
             <a:fld id="{78C97017-6FC3-485B-9764-EAC9E56C1D49}" type="datetimeFigureOut">
               <a:rPr lang="en-US" smtClean="0"/>
-              <a:t>9/30/2016</a:t>
+              <a:t>10/10/2016</a:t>
             </a:fld>
             <a:endParaRPr lang="en-US"/>
           </a:p>
@@ -3472,14 +3466,13 @@
           <a:lstStyle/>
           <a:p>
             <a:r>
-              <a:rPr lang="en-US" dirty="0" err="1" smtClean="0"/>
+              <a:rPr lang="en-US" dirty="0" err="1"/>
               <a:t>AddressBook</a:t>
             </a:r>
             <a:r>
-              <a:rPr lang="en-US" dirty="0" smtClean="0"/>
+              <a:rPr lang="en-US" dirty="0"/>
               <a:t> – Level 4</a:t>
             </a:r>
-            <a:endParaRPr lang="en-US" dirty="0"/>
           </a:p>
         </p:txBody>
       </p:sp>
@@ -3499,10 +3492,9 @@
           <a:lstStyle/>
           <a:p>
             <a:r>
-              <a:rPr lang="en-US" dirty="0" smtClean="0"/>
+              <a:rPr lang="en-US" dirty="0"/>
               <a:t>Diagrams</a:t>
             </a:r>
-            <a:endParaRPr lang="en-US" dirty="0"/>
           </a:p>
         </p:txBody>
       </p:sp>
@@ -3634,7 +3626,7 @@
           <a:p>
             <a:pPr algn="ctr"/>
             <a:r>
-              <a:rPr lang="en-US" sz="1600" dirty="0" smtClean="0">
+              <a:rPr lang="en-US" sz="1600" dirty="0">
                 <a:solidFill>
                   <a:schemeClr val="bg1"/>
                 </a:solidFill>
@@ -3693,7 +3685,7 @@
           <a:p>
             <a:pPr algn="ctr"/>
             <a:r>
-              <a:rPr lang="en-US" sz="1600" dirty="0" smtClean="0">
+              <a:rPr lang="en-US" sz="1600" dirty="0">
                 <a:solidFill>
                   <a:schemeClr val="bg1"/>
                 </a:solidFill>
@@ -3756,7 +3748,7 @@
           <a:p>
             <a:pPr algn="ctr"/>
             <a:r>
-              <a:rPr lang="en-US" sz="1600" dirty="0" smtClean="0">
+              <a:rPr lang="en-US" sz="1600" dirty="0">
                 <a:solidFill>
                   <a:schemeClr val="bg1"/>
                 </a:solidFill>
@@ -3815,7 +3807,7 @@
           <a:p>
             <a:pPr algn="ctr"/>
             <a:r>
-              <a:rPr lang="en-US" sz="1600" dirty="0" smtClean="0">
+              <a:rPr lang="en-US" sz="1600" dirty="0">
                 <a:solidFill>
                   <a:schemeClr val="bg1"/>
                 </a:solidFill>
@@ -4401,7 +4393,7 @@
           <a:p>
             <a:pPr algn="ctr"/>
             <a:r>
-              <a:rPr lang="en-US" sz="1600" dirty="0" smtClean="0">
+              <a:rPr lang="en-US" sz="1600" dirty="0">
                 <a:solidFill>
                   <a:schemeClr val="bg1"/>
                 </a:solidFill>
@@ -4752,7 +4744,7 @@
           <a:p>
             <a:pPr algn="ctr"/>
             <a:r>
-              <a:rPr lang="en-US" sz="1600" dirty="0" smtClean="0">
+              <a:rPr lang="en-US" sz="1600" dirty="0">
                 <a:solidFill>
                   <a:schemeClr val="bg1"/>
                 </a:solidFill>
@@ -4760,25 +4752,20 @@
               <a:t>Logs</a:t>
             </a:r>
             <a:br>
-              <a:rPr lang="en-US" sz="1600" dirty="0" smtClean="0">
+              <a:rPr lang="en-US" sz="1600" dirty="0">
                 <a:solidFill>
                   <a:schemeClr val="bg1"/>
                 </a:solidFill>
               </a:rPr>
             </a:br>
             <a:r>
-              <a:rPr lang="en-US" sz="1600" dirty="0" smtClean="0">
+              <a:rPr lang="en-US" sz="1600" dirty="0">
                 <a:solidFill>
                   <a:schemeClr val="bg1"/>
                 </a:solidFill>
               </a:rPr>
               <a:t>Center</a:t>
             </a:r>
-            <a:endParaRPr lang="en-US" sz="1600" dirty="0">
-              <a:solidFill>
-                <a:schemeClr val="bg1"/>
-              </a:solidFill>
-            </a:endParaRPr>
           </a:p>
         </p:txBody>
       </p:sp>
@@ -4935,7 +4922,7 @@
           <a:p>
             <a:pPr algn="ctr"/>
             <a:r>
-              <a:rPr lang="en-US" sz="1600" dirty="0" smtClean="0">
+              <a:rPr lang="en-US" sz="1600" dirty="0">
                 <a:solidFill>
                   <a:schemeClr val="bg1"/>
                 </a:solidFill>
@@ -5299,7 +5286,7 @@
           <a:p>
             <a:pPr algn="ctr"/>
             <a:r>
-              <a:rPr lang="en-US" sz="1600" dirty="0" smtClean="0">
+              <a:rPr lang="en-US" sz="1600" dirty="0">
                 <a:solidFill>
                   <a:schemeClr val="bg1"/>
                 </a:solidFill>
@@ -5446,7 +5433,7 @@
           <a:p>
             <a:pPr algn="ctr"/>
             <a:r>
-              <a:rPr lang="en-US" sz="1600" dirty="0" smtClean="0">
+              <a:rPr lang="en-US" sz="1600" dirty="0">
                 <a:solidFill>
                   <a:schemeClr val="bg1"/>
                 </a:solidFill>
@@ -5608,10 +5595,9 @@
           <a:lstStyle/>
           <a:p>
             <a:r>
-              <a:rPr lang="en-US" sz="1400" dirty="0" smtClean="0"/>
+              <a:rPr lang="en-US" sz="1400" dirty="0"/>
               <a:t>delete 1</a:t>
             </a:r>
-            <a:endParaRPr lang="en-US" sz="1400" dirty="0"/>
           </a:p>
         </p:txBody>
       </p:sp>
@@ -5674,18 +5660,13 @@
           <a:lstStyle/>
           <a:p>
             <a:r>
-              <a:rPr lang="en-US" sz="1400" dirty="0" smtClean="0">
+              <a:rPr lang="en-US" sz="1400" dirty="0">
                 <a:solidFill>
                   <a:srgbClr val="0070C0"/>
                 </a:solidFill>
               </a:rPr>
               <a:t>execute(“delete 1”)</a:t>
             </a:r>
-            <a:endParaRPr lang="en-US" sz="1400" dirty="0">
-              <a:solidFill>
-                <a:srgbClr val="0070C0"/>
-              </a:solidFill>
-            </a:endParaRPr>
           </a:p>
         </p:txBody>
       </p:sp>
@@ -5748,7 +5729,7 @@
           <a:lstStyle/>
           <a:p>
             <a:r>
-              <a:rPr lang="en-US" sz="1400" dirty="0" err="1" smtClean="0">
+              <a:rPr lang="en-US" sz="1400" dirty="0" err="1">
                 <a:solidFill>
                   <a:srgbClr val="7030A0"/>
                 </a:solidFill>
@@ -5756,18 +5737,13 @@
               <a:t>deletePerson</a:t>
             </a:r>
             <a:r>
-              <a:rPr lang="en-US" sz="1400" dirty="0" smtClean="0">
+              <a:rPr lang="en-US" sz="1400" dirty="0">
                 <a:solidFill>
                   <a:srgbClr val="7030A0"/>
                 </a:solidFill>
               </a:rPr>
               <a:t>(p)</a:t>
             </a:r>
-            <a:endParaRPr lang="en-US" sz="1400" dirty="0">
-              <a:solidFill>
-                <a:srgbClr val="7030A0"/>
-              </a:solidFill>
-            </a:endParaRPr>
           </a:p>
         </p:txBody>
       </p:sp>
@@ -5794,7 +5770,7 @@
           <a:lstStyle/>
           <a:p>
             <a:r>
-              <a:rPr lang="en-US" sz="1400" dirty="0" smtClean="0">
+              <a:rPr lang="en-US" sz="1400" dirty="0">
                 <a:solidFill>
                   <a:schemeClr val="accent5">
                     <a:lumMod val="75000"/>
@@ -5804,7 +5780,7 @@
               <a:t>post(</a:t>
             </a:r>
             <a:r>
-              <a:rPr lang="en-US" sz="1400" dirty="0" err="1" smtClean="0">
+              <a:rPr lang="en-US" sz="1400" dirty="0" err="1">
                 <a:solidFill>
                   <a:schemeClr val="accent5">
                     <a:lumMod val="75000"/>
@@ -5814,7 +5790,7 @@
               <a:t>AddressBookChangedEvent</a:t>
             </a:r>
             <a:r>
-              <a:rPr lang="en-US" sz="1400" dirty="0" smtClean="0">
+              <a:rPr lang="en-US" sz="1400" dirty="0">
                 <a:solidFill>
                   <a:schemeClr val="accent5">
                     <a:lumMod val="75000"/>
@@ -5823,13 +5799,6 @@
               </a:rPr>
               <a:t>)</a:t>
             </a:r>
-            <a:endParaRPr lang="en-US" sz="1400" dirty="0">
-              <a:solidFill>
-                <a:schemeClr val="accent5">
-                  <a:lumMod val="75000"/>
-                </a:schemeClr>
-              </a:solidFill>
-            </a:endParaRPr>
           </a:p>
         </p:txBody>
       </p:sp>
@@ -5995,7 +5964,7 @@
           <a:p>
             <a:pPr algn="ctr"/>
             <a:r>
-              <a:rPr lang="en-US" sz="1600" dirty="0" smtClean="0">
+              <a:rPr lang="en-US" sz="1600" dirty="0">
                 <a:solidFill>
                   <a:schemeClr val="bg1"/>
                 </a:solidFill>
@@ -6003,7 +5972,7 @@
               <a:t>:</a:t>
             </a:r>
             <a:r>
-              <a:rPr lang="en-US" sz="1600" dirty="0" err="1" smtClean="0">
+              <a:rPr lang="en-US" sz="1600" dirty="0" err="1">
                 <a:solidFill>
                   <a:schemeClr val="bg1"/>
                 </a:solidFill>
@@ -6236,7 +6205,7 @@
           <a:p>
             <a:pPr algn="ctr"/>
             <a:r>
-              <a:rPr lang="en-US" sz="1600" dirty="0" smtClean="0">
+              <a:rPr lang="en-US" sz="1600" dirty="0">
                 <a:solidFill>
                   <a:schemeClr val="bg1"/>
                 </a:solidFill>
@@ -6368,7 +6337,7 @@
           <a:lstStyle/>
           <a:p>
             <a:r>
-              <a:rPr lang="en-US" sz="1400" dirty="0" smtClean="0">
+              <a:rPr lang="en-US" sz="1400" dirty="0">
                 <a:solidFill>
                   <a:schemeClr val="accent5">
                     <a:lumMod val="75000"/>
@@ -6378,7 +6347,7 @@
               <a:t>post(</a:t>
             </a:r>
             <a:r>
-              <a:rPr lang="en-US" sz="1400" dirty="0" err="1" smtClean="0">
+              <a:rPr lang="en-US" sz="1400" dirty="0" err="1">
                 <a:solidFill>
                   <a:schemeClr val="accent5">
                     <a:lumMod val="75000"/>
@@ -6388,7 +6357,7 @@
               <a:t>AddressBookChangedEvent</a:t>
             </a:r>
             <a:r>
-              <a:rPr lang="en-US" sz="1400" dirty="0" smtClean="0">
+              <a:rPr lang="en-US" sz="1400" dirty="0">
                 <a:solidFill>
                   <a:schemeClr val="accent5">
                     <a:lumMod val="75000"/>
@@ -6397,13 +6366,6 @@
               </a:rPr>
               <a:t>)</a:t>
             </a:r>
-            <a:endParaRPr lang="en-US" sz="1400" dirty="0">
-              <a:solidFill>
-                <a:schemeClr val="accent5">
-                  <a:lumMod val="75000"/>
-                </a:schemeClr>
-              </a:solidFill>
-            </a:endParaRPr>
           </a:p>
         </p:txBody>
       </p:sp>
@@ -6495,7 +6457,7 @@
           <a:p>
             <a:pPr algn="ctr"/>
             <a:r>
-              <a:rPr lang="en-US" sz="1600" dirty="0" smtClean="0">
+              <a:rPr lang="en-US" sz="1600" dirty="0">
                 <a:solidFill>
                   <a:schemeClr val="bg1"/>
                 </a:solidFill>
@@ -6503,7 +6465,7 @@
               <a:t>:</a:t>
             </a:r>
             <a:r>
-              <a:rPr lang="en-US" sz="1600" dirty="0" err="1" smtClean="0">
+              <a:rPr lang="en-US" sz="1600" dirty="0" err="1">
                 <a:solidFill>
                   <a:schemeClr val="bg1"/>
                 </a:solidFill>
@@ -6750,7 +6712,7 @@
           <a:lstStyle/>
           <a:p>
             <a:r>
-              <a:rPr lang="en-US" sz="1400" dirty="0" err="1" smtClean="0">
+              <a:rPr lang="en-US" sz="1400" dirty="0" err="1">
                 <a:solidFill>
                   <a:schemeClr val="accent6">
                     <a:lumMod val="75000"/>
@@ -6760,7 +6722,7 @@
               <a:t>handleAddresssBookChangedEvent</a:t>
             </a:r>
             <a:r>
-              <a:rPr lang="en-US" sz="1400" dirty="0" smtClean="0">
+              <a:rPr lang="en-US" sz="1400" dirty="0">
                 <a:solidFill>
                   <a:schemeClr val="accent6">
                     <a:lumMod val="75000"/>
@@ -6769,13 +6731,6 @@
               </a:rPr>
               <a:t>()</a:t>
             </a:r>
-            <a:endParaRPr lang="en-US" sz="1400" dirty="0">
-              <a:solidFill>
-                <a:schemeClr val="accent6">
-                  <a:lumMod val="75000"/>
-                </a:schemeClr>
-              </a:solidFill>
-            </a:endParaRPr>
           </a:p>
         </p:txBody>
       </p:sp>
@@ -6860,7 +6815,7 @@
           <a:p>
             <a:pPr algn="ctr"/>
             <a:r>
-              <a:rPr lang="en-US" sz="1600" dirty="0" smtClean="0">
+              <a:rPr lang="en-US" sz="1600" dirty="0">
                 <a:solidFill>
                   <a:schemeClr val="bg1"/>
                 </a:solidFill>
@@ -7063,7 +7018,7 @@
           <a:lstStyle/>
           <a:p>
             <a:r>
-              <a:rPr lang="en-US" sz="1400" dirty="0" err="1" smtClean="0">
+              <a:rPr lang="en-US" sz="1400" dirty="0" err="1">
                 <a:solidFill>
                   <a:srgbClr val="00B050"/>
                 </a:solidFill>
@@ -7071,18 +7026,13 @@
               <a:t>handleAddresssBookChangedEvent</a:t>
             </a:r>
             <a:r>
-              <a:rPr lang="en-US" sz="1400" dirty="0" smtClean="0">
+              <a:rPr lang="en-US" sz="1400" dirty="0">
                 <a:solidFill>
                   <a:srgbClr val="00B050"/>
                 </a:solidFill>
               </a:rPr>
               <a:t>()</a:t>
             </a:r>
-            <a:endParaRPr lang="en-US" sz="1400" dirty="0">
-              <a:solidFill>
-                <a:srgbClr val="00B050"/>
-              </a:solidFill>
-            </a:endParaRPr>
           </a:p>
         </p:txBody>
       </p:sp>
@@ -7269,18 +7219,13 @@
           <a:p>
             <a:pPr algn="r"/>
             <a:r>
-              <a:rPr lang="en-US" sz="1400" dirty="0" smtClean="0">
+              <a:rPr lang="en-US" sz="1400" dirty="0">
                 <a:solidFill>
                   <a:srgbClr val="00B050"/>
                 </a:solidFill>
               </a:rPr>
               <a:t>Update status bar</a:t>
             </a:r>
-            <a:endParaRPr lang="en-US" sz="1400" dirty="0">
-              <a:solidFill>
-                <a:srgbClr val="00B050"/>
-              </a:solidFill>
-            </a:endParaRPr>
           </a:p>
         </p:txBody>
       </p:sp>
@@ -7470,7 +7415,7 @@
           <a:lstStyle/>
           <a:p>
             <a:r>
-              <a:rPr lang="en-US" sz="1400" dirty="0" smtClean="0">
+              <a:rPr lang="en-US" sz="1400" dirty="0">
                 <a:solidFill>
                   <a:schemeClr val="accent6">
                     <a:lumMod val="75000"/>
@@ -7480,7 +7425,7 @@
               <a:t>Save </a:t>
             </a:r>
             <a:br>
-              <a:rPr lang="en-US" sz="1400" dirty="0" smtClean="0">
+              <a:rPr lang="en-US" sz="1400" dirty="0">
                 <a:solidFill>
                   <a:schemeClr val="accent6">
                     <a:lumMod val="75000"/>
@@ -7489,7 +7434,7 @@
               </a:rPr>
             </a:br>
             <a:r>
-              <a:rPr lang="en-US" sz="1400" dirty="0" smtClean="0">
+              <a:rPr lang="en-US" sz="1400" dirty="0">
                 <a:solidFill>
                   <a:schemeClr val="accent6">
                     <a:lumMod val="75000"/>
@@ -7498,13 +7443,6 @@
               </a:rPr>
               <a:t>to file</a:t>
             </a:r>
-            <a:endParaRPr lang="en-US" sz="1400" dirty="0">
-              <a:solidFill>
-                <a:schemeClr val="accent6">
-                  <a:lumMod val="75000"/>
-                </a:schemeClr>
-              </a:solidFill>
-            </a:endParaRPr>
           </a:p>
         </p:txBody>
       </p:sp>
@@ -7581,7 +7519,7 @@
           <a:lstStyle/>
           <a:p>
             <a:r>
-              <a:rPr lang="en-US" sz="1200" b="1" dirty="0" smtClean="0">
+              <a:rPr lang="en-US" sz="1200" b="1" dirty="0">
                 <a:solidFill>
                   <a:schemeClr val="accent3">
                     <a:lumMod val="75000"/>
@@ -7764,7 +7702,7 @@
           <a:p>
             <a:pPr algn="ctr"/>
             <a:r>
-              <a:rPr lang="en-US" sz="1050" dirty="0" err="1" smtClean="0">
+              <a:rPr lang="en-US" sz="1050" dirty="0" err="1">
                 <a:solidFill>
                   <a:schemeClr val="bg1"/>
                 </a:solidFill>
@@ -8626,7 +8564,7 @@
           <a:p>
             <a:pPr algn="ctr"/>
             <a:r>
-              <a:rPr lang="en-US" sz="1050" b="1" dirty="0" smtClean="0">
+              <a:rPr lang="en-US" sz="1050" b="1" dirty="0">
                 <a:solidFill>
                   <a:schemeClr val="accent3">
                     <a:lumMod val="75000"/>
@@ -8636,7 +8574,7 @@
               <a:t>{abstract}</a:t>
             </a:r>
             <a:br>
-              <a:rPr lang="en-US" sz="1050" b="1" dirty="0" smtClean="0">
+              <a:rPr lang="en-US" sz="1050" b="1" dirty="0">
                 <a:solidFill>
                   <a:schemeClr val="accent3">
                     <a:lumMod val="75000"/>
@@ -8645,7 +8583,7 @@
               </a:rPr>
             </a:br>
             <a:r>
-              <a:rPr lang="en-US" sz="1050" b="1" dirty="0" err="1" smtClean="0">
+              <a:rPr lang="en-US" sz="1050" b="1" dirty="0" err="1">
                 <a:solidFill>
                   <a:schemeClr val="accent3">
                     <a:lumMod val="75000"/>
@@ -9134,7 +9072,7 @@
           <a:p>
             <a:pPr algn="ctr"/>
             <a:r>
-              <a:rPr lang="en-US" sz="1100" b="1" dirty="0" smtClean="0">
+              <a:rPr lang="en-US" sz="1100" b="1" dirty="0">
                 <a:solidFill>
                   <a:schemeClr val="bg1"/>
                 </a:solidFill>
@@ -9193,7 +9131,7 @@
           <a:p>
             <a:pPr algn="ctr"/>
             <a:r>
-              <a:rPr lang="en-US" sz="1050" dirty="0" smtClean="0">
+              <a:rPr lang="en-US" sz="1050" dirty="0">
                 <a:solidFill>
                   <a:schemeClr val="bg1"/>
                 </a:solidFill>
@@ -9204,7 +9142,7 @@
           <a:p>
             <a:pPr algn="ctr"/>
             <a:r>
-              <a:rPr lang="en-US" sz="1050" dirty="0" err="1" smtClean="0">
+              <a:rPr lang="en-US" sz="1050" dirty="0" err="1">
                 <a:solidFill>
                   <a:schemeClr val="bg1"/>
                 </a:solidFill>
@@ -9753,13 +9691,6 @@
   <p:clrMapOvr>
     <a:masterClrMapping/>
   </p:clrMapOvr>
-  <p:timing>
-    <p:tnLst>
-      <p:par>
-        <p:cTn id="1" dur="indefinite" restart="never" nodeType="tmRoot"/>
-      </p:par>
-    </p:tnLst>
-  </p:timing>
 </p:sld>
 </file>
 
@@ -9826,7 +9757,7 @@
           <a:lstStyle/>
           <a:p>
             <a:r>
-              <a:rPr lang="en-US" sz="1200" b="1" dirty="0" smtClean="0">
+              <a:rPr lang="en-US" sz="1200" b="1" dirty="0">
                 <a:solidFill>
                   <a:srgbClr val="0070C0"/>
                 </a:solidFill>
@@ -10000,7 +9931,7 @@
           <a:p>
             <a:pPr algn="ctr"/>
             <a:r>
-              <a:rPr lang="en-US" sz="1050" dirty="0" err="1" smtClean="0">
+              <a:rPr lang="en-US" sz="1050" dirty="0" err="1">
                 <a:solidFill>
                   <a:schemeClr val="bg1"/>
                 </a:solidFill>
@@ -10362,7 +10293,7 @@
           <a:p>
             <a:pPr algn="ctr"/>
             <a:r>
-              <a:rPr lang="en-US" sz="1050" b="1" dirty="0" smtClean="0">
+              <a:rPr lang="en-US" sz="1050" b="1" dirty="0">
                 <a:solidFill>
                   <a:srgbClr val="0070C0"/>
                 </a:solidFill>
@@ -10370,14 +10301,14 @@
               <a:t>{abstract}</a:t>
             </a:r>
             <a:br>
-              <a:rPr lang="en-US" sz="1050" b="1" dirty="0" smtClean="0">
+              <a:rPr lang="en-US" sz="1050" b="1" dirty="0">
                 <a:solidFill>
                   <a:srgbClr val="0070C0"/>
                 </a:solidFill>
               </a:rPr>
             </a:br>
             <a:r>
-              <a:rPr lang="en-US" sz="1050" b="1" dirty="0" smtClean="0">
+              <a:rPr lang="en-US" sz="1050" b="1" dirty="0">
                 <a:solidFill>
                   <a:srgbClr val="0070C0"/>
                 </a:solidFill>
@@ -11038,7 +10969,7 @@
             <a:p>
               <a:pPr algn="r"/>
               <a:r>
-                <a:rPr lang="en-US" sz="1100" dirty="0" smtClean="0">
+                <a:rPr lang="en-US" sz="1100" dirty="0">
                   <a:solidFill>
                     <a:srgbClr val="0070C0"/>
                   </a:solidFill>
@@ -11137,7 +11068,7 @@
             <a:lstStyle/>
             <a:p>
               <a:r>
-                <a:rPr lang="en-US" sz="1100" dirty="0" smtClean="0">
+                <a:rPr lang="en-US" sz="1100" dirty="0">
                   <a:solidFill>
                     <a:srgbClr val="0070C0"/>
                   </a:solidFill>
@@ -11223,7 +11154,7 @@
           <a:p>
             <a:pPr algn="r"/>
             <a:r>
-              <a:rPr lang="en-US" sz="1100" dirty="0" smtClean="0">
+              <a:rPr lang="en-US" sz="1100" dirty="0">
                 <a:solidFill>
                   <a:srgbClr val="0070C0"/>
                 </a:solidFill>
@@ -11262,7 +11193,7 @@
           <a:p>
             <a:pPr algn="r"/>
             <a:r>
-              <a:rPr lang="en-US" sz="1100" dirty="0" smtClean="0">
+              <a:rPr lang="en-US" sz="1100" dirty="0">
                 <a:solidFill>
                   <a:srgbClr val="0070C0"/>
                 </a:solidFill>
@@ -11315,7 +11246,7 @@
             <a:p>
               <a:pPr algn="r"/>
               <a:r>
-                <a:rPr lang="en-US" sz="1100" dirty="0" smtClean="0">
+                <a:rPr lang="en-US" sz="1100" dirty="0">
                   <a:solidFill>
                     <a:srgbClr val="0070C0"/>
                   </a:solidFill>
@@ -11418,7 +11349,7 @@
           <a:p>
             <a:pPr algn="ctr"/>
             <a:r>
-              <a:rPr lang="en-US" sz="1050" b="1" dirty="0" smtClean="0">
+              <a:rPr lang="en-US" sz="1050" b="1" dirty="0">
                 <a:solidFill>
                   <a:srgbClr val="0070C0"/>
                 </a:solidFill>
@@ -11426,14 +11357,14 @@
               <a:t>Incorrect</a:t>
             </a:r>
             <a:br>
-              <a:rPr lang="en-US" sz="1050" b="1" dirty="0" smtClean="0">
+              <a:rPr lang="en-US" sz="1050" b="1" dirty="0">
                 <a:solidFill>
                   <a:srgbClr val="0070C0"/>
                 </a:solidFill>
               </a:rPr>
             </a:br>
             <a:r>
-              <a:rPr lang="en-US" sz="1050" b="1" dirty="0" smtClean="0">
+              <a:rPr lang="en-US" sz="1050" b="1" dirty="0">
                 <a:solidFill>
                   <a:srgbClr val="0070C0"/>
                 </a:solidFill>
@@ -11542,13 +11473,6 @@
   <p:clrMapOvr>
     <a:masterClrMapping/>
   </p:clrMapOvr>
-  <p:timing>
-    <p:tnLst>
-      <p:par>
-        <p:cTn id="1" dur="indefinite" restart="never" nodeType="tmRoot"/>
-      </p:par>
-    </p:tnLst>
-  </p:timing>
 </p:sld>
 </file>
 
@@ -11615,7 +11539,7 @@
           <a:lstStyle/>
           <a:p>
             <a:r>
-              <a:rPr lang="en-US" sz="1200" b="1" dirty="0" smtClean="0">
+              <a:rPr lang="en-US" sz="1200" b="1" dirty="0">
                 <a:solidFill>
                   <a:srgbClr val="0070C0"/>
                 </a:solidFill>
@@ -11825,7 +11749,7 @@
           <a:p>
             <a:pPr algn="ctr"/>
             <a:r>
-              <a:rPr lang="en-US" sz="1600" dirty="0" smtClean="0">
+              <a:rPr lang="en-US" sz="1600" dirty="0">
                 <a:solidFill>
                   <a:schemeClr val="bg1"/>
                 </a:solidFill>
@@ -11972,20 +11896,12 @@
           <a:p>
             <a:pPr algn="ctr"/>
             <a:r>
-              <a:rPr lang="en-US" sz="1600" dirty="0" smtClean="0">
+              <a:rPr lang="en-US" sz="1600" dirty="0">
                 <a:solidFill>
                   <a:schemeClr val="bg1"/>
                 </a:solidFill>
               </a:rPr>
               <a:t>d:Delete</a:t>
-            </a:r>
-            <a:r>
-              <a:rPr lang="en-US" sz="1600" dirty="0">
-                <a:solidFill>
-                  <a:schemeClr val="bg1"/>
-                </a:solidFill>
-              </a:rPr>
-              <a:t/>
             </a:r>
             <a:br>
               <a:rPr lang="en-US" sz="1600" dirty="0">
@@ -12190,18 +12106,13 @@
           <a:p>
             <a:pPr algn="r"/>
             <a:r>
-              <a:rPr lang="en-US" sz="1400" dirty="0" smtClean="0">
+              <a:rPr lang="en-US" sz="1400" dirty="0">
                 <a:solidFill>
                   <a:srgbClr val="0070C0"/>
                 </a:solidFill>
               </a:rPr>
               <a:t>execute(“delete 1”)</a:t>
             </a:r>
-            <a:endParaRPr lang="en-US" sz="1400" dirty="0">
-              <a:solidFill>
-                <a:srgbClr val="0070C0"/>
-              </a:solidFill>
-            </a:endParaRPr>
           </a:p>
         </p:txBody>
       </p:sp>
@@ -12280,7 +12191,6 @@
               <a:rPr lang="en-US" dirty="0"/>
               <a:t>execute()</a:t>
             </a:r>
-            <a:endParaRPr lang="en-US" dirty="0"/>
           </a:p>
         </p:txBody>
       </p:sp>
@@ -12792,7 +12702,7 @@
           </a:lstStyle>
           <a:p>
             <a:r>
-              <a:rPr lang="en-US" dirty="0" err="1" smtClean="0">
+              <a:rPr lang="en-US" dirty="0" err="1">
                 <a:solidFill>
                   <a:srgbClr val="7030A0"/>
                 </a:solidFill>
@@ -12800,18 +12710,13 @@
               <a:t>deletePerson</a:t>
             </a:r>
             <a:r>
-              <a:rPr lang="en-US" dirty="0" smtClean="0">
+              <a:rPr lang="en-US" dirty="0">
                 <a:solidFill>
                   <a:srgbClr val="7030A0"/>
                 </a:solidFill>
               </a:rPr>
               <a:t>(p)</a:t>
             </a:r>
-            <a:endParaRPr lang="en-US" dirty="0">
-              <a:solidFill>
-                <a:srgbClr val="7030A0"/>
-              </a:solidFill>
-            </a:endParaRPr>
           </a:p>
         </p:txBody>
       </p:sp>
@@ -12849,10 +12754,9 @@
           </a:lstStyle>
           <a:p>
             <a:r>
-              <a:rPr lang="en-US" dirty="0" smtClean="0"/>
+              <a:rPr lang="en-US" dirty="0"/>
               <a:t>create()</a:t>
             </a:r>
-            <a:endParaRPr lang="en-US" dirty="0"/>
           </a:p>
         </p:txBody>
       </p:sp>
@@ -12890,10 +12794,9 @@
           </a:lstStyle>
           <a:p>
             <a:r>
-              <a:rPr lang="en-US" dirty="0" smtClean="0"/>
+              <a:rPr lang="en-US" dirty="0"/>
               <a:t>parse(“delete 1”)</a:t>
             </a:r>
-            <a:endParaRPr lang="en-US" dirty="0"/>
           </a:p>
         </p:txBody>
       </p:sp>
@@ -12931,10 +12834,9 @@
           </a:lstStyle>
           <a:p>
             <a:r>
-              <a:rPr lang="en-US" dirty="0" smtClean="0"/>
+              <a:rPr lang="en-US" dirty="0"/>
               <a:t>result</a:t>
             </a:r>
-            <a:endParaRPr lang="en-US" dirty="0"/>
           </a:p>
         </p:txBody>
       </p:sp>
@@ -12972,10 +12874,9 @@
           </a:lstStyle>
           <a:p>
             <a:r>
-              <a:rPr lang="en-US" dirty="0" smtClean="0"/>
+              <a:rPr lang="en-US" dirty="0"/>
               <a:t>result</a:t>
             </a:r>
-            <a:endParaRPr lang="en-US" dirty="0"/>
           </a:p>
         </p:txBody>
       </p:sp>
@@ -13023,7 +12924,7 @@
           <a:p>
             <a:pPr algn="ctr"/>
             <a:r>
-              <a:rPr lang="en-US" sz="1600" dirty="0" smtClean="0">
+              <a:rPr lang="en-US" sz="1600" dirty="0">
                 <a:solidFill>
                   <a:schemeClr val="bg1"/>
                 </a:solidFill>
@@ -13031,14 +12932,14 @@
               <a:t>result:</a:t>
             </a:r>
             <a:br>
-              <a:rPr lang="en-US" sz="1600" dirty="0" smtClean="0">
+              <a:rPr lang="en-US" sz="1600" dirty="0">
                 <a:solidFill>
                   <a:schemeClr val="bg1"/>
                 </a:solidFill>
               </a:rPr>
             </a:br>
             <a:r>
-              <a:rPr lang="en-US" sz="1600" dirty="0" err="1" smtClean="0">
+              <a:rPr lang="en-US" sz="1600" dirty="0" err="1">
                 <a:solidFill>
                   <a:schemeClr val="bg1"/>
                 </a:solidFill>
@@ -13208,10 +13109,9 @@
           </a:lstStyle>
           <a:p>
             <a:r>
-              <a:rPr lang="en-US" dirty="0" smtClean="0"/>
+              <a:rPr lang="en-US" dirty="0"/>
               <a:t>d</a:t>
             </a:r>
-            <a:endParaRPr lang="en-US" dirty="0"/>
           </a:p>
         </p:txBody>
       </p:sp>
@@ -13291,7 +13191,7 @@
           <a:lstStyle/>
           <a:p>
             <a:r>
-              <a:rPr lang="en-US" sz="1200" b="1" dirty="0" smtClean="0">
+              <a:rPr lang="en-US" sz="1200" b="1" dirty="0">
                 <a:solidFill>
                   <a:srgbClr val="7030A0"/>
                 </a:solidFill>
@@ -13350,7 +13250,7 @@
           <a:p>
             <a:pPr algn="ctr"/>
             <a:r>
-              <a:rPr lang="en-US" sz="1050" dirty="0" err="1" smtClean="0">
+              <a:rPr lang="en-US" sz="1050" dirty="0" err="1">
                 <a:solidFill>
                   <a:schemeClr val="bg1"/>
                 </a:solidFill>
@@ -13409,7 +13309,7 @@
           <a:p>
             <a:pPr algn="ctr"/>
             <a:r>
-              <a:rPr lang="en-US" sz="1050" dirty="0" err="1" smtClean="0">
+              <a:rPr lang="en-US" sz="1050" dirty="0" err="1">
                 <a:solidFill>
                   <a:schemeClr val="bg1"/>
                 </a:solidFill>
@@ -13565,7 +13465,7 @@
           <a:p>
             <a:pPr algn="ctr"/>
             <a:r>
-              <a:rPr lang="en-US" sz="1050" dirty="0" smtClean="0">
+              <a:rPr lang="en-US" sz="1050" dirty="0">
                 <a:solidFill>
                   <a:schemeClr val="bg1"/>
                 </a:solidFill>
@@ -13931,12 +13831,12 @@
           <a:p>
             <a:pPr algn="ctr"/>
             <a:r>
-              <a:rPr lang="en-US" sz="1050" dirty="0" err="1" smtClean="0">
+              <a:rPr lang="en-SG" sz="1050" dirty="0" err="1">
                 <a:solidFill>
                   <a:srgbClr val="7030A0"/>
                 </a:solidFill>
               </a:rPr>
-              <a:t>AddressBook</a:t>
+              <a:t>TaskList</a:t>
             </a:r>
             <a:endParaRPr lang="en-SG" sz="1050" dirty="0">
               <a:solidFill>
@@ -14073,12 +13973,12 @@
           <a:p>
             <a:pPr algn="ctr"/>
             <a:r>
-              <a:rPr lang="en-US" sz="1050" dirty="0" err="1" smtClean="0">
+              <a:rPr lang="en-US" sz="1050" dirty="0" err="1">
                 <a:solidFill>
                   <a:srgbClr val="7030A0"/>
                 </a:solidFill>
               </a:rPr>
-              <a:t>UniquePersonList</a:t>
+              <a:t>UniqueTaskList</a:t>
             </a:r>
             <a:endParaRPr lang="en-SG" sz="1050" dirty="0">
               <a:solidFill>
@@ -14217,7 +14117,7 @@
           <a:p>
             <a:pPr algn="ctr"/>
             <a:r>
-              <a:rPr lang="en-US" sz="1050" dirty="0" err="1" smtClean="0">
+              <a:rPr lang="en-US" sz="1050" dirty="0" err="1">
                 <a:solidFill>
                   <a:srgbClr val="7030A0"/>
                 </a:solidFill>
@@ -14316,12 +14216,12 @@
           <a:p>
             <a:pPr algn="ctr"/>
             <a:r>
-              <a:rPr lang="en-US" sz="1050" dirty="0" smtClean="0">
+              <a:rPr lang="en-US" sz="1050" dirty="0">
                 <a:solidFill>
                   <a:srgbClr val="7030A0"/>
                 </a:solidFill>
               </a:rPr>
-              <a:t>Person</a:t>
+              <a:t>Task</a:t>
             </a:r>
             <a:endParaRPr lang="en-SG" sz="1050" dirty="0">
               <a:solidFill>
@@ -14458,7 +14358,7 @@
           <a:p>
             <a:pPr algn="ctr"/>
             <a:r>
-              <a:rPr lang="en-US" sz="1050" dirty="0" smtClean="0">
+              <a:rPr lang="en-US" sz="1050" dirty="0">
                 <a:solidFill>
                   <a:srgbClr val="7030A0"/>
                 </a:solidFill>
@@ -14600,7 +14500,7 @@
           <a:p>
             <a:pPr algn="ctr"/>
             <a:r>
-              <a:rPr lang="en-US" sz="1050" dirty="0" smtClean="0">
+              <a:rPr lang="en-US" sz="1050" dirty="0">
                 <a:solidFill>
                   <a:srgbClr val="7030A0"/>
                 </a:solidFill>
@@ -14608,19 +14508,19 @@
               <a:t>&lt;&lt;interface&gt;&gt;</a:t>
             </a:r>
             <a:br>
-              <a:rPr lang="en-US" sz="1050" dirty="0" smtClean="0">
+              <a:rPr lang="en-US" sz="1050" dirty="0">
                 <a:solidFill>
                   <a:srgbClr val="7030A0"/>
                 </a:solidFill>
               </a:rPr>
             </a:br>
             <a:r>
-              <a:rPr lang="en-US" sz="1050" dirty="0" err="1" smtClean="0">
+              <a:rPr lang="en-US" sz="1050" dirty="0" err="1">
                 <a:solidFill>
                   <a:srgbClr val="7030A0"/>
                 </a:solidFill>
               </a:rPr>
-              <a:t>ReadOnlyPerson</a:t>
+              <a:t>ReadOnlyTask</a:t>
             </a:r>
             <a:endParaRPr lang="en-SG" sz="1050" dirty="0">
               <a:solidFill>
@@ -14638,8 +14538,8 @@
         </p:nvSpPr>
         <p:spPr>
           <a:xfrm>
-            <a:off x="7712397" y="2564238"/>
-            <a:ext cx="708186" cy="285783"/>
+            <a:off x="7634974" y="2190302"/>
+            <a:ext cx="822002" cy="285783"/>
           </a:xfrm>
           <a:prstGeom prst="rect">
             <a:avLst/>
@@ -14671,7 +14571,7 @@
           <a:p>
             <a:pPr algn="ctr"/>
             <a:r>
-              <a:rPr lang="en-US" sz="1050" dirty="0" smtClean="0">
+              <a:rPr lang="en-US" sz="1050" dirty="0">
                 <a:solidFill>
                   <a:srgbClr val="7030A0"/>
                 </a:solidFill>
@@ -14744,8 +14644,8 @@
         </p:nvCxnSpPr>
         <p:spPr>
           <a:xfrm flipV="1">
-            <a:off x="7277995" y="2707130"/>
-            <a:ext cx="434402" cy="327761"/>
+            <a:off x="7277995" y="2333194"/>
+            <a:ext cx="356979" cy="701697"/>
           </a:xfrm>
           <a:prstGeom prst="bentConnector3">
             <a:avLst/>
@@ -14782,8 +14682,8 @@
         </p:nvSpPr>
         <p:spPr>
           <a:xfrm>
-            <a:off x="7712397" y="2887216"/>
-            <a:ext cx="708186" cy="285783"/>
+            <a:off x="7634974" y="2541359"/>
+            <a:ext cx="822003" cy="285783"/>
           </a:xfrm>
           <a:prstGeom prst="rect">
             <a:avLst/>
@@ -14815,12 +14715,12 @@
           <a:p>
             <a:pPr algn="ctr"/>
             <a:r>
-              <a:rPr lang="en-US" sz="1050" dirty="0" smtClean="0">
+              <a:rPr lang="en-US" sz="1050" dirty="0">
                 <a:solidFill>
                   <a:srgbClr val="7030A0"/>
                 </a:solidFill>
               </a:rPr>
-              <a:t>Phone</a:t>
+              <a:t>Period</a:t>
             </a:r>
             <a:endParaRPr lang="en-SG" sz="1050" dirty="0">
               <a:solidFill>
@@ -14841,8 +14741,8 @@
         </p:nvCxnSpPr>
         <p:spPr>
           <a:xfrm flipV="1">
-            <a:off x="7277995" y="3030108"/>
-            <a:ext cx="434402" cy="4783"/>
+            <a:off x="7277995" y="2684251"/>
+            <a:ext cx="356979" cy="350640"/>
           </a:xfrm>
           <a:prstGeom prst="bentConnector3">
             <a:avLst/>
@@ -14879,8 +14779,8 @@
         </p:nvSpPr>
         <p:spPr>
           <a:xfrm>
-            <a:off x="7712397" y="3210194"/>
-            <a:ext cx="708186" cy="285783"/>
+            <a:off x="7634638" y="2892465"/>
+            <a:ext cx="823562" cy="285783"/>
           </a:xfrm>
           <a:prstGeom prst="rect">
             <a:avLst/>
@@ -14912,12 +14812,12 @@
           <a:p>
             <a:pPr algn="ctr"/>
             <a:r>
-              <a:rPr lang="en-US" sz="1050" dirty="0" smtClean="0">
+              <a:rPr lang="en-US" sz="1050" dirty="0">
                 <a:solidFill>
                   <a:srgbClr val="7030A0"/>
                 </a:solidFill>
               </a:rPr>
-              <a:t>Email</a:t>
+              <a:t>Deadline</a:t>
             </a:r>
             <a:endParaRPr lang="en-SG" sz="1050" dirty="0">
               <a:solidFill>
@@ -14939,7 +14839,7 @@
         <p:spPr>
           <a:xfrm>
             <a:off x="7277995" y="3034891"/>
-            <a:ext cx="434402" cy="318195"/>
+            <a:ext cx="356643" cy="466"/>
           </a:xfrm>
           <a:prstGeom prst="bentConnector3">
             <a:avLst/>
@@ -14976,8 +14876,8 @@
         </p:nvSpPr>
         <p:spPr>
           <a:xfrm>
-            <a:off x="7712397" y="3533171"/>
-            <a:ext cx="708186" cy="285783"/>
+            <a:off x="7632709" y="3237271"/>
+            <a:ext cx="822003" cy="285783"/>
           </a:xfrm>
           <a:prstGeom prst="rect">
             <a:avLst/>
@@ -15009,12 +14909,12 @@
           <a:p>
             <a:pPr algn="ctr"/>
             <a:r>
-              <a:rPr lang="en-US" sz="1050" dirty="0" smtClean="0">
+              <a:rPr lang="en-US" sz="1050" dirty="0">
                 <a:solidFill>
                   <a:srgbClr val="7030A0"/>
                 </a:solidFill>
               </a:rPr>
-              <a:t>Address</a:t>
+              <a:t>Complete</a:t>
             </a:r>
             <a:endParaRPr lang="en-SG" sz="1050" dirty="0">
               <a:solidFill>
@@ -15036,7 +14936,7 @@
         <p:spPr>
           <a:xfrm>
             <a:off x="7277995" y="3034891"/>
-            <a:ext cx="434402" cy="641172"/>
+            <a:ext cx="354714" cy="345272"/>
           </a:xfrm>
           <a:prstGeom prst="bentConnector3">
             <a:avLst/>
@@ -15197,130 +15097,12 @@
           <a:p>
             <a:pPr algn="ctr"/>
             <a:r>
-              <a:rPr lang="en-US" sz="1050" dirty="0" smtClean="0">
+              <a:rPr lang="en-US" sz="1050" dirty="0">
                 <a:solidFill>
                   <a:srgbClr val="7030A0"/>
                 </a:solidFill>
               </a:rPr>
               <a:t>&lt;&lt;interface&gt;&gt;</a:t>
-            </a:r>
-            <a:br>
-              <a:rPr lang="en-US" sz="1050" dirty="0" smtClean="0">
-                <a:solidFill>
-                  <a:srgbClr val="7030A0"/>
-                </a:solidFill>
-              </a:rPr>
-            </a:br>
-            <a:r>
-              <a:rPr lang="en-US" sz="1050" dirty="0" err="1" smtClean="0">
-                <a:solidFill>
-                  <a:srgbClr val="7030A0"/>
-                </a:solidFill>
-              </a:rPr>
-              <a:t>ReadOnlyAddressBook</a:t>
-            </a:r>
-            <a:endParaRPr lang="en-SG" sz="1050" dirty="0">
-              <a:solidFill>
-                <a:srgbClr val="7030A0"/>
-              </a:solidFill>
-            </a:endParaRPr>
-          </a:p>
-        </p:txBody>
-      </p:sp>
-      <p:sp>
-        <p:nvSpPr>
-          <p:cNvPr id="114" name="TextBox 113"/>
-          <p:cNvSpPr txBox="1"/>
-          <p:nvPr/>
-        </p:nvSpPr>
-        <p:spPr>
-          <a:xfrm rot="16200000">
-            <a:off x="6581354" y="3514530"/>
-            <a:ext cx="881018" cy="261610"/>
-          </a:xfrm>
-          <a:prstGeom prst="rect">
-            <a:avLst/>
-          </a:prstGeom>
-          <a:noFill/>
-        </p:spPr>
-        <p:txBody>
-          <a:bodyPr wrap="square" rtlCol="0">
-            <a:spAutoFit/>
-          </a:bodyPr>
-          <a:lstStyle/>
-          <a:p>
-            <a:pPr algn="r"/>
-            <a:r>
-              <a:rPr lang="en-US" sz="1100" dirty="0" smtClean="0">
-                <a:solidFill>
-                  <a:srgbClr val="7030A0"/>
-                </a:solidFill>
-              </a:rPr>
-              <a:t>filtered list</a:t>
-            </a:r>
-            <a:endParaRPr lang="en-SG" sz="1100" dirty="0">
-              <a:solidFill>
-                <a:srgbClr val="7030A0"/>
-              </a:solidFill>
-            </a:endParaRPr>
-          </a:p>
-        </p:txBody>
-      </p:sp>
-      <p:sp>
-        <p:nvSpPr>
-          <p:cNvPr id="122" name="Rectangle 8"/>
-          <p:cNvSpPr/>
-          <p:nvPr/>
-        </p:nvSpPr>
-        <p:spPr>
-          <a:xfrm>
-            <a:off x="2057400" y="4239491"/>
-            <a:ext cx="1775949" cy="346760"/>
-          </a:xfrm>
-          <a:prstGeom prst="rect">
-            <a:avLst/>
-          </a:prstGeom>
-          <a:ln w="19050">
-            <a:solidFill>
-              <a:srgbClr val="7030A0"/>
-            </a:solidFill>
-          </a:ln>
-          <a:effectLst/>
-        </p:spPr>
-        <p:style>
-          <a:lnRef idx="1">
-            <a:schemeClr val="accent4"/>
-          </a:lnRef>
-          <a:fillRef idx="2">
-            <a:schemeClr val="accent4"/>
-          </a:fillRef>
-          <a:effectRef idx="1">
-            <a:schemeClr val="accent4"/>
-          </a:effectRef>
-          <a:fontRef idx="minor">
-            <a:schemeClr val="dk1"/>
-          </a:fontRef>
-        </p:style>
-        <p:txBody>
-          <a:bodyPr rtlCol="0" anchor="ctr"/>
-          <a:lstStyle/>
-          <a:p>
-            <a:pPr algn="ctr"/>
-            <a:r>
-              <a:rPr lang="en-US" sz="1050" dirty="0" smtClean="0">
-                <a:solidFill>
-                  <a:srgbClr val="7030A0"/>
-                </a:solidFill>
-              </a:rPr>
-              <a:t>&lt;&lt;interface&gt;&gt;</a:t>
-            </a:r>
-            <a:r>
-              <a:rPr lang="en-US" sz="1050" dirty="0">
-                <a:solidFill>
-                  <a:srgbClr val="7030A0"/>
-                </a:solidFill>
-              </a:rPr>
-              <a:t/>
             </a:r>
             <a:br>
               <a:rPr lang="en-US" sz="1050" dirty="0">
@@ -15330,7 +15112,117 @@
               </a:rPr>
             </a:br>
             <a:r>
-              <a:rPr lang="en-US" sz="1050" dirty="0" err="1" smtClean="0">
+              <a:rPr lang="en-US" sz="1050" dirty="0" err="1">
+                <a:solidFill>
+                  <a:srgbClr val="7030A0"/>
+                </a:solidFill>
+              </a:rPr>
+              <a:t>ReadOnlyTaskList</a:t>
+            </a:r>
+            <a:endParaRPr lang="en-SG" sz="1050" dirty="0">
+              <a:solidFill>
+                <a:srgbClr val="7030A0"/>
+              </a:solidFill>
+            </a:endParaRPr>
+          </a:p>
+        </p:txBody>
+      </p:sp>
+      <p:sp>
+        <p:nvSpPr>
+          <p:cNvPr id="114" name="TextBox 113"/>
+          <p:cNvSpPr txBox="1"/>
+          <p:nvPr/>
+        </p:nvSpPr>
+        <p:spPr>
+          <a:xfrm rot="16200000">
+            <a:off x="6581354" y="3514530"/>
+            <a:ext cx="881018" cy="261610"/>
+          </a:xfrm>
+          <a:prstGeom prst="rect">
+            <a:avLst/>
+          </a:prstGeom>
+          <a:noFill/>
+        </p:spPr>
+        <p:txBody>
+          <a:bodyPr wrap="square" rtlCol="0">
+            <a:spAutoFit/>
+          </a:bodyPr>
+          <a:lstStyle/>
+          <a:p>
+            <a:pPr algn="r"/>
+            <a:r>
+              <a:rPr lang="en-US" sz="1100" dirty="0">
+                <a:solidFill>
+                  <a:srgbClr val="7030A0"/>
+                </a:solidFill>
+              </a:rPr>
+              <a:t>filtered list</a:t>
+            </a:r>
+            <a:endParaRPr lang="en-SG" sz="1100" dirty="0">
+              <a:solidFill>
+                <a:srgbClr val="7030A0"/>
+              </a:solidFill>
+            </a:endParaRPr>
+          </a:p>
+        </p:txBody>
+      </p:sp>
+      <p:sp>
+        <p:nvSpPr>
+          <p:cNvPr id="122" name="Rectangle 8"/>
+          <p:cNvSpPr/>
+          <p:nvPr/>
+        </p:nvSpPr>
+        <p:spPr>
+          <a:xfrm>
+            <a:off x="2057400" y="4239491"/>
+            <a:ext cx="1775949" cy="346760"/>
+          </a:xfrm>
+          <a:prstGeom prst="rect">
+            <a:avLst/>
+          </a:prstGeom>
+          <a:ln w="19050">
+            <a:solidFill>
+              <a:srgbClr val="7030A0"/>
+            </a:solidFill>
+          </a:ln>
+          <a:effectLst/>
+        </p:spPr>
+        <p:style>
+          <a:lnRef idx="1">
+            <a:schemeClr val="accent4"/>
+          </a:lnRef>
+          <a:fillRef idx="2">
+            <a:schemeClr val="accent4"/>
+          </a:fillRef>
+          <a:effectRef idx="1">
+            <a:schemeClr val="accent4"/>
+          </a:effectRef>
+          <a:fontRef idx="minor">
+            <a:schemeClr val="dk1"/>
+          </a:fontRef>
+        </p:style>
+        <p:txBody>
+          <a:bodyPr rtlCol="0" anchor="ctr"/>
+          <a:lstStyle/>
+          <a:p>
+            <a:pPr algn="ctr"/>
+            <a:r>
+              <a:rPr lang="en-US" sz="1050" dirty="0">
+                <a:solidFill>
+                  <a:srgbClr val="7030A0"/>
+                </a:solidFill>
+              </a:rPr>
+              <a:t>&lt;&lt;interface&gt;&gt;</a:t>
+            </a:r>
+            <a:br>
+              <a:rPr lang="en-US" sz="1050" dirty="0">
+                <a:solidFill>
+                  <a:srgbClr val="7030A0"/>
+                </a:solidFill>
+              </a:rPr>
+            </a:br>
+            <a:r>
+              <a:rPr lang="en-US" sz="1050" dirty="0" err="1">
                 <a:solidFill>
                   <a:srgbClr val="7030A0"/>
                 </a:solidFill>
@@ -15367,6 +15259,105 @@
               <a:srgbClr val="7030A0"/>
             </a:solidFill>
             <a:prstDash val="sysDot"/>
+            <a:headEnd type="none" w="med" len="med"/>
+            <a:tailEnd type="arrow" w="med" len="med"/>
+          </a:ln>
+          <a:effectLst/>
+        </p:spPr>
+        <p:style>
+          <a:lnRef idx="1">
+            <a:schemeClr val="accent2"/>
+          </a:lnRef>
+          <a:fillRef idx="2">
+            <a:schemeClr val="accent2"/>
+          </a:fillRef>
+          <a:effectRef idx="1">
+            <a:schemeClr val="accent2"/>
+          </a:effectRef>
+          <a:fontRef idx="minor">
+            <a:schemeClr val="dk1"/>
+          </a:fontRef>
+        </p:style>
+      </p:cxnSp>
+      <p:sp>
+        <p:nvSpPr>
+          <p:cNvPr id="50" name="Rectangle 8"/>
+          <p:cNvSpPr/>
+          <p:nvPr/>
+        </p:nvSpPr>
+        <p:spPr>
+          <a:xfrm>
+            <a:off x="7634621" y="3581400"/>
+            <a:ext cx="822003" cy="285783"/>
+          </a:xfrm>
+          <a:prstGeom prst="rect">
+            <a:avLst/>
+          </a:prstGeom>
+          <a:ln w="19050">
+            <a:solidFill>
+              <a:srgbClr val="7030A0"/>
+            </a:solidFill>
+          </a:ln>
+          <a:effectLst/>
+        </p:spPr>
+        <p:style>
+          <a:lnRef idx="1">
+            <a:schemeClr val="accent4"/>
+          </a:lnRef>
+          <a:fillRef idx="2">
+            <a:schemeClr val="accent4"/>
+          </a:fillRef>
+          <a:effectRef idx="1">
+            <a:schemeClr val="accent4"/>
+          </a:effectRef>
+          <a:fontRef idx="minor">
+            <a:schemeClr val="dk1"/>
+          </a:fontRef>
+        </p:style>
+        <p:txBody>
+          <a:bodyPr rtlCol="0" anchor="ctr"/>
+          <a:lstStyle/>
+          <a:p>
+            <a:pPr algn="ctr"/>
+            <a:r>
+              <a:rPr lang="en-US" sz="1050" dirty="0">
+                <a:solidFill>
+                  <a:srgbClr val="7030A0"/>
+                </a:solidFill>
+              </a:rPr>
+              <a:t>Recurrence</a:t>
+            </a:r>
+            <a:endParaRPr lang="en-SG" sz="1050" dirty="0">
+              <a:solidFill>
+                <a:srgbClr val="7030A0"/>
+              </a:solidFill>
+            </a:endParaRPr>
+          </a:p>
+        </p:txBody>
+      </p:sp>
+      <p:cxnSp>
+        <p:nvCxnSpPr>
+          <p:cNvPr id="52" name="Elbow Connector 85"/>
+          <p:cNvCxnSpPr>
+            <a:stCxn id="78" idx="3"/>
+            <a:endCxn id="50" idx="1"/>
+          </p:cNvCxnSpPr>
+          <p:nvPr/>
+        </p:nvCxnSpPr>
+        <p:spPr>
+          <a:xfrm>
+            <a:off x="7277995" y="3034891"/>
+            <a:ext cx="356626" cy="689401"/>
+          </a:xfrm>
+          <a:prstGeom prst="bentConnector3">
+            <a:avLst>
+              <a:gd name="adj1" fmla="val 50000"/>
+            </a:avLst>
+          </a:prstGeom>
+          <a:ln w="19050">
+            <a:solidFill>
+              <a:srgbClr val="7030A0"/>
+            </a:solidFill>
             <a:headEnd type="none" w="med" len="med"/>
             <a:tailEnd type="arrow" w="med" len="med"/>
           </a:ln>
@@ -15397,13 +15388,6 @@
   <p:clrMapOvr>
     <a:masterClrMapping/>
   </p:clrMapOvr>
-  <p:timing>
-    <p:tnLst>
-      <p:par>
-        <p:cTn id="1" dur="indefinite" restart="never" nodeType="tmRoot"/>
-      </p:par>
-    </p:tnLst>
-  </p:timing>
 </p:sld>
 </file>
 
@@ -15470,7 +15454,7 @@
           <a:lstStyle/>
           <a:p>
             <a:r>
-              <a:rPr lang="en-US" sz="1200" b="1" dirty="0" smtClean="0">
+              <a:rPr lang="en-US" sz="1200" b="1" dirty="0">
                 <a:solidFill>
                   <a:schemeClr val="accent6">
                     <a:lumMod val="75000"/>
@@ -15537,147 +15521,6 @@
           <a:p>
             <a:pPr algn="ctr"/>
             <a:r>
-              <a:rPr lang="en-US" sz="1050" dirty="0" smtClean="0">
-                <a:solidFill>
-                  <a:schemeClr val="bg1"/>
-                </a:solidFill>
-              </a:rPr>
-              <a:t>&lt;&lt;interface&gt;&gt;</a:t>
-            </a:r>
-            <a:br>
-              <a:rPr lang="en-US" sz="1050" dirty="0" smtClean="0">
-                <a:solidFill>
-                  <a:schemeClr val="bg1"/>
-                </a:solidFill>
-              </a:rPr>
-            </a:br>
-            <a:r>
-              <a:rPr lang="en-US" sz="1050" dirty="0" err="1" smtClean="0">
-                <a:solidFill>
-                  <a:schemeClr val="bg1"/>
-                </a:solidFill>
-              </a:rPr>
-              <a:t>AddressBookStorage</a:t>
-            </a:r>
-            <a:endParaRPr lang="en-SG" sz="1050" dirty="0">
-              <a:solidFill>
-                <a:schemeClr val="bg1"/>
-              </a:solidFill>
-            </a:endParaRPr>
-          </a:p>
-        </p:txBody>
-      </p:sp>
-      <p:sp>
-        <p:nvSpPr>
-          <p:cNvPr id="9" name="Rectangle 62"/>
-          <p:cNvSpPr/>
-          <p:nvPr/>
-        </p:nvSpPr>
-        <p:spPr>
-          <a:xfrm rot="16200000">
-            <a:off x="1683963" y="2868687"/>
-            <a:ext cx="1093635" cy="346760"/>
-          </a:xfrm>
-          <a:prstGeom prst="rect">
-            <a:avLst/>
-          </a:prstGeom>
-          <a:solidFill>
-            <a:schemeClr val="accent6">
-              <a:lumMod val="75000"/>
-            </a:schemeClr>
-          </a:solidFill>
-          <a:ln w="19050">
-            <a:solidFill>
-              <a:schemeClr val="accent6">
-                <a:lumMod val="75000"/>
-              </a:schemeClr>
-            </a:solidFill>
-          </a:ln>
-          <a:effectLst/>
-        </p:spPr>
-        <p:style>
-          <a:lnRef idx="1">
-            <a:schemeClr val="accent2"/>
-          </a:lnRef>
-          <a:fillRef idx="2">
-            <a:schemeClr val="accent2"/>
-          </a:fillRef>
-          <a:effectRef idx="1">
-            <a:schemeClr val="accent2"/>
-          </a:effectRef>
-          <a:fontRef idx="minor">
-            <a:schemeClr val="dk1"/>
-          </a:fontRef>
-        </p:style>
-        <p:txBody>
-          <a:bodyPr rtlCol="0" anchor="ctr"/>
-          <a:lstStyle/>
-          <a:p>
-            <a:pPr algn="ctr"/>
-            <a:r>
-              <a:rPr lang="en-US" sz="1050" dirty="0" err="1" smtClean="0">
-                <a:solidFill>
-                  <a:schemeClr val="bg1"/>
-                </a:solidFill>
-              </a:rPr>
-              <a:t>StorageManager</a:t>
-            </a:r>
-            <a:endParaRPr lang="en-SG" sz="1050" dirty="0">
-              <a:solidFill>
-                <a:schemeClr val="bg1"/>
-              </a:solidFill>
-            </a:endParaRPr>
-          </a:p>
-        </p:txBody>
-      </p:sp>
-      <p:sp>
-        <p:nvSpPr>
-          <p:cNvPr id="119" name="Rectangle 62"/>
-          <p:cNvSpPr/>
-          <p:nvPr/>
-        </p:nvSpPr>
-        <p:spPr>
-          <a:xfrm rot="16200000">
-            <a:off x="956202" y="2861202"/>
-            <a:ext cx="1093635" cy="346760"/>
-          </a:xfrm>
-          <a:prstGeom prst="rect">
-            <a:avLst/>
-          </a:prstGeom>
-          <a:solidFill>
-            <a:schemeClr val="accent6">
-              <a:lumMod val="75000"/>
-            </a:schemeClr>
-          </a:solidFill>
-          <a:ln w="19050">
-            <a:solidFill>
-              <a:schemeClr val="accent6">
-                <a:lumMod val="75000"/>
-              </a:schemeClr>
-            </a:solidFill>
-          </a:ln>
-          <a:effectLst/>
-        </p:spPr>
-        <p:style>
-          <a:lnRef idx="1">
-            <a:schemeClr val="accent2"/>
-          </a:lnRef>
-          <a:fillRef idx="2">
-            <a:schemeClr val="accent2"/>
-          </a:fillRef>
-          <a:effectRef idx="1">
-            <a:schemeClr val="accent2"/>
-          </a:effectRef>
-          <a:fontRef idx="minor">
-            <a:schemeClr val="dk1"/>
-          </a:fontRef>
-        </p:style>
-        <p:txBody>
-          <a:bodyPr rtlCol="0" anchor="ctr"/>
-          <a:lstStyle/>
-          <a:p>
-            <a:pPr algn="ctr"/>
-            <a:r>
               <a:rPr lang="en-US" sz="1050" dirty="0">
                 <a:solidFill>
                   <a:schemeClr val="bg1"/>
@@ -15685,11 +15528,152 @@
               </a:rPr>
               <a:t>&lt;&lt;interface&gt;&gt;</a:t>
             </a:r>
-          </a:p>
+            <a:br>
+              <a:rPr lang="en-US" sz="1050" dirty="0">
+                <a:solidFill>
+                  <a:schemeClr val="bg1"/>
+                </a:solidFill>
+              </a:rPr>
+            </a:br>
+            <a:r>
+              <a:rPr lang="en-US" sz="1050" dirty="0" err="1">
+                <a:solidFill>
+                  <a:schemeClr val="bg1"/>
+                </a:solidFill>
+              </a:rPr>
+              <a:t>AddressBookStorage</a:t>
+            </a:r>
+            <a:endParaRPr lang="en-SG" sz="1050" dirty="0">
+              <a:solidFill>
+                <a:schemeClr val="bg1"/>
+              </a:solidFill>
+            </a:endParaRPr>
+          </a:p>
+        </p:txBody>
+      </p:sp>
+      <p:sp>
+        <p:nvSpPr>
+          <p:cNvPr id="9" name="Rectangle 62"/>
+          <p:cNvSpPr/>
+          <p:nvPr/>
+        </p:nvSpPr>
+        <p:spPr>
+          <a:xfrm rot="16200000">
+            <a:off x="1683963" y="2868687"/>
+            <a:ext cx="1093635" cy="346760"/>
+          </a:xfrm>
+          <a:prstGeom prst="rect">
+            <a:avLst/>
+          </a:prstGeom>
+          <a:solidFill>
+            <a:schemeClr val="accent6">
+              <a:lumMod val="75000"/>
+            </a:schemeClr>
+          </a:solidFill>
+          <a:ln w="19050">
+            <a:solidFill>
+              <a:schemeClr val="accent6">
+                <a:lumMod val="75000"/>
+              </a:schemeClr>
+            </a:solidFill>
+          </a:ln>
+          <a:effectLst/>
+        </p:spPr>
+        <p:style>
+          <a:lnRef idx="1">
+            <a:schemeClr val="accent2"/>
+          </a:lnRef>
+          <a:fillRef idx="2">
+            <a:schemeClr val="accent2"/>
+          </a:fillRef>
+          <a:effectRef idx="1">
+            <a:schemeClr val="accent2"/>
+          </a:effectRef>
+          <a:fontRef idx="minor">
+            <a:schemeClr val="dk1"/>
+          </a:fontRef>
+        </p:style>
+        <p:txBody>
+          <a:bodyPr rtlCol="0" anchor="ctr"/>
+          <a:lstStyle/>
           <a:p>
             <a:pPr algn="ctr"/>
             <a:r>
-              <a:rPr lang="en-US" sz="1050" dirty="0" smtClean="0">
+              <a:rPr lang="en-US" sz="1050" dirty="0" err="1">
+                <a:solidFill>
+                  <a:schemeClr val="bg1"/>
+                </a:solidFill>
+              </a:rPr>
+              <a:t>StorageManager</a:t>
+            </a:r>
+            <a:endParaRPr lang="en-SG" sz="1050" dirty="0">
+              <a:solidFill>
+                <a:schemeClr val="bg1"/>
+              </a:solidFill>
+            </a:endParaRPr>
+          </a:p>
+        </p:txBody>
+      </p:sp>
+      <p:sp>
+        <p:nvSpPr>
+          <p:cNvPr id="119" name="Rectangle 62"/>
+          <p:cNvSpPr/>
+          <p:nvPr/>
+        </p:nvSpPr>
+        <p:spPr>
+          <a:xfrm rot="16200000">
+            <a:off x="956202" y="2861202"/>
+            <a:ext cx="1093635" cy="346760"/>
+          </a:xfrm>
+          <a:prstGeom prst="rect">
+            <a:avLst/>
+          </a:prstGeom>
+          <a:solidFill>
+            <a:schemeClr val="accent6">
+              <a:lumMod val="75000"/>
+            </a:schemeClr>
+          </a:solidFill>
+          <a:ln w="19050">
+            <a:solidFill>
+              <a:schemeClr val="accent6">
+                <a:lumMod val="75000"/>
+              </a:schemeClr>
+            </a:solidFill>
+          </a:ln>
+          <a:effectLst/>
+        </p:spPr>
+        <p:style>
+          <a:lnRef idx="1">
+            <a:schemeClr val="accent2"/>
+          </a:lnRef>
+          <a:fillRef idx="2">
+            <a:schemeClr val="accent2"/>
+          </a:fillRef>
+          <a:effectRef idx="1">
+            <a:schemeClr val="accent2"/>
+          </a:effectRef>
+          <a:fontRef idx="minor">
+            <a:schemeClr val="dk1"/>
+          </a:fontRef>
+        </p:style>
+        <p:txBody>
+          <a:bodyPr rtlCol="0" anchor="ctr"/>
+          <a:lstStyle/>
+          <a:p>
+            <a:pPr algn="ctr"/>
+            <a:r>
+              <a:rPr lang="en-US" sz="1050" dirty="0">
+                <a:solidFill>
+                  <a:schemeClr val="bg1"/>
+                </a:solidFill>
+              </a:rPr>
+              <a:t>&lt;&lt;interface&gt;&gt;</a:t>
+            </a:r>
+          </a:p>
+          <a:p>
+            <a:pPr algn="ctr"/>
+            <a:r>
+              <a:rPr lang="en-US" sz="1050" dirty="0">
                 <a:solidFill>
                   <a:schemeClr val="bg1"/>
                 </a:solidFill>
@@ -16123,7 +16107,7 @@
           <a:p>
             <a:pPr algn="ctr"/>
             <a:r>
-              <a:rPr lang="en-US" sz="1050" b="1" dirty="0" err="1" smtClean="0">
+              <a:rPr lang="en-US" sz="1050" b="1" dirty="0" err="1">
                 <a:solidFill>
                   <a:schemeClr val="accent6">
                     <a:lumMod val="75000"/>
@@ -16132,18 +16116,8 @@
               </a:rPr>
               <a:t>XmlAddressBook</a:t>
             </a:r>
-            <a:r>
-              <a:rPr lang="en-US" sz="1050" b="1" dirty="0" smtClean="0">
-                <a:solidFill>
-                  <a:schemeClr val="accent6">
-                    <a:lumMod val="75000"/>
-                  </a:schemeClr>
-                </a:solidFill>
-              </a:rPr>
-              <a:t/>
-            </a:r>
             <a:br>
-              <a:rPr lang="en-US" sz="1050" b="1" dirty="0" smtClean="0">
+              <a:rPr lang="en-US" sz="1050" b="1" dirty="0">
                 <a:solidFill>
                   <a:schemeClr val="accent6">
                     <a:lumMod val="75000"/>
@@ -16152,7 +16126,7 @@
               </a:rPr>
             </a:br>
             <a:r>
-              <a:rPr lang="en-US" sz="1050" b="1" dirty="0" smtClean="0">
+              <a:rPr lang="en-US" sz="1050" b="1" dirty="0">
                 <a:solidFill>
                   <a:schemeClr val="accent6">
                     <a:lumMod val="75000"/>
@@ -16219,7 +16193,7 @@
           <a:p>
             <a:pPr algn="ctr"/>
             <a:r>
-              <a:rPr lang="en-US" sz="1050" dirty="0" smtClean="0">
+              <a:rPr lang="en-US" sz="1050" dirty="0">
                 <a:solidFill>
                   <a:schemeClr val="bg1"/>
                 </a:solidFill>
@@ -16227,14 +16201,14 @@
               <a:t>&lt;&lt;interface&gt;&gt;</a:t>
             </a:r>
             <a:br>
-              <a:rPr lang="en-US" sz="1050" dirty="0" smtClean="0">
+              <a:rPr lang="en-US" sz="1050" dirty="0">
                 <a:solidFill>
                   <a:schemeClr val="bg1"/>
                 </a:solidFill>
               </a:rPr>
             </a:br>
             <a:r>
-              <a:rPr lang="en-US" sz="1050" dirty="0" err="1" smtClean="0">
+              <a:rPr lang="en-US" sz="1050" dirty="0" err="1">
                 <a:solidFill>
                   <a:schemeClr val="bg1"/>
                 </a:solidFill>
@@ -16492,30 +16466,22 @@
           <a:p>
             <a:pPr algn="ctr"/>
             <a:r>
-              <a:rPr lang="en-US" sz="1050" dirty="0" err="1" smtClean="0">
+              <a:rPr lang="en-US" sz="1050" dirty="0" err="1">
                 <a:solidFill>
                   <a:schemeClr val="bg1"/>
                 </a:solidFill>
               </a:rPr>
               <a:t>JsonUserPrefs</a:t>
             </a:r>
-            <a:r>
-              <a:rPr lang="en-US" sz="1050" dirty="0" smtClean="0">
-                <a:solidFill>
-                  <a:schemeClr val="bg1"/>
-                </a:solidFill>
-              </a:rPr>
-              <a:t/>
-            </a:r>
             <a:br>
-              <a:rPr lang="en-US" sz="1050" dirty="0" smtClean="0">
+              <a:rPr lang="en-US" sz="1050" dirty="0">
                 <a:solidFill>
                   <a:schemeClr val="bg1"/>
                 </a:solidFill>
               </a:rPr>
             </a:br>
             <a:r>
-              <a:rPr lang="en-US" sz="1050" dirty="0" smtClean="0">
+              <a:rPr lang="en-US" sz="1050" dirty="0">
                 <a:solidFill>
                   <a:schemeClr val="bg1"/>
                 </a:solidFill>
@@ -16567,7 +16533,7 @@
           <a:p>
             <a:pPr algn="ctr"/>
             <a:r>
-              <a:rPr lang="en-US" sz="1050" b="1" dirty="0" err="1" smtClean="0">
+              <a:rPr lang="en-US" sz="1050" b="1" dirty="0" err="1">
                 <a:solidFill>
                   <a:schemeClr val="accent6">
                     <a:lumMod val="75000"/>
@@ -16576,18 +16542,8 @@
               </a:rPr>
               <a:t>XmlSerializable</a:t>
             </a:r>
-            <a:r>
-              <a:rPr lang="en-US" sz="1050" b="1" dirty="0" smtClean="0">
-                <a:solidFill>
-                  <a:schemeClr val="accent6">
-                    <a:lumMod val="75000"/>
-                  </a:schemeClr>
-                </a:solidFill>
-              </a:rPr>
-              <a:t/>
-            </a:r>
             <a:br>
-              <a:rPr lang="en-US" sz="1050" b="1" dirty="0" smtClean="0">
+              <a:rPr lang="en-US" sz="1050" b="1" dirty="0">
                 <a:solidFill>
                   <a:schemeClr val="accent6">
                     <a:lumMod val="75000"/>
@@ -16596,7 +16552,7 @@
               </a:rPr>
             </a:br>
             <a:r>
-              <a:rPr lang="en-US" sz="1050" b="1" dirty="0" err="1" smtClean="0">
+              <a:rPr lang="en-US" sz="1050" b="1" dirty="0" err="1">
                 <a:solidFill>
                   <a:schemeClr val="accent6">
                     <a:lumMod val="75000"/>
@@ -16693,7 +16649,7 @@
           <a:p>
             <a:pPr algn="ctr"/>
             <a:r>
-              <a:rPr lang="en-US" sz="1050" b="1" dirty="0" err="1" smtClean="0">
+              <a:rPr lang="en-US" sz="1050" b="1" dirty="0" err="1">
                 <a:solidFill>
                   <a:schemeClr val="accent6">
                     <a:lumMod val="75000"/>
@@ -16749,7 +16705,7 @@
           <a:p>
             <a:pPr algn="ctr"/>
             <a:r>
-              <a:rPr lang="en-US" sz="1050" b="1" dirty="0" err="1" smtClean="0">
+              <a:rPr lang="en-US" sz="1050" b="1" dirty="0" err="1">
                 <a:solidFill>
                   <a:schemeClr val="accent6">
                     <a:lumMod val="75000"/>
@@ -16819,13 +16775,6 @@
   <p:clrMapOvr>
     <a:masterClrMapping/>
   </p:clrMapOvr>
-  <p:timing>
-    <p:tnLst>
-      <p:par>
-        <p:cTn id="1" dur="indefinite" restart="never" nodeType="tmRoot"/>
-      </p:par>
-    </p:tnLst>
-  </p:timing>
 </p:sld>
 </file>
 

</xml_diff>

<commit_message>
Update LogicClassDiagram Add abstract UndoableCommand
</commit_message>
<xml_diff>
--- a/docs/diagrams/Diagrams.pptx
+++ b/docs/diagrams/Diagrams.pptx
@@ -215,7 +215,7 @@
           <a:p>
             <a:fld id="{F5CC4B3F-88C1-4FFA-B1B6-F41C21DC6924}" type="datetimeFigureOut">
               <a:rPr lang="en-US" smtClean="0"/>
-              <a:t>10/9/2016</a:t>
+              <a:t>10/11/16</a:t>
             </a:fld>
             <a:endParaRPr lang="en-US"/>
           </a:p>
@@ -661,7 +661,7 @@
           <a:p>
             <a:fld id="{78C97017-6FC3-485B-9764-EAC9E56C1D49}" type="datetimeFigureOut">
               <a:rPr lang="en-US" smtClean="0"/>
-              <a:t>10/9/2016</a:t>
+              <a:t>10/11/16</a:t>
             </a:fld>
             <a:endParaRPr lang="en-US"/>
           </a:p>
@@ -829,7 +829,7 @@
           <a:p>
             <a:fld id="{78C97017-6FC3-485B-9764-EAC9E56C1D49}" type="datetimeFigureOut">
               <a:rPr lang="en-US" smtClean="0"/>
-              <a:t>10/9/2016</a:t>
+              <a:t>10/11/16</a:t>
             </a:fld>
             <a:endParaRPr lang="en-US"/>
           </a:p>
@@ -1007,7 +1007,7 @@
           <a:p>
             <a:fld id="{78C97017-6FC3-485B-9764-EAC9E56C1D49}" type="datetimeFigureOut">
               <a:rPr lang="en-US" smtClean="0"/>
-              <a:t>10/9/2016</a:t>
+              <a:t>10/11/16</a:t>
             </a:fld>
             <a:endParaRPr lang="en-US"/>
           </a:p>
@@ -1175,7 +1175,7 @@
           <a:p>
             <a:fld id="{78C97017-6FC3-485B-9764-EAC9E56C1D49}" type="datetimeFigureOut">
               <a:rPr lang="en-US" smtClean="0"/>
-              <a:t>10/9/2016</a:t>
+              <a:t>10/11/16</a:t>
             </a:fld>
             <a:endParaRPr lang="en-US"/>
           </a:p>
@@ -1420,7 +1420,7 @@
           <a:p>
             <a:fld id="{78C97017-6FC3-485B-9764-EAC9E56C1D49}" type="datetimeFigureOut">
               <a:rPr lang="en-US" smtClean="0"/>
-              <a:t>10/9/2016</a:t>
+              <a:t>10/11/16</a:t>
             </a:fld>
             <a:endParaRPr lang="en-US"/>
           </a:p>
@@ -1705,7 +1705,7 @@
           <a:p>
             <a:fld id="{78C97017-6FC3-485B-9764-EAC9E56C1D49}" type="datetimeFigureOut">
               <a:rPr lang="en-US" smtClean="0"/>
-              <a:t>10/9/2016</a:t>
+              <a:t>10/11/16</a:t>
             </a:fld>
             <a:endParaRPr lang="en-US"/>
           </a:p>
@@ -2124,7 +2124,7 @@
           <a:p>
             <a:fld id="{78C97017-6FC3-485B-9764-EAC9E56C1D49}" type="datetimeFigureOut">
               <a:rPr lang="en-US" smtClean="0"/>
-              <a:t>10/9/2016</a:t>
+              <a:t>10/11/16</a:t>
             </a:fld>
             <a:endParaRPr lang="en-US"/>
           </a:p>
@@ -2241,7 +2241,7 @@
           <a:p>
             <a:fld id="{78C97017-6FC3-485B-9764-EAC9E56C1D49}" type="datetimeFigureOut">
               <a:rPr lang="en-US" smtClean="0"/>
-              <a:t>10/9/2016</a:t>
+              <a:t>10/11/16</a:t>
             </a:fld>
             <a:endParaRPr lang="en-US"/>
           </a:p>
@@ -2336,7 +2336,7 @@
           <a:p>
             <a:fld id="{78C97017-6FC3-485B-9764-EAC9E56C1D49}" type="datetimeFigureOut">
               <a:rPr lang="en-US" smtClean="0"/>
-              <a:t>10/9/2016</a:t>
+              <a:t>10/11/16</a:t>
             </a:fld>
             <a:endParaRPr lang="en-US"/>
           </a:p>
@@ -2611,7 +2611,7 @@
           <a:p>
             <a:fld id="{78C97017-6FC3-485B-9764-EAC9E56C1D49}" type="datetimeFigureOut">
               <a:rPr lang="en-US" smtClean="0"/>
-              <a:t>10/9/2016</a:t>
+              <a:t>10/11/16</a:t>
             </a:fld>
             <a:endParaRPr lang="en-US"/>
           </a:p>
@@ -2863,7 +2863,7 @@
           <a:p>
             <a:fld id="{78C97017-6FC3-485B-9764-EAC9E56C1D49}" type="datetimeFigureOut">
               <a:rPr lang="en-US" smtClean="0"/>
-              <a:t>10/9/2016</a:t>
+              <a:t>10/11/16</a:t>
             </a:fld>
             <a:endParaRPr lang="en-US"/>
           </a:p>
@@ -3074,7 +3074,7 @@
           <a:p>
             <a:fld id="{78C97017-6FC3-485B-9764-EAC9E56C1D49}" type="datetimeFigureOut">
               <a:rPr lang="en-US" smtClean="0"/>
-              <a:t>10/9/2016</a:t>
+              <a:t>10/11/16</a:t>
             </a:fld>
             <a:endParaRPr lang="en-US"/>
           </a:p>
@@ -9714,8 +9714,8 @@
         </p:nvSpPr>
         <p:spPr>
           <a:xfrm>
-            <a:off x="1103085" y="2057399"/>
-            <a:ext cx="6288315" cy="2272167"/>
+            <a:off x="1103085" y="1219200"/>
+            <a:ext cx="7431315" cy="3110367"/>
           </a:xfrm>
           <a:prstGeom prst="roundRect">
             <a:avLst>
@@ -9834,7 +9834,7 @@
         </p:nvSpPr>
         <p:spPr>
           <a:xfrm flipH="1">
-            <a:off x="6180592" y="2648528"/>
+            <a:off x="7171113" y="2645680"/>
             <a:ext cx="1093635" cy="346760"/>
           </a:xfrm>
           <a:prstGeom prst="rect">
@@ -9867,12 +9867,20 @@
           <a:p>
             <a:pPr algn="ctr"/>
             <a:r>
-              <a:rPr lang="en-US" sz="1050" b="1" dirty="0" err="1">
+              <a:rPr lang="en-US" sz="1050" b="1" dirty="0" err="1" smtClean="0">
                 <a:solidFill>
                   <a:srgbClr val="0070C0"/>
                 </a:solidFill>
               </a:rPr>
-              <a:t>AddCommand</a:t>
+              <a:t>Clear</a:t>
+            </a:r>
+            <a:r>
+              <a:rPr lang="en-US" sz="1050" b="1" dirty="0" err="1" smtClean="0">
+                <a:solidFill>
+                  <a:srgbClr val="0070C0"/>
+                </a:solidFill>
+              </a:rPr>
+              <a:t>Command</a:t>
             </a:r>
             <a:endParaRPr lang="en-SG" sz="1050" b="1" dirty="0">
               <a:solidFill>
@@ -9956,7 +9964,7 @@
           </a:xfrm>
           <a:prstGeom prst="bentConnector3">
             <a:avLst>
-              <a:gd name="adj1" fmla="val -267"/>
+              <a:gd name="adj1" fmla="val 4908"/>
             </a:avLst>
           </a:prstGeom>
           <a:ln w="19050">
@@ -10084,7 +10092,7 @@
         <p:spPr>
           <a:xfrm>
             <a:off x="1103085" y="4548755"/>
-            <a:ext cx="6288315" cy="328045"/>
+            <a:ext cx="7431315" cy="328045"/>
           </a:xfrm>
           <a:prstGeom prst="roundRect">
             <a:avLst/>
@@ -10143,7 +10151,7 @@
         </p:nvSpPr>
         <p:spPr>
           <a:xfrm flipH="1">
-            <a:off x="6180592" y="3054928"/>
+            <a:off x="7171113" y="3052080"/>
             <a:ext cx="1093635" cy="346760"/>
           </a:xfrm>
           <a:prstGeom prst="rect">
@@ -10199,7 +10207,7 @@
         </p:nvSpPr>
         <p:spPr>
           <a:xfrm flipH="1">
-            <a:off x="6180590" y="3860800"/>
+            <a:off x="7171111" y="3857952"/>
             <a:ext cx="1093635" cy="346760"/>
           </a:xfrm>
           <a:prstGeom prst="rect">
@@ -10329,12 +10337,12 @@
         </p:nvCxnSpPr>
         <p:spPr>
           <a:xfrm rot="10800000" flipV="1">
-            <a:off x="5786402" y="2821908"/>
-            <a:ext cx="394190" cy="1079066"/>
+            <a:off x="5786403" y="2819060"/>
+            <a:ext cx="1384711" cy="1081914"/>
           </a:xfrm>
           <a:prstGeom prst="bentConnector3">
             <a:avLst>
-              <a:gd name="adj1" fmla="val 50000"/>
+              <a:gd name="adj1" fmla="val 32831"/>
             </a:avLst>
           </a:prstGeom>
           <a:ln w="19050">
@@ -10373,11 +10381,11 @@
         <p:spPr>
           <a:xfrm>
             <a:off x="5786402" y="3900974"/>
-            <a:ext cx="394188" cy="133206"/>
+            <a:ext cx="1384709" cy="130358"/>
           </a:xfrm>
           <a:prstGeom prst="bentConnector3">
             <a:avLst>
-              <a:gd name="adj1" fmla="val 50000"/>
+              <a:gd name="adj1" fmla="val 67169"/>
             </a:avLst>
           </a:prstGeom>
           <a:ln w="19050">
@@ -10415,12 +10423,12 @@
         </p:nvCxnSpPr>
         <p:spPr>
           <a:xfrm flipV="1">
-            <a:off x="5786402" y="3228308"/>
-            <a:ext cx="394190" cy="672666"/>
+            <a:off x="5786402" y="3225460"/>
+            <a:ext cx="1384711" cy="675514"/>
           </a:xfrm>
           <a:prstGeom prst="bentConnector3">
             <a:avLst>
-              <a:gd name="adj1" fmla="val 50000"/>
+              <a:gd name="adj1" fmla="val 67169"/>
             </a:avLst>
           </a:prstGeom>
           <a:ln w="19050">
@@ -11311,7 +11319,7 @@
         </p:nvSpPr>
         <p:spPr>
           <a:xfrm flipH="1">
-            <a:off x="6185390" y="3458098"/>
+            <a:off x="7175911" y="3455250"/>
             <a:ext cx="1093635" cy="346760"/>
           </a:xfrm>
           <a:prstGeom prst="rect">
@@ -11385,8 +11393,200 @@
         </p:nvCxnSpPr>
         <p:spPr>
           <a:xfrm flipV="1">
-            <a:off x="5786402" y="3631478"/>
-            <a:ext cx="398988" cy="269496"/>
+            <a:off x="5786402" y="3628630"/>
+            <a:ext cx="1389509" cy="272344"/>
+          </a:xfrm>
+          <a:prstGeom prst="bentConnector3">
+            <a:avLst>
+              <a:gd name="adj1" fmla="val 67110"/>
+            </a:avLst>
+          </a:prstGeom>
+          <a:ln w="19050">
+            <a:solidFill>
+              <a:srgbClr val="0070C0"/>
+            </a:solidFill>
+            <a:headEnd type="none" w="med" len="med"/>
+            <a:tailEnd type="none" w="med" len="med"/>
+          </a:ln>
+          <a:effectLst/>
+        </p:spPr>
+        <p:style>
+          <a:lnRef idx="1">
+            <a:schemeClr val="accent2"/>
+          </a:lnRef>
+          <a:fillRef idx="2">
+            <a:schemeClr val="accent2"/>
+          </a:fillRef>
+          <a:effectRef idx="1">
+            <a:schemeClr val="accent2"/>
+          </a:effectRef>
+          <a:fontRef idx="minor">
+            <a:schemeClr val="dk1"/>
+          </a:fontRef>
+        </p:style>
+      </p:cxnSp>
+      <p:sp>
+        <p:nvSpPr>
+          <p:cNvPr id="46" name="Rectangle 62"/>
+          <p:cNvSpPr/>
+          <p:nvPr/>
+        </p:nvSpPr>
+        <p:spPr>
+          <a:xfrm>
+            <a:off x="5606081" y="1743665"/>
+            <a:ext cx="837741" cy="532799"/>
+          </a:xfrm>
+          <a:prstGeom prst="rect">
+            <a:avLst/>
+          </a:prstGeom>
+          <a:ln w="19050">
+            <a:solidFill>
+              <a:srgbClr val="0070C0"/>
+            </a:solidFill>
+          </a:ln>
+          <a:effectLst/>
+        </p:spPr>
+        <p:style>
+          <a:lnRef idx="1">
+            <a:schemeClr val="accent1"/>
+          </a:lnRef>
+          <a:fillRef idx="2">
+            <a:schemeClr val="accent1"/>
+          </a:fillRef>
+          <a:effectRef idx="1">
+            <a:schemeClr val="accent1"/>
+          </a:effectRef>
+          <a:fontRef idx="minor">
+            <a:schemeClr val="dk1"/>
+          </a:fontRef>
+        </p:style>
+        <p:txBody>
+          <a:bodyPr rtlCol="0" anchor="ctr"/>
+          <a:lstStyle/>
+          <a:p>
+            <a:pPr algn="ctr"/>
+            <a:r>
+              <a:rPr lang="en-US" sz="1050" b="1" dirty="0">
+                <a:solidFill>
+                  <a:srgbClr val="0070C0"/>
+                </a:solidFill>
+              </a:rPr>
+              <a:t>{abstract}</a:t>
+            </a:r>
+            <a:r>
+              <a:rPr lang="en-US" sz="1050" b="1">
+                <a:solidFill>
+                  <a:srgbClr val="0070C0"/>
+                </a:solidFill>
+              </a:rPr>
+              <a:t/>
+            </a:r>
+            <a:br>
+              <a:rPr lang="en-US" sz="1050" b="1">
+                <a:solidFill>
+                  <a:srgbClr val="0070C0"/>
+                </a:solidFill>
+              </a:rPr>
+            </a:br>
+            <a:r>
+              <a:rPr lang="en-US" sz="1050" b="1" smtClean="0">
+                <a:solidFill>
+                  <a:srgbClr val="0070C0"/>
+                </a:solidFill>
+              </a:rPr>
+              <a:t>Undoable</a:t>
+            </a:r>
+            <a:br>
+              <a:rPr lang="en-US" sz="1050" b="1" smtClean="0">
+                <a:solidFill>
+                  <a:srgbClr val="0070C0"/>
+                </a:solidFill>
+              </a:rPr>
+            </a:br>
+            <a:r>
+              <a:rPr lang="en-US" sz="1050" b="1" smtClean="0">
+                <a:solidFill>
+                  <a:srgbClr val="0070C0"/>
+                </a:solidFill>
+              </a:rPr>
+              <a:t>Command</a:t>
+            </a:r>
+            <a:endParaRPr lang="en-SG" sz="1050" b="1" dirty="0">
+              <a:solidFill>
+                <a:srgbClr val="0070C0"/>
+              </a:solidFill>
+            </a:endParaRPr>
+          </a:p>
+        </p:txBody>
+      </p:sp>
+      <p:sp>
+        <p:nvSpPr>
+          <p:cNvPr id="47" name="Rectangle 11"/>
+          <p:cNvSpPr/>
+          <p:nvPr/>
+        </p:nvSpPr>
+        <p:spPr>
+          <a:xfrm flipH="1">
+            <a:off x="7156635" y="1324714"/>
+            <a:ext cx="1106527" cy="346760"/>
+          </a:xfrm>
+          <a:prstGeom prst="rect">
+            <a:avLst/>
+          </a:prstGeom>
+          <a:ln w="19050">
+            <a:solidFill>
+              <a:srgbClr val="0070C0"/>
+            </a:solidFill>
+          </a:ln>
+          <a:effectLst/>
+        </p:spPr>
+        <p:style>
+          <a:lnRef idx="1">
+            <a:schemeClr val="accent1"/>
+          </a:lnRef>
+          <a:fillRef idx="2">
+            <a:schemeClr val="accent1"/>
+          </a:fillRef>
+          <a:effectRef idx="1">
+            <a:schemeClr val="accent1"/>
+          </a:effectRef>
+          <a:fontRef idx="minor">
+            <a:schemeClr val="dk1"/>
+          </a:fontRef>
+        </p:style>
+        <p:txBody>
+          <a:bodyPr rtlCol="0" anchor="ctr"/>
+          <a:lstStyle/>
+          <a:p>
+            <a:pPr algn="ctr"/>
+            <a:r>
+              <a:rPr lang="en-US" sz="1050" b="1" dirty="0" err="1" smtClean="0">
+                <a:solidFill>
+                  <a:srgbClr val="0070C0"/>
+                </a:solidFill>
+              </a:rPr>
+              <a:t>AddCommand</a:t>
+            </a:r>
+            <a:endParaRPr lang="en-SG" sz="1050" b="1" dirty="0">
+              <a:solidFill>
+                <a:srgbClr val="0070C0"/>
+              </a:solidFill>
+            </a:endParaRPr>
+          </a:p>
+        </p:txBody>
+      </p:sp>
+      <p:cxnSp>
+        <p:nvCxnSpPr>
+          <p:cNvPr id="53" name="Elbow Connector 63"/>
+          <p:cNvCxnSpPr>
+            <a:endCxn id="46" idx="2"/>
+          </p:cNvCxnSpPr>
+          <p:nvPr/>
+        </p:nvCxnSpPr>
+        <p:spPr>
+          <a:xfrm rot="16200000" flipV="1">
+            <a:off x="5210102" y="3091315"/>
+            <a:ext cx="1632861" cy="3160"/>
           </a:xfrm>
           <a:prstGeom prst="bentConnector3">
             <a:avLst>
@@ -11417,6 +11617,252 @@
           </a:fontRef>
         </p:style>
       </p:cxnSp>
+      <p:sp>
+        <p:nvSpPr>
+          <p:cNvPr id="58" name="Isosceles Triangle 102"/>
+          <p:cNvSpPr/>
+          <p:nvPr/>
+        </p:nvSpPr>
+        <p:spPr>
+          <a:xfrm rot="5400000" flipV="1">
+            <a:off x="6396332" y="1920646"/>
+            <a:ext cx="270504" cy="175523"/>
+          </a:xfrm>
+          <a:prstGeom prst="triangle">
+            <a:avLst/>
+          </a:prstGeom>
+          <a:ln w="19050">
+            <a:solidFill>
+              <a:srgbClr val="0070C0"/>
+            </a:solidFill>
+          </a:ln>
+          <a:effectLst/>
+        </p:spPr>
+        <p:style>
+          <a:lnRef idx="1">
+            <a:schemeClr val="accent1"/>
+          </a:lnRef>
+          <a:fillRef idx="2">
+            <a:schemeClr val="accent1"/>
+          </a:fillRef>
+          <a:effectRef idx="1">
+            <a:schemeClr val="accent1"/>
+          </a:effectRef>
+          <a:fontRef idx="minor">
+            <a:schemeClr val="dk1"/>
+          </a:fontRef>
+        </p:style>
+        <p:txBody>
+          <a:bodyPr rtlCol="0" anchor="ctr"/>
+          <a:lstStyle/>
+          <a:p>
+            <a:pPr algn="ctr"/>
+            <a:endParaRPr lang="en-SG" sz="1050" b="1">
+              <a:solidFill>
+                <a:srgbClr val="92D050"/>
+              </a:solidFill>
+            </a:endParaRPr>
+          </a:p>
+        </p:txBody>
+      </p:sp>
+      <p:sp>
+        <p:nvSpPr>
+          <p:cNvPr id="68" name="Rectangle 67"/>
+          <p:cNvSpPr/>
+          <p:nvPr/>
+        </p:nvSpPr>
+        <p:spPr>
+          <a:xfrm flipH="1">
+            <a:off x="7169528" y="2158012"/>
+            <a:ext cx="1093635" cy="346760"/>
+          </a:xfrm>
+          <a:prstGeom prst="rect">
+            <a:avLst/>
+          </a:prstGeom>
+          <a:ln w="19050">
+            <a:solidFill>
+              <a:srgbClr val="0070C0"/>
+            </a:solidFill>
+          </a:ln>
+          <a:effectLst/>
+        </p:spPr>
+        <p:style>
+          <a:lnRef idx="1">
+            <a:schemeClr val="accent1"/>
+          </a:lnRef>
+          <a:fillRef idx="2">
+            <a:schemeClr val="accent1"/>
+          </a:fillRef>
+          <a:effectRef idx="1">
+            <a:schemeClr val="accent1"/>
+          </a:effectRef>
+          <a:fontRef idx="minor">
+            <a:schemeClr val="dk1"/>
+          </a:fontRef>
+        </p:style>
+        <p:txBody>
+          <a:bodyPr rtlCol="0" anchor="ctr"/>
+          <a:lstStyle/>
+          <a:p>
+            <a:pPr algn="ctr"/>
+            <a:r>
+              <a:rPr lang="en-US" sz="1050" b="1" dirty="0">
+                <a:solidFill>
+                  <a:srgbClr val="0070C0"/>
+                </a:solidFill>
+              </a:rPr>
+              <a:t>…</a:t>
+            </a:r>
+            <a:endParaRPr lang="en-SG" sz="1050" b="1" dirty="0">
+              <a:solidFill>
+                <a:srgbClr val="0070C0"/>
+              </a:solidFill>
+            </a:endParaRPr>
+          </a:p>
+        </p:txBody>
+      </p:sp>
+      <p:cxnSp>
+        <p:nvCxnSpPr>
+          <p:cNvPr id="69" name="Elbow Connector 63"/>
+          <p:cNvCxnSpPr>
+            <a:stCxn id="47" idx="3"/>
+            <a:endCxn id="58" idx="3"/>
+          </p:cNvCxnSpPr>
+          <p:nvPr/>
+        </p:nvCxnSpPr>
+        <p:spPr>
+          <a:xfrm rot="10800000" flipV="1">
+            <a:off x="6619347" y="1498094"/>
+            <a:ext cx="537289" cy="510314"/>
+          </a:xfrm>
+          <a:prstGeom prst="bentConnector3">
+            <a:avLst>
+              <a:gd name="adj1" fmla="val 50000"/>
+            </a:avLst>
+          </a:prstGeom>
+          <a:ln w="19050">
+            <a:solidFill>
+              <a:srgbClr val="0070C0"/>
+            </a:solidFill>
+            <a:headEnd type="none" w="med" len="med"/>
+            <a:tailEnd type="none" w="med" len="med"/>
+          </a:ln>
+          <a:effectLst/>
+        </p:spPr>
+        <p:style>
+          <a:lnRef idx="1">
+            <a:schemeClr val="accent2"/>
+          </a:lnRef>
+          <a:fillRef idx="2">
+            <a:schemeClr val="accent2"/>
+          </a:fillRef>
+          <a:effectRef idx="1">
+            <a:schemeClr val="accent2"/>
+          </a:effectRef>
+          <a:fontRef idx="minor">
+            <a:schemeClr val="dk1"/>
+          </a:fontRef>
+        </p:style>
+      </p:cxnSp>
+      <p:cxnSp>
+        <p:nvCxnSpPr>
+          <p:cNvPr id="73" name="Elbow Connector 63"/>
+          <p:cNvCxnSpPr>
+            <a:stCxn id="68" idx="3"/>
+            <a:endCxn id="58" idx="3"/>
+          </p:cNvCxnSpPr>
+          <p:nvPr/>
+        </p:nvCxnSpPr>
+        <p:spPr>
+          <a:xfrm rot="10800000">
+            <a:off x="6619346" y="2008408"/>
+            <a:ext cx="550182" cy="322984"/>
+          </a:xfrm>
+          <a:prstGeom prst="bentConnector3">
+            <a:avLst>
+              <a:gd name="adj1" fmla="val 50000"/>
+            </a:avLst>
+          </a:prstGeom>
+          <a:ln w="19050">
+            <a:solidFill>
+              <a:srgbClr val="0070C0"/>
+            </a:solidFill>
+            <a:headEnd type="none" w="med" len="med"/>
+            <a:tailEnd type="none" w="med" len="med"/>
+          </a:ln>
+          <a:effectLst/>
+        </p:spPr>
+        <p:style>
+          <a:lnRef idx="1">
+            <a:schemeClr val="accent2"/>
+          </a:lnRef>
+          <a:fillRef idx="2">
+            <a:schemeClr val="accent2"/>
+          </a:fillRef>
+          <a:effectRef idx="1">
+            <a:schemeClr val="accent2"/>
+          </a:effectRef>
+          <a:fontRef idx="minor">
+            <a:schemeClr val="dk1"/>
+          </a:fontRef>
+        </p:style>
+      </p:cxnSp>
+      <p:sp>
+        <p:nvSpPr>
+          <p:cNvPr id="78" name="Rectangle 77"/>
+          <p:cNvSpPr/>
+          <p:nvPr/>
+        </p:nvSpPr>
+        <p:spPr>
+          <a:xfrm flipH="1">
+            <a:off x="7156634" y="1743796"/>
+            <a:ext cx="1112911" cy="346760"/>
+          </a:xfrm>
+          <a:prstGeom prst="rect">
+            <a:avLst/>
+          </a:prstGeom>
+          <a:ln w="19050">
+            <a:solidFill>
+              <a:srgbClr val="0070C0"/>
+            </a:solidFill>
+          </a:ln>
+          <a:effectLst/>
+        </p:spPr>
+        <p:style>
+          <a:lnRef idx="1">
+            <a:schemeClr val="accent1"/>
+          </a:lnRef>
+          <a:fillRef idx="2">
+            <a:schemeClr val="accent1"/>
+          </a:fillRef>
+          <a:effectRef idx="1">
+            <a:schemeClr val="accent1"/>
+          </a:effectRef>
+          <a:fontRef idx="minor">
+            <a:schemeClr val="dk1"/>
+          </a:fontRef>
+        </p:style>
+        <p:txBody>
+          <a:bodyPr rtlCol="0" anchor="ctr"/>
+          <a:lstStyle/>
+          <a:p>
+            <a:pPr algn="ctr"/>
+            <a:r>
+              <a:rPr lang="en-US" sz="1050" b="1" smtClean="0">
+                <a:solidFill>
+                  <a:srgbClr val="0070C0"/>
+                </a:solidFill>
+              </a:rPr>
+              <a:t>DeleteCommand</a:t>
+            </a:r>
+            <a:endParaRPr lang="en-SG" sz="1050" b="1" dirty="0">
+              <a:solidFill>
+                <a:srgbClr val="0070C0"/>
+              </a:solidFill>
+            </a:endParaRPr>
+          </a:p>
+        </p:txBody>
+      </p:sp>
     </p:spTree>
     <p:extLst>
       <p:ext uri="{BB962C8B-B14F-4D97-AF65-F5344CB8AC3E}">
@@ -14334,6 +14780,16 @@
               </a:rPr>
               <a:t>XmlTars</a:t>
             </a:r>
+            <a:r>
+              <a:rPr lang="en-US" sz="1050" b="1" dirty="0">
+                <a:solidFill>
+                  <a:schemeClr val="accent6">
+                    <a:lumMod val="75000"/>
+                  </a:schemeClr>
+                </a:solidFill>
+              </a:rPr>
+              <a:t/>
+            </a:r>
             <a:br>
               <a:rPr lang="en-US" sz="1050" b="1" dirty="0">
                 <a:solidFill>
@@ -14691,6 +15147,14 @@
               </a:rPr>
               <a:t>JsonUserPrefs</a:t>
             </a:r>
+            <a:r>
+              <a:rPr lang="en-US" sz="1050" dirty="0">
+                <a:solidFill>
+                  <a:schemeClr val="bg1"/>
+                </a:solidFill>
+              </a:rPr>
+              <a:t/>
+            </a:r>
             <a:br>
               <a:rPr lang="en-US" sz="1050" dirty="0">
                 <a:solidFill>
@@ -14759,6 +15223,16 @@
                 </a:solidFill>
               </a:rPr>
               <a:t>XmlSerializable</a:t>
+            </a:r>
+            <a:r>
+              <a:rPr lang="en-US" sz="1050" b="1" dirty="0">
+                <a:solidFill>
+                  <a:schemeClr val="accent6">
+                    <a:lumMod val="75000"/>
+                  </a:schemeClr>
+                </a:solidFill>
+              </a:rPr>
+              <a:t/>
             </a:r>
             <a:br>
               <a:rPr lang="en-US" sz="1050" b="1" dirty="0">

</xml_diff>

<commit_message>
Edit storage diagram for Task
</commit_message>
<xml_diff>
--- a/docs/diagrams/Diagrams.pptx
+++ b/docs/diagrams/Diagrams.pptx
@@ -200,7 +200,7 @@
           <a:p>
             <a:fld id="{F5CC4B3F-88C1-4FFA-B1B6-F41C21DC6924}" type="datetimeFigureOut">
               <a:rPr lang="en-US" smtClean="0"/>
-              <a:t>9/30/2016</a:t>
+              <a:t>12/10/16</a:t>
             </a:fld>
             <a:endParaRPr lang="en-US"/>
           </a:p>
@@ -649,7 +649,7 @@
           <a:p>
             <a:fld id="{78C97017-6FC3-485B-9764-EAC9E56C1D49}" type="datetimeFigureOut">
               <a:rPr lang="en-US" smtClean="0"/>
-              <a:t>9/30/2016</a:t>
+              <a:t>12/10/16</a:t>
             </a:fld>
             <a:endParaRPr lang="en-US"/>
           </a:p>
@@ -819,7 +819,7 @@
           <a:p>
             <a:fld id="{78C97017-6FC3-485B-9764-EAC9E56C1D49}" type="datetimeFigureOut">
               <a:rPr lang="en-US" smtClean="0"/>
-              <a:t>9/30/2016</a:t>
+              <a:t>12/10/16</a:t>
             </a:fld>
             <a:endParaRPr lang="en-US"/>
           </a:p>
@@ -999,7 +999,7 @@
           <a:p>
             <a:fld id="{78C97017-6FC3-485B-9764-EAC9E56C1D49}" type="datetimeFigureOut">
               <a:rPr lang="en-US" smtClean="0"/>
-              <a:t>9/30/2016</a:t>
+              <a:t>12/10/16</a:t>
             </a:fld>
             <a:endParaRPr lang="en-US"/>
           </a:p>
@@ -1169,7 +1169,7 @@
           <a:p>
             <a:fld id="{78C97017-6FC3-485B-9764-EAC9E56C1D49}" type="datetimeFigureOut">
               <a:rPr lang="en-US" smtClean="0"/>
-              <a:t>9/30/2016</a:t>
+              <a:t>12/10/16</a:t>
             </a:fld>
             <a:endParaRPr lang="en-US"/>
           </a:p>
@@ -1415,7 +1415,7 @@
           <a:p>
             <a:fld id="{78C97017-6FC3-485B-9764-EAC9E56C1D49}" type="datetimeFigureOut">
               <a:rPr lang="en-US" smtClean="0"/>
-              <a:t>9/30/2016</a:t>
+              <a:t>12/10/16</a:t>
             </a:fld>
             <a:endParaRPr lang="en-US"/>
           </a:p>
@@ -1703,7 +1703,7 @@
           <a:p>
             <a:fld id="{78C97017-6FC3-485B-9764-EAC9E56C1D49}" type="datetimeFigureOut">
               <a:rPr lang="en-US" smtClean="0"/>
-              <a:t>9/30/2016</a:t>
+              <a:t>12/10/16</a:t>
             </a:fld>
             <a:endParaRPr lang="en-US"/>
           </a:p>
@@ -2125,7 +2125,7 @@
           <a:p>
             <a:fld id="{78C97017-6FC3-485B-9764-EAC9E56C1D49}" type="datetimeFigureOut">
               <a:rPr lang="en-US" smtClean="0"/>
-              <a:t>9/30/2016</a:t>
+              <a:t>12/10/16</a:t>
             </a:fld>
             <a:endParaRPr lang="en-US"/>
           </a:p>
@@ -2243,7 +2243,7 @@
           <a:p>
             <a:fld id="{78C97017-6FC3-485B-9764-EAC9E56C1D49}" type="datetimeFigureOut">
               <a:rPr lang="en-US" smtClean="0"/>
-              <a:t>9/30/2016</a:t>
+              <a:t>12/10/16</a:t>
             </a:fld>
             <a:endParaRPr lang="en-US"/>
           </a:p>
@@ -2338,7 +2338,7 @@
           <a:p>
             <a:fld id="{78C97017-6FC3-485B-9764-EAC9E56C1D49}" type="datetimeFigureOut">
               <a:rPr lang="en-US" smtClean="0"/>
-              <a:t>9/30/2016</a:t>
+              <a:t>12/10/16</a:t>
             </a:fld>
             <a:endParaRPr lang="en-US"/>
           </a:p>
@@ -2615,7 +2615,7 @@
           <a:p>
             <a:fld id="{78C97017-6FC3-485B-9764-EAC9E56C1D49}" type="datetimeFigureOut">
               <a:rPr lang="en-US" smtClean="0"/>
-              <a:t>9/30/2016</a:t>
+              <a:t>12/10/16</a:t>
             </a:fld>
             <a:endParaRPr lang="en-US"/>
           </a:p>
@@ -2868,7 +2868,7 @@
           <a:p>
             <a:fld id="{78C97017-6FC3-485B-9764-EAC9E56C1D49}" type="datetimeFigureOut">
               <a:rPr lang="en-US" smtClean="0"/>
-              <a:t>9/30/2016</a:t>
+              <a:t>12/10/16</a:t>
             </a:fld>
             <a:endParaRPr lang="en-US"/>
           </a:p>
@@ -3081,7 +3081,7 @@
           <a:p>
             <a:fld id="{78C97017-6FC3-485B-9764-EAC9E56C1D49}" type="datetimeFigureOut">
               <a:rPr lang="en-US" smtClean="0"/>
-              <a:t>9/30/2016</a:t>
+              <a:t>12/10/16</a:t>
             </a:fld>
             <a:endParaRPr lang="en-US"/>
           </a:p>
@@ -9756,7 +9756,7 @@
   <p:timing>
     <p:tnLst>
       <p:par>
-        <p:cTn id="1" dur="indefinite" restart="never" nodeType="tmRoot"/>
+        <p:cTn xmlns:p14="http://schemas.microsoft.com/office/powerpoint/2010/main" id="1" dur="indefinite" restart="never" nodeType="tmRoot"/>
       </p:par>
     </p:tnLst>
   </p:timing>
@@ -11545,7 +11545,7 @@
   <p:timing>
     <p:tnLst>
       <p:par>
-        <p:cTn id="1" dur="indefinite" restart="never" nodeType="tmRoot"/>
+        <p:cTn xmlns:p14="http://schemas.microsoft.com/office/powerpoint/2010/main" id="1" dur="indefinite" restart="never" nodeType="tmRoot"/>
       </p:par>
     </p:tnLst>
   </p:timing>
@@ -12280,7 +12280,6 @@
               <a:rPr lang="en-US" dirty="0"/>
               <a:t>execute()</a:t>
             </a:r>
-            <a:endParaRPr lang="en-US" dirty="0"/>
           </a:p>
         </p:txBody>
       </p:sp>
@@ -15400,7 +15399,7 @@
   <p:timing>
     <p:tnLst>
       <p:par>
-        <p:cTn id="1" dur="indefinite" restart="never" nodeType="tmRoot"/>
+        <p:cTn xmlns:p14="http://schemas.microsoft.com/office/powerpoint/2010/main" id="1" dur="indefinite" restart="never" nodeType="tmRoot"/>
       </p:par>
     </p:tnLst>
   </p:timing>
@@ -15557,7 +15556,7 @@
                   <a:schemeClr val="bg1"/>
                 </a:solidFill>
               </a:rPr>
-              <a:t>AddressBookStorage</a:t>
+              <a:t>TaskManagerStorage</a:t>
             </a:r>
             <a:endParaRPr lang="en-SG" sz="1050" dirty="0">
               <a:solidFill>
@@ -16130,7 +16129,7 @@
                   </a:schemeClr>
                 </a:solidFill>
               </a:rPr>
-              <a:t>XmlAddressBook</a:t>
+              <a:t>XmlTaskManager</a:t>
             </a:r>
             <a:r>
               <a:rPr lang="en-US" sz="1050" b="1" dirty="0" smtClean="0">
@@ -16603,7 +16602,7 @@
                   </a:schemeClr>
                 </a:solidFill>
               </a:rPr>
-              <a:t>AddressBook</a:t>
+              <a:t>TaskManager</a:t>
             </a:r>
             <a:endParaRPr lang="en-SG" sz="1050" b="1" dirty="0">
               <a:solidFill>
@@ -16756,7 +16755,7 @@
                   </a:schemeClr>
                 </a:solidFill>
               </a:rPr>
-              <a:t>XmlAdaptedPerson</a:t>
+              <a:t>XmlAdaptedTask</a:t>
             </a:r>
             <a:endParaRPr lang="en-SG" sz="1050" b="1" dirty="0">
               <a:solidFill>
@@ -16822,7 +16821,7 @@
   <p:timing>
     <p:tnLst>
       <p:par>
-        <p:cTn id="1" dur="indefinite" restart="never" nodeType="tmRoot"/>
+        <p:cTn xmlns:p14="http://schemas.microsoft.com/office/powerpoint/2010/main" id="1" dur="indefinite" restart="never" nodeType="tmRoot"/>
       </p:par>
     </p:tnLst>
   </p:timing>

</xml_diff>

<commit_message>
Edit logic diagram in ppt
</commit_message>
<xml_diff>
--- a/docs/diagrams/Diagrams.pptx
+++ b/docs/diagrams/Diagrams.pptx
@@ -10,10 +10,10 @@
   <p:sldIdLst>
     <p:sldId id="256" r:id="rId2"/>
     <p:sldId id="259" r:id="rId3"/>
-    <p:sldId id="266" r:id="rId4"/>
+    <p:sldId id="269" r:id="rId4"/>
     <p:sldId id="260" r:id="rId5"/>
-    <p:sldId id="261" r:id="rId6"/>
-    <p:sldId id="267" r:id="rId7"/>
+    <p:sldId id="270" r:id="rId6"/>
+    <p:sldId id="271" r:id="rId7"/>
     <p:sldId id="268" r:id="rId8"/>
     <p:sldId id="264" r:id="rId9"/>
     <p:sldId id="265" r:id="rId10"/>
@@ -5659,8 +5659,8 @@
         </p:nvSpPr>
         <p:spPr>
           <a:xfrm>
-            <a:off x="2166172" y="1453379"/>
-            <a:ext cx="1424846" cy="215444"/>
+            <a:off x="1861933" y="1453378"/>
+            <a:ext cx="1729085" cy="215444"/>
           </a:xfrm>
           <a:prstGeom prst="rect">
             <a:avLst/>
@@ -5753,7 +5753,7 @@
                   <a:srgbClr val="7030A0"/>
                 </a:solidFill>
               </a:rPr>
-              <a:t>deletePerson</a:t>
+              <a:t>deleteTask</a:t>
             </a:r>
             <a:r>
               <a:rPr lang="en-US" sz="1400" dirty="0" smtClean="0">
@@ -5761,7 +5761,7 @@
                   <a:srgbClr val="7030A0"/>
                 </a:solidFill>
               </a:rPr>
-              <a:t>(p)</a:t>
+              <a:t>(t)</a:t>
             </a:r>
             <a:endParaRPr lang="en-US" sz="1400" dirty="0">
               <a:solidFill>
@@ -5811,7 +5811,7 @@
                   </a:schemeClr>
                 </a:solidFill>
               </a:rPr>
-              <a:t>AddressBookChangedEvent</a:t>
+              <a:t>TaskManagerChangedEvent</a:t>
             </a:r>
             <a:r>
               <a:rPr lang="en-US" sz="1400" dirty="0" smtClean="0">
@@ -6188,6 +6188,43 @@
           </a:fontRef>
         </p:style>
       </p:cxnSp>
+      <p:cxnSp>
+        <p:nvCxnSpPr>
+          <p:cNvPr id="85" name="Straight Connector 84"/>
+          <p:cNvCxnSpPr/>
+          <p:nvPr/>
+        </p:nvCxnSpPr>
+        <p:spPr>
+          <a:xfrm flipH="1">
+            <a:off x="314394" y="1099672"/>
+            <a:ext cx="24" cy="1598671"/>
+          </a:xfrm>
+          <a:prstGeom prst="line">
+            <a:avLst/>
+          </a:prstGeom>
+          <a:ln w="19050">
+            <a:solidFill>
+              <a:schemeClr val="tx1"/>
+            </a:solidFill>
+            <a:prstDash val="sysDash"/>
+          </a:ln>
+          <a:effectLst/>
+        </p:spPr>
+        <p:style>
+          <a:lnRef idx="1">
+            <a:schemeClr val="accent1"/>
+          </a:lnRef>
+          <a:fillRef idx="2">
+            <a:schemeClr val="accent1"/>
+          </a:fillRef>
+          <a:effectRef idx="1">
+            <a:schemeClr val="accent1"/>
+          </a:effectRef>
+          <a:fontRef idx="minor">
+            <a:schemeClr val="dk1"/>
+          </a:fontRef>
+        </p:style>
+      </p:cxnSp>
       <p:sp>
         <p:nvSpPr>
           <p:cNvPr id="53" name="Rectangle 62"/>
@@ -6385,7 +6422,7 @@
                   </a:schemeClr>
                 </a:solidFill>
               </a:rPr>
-              <a:t>AddressBookChangedEvent</a:t>
+              <a:t>TaskManagerChangedEvent</a:t>
             </a:r>
             <a:r>
               <a:rPr lang="en-US" sz="1400" dirty="0" smtClean="0">
@@ -6757,7 +6794,7 @@
                   </a:schemeClr>
                 </a:solidFill>
               </a:rPr>
-              <a:t>handleAddresssBookChangedEvent</a:t>
+              <a:t>handleTaskManagerChangedEvent</a:t>
             </a:r>
             <a:r>
               <a:rPr lang="en-US" sz="1400" dirty="0" smtClean="0">
@@ -6779,43 +6816,6 @@
           </a:p>
         </p:txBody>
       </p:sp>
-      <p:cxnSp>
-        <p:nvCxnSpPr>
-          <p:cNvPr id="85" name="Straight Connector 84"/>
-          <p:cNvCxnSpPr/>
-          <p:nvPr/>
-        </p:nvCxnSpPr>
-        <p:spPr>
-          <a:xfrm flipH="1">
-            <a:off x="314394" y="1099672"/>
-            <a:ext cx="24" cy="1598671"/>
-          </a:xfrm>
-          <a:prstGeom prst="line">
-            <a:avLst/>
-          </a:prstGeom>
-          <a:ln w="19050">
-            <a:solidFill>
-              <a:schemeClr val="tx1"/>
-            </a:solidFill>
-            <a:prstDash val="sysDash"/>
-          </a:ln>
-          <a:effectLst/>
-        </p:spPr>
-        <p:style>
-          <a:lnRef idx="1">
-            <a:schemeClr val="accent1"/>
-          </a:lnRef>
-          <a:fillRef idx="2">
-            <a:schemeClr val="accent1"/>
-          </a:fillRef>
-          <a:effectRef idx="1">
-            <a:schemeClr val="accent1"/>
-          </a:effectRef>
-          <a:fontRef idx="minor">
-            <a:schemeClr val="dk1"/>
-          </a:fontRef>
-        </p:style>
-      </p:cxnSp>
       <p:sp>
         <p:nvSpPr>
           <p:cNvPr id="45" name="Rectangle 62"/>
@@ -7068,7 +7068,7 @@
                   <a:srgbClr val="00B050"/>
                 </a:solidFill>
               </a:rPr>
-              <a:t>handleAddresssBookChangedEvent</a:t>
+              <a:t>handleTaskMangerChangedEvent</a:t>
             </a:r>
             <a:r>
               <a:rPr lang="en-US" sz="1400" dirty="0" smtClean="0">
@@ -7511,7 +7511,7 @@
     </p:spTree>
     <p:extLst>
       <p:ext uri="{BB962C8B-B14F-4D97-AF65-F5344CB8AC3E}">
-        <p14:creationId xmlns:p14="http://schemas.microsoft.com/office/powerpoint/2010/main" val="4023378879"/>
+        <p14:creationId xmlns:p14="http://schemas.microsoft.com/office/powerpoint/2010/main" val="484176208"/>
       </p:ext>
     </p:extLst>
   </p:cSld>
@@ -11535,7 +11535,7 @@
     </p:spTree>
     <p:extLst>
       <p:ext uri="{BB962C8B-B14F-4D97-AF65-F5344CB8AC3E}">
-        <p14:creationId xmlns:p14="http://schemas.microsoft.com/office/powerpoint/2010/main" val="599777654"/>
+        <p14:creationId xmlns:p14="http://schemas.microsoft.com/office/powerpoint/2010/main" val="1584865696"/>
       </p:ext>
     </p:extLst>
   </p:cSld>
@@ -12796,7 +12796,7 @@
                   <a:srgbClr val="7030A0"/>
                 </a:solidFill>
               </a:rPr>
-              <a:t>deletePerson</a:t>
+              <a:t>deleteTask</a:t>
             </a:r>
             <a:r>
               <a:rPr lang="en-US" dirty="0" smtClean="0">
@@ -12804,7 +12804,23 @@
                   <a:srgbClr val="7030A0"/>
                 </a:solidFill>
               </a:rPr>
-              <a:t>(p)</a:t>
+              <a:t>(</a:t>
+            </a:r>
+            <a:r>
+              <a:rPr lang="en-US" dirty="0">
+                <a:solidFill>
+                  <a:srgbClr val="7030A0"/>
+                </a:solidFill>
+              </a:rPr>
+              <a:t>t</a:t>
+            </a:r>
+            <a:r>
+              <a:rPr lang="en-US" dirty="0" smtClean="0">
+                <a:solidFill>
+                  <a:srgbClr val="7030A0"/>
+                </a:solidFill>
+              </a:rPr>
+              <a:t>)</a:t>
             </a:r>
             <a:endParaRPr lang="en-US" dirty="0">
               <a:solidFill>
@@ -13217,7 +13233,7 @@
     </p:spTree>
     <p:extLst>
       <p:ext uri="{BB962C8B-B14F-4D97-AF65-F5344CB8AC3E}">
-        <p14:creationId xmlns:p14="http://schemas.microsoft.com/office/powerpoint/2010/main" val="3945898909"/>
+        <p14:creationId xmlns:p14="http://schemas.microsoft.com/office/powerpoint/2010/main" val="2502191504"/>
       </p:ext>
     </p:extLst>
   </p:cSld>

</xml_diff>

<commit_message>
Edit UI diagram in ppt
</commit_message>
<xml_diff>
--- a/docs/diagrams/Diagrams.pptx
+++ b/docs/diagrams/Diagrams.pptx
@@ -11,7 +11,7 @@
     <p:sldId id="256" r:id="rId2"/>
     <p:sldId id="259" r:id="rId3"/>
     <p:sldId id="269" r:id="rId4"/>
-    <p:sldId id="260" r:id="rId5"/>
+    <p:sldId id="272" r:id="rId5"/>
     <p:sldId id="270" r:id="rId6"/>
     <p:sldId id="271" r:id="rId7"/>
     <p:sldId id="268" r:id="rId8"/>
@@ -7546,8 +7546,8 @@
         </p:nvSpPr>
         <p:spPr>
           <a:xfrm>
-            <a:off x="1217465" y="1447800"/>
-            <a:ext cx="4917083" cy="3962400"/>
+            <a:off x="1171902" y="914400"/>
+            <a:ext cx="5265750" cy="4912158"/>
           </a:xfrm>
           <a:prstGeom prst="roundRect">
             <a:avLst>
@@ -7728,7 +7728,7 @@
         </p:nvSpPr>
         <p:spPr>
           <a:xfrm>
-            <a:off x="2092842" y="1770924"/>
+            <a:off x="2104363" y="1649668"/>
             <a:ext cx="1093635" cy="346760"/>
           </a:xfrm>
           <a:prstGeom prst="rect">
@@ -7783,19 +7783,18 @@
         <p:nvCxnSpPr>
           <p:cNvPr id="10" name="Elbow Connector 63"/>
           <p:cNvCxnSpPr>
-            <a:stCxn id="9" idx="2"/>
             <a:endCxn id="2" idx="0"/>
           </p:cNvCxnSpPr>
           <p:nvPr/>
         </p:nvCxnSpPr>
         <p:spPr>
-          <a:xfrm rot="16200000" flipH="1">
-            <a:off x="2529445" y="2227899"/>
-            <a:ext cx="223536" cy="3106"/>
+          <a:xfrm rot="5400000">
+            <a:off x="2480210" y="2158985"/>
+            <a:ext cx="344791" cy="19678"/>
           </a:xfrm>
           <a:prstGeom prst="bentConnector3">
             <a:avLst>
-              <a:gd name="adj1" fmla="val 50000"/>
+              <a:gd name="adj1" fmla="val -16301"/>
             </a:avLst>
           </a:prstGeom>
           <a:ln w="19050">
@@ -7830,7 +7829,7 @@
         </p:nvSpPr>
         <p:spPr>
           <a:xfrm rot="10800000" flipV="1">
-            <a:off x="5394717" y="2110477"/>
+            <a:off x="5390394" y="2035795"/>
             <a:ext cx="270504" cy="175523"/>
           </a:xfrm>
           <a:prstGeom prst="triangle">
@@ -7921,8 +7920,8 @@
         </p:nvSpPr>
         <p:spPr>
           <a:xfrm rot="16200000">
-            <a:off x="5703829" y="2464877"/>
-            <a:ext cx="2362201" cy="328045"/>
+            <a:off x="5658423" y="2019892"/>
+            <a:ext cx="2498061" cy="297862"/>
           </a:xfrm>
           <a:prstGeom prst="roundRect">
             <a:avLst/>
@@ -7981,8 +7980,8 @@
         </p:nvSpPr>
         <p:spPr>
           <a:xfrm>
-            <a:off x="2592528" y="3649359"/>
-            <a:ext cx="1093635" cy="236841"/>
+            <a:off x="2592527" y="3651004"/>
+            <a:ext cx="1439341" cy="242918"/>
           </a:xfrm>
           <a:prstGeom prst="rect">
             <a:avLst/>
@@ -8014,14 +8013,14 @@
           <a:p>
             <a:pPr algn="ctr"/>
             <a:r>
-              <a:rPr lang="en-US" sz="1050" b="1" dirty="0" err="1">
+              <a:rPr lang="en-US" sz="1050" b="1" dirty="0" err="1" smtClean="0">
                 <a:solidFill>
                   <a:schemeClr val="accent3">
                     <a:lumMod val="75000"/>
                   </a:schemeClr>
                 </a:solidFill>
               </a:rPr>
-              <a:t>BrowserPanel</a:t>
+              <a:t>DeadlinesListPanel</a:t>
             </a:r>
             <a:endParaRPr lang="en-SG" sz="1050" b="1" dirty="0">
               <a:solidFill>
@@ -8041,7 +8040,7 @@
         </p:nvSpPr>
         <p:spPr>
           <a:xfrm>
-            <a:off x="2592527" y="4563759"/>
+            <a:off x="2602995" y="5073316"/>
             <a:ext cx="1093635" cy="236841"/>
           </a:xfrm>
           <a:prstGeom prst="rect">
@@ -8101,8 +8100,8 @@
         </p:nvSpPr>
         <p:spPr>
           <a:xfrm>
-            <a:off x="2592526" y="3991960"/>
-            <a:ext cx="1093635" cy="236841"/>
+            <a:off x="2592526" y="4040957"/>
+            <a:ext cx="1441548" cy="248281"/>
           </a:xfrm>
           <a:prstGeom prst="rect">
             <a:avLst/>
@@ -8134,14 +8133,14 @@
           <a:p>
             <a:pPr algn="ctr"/>
             <a:r>
-              <a:rPr lang="en-US" sz="1050" b="1" dirty="0" err="1">
+              <a:rPr lang="en-US" sz="1050" b="1" smtClean="0">
                 <a:solidFill>
                   <a:schemeClr val="accent3">
                     <a:lumMod val="75000"/>
                   </a:schemeClr>
                 </a:solidFill>
               </a:rPr>
-              <a:t>PersonListPanel</a:t>
+              <a:t>FloatingTaskListPanel</a:t>
             </a:r>
             <a:endParaRPr lang="en-SG" sz="1050" b="1" dirty="0">
               <a:solidFill>
@@ -8161,7 +8160,7 @@
         </p:nvSpPr>
         <p:spPr>
           <a:xfrm>
-            <a:off x="3839323" y="4228801"/>
+            <a:off x="4189931" y="4264493"/>
             <a:ext cx="1040906" cy="236841"/>
           </a:xfrm>
           <a:prstGeom prst="rect">
@@ -8194,14 +8193,14 @@
           <a:p>
             <a:pPr algn="ctr"/>
             <a:r>
-              <a:rPr lang="en-US" sz="1050" b="1" dirty="0" err="1">
+              <a:rPr lang="en-US" sz="1050" b="1" smtClean="0">
                 <a:solidFill>
                   <a:schemeClr val="accent3">
                     <a:lumMod val="75000"/>
                   </a:schemeClr>
                 </a:solidFill>
               </a:rPr>
-              <a:t>PersonCard</a:t>
+              <a:t>TaskCard</a:t>
             </a:r>
             <a:endParaRPr lang="en-SG" sz="1050" b="1" dirty="0">
               <a:solidFill>
@@ -8221,7 +8220,7 @@
         </p:nvSpPr>
         <p:spPr>
           <a:xfrm>
-            <a:off x="2592528" y="4966000"/>
+            <a:off x="2604907" y="5436993"/>
             <a:ext cx="1093635" cy="236841"/>
           </a:xfrm>
           <a:prstGeom prst="rect">
@@ -8370,8 +8369,8 @@
         </p:nvSpPr>
         <p:spPr>
           <a:xfrm>
-            <a:off x="3759694" y="3416961"/>
-            <a:ext cx="1040906" cy="236841"/>
+            <a:off x="4139691" y="3383184"/>
+            <a:ext cx="1078765" cy="265994"/>
           </a:xfrm>
           <a:prstGeom prst="rect">
             <a:avLst/>
@@ -8433,8 +8432,8 @@
         </p:nvCxnSpPr>
         <p:spPr>
           <a:xfrm rot="16200000" flipH="1">
-            <a:off x="2054450" y="3229701"/>
-            <a:ext cx="899755" cy="176402"/>
+            <a:off x="2052107" y="3232043"/>
+            <a:ext cx="904438" cy="176401"/>
           </a:xfrm>
           <a:prstGeom prst="bentConnector2">
             <a:avLst/>
@@ -8474,8 +8473,8 @@
         </p:nvCxnSpPr>
         <p:spPr>
           <a:xfrm rot="16200000" flipH="1">
-            <a:off x="1883148" y="3401003"/>
-            <a:ext cx="1242356" cy="176400"/>
+            <a:off x="1855790" y="3428361"/>
+            <a:ext cx="1297073" cy="176400"/>
           </a:xfrm>
           <a:prstGeom prst="bentConnector2">
             <a:avLst/>
@@ -8515,8 +8514,8 @@
         </p:nvCxnSpPr>
         <p:spPr>
           <a:xfrm rot="16200000" flipH="1">
-            <a:off x="1597249" y="3686901"/>
-            <a:ext cx="1814155" cy="176401"/>
+            <a:off x="1347704" y="3936446"/>
+            <a:ext cx="2323712" cy="186869"/>
           </a:xfrm>
           <a:prstGeom prst="bentConnector2">
             <a:avLst/>
@@ -8555,8 +8554,8 @@
         </p:nvCxnSpPr>
         <p:spPr>
           <a:xfrm rot="16200000" flipH="1">
-            <a:off x="1184119" y="3676012"/>
-            <a:ext cx="2396440" cy="420377"/>
+            <a:off x="973637" y="3924144"/>
+            <a:ext cx="2867432" cy="395107"/>
           </a:xfrm>
           <a:prstGeom prst="bentConnector2">
             <a:avLst/>
@@ -8593,7 +8592,7 @@
         </p:nvSpPr>
         <p:spPr>
           <a:xfrm>
-            <a:off x="5143948" y="1770924"/>
+            <a:off x="5133231" y="1673561"/>
             <a:ext cx="772043" cy="346760"/>
           </a:xfrm>
           <a:prstGeom prst="rect">
@@ -8675,8 +8674,8 @@
         </p:nvCxnSpPr>
         <p:spPr>
           <a:xfrm flipV="1">
-            <a:off x="4800600" y="2286000"/>
-            <a:ext cx="729369" cy="1249382"/>
+            <a:off x="5218456" y="2211318"/>
+            <a:ext cx="307190" cy="1304863"/>
           </a:xfrm>
           <a:prstGeom prst="bentConnector2">
             <a:avLst/>
@@ -8716,8 +8715,8 @@
         </p:nvCxnSpPr>
         <p:spPr>
           <a:xfrm rot="5400000">
-            <a:off x="4174488" y="2991741"/>
-            <a:ext cx="2061222" cy="649740"/>
+            <a:off x="4292444" y="3149712"/>
+            <a:ext cx="2171596" cy="294809"/>
           </a:xfrm>
           <a:prstGeom prst="bentConnector2">
             <a:avLst/>
@@ -8749,19 +8748,18 @@
       <p:cxnSp>
         <p:nvCxnSpPr>
           <p:cNvPr id="82" name="Elbow Connector 63"/>
-          <p:cNvCxnSpPr>
-            <a:stCxn id="16" idx="3"/>
-            <a:endCxn id="34" idx="3"/>
-          </p:cNvCxnSpPr>
+          <p:cNvCxnSpPr/>
           <p:nvPr/>
         </p:nvCxnSpPr>
         <p:spPr>
-          <a:xfrm rot="5400000">
-            <a:off x="3867176" y="2104987"/>
-            <a:ext cx="1481780" cy="1843806"/>
-          </a:xfrm>
-          <a:prstGeom prst="bentConnector2">
-            <a:avLst/>
+          <a:xfrm rot="10800000" flipV="1">
+            <a:off x="4022004" y="2299879"/>
+            <a:ext cx="1480728" cy="1412134"/>
+          </a:xfrm>
+          <a:prstGeom prst="bentConnector3">
+            <a:avLst>
+              <a:gd name="adj1" fmla="val -2003"/>
+            </a:avLst>
           </a:prstGeom>
           <a:ln w="6350">
             <a:solidFill>
@@ -8798,8 +8796,8 @@
         </p:nvCxnSpPr>
         <p:spPr>
           <a:xfrm flipV="1">
-            <a:off x="3189583" y="2286000"/>
-            <a:ext cx="2340386" cy="228600"/>
+            <a:off x="3189583" y="2211318"/>
+            <a:ext cx="2336063" cy="303282"/>
           </a:xfrm>
           <a:prstGeom prst="bentConnector2">
             <a:avLst/>
@@ -8832,15 +8830,14 @@
         <p:nvCxnSpPr>
           <p:cNvPr id="91" name="Elbow Connector 63"/>
           <p:cNvCxnSpPr>
-            <a:stCxn id="16" idx="3"/>
-            <a:endCxn id="35" idx="3"/>
+            <a:endCxn id="68" idx="3"/>
           </p:cNvCxnSpPr>
           <p:nvPr/>
         </p:nvCxnSpPr>
         <p:spPr>
           <a:xfrm rot="5400000">
-            <a:off x="3409976" y="2562187"/>
-            <a:ext cx="2396180" cy="1843807"/>
+            <a:off x="3604319" y="2727431"/>
+            <a:ext cx="2342484" cy="1487386"/>
           </a:xfrm>
           <a:prstGeom prst="bentConnector2">
             <a:avLst/>
@@ -8880,8 +8877,8 @@
         </p:nvCxnSpPr>
         <p:spPr>
           <a:xfrm rot="5400000">
-            <a:off x="3208856" y="2763307"/>
-            <a:ext cx="2798421" cy="1843806"/>
+            <a:off x="2940046" y="2969814"/>
+            <a:ext cx="3344096" cy="1827104"/>
           </a:xfrm>
           <a:prstGeom prst="bentConnector2">
             <a:avLst/>
@@ -8918,7 +8915,7 @@
         </p:nvSpPr>
         <p:spPr>
           <a:xfrm>
-            <a:off x="3657600" y="1770924"/>
+            <a:off x="3668378" y="1650548"/>
             <a:ext cx="1031399" cy="346760"/>
           </a:xfrm>
           <a:prstGeom prst="rect">
@@ -8972,14 +8969,12 @@
       <p:cxnSp>
         <p:nvCxnSpPr>
           <p:cNvPr id="107" name="Elbow Connector 106"/>
-          <p:cNvCxnSpPr>
-            <a:stCxn id="9" idx="0"/>
-          </p:cNvCxnSpPr>
+          <p:cNvCxnSpPr/>
           <p:nvPr/>
         </p:nvCxnSpPr>
         <p:spPr>
           <a:xfrm rot="5400000" flipH="1" flipV="1">
-            <a:off x="4594921" y="-355061"/>
+            <a:off x="4617706" y="-500671"/>
             <a:ext cx="170724" cy="4081246"/>
           </a:xfrm>
           <a:prstGeom prst="bentConnector2">
@@ -9018,7 +9013,7 @@
         </p:nvCxnSpPr>
         <p:spPr>
           <a:xfrm flipV="1">
-            <a:off x="3198609" y="1944304"/>
+            <a:off x="3212182" y="1823048"/>
             <a:ext cx="484448" cy="2308"/>
           </a:xfrm>
           <a:prstGeom prst="straightConnector1">
@@ -9051,14 +9046,12 @@
       <p:cxnSp>
         <p:nvCxnSpPr>
           <p:cNvPr id="111" name="Straight Arrow Connector 110"/>
-          <p:cNvCxnSpPr>
-            <a:endCxn id="73" idx="1"/>
-          </p:cNvCxnSpPr>
+          <p:cNvCxnSpPr/>
           <p:nvPr/>
         </p:nvCxnSpPr>
         <p:spPr>
           <a:xfrm flipV="1">
-            <a:off x="4714456" y="1944304"/>
+            <a:off x="4717821" y="1865589"/>
             <a:ext cx="429492" cy="2308"/>
           </a:xfrm>
           <a:prstGeom prst="straightConnector1">
@@ -9097,8 +9090,8 @@
         </p:nvSpPr>
         <p:spPr>
           <a:xfrm rot="16200000">
-            <a:off x="6213739" y="4560376"/>
-            <a:ext cx="1371599" cy="328045"/>
+            <a:off x="5924985" y="4702965"/>
+            <a:ext cx="1943192" cy="328045"/>
           </a:xfrm>
           <a:prstGeom prst="roundRect">
             <a:avLst/>
@@ -9278,8 +9271,8 @@
         </p:nvCxnSpPr>
         <p:spPr>
           <a:xfrm rot="10800000" flipV="1">
-            <a:off x="1503020" y="1944303"/>
-            <a:ext cx="589823" cy="341697"/>
+            <a:off x="1503019" y="1823047"/>
+            <a:ext cx="601344" cy="462953"/>
           </a:xfrm>
           <a:prstGeom prst="bentConnector2">
             <a:avLst/>
@@ -9320,8 +9313,8 @@
         </p:nvCxnSpPr>
         <p:spPr>
           <a:xfrm rot="16200000" flipH="1">
-            <a:off x="3389830" y="3165517"/>
-            <a:ext cx="119381" cy="620348"/>
+            <a:off x="3589428" y="2965918"/>
+            <a:ext cx="100180" cy="1000345"/>
           </a:xfrm>
           <a:prstGeom prst="bentConnector2">
             <a:avLst/>
@@ -9361,8 +9354,8 @@
         </p:nvCxnSpPr>
         <p:spPr>
           <a:xfrm rot="5400000">
-            <a:off x="4102276" y="1869887"/>
-            <a:ext cx="1011581" cy="1843806"/>
+            <a:off x="4062774" y="1834708"/>
+            <a:ext cx="1086263" cy="1839483"/>
           </a:xfrm>
           <a:prstGeom prst="bentConnector2">
             <a:avLst/>
@@ -9402,8 +9395,8 @@
         </p:nvCxnSpPr>
         <p:spPr>
           <a:xfrm rot="16200000" flipH="1">
-            <a:off x="3430123" y="3938021"/>
-            <a:ext cx="118421" cy="699979"/>
+            <a:off x="3704777" y="3897760"/>
+            <a:ext cx="93676" cy="876631"/>
           </a:xfrm>
           <a:prstGeom prst="bentConnector2">
             <a:avLst/>
@@ -9436,15 +9429,14 @@
         <p:nvCxnSpPr>
           <p:cNvPr id="140" name="Elbow Connector 63"/>
           <p:cNvCxnSpPr>
-            <a:stCxn id="16" idx="3"/>
             <a:endCxn id="36" idx="3"/>
           </p:cNvCxnSpPr>
           <p:nvPr/>
         </p:nvCxnSpPr>
         <p:spPr>
           <a:xfrm rot="5400000">
-            <a:off x="3695875" y="2276286"/>
-            <a:ext cx="1824381" cy="1843808"/>
+            <a:off x="3854329" y="2479626"/>
+            <a:ext cx="1865218" cy="1505727"/>
           </a:xfrm>
           <a:prstGeom prst="bentConnector2">
             <a:avLst/>
@@ -9669,8 +9661,8 @@
         </p:nvSpPr>
         <p:spPr>
           <a:xfrm flipV="1">
-            <a:off x="4114799" y="4472708"/>
-            <a:ext cx="2642195" cy="101600"/>
+            <a:off x="4710384" y="4535681"/>
+            <a:ext cx="2022174" cy="45719"/>
           </a:xfrm>
           <a:custGeom>
             <a:avLst/>
@@ -9743,10 +9735,370 @@
           </a:p>
         </p:txBody>
       </p:sp>
+      <p:cxnSp>
+        <p:nvCxnSpPr>
+          <p:cNvPr id="62" name="Elbow Connector 61"/>
+          <p:cNvCxnSpPr/>
+          <p:nvPr/>
+        </p:nvCxnSpPr>
+        <p:spPr>
+          <a:xfrm>
+            <a:off x="4022786" y="3793487"/>
+            <a:ext cx="661233" cy="473087"/>
+          </a:xfrm>
+          <a:prstGeom prst="bentConnector2">
+            <a:avLst/>
+          </a:prstGeom>
+          <a:ln w="19050">
+            <a:solidFill>
+              <a:schemeClr val="accent3"/>
+            </a:solidFill>
+            <a:headEnd type="none" w="med" len="med"/>
+            <a:tailEnd type="arrow" w="med" len="med"/>
+          </a:ln>
+          <a:effectLst/>
+        </p:spPr>
+        <p:style>
+          <a:lnRef idx="1">
+            <a:schemeClr val="accent2"/>
+          </a:lnRef>
+          <a:fillRef idx="2">
+            <a:schemeClr val="accent2"/>
+          </a:fillRef>
+          <a:effectRef idx="1">
+            <a:schemeClr val="accent2"/>
+          </a:effectRef>
+          <a:fontRef idx="minor">
+            <a:schemeClr val="dk1"/>
+          </a:fontRef>
+        </p:style>
+      </p:cxnSp>
+      <p:sp>
+        <p:nvSpPr>
+          <p:cNvPr id="68" name="Rectangle 11"/>
+          <p:cNvSpPr/>
+          <p:nvPr/>
+        </p:nvSpPr>
+        <p:spPr>
+          <a:xfrm>
+            <a:off x="2601419" y="4529949"/>
+            <a:ext cx="1430449" cy="224833"/>
+          </a:xfrm>
+          <a:prstGeom prst="rect">
+            <a:avLst/>
+          </a:prstGeom>
+          <a:ln w="19050">
+            <a:solidFill>
+              <a:schemeClr val="accent3"/>
+            </a:solidFill>
+          </a:ln>
+          <a:effectLst/>
+        </p:spPr>
+        <p:style>
+          <a:lnRef idx="1">
+            <a:schemeClr val="accent3"/>
+          </a:lnRef>
+          <a:fillRef idx="2">
+            <a:schemeClr val="accent3"/>
+          </a:fillRef>
+          <a:effectRef idx="1">
+            <a:schemeClr val="accent3"/>
+          </a:effectRef>
+          <a:fontRef idx="minor">
+            <a:schemeClr val="dk1"/>
+          </a:fontRef>
+        </p:style>
+        <p:txBody>
+          <a:bodyPr rtlCol="0" anchor="ctr"/>
+          <a:lstStyle/>
+          <a:p>
+            <a:pPr algn="ctr"/>
+            <a:r>
+              <a:rPr lang="en-US" sz="1050" b="1" smtClean="0">
+                <a:solidFill>
+                  <a:schemeClr val="accent3">
+                    <a:lumMod val="75000"/>
+                  </a:schemeClr>
+                </a:solidFill>
+              </a:rPr>
+              <a:t>EventsListPanel</a:t>
+            </a:r>
+            <a:endParaRPr lang="en-SG" sz="1050" b="1" dirty="0">
+              <a:solidFill>
+                <a:schemeClr val="accent3">
+                  <a:lumMod val="75000"/>
+                </a:schemeClr>
+              </a:solidFill>
+            </a:endParaRPr>
+          </a:p>
+        </p:txBody>
+      </p:sp>
+      <p:sp>
+        <p:nvSpPr>
+          <p:cNvPr id="81" name="Freeform 80"/>
+          <p:cNvSpPr/>
+          <p:nvPr/>
+        </p:nvSpPr>
+        <p:spPr>
+          <a:xfrm flipV="1">
+            <a:off x="4711427" y="5033003"/>
+            <a:ext cx="2021131" cy="45719"/>
+          </a:xfrm>
+          <a:custGeom>
+            <a:avLst/>
+            <a:gdLst>
+              <a:gd name="connsiteX0" fmla="*/ 0 w 3048000"/>
+              <a:gd name="connsiteY0" fmla="*/ 203200 h 203200"/>
+              <a:gd name="connsiteX1" fmla="*/ 221673 w 3048000"/>
+              <a:gd name="connsiteY1" fmla="*/ 0 h 203200"/>
+              <a:gd name="connsiteX2" fmla="*/ 3048000 w 3048000"/>
+              <a:gd name="connsiteY2" fmla="*/ 0 h 203200"/>
+            </a:gdLst>
+            <a:ahLst/>
+            <a:cxnLst>
+              <a:cxn ang="0">
+                <a:pos x="connsiteX0" y="connsiteY0"/>
+              </a:cxn>
+              <a:cxn ang="0">
+                <a:pos x="connsiteX1" y="connsiteY1"/>
+              </a:cxn>
+              <a:cxn ang="0">
+                <a:pos x="connsiteX2" y="connsiteY2"/>
+              </a:cxn>
+            </a:cxnLst>
+            <a:rect l="l" t="t" r="r" b="b"/>
+            <a:pathLst>
+              <a:path w="3048000" h="203200">
+                <a:moveTo>
+                  <a:pt x="0" y="203200"/>
+                </a:moveTo>
+                <a:lnTo>
+                  <a:pt x="221673" y="0"/>
+                </a:lnTo>
+                <a:lnTo>
+                  <a:pt x="3048000" y="0"/>
+                </a:lnTo>
+              </a:path>
+            </a:pathLst>
+          </a:custGeom>
+          <a:noFill/>
+          <a:ln w="19050">
+            <a:solidFill>
+              <a:schemeClr val="accent3"/>
+            </a:solidFill>
+            <a:prstDash val="sysDot"/>
+            <a:headEnd type="none" w="med" len="med"/>
+            <a:tailEnd type="arrow" w="med" len="med"/>
+          </a:ln>
+          <a:effectLst/>
+        </p:spPr>
+        <p:style>
+          <a:lnRef idx="1">
+            <a:schemeClr val="accent2"/>
+          </a:lnRef>
+          <a:fillRef idx="2">
+            <a:schemeClr val="accent2"/>
+          </a:fillRef>
+          <a:effectRef idx="1">
+            <a:schemeClr val="accent2"/>
+          </a:effectRef>
+          <a:fontRef idx="minor">
+            <a:schemeClr val="dk1"/>
+          </a:fontRef>
+        </p:style>
+        <p:txBody>
+          <a:bodyPr rtlCol="0" anchor="ctr"/>
+          <a:lstStyle/>
+          <a:p>
+            <a:pPr algn="ctr"/>
+            <a:endParaRPr lang="en-SG"/>
+          </a:p>
+        </p:txBody>
+      </p:sp>
+      <p:cxnSp>
+        <p:nvCxnSpPr>
+          <p:cNvPr id="85" name="Elbow Connector 63"/>
+          <p:cNvCxnSpPr>
+            <a:endCxn id="68" idx="1"/>
+          </p:cNvCxnSpPr>
+          <p:nvPr/>
+        </p:nvCxnSpPr>
+        <p:spPr>
+          <a:xfrm rot="16200000" flipH="1">
+            <a:off x="1977992" y="4018939"/>
+            <a:ext cx="1064370" cy="182483"/>
+          </a:xfrm>
+          <a:prstGeom prst="bentConnector2">
+            <a:avLst/>
+          </a:prstGeom>
+          <a:ln w="19050">
+            <a:solidFill>
+              <a:schemeClr val="accent3"/>
+            </a:solidFill>
+            <a:headEnd type="none" w="med" len="med"/>
+            <a:tailEnd type="arrow" w="med" len="med"/>
+          </a:ln>
+          <a:effectLst/>
+        </p:spPr>
+        <p:style>
+          <a:lnRef idx="1">
+            <a:schemeClr val="accent2"/>
+          </a:lnRef>
+          <a:fillRef idx="2">
+            <a:schemeClr val="accent2"/>
+          </a:fillRef>
+          <a:effectRef idx="1">
+            <a:schemeClr val="accent2"/>
+          </a:effectRef>
+          <a:fontRef idx="minor">
+            <a:schemeClr val="dk1"/>
+          </a:fontRef>
+        </p:style>
+      </p:cxnSp>
+      <p:sp>
+        <p:nvSpPr>
+          <p:cNvPr id="97" name="Rectangle 11"/>
+          <p:cNvSpPr/>
+          <p:nvPr/>
+        </p:nvSpPr>
+        <p:spPr>
+          <a:xfrm>
+            <a:off x="4166609" y="4743053"/>
+            <a:ext cx="1077944" cy="247870"/>
+          </a:xfrm>
+          <a:prstGeom prst="rect">
+            <a:avLst/>
+          </a:prstGeom>
+          <a:ln w="19050">
+            <a:solidFill>
+              <a:schemeClr val="accent3"/>
+            </a:solidFill>
+          </a:ln>
+          <a:effectLst/>
+        </p:spPr>
+        <p:style>
+          <a:lnRef idx="1">
+            <a:schemeClr val="accent3"/>
+          </a:lnRef>
+          <a:fillRef idx="2">
+            <a:schemeClr val="accent3"/>
+          </a:fillRef>
+          <a:effectRef idx="1">
+            <a:schemeClr val="accent3"/>
+          </a:effectRef>
+          <a:fontRef idx="minor">
+            <a:schemeClr val="dk1"/>
+          </a:fontRef>
+        </p:style>
+        <p:txBody>
+          <a:bodyPr rtlCol="0" anchor="ctr"/>
+          <a:lstStyle/>
+          <a:p>
+            <a:pPr algn="ctr"/>
+            <a:r>
+              <a:rPr lang="en-US" sz="1050" b="1" smtClean="0">
+                <a:solidFill>
+                  <a:schemeClr val="accent3">
+                    <a:lumMod val="75000"/>
+                  </a:schemeClr>
+                </a:solidFill>
+              </a:rPr>
+              <a:t>EventsTaskCard</a:t>
+            </a:r>
+            <a:endParaRPr lang="en-SG" sz="1050" b="1" dirty="0">
+              <a:solidFill>
+                <a:schemeClr val="accent3">
+                  <a:lumMod val="75000"/>
+                </a:schemeClr>
+              </a:solidFill>
+            </a:endParaRPr>
+          </a:p>
+        </p:txBody>
+      </p:sp>
+      <p:cxnSp>
+        <p:nvCxnSpPr>
+          <p:cNvPr id="99" name="Elbow Connector 98"/>
+          <p:cNvCxnSpPr>
+            <a:stCxn id="68" idx="2"/>
+          </p:cNvCxnSpPr>
+          <p:nvPr/>
+        </p:nvCxnSpPr>
+        <p:spPr>
+          <a:xfrm rot="16200000" flipH="1">
+            <a:off x="3670773" y="4400652"/>
+            <a:ext cx="134950" cy="843209"/>
+          </a:xfrm>
+          <a:prstGeom prst="bentConnector2">
+            <a:avLst/>
+          </a:prstGeom>
+          <a:ln w="19050">
+            <a:solidFill>
+              <a:schemeClr val="accent3"/>
+            </a:solidFill>
+            <a:headEnd type="none" w="med" len="med"/>
+            <a:tailEnd type="arrow" w="med" len="med"/>
+          </a:ln>
+          <a:effectLst/>
+        </p:spPr>
+        <p:style>
+          <a:lnRef idx="1">
+            <a:schemeClr val="accent2"/>
+          </a:lnRef>
+          <a:fillRef idx="2">
+            <a:schemeClr val="accent2"/>
+          </a:fillRef>
+          <a:effectRef idx="1">
+            <a:schemeClr val="accent2"/>
+          </a:effectRef>
+          <a:fontRef idx="minor">
+            <a:schemeClr val="dk1"/>
+          </a:fontRef>
+        </p:style>
+      </p:cxnSp>
+      <p:cxnSp>
+        <p:nvCxnSpPr>
+          <p:cNvPr id="165" name="Elbow Connector 63"/>
+          <p:cNvCxnSpPr>
+            <a:endCxn id="35" idx="3"/>
+          </p:cNvCxnSpPr>
+          <p:nvPr/>
+        </p:nvCxnSpPr>
+        <p:spPr>
+          <a:xfrm rot="5400000">
+            <a:off x="3433323" y="3096218"/>
+            <a:ext cx="2358826" cy="1832212"/>
+          </a:xfrm>
+          <a:prstGeom prst="bentConnector2">
+            <a:avLst/>
+          </a:prstGeom>
+          <a:ln w="6350">
+            <a:solidFill>
+              <a:schemeClr val="accent3"/>
+            </a:solidFill>
+            <a:headEnd type="none" w="med" len="med"/>
+            <a:tailEnd type="none" w="med" len="med"/>
+          </a:ln>
+          <a:effectLst/>
+        </p:spPr>
+        <p:style>
+          <a:lnRef idx="1">
+            <a:schemeClr val="accent2"/>
+          </a:lnRef>
+          <a:fillRef idx="2">
+            <a:schemeClr val="accent2"/>
+          </a:fillRef>
+          <a:effectRef idx="1">
+            <a:schemeClr val="accent2"/>
+          </a:effectRef>
+          <a:fontRef idx="minor">
+            <a:schemeClr val="dk1"/>
+          </a:fontRef>
+        </p:style>
+      </p:cxnSp>
     </p:spTree>
     <p:extLst>
       <p:ext uri="{BB962C8B-B14F-4D97-AF65-F5344CB8AC3E}">
-        <p14:creationId xmlns:p14="http://schemas.microsoft.com/office/powerpoint/2010/main" val="2776882492"/>
+        <p14:creationId xmlns:p14="http://schemas.microsoft.com/office/powerpoint/2010/main" val="1646304702"/>
       </p:ext>
     </p:extLst>
   </p:cSld>

</xml_diff>

<commit_message>
Fix diagrams for Logic
</commit_message>
<xml_diff>
--- a/docs/diagrams/Diagrams.pptx
+++ b/docs/diagrams/Diagrams.pptx
@@ -5779,8 +5779,8 @@
         </p:nvSpPr>
         <p:spPr>
           <a:xfrm>
-            <a:off x="6074030" y="1687656"/>
-            <a:ext cx="2438400" cy="215444"/>
+            <a:off x="5674077" y="1676400"/>
+            <a:ext cx="3048000" cy="215444"/>
           </a:xfrm>
           <a:prstGeom prst="rect">
             <a:avLst/>
@@ -5793,6 +5793,7 @@
           </a:bodyPr>
           <a:lstStyle/>
           <a:p>
+            <a:pPr algn="r"/>
             <a:r>
               <a:rPr lang="en-US" sz="1400" dirty="0" smtClean="0">
                 <a:solidFill>
@@ -5955,7 +5956,7 @@
         </p:nvSpPr>
         <p:spPr>
           <a:xfrm>
-            <a:off x="7696200" y="591251"/>
+            <a:off x="7848600" y="591251"/>
             <a:ext cx="1371600" cy="346760"/>
           </a:xfrm>
           <a:prstGeom prst="rect">
@@ -6026,7 +6027,7 @@
         </p:nvCxnSpPr>
         <p:spPr>
           <a:xfrm>
-            <a:off x="8616802" y="944305"/>
+            <a:off x="8769202" y="944305"/>
             <a:ext cx="0" cy="1723059"/>
           </a:xfrm>
           <a:prstGeom prst="line">
@@ -6065,7 +6066,7 @@
         </p:nvSpPr>
         <p:spPr>
           <a:xfrm>
-            <a:off x="8544794" y="1961202"/>
+            <a:off x="8697194" y="1961202"/>
             <a:ext cx="142006" cy="176787"/>
           </a:xfrm>
           <a:prstGeom prst="rect">
@@ -6120,8 +6121,8 @@
         </p:nvCxnSpPr>
         <p:spPr>
           <a:xfrm>
-            <a:off x="5943992" y="1961202"/>
-            <a:ext cx="2568438" cy="0"/>
+            <a:off x="5943600" y="1981200"/>
+            <a:ext cx="2743200" cy="0"/>
           </a:xfrm>
           <a:prstGeom prst="straightConnector1">
             <a:avLst/>
@@ -6156,8 +6157,8 @@
         </p:nvCxnSpPr>
         <p:spPr>
           <a:xfrm>
-            <a:off x="5943992" y="2137989"/>
-            <a:ext cx="2549946" cy="0"/>
+            <a:off x="5943600" y="2133600"/>
+            <a:ext cx="2702738" cy="4389"/>
           </a:xfrm>
           <a:prstGeom prst="straightConnector1">
             <a:avLst/>
@@ -6390,8 +6391,8 @@
         </p:nvSpPr>
         <p:spPr>
           <a:xfrm>
-            <a:off x="1810094" y="4797674"/>
-            <a:ext cx="2716635" cy="215444"/>
+            <a:off x="990600" y="4800600"/>
+            <a:ext cx="3371506" cy="215444"/>
           </a:xfrm>
           <a:prstGeom prst="rect">
             <a:avLst/>
@@ -6404,6 +6405,7 @@
           </a:bodyPr>
           <a:lstStyle/>
           <a:p>
+            <a:pPr algn="r"/>
             <a:r>
               <a:rPr lang="en-US" sz="1400" dirty="0" smtClean="0">
                 <a:solidFill>
@@ -6772,8 +6774,8 @@
         </p:nvSpPr>
         <p:spPr>
           <a:xfrm>
-            <a:off x="5036330" y="5065911"/>
-            <a:ext cx="2659870" cy="215444"/>
+            <a:off x="4724400" y="5065911"/>
+            <a:ext cx="2971800" cy="215444"/>
           </a:xfrm>
           <a:prstGeom prst="rect">
             <a:avLst/>
@@ -6786,6 +6788,7 @@
           </a:bodyPr>
           <a:lstStyle/>
           <a:p>
+            <a:pPr algn="r"/>
             <a:r>
               <a:rPr lang="en-US" sz="1400" dirty="0" err="1" smtClean="0">
                 <a:solidFill>
@@ -7048,8 +7051,8 @@
         </p:nvSpPr>
         <p:spPr>
           <a:xfrm>
-            <a:off x="1416276" y="5395369"/>
-            <a:ext cx="2659870" cy="215444"/>
+            <a:off x="1416276" y="5395368"/>
+            <a:ext cx="3079524" cy="215444"/>
           </a:xfrm>
           <a:prstGeom prst="rect">
             <a:avLst/>
@@ -12526,8 +12529,8 @@
         </p:nvSpPr>
         <p:spPr>
           <a:xfrm>
-            <a:off x="152400" y="2743200"/>
-            <a:ext cx="1424846" cy="215444"/>
+            <a:off x="76200" y="2743200"/>
+            <a:ext cx="1611959" cy="215444"/>
           </a:xfrm>
           <a:prstGeom prst="rect">
             <a:avLst/>

</xml_diff>

<commit_message>
Diagrams: Addressbook -> Jimi, add new model classes
</commit_message>
<xml_diff>
--- a/docs/diagrams/Diagrams.pptx
+++ b/docs/diagrams/Diagrams.pptx
@@ -200,7 +200,7 @@
           <a:p>
             <a:fld id="{F5CC4B3F-88C1-4FFA-B1B6-F41C21DC6924}" type="datetimeFigureOut">
               <a:rPr lang="en-US" smtClean="0"/>
-              <a:t>9/30/2016</a:t>
+              <a:t>13-Oct-16</a:t>
             </a:fld>
             <a:endParaRPr lang="en-US"/>
           </a:p>
@@ -649,7 +649,7 @@
           <a:p>
             <a:fld id="{78C97017-6FC3-485B-9764-EAC9E56C1D49}" type="datetimeFigureOut">
               <a:rPr lang="en-US" smtClean="0"/>
-              <a:t>9/30/2016</a:t>
+              <a:t>13-Oct-16</a:t>
             </a:fld>
             <a:endParaRPr lang="en-US"/>
           </a:p>
@@ -819,7 +819,7 @@
           <a:p>
             <a:fld id="{78C97017-6FC3-485B-9764-EAC9E56C1D49}" type="datetimeFigureOut">
               <a:rPr lang="en-US" smtClean="0"/>
-              <a:t>9/30/2016</a:t>
+              <a:t>13-Oct-16</a:t>
             </a:fld>
             <a:endParaRPr lang="en-US"/>
           </a:p>
@@ -999,7 +999,7 @@
           <a:p>
             <a:fld id="{78C97017-6FC3-485B-9764-EAC9E56C1D49}" type="datetimeFigureOut">
               <a:rPr lang="en-US" smtClean="0"/>
-              <a:t>9/30/2016</a:t>
+              <a:t>13-Oct-16</a:t>
             </a:fld>
             <a:endParaRPr lang="en-US"/>
           </a:p>
@@ -1169,7 +1169,7 @@
           <a:p>
             <a:fld id="{78C97017-6FC3-485B-9764-EAC9E56C1D49}" type="datetimeFigureOut">
               <a:rPr lang="en-US" smtClean="0"/>
-              <a:t>9/30/2016</a:t>
+              <a:t>13-Oct-16</a:t>
             </a:fld>
             <a:endParaRPr lang="en-US"/>
           </a:p>
@@ -1415,7 +1415,7 @@
           <a:p>
             <a:fld id="{78C97017-6FC3-485B-9764-EAC9E56C1D49}" type="datetimeFigureOut">
               <a:rPr lang="en-US" smtClean="0"/>
-              <a:t>9/30/2016</a:t>
+              <a:t>13-Oct-16</a:t>
             </a:fld>
             <a:endParaRPr lang="en-US"/>
           </a:p>
@@ -1703,7 +1703,7 @@
           <a:p>
             <a:fld id="{78C97017-6FC3-485B-9764-EAC9E56C1D49}" type="datetimeFigureOut">
               <a:rPr lang="en-US" smtClean="0"/>
-              <a:t>9/30/2016</a:t>
+              <a:t>13-Oct-16</a:t>
             </a:fld>
             <a:endParaRPr lang="en-US"/>
           </a:p>
@@ -2125,7 +2125,7 @@
           <a:p>
             <a:fld id="{78C97017-6FC3-485B-9764-EAC9E56C1D49}" type="datetimeFigureOut">
               <a:rPr lang="en-US" smtClean="0"/>
-              <a:t>9/30/2016</a:t>
+              <a:t>13-Oct-16</a:t>
             </a:fld>
             <a:endParaRPr lang="en-US"/>
           </a:p>
@@ -2243,7 +2243,7 @@
           <a:p>
             <a:fld id="{78C97017-6FC3-485B-9764-EAC9E56C1D49}" type="datetimeFigureOut">
               <a:rPr lang="en-US" smtClean="0"/>
-              <a:t>9/30/2016</a:t>
+              <a:t>13-Oct-16</a:t>
             </a:fld>
             <a:endParaRPr lang="en-US"/>
           </a:p>
@@ -2338,7 +2338,7 @@
           <a:p>
             <a:fld id="{78C97017-6FC3-485B-9764-EAC9E56C1D49}" type="datetimeFigureOut">
               <a:rPr lang="en-US" smtClean="0"/>
-              <a:t>9/30/2016</a:t>
+              <a:t>13-Oct-16</a:t>
             </a:fld>
             <a:endParaRPr lang="en-US"/>
           </a:p>
@@ -2615,7 +2615,7 @@
           <a:p>
             <a:fld id="{78C97017-6FC3-485B-9764-EAC9E56C1D49}" type="datetimeFigureOut">
               <a:rPr lang="en-US" smtClean="0"/>
-              <a:t>9/30/2016</a:t>
+              <a:t>13-Oct-16</a:t>
             </a:fld>
             <a:endParaRPr lang="en-US"/>
           </a:p>
@@ -2868,7 +2868,7 @@
           <a:p>
             <a:fld id="{78C97017-6FC3-485B-9764-EAC9E56C1D49}" type="datetimeFigureOut">
               <a:rPr lang="en-US" smtClean="0"/>
-              <a:t>9/30/2016</a:t>
+              <a:t>13-Oct-16</a:t>
             </a:fld>
             <a:endParaRPr lang="en-US"/>
           </a:p>
@@ -3081,7 +3081,7 @@
           <a:p>
             <a:fld id="{78C97017-6FC3-485B-9764-EAC9E56C1D49}" type="datetimeFigureOut">
               <a:rPr lang="en-US" smtClean="0"/>
-              <a:t>9/30/2016</a:t>
+              <a:t>13-Oct-16</a:t>
             </a:fld>
             <a:endParaRPr lang="en-US"/>
           </a:p>
@@ -5753,7 +5753,7 @@
                   <a:srgbClr val="7030A0"/>
                 </a:solidFill>
               </a:rPr>
-              <a:t>deletePerson</a:t>
+              <a:t>deleteTask</a:t>
             </a:r>
             <a:r>
               <a:rPr lang="en-US" sz="1400" dirty="0" smtClean="0">
@@ -5761,7 +5761,15 @@
                   <a:srgbClr val="7030A0"/>
                 </a:solidFill>
               </a:rPr>
-              <a:t>(p)</a:t>
+              <a:t>(p</a:t>
+            </a:r>
+            <a:r>
+              <a:rPr lang="en-US" sz="1400" dirty="0" smtClean="0">
+                <a:solidFill>
+                  <a:srgbClr val="7030A0"/>
+                </a:solidFill>
+              </a:rPr>
+              <a:t>)</a:t>
             </a:r>
             <a:endParaRPr lang="en-US" sz="1400" dirty="0">
               <a:solidFill>
@@ -5811,7 +5819,7 @@
                   </a:schemeClr>
                 </a:solidFill>
               </a:rPr>
-              <a:t>AddressBookChangedEvent</a:t>
+              <a:t>TaskBookChangedEvent</a:t>
             </a:r>
             <a:r>
               <a:rPr lang="en-US" sz="1400" dirty="0" smtClean="0">
@@ -6368,7 +6376,7 @@
           <a:lstStyle/>
           <a:p>
             <a:r>
-              <a:rPr lang="en-US" sz="1400" dirty="0" smtClean="0">
+              <a:rPr lang="en-US" sz="1400" dirty="0">
                 <a:solidFill>
                   <a:schemeClr val="accent5">
                     <a:lumMod val="75000"/>
@@ -6378,17 +6386,17 @@
               <a:t>post(</a:t>
             </a:r>
             <a:r>
-              <a:rPr lang="en-US" sz="1400" dirty="0" err="1" smtClean="0">
+              <a:rPr lang="en-US" sz="1400" dirty="0" err="1">
                 <a:solidFill>
                   <a:schemeClr val="accent5">
                     <a:lumMod val="75000"/>
                   </a:schemeClr>
                 </a:solidFill>
               </a:rPr>
-              <a:t>AddressBookChangedEvent</a:t>
-            </a:r>
-            <a:r>
-              <a:rPr lang="en-US" sz="1400" dirty="0" smtClean="0">
+              <a:t>TaskBookChangedEvent</a:t>
+            </a:r>
+            <a:r>
+              <a:rPr lang="en-US" sz="1400" dirty="0">
                 <a:solidFill>
                   <a:schemeClr val="accent5">
                     <a:lumMod val="75000"/>
@@ -6757,7 +6765,7 @@
                   </a:schemeClr>
                 </a:solidFill>
               </a:rPr>
-              <a:t>handleAddresssBookChangedEvent</a:t>
+              <a:t>handleTaskBookChangedEvent</a:t>
             </a:r>
             <a:r>
               <a:rPr lang="en-US" sz="1400" dirty="0" smtClean="0">
@@ -7068,7 +7076,7 @@
                   <a:srgbClr val="00B050"/>
                 </a:solidFill>
               </a:rPr>
-              <a:t>handleAddresssBookChangedEvent</a:t>
+              <a:t>handleTaskBookChangedEvent</a:t>
             </a:r>
             <a:r>
               <a:rPr lang="en-US" sz="1400" dirty="0" smtClean="0">
@@ -12280,7 +12288,6 @@
               <a:rPr lang="en-US" dirty="0"/>
               <a:t>execute()</a:t>
             </a:r>
-            <a:endParaRPr lang="en-US" dirty="0"/>
           </a:p>
         </p:txBody>
       </p:sp>
@@ -12797,7 +12804,7 @@
                   <a:srgbClr val="7030A0"/>
                 </a:solidFill>
               </a:rPr>
-              <a:t>deletePerson</a:t>
+              <a:t>deleteTask</a:t>
             </a:r>
             <a:r>
               <a:rPr lang="en-US" dirty="0" smtClean="0">
@@ -12805,7 +12812,15 @@
                   <a:srgbClr val="7030A0"/>
                 </a:solidFill>
               </a:rPr>
-              <a:t>(p)</a:t>
+              <a:t>(p</a:t>
+            </a:r>
+            <a:r>
+              <a:rPr lang="en-US" dirty="0" smtClean="0">
+                <a:solidFill>
+                  <a:srgbClr val="7030A0"/>
+                </a:solidFill>
+              </a:rPr>
+              <a:t>)</a:t>
             </a:r>
             <a:endParaRPr lang="en-US" dirty="0">
               <a:solidFill>
@@ -13253,8 +13268,8 @@
         </p:nvSpPr>
         <p:spPr>
           <a:xfrm>
-            <a:off x="1119865" y="1727200"/>
-            <a:ext cx="7490735" cy="2997200"/>
+            <a:off x="817849" y="304801"/>
+            <a:ext cx="7716551" cy="4495799"/>
           </a:xfrm>
           <a:prstGeom prst="roundRect">
             <a:avLst>
@@ -13314,7 +13329,7 @@
         </p:nvSpPr>
         <p:spPr>
           <a:xfrm>
-            <a:off x="2877180" y="3158440"/>
+            <a:off x="2498964" y="3190190"/>
             <a:ext cx="1093635" cy="346760"/>
           </a:xfrm>
           <a:prstGeom prst="rect">
@@ -13373,7 +13388,7 @@
         </p:nvSpPr>
         <p:spPr>
           <a:xfrm rot="16200000">
-            <a:off x="1683963" y="2868687"/>
+            <a:off x="1305747" y="2900437"/>
             <a:ext cx="1093635" cy="346760"/>
           </a:xfrm>
           <a:prstGeom prst="rect">
@@ -13429,17 +13444,18 @@
           <p:cNvPr id="53" name="Elbow Connector 63"/>
           <p:cNvCxnSpPr>
             <a:stCxn id="71" idx="3"/>
-            <a:endCxn id="62" idx="2"/>
           </p:cNvCxnSpPr>
           <p:nvPr/>
         </p:nvCxnSpPr>
         <p:spPr>
-          <a:xfrm flipV="1">
-            <a:off x="6477000" y="3204826"/>
-            <a:ext cx="190770" cy="405819"/>
-          </a:xfrm>
-          <a:prstGeom prst="bentConnector2">
-            <a:avLst/>
+          <a:xfrm rot="5400000">
+            <a:off x="6430591" y="2576902"/>
+            <a:ext cx="704297" cy="118895"/>
+          </a:xfrm>
+          <a:prstGeom prst="bentConnector3">
+            <a:avLst>
+              <a:gd name="adj1" fmla="val 63524"/>
+            </a:avLst>
           </a:prstGeom>
           <a:ln w="19050">
             <a:solidFill>
@@ -13471,18 +13487,18 @@
           <p:cNvPr id="107" name="Elbow Connector 106"/>
           <p:cNvCxnSpPr>
             <a:stCxn id="9" idx="1"/>
+            <a:endCxn id="62" idx="2"/>
           </p:cNvCxnSpPr>
           <p:nvPr/>
         </p:nvCxnSpPr>
         <p:spPr>
           <a:xfrm rot="5400000" flipH="1" flipV="1">
-            <a:off x="4360065" y="1080909"/>
-            <a:ext cx="378691" cy="4637261"/>
-          </a:xfrm>
-          <a:prstGeom prst="bentConnector4">
+            <a:off x="3933313" y="1155827"/>
+            <a:ext cx="384059" cy="4545557"/>
+          </a:xfrm>
+          <a:prstGeom prst="bentConnector3">
             <a:avLst>
-              <a:gd name="adj1" fmla="val -101829"/>
-              <a:gd name="adj2" fmla="val 99976"/>
+              <a:gd name="adj1" fmla="val -81332"/>
             </a:avLst>
           </a:prstGeom>
           <a:ln w="19050">
@@ -13518,7 +13534,7 @@
         </p:nvSpPr>
         <p:spPr>
           <a:xfrm rot="16200000">
-            <a:off x="956202" y="2861202"/>
+            <a:off x="577986" y="2892952"/>
             <a:ext cx="1093635" cy="346760"/>
           </a:xfrm>
           <a:prstGeom prst="rect">
@@ -13588,7 +13604,7 @@
         </p:nvSpPr>
         <p:spPr>
           <a:xfrm rot="16200000">
-            <a:off x="1626910" y="2952291"/>
+            <a:off x="1248694" y="2984041"/>
             <a:ext cx="270504" cy="175523"/>
           </a:xfrm>
           <a:prstGeom prst="triangle">
@@ -13631,15 +13647,14 @@
         <p:nvCxnSpPr>
           <p:cNvPr id="55" name="Straight Arrow Connector 54"/>
           <p:cNvCxnSpPr>
-            <a:stCxn id="62" idx="0"/>
             <a:endCxn id="67" idx="2"/>
           </p:cNvCxnSpPr>
           <p:nvPr/>
         </p:nvCxnSpPr>
         <p:spPr>
           <a:xfrm flipV="1">
-            <a:off x="6667770" y="2632344"/>
-            <a:ext cx="1612" cy="225722"/>
+            <a:off x="6291166" y="2664094"/>
+            <a:ext cx="0" cy="258372"/>
           </a:xfrm>
           <a:prstGeom prst="straightConnector1">
             <a:avLst/>
@@ -13680,7 +13695,7 @@
         </p:nvCxnSpPr>
         <p:spPr>
           <a:xfrm>
-            <a:off x="2656370" y="3326536"/>
+            <a:off x="2278154" y="3358286"/>
             <a:ext cx="220810" cy="5284"/>
           </a:xfrm>
           <a:prstGeom prst="straightConnector1">
@@ -13717,8 +13732,8 @@
           <p:nvPr/>
         </p:nvSpPr>
         <p:spPr>
-          <a:xfrm rot="5400000" flipV="1">
-            <a:off x="6253986" y="3522883"/>
+          <a:xfrm rot="10800000" flipV="1">
+            <a:off x="6706934" y="2108678"/>
             <a:ext cx="270504" cy="175523"/>
           </a:xfrm>
           <a:prstGeom prst="triangle">
@@ -13769,7 +13784,7 @@
         </p:nvCxnSpPr>
         <p:spPr>
           <a:xfrm>
-            <a:off x="910091" y="3040053"/>
+            <a:off x="531875" y="3071803"/>
             <a:ext cx="419548" cy="2860"/>
           </a:xfrm>
           <a:prstGeom prst="bentConnector3">
@@ -13814,7 +13829,7 @@
         </p:nvCxnSpPr>
         <p:spPr>
           <a:xfrm flipV="1">
-            <a:off x="1849924" y="3040052"/>
+            <a:off x="1471708" y="3071802"/>
             <a:ext cx="216105" cy="1"/>
           </a:xfrm>
           <a:prstGeom prst="line">
@@ -13853,7 +13868,7 @@
         </p:nvSpPr>
         <p:spPr>
           <a:xfrm>
-            <a:off x="2420322" y="3239846"/>
+            <a:off x="2042106" y="3271596"/>
             <a:ext cx="236048" cy="173380"/>
           </a:xfrm>
           <a:prstGeom prst="flowChartDecision">
@@ -13898,7 +13913,7 @@
         </p:nvSpPr>
         <p:spPr>
           <a:xfrm>
-            <a:off x="2879490" y="2627420"/>
+            <a:off x="2501274" y="2659170"/>
             <a:ext cx="1093635" cy="346760"/>
           </a:xfrm>
           <a:prstGeom prst="rect">
@@ -13936,7 +13951,7 @@
                   <a:srgbClr val="7030A0"/>
                 </a:solidFill>
               </a:rPr>
-              <a:t>AddressBook</a:t>
+              <a:t>TaskBook</a:t>
             </a:r>
             <a:endParaRPr lang="en-SG" sz="1050" dirty="0">
               <a:solidFill>
@@ -13957,7 +13972,7 @@
         </p:nvCxnSpPr>
         <p:spPr>
           <a:xfrm>
-            <a:off x="2658680" y="2795516"/>
+            <a:off x="2280464" y="2827266"/>
             <a:ext cx="220810" cy="5284"/>
           </a:xfrm>
           <a:prstGeom prst="straightConnector1">
@@ -13995,7 +14010,7 @@
         </p:nvSpPr>
         <p:spPr>
           <a:xfrm>
-            <a:off x="2422632" y="2708826"/>
+            <a:off x="2044416" y="2740576"/>
             <a:ext cx="236048" cy="173380"/>
           </a:xfrm>
           <a:prstGeom prst="flowChartDecision">
@@ -14040,7 +14055,7 @@
         </p:nvSpPr>
         <p:spPr>
           <a:xfrm>
-            <a:off x="4487017" y="2847371"/>
+            <a:off x="4108801" y="2879121"/>
             <a:ext cx="1156969" cy="346760"/>
           </a:xfrm>
           <a:prstGeom prst="rect">
@@ -14078,7 +14093,7 @@
                   <a:srgbClr val="7030A0"/>
                 </a:solidFill>
               </a:rPr>
-              <a:t>UniquePersonList</a:t>
+              <a:t>UniqueTaskList</a:t>
             </a:r>
             <a:endParaRPr lang="en-SG" sz="1050" dirty="0">
               <a:solidFill>
@@ -14096,7 +14111,7 @@
         </p:nvSpPr>
         <p:spPr>
           <a:xfrm>
-            <a:off x="3984303" y="2673991"/>
+            <a:off x="3606087" y="2705741"/>
             <a:ext cx="236048" cy="173380"/>
           </a:xfrm>
           <a:prstGeom prst="flowChartDecision">
@@ -14146,7 +14161,7 @@
         </p:nvCxnSpPr>
         <p:spPr>
           <a:xfrm>
-            <a:off x="4220351" y="2760681"/>
+            <a:off x="3842135" y="2792431"/>
             <a:ext cx="266666" cy="260070"/>
           </a:xfrm>
           <a:prstGeom prst="bentConnector3">
@@ -14184,7 +14199,7 @@
         </p:nvSpPr>
         <p:spPr>
           <a:xfrm>
-            <a:off x="4503204" y="2280569"/>
+            <a:off x="4124988" y="2312319"/>
             <a:ext cx="1156969" cy="346760"/>
           </a:xfrm>
           <a:prstGeom prst="rect">
@@ -14243,7 +14258,7 @@
         </p:nvCxnSpPr>
         <p:spPr>
           <a:xfrm flipV="1">
-            <a:off x="4220351" y="2453949"/>
+            <a:off x="3842135" y="2485699"/>
             <a:ext cx="282853" cy="306732"/>
           </a:xfrm>
           <a:prstGeom prst="bentConnector3">
@@ -14283,8 +14298,8 @@
         </p:nvSpPr>
         <p:spPr>
           <a:xfrm>
-            <a:off x="6313677" y="2858066"/>
-            <a:ext cx="708186" cy="346760"/>
+            <a:off x="5935460" y="2889816"/>
+            <a:ext cx="925323" cy="346760"/>
           </a:xfrm>
           <a:prstGeom prst="rect">
             <a:avLst/>
@@ -14316,14 +14331,22 @@
           <a:p>
             <a:pPr algn="ctr"/>
             <a:r>
-              <a:rPr lang="en-US" sz="1050" dirty="0" smtClean="0">
+              <a:rPr lang="en-US" sz="1000" dirty="0" err="1" smtClean="0">
                 <a:solidFill>
                   <a:srgbClr val="7030A0"/>
                 </a:solidFill>
               </a:rPr>
-              <a:t>Person</a:t>
-            </a:r>
-            <a:endParaRPr lang="en-SG" sz="1050" dirty="0">
+              <a:t>Floating</a:t>
+            </a:r>
+            <a:r>
+              <a:rPr lang="en-US" sz="1000" dirty="0" err="1" smtClean="0">
+                <a:solidFill>
+                  <a:srgbClr val="7030A0"/>
+                </a:solidFill>
+              </a:rPr>
+              <a:t>Task</a:t>
+            </a:r>
+            <a:endParaRPr lang="en-SG" sz="1000" dirty="0">
               <a:solidFill>
                 <a:srgbClr val="7030A0"/>
               </a:solidFill>
@@ -14339,7 +14362,7 @@
         </p:nvSpPr>
         <p:spPr>
           <a:xfrm>
-            <a:off x="5643227" y="2943979"/>
+            <a:off x="5265011" y="2975729"/>
             <a:ext cx="236048" cy="173380"/>
           </a:xfrm>
           <a:prstGeom prst="flowChartDecision">
@@ -14387,8 +14410,8 @@
         </p:nvCxnSpPr>
         <p:spPr>
           <a:xfrm>
-            <a:off x="5879275" y="3030669"/>
-            <a:ext cx="434402" cy="777"/>
+            <a:off x="5501059" y="3062419"/>
+            <a:ext cx="434401" cy="777"/>
           </a:xfrm>
           <a:prstGeom prst="bentConnector3">
             <a:avLst/>
@@ -14425,7 +14448,7 @@
         </p:nvSpPr>
         <p:spPr>
           <a:xfrm>
-            <a:off x="6315289" y="2285584"/>
+            <a:off x="5937073" y="2317334"/>
             <a:ext cx="708186" cy="346760"/>
           </a:xfrm>
           <a:prstGeom prst="rect">
@@ -14481,7 +14504,7 @@
         </p:nvSpPr>
         <p:spPr>
           <a:xfrm>
-            <a:off x="5672547" y="2371497"/>
+            <a:off x="5294331" y="2403247"/>
             <a:ext cx="236048" cy="173380"/>
           </a:xfrm>
           <a:prstGeom prst="flowChartDecision">
@@ -14529,7 +14552,7 @@
         </p:nvCxnSpPr>
         <p:spPr>
           <a:xfrm>
-            <a:off x="5908595" y="2458187"/>
+            <a:off x="5530379" y="2489937"/>
             <a:ext cx="406694" cy="777"/>
           </a:xfrm>
           <a:prstGeom prst="bentConnector3">
@@ -14567,7 +14590,7 @@
         </p:nvSpPr>
         <p:spPr>
           <a:xfrm>
-            <a:off x="5128257" y="3429000"/>
+            <a:off x="5960011" y="1752597"/>
             <a:ext cx="1156969" cy="346760"/>
           </a:xfrm>
           <a:prstGeom prst="rect">
@@ -14620,7 +14643,7 @@
                   <a:srgbClr val="7030A0"/>
                 </a:solidFill>
               </a:rPr>
-              <a:t>ReadOnlyPerson</a:t>
+              <a:t>ReadOnlyTask</a:t>
             </a:r>
             <a:endParaRPr lang="en-SG" sz="1050" dirty="0">
               <a:solidFill>
@@ -14638,7 +14661,7 @@
         </p:nvSpPr>
         <p:spPr>
           <a:xfrm>
-            <a:off x="7712397" y="2564238"/>
+            <a:off x="7521414" y="2628900"/>
             <a:ext cx="708186" cy="285783"/>
           </a:xfrm>
           <a:prstGeom prst="rect">
@@ -14671,7 +14694,7 @@
           <a:p>
             <a:pPr algn="ctr"/>
             <a:r>
-              <a:rPr lang="en-US" sz="1050" dirty="0" smtClean="0">
+              <a:rPr lang="en-SG" sz="1050" dirty="0" smtClean="0">
                 <a:solidFill>
                   <a:srgbClr val="7030A0"/>
                 </a:solidFill>
@@ -14694,7 +14717,7 @@
         </p:nvSpPr>
         <p:spPr>
           <a:xfrm>
-            <a:off x="7041947" y="2948201"/>
+            <a:off x="6880932" y="2979951"/>
             <a:ext cx="236048" cy="173380"/>
           </a:xfrm>
           <a:prstGeom prst="flowChartDecision">
@@ -14744,8 +14767,8 @@
         </p:nvCxnSpPr>
         <p:spPr>
           <a:xfrm flipV="1">
-            <a:off x="7277995" y="2707130"/>
-            <a:ext cx="434402" cy="327761"/>
+            <a:off x="7116980" y="2771792"/>
+            <a:ext cx="404434" cy="294849"/>
           </a:xfrm>
           <a:prstGeom prst="bentConnector3">
             <a:avLst/>
@@ -14776,14 +14799,14 @@
       </p:cxnSp>
       <p:sp>
         <p:nvSpPr>
-          <p:cNvPr id="80" name="Rectangle 8"/>
+          <p:cNvPr id="85" name="Rectangle 8"/>
           <p:cNvSpPr/>
           <p:nvPr/>
         </p:nvSpPr>
         <p:spPr>
           <a:xfrm>
-            <a:off x="7712397" y="2887216"/>
-            <a:ext cx="708186" cy="285783"/>
+            <a:off x="7521414" y="2959522"/>
+            <a:ext cx="898205" cy="285783"/>
           </a:xfrm>
           <a:prstGeom prst="rect">
             <a:avLst/>
@@ -14815,206 +14838,12 @@
           <a:p>
             <a:pPr algn="ctr"/>
             <a:r>
-              <a:rPr lang="en-US" sz="1050" dirty="0" smtClean="0">
+              <a:rPr lang="en-US" sz="1050" dirty="0" err="1" smtClean="0">
                 <a:solidFill>
                   <a:srgbClr val="7030A0"/>
                 </a:solidFill>
               </a:rPr>
-              <a:t>Phone</a:t>
-            </a:r>
-            <a:endParaRPr lang="en-SG" sz="1050" dirty="0">
-              <a:solidFill>
-                <a:srgbClr val="7030A0"/>
-              </a:solidFill>
-            </a:endParaRPr>
-          </a:p>
-        </p:txBody>
-      </p:sp>
-      <p:cxnSp>
-        <p:nvCxnSpPr>
-          <p:cNvPr id="81" name="Elbow Connector 80"/>
-          <p:cNvCxnSpPr>
-            <a:stCxn id="78" idx="3"/>
-            <a:endCxn id="80" idx="1"/>
-          </p:cNvCxnSpPr>
-          <p:nvPr/>
-        </p:nvCxnSpPr>
-        <p:spPr>
-          <a:xfrm flipV="1">
-            <a:off x="7277995" y="3030108"/>
-            <a:ext cx="434402" cy="4783"/>
-          </a:xfrm>
-          <a:prstGeom prst="bentConnector3">
-            <a:avLst/>
-          </a:prstGeom>
-          <a:ln w="19050">
-            <a:solidFill>
-              <a:srgbClr val="7030A0"/>
-            </a:solidFill>
-            <a:headEnd type="none" w="med" len="med"/>
-            <a:tailEnd type="arrow" w="med" len="med"/>
-          </a:ln>
-          <a:effectLst/>
-        </p:spPr>
-        <p:style>
-          <a:lnRef idx="1">
-            <a:schemeClr val="accent2"/>
-          </a:lnRef>
-          <a:fillRef idx="2">
-            <a:schemeClr val="accent2"/>
-          </a:fillRef>
-          <a:effectRef idx="1">
-            <a:schemeClr val="accent2"/>
-          </a:effectRef>
-          <a:fontRef idx="minor">
-            <a:schemeClr val="dk1"/>
-          </a:fontRef>
-        </p:style>
-      </p:cxnSp>
-      <p:sp>
-        <p:nvSpPr>
-          <p:cNvPr id="83" name="Rectangle 8"/>
-          <p:cNvSpPr/>
-          <p:nvPr/>
-        </p:nvSpPr>
-        <p:spPr>
-          <a:xfrm>
-            <a:off x="7712397" y="3210194"/>
-            <a:ext cx="708186" cy="285783"/>
-          </a:xfrm>
-          <a:prstGeom prst="rect">
-            <a:avLst/>
-          </a:prstGeom>
-          <a:ln w="19050">
-            <a:solidFill>
-              <a:srgbClr val="7030A0"/>
-            </a:solidFill>
-          </a:ln>
-          <a:effectLst/>
-        </p:spPr>
-        <p:style>
-          <a:lnRef idx="1">
-            <a:schemeClr val="accent4"/>
-          </a:lnRef>
-          <a:fillRef idx="2">
-            <a:schemeClr val="accent4"/>
-          </a:fillRef>
-          <a:effectRef idx="1">
-            <a:schemeClr val="accent4"/>
-          </a:effectRef>
-          <a:fontRef idx="minor">
-            <a:schemeClr val="dk1"/>
-          </a:fontRef>
-        </p:style>
-        <p:txBody>
-          <a:bodyPr rtlCol="0" anchor="ctr"/>
-          <a:lstStyle/>
-          <a:p>
-            <a:pPr algn="ctr"/>
-            <a:r>
-              <a:rPr lang="en-US" sz="1050" dirty="0" smtClean="0">
-                <a:solidFill>
-                  <a:srgbClr val="7030A0"/>
-                </a:solidFill>
-              </a:rPr>
-              <a:t>Email</a:t>
-            </a:r>
-            <a:endParaRPr lang="en-SG" sz="1050" dirty="0">
-              <a:solidFill>
-                <a:srgbClr val="7030A0"/>
-              </a:solidFill>
-            </a:endParaRPr>
-          </a:p>
-        </p:txBody>
-      </p:sp>
-      <p:cxnSp>
-        <p:nvCxnSpPr>
-          <p:cNvPr id="84" name="Elbow Connector 83"/>
-          <p:cNvCxnSpPr>
-            <a:stCxn id="78" idx="3"/>
-            <a:endCxn id="83" idx="1"/>
-          </p:cNvCxnSpPr>
-          <p:nvPr/>
-        </p:nvCxnSpPr>
-        <p:spPr>
-          <a:xfrm>
-            <a:off x="7277995" y="3034891"/>
-            <a:ext cx="434402" cy="318195"/>
-          </a:xfrm>
-          <a:prstGeom prst="bentConnector3">
-            <a:avLst/>
-          </a:prstGeom>
-          <a:ln w="19050">
-            <a:solidFill>
-              <a:srgbClr val="7030A0"/>
-            </a:solidFill>
-            <a:headEnd type="none" w="med" len="med"/>
-            <a:tailEnd type="arrow" w="med" len="med"/>
-          </a:ln>
-          <a:effectLst/>
-        </p:spPr>
-        <p:style>
-          <a:lnRef idx="1">
-            <a:schemeClr val="accent2"/>
-          </a:lnRef>
-          <a:fillRef idx="2">
-            <a:schemeClr val="accent2"/>
-          </a:fillRef>
-          <a:effectRef idx="1">
-            <a:schemeClr val="accent2"/>
-          </a:effectRef>
-          <a:fontRef idx="minor">
-            <a:schemeClr val="dk1"/>
-          </a:fontRef>
-        </p:style>
-      </p:cxnSp>
-      <p:sp>
-        <p:nvSpPr>
-          <p:cNvPr id="85" name="Rectangle 8"/>
-          <p:cNvSpPr/>
-          <p:nvPr/>
-        </p:nvSpPr>
-        <p:spPr>
-          <a:xfrm>
-            <a:off x="7712397" y="3533171"/>
-            <a:ext cx="708186" cy="285783"/>
-          </a:xfrm>
-          <a:prstGeom prst="rect">
-            <a:avLst/>
-          </a:prstGeom>
-          <a:ln w="19050">
-            <a:solidFill>
-              <a:srgbClr val="7030A0"/>
-            </a:solidFill>
-          </a:ln>
-          <a:effectLst/>
-        </p:spPr>
-        <p:style>
-          <a:lnRef idx="1">
-            <a:schemeClr val="accent4"/>
-          </a:lnRef>
-          <a:fillRef idx="2">
-            <a:schemeClr val="accent4"/>
-          </a:fillRef>
-          <a:effectRef idx="1">
-            <a:schemeClr val="accent4"/>
-          </a:effectRef>
-          <a:fontRef idx="minor">
-            <a:schemeClr val="dk1"/>
-          </a:fontRef>
-        </p:style>
-        <p:txBody>
-          <a:bodyPr rtlCol="0" anchor="ctr"/>
-          <a:lstStyle/>
-          <a:p>
-            <a:pPr algn="ctr"/>
-            <a:r>
-              <a:rPr lang="en-US" sz="1050" dirty="0" smtClean="0">
-                <a:solidFill>
-                  <a:srgbClr val="7030A0"/>
-                </a:solidFill>
-              </a:rPr>
-              <a:t>Address</a:t>
+              <a:t>isCompleted</a:t>
             </a:r>
             <a:endParaRPr lang="en-SG" sz="1050" dirty="0">
               <a:solidFill>
@@ -15035,8 +14864,8 @@
         </p:nvCxnSpPr>
         <p:spPr>
           <a:xfrm>
-            <a:off x="7277995" y="3034891"/>
-            <a:ext cx="434402" cy="641172"/>
+            <a:off x="7116980" y="3066641"/>
+            <a:ext cx="404434" cy="35773"/>
           </a:xfrm>
           <a:prstGeom prst="bentConnector3">
             <a:avLst/>
@@ -15075,7 +14904,7 @@
         </p:nvCxnSpPr>
         <p:spPr>
           <a:xfrm rot="16200000" flipH="1">
-            <a:off x="3279321" y="2485431"/>
+            <a:off x="2901105" y="2517181"/>
             <a:ext cx="293825" cy="1"/>
           </a:xfrm>
           <a:prstGeom prst="bentConnector3">
@@ -15116,7 +14945,7 @@
         </p:nvSpPr>
         <p:spPr>
           <a:xfrm rot="10800000" flipV="1">
-            <a:off x="3290981" y="2162997"/>
+            <a:off x="2912765" y="2194747"/>
             <a:ext cx="270504" cy="175523"/>
           </a:xfrm>
           <a:prstGeom prst="triangle">
@@ -15164,7 +14993,7 @@
         </p:nvSpPr>
         <p:spPr>
           <a:xfrm>
-            <a:off x="2660303" y="1806470"/>
+            <a:off x="2282087" y="1838220"/>
             <a:ext cx="1539926" cy="346760"/>
           </a:xfrm>
           <a:prstGeom prst="rect">
@@ -15217,7 +15046,7 @@
                   <a:srgbClr val="7030A0"/>
                 </a:solidFill>
               </a:rPr>
-              <a:t>ReadOnlyAddressBook</a:t>
+              <a:t>ReadOnlyTaskBook</a:t>
             </a:r>
             <a:endParaRPr lang="en-SG" sz="1050" dirty="0">
               <a:solidFill>
@@ -15234,8 +15063,8 @@
           <p:nvPr/>
         </p:nvSpPr>
         <p:spPr>
-          <a:xfrm rot="16200000">
-            <a:off x="6581354" y="3514530"/>
+          <a:xfrm>
+            <a:off x="5494951" y="3688744"/>
             <a:ext cx="881018" cy="261610"/>
           </a:xfrm>
           <a:prstGeom prst="rect">
@@ -15274,7 +15103,7 @@
         </p:nvSpPr>
         <p:spPr>
           <a:xfrm>
-            <a:off x="2057400" y="4239491"/>
+            <a:off x="1679184" y="4271241"/>
             <a:ext cx="1775949" cy="346760"/>
           </a:xfrm>
           <a:prstGeom prst="rect">
@@ -15356,7 +15185,7 @@
         </p:nvCxnSpPr>
         <p:spPr>
           <a:xfrm rot="16200000" flipH="1">
-            <a:off x="1364475" y="3719945"/>
+            <a:off x="986259" y="3751695"/>
             <a:ext cx="831471" cy="554380"/>
           </a:xfrm>
           <a:prstGeom prst="bentConnector2">
@@ -15387,6 +15216,1836 @@
           </a:fontRef>
         </p:style>
       </p:cxnSp>
+      <p:sp>
+        <p:nvSpPr>
+          <p:cNvPr id="61" name="Isosceles Triangle 102"/>
+          <p:cNvSpPr/>
+          <p:nvPr/>
+        </p:nvSpPr>
+        <p:spPr>
+          <a:xfrm rot="10800000" flipV="1">
+            <a:off x="6571682" y="3245305"/>
+            <a:ext cx="270504" cy="175523"/>
+          </a:xfrm>
+          <a:prstGeom prst="triangle">
+            <a:avLst/>
+          </a:prstGeom>
+          <a:solidFill>
+            <a:srgbClr val="7030A0"/>
+          </a:solidFill>
+          <a:ln w="19050">
+            <a:solidFill>
+              <a:srgbClr val="7030A0"/>
+            </a:solidFill>
+          </a:ln>
+          <a:effectLst/>
+        </p:spPr>
+        <p:style>
+          <a:lnRef idx="1">
+            <a:schemeClr val="accent4"/>
+          </a:lnRef>
+          <a:fillRef idx="2">
+            <a:schemeClr val="accent4"/>
+          </a:fillRef>
+          <a:effectRef idx="1">
+            <a:schemeClr val="accent4"/>
+          </a:effectRef>
+          <a:fontRef idx="minor">
+            <a:schemeClr val="dk1"/>
+          </a:fontRef>
+        </p:style>
+        <p:txBody>
+          <a:bodyPr rtlCol="0" anchor="ctr"/>
+          <a:lstStyle/>
+          <a:p>
+            <a:pPr algn="ctr"/>
+            <a:endParaRPr lang="en-SG" sz="1050" b="1">
+              <a:solidFill>
+                <a:srgbClr val="92D050"/>
+              </a:solidFill>
+            </a:endParaRPr>
+          </a:p>
+        </p:txBody>
+      </p:sp>
+      <p:cxnSp>
+        <p:nvCxnSpPr>
+          <p:cNvPr id="24" name="Elbow Connector 23"/>
+          <p:cNvCxnSpPr>
+            <a:stCxn id="61" idx="3"/>
+            <a:endCxn id="73" idx="1"/>
+          </p:cNvCxnSpPr>
+          <p:nvPr/>
+        </p:nvCxnSpPr>
+        <p:spPr>
+          <a:xfrm rot="16200000" flipH="1">
+            <a:off x="6721224" y="3406538"/>
+            <a:ext cx="375117" cy="403696"/>
+          </a:xfrm>
+          <a:prstGeom prst="bentConnector2">
+            <a:avLst/>
+          </a:prstGeom>
+          <a:ln w="19050">
+            <a:solidFill>
+              <a:srgbClr val="7030A0"/>
+            </a:solidFill>
+          </a:ln>
+        </p:spPr>
+        <p:style>
+          <a:lnRef idx="1">
+            <a:schemeClr val="accent1"/>
+          </a:lnRef>
+          <a:fillRef idx="0">
+            <a:schemeClr val="accent1"/>
+          </a:fillRef>
+          <a:effectRef idx="0">
+            <a:schemeClr val="accent1"/>
+          </a:effectRef>
+          <a:fontRef idx="minor">
+            <a:schemeClr val="tx1"/>
+          </a:fontRef>
+        </p:style>
+      </p:cxnSp>
+      <p:sp>
+        <p:nvSpPr>
+          <p:cNvPr id="73" name="Rectangle 8"/>
+          <p:cNvSpPr/>
+          <p:nvPr/>
+        </p:nvSpPr>
+        <p:spPr>
+          <a:xfrm>
+            <a:off x="7110630" y="3622565"/>
+            <a:ext cx="925323" cy="346760"/>
+          </a:xfrm>
+          <a:prstGeom prst="rect">
+            <a:avLst/>
+          </a:prstGeom>
+          <a:ln w="19050">
+            <a:solidFill>
+              <a:srgbClr val="7030A0"/>
+            </a:solidFill>
+          </a:ln>
+          <a:effectLst/>
+        </p:spPr>
+        <p:style>
+          <a:lnRef idx="1">
+            <a:schemeClr val="accent4"/>
+          </a:lnRef>
+          <a:fillRef idx="2">
+            <a:schemeClr val="accent4"/>
+          </a:fillRef>
+          <a:effectRef idx="1">
+            <a:schemeClr val="accent4"/>
+          </a:effectRef>
+          <a:fontRef idx="minor">
+            <a:schemeClr val="dk1"/>
+          </a:fontRef>
+        </p:style>
+        <p:txBody>
+          <a:bodyPr rtlCol="0" anchor="ctr"/>
+          <a:lstStyle/>
+          <a:p>
+            <a:pPr algn="ctr"/>
+            <a:r>
+              <a:rPr lang="en-US" sz="1000" dirty="0" err="1" smtClean="0">
+                <a:solidFill>
+                  <a:srgbClr val="7030A0"/>
+                </a:solidFill>
+              </a:rPr>
+              <a:t>DeadlineTask</a:t>
+            </a:r>
+            <a:endParaRPr lang="en-SG" sz="1000" dirty="0">
+              <a:solidFill>
+                <a:srgbClr val="7030A0"/>
+              </a:solidFill>
+            </a:endParaRPr>
+          </a:p>
+        </p:txBody>
+      </p:sp>
+      <p:sp>
+        <p:nvSpPr>
+          <p:cNvPr id="82" name="Flowchart: Decision 96"/>
+          <p:cNvSpPr/>
+          <p:nvPr/>
+        </p:nvSpPr>
+        <p:spPr>
+          <a:xfrm rot="5400000">
+            <a:off x="7455267" y="4000659"/>
+            <a:ext cx="236048" cy="173380"/>
+          </a:xfrm>
+          <a:prstGeom prst="flowChartDecision">
+            <a:avLst/>
+          </a:prstGeom>
+          <a:solidFill>
+            <a:srgbClr val="7030A0"/>
+          </a:solidFill>
+          <a:ln w="19050">
+            <a:solidFill>
+              <a:srgbClr val="7030A0"/>
+            </a:solidFill>
+          </a:ln>
+          <a:effectLst/>
+        </p:spPr>
+        <p:style>
+          <a:lnRef idx="1">
+            <a:schemeClr val="accent6"/>
+          </a:lnRef>
+          <a:fillRef idx="2">
+            <a:schemeClr val="accent6"/>
+          </a:fillRef>
+          <a:effectRef idx="1">
+            <a:schemeClr val="accent6"/>
+          </a:effectRef>
+          <a:fontRef idx="minor">
+            <a:schemeClr val="dk1"/>
+          </a:fontRef>
+        </p:style>
+        <p:txBody>
+          <a:bodyPr rtlCol="0" anchor="ctr"/>
+          <a:lstStyle/>
+          <a:p>
+            <a:pPr algn="ctr"/>
+            <a:endParaRPr lang="en-US" sz="1050"/>
+          </a:p>
+        </p:txBody>
+      </p:sp>
+      <p:cxnSp>
+        <p:nvCxnSpPr>
+          <p:cNvPr id="91" name="Elbow Connector 90"/>
+          <p:cNvCxnSpPr>
+            <a:stCxn id="82" idx="3"/>
+          </p:cNvCxnSpPr>
+          <p:nvPr/>
+        </p:nvCxnSpPr>
+        <p:spPr>
+          <a:xfrm flipH="1">
+            <a:off x="7570119" y="4205373"/>
+            <a:ext cx="3172" cy="214227"/>
+          </a:xfrm>
+          <a:prstGeom prst="straightConnector1">
+            <a:avLst/>
+          </a:prstGeom>
+          <a:ln w="19050">
+            <a:solidFill>
+              <a:srgbClr val="7030A0"/>
+            </a:solidFill>
+            <a:headEnd type="none" w="med" len="med"/>
+            <a:tailEnd type="arrow" w="med" len="med"/>
+          </a:ln>
+          <a:effectLst/>
+        </p:spPr>
+        <p:style>
+          <a:lnRef idx="1">
+            <a:schemeClr val="accent2"/>
+          </a:lnRef>
+          <a:fillRef idx="2">
+            <a:schemeClr val="accent2"/>
+          </a:fillRef>
+          <a:effectRef idx="1">
+            <a:schemeClr val="accent2"/>
+          </a:effectRef>
+          <a:fontRef idx="minor">
+            <a:schemeClr val="dk1"/>
+          </a:fontRef>
+        </p:style>
+      </p:cxnSp>
+      <p:cxnSp>
+        <p:nvCxnSpPr>
+          <p:cNvPr id="113" name="Elbow Connector 112"/>
+          <p:cNvCxnSpPr>
+            <a:stCxn id="253" idx="1"/>
+            <a:endCxn id="121" idx="3"/>
+          </p:cNvCxnSpPr>
+          <p:nvPr/>
+        </p:nvCxnSpPr>
+        <p:spPr>
+          <a:xfrm rot="10800000">
+            <a:off x="6205514" y="4261128"/>
+            <a:ext cx="732654" cy="267657"/>
+          </a:xfrm>
+          <a:prstGeom prst="bentConnector3">
+            <a:avLst>
+              <a:gd name="adj1" fmla="val 50000"/>
+            </a:avLst>
+          </a:prstGeom>
+          <a:ln w="19050">
+            <a:solidFill>
+              <a:srgbClr val="7030A0"/>
+            </a:solidFill>
+            <a:headEnd type="none" w="med" len="med"/>
+            <a:tailEnd type="arrow" w="med" len="med"/>
+          </a:ln>
+          <a:effectLst/>
+        </p:spPr>
+        <p:style>
+          <a:lnRef idx="1">
+            <a:schemeClr val="accent2"/>
+          </a:lnRef>
+          <a:fillRef idx="2">
+            <a:schemeClr val="accent2"/>
+          </a:fillRef>
+          <a:effectRef idx="1">
+            <a:schemeClr val="accent2"/>
+          </a:effectRef>
+          <a:fontRef idx="minor">
+            <a:schemeClr val="dk1"/>
+          </a:fontRef>
+        </p:style>
+      </p:cxnSp>
+      <p:cxnSp>
+        <p:nvCxnSpPr>
+          <p:cNvPr id="116" name="Elbow Connector 115"/>
+          <p:cNvCxnSpPr>
+            <a:stCxn id="253" idx="1"/>
+            <a:endCxn id="123" idx="3"/>
+          </p:cNvCxnSpPr>
+          <p:nvPr/>
+        </p:nvCxnSpPr>
+        <p:spPr>
+          <a:xfrm rot="10800000" flipV="1">
+            <a:off x="6205514" y="4528783"/>
+            <a:ext cx="732654" cy="87425"/>
+          </a:xfrm>
+          <a:prstGeom prst="bentConnector3">
+            <a:avLst>
+              <a:gd name="adj1" fmla="val 50000"/>
+            </a:avLst>
+          </a:prstGeom>
+          <a:ln w="19050">
+            <a:solidFill>
+              <a:srgbClr val="7030A0"/>
+            </a:solidFill>
+            <a:headEnd type="none" w="med" len="med"/>
+            <a:tailEnd type="arrow" w="med" len="med"/>
+          </a:ln>
+          <a:effectLst/>
+        </p:spPr>
+        <p:style>
+          <a:lnRef idx="1">
+            <a:schemeClr val="accent2"/>
+          </a:lnRef>
+          <a:fillRef idx="2">
+            <a:schemeClr val="accent2"/>
+          </a:fillRef>
+          <a:effectRef idx="1">
+            <a:schemeClr val="accent2"/>
+          </a:effectRef>
+          <a:fontRef idx="minor">
+            <a:schemeClr val="dk1"/>
+          </a:fontRef>
+        </p:style>
+      </p:cxnSp>
+      <p:sp>
+        <p:nvSpPr>
+          <p:cNvPr id="121" name="Rectangle 8"/>
+          <p:cNvSpPr/>
+          <p:nvPr/>
+        </p:nvSpPr>
+        <p:spPr>
+          <a:xfrm>
+            <a:off x="5738098" y="4162431"/>
+            <a:ext cx="467416" cy="197392"/>
+          </a:xfrm>
+          <a:prstGeom prst="rect">
+            <a:avLst/>
+          </a:prstGeom>
+          <a:ln w="19050">
+            <a:solidFill>
+              <a:srgbClr val="7030A0"/>
+            </a:solidFill>
+          </a:ln>
+          <a:effectLst/>
+        </p:spPr>
+        <p:style>
+          <a:lnRef idx="1">
+            <a:schemeClr val="accent4"/>
+          </a:lnRef>
+          <a:fillRef idx="2">
+            <a:schemeClr val="accent4"/>
+          </a:fillRef>
+          <a:effectRef idx="1">
+            <a:schemeClr val="accent4"/>
+          </a:effectRef>
+          <a:fontRef idx="minor">
+            <a:schemeClr val="dk1"/>
+          </a:fontRef>
+        </p:style>
+        <p:txBody>
+          <a:bodyPr rtlCol="0" anchor="ctr"/>
+          <a:lstStyle/>
+          <a:p>
+            <a:pPr algn="ctr"/>
+            <a:r>
+              <a:rPr lang="en-SG" sz="1050" dirty="0" smtClean="0">
+                <a:solidFill>
+                  <a:srgbClr val="7030A0"/>
+                </a:solidFill>
+              </a:rPr>
+              <a:t>Date</a:t>
+            </a:r>
+            <a:endParaRPr lang="en-SG" sz="1050" dirty="0">
+              <a:solidFill>
+                <a:srgbClr val="7030A0"/>
+              </a:solidFill>
+            </a:endParaRPr>
+          </a:p>
+        </p:txBody>
+      </p:sp>
+      <p:sp>
+        <p:nvSpPr>
+          <p:cNvPr id="123" name="Rectangle 8"/>
+          <p:cNvSpPr/>
+          <p:nvPr/>
+        </p:nvSpPr>
+        <p:spPr>
+          <a:xfrm>
+            <a:off x="5738098" y="4517513"/>
+            <a:ext cx="467416" cy="197392"/>
+          </a:xfrm>
+          <a:prstGeom prst="rect">
+            <a:avLst/>
+          </a:prstGeom>
+          <a:ln w="19050">
+            <a:solidFill>
+              <a:srgbClr val="7030A0"/>
+            </a:solidFill>
+          </a:ln>
+          <a:effectLst/>
+        </p:spPr>
+        <p:style>
+          <a:lnRef idx="1">
+            <a:schemeClr val="accent4"/>
+          </a:lnRef>
+          <a:fillRef idx="2">
+            <a:schemeClr val="accent4"/>
+          </a:fillRef>
+          <a:effectRef idx="1">
+            <a:schemeClr val="accent4"/>
+          </a:effectRef>
+          <a:fontRef idx="minor">
+            <a:schemeClr val="dk1"/>
+          </a:fontRef>
+        </p:style>
+        <p:txBody>
+          <a:bodyPr rtlCol="0" anchor="ctr"/>
+          <a:lstStyle/>
+          <a:p>
+            <a:pPr algn="ctr"/>
+            <a:r>
+              <a:rPr lang="en-SG" sz="1050" dirty="0" smtClean="0">
+                <a:solidFill>
+                  <a:srgbClr val="7030A0"/>
+                </a:solidFill>
+              </a:rPr>
+              <a:t>Time</a:t>
+            </a:r>
+            <a:endParaRPr lang="en-SG" sz="1050" dirty="0">
+              <a:solidFill>
+                <a:srgbClr val="7030A0"/>
+              </a:solidFill>
+            </a:endParaRPr>
+          </a:p>
+        </p:txBody>
+      </p:sp>
+      <p:sp>
+        <p:nvSpPr>
+          <p:cNvPr id="144" name="Isosceles Triangle 102"/>
+          <p:cNvSpPr/>
+          <p:nvPr/>
+        </p:nvSpPr>
+        <p:spPr>
+          <a:xfrm flipV="1">
+            <a:off x="6405586" y="1577074"/>
+            <a:ext cx="270504" cy="175523"/>
+          </a:xfrm>
+          <a:prstGeom prst="triangle">
+            <a:avLst/>
+          </a:prstGeom>
+          <a:solidFill>
+            <a:srgbClr val="7030A0"/>
+          </a:solidFill>
+          <a:ln w="19050">
+            <a:solidFill>
+              <a:srgbClr val="7030A0"/>
+            </a:solidFill>
+          </a:ln>
+          <a:effectLst/>
+        </p:spPr>
+        <p:style>
+          <a:lnRef idx="1">
+            <a:schemeClr val="accent4"/>
+          </a:lnRef>
+          <a:fillRef idx="2">
+            <a:schemeClr val="accent4"/>
+          </a:fillRef>
+          <a:effectRef idx="1">
+            <a:schemeClr val="accent4"/>
+          </a:effectRef>
+          <a:fontRef idx="minor">
+            <a:schemeClr val="dk1"/>
+          </a:fontRef>
+        </p:style>
+        <p:txBody>
+          <a:bodyPr rtlCol="0" anchor="ctr"/>
+          <a:lstStyle/>
+          <a:p>
+            <a:pPr algn="ctr"/>
+            <a:endParaRPr lang="en-SG" sz="1050" b="1">
+              <a:solidFill>
+                <a:srgbClr val="92D050"/>
+              </a:solidFill>
+            </a:endParaRPr>
+          </a:p>
+        </p:txBody>
+      </p:sp>
+      <p:cxnSp>
+        <p:nvCxnSpPr>
+          <p:cNvPr id="146" name="Elbow Connector 63"/>
+          <p:cNvCxnSpPr>
+            <a:stCxn id="144" idx="3"/>
+          </p:cNvCxnSpPr>
+          <p:nvPr/>
+        </p:nvCxnSpPr>
+        <p:spPr>
+          <a:xfrm rot="16200000" flipV="1">
+            <a:off x="6381444" y="1417679"/>
+            <a:ext cx="316446" cy="2343"/>
+          </a:xfrm>
+          <a:prstGeom prst="bentConnector3">
+            <a:avLst>
+              <a:gd name="adj1" fmla="val 50000"/>
+            </a:avLst>
+          </a:prstGeom>
+          <a:ln w="19050">
+            <a:solidFill>
+              <a:srgbClr val="7030A0"/>
+            </a:solidFill>
+            <a:prstDash val="sysDot"/>
+            <a:headEnd type="none" w="med" len="med"/>
+            <a:tailEnd type="none" w="med" len="med"/>
+          </a:ln>
+          <a:effectLst/>
+        </p:spPr>
+        <p:style>
+          <a:lnRef idx="1">
+            <a:schemeClr val="accent2"/>
+          </a:lnRef>
+          <a:fillRef idx="2">
+            <a:schemeClr val="accent2"/>
+          </a:fillRef>
+          <a:effectRef idx="1">
+            <a:schemeClr val="accent2"/>
+          </a:effectRef>
+          <a:fontRef idx="minor">
+            <a:schemeClr val="dk1"/>
+          </a:fontRef>
+        </p:style>
+      </p:cxnSp>
+      <p:sp>
+        <p:nvSpPr>
+          <p:cNvPr id="153" name="Rectangle 8"/>
+          <p:cNvSpPr/>
+          <p:nvPr/>
+        </p:nvSpPr>
+        <p:spPr>
+          <a:xfrm>
+            <a:off x="5964356" y="926470"/>
+            <a:ext cx="925323" cy="346760"/>
+          </a:xfrm>
+          <a:prstGeom prst="rect">
+            <a:avLst/>
+          </a:prstGeom>
+          <a:ln w="19050">
+            <a:solidFill>
+              <a:srgbClr val="7030A0"/>
+            </a:solidFill>
+          </a:ln>
+          <a:effectLst/>
+        </p:spPr>
+        <p:style>
+          <a:lnRef idx="1">
+            <a:schemeClr val="accent4"/>
+          </a:lnRef>
+          <a:fillRef idx="2">
+            <a:schemeClr val="accent4"/>
+          </a:fillRef>
+          <a:effectRef idx="1">
+            <a:schemeClr val="accent4"/>
+          </a:effectRef>
+          <a:fontRef idx="minor">
+            <a:schemeClr val="dk1"/>
+          </a:fontRef>
+        </p:style>
+        <p:txBody>
+          <a:bodyPr rtlCol="0" anchor="ctr"/>
+          <a:lstStyle/>
+          <a:p>
+            <a:pPr algn="ctr"/>
+            <a:r>
+              <a:rPr lang="en-US" sz="1000" dirty="0" smtClean="0">
+                <a:solidFill>
+                  <a:srgbClr val="7030A0"/>
+                </a:solidFill>
+              </a:rPr>
+              <a:t>Event</a:t>
+            </a:r>
+            <a:endParaRPr lang="en-SG" sz="1000" dirty="0">
+              <a:solidFill>
+                <a:srgbClr val="7030A0"/>
+              </a:solidFill>
+            </a:endParaRPr>
+          </a:p>
+        </p:txBody>
+      </p:sp>
+      <p:sp>
+        <p:nvSpPr>
+          <p:cNvPr id="159" name="Rectangle 8"/>
+          <p:cNvSpPr/>
+          <p:nvPr/>
+        </p:nvSpPr>
+        <p:spPr>
+          <a:xfrm>
+            <a:off x="7521413" y="644223"/>
+            <a:ext cx="708186" cy="285783"/>
+          </a:xfrm>
+          <a:prstGeom prst="rect">
+            <a:avLst/>
+          </a:prstGeom>
+          <a:ln w="19050">
+            <a:solidFill>
+              <a:srgbClr val="7030A0"/>
+            </a:solidFill>
+          </a:ln>
+          <a:effectLst/>
+        </p:spPr>
+        <p:style>
+          <a:lnRef idx="1">
+            <a:schemeClr val="accent4"/>
+          </a:lnRef>
+          <a:fillRef idx="2">
+            <a:schemeClr val="accent4"/>
+          </a:fillRef>
+          <a:effectRef idx="1">
+            <a:schemeClr val="accent4"/>
+          </a:effectRef>
+          <a:fontRef idx="minor">
+            <a:schemeClr val="dk1"/>
+          </a:fontRef>
+        </p:style>
+        <p:txBody>
+          <a:bodyPr rtlCol="0" anchor="ctr"/>
+          <a:lstStyle/>
+          <a:p>
+            <a:pPr algn="ctr"/>
+            <a:r>
+              <a:rPr lang="en-SG" sz="1050" dirty="0" smtClean="0">
+                <a:solidFill>
+                  <a:srgbClr val="7030A0"/>
+                </a:solidFill>
+              </a:rPr>
+              <a:t>Name</a:t>
+            </a:r>
+            <a:endParaRPr lang="en-SG" sz="1050" dirty="0">
+              <a:solidFill>
+                <a:srgbClr val="7030A0"/>
+              </a:solidFill>
+            </a:endParaRPr>
+          </a:p>
+        </p:txBody>
+      </p:sp>
+      <p:sp>
+        <p:nvSpPr>
+          <p:cNvPr id="160" name="Flowchart: Decision 96"/>
+          <p:cNvSpPr/>
+          <p:nvPr/>
+        </p:nvSpPr>
+        <p:spPr>
+          <a:xfrm>
+            <a:off x="6887281" y="995274"/>
+            <a:ext cx="236048" cy="173380"/>
+          </a:xfrm>
+          <a:prstGeom prst="flowChartDecision">
+            <a:avLst/>
+          </a:prstGeom>
+          <a:solidFill>
+            <a:srgbClr val="7030A0"/>
+          </a:solidFill>
+          <a:ln w="19050">
+            <a:solidFill>
+              <a:srgbClr val="7030A0"/>
+            </a:solidFill>
+          </a:ln>
+          <a:effectLst/>
+        </p:spPr>
+        <p:style>
+          <a:lnRef idx="1">
+            <a:schemeClr val="accent6"/>
+          </a:lnRef>
+          <a:fillRef idx="2">
+            <a:schemeClr val="accent6"/>
+          </a:fillRef>
+          <a:effectRef idx="1">
+            <a:schemeClr val="accent6"/>
+          </a:effectRef>
+          <a:fontRef idx="minor">
+            <a:schemeClr val="dk1"/>
+          </a:fontRef>
+        </p:style>
+        <p:txBody>
+          <a:bodyPr rtlCol="0" anchor="ctr"/>
+          <a:lstStyle/>
+          <a:p>
+            <a:pPr algn="ctr"/>
+            <a:endParaRPr lang="en-US" sz="1050"/>
+          </a:p>
+        </p:txBody>
+      </p:sp>
+      <p:cxnSp>
+        <p:nvCxnSpPr>
+          <p:cNvPr id="161" name="Elbow Connector 160"/>
+          <p:cNvCxnSpPr>
+            <a:stCxn id="160" idx="3"/>
+            <a:endCxn id="159" idx="1"/>
+          </p:cNvCxnSpPr>
+          <p:nvPr/>
+        </p:nvCxnSpPr>
+        <p:spPr>
+          <a:xfrm flipV="1">
+            <a:off x="7123329" y="787115"/>
+            <a:ext cx="398084" cy="294849"/>
+          </a:xfrm>
+          <a:prstGeom prst="bentConnector3">
+            <a:avLst/>
+          </a:prstGeom>
+          <a:ln w="19050">
+            <a:solidFill>
+              <a:srgbClr val="7030A0"/>
+            </a:solidFill>
+            <a:headEnd type="none" w="med" len="med"/>
+            <a:tailEnd type="arrow" w="med" len="med"/>
+          </a:ln>
+          <a:effectLst/>
+        </p:spPr>
+        <p:style>
+          <a:lnRef idx="1">
+            <a:schemeClr val="accent2"/>
+          </a:lnRef>
+          <a:fillRef idx="2">
+            <a:schemeClr val="accent2"/>
+          </a:fillRef>
+          <a:effectRef idx="1">
+            <a:schemeClr val="accent2"/>
+          </a:effectRef>
+          <a:fontRef idx="minor">
+            <a:schemeClr val="dk1"/>
+          </a:fontRef>
+        </p:style>
+      </p:cxnSp>
+      <p:sp>
+        <p:nvSpPr>
+          <p:cNvPr id="162" name="Rectangle 8"/>
+          <p:cNvSpPr/>
+          <p:nvPr/>
+        </p:nvSpPr>
+        <p:spPr>
+          <a:xfrm>
+            <a:off x="7521413" y="974845"/>
+            <a:ext cx="898205" cy="285783"/>
+          </a:xfrm>
+          <a:prstGeom prst="rect">
+            <a:avLst/>
+          </a:prstGeom>
+          <a:ln w="19050">
+            <a:solidFill>
+              <a:srgbClr val="7030A0"/>
+            </a:solidFill>
+          </a:ln>
+          <a:effectLst/>
+        </p:spPr>
+        <p:style>
+          <a:lnRef idx="1">
+            <a:schemeClr val="accent4"/>
+          </a:lnRef>
+          <a:fillRef idx="2">
+            <a:schemeClr val="accent4"/>
+          </a:fillRef>
+          <a:effectRef idx="1">
+            <a:schemeClr val="accent4"/>
+          </a:effectRef>
+          <a:fontRef idx="minor">
+            <a:schemeClr val="dk1"/>
+          </a:fontRef>
+        </p:style>
+        <p:txBody>
+          <a:bodyPr rtlCol="0" anchor="ctr"/>
+          <a:lstStyle/>
+          <a:p>
+            <a:pPr algn="ctr"/>
+            <a:r>
+              <a:rPr lang="en-US" sz="1050" dirty="0" err="1" smtClean="0">
+                <a:solidFill>
+                  <a:srgbClr val="7030A0"/>
+                </a:solidFill>
+              </a:rPr>
+              <a:t>isCompleted</a:t>
+            </a:r>
+            <a:endParaRPr lang="en-SG" sz="1050" dirty="0">
+              <a:solidFill>
+                <a:srgbClr val="7030A0"/>
+              </a:solidFill>
+            </a:endParaRPr>
+          </a:p>
+        </p:txBody>
+      </p:sp>
+      <p:cxnSp>
+        <p:nvCxnSpPr>
+          <p:cNvPr id="163" name="Elbow Connector 162"/>
+          <p:cNvCxnSpPr>
+            <a:stCxn id="160" idx="3"/>
+            <a:endCxn id="162" idx="1"/>
+          </p:cNvCxnSpPr>
+          <p:nvPr/>
+        </p:nvCxnSpPr>
+        <p:spPr>
+          <a:xfrm>
+            <a:off x="7123329" y="1081964"/>
+            <a:ext cx="398084" cy="35773"/>
+          </a:xfrm>
+          <a:prstGeom prst="bentConnector3">
+            <a:avLst/>
+          </a:prstGeom>
+          <a:ln w="19050">
+            <a:solidFill>
+              <a:srgbClr val="7030A0"/>
+            </a:solidFill>
+            <a:headEnd type="none" w="med" len="med"/>
+            <a:tailEnd type="arrow" w="med" len="med"/>
+          </a:ln>
+          <a:effectLst/>
+        </p:spPr>
+        <p:style>
+          <a:lnRef idx="1">
+            <a:schemeClr val="accent2"/>
+          </a:lnRef>
+          <a:fillRef idx="2">
+            <a:schemeClr val="accent2"/>
+          </a:fillRef>
+          <a:effectRef idx="1">
+            <a:schemeClr val="accent2"/>
+          </a:effectRef>
+          <a:fontRef idx="minor">
+            <a:schemeClr val="dk1"/>
+          </a:fontRef>
+        </p:style>
+      </p:cxnSp>
+      <p:sp>
+        <p:nvSpPr>
+          <p:cNvPr id="178" name="Flowchart: Decision 96"/>
+          <p:cNvSpPr/>
+          <p:nvPr/>
+        </p:nvSpPr>
+        <p:spPr>
+          <a:xfrm rot="16200000">
+            <a:off x="4566409" y="2105291"/>
+            <a:ext cx="236048" cy="173380"/>
+          </a:xfrm>
+          <a:prstGeom prst="flowChartDecision">
+            <a:avLst/>
+          </a:prstGeom>
+          <a:noFill/>
+          <a:ln w="19050">
+            <a:solidFill>
+              <a:srgbClr val="7030A0"/>
+            </a:solidFill>
+          </a:ln>
+          <a:effectLst/>
+        </p:spPr>
+        <p:style>
+          <a:lnRef idx="1">
+            <a:schemeClr val="accent6"/>
+          </a:lnRef>
+          <a:fillRef idx="2">
+            <a:schemeClr val="accent6"/>
+          </a:fillRef>
+          <a:effectRef idx="1">
+            <a:schemeClr val="accent6"/>
+          </a:effectRef>
+          <a:fontRef idx="minor">
+            <a:schemeClr val="dk1"/>
+          </a:fontRef>
+        </p:style>
+        <p:txBody>
+          <a:bodyPr rtlCol="0" anchor="ctr"/>
+          <a:lstStyle/>
+          <a:p>
+            <a:pPr algn="ctr"/>
+            <a:endParaRPr lang="en-US" sz="1050"/>
+          </a:p>
+        </p:txBody>
+      </p:sp>
+      <p:cxnSp>
+        <p:nvCxnSpPr>
+          <p:cNvPr id="179" name="Elbow Connector 178"/>
+          <p:cNvCxnSpPr>
+            <a:stCxn id="178" idx="3"/>
+            <a:endCxn id="183" idx="2"/>
+          </p:cNvCxnSpPr>
+          <p:nvPr/>
+        </p:nvCxnSpPr>
+        <p:spPr>
+          <a:xfrm flipV="1">
+            <a:off x="4684433" y="1841497"/>
+            <a:ext cx="0" cy="232460"/>
+          </a:xfrm>
+          <a:prstGeom prst="straightConnector1">
+            <a:avLst/>
+          </a:prstGeom>
+          <a:ln w="19050">
+            <a:solidFill>
+              <a:srgbClr val="7030A0"/>
+            </a:solidFill>
+            <a:headEnd type="none" w="med" len="med"/>
+            <a:tailEnd type="arrow" w="med" len="med"/>
+          </a:ln>
+          <a:effectLst/>
+        </p:spPr>
+        <p:style>
+          <a:lnRef idx="1">
+            <a:schemeClr val="accent2"/>
+          </a:lnRef>
+          <a:fillRef idx="2">
+            <a:schemeClr val="accent2"/>
+          </a:fillRef>
+          <a:effectRef idx="1">
+            <a:schemeClr val="accent2"/>
+          </a:effectRef>
+          <a:fontRef idx="minor">
+            <a:schemeClr val="dk1"/>
+          </a:fontRef>
+        </p:style>
+      </p:cxnSp>
+      <p:sp>
+        <p:nvSpPr>
+          <p:cNvPr id="183" name="Rectangle 8"/>
+          <p:cNvSpPr/>
+          <p:nvPr/>
+        </p:nvSpPr>
+        <p:spPr>
+          <a:xfrm>
+            <a:off x="4330340" y="1494737"/>
+            <a:ext cx="708186" cy="346760"/>
+          </a:xfrm>
+          <a:prstGeom prst="rect">
+            <a:avLst/>
+          </a:prstGeom>
+          <a:ln w="19050">
+            <a:solidFill>
+              <a:srgbClr val="7030A0"/>
+            </a:solidFill>
+          </a:ln>
+          <a:effectLst/>
+        </p:spPr>
+        <p:style>
+          <a:lnRef idx="1">
+            <a:schemeClr val="accent4"/>
+          </a:lnRef>
+          <a:fillRef idx="2">
+            <a:schemeClr val="accent4"/>
+          </a:fillRef>
+          <a:effectRef idx="1">
+            <a:schemeClr val="accent4"/>
+          </a:effectRef>
+          <a:fontRef idx="minor">
+            <a:schemeClr val="dk1"/>
+          </a:fontRef>
+        </p:style>
+        <p:txBody>
+          <a:bodyPr rtlCol="0" anchor="ctr"/>
+          <a:lstStyle/>
+          <a:p>
+            <a:pPr algn="ctr"/>
+            <a:r>
+              <a:rPr lang="en-US" sz="1050" dirty="0" smtClean="0">
+                <a:solidFill>
+                  <a:srgbClr val="7030A0"/>
+                </a:solidFill>
+              </a:rPr>
+              <a:t>Tag</a:t>
+            </a:r>
+            <a:endParaRPr lang="en-SG" sz="1050" dirty="0">
+              <a:solidFill>
+                <a:srgbClr val="7030A0"/>
+              </a:solidFill>
+            </a:endParaRPr>
+          </a:p>
+        </p:txBody>
+      </p:sp>
+      <p:cxnSp>
+        <p:nvCxnSpPr>
+          <p:cNvPr id="192" name="Straight Arrow Connector 191"/>
+          <p:cNvCxnSpPr/>
+          <p:nvPr/>
+        </p:nvCxnSpPr>
+        <p:spPr>
+          <a:xfrm rot="10800000" flipV="1">
+            <a:off x="5038528" y="1273229"/>
+            <a:ext cx="1209872" cy="394885"/>
+          </a:xfrm>
+          <a:prstGeom prst="bentConnector3">
+            <a:avLst>
+              <a:gd name="adj1" fmla="val -779"/>
+            </a:avLst>
+          </a:prstGeom>
+          <a:ln w="19050">
+            <a:solidFill>
+              <a:srgbClr val="7030A0"/>
+            </a:solidFill>
+            <a:prstDash val="sysDot"/>
+            <a:headEnd type="none" w="med" len="med"/>
+            <a:tailEnd type="arrow" w="med" len="med"/>
+          </a:ln>
+          <a:effectLst/>
+        </p:spPr>
+        <p:style>
+          <a:lnRef idx="1">
+            <a:schemeClr val="accent2"/>
+          </a:lnRef>
+          <a:fillRef idx="2">
+            <a:schemeClr val="accent2"/>
+          </a:fillRef>
+          <a:effectRef idx="1">
+            <a:schemeClr val="accent2"/>
+          </a:effectRef>
+          <a:fontRef idx="minor">
+            <a:schemeClr val="dk1"/>
+          </a:fontRef>
+        </p:style>
+      </p:cxnSp>
+      <p:sp>
+        <p:nvSpPr>
+          <p:cNvPr id="215" name="Flowchart: Decision 96"/>
+          <p:cNvSpPr/>
+          <p:nvPr/>
+        </p:nvSpPr>
+        <p:spPr>
+          <a:xfrm>
+            <a:off x="5718869" y="995729"/>
+            <a:ext cx="236048" cy="173380"/>
+          </a:xfrm>
+          <a:prstGeom prst="flowChartDecision">
+            <a:avLst/>
+          </a:prstGeom>
+          <a:solidFill>
+            <a:srgbClr val="7030A0"/>
+          </a:solidFill>
+          <a:ln w="19050">
+            <a:solidFill>
+              <a:srgbClr val="7030A0"/>
+            </a:solidFill>
+          </a:ln>
+          <a:effectLst/>
+        </p:spPr>
+        <p:style>
+          <a:lnRef idx="1">
+            <a:schemeClr val="accent6"/>
+          </a:lnRef>
+          <a:fillRef idx="2">
+            <a:schemeClr val="accent6"/>
+          </a:fillRef>
+          <a:effectRef idx="1">
+            <a:schemeClr val="accent6"/>
+          </a:effectRef>
+          <a:fontRef idx="minor">
+            <a:schemeClr val="dk1"/>
+          </a:fontRef>
+        </p:style>
+        <p:txBody>
+          <a:bodyPr rtlCol="0" anchor="ctr"/>
+          <a:lstStyle/>
+          <a:p>
+            <a:pPr algn="ctr"/>
+            <a:endParaRPr lang="en-US" sz="1050"/>
+          </a:p>
+        </p:txBody>
+      </p:sp>
+      <p:sp>
+        <p:nvSpPr>
+          <p:cNvPr id="216" name="Rectangle 8"/>
+          <p:cNvSpPr/>
+          <p:nvPr/>
+        </p:nvSpPr>
+        <p:spPr>
+          <a:xfrm>
+            <a:off x="4396505" y="1081964"/>
+            <a:ext cx="785096" cy="214858"/>
+          </a:xfrm>
+          <a:prstGeom prst="rect">
+            <a:avLst/>
+          </a:prstGeom>
+          <a:ln w="19050">
+            <a:solidFill>
+              <a:srgbClr val="7030A0"/>
+            </a:solidFill>
+          </a:ln>
+          <a:effectLst/>
+        </p:spPr>
+        <p:style>
+          <a:lnRef idx="1">
+            <a:schemeClr val="accent4"/>
+          </a:lnRef>
+          <a:fillRef idx="2">
+            <a:schemeClr val="accent4"/>
+          </a:fillRef>
+          <a:effectRef idx="1">
+            <a:schemeClr val="accent4"/>
+          </a:effectRef>
+          <a:fontRef idx="minor">
+            <a:schemeClr val="dk1"/>
+          </a:fontRef>
+        </p:style>
+        <p:txBody>
+          <a:bodyPr rtlCol="0" anchor="ctr"/>
+          <a:lstStyle/>
+          <a:p>
+            <a:pPr algn="ctr"/>
+            <a:r>
+              <a:rPr lang="en-US" sz="1000" dirty="0" err="1" smtClean="0">
+                <a:solidFill>
+                  <a:srgbClr val="7030A0"/>
+                </a:solidFill>
+              </a:rPr>
+              <a:t>DateTime</a:t>
+            </a:r>
+            <a:endParaRPr lang="en-SG" sz="1000" dirty="0">
+              <a:solidFill>
+                <a:srgbClr val="7030A0"/>
+              </a:solidFill>
+            </a:endParaRPr>
+          </a:p>
+        </p:txBody>
+      </p:sp>
+      <p:sp>
+        <p:nvSpPr>
+          <p:cNvPr id="217" name="Rectangle 8"/>
+          <p:cNvSpPr/>
+          <p:nvPr/>
+        </p:nvSpPr>
+        <p:spPr>
+          <a:xfrm>
+            <a:off x="7180743" y="4421355"/>
+            <a:ext cx="785096" cy="214858"/>
+          </a:xfrm>
+          <a:prstGeom prst="rect">
+            <a:avLst/>
+          </a:prstGeom>
+          <a:ln w="19050">
+            <a:solidFill>
+              <a:srgbClr val="7030A0"/>
+            </a:solidFill>
+          </a:ln>
+          <a:effectLst/>
+        </p:spPr>
+        <p:style>
+          <a:lnRef idx="1">
+            <a:schemeClr val="accent4"/>
+          </a:lnRef>
+          <a:fillRef idx="2">
+            <a:schemeClr val="accent4"/>
+          </a:fillRef>
+          <a:effectRef idx="1">
+            <a:schemeClr val="accent4"/>
+          </a:effectRef>
+          <a:fontRef idx="minor">
+            <a:schemeClr val="dk1"/>
+          </a:fontRef>
+        </p:style>
+        <p:txBody>
+          <a:bodyPr rtlCol="0" anchor="ctr"/>
+          <a:lstStyle/>
+          <a:p>
+            <a:pPr algn="ctr"/>
+            <a:r>
+              <a:rPr lang="en-US" sz="1000" dirty="0" err="1" smtClean="0">
+                <a:solidFill>
+                  <a:srgbClr val="7030A0"/>
+                </a:solidFill>
+              </a:rPr>
+              <a:t>DateTime</a:t>
+            </a:r>
+            <a:endParaRPr lang="en-SG" sz="1000" dirty="0">
+              <a:solidFill>
+                <a:srgbClr val="7030A0"/>
+              </a:solidFill>
+            </a:endParaRPr>
+          </a:p>
+        </p:txBody>
+      </p:sp>
+      <p:cxnSp>
+        <p:nvCxnSpPr>
+          <p:cNvPr id="225" name="Elbow Connector 224"/>
+          <p:cNvCxnSpPr>
+            <a:stCxn id="215" idx="1"/>
+            <a:endCxn id="216" idx="3"/>
+          </p:cNvCxnSpPr>
+          <p:nvPr/>
+        </p:nvCxnSpPr>
+        <p:spPr>
+          <a:xfrm rot="10800000" flipV="1">
+            <a:off x="5181601" y="1082419"/>
+            <a:ext cx="537268" cy="106974"/>
+          </a:xfrm>
+          <a:prstGeom prst="bentConnector3">
+            <a:avLst/>
+          </a:prstGeom>
+          <a:ln w="19050">
+            <a:solidFill>
+              <a:srgbClr val="7030A0"/>
+            </a:solidFill>
+            <a:headEnd type="none" w="med" len="med"/>
+            <a:tailEnd type="arrow" w="med" len="med"/>
+          </a:ln>
+          <a:effectLst/>
+        </p:spPr>
+        <p:style>
+          <a:lnRef idx="1">
+            <a:schemeClr val="accent2"/>
+          </a:lnRef>
+          <a:fillRef idx="2">
+            <a:schemeClr val="accent2"/>
+          </a:fillRef>
+          <a:effectRef idx="1">
+            <a:schemeClr val="accent2"/>
+          </a:effectRef>
+          <a:fontRef idx="minor">
+            <a:schemeClr val="dk1"/>
+          </a:fontRef>
+        </p:style>
+      </p:cxnSp>
+      <p:cxnSp>
+        <p:nvCxnSpPr>
+          <p:cNvPr id="228" name="Elbow Connector 227"/>
+          <p:cNvCxnSpPr>
+            <a:stCxn id="215" idx="1"/>
+            <a:endCxn id="231" idx="3"/>
+          </p:cNvCxnSpPr>
+          <p:nvPr/>
+        </p:nvCxnSpPr>
+        <p:spPr>
+          <a:xfrm rot="10800000">
+            <a:off x="5181601" y="743649"/>
+            <a:ext cx="537268" cy="338770"/>
+          </a:xfrm>
+          <a:prstGeom prst="bentConnector3">
+            <a:avLst/>
+          </a:prstGeom>
+          <a:ln w="19050">
+            <a:solidFill>
+              <a:srgbClr val="7030A0"/>
+            </a:solidFill>
+            <a:headEnd type="none" w="med" len="med"/>
+            <a:tailEnd type="arrow" w="med" len="med"/>
+          </a:ln>
+          <a:effectLst/>
+        </p:spPr>
+        <p:style>
+          <a:lnRef idx="1">
+            <a:schemeClr val="accent2"/>
+          </a:lnRef>
+          <a:fillRef idx="2">
+            <a:schemeClr val="accent2"/>
+          </a:fillRef>
+          <a:effectRef idx="1">
+            <a:schemeClr val="accent2"/>
+          </a:effectRef>
+          <a:fontRef idx="minor">
+            <a:schemeClr val="dk1"/>
+          </a:fontRef>
+        </p:style>
+      </p:cxnSp>
+      <p:sp>
+        <p:nvSpPr>
+          <p:cNvPr id="231" name="Rectangle 8"/>
+          <p:cNvSpPr/>
+          <p:nvPr/>
+        </p:nvSpPr>
+        <p:spPr>
+          <a:xfrm>
+            <a:off x="4396505" y="636220"/>
+            <a:ext cx="785096" cy="214858"/>
+          </a:xfrm>
+          <a:prstGeom prst="rect">
+            <a:avLst/>
+          </a:prstGeom>
+          <a:ln w="19050">
+            <a:solidFill>
+              <a:srgbClr val="7030A0"/>
+            </a:solidFill>
+          </a:ln>
+          <a:effectLst/>
+        </p:spPr>
+        <p:style>
+          <a:lnRef idx="1">
+            <a:schemeClr val="accent4"/>
+          </a:lnRef>
+          <a:fillRef idx="2">
+            <a:schemeClr val="accent4"/>
+          </a:fillRef>
+          <a:effectRef idx="1">
+            <a:schemeClr val="accent4"/>
+          </a:effectRef>
+          <a:fontRef idx="minor">
+            <a:schemeClr val="dk1"/>
+          </a:fontRef>
+        </p:style>
+        <p:txBody>
+          <a:bodyPr rtlCol="0" anchor="ctr"/>
+          <a:lstStyle/>
+          <a:p>
+            <a:pPr algn="ctr"/>
+            <a:r>
+              <a:rPr lang="en-US" sz="1000" dirty="0" err="1" smtClean="0">
+                <a:solidFill>
+                  <a:srgbClr val="7030A0"/>
+                </a:solidFill>
+              </a:rPr>
+              <a:t>DateTime</a:t>
+            </a:r>
+            <a:endParaRPr lang="en-SG" sz="1000" dirty="0">
+              <a:solidFill>
+                <a:srgbClr val="7030A0"/>
+              </a:solidFill>
+            </a:endParaRPr>
+          </a:p>
+        </p:txBody>
+      </p:sp>
+      <p:sp>
+        <p:nvSpPr>
+          <p:cNvPr id="233" name="Flowchart: Decision 96"/>
+          <p:cNvSpPr/>
+          <p:nvPr/>
+        </p:nvSpPr>
+        <p:spPr>
+          <a:xfrm>
+            <a:off x="4160457" y="644223"/>
+            <a:ext cx="236048" cy="173380"/>
+          </a:xfrm>
+          <a:prstGeom prst="flowChartDecision">
+            <a:avLst/>
+          </a:prstGeom>
+          <a:solidFill>
+            <a:srgbClr val="7030A0"/>
+          </a:solidFill>
+          <a:ln w="19050">
+            <a:solidFill>
+              <a:srgbClr val="7030A0"/>
+            </a:solidFill>
+          </a:ln>
+          <a:effectLst/>
+        </p:spPr>
+        <p:style>
+          <a:lnRef idx="1">
+            <a:schemeClr val="accent6"/>
+          </a:lnRef>
+          <a:fillRef idx="2">
+            <a:schemeClr val="accent6"/>
+          </a:fillRef>
+          <a:effectRef idx="1">
+            <a:schemeClr val="accent6"/>
+          </a:effectRef>
+          <a:fontRef idx="minor">
+            <a:schemeClr val="dk1"/>
+          </a:fontRef>
+        </p:style>
+        <p:txBody>
+          <a:bodyPr rtlCol="0" anchor="ctr"/>
+          <a:lstStyle/>
+          <a:p>
+            <a:pPr algn="ctr"/>
+            <a:endParaRPr lang="en-US" sz="1050"/>
+          </a:p>
+        </p:txBody>
+      </p:sp>
+      <p:sp>
+        <p:nvSpPr>
+          <p:cNvPr id="234" name="Flowchart: Decision 96"/>
+          <p:cNvSpPr/>
+          <p:nvPr/>
+        </p:nvSpPr>
+        <p:spPr>
+          <a:xfrm>
+            <a:off x="4160430" y="1117736"/>
+            <a:ext cx="236048" cy="173380"/>
+          </a:xfrm>
+          <a:prstGeom prst="flowChartDecision">
+            <a:avLst/>
+          </a:prstGeom>
+          <a:solidFill>
+            <a:srgbClr val="7030A0"/>
+          </a:solidFill>
+          <a:ln w="19050">
+            <a:solidFill>
+              <a:srgbClr val="7030A0"/>
+            </a:solidFill>
+          </a:ln>
+          <a:effectLst/>
+        </p:spPr>
+        <p:style>
+          <a:lnRef idx="1">
+            <a:schemeClr val="accent6"/>
+          </a:lnRef>
+          <a:fillRef idx="2">
+            <a:schemeClr val="accent6"/>
+          </a:fillRef>
+          <a:effectRef idx="1">
+            <a:schemeClr val="accent6"/>
+          </a:effectRef>
+          <a:fontRef idx="minor">
+            <a:schemeClr val="dk1"/>
+          </a:fontRef>
+        </p:style>
+        <p:txBody>
+          <a:bodyPr rtlCol="0" anchor="ctr"/>
+          <a:lstStyle/>
+          <a:p>
+            <a:pPr algn="ctr"/>
+            <a:endParaRPr lang="en-US" sz="1050"/>
+          </a:p>
+        </p:txBody>
+      </p:sp>
+      <p:cxnSp>
+        <p:nvCxnSpPr>
+          <p:cNvPr id="235" name="Elbow Connector 234"/>
+          <p:cNvCxnSpPr>
+            <a:stCxn id="233" idx="1"/>
+            <a:endCxn id="238" idx="3"/>
+          </p:cNvCxnSpPr>
+          <p:nvPr/>
+        </p:nvCxnSpPr>
+        <p:spPr>
+          <a:xfrm rot="10800000">
+            <a:off x="3724111" y="457201"/>
+            <a:ext cx="436346" cy="273712"/>
+          </a:xfrm>
+          <a:prstGeom prst="bentConnector3">
+            <a:avLst/>
+          </a:prstGeom>
+          <a:ln w="19050">
+            <a:solidFill>
+              <a:srgbClr val="7030A0"/>
+            </a:solidFill>
+            <a:headEnd type="none" w="med" len="med"/>
+            <a:tailEnd type="arrow" w="med" len="med"/>
+          </a:ln>
+          <a:effectLst/>
+        </p:spPr>
+        <p:style>
+          <a:lnRef idx="1">
+            <a:schemeClr val="accent2"/>
+          </a:lnRef>
+          <a:fillRef idx="2">
+            <a:schemeClr val="accent2"/>
+          </a:fillRef>
+          <a:effectRef idx="1">
+            <a:schemeClr val="accent2"/>
+          </a:effectRef>
+          <a:fontRef idx="minor">
+            <a:schemeClr val="dk1"/>
+          </a:fontRef>
+        </p:style>
+      </p:cxnSp>
+      <p:sp>
+        <p:nvSpPr>
+          <p:cNvPr id="238" name="Rectangle 8"/>
+          <p:cNvSpPr/>
+          <p:nvPr/>
+        </p:nvSpPr>
+        <p:spPr>
+          <a:xfrm>
+            <a:off x="3256695" y="358505"/>
+            <a:ext cx="467416" cy="197392"/>
+          </a:xfrm>
+          <a:prstGeom prst="rect">
+            <a:avLst/>
+          </a:prstGeom>
+          <a:ln w="19050">
+            <a:solidFill>
+              <a:srgbClr val="7030A0"/>
+            </a:solidFill>
+          </a:ln>
+          <a:effectLst/>
+        </p:spPr>
+        <p:style>
+          <a:lnRef idx="1">
+            <a:schemeClr val="accent4"/>
+          </a:lnRef>
+          <a:fillRef idx="2">
+            <a:schemeClr val="accent4"/>
+          </a:fillRef>
+          <a:effectRef idx="1">
+            <a:schemeClr val="accent4"/>
+          </a:effectRef>
+          <a:fontRef idx="minor">
+            <a:schemeClr val="dk1"/>
+          </a:fontRef>
+        </p:style>
+        <p:txBody>
+          <a:bodyPr rtlCol="0" anchor="ctr"/>
+          <a:lstStyle/>
+          <a:p>
+            <a:pPr algn="ctr"/>
+            <a:r>
+              <a:rPr lang="en-SG" sz="1050" dirty="0" smtClean="0">
+                <a:solidFill>
+                  <a:srgbClr val="7030A0"/>
+                </a:solidFill>
+              </a:rPr>
+              <a:t>Date</a:t>
+            </a:r>
+            <a:endParaRPr lang="en-SG" sz="1050" dirty="0">
+              <a:solidFill>
+                <a:srgbClr val="7030A0"/>
+              </a:solidFill>
+            </a:endParaRPr>
+          </a:p>
+        </p:txBody>
+      </p:sp>
+      <p:sp>
+        <p:nvSpPr>
+          <p:cNvPr id="240" name="Rectangle 8"/>
+          <p:cNvSpPr/>
+          <p:nvPr/>
+        </p:nvSpPr>
+        <p:spPr>
+          <a:xfrm>
+            <a:off x="3256695" y="594057"/>
+            <a:ext cx="467416" cy="197392"/>
+          </a:xfrm>
+          <a:prstGeom prst="rect">
+            <a:avLst/>
+          </a:prstGeom>
+          <a:ln w="19050">
+            <a:solidFill>
+              <a:srgbClr val="7030A0"/>
+            </a:solidFill>
+          </a:ln>
+          <a:effectLst/>
+        </p:spPr>
+        <p:style>
+          <a:lnRef idx="1">
+            <a:schemeClr val="accent4"/>
+          </a:lnRef>
+          <a:fillRef idx="2">
+            <a:schemeClr val="accent4"/>
+          </a:fillRef>
+          <a:effectRef idx="1">
+            <a:schemeClr val="accent4"/>
+          </a:effectRef>
+          <a:fontRef idx="minor">
+            <a:schemeClr val="dk1"/>
+          </a:fontRef>
+        </p:style>
+        <p:txBody>
+          <a:bodyPr rtlCol="0" anchor="ctr"/>
+          <a:lstStyle/>
+          <a:p>
+            <a:pPr algn="ctr"/>
+            <a:r>
+              <a:rPr lang="en-SG" sz="1050" dirty="0" smtClean="0">
+                <a:solidFill>
+                  <a:srgbClr val="7030A0"/>
+                </a:solidFill>
+              </a:rPr>
+              <a:t>Time</a:t>
+            </a:r>
+            <a:endParaRPr lang="en-SG" sz="1050" dirty="0">
+              <a:solidFill>
+                <a:srgbClr val="7030A0"/>
+              </a:solidFill>
+            </a:endParaRPr>
+          </a:p>
+        </p:txBody>
+      </p:sp>
+      <p:cxnSp>
+        <p:nvCxnSpPr>
+          <p:cNvPr id="241" name="Elbow Connector 240"/>
+          <p:cNvCxnSpPr>
+            <a:stCxn id="233" idx="1"/>
+            <a:endCxn id="240" idx="3"/>
+          </p:cNvCxnSpPr>
+          <p:nvPr/>
+        </p:nvCxnSpPr>
+        <p:spPr>
+          <a:xfrm rot="10800000">
+            <a:off x="3724111" y="692753"/>
+            <a:ext cx="436346" cy="38160"/>
+          </a:xfrm>
+          <a:prstGeom prst="bentConnector3">
+            <a:avLst/>
+          </a:prstGeom>
+          <a:ln w="19050">
+            <a:solidFill>
+              <a:srgbClr val="7030A0"/>
+            </a:solidFill>
+            <a:headEnd type="none" w="med" len="med"/>
+            <a:tailEnd type="arrow" w="med" len="med"/>
+          </a:ln>
+          <a:effectLst/>
+        </p:spPr>
+        <p:style>
+          <a:lnRef idx="1">
+            <a:schemeClr val="accent2"/>
+          </a:lnRef>
+          <a:fillRef idx="2">
+            <a:schemeClr val="accent2"/>
+          </a:fillRef>
+          <a:effectRef idx="1">
+            <a:schemeClr val="accent2"/>
+          </a:effectRef>
+          <a:fontRef idx="minor">
+            <a:schemeClr val="dk1"/>
+          </a:fontRef>
+        </p:style>
+      </p:cxnSp>
+      <p:cxnSp>
+        <p:nvCxnSpPr>
+          <p:cNvPr id="244" name="Elbow Connector 243"/>
+          <p:cNvCxnSpPr>
+            <a:stCxn id="234" idx="1"/>
+            <a:endCxn id="245" idx="3"/>
+          </p:cNvCxnSpPr>
+          <p:nvPr/>
+        </p:nvCxnSpPr>
+        <p:spPr>
+          <a:xfrm rot="10800000">
+            <a:off x="3724112" y="1014026"/>
+            <a:ext cx="436318" cy="190400"/>
+          </a:xfrm>
+          <a:prstGeom prst="bentConnector3">
+            <a:avLst/>
+          </a:prstGeom>
+          <a:ln w="19050">
+            <a:solidFill>
+              <a:srgbClr val="7030A0"/>
+            </a:solidFill>
+            <a:headEnd type="none" w="med" len="med"/>
+            <a:tailEnd type="arrow" w="med" len="med"/>
+          </a:ln>
+          <a:effectLst/>
+        </p:spPr>
+        <p:style>
+          <a:lnRef idx="1">
+            <a:schemeClr val="accent2"/>
+          </a:lnRef>
+          <a:fillRef idx="2">
+            <a:schemeClr val="accent2"/>
+          </a:fillRef>
+          <a:effectRef idx="1">
+            <a:schemeClr val="accent2"/>
+          </a:effectRef>
+          <a:fontRef idx="minor">
+            <a:schemeClr val="dk1"/>
+          </a:fontRef>
+        </p:style>
+      </p:cxnSp>
+      <p:sp>
+        <p:nvSpPr>
+          <p:cNvPr id="245" name="Rectangle 8"/>
+          <p:cNvSpPr/>
+          <p:nvPr/>
+        </p:nvSpPr>
+        <p:spPr>
+          <a:xfrm>
+            <a:off x="3256696" y="915330"/>
+            <a:ext cx="467416" cy="197392"/>
+          </a:xfrm>
+          <a:prstGeom prst="rect">
+            <a:avLst/>
+          </a:prstGeom>
+          <a:ln w="19050">
+            <a:solidFill>
+              <a:srgbClr val="7030A0"/>
+            </a:solidFill>
+          </a:ln>
+          <a:effectLst/>
+        </p:spPr>
+        <p:style>
+          <a:lnRef idx="1">
+            <a:schemeClr val="accent4"/>
+          </a:lnRef>
+          <a:fillRef idx="2">
+            <a:schemeClr val="accent4"/>
+          </a:fillRef>
+          <a:effectRef idx="1">
+            <a:schemeClr val="accent4"/>
+          </a:effectRef>
+          <a:fontRef idx="minor">
+            <a:schemeClr val="dk1"/>
+          </a:fontRef>
+        </p:style>
+        <p:txBody>
+          <a:bodyPr rtlCol="0" anchor="ctr"/>
+          <a:lstStyle/>
+          <a:p>
+            <a:pPr algn="ctr"/>
+            <a:r>
+              <a:rPr lang="en-SG" sz="1050" dirty="0" smtClean="0">
+                <a:solidFill>
+                  <a:srgbClr val="7030A0"/>
+                </a:solidFill>
+              </a:rPr>
+              <a:t>Date</a:t>
+            </a:r>
+            <a:endParaRPr lang="en-SG" sz="1050" dirty="0">
+              <a:solidFill>
+                <a:srgbClr val="7030A0"/>
+              </a:solidFill>
+            </a:endParaRPr>
+          </a:p>
+        </p:txBody>
+      </p:sp>
+      <p:sp>
+        <p:nvSpPr>
+          <p:cNvPr id="246" name="Rectangle 8"/>
+          <p:cNvSpPr/>
+          <p:nvPr/>
+        </p:nvSpPr>
+        <p:spPr>
+          <a:xfrm>
+            <a:off x="3256696" y="1150882"/>
+            <a:ext cx="467416" cy="197392"/>
+          </a:xfrm>
+          <a:prstGeom prst="rect">
+            <a:avLst/>
+          </a:prstGeom>
+          <a:ln w="19050">
+            <a:solidFill>
+              <a:srgbClr val="7030A0"/>
+            </a:solidFill>
+          </a:ln>
+          <a:effectLst/>
+        </p:spPr>
+        <p:style>
+          <a:lnRef idx="1">
+            <a:schemeClr val="accent4"/>
+          </a:lnRef>
+          <a:fillRef idx="2">
+            <a:schemeClr val="accent4"/>
+          </a:fillRef>
+          <a:effectRef idx="1">
+            <a:schemeClr val="accent4"/>
+          </a:effectRef>
+          <a:fontRef idx="minor">
+            <a:schemeClr val="dk1"/>
+          </a:fontRef>
+        </p:style>
+        <p:txBody>
+          <a:bodyPr rtlCol="0" anchor="ctr"/>
+          <a:lstStyle/>
+          <a:p>
+            <a:pPr algn="ctr"/>
+            <a:r>
+              <a:rPr lang="en-SG" sz="1050" dirty="0" smtClean="0">
+                <a:solidFill>
+                  <a:srgbClr val="7030A0"/>
+                </a:solidFill>
+              </a:rPr>
+              <a:t>Time</a:t>
+            </a:r>
+            <a:endParaRPr lang="en-SG" sz="1050" dirty="0">
+              <a:solidFill>
+                <a:srgbClr val="7030A0"/>
+              </a:solidFill>
+            </a:endParaRPr>
+          </a:p>
+        </p:txBody>
+      </p:sp>
+      <p:cxnSp>
+        <p:nvCxnSpPr>
+          <p:cNvPr id="247" name="Elbow Connector 246"/>
+          <p:cNvCxnSpPr>
+            <a:stCxn id="234" idx="1"/>
+            <a:endCxn id="246" idx="3"/>
+          </p:cNvCxnSpPr>
+          <p:nvPr/>
+        </p:nvCxnSpPr>
+        <p:spPr>
+          <a:xfrm rot="10800000" flipV="1">
+            <a:off x="3724112" y="1204426"/>
+            <a:ext cx="436318" cy="45152"/>
+          </a:xfrm>
+          <a:prstGeom prst="bentConnector3">
+            <a:avLst/>
+          </a:prstGeom>
+          <a:ln w="19050">
+            <a:solidFill>
+              <a:srgbClr val="7030A0"/>
+            </a:solidFill>
+            <a:headEnd type="none" w="med" len="med"/>
+            <a:tailEnd type="arrow" w="med" len="med"/>
+          </a:ln>
+          <a:effectLst/>
+        </p:spPr>
+        <p:style>
+          <a:lnRef idx="1">
+            <a:schemeClr val="accent2"/>
+          </a:lnRef>
+          <a:fillRef idx="2">
+            <a:schemeClr val="accent2"/>
+          </a:fillRef>
+          <a:effectRef idx="1">
+            <a:schemeClr val="accent2"/>
+          </a:effectRef>
+          <a:fontRef idx="minor">
+            <a:schemeClr val="dk1"/>
+          </a:fontRef>
+        </p:style>
+      </p:cxnSp>
+      <p:sp>
+        <p:nvSpPr>
+          <p:cNvPr id="253" name="Flowchart: Decision 96"/>
+          <p:cNvSpPr/>
+          <p:nvPr/>
+        </p:nvSpPr>
+        <p:spPr>
+          <a:xfrm>
+            <a:off x="6938168" y="4442094"/>
+            <a:ext cx="236048" cy="173380"/>
+          </a:xfrm>
+          <a:prstGeom prst="flowChartDecision">
+            <a:avLst/>
+          </a:prstGeom>
+          <a:solidFill>
+            <a:srgbClr val="7030A0"/>
+          </a:solidFill>
+          <a:ln w="19050">
+            <a:solidFill>
+              <a:srgbClr val="7030A0"/>
+            </a:solidFill>
+          </a:ln>
+          <a:effectLst/>
+        </p:spPr>
+        <p:style>
+          <a:lnRef idx="1">
+            <a:schemeClr val="accent6"/>
+          </a:lnRef>
+          <a:fillRef idx="2">
+            <a:schemeClr val="accent6"/>
+          </a:fillRef>
+          <a:effectRef idx="1">
+            <a:schemeClr val="accent6"/>
+          </a:effectRef>
+          <a:fontRef idx="minor">
+            <a:schemeClr val="dk1"/>
+          </a:fontRef>
+        </p:style>
+        <p:txBody>
+          <a:bodyPr rtlCol="0" anchor="ctr"/>
+          <a:lstStyle/>
+          <a:p>
+            <a:pPr algn="ctr"/>
+            <a:endParaRPr lang="en-US" sz="1050"/>
+          </a:p>
+        </p:txBody>
+      </p:sp>
     </p:spTree>
     <p:extLst>
       <p:ext uri="{BB962C8B-B14F-4D97-AF65-F5344CB8AC3E}">
@@ -15557,7 +17216,7 @@
                   <a:schemeClr val="bg1"/>
                 </a:solidFill>
               </a:rPr>
-              <a:t>AddressBookStorage</a:t>
+              <a:t>TaskBookStorage</a:t>
             </a:r>
             <a:endParaRPr lang="en-SG" sz="1050" dirty="0">
               <a:solidFill>
@@ -16130,7 +17789,7 @@
                   </a:schemeClr>
                 </a:solidFill>
               </a:rPr>
-              <a:t>XmlAddressBook</a:t>
+              <a:t>XmlTaskBook</a:t>
             </a:r>
             <a:r>
               <a:rPr lang="en-US" sz="1050" b="1" dirty="0" smtClean="0">
@@ -16603,7 +18262,17 @@
                   </a:schemeClr>
                 </a:solidFill>
               </a:rPr>
-              <a:t>AddressBook</a:t>
+              <a:t>Task</a:t>
+            </a:r>
+            <a:r>
+              <a:rPr lang="en-US" sz="1050" b="1" dirty="0" err="1" smtClean="0">
+                <a:solidFill>
+                  <a:schemeClr val="accent6">
+                    <a:lumMod val="75000"/>
+                  </a:schemeClr>
+                </a:solidFill>
+              </a:rPr>
+              <a:t>Book</a:t>
             </a:r>
             <a:endParaRPr lang="en-SG" sz="1050" b="1" dirty="0">
               <a:solidFill>
@@ -16756,7 +18425,7 @@
                   </a:schemeClr>
                 </a:solidFill>
               </a:rPr>
-              <a:t>XmlAdaptedPerson</a:t>
+              <a:t>XmlAdaptedTask</a:t>
             </a:r>
             <a:endParaRPr lang="en-SG" sz="1050" b="1" dirty="0">
               <a:solidFill>

</xml_diff>

<commit_message>
DG: architecture pic update
</commit_message>
<xml_diff>
--- a/docs/diagrams/Diagrams.pptx
+++ b/docs/diagrams/Diagrams.pptx
@@ -4262,101 +4262,6 @@
           </a:p>
         </p:txBody>
       </p:sp>
-      <p:sp>
-        <p:nvSpPr>
-          <p:cNvPr id="51" name="Cloud 50"/>
-          <p:cNvSpPr/>
-          <p:nvPr/>
-        </p:nvSpPr>
-        <p:spPr>
-          <a:xfrm>
-            <a:off x="2650069" y="1447800"/>
-            <a:ext cx="914400" cy="533400"/>
-          </a:xfrm>
-          <a:prstGeom prst="cloud">
-            <a:avLst/>
-          </a:prstGeom>
-          <a:solidFill>
-            <a:schemeClr val="bg1"/>
-          </a:solidFill>
-          <a:ln>
-            <a:solidFill>
-              <a:schemeClr val="tx1"/>
-            </a:solidFill>
-          </a:ln>
-        </p:spPr>
-        <p:style>
-          <a:lnRef idx="2">
-            <a:schemeClr val="accent1">
-              <a:shade val="50000"/>
-            </a:schemeClr>
-          </a:lnRef>
-          <a:fillRef idx="1">
-            <a:schemeClr val="accent1"/>
-          </a:fillRef>
-          <a:effectRef idx="0">
-            <a:schemeClr val="accent1"/>
-          </a:effectRef>
-          <a:fontRef idx="minor">
-            <a:schemeClr val="lt1"/>
-          </a:fontRef>
-        </p:style>
-        <p:txBody>
-          <a:bodyPr rtlCol="0" anchor="ctr"/>
-          <a:lstStyle/>
-          <a:p>
-            <a:pPr algn="ctr"/>
-            <a:r>
-              <a:rPr lang="en-US" sz="1400" dirty="0">
-                <a:solidFill>
-                  <a:schemeClr val="tx1"/>
-                </a:solidFill>
-              </a:rPr>
-              <a:t>Web</a:t>
-            </a:r>
-          </a:p>
-        </p:txBody>
-      </p:sp>
-      <p:cxnSp>
-        <p:nvCxnSpPr>
-          <p:cNvPr id="52" name="Elbow Connector 51"/>
-          <p:cNvCxnSpPr>
-            <a:stCxn id="2" idx="0"/>
-            <a:endCxn id="51" idx="2"/>
-          </p:cNvCxnSpPr>
-          <p:nvPr/>
-        </p:nvCxnSpPr>
-        <p:spPr>
-          <a:xfrm rot="5400000" flipH="1" flipV="1">
-            <a:off x="2222648" y="1760922"/>
-            <a:ext cx="476678" cy="383835"/>
-          </a:xfrm>
-          <a:prstGeom prst="bentConnector2">
-            <a:avLst/>
-          </a:prstGeom>
-          <a:ln w="28575">
-            <a:solidFill>
-              <a:srgbClr val="00B050"/>
-            </a:solidFill>
-            <a:prstDash val="sysDot"/>
-            <a:tailEnd type="arrow"/>
-          </a:ln>
-        </p:spPr>
-        <p:style>
-          <a:lnRef idx="1">
-            <a:schemeClr val="accent1"/>
-          </a:lnRef>
-          <a:fillRef idx="0">
-            <a:schemeClr val="accent1"/>
-          </a:fillRef>
-          <a:effectRef idx="0">
-            <a:schemeClr val="accent1"/>
-          </a:effectRef>
-          <a:fontRef idx="minor">
-            <a:schemeClr val="tx1"/>
-          </a:fontRef>
-        </p:style>
-      </p:cxnSp>
       <p:sp>
         <p:nvSpPr>
           <p:cNvPr id="23" name="Rectangle 62"/>

</xml_diff>

<commit_message>
[DevGuide] Update images for Developer Guide
</commit_message>
<xml_diff>
--- a/docs/diagrams/Diagrams.pptx
+++ b/docs/diagrams/Diagrams.pptx
@@ -5,7 +5,7 @@
     <p:sldMasterId id="2147483648" r:id="rId1"/>
   </p:sldMasterIdLst>
   <p:notesMasterIdLst>
-    <p:notesMasterId r:id="rId11"/>
+    <p:notesMasterId r:id="rId10"/>
   </p:notesMasterIdLst>
   <p:sldIdLst>
     <p:sldId id="256" r:id="rId2"/>
@@ -16,7 +16,6 @@
     <p:sldId id="267" r:id="rId7"/>
     <p:sldId id="263" r:id="rId8"/>
     <p:sldId id="264" r:id="rId9"/>
-    <p:sldId id="265" r:id="rId10"/>
   </p:sldIdLst>
   <p:sldSz cx="9144000" cy="6858000" type="screen4x3"/>
   <p:notesSz cx="6858000" cy="9144000"/>
@@ -115,6 +114,22 @@
       </a:defRPr>
     </a:lvl9pPr>
   </p:defaultTextStyle>
+  <p:extLst>
+    <p:ext uri="{EFAFB233-063F-42B5-8137-9DF3F51BA10A}">
+      <p15:sldGuideLst xmlns:p15="http://schemas.microsoft.com/office/powerpoint/2012/main">
+        <p15:guide id="1" orient="horz" pos="1488">
+          <p15:clr>
+            <a:srgbClr val="A4A3A4"/>
+          </p15:clr>
+        </p15:guide>
+        <p15:guide id="2" pos="2880">
+          <p15:clr>
+            <a:srgbClr val="A4A3A4"/>
+          </p15:clr>
+        </p15:guide>
+      </p15:sldGuideLst>
+    </p:ext>
+  </p:extLst>
 </p:presentation>
 </file>
 
@@ -200,7 +215,7 @@
           <a:p>
             <a:fld id="{F5CC4B3F-88C1-4FFA-B1B6-F41C21DC6924}" type="datetimeFigureOut">
               <a:rPr lang="en-US" smtClean="0"/>
-              <a:t>9/30/2016</a:t>
+              <a:t>10/18/16</a:t>
             </a:fld>
             <a:endParaRPr lang="en-US"/>
           </a:p>
@@ -649,7 +664,7 @@
           <a:p>
             <a:fld id="{78C97017-6FC3-485B-9764-EAC9E56C1D49}" type="datetimeFigureOut">
               <a:rPr lang="en-US" smtClean="0"/>
-              <a:t>9/30/2016</a:t>
+              <a:t>10/18/16</a:t>
             </a:fld>
             <a:endParaRPr lang="en-US"/>
           </a:p>
@@ -819,7 +834,7 @@
           <a:p>
             <a:fld id="{78C97017-6FC3-485B-9764-EAC9E56C1D49}" type="datetimeFigureOut">
               <a:rPr lang="en-US" smtClean="0"/>
-              <a:t>9/30/2016</a:t>
+              <a:t>10/18/16</a:t>
             </a:fld>
             <a:endParaRPr lang="en-US"/>
           </a:p>
@@ -999,7 +1014,7 @@
           <a:p>
             <a:fld id="{78C97017-6FC3-485B-9764-EAC9E56C1D49}" type="datetimeFigureOut">
               <a:rPr lang="en-US" smtClean="0"/>
-              <a:t>9/30/2016</a:t>
+              <a:t>10/18/16</a:t>
             </a:fld>
             <a:endParaRPr lang="en-US"/>
           </a:p>
@@ -1169,7 +1184,7 @@
           <a:p>
             <a:fld id="{78C97017-6FC3-485B-9764-EAC9E56C1D49}" type="datetimeFigureOut">
               <a:rPr lang="en-US" smtClean="0"/>
-              <a:t>9/30/2016</a:t>
+              <a:t>10/18/16</a:t>
             </a:fld>
             <a:endParaRPr lang="en-US"/>
           </a:p>
@@ -1415,7 +1430,7 @@
           <a:p>
             <a:fld id="{78C97017-6FC3-485B-9764-EAC9E56C1D49}" type="datetimeFigureOut">
               <a:rPr lang="en-US" smtClean="0"/>
-              <a:t>9/30/2016</a:t>
+              <a:t>10/18/16</a:t>
             </a:fld>
             <a:endParaRPr lang="en-US"/>
           </a:p>
@@ -1703,7 +1718,7 @@
           <a:p>
             <a:fld id="{78C97017-6FC3-485B-9764-EAC9E56C1D49}" type="datetimeFigureOut">
               <a:rPr lang="en-US" smtClean="0"/>
-              <a:t>9/30/2016</a:t>
+              <a:t>10/18/16</a:t>
             </a:fld>
             <a:endParaRPr lang="en-US"/>
           </a:p>
@@ -2125,7 +2140,7 @@
           <a:p>
             <a:fld id="{78C97017-6FC3-485B-9764-EAC9E56C1D49}" type="datetimeFigureOut">
               <a:rPr lang="en-US" smtClean="0"/>
-              <a:t>9/30/2016</a:t>
+              <a:t>10/18/16</a:t>
             </a:fld>
             <a:endParaRPr lang="en-US"/>
           </a:p>
@@ -2243,7 +2258,7 @@
           <a:p>
             <a:fld id="{78C97017-6FC3-485B-9764-EAC9E56C1D49}" type="datetimeFigureOut">
               <a:rPr lang="en-US" smtClean="0"/>
-              <a:t>9/30/2016</a:t>
+              <a:t>10/18/16</a:t>
             </a:fld>
             <a:endParaRPr lang="en-US"/>
           </a:p>
@@ -2338,7 +2353,7 @@
           <a:p>
             <a:fld id="{78C97017-6FC3-485B-9764-EAC9E56C1D49}" type="datetimeFigureOut">
               <a:rPr lang="en-US" smtClean="0"/>
-              <a:t>9/30/2016</a:t>
+              <a:t>10/18/16</a:t>
             </a:fld>
             <a:endParaRPr lang="en-US"/>
           </a:p>
@@ -2615,7 +2630,7 @@
           <a:p>
             <a:fld id="{78C97017-6FC3-485B-9764-EAC9E56C1D49}" type="datetimeFigureOut">
               <a:rPr lang="en-US" smtClean="0"/>
-              <a:t>9/30/2016</a:t>
+              <a:t>10/18/16</a:t>
             </a:fld>
             <a:endParaRPr lang="en-US"/>
           </a:p>
@@ -2868,7 +2883,7 @@
           <a:p>
             <a:fld id="{78C97017-6FC3-485B-9764-EAC9E56C1D49}" type="datetimeFigureOut">
               <a:rPr lang="en-US" smtClean="0"/>
-              <a:t>9/30/2016</a:t>
+              <a:t>10/18/16</a:t>
             </a:fld>
             <a:endParaRPr lang="en-US"/>
           </a:p>
@@ -2933,9 +2948,14 @@
 <p:sldMaster xmlns:a="http://schemas.openxmlformats.org/drawingml/2006/main" xmlns:r="http://schemas.openxmlformats.org/officeDocument/2006/relationships" xmlns:p="http://schemas.openxmlformats.org/presentationml/2006/main">
   <p:cSld>
     <p:bg>
-      <p:bgRef idx="1001">
-        <a:schemeClr val="bg1"/>
-      </p:bgRef>
+      <p:bgPr>
+        <a:solidFill>
+          <a:schemeClr val="bg1">
+            <a:alpha val="0"/>
+          </a:schemeClr>
+        </a:solidFill>
+        <a:effectLst/>
+      </p:bgPr>
     </p:bg>
     <p:spTree>
       <p:nvGrpSpPr>
@@ -3081,7 +3101,7 @@
           <a:p>
             <a:fld id="{78C97017-6FC3-485B-9764-EAC9E56C1D49}" type="datetimeFigureOut">
               <a:rPr lang="en-US" smtClean="0"/>
-              <a:t>9/30/2016</a:t>
+              <a:t>10/18/16</a:t>
             </a:fld>
             <a:endParaRPr lang="en-US"/>
           </a:p>
@@ -3472,12 +3492,8 @@
           <a:lstStyle/>
           <a:p>
             <a:r>
-              <a:rPr lang="en-US" dirty="0" err="1" smtClean="0"/>
-              <a:t>AddressBook</a:t>
-            </a:r>
-            <a:r>
               <a:rPr lang="en-US" dirty="0" smtClean="0"/>
-              <a:t> – Level 4</a:t>
+              <a:t>TUSK</a:t>
             </a:r>
             <a:endParaRPr lang="en-US" dirty="0"/>
           </a:p>
@@ -4262,101 +4278,6 @@
           </a:p>
         </p:txBody>
       </p:sp>
-      <p:sp>
-        <p:nvSpPr>
-          <p:cNvPr id="51" name="Cloud 50"/>
-          <p:cNvSpPr/>
-          <p:nvPr/>
-        </p:nvSpPr>
-        <p:spPr>
-          <a:xfrm>
-            <a:off x="2650069" y="1447800"/>
-            <a:ext cx="914400" cy="533400"/>
-          </a:xfrm>
-          <a:prstGeom prst="cloud">
-            <a:avLst/>
-          </a:prstGeom>
-          <a:solidFill>
-            <a:schemeClr val="bg1"/>
-          </a:solidFill>
-          <a:ln>
-            <a:solidFill>
-              <a:schemeClr val="tx1"/>
-            </a:solidFill>
-          </a:ln>
-        </p:spPr>
-        <p:style>
-          <a:lnRef idx="2">
-            <a:schemeClr val="accent1">
-              <a:shade val="50000"/>
-            </a:schemeClr>
-          </a:lnRef>
-          <a:fillRef idx="1">
-            <a:schemeClr val="accent1"/>
-          </a:fillRef>
-          <a:effectRef idx="0">
-            <a:schemeClr val="accent1"/>
-          </a:effectRef>
-          <a:fontRef idx="minor">
-            <a:schemeClr val="lt1"/>
-          </a:fontRef>
-        </p:style>
-        <p:txBody>
-          <a:bodyPr rtlCol="0" anchor="ctr"/>
-          <a:lstStyle/>
-          <a:p>
-            <a:pPr algn="ctr"/>
-            <a:r>
-              <a:rPr lang="en-US" sz="1400" dirty="0">
-                <a:solidFill>
-                  <a:schemeClr val="tx1"/>
-                </a:solidFill>
-              </a:rPr>
-              <a:t>Web</a:t>
-            </a:r>
-          </a:p>
-        </p:txBody>
-      </p:sp>
-      <p:cxnSp>
-        <p:nvCxnSpPr>
-          <p:cNvPr id="52" name="Elbow Connector 51"/>
-          <p:cNvCxnSpPr>
-            <a:stCxn id="2" idx="0"/>
-            <a:endCxn id="51" idx="2"/>
-          </p:cNvCxnSpPr>
-          <p:nvPr/>
-        </p:nvCxnSpPr>
-        <p:spPr>
-          <a:xfrm rot="5400000" flipH="1" flipV="1">
-            <a:off x="2222648" y="1760922"/>
-            <a:ext cx="476678" cy="383835"/>
-          </a:xfrm>
-          <a:prstGeom prst="bentConnector2">
-            <a:avLst/>
-          </a:prstGeom>
-          <a:ln w="28575">
-            <a:solidFill>
-              <a:srgbClr val="00B050"/>
-            </a:solidFill>
-            <a:prstDash val="sysDot"/>
-            <a:tailEnd type="arrow"/>
-          </a:ln>
-        </p:spPr>
-        <p:style>
-          <a:lnRef idx="1">
-            <a:schemeClr val="accent1"/>
-          </a:lnRef>
-          <a:fillRef idx="0">
-            <a:schemeClr val="accent1"/>
-          </a:fillRef>
-          <a:effectRef idx="0">
-            <a:schemeClr val="accent1"/>
-          </a:effectRef>
-          <a:fontRef idx="minor">
-            <a:schemeClr val="tx1"/>
-          </a:fontRef>
-        </p:style>
-      </p:cxnSp>
       <p:sp>
         <p:nvSpPr>
           <p:cNvPr id="23" name="Rectangle 62"/>
@@ -5753,7 +5674,7 @@
                   <a:srgbClr val="7030A0"/>
                 </a:solidFill>
               </a:rPr>
-              <a:t>deletePerson</a:t>
+              <a:t>deleteTask</a:t>
             </a:r>
             <a:r>
               <a:rPr lang="en-US" sz="1400" dirty="0" smtClean="0">
@@ -5761,7 +5682,15 @@
                   <a:srgbClr val="7030A0"/>
                 </a:solidFill>
               </a:rPr>
-              <a:t>(p)</a:t>
+              <a:t>(p</a:t>
+            </a:r>
+            <a:r>
+              <a:rPr lang="en-US" sz="1400" dirty="0" smtClean="0">
+                <a:solidFill>
+                  <a:srgbClr val="7030A0"/>
+                </a:solidFill>
+              </a:rPr>
+              <a:t>)</a:t>
             </a:r>
             <a:endParaRPr lang="en-US" sz="1400" dirty="0">
               <a:solidFill>
@@ -5811,7 +5740,7 @@
                   </a:schemeClr>
                 </a:solidFill>
               </a:rPr>
-              <a:t>AddressBookChangedEvent</a:t>
+              <a:t>TaskManagerChangedEvent</a:t>
             </a:r>
             <a:r>
               <a:rPr lang="en-US" sz="1400" dirty="0" smtClean="0">
@@ -6385,7 +6314,7 @@
                   </a:schemeClr>
                 </a:solidFill>
               </a:rPr>
-              <a:t>AddressBookChangedEvent</a:t>
+              <a:t>TaskManagerChangedEvent</a:t>
             </a:r>
             <a:r>
               <a:rPr lang="en-US" sz="1400" dirty="0" smtClean="0">
@@ -6757,7 +6686,27 @@
                   </a:schemeClr>
                 </a:solidFill>
               </a:rPr>
-              <a:t>handleAddresssBookChangedEvent</a:t>
+              <a:t>handle</a:t>
+            </a:r>
+            <a:r>
+              <a:rPr lang="en-US" sz="1400" dirty="0" err="1">
+                <a:solidFill>
+                  <a:schemeClr val="accent6">
+                    <a:lumMod val="75000"/>
+                  </a:schemeClr>
+                </a:solidFill>
+              </a:rPr>
+              <a:t>TaskManager</a:t>
+            </a:r>
+            <a:r>
+              <a:rPr lang="en-US" sz="1400" dirty="0" err="1" smtClean="0">
+                <a:solidFill>
+                  <a:schemeClr val="accent6">
+                    <a:lumMod val="75000"/>
+                  </a:schemeClr>
+                </a:solidFill>
+              </a:rPr>
+              <a:t>ChangedEvent</a:t>
             </a:r>
             <a:r>
               <a:rPr lang="en-US" sz="1400" dirty="0" smtClean="0">
@@ -7068,7 +7017,7 @@
                   <a:srgbClr val="00B050"/>
                 </a:solidFill>
               </a:rPr>
-              <a:t>handleAddresssBookChangedEvent</a:t>
+              <a:t>handleTaskManagerChangedEvent</a:t>
             </a:r>
             <a:r>
               <a:rPr lang="en-US" sz="1400" dirty="0" smtClean="0">
@@ -7547,7 +7496,7 @@
         <p:spPr>
           <a:xfrm>
             <a:off x="1217465" y="1447800"/>
-            <a:ext cx="4917083" cy="3962400"/>
+            <a:ext cx="5030935" cy="4876800"/>
           </a:xfrm>
           <a:prstGeom prst="roundRect">
             <a:avLst>
@@ -7975,13 +7924,13 @@
       </p:sp>
       <p:sp>
         <p:nvSpPr>
-          <p:cNvPr id="34" name="Rectangle 11"/>
+          <p:cNvPr id="35" name="Rectangle 11"/>
           <p:cNvSpPr/>
           <p:nvPr/>
         </p:nvSpPr>
         <p:spPr>
           <a:xfrm>
-            <a:off x="2592528" y="3649359"/>
+            <a:off x="2592527" y="4495800"/>
             <a:ext cx="1093635" cy="236841"/>
           </a:xfrm>
           <a:prstGeom prst="rect">
@@ -8021,7 +7970,7 @@
                   </a:schemeClr>
                 </a:solidFill>
               </a:rPr>
-              <a:t>BrowserPanel</a:t>
+              <a:t>StatusBarFooter</a:t>
             </a:r>
             <a:endParaRPr lang="en-SG" sz="1050" b="1" dirty="0">
               <a:solidFill>
@@ -8035,13 +7984,13 @@
       </p:sp>
       <p:sp>
         <p:nvSpPr>
-          <p:cNvPr id="35" name="Rectangle 11"/>
+          <p:cNvPr id="36" name="Rectangle 11"/>
           <p:cNvSpPr/>
           <p:nvPr/>
         </p:nvSpPr>
         <p:spPr>
           <a:xfrm>
-            <a:off x="2592527" y="4563759"/>
+            <a:off x="2592526" y="3837252"/>
             <a:ext cx="1093635" cy="236841"/>
           </a:xfrm>
           <a:prstGeom prst="rect">
@@ -8074,14 +8023,14 @@
           <a:p>
             <a:pPr algn="ctr"/>
             <a:r>
-              <a:rPr lang="en-US" sz="1050" b="1" dirty="0" err="1">
+              <a:rPr lang="en-US" sz="1050" b="1" dirty="0" err="1" smtClean="0">
                 <a:solidFill>
                   <a:schemeClr val="accent3">
                     <a:lumMod val="75000"/>
                   </a:schemeClr>
                 </a:solidFill>
               </a:rPr>
-              <a:t>StatusBarFooter</a:t>
+              <a:t>TaskListPanel</a:t>
             </a:r>
             <a:endParaRPr lang="en-SG" sz="1050" b="1" dirty="0">
               <a:solidFill>
@@ -8095,14 +8044,14 @@
       </p:sp>
       <p:sp>
         <p:nvSpPr>
-          <p:cNvPr id="36" name="Rectangle 11"/>
+          <p:cNvPr id="37" name="Rectangle 11"/>
           <p:cNvSpPr/>
           <p:nvPr/>
         </p:nvSpPr>
         <p:spPr>
           <a:xfrm>
-            <a:off x="2592526" y="3991960"/>
-            <a:ext cx="1093635" cy="236841"/>
+            <a:off x="3839323" y="4074093"/>
+            <a:ext cx="1040906" cy="236841"/>
           </a:xfrm>
           <a:prstGeom prst="rect">
             <a:avLst/>
@@ -8134,14 +8083,14 @@
           <a:p>
             <a:pPr algn="ctr"/>
             <a:r>
-              <a:rPr lang="en-US" sz="1050" b="1" dirty="0" err="1">
+              <a:rPr lang="en-US" sz="1050" b="1" dirty="0" err="1" smtClean="0">
                 <a:solidFill>
                   <a:schemeClr val="accent3">
                     <a:lumMod val="75000"/>
                   </a:schemeClr>
                 </a:solidFill>
               </a:rPr>
-              <a:t>PersonListPanel</a:t>
+              <a:t>TaskCard</a:t>
             </a:r>
             <a:endParaRPr lang="en-SG" sz="1050" b="1" dirty="0">
               <a:solidFill>
@@ -8155,14 +8104,14 @@
       </p:sp>
       <p:sp>
         <p:nvSpPr>
-          <p:cNvPr id="37" name="Rectangle 11"/>
+          <p:cNvPr id="38" name="Rectangle 11"/>
           <p:cNvSpPr/>
           <p:nvPr/>
         </p:nvSpPr>
         <p:spPr>
           <a:xfrm>
-            <a:off x="3839323" y="4228801"/>
-            <a:ext cx="1040906" cy="236841"/>
+            <a:off x="2593674" y="4966001"/>
+            <a:ext cx="1093635" cy="236841"/>
           </a:xfrm>
           <a:prstGeom prst="rect">
             <a:avLst/>
@@ -8201,7 +8150,7 @@
                   </a:schemeClr>
                 </a:solidFill>
               </a:rPr>
-              <a:t>PersonCard</a:t>
+              <a:t>HelpWindow</a:t>
             </a:r>
             <a:endParaRPr lang="en-SG" sz="1050" b="1" dirty="0">
               <a:solidFill>
@@ -8215,14 +8164,103 @@
       </p:sp>
       <p:sp>
         <p:nvSpPr>
-          <p:cNvPr id="38" name="Rectangle 11"/>
+          <p:cNvPr id="39" name="Flowchart: Decision 38"/>
           <p:cNvSpPr/>
           <p:nvPr/>
         </p:nvSpPr>
         <p:spPr>
           <a:xfrm>
-            <a:off x="2592528" y="4966000"/>
-            <a:ext cx="1093635" cy="236841"/>
+            <a:off x="2324548" y="2706452"/>
+            <a:ext cx="183156" cy="161573"/>
+          </a:xfrm>
+          <a:prstGeom prst="flowChartDecision">
+            <a:avLst/>
+          </a:prstGeom>
+          <a:solidFill>
+            <a:schemeClr val="accent3"/>
+          </a:solidFill>
+          <a:ln>
+            <a:solidFill>
+              <a:schemeClr val="accent3"/>
+            </a:solidFill>
+          </a:ln>
+        </p:spPr>
+        <p:style>
+          <a:lnRef idx="2">
+            <a:schemeClr val="accent1">
+              <a:shade val="50000"/>
+            </a:schemeClr>
+          </a:lnRef>
+          <a:fillRef idx="1">
+            <a:schemeClr val="accent1"/>
+          </a:fillRef>
+          <a:effectRef idx="0">
+            <a:schemeClr val="accent1"/>
+          </a:effectRef>
+          <a:fontRef idx="minor">
+            <a:schemeClr val="lt1"/>
+          </a:fontRef>
+        </p:style>
+        <p:txBody>
+          <a:bodyPr rtlCol="0" anchor="ctr"/>
+          <a:lstStyle/>
+          <a:p>
+            <a:pPr algn="ctr"/>
+            <a:endParaRPr lang="en-SG"/>
+          </a:p>
+        </p:txBody>
+      </p:sp>
+      <p:cxnSp>
+        <p:nvCxnSpPr>
+          <p:cNvPr id="40" name="Elbow Connector 63"/>
+          <p:cNvCxnSpPr>
+            <a:stCxn id="39" idx="2"/>
+            <a:endCxn id="3" idx="1"/>
+          </p:cNvCxnSpPr>
+          <p:nvPr/>
+        </p:nvCxnSpPr>
+        <p:spPr>
+          <a:xfrm rot="16200000" flipH="1">
+            <a:off x="2289549" y="2994602"/>
+            <a:ext cx="429556" cy="176402"/>
+          </a:xfrm>
+          <a:prstGeom prst="bentConnector2">
+            <a:avLst/>
+          </a:prstGeom>
+          <a:ln w="19050">
+            <a:solidFill>
+              <a:schemeClr val="accent3"/>
+            </a:solidFill>
+            <a:headEnd type="none" w="med" len="med"/>
+            <a:tailEnd type="arrow" w="med" len="med"/>
+          </a:ln>
+          <a:effectLst/>
+        </p:spPr>
+        <p:style>
+          <a:lnRef idx="1">
+            <a:schemeClr val="accent2"/>
+          </a:lnRef>
+          <a:fillRef idx="2">
+            <a:schemeClr val="accent2"/>
+          </a:fillRef>
+          <a:effectRef idx="1">
+            <a:schemeClr val="accent2"/>
+          </a:effectRef>
+          <a:fontRef idx="minor">
+            <a:schemeClr val="dk1"/>
+          </a:fontRef>
+        </p:style>
+      </p:cxnSp>
+      <p:sp>
+        <p:nvSpPr>
+          <p:cNvPr id="43" name="Rectangle 11"/>
+          <p:cNvSpPr/>
+          <p:nvPr/>
+        </p:nvSpPr>
+        <p:spPr>
+          <a:xfrm>
+            <a:off x="3759694" y="3416961"/>
+            <a:ext cx="1040906" cy="236841"/>
           </a:xfrm>
           <a:prstGeom prst="rect">
             <a:avLst/>
@@ -8261,7 +8299,7 @@
                   </a:schemeClr>
                 </a:solidFill>
               </a:rPr>
-              <a:t>HelpWindow</a:t>
+              <a:t>ResultsDisplay</a:t>
             </a:r>
             <a:endParaRPr lang="en-SG" sz="1050" b="1" dirty="0">
               <a:solidFill>
@@ -8273,290 +8311,16 @@
           </a:p>
         </p:txBody>
       </p:sp>
-      <p:sp>
-        <p:nvSpPr>
-          <p:cNvPr id="39" name="Flowchart: Decision 38"/>
-          <p:cNvSpPr/>
-          <p:nvPr/>
-        </p:nvSpPr>
-        <p:spPr>
-          <a:xfrm>
-            <a:off x="2324548" y="2706452"/>
-            <a:ext cx="183156" cy="161573"/>
-          </a:xfrm>
-          <a:prstGeom prst="flowChartDecision">
-            <a:avLst/>
-          </a:prstGeom>
-          <a:solidFill>
-            <a:schemeClr val="accent3"/>
-          </a:solidFill>
-          <a:ln>
-            <a:solidFill>
-              <a:schemeClr val="accent3"/>
-            </a:solidFill>
-          </a:ln>
-        </p:spPr>
-        <p:style>
-          <a:lnRef idx="2">
-            <a:schemeClr val="accent1">
-              <a:shade val="50000"/>
-            </a:schemeClr>
-          </a:lnRef>
-          <a:fillRef idx="1">
-            <a:schemeClr val="accent1"/>
-          </a:fillRef>
-          <a:effectRef idx="0">
-            <a:schemeClr val="accent1"/>
-          </a:effectRef>
-          <a:fontRef idx="minor">
-            <a:schemeClr val="lt1"/>
-          </a:fontRef>
-        </p:style>
-        <p:txBody>
-          <a:bodyPr rtlCol="0" anchor="ctr"/>
-          <a:lstStyle/>
-          <a:p>
-            <a:pPr algn="ctr"/>
-            <a:endParaRPr lang="en-SG"/>
-          </a:p>
-        </p:txBody>
-      </p:sp>
-      <p:cxnSp>
-        <p:nvCxnSpPr>
-          <p:cNvPr id="40" name="Elbow Connector 63"/>
-          <p:cNvCxnSpPr>
-            <a:stCxn id="39" idx="2"/>
-            <a:endCxn id="3" idx="1"/>
-          </p:cNvCxnSpPr>
-          <p:nvPr/>
-        </p:nvCxnSpPr>
-        <p:spPr>
-          <a:xfrm rot="16200000" flipH="1">
-            <a:off x="2289549" y="2994602"/>
-            <a:ext cx="429556" cy="176402"/>
-          </a:xfrm>
-          <a:prstGeom prst="bentConnector2">
-            <a:avLst/>
-          </a:prstGeom>
-          <a:ln w="19050">
-            <a:solidFill>
-              <a:schemeClr val="accent3"/>
-            </a:solidFill>
-            <a:headEnd type="none" w="med" len="med"/>
-            <a:tailEnd type="arrow" w="med" len="med"/>
-          </a:ln>
-          <a:effectLst/>
-        </p:spPr>
-        <p:style>
-          <a:lnRef idx="1">
-            <a:schemeClr val="accent2"/>
-          </a:lnRef>
-          <a:fillRef idx="2">
-            <a:schemeClr val="accent2"/>
-          </a:fillRef>
-          <a:effectRef idx="1">
-            <a:schemeClr val="accent2"/>
-          </a:effectRef>
-          <a:fontRef idx="minor">
-            <a:schemeClr val="dk1"/>
-          </a:fontRef>
-        </p:style>
-      </p:cxnSp>
-      <p:sp>
-        <p:nvSpPr>
-          <p:cNvPr id="43" name="Rectangle 11"/>
-          <p:cNvSpPr/>
-          <p:nvPr/>
-        </p:nvSpPr>
-        <p:spPr>
-          <a:xfrm>
-            <a:off x="3759694" y="3416961"/>
-            <a:ext cx="1040906" cy="236841"/>
-          </a:xfrm>
-          <a:prstGeom prst="rect">
-            <a:avLst/>
-          </a:prstGeom>
-          <a:ln w="19050">
-            <a:solidFill>
-              <a:schemeClr val="accent3"/>
-            </a:solidFill>
-          </a:ln>
-          <a:effectLst/>
-        </p:spPr>
-        <p:style>
-          <a:lnRef idx="1">
-            <a:schemeClr val="accent3"/>
-          </a:lnRef>
-          <a:fillRef idx="2">
-            <a:schemeClr val="accent3"/>
-          </a:fillRef>
-          <a:effectRef idx="1">
-            <a:schemeClr val="accent3"/>
-          </a:effectRef>
-          <a:fontRef idx="minor">
-            <a:schemeClr val="dk1"/>
-          </a:fontRef>
-        </p:style>
-        <p:txBody>
-          <a:bodyPr rtlCol="0" anchor="ctr"/>
-          <a:lstStyle/>
-          <a:p>
-            <a:pPr algn="ctr"/>
-            <a:r>
-              <a:rPr lang="en-US" sz="1050" b="1" dirty="0" err="1">
-                <a:solidFill>
-                  <a:schemeClr val="accent3">
-                    <a:lumMod val="75000"/>
-                  </a:schemeClr>
-                </a:solidFill>
-              </a:rPr>
-              <a:t>ResultsDisplay</a:t>
-            </a:r>
-            <a:endParaRPr lang="en-SG" sz="1050" b="1" dirty="0">
-              <a:solidFill>
-                <a:schemeClr val="accent3">
-                  <a:lumMod val="75000"/>
-                </a:schemeClr>
-              </a:solidFill>
-            </a:endParaRPr>
-          </a:p>
-        </p:txBody>
-      </p:sp>
-      <p:cxnSp>
-        <p:nvCxnSpPr>
-          <p:cNvPr id="44" name="Elbow Connector 63"/>
-          <p:cNvCxnSpPr>
-            <a:stCxn id="39" idx="2"/>
-            <a:endCxn id="34" idx="1"/>
-          </p:cNvCxnSpPr>
-          <p:nvPr/>
-        </p:nvCxnSpPr>
-        <p:spPr>
-          <a:xfrm rot="16200000" flipH="1">
-            <a:off x="2054450" y="3229701"/>
-            <a:ext cx="899755" cy="176402"/>
-          </a:xfrm>
-          <a:prstGeom prst="bentConnector2">
-            <a:avLst/>
-          </a:prstGeom>
-          <a:ln w="19050">
-            <a:solidFill>
-              <a:schemeClr val="accent3"/>
-            </a:solidFill>
-            <a:headEnd type="none" w="med" len="med"/>
-            <a:tailEnd type="arrow" w="med" len="med"/>
-          </a:ln>
-          <a:effectLst/>
-        </p:spPr>
-        <p:style>
-          <a:lnRef idx="1">
-            <a:schemeClr val="accent2"/>
-          </a:lnRef>
-          <a:fillRef idx="2">
-            <a:schemeClr val="accent2"/>
-          </a:fillRef>
-          <a:effectRef idx="1">
-            <a:schemeClr val="accent2"/>
-          </a:effectRef>
-          <a:fontRef idx="minor">
-            <a:schemeClr val="dk1"/>
-          </a:fontRef>
-        </p:style>
-      </p:cxnSp>
       <p:cxnSp>
         <p:nvCxnSpPr>
           <p:cNvPr id="47" name="Elbow Connector 63"/>
-          <p:cNvCxnSpPr>
-            <a:stCxn id="39" idx="2"/>
-            <a:endCxn id="36" idx="1"/>
-          </p:cNvCxnSpPr>
+          <p:cNvCxnSpPr/>
           <p:nvPr/>
         </p:nvCxnSpPr>
         <p:spPr>
           <a:xfrm rot="16200000" flipH="1">
-            <a:off x="1883148" y="3401003"/>
+            <a:off x="1883148" y="3253022"/>
             <a:ext cx="1242356" cy="176400"/>
-          </a:xfrm>
-          <a:prstGeom prst="bentConnector2">
-            <a:avLst/>
-          </a:prstGeom>
-          <a:ln w="19050">
-            <a:solidFill>
-              <a:schemeClr val="accent3"/>
-            </a:solidFill>
-            <a:headEnd type="none" w="med" len="med"/>
-            <a:tailEnd type="arrow" w="med" len="med"/>
-          </a:ln>
-          <a:effectLst/>
-        </p:spPr>
-        <p:style>
-          <a:lnRef idx="1">
-            <a:schemeClr val="accent2"/>
-          </a:lnRef>
-          <a:fillRef idx="2">
-            <a:schemeClr val="accent2"/>
-          </a:fillRef>
-          <a:effectRef idx="1">
-            <a:schemeClr val="accent2"/>
-          </a:effectRef>
-          <a:fontRef idx="minor">
-            <a:schemeClr val="dk1"/>
-          </a:fontRef>
-        </p:style>
-      </p:cxnSp>
-      <p:cxnSp>
-        <p:nvCxnSpPr>
-          <p:cNvPr id="50" name="Elbow Connector 63"/>
-          <p:cNvCxnSpPr>
-            <a:stCxn id="39" idx="2"/>
-            <a:endCxn id="35" idx="1"/>
-          </p:cNvCxnSpPr>
-          <p:nvPr/>
-        </p:nvCxnSpPr>
-        <p:spPr>
-          <a:xfrm rot="16200000" flipH="1">
-            <a:off x="1597249" y="3686901"/>
-            <a:ext cx="1814155" cy="176401"/>
-          </a:xfrm>
-          <a:prstGeom prst="bentConnector2">
-            <a:avLst/>
-          </a:prstGeom>
-          <a:ln w="19050">
-            <a:solidFill>
-              <a:schemeClr val="accent3"/>
-            </a:solidFill>
-            <a:headEnd type="none" w="med" len="med"/>
-            <a:tailEnd type="arrow" w="med" len="med"/>
-          </a:ln>
-          <a:effectLst/>
-        </p:spPr>
-        <p:style>
-          <a:lnRef idx="1">
-            <a:schemeClr val="accent2"/>
-          </a:lnRef>
-          <a:fillRef idx="2">
-            <a:schemeClr val="accent2"/>
-          </a:fillRef>
-          <a:effectRef idx="1">
-            <a:schemeClr val="accent2"/>
-          </a:effectRef>
-          <a:fontRef idx="minor">
-            <a:schemeClr val="dk1"/>
-          </a:fontRef>
-        </p:style>
-      </p:cxnSp>
-      <p:cxnSp>
-        <p:nvCxnSpPr>
-          <p:cNvPr id="53" name="Elbow Connector 63"/>
-          <p:cNvCxnSpPr>
-            <a:endCxn id="38" idx="1"/>
-          </p:cNvCxnSpPr>
-          <p:nvPr/>
-        </p:nvCxnSpPr>
-        <p:spPr>
-          <a:xfrm rot="16200000" flipH="1">
-            <a:off x="1184119" y="3676012"/>
-            <a:ext cx="2396440" cy="420377"/>
           </a:xfrm>
           <a:prstGeom prst="bentConnector2">
             <a:avLst/>
@@ -8716,49 +8480,8 @@
         </p:nvCxnSpPr>
         <p:spPr>
           <a:xfrm rot="5400000">
-            <a:off x="4174488" y="2991741"/>
-            <a:ext cx="2061222" cy="649740"/>
-          </a:xfrm>
-          <a:prstGeom prst="bentConnector2">
-            <a:avLst/>
-          </a:prstGeom>
-          <a:ln w="6350">
-            <a:solidFill>
-              <a:schemeClr val="accent3"/>
-            </a:solidFill>
-            <a:headEnd type="none" w="med" len="med"/>
-            <a:tailEnd type="none" w="med" len="med"/>
-          </a:ln>
-          <a:effectLst/>
-        </p:spPr>
-        <p:style>
-          <a:lnRef idx="1">
-            <a:schemeClr val="accent2"/>
-          </a:lnRef>
-          <a:fillRef idx="2">
-            <a:schemeClr val="accent2"/>
-          </a:fillRef>
-          <a:effectRef idx="1">
-            <a:schemeClr val="accent2"/>
-          </a:effectRef>
-          <a:fontRef idx="minor">
-            <a:schemeClr val="dk1"/>
-          </a:fontRef>
-        </p:style>
-      </p:cxnSp>
-      <p:cxnSp>
-        <p:nvCxnSpPr>
-          <p:cNvPr id="82" name="Elbow Connector 63"/>
-          <p:cNvCxnSpPr>
-            <a:stCxn id="16" idx="3"/>
-            <a:endCxn id="34" idx="3"/>
-          </p:cNvCxnSpPr>
-          <p:nvPr/>
-        </p:nvCxnSpPr>
-        <p:spPr>
-          <a:xfrm rot="5400000">
-            <a:off x="3867176" y="2104987"/>
-            <a:ext cx="1481780" cy="1843806"/>
+            <a:off x="4251842" y="2914387"/>
+            <a:ext cx="1906514" cy="649740"/>
           </a:xfrm>
           <a:prstGeom prst="bentConnector2">
             <a:avLst/>
@@ -8832,15 +8555,14 @@
         <p:nvCxnSpPr>
           <p:cNvPr id="91" name="Elbow Connector 63"/>
           <p:cNvCxnSpPr>
-            <a:stCxn id="16" idx="3"/>
             <a:endCxn id="35" idx="3"/>
           </p:cNvCxnSpPr>
           <p:nvPr/>
         </p:nvCxnSpPr>
         <p:spPr>
           <a:xfrm rot="5400000">
-            <a:off x="3409976" y="2562187"/>
-            <a:ext cx="2396180" cy="1843807"/>
+            <a:off x="3451282" y="2535532"/>
+            <a:ext cx="2313569" cy="1843808"/>
           </a:xfrm>
           <a:prstGeom prst="bentConnector2">
             <a:avLst/>
@@ -8873,14 +8595,13 @@
         <p:nvCxnSpPr>
           <p:cNvPr id="94" name="Elbow Connector 63"/>
           <p:cNvCxnSpPr>
-            <a:stCxn id="16" idx="3"/>
             <a:endCxn id="38" idx="3"/>
           </p:cNvCxnSpPr>
           <p:nvPr/>
         </p:nvCxnSpPr>
         <p:spPr>
           <a:xfrm rot="5400000">
-            <a:off x="3208856" y="2763307"/>
+            <a:off x="3210002" y="2763308"/>
             <a:ext cx="2798421" cy="1843806"/>
           </a:xfrm>
           <a:prstGeom prst="bentConnector2">
@@ -9097,8 +8818,8 @@
         </p:nvSpPr>
         <p:spPr>
           <a:xfrm rot="16200000">
-            <a:off x="6213739" y="4560376"/>
-            <a:ext cx="1371599" cy="328045"/>
+            <a:off x="5756538" y="5017575"/>
+            <a:ext cx="2286002" cy="328045"/>
           </a:xfrm>
           <a:prstGeom prst="roundRect">
             <a:avLst/>
@@ -9402,7 +9123,7 @@
         </p:nvCxnSpPr>
         <p:spPr>
           <a:xfrm rot="16200000" flipH="1">
-            <a:off x="3430123" y="3938021"/>
+            <a:off x="3430123" y="3783313"/>
             <a:ext cx="118421" cy="699979"/>
           </a:xfrm>
           <a:prstGeom prst="bentConnector2">
@@ -9443,8 +9164,8 @@
         </p:nvCxnSpPr>
         <p:spPr>
           <a:xfrm rot="5400000">
-            <a:off x="3695875" y="2276286"/>
-            <a:ext cx="1824381" cy="1843808"/>
+            <a:off x="3773229" y="2198932"/>
+            <a:ext cx="1669673" cy="1843808"/>
           </a:xfrm>
           <a:prstGeom prst="bentConnector2">
             <a:avLst/>
@@ -9669,7 +9390,7 @@
         </p:nvSpPr>
         <p:spPr>
           <a:xfrm flipV="1">
-            <a:off x="4114799" y="4472708"/>
+            <a:off x="4114799" y="4318000"/>
             <a:ext cx="2642195" cy="101600"/>
           </a:xfrm>
           <a:custGeom>
@@ -9743,6 +9464,528 @@
           </a:p>
         </p:txBody>
       </p:sp>
+      <p:sp>
+        <p:nvSpPr>
+          <p:cNvPr id="46" name="Rectangle 11"/>
+          <p:cNvSpPr/>
+          <p:nvPr/>
+        </p:nvSpPr>
+        <p:spPr>
+          <a:xfrm>
+            <a:off x="3810000" y="5631494"/>
+            <a:ext cx="1093635" cy="236841"/>
+          </a:xfrm>
+          <a:prstGeom prst="rect">
+            <a:avLst/>
+          </a:prstGeom>
+          <a:ln w="19050">
+            <a:solidFill>
+              <a:schemeClr val="accent3"/>
+            </a:solidFill>
+          </a:ln>
+          <a:effectLst/>
+        </p:spPr>
+        <p:style>
+          <a:lnRef idx="1">
+            <a:schemeClr val="accent3"/>
+          </a:lnRef>
+          <a:fillRef idx="2">
+            <a:schemeClr val="accent3"/>
+          </a:fillRef>
+          <a:effectRef idx="1">
+            <a:schemeClr val="accent3"/>
+          </a:effectRef>
+          <a:fontRef idx="minor">
+            <a:schemeClr val="dk1"/>
+          </a:fontRef>
+        </p:style>
+        <p:txBody>
+          <a:bodyPr rtlCol="0" anchor="ctr"/>
+          <a:lstStyle/>
+          <a:p>
+            <a:pPr algn="ctr"/>
+            <a:r>
+              <a:rPr lang="en-US" sz="1050" b="1" dirty="0" err="1" smtClean="0">
+                <a:solidFill>
+                  <a:schemeClr val="accent3">
+                    <a:lumMod val="75000"/>
+                  </a:schemeClr>
+                </a:solidFill>
+              </a:rPr>
+              <a:t>Alias</a:t>
+            </a:r>
+            <a:r>
+              <a:rPr lang="en-US" sz="1050" b="1" dirty="0" err="1" smtClean="0">
+                <a:solidFill>
+                  <a:schemeClr val="accent3">
+                    <a:lumMod val="75000"/>
+                  </a:schemeClr>
+                </a:solidFill>
+              </a:rPr>
+              <a:t>ListPanel</a:t>
+            </a:r>
+            <a:endParaRPr lang="en-SG" sz="1050" b="1" dirty="0">
+              <a:solidFill>
+                <a:schemeClr val="accent3">
+                  <a:lumMod val="75000"/>
+                </a:schemeClr>
+              </a:solidFill>
+            </a:endParaRPr>
+          </a:p>
+        </p:txBody>
+      </p:sp>
+      <p:sp>
+        <p:nvSpPr>
+          <p:cNvPr id="48" name="Rectangle 11"/>
+          <p:cNvSpPr/>
+          <p:nvPr/>
+        </p:nvSpPr>
+        <p:spPr>
+          <a:xfrm>
+            <a:off x="5056797" y="5859159"/>
+            <a:ext cx="1040906" cy="236841"/>
+          </a:xfrm>
+          <a:prstGeom prst="rect">
+            <a:avLst/>
+          </a:prstGeom>
+          <a:ln w="19050">
+            <a:solidFill>
+              <a:schemeClr val="accent3"/>
+            </a:solidFill>
+          </a:ln>
+          <a:effectLst/>
+        </p:spPr>
+        <p:style>
+          <a:lnRef idx="1">
+            <a:schemeClr val="accent3"/>
+          </a:lnRef>
+          <a:fillRef idx="2">
+            <a:schemeClr val="accent3"/>
+          </a:fillRef>
+          <a:effectRef idx="1">
+            <a:schemeClr val="accent3"/>
+          </a:effectRef>
+          <a:fontRef idx="minor">
+            <a:schemeClr val="dk1"/>
+          </a:fontRef>
+        </p:style>
+        <p:txBody>
+          <a:bodyPr rtlCol="0" anchor="ctr"/>
+          <a:lstStyle/>
+          <a:p>
+            <a:pPr algn="ctr"/>
+            <a:r>
+              <a:rPr lang="en-US" sz="1050" b="1" dirty="0" err="1" smtClean="0">
+                <a:solidFill>
+                  <a:schemeClr val="accent3">
+                    <a:lumMod val="75000"/>
+                  </a:schemeClr>
+                </a:solidFill>
+              </a:rPr>
+              <a:t>Alias</a:t>
+            </a:r>
+            <a:r>
+              <a:rPr lang="en-US" sz="1050" b="1" dirty="0" err="1" smtClean="0">
+                <a:solidFill>
+                  <a:schemeClr val="accent3">
+                    <a:lumMod val="75000"/>
+                  </a:schemeClr>
+                </a:solidFill>
+              </a:rPr>
+              <a:t>Card</a:t>
+            </a:r>
+            <a:endParaRPr lang="en-SG" sz="1050" b="1" dirty="0">
+              <a:solidFill>
+                <a:schemeClr val="accent3">
+                  <a:lumMod val="75000"/>
+                </a:schemeClr>
+              </a:solidFill>
+            </a:endParaRPr>
+          </a:p>
+        </p:txBody>
+      </p:sp>
+      <p:cxnSp>
+        <p:nvCxnSpPr>
+          <p:cNvPr id="51" name="Elbow Connector 50"/>
+          <p:cNvCxnSpPr/>
+          <p:nvPr/>
+        </p:nvCxnSpPr>
+        <p:spPr>
+          <a:xfrm rot="16200000" flipH="1">
+            <a:off x="4647597" y="5568380"/>
+            <a:ext cx="118421" cy="699979"/>
+          </a:xfrm>
+          <a:prstGeom prst="bentConnector2">
+            <a:avLst/>
+          </a:prstGeom>
+          <a:ln w="19050">
+            <a:solidFill>
+              <a:schemeClr val="accent3"/>
+            </a:solidFill>
+            <a:headEnd type="none" w="med" len="med"/>
+            <a:tailEnd type="arrow" w="med" len="med"/>
+          </a:ln>
+          <a:effectLst/>
+        </p:spPr>
+        <p:style>
+          <a:lnRef idx="1">
+            <a:schemeClr val="accent2"/>
+          </a:lnRef>
+          <a:fillRef idx="2">
+            <a:schemeClr val="accent2"/>
+          </a:fillRef>
+          <a:effectRef idx="1">
+            <a:schemeClr val="accent2"/>
+          </a:effectRef>
+          <a:fontRef idx="minor">
+            <a:schemeClr val="dk1"/>
+          </a:fontRef>
+        </p:style>
+      </p:cxnSp>
+      <p:sp>
+        <p:nvSpPr>
+          <p:cNvPr id="58" name="Rectangle 11"/>
+          <p:cNvSpPr/>
+          <p:nvPr/>
+        </p:nvSpPr>
+        <p:spPr>
+          <a:xfrm>
+            <a:off x="2582371" y="5360673"/>
+            <a:ext cx="1093635" cy="236841"/>
+          </a:xfrm>
+          <a:prstGeom prst="rect">
+            <a:avLst/>
+          </a:prstGeom>
+          <a:ln w="19050">
+            <a:solidFill>
+              <a:schemeClr val="accent3"/>
+            </a:solidFill>
+          </a:ln>
+          <a:effectLst/>
+        </p:spPr>
+        <p:style>
+          <a:lnRef idx="1">
+            <a:schemeClr val="accent3"/>
+          </a:lnRef>
+          <a:fillRef idx="2">
+            <a:schemeClr val="accent3"/>
+          </a:fillRef>
+          <a:effectRef idx="1">
+            <a:schemeClr val="accent3"/>
+          </a:effectRef>
+          <a:fontRef idx="minor">
+            <a:schemeClr val="dk1"/>
+          </a:fontRef>
+        </p:style>
+        <p:txBody>
+          <a:bodyPr rtlCol="0" anchor="ctr"/>
+          <a:lstStyle/>
+          <a:p>
+            <a:pPr algn="ctr"/>
+            <a:r>
+              <a:rPr lang="en-US" sz="1050" b="1" dirty="0" err="1" smtClean="0">
+                <a:solidFill>
+                  <a:schemeClr val="accent3">
+                    <a:lumMod val="75000"/>
+                  </a:schemeClr>
+                </a:solidFill>
+              </a:rPr>
+              <a:t>Alias</a:t>
+            </a:r>
+            <a:r>
+              <a:rPr lang="en-US" sz="1050" b="1" dirty="0" err="1" smtClean="0">
+                <a:solidFill>
+                  <a:schemeClr val="accent3">
+                    <a:lumMod val="75000"/>
+                  </a:schemeClr>
+                </a:solidFill>
+              </a:rPr>
+              <a:t>Window</a:t>
+            </a:r>
+            <a:endParaRPr lang="en-SG" sz="1050" b="1" dirty="0">
+              <a:solidFill>
+                <a:schemeClr val="accent3">
+                  <a:lumMod val="75000"/>
+                </a:schemeClr>
+              </a:solidFill>
+            </a:endParaRPr>
+          </a:p>
+        </p:txBody>
+      </p:sp>
+      <p:cxnSp>
+        <p:nvCxnSpPr>
+          <p:cNvPr id="59" name="Elbow Connector 58"/>
+          <p:cNvCxnSpPr/>
+          <p:nvPr/>
+        </p:nvCxnSpPr>
+        <p:spPr>
+          <a:xfrm rot="16200000" flipH="1">
+            <a:off x="3400800" y="5317353"/>
+            <a:ext cx="118421" cy="699979"/>
+          </a:xfrm>
+          <a:prstGeom prst="bentConnector2">
+            <a:avLst/>
+          </a:prstGeom>
+          <a:ln w="19050">
+            <a:solidFill>
+              <a:schemeClr val="accent3"/>
+            </a:solidFill>
+            <a:headEnd type="none" w="med" len="med"/>
+            <a:tailEnd type="arrow" w="med" len="med"/>
+          </a:ln>
+          <a:effectLst/>
+        </p:spPr>
+        <p:style>
+          <a:lnRef idx="1">
+            <a:schemeClr val="accent2"/>
+          </a:lnRef>
+          <a:fillRef idx="2">
+            <a:schemeClr val="accent2"/>
+          </a:fillRef>
+          <a:effectRef idx="1">
+            <a:schemeClr val="accent2"/>
+          </a:effectRef>
+          <a:fontRef idx="minor">
+            <a:schemeClr val="dk1"/>
+          </a:fontRef>
+        </p:style>
+      </p:cxnSp>
+      <p:cxnSp>
+        <p:nvCxnSpPr>
+          <p:cNvPr id="60" name="Elbow Connector 63"/>
+          <p:cNvCxnSpPr/>
+          <p:nvPr/>
+        </p:nvCxnSpPr>
+        <p:spPr>
+          <a:xfrm rot="5400000">
+            <a:off x="3208855" y="3157980"/>
+            <a:ext cx="2798421" cy="1843806"/>
+          </a:xfrm>
+          <a:prstGeom prst="bentConnector2">
+            <a:avLst/>
+          </a:prstGeom>
+          <a:ln w="6350">
+            <a:solidFill>
+              <a:schemeClr val="accent3"/>
+            </a:solidFill>
+            <a:headEnd type="none" w="med" len="med"/>
+            <a:tailEnd type="none" w="med" len="med"/>
+          </a:ln>
+          <a:effectLst/>
+        </p:spPr>
+        <p:style>
+          <a:lnRef idx="1">
+            <a:schemeClr val="accent2"/>
+          </a:lnRef>
+          <a:fillRef idx="2">
+            <a:schemeClr val="accent2"/>
+          </a:fillRef>
+          <a:effectRef idx="1">
+            <a:schemeClr val="accent2"/>
+          </a:effectRef>
+          <a:fontRef idx="minor">
+            <a:schemeClr val="dk1"/>
+          </a:fontRef>
+        </p:style>
+      </p:cxnSp>
+      <p:cxnSp>
+        <p:nvCxnSpPr>
+          <p:cNvPr id="64" name="Elbow Connector 63"/>
+          <p:cNvCxnSpPr/>
+          <p:nvPr/>
+        </p:nvCxnSpPr>
+        <p:spPr>
+          <a:xfrm rot="16200000" flipH="1">
+            <a:off x="1881422" y="3862622"/>
+            <a:ext cx="1242356" cy="176400"/>
+          </a:xfrm>
+          <a:prstGeom prst="bentConnector2">
+            <a:avLst/>
+          </a:prstGeom>
+          <a:ln w="19050">
+            <a:solidFill>
+              <a:schemeClr val="accent3"/>
+            </a:solidFill>
+            <a:headEnd type="none" w="med" len="med"/>
+            <a:tailEnd type="arrow" w="med" len="med"/>
+          </a:ln>
+          <a:effectLst/>
+        </p:spPr>
+        <p:style>
+          <a:lnRef idx="1">
+            <a:schemeClr val="accent2"/>
+          </a:lnRef>
+          <a:fillRef idx="2">
+            <a:schemeClr val="accent2"/>
+          </a:fillRef>
+          <a:effectRef idx="1">
+            <a:schemeClr val="accent2"/>
+          </a:effectRef>
+          <a:fontRef idx="minor">
+            <a:schemeClr val="dk1"/>
+          </a:fontRef>
+        </p:style>
+      </p:cxnSp>
+      <p:cxnSp>
+        <p:nvCxnSpPr>
+          <p:cNvPr id="71" name="Elbow Connector 63"/>
+          <p:cNvCxnSpPr>
+            <a:endCxn id="38" idx="1"/>
+          </p:cNvCxnSpPr>
+          <p:nvPr/>
+        </p:nvCxnSpPr>
+        <p:spPr>
+          <a:xfrm rot="16200000" flipH="1">
+            <a:off x="1187527" y="3678274"/>
+            <a:ext cx="2377969" cy="434326"/>
+          </a:xfrm>
+          <a:prstGeom prst="bentConnector2">
+            <a:avLst/>
+          </a:prstGeom>
+          <a:ln w="19050">
+            <a:solidFill>
+              <a:schemeClr val="accent3"/>
+            </a:solidFill>
+            <a:headEnd type="none" w="med" len="med"/>
+            <a:tailEnd type="arrow" w="med" len="med"/>
+          </a:ln>
+          <a:effectLst/>
+        </p:spPr>
+        <p:style>
+          <a:lnRef idx="1">
+            <a:schemeClr val="accent2"/>
+          </a:lnRef>
+          <a:fillRef idx="2">
+            <a:schemeClr val="accent2"/>
+          </a:fillRef>
+          <a:effectRef idx="1">
+            <a:schemeClr val="accent2"/>
+          </a:effectRef>
+          <a:fontRef idx="minor">
+            <a:schemeClr val="dk1"/>
+          </a:fontRef>
+        </p:style>
+      </p:cxnSp>
+      <p:cxnSp>
+        <p:nvCxnSpPr>
+          <p:cNvPr id="76" name="Elbow Connector 63"/>
+          <p:cNvCxnSpPr/>
+          <p:nvPr/>
+        </p:nvCxnSpPr>
+        <p:spPr>
+          <a:xfrm rot="16200000" flipH="1">
+            <a:off x="1184652" y="4080252"/>
+            <a:ext cx="2377969" cy="434326"/>
+          </a:xfrm>
+          <a:prstGeom prst="bentConnector2">
+            <a:avLst/>
+          </a:prstGeom>
+          <a:ln w="19050">
+            <a:solidFill>
+              <a:schemeClr val="accent3"/>
+            </a:solidFill>
+            <a:headEnd type="none" w="med" len="med"/>
+            <a:tailEnd type="arrow" w="med" len="med"/>
+          </a:ln>
+          <a:effectLst/>
+        </p:spPr>
+        <p:style>
+          <a:lnRef idx="1">
+            <a:schemeClr val="accent2"/>
+          </a:lnRef>
+          <a:fillRef idx="2">
+            <a:schemeClr val="accent2"/>
+          </a:fillRef>
+          <a:effectRef idx="1">
+            <a:schemeClr val="accent2"/>
+          </a:effectRef>
+          <a:fontRef idx="minor">
+            <a:schemeClr val="dk1"/>
+          </a:fontRef>
+        </p:style>
+      </p:cxnSp>
+      <p:sp>
+        <p:nvSpPr>
+          <p:cNvPr id="78" name="Freeform 77"/>
+          <p:cNvSpPr/>
+          <p:nvPr/>
+        </p:nvSpPr>
+        <p:spPr>
+          <a:xfrm flipV="1">
+            <a:off x="5331106" y="6104841"/>
+            <a:ext cx="1389799" cy="69454"/>
+          </a:xfrm>
+          <a:custGeom>
+            <a:avLst/>
+            <a:gdLst>
+              <a:gd name="connsiteX0" fmla="*/ 0 w 3048000"/>
+              <a:gd name="connsiteY0" fmla="*/ 203200 h 203200"/>
+              <a:gd name="connsiteX1" fmla="*/ 221673 w 3048000"/>
+              <a:gd name="connsiteY1" fmla="*/ 0 h 203200"/>
+              <a:gd name="connsiteX2" fmla="*/ 3048000 w 3048000"/>
+              <a:gd name="connsiteY2" fmla="*/ 0 h 203200"/>
+            </a:gdLst>
+            <a:ahLst/>
+            <a:cxnLst>
+              <a:cxn ang="0">
+                <a:pos x="connsiteX0" y="connsiteY0"/>
+              </a:cxn>
+              <a:cxn ang="0">
+                <a:pos x="connsiteX1" y="connsiteY1"/>
+              </a:cxn>
+              <a:cxn ang="0">
+                <a:pos x="connsiteX2" y="connsiteY2"/>
+              </a:cxn>
+            </a:cxnLst>
+            <a:rect l="l" t="t" r="r" b="b"/>
+            <a:pathLst>
+              <a:path w="3048000" h="203200">
+                <a:moveTo>
+                  <a:pt x="0" y="203200"/>
+                </a:moveTo>
+                <a:lnTo>
+                  <a:pt x="221673" y="0"/>
+                </a:lnTo>
+                <a:lnTo>
+                  <a:pt x="3048000" y="0"/>
+                </a:lnTo>
+              </a:path>
+            </a:pathLst>
+          </a:custGeom>
+          <a:noFill/>
+          <a:ln w="19050">
+            <a:solidFill>
+              <a:schemeClr val="accent3"/>
+            </a:solidFill>
+            <a:prstDash val="sysDot"/>
+            <a:headEnd type="none" w="med" len="med"/>
+            <a:tailEnd type="arrow" w="med" len="med"/>
+          </a:ln>
+          <a:effectLst/>
+        </p:spPr>
+        <p:style>
+          <a:lnRef idx="1">
+            <a:schemeClr val="accent2"/>
+          </a:lnRef>
+          <a:fillRef idx="2">
+            <a:schemeClr val="accent2"/>
+          </a:fillRef>
+          <a:effectRef idx="1">
+            <a:schemeClr val="accent2"/>
+          </a:effectRef>
+          <a:fontRef idx="minor">
+            <a:schemeClr val="dk1"/>
+          </a:fontRef>
+        </p:style>
+        <p:txBody>
+          <a:bodyPr rtlCol="0" anchor="ctr"/>
+          <a:lstStyle/>
+          <a:p>
+            <a:pPr algn="ctr"/>
+            <a:endParaRPr lang="en-SG"/>
+          </a:p>
+        </p:txBody>
+      </p:sp>
     </p:spTree>
     <p:extLst>
       <p:ext uri="{BB962C8B-B14F-4D97-AF65-F5344CB8AC3E}">
@@ -9789,7 +10032,7 @@
         <p:spPr>
           <a:xfrm>
             <a:off x="1103085" y="2057399"/>
-            <a:ext cx="6288315" cy="2272167"/>
+            <a:ext cx="6364515" cy="2272167"/>
           </a:xfrm>
           <a:prstGeom prst="roundRect">
             <a:avLst>
@@ -9908,8 +10151,8 @@
         </p:nvSpPr>
         <p:spPr>
           <a:xfrm flipH="1">
-            <a:off x="6180592" y="2648528"/>
-            <a:ext cx="1093635" cy="346760"/>
+            <a:off x="6180589" y="2648528"/>
+            <a:ext cx="1227590" cy="346760"/>
           </a:xfrm>
           <a:prstGeom prst="rect">
             <a:avLst/>
@@ -9941,12 +10184,12 @@
           <a:p>
             <a:pPr algn="ctr"/>
             <a:r>
-              <a:rPr lang="en-US" sz="1050" b="1" dirty="0" err="1">
+              <a:rPr lang="en-US" sz="1050" b="1" dirty="0" err="1" smtClean="0">
                 <a:solidFill>
                   <a:srgbClr val="0070C0"/>
                 </a:solidFill>
               </a:rPr>
-              <a:t>AddCommand</a:t>
+              <a:t>AddTaskCommand</a:t>
             </a:r>
             <a:endParaRPr lang="en-SG" sz="1050" b="1" dirty="0">
               <a:solidFill>
@@ -10217,8 +10460,8 @@
         </p:nvSpPr>
         <p:spPr>
           <a:xfrm flipH="1">
-            <a:off x="6180592" y="3054928"/>
-            <a:ext cx="1093635" cy="346760"/>
+            <a:off x="6180591" y="3054928"/>
+            <a:ext cx="1227588" cy="346760"/>
           </a:xfrm>
           <a:prstGeom prst="rect">
             <a:avLst/>
@@ -10250,12 +10493,12 @@
           <a:p>
             <a:pPr algn="ctr"/>
             <a:r>
-              <a:rPr lang="en-US" sz="1050" b="1" dirty="0" err="1">
+              <a:rPr lang="en-US" sz="1050" b="1" smtClean="0">
                 <a:solidFill>
                   <a:srgbClr val="0070C0"/>
                 </a:solidFill>
               </a:rPr>
-              <a:t>ListCommand</a:t>
+              <a:t>ListTaskCommand</a:t>
             </a:r>
             <a:endParaRPr lang="en-SG" sz="1050" b="1" dirty="0">
               <a:solidFill>
@@ -10403,8 +10646,8 @@
         </p:nvCxnSpPr>
         <p:spPr>
           <a:xfrm rot="10800000" flipV="1">
-            <a:off x="5786402" y="2821908"/>
-            <a:ext cx="394190" cy="1079066"/>
+            <a:off x="5786403" y="2821908"/>
+            <a:ext cx="394187" cy="1079066"/>
           </a:xfrm>
           <a:prstGeom prst="bentConnector3">
             <a:avLst>
@@ -10490,7 +10733,7 @@
         <p:spPr>
           <a:xfrm flipV="1">
             <a:off x="5786402" y="3228308"/>
-            <a:ext cx="394190" cy="672666"/>
+            <a:ext cx="394189" cy="672666"/>
           </a:xfrm>
           <a:prstGeom prst="bentConnector3">
             <a:avLst>
@@ -11418,12 +11661,20 @@
           <a:p>
             <a:pPr algn="ctr"/>
             <a:r>
+              <a:rPr lang="en-US" sz="1050" b="1" dirty="0" err="1" smtClean="0">
+                <a:solidFill>
+                  <a:srgbClr val="0070C0"/>
+                </a:solidFill>
+              </a:rPr>
+              <a:t>IncorrectTask</a:t>
+            </a:r>
+            <a:r>
               <a:rPr lang="en-US" sz="1050" b="1" dirty="0" smtClean="0">
                 <a:solidFill>
                   <a:srgbClr val="0070C0"/>
                 </a:solidFill>
               </a:rPr>
-              <a:t>Incorrect</a:t>
+              <a:t/>
             </a:r>
             <a:br>
               <a:rPr lang="en-US" sz="1050" b="1" dirty="0" smtClean="0">
@@ -12280,7 +12531,6 @@
               <a:rPr lang="en-US" dirty="0"/>
               <a:t>execute()</a:t>
             </a:r>
-            <a:endParaRPr lang="en-US" dirty="0"/>
           </a:p>
         </p:txBody>
       </p:sp>
@@ -12797,7 +13047,7 @@
                   <a:srgbClr val="7030A0"/>
                 </a:solidFill>
               </a:rPr>
-              <a:t>deletePerson</a:t>
+              <a:t>deleteTask</a:t>
             </a:r>
             <a:r>
               <a:rPr lang="en-US" dirty="0" smtClean="0">
@@ -12805,7 +13055,15 @@
                   <a:srgbClr val="7030A0"/>
                 </a:solidFill>
               </a:rPr>
-              <a:t>(p)</a:t>
+              <a:t>(p</a:t>
+            </a:r>
+            <a:r>
+              <a:rPr lang="en-US" dirty="0" smtClean="0">
+                <a:solidFill>
+                  <a:srgbClr val="7030A0"/>
+                </a:solidFill>
+              </a:rPr>
+              <a:t>)</a:t>
             </a:r>
             <a:endParaRPr lang="en-US" dirty="0">
               <a:solidFill>
@@ -13373,8 +13631,8 @@
         </p:nvSpPr>
         <p:spPr>
           <a:xfrm rot="16200000">
-            <a:off x="1683963" y="2868687"/>
-            <a:ext cx="1093635" cy="346760"/>
+            <a:off x="1606334" y="2822562"/>
+            <a:ext cx="1217389" cy="315255"/>
           </a:xfrm>
           <a:prstGeom prst="rect">
             <a:avLst/>
@@ -13409,12 +13667,12 @@
           <a:p>
             <a:pPr algn="ctr"/>
             <a:r>
-              <a:rPr lang="en-US" sz="1050" dirty="0" err="1" smtClean="0">
+              <a:rPr lang="en-SG" sz="1050" dirty="0" err="1" smtClean="0">
                 <a:solidFill>
                   <a:schemeClr val="bg1"/>
                 </a:solidFill>
               </a:rPr>
-              <a:t>ModelManager</a:t>
+              <a:t>TaskManager</a:t>
             </a:r>
             <a:endParaRPr lang="en-SG" sz="1050" dirty="0">
               <a:solidFill>
@@ -13476,13 +13734,12 @@
         </p:nvCxnSpPr>
         <p:spPr>
           <a:xfrm rot="5400000" flipH="1" flipV="1">
-            <a:off x="4360065" y="1080909"/>
-            <a:ext cx="378691" cy="4637261"/>
-          </a:xfrm>
-          <a:prstGeom prst="bentConnector4">
+            <a:off x="4410546" y="1026548"/>
+            <a:ext cx="366819" cy="4757854"/>
+          </a:xfrm>
+          <a:prstGeom prst="bentConnector3">
             <a:avLst>
-              <a:gd name="adj1" fmla="val -101829"/>
-              <a:gd name="adj2" fmla="val 99976"/>
+              <a:gd name="adj1" fmla="val -111870"/>
             </a:avLst>
           </a:prstGeom>
           <a:ln w="19050">
@@ -13518,8 +13775,8 @@
         </p:nvSpPr>
         <p:spPr>
           <a:xfrm rot="16200000">
-            <a:off x="956202" y="2861202"/>
-            <a:ext cx="1093635" cy="346760"/>
+            <a:off x="898068" y="2803068"/>
+            <a:ext cx="1209903" cy="346760"/>
           </a:xfrm>
           <a:prstGeom prst="rect">
             <a:avLst/>
@@ -13565,12 +13822,12 @@
           <a:p>
             <a:pPr algn="ctr"/>
             <a:r>
-              <a:rPr lang="en-US" sz="1050" dirty="0" smtClean="0">
+              <a:rPr lang="en-US" sz="1050" dirty="0" err="1" smtClean="0">
                 <a:solidFill>
                   <a:schemeClr val="bg1"/>
                 </a:solidFill>
               </a:rPr>
-              <a:t>Model</a:t>
+              <a:t>InMemoryTaskList</a:t>
             </a:r>
             <a:endParaRPr lang="en-SG" sz="1050" dirty="0">
               <a:solidFill>
@@ -13627,48 +13884,6 @@
           </a:p>
         </p:txBody>
       </p:sp>
-      <p:cxnSp>
-        <p:nvCxnSpPr>
-          <p:cNvPr id="55" name="Straight Arrow Connector 54"/>
-          <p:cNvCxnSpPr>
-            <a:stCxn id="62" idx="0"/>
-            <a:endCxn id="67" idx="2"/>
-          </p:cNvCxnSpPr>
-          <p:nvPr/>
-        </p:nvCxnSpPr>
-        <p:spPr>
-          <a:xfrm flipV="1">
-            <a:off x="6667770" y="2632344"/>
-            <a:ext cx="1612" cy="225722"/>
-          </a:xfrm>
-          <a:prstGeom prst="straightConnector1">
-            <a:avLst/>
-          </a:prstGeom>
-          <a:ln w="19050">
-            <a:solidFill>
-              <a:srgbClr val="7030A0"/>
-            </a:solidFill>
-            <a:prstDash val="sysDot"/>
-            <a:headEnd type="none" w="med" len="med"/>
-            <a:tailEnd type="arrow" w="med" len="med"/>
-          </a:ln>
-          <a:effectLst/>
-        </p:spPr>
-        <p:style>
-          <a:lnRef idx="1">
-            <a:schemeClr val="accent2"/>
-          </a:lnRef>
-          <a:fillRef idx="2">
-            <a:schemeClr val="accent2"/>
-          </a:fillRef>
-          <a:effectRef idx="1">
-            <a:schemeClr val="accent2"/>
-          </a:effectRef>
-          <a:fontRef idx="minor">
-            <a:schemeClr val="dk1"/>
-          </a:fontRef>
-        </p:style>
-      </p:cxnSp>
       <p:cxnSp>
         <p:nvCxnSpPr>
           <p:cNvPr id="58" name="Straight Arrow Connector 57"/>
@@ -13680,8 +13895,8 @@
         </p:nvCxnSpPr>
         <p:spPr>
           <a:xfrm>
-            <a:off x="2656370" y="3326536"/>
-            <a:ext cx="220810" cy="5284"/>
+            <a:off x="2598248" y="3326536"/>
+            <a:ext cx="278932" cy="5284"/>
           </a:xfrm>
           <a:prstGeom prst="straightConnector1">
             <a:avLst/>
@@ -13853,7 +14068,7 @@
         </p:nvSpPr>
         <p:spPr>
           <a:xfrm>
-            <a:off x="2420322" y="3239846"/>
+            <a:off x="2362200" y="3239846"/>
             <a:ext cx="236048" cy="173380"/>
           </a:xfrm>
           <a:prstGeom prst="flowChartDecision">
@@ -13892,211 +14107,13 @@
       </p:sp>
       <p:sp>
         <p:nvSpPr>
-          <p:cNvPr id="46" name="Rectangle 8"/>
-          <p:cNvSpPr/>
-          <p:nvPr/>
-        </p:nvSpPr>
-        <p:spPr>
-          <a:xfrm>
-            <a:off x="2879490" y="2627420"/>
-            <a:ext cx="1093635" cy="346760"/>
-          </a:xfrm>
-          <a:prstGeom prst="rect">
-            <a:avLst/>
-          </a:prstGeom>
-          <a:ln w="19050">
-            <a:solidFill>
-              <a:srgbClr val="7030A0"/>
-            </a:solidFill>
-          </a:ln>
-          <a:effectLst/>
-        </p:spPr>
-        <p:style>
-          <a:lnRef idx="1">
-            <a:schemeClr val="accent4"/>
-          </a:lnRef>
-          <a:fillRef idx="2">
-            <a:schemeClr val="accent4"/>
-          </a:fillRef>
-          <a:effectRef idx="1">
-            <a:schemeClr val="accent4"/>
-          </a:effectRef>
-          <a:fontRef idx="minor">
-            <a:schemeClr val="dk1"/>
-          </a:fontRef>
-        </p:style>
-        <p:txBody>
-          <a:bodyPr rtlCol="0" anchor="ctr"/>
-          <a:lstStyle/>
-          <a:p>
-            <a:pPr algn="ctr"/>
-            <a:r>
-              <a:rPr lang="en-US" sz="1050" dirty="0" err="1" smtClean="0">
-                <a:solidFill>
-                  <a:srgbClr val="7030A0"/>
-                </a:solidFill>
-              </a:rPr>
-              <a:t>AddressBook</a:t>
-            </a:r>
-            <a:endParaRPr lang="en-SG" sz="1050" dirty="0">
-              <a:solidFill>
-                <a:srgbClr val="7030A0"/>
-              </a:solidFill>
-            </a:endParaRPr>
-          </a:p>
-        </p:txBody>
-      </p:sp>
-      <p:cxnSp>
-        <p:nvCxnSpPr>
-          <p:cNvPr id="47" name="Straight Arrow Connector 46"/>
-          <p:cNvCxnSpPr>
-            <a:stCxn id="48" idx="3"/>
-            <a:endCxn id="46" idx="1"/>
-          </p:cNvCxnSpPr>
-          <p:nvPr/>
-        </p:nvCxnSpPr>
-        <p:spPr>
-          <a:xfrm>
-            <a:off x="2658680" y="2795516"/>
-            <a:ext cx="220810" cy="5284"/>
-          </a:xfrm>
-          <a:prstGeom prst="straightConnector1">
-            <a:avLst/>
-          </a:prstGeom>
-          <a:ln w="19050">
-            <a:solidFill>
-              <a:srgbClr val="7030A0"/>
-            </a:solidFill>
-            <a:headEnd type="none" w="med" len="med"/>
-            <a:tailEnd type="arrow" w="med" len="med"/>
-          </a:ln>
-          <a:effectLst/>
-        </p:spPr>
-        <p:style>
-          <a:lnRef idx="1">
-            <a:schemeClr val="accent2"/>
-          </a:lnRef>
-          <a:fillRef idx="2">
-            <a:schemeClr val="accent2"/>
-          </a:fillRef>
-          <a:effectRef idx="1">
-            <a:schemeClr val="accent2"/>
-          </a:effectRef>
-          <a:fontRef idx="minor">
-            <a:schemeClr val="dk1"/>
-          </a:fontRef>
-        </p:style>
-      </p:cxnSp>
-      <p:sp>
-        <p:nvSpPr>
-          <p:cNvPr id="48" name="Flowchart: Decision 96"/>
-          <p:cNvSpPr/>
-          <p:nvPr/>
-        </p:nvSpPr>
-        <p:spPr>
-          <a:xfrm>
-            <a:off x="2422632" y="2708826"/>
-            <a:ext cx="236048" cy="173380"/>
-          </a:xfrm>
-          <a:prstGeom prst="flowChartDecision">
-            <a:avLst/>
-          </a:prstGeom>
-          <a:noFill/>
-          <a:ln w="19050">
-            <a:solidFill>
-              <a:srgbClr val="7030A0"/>
-            </a:solidFill>
-          </a:ln>
-          <a:effectLst/>
-        </p:spPr>
-        <p:style>
-          <a:lnRef idx="1">
-            <a:schemeClr val="accent6"/>
-          </a:lnRef>
-          <a:fillRef idx="2">
-            <a:schemeClr val="accent6"/>
-          </a:fillRef>
-          <a:effectRef idx="1">
-            <a:schemeClr val="accent6"/>
-          </a:effectRef>
-          <a:fontRef idx="minor">
-            <a:schemeClr val="dk1"/>
-          </a:fontRef>
-        </p:style>
-        <p:txBody>
-          <a:bodyPr rtlCol="0" anchor="ctr"/>
-          <a:lstStyle/>
-          <a:p>
-            <a:pPr algn="ctr"/>
-            <a:endParaRPr lang="en-US" sz="1050"/>
-          </a:p>
-        </p:txBody>
-      </p:sp>
-      <p:sp>
-        <p:nvSpPr>
-          <p:cNvPr id="49" name="Rectangle 8"/>
-          <p:cNvSpPr/>
-          <p:nvPr/>
-        </p:nvSpPr>
-        <p:spPr>
-          <a:xfrm>
-            <a:off x="4487017" y="2847371"/>
-            <a:ext cx="1156969" cy="346760"/>
-          </a:xfrm>
-          <a:prstGeom prst="rect">
-            <a:avLst/>
-          </a:prstGeom>
-          <a:ln w="19050">
-            <a:solidFill>
-              <a:srgbClr val="7030A0"/>
-            </a:solidFill>
-          </a:ln>
-          <a:effectLst/>
-        </p:spPr>
-        <p:style>
-          <a:lnRef idx="1">
-            <a:schemeClr val="accent4"/>
-          </a:lnRef>
-          <a:fillRef idx="2">
-            <a:schemeClr val="accent4"/>
-          </a:fillRef>
-          <a:effectRef idx="1">
-            <a:schemeClr val="accent4"/>
-          </a:effectRef>
-          <a:fontRef idx="minor">
-            <a:schemeClr val="dk1"/>
-          </a:fontRef>
-        </p:style>
-        <p:txBody>
-          <a:bodyPr rtlCol="0" anchor="ctr"/>
-          <a:lstStyle/>
-          <a:p>
-            <a:pPr algn="ctr"/>
-            <a:r>
-              <a:rPr lang="en-US" sz="1050" dirty="0" err="1" smtClean="0">
-                <a:solidFill>
-                  <a:srgbClr val="7030A0"/>
-                </a:solidFill>
-              </a:rPr>
-              <a:t>UniquePersonList</a:t>
-            </a:r>
-            <a:endParaRPr lang="en-SG" sz="1050" dirty="0">
-              <a:solidFill>
-                <a:srgbClr val="7030A0"/>
-              </a:solidFill>
-            </a:endParaRPr>
-          </a:p>
-        </p:txBody>
-      </p:sp>
-      <p:sp>
-        <p:nvSpPr>
           <p:cNvPr id="51" name="Flowchart: Decision 96"/>
           <p:cNvSpPr/>
           <p:nvPr/>
         </p:nvSpPr>
         <p:spPr>
           <a:xfrm>
-            <a:off x="3984303" y="2673991"/>
+            <a:off x="2372656" y="2714763"/>
             <a:ext cx="236048" cy="173380"/>
           </a:xfrm>
           <a:prstGeom prst="flowChartDecision">
@@ -14135,47 +14152,6 @@
           </a:p>
         </p:txBody>
       </p:sp>
-      <p:cxnSp>
-        <p:nvCxnSpPr>
-          <p:cNvPr id="30" name="Elbow Connector 29"/>
-          <p:cNvCxnSpPr>
-            <a:stCxn id="51" idx="3"/>
-            <a:endCxn id="49" idx="1"/>
-          </p:cNvCxnSpPr>
-          <p:nvPr/>
-        </p:nvCxnSpPr>
-        <p:spPr>
-          <a:xfrm>
-            <a:off x="4220351" y="2760681"/>
-            <a:ext cx="266666" cy="260070"/>
-          </a:xfrm>
-          <a:prstGeom prst="bentConnector3">
-            <a:avLst/>
-          </a:prstGeom>
-          <a:ln w="19050">
-            <a:solidFill>
-              <a:srgbClr val="7030A0"/>
-            </a:solidFill>
-            <a:headEnd type="none" w="med" len="med"/>
-            <a:tailEnd type="arrow" w="med" len="med"/>
-          </a:ln>
-          <a:effectLst/>
-        </p:spPr>
-        <p:style>
-          <a:lnRef idx="1">
-            <a:schemeClr val="accent2"/>
-          </a:lnRef>
-          <a:fillRef idx="2">
-            <a:schemeClr val="accent2"/>
-          </a:fillRef>
-          <a:effectRef idx="1">
-            <a:schemeClr val="accent2"/>
-          </a:effectRef>
-          <a:fontRef idx="minor">
-            <a:schemeClr val="dk1"/>
-          </a:fontRef>
-        </p:style>
-      </p:cxnSp>
       <p:sp>
         <p:nvSpPr>
           <p:cNvPr id="57" name="Rectangle 8"/>
@@ -14185,7 +14161,7 @@
         <p:spPr>
           <a:xfrm>
             <a:off x="4503204" y="2280569"/>
-            <a:ext cx="1156969" cy="346760"/>
+            <a:ext cx="1776289" cy="346760"/>
           </a:xfrm>
           <a:prstGeom prst="rect">
             <a:avLst/>
@@ -14222,7 +14198,15 @@
                   <a:srgbClr val="7030A0"/>
                 </a:solidFill>
               </a:rPr>
-              <a:t>UniqueTagList</a:t>
+              <a:t>UniqueItemCollection</a:t>
+            </a:r>
+            <a:r>
+              <a:rPr lang="en-US" sz="1050" dirty="0" smtClean="0">
+                <a:solidFill>
+                  <a:srgbClr val="7030A0"/>
+                </a:solidFill>
+              </a:rPr>
+              <a:t>&lt;Task&gt;</a:t>
             </a:r>
             <a:endParaRPr lang="en-SG" sz="1050" dirty="0">
               <a:solidFill>
@@ -14243,8 +14227,8 @@
         </p:nvCxnSpPr>
         <p:spPr>
           <a:xfrm flipV="1">
-            <a:off x="4220351" y="2453949"/>
-            <a:ext cx="282853" cy="306732"/>
+            <a:off x="2608704" y="2453949"/>
+            <a:ext cx="1894500" cy="347504"/>
           </a:xfrm>
           <a:prstGeom prst="bentConnector3">
             <a:avLst>
@@ -14321,7 +14305,7 @@
                   <a:srgbClr val="7030A0"/>
                 </a:solidFill>
               </a:rPr>
-              <a:t>Person</a:t>
+              <a:t>Task</a:t>
             </a:r>
             <a:endParaRPr lang="en-SG" sz="1050" dirty="0">
               <a:solidFill>
@@ -14333,13 +14317,13 @@
       </p:sp>
       <p:sp>
         <p:nvSpPr>
-          <p:cNvPr id="63" name="Flowchart: Decision 96"/>
+          <p:cNvPr id="68" name="Flowchart: Decision 96"/>
           <p:cNvSpPr/>
           <p:nvPr/>
         </p:nvSpPr>
         <p:spPr>
           <a:xfrm>
-            <a:off x="5643227" y="2943979"/>
+            <a:off x="6292737" y="2380840"/>
             <a:ext cx="236048" cy="173380"/>
           </a:xfrm>
           <a:prstGeom prst="flowChartDecision">
@@ -14378,20 +14362,21 @@
       </p:sp>
       <p:cxnSp>
         <p:nvCxnSpPr>
-          <p:cNvPr id="64" name="Elbow Connector 63"/>
+          <p:cNvPr id="69" name="Elbow Connector 68"/>
           <p:cNvCxnSpPr>
-            <a:stCxn id="63" idx="3"/>
-            <a:endCxn id="62" idx="1"/>
+            <a:endCxn id="62" idx="0"/>
           </p:cNvCxnSpPr>
           <p:nvPr/>
         </p:nvCxnSpPr>
         <p:spPr>
-          <a:xfrm>
-            <a:off x="5879275" y="3030669"/>
-            <a:ext cx="434402" cy="777"/>
+          <a:xfrm rot="16200000" flipH="1">
+            <a:off x="6405835" y="2596130"/>
+            <a:ext cx="391313" cy="132558"/>
           </a:xfrm>
           <a:prstGeom prst="bentConnector3">
-            <a:avLst/>
+            <a:avLst>
+              <a:gd name="adj1" fmla="val 1838"/>
+            </a:avLst>
           </a:prstGeom>
           <a:ln w="19050">
             <a:solidFill>
@@ -14419,14 +14404,14 @@
       </p:cxnSp>
       <p:sp>
         <p:nvSpPr>
-          <p:cNvPr id="67" name="Rectangle 8"/>
+          <p:cNvPr id="72" name="Rectangle 8"/>
           <p:cNvSpPr/>
           <p:nvPr/>
         </p:nvSpPr>
         <p:spPr>
           <a:xfrm>
-            <a:off x="6315289" y="2285584"/>
-            <a:ext cx="708186" cy="346760"/>
+            <a:off x="5128257" y="3429000"/>
+            <a:ext cx="1156969" cy="346760"/>
           </a:xfrm>
           <a:prstGeom prst="rect">
             <a:avLst/>
@@ -14463,7 +14448,30 @@
                   <a:srgbClr val="7030A0"/>
                 </a:solidFill>
               </a:rPr>
-              <a:t>Tag</a:t>
+              <a:t>&lt;&lt;interface&gt;&gt;</a:t>
+            </a:r>
+            <a:br>
+              <a:rPr lang="en-US" sz="1050" dirty="0" smtClean="0">
+                <a:solidFill>
+                  <a:srgbClr val="7030A0"/>
+                </a:solidFill>
+              </a:rPr>
+            </a:br>
+            <a:r>
+              <a:rPr lang="en-US" sz="1050" dirty="0" err="1" smtClean="0">
+                <a:solidFill>
+                  <a:srgbClr val="7030A0"/>
+                </a:solidFill>
+              </a:rPr>
+              <a:t>Favortible</a:t>
+            </a:r>
+            <a:r>
+              <a:rPr lang="en-US" sz="1050" dirty="0" err="1" smtClean="0">
+                <a:solidFill>
+                  <a:srgbClr val="7030A0"/>
+                </a:solidFill>
+              </a:rPr>
+              <a:t>Task</a:t>
             </a:r>
             <a:endParaRPr lang="en-SG" sz="1050" dirty="0">
               <a:solidFill>
@@ -14475,219 +14483,6 @@
       </p:sp>
       <p:sp>
         <p:nvSpPr>
-          <p:cNvPr id="68" name="Flowchart: Decision 96"/>
-          <p:cNvSpPr/>
-          <p:nvPr/>
-        </p:nvSpPr>
-        <p:spPr>
-          <a:xfrm>
-            <a:off x="5672547" y="2371497"/>
-            <a:ext cx="236048" cy="173380"/>
-          </a:xfrm>
-          <a:prstGeom prst="flowChartDecision">
-            <a:avLst/>
-          </a:prstGeom>
-          <a:noFill/>
-          <a:ln w="19050">
-            <a:solidFill>
-              <a:srgbClr val="7030A0"/>
-            </a:solidFill>
-          </a:ln>
-          <a:effectLst/>
-        </p:spPr>
-        <p:style>
-          <a:lnRef idx="1">
-            <a:schemeClr val="accent6"/>
-          </a:lnRef>
-          <a:fillRef idx="2">
-            <a:schemeClr val="accent6"/>
-          </a:fillRef>
-          <a:effectRef idx="1">
-            <a:schemeClr val="accent6"/>
-          </a:effectRef>
-          <a:fontRef idx="minor">
-            <a:schemeClr val="dk1"/>
-          </a:fontRef>
-        </p:style>
-        <p:txBody>
-          <a:bodyPr rtlCol="0" anchor="ctr"/>
-          <a:lstStyle/>
-          <a:p>
-            <a:pPr algn="ctr"/>
-            <a:endParaRPr lang="en-US" sz="1050"/>
-          </a:p>
-        </p:txBody>
-      </p:sp>
-      <p:cxnSp>
-        <p:nvCxnSpPr>
-          <p:cNvPr id="69" name="Elbow Connector 68"/>
-          <p:cNvCxnSpPr>
-            <a:stCxn id="68" idx="3"/>
-            <a:endCxn id="67" idx="1"/>
-          </p:cNvCxnSpPr>
-          <p:nvPr/>
-        </p:nvCxnSpPr>
-        <p:spPr>
-          <a:xfrm>
-            <a:off x="5908595" y="2458187"/>
-            <a:ext cx="406694" cy="777"/>
-          </a:xfrm>
-          <a:prstGeom prst="bentConnector3">
-            <a:avLst/>
-          </a:prstGeom>
-          <a:ln w="19050">
-            <a:solidFill>
-              <a:srgbClr val="7030A0"/>
-            </a:solidFill>
-            <a:headEnd type="none" w="med" len="med"/>
-            <a:tailEnd type="arrow" w="med" len="med"/>
-          </a:ln>
-          <a:effectLst/>
-        </p:spPr>
-        <p:style>
-          <a:lnRef idx="1">
-            <a:schemeClr val="accent2"/>
-          </a:lnRef>
-          <a:fillRef idx="2">
-            <a:schemeClr val="accent2"/>
-          </a:fillRef>
-          <a:effectRef idx="1">
-            <a:schemeClr val="accent2"/>
-          </a:effectRef>
-          <a:fontRef idx="minor">
-            <a:schemeClr val="dk1"/>
-          </a:fontRef>
-        </p:style>
-      </p:cxnSp>
-      <p:sp>
-        <p:nvSpPr>
-          <p:cNvPr id="72" name="Rectangle 8"/>
-          <p:cNvSpPr/>
-          <p:nvPr/>
-        </p:nvSpPr>
-        <p:spPr>
-          <a:xfrm>
-            <a:off x="5128257" y="3429000"/>
-            <a:ext cx="1156969" cy="346760"/>
-          </a:xfrm>
-          <a:prstGeom prst="rect">
-            <a:avLst/>
-          </a:prstGeom>
-          <a:ln w="19050">
-            <a:solidFill>
-              <a:srgbClr val="7030A0"/>
-            </a:solidFill>
-          </a:ln>
-          <a:effectLst/>
-        </p:spPr>
-        <p:style>
-          <a:lnRef idx="1">
-            <a:schemeClr val="accent4"/>
-          </a:lnRef>
-          <a:fillRef idx="2">
-            <a:schemeClr val="accent4"/>
-          </a:fillRef>
-          <a:effectRef idx="1">
-            <a:schemeClr val="accent4"/>
-          </a:effectRef>
-          <a:fontRef idx="minor">
-            <a:schemeClr val="dk1"/>
-          </a:fontRef>
-        </p:style>
-        <p:txBody>
-          <a:bodyPr rtlCol="0" anchor="ctr"/>
-          <a:lstStyle/>
-          <a:p>
-            <a:pPr algn="ctr"/>
-            <a:r>
-              <a:rPr lang="en-US" sz="1050" dirty="0" smtClean="0">
-                <a:solidFill>
-                  <a:srgbClr val="7030A0"/>
-                </a:solidFill>
-              </a:rPr>
-              <a:t>&lt;&lt;interface&gt;&gt;</a:t>
-            </a:r>
-            <a:br>
-              <a:rPr lang="en-US" sz="1050" dirty="0" smtClean="0">
-                <a:solidFill>
-                  <a:srgbClr val="7030A0"/>
-                </a:solidFill>
-              </a:rPr>
-            </a:br>
-            <a:r>
-              <a:rPr lang="en-US" sz="1050" dirty="0" err="1" smtClean="0">
-                <a:solidFill>
-                  <a:srgbClr val="7030A0"/>
-                </a:solidFill>
-              </a:rPr>
-              <a:t>ReadOnlyPerson</a:t>
-            </a:r>
-            <a:endParaRPr lang="en-SG" sz="1050" dirty="0">
-              <a:solidFill>
-                <a:srgbClr val="7030A0"/>
-              </a:solidFill>
-            </a:endParaRPr>
-          </a:p>
-        </p:txBody>
-      </p:sp>
-      <p:sp>
-        <p:nvSpPr>
-          <p:cNvPr id="76" name="Rectangle 8"/>
-          <p:cNvSpPr/>
-          <p:nvPr/>
-        </p:nvSpPr>
-        <p:spPr>
-          <a:xfrm>
-            <a:off x="7712397" y="2564238"/>
-            <a:ext cx="708186" cy="285783"/>
-          </a:xfrm>
-          <a:prstGeom prst="rect">
-            <a:avLst/>
-          </a:prstGeom>
-          <a:ln w="19050">
-            <a:solidFill>
-              <a:srgbClr val="7030A0"/>
-            </a:solidFill>
-          </a:ln>
-          <a:effectLst/>
-        </p:spPr>
-        <p:style>
-          <a:lnRef idx="1">
-            <a:schemeClr val="accent4"/>
-          </a:lnRef>
-          <a:fillRef idx="2">
-            <a:schemeClr val="accent4"/>
-          </a:fillRef>
-          <a:effectRef idx="1">
-            <a:schemeClr val="accent4"/>
-          </a:effectRef>
-          <a:fontRef idx="minor">
-            <a:schemeClr val="dk1"/>
-          </a:fontRef>
-        </p:style>
-        <p:txBody>
-          <a:bodyPr rtlCol="0" anchor="ctr"/>
-          <a:lstStyle/>
-          <a:p>
-            <a:pPr algn="ctr"/>
-            <a:r>
-              <a:rPr lang="en-US" sz="1050" dirty="0" smtClean="0">
-                <a:solidFill>
-                  <a:srgbClr val="7030A0"/>
-                </a:solidFill>
-              </a:rPr>
-              <a:t>Name</a:t>
-            </a:r>
-            <a:endParaRPr lang="en-SG" sz="1050" dirty="0">
-              <a:solidFill>
-                <a:srgbClr val="7030A0"/>
-              </a:solidFill>
-            </a:endParaRPr>
-          </a:p>
-        </p:txBody>
-      </p:sp>
-      <p:sp>
-        <p:nvSpPr>
           <p:cNvPr id="78" name="Flowchart: Decision 96"/>
           <p:cNvSpPr/>
           <p:nvPr/>
@@ -14733,47 +14528,6 @@
           </a:p>
         </p:txBody>
       </p:sp>
-      <p:cxnSp>
-        <p:nvCxnSpPr>
-          <p:cNvPr id="79" name="Elbow Connector 78"/>
-          <p:cNvCxnSpPr>
-            <a:stCxn id="78" idx="3"/>
-            <a:endCxn id="76" idx="1"/>
-          </p:cNvCxnSpPr>
-          <p:nvPr/>
-        </p:nvCxnSpPr>
-        <p:spPr>
-          <a:xfrm flipV="1">
-            <a:off x="7277995" y="2707130"/>
-            <a:ext cx="434402" cy="327761"/>
-          </a:xfrm>
-          <a:prstGeom prst="bentConnector3">
-            <a:avLst/>
-          </a:prstGeom>
-          <a:ln w="19050">
-            <a:solidFill>
-              <a:srgbClr val="7030A0"/>
-            </a:solidFill>
-            <a:headEnd type="none" w="med" len="med"/>
-            <a:tailEnd type="arrow" w="med" len="med"/>
-          </a:ln>
-          <a:effectLst/>
-        </p:spPr>
-        <p:style>
-          <a:lnRef idx="1">
-            <a:schemeClr val="accent2"/>
-          </a:lnRef>
-          <a:fillRef idx="2">
-            <a:schemeClr val="accent2"/>
-          </a:fillRef>
-          <a:effectRef idx="1">
-            <a:schemeClr val="accent2"/>
-          </a:effectRef>
-          <a:fontRef idx="minor">
-            <a:schemeClr val="dk1"/>
-          </a:fontRef>
-        </p:style>
-      </p:cxnSp>
       <p:sp>
         <p:nvSpPr>
           <p:cNvPr id="80" name="Rectangle 8"/>
@@ -14782,8 +14536,8 @@
         </p:nvSpPr>
         <p:spPr>
           <a:xfrm>
-            <a:off x="7712397" y="2887216"/>
-            <a:ext cx="708186" cy="285783"/>
+            <a:off x="7712396" y="2887216"/>
+            <a:ext cx="822003" cy="285783"/>
           </a:xfrm>
           <a:prstGeom prst="rect">
             <a:avLst/>
@@ -14815,12 +14569,12 @@
           <a:p>
             <a:pPr algn="ctr"/>
             <a:r>
-              <a:rPr lang="en-US" sz="1050" dirty="0" smtClean="0">
+              <a:rPr lang="en-SG" sz="1050" smtClean="0">
                 <a:solidFill>
                   <a:srgbClr val="7030A0"/>
                 </a:solidFill>
               </a:rPr>
-              <a:t>Phone</a:t>
+              <a:t>Description</a:t>
             </a:r>
             <a:endParaRPr lang="en-SG" sz="1050" dirty="0">
               <a:solidFill>
@@ -14842,7 +14596,7 @@
         <p:spPr>
           <a:xfrm flipV="1">
             <a:off x="7277995" y="3030108"/>
-            <a:ext cx="434402" cy="4783"/>
+            <a:ext cx="434401" cy="4783"/>
           </a:xfrm>
           <a:prstGeom prst="bentConnector3">
             <a:avLst/>
@@ -14871,401 +14625,6 @@
           </a:fontRef>
         </p:style>
       </p:cxnSp>
-      <p:sp>
-        <p:nvSpPr>
-          <p:cNvPr id="83" name="Rectangle 8"/>
-          <p:cNvSpPr/>
-          <p:nvPr/>
-        </p:nvSpPr>
-        <p:spPr>
-          <a:xfrm>
-            <a:off x="7712397" y="3210194"/>
-            <a:ext cx="708186" cy="285783"/>
-          </a:xfrm>
-          <a:prstGeom prst="rect">
-            <a:avLst/>
-          </a:prstGeom>
-          <a:ln w="19050">
-            <a:solidFill>
-              <a:srgbClr val="7030A0"/>
-            </a:solidFill>
-          </a:ln>
-          <a:effectLst/>
-        </p:spPr>
-        <p:style>
-          <a:lnRef idx="1">
-            <a:schemeClr val="accent4"/>
-          </a:lnRef>
-          <a:fillRef idx="2">
-            <a:schemeClr val="accent4"/>
-          </a:fillRef>
-          <a:effectRef idx="1">
-            <a:schemeClr val="accent4"/>
-          </a:effectRef>
-          <a:fontRef idx="minor">
-            <a:schemeClr val="dk1"/>
-          </a:fontRef>
-        </p:style>
-        <p:txBody>
-          <a:bodyPr rtlCol="0" anchor="ctr"/>
-          <a:lstStyle/>
-          <a:p>
-            <a:pPr algn="ctr"/>
-            <a:r>
-              <a:rPr lang="en-US" sz="1050" dirty="0" smtClean="0">
-                <a:solidFill>
-                  <a:srgbClr val="7030A0"/>
-                </a:solidFill>
-              </a:rPr>
-              <a:t>Email</a:t>
-            </a:r>
-            <a:endParaRPr lang="en-SG" sz="1050" dirty="0">
-              <a:solidFill>
-                <a:srgbClr val="7030A0"/>
-              </a:solidFill>
-            </a:endParaRPr>
-          </a:p>
-        </p:txBody>
-      </p:sp>
-      <p:cxnSp>
-        <p:nvCxnSpPr>
-          <p:cNvPr id="84" name="Elbow Connector 83"/>
-          <p:cNvCxnSpPr>
-            <a:stCxn id="78" idx="3"/>
-            <a:endCxn id="83" idx="1"/>
-          </p:cNvCxnSpPr>
-          <p:nvPr/>
-        </p:nvCxnSpPr>
-        <p:spPr>
-          <a:xfrm>
-            <a:off x="7277995" y="3034891"/>
-            <a:ext cx="434402" cy="318195"/>
-          </a:xfrm>
-          <a:prstGeom prst="bentConnector3">
-            <a:avLst/>
-          </a:prstGeom>
-          <a:ln w="19050">
-            <a:solidFill>
-              <a:srgbClr val="7030A0"/>
-            </a:solidFill>
-            <a:headEnd type="none" w="med" len="med"/>
-            <a:tailEnd type="arrow" w="med" len="med"/>
-          </a:ln>
-          <a:effectLst/>
-        </p:spPr>
-        <p:style>
-          <a:lnRef idx="1">
-            <a:schemeClr val="accent2"/>
-          </a:lnRef>
-          <a:fillRef idx="2">
-            <a:schemeClr val="accent2"/>
-          </a:fillRef>
-          <a:effectRef idx="1">
-            <a:schemeClr val="accent2"/>
-          </a:effectRef>
-          <a:fontRef idx="minor">
-            <a:schemeClr val="dk1"/>
-          </a:fontRef>
-        </p:style>
-      </p:cxnSp>
-      <p:sp>
-        <p:nvSpPr>
-          <p:cNvPr id="85" name="Rectangle 8"/>
-          <p:cNvSpPr/>
-          <p:nvPr/>
-        </p:nvSpPr>
-        <p:spPr>
-          <a:xfrm>
-            <a:off x="7712397" y="3533171"/>
-            <a:ext cx="708186" cy="285783"/>
-          </a:xfrm>
-          <a:prstGeom prst="rect">
-            <a:avLst/>
-          </a:prstGeom>
-          <a:ln w="19050">
-            <a:solidFill>
-              <a:srgbClr val="7030A0"/>
-            </a:solidFill>
-          </a:ln>
-          <a:effectLst/>
-        </p:spPr>
-        <p:style>
-          <a:lnRef idx="1">
-            <a:schemeClr val="accent4"/>
-          </a:lnRef>
-          <a:fillRef idx="2">
-            <a:schemeClr val="accent4"/>
-          </a:fillRef>
-          <a:effectRef idx="1">
-            <a:schemeClr val="accent4"/>
-          </a:effectRef>
-          <a:fontRef idx="minor">
-            <a:schemeClr val="dk1"/>
-          </a:fontRef>
-        </p:style>
-        <p:txBody>
-          <a:bodyPr rtlCol="0" anchor="ctr"/>
-          <a:lstStyle/>
-          <a:p>
-            <a:pPr algn="ctr"/>
-            <a:r>
-              <a:rPr lang="en-US" sz="1050" dirty="0" smtClean="0">
-                <a:solidFill>
-                  <a:srgbClr val="7030A0"/>
-                </a:solidFill>
-              </a:rPr>
-              <a:t>Address</a:t>
-            </a:r>
-            <a:endParaRPr lang="en-SG" sz="1050" dirty="0">
-              <a:solidFill>
-                <a:srgbClr val="7030A0"/>
-              </a:solidFill>
-            </a:endParaRPr>
-          </a:p>
-        </p:txBody>
-      </p:sp>
-      <p:cxnSp>
-        <p:nvCxnSpPr>
-          <p:cNvPr id="86" name="Elbow Connector 85"/>
-          <p:cNvCxnSpPr>
-            <a:stCxn id="78" idx="3"/>
-            <a:endCxn id="85" idx="1"/>
-          </p:cNvCxnSpPr>
-          <p:nvPr/>
-        </p:nvCxnSpPr>
-        <p:spPr>
-          <a:xfrm>
-            <a:off x="7277995" y="3034891"/>
-            <a:ext cx="434402" cy="641172"/>
-          </a:xfrm>
-          <a:prstGeom prst="bentConnector3">
-            <a:avLst/>
-          </a:prstGeom>
-          <a:ln w="19050">
-            <a:solidFill>
-              <a:srgbClr val="7030A0"/>
-            </a:solidFill>
-            <a:headEnd type="none" w="med" len="med"/>
-            <a:tailEnd type="arrow" w="med" len="med"/>
-          </a:ln>
-          <a:effectLst/>
-        </p:spPr>
-        <p:style>
-          <a:lnRef idx="1">
-            <a:schemeClr val="accent2"/>
-          </a:lnRef>
-          <a:fillRef idx="2">
-            <a:schemeClr val="accent2"/>
-          </a:fillRef>
-          <a:effectRef idx="1">
-            <a:schemeClr val="accent2"/>
-          </a:effectRef>
-          <a:fontRef idx="minor">
-            <a:schemeClr val="dk1"/>
-          </a:fontRef>
-        </p:style>
-      </p:cxnSp>
-      <p:cxnSp>
-        <p:nvCxnSpPr>
-          <p:cNvPr id="97" name="Elbow Connector 63"/>
-          <p:cNvCxnSpPr>
-            <a:stCxn id="99" idx="3"/>
-          </p:cNvCxnSpPr>
-          <p:nvPr/>
-        </p:nvCxnSpPr>
-        <p:spPr>
-          <a:xfrm rot="16200000" flipH="1">
-            <a:off x="3279321" y="2485431"/>
-            <a:ext cx="293825" cy="1"/>
-          </a:xfrm>
-          <a:prstGeom prst="bentConnector3">
-            <a:avLst>
-              <a:gd name="adj1" fmla="val 50000"/>
-            </a:avLst>
-          </a:prstGeom>
-          <a:ln w="19050">
-            <a:solidFill>
-              <a:srgbClr val="7030A0"/>
-            </a:solidFill>
-            <a:prstDash val="sysDot"/>
-            <a:headEnd type="none" w="med" len="med"/>
-            <a:tailEnd type="none" w="med" len="med"/>
-          </a:ln>
-          <a:effectLst/>
-        </p:spPr>
-        <p:style>
-          <a:lnRef idx="1">
-            <a:schemeClr val="accent2"/>
-          </a:lnRef>
-          <a:fillRef idx="2">
-            <a:schemeClr val="accent2"/>
-          </a:fillRef>
-          <a:effectRef idx="1">
-            <a:schemeClr val="accent2"/>
-          </a:effectRef>
-          <a:fontRef idx="minor">
-            <a:schemeClr val="dk1"/>
-          </a:fontRef>
-        </p:style>
-      </p:cxnSp>
-      <p:sp>
-        <p:nvSpPr>
-          <p:cNvPr id="99" name="Isosceles Triangle 102"/>
-          <p:cNvSpPr/>
-          <p:nvPr/>
-        </p:nvSpPr>
-        <p:spPr>
-          <a:xfrm rot="10800000" flipV="1">
-            <a:off x="3290981" y="2162997"/>
-            <a:ext cx="270504" cy="175523"/>
-          </a:xfrm>
-          <a:prstGeom prst="triangle">
-            <a:avLst/>
-          </a:prstGeom>
-          <a:ln w="19050">
-            <a:solidFill>
-              <a:srgbClr val="7030A0"/>
-            </a:solidFill>
-          </a:ln>
-          <a:effectLst/>
-        </p:spPr>
-        <p:style>
-          <a:lnRef idx="1">
-            <a:schemeClr val="accent4"/>
-          </a:lnRef>
-          <a:fillRef idx="2">
-            <a:schemeClr val="accent4"/>
-          </a:fillRef>
-          <a:effectRef idx="1">
-            <a:schemeClr val="accent4"/>
-          </a:effectRef>
-          <a:fontRef idx="minor">
-            <a:schemeClr val="dk1"/>
-          </a:fontRef>
-        </p:style>
-        <p:txBody>
-          <a:bodyPr rtlCol="0" anchor="ctr"/>
-          <a:lstStyle/>
-          <a:p>
-            <a:pPr algn="ctr"/>
-            <a:endParaRPr lang="en-SG" sz="1050" b="1">
-              <a:solidFill>
-                <a:srgbClr val="92D050"/>
-              </a:solidFill>
-            </a:endParaRPr>
-          </a:p>
-        </p:txBody>
-      </p:sp>
-      <p:sp>
-        <p:nvSpPr>
-          <p:cNvPr id="100" name="Rectangle 8"/>
-          <p:cNvSpPr/>
-          <p:nvPr/>
-        </p:nvSpPr>
-        <p:spPr>
-          <a:xfrm>
-            <a:off x="2660303" y="1806470"/>
-            <a:ext cx="1539926" cy="346760"/>
-          </a:xfrm>
-          <a:prstGeom prst="rect">
-            <a:avLst/>
-          </a:prstGeom>
-          <a:ln w="19050">
-            <a:solidFill>
-              <a:srgbClr val="7030A0"/>
-            </a:solidFill>
-          </a:ln>
-          <a:effectLst/>
-        </p:spPr>
-        <p:style>
-          <a:lnRef idx="1">
-            <a:schemeClr val="accent4"/>
-          </a:lnRef>
-          <a:fillRef idx="2">
-            <a:schemeClr val="accent4"/>
-          </a:fillRef>
-          <a:effectRef idx="1">
-            <a:schemeClr val="accent4"/>
-          </a:effectRef>
-          <a:fontRef idx="minor">
-            <a:schemeClr val="dk1"/>
-          </a:fontRef>
-        </p:style>
-        <p:txBody>
-          <a:bodyPr rtlCol="0" anchor="ctr"/>
-          <a:lstStyle/>
-          <a:p>
-            <a:pPr algn="ctr"/>
-            <a:r>
-              <a:rPr lang="en-US" sz="1050" dirty="0" smtClean="0">
-                <a:solidFill>
-                  <a:srgbClr val="7030A0"/>
-                </a:solidFill>
-              </a:rPr>
-              <a:t>&lt;&lt;interface&gt;&gt;</a:t>
-            </a:r>
-            <a:br>
-              <a:rPr lang="en-US" sz="1050" dirty="0" smtClean="0">
-                <a:solidFill>
-                  <a:srgbClr val="7030A0"/>
-                </a:solidFill>
-              </a:rPr>
-            </a:br>
-            <a:r>
-              <a:rPr lang="en-US" sz="1050" dirty="0" err="1" smtClean="0">
-                <a:solidFill>
-                  <a:srgbClr val="7030A0"/>
-                </a:solidFill>
-              </a:rPr>
-              <a:t>ReadOnlyAddressBook</a:t>
-            </a:r>
-            <a:endParaRPr lang="en-SG" sz="1050" dirty="0">
-              <a:solidFill>
-                <a:srgbClr val="7030A0"/>
-              </a:solidFill>
-            </a:endParaRPr>
-          </a:p>
-        </p:txBody>
-      </p:sp>
-      <p:sp>
-        <p:nvSpPr>
-          <p:cNvPr id="114" name="TextBox 113"/>
-          <p:cNvSpPr txBox="1"/>
-          <p:nvPr/>
-        </p:nvSpPr>
-        <p:spPr>
-          <a:xfrm rot="16200000">
-            <a:off x="6581354" y="3514530"/>
-            <a:ext cx="881018" cy="261610"/>
-          </a:xfrm>
-          <a:prstGeom prst="rect">
-            <a:avLst/>
-          </a:prstGeom>
-          <a:noFill/>
-        </p:spPr>
-        <p:txBody>
-          <a:bodyPr wrap="square" rtlCol="0">
-            <a:spAutoFit/>
-          </a:bodyPr>
-          <a:lstStyle/>
-          <a:p>
-            <a:pPr algn="r"/>
-            <a:r>
-              <a:rPr lang="en-US" sz="1100" dirty="0" smtClean="0">
-                <a:solidFill>
-                  <a:srgbClr val="7030A0"/>
-                </a:solidFill>
-              </a:rPr>
-              <a:t>filtered list</a:t>
-            </a:r>
-            <a:endParaRPr lang="en-SG" sz="1100" dirty="0">
-              <a:solidFill>
-                <a:srgbClr val="7030A0"/>
-              </a:solidFill>
-            </a:endParaRPr>
-          </a:p>
-        </p:txBody>
-      </p:sp>
       <p:sp>
         <p:nvSpPr>
           <p:cNvPr id="122" name="Rectangle 8"/>
@@ -15387,6 +14746,44 @@
           </a:fontRef>
         </p:style>
       </p:cxnSp>
+      <p:sp>
+        <p:nvSpPr>
+          <p:cNvPr id="38" name="TextBox 37"/>
+          <p:cNvSpPr txBox="1"/>
+          <p:nvPr/>
+        </p:nvSpPr>
+        <p:spPr>
+          <a:xfrm rot="16200000">
+            <a:off x="6715778" y="3529469"/>
+            <a:ext cx="840856" cy="261610"/>
+          </a:xfrm>
+          <a:prstGeom prst="rect">
+            <a:avLst/>
+          </a:prstGeom>
+          <a:noFill/>
+        </p:spPr>
+        <p:txBody>
+          <a:bodyPr wrap="square" rtlCol="0">
+            <a:spAutoFit/>
+          </a:bodyPr>
+          <a:lstStyle/>
+          <a:p>
+            <a:r>
+              <a:rPr lang="en-US" sz="1100" dirty="0" smtClean="0">
+                <a:solidFill>
+                  <a:srgbClr val="7030A0"/>
+                </a:solidFill>
+              </a:rPr>
+              <a:t>Filtered list</a:t>
+            </a:r>
+            <a:endParaRPr lang="en-US" sz="1100" dirty="0">
+              <a:solidFill>
+                <a:srgbClr val="7030A0"/>
+              </a:solidFill>
+            </a:endParaRPr>
+          </a:p>
+        </p:txBody>
+      </p:sp>
     </p:spTree>
     <p:extLst>
       <p:ext uri="{BB962C8B-B14F-4D97-AF65-F5344CB8AC3E}">
@@ -15433,7 +14830,7 @@
         <p:spPr>
           <a:xfrm>
             <a:off x="1119865" y="2086382"/>
-            <a:ext cx="7871735" cy="1723618"/>
+            <a:ext cx="7871735" cy="2485618"/>
           </a:xfrm>
           <a:prstGeom prst="roundRect">
             <a:avLst>
@@ -15557,7 +14954,7 @@
                   <a:schemeClr val="bg1"/>
                 </a:solidFill>
               </a:rPr>
-              <a:t>AddressBookStorage</a:t>
+              <a:t>TaskStorage</a:t>
             </a:r>
             <a:endParaRPr lang="en-SG" sz="1050" dirty="0">
               <a:solidFill>
@@ -15575,8 +14972,8 @@
         </p:nvSpPr>
         <p:spPr>
           <a:xfrm rot="16200000">
-            <a:off x="1683963" y="2868687"/>
-            <a:ext cx="1093635" cy="346760"/>
+            <a:off x="1382906" y="3169744"/>
+            <a:ext cx="1695750" cy="346760"/>
           </a:xfrm>
           <a:prstGeom prst="rect">
             <a:avLst/>
@@ -15620,7 +15017,7 @@
                   <a:schemeClr val="bg1"/>
                 </a:solidFill>
               </a:rPr>
-              <a:t>StorageManager</a:t>
+              <a:t>TaskStorageManager</a:t>
             </a:r>
             <a:endParaRPr lang="en-SG" sz="1050" dirty="0">
               <a:solidFill>
@@ -15638,8 +15035,8 @@
         </p:nvSpPr>
         <p:spPr>
           <a:xfrm rot="16200000">
-            <a:off x="956202" y="2861202"/>
-            <a:ext cx="1093635" cy="346760"/>
+            <a:off x="651403" y="3166001"/>
+            <a:ext cx="1703234" cy="346760"/>
           </a:xfrm>
           <a:prstGeom prst="rect">
             <a:avLst/>
@@ -15689,12 +15086,12 @@
           <a:p>
             <a:pPr algn="ctr"/>
             <a:r>
-              <a:rPr lang="en-US" sz="1050" dirty="0" smtClean="0">
+              <a:rPr lang="en-US" sz="1050" dirty="0" err="1" smtClean="0">
                 <a:solidFill>
                   <a:schemeClr val="bg1"/>
                 </a:solidFill>
               </a:rPr>
-              <a:t>Storage</a:t>
+              <a:t>TaskStorage</a:t>
             </a:r>
             <a:endParaRPr lang="en-SG" sz="1050" dirty="0">
               <a:solidFill>
@@ -15712,7 +15109,7 @@
         </p:nvSpPr>
         <p:spPr>
           <a:xfrm rot="16200000">
-            <a:off x="1626910" y="2952291"/>
+            <a:off x="1626910" y="3171691"/>
             <a:ext cx="270504" cy="175523"/>
           </a:xfrm>
           <a:prstGeom prst="triangle">
@@ -15810,7 +15207,7 @@
         </p:nvCxnSpPr>
         <p:spPr>
           <a:xfrm>
-            <a:off x="910091" y="3040053"/>
+            <a:off x="910091" y="3349940"/>
             <a:ext cx="419548" cy="2860"/>
           </a:xfrm>
           <a:prstGeom prst="bentConnector3">
@@ -15855,7 +15252,7 @@
         </p:nvCxnSpPr>
         <p:spPr>
           <a:xfrm flipV="1">
-            <a:off x="1849924" y="3040052"/>
+            <a:off x="1849924" y="3259452"/>
             <a:ext cx="216105" cy="1"/>
           </a:xfrm>
           <a:prstGeom prst="line">
@@ -16130,7 +15527,7 @@
                   </a:schemeClr>
                 </a:solidFill>
               </a:rPr>
-              <a:t>XmlAddressBook</a:t>
+              <a:t>XmlTask</a:t>
             </a:r>
             <a:r>
               <a:rPr lang="en-US" sz="1050" b="1" dirty="0" smtClean="0">
@@ -16596,14 +15993,14 @@
               </a:rPr>
             </a:br>
             <a:r>
-              <a:rPr lang="en-US" sz="1050" b="1" dirty="0" err="1" smtClean="0">
+              <a:rPr lang="en-US" sz="1050" b="1" dirty="0" smtClean="0">
                 <a:solidFill>
                   <a:schemeClr val="accent6">
                     <a:lumMod val="75000"/>
                   </a:schemeClr>
                 </a:solidFill>
               </a:rPr>
-              <a:t>AddressBook</a:t>
+              <a:t>Task</a:t>
             </a:r>
             <a:endParaRPr lang="en-SG" sz="1050" b="1" dirty="0">
               <a:solidFill>
@@ -16615,56 +16012,15 @@
           </a:p>
         </p:txBody>
       </p:sp>
-      <p:cxnSp>
-        <p:nvCxnSpPr>
-          <p:cNvPr id="70" name="Elbow Connector 122"/>
-          <p:cNvCxnSpPr>
-            <a:stCxn id="74" idx="0"/>
-            <a:endCxn id="73" idx="2"/>
-          </p:cNvCxnSpPr>
-          <p:nvPr/>
-        </p:nvCxnSpPr>
-        <p:spPr>
-          <a:xfrm rot="5400000" flipH="1" flipV="1">
-            <a:off x="8077993" y="2992020"/>
-            <a:ext cx="335208" cy="12700"/>
-          </a:xfrm>
-          <a:prstGeom prst="bentConnector3">
-            <a:avLst>
-              <a:gd name="adj1" fmla="val 50000"/>
-            </a:avLst>
-          </a:prstGeom>
-          <a:ln w="19050">
-            <a:prstDash val="sysDot"/>
-            <a:headEnd type="none" w="med" len="med"/>
-            <a:tailEnd type="arrow" w="med" len="med"/>
-          </a:ln>
-          <a:effectLst/>
-        </p:spPr>
-        <p:style>
-          <a:lnRef idx="1">
-            <a:schemeClr val="accent6"/>
-          </a:lnRef>
-          <a:fillRef idx="2">
-            <a:schemeClr val="accent6"/>
-          </a:fillRef>
-          <a:effectRef idx="1">
-            <a:schemeClr val="accent6"/>
-          </a:effectRef>
-          <a:fontRef idx="minor">
-            <a:schemeClr val="dk1"/>
-          </a:fontRef>
-        </p:style>
-      </p:cxnSp>
-      <p:sp>
-        <p:nvSpPr>
-          <p:cNvPr id="73" name="Rectangle 8"/>
+      <p:sp>
+        <p:nvSpPr>
+          <p:cNvPr id="74" name="Rectangle 8"/>
           <p:cNvSpPr/>
           <p:nvPr/>
         </p:nvSpPr>
         <p:spPr>
           <a:xfrm>
-            <a:off x="7615738" y="2477656"/>
+            <a:off x="7615738" y="3159624"/>
             <a:ext cx="1259718" cy="346760"/>
           </a:xfrm>
           <a:prstGeom prst="rect">
@@ -16700,7 +16056,7 @@
                   </a:schemeClr>
                 </a:solidFill>
               </a:rPr>
-              <a:t>XmlAdaptedTag</a:t>
+              <a:t>XmlAdaptedTask</a:t>
             </a:r>
             <a:endParaRPr lang="en-SG" sz="1050" b="1" dirty="0">
               <a:solidFill>
@@ -16712,16 +16068,377 @@
           </a:p>
         </p:txBody>
       </p:sp>
-      <p:sp>
-        <p:nvSpPr>
-          <p:cNvPr id="74" name="Rectangle 8"/>
+      <p:cxnSp>
+        <p:nvCxnSpPr>
+          <p:cNvPr id="77" name="Elbow Connector 122"/>
+          <p:cNvCxnSpPr>
+            <a:stCxn id="66" idx="3"/>
+            <a:endCxn id="74" idx="1"/>
+          </p:cNvCxnSpPr>
+          <p:nvPr/>
+        </p:nvCxnSpPr>
+        <p:spPr>
+          <a:xfrm flipV="1">
+            <a:off x="7220507" y="3333004"/>
+            <a:ext cx="395231" cy="786"/>
+          </a:xfrm>
+          <a:prstGeom prst="bentConnector3">
+            <a:avLst>
+              <a:gd name="adj1" fmla="val 50000"/>
+            </a:avLst>
+          </a:prstGeom>
+          <a:ln w="19050">
+            <a:prstDash val="sysDot"/>
+            <a:headEnd type="none" w="med" len="med"/>
+            <a:tailEnd type="arrow" w="med" len="med"/>
+          </a:ln>
+          <a:effectLst/>
+        </p:spPr>
+        <p:style>
+          <a:lnRef idx="1">
+            <a:schemeClr val="accent6"/>
+          </a:lnRef>
+          <a:fillRef idx="2">
+            <a:schemeClr val="accent6"/>
+          </a:fillRef>
+          <a:effectRef idx="1">
+            <a:schemeClr val="accent6"/>
+          </a:effectRef>
+          <a:fontRef idx="minor">
+            <a:schemeClr val="dk1"/>
+          </a:fontRef>
+        </p:style>
+      </p:cxnSp>
+      <p:sp>
+        <p:nvSpPr>
+          <p:cNvPr id="26" name="Rectangle 8"/>
           <p:cNvSpPr/>
           <p:nvPr/>
         </p:nvSpPr>
         <p:spPr>
           <a:xfrm>
-            <a:off x="7615738" y="3159624"/>
-            <a:ext cx="1259718" cy="346760"/>
+            <a:off x="2895258" y="3733800"/>
+            <a:ext cx="1323049" cy="346760"/>
+          </a:xfrm>
+          <a:prstGeom prst="rect">
+            <a:avLst/>
+          </a:prstGeom>
+          <a:solidFill>
+            <a:schemeClr val="accent6">
+              <a:lumMod val="75000"/>
+            </a:schemeClr>
+          </a:solidFill>
+          <a:ln w="19050">
+            <a:solidFill>
+              <a:schemeClr val="accent6">
+                <a:lumMod val="75000"/>
+              </a:schemeClr>
+            </a:solidFill>
+          </a:ln>
+          <a:effectLst/>
+        </p:spPr>
+        <p:style>
+          <a:lnRef idx="1">
+            <a:schemeClr val="accent2"/>
+          </a:lnRef>
+          <a:fillRef idx="2">
+            <a:schemeClr val="accent2"/>
+          </a:fillRef>
+          <a:effectRef idx="1">
+            <a:schemeClr val="accent2"/>
+          </a:effectRef>
+          <a:fontRef idx="minor">
+            <a:schemeClr val="dk1"/>
+          </a:fontRef>
+        </p:style>
+        <p:txBody>
+          <a:bodyPr rtlCol="0" anchor="ctr"/>
+          <a:lstStyle/>
+          <a:p>
+            <a:pPr algn="ctr"/>
+            <a:r>
+              <a:rPr lang="en-US" sz="1050" dirty="0" smtClean="0">
+                <a:solidFill>
+                  <a:schemeClr val="bg1"/>
+                </a:solidFill>
+              </a:rPr>
+              <a:t>&lt;&lt;interface&gt;&gt;</a:t>
+            </a:r>
+            <a:br>
+              <a:rPr lang="en-US" sz="1050" dirty="0" smtClean="0">
+                <a:solidFill>
+                  <a:schemeClr val="bg1"/>
+                </a:solidFill>
+              </a:rPr>
+            </a:br>
+            <a:r>
+              <a:rPr lang="en-US" sz="1050" dirty="0" err="1" smtClean="0">
+                <a:solidFill>
+                  <a:schemeClr val="bg1"/>
+                </a:solidFill>
+              </a:rPr>
+              <a:t>Alias</a:t>
+            </a:r>
+            <a:r>
+              <a:rPr lang="en-US" sz="1050" dirty="0" err="1" smtClean="0">
+                <a:solidFill>
+                  <a:schemeClr val="bg1"/>
+                </a:solidFill>
+              </a:rPr>
+              <a:t>Storage</a:t>
+            </a:r>
+            <a:endParaRPr lang="en-SG" sz="1050" dirty="0">
+              <a:solidFill>
+                <a:schemeClr val="bg1"/>
+              </a:solidFill>
+            </a:endParaRPr>
+          </a:p>
+        </p:txBody>
+      </p:sp>
+      <p:cxnSp>
+        <p:nvCxnSpPr>
+          <p:cNvPr id="27" name="Straight Arrow Connector 26"/>
+          <p:cNvCxnSpPr>
+            <a:endCxn id="26" idx="1"/>
+          </p:cNvCxnSpPr>
+          <p:nvPr/>
+        </p:nvCxnSpPr>
+        <p:spPr>
+          <a:xfrm>
+            <a:off x="2674448" y="3901896"/>
+            <a:ext cx="220810" cy="5284"/>
+          </a:xfrm>
+          <a:prstGeom prst="straightConnector1">
+            <a:avLst/>
+          </a:prstGeom>
+          <a:ln w="19050">
+            <a:solidFill>
+              <a:schemeClr val="accent6">
+                <a:lumMod val="75000"/>
+              </a:schemeClr>
+            </a:solidFill>
+            <a:headEnd type="none" w="med" len="med"/>
+            <a:tailEnd type="arrow" w="med" len="med"/>
+          </a:ln>
+          <a:effectLst/>
+        </p:spPr>
+        <p:style>
+          <a:lnRef idx="1">
+            <a:schemeClr val="accent2"/>
+          </a:lnRef>
+          <a:fillRef idx="2">
+            <a:schemeClr val="accent2"/>
+          </a:fillRef>
+          <a:effectRef idx="1">
+            <a:schemeClr val="accent2"/>
+          </a:effectRef>
+          <a:fontRef idx="minor">
+            <a:schemeClr val="dk1"/>
+          </a:fontRef>
+        </p:style>
+      </p:cxnSp>
+      <p:sp>
+        <p:nvSpPr>
+          <p:cNvPr id="28" name="Flowchart: Decision 96"/>
+          <p:cNvSpPr/>
+          <p:nvPr/>
+        </p:nvSpPr>
+        <p:spPr>
+          <a:xfrm>
+            <a:off x="2438400" y="3815206"/>
+            <a:ext cx="236048" cy="173380"/>
+          </a:xfrm>
+          <a:prstGeom prst="flowChartDecision">
+            <a:avLst/>
+          </a:prstGeom>
+          <a:noFill/>
+          <a:ln w="19050">
+            <a:solidFill>
+              <a:schemeClr val="accent6">
+                <a:lumMod val="75000"/>
+              </a:schemeClr>
+            </a:solidFill>
+          </a:ln>
+          <a:effectLst/>
+        </p:spPr>
+        <p:style>
+          <a:lnRef idx="1">
+            <a:schemeClr val="accent2"/>
+          </a:lnRef>
+          <a:fillRef idx="2">
+            <a:schemeClr val="accent2"/>
+          </a:fillRef>
+          <a:effectRef idx="1">
+            <a:schemeClr val="accent2"/>
+          </a:effectRef>
+          <a:fontRef idx="minor">
+            <a:schemeClr val="dk1"/>
+          </a:fontRef>
+        </p:style>
+        <p:txBody>
+          <a:bodyPr rtlCol="0" anchor="ctr"/>
+          <a:lstStyle/>
+          <a:p>
+            <a:pPr algn="ctr"/>
+            <a:endParaRPr lang="en-US" sz="1050">
+              <a:solidFill>
+                <a:schemeClr val="bg1"/>
+              </a:solidFill>
+            </a:endParaRPr>
+          </a:p>
+        </p:txBody>
+      </p:sp>
+      <p:cxnSp>
+        <p:nvCxnSpPr>
+          <p:cNvPr id="29" name="Elbow Connector 63"/>
+          <p:cNvCxnSpPr/>
+          <p:nvPr/>
+        </p:nvCxnSpPr>
+        <p:spPr>
+          <a:xfrm flipV="1">
+            <a:off x="4416119" y="3907180"/>
+            <a:ext cx="223324" cy="1"/>
+          </a:xfrm>
+          <a:prstGeom prst="bentConnector3">
+            <a:avLst>
+              <a:gd name="adj1" fmla="val 50000"/>
+            </a:avLst>
+          </a:prstGeom>
+          <a:ln w="19050">
+            <a:solidFill>
+              <a:schemeClr val="accent6">
+                <a:lumMod val="75000"/>
+              </a:schemeClr>
+            </a:solidFill>
+            <a:prstDash val="sysDot"/>
+            <a:headEnd type="none" w="med" len="med"/>
+            <a:tailEnd type="none" w="med" len="med"/>
+          </a:ln>
+          <a:effectLst/>
+        </p:spPr>
+        <p:style>
+          <a:lnRef idx="1">
+            <a:schemeClr val="accent2"/>
+          </a:lnRef>
+          <a:fillRef idx="2">
+            <a:schemeClr val="accent2"/>
+          </a:fillRef>
+          <a:effectRef idx="1">
+            <a:schemeClr val="accent2"/>
+          </a:effectRef>
+          <a:fontRef idx="minor">
+            <a:schemeClr val="dk1"/>
+          </a:fontRef>
+        </p:style>
+      </p:cxnSp>
+      <p:sp>
+        <p:nvSpPr>
+          <p:cNvPr id="30" name="Isosceles Triangle 102"/>
+          <p:cNvSpPr/>
+          <p:nvPr/>
+        </p:nvSpPr>
+        <p:spPr>
+          <a:xfrm rot="5400000" flipV="1">
+            <a:off x="4193105" y="3819419"/>
+            <a:ext cx="270504" cy="175523"/>
+          </a:xfrm>
+          <a:prstGeom prst="triangle">
+            <a:avLst/>
+          </a:prstGeom>
+          <a:solidFill>
+            <a:schemeClr val="accent6">
+              <a:lumMod val="75000"/>
+            </a:schemeClr>
+          </a:solidFill>
+          <a:ln w="19050">
+            <a:solidFill>
+              <a:schemeClr val="accent6">
+                <a:lumMod val="75000"/>
+              </a:schemeClr>
+            </a:solidFill>
+          </a:ln>
+          <a:effectLst/>
+        </p:spPr>
+        <p:style>
+          <a:lnRef idx="1">
+            <a:schemeClr val="accent2"/>
+          </a:lnRef>
+          <a:fillRef idx="2">
+            <a:schemeClr val="accent2"/>
+          </a:fillRef>
+          <a:effectRef idx="1">
+            <a:schemeClr val="accent2"/>
+          </a:effectRef>
+          <a:fontRef idx="minor">
+            <a:schemeClr val="dk1"/>
+          </a:fontRef>
+        </p:style>
+        <p:txBody>
+          <a:bodyPr rtlCol="0" anchor="ctr"/>
+          <a:lstStyle/>
+          <a:p>
+            <a:pPr algn="ctr"/>
+            <a:endParaRPr lang="en-SG" sz="1050">
+              <a:solidFill>
+                <a:schemeClr val="bg1"/>
+              </a:solidFill>
+            </a:endParaRPr>
+          </a:p>
+        </p:txBody>
+      </p:sp>
+      <p:cxnSp>
+        <p:nvCxnSpPr>
+          <p:cNvPr id="31" name="Elbow Connector 122"/>
+          <p:cNvCxnSpPr/>
+          <p:nvPr/>
+        </p:nvCxnSpPr>
+        <p:spPr>
+          <a:xfrm>
+            <a:off x="5809278" y="3907180"/>
+            <a:ext cx="228600" cy="1970"/>
+          </a:xfrm>
+          <a:prstGeom prst="bentConnector3">
+            <a:avLst>
+              <a:gd name="adj1" fmla="val 50000"/>
+            </a:avLst>
+          </a:prstGeom>
+          <a:ln w="19050">
+            <a:solidFill>
+              <a:schemeClr val="accent6">
+                <a:lumMod val="75000"/>
+              </a:schemeClr>
+            </a:solidFill>
+            <a:prstDash val="sysDot"/>
+            <a:headEnd type="none" w="med" len="med"/>
+            <a:tailEnd type="arrow" w="med" len="med"/>
+          </a:ln>
+          <a:effectLst/>
+        </p:spPr>
+        <p:style>
+          <a:lnRef idx="1">
+            <a:schemeClr val="accent2"/>
+          </a:lnRef>
+          <a:fillRef idx="2">
+            <a:schemeClr val="accent2"/>
+          </a:fillRef>
+          <a:effectRef idx="1">
+            <a:schemeClr val="accent2"/>
+          </a:effectRef>
+          <a:fontRef idx="minor">
+            <a:schemeClr val="dk1"/>
+          </a:fontRef>
+        </p:style>
+      </p:cxnSp>
+      <p:sp>
+        <p:nvSpPr>
+          <p:cNvPr id="32" name="Rectangle 8"/>
+          <p:cNvSpPr/>
+          <p:nvPr/>
+        </p:nvSpPr>
+        <p:spPr>
+          <a:xfrm>
+            <a:off x="4639443" y="3733800"/>
+            <a:ext cx="1169835" cy="346760"/>
           </a:xfrm>
           <a:prstGeom prst="rect">
             <a:avLst/>
@@ -16756,7 +16473,7 @@
                   </a:schemeClr>
                 </a:solidFill>
               </a:rPr>
-              <a:t>XmlAdaptedPerson</a:t>
+              <a:t>XmlAliasStorage</a:t>
             </a:r>
             <a:endParaRPr lang="en-SG" sz="1050" b="1" dirty="0">
               <a:solidFill>
@@ -16768,18 +16485,156 @@
           </a:p>
         </p:txBody>
       </p:sp>
+      <p:sp>
+        <p:nvSpPr>
+          <p:cNvPr id="33" name="Rectangle 32"/>
+          <p:cNvSpPr/>
+          <p:nvPr/>
+        </p:nvSpPr>
+        <p:spPr>
+          <a:xfrm>
+            <a:off x="6037878" y="3735770"/>
+            <a:ext cx="1200707" cy="346760"/>
+          </a:xfrm>
+          <a:prstGeom prst="rect">
+            <a:avLst/>
+          </a:prstGeom>
+          <a:ln w="19050"/>
+          <a:effectLst/>
+        </p:spPr>
+        <p:style>
+          <a:lnRef idx="1">
+            <a:schemeClr val="accent6"/>
+          </a:lnRef>
+          <a:fillRef idx="2">
+            <a:schemeClr val="accent6"/>
+          </a:fillRef>
+          <a:effectRef idx="1">
+            <a:schemeClr val="accent6"/>
+          </a:effectRef>
+          <a:fontRef idx="minor">
+            <a:schemeClr val="dk1"/>
+          </a:fontRef>
+        </p:style>
+        <p:txBody>
+          <a:bodyPr rtlCol="0" anchor="ctr"/>
+          <a:lstStyle/>
+          <a:p>
+            <a:pPr algn="ctr"/>
+            <a:r>
+              <a:rPr lang="en-US" sz="1050" b="1" dirty="0" err="1" smtClean="0">
+                <a:solidFill>
+                  <a:schemeClr val="accent6">
+                    <a:lumMod val="75000"/>
+                  </a:schemeClr>
+                </a:solidFill>
+              </a:rPr>
+              <a:t>XmlSerializable</a:t>
+            </a:r>
+            <a:r>
+              <a:rPr lang="en-US" sz="1050" b="1" dirty="0" smtClean="0">
+                <a:solidFill>
+                  <a:schemeClr val="accent6">
+                    <a:lumMod val="75000"/>
+                  </a:schemeClr>
+                </a:solidFill>
+              </a:rPr>
+              <a:t/>
+            </a:r>
+            <a:br>
+              <a:rPr lang="en-US" sz="1050" b="1" dirty="0" smtClean="0">
+                <a:solidFill>
+                  <a:schemeClr val="accent6">
+                    <a:lumMod val="75000"/>
+                  </a:schemeClr>
+                </a:solidFill>
+              </a:rPr>
+            </a:br>
+            <a:r>
+              <a:rPr lang="en-US" sz="1050" b="1" dirty="0" smtClean="0">
+                <a:solidFill>
+                  <a:schemeClr val="accent6">
+                    <a:lumMod val="75000"/>
+                  </a:schemeClr>
+                </a:solidFill>
+              </a:rPr>
+              <a:t>Alias</a:t>
+            </a:r>
+            <a:endParaRPr lang="en-SG" sz="1050" b="1" dirty="0">
+              <a:solidFill>
+                <a:schemeClr val="accent6">
+                  <a:lumMod val="75000"/>
+                </a:schemeClr>
+              </a:solidFill>
+            </a:endParaRPr>
+          </a:p>
+        </p:txBody>
+      </p:sp>
+      <p:sp>
+        <p:nvSpPr>
+          <p:cNvPr id="34" name="Rectangle 8"/>
+          <p:cNvSpPr/>
+          <p:nvPr/>
+        </p:nvSpPr>
+        <p:spPr>
+          <a:xfrm>
+            <a:off x="7633816" y="3734984"/>
+            <a:ext cx="1259718" cy="346760"/>
+          </a:xfrm>
+          <a:prstGeom prst="rect">
+            <a:avLst/>
+          </a:prstGeom>
+          <a:ln w="19050"/>
+          <a:effectLst/>
+        </p:spPr>
+        <p:style>
+          <a:lnRef idx="1">
+            <a:schemeClr val="accent6"/>
+          </a:lnRef>
+          <a:fillRef idx="2">
+            <a:schemeClr val="accent6"/>
+          </a:fillRef>
+          <a:effectRef idx="1">
+            <a:schemeClr val="accent6"/>
+          </a:effectRef>
+          <a:fontRef idx="minor">
+            <a:schemeClr val="dk1"/>
+          </a:fontRef>
+        </p:style>
+        <p:txBody>
+          <a:bodyPr rtlCol="0" anchor="ctr"/>
+          <a:lstStyle/>
+          <a:p>
+            <a:pPr algn="ctr"/>
+            <a:r>
+              <a:rPr lang="en-US" sz="1050" b="1" dirty="0" err="1" smtClean="0">
+                <a:solidFill>
+                  <a:schemeClr val="accent6">
+                    <a:lumMod val="75000"/>
+                  </a:schemeClr>
+                </a:solidFill>
+              </a:rPr>
+              <a:t>XmlAdaptedAlias</a:t>
+            </a:r>
+            <a:endParaRPr lang="en-SG" sz="1050" b="1" dirty="0">
+              <a:solidFill>
+                <a:schemeClr val="accent6">
+                  <a:lumMod val="75000"/>
+                </a:schemeClr>
+              </a:solidFill>
+            </a:endParaRPr>
+          </a:p>
+        </p:txBody>
+      </p:sp>
       <p:cxnSp>
         <p:nvCxnSpPr>
-          <p:cNvPr id="77" name="Elbow Connector 122"/>
-          <p:cNvCxnSpPr>
-            <a:stCxn id="66" idx="3"/>
-            <a:endCxn id="74" idx="1"/>
-          </p:cNvCxnSpPr>
+          <p:cNvPr id="35" name="Elbow Connector 122"/>
+          <p:cNvCxnSpPr/>
           <p:nvPr/>
         </p:nvCxnSpPr>
         <p:spPr>
           <a:xfrm flipV="1">
-            <a:off x="7220507" y="3333004"/>
+            <a:off x="7238585" y="3908364"/>
             <a:ext cx="395231" cy="786"/>
           </a:xfrm>
           <a:prstGeom prst="bentConnector3">
@@ -16826,36 +16681,6 @@
       </p:par>
     </p:tnLst>
   </p:timing>
-</p:sld>
-</file>
-
-<file path=ppt/slides/slide9.xml><?xml version="1.0" encoding="utf-8"?>
-<p:sld xmlns:a="http://schemas.openxmlformats.org/drawingml/2006/main" xmlns:r="http://schemas.openxmlformats.org/officeDocument/2006/relationships" xmlns:p="http://schemas.openxmlformats.org/presentationml/2006/main">
-  <p:cSld>
-    <p:spTree>
-      <p:nvGrpSpPr>
-        <p:cNvPr id="1" name=""/>
-        <p:cNvGrpSpPr/>
-        <p:nvPr/>
-      </p:nvGrpSpPr>
-      <p:grpSpPr>
-        <a:xfrm>
-          <a:off x="0" y="0"/>
-          <a:ext cx="0" cy="0"/>
-          <a:chOff x="0" y="0"/>
-          <a:chExt cx="0" cy="0"/>
-        </a:xfrm>
-      </p:grpSpPr>
-    </p:spTree>
-    <p:extLst>
-      <p:ext uri="{BB962C8B-B14F-4D97-AF65-F5344CB8AC3E}">
-        <p14:creationId xmlns:p14="http://schemas.microsoft.com/office/powerpoint/2010/main" val="2978036214"/>
-      </p:ext>
-    </p:extLst>
-  </p:cSld>
-  <p:clrMapOvr>
-    <a:masterClrMapping/>
-  </p:clrMapOvr>
 </p:sld>
 </file>
 

</xml_diff>

<commit_message>
[DevGuide] Fix Images for Developer Guide
</commit_message>
<xml_diff>
--- a/docs/diagrams/Diagrams.pptx
+++ b/docs/diagrams/Diagrams.pptx
@@ -215,7 +215,7 @@
           <a:p>
             <a:fld id="{F5CC4B3F-88C1-4FFA-B1B6-F41C21DC6924}" type="datetimeFigureOut">
               <a:rPr lang="en-US" smtClean="0"/>
-              <a:t>10/18/16</a:t>
+              <a:t>10/19/16</a:t>
             </a:fld>
             <a:endParaRPr lang="en-US"/>
           </a:p>
@@ -664,7 +664,7 @@
           <a:p>
             <a:fld id="{78C97017-6FC3-485B-9764-EAC9E56C1D49}" type="datetimeFigureOut">
               <a:rPr lang="en-US" smtClean="0"/>
-              <a:t>10/18/16</a:t>
+              <a:t>10/19/16</a:t>
             </a:fld>
             <a:endParaRPr lang="en-US"/>
           </a:p>
@@ -834,7 +834,7 @@
           <a:p>
             <a:fld id="{78C97017-6FC3-485B-9764-EAC9E56C1D49}" type="datetimeFigureOut">
               <a:rPr lang="en-US" smtClean="0"/>
-              <a:t>10/18/16</a:t>
+              <a:t>10/19/16</a:t>
             </a:fld>
             <a:endParaRPr lang="en-US"/>
           </a:p>
@@ -1014,7 +1014,7 @@
           <a:p>
             <a:fld id="{78C97017-6FC3-485B-9764-EAC9E56C1D49}" type="datetimeFigureOut">
               <a:rPr lang="en-US" smtClean="0"/>
-              <a:t>10/18/16</a:t>
+              <a:t>10/19/16</a:t>
             </a:fld>
             <a:endParaRPr lang="en-US"/>
           </a:p>
@@ -1184,7 +1184,7 @@
           <a:p>
             <a:fld id="{78C97017-6FC3-485B-9764-EAC9E56C1D49}" type="datetimeFigureOut">
               <a:rPr lang="en-US" smtClean="0"/>
-              <a:t>10/18/16</a:t>
+              <a:t>10/19/16</a:t>
             </a:fld>
             <a:endParaRPr lang="en-US"/>
           </a:p>
@@ -1430,7 +1430,7 @@
           <a:p>
             <a:fld id="{78C97017-6FC3-485B-9764-EAC9E56C1D49}" type="datetimeFigureOut">
               <a:rPr lang="en-US" smtClean="0"/>
-              <a:t>10/18/16</a:t>
+              <a:t>10/19/16</a:t>
             </a:fld>
             <a:endParaRPr lang="en-US"/>
           </a:p>
@@ -1718,7 +1718,7 @@
           <a:p>
             <a:fld id="{78C97017-6FC3-485B-9764-EAC9E56C1D49}" type="datetimeFigureOut">
               <a:rPr lang="en-US" smtClean="0"/>
-              <a:t>10/18/16</a:t>
+              <a:t>10/19/16</a:t>
             </a:fld>
             <a:endParaRPr lang="en-US"/>
           </a:p>
@@ -2140,7 +2140,7 @@
           <a:p>
             <a:fld id="{78C97017-6FC3-485B-9764-EAC9E56C1D49}" type="datetimeFigureOut">
               <a:rPr lang="en-US" smtClean="0"/>
-              <a:t>10/18/16</a:t>
+              <a:t>10/19/16</a:t>
             </a:fld>
             <a:endParaRPr lang="en-US"/>
           </a:p>
@@ -2258,7 +2258,7 @@
           <a:p>
             <a:fld id="{78C97017-6FC3-485B-9764-EAC9E56C1D49}" type="datetimeFigureOut">
               <a:rPr lang="en-US" smtClean="0"/>
-              <a:t>10/18/16</a:t>
+              <a:t>10/19/16</a:t>
             </a:fld>
             <a:endParaRPr lang="en-US"/>
           </a:p>
@@ -2353,7 +2353,7 @@
           <a:p>
             <a:fld id="{78C97017-6FC3-485B-9764-EAC9E56C1D49}" type="datetimeFigureOut">
               <a:rPr lang="en-US" smtClean="0"/>
-              <a:t>10/18/16</a:t>
+              <a:t>10/19/16</a:t>
             </a:fld>
             <a:endParaRPr lang="en-US"/>
           </a:p>
@@ -2630,7 +2630,7 @@
           <a:p>
             <a:fld id="{78C97017-6FC3-485B-9764-EAC9E56C1D49}" type="datetimeFigureOut">
               <a:rPr lang="en-US" smtClean="0"/>
-              <a:t>10/18/16</a:t>
+              <a:t>10/19/16</a:t>
             </a:fld>
             <a:endParaRPr lang="en-US"/>
           </a:p>
@@ -2883,7 +2883,7 @@
           <a:p>
             <a:fld id="{78C97017-6FC3-485B-9764-EAC9E56C1D49}" type="datetimeFigureOut">
               <a:rPr lang="en-US" smtClean="0"/>
-              <a:t>10/18/16</a:t>
+              <a:t>10/19/16</a:t>
             </a:fld>
             <a:endParaRPr lang="en-US"/>
           </a:p>
@@ -3101,7 +3101,7 @@
           <a:p>
             <a:fld id="{78C97017-6FC3-485B-9764-EAC9E56C1D49}" type="datetimeFigureOut">
               <a:rPr lang="en-US" smtClean="0"/>
-              <a:t>10/18/16</a:t>
+              <a:t>10/19/16</a:t>
             </a:fld>
             <a:endParaRPr lang="en-US"/>
           </a:p>
@@ -5581,7 +5581,7 @@
         <p:spPr>
           <a:xfrm>
             <a:off x="2166172" y="1453379"/>
-            <a:ext cx="1424846" cy="215444"/>
+            <a:ext cx="1424846" cy="184666"/>
           </a:xfrm>
           <a:prstGeom prst="rect">
             <a:avLst/>
@@ -5595,14 +5595,14 @@
           <a:lstStyle/>
           <a:p>
             <a:r>
-              <a:rPr lang="en-US" sz="1400" dirty="0" smtClean="0">
+              <a:rPr lang="en-US" sz="1200" dirty="0" smtClean="0">
                 <a:solidFill>
                   <a:srgbClr val="0070C0"/>
                 </a:solidFill>
               </a:rPr>
               <a:t>execute(“delete 1”)</a:t>
             </a:r>
-            <a:endParaRPr lang="en-US" sz="1400" dirty="0">
+            <a:endParaRPr lang="en-US" sz="1200" dirty="0">
               <a:solidFill>
                 <a:srgbClr val="0070C0"/>
               </a:solidFill>
@@ -5654,7 +5654,7 @@
         </p:nvSpPr>
         <p:spPr>
           <a:xfrm>
-            <a:off x="4299772" y="1542583"/>
+            <a:off x="4442554" y="1542583"/>
             <a:ext cx="1424846" cy="215444"/>
           </a:xfrm>
           <a:prstGeom prst="rect">
@@ -5669,7 +5669,7 @@
           <a:lstStyle/>
           <a:p>
             <a:r>
-              <a:rPr lang="en-US" sz="1400" dirty="0" err="1" smtClean="0">
+              <a:rPr lang="en-US" sz="1200" dirty="0" err="1" smtClean="0">
                 <a:solidFill>
                   <a:srgbClr val="7030A0"/>
                 </a:solidFill>
@@ -5677,7 +5677,7 @@
               <a:t>deleteTask</a:t>
             </a:r>
             <a:r>
-              <a:rPr lang="en-US" sz="1400" dirty="0" smtClean="0">
+              <a:rPr lang="en-US" sz="1200" dirty="0" smtClean="0">
                 <a:solidFill>
                   <a:srgbClr val="7030A0"/>
                 </a:solidFill>
@@ -5708,8 +5708,8 @@
         </p:nvSpPr>
         <p:spPr>
           <a:xfrm>
-            <a:off x="6074030" y="1687656"/>
-            <a:ext cx="2438400" cy="215444"/>
+            <a:off x="6177905" y="1725165"/>
+            <a:ext cx="2688970" cy="184666"/>
           </a:xfrm>
           <a:prstGeom prst="rect">
             <a:avLst/>
@@ -5723,7 +5723,7 @@
           <a:lstStyle/>
           <a:p>
             <a:r>
-              <a:rPr lang="en-US" sz="1400" dirty="0" smtClean="0">
+              <a:rPr lang="en-US" sz="1200" dirty="0" smtClean="0">
                 <a:solidFill>
                   <a:schemeClr val="accent5">
                     <a:lumMod val="75000"/>
@@ -5733,7 +5733,7 @@
               <a:t>post(</a:t>
             </a:r>
             <a:r>
-              <a:rPr lang="en-US" sz="1400" dirty="0" err="1" smtClean="0">
+              <a:rPr lang="en-US" sz="1200" dirty="0" err="1" smtClean="0">
                 <a:solidFill>
                   <a:schemeClr val="accent5">
                     <a:lumMod val="75000"/>
@@ -5743,7 +5743,7 @@
               <a:t>TaskManagerChangedEvent</a:t>
             </a:r>
             <a:r>
-              <a:rPr lang="en-US" sz="1400" dirty="0" smtClean="0">
+              <a:rPr lang="en-US" sz="1200" dirty="0" smtClean="0">
                 <a:solidFill>
                   <a:schemeClr val="accent5">
                     <a:lumMod val="75000"/>
@@ -5752,7 +5752,7 @@
               </a:rPr>
               <a:t>)</a:t>
             </a:r>
-            <a:endParaRPr lang="en-US" sz="1400" dirty="0">
+            <a:endParaRPr lang="en-US" sz="1200" dirty="0">
               <a:solidFill>
                 <a:schemeClr val="accent5">
                   <a:lumMod val="75000"/>
@@ -6282,8 +6282,8 @@
         </p:nvSpPr>
         <p:spPr>
           <a:xfrm>
-            <a:off x="1810094" y="4797674"/>
-            <a:ext cx="2716635" cy="215444"/>
+            <a:off x="1855365" y="4876800"/>
+            <a:ext cx="2716635" cy="184666"/>
           </a:xfrm>
           <a:prstGeom prst="rect">
             <a:avLst/>
@@ -6297,7 +6297,7 @@
           <a:lstStyle/>
           <a:p>
             <a:r>
-              <a:rPr lang="en-US" sz="1400" dirty="0" smtClean="0">
+              <a:rPr lang="en-US" sz="1200" dirty="0" smtClean="0">
                 <a:solidFill>
                   <a:schemeClr val="accent5">
                     <a:lumMod val="75000"/>
@@ -6307,7 +6307,7 @@
               <a:t>post(</a:t>
             </a:r>
             <a:r>
-              <a:rPr lang="en-US" sz="1400" dirty="0" err="1" smtClean="0">
+              <a:rPr lang="en-US" sz="1200" dirty="0" err="1" smtClean="0">
                 <a:solidFill>
                   <a:schemeClr val="accent5">
                     <a:lumMod val="75000"/>
@@ -6317,7 +6317,7 @@
               <a:t>TaskManagerChangedEvent</a:t>
             </a:r>
             <a:r>
-              <a:rPr lang="en-US" sz="1400" dirty="0" smtClean="0">
+              <a:rPr lang="en-US" sz="1200" dirty="0" smtClean="0">
                 <a:solidFill>
                   <a:schemeClr val="accent5">
                     <a:lumMod val="75000"/>
@@ -6326,7 +6326,7 @@
               </a:rPr>
               <a:t>)</a:t>
             </a:r>
-            <a:endParaRPr lang="en-US" sz="1400" dirty="0">
+            <a:endParaRPr lang="en-US" sz="1200" dirty="0">
               <a:solidFill>
                 <a:schemeClr val="accent5">
                   <a:lumMod val="75000"/>
@@ -6664,8 +6664,8 @@
         </p:nvSpPr>
         <p:spPr>
           <a:xfrm>
-            <a:off x="5036330" y="5065911"/>
-            <a:ext cx="2659870" cy="215444"/>
+            <a:off x="5036330" y="5149334"/>
+            <a:ext cx="2659870" cy="184666"/>
           </a:xfrm>
           <a:prstGeom prst="rect">
             <a:avLst/>
@@ -6679,7 +6679,7 @@
           <a:lstStyle/>
           <a:p>
             <a:r>
-              <a:rPr lang="en-US" sz="1400" dirty="0" err="1" smtClean="0">
+              <a:rPr lang="en-US" sz="1200" dirty="0" err="1" smtClean="0">
                 <a:solidFill>
                   <a:schemeClr val="accent6">
                     <a:lumMod val="75000"/>
@@ -6689,7 +6689,7 @@
               <a:t>handle</a:t>
             </a:r>
             <a:r>
-              <a:rPr lang="en-US" sz="1400" dirty="0" err="1">
+              <a:rPr lang="en-US" sz="1200" dirty="0" err="1">
                 <a:solidFill>
                   <a:schemeClr val="accent6">
                     <a:lumMod val="75000"/>
@@ -6699,7 +6699,7 @@
               <a:t>TaskManager</a:t>
             </a:r>
             <a:r>
-              <a:rPr lang="en-US" sz="1400" dirty="0" err="1" smtClean="0">
+              <a:rPr lang="en-US" sz="1200" dirty="0" err="1" smtClean="0">
                 <a:solidFill>
                   <a:schemeClr val="accent6">
                     <a:lumMod val="75000"/>
@@ -6709,7 +6709,7 @@
               <a:t>ChangedEvent</a:t>
             </a:r>
             <a:r>
-              <a:rPr lang="en-US" sz="1400" dirty="0" smtClean="0">
+              <a:rPr lang="en-US" sz="1200" dirty="0" smtClean="0">
                 <a:solidFill>
                   <a:schemeClr val="accent6">
                     <a:lumMod val="75000"/>
@@ -6718,7 +6718,7 @@
               </a:rPr>
               <a:t>()</a:t>
             </a:r>
-            <a:endParaRPr lang="en-US" sz="1400" dirty="0">
+            <a:endParaRPr lang="en-US" sz="1200" dirty="0">
               <a:solidFill>
                 <a:schemeClr val="accent6">
                   <a:lumMod val="75000"/>
@@ -6997,8 +6997,8 @@
         </p:nvSpPr>
         <p:spPr>
           <a:xfrm>
-            <a:off x="1416276" y="5395369"/>
-            <a:ext cx="2659870" cy="215444"/>
+            <a:off x="1531130" y="5454134"/>
+            <a:ext cx="2659870" cy="184666"/>
           </a:xfrm>
           <a:prstGeom prst="rect">
             <a:avLst/>
@@ -7012,7 +7012,7 @@
           <a:lstStyle/>
           <a:p>
             <a:r>
-              <a:rPr lang="en-US" sz="1400" dirty="0" err="1" smtClean="0">
+              <a:rPr lang="en-US" sz="1200" dirty="0" err="1" smtClean="0">
                 <a:solidFill>
                   <a:srgbClr val="00B050"/>
                 </a:solidFill>
@@ -7020,14 +7020,14 @@
               <a:t>handleTaskManagerChangedEvent</a:t>
             </a:r>
             <a:r>
-              <a:rPr lang="en-US" sz="1400" dirty="0" smtClean="0">
+              <a:rPr lang="en-US" sz="1200" dirty="0" smtClean="0">
                 <a:solidFill>
                   <a:srgbClr val="00B050"/>
                 </a:solidFill>
               </a:rPr>
               <a:t>()</a:t>
             </a:r>
-            <a:endParaRPr lang="en-US" sz="1400" dirty="0">
+            <a:endParaRPr lang="en-US" sz="1200" dirty="0">
               <a:solidFill>
                 <a:srgbClr val="00B050"/>
               </a:solidFill>
@@ -9512,17 +9512,7 @@
                   </a:schemeClr>
                 </a:solidFill>
               </a:rPr>
-              <a:t>Alias</a:t>
-            </a:r>
-            <a:r>
-              <a:rPr lang="en-US" sz="1050" b="1" dirty="0" err="1" smtClean="0">
-                <a:solidFill>
-                  <a:schemeClr val="accent3">
-                    <a:lumMod val="75000"/>
-                  </a:schemeClr>
-                </a:solidFill>
-              </a:rPr>
-              <a:t>ListPanel</a:t>
+              <a:t>AliasListPanel</a:t>
             </a:r>
             <a:endParaRPr lang="en-SG" sz="1050" b="1" dirty="0">
               <a:solidFill>
@@ -9582,17 +9572,7 @@
                   </a:schemeClr>
                 </a:solidFill>
               </a:rPr>
-              <a:t>Alias</a:t>
-            </a:r>
-            <a:r>
-              <a:rPr lang="en-US" sz="1050" b="1" dirty="0" err="1" smtClean="0">
-                <a:solidFill>
-                  <a:schemeClr val="accent3">
-                    <a:lumMod val="75000"/>
-                  </a:schemeClr>
-                </a:solidFill>
-              </a:rPr>
-              <a:t>Card</a:t>
+              <a:t>AliasCard</a:t>
             </a:r>
             <a:endParaRPr lang="en-SG" sz="1050" b="1" dirty="0">
               <a:solidFill>
@@ -9690,17 +9670,7 @@
                   </a:schemeClr>
                 </a:solidFill>
               </a:rPr>
-              <a:t>Alias</a:t>
-            </a:r>
-            <a:r>
-              <a:rPr lang="en-US" sz="1050" b="1" dirty="0" err="1" smtClean="0">
-                <a:solidFill>
-                  <a:schemeClr val="accent3">
-                    <a:lumMod val="75000"/>
-                  </a:schemeClr>
-                </a:solidFill>
-              </a:rPr>
-              <a:t>Window</a:t>
+              <a:t>AliasWindow</a:t>
             </a:r>
             <a:endParaRPr lang="en-SG" sz="1050" b="1" dirty="0">
               <a:solidFill>
@@ -12425,8 +12395,8 @@
         </p:nvSpPr>
         <p:spPr>
           <a:xfrm>
-            <a:off x="152400" y="2743200"/>
-            <a:ext cx="1424846" cy="215444"/>
+            <a:off x="76200" y="2819400"/>
+            <a:ext cx="1424846" cy="184666"/>
           </a:xfrm>
           <a:prstGeom prst="rect">
             <a:avLst/>
@@ -12441,14 +12411,14 @@
           <a:p>
             <a:pPr algn="r"/>
             <a:r>
-              <a:rPr lang="en-US" sz="1400" dirty="0" smtClean="0">
+              <a:rPr lang="en-US" sz="1200" dirty="0" smtClean="0">
                 <a:solidFill>
                   <a:srgbClr val="0070C0"/>
                 </a:solidFill>
               </a:rPr>
               <a:t>execute(“delete 1”)</a:t>
             </a:r>
-            <a:endParaRPr lang="en-US" sz="1400" dirty="0">
+            <a:endParaRPr lang="en-US" sz="1200" dirty="0">
               <a:solidFill>
                 <a:srgbClr val="0070C0"/>
               </a:solidFill>
@@ -12502,8 +12472,8 @@
         </p:nvSpPr>
         <p:spPr>
           <a:xfrm>
-            <a:off x="4419600" y="4251556"/>
-            <a:ext cx="855809" cy="215444"/>
+            <a:off x="4343400" y="4311134"/>
+            <a:ext cx="855809" cy="184666"/>
           </a:xfrm>
           <a:prstGeom prst="rect">
             <a:avLst/>
@@ -12528,7 +12498,7 @@
           </a:lstStyle>
           <a:p>
             <a:r>
-              <a:rPr lang="en-US" dirty="0"/>
+              <a:rPr lang="en-US" sz="1200" dirty="0"/>
               <a:t>execute()</a:t>
             </a:r>
           </a:p>
@@ -13016,8 +12986,8 @@
         </p:nvSpPr>
         <p:spPr>
           <a:xfrm>
-            <a:off x="6858000" y="4278848"/>
-            <a:ext cx="1424846" cy="215444"/>
+            <a:off x="6786723" y="4311134"/>
+            <a:ext cx="1424846" cy="184666"/>
           </a:xfrm>
           <a:prstGeom prst="rect">
             <a:avLst/>
@@ -13042,7 +13012,7 @@
           </a:lstStyle>
           <a:p>
             <a:r>
-              <a:rPr lang="en-US" dirty="0" err="1" smtClean="0">
+              <a:rPr lang="en-US" sz="1200" dirty="0" err="1" smtClean="0">
                 <a:solidFill>
                   <a:srgbClr val="7030A0"/>
                 </a:solidFill>
@@ -13050,22 +13020,14 @@
               <a:t>deleteTask</a:t>
             </a:r>
             <a:r>
-              <a:rPr lang="en-US" dirty="0" smtClean="0">
+              <a:rPr lang="en-US" sz="1200" dirty="0" smtClean="0">
                 <a:solidFill>
                   <a:srgbClr val="7030A0"/>
                 </a:solidFill>
               </a:rPr>
-              <a:t>(p</a:t>
-            </a:r>
-            <a:r>
-              <a:rPr lang="en-US" dirty="0" smtClean="0">
-                <a:solidFill>
-                  <a:srgbClr val="7030A0"/>
-                </a:solidFill>
-              </a:rPr>
-              <a:t>)</a:t>
-            </a:r>
-            <a:endParaRPr lang="en-US" dirty="0">
+              <a:t>(p)</a:t>
+            </a:r>
+            <a:endParaRPr lang="en-US" sz="1200" dirty="0">
               <a:solidFill>
                 <a:srgbClr val="7030A0"/>
               </a:solidFill>
@@ -13081,8 +13043,8 @@
         </p:nvSpPr>
         <p:spPr>
           <a:xfrm>
-            <a:off x="4191000" y="2996259"/>
-            <a:ext cx="640023" cy="215444"/>
+            <a:off x="4114800" y="3015734"/>
+            <a:ext cx="640023" cy="184666"/>
           </a:xfrm>
           <a:prstGeom prst="rect">
             <a:avLst/>
@@ -13107,10 +13069,10 @@
           </a:lstStyle>
           <a:p>
             <a:r>
-              <a:rPr lang="en-US" dirty="0" smtClean="0"/>
+              <a:rPr lang="en-US" sz="1200" dirty="0" smtClean="0"/>
               <a:t>create()</a:t>
             </a:r>
-            <a:endParaRPr lang="en-US" dirty="0"/>
+            <a:endParaRPr lang="en-US" sz="1200" dirty="0"/>
           </a:p>
         </p:txBody>
       </p:sp>
@@ -13122,8 +13084,8 @@
         </p:nvSpPr>
         <p:spPr>
           <a:xfrm>
-            <a:off x="2131905" y="2850922"/>
-            <a:ext cx="1424846" cy="215444"/>
+            <a:off x="2107569" y="2910441"/>
+            <a:ext cx="1424846" cy="184666"/>
           </a:xfrm>
           <a:prstGeom prst="rect">
             <a:avLst/>
@@ -13148,10 +13110,10 @@
           </a:lstStyle>
           <a:p>
             <a:r>
-              <a:rPr lang="en-US" dirty="0" smtClean="0"/>
+              <a:rPr lang="en-US" sz="1200" dirty="0" smtClean="0"/>
               <a:t>parse(“delete 1”)</a:t>
             </a:r>
-            <a:endParaRPr lang="en-US" dirty="0"/>
+            <a:endParaRPr lang="en-US" sz="1200" dirty="0"/>
           </a:p>
         </p:txBody>
       </p:sp>
@@ -13163,8 +13125,8 @@
         </p:nvSpPr>
         <p:spPr>
           <a:xfrm>
-            <a:off x="3101175" y="5430096"/>
-            <a:ext cx="621216" cy="215444"/>
+            <a:off x="3101175" y="5454134"/>
+            <a:ext cx="621216" cy="184666"/>
           </a:xfrm>
           <a:prstGeom prst="rect">
             <a:avLst/>
@@ -13189,10 +13151,10 @@
           </a:lstStyle>
           <a:p>
             <a:r>
-              <a:rPr lang="en-US" dirty="0" smtClean="0"/>
+              <a:rPr lang="en-US" sz="1200" dirty="0" smtClean="0"/>
               <a:t>result</a:t>
             </a:r>
-            <a:endParaRPr lang="en-US" dirty="0"/>
+            <a:endParaRPr lang="en-US" sz="1200" dirty="0"/>
           </a:p>
         </p:txBody>
       </p:sp>
@@ -13204,8 +13166,8 @@
         </p:nvSpPr>
         <p:spPr>
           <a:xfrm>
-            <a:off x="762001" y="5538488"/>
-            <a:ext cx="762000" cy="215444"/>
+            <a:off x="678782" y="5585914"/>
+            <a:ext cx="762000" cy="184666"/>
           </a:xfrm>
           <a:prstGeom prst="rect">
             <a:avLst/>
@@ -13230,10 +13192,10 @@
           </a:lstStyle>
           <a:p>
             <a:r>
-              <a:rPr lang="en-US" dirty="0" smtClean="0"/>
+              <a:rPr lang="en-US" sz="1200" dirty="0" smtClean="0"/>
               <a:t>result</a:t>
             </a:r>
-            <a:endParaRPr lang="en-US" dirty="0"/>
+            <a:endParaRPr lang="en-US" sz="1200" dirty="0"/>
           </a:p>
         </p:txBody>
       </p:sp>
@@ -14443,7 +14405,7 @@
           <a:p>
             <a:pPr algn="ctr"/>
             <a:r>
-              <a:rPr lang="en-US" sz="1050" dirty="0" smtClean="0">
+              <a:rPr lang="en-US" sz="1050" dirty="0">
                 <a:solidFill>
                   <a:srgbClr val="7030A0"/>
                 </a:solidFill>
@@ -14451,27 +14413,19 @@
               <a:t>&lt;&lt;interface&gt;&gt;</a:t>
             </a:r>
             <a:br>
-              <a:rPr lang="en-US" sz="1050" dirty="0" smtClean="0">
+              <a:rPr lang="en-US" sz="1050" dirty="0">
                 <a:solidFill>
                   <a:srgbClr val="7030A0"/>
                 </a:solidFill>
               </a:rPr>
             </a:br>
             <a:r>
-              <a:rPr lang="en-US" sz="1050" dirty="0" err="1" smtClean="0">
+              <a:rPr lang="en-US" sz="1050" dirty="0" err="1">
                 <a:solidFill>
                   <a:srgbClr val="7030A0"/>
                 </a:solidFill>
               </a:rPr>
-              <a:t>Favortible</a:t>
-            </a:r>
-            <a:r>
-              <a:rPr lang="en-US" sz="1050" dirty="0" err="1" smtClean="0">
-                <a:solidFill>
-                  <a:srgbClr val="7030A0"/>
-                </a:solidFill>
-              </a:rPr>
-              <a:t>Task</a:t>
+              <a:t>FavoritableTask</a:t>
             </a:r>
             <a:endParaRPr lang="en-SG" sz="1050" dirty="0">
               <a:solidFill>
@@ -14753,9 +14707,9 @@
           <p:nvPr/>
         </p:nvSpPr>
         <p:spPr>
-          <a:xfrm rot="16200000">
-            <a:off x="6715778" y="3529469"/>
-            <a:ext cx="840856" cy="261610"/>
+          <a:xfrm>
+            <a:off x="6931544" y="3544928"/>
+            <a:ext cx="840856" cy="246221"/>
           </a:xfrm>
           <a:prstGeom prst="rect">
             <a:avLst/>
@@ -14769,14 +14723,14 @@
           <a:lstStyle/>
           <a:p>
             <a:r>
-              <a:rPr lang="en-US" sz="1100" dirty="0" smtClean="0">
+              <a:rPr lang="en-US" sz="1000" dirty="0" smtClean="0">
                 <a:solidFill>
                   <a:srgbClr val="7030A0"/>
                 </a:solidFill>
               </a:rPr>
               <a:t>Filtered list</a:t>
             </a:r>
-            <a:endParaRPr lang="en-US" sz="1100" dirty="0">
+            <a:endParaRPr lang="en-US" sz="1000" dirty="0">
               <a:solidFill>
                 <a:srgbClr val="7030A0"/>
               </a:solidFill>
@@ -16177,15 +16131,7 @@
                   <a:schemeClr val="bg1"/>
                 </a:solidFill>
               </a:rPr>
-              <a:t>Alias</a:t>
-            </a:r>
-            <a:r>
-              <a:rPr lang="en-US" sz="1050" dirty="0" err="1" smtClean="0">
-                <a:solidFill>
-                  <a:schemeClr val="bg1"/>
-                </a:solidFill>
-              </a:rPr>
-              <a:t>Storage</a:t>
+              <a:t>AliasStorage</a:t>
             </a:r>
             <a:endParaRPr lang="en-SG" sz="1050" dirty="0">
               <a:solidFill>

</xml_diff>

<commit_message>
Update Model Picture in ModelClassDiagram
</commit_message>
<xml_diff>
--- a/docs/diagrams/Diagrams.pptx
+++ b/docs/diagrams/Diagrams.pptx
@@ -200,7 +200,8 @@
           <a:p>
             <a:fld id="{F5CC4B3F-88C1-4FFA-B1B6-F41C21DC6924}" type="datetimeFigureOut">
               <a:rPr lang="en-US" smtClean="0"/>
-              <a:t>9/30/2016</a:t>
+              <a:pPr/>
+              <a:t>10/19/2016</a:t>
             </a:fld>
             <a:endParaRPr lang="en-US"/>
           </a:p>
@@ -359,6 +360,7 @@
           <a:p>
             <a:fld id="{5A7AB025-77E3-4BD1-A2FD-B3183DBA47A3}" type="slidenum">
               <a:rPr lang="en-US" smtClean="0"/>
+              <a:pPr/>
               <a:t>‹#›</a:t>
             </a:fld>
             <a:endParaRPr lang="en-US"/>
@@ -368,7 +370,7 @@
     </p:spTree>
     <p:extLst>
       <p:ext uri="{BB962C8B-B14F-4D97-AF65-F5344CB8AC3E}">
-        <p14:creationId xmlns:p14="http://schemas.microsoft.com/office/powerpoint/2010/main" val="2023976206"/>
+        <p14:creationId xmlns:p14="http://schemas.microsoft.com/office/powerpoint/2010/main" xmlns="" val="2023976206"/>
       </p:ext>
     </p:extLst>
   </p:cSld>
@@ -649,7 +651,8 @@
           <a:p>
             <a:fld id="{78C97017-6FC3-485B-9764-EAC9E56C1D49}" type="datetimeFigureOut">
               <a:rPr lang="en-US" smtClean="0"/>
-              <a:t>9/30/2016</a:t>
+              <a:pPr/>
+              <a:t>10/19/2016</a:t>
             </a:fld>
             <a:endParaRPr lang="en-US"/>
           </a:p>
@@ -691,6 +694,7 @@
           <a:p>
             <a:fld id="{FB34683C-161B-4520-BF45-B179E228CF2A}" type="slidenum">
               <a:rPr lang="en-US" smtClean="0"/>
+              <a:pPr/>
               <a:t>‹#›</a:t>
             </a:fld>
             <a:endParaRPr lang="en-US"/>
@@ -700,7 +704,7 @@
     </p:spTree>
     <p:extLst>
       <p:ext uri="{BB962C8B-B14F-4D97-AF65-F5344CB8AC3E}">
-        <p14:creationId xmlns:p14="http://schemas.microsoft.com/office/powerpoint/2010/main" val="3246593157"/>
+        <p14:creationId xmlns:p14="http://schemas.microsoft.com/office/powerpoint/2010/main" xmlns="" val="3246593157"/>
       </p:ext>
     </p:extLst>
   </p:cSld>
@@ -819,7 +823,8 @@
           <a:p>
             <a:fld id="{78C97017-6FC3-485B-9764-EAC9E56C1D49}" type="datetimeFigureOut">
               <a:rPr lang="en-US" smtClean="0"/>
-              <a:t>9/30/2016</a:t>
+              <a:pPr/>
+              <a:t>10/19/2016</a:t>
             </a:fld>
             <a:endParaRPr lang="en-US"/>
           </a:p>
@@ -861,6 +866,7 @@
           <a:p>
             <a:fld id="{FB34683C-161B-4520-BF45-B179E228CF2A}" type="slidenum">
               <a:rPr lang="en-US" smtClean="0"/>
+              <a:pPr/>
               <a:t>‹#›</a:t>
             </a:fld>
             <a:endParaRPr lang="en-US"/>
@@ -870,7 +876,7 @@
     </p:spTree>
     <p:extLst>
       <p:ext uri="{BB962C8B-B14F-4D97-AF65-F5344CB8AC3E}">
-        <p14:creationId xmlns:p14="http://schemas.microsoft.com/office/powerpoint/2010/main" val="2707025021"/>
+        <p14:creationId xmlns:p14="http://schemas.microsoft.com/office/powerpoint/2010/main" xmlns="" val="2707025021"/>
       </p:ext>
     </p:extLst>
   </p:cSld>
@@ -999,7 +1005,8 @@
           <a:p>
             <a:fld id="{78C97017-6FC3-485B-9764-EAC9E56C1D49}" type="datetimeFigureOut">
               <a:rPr lang="en-US" smtClean="0"/>
-              <a:t>9/30/2016</a:t>
+              <a:pPr/>
+              <a:t>10/19/2016</a:t>
             </a:fld>
             <a:endParaRPr lang="en-US"/>
           </a:p>
@@ -1041,6 +1048,7 @@
           <a:p>
             <a:fld id="{FB34683C-161B-4520-BF45-B179E228CF2A}" type="slidenum">
               <a:rPr lang="en-US" smtClean="0"/>
+              <a:pPr/>
               <a:t>‹#›</a:t>
             </a:fld>
             <a:endParaRPr lang="en-US"/>
@@ -1050,7 +1058,7 @@
     </p:spTree>
     <p:extLst>
       <p:ext uri="{BB962C8B-B14F-4D97-AF65-F5344CB8AC3E}">
-        <p14:creationId xmlns:p14="http://schemas.microsoft.com/office/powerpoint/2010/main" val="568378986"/>
+        <p14:creationId xmlns:p14="http://schemas.microsoft.com/office/powerpoint/2010/main" xmlns="" val="568378986"/>
       </p:ext>
     </p:extLst>
   </p:cSld>
@@ -1169,7 +1177,8 @@
           <a:p>
             <a:fld id="{78C97017-6FC3-485B-9764-EAC9E56C1D49}" type="datetimeFigureOut">
               <a:rPr lang="en-US" smtClean="0"/>
-              <a:t>9/30/2016</a:t>
+              <a:pPr/>
+              <a:t>10/19/2016</a:t>
             </a:fld>
             <a:endParaRPr lang="en-US"/>
           </a:p>
@@ -1211,6 +1220,7 @@
           <a:p>
             <a:fld id="{FB34683C-161B-4520-BF45-B179E228CF2A}" type="slidenum">
               <a:rPr lang="en-US" smtClean="0"/>
+              <a:pPr/>
               <a:t>‹#›</a:t>
             </a:fld>
             <a:endParaRPr lang="en-US"/>
@@ -1220,7 +1230,7 @@
     </p:spTree>
     <p:extLst>
       <p:ext uri="{BB962C8B-B14F-4D97-AF65-F5344CB8AC3E}">
-        <p14:creationId xmlns:p14="http://schemas.microsoft.com/office/powerpoint/2010/main" val="266658052"/>
+        <p14:creationId xmlns:p14="http://schemas.microsoft.com/office/powerpoint/2010/main" xmlns="" val="266658052"/>
       </p:ext>
     </p:extLst>
   </p:cSld>
@@ -1415,7 +1425,8 @@
           <a:p>
             <a:fld id="{78C97017-6FC3-485B-9764-EAC9E56C1D49}" type="datetimeFigureOut">
               <a:rPr lang="en-US" smtClean="0"/>
-              <a:t>9/30/2016</a:t>
+              <a:pPr/>
+              <a:t>10/19/2016</a:t>
             </a:fld>
             <a:endParaRPr lang="en-US"/>
           </a:p>
@@ -1457,6 +1468,7 @@
           <a:p>
             <a:fld id="{FB34683C-161B-4520-BF45-B179E228CF2A}" type="slidenum">
               <a:rPr lang="en-US" smtClean="0"/>
+              <a:pPr/>
               <a:t>‹#›</a:t>
             </a:fld>
             <a:endParaRPr lang="en-US"/>
@@ -1466,7 +1478,7 @@
     </p:spTree>
     <p:extLst>
       <p:ext uri="{BB962C8B-B14F-4D97-AF65-F5344CB8AC3E}">
-        <p14:creationId xmlns:p14="http://schemas.microsoft.com/office/powerpoint/2010/main" val="474686344"/>
+        <p14:creationId xmlns:p14="http://schemas.microsoft.com/office/powerpoint/2010/main" xmlns="" val="474686344"/>
       </p:ext>
     </p:extLst>
   </p:cSld>
@@ -1703,7 +1715,8 @@
           <a:p>
             <a:fld id="{78C97017-6FC3-485B-9764-EAC9E56C1D49}" type="datetimeFigureOut">
               <a:rPr lang="en-US" smtClean="0"/>
-              <a:t>9/30/2016</a:t>
+              <a:pPr/>
+              <a:t>10/19/2016</a:t>
             </a:fld>
             <a:endParaRPr lang="en-US"/>
           </a:p>
@@ -1745,6 +1758,7 @@
           <a:p>
             <a:fld id="{FB34683C-161B-4520-BF45-B179E228CF2A}" type="slidenum">
               <a:rPr lang="en-US" smtClean="0"/>
+              <a:pPr/>
               <a:t>‹#›</a:t>
             </a:fld>
             <a:endParaRPr lang="en-US"/>
@@ -1754,7 +1768,7 @@
     </p:spTree>
     <p:extLst>
       <p:ext uri="{BB962C8B-B14F-4D97-AF65-F5344CB8AC3E}">
-        <p14:creationId xmlns:p14="http://schemas.microsoft.com/office/powerpoint/2010/main" val="562293251"/>
+        <p14:creationId xmlns:p14="http://schemas.microsoft.com/office/powerpoint/2010/main" xmlns="" val="562293251"/>
       </p:ext>
     </p:extLst>
   </p:cSld>
@@ -2125,7 +2139,8 @@
           <a:p>
             <a:fld id="{78C97017-6FC3-485B-9764-EAC9E56C1D49}" type="datetimeFigureOut">
               <a:rPr lang="en-US" smtClean="0"/>
-              <a:t>9/30/2016</a:t>
+              <a:pPr/>
+              <a:t>10/19/2016</a:t>
             </a:fld>
             <a:endParaRPr lang="en-US"/>
           </a:p>
@@ -2167,6 +2182,7 @@
           <a:p>
             <a:fld id="{FB34683C-161B-4520-BF45-B179E228CF2A}" type="slidenum">
               <a:rPr lang="en-US" smtClean="0"/>
+              <a:pPr/>
               <a:t>‹#›</a:t>
             </a:fld>
             <a:endParaRPr lang="en-US"/>
@@ -2176,7 +2192,7 @@
     </p:spTree>
     <p:extLst>
       <p:ext uri="{BB962C8B-B14F-4D97-AF65-F5344CB8AC3E}">
-        <p14:creationId xmlns:p14="http://schemas.microsoft.com/office/powerpoint/2010/main" val="1126424250"/>
+        <p14:creationId xmlns:p14="http://schemas.microsoft.com/office/powerpoint/2010/main" xmlns="" val="1126424250"/>
       </p:ext>
     </p:extLst>
   </p:cSld>
@@ -2243,7 +2259,8 @@
           <a:p>
             <a:fld id="{78C97017-6FC3-485B-9764-EAC9E56C1D49}" type="datetimeFigureOut">
               <a:rPr lang="en-US" smtClean="0"/>
-              <a:t>9/30/2016</a:t>
+              <a:pPr/>
+              <a:t>10/19/2016</a:t>
             </a:fld>
             <a:endParaRPr lang="en-US"/>
           </a:p>
@@ -2285,6 +2302,7 @@
           <a:p>
             <a:fld id="{FB34683C-161B-4520-BF45-B179E228CF2A}" type="slidenum">
               <a:rPr lang="en-US" smtClean="0"/>
+              <a:pPr/>
               <a:t>‹#›</a:t>
             </a:fld>
             <a:endParaRPr lang="en-US"/>
@@ -2294,7 +2312,7 @@
     </p:spTree>
     <p:extLst>
       <p:ext uri="{BB962C8B-B14F-4D97-AF65-F5344CB8AC3E}">
-        <p14:creationId xmlns:p14="http://schemas.microsoft.com/office/powerpoint/2010/main" val="4159724230"/>
+        <p14:creationId xmlns:p14="http://schemas.microsoft.com/office/powerpoint/2010/main" xmlns="" val="4159724230"/>
       </p:ext>
     </p:extLst>
   </p:cSld>
@@ -2338,7 +2356,8 @@
           <a:p>
             <a:fld id="{78C97017-6FC3-485B-9764-EAC9E56C1D49}" type="datetimeFigureOut">
               <a:rPr lang="en-US" smtClean="0"/>
-              <a:t>9/30/2016</a:t>
+              <a:pPr/>
+              <a:t>10/19/2016</a:t>
             </a:fld>
             <a:endParaRPr lang="en-US"/>
           </a:p>
@@ -2380,6 +2399,7 @@
           <a:p>
             <a:fld id="{FB34683C-161B-4520-BF45-B179E228CF2A}" type="slidenum">
               <a:rPr lang="en-US" smtClean="0"/>
+              <a:pPr/>
               <a:t>‹#›</a:t>
             </a:fld>
             <a:endParaRPr lang="en-US"/>
@@ -2389,7 +2409,7 @@
     </p:spTree>
     <p:extLst>
       <p:ext uri="{BB962C8B-B14F-4D97-AF65-F5344CB8AC3E}">
-        <p14:creationId xmlns:p14="http://schemas.microsoft.com/office/powerpoint/2010/main" val="1793928710"/>
+        <p14:creationId xmlns:p14="http://schemas.microsoft.com/office/powerpoint/2010/main" xmlns="" val="1793928710"/>
       </p:ext>
     </p:extLst>
   </p:cSld>
@@ -2615,7 +2635,8 @@
           <a:p>
             <a:fld id="{78C97017-6FC3-485B-9764-EAC9E56C1D49}" type="datetimeFigureOut">
               <a:rPr lang="en-US" smtClean="0"/>
-              <a:t>9/30/2016</a:t>
+              <a:pPr/>
+              <a:t>10/19/2016</a:t>
             </a:fld>
             <a:endParaRPr lang="en-US"/>
           </a:p>
@@ -2657,6 +2678,7 @@
           <a:p>
             <a:fld id="{FB34683C-161B-4520-BF45-B179E228CF2A}" type="slidenum">
               <a:rPr lang="en-US" smtClean="0"/>
+              <a:pPr/>
               <a:t>‹#›</a:t>
             </a:fld>
             <a:endParaRPr lang="en-US"/>
@@ -2666,7 +2688,7 @@
     </p:spTree>
     <p:extLst>
       <p:ext uri="{BB962C8B-B14F-4D97-AF65-F5344CB8AC3E}">
-        <p14:creationId xmlns:p14="http://schemas.microsoft.com/office/powerpoint/2010/main" val="2076802089"/>
+        <p14:creationId xmlns:p14="http://schemas.microsoft.com/office/powerpoint/2010/main" xmlns="" val="2076802089"/>
       </p:ext>
     </p:extLst>
   </p:cSld>
@@ -2868,7 +2890,8 @@
           <a:p>
             <a:fld id="{78C97017-6FC3-485B-9764-EAC9E56C1D49}" type="datetimeFigureOut">
               <a:rPr lang="en-US" smtClean="0"/>
-              <a:t>9/30/2016</a:t>
+              <a:pPr/>
+              <a:t>10/19/2016</a:t>
             </a:fld>
             <a:endParaRPr lang="en-US"/>
           </a:p>
@@ -2910,6 +2933,7 @@
           <a:p>
             <a:fld id="{FB34683C-161B-4520-BF45-B179E228CF2A}" type="slidenum">
               <a:rPr lang="en-US" smtClean="0"/>
+              <a:pPr/>
               <a:t>‹#›</a:t>
             </a:fld>
             <a:endParaRPr lang="en-US"/>
@@ -2919,7 +2943,7 @@
     </p:spTree>
     <p:extLst>
       <p:ext uri="{BB962C8B-B14F-4D97-AF65-F5344CB8AC3E}">
-        <p14:creationId xmlns:p14="http://schemas.microsoft.com/office/powerpoint/2010/main" val="201835938"/>
+        <p14:creationId xmlns:p14="http://schemas.microsoft.com/office/powerpoint/2010/main" xmlns="" val="201835938"/>
       </p:ext>
     </p:extLst>
   </p:cSld>
@@ -3081,7 +3105,8 @@
           <a:p>
             <a:fld id="{78C97017-6FC3-485B-9764-EAC9E56C1D49}" type="datetimeFigureOut">
               <a:rPr lang="en-US" smtClean="0"/>
-              <a:t>9/30/2016</a:t>
+              <a:pPr/>
+              <a:t>10/19/2016</a:t>
             </a:fld>
             <a:endParaRPr lang="en-US"/>
           </a:p>
@@ -3159,6 +3184,7 @@
           <a:p>
             <a:fld id="{FB34683C-161B-4520-BF45-B179E228CF2A}" type="slidenum">
               <a:rPr lang="en-US" smtClean="0"/>
+              <a:pPr/>
               <a:t>‹#›</a:t>
             </a:fld>
             <a:endParaRPr lang="en-US"/>
@@ -3168,7 +3194,7 @@
     </p:spTree>
     <p:extLst>
       <p:ext uri="{BB962C8B-B14F-4D97-AF65-F5344CB8AC3E}">
-        <p14:creationId xmlns:p14="http://schemas.microsoft.com/office/powerpoint/2010/main" val="2341400630"/>
+        <p14:creationId xmlns:p14="http://schemas.microsoft.com/office/powerpoint/2010/main" xmlns="" val="2341400630"/>
       </p:ext>
     </p:extLst>
   </p:cSld>
@@ -3509,7 +3535,7 @@
     </p:spTree>
     <p:extLst>
       <p:ext uri="{BB962C8B-B14F-4D97-AF65-F5344CB8AC3E}">
-        <p14:creationId xmlns:p14="http://schemas.microsoft.com/office/powerpoint/2010/main" val="2960930635"/>
+        <p14:creationId xmlns:p14="http://schemas.microsoft.com/office/powerpoint/2010/main" xmlns="" val="2960930635"/>
       </p:ext>
     </p:extLst>
   </p:cSld>
@@ -4864,7 +4890,7 @@
     </p:spTree>
     <p:extLst>
       <p:ext uri="{BB962C8B-B14F-4D97-AF65-F5344CB8AC3E}">
-        <p14:creationId xmlns:p14="http://schemas.microsoft.com/office/powerpoint/2010/main" val="1981432603"/>
+        <p14:creationId xmlns:p14="http://schemas.microsoft.com/office/powerpoint/2010/main" xmlns="" val="1981432603"/>
       </p:ext>
     </p:extLst>
   </p:cSld>
@@ -7511,7 +7537,7 @@
     </p:spTree>
     <p:extLst>
       <p:ext uri="{BB962C8B-B14F-4D97-AF65-F5344CB8AC3E}">
-        <p14:creationId xmlns:p14="http://schemas.microsoft.com/office/powerpoint/2010/main" val="4023378879"/>
+        <p14:creationId xmlns:p14="http://schemas.microsoft.com/office/powerpoint/2010/main" xmlns="" val="4023378879"/>
       </p:ext>
     </p:extLst>
   </p:cSld>
@@ -9746,7 +9772,7 @@
     </p:spTree>
     <p:extLst>
       <p:ext uri="{BB962C8B-B14F-4D97-AF65-F5344CB8AC3E}">
-        <p14:creationId xmlns:p14="http://schemas.microsoft.com/office/powerpoint/2010/main" val="2776882492"/>
+        <p14:creationId xmlns:p14="http://schemas.microsoft.com/office/powerpoint/2010/main" xmlns="" val="2776882492"/>
       </p:ext>
     </p:extLst>
   </p:cSld>
@@ -11535,7 +11561,7 @@
     </p:spTree>
     <p:extLst>
       <p:ext uri="{BB962C8B-B14F-4D97-AF65-F5344CB8AC3E}">
-        <p14:creationId xmlns:p14="http://schemas.microsoft.com/office/powerpoint/2010/main" val="599777654"/>
+        <p14:creationId xmlns:p14="http://schemas.microsoft.com/office/powerpoint/2010/main" xmlns="" val="599777654"/>
       </p:ext>
     </p:extLst>
   </p:cSld>
@@ -12280,7 +12306,6 @@
               <a:rPr lang="en-US" dirty="0"/>
               <a:t>execute()</a:t>
             </a:r>
-            <a:endParaRPr lang="en-US" dirty="0"/>
           </a:p>
         </p:txBody>
       </p:sp>
@@ -13218,7 +13243,7 @@
     </p:spTree>
     <p:extLst>
       <p:ext uri="{BB962C8B-B14F-4D97-AF65-F5344CB8AC3E}">
-        <p14:creationId xmlns:p14="http://schemas.microsoft.com/office/powerpoint/2010/main" val="3945898909"/>
+        <p14:creationId xmlns:p14="http://schemas.microsoft.com/office/powerpoint/2010/main" xmlns="" val="3945898909"/>
       </p:ext>
     </p:extLst>
   </p:cSld>
@@ -15390,7 +15415,7 @@
     </p:spTree>
     <p:extLst>
       <p:ext uri="{BB962C8B-B14F-4D97-AF65-F5344CB8AC3E}">
-        <p14:creationId xmlns:p14="http://schemas.microsoft.com/office/powerpoint/2010/main" val="2396968029"/>
+        <p14:creationId xmlns:p14="http://schemas.microsoft.com/office/powerpoint/2010/main" xmlns="" val="2396968029"/>
       </p:ext>
     </p:extLst>
   </p:cSld>
@@ -16812,7 +16837,7 @@
     </p:spTree>
     <p:extLst>
       <p:ext uri="{BB962C8B-B14F-4D97-AF65-F5344CB8AC3E}">
-        <p14:creationId xmlns:p14="http://schemas.microsoft.com/office/powerpoint/2010/main" val="1478832369"/>
+        <p14:creationId xmlns:p14="http://schemas.microsoft.com/office/powerpoint/2010/main" xmlns="" val="1478832369"/>
       </p:ext>
     </p:extLst>
   </p:cSld>
@@ -16849,7 +16874,7 @@
     </p:spTree>
     <p:extLst>
       <p:ext uri="{BB962C8B-B14F-4D97-AF65-F5344CB8AC3E}">
-        <p14:creationId xmlns:p14="http://schemas.microsoft.com/office/powerpoint/2010/main" val="2978036214"/>
+        <p14:creationId xmlns:p14="http://schemas.microsoft.com/office/powerpoint/2010/main" xmlns="" val="2978036214"/>
       </p:ext>
     </p:extLst>
   </p:cSld>

</xml_diff>

<commit_message>
Editted images in DG
</commit_message>
<xml_diff>
--- a/docs/diagrams/Diagrams.pptx
+++ b/docs/diagrams/Diagrams.pptx
@@ -200,7 +200,7 @@
           <a:p>
             <a:fld id="{F5CC4B3F-88C1-4FFA-B1B6-F41C21DC6924}" type="datetimeFigureOut">
               <a:rPr lang="en-US" smtClean="0"/>
-              <a:t>9/30/2016</a:t>
+              <a:t>19/10/16</a:t>
             </a:fld>
             <a:endParaRPr lang="en-US"/>
           </a:p>
@@ -649,7 +649,7 @@
           <a:p>
             <a:fld id="{78C97017-6FC3-485B-9764-EAC9E56C1D49}" type="datetimeFigureOut">
               <a:rPr lang="en-US" smtClean="0"/>
-              <a:t>9/30/2016</a:t>
+              <a:t>19/10/16</a:t>
             </a:fld>
             <a:endParaRPr lang="en-US"/>
           </a:p>
@@ -819,7 +819,7 @@
           <a:p>
             <a:fld id="{78C97017-6FC3-485B-9764-EAC9E56C1D49}" type="datetimeFigureOut">
               <a:rPr lang="en-US" smtClean="0"/>
-              <a:t>9/30/2016</a:t>
+              <a:t>19/10/16</a:t>
             </a:fld>
             <a:endParaRPr lang="en-US"/>
           </a:p>
@@ -999,7 +999,7 @@
           <a:p>
             <a:fld id="{78C97017-6FC3-485B-9764-EAC9E56C1D49}" type="datetimeFigureOut">
               <a:rPr lang="en-US" smtClean="0"/>
-              <a:t>9/30/2016</a:t>
+              <a:t>19/10/16</a:t>
             </a:fld>
             <a:endParaRPr lang="en-US"/>
           </a:p>
@@ -1169,7 +1169,7 @@
           <a:p>
             <a:fld id="{78C97017-6FC3-485B-9764-EAC9E56C1D49}" type="datetimeFigureOut">
               <a:rPr lang="en-US" smtClean="0"/>
-              <a:t>9/30/2016</a:t>
+              <a:t>19/10/16</a:t>
             </a:fld>
             <a:endParaRPr lang="en-US"/>
           </a:p>
@@ -1415,7 +1415,7 @@
           <a:p>
             <a:fld id="{78C97017-6FC3-485B-9764-EAC9E56C1D49}" type="datetimeFigureOut">
               <a:rPr lang="en-US" smtClean="0"/>
-              <a:t>9/30/2016</a:t>
+              <a:t>19/10/16</a:t>
             </a:fld>
             <a:endParaRPr lang="en-US"/>
           </a:p>
@@ -1703,7 +1703,7 @@
           <a:p>
             <a:fld id="{78C97017-6FC3-485B-9764-EAC9E56C1D49}" type="datetimeFigureOut">
               <a:rPr lang="en-US" smtClean="0"/>
-              <a:t>9/30/2016</a:t>
+              <a:t>19/10/16</a:t>
             </a:fld>
             <a:endParaRPr lang="en-US"/>
           </a:p>
@@ -2125,7 +2125,7 @@
           <a:p>
             <a:fld id="{78C97017-6FC3-485B-9764-EAC9E56C1D49}" type="datetimeFigureOut">
               <a:rPr lang="en-US" smtClean="0"/>
-              <a:t>9/30/2016</a:t>
+              <a:t>19/10/16</a:t>
             </a:fld>
             <a:endParaRPr lang="en-US"/>
           </a:p>
@@ -2243,7 +2243,7 @@
           <a:p>
             <a:fld id="{78C97017-6FC3-485B-9764-EAC9E56C1D49}" type="datetimeFigureOut">
               <a:rPr lang="en-US" smtClean="0"/>
-              <a:t>9/30/2016</a:t>
+              <a:t>19/10/16</a:t>
             </a:fld>
             <a:endParaRPr lang="en-US"/>
           </a:p>
@@ -2338,7 +2338,7 @@
           <a:p>
             <a:fld id="{78C97017-6FC3-485B-9764-EAC9E56C1D49}" type="datetimeFigureOut">
               <a:rPr lang="en-US" smtClean="0"/>
-              <a:t>9/30/2016</a:t>
+              <a:t>19/10/16</a:t>
             </a:fld>
             <a:endParaRPr lang="en-US"/>
           </a:p>
@@ -2615,7 +2615,7 @@
           <a:p>
             <a:fld id="{78C97017-6FC3-485B-9764-EAC9E56C1D49}" type="datetimeFigureOut">
               <a:rPr lang="en-US" smtClean="0"/>
-              <a:t>9/30/2016</a:t>
+              <a:t>19/10/16</a:t>
             </a:fld>
             <a:endParaRPr lang="en-US"/>
           </a:p>
@@ -2868,7 +2868,7 @@
           <a:p>
             <a:fld id="{78C97017-6FC3-485B-9764-EAC9E56C1D49}" type="datetimeFigureOut">
               <a:rPr lang="en-US" smtClean="0"/>
-              <a:t>9/30/2016</a:t>
+              <a:t>19/10/16</a:t>
             </a:fld>
             <a:endParaRPr lang="en-US"/>
           </a:p>
@@ -3081,7 +3081,7 @@
           <a:p>
             <a:fld id="{78C97017-6FC3-485B-9764-EAC9E56C1D49}" type="datetimeFigureOut">
               <a:rPr lang="en-US" smtClean="0"/>
-              <a:t>9/30/2016</a:t>
+              <a:t>19/10/16</a:t>
             </a:fld>
             <a:endParaRPr lang="en-US"/>
           </a:p>
@@ -3473,11 +3473,15 @@
           <a:p>
             <a:r>
               <a:rPr lang="en-US" dirty="0" err="1" smtClean="0"/>
-              <a:t>AddressBook</a:t>
+              <a:t>TaskManager</a:t>
             </a:r>
             <a:r>
               <a:rPr lang="en-US" dirty="0" smtClean="0"/>
-              <a:t> – Level 4</a:t>
+              <a:t> – </a:t>
+            </a:r>
+            <a:r>
+              <a:rPr lang="en-US" dirty="0" err="1" smtClean="0"/>
+              <a:t>ForgetMeNot</a:t>
             </a:r>
             <a:endParaRPr lang="en-US" dirty="0"/>
           </a:p>
@@ -5038,223 +5042,6 @@
           </a:p>
         </p:txBody>
       </p:sp>
-      <p:grpSp>
-        <p:nvGrpSpPr>
-          <p:cNvPr id="7" name="Actor"/>
-          <p:cNvGrpSpPr/>
-          <p:nvPr/>
-        </p:nvGrpSpPr>
-        <p:grpSpPr>
-          <a:xfrm>
-            <a:off x="152400" y="533400"/>
-            <a:ext cx="324036" cy="573410"/>
-            <a:chOff x="3239901" y="4149080"/>
-            <a:chExt cx="648072" cy="1146820"/>
-          </a:xfrm>
-        </p:grpSpPr>
-        <p:sp>
-          <p:nvSpPr>
-            <p:cNvPr id="8" name="Flowchart: Connector 7"/>
-            <p:cNvSpPr/>
-            <p:nvPr/>
-          </p:nvSpPr>
-          <p:spPr>
-            <a:xfrm>
-              <a:off x="3419872" y="4149080"/>
-              <a:ext cx="288032" cy="288032"/>
-            </a:xfrm>
-            <a:prstGeom prst="flowChartConnector">
-              <a:avLst/>
-            </a:prstGeom>
-            <a:solidFill>
-              <a:schemeClr val="bg1">
-                <a:lumMod val="85000"/>
-              </a:schemeClr>
-            </a:solidFill>
-            <a:ln w="28575">
-              <a:solidFill>
-                <a:schemeClr val="tx1"/>
-              </a:solidFill>
-            </a:ln>
-            <a:effectLst/>
-          </p:spPr>
-          <p:style>
-            <a:lnRef idx="1">
-              <a:schemeClr val="accent4"/>
-            </a:lnRef>
-            <a:fillRef idx="2">
-              <a:schemeClr val="accent4"/>
-            </a:fillRef>
-            <a:effectRef idx="1">
-              <a:schemeClr val="accent4"/>
-            </a:effectRef>
-            <a:fontRef idx="minor">
-              <a:schemeClr val="dk1"/>
-            </a:fontRef>
-          </p:style>
-          <p:txBody>
-            <a:bodyPr rtlCol="0" anchor="ctr"/>
-            <a:lstStyle/>
-            <a:p>
-              <a:pPr algn="ctr"/>
-              <a:endParaRPr lang="en-SG"/>
-            </a:p>
-          </p:txBody>
-        </p:sp>
-        <p:cxnSp>
-          <p:nvCxnSpPr>
-            <p:cNvPr id="9" name="Straight Connector 8"/>
-            <p:cNvCxnSpPr>
-              <a:stCxn id="8" idx="4"/>
-            </p:cNvCxnSpPr>
-            <p:nvPr/>
-          </p:nvCxnSpPr>
-          <p:spPr>
-            <a:xfrm>
-              <a:off x="3563888" y="4437112"/>
-              <a:ext cx="0" cy="504056"/>
-            </a:xfrm>
-            <a:prstGeom prst="line">
-              <a:avLst/>
-            </a:prstGeom>
-            <a:ln w="28575">
-              <a:solidFill>
-                <a:schemeClr val="tx1"/>
-              </a:solidFill>
-            </a:ln>
-            <a:effectLst/>
-          </p:spPr>
-          <p:style>
-            <a:lnRef idx="1">
-              <a:schemeClr val="accent4"/>
-            </a:lnRef>
-            <a:fillRef idx="2">
-              <a:schemeClr val="accent4"/>
-            </a:fillRef>
-            <a:effectRef idx="1">
-              <a:schemeClr val="accent4"/>
-            </a:effectRef>
-            <a:fontRef idx="minor">
-              <a:schemeClr val="dk1"/>
-            </a:fontRef>
-          </p:style>
-        </p:cxnSp>
-        <p:sp>
-          <p:nvSpPr>
-            <p:cNvPr id="10" name="Freeform 9"/>
-            <p:cNvSpPr/>
-            <p:nvPr/>
-          </p:nvSpPr>
-          <p:spPr>
-            <a:xfrm>
-              <a:off x="3324225" y="4933950"/>
-              <a:ext cx="479425" cy="361950"/>
-            </a:xfrm>
-            <a:custGeom>
-              <a:avLst/>
-              <a:gdLst>
-                <a:gd name="connsiteX0" fmla="*/ 0 w 479425"/>
-                <a:gd name="connsiteY0" fmla="*/ 355600 h 361950"/>
-                <a:gd name="connsiteX1" fmla="*/ 241300 w 479425"/>
-                <a:gd name="connsiteY1" fmla="*/ 0 h 361950"/>
-                <a:gd name="connsiteX2" fmla="*/ 479425 w 479425"/>
-                <a:gd name="connsiteY2" fmla="*/ 361950 h 361950"/>
-              </a:gdLst>
-              <a:ahLst/>
-              <a:cxnLst>
-                <a:cxn ang="0">
-                  <a:pos x="connsiteX0" y="connsiteY0"/>
-                </a:cxn>
-                <a:cxn ang="0">
-                  <a:pos x="connsiteX1" y="connsiteY1"/>
-                </a:cxn>
-                <a:cxn ang="0">
-                  <a:pos x="connsiteX2" y="connsiteY2"/>
-                </a:cxn>
-              </a:cxnLst>
-              <a:rect l="l" t="t" r="r" b="b"/>
-              <a:pathLst>
-                <a:path w="479425" h="361950">
-                  <a:moveTo>
-                    <a:pt x="0" y="355600"/>
-                  </a:moveTo>
-                  <a:lnTo>
-                    <a:pt x="241300" y="0"/>
-                  </a:lnTo>
-                  <a:lnTo>
-                    <a:pt x="479425" y="361950"/>
-                  </a:lnTo>
-                </a:path>
-              </a:pathLst>
-            </a:custGeom>
-            <a:noFill/>
-            <a:ln w="28575">
-              <a:solidFill>
-                <a:schemeClr val="tx1"/>
-              </a:solidFill>
-            </a:ln>
-            <a:effectLst/>
-          </p:spPr>
-          <p:style>
-            <a:lnRef idx="1">
-              <a:schemeClr val="accent4"/>
-            </a:lnRef>
-            <a:fillRef idx="2">
-              <a:schemeClr val="accent4"/>
-            </a:fillRef>
-            <a:effectRef idx="1">
-              <a:schemeClr val="accent4"/>
-            </a:effectRef>
-            <a:fontRef idx="minor">
-              <a:schemeClr val="dk1"/>
-            </a:fontRef>
-          </p:style>
-          <p:txBody>
-            <a:bodyPr rtlCol="0" anchor="ctr"/>
-            <a:lstStyle/>
-            <a:p>
-              <a:pPr algn="ctr"/>
-              <a:endParaRPr lang="en-SG"/>
-            </a:p>
-          </p:txBody>
-        </p:sp>
-        <p:cxnSp>
-          <p:nvCxnSpPr>
-            <p:cNvPr id="11" name="Straight Connector 10"/>
-            <p:cNvCxnSpPr/>
-            <p:nvPr/>
-          </p:nvCxnSpPr>
-          <p:spPr>
-            <a:xfrm>
-              <a:off x="3239901" y="4509120"/>
-              <a:ext cx="648072" cy="0"/>
-            </a:xfrm>
-            <a:prstGeom prst="line">
-              <a:avLst/>
-            </a:prstGeom>
-            <a:ln w="28575">
-              <a:solidFill>
-                <a:schemeClr val="tx1"/>
-              </a:solidFill>
-            </a:ln>
-            <a:effectLst/>
-          </p:spPr>
-          <p:style>
-            <a:lnRef idx="1">
-              <a:schemeClr val="accent4"/>
-            </a:lnRef>
-            <a:fillRef idx="2">
-              <a:schemeClr val="accent4"/>
-            </a:fillRef>
-            <a:effectRef idx="1">
-              <a:schemeClr val="accent4"/>
-            </a:effectRef>
-            <a:fontRef idx="minor">
-              <a:schemeClr val="dk1"/>
-            </a:fontRef>
-          </p:style>
-        </p:cxnSp>
-      </p:grpSp>
       <p:sp>
         <p:nvSpPr>
           <p:cNvPr id="16" name="Rectangle 62"/>
@@ -5753,7 +5540,7 @@
                   <a:srgbClr val="7030A0"/>
                 </a:solidFill>
               </a:rPr>
-              <a:t>deletePerson</a:t>
+              <a:t>deleteTask</a:t>
             </a:r>
             <a:r>
               <a:rPr lang="en-US" sz="1400" dirty="0" smtClean="0">
@@ -5761,7 +5548,15 @@
                   <a:srgbClr val="7030A0"/>
                 </a:solidFill>
               </a:rPr>
-              <a:t>(p)</a:t>
+              <a:t>(</a:t>
+            </a:r>
+            <a:r>
+              <a:rPr lang="en-US" sz="1400" dirty="0" smtClean="0">
+                <a:solidFill>
+                  <a:srgbClr val="7030A0"/>
+                </a:solidFill>
+              </a:rPr>
+              <a:t>p)</a:t>
             </a:r>
             <a:endParaRPr lang="en-US" sz="1400" dirty="0">
               <a:solidFill>
@@ -5801,7 +5596,7 @@
                   </a:schemeClr>
                 </a:solidFill>
               </a:rPr>
-              <a:t>post(</a:t>
+              <a:t>Post(</a:t>
             </a:r>
             <a:r>
               <a:rPr lang="en-US" sz="1400" dirty="0" err="1" smtClean="0">
@@ -5811,7 +5606,17 @@
                   </a:schemeClr>
                 </a:solidFill>
               </a:rPr>
-              <a:t>AddressBookChangedEvent</a:t>
+              <a:t>TaskManager</a:t>
+            </a:r>
+            <a:r>
+              <a:rPr lang="en-US" sz="1400" dirty="0" err="1" smtClean="0">
+                <a:solidFill>
+                  <a:schemeClr val="accent5">
+                    <a:lumMod val="75000"/>
+                  </a:schemeClr>
+                </a:solidFill>
+              </a:rPr>
+              <a:t>ChangedEvent</a:t>
             </a:r>
             <a:r>
               <a:rPr lang="en-US" sz="1400" dirty="0" smtClean="0">
@@ -6375,7 +6180,7 @@
                   </a:schemeClr>
                 </a:solidFill>
               </a:rPr>
-              <a:t>post(</a:t>
+              <a:t>Post(</a:t>
             </a:r>
             <a:r>
               <a:rPr lang="en-US" sz="1400" dirty="0" err="1" smtClean="0">
@@ -6385,7 +6190,17 @@
                   </a:schemeClr>
                 </a:solidFill>
               </a:rPr>
-              <a:t>AddressBookChangedEvent</a:t>
+              <a:t>TaskManager</a:t>
+            </a:r>
+            <a:r>
+              <a:rPr lang="en-US" sz="1400" dirty="0" err="1" smtClean="0">
+                <a:solidFill>
+                  <a:schemeClr val="accent5">
+                    <a:lumMod val="75000"/>
+                  </a:schemeClr>
+                </a:solidFill>
+              </a:rPr>
+              <a:t>ChangedEvent</a:t>
             </a:r>
             <a:r>
               <a:rPr lang="en-US" sz="1400" dirty="0" smtClean="0">
@@ -6757,7 +6572,7 @@
                   </a:schemeClr>
                 </a:solidFill>
               </a:rPr>
-              <a:t>handleAddresssBookChangedEvent</a:t>
+              <a:t>handleTaskManagerChangedEvent</a:t>
             </a:r>
             <a:r>
               <a:rPr lang="en-US" sz="1400" dirty="0" smtClean="0">
@@ -7068,7 +6883,7 @@
                   <a:srgbClr val="00B050"/>
                 </a:solidFill>
               </a:rPr>
-              <a:t>handleAddresssBookChangedEvent</a:t>
+              <a:t>handleTaskManagerChangedEvent</a:t>
             </a:r>
             <a:r>
               <a:rPr lang="en-US" sz="1400" dirty="0" smtClean="0">
@@ -7508,6 +7323,35 @@
           </a:p>
         </p:txBody>
       </p:sp>
+      <p:pic>
+        <p:nvPicPr>
+          <p:cNvPr id="3" name="Picture 2" descr="noun_396626_cc.png"/>
+          <p:cNvPicPr>
+            <a:picLocks noChangeAspect="1"/>
+          </p:cNvPicPr>
+          <p:nvPr/>
+        </p:nvPicPr>
+        <p:blipFill rotWithShape="1">
+          <a:blip r:embed="rId2">
+            <a:extLst>
+              <a:ext uri="{28A0092B-C50C-407E-A947-70E740481C1C}">
+                <a14:useLocalDpi xmlns:a14="http://schemas.microsoft.com/office/drawing/2010/main" val="0"/>
+              </a:ext>
+            </a:extLst>
+          </a:blip>
+          <a:srcRect t="-2" b="13385"/>
+          <a:stretch/>
+        </p:blipFill>
+        <p:spPr>
+          <a:xfrm>
+            <a:off x="-152400" y="385762"/>
+            <a:ext cx="990600" cy="681038"/>
+          </a:xfrm>
+          <a:prstGeom prst="rect">
+            <a:avLst/>
+          </a:prstGeom>
+        </p:spPr>
+      </p:pic>
     </p:spTree>
     <p:extLst>
       <p:ext uri="{BB962C8B-B14F-4D97-AF65-F5344CB8AC3E}">
@@ -8134,14 +7978,24 @@
           <a:p>
             <a:pPr algn="ctr"/>
             <a:r>
-              <a:rPr lang="en-US" sz="1050" b="1" dirty="0" err="1">
+              <a:rPr lang="en-US" sz="1050" b="1" dirty="0" err="1" smtClean="0">
                 <a:solidFill>
                   <a:schemeClr val="accent3">
                     <a:lumMod val="75000"/>
                   </a:schemeClr>
                 </a:solidFill>
               </a:rPr>
-              <a:t>PersonListPanel</a:t>
+              <a:t>Task</a:t>
+            </a:r>
+            <a:r>
+              <a:rPr lang="en-US" sz="1050" b="1" dirty="0" err="1" smtClean="0">
+                <a:solidFill>
+                  <a:schemeClr val="accent3">
+                    <a:lumMod val="75000"/>
+                  </a:schemeClr>
+                </a:solidFill>
+              </a:rPr>
+              <a:t>ListPanel</a:t>
             </a:r>
             <a:endParaRPr lang="en-SG" sz="1050" b="1" dirty="0">
               <a:solidFill>
@@ -8194,14 +8048,24 @@
           <a:p>
             <a:pPr algn="ctr"/>
             <a:r>
-              <a:rPr lang="en-US" sz="1050" b="1" dirty="0" err="1">
+              <a:rPr lang="en-US" sz="1050" b="1" dirty="0" err="1" smtClean="0">
                 <a:solidFill>
                   <a:schemeClr val="accent3">
                     <a:lumMod val="75000"/>
                   </a:schemeClr>
                 </a:solidFill>
               </a:rPr>
-              <a:t>PersonCard</a:t>
+              <a:t>Task</a:t>
+            </a:r>
+            <a:r>
+              <a:rPr lang="en-US" sz="1050" b="1" dirty="0" err="1" smtClean="0">
+                <a:solidFill>
+                  <a:schemeClr val="accent3">
+                    <a:lumMod val="75000"/>
+                  </a:schemeClr>
+                </a:solidFill>
+              </a:rPr>
+              <a:t>Card</a:t>
             </a:r>
             <a:endParaRPr lang="en-SG" sz="1050" b="1" dirty="0">
               <a:solidFill>
@@ -9756,7 +9620,7 @@
   <p:timing>
     <p:tnLst>
       <p:par>
-        <p:cTn id="1" dur="indefinite" restart="never" nodeType="tmRoot"/>
+        <p:cTn xmlns:p14="http://schemas.microsoft.com/office/powerpoint/2010/main" id="1" dur="indefinite" restart="never" nodeType="tmRoot"/>
       </p:par>
     </p:tnLst>
   </p:timing>
@@ -11545,7 +11409,7 @@
   <p:timing>
     <p:tnLst>
       <p:par>
-        <p:cTn id="1" dur="indefinite" restart="never" nodeType="tmRoot"/>
+        <p:cTn xmlns:p14="http://schemas.microsoft.com/office/powerpoint/2010/main" id="1" dur="indefinite" restart="never" nodeType="tmRoot"/>
       </p:par>
     </p:tnLst>
   </p:timing>
@@ -12280,7 +12144,6 @@
               <a:rPr lang="en-US" dirty="0"/>
               <a:t>execute()</a:t>
             </a:r>
-            <a:endParaRPr lang="en-US" dirty="0"/>
           </a:p>
         </p:txBody>
       </p:sp>
@@ -12766,7 +12629,7 @@
         </p:nvSpPr>
         <p:spPr>
           <a:xfrm>
-            <a:off x="6858000" y="4278848"/>
+            <a:off x="6248400" y="4278848"/>
             <a:ext cx="1424846" cy="215444"/>
           </a:xfrm>
           <a:prstGeom prst="rect">
@@ -12797,7 +12660,7 @@
                   <a:srgbClr val="7030A0"/>
                 </a:solidFill>
               </a:rPr>
-              <a:t>deletePerson</a:t>
+              <a:t>deleteTask</a:t>
             </a:r>
             <a:r>
               <a:rPr lang="en-US" dirty="0" smtClean="0">
@@ -12805,7 +12668,15 @@
                   <a:srgbClr val="7030A0"/>
                 </a:solidFill>
               </a:rPr>
-              <a:t>(p)</a:t>
+              <a:t>(</a:t>
+            </a:r>
+            <a:r>
+              <a:rPr lang="en-US" dirty="0" smtClean="0">
+                <a:solidFill>
+                  <a:srgbClr val="7030A0"/>
+                </a:solidFill>
+              </a:rPr>
+              <a:t>p)</a:t>
             </a:r>
             <a:endParaRPr lang="en-US" dirty="0">
               <a:solidFill>
@@ -13936,7 +13807,7 @@
                   <a:srgbClr val="7030A0"/>
                 </a:solidFill>
               </a:rPr>
-              <a:t>AddressBook</a:t>
+              <a:t>TaskManager</a:t>
             </a:r>
             <a:endParaRPr lang="en-SG" sz="1050" dirty="0">
               <a:solidFill>
@@ -14078,7 +13949,7 @@
                   <a:srgbClr val="7030A0"/>
                 </a:solidFill>
               </a:rPr>
-              <a:t>UniquePersonList</a:t>
+              <a:t>UniqueTaskList</a:t>
             </a:r>
             <a:endParaRPr lang="en-SG" sz="1050" dirty="0">
               <a:solidFill>
@@ -14321,7 +14192,7 @@
                   <a:srgbClr val="7030A0"/>
                 </a:solidFill>
               </a:rPr>
-              <a:t>Person</a:t>
+              <a:t>Task</a:t>
             </a:r>
             <a:endParaRPr lang="en-SG" sz="1050" dirty="0">
               <a:solidFill>
@@ -14620,7 +14491,7 @@
                   <a:srgbClr val="7030A0"/>
                 </a:solidFill>
               </a:rPr>
-              <a:t>ReadOnlyPerson</a:t>
+              <a:t>ReadOnlyTask</a:t>
             </a:r>
             <a:endParaRPr lang="en-SG" sz="1050" dirty="0">
               <a:solidFill>
@@ -14815,12 +14686,12 @@
           <a:p>
             <a:pPr algn="ctr"/>
             <a:r>
-              <a:rPr lang="en-US" sz="1050" dirty="0" smtClean="0">
+              <a:rPr lang="en-US" sz="1050" dirty="0" err="1" smtClean="0">
                 <a:solidFill>
                   <a:srgbClr val="7030A0"/>
                 </a:solidFill>
               </a:rPr>
-              <a:t>Phone</a:t>
+              <a:t>StartTime</a:t>
             </a:r>
             <a:endParaRPr lang="en-SG" sz="1050" dirty="0">
               <a:solidFill>
@@ -14912,12 +14783,12 @@
           <a:p>
             <a:pPr algn="ctr"/>
             <a:r>
-              <a:rPr lang="en-US" sz="1050" dirty="0" smtClean="0">
+              <a:rPr lang="en-US" sz="1050" dirty="0" err="1" smtClean="0">
                 <a:solidFill>
                   <a:srgbClr val="7030A0"/>
                 </a:solidFill>
               </a:rPr>
-              <a:t>Email</a:t>
+              <a:t>EndTime</a:t>
             </a:r>
             <a:endParaRPr lang="en-SG" sz="1050" dirty="0">
               <a:solidFill>
@@ -15014,7 +14885,7 @@
                   <a:srgbClr val="7030A0"/>
                 </a:solidFill>
               </a:rPr>
-              <a:t>Address</a:t>
+              <a:t>Done</a:t>
             </a:r>
             <a:endParaRPr lang="en-SG" sz="1050" dirty="0">
               <a:solidFill>
@@ -15217,7 +15088,7 @@
                   <a:srgbClr val="7030A0"/>
                 </a:solidFill>
               </a:rPr>
-              <a:t>ReadOnlyAddressBook</a:t>
+              <a:t>ReadOnlyTaskManager</a:t>
             </a:r>
             <a:endParaRPr lang="en-SG" sz="1050" dirty="0">
               <a:solidFill>
@@ -15400,7 +15271,7 @@
   <p:timing>
     <p:tnLst>
       <p:par>
-        <p:cTn id="1" dur="indefinite" restart="never" nodeType="tmRoot"/>
+        <p:cTn xmlns:p14="http://schemas.microsoft.com/office/powerpoint/2010/main" id="1" dur="indefinite" restart="never" nodeType="tmRoot"/>
       </p:par>
     </p:tnLst>
   </p:timing>
@@ -15557,7 +15428,15 @@
                   <a:schemeClr val="bg1"/>
                 </a:solidFill>
               </a:rPr>
-              <a:t>AddressBookStorage</a:t>
+              <a:t>TaskManager</a:t>
+            </a:r>
+            <a:r>
+              <a:rPr lang="en-US" sz="1050" dirty="0" err="1" smtClean="0">
+                <a:solidFill>
+                  <a:schemeClr val="bg1"/>
+                </a:solidFill>
+              </a:rPr>
+              <a:t>Storage</a:t>
             </a:r>
             <a:endParaRPr lang="en-SG" sz="1050" dirty="0">
               <a:solidFill>
@@ -16130,7 +16009,7 @@
                   </a:schemeClr>
                 </a:solidFill>
               </a:rPr>
-              <a:t>XmlAddressBook</a:t>
+              <a:t>XmlTaskManager</a:t>
             </a:r>
             <a:r>
               <a:rPr lang="en-US" sz="1050" b="1" dirty="0" smtClean="0">
@@ -16603,7 +16482,7 @@
                   </a:schemeClr>
                 </a:solidFill>
               </a:rPr>
-              <a:t>AddressBook</a:t>
+              <a:t>TaskManager</a:t>
             </a:r>
             <a:endParaRPr lang="en-SG" sz="1050" b="1" dirty="0">
               <a:solidFill>
@@ -16756,7 +16635,7 @@
                   </a:schemeClr>
                 </a:solidFill>
               </a:rPr>
-              <a:t>XmlAdaptedPerson</a:t>
+              <a:t>XmlAdaptedTask</a:t>
             </a:r>
             <a:endParaRPr lang="en-SG" sz="1050" b="1" dirty="0">
               <a:solidFill>
@@ -16822,7 +16701,7 @@
   <p:timing>
     <p:tnLst>
       <p:par>
-        <p:cTn id="1" dur="indefinite" restart="never" nodeType="tmRoot"/>
+        <p:cTn xmlns:p14="http://schemas.microsoft.com/office/powerpoint/2010/main" id="1" dur="indefinite" restart="never" nodeType="tmRoot"/>
       </p:par>
     </p:tnLst>
   </p:timing>

</xml_diff>

<commit_message>
Update diagrams to reflect change to Task manager
</commit_message>
<xml_diff>
--- a/docs/diagrams/Diagrams.pptx
+++ b/docs/diagrams/Diagrams.pptx
@@ -115,6 +115,22 @@
       </a:defRPr>
     </a:lvl9pPr>
   </p:defaultTextStyle>
+  <p:extLst>
+    <p:ext uri="{EFAFB233-063F-42B5-8137-9DF3F51BA10A}">
+      <p15:sldGuideLst xmlns:p15="http://schemas.microsoft.com/office/powerpoint/2012/main">
+        <p15:guide id="1" orient="horz" pos="1488">
+          <p15:clr>
+            <a:srgbClr val="A4A3A4"/>
+          </p15:clr>
+        </p15:guide>
+        <p15:guide id="2" pos="2880">
+          <p15:clr>
+            <a:srgbClr val="A4A3A4"/>
+          </p15:clr>
+        </p15:guide>
+      </p15:sldGuideLst>
+    </p:ext>
+  </p:extLst>
 </p:presentation>
 </file>
 
@@ -200,7 +216,7 @@
           <a:p>
             <a:fld id="{F5CC4B3F-88C1-4FFA-B1B6-F41C21DC6924}" type="datetimeFigureOut">
               <a:rPr lang="en-US" smtClean="0"/>
-              <a:t>9/30/2016</a:t>
+              <a:t>10/19/16</a:t>
             </a:fld>
             <a:endParaRPr lang="en-US"/>
           </a:p>
@@ -649,7 +665,7 @@
           <a:p>
             <a:fld id="{78C97017-6FC3-485B-9764-EAC9E56C1D49}" type="datetimeFigureOut">
               <a:rPr lang="en-US" smtClean="0"/>
-              <a:t>9/30/2016</a:t>
+              <a:t>10/19/16</a:t>
             </a:fld>
             <a:endParaRPr lang="en-US"/>
           </a:p>
@@ -819,7 +835,7 @@
           <a:p>
             <a:fld id="{78C97017-6FC3-485B-9764-EAC9E56C1D49}" type="datetimeFigureOut">
               <a:rPr lang="en-US" smtClean="0"/>
-              <a:t>9/30/2016</a:t>
+              <a:t>10/19/16</a:t>
             </a:fld>
             <a:endParaRPr lang="en-US"/>
           </a:p>
@@ -999,7 +1015,7 @@
           <a:p>
             <a:fld id="{78C97017-6FC3-485B-9764-EAC9E56C1D49}" type="datetimeFigureOut">
               <a:rPr lang="en-US" smtClean="0"/>
-              <a:t>9/30/2016</a:t>
+              <a:t>10/19/16</a:t>
             </a:fld>
             <a:endParaRPr lang="en-US"/>
           </a:p>
@@ -1169,7 +1185,7 @@
           <a:p>
             <a:fld id="{78C97017-6FC3-485B-9764-EAC9E56C1D49}" type="datetimeFigureOut">
               <a:rPr lang="en-US" smtClean="0"/>
-              <a:t>9/30/2016</a:t>
+              <a:t>10/19/16</a:t>
             </a:fld>
             <a:endParaRPr lang="en-US"/>
           </a:p>
@@ -1415,7 +1431,7 @@
           <a:p>
             <a:fld id="{78C97017-6FC3-485B-9764-EAC9E56C1D49}" type="datetimeFigureOut">
               <a:rPr lang="en-US" smtClean="0"/>
-              <a:t>9/30/2016</a:t>
+              <a:t>10/19/16</a:t>
             </a:fld>
             <a:endParaRPr lang="en-US"/>
           </a:p>
@@ -1703,7 +1719,7 @@
           <a:p>
             <a:fld id="{78C97017-6FC3-485B-9764-EAC9E56C1D49}" type="datetimeFigureOut">
               <a:rPr lang="en-US" smtClean="0"/>
-              <a:t>9/30/2016</a:t>
+              <a:t>10/19/16</a:t>
             </a:fld>
             <a:endParaRPr lang="en-US"/>
           </a:p>
@@ -2125,7 +2141,7 @@
           <a:p>
             <a:fld id="{78C97017-6FC3-485B-9764-EAC9E56C1D49}" type="datetimeFigureOut">
               <a:rPr lang="en-US" smtClean="0"/>
-              <a:t>9/30/2016</a:t>
+              <a:t>10/19/16</a:t>
             </a:fld>
             <a:endParaRPr lang="en-US"/>
           </a:p>
@@ -2243,7 +2259,7 @@
           <a:p>
             <a:fld id="{78C97017-6FC3-485B-9764-EAC9E56C1D49}" type="datetimeFigureOut">
               <a:rPr lang="en-US" smtClean="0"/>
-              <a:t>9/30/2016</a:t>
+              <a:t>10/19/16</a:t>
             </a:fld>
             <a:endParaRPr lang="en-US"/>
           </a:p>
@@ -2338,7 +2354,7 @@
           <a:p>
             <a:fld id="{78C97017-6FC3-485B-9764-EAC9E56C1D49}" type="datetimeFigureOut">
               <a:rPr lang="en-US" smtClean="0"/>
-              <a:t>9/30/2016</a:t>
+              <a:t>10/19/16</a:t>
             </a:fld>
             <a:endParaRPr lang="en-US"/>
           </a:p>
@@ -2615,7 +2631,7 @@
           <a:p>
             <a:fld id="{78C97017-6FC3-485B-9764-EAC9E56C1D49}" type="datetimeFigureOut">
               <a:rPr lang="en-US" smtClean="0"/>
-              <a:t>9/30/2016</a:t>
+              <a:t>10/19/16</a:t>
             </a:fld>
             <a:endParaRPr lang="en-US"/>
           </a:p>
@@ -2868,7 +2884,7 @@
           <a:p>
             <a:fld id="{78C97017-6FC3-485B-9764-EAC9E56C1D49}" type="datetimeFigureOut">
               <a:rPr lang="en-US" smtClean="0"/>
-              <a:t>9/30/2016</a:t>
+              <a:t>10/19/16</a:t>
             </a:fld>
             <a:endParaRPr lang="en-US"/>
           </a:p>
@@ -3081,7 +3097,7 @@
           <a:p>
             <a:fld id="{78C97017-6FC3-485B-9764-EAC9E56C1D49}" type="datetimeFigureOut">
               <a:rPr lang="en-US" smtClean="0"/>
-              <a:t>9/30/2016</a:t>
+              <a:t>10/19/16</a:t>
             </a:fld>
             <a:endParaRPr lang="en-US"/>
           </a:p>
@@ -3473,11 +3489,7 @@
           <a:p>
             <a:r>
               <a:rPr lang="en-US" dirty="0" err="1" smtClean="0"/>
-              <a:t>AddressBook</a:t>
-            </a:r>
-            <a:r>
-              <a:rPr lang="en-US" dirty="0" smtClean="0"/>
-              <a:t> – Level 4</a:t>
+              <a:t>taskmanager</a:t>
             </a:r>
             <a:endParaRPr lang="en-US" dirty="0"/>
           </a:p>
@@ -5753,7 +5765,7 @@
                   <a:srgbClr val="7030A0"/>
                 </a:solidFill>
               </a:rPr>
-              <a:t>deletePerson</a:t>
+              <a:t>deleteItem</a:t>
             </a:r>
             <a:r>
               <a:rPr lang="en-US" sz="1400" dirty="0" smtClean="0">
@@ -5811,7 +5823,7 @@
                   </a:schemeClr>
                 </a:solidFill>
               </a:rPr>
-              <a:t>AddressBookChangedEvent</a:t>
+              <a:t>TaskManagerChangedEvent</a:t>
             </a:r>
             <a:r>
               <a:rPr lang="en-US" sz="1400" dirty="0" smtClean="0">
@@ -6385,7 +6397,17 @@
                   </a:schemeClr>
                 </a:solidFill>
               </a:rPr>
-              <a:t>AddressBookChangedEvent</a:t>
+              <a:t>T</a:t>
+            </a:r>
+            <a:r>
+              <a:rPr lang="en-US" sz="1400" dirty="0" err="1" smtClean="0">
+                <a:solidFill>
+                  <a:schemeClr val="accent5">
+                    <a:lumMod val="75000"/>
+                  </a:schemeClr>
+                </a:solidFill>
+              </a:rPr>
+              <a:t>askManagerChangedEvent</a:t>
             </a:r>
             <a:r>
               <a:rPr lang="en-US" sz="1400" dirty="0" smtClean="0">
@@ -6757,7 +6779,17 @@
                   </a:schemeClr>
                 </a:solidFill>
               </a:rPr>
-              <a:t>handleAddresssBookChangedEvent</a:t>
+              <a:t>h</a:t>
+            </a:r>
+            <a:r>
+              <a:rPr lang="en-US" sz="1400" dirty="0" err="1" smtClean="0">
+                <a:solidFill>
+                  <a:schemeClr val="accent6">
+                    <a:lumMod val="75000"/>
+                  </a:schemeClr>
+                </a:solidFill>
+              </a:rPr>
+              <a:t>andleTaskManagerChangedEvent</a:t>
             </a:r>
             <a:r>
               <a:rPr lang="en-US" sz="1400" dirty="0" smtClean="0">
@@ -7068,7 +7100,7 @@
                   <a:srgbClr val="00B050"/>
                 </a:solidFill>
               </a:rPr>
-              <a:t>handleAddresssBookChangedEvent</a:t>
+              <a:t>handleTaskManagerChangedEvent</a:t>
             </a:r>
             <a:r>
               <a:rPr lang="en-US" sz="1400" dirty="0" smtClean="0">
@@ -8134,14 +8166,14 @@
           <a:p>
             <a:pPr algn="ctr"/>
             <a:r>
-              <a:rPr lang="en-US" sz="1050" b="1" dirty="0" err="1">
+              <a:rPr lang="en-US" sz="1050" b="1" smtClean="0">
                 <a:solidFill>
                   <a:schemeClr val="accent3">
                     <a:lumMod val="75000"/>
                   </a:schemeClr>
                 </a:solidFill>
               </a:rPr>
-              <a:t>PersonListPanel</a:t>
+              <a:t>ItemListPanel</a:t>
             </a:r>
             <a:endParaRPr lang="en-SG" sz="1050" b="1" dirty="0">
               <a:solidFill>
@@ -8194,14 +8226,24 @@
           <a:p>
             <a:pPr algn="ctr"/>
             <a:r>
-              <a:rPr lang="en-US" sz="1050" b="1" dirty="0" err="1">
+              <a:rPr lang="en-US" sz="1050" b="1" dirty="0" err="1" smtClean="0">
                 <a:solidFill>
                   <a:schemeClr val="accent3">
                     <a:lumMod val="75000"/>
                   </a:schemeClr>
                 </a:solidFill>
               </a:rPr>
-              <a:t>PersonCard</a:t>
+              <a:t>Item</a:t>
+            </a:r>
+            <a:r>
+              <a:rPr lang="en-US" sz="1050" b="1" dirty="0" err="1" smtClean="0">
+                <a:solidFill>
+                  <a:schemeClr val="accent3">
+                    <a:lumMod val="75000"/>
+                  </a:schemeClr>
+                </a:solidFill>
+              </a:rPr>
+              <a:t>Card</a:t>
             </a:r>
             <a:endParaRPr lang="en-SG" sz="1050" b="1" dirty="0">
               <a:solidFill>
@@ -12280,7 +12322,6 @@
               <a:rPr lang="en-US" dirty="0"/>
               <a:t>execute()</a:t>
             </a:r>
-            <a:endParaRPr lang="en-US" dirty="0"/>
           </a:p>
         </p:txBody>
       </p:sp>
@@ -13936,7 +13977,15 @@
                   <a:srgbClr val="7030A0"/>
                 </a:solidFill>
               </a:rPr>
-              <a:t>AddressBook</a:t>
+              <a:t>T</a:t>
+            </a:r>
+            <a:r>
+              <a:rPr lang="en-US" sz="1050" dirty="0" err="1" smtClean="0">
+                <a:solidFill>
+                  <a:srgbClr val="7030A0"/>
+                </a:solidFill>
+              </a:rPr>
+              <a:t>askManager</a:t>
             </a:r>
             <a:endParaRPr lang="en-SG" sz="1050" dirty="0">
               <a:solidFill>
@@ -14321,7 +14370,7 @@
                   <a:srgbClr val="7030A0"/>
                 </a:solidFill>
               </a:rPr>
-              <a:t>Person</a:t>
+              <a:t>Item</a:t>
             </a:r>
             <a:endParaRPr lang="en-SG" sz="1050" dirty="0">
               <a:solidFill>
@@ -14620,7 +14669,7 @@
                   <a:srgbClr val="7030A0"/>
                 </a:solidFill>
               </a:rPr>
-              <a:t>ReadOnlyPerson</a:t>
+              <a:t>ReadOnlyItem</a:t>
             </a:r>
             <a:endParaRPr lang="en-SG" sz="1050" dirty="0">
               <a:solidFill>
@@ -14820,7 +14869,7 @@
                   <a:srgbClr val="7030A0"/>
                 </a:solidFill>
               </a:rPr>
-              <a:t>Phone</a:t>
+              <a:t>Start Date</a:t>
             </a:r>
             <a:endParaRPr lang="en-SG" sz="1050" dirty="0">
               <a:solidFill>
@@ -14917,7 +14966,7 @@
                   <a:srgbClr val="7030A0"/>
                 </a:solidFill>
               </a:rPr>
-              <a:t>Email</a:t>
+              <a:t>Start Time</a:t>
             </a:r>
             <a:endParaRPr lang="en-SG" sz="1050" dirty="0">
               <a:solidFill>
@@ -15009,12 +15058,12 @@
           <a:p>
             <a:pPr algn="ctr"/>
             <a:r>
-              <a:rPr lang="en-US" sz="1050" dirty="0" smtClean="0">
+              <a:rPr lang="mr-IN" sz="1050" dirty="0" smtClean="0">
                 <a:solidFill>
                   <a:srgbClr val="7030A0"/>
                 </a:solidFill>
               </a:rPr>
-              <a:t>Address</a:t>
+              <a:t>…</a:t>
             </a:r>
             <a:endParaRPr lang="en-SG" sz="1050" dirty="0">
               <a:solidFill>
@@ -15217,7 +15266,7 @@
                   <a:srgbClr val="7030A0"/>
                 </a:solidFill>
               </a:rPr>
-              <a:t>ReadOnlyAddressBook</a:t>
+              <a:t>ReadOnlytaskmanager</a:t>
             </a:r>
             <a:endParaRPr lang="en-SG" sz="1050" dirty="0">
               <a:solidFill>
@@ -15557,7 +15606,7 @@
                   <a:schemeClr val="bg1"/>
                 </a:solidFill>
               </a:rPr>
-              <a:t>AddressBookStorage</a:t>
+              <a:t>TaskManagerStorage</a:t>
             </a:r>
             <a:endParaRPr lang="en-SG" sz="1050" dirty="0">
               <a:solidFill>
@@ -16130,7 +16179,422 @@
                   </a:schemeClr>
                 </a:solidFill>
               </a:rPr>
-              <a:t>XmlAddressBook</a:t>
+              <a:t>XmlTaskManagerStorage</a:t>
+            </a:r>
+            <a:endParaRPr lang="en-SG" sz="1050" b="1" dirty="0">
+              <a:solidFill>
+                <a:schemeClr val="accent6">
+                  <a:lumMod val="75000"/>
+                </a:schemeClr>
+              </a:solidFill>
+            </a:endParaRPr>
+          </a:p>
+        </p:txBody>
+      </p:sp>
+      <p:sp>
+        <p:nvSpPr>
+          <p:cNvPr id="52" name="Rectangle 8"/>
+          <p:cNvSpPr/>
+          <p:nvPr/>
+        </p:nvSpPr>
+        <p:spPr>
+          <a:xfrm>
+            <a:off x="2873943" y="2558040"/>
+            <a:ext cx="1323049" cy="346760"/>
+          </a:xfrm>
+          <a:prstGeom prst="rect">
+            <a:avLst/>
+          </a:prstGeom>
+          <a:solidFill>
+            <a:schemeClr val="accent6">
+              <a:lumMod val="75000"/>
+            </a:schemeClr>
+          </a:solidFill>
+          <a:ln w="19050">
+            <a:solidFill>
+              <a:schemeClr val="accent6">
+                <a:lumMod val="75000"/>
+              </a:schemeClr>
+            </a:solidFill>
+          </a:ln>
+          <a:effectLst/>
+        </p:spPr>
+        <p:style>
+          <a:lnRef idx="1">
+            <a:schemeClr val="accent2"/>
+          </a:lnRef>
+          <a:fillRef idx="2">
+            <a:schemeClr val="accent2"/>
+          </a:fillRef>
+          <a:effectRef idx="1">
+            <a:schemeClr val="accent2"/>
+          </a:effectRef>
+          <a:fontRef idx="minor">
+            <a:schemeClr val="dk1"/>
+          </a:fontRef>
+        </p:style>
+        <p:txBody>
+          <a:bodyPr rtlCol="0" anchor="ctr"/>
+          <a:lstStyle/>
+          <a:p>
+            <a:pPr algn="ctr"/>
+            <a:r>
+              <a:rPr lang="en-US" sz="1050" dirty="0" smtClean="0">
+                <a:solidFill>
+                  <a:schemeClr val="bg1"/>
+                </a:solidFill>
+              </a:rPr>
+              <a:t>&lt;&lt;interface&gt;&gt;</a:t>
+            </a:r>
+            <a:br>
+              <a:rPr lang="en-US" sz="1050" dirty="0" smtClean="0">
+                <a:solidFill>
+                  <a:schemeClr val="bg1"/>
+                </a:solidFill>
+              </a:rPr>
+            </a:br>
+            <a:r>
+              <a:rPr lang="en-US" sz="1050" dirty="0" err="1" smtClean="0">
+                <a:solidFill>
+                  <a:schemeClr val="bg1"/>
+                </a:solidFill>
+              </a:rPr>
+              <a:t>UserPrefsStorage</a:t>
+            </a:r>
+            <a:endParaRPr lang="en-SG" sz="1050" dirty="0">
+              <a:solidFill>
+                <a:schemeClr val="bg1"/>
+              </a:solidFill>
+            </a:endParaRPr>
+          </a:p>
+        </p:txBody>
+      </p:sp>
+      <p:cxnSp>
+        <p:nvCxnSpPr>
+          <p:cNvPr id="54" name="Straight Arrow Connector 53"/>
+          <p:cNvCxnSpPr>
+            <a:stCxn id="56" idx="3"/>
+            <a:endCxn id="52" idx="1"/>
+          </p:cNvCxnSpPr>
+          <p:nvPr/>
+        </p:nvCxnSpPr>
+        <p:spPr>
+          <a:xfrm>
+            <a:off x="2653133" y="2726136"/>
+            <a:ext cx="220810" cy="5284"/>
+          </a:xfrm>
+          <a:prstGeom prst="straightConnector1">
+            <a:avLst/>
+          </a:prstGeom>
+          <a:ln w="19050">
+            <a:solidFill>
+              <a:schemeClr val="accent6">
+                <a:lumMod val="75000"/>
+              </a:schemeClr>
+            </a:solidFill>
+            <a:headEnd type="none" w="med" len="med"/>
+            <a:tailEnd type="arrow" w="med" len="med"/>
+          </a:ln>
+          <a:effectLst/>
+        </p:spPr>
+        <p:style>
+          <a:lnRef idx="1">
+            <a:schemeClr val="accent2"/>
+          </a:lnRef>
+          <a:fillRef idx="2">
+            <a:schemeClr val="accent2"/>
+          </a:fillRef>
+          <a:effectRef idx="1">
+            <a:schemeClr val="accent2"/>
+          </a:effectRef>
+          <a:fontRef idx="minor">
+            <a:schemeClr val="dk1"/>
+          </a:fontRef>
+        </p:style>
+      </p:cxnSp>
+      <p:sp>
+        <p:nvSpPr>
+          <p:cNvPr id="56" name="Flowchart: Decision 96"/>
+          <p:cNvSpPr/>
+          <p:nvPr/>
+        </p:nvSpPr>
+        <p:spPr>
+          <a:xfrm>
+            <a:off x="2417085" y="2639446"/>
+            <a:ext cx="236048" cy="173380"/>
+          </a:xfrm>
+          <a:prstGeom prst="flowChartDecision">
+            <a:avLst/>
+          </a:prstGeom>
+          <a:noFill/>
+          <a:ln w="19050">
+            <a:solidFill>
+              <a:schemeClr val="accent6">
+                <a:lumMod val="75000"/>
+              </a:schemeClr>
+            </a:solidFill>
+          </a:ln>
+          <a:effectLst/>
+        </p:spPr>
+        <p:style>
+          <a:lnRef idx="1">
+            <a:schemeClr val="accent2"/>
+          </a:lnRef>
+          <a:fillRef idx="2">
+            <a:schemeClr val="accent2"/>
+          </a:fillRef>
+          <a:effectRef idx="1">
+            <a:schemeClr val="accent2"/>
+          </a:effectRef>
+          <a:fontRef idx="minor">
+            <a:schemeClr val="dk1"/>
+          </a:fontRef>
+        </p:style>
+        <p:txBody>
+          <a:bodyPr rtlCol="0" anchor="ctr"/>
+          <a:lstStyle/>
+          <a:p>
+            <a:pPr algn="ctr"/>
+            <a:endParaRPr lang="en-US" sz="1050">
+              <a:solidFill>
+                <a:schemeClr val="bg1"/>
+              </a:solidFill>
+            </a:endParaRPr>
+          </a:p>
+        </p:txBody>
+      </p:sp>
+      <p:cxnSp>
+        <p:nvCxnSpPr>
+          <p:cNvPr id="60" name="Elbow Connector 63"/>
+          <p:cNvCxnSpPr>
+            <a:stCxn id="61" idx="3"/>
+            <a:endCxn id="65" idx="1"/>
+          </p:cNvCxnSpPr>
+          <p:nvPr/>
+        </p:nvCxnSpPr>
+        <p:spPr>
+          <a:xfrm flipV="1">
+            <a:off x="4394804" y="2731420"/>
+            <a:ext cx="223324" cy="1"/>
+          </a:xfrm>
+          <a:prstGeom prst="bentConnector3">
+            <a:avLst>
+              <a:gd name="adj1" fmla="val 50000"/>
+            </a:avLst>
+          </a:prstGeom>
+          <a:ln w="19050">
+            <a:solidFill>
+              <a:schemeClr val="accent6">
+                <a:lumMod val="75000"/>
+              </a:schemeClr>
+            </a:solidFill>
+            <a:prstDash val="sysDot"/>
+            <a:headEnd type="none" w="med" len="med"/>
+            <a:tailEnd type="none" w="med" len="med"/>
+          </a:ln>
+          <a:effectLst/>
+        </p:spPr>
+        <p:style>
+          <a:lnRef idx="1">
+            <a:schemeClr val="accent2"/>
+          </a:lnRef>
+          <a:fillRef idx="2">
+            <a:schemeClr val="accent2"/>
+          </a:fillRef>
+          <a:effectRef idx="1">
+            <a:schemeClr val="accent2"/>
+          </a:effectRef>
+          <a:fontRef idx="minor">
+            <a:schemeClr val="dk1"/>
+          </a:fontRef>
+        </p:style>
+      </p:cxnSp>
+      <p:sp>
+        <p:nvSpPr>
+          <p:cNvPr id="61" name="Isosceles Triangle 102"/>
+          <p:cNvSpPr/>
+          <p:nvPr/>
+        </p:nvSpPr>
+        <p:spPr>
+          <a:xfrm rot="5400000" flipV="1">
+            <a:off x="4171790" y="2643659"/>
+            <a:ext cx="270504" cy="175523"/>
+          </a:xfrm>
+          <a:prstGeom prst="triangle">
+            <a:avLst/>
+          </a:prstGeom>
+          <a:solidFill>
+            <a:schemeClr val="accent6">
+              <a:lumMod val="75000"/>
+            </a:schemeClr>
+          </a:solidFill>
+          <a:ln w="19050">
+            <a:solidFill>
+              <a:schemeClr val="accent6">
+                <a:lumMod val="75000"/>
+              </a:schemeClr>
+            </a:solidFill>
+          </a:ln>
+          <a:effectLst/>
+        </p:spPr>
+        <p:style>
+          <a:lnRef idx="1">
+            <a:schemeClr val="accent2"/>
+          </a:lnRef>
+          <a:fillRef idx="2">
+            <a:schemeClr val="accent2"/>
+          </a:fillRef>
+          <a:effectRef idx="1">
+            <a:schemeClr val="accent2"/>
+          </a:effectRef>
+          <a:fontRef idx="minor">
+            <a:schemeClr val="dk1"/>
+          </a:fontRef>
+        </p:style>
+        <p:txBody>
+          <a:bodyPr rtlCol="0" anchor="ctr"/>
+          <a:lstStyle/>
+          <a:p>
+            <a:pPr algn="ctr"/>
+            <a:endParaRPr lang="en-SG" sz="1050">
+              <a:solidFill>
+                <a:schemeClr val="bg1"/>
+              </a:solidFill>
+            </a:endParaRPr>
+          </a:p>
+        </p:txBody>
+      </p:sp>
+      <p:sp>
+        <p:nvSpPr>
+          <p:cNvPr id="65" name="Rectangle 8"/>
+          <p:cNvSpPr/>
+          <p:nvPr/>
+        </p:nvSpPr>
+        <p:spPr>
+          <a:xfrm>
+            <a:off x="4618128" y="2558040"/>
+            <a:ext cx="1093635" cy="346760"/>
+          </a:xfrm>
+          <a:prstGeom prst="rect">
+            <a:avLst/>
+          </a:prstGeom>
+          <a:solidFill>
+            <a:schemeClr val="accent6">
+              <a:lumMod val="75000"/>
+            </a:schemeClr>
+          </a:solidFill>
+          <a:ln w="19050">
+            <a:solidFill>
+              <a:schemeClr val="accent6">
+                <a:lumMod val="75000"/>
+              </a:schemeClr>
+            </a:solidFill>
+          </a:ln>
+          <a:effectLst/>
+        </p:spPr>
+        <p:style>
+          <a:lnRef idx="1">
+            <a:schemeClr val="accent2"/>
+          </a:lnRef>
+          <a:fillRef idx="2">
+            <a:schemeClr val="accent2"/>
+          </a:fillRef>
+          <a:effectRef idx="1">
+            <a:schemeClr val="accent2"/>
+          </a:effectRef>
+          <a:fontRef idx="minor">
+            <a:schemeClr val="dk1"/>
+          </a:fontRef>
+        </p:style>
+        <p:txBody>
+          <a:bodyPr rtlCol="0" anchor="ctr"/>
+          <a:lstStyle/>
+          <a:p>
+            <a:pPr algn="ctr"/>
+            <a:r>
+              <a:rPr lang="en-US" sz="1050" dirty="0" err="1" smtClean="0">
+                <a:solidFill>
+                  <a:schemeClr val="bg1"/>
+                </a:solidFill>
+              </a:rPr>
+              <a:t>JsonUserPrefs</a:t>
+            </a:r>
+            <a:r>
+              <a:rPr lang="en-US" sz="1050" dirty="0" smtClean="0">
+                <a:solidFill>
+                  <a:schemeClr val="bg1"/>
+                </a:solidFill>
+              </a:rPr>
+              <a:t/>
+            </a:r>
+            <a:br>
+              <a:rPr lang="en-US" sz="1050" dirty="0" smtClean="0">
+                <a:solidFill>
+                  <a:schemeClr val="bg1"/>
+                </a:solidFill>
+              </a:rPr>
+            </a:br>
+            <a:r>
+              <a:rPr lang="en-US" sz="1050" dirty="0" smtClean="0">
+                <a:solidFill>
+                  <a:schemeClr val="bg1"/>
+                </a:solidFill>
+              </a:rPr>
+              <a:t>Storage</a:t>
+            </a:r>
+            <a:endParaRPr lang="en-SG" sz="1050" dirty="0">
+              <a:solidFill>
+                <a:schemeClr val="bg1"/>
+              </a:solidFill>
+            </a:endParaRPr>
+          </a:p>
+        </p:txBody>
+      </p:sp>
+      <p:sp>
+        <p:nvSpPr>
+          <p:cNvPr id="66" name="Rectangle 8"/>
+          <p:cNvSpPr/>
+          <p:nvPr/>
+        </p:nvSpPr>
+        <p:spPr>
+          <a:xfrm>
+            <a:off x="6019800" y="3160410"/>
+            <a:ext cx="1200707" cy="346760"/>
+          </a:xfrm>
+          <a:prstGeom prst="rect">
+            <a:avLst/>
+          </a:prstGeom>
+          <a:ln w="19050"/>
+          <a:effectLst/>
+        </p:spPr>
+        <p:style>
+          <a:lnRef idx="1">
+            <a:schemeClr val="accent6"/>
+          </a:lnRef>
+          <a:fillRef idx="2">
+            <a:schemeClr val="accent6"/>
+          </a:fillRef>
+          <a:effectRef idx="1">
+            <a:schemeClr val="accent6"/>
+          </a:effectRef>
+          <a:fontRef idx="minor">
+            <a:schemeClr val="dk1"/>
+          </a:fontRef>
+        </p:style>
+        <p:txBody>
+          <a:bodyPr rtlCol="0" anchor="ctr"/>
+          <a:lstStyle/>
+          <a:p>
+            <a:pPr algn="ctr"/>
+            <a:r>
+              <a:rPr lang="en-US" sz="1050" b="1" dirty="0" err="1" smtClean="0">
+                <a:solidFill>
+                  <a:schemeClr val="accent6">
+                    <a:lumMod val="75000"/>
+                  </a:schemeClr>
+                </a:solidFill>
+              </a:rPr>
+              <a:t>XmlSerializable</a:t>
             </a:r>
             <a:r>
               <a:rPr lang="en-US" sz="1050" b="1" dirty="0" smtClean="0">
@@ -16152,421 +16616,6 @@
               </a:rPr>
             </a:br>
             <a:r>
-              <a:rPr lang="en-US" sz="1050" b="1" dirty="0" smtClean="0">
-                <a:solidFill>
-                  <a:schemeClr val="accent6">
-                    <a:lumMod val="75000"/>
-                  </a:schemeClr>
-                </a:solidFill>
-              </a:rPr>
-              <a:t>Storage</a:t>
-            </a:r>
-            <a:endParaRPr lang="en-SG" sz="1050" b="1" dirty="0">
-              <a:solidFill>
-                <a:schemeClr val="accent6">
-                  <a:lumMod val="75000"/>
-                </a:schemeClr>
-              </a:solidFill>
-            </a:endParaRPr>
-          </a:p>
-        </p:txBody>
-      </p:sp>
-      <p:sp>
-        <p:nvSpPr>
-          <p:cNvPr id="52" name="Rectangle 8"/>
-          <p:cNvSpPr/>
-          <p:nvPr/>
-        </p:nvSpPr>
-        <p:spPr>
-          <a:xfrm>
-            <a:off x="2873943" y="2558040"/>
-            <a:ext cx="1323049" cy="346760"/>
-          </a:xfrm>
-          <a:prstGeom prst="rect">
-            <a:avLst/>
-          </a:prstGeom>
-          <a:solidFill>
-            <a:schemeClr val="accent6">
-              <a:lumMod val="75000"/>
-            </a:schemeClr>
-          </a:solidFill>
-          <a:ln w="19050">
-            <a:solidFill>
-              <a:schemeClr val="accent6">
-                <a:lumMod val="75000"/>
-              </a:schemeClr>
-            </a:solidFill>
-          </a:ln>
-          <a:effectLst/>
-        </p:spPr>
-        <p:style>
-          <a:lnRef idx="1">
-            <a:schemeClr val="accent2"/>
-          </a:lnRef>
-          <a:fillRef idx="2">
-            <a:schemeClr val="accent2"/>
-          </a:fillRef>
-          <a:effectRef idx="1">
-            <a:schemeClr val="accent2"/>
-          </a:effectRef>
-          <a:fontRef idx="minor">
-            <a:schemeClr val="dk1"/>
-          </a:fontRef>
-        </p:style>
-        <p:txBody>
-          <a:bodyPr rtlCol="0" anchor="ctr"/>
-          <a:lstStyle/>
-          <a:p>
-            <a:pPr algn="ctr"/>
-            <a:r>
-              <a:rPr lang="en-US" sz="1050" dirty="0" smtClean="0">
-                <a:solidFill>
-                  <a:schemeClr val="bg1"/>
-                </a:solidFill>
-              </a:rPr>
-              <a:t>&lt;&lt;interface&gt;&gt;</a:t>
-            </a:r>
-            <a:br>
-              <a:rPr lang="en-US" sz="1050" dirty="0" smtClean="0">
-                <a:solidFill>
-                  <a:schemeClr val="bg1"/>
-                </a:solidFill>
-              </a:rPr>
-            </a:br>
-            <a:r>
-              <a:rPr lang="en-US" sz="1050" dirty="0" err="1" smtClean="0">
-                <a:solidFill>
-                  <a:schemeClr val="bg1"/>
-                </a:solidFill>
-              </a:rPr>
-              <a:t>UserPrefsStorage</a:t>
-            </a:r>
-            <a:endParaRPr lang="en-SG" sz="1050" dirty="0">
-              <a:solidFill>
-                <a:schemeClr val="bg1"/>
-              </a:solidFill>
-            </a:endParaRPr>
-          </a:p>
-        </p:txBody>
-      </p:sp>
-      <p:cxnSp>
-        <p:nvCxnSpPr>
-          <p:cNvPr id="54" name="Straight Arrow Connector 53"/>
-          <p:cNvCxnSpPr>
-            <a:stCxn id="56" idx="3"/>
-            <a:endCxn id="52" idx="1"/>
-          </p:cNvCxnSpPr>
-          <p:nvPr/>
-        </p:nvCxnSpPr>
-        <p:spPr>
-          <a:xfrm>
-            <a:off x="2653133" y="2726136"/>
-            <a:ext cx="220810" cy="5284"/>
-          </a:xfrm>
-          <a:prstGeom prst="straightConnector1">
-            <a:avLst/>
-          </a:prstGeom>
-          <a:ln w="19050">
-            <a:solidFill>
-              <a:schemeClr val="accent6">
-                <a:lumMod val="75000"/>
-              </a:schemeClr>
-            </a:solidFill>
-            <a:headEnd type="none" w="med" len="med"/>
-            <a:tailEnd type="arrow" w="med" len="med"/>
-          </a:ln>
-          <a:effectLst/>
-        </p:spPr>
-        <p:style>
-          <a:lnRef idx="1">
-            <a:schemeClr val="accent2"/>
-          </a:lnRef>
-          <a:fillRef idx="2">
-            <a:schemeClr val="accent2"/>
-          </a:fillRef>
-          <a:effectRef idx="1">
-            <a:schemeClr val="accent2"/>
-          </a:effectRef>
-          <a:fontRef idx="minor">
-            <a:schemeClr val="dk1"/>
-          </a:fontRef>
-        </p:style>
-      </p:cxnSp>
-      <p:sp>
-        <p:nvSpPr>
-          <p:cNvPr id="56" name="Flowchart: Decision 96"/>
-          <p:cNvSpPr/>
-          <p:nvPr/>
-        </p:nvSpPr>
-        <p:spPr>
-          <a:xfrm>
-            <a:off x="2417085" y="2639446"/>
-            <a:ext cx="236048" cy="173380"/>
-          </a:xfrm>
-          <a:prstGeom prst="flowChartDecision">
-            <a:avLst/>
-          </a:prstGeom>
-          <a:noFill/>
-          <a:ln w="19050">
-            <a:solidFill>
-              <a:schemeClr val="accent6">
-                <a:lumMod val="75000"/>
-              </a:schemeClr>
-            </a:solidFill>
-          </a:ln>
-          <a:effectLst/>
-        </p:spPr>
-        <p:style>
-          <a:lnRef idx="1">
-            <a:schemeClr val="accent2"/>
-          </a:lnRef>
-          <a:fillRef idx="2">
-            <a:schemeClr val="accent2"/>
-          </a:fillRef>
-          <a:effectRef idx="1">
-            <a:schemeClr val="accent2"/>
-          </a:effectRef>
-          <a:fontRef idx="minor">
-            <a:schemeClr val="dk1"/>
-          </a:fontRef>
-        </p:style>
-        <p:txBody>
-          <a:bodyPr rtlCol="0" anchor="ctr"/>
-          <a:lstStyle/>
-          <a:p>
-            <a:pPr algn="ctr"/>
-            <a:endParaRPr lang="en-US" sz="1050">
-              <a:solidFill>
-                <a:schemeClr val="bg1"/>
-              </a:solidFill>
-            </a:endParaRPr>
-          </a:p>
-        </p:txBody>
-      </p:sp>
-      <p:cxnSp>
-        <p:nvCxnSpPr>
-          <p:cNvPr id="60" name="Elbow Connector 63"/>
-          <p:cNvCxnSpPr>
-            <a:stCxn id="61" idx="3"/>
-            <a:endCxn id="65" idx="1"/>
-          </p:cNvCxnSpPr>
-          <p:nvPr/>
-        </p:nvCxnSpPr>
-        <p:spPr>
-          <a:xfrm flipV="1">
-            <a:off x="4394804" y="2731420"/>
-            <a:ext cx="223324" cy="1"/>
-          </a:xfrm>
-          <a:prstGeom prst="bentConnector3">
-            <a:avLst>
-              <a:gd name="adj1" fmla="val 50000"/>
-            </a:avLst>
-          </a:prstGeom>
-          <a:ln w="19050">
-            <a:solidFill>
-              <a:schemeClr val="accent6">
-                <a:lumMod val="75000"/>
-              </a:schemeClr>
-            </a:solidFill>
-            <a:prstDash val="sysDot"/>
-            <a:headEnd type="none" w="med" len="med"/>
-            <a:tailEnd type="none" w="med" len="med"/>
-          </a:ln>
-          <a:effectLst/>
-        </p:spPr>
-        <p:style>
-          <a:lnRef idx="1">
-            <a:schemeClr val="accent2"/>
-          </a:lnRef>
-          <a:fillRef idx="2">
-            <a:schemeClr val="accent2"/>
-          </a:fillRef>
-          <a:effectRef idx="1">
-            <a:schemeClr val="accent2"/>
-          </a:effectRef>
-          <a:fontRef idx="minor">
-            <a:schemeClr val="dk1"/>
-          </a:fontRef>
-        </p:style>
-      </p:cxnSp>
-      <p:sp>
-        <p:nvSpPr>
-          <p:cNvPr id="61" name="Isosceles Triangle 102"/>
-          <p:cNvSpPr/>
-          <p:nvPr/>
-        </p:nvSpPr>
-        <p:spPr>
-          <a:xfrm rot="5400000" flipV="1">
-            <a:off x="4171790" y="2643659"/>
-            <a:ext cx="270504" cy="175523"/>
-          </a:xfrm>
-          <a:prstGeom prst="triangle">
-            <a:avLst/>
-          </a:prstGeom>
-          <a:solidFill>
-            <a:schemeClr val="accent6">
-              <a:lumMod val="75000"/>
-            </a:schemeClr>
-          </a:solidFill>
-          <a:ln w="19050">
-            <a:solidFill>
-              <a:schemeClr val="accent6">
-                <a:lumMod val="75000"/>
-              </a:schemeClr>
-            </a:solidFill>
-          </a:ln>
-          <a:effectLst/>
-        </p:spPr>
-        <p:style>
-          <a:lnRef idx="1">
-            <a:schemeClr val="accent2"/>
-          </a:lnRef>
-          <a:fillRef idx="2">
-            <a:schemeClr val="accent2"/>
-          </a:fillRef>
-          <a:effectRef idx="1">
-            <a:schemeClr val="accent2"/>
-          </a:effectRef>
-          <a:fontRef idx="minor">
-            <a:schemeClr val="dk1"/>
-          </a:fontRef>
-        </p:style>
-        <p:txBody>
-          <a:bodyPr rtlCol="0" anchor="ctr"/>
-          <a:lstStyle/>
-          <a:p>
-            <a:pPr algn="ctr"/>
-            <a:endParaRPr lang="en-SG" sz="1050">
-              <a:solidFill>
-                <a:schemeClr val="bg1"/>
-              </a:solidFill>
-            </a:endParaRPr>
-          </a:p>
-        </p:txBody>
-      </p:sp>
-      <p:sp>
-        <p:nvSpPr>
-          <p:cNvPr id="65" name="Rectangle 8"/>
-          <p:cNvSpPr/>
-          <p:nvPr/>
-        </p:nvSpPr>
-        <p:spPr>
-          <a:xfrm>
-            <a:off x="4618128" y="2558040"/>
-            <a:ext cx="1093635" cy="346760"/>
-          </a:xfrm>
-          <a:prstGeom prst="rect">
-            <a:avLst/>
-          </a:prstGeom>
-          <a:solidFill>
-            <a:schemeClr val="accent6">
-              <a:lumMod val="75000"/>
-            </a:schemeClr>
-          </a:solidFill>
-          <a:ln w="19050">
-            <a:solidFill>
-              <a:schemeClr val="accent6">
-                <a:lumMod val="75000"/>
-              </a:schemeClr>
-            </a:solidFill>
-          </a:ln>
-          <a:effectLst/>
-        </p:spPr>
-        <p:style>
-          <a:lnRef idx="1">
-            <a:schemeClr val="accent2"/>
-          </a:lnRef>
-          <a:fillRef idx="2">
-            <a:schemeClr val="accent2"/>
-          </a:fillRef>
-          <a:effectRef idx="1">
-            <a:schemeClr val="accent2"/>
-          </a:effectRef>
-          <a:fontRef idx="minor">
-            <a:schemeClr val="dk1"/>
-          </a:fontRef>
-        </p:style>
-        <p:txBody>
-          <a:bodyPr rtlCol="0" anchor="ctr"/>
-          <a:lstStyle/>
-          <a:p>
-            <a:pPr algn="ctr"/>
-            <a:r>
-              <a:rPr lang="en-US" sz="1050" dirty="0" err="1" smtClean="0">
-                <a:solidFill>
-                  <a:schemeClr val="bg1"/>
-                </a:solidFill>
-              </a:rPr>
-              <a:t>JsonUserPrefs</a:t>
-            </a:r>
-            <a:r>
-              <a:rPr lang="en-US" sz="1050" dirty="0" smtClean="0">
-                <a:solidFill>
-                  <a:schemeClr val="bg1"/>
-                </a:solidFill>
-              </a:rPr>
-              <a:t/>
-            </a:r>
-            <a:br>
-              <a:rPr lang="en-US" sz="1050" dirty="0" smtClean="0">
-                <a:solidFill>
-                  <a:schemeClr val="bg1"/>
-                </a:solidFill>
-              </a:rPr>
-            </a:br>
-            <a:r>
-              <a:rPr lang="en-US" sz="1050" dirty="0" smtClean="0">
-                <a:solidFill>
-                  <a:schemeClr val="bg1"/>
-                </a:solidFill>
-              </a:rPr>
-              <a:t>Storage</a:t>
-            </a:r>
-            <a:endParaRPr lang="en-SG" sz="1050" dirty="0">
-              <a:solidFill>
-                <a:schemeClr val="bg1"/>
-              </a:solidFill>
-            </a:endParaRPr>
-          </a:p>
-        </p:txBody>
-      </p:sp>
-      <p:sp>
-        <p:nvSpPr>
-          <p:cNvPr id="66" name="Rectangle 8"/>
-          <p:cNvSpPr/>
-          <p:nvPr/>
-        </p:nvSpPr>
-        <p:spPr>
-          <a:xfrm>
-            <a:off x="6019800" y="3160410"/>
-            <a:ext cx="1200707" cy="346760"/>
-          </a:xfrm>
-          <a:prstGeom prst="rect">
-            <a:avLst/>
-          </a:prstGeom>
-          <a:ln w="19050"/>
-          <a:effectLst/>
-        </p:spPr>
-        <p:style>
-          <a:lnRef idx="1">
-            <a:schemeClr val="accent6"/>
-          </a:lnRef>
-          <a:fillRef idx="2">
-            <a:schemeClr val="accent6"/>
-          </a:fillRef>
-          <a:effectRef idx="1">
-            <a:schemeClr val="accent6"/>
-          </a:effectRef>
-          <a:fontRef idx="minor">
-            <a:schemeClr val="dk1"/>
-          </a:fontRef>
-        </p:style>
-        <p:txBody>
-          <a:bodyPr rtlCol="0" anchor="ctr"/>
-          <a:lstStyle/>
-          <a:p>
-            <a:pPr algn="ctr"/>
-            <a:r>
               <a:rPr lang="en-US" sz="1050" b="1" dirty="0" err="1" smtClean="0">
                 <a:solidFill>
                   <a:schemeClr val="accent6">
@@ -16574,36 +16623,7 @@
                   </a:schemeClr>
                 </a:solidFill>
               </a:rPr>
-              <a:t>XmlSerializable</a:t>
-            </a:r>
-            <a:r>
-              <a:rPr lang="en-US" sz="1050" b="1" dirty="0" smtClean="0">
-                <a:solidFill>
-                  <a:schemeClr val="accent6">
-                    <a:lumMod val="75000"/>
-                  </a:schemeClr>
-                </a:solidFill>
-              </a:rPr>
-              <a:t/>
-            </a:r>
-            <a:br>
-              <a:rPr lang="en-US" sz="1050" b="1" dirty="0" smtClean="0">
-                <a:solidFill>
-                  <a:schemeClr val="accent6">
-                    <a:lumMod val="75000"/>
-                  </a:schemeClr>
-                </a:solidFill>
-              </a:rPr>
-            </a:br>
-            <a:r>
-              <a:rPr lang="en-US" sz="1050" b="1" dirty="0" err="1" smtClean="0">
-                <a:solidFill>
-                  <a:schemeClr val="accent6">
-                    <a:lumMod val="75000"/>
-                  </a:schemeClr>
-                </a:solidFill>
-              </a:rPr>
-              <a:t>AddressBook</a:t>
+              <a:t>TaskManager</a:t>
             </a:r>
             <a:endParaRPr lang="en-SG" sz="1050" b="1" dirty="0">
               <a:solidFill>
@@ -16756,7 +16776,7 @@
                   </a:schemeClr>
                 </a:solidFill>
               </a:rPr>
-              <a:t>XmlAdaptedPerson</a:t>
+              <a:t>XmlAdaptedItem</a:t>
             </a:r>
             <a:endParaRPr lang="en-SG" sz="1050" b="1" dirty="0">
               <a:solidFill>

</xml_diff>

<commit_message>
Revert "Update diagrams to reflect change to task manager"
This reverts commit afa333d8ab5b266f650448df4f45043e57de9199.
</commit_message>
<xml_diff>
--- a/docs/diagrams/Diagrams.pptx
+++ b/docs/diagrams/Diagrams.pptx
@@ -5,7 +5,7 @@
     <p:sldMasterId id="2147483648" r:id="rId1"/>
   </p:sldMasterIdLst>
   <p:notesMasterIdLst>
-    <p:notesMasterId r:id="rId12"/>
+    <p:notesMasterId r:id="rId11"/>
   </p:notesMasterIdLst>
   <p:sldIdLst>
     <p:sldId id="256" r:id="rId2"/>
@@ -16,8 +16,7 @@
     <p:sldId id="267" r:id="rId7"/>
     <p:sldId id="263" r:id="rId8"/>
     <p:sldId id="264" r:id="rId9"/>
-    <p:sldId id="268" r:id="rId10"/>
-    <p:sldId id="265" r:id="rId11"/>
+    <p:sldId id="265" r:id="rId10"/>
   </p:sldIdLst>
   <p:sldSz cx="9144000" cy="6858000" type="screen4x3"/>
   <p:notesSz cx="6858000" cy="9144000"/>
@@ -3532,36 +3531,6 @@
 </p:sld>
 </file>
 
-<file path=ppt/slides/slide10.xml><?xml version="1.0" encoding="utf-8"?>
-<p:sld xmlns:a="http://schemas.openxmlformats.org/drawingml/2006/main" xmlns:r="http://schemas.openxmlformats.org/officeDocument/2006/relationships" xmlns:p="http://schemas.openxmlformats.org/presentationml/2006/main">
-  <p:cSld>
-    <p:spTree>
-      <p:nvGrpSpPr>
-        <p:cNvPr id="1" name=""/>
-        <p:cNvGrpSpPr/>
-        <p:nvPr/>
-      </p:nvGrpSpPr>
-      <p:grpSpPr>
-        <a:xfrm>
-          <a:off x="0" y="0"/>
-          <a:ext cx="0" cy="0"/>
-          <a:chOff x="0" y="0"/>
-          <a:chExt cx="0" cy="0"/>
-        </a:xfrm>
-      </p:grpSpPr>
-    </p:spTree>
-    <p:extLst>
-      <p:ext uri="{BB962C8B-B14F-4D97-AF65-F5344CB8AC3E}">
-        <p14:creationId xmlns:p14="http://schemas.microsoft.com/office/powerpoint/2010/main" val="2978036214"/>
-      </p:ext>
-    </p:extLst>
-  </p:cSld>
-  <p:clrMapOvr>
-    <a:masterClrMapping/>
-  </p:clrMapOvr>
-</p:sld>
-</file>
-
 <file path=ppt/slides/slide2.xml><?xml version="1.0" encoding="utf-8"?>
 <p:sld xmlns:a="http://schemas.openxmlformats.org/drawingml/2006/main" xmlns:r="http://schemas.openxmlformats.org/officeDocument/2006/relationships" xmlns:p="http://schemas.openxmlformats.org/presentationml/2006/main">
   <p:cSld>
@@ -6428,7 +6397,17 @@
                   </a:schemeClr>
                 </a:solidFill>
               </a:rPr>
-              <a:t>TaskManagerChangedEvent</a:t>
+              <a:t>T</a:t>
+            </a:r>
+            <a:r>
+              <a:rPr lang="en-US" sz="1400" dirty="0" err="1" smtClean="0">
+                <a:solidFill>
+                  <a:schemeClr val="accent5">
+                    <a:lumMod val="75000"/>
+                  </a:schemeClr>
+                </a:solidFill>
+              </a:rPr>
+              <a:t>askManagerChangedEvent</a:t>
             </a:r>
             <a:r>
               <a:rPr lang="en-US" sz="1400" dirty="0" smtClean="0">
@@ -6800,7 +6779,17 @@
                   </a:schemeClr>
                 </a:solidFill>
               </a:rPr>
-              <a:t>handleTaskManagerChangedEvent</a:t>
+              <a:t>h</a:t>
+            </a:r>
+            <a:r>
+              <a:rPr lang="en-US" sz="1400" dirty="0" err="1" smtClean="0">
+                <a:solidFill>
+                  <a:schemeClr val="accent6">
+                    <a:lumMod val="75000"/>
+                  </a:schemeClr>
+                </a:solidFill>
+              </a:rPr>
+              <a:t>andleTaskManagerChangedEvent</a:t>
             </a:r>
             <a:r>
               <a:rPr lang="en-US" sz="1400" dirty="0" smtClean="0">
@@ -8244,7 +8233,17 @@
                   </a:schemeClr>
                 </a:solidFill>
               </a:rPr>
-              <a:t>ItemCard</a:t>
+              <a:t>Item</a:t>
+            </a:r>
+            <a:r>
+              <a:rPr lang="en-US" sz="1050" b="1" dirty="0" err="1" smtClean="0">
+                <a:solidFill>
+                  <a:schemeClr val="accent3">
+                    <a:lumMod val="75000"/>
+                  </a:schemeClr>
+                </a:solidFill>
+              </a:rPr>
+              <a:t>Card</a:t>
             </a:r>
             <a:endParaRPr lang="en-SG" sz="1050" b="1" dirty="0">
               <a:solidFill>
@@ -13978,7 +13977,15 @@
                   <a:srgbClr val="7030A0"/>
                 </a:solidFill>
               </a:rPr>
-              <a:t>TaskManager</a:t>
+              <a:t>T</a:t>
+            </a:r>
+            <a:r>
+              <a:rPr lang="en-US" sz="1050" dirty="0" err="1" smtClean="0">
+                <a:solidFill>
+                  <a:srgbClr val="7030A0"/>
+                </a:solidFill>
+              </a:rPr>
+              <a:t>askManager</a:t>
             </a:r>
             <a:endParaRPr lang="en-SG" sz="1050" dirty="0">
               <a:solidFill>
@@ -16859,1379 +16866,16 @@
           <a:chExt cx="0" cy="0"/>
         </a:xfrm>
       </p:grpSpPr>
-      <p:sp>
-        <p:nvSpPr>
-          <p:cNvPr id="118" name="Rectangle 65"/>
-          <p:cNvSpPr/>
-          <p:nvPr/>
-        </p:nvSpPr>
-        <p:spPr>
-          <a:xfrm>
-            <a:off x="1119865" y="2086382"/>
-            <a:ext cx="7871735" cy="1723618"/>
-          </a:xfrm>
-          <a:prstGeom prst="roundRect">
-            <a:avLst>
-              <a:gd name="adj" fmla="val 3484"/>
-            </a:avLst>
-          </a:prstGeom>
-          <a:solidFill>
-            <a:schemeClr val="accent6">
-              <a:lumMod val="20000"/>
-              <a:lumOff val="80000"/>
-            </a:schemeClr>
-          </a:solidFill>
-          <a:ln w="19050">
-            <a:noFill/>
-          </a:ln>
-          <a:effectLst/>
-        </p:spPr>
-        <p:style>
-          <a:lnRef idx="1">
-            <a:schemeClr val="accent2"/>
-          </a:lnRef>
-          <a:fillRef idx="2">
-            <a:schemeClr val="accent2"/>
-          </a:fillRef>
-          <a:effectRef idx="1">
-            <a:schemeClr val="accent2"/>
-          </a:effectRef>
-          <a:fontRef idx="minor">
-            <a:schemeClr val="dk1"/>
-          </a:fontRef>
-        </p:style>
-        <p:txBody>
-          <a:bodyPr rtlCol="0" anchor="t"/>
-          <a:lstStyle/>
-          <a:p>
-            <a:r>
-              <a:rPr lang="en-US" sz="1200" b="1" dirty="0" smtClean="0">
-                <a:solidFill>
-                  <a:schemeClr val="accent6">
-                    <a:lumMod val="75000"/>
-                  </a:schemeClr>
-                </a:solidFill>
-              </a:rPr>
-              <a:t>Storage</a:t>
-            </a:r>
-            <a:endParaRPr lang="en-SG" sz="1200" b="1" dirty="0">
-              <a:solidFill>
-                <a:schemeClr val="accent6">
-                  <a:lumMod val="75000"/>
-                </a:schemeClr>
-              </a:solidFill>
-            </a:endParaRPr>
-          </a:p>
-        </p:txBody>
-      </p:sp>
-      <p:sp>
-        <p:nvSpPr>
-          <p:cNvPr id="2" name="Rectangle 8"/>
-          <p:cNvSpPr/>
-          <p:nvPr/>
-        </p:nvSpPr>
-        <p:spPr>
-          <a:xfrm>
-            <a:off x="2877180" y="3158440"/>
-            <a:ext cx="1323049" cy="346760"/>
-          </a:xfrm>
-          <a:prstGeom prst="rect">
-            <a:avLst/>
-          </a:prstGeom>
-          <a:solidFill>
-            <a:schemeClr val="accent6">
-              <a:lumMod val="75000"/>
-            </a:schemeClr>
-          </a:solidFill>
-          <a:ln w="19050">
-            <a:solidFill>
-              <a:schemeClr val="accent6">
-                <a:lumMod val="75000"/>
-              </a:schemeClr>
-            </a:solidFill>
-          </a:ln>
-          <a:effectLst/>
-        </p:spPr>
-        <p:style>
-          <a:lnRef idx="1">
-            <a:schemeClr val="accent2"/>
-          </a:lnRef>
-          <a:fillRef idx="2">
-            <a:schemeClr val="accent2"/>
-          </a:fillRef>
-          <a:effectRef idx="1">
-            <a:schemeClr val="accent2"/>
-          </a:effectRef>
-          <a:fontRef idx="minor">
-            <a:schemeClr val="dk1"/>
-          </a:fontRef>
-        </p:style>
-        <p:txBody>
-          <a:bodyPr rtlCol="0" anchor="ctr"/>
-          <a:lstStyle/>
-          <a:p>
-            <a:pPr algn="ctr"/>
-            <a:r>
-              <a:rPr lang="en-US" sz="1050" dirty="0" smtClean="0">
-                <a:solidFill>
-                  <a:schemeClr val="bg1"/>
-                </a:solidFill>
-              </a:rPr>
-              <a:t>&lt;&lt;interface&gt;&gt;</a:t>
-            </a:r>
-            <a:br>
-              <a:rPr lang="en-US" sz="1050" dirty="0" smtClean="0">
-                <a:solidFill>
-                  <a:schemeClr val="bg1"/>
-                </a:solidFill>
-              </a:rPr>
-            </a:br>
-            <a:r>
-              <a:rPr lang="en-US" sz="1050" dirty="0" err="1" smtClean="0">
-                <a:solidFill>
-                  <a:schemeClr val="bg1"/>
-                </a:solidFill>
-              </a:rPr>
-              <a:t>TaskManagerStorage</a:t>
-            </a:r>
-            <a:endParaRPr lang="en-SG" sz="1050" dirty="0">
-              <a:solidFill>
-                <a:schemeClr val="bg1"/>
-              </a:solidFill>
-            </a:endParaRPr>
-          </a:p>
-        </p:txBody>
-      </p:sp>
-      <p:sp>
-        <p:nvSpPr>
-          <p:cNvPr id="9" name="Rectangle 62"/>
-          <p:cNvSpPr/>
-          <p:nvPr/>
-        </p:nvSpPr>
-        <p:spPr>
-          <a:xfrm rot="16200000">
-            <a:off x="1683963" y="2868687"/>
-            <a:ext cx="1093635" cy="346760"/>
-          </a:xfrm>
-          <a:prstGeom prst="rect">
-            <a:avLst/>
-          </a:prstGeom>
-          <a:solidFill>
-            <a:schemeClr val="accent6">
-              <a:lumMod val="75000"/>
-            </a:schemeClr>
-          </a:solidFill>
-          <a:ln w="19050">
-            <a:solidFill>
-              <a:schemeClr val="accent6">
-                <a:lumMod val="75000"/>
-              </a:schemeClr>
-            </a:solidFill>
-          </a:ln>
-          <a:effectLst/>
-        </p:spPr>
-        <p:style>
-          <a:lnRef idx="1">
-            <a:schemeClr val="accent2"/>
-          </a:lnRef>
-          <a:fillRef idx="2">
-            <a:schemeClr val="accent2"/>
-          </a:fillRef>
-          <a:effectRef idx="1">
-            <a:schemeClr val="accent2"/>
-          </a:effectRef>
-          <a:fontRef idx="minor">
-            <a:schemeClr val="dk1"/>
-          </a:fontRef>
-        </p:style>
-        <p:txBody>
-          <a:bodyPr rtlCol="0" anchor="ctr"/>
-          <a:lstStyle/>
-          <a:p>
-            <a:pPr algn="ctr"/>
-            <a:r>
-              <a:rPr lang="en-US" sz="1050" dirty="0" err="1" smtClean="0">
-                <a:solidFill>
-                  <a:schemeClr val="bg1"/>
-                </a:solidFill>
-              </a:rPr>
-              <a:t>StorageManager</a:t>
-            </a:r>
-            <a:endParaRPr lang="en-SG" sz="1050" dirty="0">
-              <a:solidFill>
-                <a:schemeClr val="bg1"/>
-              </a:solidFill>
-            </a:endParaRPr>
-          </a:p>
-        </p:txBody>
-      </p:sp>
-      <p:sp>
-        <p:nvSpPr>
-          <p:cNvPr id="119" name="Rectangle 62"/>
-          <p:cNvSpPr/>
-          <p:nvPr/>
-        </p:nvSpPr>
-        <p:spPr>
-          <a:xfrm rot="16200000">
-            <a:off x="956202" y="2861202"/>
-            <a:ext cx="1093635" cy="346760"/>
-          </a:xfrm>
-          <a:prstGeom prst="rect">
-            <a:avLst/>
-          </a:prstGeom>
-          <a:solidFill>
-            <a:schemeClr val="accent6">
-              <a:lumMod val="75000"/>
-            </a:schemeClr>
-          </a:solidFill>
-          <a:ln w="19050">
-            <a:solidFill>
-              <a:schemeClr val="accent6">
-                <a:lumMod val="75000"/>
-              </a:schemeClr>
-            </a:solidFill>
-          </a:ln>
-          <a:effectLst/>
-        </p:spPr>
-        <p:style>
-          <a:lnRef idx="1">
-            <a:schemeClr val="accent2"/>
-          </a:lnRef>
-          <a:fillRef idx="2">
-            <a:schemeClr val="accent2"/>
-          </a:fillRef>
-          <a:effectRef idx="1">
-            <a:schemeClr val="accent2"/>
-          </a:effectRef>
-          <a:fontRef idx="minor">
-            <a:schemeClr val="dk1"/>
-          </a:fontRef>
-        </p:style>
-        <p:txBody>
-          <a:bodyPr rtlCol="0" anchor="ctr"/>
-          <a:lstStyle/>
-          <a:p>
-            <a:pPr algn="ctr"/>
-            <a:r>
-              <a:rPr lang="en-US" sz="1050" dirty="0">
-                <a:solidFill>
-                  <a:schemeClr val="bg1"/>
-                </a:solidFill>
-              </a:rPr>
-              <a:t>&lt;&lt;interface&gt;&gt;</a:t>
-            </a:r>
-          </a:p>
-          <a:p>
-            <a:pPr algn="ctr"/>
-            <a:r>
-              <a:rPr lang="en-US" sz="1050" dirty="0" smtClean="0">
-                <a:solidFill>
-                  <a:schemeClr val="bg1"/>
-                </a:solidFill>
-              </a:rPr>
-              <a:t>Storage</a:t>
-            </a:r>
-            <a:endParaRPr lang="en-SG" sz="1050" dirty="0">
-              <a:solidFill>
-                <a:schemeClr val="bg1"/>
-              </a:solidFill>
-            </a:endParaRPr>
-          </a:p>
-        </p:txBody>
-      </p:sp>
-      <p:sp>
-        <p:nvSpPr>
-          <p:cNvPr id="120" name="Isosceles Triangle 102"/>
-          <p:cNvSpPr/>
-          <p:nvPr/>
-        </p:nvSpPr>
-        <p:spPr>
-          <a:xfrm rot="16200000">
-            <a:off x="1626910" y="2952291"/>
-            <a:ext cx="270504" cy="175523"/>
-          </a:xfrm>
-          <a:prstGeom prst="triangle">
-            <a:avLst/>
-          </a:prstGeom>
-          <a:solidFill>
-            <a:schemeClr val="accent6">
-              <a:lumMod val="75000"/>
-            </a:schemeClr>
-          </a:solidFill>
-          <a:ln w="19050">
-            <a:solidFill>
-              <a:schemeClr val="accent6">
-                <a:lumMod val="75000"/>
-              </a:schemeClr>
-            </a:solidFill>
-          </a:ln>
-          <a:effectLst/>
-        </p:spPr>
-        <p:style>
-          <a:lnRef idx="1">
-            <a:schemeClr val="accent2"/>
-          </a:lnRef>
-          <a:fillRef idx="2">
-            <a:schemeClr val="accent2"/>
-          </a:fillRef>
-          <a:effectRef idx="1">
-            <a:schemeClr val="accent2"/>
-          </a:effectRef>
-          <a:fontRef idx="minor">
-            <a:schemeClr val="dk1"/>
-          </a:fontRef>
-        </p:style>
-        <p:txBody>
-          <a:bodyPr rtlCol="0" anchor="ctr"/>
-          <a:lstStyle/>
-          <a:p>
-            <a:pPr algn="ctr"/>
-            <a:endParaRPr lang="en-SG" sz="1050">
-              <a:solidFill>
-                <a:schemeClr val="bg1"/>
-              </a:solidFill>
-            </a:endParaRPr>
-          </a:p>
-        </p:txBody>
-      </p:sp>
-      <p:cxnSp>
-        <p:nvCxnSpPr>
-          <p:cNvPr id="58" name="Straight Arrow Connector 57"/>
-          <p:cNvCxnSpPr>
-            <a:stCxn id="42" idx="3"/>
-            <a:endCxn id="2" idx="1"/>
-          </p:cNvCxnSpPr>
-          <p:nvPr/>
-        </p:nvCxnSpPr>
-        <p:spPr>
-          <a:xfrm>
-            <a:off x="2656370" y="3326536"/>
-            <a:ext cx="220810" cy="5284"/>
-          </a:xfrm>
-          <a:prstGeom prst="straightConnector1">
-            <a:avLst/>
-          </a:prstGeom>
-          <a:ln w="19050">
-            <a:solidFill>
-              <a:schemeClr val="accent6">
-                <a:lumMod val="75000"/>
-              </a:schemeClr>
-            </a:solidFill>
-            <a:headEnd type="none" w="med" len="med"/>
-            <a:tailEnd type="arrow" w="med" len="med"/>
-          </a:ln>
-          <a:effectLst/>
-        </p:spPr>
-        <p:style>
-          <a:lnRef idx="1">
-            <a:schemeClr val="accent2"/>
-          </a:lnRef>
-          <a:fillRef idx="2">
-            <a:schemeClr val="accent2"/>
-          </a:fillRef>
-          <a:effectRef idx="1">
-            <a:schemeClr val="accent2"/>
-          </a:effectRef>
-          <a:fontRef idx="minor">
-            <a:schemeClr val="dk1"/>
-          </a:fontRef>
-        </p:style>
-      </p:cxnSp>
-      <p:cxnSp>
-        <p:nvCxnSpPr>
-          <p:cNvPr id="75" name="Elbow Connector 122"/>
-          <p:cNvCxnSpPr/>
-          <p:nvPr/>
-        </p:nvCxnSpPr>
-        <p:spPr>
-          <a:xfrm>
-            <a:off x="910091" y="3040053"/>
-            <a:ext cx="419548" cy="2860"/>
-          </a:xfrm>
-          <a:prstGeom prst="bentConnector3">
-            <a:avLst>
-              <a:gd name="adj1" fmla="val 50000"/>
-            </a:avLst>
-          </a:prstGeom>
-          <a:ln w="19050">
-            <a:solidFill>
-              <a:schemeClr val="bg1">
-                <a:lumMod val="75000"/>
-              </a:schemeClr>
-            </a:solidFill>
-            <a:prstDash val="sysDot"/>
-            <a:headEnd type="none" w="med" len="med"/>
-            <a:tailEnd type="arrow" w="med" len="med"/>
-          </a:ln>
-          <a:effectLst/>
-        </p:spPr>
-        <p:style>
-          <a:lnRef idx="1">
-            <a:schemeClr val="accent2"/>
-          </a:lnRef>
-          <a:fillRef idx="2">
-            <a:schemeClr val="accent2"/>
-          </a:fillRef>
-          <a:effectRef idx="1">
-            <a:schemeClr val="accent2"/>
-          </a:effectRef>
-          <a:fontRef idx="minor">
-            <a:schemeClr val="dk1"/>
-          </a:fontRef>
-        </p:style>
-      </p:cxnSp>
-      <p:cxnSp>
-        <p:nvCxnSpPr>
-          <p:cNvPr id="21" name="Straight Connector 20"/>
-          <p:cNvCxnSpPr>
-            <a:stCxn id="120" idx="3"/>
-          </p:cNvCxnSpPr>
-          <p:nvPr/>
-        </p:nvCxnSpPr>
-        <p:spPr>
-          <a:xfrm flipV="1">
-            <a:off x="1849924" y="3040052"/>
-            <a:ext cx="216105" cy="1"/>
-          </a:xfrm>
-          <a:prstGeom prst="line">
-            <a:avLst/>
-          </a:prstGeom>
-          <a:ln w="19050">
-            <a:solidFill>
-              <a:schemeClr val="accent6">
-                <a:lumMod val="75000"/>
-              </a:schemeClr>
-            </a:solidFill>
-            <a:prstDash val="sysDot"/>
-            <a:headEnd type="none" w="med" len="med"/>
-            <a:tailEnd type="none" w="med" len="med"/>
-          </a:ln>
-          <a:effectLst/>
-        </p:spPr>
-        <p:style>
-          <a:lnRef idx="1">
-            <a:schemeClr val="accent2"/>
-          </a:lnRef>
-          <a:fillRef idx="2">
-            <a:schemeClr val="accent2"/>
-          </a:fillRef>
-          <a:effectRef idx="1">
-            <a:schemeClr val="accent2"/>
-          </a:effectRef>
-          <a:fontRef idx="minor">
-            <a:schemeClr val="dk1"/>
-          </a:fontRef>
-        </p:style>
-      </p:cxnSp>
-      <p:sp>
-        <p:nvSpPr>
-          <p:cNvPr id="42" name="Flowchart: Decision 96"/>
-          <p:cNvSpPr/>
-          <p:nvPr/>
-        </p:nvSpPr>
-        <p:spPr>
-          <a:xfrm>
-            <a:off x="2420322" y="3239846"/>
-            <a:ext cx="236048" cy="173380"/>
-          </a:xfrm>
-          <a:prstGeom prst="flowChartDecision">
-            <a:avLst/>
-          </a:prstGeom>
-          <a:noFill/>
-          <a:ln w="19050">
-            <a:solidFill>
-              <a:schemeClr val="accent6">
-                <a:lumMod val="75000"/>
-              </a:schemeClr>
-            </a:solidFill>
-          </a:ln>
-          <a:effectLst/>
-        </p:spPr>
-        <p:style>
-          <a:lnRef idx="1">
-            <a:schemeClr val="accent2"/>
-          </a:lnRef>
-          <a:fillRef idx="2">
-            <a:schemeClr val="accent2"/>
-          </a:fillRef>
-          <a:effectRef idx="1">
-            <a:schemeClr val="accent2"/>
-          </a:effectRef>
-          <a:fontRef idx="minor">
-            <a:schemeClr val="dk1"/>
-          </a:fontRef>
-        </p:style>
-        <p:txBody>
-          <a:bodyPr rtlCol="0" anchor="ctr"/>
-          <a:lstStyle/>
-          <a:p>
-            <a:pPr algn="ctr"/>
-            <a:endParaRPr lang="en-US" sz="1050">
-              <a:solidFill>
-                <a:schemeClr val="bg1"/>
-              </a:solidFill>
-            </a:endParaRPr>
-          </a:p>
-        </p:txBody>
-      </p:sp>
-      <p:cxnSp>
-        <p:nvCxnSpPr>
-          <p:cNvPr id="97" name="Elbow Connector 63"/>
-          <p:cNvCxnSpPr>
-            <a:stCxn id="99" idx="3"/>
-            <a:endCxn id="50" idx="1"/>
-          </p:cNvCxnSpPr>
-          <p:nvPr/>
-        </p:nvCxnSpPr>
-        <p:spPr>
-          <a:xfrm flipV="1">
-            <a:off x="4398041" y="3331820"/>
-            <a:ext cx="223324" cy="1"/>
-          </a:xfrm>
-          <a:prstGeom prst="bentConnector3">
-            <a:avLst>
-              <a:gd name="adj1" fmla="val 50000"/>
-            </a:avLst>
-          </a:prstGeom>
-          <a:ln w="19050">
-            <a:solidFill>
-              <a:schemeClr val="accent6">
-                <a:lumMod val="75000"/>
-              </a:schemeClr>
-            </a:solidFill>
-            <a:prstDash val="sysDot"/>
-            <a:headEnd type="none" w="med" len="med"/>
-            <a:tailEnd type="none" w="med" len="med"/>
-          </a:ln>
-          <a:effectLst/>
-        </p:spPr>
-        <p:style>
-          <a:lnRef idx="1">
-            <a:schemeClr val="accent2"/>
-          </a:lnRef>
-          <a:fillRef idx="2">
-            <a:schemeClr val="accent2"/>
-          </a:fillRef>
-          <a:effectRef idx="1">
-            <a:schemeClr val="accent2"/>
-          </a:effectRef>
-          <a:fontRef idx="minor">
-            <a:schemeClr val="dk1"/>
-          </a:fontRef>
-        </p:style>
-      </p:cxnSp>
-      <p:sp>
-        <p:nvSpPr>
-          <p:cNvPr id="99" name="Isosceles Triangle 102"/>
-          <p:cNvSpPr/>
-          <p:nvPr/>
-        </p:nvSpPr>
-        <p:spPr>
-          <a:xfrm rot="5400000" flipV="1">
-            <a:off x="4175027" y="3244059"/>
-            <a:ext cx="270504" cy="175523"/>
-          </a:xfrm>
-          <a:prstGeom prst="triangle">
-            <a:avLst/>
-          </a:prstGeom>
-          <a:solidFill>
-            <a:schemeClr val="accent6">
-              <a:lumMod val="75000"/>
-            </a:schemeClr>
-          </a:solidFill>
-          <a:ln w="19050">
-            <a:solidFill>
-              <a:schemeClr val="accent6">
-                <a:lumMod val="75000"/>
-              </a:schemeClr>
-            </a:solidFill>
-          </a:ln>
-          <a:effectLst/>
-        </p:spPr>
-        <p:style>
-          <a:lnRef idx="1">
-            <a:schemeClr val="accent2"/>
-          </a:lnRef>
-          <a:fillRef idx="2">
-            <a:schemeClr val="accent2"/>
-          </a:fillRef>
-          <a:effectRef idx="1">
-            <a:schemeClr val="accent2"/>
-          </a:effectRef>
-          <a:fontRef idx="minor">
-            <a:schemeClr val="dk1"/>
-          </a:fontRef>
-        </p:style>
-        <p:txBody>
-          <a:bodyPr rtlCol="0" anchor="ctr"/>
-          <a:lstStyle/>
-          <a:p>
-            <a:pPr algn="ctr"/>
-            <a:endParaRPr lang="en-SG" sz="1050">
-              <a:solidFill>
-                <a:schemeClr val="bg1"/>
-              </a:solidFill>
-            </a:endParaRPr>
-          </a:p>
-        </p:txBody>
-      </p:sp>
-      <p:cxnSp>
-        <p:nvCxnSpPr>
-          <p:cNvPr id="124" name="Elbow Connector 122"/>
-          <p:cNvCxnSpPr>
-            <a:stCxn id="50" idx="3"/>
-            <a:endCxn id="66" idx="1"/>
-          </p:cNvCxnSpPr>
-          <p:nvPr/>
-        </p:nvCxnSpPr>
-        <p:spPr>
-          <a:xfrm>
-            <a:off x="5791200" y="3331820"/>
-            <a:ext cx="228600" cy="1970"/>
-          </a:xfrm>
-          <a:prstGeom prst="bentConnector3">
-            <a:avLst>
-              <a:gd name="adj1" fmla="val 50000"/>
-            </a:avLst>
-          </a:prstGeom>
-          <a:ln w="19050">
-            <a:solidFill>
-              <a:schemeClr val="accent6">
-                <a:lumMod val="75000"/>
-              </a:schemeClr>
-            </a:solidFill>
-            <a:prstDash val="sysDot"/>
-            <a:headEnd type="none" w="med" len="med"/>
-            <a:tailEnd type="arrow" w="med" len="med"/>
-          </a:ln>
-          <a:effectLst/>
-        </p:spPr>
-        <p:style>
-          <a:lnRef idx="1">
-            <a:schemeClr val="accent2"/>
-          </a:lnRef>
-          <a:fillRef idx="2">
-            <a:schemeClr val="accent2"/>
-          </a:fillRef>
-          <a:effectRef idx="1">
-            <a:schemeClr val="accent2"/>
-          </a:effectRef>
-          <a:fontRef idx="minor">
-            <a:schemeClr val="dk1"/>
-          </a:fontRef>
-        </p:style>
-      </p:cxnSp>
-      <p:sp>
-        <p:nvSpPr>
-          <p:cNvPr id="50" name="Rectangle 8"/>
-          <p:cNvSpPr/>
-          <p:nvPr/>
-        </p:nvSpPr>
-        <p:spPr>
-          <a:xfrm>
-            <a:off x="4621365" y="3158440"/>
-            <a:ext cx="1169835" cy="346760"/>
-          </a:xfrm>
-          <a:prstGeom prst="rect">
-            <a:avLst/>
-          </a:prstGeom>
-          <a:ln w="19050"/>
-          <a:effectLst/>
-        </p:spPr>
-        <p:style>
-          <a:lnRef idx="1">
-            <a:schemeClr val="accent6"/>
-          </a:lnRef>
-          <a:fillRef idx="2">
-            <a:schemeClr val="accent6"/>
-          </a:fillRef>
-          <a:effectRef idx="1">
-            <a:schemeClr val="accent6"/>
-          </a:effectRef>
-          <a:fontRef idx="minor">
-            <a:schemeClr val="dk1"/>
-          </a:fontRef>
-        </p:style>
-        <p:txBody>
-          <a:bodyPr rtlCol="0" anchor="ctr"/>
-          <a:lstStyle/>
-          <a:p>
-            <a:pPr algn="ctr"/>
-            <a:r>
-              <a:rPr lang="en-US" sz="1050" b="1" dirty="0" err="1" smtClean="0">
-                <a:solidFill>
-                  <a:schemeClr val="accent6">
-                    <a:lumMod val="75000"/>
-                  </a:schemeClr>
-                </a:solidFill>
-              </a:rPr>
-              <a:t>XmlTaskManagerStorage</a:t>
-            </a:r>
-            <a:endParaRPr lang="en-SG" sz="1050" b="1" dirty="0">
-              <a:solidFill>
-                <a:schemeClr val="accent6">
-                  <a:lumMod val="75000"/>
-                </a:schemeClr>
-              </a:solidFill>
-            </a:endParaRPr>
-          </a:p>
-        </p:txBody>
-      </p:sp>
-      <p:sp>
-        <p:nvSpPr>
-          <p:cNvPr id="52" name="Rectangle 8"/>
-          <p:cNvSpPr/>
-          <p:nvPr/>
-        </p:nvSpPr>
-        <p:spPr>
-          <a:xfrm>
-            <a:off x="2873943" y="2558040"/>
-            <a:ext cx="1323049" cy="346760"/>
-          </a:xfrm>
-          <a:prstGeom prst="rect">
-            <a:avLst/>
-          </a:prstGeom>
-          <a:solidFill>
-            <a:schemeClr val="accent6">
-              <a:lumMod val="75000"/>
-            </a:schemeClr>
-          </a:solidFill>
-          <a:ln w="19050">
-            <a:solidFill>
-              <a:schemeClr val="accent6">
-                <a:lumMod val="75000"/>
-              </a:schemeClr>
-            </a:solidFill>
-          </a:ln>
-          <a:effectLst/>
-        </p:spPr>
-        <p:style>
-          <a:lnRef idx="1">
-            <a:schemeClr val="accent2"/>
-          </a:lnRef>
-          <a:fillRef idx="2">
-            <a:schemeClr val="accent2"/>
-          </a:fillRef>
-          <a:effectRef idx="1">
-            <a:schemeClr val="accent2"/>
-          </a:effectRef>
-          <a:fontRef idx="minor">
-            <a:schemeClr val="dk1"/>
-          </a:fontRef>
-        </p:style>
-        <p:txBody>
-          <a:bodyPr rtlCol="0" anchor="ctr"/>
-          <a:lstStyle/>
-          <a:p>
-            <a:pPr algn="ctr"/>
-            <a:r>
-              <a:rPr lang="en-US" sz="1050" dirty="0" smtClean="0">
-                <a:solidFill>
-                  <a:schemeClr val="bg1"/>
-                </a:solidFill>
-              </a:rPr>
-              <a:t>&lt;&lt;interface&gt;&gt;</a:t>
-            </a:r>
-            <a:br>
-              <a:rPr lang="en-US" sz="1050" dirty="0" smtClean="0">
-                <a:solidFill>
-                  <a:schemeClr val="bg1"/>
-                </a:solidFill>
-              </a:rPr>
-            </a:br>
-            <a:r>
-              <a:rPr lang="en-US" sz="1050" dirty="0" err="1" smtClean="0">
-                <a:solidFill>
-                  <a:schemeClr val="bg1"/>
-                </a:solidFill>
-              </a:rPr>
-              <a:t>UserPrefsStorage</a:t>
-            </a:r>
-            <a:endParaRPr lang="en-SG" sz="1050" dirty="0">
-              <a:solidFill>
-                <a:schemeClr val="bg1"/>
-              </a:solidFill>
-            </a:endParaRPr>
-          </a:p>
-        </p:txBody>
-      </p:sp>
-      <p:cxnSp>
-        <p:nvCxnSpPr>
-          <p:cNvPr id="54" name="Straight Arrow Connector 53"/>
-          <p:cNvCxnSpPr>
-            <a:stCxn id="56" idx="3"/>
-            <a:endCxn id="52" idx="1"/>
-          </p:cNvCxnSpPr>
-          <p:nvPr/>
-        </p:nvCxnSpPr>
-        <p:spPr>
-          <a:xfrm>
-            <a:off x="2653133" y="2726136"/>
-            <a:ext cx="220810" cy="5284"/>
-          </a:xfrm>
-          <a:prstGeom prst="straightConnector1">
-            <a:avLst/>
-          </a:prstGeom>
-          <a:ln w="19050">
-            <a:solidFill>
-              <a:schemeClr val="accent6">
-                <a:lumMod val="75000"/>
-              </a:schemeClr>
-            </a:solidFill>
-            <a:headEnd type="none" w="med" len="med"/>
-            <a:tailEnd type="arrow" w="med" len="med"/>
-          </a:ln>
-          <a:effectLst/>
-        </p:spPr>
-        <p:style>
-          <a:lnRef idx="1">
-            <a:schemeClr val="accent2"/>
-          </a:lnRef>
-          <a:fillRef idx="2">
-            <a:schemeClr val="accent2"/>
-          </a:fillRef>
-          <a:effectRef idx="1">
-            <a:schemeClr val="accent2"/>
-          </a:effectRef>
-          <a:fontRef idx="minor">
-            <a:schemeClr val="dk1"/>
-          </a:fontRef>
-        </p:style>
-      </p:cxnSp>
-      <p:sp>
-        <p:nvSpPr>
-          <p:cNvPr id="56" name="Flowchart: Decision 96"/>
-          <p:cNvSpPr/>
-          <p:nvPr/>
-        </p:nvSpPr>
-        <p:spPr>
-          <a:xfrm>
-            <a:off x="2417085" y="2639446"/>
-            <a:ext cx="236048" cy="173380"/>
-          </a:xfrm>
-          <a:prstGeom prst="flowChartDecision">
-            <a:avLst/>
-          </a:prstGeom>
-          <a:noFill/>
-          <a:ln w="19050">
-            <a:solidFill>
-              <a:schemeClr val="accent6">
-                <a:lumMod val="75000"/>
-              </a:schemeClr>
-            </a:solidFill>
-          </a:ln>
-          <a:effectLst/>
-        </p:spPr>
-        <p:style>
-          <a:lnRef idx="1">
-            <a:schemeClr val="accent2"/>
-          </a:lnRef>
-          <a:fillRef idx="2">
-            <a:schemeClr val="accent2"/>
-          </a:fillRef>
-          <a:effectRef idx="1">
-            <a:schemeClr val="accent2"/>
-          </a:effectRef>
-          <a:fontRef idx="minor">
-            <a:schemeClr val="dk1"/>
-          </a:fontRef>
-        </p:style>
-        <p:txBody>
-          <a:bodyPr rtlCol="0" anchor="ctr"/>
-          <a:lstStyle/>
-          <a:p>
-            <a:pPr algn="ctr"/>
-            <a:endParaRPr lang="en-US" sz="1050">
-              <a:solidFill>
-                <a:schemeClr val="bg1"/>
-              </a:solidFill>
-            </a:endParaRPr>
-          </a:p>
-        </p:txBody>
-      </p:sp>
-      <p:cxnSp>
-        <p:nvCxnSpPr>
-          <p:cNvPr id="60" name="Elbow Connector 63"/>
-          <p:cNvCxnSpPr>
-            <a:stCxn id="61" idx="3"/>
-            <a:endCxn id="65" idx="1"/>
-          </p:cNvCxnSpPr>
-          <p:nvPr/>
-        </p:nvCxnSpPr>
-        <p:spPr>
-          <a:xfrm flipV="1">
-            <a:off x="4394804" y="2731420"/>
-            <a:ext cx="223324" cy="1"/>
-          </a:xfrm>
-          <a:prstGeom prst="bentConnector3">
-            <a:avLst>
-              <a:gd name="adj1" fmla="val 50000"/>
-            </a:avLst>
-          </a:prstGeom>
-          <a:ln w="19050">
-            <a:solidFill>
-              <a:schemeClr val="accent6">
-                <a:lumMod val="75000"/>
-              </a:schemeClr>
-            </a:solidFill>
-            <a:prstDash val="sysDot"/>
-            <a:headEnd type="none" w="med" len="med"/>
-            <a:tailEnd type="none" w="med" len="med"/>
-          </a:ln>
-          <a:effectLst/>
-        </p:spPr>
-        <p:style>
-          <a:lnRef idx="1">
-            <a:schemeClr val="accent2"/>
-          </a:lnRef>
-          <a:fillRef idx="2">
-            <a:schemeClr val="accent2"/>
-          </a:fillRef>
-          <a:effectRef idx="1">
-            <a:schemeClr val="accent2"/>
-          </a:effectRef>
-          <a:fontRef idx="minor">
-            <a:schemeClr val="dk1"/>
-          </a:fontRef>
-        </p:style>
-      </p:cxnSp>
-      <p:sp>
-        <p:nvSpPr>
-          <p:cNvPr id="61" name="Isosceles Triangle 102"/>
-          <p:cNvSpPr/>
-          <p:nvPr/>
-        </p:nvSpPr>
-        <p:spPr>
-          <a:xfrm rot="5400000" flipV="1">
-            <a:off x="4171790" y="2643659"/>
-            <a:ext cx="270504" cy="175523"/>
-          </a:xfrm>
-          <a:prstGeom prst="triangle">
-            <a:avLst/>
-          </a:prstGeom>
-          <a:solidFill>
-            <a:schemeClr val="accent6">
-              <a:lumMod val="75000"/>
-            </a:schemeClr>
-          </a:solidFill>
-          <a:ln w="19050">
-            <a:solidFill>
-              <a:schemeClr val="accent6">
-                <a:lumMod val="75000"/>
-              </a:schemeClr>
-            </a:solidFill>
-          </a:ln>
-          <a:effectLst/>
-        </p:spPr>
-        <p:style>
-          <a:lnRef idx="1">
-            <a:schemeClr val="accent2"/>
-          </a:lnRef>
-          <a:fillRef idx="2">
-            <a:schemeClr val="accent2"/>
-          </a:fillRef>
-          <a:effectRef idx="1">
-            <a:schemeClr val="accent2"/>
-          </a:effectRef>
-          <a:fontRef idx="minor">
-            <a:schemeClr val="dk1"/>
-          </a:fontRef>
-        </p:style>
-        <p:txBody>
-          <a:bodyPr rtlCol="0" anchor="ctr"/>
-          <a:lstStyle/>
-          <a:p>
-            <a:pPr algn="ctr"/>
-            <a:endParaRPr lang="en-SG" sz="1050">
-              <a:solidFill>
-                <a:schemeClr val="bg1"/>
-              </a:solidFill>
-            </a:endParaRPr>
-          </a:p>
-        </p:txBody>
-      </p:sp>
-      <p:sp>
-        <p:nvSpPr>
-          <p:cNvPr id="65" name="Rectangle 8"/>
-          <p:cNvSpPr/>
-          <p:nvPr/>
-        </p:nvSpPr>
-        <p:spPr>
-          <a:xfrm>
-            <a:off x="4618128" y="2558040"/>
-            <a:ext cx="1093635" cy="346760"/>
-          </a:xfrm>
-          <a:prstGeom prst="rect">
-            <a:avLst/>
-          </a:prstGeom>
-          <a:solidFill>
-            <a:schemeClr val="accent6">
-              <a:lumMod val="75000"/>
-            </a:schemeClr>
-          </a:solidFill>
-          <a:ln w="19050">
-            <a:solidFill>
-              <a:schemeClr val="accent6">
-                <a:lumMod val="75000"/>
-              </a:schemeClr>
-            </a:solidFill>
-          </a:ln>
-          <a:effectLst/>
-        </p:spPr>
-        <p:style>
-          <a:lnRef idx="1">
-            <a:schemeClr val="accent2"/>
-          </a:lnRef>
-          <a:fillRef idx="2">
-            <a:schemeClr val="accent2"/>
-          </a:fillRef>
-          <a:effectRef idx="1">
-            <a:schemeClr val="accent2"/>
-          </a:effectRef>
-          <a:fontRef idx="minor">
-            <a:schemeClr val="dk1"/>
-          </a:fontRef>
-        </p:style>
-        <p:txBody>
-          <a:bodyPr rtlCol="0" anchor="ctr"/>
-          <a:lstStyle/>
-          <a:p>
-            <a:pPr algn="ctr"/>
-            <a:r>
-              <a:rPr lang="en-US" sz="1050" dirty="0" err="1" smtClean="0">
-                <a:solidFill>
-                  <a:schemeClr val="bg1"/>
-                </a:solidFill>
-              </a:rPr>
-              <a:t>JsonUserPrefs</a:t>
-            </a:r>
-            <a:r>
-              <a:rPr lang="en-US" sz="1050" dirty="0" smtClean="0">
-                <a:solidFill>
-                  <a:schemeClr val="bg1"/>
-                </a:solidFill>
-              </a:rPr>
-              <a:t/>
-            </a:r>
-            <a:br>
-              <a:rPr lang="en-US" sz="1050" dirty="0" smtClean="0">
-                <a:solidFill>
-                  <a:schemeClr val="bg1"/>
-                </a:solidFill>
-              </a:rPr>
-            </a:br>
-            <a:r>
-              <a:rPr lang="en-US" sz="1050" dirty="0" smtClean="0">
-                <a:solidFill>
-                  <a:schemeClr val="bg1"/>
-                </a:solidFill>
-              </a:rPr>
-              <a:t>Storage</a:t>
-            </a:r>
-            <a:endParaRPr lang="en-SG" sz="1050" dirty="0">
-              <a:solidFill>
-                <a:schemeClr val="bg1"/>
-              </a:solidFill>
-            </a:endParaRPr>
-          </a:p>
-        </p:txBody>
-      </p:sp>
-      <p:sp>
-        <p:nvSpPr>
-          <p:cNvPr id="66" name="Rectangle 8"/>
-          <p:cNvSpPr/>
-          <p:nvPr/>
-        </p:nvSpPr>
-        <p:spPr>
-          <a:xfrm>
-            <a:off x="6019800" y="3160410"/>
-            <a:ext cx="1200707" cy="346760"/>
-          </a:xfrm>
-          <a:prstGeom prst="rect">
-            <a:avLst/>
-          </a:prstGeom>
-          <a:ln w="19050"/>
-          <a:effectLst/>
-        </p:spPr>
-        <p:style>
-          <a:lnRef idx="1">
-            <a:schemeClr val="accent6"/>
-          </a:lnRef>
-          <a:fillRef idx="2">
-            <a:schemeClr val="accent6"/>
-          </a:fillRef>
-          <a:effectRef idx="1">
-            <a:schemeClr val="accent6"/>
-          </a:effectRef>
-          <a:fontRef idx="minor">
-            <a:schemeClr val="dk1"/>
-          </a:fontRef>
-        </p:style>
-        <p:txBody>
-          <a:bodyPr rtlCol="0" anchor="ctr"/>
-          <a:lstStyle/>
-          <a:p>
-            <a:pPr algn="ctr"/>
-            <a:r>
-              <a:rPr lang="en-US" sz="1050" b="1" dirty="0" err="1" smtClean="0">
-                <a:solidFill>
-                  <a:schemeClr val="accent6">
-                    <a:lumMod val="75000"/>
-                  </a:schemeClr>
-                </a:solidFill>
-              </a:rPr>
-              <a:t>XmlSerializable</a:t>
-            </a:r>
-            <a:r>
-              <a:rPr lang="en-US" sz="1050" b="1" dirty="0" smtClean="0">
-                <a:solidFill>
-                  <a:schemeClr val="accent6">
-                    <a:lumMod val="75000"/>
-                  </a:schemeClr>
-                </a:solidFill>
-              </a:rPr>
-              <a:t/>
-            </a:r>
-            <a:br>
-              <a:rPr lang="en-US" sz="1050" b="1" dirty="0" smtClean="0">
-                <a:solidFill>
-                  <a:schemeClr val="accent6">
-                    <a:lumMod val="75000"/>
-                  </a:schemeClr>
-                </a:solidFill>
-              </a:rPr>
-            </a:br>
-            <a:r>
-              <a:rPr lang="en-US" sz="1050" b="1" dirty="0" err="1" smtClean="0">
-                <a:solidFill>
-                  <a:schemeClr val="accent6">
-                    <a:lumMod val="75000"/>
-                  </a:schemeClr>
-                </a:solidFill>
-              </a:rPr>
-              <a:t>TaskManager</a:t>
-            </a:r>
-            <a:endParaRPr lang="en-SG" sz="1050" b="1" dirty="0">
-              <a:solidFill>
-                <a:schemeClr val="accent6">
-                  <a:lumMod val="75000"/>
-                </a:schemeClr>
-              </a:solidFill>
-            </a:endParaRPr>
-          </a:p>
-        </p:txBody>
-      </p:sp>
-      <p:cxnSp>
-        <p:nvCxnSpPr>
-          <p:cNvPr id="70" name="Elbow Connector 122"/>
-          <p:cNvCxnSpPr>
-            <a:stCxn id="74" idx="0"/>
-            <a:endCxn id="73" idx="2"/>
-          </p:cNvCxnSpPr>
-          <p:nvPr/>
-        </p:nvCxnSpPr>
-        <p:spPr>
-          <a:xfrm rot="5400000" flipH="1" flipV="1">
-            <a:off x="8077993" y="2992020"/>
-            <a:ext cx="335208" cy="12700"/>
-          </a:xfrm>
-          <a:prstGeom prst="bentConnector3">
-            <a:avLst>
-              <a:gd name="adj1" fmla="val 50000"/>
-            </a:avLst>
-          </a:prstGeom>
-          <a:ln w="19050">
-            <a:prstDash val="sysDot"/>
-            <a:headEnd type="none" w="med" len="med"/>
-            <a:tailEnd type="arrow" w="med" len="med"/>
-          </a:ln>
-          <a:effectLst/>
-        </p:spPr>
-        <p:style>
-          <a:lnRef idx="1">
-            <a:schemeClr val="accent6"/>
-          </a:lnRef>
-          <a:fillRef idx="2">
-            <a:schemeClr val="accent6"/>
-          </a:fillRef>
-          <a:effectRef idx="1">
-            <a:schemeClr val="accent6"/>
-          </a:effectRef>
-          <a:fontRef idx="minor">
-            <a:schemeClr val="dk1"/>
-          </a:fontRef>
-        </p:style>
-      </p:cxnSp>
-      <p:sp>
-        <p:nvSpPr>
-          <p:cNvPr id="73" name="Rectangle 8"/>
-          <p:cNvSpPr/>
-          <p:nvPr/>
-        </p:nvSpPr>
-        <p:spPr>
-          <a:xfrm>
-            <a:off x="7615738" y="2477656"/>
-            <a:ext cx="1259718" cy="346760"/>
-          </a:xfrm>
-          <a:prstGeom prst="rect">
-            <a:avLst/>
-          </a:prstGeom>
-          <a:ln w="19050"/>
-          <a:effectLst/>
-        </p:spPr>
-        <p:style>
-          <a:lnRef idx="1">
-            <a:schemeClr val="accent6"/>
-          </a:lnRef>
-          <a:fillRef idx="2">
-            <a:schemeClr val="accent6"/>
-          </a:fillRef>
-          <a:effectRef idx="1">
-            <a:schemeClr val="accent6"/>
-          </a:effectRef>
-          <a:fontRef idx="minor">
-            <a:schemeClr val="dk1"/>
-          </a:fontRef>
-        </p:style>
-        <p:txBody>
-          <a:bodyPr rtlCol="0" anchor="ctr"/>
-          <a:lstStyle/>
-          <a:p>
-            <a:pPr algn="ctr"/>
-            <a:r>
-              <a:rPr lang="en-US" sz="1050" b="1" dirty="0" err="1" smtClean="0">
-                <a:solidFill>
-                  <a:schemeClr val="accent6">
-                    <a:lumMod val="75000"/>
-                  </a:schemeClr>
-                </a:solidFill>
-              </a:rPr>
-              <a:t>XmlAdaptedTag</a:t>
-            </a:r>
-            <a:endParaRPr lang="en-SG" sz="1050" b="1" dirty="0">
-              <a:solidFill>
-                <a:schemeClr val="accent6">
-                  <a:lumMod val="75000"/>
-                </a:schemeClr>
-              </a:solidFill>
-            </a:endParaRPr>
-          </a:p>
-        </p:txBody>
-      </p:sp>
-      <p:sp>
-        <p:nvSpPr>
-          <p:cNvPr id="74" name="Rectangle 8"/>
-          <p:cNvSpPr/>
-          <p:nvPr/>
-        </p:nvSpPr>
-        <p:spPr>
-          <a:xfrm>
-            <a:off x="7615738" y="3159624"/>
-            <a:ext cx="1259718" cy="346760"/>
-          </a:xfrm>
-          <a:prstGeom prst="rect">
-            <a:avLst/>
-          </a:prstGeom>
-          <a:ln w="19050"/>
-          <a:effectLst/>
-        </p:spPr>
-        <p:style>
-          <a:lnRef idx="1">
-            <a:schemeClr val="accent6"/>
-          </a:lnRef>
-          <a:fillRef idx="2">
-            <a:schemeClr val="accent6"/>
-          </a:fillRef>
-          <a:effectRef idx="1">
-            <a:schemeClr val="accent6"/>
-          </a:effectRef>
-          <a:fontRef idx="minor">
-            <a:schemeClr val="dk1"/>
-          </a:fontRef>
-        </p:style>
-        <p:txBody>
-          <a:bodyPr rtlCol="0" anchor="ctr"/>
-          <a:lstStyle/>
-          <a:p>
-            <a:pPr algn="ctr"/>
-            <a:r>
-              <a:rPr lang="en-US" sz="1050" b="1" dirty="0" err="1" smtClean="0">
-                <a:solidFill>
-                  <a:schemeClr val="accent6">
-                    <a:lumMod val="75000"/>
-                  </a:schemeClr>
-                </a:solidFill>
-              </a:rPr>
-              <a:t>XmlAdaptedItem</a:t>
-            </a:r>
-            <a:endParaRPr lang="en-SG" sz="1050" b="1" dirty="0">
-              <a:solidFill>
-                <a:schemeClr val="accent6">
-                  <a:lumMod val="75000"/>
-                </a:schemeClr>
-              </a:solidFill>
-            </a:endParaRPr>
-          </a:p>
-        </p:txBody>
-      </p:sp>
-      <p:cxnSp>
-        <p:nvCxnSpPr>
-          <p:cNvPr id="77" name="Elbow Connector 122"/>
-          <p:cNvCxnSpPr>
-            <a:stCxn id="66" idx="3"/>
-            <a:endCxn id="74" idx="1"/>
-          </p:cNvCxnSpPr>
-          <p:nvPr/>
-        </p:nvCxnSpPr>
-        <p:spPr>
-          <a:xfrm flipV="1">
-            <a:off x="7220507" y="3333004"/>
-            <a:ext cx="395231" cy="786"/>
-          </a:xfrm>
-          <a:prstGeom prst="bentConnector3">
-            <a:avLst>
-              <a:gd name="adj1" fmla="val 50000"/>
-            </a:avLst>
-          </a:prstGeom>
-          <a:ln w="19050">
-            <a:prstDash val="sysDot"/>
-            <a:headEnd type="none" w="med" len="med"/>
-            <a:tailEnd type="arrow" w="med" len="med"/>
-          </a:ln>
-          <a:effectLst/>
-        </p:spPr>
-        <p:style>
-          <a:lnRef idx="1">
-            <a:schemeClr val="accent6"/>
-          </a:lnRef>
-          <a:fillRef idx="2">
-            <a:schemeClr val="accent6"/>
-          </a:fillRef>
-          <a:effectRef idx="1">
-            <a:schemeClr val="accent6"/>
-          </a:effectRef>
-          <a:fontRef idx="minor">
-            <a:schemeClr val="dk1"/>
-          </a:fontRef>
-        </p:style>
-      </p:cxnSp>
     </p:spTree>
     <p:extLst>
       <p:ext uri="{BB962C8B-B14F-4D97-AF65-F5344CB8AC3E}">
-        <p14:creationId xmlns:p14="http://schemas.microsoft.com/office/powerpoint/2010/main" val="429606320"/>
+        <p14:creationId xmlns:p14="http://schemas.microsoft.com/office/powerpoint/2010/main" val="2978036214"/>
       </p:ext>
     </p:extLst>
   </p:cSld>
   <p:clrMapOvr>
     <a:masterClrMapping/>
   </p:clrMapOvr>
-  <p:timing>
-    <p:tnLst>
-      <p:par>
-        <p:cTn id="1" dur="indefinite" restart="never" nodeType="tmRoot"/>
-      </p:par>
-    </p:tnLst>
-  </p:timing>
 </p:sld>
 </file>
 

</xml_diff>

<commit_message>
Update developer guide for storage
</commit_message>
<xml_diff>
--- a/docs/diagrams/Diagrams.pptx
+++ b/docs/diagrams/Diagrams.pptx
@@ -115,6 +115,22 @@
       </a:defRPr>
     </a:lvl9pPr>
   </p:defaultTextStyle>
+  <p:extLst>
+    <p:ext uri="{EFAFB233-063F-42B5-8137-9DF3F51BA10A}">
+      <p15:sldGuideLst xmlns:p15="http://schemas.microsoft.com/office/powerpoint/2012/main">
+        <p15:guide id="1" orient="horz" pos="1488">
+          <p15:clr>
+            <a:srgbClr val="A4A3A4"/>
+          </p15:clr>
+        </p15:guide>
+        <p15:guide id="2" pos="2880">
+          <p15:clr>
+            <a:srgbClr val="A4A3A4"/>
+          </p15:clr>
+        </p15:guide>
+      </p15:sldGuideLst>
+    </p:ext>
+  </p:extLst>
 </p:presentation>
 </file>
 
@@ -200,7 +216,7 @@
           <a:p>
             <a:fld id="{F5CC4B3F-88C1-4FFA-B1B6-F41C21DC6924}" type="datetimeFigureOut">
               <a:rPr lang="en-US" smtClean="0"/>
-              <a:t>9/30/2016</a:t>
+              <a:t>10/20/2016</a:t>
             </a:fld>
             <a:endParaRPr lang="en-US"/>
           </a:p>
@@ -649,7 +665,7 @@
           <a:p>
             <a:fld id="{78C97017-6FC3-485B-9764-EAC9E56C1D49}" type="datetimeFigureOut">
               <a:rPr lang="en-US" smtClean="0"/>
-              <a:t>9/30/2016</a:t>
+              <a:t>10/20/2016</a:t>
             </a:fld>
             <a:endParaRPr lang="en-US"/>
           </a:p>
@@ -819,7 +835,7 @@
           <a:p>
             <a:fld id="{78C97017-6FC3-485B-9764-EAC9E56C1D49}" type="datetimeFigureOut">
               <a:rPr lang="en-US" smtClean="0"/>
-              <a:t>9/30/2016</a:t>
+              <a:t>10/20/2016</a:t>
             </a:fld>
             <a:endParaRPr lang="en-US"/>
           </a:p>
@@ -999,7 +1015,7 @@
           <a:p>
             <a:fld id="{78C97017-6FC3-485B-9764-EAC9E56C1D49}" type="datetimeFigureOut">
               <a:rPr lang="en-US" smtClean="0"/>
-              <a:t>9/30/2016</a:t>
+              <a:t>10/20/2016</a:t>
             </a:fld>
             <a:endParaRPr lang="en-US"/>
           </a:p>
@@ -1169,7 +1185,7 @@
           <a:p>
             <a:fld id="{78C97017-6FC3-485B-9764-EAC9E56C1D49}" type="datetimeFigureOut">
               <a:rPr lang="en-US" smtClean="0"/>
-              <a:t>9/30/2016</a:t>
+              <a:t>10/20/2016</a:t>
             </a:fld>
             <a:endParaRPr lang="en-US"/>
           </a:p>
@@ -1415,7 +1431,7 @@
           <a:p>
             <a:fld id="{78C97017-6FC3-485B-9764-EAC9E56C1D49}" type="datetimeFigureOut">
               <a:rPr lang="en-US" smtClean="0"/>
-              <a:t>9/30/2016</a:t>
+              <a:t>10/20/2016</a:t>
             </a:fld>
             <a:endParaRPr lang="en-US"/>
           </a:p>
@@ -1703,7 +1719,7 @@
           <a:p>
             <a:fld id="{78C97017-6FC3-485B-9764-EAC9E56C1D49}" type="datetimeFigureOut">
               <a:rPr lang="en-US" smtClean="0"/>
-              <a:t>9/30/2016</a:t>
+              <a:t>10/20/2016</a:t>
             </a:fld>
             <a:endParaRPr lang="en-US"/>
           </a:p>
@@ -2125,7 +2141,7 @@
           <a:p>
             <a:fld id="{78C97017-6FC3-485B-9764-EAC9E56C1D49}" type="datetimeFigureOut">
               <a:rPr lang="en-US" smtClean="0"/>
-              <a:t>9/30/2016</a:t>
+              <a:t>10/20/2016</a:t>
             </a:fld>
             <a:endParaRPr lang="en-US"/>
           </a:p>
@@ -2243,7 +2259,7 @@
           <a:p>
             <a:fld id="{78C97017-6FC3-485B-9764-EAC9E56C1D49}" type="datetimeFigureOut">
               <a:rPr lang="en-US" smtClean="0"/>
-              <a:t>9/30/2016</a:t>
+              <a:t>10/20/2016</a:t>
             </a:fld>
             <a:endParaRPr lang="en-US"/>
           </a:p>
@@ -2338,7 +2354,7 @@
           <a:p>
             <a:fld id="{78C97017-6FC3-485B-9764-EAC9E56C1D49}" type="datetimeFigureOut">
               <a:rPr lang="en-US" smtClean="0"/>
-              <a:t>9/30/2016</a:t>
+              <a:t>10/20/2016</a:t>
             </a:fld>
             <a:endParaRPr lang="en-US"/>
           </a:p>
@@ -2615,7 +2631,7 @@
           <a:p>
             <a:fld id="{78C97017-6FC3-485B-9764-EAC9E56C1D49}" type="datetimeFigureOut">
               <a:rPr lang="en-US" smtClean="0"/>
-              <a:t>9/30/2016</a:t>
+              <a:t>10/20/2016</a:t>
             </a:fld>
             <a:endParaRPr lang="en-US"/>
           </a:p>
@@ -2868,7 +2884,7 @@
           <a:p>
             <a:fld id="{78C97017-6FC3-485B-9764-EAC9E56C1D49}" type="datetimeFigureOut">
               <a:rPr lang="en-US" smtClean="0"/>
-              <a:t>9/30/2016</a:t>
+              <a:t>10/20/2016</a:t>
             </a:fld>
             <a:endParaRPr lang="en-US"/>
           </a:p>
@@ -3081,7 +3097,7 @@
           <a:p>
             <a:fld id="{78C97017-6FC3-485B-9764-EAC9E56C1D49}" type="datetimeFigureOut">
               <a:rPr lang="en-US" smtClean="0"/>
-              <a:t>9/30/2016</a:t>
+              <a:t>10/20/2016</a:t>
             </a:fld>
             <a:endParaRPr lang="en-US"/>
           </a:p>
@@ -12280,7 +12296,6 @@
               <a:rPr lang="en-US" dirty="0"/>
               <a:t>execute()</a:t>
             </a:r>
-            <a:endParaRPr lang="en-US" dirty="0"/>
           </a:p>
         </p:txBody>
       </p:sp>
@@ -15497,8 +15512,8 @@
         </p:nvSpPr>
         <p:spPr>
           <a:xfrm>
-            <a:off x="2877180" y="3158440"/>
-            <a:ext cx="1323049" cy="346760"/>
+            <a:off x="2866144" y="3158440"/>
+            <a:ext cx="1334085" cy="346760"/>
           </a:xfrm>
           <a:prstGeom prst="rect">
             <a:avLst/>
@@ -15542,7 +15557,15 @@
                   <a:schemeClr val="bg1"/>
                 </a:solidFill>
               </a:rPr>
-              <a:t>&lt;&lt;interface&gt;&gt;</a:t>
+              <a:t>&lt;&lt;interface</a:t>
+            </a:r>
+            <a:r>
+              <a:rPr lang="en-US" sz="1050" dirty="0" smtClean="0">
+                <a:solidFill>
+                  <a:schemeClr val="bg1"/>
+                </a:solidFill>
+              </a:rPr>
+              <a:t>&gt;&gt;</a:t>
             </a:r>
             <a:br>
               <a:rPr lang="en-US" sz="1050" dirty="0" smtClean="0">
@@ -15557,7 +15580,7 @@
                   <a:schemeClr val="bg1"/>
                 </a:solidFill>
               </a:rPr>
-              <a:t>AddressBookStorage</a:t>
+              <a:t>TaskManagerStorage</a:t>
             </a:r>
             <a:endParaRPr lang="en-SG" sz="1050" dirty="0">
               <a:solidFill>
@@ -15771,7 +15794,7 @@
         <p:spPr>
           <a:xfrm>
             <a:off x="2656370" y="3326536"/>
-            <a:ext cx="220810" cy="5284"/>
+            <a:ext cx="209774" cy="5284"/>
           </a:xfrm>
           <a:prstGeom prst="straightConnector1">
             <a:avLst/>
@@ -16130,7 +16153,7 @@
                   </a:schemeClr>
                 </a:solidFill>
               </a:rPr>
-              <a:t>XmlAddressBook</a:t>
+              <a:t>XmlTaskManager</a:t>
             </a:r>
             <a:r>
               <a:rPr lang="en-US" sz="1050" b="1" dirty="0" smtClean="0">
@@ -16603,7 +16626,7 @@
                   </a:schemeClr>
                 </a:solidFill>
               </a:rPr>
-              <a:t>AddressBook</a:t>
+              <a:t>TaskManager</a:t>
             </a:r>
             <a:endParaRPr lang="en-SG" sz="1050" b="1" dirty="0">
               <a:solidFill>
@@ -16756,7 +16779,7 @@
                   </a:schemeClr>
                 </a:solidFill>
               </a:rPr>
-              <a:t>XmlAdaptedPerson</a:t>
+              <a:t>XmlAdaptedItem</a:t>
             </a:r>
             <a:endParaRPr lang="en-SG" sz="1050" b="1" dirty="0">
               <a:solidFill>

</xml_diff>

<commit_message>
changes DG charts added Use Case set storage
</commit_message>
<xml_diff>
--- a/docs/diagrams/Diagrams.pptx
+++ b/docs/diagrams/Diagrams.pptx
@@ -200,7 +200,7 @@
           <a:p>
             <a:fld id="{F5CC4B3F-88C1-4FFA-B1B6-F41C21DC6924}" type="datetimeFigureOut">
               <a:rPr lang="en-US" smtClean="0"/>
-              <a:t>19/10/16</a:t>
+              <a:t>20/10/16</a:t>
             </a:fld>
             <a:endParaRPr lang="en-US"/>
           </a:p>
@@ -468,6 +468,90 @@
 </p:notesMaster>
 </file>
 
+<file path=ppt/notesSlides/notesSlide1.xml><?xml version="1.0" encoding="utf-8"?>
+<p:notes xmlns:a="http://schemas.openxmlformats.org/drawingml/2006/main" xmlns:r="http://schemas.openxmlformats.org/officeDocument/2006/relationships" xmlns:p="http://schemas.openxmlformats.org/presentationml/2006/main">
+  <p:cSld>
+    <p:spTree>
+      <p:nvGrpSpPr>
+        <p:cNvPr id="1" name=""/>
+        <p:cNvGrpSpPr/>
+        <p:nvPr/>
+      </p:nvGrpSpPr>
+      <p:grpSpPr>
+        <a:xfrm>
+          <a:off x="0" y="0"/>
+          <a:ext cx="0" cy="0"/>
+          <a:chOff x="0" y="0"/>
+          <a:chExt cx="0" cy="0"/>
+        </a:xfrm>
+      </p:grpSpPr>
+      <p:sp>
+        <p:nvSpPr>
+          <p:cNvPr id="2" name="Slide Image Placeholder 1"/>
+          <p:cNvSpPr>
+            <a:spLocks noGrp="1" noRot="1" noChangeAspect="1"/>
+          </p:cNvSpPr>
+          <p:nvPr>
+            <p:ph type="sldImg"/>
+          </p:nvPr>
+        </p:nvSpPr>
+        <p:spPr/>
+      </p:sp>
+      <p:sp>
+        <p:nvSpPr>
+          <p:cNvPr id="3" name="Notes Placeholder 2"/>
+          <p:cNvSpPr>
+            <a:spLocks noGrp="1"/>
+          </p:cNvSpPr>
+          <p:nvPr>
+            <p:ph type="body" idx="1"/>
+          </p:nvPr>
+        </p:nvSpPr>
+        <p:spPr/>
+        <p:txBody>
+          <a:bodyPr/>
+          <a:lstStyle/>
+          <a:p>
+            <a:endParaRPr lang="en-US" dirty="0"/>
+          </a:p>
+        </p:txBody>
+      </p:sp>
+      <p:sp>
+        <p:nvSpPr>
+          <p:cNvPr id="4" name="Slide Number Placeholder 3"/>
+          <p:cNvSpPr>
+            <a:spLocks noGrp="1"/>
+          </p:cNvSpPr>
+          <p:nvPr>
+            <p:ph type="sldNum" sz="quarter" idx="10"/>
+          </p:nvPr>
+        </p:nvSpPr>
+        <p:spPr/>
+        <p:txBody>
+          <a:bodyPr/>
+          <a:lstStyle/>
+          <a:p>
+            <a:fld id="{5A7AB025-77E3-4BD1-A2FD-B3183DBA47A3}" type="slidenum">
+              <a:rPr lang="en-US" smtClean="0"/>
+              <a:t>7</a:t>
+            </a:fld>
+            <a:endParaRPr lang="en-US"/>
+          </a:p>
+        </p:txBody>
+      </p:sp>
+    </p:spTree>
+    <p:extLst>
+      <p:ext uri="{BB962C8B-B14F-4D97-AF65-F5344CB8AC3E}">
+        <p14:creationId xmlns:p14="http://schemas.microsoft.com/office/powerpoint/2010/main" val="3371382403"/>
+      </p:ext>
+    </p:extLst>
+  </p:cSld>
+  <p:clrMapOvr>
+    <a:masterClrMapping/>
+  </p:clrMapOvr>
+</p:notes>
+</file>
+
 <file path=ppt/slideLayouts/slideLayout1.xml><?xml version="1.0" encoding="utf-8"?>
 <p:sldLayout xmlns:a="http://schemas.openxmlformats.org/drawingml/2006/main" xmlns:r="http://schemas.openxmlformats.org/officeDocument/2006/relationships" xmlns:p="http://schemas.openxmlformats.org/presentationml/2006/main" type="title" preserve="1">
   <p:cSld name="Title Slide">
@@ -649,7 +733,7 @@
           <a:p>
             <a:fld id="{78C97017-6FC3-485B-9764-EAC9E56C1D49}" type="datetimeFigureOut">
               <a:rPr lang="en-US" smtClean="0"/>
-              <a:t>19/10/16</a:t>
+              <a:t>20/10/16</a:t>
             </a:fld>
             <a:endParaRPr lang="en-US"/>
           </a:p>
@@ -819,7 +903,7 @@
           <a:p>
             <a:fld id="{78C97017-6FC3-485B-9764-EAC9E56C1D49}" type="datetimeFigureOut">
               <a:rPr lang="en-US" smtClean="0"/>
-              <a:t>19/10/16</a:t>
+              <a:t>20/10/16</a:t>
             </a:fld>
             <a:endParaRPr lang="en-US"/>
           </a:p>
@@ -999,7 +1083,7 @@
           <a:p>
             <a:fld id="{78C97017-6FC3-485B-9764-EAC9E56C1D49}" type="datetimeFigureOut">
               <a:rPr lang="en-US" smtClean="0"/>
-              <a:t>19/10/16</a:t>
+              <a:t>20/10/16</a:t>
             </a:fld>
             <a:endParaRPr lang="en-US"/>
           </a:p>
@@ -1169,7 +1253,7 @@
           <a:p>
             <a:fld id="{78C97017-6FC3-485B-9764-EAC9E56C1D49}" type="datetimeFigureOut">
               <a:rPr lang="en-US" smtClean="0"/>
-              <a:t>19/10/16</a:t>
+              <a:t>20/10/16</a:t>
             </a:fld>
             <a:endParaRPr lang="en-US"/>
           </a:p>
@@ -1415,7 +1499,7 @@
           <a:p>
             <a:fld id="{78C97017-6FC3-485B-9764-EAC9E56C1D49}" type="datetimeFigureOut">
               <a:rPr lang="en-US" smtClean="0"/>
-              <a:t>19/10/16</a:t>
+              <a:t>20/10/16</a:t>
             </a:fld>
             <a:endParaRPr lang="en-US"/>
           </a:p>
@@ -1703,7 +1787,7 @@
           <a:p>
             <a:fld id="{78C97017-6FC3-485B-9764-EAC9E56C1D49}" type="datetimeFigureOut">
               <a:rPr lang="en-US" smtClean="0"/>
-              <a:t>19/10/16</a:t>
+              <a:t>20/10/16</a:t>
             </a:fld>
             <a:endParaRPr lang="en-US"/>
           </a:p>
@@ -2125,7 +2209,7 @@
           <a:p>
             <a:fld id="{78C97017-6FC3-485B-9764-EAC9E56C1D49}" type="datetimeFigureOut">
               <a:rPr lang="en-US" smtClean="0"/>
-              <a:t>19/10/16</a:t>
+              <a:t>20/10/16</a:t>
             </a:fld>
             <a:endParaRPr lang="en-US"/>
           </a:p>
@@ -2243,7 +2327,7 @@
           <a:p>
             <a:fld id="{78C97017-6FC3-485B-9764-EAC9E56C1D49}" type="datetimeFigureOut">
               <a:rPr lang="en-US" smtClean="0"/>
-              <a:t>19/10/16</a:t>
+              <a:t>20/10/16</a:t>
             </a:fld>
             <a:endParaRPr lang="en-US"/>
           </a:p>
@@ -2338,7 +2422,7 @@
           <a:p>
             <a:fld id="{78C97017-6FC3-485B-9764-EAC9E56C1D49}" type="datetimeFigureOut">
               <a:rPr lang="en-US" smtClean="0"/>
-              <a:t>19/10/16</a:t>
+              <a:t>20/10/16</a:t>
             </a:fld>
             <a:endParaRPr lang="en-US"/>
           </a:p>
@@ -2615,7 +2699,7 @@
           <a:p>
             <a:fld id="{78C97017-6FC3-485B-9764-EAC9E56C1D49}" type="datetimeFigureOut">
               <a:rPr lang="en-US" smtClean="0"/>
-              <a:t>19/10/16</a:t>
+              <a:t>20/10/16</a:t>
             </a:fld>
             <a:endParaRPr lang="en-US"/>
           </a:p>
@@ -2868,7 +2952,7 @@
           <a:p>
             <a:fld id="{78C97017-6FC3-485B-9764-EAC9E56C1D49}" type="datetimeFigureOut">
               <a:rPr lang="en-US" smtClean="0"/>
-              <a:t>19/10/16</a:t>
+              <a:t>20/10/16</a:t>
             </a:fld>
             <a:endParaRPr lang="en-US"/>
           </a:p>
@@ -3081,7 +3165,7 @@
           <a:p>
             <a:fld id="{78C97017-6FC3-485B-9764-EAC9E56C1D49}" type="datetimeFigureOut">
               <a:rPr lang="en-US" smtClean="0"/>
-              <a:t>19/10/16</a:t>
+              <a:t>20/10/16</a:t>
             </a:fld>
             <a:endParaRPr lang="en-US"/>
           </a:p>
@@ -5748,20 +5832,28 @@
           <a:lstStyle/>
           <a:p>
             <a:r>
-              <a:rPr lang="en-US" sz="1400" dirty="0" err="1" smtClean="0">
-                <a:solidFill>
-                  <a:srgbClr val="7030A0"/>
-                </a:solidFill>
-              </a:rPr>
-              <a:t>deletePerson</a:t>
-            </a:r>
-            <a:r>
               <a:rPr lang="en-US" sz="1400" dirty="0" smtClean="0">
                 <a:solidFill>
                   <a:srgbClr val="7030A0"/>
                 </a:solidFill>
               </a:rPr>
-              <a:t>(p)</a:t>
+              <a:t>deleteTask(</a:t>
+            </a:r>
+            <a:r>
+              <a:rPr lang="en-US" sz="1400" dirty="0">
+                <a:solidFill>
+                  <a:srgbClr val="7030A0"/>
+                </a:solidFill>
+              </a:rPr>
+              <a:t>T</a:t>
+            </a:r>
+            <a:r>
+              <a:rPr lang="en-US" sz="1400" dirty="0" smtClean="0">
+                <a:solidFill>
+                  <a:srgbClr val="7030A0"/>
+                </a:solidFill>
+              </a:rPr>
+              <a:t>)</a:t>
             </a:r>
             <a:endParaRPr lang="en-US" sz="1400" dirty="0">
               <a:solidFill>
@@ -5779,7 +5871,7 @@
         </p:nvSpPr>
         <p:spPr>
           <a:xfrm>
-            <a:off x="6074030" y="1687656"/>
+            <a:off x="6096000" y="1687656"/>
             <a:ext cx="2438400" cy="215444"/>
           </a:xfrm>
           <a:prstGeom prst="rect">
@@ -5801,7 +5893,7 @@
                   </a:schemeClr>
                 </a:solidFill>
               </a:rPr>
-              <a:t>post(</a:t>
+              <a:t>Post(</a:t>
             </a:r>
             <a:r>
               <a:rPr lang="en-US" sz="1400" dirty="0" err="1" smtClean="0">
@@ -5811,7 +5903,17 @@
                   </a:schemeClr>
                 </a:solidFill>
               </a:rPr>
-              <a:t>AddressBookChangedEvent</a:t>
+              <a:t>TaskList</a:t>
+            </a:r>
+            <a:r>
+              <a:rPr lang="en-US" sz="1400" dirty="0" err="1" smtClean="0">
+                <a:solidFill>
+                  <a:schemeClr val="accent5">
+                    <a:lumMod val="75000"/>
+                  </a:schemeClr>
+                </a:solidFill>
+              </a:rPr>
+              <a:t>ChangedEvent</a:t>
             </a:r>
             <a:r>
               <a:rPr lang="en-US" sz="1400" dirty="0" smtClean="0">
@@ -6375,7 +6477,7 @@
                   </a:schemeClr>
                 </a:solidFill>
               </a:rPr>
-              <a:t>post(</a:t>
+              <a:t>Post(</a:t>
             </a:r>
             <a:r>
               <a:rPr lang="en-US" sz="1400" dirty="0" err="1" smtClean="0">
@@ -6385,7 +6487,17 @@
                   </a:schemeClr>
                 </a:solidFill>
               </a:rPr>
-              <a:t>AddressBookChangedEvent</a:t>
+              <a:t>TaskList</a:t>
+            </a:r>
+            <a:r>
+              <a:rPr lang="en-US" sz="1400" dirty="0" err="1" smtClean="0">
+                <a:solidFill>
+                  <a:schemeClr val="accent5">
+                    <a:lumMod val="75000"/>
+                  </a:schemeClr>
+                </a:solidFill>
+              </a:rPr>
+              <a:t>ChangedEvent</a:t>
             </a:r>
             <a:r>
               <a:rPr lang="en-US" sz="1400" dirty="0" smtClean="0">
@@ -6757,7 +6869,7 @@
                   </a:schemeClr>
                 </a:solidFill>
               </a:rPr>
-              <a:t>handleAddresssBookChangedEvent</a:t>
+              <a:t>handleTaskListChangedEvent</a:t>
             </a:r>
             <a:r>
               <a:rPr lang="en-US" sz="1400" dirty="0" smtClean="0">
@@ -7068,7 +7180,7 @@
                   <a:srgbClr val="00B050"/>
                 </a:solidFill>
               </a:rPr>
-              <a:t>handleAddresssBookChangedEvent</a:t>
+              <a:t>handleTaskListChangedEvent</a:t>
             </a:r>
             <a:r>
               <a:rPr lang="en-US" sz="1400" dirty="0" smtClean="0">
@@ -7641,7 +7753,7 @@
           <a:p>
             <a:pPr algn="ctr"/>
             <a:r>
-              <a:rPr lang="en-US" sz="1050" b="1" dirty="0" err="1">
+              <a:rPr lang="en-US" sz="1050" b="1" dirty="0">
                 <a:solidFill>
                   <a:schemeClr val="accent3">
                     <a:lumMod val="75000"/>
@@ -7701,7 +7813,7 @@
           <a:p>
             <a:pPr algn="ctr"/>
             <a:r>
-              <a:rPr lang="en-US" sz="1050" b="1" dirty="0" err="1">
+              <a:rPr lang="en-US" sz="1050" b="1" dirty="0">
                 <a:solidFill>
                   <a:schemeClr val="accent3">
                     <a:lumMod val="75000"/>
@@ -7764,7 +7876,7 @@
           <a:p>
             <a:pPr algn="ctr"/>
             <a:r>
-              <a:rPr lang="en-US" sz="1050" dirty="0" err="1" smtClean="0">
+              <a:rPr lang="en-US" sz="1050" dirty="0" smtClean="0">
                 <a:solidFill>
                   <a:schemeClr val="bg1"/>
                 </a:solidFill>
@@ -8014,7 +8126,7 @@
           <a:p>
             <a:pPr algn="ctr"/>
             <a:r>
-              <a:rPr lang="en-US" sz="1050" b="1" dirty="0" err="1">
+              <a:rPr lang="en-US" sz="1050" b="1" dirty="0">
                 <a:solidFill>
                   <a:schemeClr val="accent3">
                     <a:lumMod val="75000"/>
@@ -8074,7 +8186,7 @@
           <a:p>
             <a:pPr algn="ctr"/>
             <a:r>
-              <a:rPr lang="en-US" sz="1050" b="1" dirty="0" err="1">
+              <a:rPr lang="en-US" sz="1050" b="1" dirty="0">
                 <a:solidFill>
                   <a:schemeClr val="accent3">
                     <a:lumMod val="75000"/>
@@ -8134,7 +8246,7 @@
           <a:p>
             <a:pPr algn="ctr"/>
             <a:r>
-              <a:rPr lang="en-US" sz="1050" b="1" dirty="0" err="1">
+              <a:rPr lang="en-US" sz="1050" b="1" dirty="0">
                 <a:solidFill>
                   <a:schemeClr val="accent3">
                     <a:lumMod val="75000"/>
@@ -8194,7 +8306,7 @@
           <a:p>
             <a:pPr algn="ctr"/>
             <a:r>
-              <a:rPr lang="en-US" sz="1050" b="1" dirty="0" err="1">
+              <a:rPr lang="en-US" sz="1050" b="1" dirty="0">
                 <a:solidFill>
                   <a:schemeClr val="accent3">
                     <a:lumMod val="75000"/>
@@ -8254,7 +8366,7 @@
           <a:p>
             <a:pPr algn="ctr"/>
             <a:r>
-              <a:rPr lang="en-US" sz="1050" b="1" dirty="0" err="1">
+              <a:rPr lang="en-US" sz="1050" b="1" dirty="0">
                 <a:solidFill>
                   <a:schemeClr val="accent3">
                     <a:lumMod val="75000"/>
@@ -8403,7 +8515,7 @@
           <a:p>
             <a:pPr algn="ctr"/>
             <a:r>
-              <a:rPr lang="en-US" sz="1050" b="1" dirty="0" err="1">
+              <a:rPr lang="en-US" sz="1050" b="1" dirty="0">
                 <a:solidFill>
                   <a:schemeClr val="accent3">
                     <a:lumMod val="75000"/>
@@ -8645,7 +8757,7 @@
               </a:rPr>
             </a:br>
             <a:r>
-              <a:rPr lang="en-US" sz="1050" b="1" dirty="0" err="1" smtClean="0">
+              <a:rPr lang="en-US" sz="1050" b="1" dirty="0" smtClean="0">
                 <a:solidFill>
                   <a:schemeClr val="accent3">
                     <a:lumMod val="75000"/>
@@ -8954,7 +9066,7 @@
           <a:p>
             <a:pPr algn="ctr"/>
             <a:r>
-              <a:rPr lang="en-US" sz="1050" dirty="0" err="1">
+              <a:rPr lang="en-US" sz="1050" dirty="0">
                 <a:solidFill>
                   <a:schemeClr val="bg1"/>
                 </a:solidFill>
@@ -9885,7 +9997,7 @@
           <a:p>
             <a:pPr algn="ctr"/>
             <a:r>
-              <a:rPr lang="en-US" sz="1050" dirty="0" err="1">
+              <a:rPr lang="en-US" sz="1050" dirty="0">
                 <a:solidFill>
                   <a:schemeClr val="bg1"/>
                 </a:solidFill>
@@ -9944,7 +10056,7 @@
           <a:p>
             <a:pPr algn="ctr"/>
             <a:r>
-              <a:rPr lang="en-US" sz="1050" dirty="0" err="1" smtClean="0">
+              <a:rPr lang="en-US" sz="1050" dirty="0" smtClean="0">
                 <a:solidFill>
                   <a:schemeClr val="bg1"/>
                 </a:solidFill>
@@ -11374,7 +11486,7 @@
           <a:p>
             <a:pPr algn="ctr"/>
             <a:r>
-              <a:rPr lang="en-US" sz="1050" b="1" dirty="0" err="1">
+              <a:rPr lang="en-US" sz="1050" b="1" dirty="0">
                 <a:solidFill>
                   <a:srgbClr val="0070C0"/>
                 </a:solidFill>
@@ -11430,20 +11542,12 @@
           <a:p>
             <a:pPr algn="ctr"/>
             <a:r>
-              <a:rPr lang="en-US" sz="1050" b="1" dirty="0" err="1" smtClean="0">
+              <a:rPr lang="en-US" sz="1050" b="1" dirty="0" smtClean="0">
                 <a:solidFill>
                   <a:srgbClr val="0070C0"/>
                 </a:solidFill>
               </a:rPr>
-              <a:t>Show</a:t>
-            </a:r>
-            <a:r>
-              <a:rPr lang="en-US" sz="1050" b="1" dirty="0" err="1" smtClean="0">
-                <a:solidFill>
-                  <a:srgbClr val="0070C0"/>
-                </a:solidFill>
-              </a:rPr>
-              <a:t>Command</a:t>
+              <a:t>ShowCommand</a:t>
             </a:r>
             <a:endParaRPr lang="en-SG" sz="1050" b="1" dirty="0">
               <a:solidFill>
@@ -11494,7 +11598,7 @@
           <a:p>
             <a:pPr algn="ctr"/>
             <a:r>
-              <a:rPr lang="en-US" sz="1050" b="1" dirty="0" err="1" smtClean="0">
+              <a:rPr lang="en-US" sz="1050" b="1" dirty="0" smtClean="0">
                 <a:solidFill>
                   <a:srgbClr val="0070C0"/>
                 </a:solidFill>
@@ -11621,7 +11725,7 @@
           <a:p>
             <a:pPr algn="ctr"/>
             <a:r>
-              <a:rPr lang="en-US" sz="1050" b="1" dirty="0" err="1" smtClean="0">
+              <a:rPr lang="en-US" sz="1050" b="1" dirty="0" smtClean="0">
                 <a:solidFill>
                   <a:srgbClr val="0070C0"/>
                 </a:solidFill>
@@ -11677,7 +11781,7 @@
           <a:p>
             <a:pPr algn="ctr"/>
             <a:r>
-              <a:rPr lang="en-US" sz="1050" b="1" dirty="0" err="1" smtClean="0">
+              <a:rPr lang="en-US" sz="1050" b="1" dirty="0" smtClean="0">
                 <a:solidFill>
                   <a:srgbClr val="0070C0"/>
                 </a:solidFill>
@@ -11733,7 +11837,7 @@
           <a:p>
             <a:pPr algn="ctr"/>
             <a:r>
-              <a:rPr lang="en-US" sz="1050" b="1" dirty="0" err="1" smtClean="0">
+              <a:rPr lang="en-US" sz="1050" b="1" dirty="0" smtClean="0">
                 <a:solidFill>
                   <a:srgbClr val="0070C0"/>
                 </a:solidFill>
@@ -11789,7 +11893,7 @@
           <a:p>
             <a:pPr algn="ctr"/>
             <a:r>
-              <a:rPr lang="en-US" sz="1050" b="1" dirty="0" err="1" smtClean="0">
+              <a:rPr lang="en-US" sz="1050" b="1" dirty="0" smtClean="0">
                 <a:solidFill>
                   <a:srgbClr val="0070C0"/>
                 </a:solidFill>
@@ -11845,7 +11949,7 @@
           <a:p>
             <a:pPr algn="ctr"/>
             <a:r>
-              <a:rPr lang="en-US" sz="1050" b="1" dirty="0" err="1" smtClean="0">
+              <a:rPr lang="en-US" sz="1050" b="1" dirty="0" smtClean="0">
                 <a:solidFill>
                   <a:srgbClr val="0070C0"/>
                 </a:solidFill>
@@ -11901,7 +12005,7 @@
           <a:p>
             <a:pPr algn="ctr"/>
             <a:r>
-              <a:rPr lang="en-US" sz="1050" b="1" dirty="0" err="1" smtClean="0">
+              <a:rPr lang="en-US" sz="1050" b="1" dirty="0" smtClean="0">
                 <a:solidFill>
                   <a:srgbClr val="0070C0"/>
                 </a:solidFill>
@@ -11957,7 +12061,7 @@
           <a:p>
             <a:pPr algn="ctr"/>
             <a:r>
-              <a:rPr lang="en-US" sz="1050" b="1" dirty="0" err="1" smtClean="0">
+              <a:rPr lang="en-US" sz="1050" b="1" dirty="0" smtClean="0">
                 <a:solidFill>
                   <a:srgbClr val="0070C0"/>
                 </a:solidFill>
@@ -12397,15 +12501,7 @@
                   <a:schemeClr val="bg1"/>
                 </a:solidFill>
               </a:rPr>
-              <a:t>:</a:t>
-            </a:r>
-            <a:r>
-              <a:rPr lang="en-US" sz="1600" dirty="0" err="1">
-                <a:solidFill>
-                  <a:schemeClr val="bg1"/>
-                </a:solidFill>
-              </a:rPr>
-              <a:t>LogicManager</a:t>
+              <a:t>:LogicManager</a:t>
             </a:r>
             <a:endParaRPr lang="en-SG" sz="1600" dirty="0">
               <a:solidFill>
@@ -13509,20 +13605,28 @@
           </a:lstStyle>
           <a:p>
             <a:r>
-              <a:rPr lang="en-US" dirty="0" err="1" smtClean="0">
-                <a:solidFill>
-                  <a:srgbClr val="7030A0"/>
-                </a:solidFill>
-              </a:rPr>
-              <a:t>deletePerson</a:t>
-            </a:r>
-            <a:r>
               <a:rPr lang="en-US" dirty="0" smtClean="0">
                 <a:solidFill>
                   <a:srgbClr val="7030A0"/>
                 </a:solidFill>
               </a:rPr>
-              <a:t>(p)</a:t>
+              <a:t>deleteTask(</a:t>
+            </a:r>
+            <a:r>
+              <a:rPr lang="en-US" dirty="0">
+                <a:solidFill>
+                  <a:srgbClr val="7030A0"/>
+                </a:solidFill>
+              </a:rPr>
+              <a:t>T</a:t>
+            </a:r>
+            <a:r>
+              <a:rPr lang="en-US" dirty="0" smtClean="0">
+                <a:solidFill>
+                  <a:srgbClr val="7030A0"/>
+                </a:solidFill>
+              </a:rPr>
+              <a:t>)</a:t>
             </a:r>
             <a:endParaRPr lang="en-US" dirty="0">
               <a:solidFill>
@@ -13755,7 +13859,7 @@
               </a:rPr>
             </a:br>
             <a:r>
-              <a:rPr lang="en-US" sz="1600" dirty="0" err="1" smtClean="0">
+              <a:rPr lang="en-US" sz="1600" dirty="0" smtClean="0">
                 <a:solidFill>
                   <a:schemeClr val="bg1"/>
                 </a:solidFill>
@@ -13970,8 +14074,8 @@
         </p:nvSpPr>
         <p:spPr>
           <a:xfrm>
-            <a:off x="1119865" y="1727200"/>
-            <a:ext cx="7490735" cy="2997200"/>
+            <a:off x="228600" y="914400"/>
+            <a:ext cx="8894902" cy="3810000"/>
           </a:xfrm>
           <a:prstGeom prst="roundRect">
             <a:avLst>
@@ -14031,8 +14135,8 @@
         </p:nvSpPr>
         <p:spPr>
           <a:xfrm>
-            <a:off x="2877180" y="3158440"/>
-            <a:ext cx="1093635" cy="346760"/>
+            <a:off x="2335827" y="2733773"/>
+            <a:ext cx="1298641" cy="440797"/>
           </a:xfrm>
           <a:prstGeom prst="rect">
             <a:avLst/>
@@ -14067,7 +14171,7 @@
           <a:p>
             <a:pPr algn="ctr"/>
             <a:r>
-              <a:rPr lang="en-US" sz="1050" dirty="0" err="1" smtClean="0">
+              <a:rPr lang="en-US" sz="1050" dirty="0" smtClean="0">
                 <a:solidFill>
                   <a:schemeClr val="bg1"/>
                 </a:solidFill>
@@ -14090,8 +14194,8 @@
         </p:nvSpPr>
         <p:spPr>
           <a:xfrm rot="16200000">
-            <a:off x="1683963" y="2868687"/>
-            <a:ext cx="1093635" cy="346760"/>
+            <a:off x="873151" y="2379960"/>
+            <a:ext cx="1390214" cy="411761"/>
           </a:xfrm>
           <a:prstGeom prst="rect">
             <a:avLst/>
@@ -14126,7 +14230,7 @@
           <a:p>
             <a:pPr algn="ctr"/>
             <a:r>
-              <a:rPr lang="en-US" sz="1050" dirty="0" err="1" smtClean="0">
+              <a:rPr lang="en-US" sz="1050" dirty="0" smtClean="0">
                 <a:solidFill>
                   <a:schemeClr val="bg1"/>
                 </a:solidFill>
@@ -14152,8 +14256,8 @@
         </p:nvCxnSpPr>
         <p:spPr>
           <a:xfrm flipV="1">
-            <a:off x="6477000" y="3204826"/>
-            <a:ext cx="190770" cy="405819"/>
+            <a:off x="6610447" y="2792738"/>
+            <a:ext cx="226531" cy="515872"/>
           </a:xfrm>
           <a:prstGeom prst="bentConnector2">
             <a:avLst/>
@@ -14193,8 +14297,8 @@
         </p:nvCxnSpPr>
         <p:spPr>
           <a:xfrm rot="5400000" flipH="1" flipV="1">
-            <a:off x="4360065" y="1080909"/>
-            <a:ext cx="378691" cy="4637261"/>
+            <a:off x="4080830" y="286989"/>
+            <a:ext cx="481387" cy="5506533"/>
           </a:xfrm>
           <a:prstGeom prst="bentConnector4">
             <a:avLst>
@@ -14235,8 +14339,8 @@
         </p:nvSpPr>
         <p:spPr>
           <a:xfrm rot="16200000">
-            <a:off x="956202" y="2861202"/>
-            <a:ext cx="1093635" cy="346760"/>
+            <a:off x="8968" y="2370446"/>
+            <a:ext cx="1390214" cy="411761"/>
           </a:xfrm>
           <a:prstGeom prst="rect">
             <a:avLst/>
@@ -14305,8 +14409,8 @@
         </p:nvSpPr>
         <p:spPr>
           <a:xfrm rot="16200000">
-            <a:off x="1626910" y="2952291"/>
-            <a:ext cx="270504" cy="175523"/>
+            <a:off x="839864" y="2479068"/>
+            <a:ext cx="343861" cy="208425"/>
           </a:xfrm>
           <a:prstGeom prst="triangle">
             <a:avLst/>
@@ -14355,8 +14459,8 @@
         </p:nvCxnSpPr>
         <p:spPr>
           <a:xfrm flipV="1">
-            <a:off x="6667770" y="2632344"/>
-            <a:ext cx="1612" cy="225722"/>
+            <a:off x="6836978" y="2065007"/>
+            <a:ext cx="1914" cy="286935"/>
           </a:xfrm>
           <a:prstGeom prst="straightConnector1">
             <a:avLst/>
@@ -14397,8 +14501,8 @@
         </p:nvCxnSpPr>
         <p:spPr>
           <a:xfrm>
-            <a:off x="2656370" y="3326536"/>
-            <a:ext cx="220810" cy="5284"/>
+            <a:off x="2073626" y="2947454"/>
+            <a:ext cx="262202" cy="6717"/>
           </a:xfrm>
           <a:prstGeom prst="straightConnector1">
             <a:avLst/>
@@ -14435,8 +14539,8 @@
         </p:nvSpPr>
         <p:spPr>
           <a:xfrm rot="5400000" flipV="1">
-            <a:off x="6253986" y="3522883"/>
-            <a:ext cx="270504" cy="175523"/>
+            <a:off x="6334304" y="3204396"/>
+            <a:ext cx="343861" cy="208425"/>
           </a:xfrm>
           <a:prstGeom prst="triangle">
             <a:avLst/>
@@ -14486,8 +14590,8 @@
         </p:nvCxnSpPr>
         <p:spPr>
           <a:xfrm>
-            <a:off x="910091" y="3040053"/>
-            <a:ext cx="419548" cy="2860"/>
+            <a:off x="0" y="2583281"/>
+            <a:ext cx="498194" cy="3636"/>
           </a:xfrm>
           <a:prstGeom prst="bentConnector3">
             <a:avLst>
@@ -14531,8 +14635,8 @@
         </p:nvCxnSpPr>
         <p:spPr>
           <a:xfrm flipV="1">
-            <a:off x="1849924" y="3040052"/>
-            <a:ext cx="216105" cy="1"/>
+            <a:off x="1116008" y="2583280"/>
+            <a:ext cx="256615" cy="1"/>
           </a:xfrm>
           <a:prstGeom prst="line">
             <a:avLst/>
@@ -14570,8 +14674,8 @@
         </p:nvSpPr>
         <p:spPr>
           <a:xfrm>
-            <a:off x="2420322" y="3239846"/>
-            <a:ext cx="236048" cy="173380"/>
+            <a:off x="1793330" y="2837255"/>
+            <a:ext cx="280296" cy="220398"/>
           </a:xfrm>
           <a:prstGeom prst="flowChartDecision">
             <a:avLst/>
@@ -14615,8 +14719,8 @@
         </p:nvSpPr>
         <p:spPr>
           <a:xfrm>
-            <a:off x="2879490" y="2627420"/>
-            <a:ext cx="1093635" cy="346760"/>
+            <a:off x="2338570" y="2058747"/>
+            <a:ext cx="1298641" cy="440797"/>
           </a:xfrm>
           <a:prstGeom prst="rect">
             <a:avLst/>
@@ -14648,7 +14752,7 @@
           <a:p>
             <a:pPr algn="ctr"/>
             <a:r>
-              <a:rPr lang="en-US" sz="1050" dirty="0" err="1" smtClean="0">
+              <a:rPr lang="en-US" sz="1050" dirty="0" smtClean="0">
                 <a:solidFill>
                   <a:srgbClr val="7030A0"/>
                 </a:solidFill>
@@ -14674,8 +14778,8 @@
         </p:nvCxnSpPr>
         <p:spPr>
           <a:xfrm>
-            <a:off x="2658680" y="2795516"/>
-            <a:ext cx="220810" cy="5284"/>
+            <a:off x="2076369" y="2272429"/>
+            <a:ext cx="262202" cy="6717"/>
           </a:xfrm>
           <a:prstGeom prst="straightConnector1">
             <a:avLst/>
@@ -14712,8 +14816,8 @@
         </p:nvSpPr>
         <p:spPr>
           <a:xfrm>
-            <a:off x="2422632" y="2708826"/>
-            <a:ext cx="236048" cy="173380"/>
+            <a:off x="1796073" y="2162230"/>
+            <a:ext cx="280296" cy="220398"/>
           </a:xfrm>
           <a:prstGeom prst="flowChartDecision">
             <a:avLst/>
@@ -14757,8 +14861,8 @@
         </p:nvSpPr>
         <p:spPr>
           <a:xfrm>
-            <a:off x="4487017" y="2847371"/>
-            <a:ext cx="1156969" cy="346760"/>
+            <a:off x="4247435" y="2338346"/>
+            <a:ext cx="1373847" cy="440797"/>
           </a:xfrm>
           <a:prstGeom prst="rect">
             <a:avLst/>
@@ -14790,7 +14894,7 @@
           <a:p>
             <a:pPr algn="ctr"/>
             <a:r>
-              <a:rPr lang="en-US" sz="1050" dirty="0" err="1" smtClean="0">
+              <a:rPr lang="en-US" sz="1050" dirty="0" smtClean="0">
                 <a:solidFill>
                   <a:srgbClr val="7030A0"/>
                 </a:solidFill>
@@ -14813,8 +14917,8 @@
         </p:nvSpPr>
         <p:spPr>
           <a:xfrm>
-            <a:off x="3984303" y="2673991"/>
-            <a:ext cx="236048" cy="173380"/>
+            <a:off x="3650485" y="2117948"/>
+            <a:ext cx="280296" cy="220398"/>
           </a:xfrm>
           <a:prstGeom prst="flowChartDecision">
             <a:avLst/>
@@ -14863,8 +14967,8 @@
         </p:nvCxnSpPr>
         <p:spPr>
           <a:xfrm>
-            <a:off x="4220351" y="2760681"/>
-            <a:ext cx="266666" cy="260070"/>
+            <a:off x="3930781" y="2228147"/>
+            <a:ext cx="316654" cy="330597"/>
           </a:xfrm>
           <a:prstGeom prst="bentConnector3">
             <a:avLst/>
@@ -14901,8 +15005,8 @@
         </p:nvSpPr>
         <p:spPr>
           <a:xfrm>
-            <a:off x="4503204" y="2280569"/>
-            <a:ext cx="1156969" cy="346760"/>
+            <a:off x="4266656" y="1617835"/>
+            <a:ext cx="1373847" cy="440797"/>
           </a:xfrm>
           <a:prstGeom prst="rect">
             <a:avLst/>
@@ -14934,7 +15038,7 @@
           <a:p>
             <a:pPr algn="ctr"/>
             <a:r>
-              <a:rPr lang="en-US" sz="1050" dirty="0" err="1" smtClean="0">
+              <a:rPr lang="en-US" sz="1050" dirty="0" smtClean="0">
                 <a:solidFill>
                   <a:srgbClr val="7030A0"/>
                 </a:solidFill>
@@ -14960,8 +15064,8 @@
         </p:nvCxnSpPr>
         <p:spPr>
           <a:xfrm flipV="1">
-            <a:off x="4220351" y="2453949"/>
-            <a:ext cx="282853" cy="306732"/>
+            <a:off x="3930781" y="1838233"/>
+            <a:ext cx="335875" cy="389914"/>
           </a:xfrm>
           <a:prstGeom prst="bentConnector3">
             <a:avLst>
@@ -15000,8 +15104,8 @@
         </p:nvSpPr>
         <p:spPr>
           <a:xfrm>
-            <a:off x="6313677" y="2858066"/>
-            <a:ext cx="708186" cy="346760"/>
+            <a:off x="6416509" y="2351942"/>
+            <a:ext cx="840938" cy="440797"/>
           </a:xfrm>
           <a:prstGeom prst="rect">
             <a:avLst/>
@@ -15056,8 +15160,8 @@
         </p:nvSpPr>
         <p:spPr>
           <a:xfrm>
-            <a:off x="5643227" y="2943979"/>
-            <a:ext cx="236048" cy="173380"/>
+            <a:off x="5620381" y="2461153"/>
+            <a:ext cx="280296" cy="220398"/>
           </a:xfrm>
           <a:prstGeom prst="flowChartDecision">
             <a:avLst/>
@@ -15104,8 +15208,8 @@
         </p:nvCxnSpPr>
         <p:spPr>
           <a:xfrm>
-            <a:off x="5879275" y="3030669"/>
-            <a:ext cx="434402" cy="777"/>
+            <a:off x="5900677" y="2571352"/>
+            <a:ext cx="515832" cy="988"/>
           </a:xfrm>
           <a:prstGeom prst="bentConnector3">
             <a:avLst/>
@@ -15142,8 +15246,8 @@
         </p:nvSpPr>
         <p:spPr>
           <a:xfrm>
-            <a:off x="6315289" y="2285584"/>
-            <a:ext cx="708186" cy="346760"/>
+            <a:off x="6418423" y="1624210"/>
+            <a:ext cx="840938" cy="440797"/>
           </a:xfrm>
           <a:prstGeom prst="rect">
             <a:avLst/>
@@ -15198,8 +15302,8 @@
         </p:nvSpPr>
         <p:spPr>
           <a:xfrm>
-            <a:off x="5672547" y="2371497"/>
-            <a:ext cx="236048" cy="173380"/>
+            <a:off x="5655197" y="1733422"/>
+            <a:ext cx="280296" cy="220398"/>
           </a:xfrm>
           <a:prstGeom prst="flowChartDecision">
             <a:avLst/>
@@ -15246,8 +15350,8 @@
         </p:nvCxnSpPr>
         <p:spPr>
           <a:xfrm>
-            <a:off x="5908595" y="2458187"/>
-            <a:ext cx="406694" cy="777"/>
+            <a:off x="5935493" y="1843621"/>
+            <a:ext cx="482930" cy="988"/>
           </a:xfrm>
           <a:prstGeom prst="bentConnector3">
             <a:avLst/>
@@ -15284,8 +15388,8 @@
         </p:nvSpPr>
         <p:spPr>
           <a:xfrm>
-            <a:off x="5128257" y="3429000"/>
-            <a:ext cx="1156969" cy="346760"/>
+            <a:off x="5008877" y="3077705"/>
+            <a:ext cx="1373847" cy="440797"/>
           </a:xfrm>
           <a:prstGeom prst="rect">
             <a:avLst/>
@@ -15332,7 +15436,7 @@
               </a:rPr>
             </a:br>
             <a:r>
-              <a:rPr lang="en-US" sz="1050" dirty="0" err="1" smtClean="0">
+              <a:rPr lang="en-US" sz="1050" dirty="0" smtClean="0">
                 <a:solidFill>
                   <a:srgbClr val="7030A0"/>
                 </a:solidFill>
@@ -15355,8 +15459,8 @@
         </p:nvSpPr>
         <p:spPr>
           <a:xfrm>
-            <a:off x="7712397" y="2564238"/>
-            <a:ext cx="708186" cy="285783"/>
+            <a:off x="8077424" y="1978431"/>
+            <a:ext cx="840938" cy="363283"/>
           </a:xfrm>
           <a:prstGeom prst="rect">
             <a:avLst/>
@@ -15388,7 +15492,7 @@
           <a:p>
             <a:pPr algn="ctr"/>
             <a:r>
-              <a:rPr lang="en-US" sz="1050" dirty="0" err="1" smtClean="0">
+              <a:rPr lang="en-US" sz="1050" dirty="0" smtClean="0">
                 <a:solidFill>
                   <a:srgbClr val="7030A0"/>
                 </a:solidFill>
@@ -15411,8 +15515,8 @@
         </p:nvSpPr>
         <p:spPr>
           <a:xfrm>
-            <a:off x="7041947" y="2948201"/>
-            <a:ext cx="236048" cy="173380"/>
+            <a:off x="7281296" y="2466520"/>
+            <a:ext cx="280296" cy="220398"/>
           </a:xfrm>
           <a:prstGeom prst="flowChartDecision">
             <a:avLst/>
@@ -15461,8 +15565,8 @@
         </p:nvCxnSpPr>
         <p:spPr>
           <a:xfrm flipV="1">
-            <a:off x="7277995" y="2707130"/>
-            <a:ext cx="434402" cy="327761"/>
+            <a:off x="7561592" y="2160074"/>
+            <a:ext cx="515832" cy="416645"/>
           </a:xfrm>
           <a:prstGeom prst="bentConnector3">
             <a:avLst/>
@@ -15499,8 +15603,8 @@
         </p:nvSpPr>
         <p:spPr>
           <a:xfrm>
-            <a:off x="7712397" y="2887216"/>
-            <a:ext cx="708186" cy="285783"/>
+            <a:off x="8077424" y="2388997"/>
+            <a:ext cx="840938" cy="363283"/>
           </a:xfrm>
           <a:prstGeom prst="rect">
             <a:avLst/>
@@ -15532,7 +15636,7 @@
           <a:p>
             <a:pPr algn="ctr"/>
             <a:r>
-              <a:rPr lang="en-US" sz="1050" dirty="0" err="1" smtClean="0">
+              <a:rPr lang="en-US" sz="1050" dirty="0" smtClean="0">
                 <a:solidFill>
                   <a:srgbClr val="7030A0"/>
                 </a:solidFill>
@@ -15558,8 +15662,8 @@
         </p:nvCxnSpPr>
         <p:spPr>
           <a:xfrm flipV="1">
-            <a:off x="7277995" y="3030108"/>
-            <a:ext cx="434402" cy="4783"/>
+            <a:off x="7561592" y="2570639"/>
+            <a:ext cx="515832" cy="6080"/>
           </a:xfrm>
           <a:prstGeom prst="bentConnector3">
             <a:avLst/>
@@ -15596,8 +15700,8 @@
         </p:nvSpPr>
         <p:spPr>
           <a:xfrm>
-            <a:off x="7712397" y="3210194"/>
-            <a:ext cx="708186" cy="285783"/>
+            <a:off x="8077424" y="2799562"/>
+            <a:ext cx="840938" cy="363283"/>
           </a:xfrm>
           <a:prstGeom prst="rect">
             <a:avLst/>
@@ -15629,7 +15733,7 @@
           <a:p>
             <a:pPr algn="ctr"/>
             <a:r>
-              <a:rPr lang="en-US" sz="1050" dirty="0" err="1" smtClean="0">
+              <a:rPr lang="en-US" sz="1050" dirty="0" smtClean="0">
                 <a:solidFill>
                   <a:srgbClr val="7030A0"/>
                 </a:solidFill>
@@ -15655,8 +15759,8 @@
         </p:nvCxnSpPr>
         <p:spPr>
           <a:xfrm>
-            <a:off x="7277995" y="3034891"/>
-            <a:ext cx="434402" cy="318195"/>
+            <a:off x="7561592" y="2576719"/>
+            <a:ext cx="515832" cy="404485"/>
           </a:xfrm>
           <a:prstGeom prst="bentConnector3">
             <a:avLst/>
@@ -15693,8 +15797,8 @@
         </p:nvSpPr>
         <p:spPr>
           <a:xfrm>
-            <a:off x="7712397" y="3533171"/>
-            <a:ext cx="708186" cy="285783"/>
+            <a:off x="8077424" y="3210126"/>
+            <a:ext cx="840938" cy="363283"/>
           </a:xfrm>
           <a:prstGeom prst="rect">
             <a:avLst/>
@@ -15726,7 +15830,7 @@
           <a:p>
             <a:pPr algn="ctr"/>
             <a:r>
-              <a:rPr lang="en-US" sz="1050" dirty="0" err="1" smtClean="0">
+              <a:rPr lang="en-US" sz="1050" dirty="0" smtClean="0">
                 <a:solidFill>
                   <a:srgbClr val="7030A0"/>
                 </a:solidFill>
@@ -15752,8 +15856,8 @@
         </p:nvCxnSpPr>
         <p:spPr>
           <a:xfrm>
-            <a:off x="7277995" y="3034891"/>
-            <a:ext cx="434402" cy="641172"/>
+            <a:off x="7561592" y="2576719"/>
+            <a:ext cx="515832" cy="815049"/>
           </a:xfrm>
           <a:prstGeom prst="bentConnector3">
             <a:avLst/>
@@ -15792,8 +15896,8 @@
         </p:nvCxnSpPr>
         <p:spPr>
           <a:xfrm rot="16200000" flipH="1">
-            <a:off x="3279321" y="2485431"/>
-            <a:ext cx="293825" cy="1"/>
+            <a:off x="2801050" y="1878253"/>
+            <a:ext cx="373506" cy="1"/>
           </a:xfrm>
           <a:prstGeom prst="bentConnector3">
             <a:avLst>
@@ -15833,8 +15937,8 @@
         </p:nvSpPr>
         <p:spPr>
           <a:xfrm rot="10800000" flipV="1">
-            <a:off x="3290981" y="2162997"/>
-            <a:ext cx="270504" cy="175523"/>
+            <a:off x="2827197" y="1468379"/>
+            <a:ext cx="321211" cy="223122"/>
           </a:xfrm>
           <a:prstGeom prst="triangle">
             <a:avLst/>
@@ -15881,8 +15985,8 @@
         </p:nvSpPr>
         <p:spPr>
           <a:xfrm>
-            <a:off x="2660303" y="1806470"/>
-            <a:ext cx="1539926" cy="346760"/>
+            <a:off x="2078296" y="1015167"/>
+            <a:ext cx="1828591" cy="440797"/>
           </a:xfrm>
           <a:prstGeom prst="rect">
             <a:avLst/>
@@ -15929,7 +16033,7 @@
               </a:rPr>
             </a:br>
             <a:r>
-              <a:rPr lang="en-US" sz="1050" dirty="0" err="1" smtClean="0">
+              <a:rPr lang="en-US" sz="1050" dirty="0" smtClean="0">
                 <a:solidFill>
                   <a:srgbClr val="7030A0"/>
                 </a:solidFill>
@@ -15952,8 +16056,8 @@
         </p:nvSpPr>
         <p:spPr>
           <a:xfrm rot="16200000">
-            <a:off x="6581354" y="3514530"/>
-            <a:ext cx="881018" cy="261610"/>
+            <a:off x="6697478" y="3197382"/>
+            <a:ext cx="1119938" cy="310650"/>
           </a:xfrm>
           <a:prstGeom prst="rect">
             <a:avLst/>
@@ -15991,8 +16095,8 @@
         </p:nvSpPr>
         <p:spPr>
           <a:xfrm>
-            <a:off x="2057400" y="4239491"/>
-            <a:ext cx="1775949" cy="346760"/>
+            <a:off x="1362376" y="4107990"/>
+            <a:ext cx="2108857" cy="440797"/>
           </a:xfrm>
           <a:prstGeom prst="rect">
             <a:avLst/>
@@ -16047,7 +16151,7 @@
               </a:rPr>
             </a:br>
             <a:r>
-              <a:rPr lang="en-US" sz="1050" dirty="0" err="1" smtClean="0">
+              <a:rPr lang="en-US" sz="1050" dirty="0" smtClean="0">
                 <a:solidFill>
                   <a:srgbClr val="7030A0"/>
                 </a:solidFill>
@@ -16073,8 +16177,8 @@
         </p:nvCxnSpPr>
         <p:spPr>
           <a:xfrm rot="16200000" flipH="1">
-            <a:off x="1364475" y="3719945"/>
-            <a:ext cx="831471" cy="554380"/>
+            <a:off x="504749" y="3470760"/>
+            <a:ext cx="1056955" cy="658301"/>
           </a:xfrm>
           <a:prstGeom prst="bentConnector2">
             <a:avLst/>
@@ -16112,8 +16216,8 @@
         </p:nvCxnSpPr>
         <p:spPr>
           <a:xfrm>
-            <a:off x="7467600" y="4038600"/>
-            <a:ext cx="228600" cy="0"/>
+            <a:off x="7805748" y="3852620"/>
+            <a:ext cx="271452" cy="0"/>
           </a:xfrm>
           <a:prstGeom prst="straightConnector1">
             <a:avLst/>
@@ -16150,8 +16254,8 @@
         </p:nvSpPr>
         <p:spPr>
           <a:xfrm>
-            <a:off x="7696200" y="3886200"/>
-            <a:ext cx="708186" cy="285783"/>
+            <a:off x="8058191" y="3658892"/>
+            <a:ext cx="840938" cy="363283"/>
           </a:xfrm>
           <a:prstGeom prst="rect">
             <a:avLst/>
@@ -16206,8 +16310,8 @@
         </p:nvCxnSpPr>
         <p:spPr>
           <a:xfrm>
-            <a:off x="7467600" y="3581400"/>
-            <a:ext cx="0" cy="457200"/>
+            <a:off x="7848600" y="3276600"/>
+            <a:ext cx="0" cy="581186"/>
           </a:xfrm>
           <a:prstGeom prst="straightConnector1">
             <a:avLst/>
@@ -16233,6 +16337,173 @@
           </a:effectRef>
           <a:fontRef idx="minor">
             <a:schemeClr val="dk1"/>
+          </a:fontRef>
+        </p:style>
+      </p:cxnSp>
+      <p:sp>
+        <p:nvSpPr>
+          <p:cNvPr id="50" name="Rectangle 8"/>
+          <p:cNvSpPr/>
+          <p:nvPr/>
+        </p:nvSpPr>
+        <p:spPr>
+          <a:xfrm>
+            <a:off x="4749143" y="4038600"/>
+            <a:ext cx="2108857" cy="440797"/>
+          </a:xfrm>
+          <a:prstGeom prst="rect">
+            <a:avLst/>
+          </a:prstGeom>
+          <a:ln w="19050">
+            <a:solidFill>
+              <a:srgbClr val="7030A0"/>
+            </a:solidFill>
+          </a:ln>
+          <a:effectLst/>
+        </p:spPr>
+        <p:style>
+          <a:lnRef idx="1">
+            <a:schemeClr val="accent4"/>
+          </a:lnRef>
+          <a:fillRef idx="2">
+            <a:schemeClr val="accent4"/>
+          </a:fillRef>
+          <a:effectRef idx="1">
+            <a:schemeClr val="accent4"/>
+          </a:effectRef>
+          <a:fontRef idx="minor">
+            <a:schemeClr val="dk1"/>
+          </a:fontRef>
+        </p:style>
+        <p:txBody>
+          <a:bodyPr rtlCol="0" anchor="ctr"/>
+          <a:lstStyle/>
+          <a:p>
+            <a:pPr algn="ctr"/>
+            <a:r>
+              <a:rPr lang="en-US" sz="1050" dirty="0" smtClean="0">
+                <a:solidFill>
+                  <a:srgbClr val="7030A0"/>
+                </a:solidFill>
+              </a:rPr>
+              <a:t>TimePreparser</a:t>
+            </a:r>
+            <a:endParaRPr lang="en-SG" sz="1050" dirty="0">
+              <a:solidFill>
+                <a:srgbClr val="7030A0"/>
+              </a:solidFill>
+            </a:endParaRPr>
+          </a:p>
+        </p:txBody>
+      </p:sp>
+      <p:cxnSp>
+        <p:nvCxnSpPr>
+          <p:cNvPr id="52" name="Elbow Connector 51"/>
+          <p:cNvCxnSpPr/>
+          <p:nvPr/>
+        </p:nvCxnSpPr>
+        <p:spPr>
+          <a:xfrm rot="16200000" flipH="1">
+            <a:off x="8115300" y="3314700"/>
+            <a:ext cx="1752600" cy="152400"/>
+          </a:xfrm>
+          <a:prstGeom prst="bentConnector3">
+            <a:avLst>
+              <a:gd name="adj1" fmla="val -32"/>
+            </a:avLst>
+          </a:prstGeom>
+          <a:ln w="19050">
+            <a:solidFill>
+              <a:srgbClr val="7030A0"/>
+            </a:solidFill>
+            <a:headEnd type="none" w="med" len="med"/>
+            <a:tailEnd type="none" w="med" len="med"/>
+          </a:ln>
+          <a:effectLst/>
+          <a:scene3d>
+            <a:camera prst="orthographicFront">
+              <a:rot lat="0" lon="0" rev="0"/>
+            </a:camera>
+            <a:lightRig rig="threePt" dir="t"/>
+          </a:scene3d>
+        </p:spPr>
+        <p:style>
+          <a:lnRef idx="1">
+            <a:schemeClr val="accent2"/>
+          </a:lnRef>
+          <a:fillRef idx="2">
+            <a:schemeClr val="accent2"/>
+          </a:fillRef>
+          <a:effectRef idx="1">
+            <a:schemeClr val="accent2"/>
+          </a:effectRef>
+          <a:fontRef idx="minor">
+            <a:schemeClr val="dk1"/>
+          </a:fontRef>
+        </p:style>
+      </p:cxnSp>
+      <p:cxnSp>
+        <p:nvCxnSpPr>
+          <p:cNvPr id="12" name="Straight Connector 11"/>
+          <p:cNvCxnSpPr>
+            <a:stCxn id="83" idx="3"/>
+          </p:cNvCxnSpPr>
+          <p:nvPr/>
+        </p:nvCxnSpPr>
+        <p:spPr>
+          <a:xfrm>
+            <a:off x="8918362" y="2981204"/>
+            <a:ext cx="149438" cy="66796"/>
+          </a:xfrm>
+          <a:prstGeom prst="line">
+            <a:avLst/>
+          </a:prstGeom>
+        </p:spPr>
+        <p:style>
+          <a:lnRef idx="2">
+            <a:schemeClr val="accent4"/>
+          </a:lnRef>
+          <a:fillRef idx="0">
+            <a:schemeClr val="accent4"/>
+          </a:fillRef>
+          <a:effectRef idx="1">
+            <a:schemeClr val="accent4"/>
+          </a:effectRef>
+          <a:fontRef idx="minor">
+            <a:schemeClr val="tx1"/>
+          </a:fontRef>
+        </p:style>
+      </p:cxnSp>
+      <p:cxnSp>
+        <p:nvCxnSpPr>
+          <p:cNvPr id="29" name="Straight Arrow Connector 28"/>
+          <p:cNvCxnSpPr/>
+          <p:nvPr/>
+        </p:nvCxnSpPr>
+        <p:spPr>
+          <a:xfrm flipH="1">
+            <a:off x="6858000" y="4267200"/>
+            <a:ext cx="2209800" cy="0"/>
+          </a:xfrm>
+          <a:prstGeom prst="straightConnector1">
+            <a:avLst/>
+          </a:prstGeom>
+          <a:ln>
+            <a:tailEnd type="arrow"/>
+          </a:ln>
+        </p:spPr>
+        <p:style>
+          <a:lnRef idx="2">
+            <a:schemeClr val="accent4"/>
+          </a:lnRef>
+          <a:fillRef idx="0">
+            <a:schemeClr val="accent4"/>
+          </a:fillRef>
+          <a:effectRef idx="1">
+            <a:schemeClr val="accent4"/>
+          </a:effectRef>
+          <a:fontRef idx="minor">
+            <a:schemeClr val="tx1"/>
           </a:fontRef>
         </p:style>
       </p:cxnSp>
@@ -16401,7 +16672,7 @@
               </a:rPr>
             </a:br>
             <a:r>
-              <a:rPr lang="en-US" sz="1050" dirty="0" err="1" smtClean="0">
+              <a:rPr lang="en-US" sz="1050" dirty="0" smtClean="0">
                 <a:solidFill>
                   <a:schemeClr val="bg1"/>
                 </a:solidFill>
@@ -16464,7 +16735,7 @@
           <a:p>
             <a:pPr algn="ctr"/>
             <a:r>
-              <a:rPr lang="en-US" sz="1050" dirty="0" err="1" smtClean="0">
+              <a:rPr lang="en-US" sz="1050" dirty="0" smtClean="0">
                 <a:solidFill>
                   <a:schemeClr val="bg1"/>
                 </a:solidFill>
@@ -16780,7 +17051,7 @@
           <a:lstStyle/>
           <a:p>
             <a:pPr algn="ctr"/>
-            <a:endParaRPr lang="en-US" sz="1050">
+            <a:endParaRPr lang="en-US" sz="1050" dirty="0">
               <a:solidFill>
                 <a:schemeClr val="bg1"/>
               </a:solidFill>
@@ -16972,7 +17243,7 @@
           <a:p>
             <a:pPr algn="ctr"/>
             <a:r>
-              <a:rPr lang="en-US" sz="1050" b="1" dirty="0" err="1" smtClean="0">
+              <a:rPr lang="en-US" sz="1050" b="1" dirty="0" smtClean="0">
                 <a:solidFill>
                   <a:schemeClr val="accent6">
                     <a:lumMod val="75000"/>
@@ -16980,16 +17251,6 @@
                 </a:solidFill>
               </a:rPr>
               <a:t>TaskListStorage</a:t>
-            </a:r>
-            <a:r>
-              <a:rPr lang="en-US" sz="1050" b="1" dirty="0" smtClean="0">
-                <a:solidFill>
-                  <a:schemeClr val="accent6">
-                    <a:lumMod val="75000"/>
-                  </a:schemeClr>
-                </a:solidFill>
-              </a:rPr>
-              <a:t/>
             </a:r>
             <a:br>
               <a:rPr lang="en-US" sz="1050" b="1" dirty="0" smtClean="0">
@@ -17083,7 +17344,7 @@
               </a:rPr>
             </a:br>
             <a:r>
-              <a:rPr lang="en-US" sz="1050" dirty="0" err="1" smtClean="0">
+              <a:rPr lang="en-US" sz="1050" dirty="0" smtClean="0">
                 <a:solidFill>
                   <a:schemeClr val="bg1"/>
                 </a:solidFill>
@@ -17341,20 +17602,12 @@
           <a:p>
             <a:pPr algn="ctr"/>
             <a:r>
-              <a:rPr lang="en-US" sz="1050" dirty="0" err="1" smtClean="0">
+              <a:rPr lang="en-US" sz="1050" dirty="0" smtClean="0">
                 <a:solidFill>
                   <a:schemeClr val="bg1"/>
                 </a:solidFill>
               </a:rPr>
               <a:t>JsonUserPrefs</a:t>
-            </a:r>
-            <a:r>
-              <a:rPr lang="en-US" sz="1050" dirty="0" smtClean="0">
-                <a:solidFill>
-                  <a:schemeClr val="bg1"/>
-                </a:solidFill>
-              </a:rPr>
-              <a:t/>
             </a:r>
             <a:br>
               <a:rPr lang="en-US" sz="1050" dirty="0" smtClean="0">
@@ -17416,7 +17669,7 @@
           <a:p>
             <a:pPr algn="ctr"/>
             <a:r>
-              <a:rPr lang="en-US" sz="1050" b="1" dirty="0" err="1" smtClean="0">
+              <a:rPr lang="en-US" sz="1050" b="1" dirty="0" smtClean="0">
                 <a:solidFill>
                   <a:schemeClr val="accent6">
                     <a:lumMod val="75000"/>
@@ -17424,16 +17677,6 @@
                 </a:solidFill>
               </a:rPr>
               <a:t>XmlSerializable</a:t>
-            </a:r>
-            <a:r>
-              <a:rPr lang="en-US" sz="1050" b="1" dirty="0" smtClean="0">
-                <a:solidFill>
-                  <a:schemeClr val="accent6">
-                    <a:lumMod val="75000"/>
-                  </a:schemeClr>
-                </a:solidFill>
-              </a:rPr>
-              <a:t/>
             </a:r>
             <a:br>
               <a:rPr lang="en-US" sz="1050" b="1" dirty="0" smtClean="0">
@@ -17445,7 +17688,7 @@
               </a:rPr>
             </a:br>
             <a:r>
-              <a:rPr lang="en-US" sz="1050" b="1" dirty="0" err="1" smtClean="0">
+              <a:rPr lang="en-US" sz="1050" b="1" dirty="0" smtClean="0">
                 <a:solidFill>
                   <a:schemeClr val="accent6">
                     <a:lumMod val="75000"/>
@@ -17542,7 +17785,7 @@
           <a:p>
             <a:pPr algn="ctr"/>
             <a:r>
-              <a:rPr lang="en-US" sz="1050" b="1" dirty="0" err="1" smtClean="0">
+              <a:rPr lang="en-US" sz="1050" b="1" dirty="0" smtClean="0">
                 <a:solidFill>
                   <a:schemeClr val="accent6">
                     <a:lumMod val="75000"/>
@@ -17598,7 +17841,7 @@
           <a:p>
             <a:pPr algn="ctr"/>
             <a:r>
-              <a:rPr lang="en-US" sz="1050" b="1" dirty="0" err="1" smtClean="0">
+              <a:rPr lang="en-US" sz="1050" b="1" dirty="0" smtClean="0">
                 <a:solidFill>
                   <a:schemeClr val="accent6">
                     <a:lumMod val="75000"/>

</xml_diff>

<commit_message>
Update Storage API documentation, fixes #18
</commit_message>
<xml_diff>
--- a/docs/diagrams/Diagrams.pptx
+++ b/docs/diagrams/Diagrams.pptx
@@ -115,6 +115,22 @@
       </a:defRPr>
     </a:lvl9pPr>
   </p:defaultTextStyle>
+  <p:extLst>
+    <p:ext uri="{EFAFB233-063F-42B5-8137-9DF3F51BA10A}">
+      <p15:sldGuideLst xmlns:p15="http://schemas.microsoft.com/office/powerpoint/2012/main">
+        <p15:guide id="1" orient="horz" pos="1488">
+          <p15:clr>
+            <a:srgbClr val="A4A3A4"/>
+          </p15:clr>
+        </p15:guide>
+        <p15:guide id="2" pos="2880">
+          <p15:clr>
+            <a:srgbClr val="A4A3A4"/>
+          </p15:clr>
+        </p15:guide>
+      </p15:sldGuideLst>
+    </p:ext>
+  </p:extLst>
 </p:presentation>
 </file>
 
@@ -201,7 +217,7 @@
             <a:fld id="{F5CC4B3F-88C1-4FFA-B1B6-F41C21DC6924}" type="datetimeFigureOut">
               <a:rPr lang="en-US" smtClean="0"/>
               <a:pPr/>
-              <a:t>10/19/2016</a:t>
+              <a:t>10/20/2016</a:t>
             </a:fld>
             <a:endParaRPr lang="en-US"/>
           </a:p>
@@ -370,7 +386,7 @@
     </p:spTree>
     <p:extLst>
       <p:ext uri="{BB962C8B-B14F-4D97-AF65-F5344CB8AC3E}">
-        <p14:creationId xmlns:p14="http://schemas.microsoft.com/office/powerpoint/2010/main" xmlns="" val="2023976206"/>
+        <p14:creationId xmlns:p14="http://schemas.microsoft.com/office/powerpoint/2010/main" val="2023976206"/>
       </p:ext>
     </p:extLst>
   </p:cSld>
@@ -652,7 +668,7 @@
             <a:fld id="{78C97017-6FC3-485B-9764-EAC9E56C1D49}" type="datetimeFigureOut">
               <a:rPr lang="en-US" smtClean="0"/>
               <a:pPr/>
-              <a:t>10/19/2016</a:t>
+              <a:t>10/20/2016</a:t>
             </a:fld>
             <a:endParaRPr lang="en-US"/>
           </a:p>
@@ -704,7 +720,7 @@
     </p:spTree>
     <p:extLst>
       <p:ext uri="{BB962C8B-B14F-4D97-AF65-F5344CB8AC3E}">
-        <p14:creationId xmlns:p14="http://schemas.microsoft.com/office/powerpoint/2010/main" xmlns="" val="3246593157"/>
+        <p14:creationId xmlns:p14="http://schemas.microsoft.com/office/powerpoint/2010/main" val="3246593157"/>
       </p:ext>
     </p:extLst>
   </p:cSld>
@@ -824,7 +840,7 @@
             <a:fld id="{78C97017-6FC3-485B-9764-EAC9E56C1D49}" type="datetimeFigureOut">
               <a:rPr lang="en-US" smtClean="0"/>
               <a:pPr/>
-              <a:t>10/19/2016</a:t>
+              <a:t>10/20/2016</a:t>
             </a:fld>
             <a:endParaRPr lang="en-US"/>
           </a:p>
@@ -876,7 +892,7 @@
     </p:spTree>
     <p:extLst>
       <p:ext uri="{BB962C8B-B14F-4D97-AF65-F5344CB8AC3E}">
-        <p14:creationId xmlns:p14="http://schemas.microsoft.com/office/powerpoint/2010/main" xmlns="" val="2707025021"/>
+        <p14:creationId xmlns:p14="http://schemas.microsoft.com/office/powerpoint/2010/main" val="2707025021"/>
       </p:ext>
     </p:extLst>
   </p:cSld>
@@ -1006,7 +1022,7 @@
             <a:fld id="{78C97017-6FC3-485B-9764-EAC9E56C1D49}" type="datetimeFigureOut">
               <a:rPr lang="en-US" smtClean="0"/>
               <a:pPr/>
-              <a:t>10/19/2016</a:t>
+              <a:t>10/20/2016</a:t>
             </a:fld>
             <a:endParaRPr lang="en-US"/>
           </a:p>
@@ -1058,7 +1074,7 @@
     </p:spTree>
     <p:extLst>
       <p:ext uri="{BB962C8B-B14F-4D97-AF65-F5344CB8AC3E}">
-        <p14:creationId xmlns:p14="http://schemas.microsoft.com/office/powerpoint/2010/main" xmlns="" val="568378986"/>
+        <p14:creationId xmlns:p14="http://schemas.microsoft.com/office/powerpoint/2010/main" val="568378986"/>
       </p:ext>
     </p:extLst>
   </p:cSld>
@@ -1178,7 +1194,7 @@
             <a:fld id="{78C97017-6FC3-485B-9764-EAC9E56C1D49}" type="datetimeFigureOut">
               <a:rPr lang="en-US" smtClean="0"/>
               <a:pPr/>
-              <a:t>10/19/2016</a:t>
+              <a:t>10/20/2016</a:t>
             </a:fld>
             <a:endParaRPr lang="en-US"/>
           </a:p>
@@ -1230,7 +1246,7 @@
     </p:spTree>
     <p:extLst>
       <p:ext uri="{BB962C8B-B14F-4D97-AF65-F5344CB8AC3E}">
-        <p14:creationId xmlns:p14="http://schemas.microsoft.com/office/powerpoint/2010/main" xmlns="" val="266658052"/>
+        <p14:creationId xmlns:p14="http://schemas.microsoft.com/office/powerpoint/2010/main" val="266658052"/>
       </p:ext>
     </p:extLst>
   </p:cSld>
@@ -1426,7 +1442,7 @@
             <a:fld id="{78C97017-6FC3-485B-9764-EAC9E56C1D49}" type="datetimeFigureOut">
               <a:rPr lang="en-US" smtClean="0"/>
               <a:pPr/>
-              <a:t>10/19/2016</a:t>
+              <a:t>10/20/2016</a:t>
             </a:fld>
             <a:endParaRPr lang="en-US"/>
           </a:p>
@@ -1478,7 +1494,7 @@
     </p:spTree>
     <p:extLst>
       <p:ext uri="{BB962C8B-B14F-4D97-AF65-F5344CB8AC3E}">
-        <p14:creationId xmlns:p14="http://schemas.microsoft.com/office/powerpoint/2010/main" xmlns="" val="474686344"/>
+        <p14:creationId xmlns:p14="http://schemas.microsoft.com/office/powerpoint/2010/main" val="474686344"/>
       </p:ext>
     </p:extLst>
   </p:cSld>
@@ -1716,7 +1732,7 @@
             <a:fld id="{78C97017-6FC3-485B-9764-EAC9E56C1D49}" type="datetimeFigureOut">
               <a:rPr lang="en-US" smtClean="0"/>
               <a:pPr/>
-              <a:t>10/19/2016</a:t>
+              <a:t>10/20/2016</a:t>
             </a:fld>
             <a:endParaRPr lang="en-US"/>
           </a:p>
@@ -1768,7 +1784,7 @@
     </p:spTree>
     <p:extLst>
       <p:ext uri="{BB962C8B-B14F-4D97-AF65-F5344CB8AC3E}">
-        <p14:creationId xmlns:p14="http://schemas.microsoft.com/office/powerpoint/2010/main" xmlns="" val="562293251"/>
+        <p14:creationId xmlns:p14="http://schemas.microsoft.com/office/powerpoint/2010/main" val="562293251"/>
       </p:ext>
     </p:extLst>
   </p:cSld>
@@ -2140,7 +2156,7 @@
             <a:fld id="{78C97017-6FC3-485B-9764-EAC9E56C1D49}" type="datetimeFigureOut">
               <a:rPr lang="en-US" smtClean="0"/>
               <a:pPr/>
-              <a:t>10/19/2016</a:t>
+              <a:t>10/20/2016</a:t>
             </a:fld>
             <a:endParaRPr lang="en-US"/>
           </a:p>
@@ -2192,7 +2208,7 @@
     </p:spTree>
     <p:extLst>
       <p:ext uri="{BB962C8B-B14F-4D97-AF65-F5344CB8AC3E}">
-        <p14:creationId xmlns:p14="http://schemas.microsoft.com/office/powerpoint/2010/main" xmlns="" val="1126424250"/>
+        <p14:creationId xmlns:p14="http://schemas.microsoft.com/office/powerpoint/2010/main" val="1126424250"/>
       </p:ext>
     </p:extLst>
   </p:cSld>
@@ -2260,7 +2276,7 @@
             <a:fld id="{78C97017-6FC3-485B-9764-EAC9E56C1D49}" type="datetimeFigureOut">
               <a:rPr lang="en-US" smtClean="0"/>
               <a:pPr/>
-              <a:t>10/19/2016</a:t>
+              <a:t>10/20/2016</a:t>
             </a:fld>
             <a:endParaRPr lang="en-US"/>
           </a:p>
@@ -2312,7 +2328,7 @@
     </p:spTree>
     <p:extLst>
       <p:ext uri="{BB962C8B-B14F-4D97-AF65-F5344CB8AC3E}">
-        <p14:creationId xmlns:p14="http://schemas.microsoft.com/office/powerpoint/2010/main" xmlns="" val="4159724230"/>
+        <p14:creationId xmlns:p14="http://schemas.microsoft.com/office/powerpoint/2010/main" val="4159724230"/>
       </p:ext>
     </p:extLst>
   </p:cSld>
@@ -2357,7 +2373,7 @@
             <a:fld id="{78C97017-6FC3-485B-9764-EAC9E56C1D49}" type="datetimeFigureOut">
               <a:rPr lang="en-US" smtClean="0"/>
               <a:pPr/>
-              <a:t>10/19/2016</a:t>
+              <a:t>10/20/2016</a:t>
             </a:fld>
             <a:endParaRPr lang="en-US"/>
           </a:p>
@@ -2409,7 +2425,7 @@
     </p:spTree>
     <p:extLst>
       <p:ext uri="{BB962C8B-B14F-4D97-AF65-F5344CB8AC3E}">
-        <p14:creationId xmlns:p14="http://schemas.microsoft.com/office/powerpoint/2010/main" xmlns="" val="1793928710"/>
+        <p14:creationId xmlns:p14="http://schemas.microsoft.com/office/powerpoint/2010/main" val="1793928710"/>
       </p:ext>
     </p:extLst>
   </p:cSld>
@@ -2636,7 +2652,7 @@
             <a:fld id="{78C97017-6FC3-485B-9764-EAC9E56C1D49}" type="datetimeFigureOut">
               <a:rPr lang="en-US" smtClean="0"/>
               <a:pPr/>
-              <a:t>10/19/2016</a:t>
+              <a:t>10/20/2016</a:t>
             </a:fld>
             <a:endParaRPr lang="en-US"/>
           </a:p>
@@ -2688,7 +2704,7 @@
     </p:spTree>
     <p:extLst>
       <p:ext uri="{BB962C8B-B14F-4D97-AF65-F5344CB8AC3E}">
-        <p14:creationId xmlns:p14="http://schemas.microsoft.com/office/powerpoint/2010/main" xmlns="" val="2076802089"/>
+        <p14:creationId xmlns:p14="http://schemas.microsoft.com/office/powerpoint/2010/main" val="2076802089"/>
       </p:ext>
     </p:extLst>
   </p:cSld>
@@ -2891,7 +2907,7 @@
             <a:fld id="{78C97017-6FC3-485B-9764-EAC9E56C1D49}" type="datetimeFigureOut">
               <a:rPr lang="en-US" smtClean="0"/>
               <a:pPr/>
-              <a:t>10/19/2016</a:t>
+              <a:t>10/20/2016</a:t>
             </a:fld>
             <a:endParaRPr lang="en-US"/>
           </a:p>
@@ -2943,7 +2959,7 @@
     </p:spTree>
     <p:extLst>
       <p:ext uri="{BB962C8B-B14F-4D97-AF65-F5344CB8AC3E}">
-        <p14:creationId xmlns:p14="http://schemas.microsoft.com/office/powerpoint/2010/main" xmlns="" val="201835938"/>
+        <p14:creationId xmlns:p14="http://schemas.microsoft.com/office/powerpoint/2010/main" val="201835938"/>
       </p:ext>
     </p:extLst>
   </p:cSld>
@@ -3106,7 +3122,7 @@
             <a:fld id="{78C97017-6FC3-485B-9764-EAC9E56C1D49}" type="datetimeFigureOut">
               <a:rPr lang="en-US" smtClean="0"/>
               <a:pPr/>
-              <a:t>10/19/2016</a:t>
+              <a:t>10/20/2016</a:t>
             </a:fld>
             <a:endParaRPr lang="en-US"/>
           </a:p>
@@ -3194,7 +3210,7 @@
     </p:spTree>
     <p:extLst>
       <p:ext uri="{BB962C8B-B14F-4D97-AF65-F5344CB8AC3E}">
-        <p14:creationId xmlns:p14="http://schemas.microsoft.com/office/powerpoint/2010/main" xmlns="" val="2341400630"/>
+        <p14:creationId xmlns:p14="http://schemas.microsoft.com/office/powerpoint/2010/main" val="2341400630"/>
       </p:ext>
     </p:extLst>
   </p:cSld>
@@ -3535,7 +3551,7 @@
     </p:spTree>
     <p:extLst>
       <p:ext uri="{BB962C8B-B14F-4D97-AF65-F5344CB8AC3E}">
-        <p14:creationId xmlns:p14="http://schemas.microsoft.com/office/powerpoint/2010/main" xmlns="" val="2960930635"/>
+        <p14:creationId xmlns:p14="http://schemas.microsoft.com/office/powerpoint/2010/main" val="2960930635"/>
       </p:ext>
     </p:extLst>
   </p:cSld>
@@ -4890,7 +4906,7 @@
     </p:spTree>
     <p:extLst>
       <p:ext uri="{BB962C8B-B14F-4D97-AF65-F5344CB8AC3E}">
-        <p14:creationId xmlns:p14="http://schemas.microsoft.com/office/powerpoint/2010/main" xmlns="" val="1981432603"/>
+        <p14:creationId xmlns:p14="http://schemas.microsoft.com/office/powerpoint/2010/main" val="1981432603"/>
       </p:ext>
     </p:extLst>
   </p:cSld>
@@ -7537,7 +7553,7 @@
     </p:spTree>
     <p:extLst>
       <p:ext uri="{BB962C8B-B14F-4D97-AF65-F5344CB8AC3E}">
-        <p14:creationId xmlns:p14="http://schemas.microsoft.com/office/powerpoint/2010/main" xmlns="" val="4023378879"/>
+        <p14:creationId xmlns:p14="http://schemas.microsoft.com/office/powerpoint/2010/main" val="4023378879"/>
       </p:ext>
     </p:extLst>
   </p:cSld>
@@ -9772,7 +9788,7 @@
     </p:spTree>
     <p:extLst>
       <p:ext uri="{BB962C8B-B14F-4D97-AF65-F5344CB8AC3E}">
-        <p14:creationId xmlns:p14="http://schemas.microsoft.com/office/powerpoint/2010/main" xmlns="" val="2776882492"/>
+        <p14:creationId xmlns:p14="http://schemas.microsoft.com/office/powerpoint/2010/main" val="2776882492"/>
       </p:ext>
     </p:extLst>
   </p:cSld>
@@ -11561,7 +11577,7 @@
     </p:spTree>
     <p:extLst>
       <p:ext uri="{BB962C8B-B14F-4D97-AF65-F5344CB8AC3E}">
-        <p14:creationId xmlns:p14="http://schemas.microsoft.com/office/powerpoint/2010/main" xmlns="" val="599777654"/>
+        <p14:creationId xmlns:p14="http://schemas.microsoft.com/office/powerpoint/2010/main" val="599777654"/>
       </p:ext>
     </p:extLst>
   </p:cSld>
@@ -13243,7 +13259,7 @@
     </p:spTree>
     <p:extLst>
       <p:ext uri="{BB962C8B-B14F-4D97-AF65-F5344CB8AC3E}">
-        <p14:creationId xmlns:p14="http://schemas.microsoft.com/office/powerpoint/2010/main" xmlns="" val="3945898909"/>
+        <p14:creationId xmlns:p14="http://schemas.microsoft.com/office/powerpoint/2010/main" val="3945898909"/>
       </p:ext>
     </p:extLst>
   </p:cSld>
@@ -15415,7 +15431,7 @@
     </p:spTree>
     <p:extLst>
       <p:ext uri="{BB962C8B-B14F-4D97-AF65-F5344CB8AC3E}">
-        <p14:creationId xmlns:p14="http://schemas.microsoft.com/office/powerpoint/2010/main" xmlns="" val="2396968029"/>
+        <p14:creationId xmlns:p14="http://schemas.microsoft.com/office/powerpoint/2010/main" val="2396968029"/>
       </p:ext>
     </p:extLst>
   </p:cSld>
@@ -15457,8 +15473,8 @@
         </p:nvSpPr>
         <p:spPr>
           <a:xfrm>
-            <a:off x="1119865" y="2086382"/>
-            <a:ext cx="7871735" cy="1723618"/>
+            <a:off x="533400" y="2514600"/>
+            <a:ext cx="8305800" cy="2590800"/>
           </a:xfrm>
           <a:prstGeom prst="roundRect">
             <a:avLst>
@@ -15522,7 +15538,7 @@
         </p:nvSpPr>
         <p:spPr>
           <a:xfrm>
-            <a:off x="2877180" y="3158440"/>
+            <a:off x="2290715" y="3739058"/>
             <a:ext cx="1323049" cy="346760"/>
           </a:xfrm>
           <a:prstGeom prst="rect">
@@ -15582,7 +15598,7 @@
                   <a:schemeClr val="bg1"/>
                 </a:solidFill>
               </a:rPr>
-              <a:t>AddressBookStorage</a:t>
+              <a:t>MatlitioStorage</a:t>
             </a:r>
             <a:endParaRPr lang="en-SG" sz="1050" dirty="0">
               <a:solidFill>
@@ -15600,7 +15616,7 @@
         </p:nvSpPr>
         <p:spPr>
           <a:xfrm rot="16200000">
-            <a:off x="1683963" y="2868687"/>
+            <a:off x="1097498" y="3449305"/>
             <a:ext cx="1093635" cy="346760"/>
           </a:xfrm>
           <a:prstGeom prst="rect">
@@ -15663,7 +15679,7 @@
         </p:nvSpPr>
         <p:spPr>
           <a:xfrm rot="16200000">
-            <a:off x="956202" y="2861202"/>
+            <a:off x="369737" y="3441820"/>
             <a:ext cx="1093635" cy="346760"/>
           </a:xfrm>
           <a:prstGeom prst="rect">
@@ -15737,7 +15753,7 @@
         </p:nvSpPr>
         <p:spPr>
           <a:xfrm rot="16200000">
-            <a:off x="1626910" y="2952291"/>
+            <a:off x="1040445" y="3532909"/>
             <a:ext cx="270504" cy="175523"/>
           </a:xfrm>
           <a:prstGeom prst="triangle">
@@ -15795,7 +15811,7 @@
         </p:nvCxnSpPr>
         <p:spPr>
           <a:xfrm>
-            <a:off x="2656370" y="3326536"/>
+            <a:off x="2069905" y="3907154"/>
             <a:ext cx="220810" cy="5284"/>
           </a:xfrm>
           <a:prstGeom prst="straightConnector1">
@@ -15835,7 +15851,7 @@
         </p:nvCxnSpPr>
         <p:spPr>
           <a:xfrm>
-            <a:off x="910091" y="3040053"/>
+            <a:off x="323626" y="3620671"/>
             <a:ext cx="419548" cy="2860"/>
           </a:xfrm>
           <a:prstGeom prst="bentConnector3">
@@ -15880,7 +15896,7 @@
         </p:nvCxnSpPr>
         <p:spPr>
           <a:xfrm flipV="1">
-            <a:off x="1849924" y="3040052"/>
+            <a:off x="1263459" y="3620670"/>
             <a:ext cx="216105" cy="1"/>
           </a:xfrm>
           <a:prstGeom prst="line">
@@ -15921,7 +15937,7 @@
         </p:nvSpPr>
         <p:spPr>
           <a:xfrm>
-            <a:off x="2420322" y="3239846"/>
+            <a:off x="1833857" y="3820464"/>
             <a:ext cx="236048" cy="173380"/>
           </a:xfrm>
           <a:prstGeom prst="flowChartDecision">
@@ -15975,7 +15991,7 @@
         </p:nvCxnSpPr>
         <p:spPr>
           <a:xfrm flipV="1">
-            <a:off x="4398041" y="3331820"/>
+            <a:off x="3811576" y="3912438"/>
             <a:ext cx="223324" cy="1"/>
           </a:xfrm>
           <a:prstGeom prst="bentConnector3">
@@ -16018,7 +16034,7 @@
         </p:nvSpPr>
         <p:spPr>
           <a:xfrm rot="5400000" flipV="1">
-            <a:off x="4175027" y="3244059"/>
+            <a:off x="3588562" y="3824677"/>
             <a:ext cx="270504" cy="175523"/>
           </a:xfrm>
           <a:prstGeom prst="triangle">
@@ -16076,7 +16092,7 @@
         </p:nvCxnSpPr>
         <p:spPr>
           <a:xfrm>
-            <a:off x="5791200" y="3331820"/>
+            <a:off x="5204735" y="3912438"/>
             <a:ext cx="228600" cy="1970"/>
           </a:xfrm>
           <a:prstGeom prst="bentConnector3">
@@ -16119,7 +16135,7 @@
         </p:nvSpPr>
         <p:spPr>
           <a:xfrm>
-            <a:off x="4621365" y="3158440"/>
+            <a:off x="4034900" y="3739058"/>
             <a:ext cx="1169835" cy="346760"/>
           </a:xfrm>
           <a:prstGeom prst="rect">
@@ -16155,7 +16171,7 @@
                   </a:schemeClr>
                 </a:solidFill>
               </a:rPr>
-              <a:t>XmlAddressBook</a:t>
+              <a:t>XmlMalitio</a:t>
             </a:r>
             <a:r>
               <a:rPr lang="en-US" sz="1050" b="1" dirty="0" smtClean="0">
@@ -16204,7 +16220,7 @@
         </p:nvSpPr>
         <p:spPr>
           <a:xfrm>
-            <a:off x="2873943" y="2558040"/>
+            <a:off x="2287478" y="3138658"/>
             <a:ext cx="1323049" cy="346760"/>
           </a:xfrm>
           <a:prstGeom prst="rect">
@@ -16285,7 +16301,7 @@
         </p:nvCxnSpPr>
         <p:spPr>
           <a:xfrm>
-            <a:off x="2653133" y="2726136"/>
+            <a:off x="2066668" y="3306754"/>
             <a:ext cx="220810" cy="5284"/>
           </a:xfrm>
           <a:prstGeom prst="straightConnector1">
@@ -16325,7 +16341,7 @@
         </p:nvSpPr>
         <p:spPr>
           <a:xfrm>
-            <a:off x="2417085" y="2639446"/>
+            <a:off x="1830620" y="3220064"/>
             <a:ext cx="236048" cy="173380"/>
           </a:xfrm>
           <a:prstGeom prst="flowChartDecision">
@@ -16379,7 +16395,7 @@
         </p:nvCxnSpPr>
         <p:spPr>
           <a:xfrm flipV="1">
-            <a:off x="4394804" y="2731420"/>
+            <a:off x="3808339" y="3312038"/>
             <a:ext cx="223324" cy="1"/>
           </a:xfrm>
           <a:prstGeom prst="bentConnector3">
@@ -16422,7 +16438,7 @@
         </p:nvSpPr>
         <p:spPr>
           <a:xfrm rot="5400000" flipV="1">
-            <a:off x="4171790" y="2643659"/>
+            <a:off x="3585325" y="3224277"/>
             <a:ext cx="270504" cy="175523"/>
           </a:xfrm>
           <a:prstGeom prst="triangle">
@@ -16477,7 +16493,7 @@
         </p:nvSpPr>
         <p:spPr>
           <a:xfrm>
-            <a:off x="4618128" y="2558040"/>
+            <a:off x="4031663" y="3138658"/>
             <a:ext cx="1093635" cy="346760"/>
           </a:xfrm>
           <a:prstGeom prst="rect">
@@ -16563,7 +16579,7 @@
         </p:nvSpPr>
         <p:spPr>
           <a:xfrm>
-            <a:off x="6019800" y="3160410"/>
+            <a:off x="5433335" y="3741028"/>
             <a:ext cx="1200707" cy="346760"/>
           </a:xfrm>
           <a:prstGeom prst="rect">
@@ -16628,7 +16644,7 @@
                   </a:schemeClr>
                 </a:solidFill>
               </a:rPr>
-              <a:t>AddressBook</a:t>
+              <a:t>Malitio</a:t>
             </a:r>
             <a:endParaRPr lang="en-SG" sz="1050" b="1" dirty="0">
               <a:solidFill>
@@ -16643,16 +16659,13 @@
       <p:cxnSp>
         <p:nvCxnSpPr>
           <p:cNvPr id="70" name="Elbow Connector 122"/>
-          <p:cNvCxnSpPr>
-            <a:stCxn id="74" idx="0"/>
-            <a:endCxn id="73" idx="2"/>
-          </p:cNvCxnSpPr>
+          <p:cNvCxnSpPr/>
           <p:nvPr/>
         </p:nvCxnSpPr>
         <p:spPr>
-          <a:xfrm rot="5400000" flipH="1" flipV="1">
-            <a:off x="8077993" y="2992020"/>
-            <a:ext cx="335208" cy="12700"/>
+          <a:xfrm rot="16200000" flipV="1">
+            <a:off x="7765525" y="3538694"/>
+            <a:ext cx="434457" cy="1"/>
           </a:xfrm>
           <a:prstGeom prst="bentConnector3">
             <a:avLst>
@@ -16689,7 +16702,7 @@
         </p:nvSpPr>
         <p:spPr>
           <a:xfrm>
-            <a:off x="7615738" y="2477656"/>
+            <a:off x="7352893" y="2959994"/>
             <a:ext cx="1259718" cy="346760"/>
           </a:xfrm>
           <a:prstGeom prst="rect">
@@ -16745,8 +16758,8 @@
         </p:nvSpPr>
         <p:spPr>
           <a:xfrm>
-            <a:off x="7615738" y="3159624"/>
-            <a:ext cx="1259718" cy="346760"/>
+            <a:off x="7029272" y="3740242"/>
+            <a:ext cx="1375863" cy="346760"/>
           </a:xfrm>
           <a:prstGeom prst="rect">
             <a:avLst/>
@@ -16781,7 +16794,107 @@
                   </a:schemeClr>
                 </a:solidFill>
               </a:rPr>
-              <a:t>XmlAdaptedPerson</a:t>
+              <a:t>XmlAdaptedFloating</a:t>
+            </a:r>
+            <a:r>
+              <a:rPr lang="en-US" sz="1050" b="1" dirty="0" smtClean="0">
+                <a:solidFill>
+                  <a:schemeClr val="accent6">
+                    <a:lumMod val="75000"/>
+                  </a:schemeClr>
+                </a:solidFill>
+              </a:rPr>
+              <a:t> Task</a:t>
+            </a:r>
+          </a:p>
+        </p:txBody>
+      </p:sp>
+      <p:cxnSp>
+        <p:nvCxnSpPr>
+          <p:cNvPr id="77" name="Elbow Connector 122"/>
+          <p:cNvCxnSpPr>
+            <a:stCxn id="66" idx="3"/>
+            <a:endCxn id="74" idx="1"/>
+          </p:cNvCxnSpPr>
+          <p:nvPr/>
+        </p:nvCxnSpPr>
+        <p:spPr>
+          <a:xfrm flipV="1">
+            <a:off x="6634042" y="3913622"/>
+            <a:ext cx="395230" cy="786"/>
+          </a:xfrm>
+          <a:prstGeom prst="bentConnector3">
+            <a:avLst>
+              <a:gd name="adj1" fmla="val 50000"/>
+            </a:avLst>
+          </a:prstGeom>
+          <a:ln w="19050">
+            <a:prstDash val="sysDot"/>
+            <a:headEnd type="none" w="med" len="med"/>
+            <a:tailEnd type="arrow" w="med" len="med"/>
+          </a:ln>
+          <a:effectLst/>
+        </p:spPr>
+        <p:style>
+          <a:lnRef idx="1">
+            <a:schemeClr val="accent6"/>
+          </a:lnRef>
+          <a:fillRef idx="2">
+            <a:schemeClr val="accent6"/>
+          </a:fillRef>
+          <a:effectRef idx="1">
+            <a:schemeClr val="accent6"/>
+          </a:effectRef>
+          <a:fontRef idx="minor">
+            <a:schemeClr val="dk1"/>
+          </a:fontRef>
+        </p:style>
+      </p:cxnSp>
+      <p:sp>
+        <p:nvSpPr>
+          <p:cNvPr id="26" name="Rectangle 8"/>
+          <p:cNvSpPr/>
+          <p:nvPr/>
+        </p:nvSpPr>
+        <p:spPr>
+          <a:xfrm>
+            <a:off x="5403828" y="2965278"/>
+            <a:ext cx="1259718" cy="346760"/>
+          </a:xfrm>
+          <a:prstGeom prst="rect">
+            <a:avLst/>
+          </a:prstGeom>
+          <a:ln w="19050"/>
+          <a:effectLst/>
+        </p:spPr>
+        <p:style>
+          <a:lnRef idx="1">
+            <a:schemeClr val="accent6"/>
+          </a:lnRef>
+          <a:fillRef idx="2">
+            <a:schemeClr val="accent6"/>
+          </a:fillRef>
+          <a:effectRef idx="1">
+            <a:schemeClr val="accent6"/>
+          </a:effectRef>
+          <a:fontRef idx="minor">
+            <a:schemeClr val="dk1"/>
+          </a:fontRef>
+        </p:style>
+        <p:txBody>
+          <a:bodyPr rtlCol="0" anchor="ctr"/>
+          <a:lstStyle/>
+          <a:p>
+            <a:pPr algn="ctr"/>
+            <a:r>
+              <a:rPr lang="en-US" sz="1050" b="1" dirty="0" err="1" smtClean="0">
+                <a:solidFill>
+                  <a:schemeClr val="accent6">
+                    <a:lumMod val="75000"/>
+                  </a:schemeClr>
+                </a:solidFill>
+              </a:rPr>
+              <a:t>XmlAdaptedEvent</a:t>
             </a:r>
             <a:endParaRPr lang="en-SG" sz="1050" b="1" dirty="0">
               <a:solidFill>
@@ -16793,19 +16906,75 @@
           </a:p>
         </p:txBody>
       </p:sp>
+      <p:sp>
+        <p:nvSpPr>
+          <p:cNvPr id="27" name="Rectangle 8"/>
+          <p:cNvSpPr/>
+          <p:nvPr/>
+        </p:nvSpPr>
+        <p:spPr>
+          <a:xfrm>
+            <a:off x="5337065" y="4392213"/>
+            <a:ext cx="1393245" cy="346760"/>
+          </a:xfrm>
+          <a:prstGeom prst="rect">
+            <a:avLst/>
+          </a:prstGeom>
+          <a:ln w="19050"/>
+          <a:effectLst/>
+        </p:spPr>
+        <p:style>
+          <a:lnRef idx="1">
+            <a:schemeClr val="accent6"/>
+          </a:lnRef>
+          <a:fillRef idx="2">
+            <a:schemeClr val="accent6"/>
+          </a:fillRef>
+          <a:effectRef idx="1">
+            <a:schemeClr val="accent6"/>
+          </a:effectRef>
+          <a:fontRef idx="minor">
+            <a:schemeClr val="dk1"/>
+          </a:fontRef>
+        </p:style>
+        <p:txBody>
+          <a:bodyPr rtlCol="0" anchor="ctr"/>
+          <a:lstStyle/>
+          <a:p>
+            <a:pPr algn="ctr"/>
+            <a:r>
+              <a:rPr lang="en-US" sz="1050" b="1" dirty="0" err="1" smtClean="0">
+                <a:solidFill>
+                  <a:schemeClr val="accent6">
+                    <a:lumMod val="75000"/>
+                  </a:schemeClr>
+                </a:solidFill>
+              </a:rPr>
+              <a:t>XmlAdaptedDeadline</a:t>
+            </a:r>
+            <a:endParaRPr lang="en-SG" sz="1050" b="1" dirty="0">
+              <a:solidFill>
+                <a:schemeClr val="accent6">
+                  <a:lumMod val="75000"/>
+                </a:schemeClr>
+              </a:solidFill>
+            </a:endParaRPr>
+          </a:p>
+        </p:txBody>
+      </p:sp>
       <p:cxnSp>
         <p:nvCxnSpPr>
-          <p:cNvPr id="77" name="Elbow Connector 122"/>
+          <p:cNvPr id="33" name="Elbow Connector 122"/>
           <p:cNvCxnSpPr>
-            <a:stCxn id="66" idx="3"/>
-            <a:endCxn id="74" idx="1"/>
+            <a:stCxn id="66" idx="0"/>
+            <a:endCxn id="26" idx="2"/>
           </p:cNvCxnSpPr>
           <p:nvPr/>
         </p:nvCxnSpPr>
         <p:spPr>
-          <a:xfrm flipV="1">
-            <a:off x="7220507" y="3333004"/>
-            <a:ext cx="395231" cy="786"/>
+          <a:xfrm rot="16200000" flipV="1">
+            <a:off x="5819193" y="3526532"/>
+            <a:ext cx="428990" cy="2"/>
           </a:xfrm>
           <a:prstGeom prst="bentConnector3">
             <a:avLst>
@@ -16834,10 +17003,132 @@
           </a:fontRef>
         </p:style>
       </p:cxnSp>
+      <p:cxnSp>
+        <p:nvCxnSpPr>
+          <p:cNvPr id="43" name="Elbow Connector 122"/>
+          <p:cNvCxnSpPr>
+            <a:stCxn id="66" idx="2"/>
+            <a:endCxn id="27" idx="0"/>
+          </p:cNvCxnSpPr>
+          <p:nvPr/>
+        </p:nvCxnSpPr>
+        <p:spPr>
+          <a:xfrm rot="5400000">
+            <a:off x="5881477" y="4240000"/>
+            <a:ext cx="304425" cy="1"/>
+          </a:xfrm>
+          <a:prstGeom prst="bentConnector3">
+            <a:avLst>
+              <a:gd name="adj1" fmla="val 50000"/>
+            </a:avLst>
+          </a:prstGeom>
+          <a:ln w="19050">
+            <a:prstDash val="sysDot"/>
+            <a:headEnd type="none" w="med" len="med"/>
+            <a:tailEnd type="arrow" w="med" len="med"/>
+          </a:ln>
+          <a:effectLst/>
+        </p:spPr>
+        <p:style>
+          <a:lnRef idx="1">
+            <a:schemeClr val="accent6"/>
+          </a:lnRef>
+          <a:fillRef idx="2">
+            <a:schemeClr val="accent6"/>
+          </a:fillRef>
+          <a:effectRef idx="1">
+            <a:schemeClr val="accent6"/>
+          </a:effectRef>
+          <a:fontRef idx="minor">
+            <a:schemeClr val="dk1"/>
+          </a:fontRef>
+        </p:style>
+      </p:cxnSp>
+      <p:cxnSp>
+        <p:nvCxnSpPr>
+          <p:cNvPr id="48" name="Elbow Connector 122"/>
+          <p:cNvCxnSpPr>
+            <a:stCxn id="26" idx="3"/>
+            <a:endCxn id="73" idx="1"/>
+          </p:cNvCxnSpPr>
+          <p:nvPr/>
+        </p:nvCxnSpPr>
+        <p:spPr>
+          <a:xfrm flipV="1">
+            <a:off x="6663546" y="3133374"/>
+            <a:ext cx="689347" cy="5284"/>
+          </a:xfrm>
+          <a:prstGeom prst="bentConnector3">
+            <a:avLst>
+              <a:gd name="adj1" fmla="val 50000"/>
+            </a:avLst>
+          </a:prstGeom>
+          <a:ln w="19050">
+            <a:prstDash val="sysDot"/>
+            <a:headEnd type="none" w="med" len="med"/>
+            <a:tailEnd type="arrow" w="med" len="med"/>
+          </a:ln>
+          <a:effectLst/>
+        </p:spPr>
+        <p:style>
+          <a:lnRef idx="1">
+            <a:schemeClr val="accent6"/>
+          </a:lnRef>
+          <a:fillRef idx="2">
+            <a:schemeClr val="accent6"/>
+          </a:fillRef>
+          <a:effectRef idx="1">
+            <a:schemeClr val="accent6"/>
+          </a:effectRef>
+          <a:fontRef idx="minor">
+            <a:schemeClr val="dk1"/>
+          </a:fontRef>
+        </p:style>
+      </p:cxnSp>
+      <p:cxnSp>
+        <p:nvCxnSpPr>
+          <p:cNvPr id="53" name="Elbow Connector 122"/>
+          <p:cNvCxnSpPr>
+            <a:endCxn id="73" idx="3"/>
+          </p:cNvCxnSpPr>
+          <p:nvPr/>
+        </p:nvCxnSpPr>
+        <p:spPr>
+          <a:xfrm flipV="1">
+            <a:off x="6791611" y="3133374"/>
+            <a:ext cx="1821000" cy="1432220"/>
+          </a:xfrm>
+          <a:prstGeom prst="bentConnector3">
+            <a:avLst>
+              <a:gd name="adj1" fmla="val 107308"/>
+            </a:avLst>
+          </a:prstGeom>
+          <a:ln w="19050">
+            <a:prstDash val="sysDot"/>
+            <a:headEnd type="none" w="med" len="med"/>
+            <a:tailEnd type="arrow" w="med" len="med"/>
+          </a:ln>
+          <a:effectLst/>
+        </p:spPr>
+        <p:style>
+          <a:lnRef idx="1">
+            <a:schemeClr val="accent6"/>
+          </a:lnRef>
+          <a:fillRef idx="2">
+            <a:schemeClr val="accent6"/>
+          </a:fillRef>
+          <a:effectRef idx="1">
+            <a:schemeClr val="accent6"/>
+          </a:effectRef>
+          <a:fontRef idx="minor">
+            <a:schemeClr val="dk1"/>
+          </a:fontRef>
+        </p:style>
+      </p:cxnSp>
     </p:spTree>
     <p:extLst>
       <p:ext uri="{BB962C8B-B14F-4D97-AF65-F5344CB8AC3E}">
-        <p14:creationId xmlns:p14="http://schemas.microsoft.com/office/powerpoint/2010/main" xmlns="" val="1478832369"/>
+        <p14:creationId xmlns:p14="http://schemas.microsoft.com/office/powerpoint/2010/main" val="1478832369"/>
       </p:ext>
     </p:extLst>
   </p:cSld>
@@ -16874,7 +17165,7 @@
     </p:spTree>
     <p:extLst>
       <p:ext uri="{BB962C8B-B14F-4D97-AF65-F5344CB8AC3E}">
-        <p14:creationId xmlns:p14="http://schemas.microsoft.com/office/powerpoint/2010/main" xmlns="" val="2978036214"/>
+        <p14:creationId xmlns:p14="http://schemas.microsoft.com/office/powerpoint/2010/main" val="2978036214"/>
       </p:ext>
     </p:extLst>
   </p:cSld>

</xml_diff>

<commit_message>
Update diagrams and userguide
</commit_message>
<xml_diff>
--- a/docs/diagrams/Diagrams.pptx
+++ b/docs/diagrams/Diagrams.pptx
@@ -215,7 +215,7 @@
           <a:p>
             <a:fld id="{F5CC4B3F-88C1-4FFA-B1B6-F41C21DC6924}" type="datetimeFigureOut">
               <a:rPr lang="en-US" smtClean="0"/>
-              <a:t>10/13/2016</a:t>
+              <a:t>10/20/2016</a:t>
             </a:fld>
             <a:endParaRPr lang="en-US"/>
           </a:p>
@@ -664,7 +664,7 @@
           <a:p>
             <a:fld id="{78C97017-6FC3-485B-9764-EAC9E56C1D49}" type="datetimeFigureOut">
               <a:rPr lang="en-US" smtClean="0"/>
-              <a:t>10/13/2016</a:t>
+              <a:t>10/20/2016</a:t>
             </a:fld>
             <a:endParaRPr lang="en-US"/>
           </a:p>
@@ -834,7 +834,7 @@
           <a:p>
             <a:fld id="{78C97017-6FC3-485B-9764-EAC9E56C1D49}" type="datetimeFigureOut">
               <a:rPr lang="en-US" smtClean="0"/>
-              <a:t>10/13/2016</a:t>
+              <a:t>10/20/2016</a:t>
             </a:fld>
             <a:endParaRPr lang="en-US"/>
           </a:p>
@@ -1014,7 +1014,7 @@
           <a:p>
             <a:fld id="{78C97017-6FC3-485B-9764-EAC9E56C1D49}" type="datetimeFigureOut">
               <a:rPr lang="en-US" smtClean="0"/>
-              <a:t>10/13/2016</a:t>
+              <a:t>10/20/2016</a:t>
             </a:fld>
             <a:endParaRPr lang="en-US"/>
           </a:p>
@@ -1184,7 +1184,7 @@
           <a:p>
             <a:fld id="{78C97017-6FC3-485B-9764-EAC9E56C1D49}" type="datetimeFigureOut">
               <a:rPr lang="en-US" smtClean="0"/>
-              <a:t>10/13/2016</a:t>
+              <a:t>10/20/2016</a:t>
             </a:fld>
             <a:endParaRPr lang="en-US"/>
           </a:p>
@@ -1430,7 +1430,7 @@
           <a:p>
             <a:fld id="{78C97017-6FC3-485B-9764-EAC9E56C1D49}" type="datetimeFigureOut">
               <a:rPr lang="en-US" smtClean="0"/>
-              <a:t>10/13/2016</a:t>
+              <a:t>10/20/2016</a:t>
             </a:fld>
             <a:endParaRPr lang="en-US"/>
           </a:p>
@@ -1718,7 +1718,7 @@
           <a:p>
             <a:fld id="{78C97017-6FC3-485B-9764-EAC9E56C1D49}" type="datetimeFigureOut">
               <a:rPr lang="en-US" smtClean="0"/>
-              <a:t>10/13/2016</a:t>
+              <a:t>10/20/2016</a:t>
             </a:fld>
             <a:endParaRPr lang="en-US"/>
           </a:p>
@@ -2140,7 +2140,7 @@
           <a:p>
             <a:fld id="{78C97017-6FC3-485B-9764-EAC9E56C1D49}" type="datetimeFigureOut">
               <a:rPr lang="en-US" smtClean="0"/>
-              <a:t>10/13/2016</a:t>
+              <a:t>10/20/2016</a:t>
             </a:fld>
             <a:endParaRPr lang="en-US"/>
           </a:p>
@@ -2258,7 +2258,7 @@
           <a:p>
             <a:fld id="{78C97017-6FC3-485B-9764-EAC9E56C1D49}" type="datetimeFigureOut">
               <a:rPr lang="en-US" smtClean="0"/>
-              <a:t>10/13/2016</a:t>
+              <a:t>10/20/2016</a:t>
             </a:fld>
             <a:endParaRPr lang="en-US"/>
           </a:p>
@@ -2353,7 +2353,7 @@
           <a:p>
             <a:fld id="{78C97017-6FC3-485B-9764-EAC9E56C1D49}" type="datetimeFigureOut">
               <a:rPr lang="en-US" smtClean="0"/>
-              <a:t>10/13/2016</a:t>
+              <a:t>10/20/2016</a:t>
             </a:fld>
             <a:endParaRPr lang="en-US"/>
           </a:p>
@@ -2630,7 +2630,7 @@
           <a:p>
             <a:fld id="{78C97017-6FC3-485B-9764-EAC9E56C1D49}" type="datetimeFigureOut">
               <a:rPr lang="en-US" smtClean="0"/>
-              <a:t>10/13/2016</a:t>
+              <a:t>10/20/2016</a:t>
             </a:fld>
             <a:endParaRPr lang="en-US"/>
           </a:p>
@@ -2883,7 +2883,7 @@
           <a:p>
             <a:fld id="{78C97017-6FC3-485B-9764-EAC9E56C1D49}" type="datetimeFigureOut">
               <a:rPr lang="en-US" smtClean="0"/>
-              <a:t>10/13/2016</a:t>
+              <a:t>10/20/2016</a:t>
             </a:fld>
             <a:endParaRPr lang="en-US"/>
           </a:p>
@@ -3096,7 +3096,7 @@
           <a:p>
             <a:fld id="{78C97017-6FC3-485B-9764-EAC9E56C1D49}" type="datetimeFigureOut">
               <a:rPr lang="en-US" smtClean="0"/>
-              <a:t>10/13/2016</a:t>
+              <a:t>10/20/2016</a:t>
             </a:fld>
             <a:endParaRPr lang="en-US"/>
           </a:p>
@@ -10606,17 +10606,6 @@
           <a:p>
             <a:pPr algn="ctr"/>
             <a:r>
-              <a:rPr lang="en-US" sz="1050" b="1" dirty="0" smtClean="0">
-                <a:solidFill>
-                  <a:srgbClr val="0070C0"/>
-                </a:solidFill>
-              </a:rPr>
-              <a:t>{abstract}</a:t>
-            </a:r>
-          </a:p>
-          <a:p>
-            <a:pPr algn="ctr"/>
-            <a:r>
               <a:rPr lang="en-US" sz="1050" b="1" dirty="0" err="1" smtClean="0">
                 <a:solidFill>
                   <a:srgbClr val="0070C0"/>
@@ -11579,15 +11568,7 @@
                   <a:srgbClr val="0070C0"/>
                 </a:solidFill>
               </a:rPr>
-              <a:t>Edit</a:t>
-            </a:r>
-            <a:r>
-              <a:rPr lang="en-US" sz="900" b="1" dirty="0" err="1" smtClean="0">
-                <a:solidFill>
-                  <a:srgbClr val="0070C0"/>
-                </a:solidFill>
-              </a:rPr>
-              <a:t>Command</a:t>
+              <a:t>EditCommand</a:t>
             </a:r>
             <a:endParaRPr lang="en-SG" sz="900" b="1" dirty="0">
               <a:solidFill>
@@ -11729,7 +11710,7 @@
                   <a:srgbClr val="0070C0"/>
                 </a:solidFill>
               </a:rPr>
-              <a:t>Search</a:t>
+              <a:t>Find</a:t>
             </a:r>
             <a:r>
               <a:rPr lang="en-US" sz="900" b="1" dirty="0" err="1" smtClean="0">
@@ -12131,15 +12112,7 @@
                   <a:srgbClr val="0070C0"/>
                 </a:solidFill>
               </a:rPr>
-              <a:t>Save</a:t>
-            </a:r>
-            <a:r>
-              <a:rPr lang="en-US" sz="900" b="1" dirty="0" err="1" smtClean="0">
-                <a:solidFill>
-                  <a:srgbClr val="0070C0"/>
-                </a:solidFill>
-              </a:rPr>
-              <a:t>Command</a:t>
+              <a:t>SaveCommand</a:t>
             </a:r>
             <a:endParaRPr lang="en-SG" sz="900" b="1" dirty="0">
               <a:solidFill>
@@ -12195,15 +12168,7 @@
                   <a:srgbClr val="0070C0"/>
                 </a:solidFill>
               </a:rPr>
-              <a:t>Delete</a:t>
-            </a:r>
-            <a:r>
-              <a:rPr lang="en-US" sz="900" b="1" dirty="0" err="1" smtClean="0">
-                <a:solidFill>
-                  <a:srgbClr val="0070C0"/>
-                </a:solidFill>
-              </a:rPr>
-              <a:t>Command</a:t>
+              <a:t>DeleteCommand</a:t>
             </a:r>
             <a:endParaRPr lang="en-SG" sz="900" b="1" dirty="0">
               <a:solidFill>
@@ -12655,15 +12620,7 @@
                   <a:srgbClr val="0070C0"/>
                 </a:solidFill>
               </a:rPr>
-              <a:t>EditTask</a:t>
-            </a:r>
-            <a:r>
-              <a:rPr lang="en-US" sz="900" b="1" dirty="0" err="1" smtClean="0">
-                <a:solidFill>
-                  <a:srgbClr val="0070C0"/>
-                </a:solidFill>
-              </a:rPr>
-              <a:t>Command</a:t>
+              <a:t>EditTaskCommand</a:t>
             </a:r>
             <a:endParaRPr lang="en-SG" sz="900" b="1" dirty="0">
               <a:solidFill>
@@ -12719,15 +12676,7 @@
                   <a:srgbClr val="0070C0"/>
                 </a:solidFill>
               </a:rPr>
-              <a:t>Edit</a:t>
-            </a:r>
-            <a:r>
-              <a:rPr lang="en-US" sz="900" b="1" dirty="0" err="1" smtClean="0">
-                <a:solidFill>
-                  <a:srgbClr val="0070C0"/>
-                </a:solidFill>
-              </a:rPr>
-              <a:t>EventCommand</a:t>
+              <a:t>EditEventCommand</a:t>
             </a:r>
             <a:endParaRPr lang="en-SG" sz="900" b="1" dirty="0">
               <a:solidFill>
@@ -12783,15 +12732,7 @@
                   <a:srgbClr val="0070C0"/>
                 </a:solidFill>
               </a:rPr>
-              <a:t>DeleteTask</a:t>
-            </a:r>
-            <a:r>
-              <a:rPr lang="en-US" sz="900" b="1" dirty="0" err="1" smtClean="0">
-                <a:solidFill>
-                  <a:srgbClr val="0070C0"/>
-                </a:solidFill>
-              </a:rPr>
-              <a:t>Command</a:t>
+              <a:t>DeleteTaskCommand</a:t>
             </a:r>
             <a:endParaRPr lang="en-SG" sz="900" b="1" dirty="0">
               <a:solidFill>
@@ -12847,15 +12788,7 @@
                   <a:srgbClr val="0070C0"/>
                 </a:solidFill>
               </a:rPr>
-              <a:t>Delete</a:t>
-            </a:r>
-            <a:r>
-              <a:rPr lang="en-US" sz="900" b="1" dirty="0" err="1" smtClean="0">
-                <a:solidFill>
-                  <a:srgbClr val="0070C0"/>
-                </a:solidFill>
-              </a:rPr>
-              <a:t>EventCommand</a:t>
+              <a:t>DeleteEventCommand</a:t>
             </a:r>
             <a:endParaRPr lang="en-SG" sz="900" b="1" dirty="0">
               <a:solidFill>
@@ -12911,15 +12844,7 @@
                   <a:srgbClr val="0070C0"/>
                 </a:solidFill>
               </a:rPr>
-              <a:t>ListTask</a:t>
-            </a:r>
-            <a:r>
-              <a:rPr lang="en-US" sz="900" b="1" dirty="0" err="1" smtClean="0">
-                <a:solidFill>
-                  <a:srgbClr val="0070C0"/>
-                </a:solidFill>
-              </a:rPr>
-              <a:t>Command</a:t>
+              <a:t>ListTaskCommand</a:t>
             </a:r>
             <a:endParaRPr lang="en-SG" sz="900" b="1" dirty="0">
               <a:solidFill>
@@ -13345,15 +13270,7 @@
                   <a:srgbClr val="0070C0"/>
                 </a:solidFill>
               </a:rPr>
-              <a:t>List</a:t>
-            </a:r>
-            <a:r>
-              <a:rPr lang="en-US" sz="1050" b="1" dirty="0" err="1" smtClean="0">
-                <a:solidFill>
-                  <a:srgbClr val="0070C0"/>
-                </a:solidFill>
-              </a:rPr>
-              <a:t>Parser</a:t>
+              <a:t>ListParser</a:t>
             </a:r>
             <a:endParaRPr lang="en-SG" sz="1050" b="1" dirty="0">
               <a:solidFill>

</xml_diff>

<commit_message>
Diagrams for storage component (#99)
* Add Storage manager object diagram

* Add sequence diagram for load command

* Update common and storage sections

- removed information in common classes
- add object diagram and sequence diagram to storage

* Change picture size
</commit_message>
<xml_diff>
--- a/docs/diagrams/Diagrams.pptx
+++ b/docs/diagrams/Diagrams.pptx
@@ -5,7 +5,7 @@
     <p:sldMasterId id="2147483648" r:id="rId1"/>
   </p:sldMasterIdLst>
   <p:notesMasterIdLst>
-    <p:notesMasterId r:id="rId11"/>
+    <p:notesMasterId r:id="rId12"/>
   </p:notesMasterIdLst>
   <p:sldIdLst>
     <p:sldId id="256" r:id="rId2"/>
@@ -17,6 +17,7 @@
     <p:sldId id="263" r:id="rId8"/>
     <p:sldId id="264" r:id="rId9"/>
     <p:sldId id="265" r:id="rId10"/>
+    <p:sldId id="268" r:id="rId11"/>
   </p:sldIdLst>
   <p:sldSz cx="9144000" cy="6858000" type="screen4x3"/>
   <p:notesSz cx="6858000" cy="9144000"/>
@@ -216,7 +217,7 @@
           <a:p>
             <a:fld id="{F5CC4B3F-88C1-4FFA-B1B6-F41C21DC6924}" type="datetimeFigureOut">
               <a:rPr lang="en-US" smtClean="0"/>
-              <a:t>10/15/2016</a:t>
+              <a:t>10/22/2016</a:t>
             </a:fld>
             <a:endParaRPr lang="en-US"/>
           </a:p>
@@ -665,7 +666,7 @@
           <a:p>
             <a:fld id="{78C97017-6FC3-485B-9764-EAC9E56C1D49}" type="datetimeFigureOut">
               <a:rPr lang="en-US" smtClean="0"/>
-              <a:t>10/15/2016</a:t>
+              <a:t>10/22/2016</a:t>
             </a:fld>
             <a:endParaRPr lang="en-US"/>
           </a:p>
@@ -835,7 +836,7 @@
           <a:p>
             <a:fld id="{78C97017-6FC3-485B-9764-EAC9E56C1D49}" type="datetimeFigureOut">
               <a:rPr lang="en-US" smtClean="0"/>
-              <a:t>10/15/2016</a:t>
+              <a:t>10/22/2016</a:t>
             </a:fld>
             <a:endParaRPr lang="en-US"/>
           </a:p>
@@ -1015,7 +1016,7 @@
           <a:p>
             <a:fld id="{78C97017-6FC3-485B-9764-EAC9E56C1D49}" type="datetimeFigureOut">
               <a:rPr lang="en-US" smtClean="0"/>
-              <a:t>10/15/2016</a:t>
+              <a:t>10/22/2016</a:t>
             </a:fld>
             <a:endParaRPr lang="en-US"/>
           </a:p>
@@ -1185,7 +1186,7 @@
           <a:p>
             <a:fld id="{78C97017-6FC3-485B-9764-EAC9E56C1D49}" type="datetimeFigureOut">
               <a:rPr lang="en-US" smtClean="0"/>
-              <a:t>10/15/2016</a:t>
+              <a:t>10/22/2016</a:t>
             </a:fld>
             <a:endParaRPr lang="en-US"/>
           </a:p>
@@ -1431,7 +1432,7 @@
           <a:p>
             <a:fld id="{78C97017-6FC3-485B-9764-EAC9E56C1D49}" type="datetimeFigureOut">
               <a:rPr lang="en-US" smtClean="0"/>
-              <a:t>10/15/2016</a:t>
+              <a:t>10/22/2016</a:t>
             </a:fld>
             <a:endParaRPr lang="en-US"/>
           </a:p>
@@ -1719,7 +1720,7 @@
           <a:p>
             <a:fld id="{78C97017-6FC3-485B-9764-EAC9E56C1D49}" type="datetimeFigureOut">
               <a:rPr lang="en-US" smtClean="0"/>
-              <a:t>10/15/2016</a:t>
+              <a:t>10/22/2016</a:t>
             </a:fld>
             <a:endParaRPr lang="en-US"/>
           </a:p>
@@ -2141,7 +2142,7 @@
           <a:p>
             <a:fld id="{78C97017-6FC3-485B-9764-EAC9E56C1D49}" type="datetimeFigureOut">
               <a:rPr lang="en-US" smtClean="0"/>
-              <a:t>10/15/2016</a:t>
+              <a:t>10/22/2016</a:t>
             </a:fld>
             <a:endParaRPr lang="en-US"/>
           </a:p>
@@ -2259,7 +2260,7 @@
           <a:p>
             <a:fld id="{78C97017-6FC3-485B-9764-EAC9E56C1D49}" type="datetimeFigureOut">
               <a:rPr lang="en-US" smtClean="0"/>
-              <a:t>10/15/2016</a:t>
+              <a:t>10/22/2016</a:t>
             </a:fld>
             <a:endParaRPr lang="en-US"/>
           </a:p>
@@ -2354,7 +2355,7 @@
           <a:p>
             <a:fld id="{78C97017-6FC3-485B-9764-EAC9E56C1D49}" type="datetimeFigureOut">
               <a:rPr lang="en-US" smtClean="0"/>
-              <a:t>10/15/2016</a:t>
+              <a:t>10/22/2016</a:t>
             </a:fld>
             <a:endParaRPr lang="en-US"/>
           </a:p>
@@ -2631,7 +2632,7 @@
           <a:p>
             <a:fld id="{78C97017-6FC3-485B-9764-EAC9E56C1D49}" type="datetimeFigureOut">
               <a:rPr lang="en-US" smtClean="0"/>
-              <a:t>10/15/2016</a:t>
+              <a:t>10/22/2016</a:t>
             </a:fld>
             <a:endParaRPr lang="en-US"/>
           </a:p>
@@ -2884,7 +2885,7 @@
           <a:p>
             <a:fld id="{78C97017-6FC3-485B-9764-EAC9E56C1D49}" type="datetimeFigureOut">
               <a:rPr lang="en-US" smtClean="0"/>
-              <a:t>10/15/2016</a:t>
+              <a:t>10/22/2016</a:t>
             </a:fld>
             <a:endParaRPr lang="en-US"/>
           </a:p>
@@ -3097,7 +3098,7 @@
           <a:p>
             <a:fld id="{78C97017-6FC3-485B-9764-EAC9E56C1D49}" type="datetimeFigureOut">
               <a:rPr lang="en-US" smtClean="0"/>
-              <a:t>10/15/2016</a:t>
+              <a:t>10/22/2016</a:t>
             </a:fld>
             <a:endParaRPr lang="en-US"/>
           </a:p>
@@ -3535,6 +3536,1593 @@
 </p:sld>
 </file>
 
+<file path=ppt/slides/slide10.xml><?xml version="1.0" encoding="utf-8"?>
+<p:sld xmlns:a="http://schemas.openxmlformats.org/drawingml/2006/main" xmlns:r="http://schemas.openxmlformats.org/officeDocument/2006/relationships" xmlns:p="http://schemas.openxmlformats.org/presentationml/2006/main">
+  <p:cSld>
+    <p:spTree>
+      <p:nvGrpSpPr>
+        <p:cNvPr id="1" name=""/>
+        <p:cNvGrpSpPr/>
+        <p:nvPr/>
+      </p:nvGrpSpPr>
+      <p:grpSpPr>
+        <a:xfrm>
+          <a:off x="0" y="0"/>
+          <a:ext cx="0" cy="0"/>
+          <a:chOff x="0" y="0"/>
+          <a:chExt cx="0" cy="0"/>
+        </a:xfrm>
+      </p:grpSpPr>
+      <p:grpSp>
+        <p:nvGrpSpPr>
+          <p:cNvPr id="88" name="Group 87"/>
+          <p:cNvGrpSpPr/>
+          <p:nvPr/>
+        </p:nvGrpSpPr>
+        <p:grpSpPr>
+          <a:xfrm>
+            <a:off x="152400" y="2271466"/>
+            <a:ext cx="8904368" cy="3367334"/>
+            <a:chOff x="64408" y="2271466"/>
+            <a:chExt cx="8904368" cy="3367334"/>
+          </a:xfrm>
+        </p:grpSpPr>
+        <p:sp>
+          <p:nvSpPr>
+            <p:cNvPr id="4" name="Rectangle 62"/>
+            <p:cNvSpPr/>
+            <p:nvPr/>
+          </p:nvSpPr>
+          <p:spPr>
+            <a:xfrm>
+              <a:off x="1426783" y="2271466"/>
+              <a:ext cx="1093635" cy="346760"/>
+            </a:xfrm>
+            <a:prstGeom prst="rect">
+              <a:avLst/>
+            </a:prstGeom>
+            <a:solidFill>
+              <a:srgbClr val="7030A0"/>
+            </a:solidFill>
+            <a:ln w="19050">
+              <a:solidFill>
+                <a:srgbClr val="7030A0"/>
+              </a:solidFill>
+            </a:ln>
+            <a:effectLst/>
+          </p:spPr>
+          <p:style>
+            <a:lnRef idx="1">
+              <a:schemeClr val="accent2"/>
+            </a:lnRef>
+            <a:fillRef idx="2">
+              <a:schemeClr val="accent2"/>
+            </a:fillRef>
+            <a:effectRef idx="1">
+              <a:schemeClr val="accent2"/>
+            </a:effectRef>
+            <a:fontRef idx="minor">
+              <a:schemeClr val="dk1"/>
+            </a:fontRef>
+          </p:style>
+          <p:txBody>
+            <a:bodyPr rtlCol="0" anchor="ctr"/>
+            <a:lstStyle/>
+            <a:p>
+              <a:pPr algn="ctr"/>
+              <a:r>
+                <a:rPr lang="en-US" sz="1600" dirty="0" smtClean="0">
+                  <a:solidFill>
+                    <a:schemeClr val="bg1"/>
+                  </a:solidFill>
+                </a:rPr>
+                <a:t>:Model</a:t>
+              </a:r>
+              <a:endParaRPr lang="en-SG" sz="1600" dirty="0">
+                <a:solidFill>
+                  <a:schemeClr val="bg1"/>
+                </a:solidFill>
+              </a:endParaRPr>
+            </a:p>
+          </p:txBody>
+        </p:sp>
+        <p:cxnSp>
+          <p:nvCxnSpPr>
+            <p:cNvPr id="5" name="Straight Connector 4"/>
+            <p:cNvCxnSpPr/>
+            <p:nvPr/>
+          </p:nvCxnSpPr>
+          <p:spPr>
+            <a:xfrm flipH="1">
+              <a:off x="1973600" y="2635137"/>
+              <a:ext cx="3" cy="3003663"/>
+            </a:xfrm>
+            <a:prstGeom prst="line">
+              <a:avLst/>
+            </a:prstGeom>
+            <a:ln w="19050">
+              <a:solidFill>
+                <a:srgbClr val="7030A0"/>
+              </a:solidFill>
+              <a:prstDash val="sysDash"/>
+            </a:ln>
+            <a:effectLst/>
+          </p:spPr>
+          <p:style>
+            <a:lnRef idx="1">
+              <a:schemeClr val="accent1"/>
+            </a:lnRef>
+            <a:fillRef idx="2">
+              <a:schemeClr val="accent1"/>
+            </a:fillRef>
+            <a:effectRef idx="1">
+              <a:schemeClr val="accent1"/>
+            </a:effectRef>
+            <a:fontRef idx="minor">
+              <a:schemeClr val="dk1"/>
+            </a:fontRef>
+          </p:style>
+        </p:cxnSp>
+        <p:sp>
+          <p:nvSpPr>
+            <p:cNvPr id="6" name="Rectangle 5"/>
+            <p:cNvSpPr/>
+            <p:nvPr/>
+          </p:nvSpPr>
+          <p:spPr>
+            <a:xfrm>
+              <a:off x="1901592" y="3201948"/>
+              <a:ext cx="142006" cy="2284452"/>
+            </a:xfrm>
+            <a:prstGeom prst="rect">
+              <a:avLst/>
+            </a:prstGeom>
+            <a:solidFill>
+              <a:srgbClr val="7030A0"/>
+            </a:solidFill>
+            <a:ln>
+              <a:solidFill>
+                <a:srgbClr val="7030A0"/>
+              </a:solidFill>
+            </a:ln>
+            <a:effectLst/>
+          </p:spPr>
+          <p:style>
+            <a:lnRef idx="1">
+              <a:schemeClr val="accent3"/>
+            </a:lnRef>
+            <a:fillRef idx="2">
+              <a:schemeClr val="accent3"/>
+            </a:fillRef>
+            <a:effectRef idx="1">
+              <a:schemeClr val="accent3"/>
+            </a:effectRef>
+            <a:fontRef idx="minor">
+              <a:schemeClr val="dk1"/>
+            </a:fontRef>
+          </p:style>
+          <p:txBody>
+            <a:bodyPr rtlCol="0" anchor="ctr"/>
+            <a:lstStyle/>
+            <a:p>
+              <a:pPr algn="ctr"/>
+              <a:endParaRPr lang="en-SG" sz="1400">
+                <a:solidFill>
+                  <a:schemeClr val="dk1"/>
+                </a:solidFill>
+              </a:endParaRPr>
+            </a:p>
+          </p:txBody>
+        </p:sp>
+        <p:cxnSp>
+          <p:nvCxnSpPr>
+            <p:cNvPr id="7" name="Straight Arrow Connector 6"/>
+            <p:cNvCxnSpPr/>
+            <p:nvPr/>
+          </p:nvCxnSpPr>
+          <p:spPr>
+            <a:xfrm>
+              <a:off x="64408" y="3201949"/>
+              <a:ext cx="1837184" cy="0"/>
+            </a:xfrm>
+            <a:prstGeom prst="straightConnector1">
+              <a:avLst/>
+            </a:prstGeom>
+            <a:ln w="19050">
+              <a:solidFill>
+                <a:srgbClr val="0070C0"/>
+              </a:solidFill>
+              <a:tailEnd type="arrow"/>
+            </a:ln>
+          </p:spPr>
+          <p:style>
+            <a:lnRef idx="1">
+              <a:schemeClr val="accent1"/>
+            </a:lnRef>
+            <a:fillRef idx="0">
+              <a:schemeClr val="accent1"/>
+            </a:fillRef>
+            <a:effectRef idx="0">
+              <a:schemeClr val="accent1"/>
+            </a:effectRef>
+            <a:fontRef idx="minor">
+              <a:schemeClr val="tx1"/>
+            </a:fontRef>
+          </p:style>
+        </p:cxnSp>
+        <p:sp>
+          <p:nvSpPr>
+            <p:cNvPr id="8" name="TextBox 7"/>
+            <p:cNvSpPr txBox="1"/>
+            <p:nvPr/>
+          </p:nvSpPr>
+          <p:spPr>
+            <a:xfrm>
+              <a:off x="139991" y="2766534"/>
+              <a:ext cx="1686018" cy="430887"/>
+            </a:xfrm>
+            <a:prstGeom prst="rect">
+              <a:avLst/>
+            </a:prstGeom>
+            <a:noFill/>
+          </p:spPr>
+          <p:txBody>
+            <a:bodyPr wrap="square" lIns="0" tIns="0" rIns="0" bIns="0" rtlCol="0">
+              <a:spAutoFit/>
+            </a:bodyPr>
+            <a:lstStyle/>
+            <a:p>
+              <a:pPr algn="ctr"/>
+              <a:r>
+                <a:rPr lang="en-US" sz="1400" dirty="0" err="1" smtClean="0">
+                  <a:solidFill>
+                    <a:srgbClr val="7030A0"/>
+                  </a:solidFill>
+                </a:rPr>
+                <a:t>loadFromLocation</a:t>
+              </a:r>
+              <a:endParaRPr lang="en-US" sz="1400" dirty="0" smtClean="0">
+                <a:solidFill>
+                  <a:srgbClr val="7030A0"/>
+                </a:solidFill>
+              </a:endParaRPr>
+            </a:p>
+            <a:p>
+              <a:pPr algn="ctr"/>
+              <a:r>
+                <a:rPr lang="en-US" sz="1400" dirty="0" smtClean="0">
+                  <a:solidFill>
+                    <a:srgbClr val="7030A0"/>
+                  </a:solidFill>
+                </a:rPr>
+                <a:t>(</a:t>
+              </a:r>
+              <a:r>
+                <a:rPr lang="en-US" altLang="zh-CN" sz="1400" dirty="0" smtClean="0">
+                  <a:solidFill>
+                    <a:srgbClr val="7030A0"/>
+                  </a:solidFill>
+                </a:rPr>
+                <a:t>location</a:t>
+              </a:r>
+              <a:r>
+                <a:rPr lang="en-US" sz="1400" dirty="0" smtClean="0">
+                  <a:solidFill>
+                    <a:srgbClr val="7030A0"/>
+                  </a:solidFill>
+                </a:rPr>
+                <a:t>)</a:t>
+              </a:r>
+              <a:endParaRPr lang="en-US" sz="1400" dirty="0">
+                <a:solidFill>
+                  <a:srgbClr val="7030A0"/>
+                </a:solidFill>
+              </a:endParaRPr>
+            </a:p>
+          </p:txBody>
+        </p:sp>
+        <p:sp>
+          <p:nvSpPr>
+            <p:cNvPr id="11" name="Rectangle 62"/>
+            <p:cNvSpPr/>
+            <p:nvPr/>
+          </p:nvSpPr>
+          <p:spPr>
+            <a:xfrm>
+              <a:off x="3812402" y="2288377"/>
+              <a:ext cx="1371600" cy="346760"/>
+            </a:xfrm>
+            <a:prstGeom prst="rect">
+              <a:avLst/>
+            </a:prstGeom>
+            <a:solidFill>
+              <a:schemeClr val="accent5">
+                <a:lumMod val="75000"/>
+              </a:schemeClr>
+            </a:solidFill>
+            <a:ln w="19050">
+              <a:solidFill>
+                <a:schemeClr val="accent5">
+                  <a:lumMod val="75000"/>
+                </a:schemeClr>
+              </a:solidFill>
+            </a:ln>
+            <a:effectLst/>
+          </p:spPr>
+          <p:style>
+            <a:lnRef idx="1">
+              <a:schemeClr val="accent2"/>
+            </a:lnRef>
+            <a:fillRef idx="2">
+              <a:schemeClr val="accent2"/>
+            </a:fillRef>
+            <a:effectRef idx="1">
+              <a:schemeClr val="accent2"/>
+            </a:effectRef>
+            <a:fontRef idx="minor">
+              <a:schemeClr val="dk1"/>
+            </a:fontRef>
+          </p:style>
+          <p:txBody>
+            <a:bodyPr rtlCol="0" anchor="ctr"/>
+            <a:lstStyle/>
+            <a:p>
+              <a:pPr algn="ctr"/>
+              <a:r>
+                <a:rPr lang="en-US" sz="1600" dirty="0" smtClean="0">
+                  <a:solidFill>
+                    <a:schemeClr val="bg1"/>
+                  </a:solidFill>
+                </a:rPr>
+                <a:t>:</a:t>
+              </a:r>
+              <a:r>
+                <a:rPr lang="en-US" sz="1600" dirty="0" err="1" smtClean="0">
+                  <a:solidFill>
+                    <a:schemeClr val="bg1"/>
+                  </a:solidFill>
+                </a:rPr>
+                <a:t>EventsCenter</a:t>
+              </a:r>
+              <a:endParaRPr lang="en-SG" sz="1600" dirty="0">
+                <a:solidFill>
+                  <a:schemeClr val="bg1"/>
+                </a:solidFill>
+              </a:endParaRPr>
+            </a:p>
+          </p:txBody>
+        </p:sp>
+        <p:sp>
+          <p:nvSpPr>
+            <p:cNvPr id="13" name="Rectangle 12"/>
+            <p:cNvSpPr/>
+            <p:nvPr/>
+          </p:nvSpPr>
+          <p:spPr>
+            <a:xfrm>
+              <a:off x="4419600" y="3429001"/>
+              <a:ext cx="152948" cy="1828799"/>
+            </a:xfrm>
+            <a:prstGeom prst="rect">
+              <a:avLst/>
+            </a:prstGeom>
+            <a:solidFill>
+              <a:schemeClr val="accent5">
+                <a:lumMod val="75000"/>
+              </a:schemeClr>
+            </a:solidFill>
+            <a:ln>
+              <a:solidFill>
+                <a:schemeClr val="accent5">
+                  <a:lumMod val="75000"/>
+                </a:schemeClr>
+              </a:solidFill>
+            </a:ln>
+            <a:effectLst/>
+          </p:spPr>
+          <p:style>
+            <a:lnRef idx="1">
+              <a:schemeClr val="accent3"/>
+            </a:lnRef>
+            <a:fillRef idx="2">
+              <a:schemeClr val="accent3"/>
+            </a:fillRef>
+            <a:effectRef idx="1">
+              <a:schemeClr val="accent3"/>
+            </a:effectRef>
+            <a:fontRef idx="minor">
+              <a:schemeClr val="dk1"/>
+            </a:fontRef>
+          </p:style>
+          <p:txBody>
+            <a:bodyPr rtlCol="0" anchor="ctr"/>
+            <a:lstStyle/>
+            <a:p>
+              <a:pPr algn="ctr"/>
+              <a:endParaRPr lang="en-SG" sz="1400">
+                <a:solidFill>
+                  <a:schemeClr val="dk1"/>
+                </a:solidFill>
+              </a:endParaRPr>
+            </a:p>
+          </p:txBody>
+        </p:sp>
+        <p:grpSp>
+          <p:nvGrpSpPr>
+            <p:cNvPr id="34" name="Group 33"/>
+            <p:cNvGrpSpPr/>
+            <p:nvPr/>
+          </p:nvGrpSpPr>
+          <p:grpSpPr>
+            <a:xfrm>
+              <a:off x="2057792" y="3155454"/>
+              <a:ext cx="2361808" cy="273546"/>
+              <a:chOff x="2053992" y="3351196"/>
+              <a:chExt cx="2361808" cy="273546"/>
+            </a:xfrm>
+          </p:grpSpPr>
+          <p:sp>
+            <p:nvSpPr>
+              <p:cNvPr id="9" name="TextBox 8"/>
+              <p:cNvSpPr txBox="1"/>
+              <p:nvPr/>
+            </p:nvSpPr>
+            <p:spPr>
+              <a:xfrm>
+                <a:off x="2133600" y="3351196"/>
+                <a:ext cx="2159370" cy="215444"/>
+              </a:xfrm>
+              <a:prstGeom prst="rect">
+                <a:avLst/>
+              </a:prstGeom>
+              <a:noFill/>
+            </p:spPr>
+            <p:txBody>
+              <a:bodyPr wrap="square" lIns="0" tIns="0" rIns="0" bIns="0" rtlCol="0">
+                <a:spAutoFit/>
+              </a:bodyPr>
+              <a:lstStyle/>
+              <a:p>
+                <a:pPr algn="ctr"/>
+                <a:r>
+                  <a:rPr lang="en-US" sz="1400" dirty="0">
+                    <a:solidFill>
+                      <a:schemeClr val="accent5">
+                        <a:lumMod val="75000"/>
+                      </a:schemeClr>
+                    </a:solidFill>
+                  </a:rPr>
+                  <a:t>post(</a:t>
+                </a:r>
+                <a:r>
+                  <a:rPr lang="en-US" sz="1400" dirty="0" err="1">
+                    <a:solidFill>
+                      <a:schemeClr val="accent5">
+                        <a:lumMod val="75000"/>
+                      </a:schemeClr>
+                    </a:solidFill>
+                  </a:rPr>
+                  <a:t>LoadDataRequestEvent</a:t>
+                </a:r>
+                <a:r>
+                  <a:rPr lang="en-US" sz="1400" dirty="0">
+                    <a:solidFill>
+                      <a:schemeClr val="accent5">
+                        <a:lumMod val="75000"/>
+                      </a:schemeClr>
+                    </a:solidFill>
+                  </a:rPr>
+                  <a:t>)</a:t>
+                </a:r>
+                <a:endParaRPr lang="en-US" sz="1400" dirty="0">
+                  <a:solidFill>
+                    <a:schemeClr val="accent5">
+                      <a:lumMod val="75000"/>
+                    </a:schemeClr>
+                  </a:solidFill>
+                </a:endParaRPr>
+              </a:p>
+            </p:txBody>
+          </p:sp>
+          <p:cxnSp>
+            <p:nvCxnSpPr>
+              <p:cNvPr id="14" name="Straight Arrow Connector 13"/>
+              <p:cNvCxnSpPr/>
+              <p:nvPr/>
+            </p:nvCxnSpPr>
+            <p:spPr>
+              <a:xfrm>
+                <a:off x="2053992" y="3624742"/>
+                <a:ext cx="2361808" cy="0"/>
+              </a:xfrm>
+              <a:prstGeom prst="straightConnector1">
+                <a:avLst/>
+              </a:prstGeom>
+              <a:ln w="19050">
+                <a:solidFill>
+                  <a:srgbClr val="7030A0"/>
+                </a:solidFill>
+                <a:tailEnd type="arrow"/>
+              </a:ln>
+            </p:spPr>
+            <p:style>
+              <a:lnRef idx="1">
+                <a:schemeClr val="accent1"/>
+              </a:lnRef>
+              <a:fillRef idx="0">
+                <a:schemeClr val="accent1"/>
+              </a:fillRef>
+              <a:effectRef idx="0">
+                <a:schemeClr val="accent1"/>
+              </a:effectRef>
+              <a:fontRef idx="minor">
+                <a:schemeClr val="tx1"/>
+              </a:fontRef>
+            </p:style>
+          </p:cxnSp>
+        </p:grpSp>
+        <p:cxnSp>
+          <p:nvCxnSpPr>
+            <p:cNvPr id="15" name="Straight Arrow Connector 14"/>
+            <p:cNvCxnSpPr/>
+            <p:nvPr/>
+          </p:nvCxnSpPr>
+          <p:spPr>
+            <a:xfrm>
+              <a:off x="2043598" y="4426734"/>
+              <a:ext cx="2376002" cy="0"/>
+            </a:xfrm>
+            <a:prstGeom prst="straightConnector1">
+              <a:avLst/>
+            </a:prstGeom>
+            <a:ln w="19050">
+              <a:solidFill>
+                <a:schemeClr val="accent5">
+                  <a:lumMod val="75000"/>
+                </a:schemeClr>
+              </a:solidFill>
+              <a:prstDash val="solid"/>
+              <a:headEnd type="arrow" w="med" len="med"/>
+              <a:tailEnd type="none" w="med" len="med"/>
+            </a:ln>
+          </p:spPr>
+          <p:style>
+            <a:lnRef idx="1">
+              <a:schemeClr val="accent1"/>
+            </a:lnRef>
+            <a:fillRef idx="0">
+              <a:schemeClr val="accent1"/>
+            </a:fillRef>
+            <a:effectRef idx="0">
+              <a:schemeClr val="accent1"/>
+            </a:effectRef>
+            <a:fontRef idx="minor">
+              <a:schemeClr val="tx1"/>
+            </a:fontRef>
+          </p:style>
+        </p:cxnSp>
+        <p:sp>
+          <p:nvSpPr>
+            <p:cNvPr id="17" name="Rectangle 62"/>
+            <p:cNvSpPr/>
+            <p:nvPr/>
+          </p:nvSpPr>
+          <p:spPr>
+            <a:xfrm>
+              <a:off x="7405679" y="2288377"/>
+              <a:ext cx="1093635" cy="346760"/>
+            </a:xfrm>
+            <a:prstGeom prst="rect">
+              <a:avLst/>
+            </a:prstGeom>
+            <a:solidFill>
+              <a:schemeClr val="accent6">
+                <a:lumMod val="75000"/>
+              </a:schemeClr>
+            </a:solidFill>
+            <a:ln w="19050">
+              <a:solidFill>
+                <a:schemeClr val="accent6">
+                  <a:lumMod val="75000"/>
+                </a:schemeClr>
+              </a:solidFill>
+            </a:ln>
+            <a:effectLst/>
+          </p:spPr>
+          <p:style>
+            <a:lnRef idx="1">
+              <a:schemeClr val="accent2"/>
+            </a:lnRef>
+            <a:fillRef idx="2">
+              <a:schemeClr val="accent2"/>
+            </a:fillRef>
+            <a:effectRef idx="1">
+              <a:schemeClr val="accent2"/>
+            </a:effectRef>
+            <a:fontRef idx="minor">
+              <a:schemeClr val="dk1"/>
+            </a:fontRef>
+          </p:style>
+          <p:txBody>
+            <a:bodyPr rtlCol="0" anchor="ctr"/>
+            <a:lstStyle/>
+            <a:p>
+              <a:pPr algn="ctr"/>
+              <a:r>
+                <a:rPr lang="en-US" sz="1600" dirty="0" smtClean="0">
+                  <a:solidFill>
+                    <a:schemeClr val="bg1"/>
+                  </a:solidFill>
+                </a:rPr>
+                <a:t>:Storage</a:t>
+              </a:r>
+              <a:endParaRPr lang="en-SG" sz="1600" dirty="0">
+                <a:solidFill>
+                  <a:schemeClr val="bg1"/>
+                </a:solidFill>
+              </a:endParaRPr>
+            </a:p>
+          </p:txBody>
+        </p:sp>
+        <p:cxnSp>
+          <p:nvCxnSpPr>
+            <p:cNvPr id="18" name="Straight Connector 17"/>
+            <p:cNvCxnSpPr/>
+            <p:nvPr/>
+          </p:nvCxnSpPr>
+          <p:spPr>
+            <a:xfrm>
+              <a:off x="7962266" y="2667000"/>
+              <a:ext cx="0" cy="2743200"/>
+            </a:xfrm>
+            <a:prstGeom prst="line">
+              <a:avLst/>
+            </a:prstGeom>
+            <a:ln w="19050">
+              <a:solidFill>
+                <a:schemeClr val="accent6">
+                  <a:lumMod val="75000"/>
+                </a:schemeClr>
+              </a:solidFill>
+              <a:prstDash val="sysDash"/>
+            </a:ln>
+            <a:effectLst/>
+          </p:spPr>
+          <p:style>
+            <a:lnRef idx="1">
+              <a:schemeClr val="accent1"/>
+            </a:lnRef>
+            <a:fillRef idx="2">
+              <a:schemeClr val="accent1"/>
+            </a:fillRef>
+            <a:effectRef idx="1">
+              <a:schemeClr val="accent1"/>
+            </a:effectRef>
+            <a:fontRef idx="minor">
+              <a:schemeClr val="dk1"/>
+            </a:fontRef>
+          </p:style>
+        </p:cxnSp>
+        <p:sp>
+          <p:nvSpPr>
+            <p:cNvPr id="19" name="Rectangle 18"/>
+            <p:cNvSpPr/>
+            <p:nvPr/>
+          </p:nvSpPr>
+          <p:spPr>
+            <a:xfrm>
+              <a:off x="7890257" y="3625927"/>
+              <a:ext cx="140896" cy="565073"/>
+            </a:xfrm>
+            <a:prstGeom prst="rect">
+              <a:avLst/>
+            </a:prstGeom>
+            <a:solidFill>
+              <a:schemeClr val="accent6">
+                <a:lumMod val="75000"/>
+              </a:schemeClr>
+            </a:solidFill>
+            <a:ln>
+              <a:solidFill>
+                <a:schemeClr val="accent6">
+                  <a:lumMod val="75000"/>
+                </a:schemeClr>
+              </a:solidFill>
+            </a:ln>
+            <a:effectLst/>
+          </p:spPr>
+          <p:style>
+            <a:lnRef idx="1">
+              <a:schemeClr val="accent3"/>
+            </a:lnRef>
+            <a:fillRef idx="2">
+              <a:schemeClr val="accent3"/>
+            </a:fillRef>
+            <a:effectRef idx="1">
+              <a:schemeClr val="accent3"/>
+            </a:effectRef>
+            <a:fontRef idx="minor">
+              <a:schemeClr val="dk1"/>
+            </a:fontRef>
+          </p:style>
+          <p:txBody>
+            <a:bodyPr rtlCol="0" anchor="ctr"/>
+            <a:lstStyle/>
+            <a:p>
+              <a:pPr algn="ctr"/>
+              <a:endParaRPr lang="en-SG" sz="1400">
+                <a:solidFill>
+                  <a:schemeClr val="dk1"/>
+                </a:solidFill>
+              </a:endParaRPr>
+            </a:p>
+          </p:txBody>
+        </p:sp>
+        <p:cxnSp>
+          <p:nvCxnSpPr>
+            <p:cNvPr id="20" name="Straight Arrow Connector 19"/>
+            <p:cNvCxnSpPr>
+              <a:stCxn id="19" idx="2"/>
+            </p:cNvCxnSpPr>
+            <p:nvPr/>
+          </p:nvCxnSpPr>
+          <p:spPr>
+            <a:xfrm flipH="1">
+              <a:off x="4572000" y="4191000"/>
+              <a:ext cx="3388705" cy="0"/>
+            </a:xfrm>
+            <a:prstGeom prst="straightConnector1">
+              <a:avLst/>
+            </a:prstGeom>
+            <a:ln w="19050">
+              <a:solidFill>
+                <a:schemeClr val="accent6">
+                  <a:lumMod val="75000"/>
+                </a:schemeClr>
+              </a:solidFill>
+              <a:prstDash val="solid"/>
+              <a:headEnd type="none" w="med" len="med"/>
+              <a:tailEnd type="arrow" w="med" len="med"/>
+            </a:ln>
+          </p:spPr>
+          <p:style>
+            <a:lnRef idx="1">
+              <a:schemeClr val="accent1"/>
+            </a:lnRef>
+            <a:fillRef idx="0">
+              <a:schemeClr val="accent1"/>
+            </a:fillRef>
+            <a:effectRef idx="0">
+              <a:schemeClr val="accent1"/>
+            </a:effectRef>
+            <a:fontRef idx="minor">
+              <a:schemeClr val="tx1"/>
+            </a:fontRef>
+          </p:style>
+        </p:cxnSp>
+        <p:cxnSp>
+          <p:nvCxnSpPr>
+            <p:cNvPr id="21" name="Straight Connector 20"/>
+            <p:cNvCxnSpPr/>
+            <p:nvPr/>
+          </p:nvCxnSpPr>
+          <p:spPr>
+            <a:xfrm>
+              <a:off x="4498202" y="2590800"/>
+              <a:ext cx="0" cy="2895600"/>
+            </a:xfrm>
+            <a:prstGeom prst="line">
+              <a:avLst/>
+            </a:prstGeom>
+            <a:ln w="19050">
+              <a:solidFill>
+                <a:schemeClr val="accent5">
+                  <a:lumMod val="75000"/>
+                </a:schemeClr>
+              </a:solidFill>
+              <a:prstDash val="sysDash"/>
+            </a:ln>
+            <a:effectLst/>
+          </p:spPr>
+          <p:style>
+            <a:lnRef idx="1">
+              <a:schemeClr val="accent1"/>
+            </a:lnRef>
+            <a:fillRef idx="2">
+              <a:schemeClr val="accent1"/>
+            </a:fillRef>
+            <a:effectRef idx="1">
+              <a:schemeClr val="accent1"/>
+            </a:effectRef>
+            <a:fontRef idx="minor">
+              <a:schemeClr val="dk1"/>
+            </a:fontRef>
+          </p:style>
+        </p:cxnSp>
+        <p:cxnSp>
+          <p:nvCxnSpPr>
+            <p:cNvPr id="22" name="Straight Arrow Connector 21"/>
+            <p:cNvCxnSpPr/>
+            <p:nvPr/>
+          </p:nvCxnSpPr>
+          <p:spPr>
+            <a:xfrm>
+              <a:off x="4572000" y="3664717"/>
+              <a:ext cx="3318258" cy="0"/>
+            </a:xfrm>
+            <a:prstGeom prst="straightConnector1">
+              <a:avLst/>
+            </a:prstGeom>
+            <a:ln w="19050">
+              <a:solidFill>
+                <a:schemeClr val="accent5">
+                  <a:lumMod val="75000"/>
+                </a:schemeClr>
+              </a:solidFill>
+              <a:headEnd type="none" w="med" len="med"/>
+              <a:tailEnd type="arrow" w="med" len="med"/>
+            </a:ln>
+          </p:spPr>
+          <p:style>
+            <a:lnRef idx="1">
+              <a:schemeClr val="accent1"/>
+            </a:lnRef>
+            <a:fillRef idx="0">
+              <a:schemeClr val="accent1"/>
+            </a:fillRef>
+            <a:effectRef idx="0">
+              <a:schemeClr val="accent1"/>
+            </a:effectRef>
+            <a:fontRef idx="minor">
+              <a:schemeClr val="tx1"/>
+            </a:fontRef>
+          </p:style>
+        </p:cxnSp>
+        <p:sp>
+          <p:nvSpPr>
+            <p:cNvPr id="23" name="TextBox 22"/>
+            <p:cNvSpPr txBox="1"/>
+            <p:nvPr/>
+          </p:nvSpPr>
+          <p:spPr>
+            <a:xfrm>
+              <a:off x="5165906" y="3356176"/>
+              <a:ext cx="2355070" cy="215444"/>
+            </a:xfrm>
+            <a:prstGeom prst="rect">
+              <a:avLst/>
+            </a:prstGeom>
+            <a:noFill/>
+          </p:spPr>
+          <p:txBody>
+            <a:bodyPr wrap="square" lIns="0" tIns="0" rIns="0" bIns="0" rtlCol="0">
+              <a:spAutoFit/>
+            </a:bodyPr>
+            <a:lstStyle/>
+            <a:p>
+              <a:r>
+                <a:rPr lang="en-US" sz="1400" dirty="0" err="1" smtClean="0">
+                  <a:solidFill>
+                    <a:schemeClr val="accent6">
+                      <a:lumMod val="75000"/>
+                    </a:schemeClr>
+                  </a:solidFill>
+                </a:rPr>
+                <a:t>handleLoadDataRequestEvent</a:t>
+              </a:r>
+              <a:r>
+                <a:rPr lang="en-US" sz="1400" dirty="0" smtClean="0">
+                  <a:solidFill>
+                    <a:schemeClr val="accent6">
+                      <a:lumMod val="75000"/>
+                    </a:schemeClr>
+                  </a:solidFill>
+                </a:rPr>
+                <a:t>()</a:t>
+              </a:r>
+              <a:endParaRPr lang="en-US" sz="1400" dirty="0">
+                <a:solidFill>
+                  <a:schemeClr val="accent6">
+                    <a:lumMod val="75000"/>
+                  </a:schemeClr>
+                </a:solidFill>
+              </a:endParaRPr>
+            </a:p>
+          </p:txBody>
+        </p:sp>
+        <p:grpSp>
+          <p:nvGrpSpPr>
+            <p:cNvPr id="24" name="Group 23"/>
+            <p:cNvGrpSpPr/>
+            <p:nvPr/>
+          </p:nvGrpSpPr>
+          <p:grpSpPr>
+            <a:xfrm flipH="1">
+              <a:off x="7982113" y="3695010"/>
+              <a:ext cx="217349" cy="270072"/>
+              <a:chOff x="1028134" y="5612032"/>
+              <a:chExt cx="217349" cy="270072"/>
+            </a:xfrm>
+          </p:grpSpPr>
+          <p:sp>
+            <p:nvSpPr>
+              <p:cNvPr id="25" name="Freeform 24"/>
+              <p:cNvSpPr/>
+              <p:nvPr/>
+            </p:nvSpPr>
+            <p:spPr>
+              <a:xfrm rot="2600998" flipH="1" flipV="1">
+                <a:off x="1028134" y="5612032"/>
+                <a:ext cx="167452" cy="116880"/>
+              </a:xfrm>
+              <a:custGeom>
+                <a:avLst/>
+                <a:gdLst>
+                  <a:gd name="connsiteX0" fmla="*/ 0 w 226400"/>
+                  <a:gd name="connsiteY0" fmla="*/ 32920 h 171466"/>
+                  <a:gd name="connsiteX1" fmla="*/ 157018 w 226400"/>
+                  <a:gd name="connsiteY1" fmla="*/ 5211 h 171466"/>
+                  <a:gd name="connsiteX2" fmla="*/ 221673 w 226400"/>
+                  <a:gd name="connsiteY2" fmla="*/ 125284 h 171466"/>
+                  <a:gd name="connsiteX3" fmla="*/ 36945 w 226400"/>
+                  <a:gd name="connsiteY3" fmla="*/ 171466 h 171466"/>
+                </a:gdLst>
+                <a:ahLst/>
+                <a:cxnLst>
+                  <a:cxn ang="0">
+                    <a:pos x="connsiteX0" y="connsiteY0"/>
+                  </a:cxn>
+                  <a:cxn ang="0">
+                    <a:pos x="connsiteX1" y="connsiteY1"/>
+                  </a:cxn>
+                  <a:cxn ang="0">
+                    <a:pos x="connsiteX2" y="connsiteY2"/>
+                  </a:cxn>
+                  <a:cxn ang="0">
+                    <a:pos x="connsiteX3" y="connsiteY3"/>
+                  </a:cxn>
+                </a:cxnLst>
+                <a:rect l="l" t="t" r="r" b="b"/>
+                <a:pathLst>
+                  <a:path w="226400" h="171466">
+                    <a:moveTo>
+                      <a:pt x="0" y="32920"/>
+                    </a:moveTo>
+                    <a:cubicBezTo>
+                      <a:pt x="60036" y="11368"/>
+                      <a:pt x="120073" y="-10183"/>
+                      <a:pt x="157018" y="5211"/>
+                    </a:cubicBezTo>
+                    <a:cubicBezTo>
+                      <a:pt x="193963" y="20605"/>
+                      <a:pt x="241685" y="97575"/>
+                      <a:pt x="221673" y="125284"/>
+                    </a:cubicBezTo>
+                    <a:cubicBezTo>
+                      <a:pt x="201661" y="152993"/>
+                      <a:pt x="119303" y="162229"/>
+                      <a:pt x="36945" y="171466"/>
+                    </a:cubicBezTo>
+                  </a:path>
+                </a:pathLst>
+              </a:custGeom>
+              <a:ln w="19050">
+                <a:solidFill>
+                  <a:schemeClr val="accent6">
+                    <a:lumMod val="75000"/>
+                  </a:schemeClr>
+                </a:solidFill>
+                <a:headEnd type="arrow" w="med" len="med"/>
+                <a:tailEnd type="none" w="med" len="med"/>
+              </a:ln>
+            </p:spPr>
+            <p:style>
+              <a:lnRef idx="1">
+                <a:schemeClr val="accent1"/>
+              </a:lnRef>
+              <a:fillRef idx="0">
+                <a:schemeClr val="accent1"/>
+              </a:fillRef>
+              <a:effectRef idx="0">
+                <a:schemeClr val="accent1"/>
+              </a:effectRef>
+              <a:fontRef idx="minor">
+                <a:schemeClr val="tx1"/>
+              </a:fontRef>
+            </p:style>
+            <p:txBody>
+              <a:bodyPr rtlCol="0" anchor="ctr"/>
+              <a:lstStyle/>
+              <a:p>
+                <a:pPr algn="ctr"/>
+                <a:endParaRPr lang="en-SG"/>
+              </a:p>
+            </p:txBody>
+          </p:sp>
+          <p:sp>
+            <p:nvSpPr>
+              <p:cNvPr id="26" name="Rectangle 25"/>
+              <p:cNvSpPr/>
+              <p:nvPr/>
+            </p:nvSpPr>
+            <p:spPr>
+              <a:xfrm>
+                <a:off x="1147403" y="5712513"/>
+                <a:ext cx="98080" cy="169591"/>
+              </a:xfrm>
+              <a:prstGeom prst="rect">
+                <a:avLst/>
+              </a:prstGeom>
+              <a:solidFill>
+                <a:schemeClr val="accent6">
+                  <a:lumMod val="75000"/>
+                </a:schemeClr>
+              </a:solidFill>
+              <a:ln>
+                <a:solidFill>
+                  <a:schemeClr val="bg1"/>
+                </a:solidFill>
+              </a:ln>
+              <a:effectLst/>
+            </p:spPr>
+            <p:style>
+              <a:lnRef idx="1">
+                <a:schemeClr val="accent3"/>
+              </a:lnRef>
+              <a:fillRef idx="2">
+                <a:schemeClr val="accent3"/>
+              </a:fillRef>
+              <a:effectRef idx="1">
+                <a:schemeClr val="accent3"/>
+              </a:effectRef>
+              <a:fontRef idx="minor">
+                <a:schemeClr val="dk1"/>
+              </a:fontRef>
+            </p:style>
+            <p:txBody>
+              <a:bodyPr rtlCol="0" anchor="ctr"/>
+              <a:lstStyle/>
+              <a:p>
+                <a:pPr algn="ctr"/>
+                <a:endParaRPr lang="en-SG" sz="1400">
+                  <a:solidFill>
+                    <a:schemeClr val="dk1"/>
+                  </a:solidFill>
+                </a:endParaRPr>
+              </a:p>
+            </p:txBody>
+          </p:sp>
+        </p:grpSp>
+        <p:sp>
+          <p:nvSpPr>
+            <p:cNvPr id="27" name="TextBox 26"/>
+            <p:cNvSpPr txBox="1"/>
+            <p:nvPr/>
+          </p:nvSpPr>
+          <p:spPr>
+            <a:xfrm>
+              <a:off x="8239560" y="3581400"/>
+              <a:ext cx="729216" cy="430887"/>
+            </a:xfrm>
+            <a:prstGeom prst="rect">
+              <a:avLst/>
+            </a:prstGeom>
+            <a:noFill/>
+          </p:spPr>
+          <p:txBody>
+            <a:bodyPr wrap="square" lIns="0" tIns="0" rIns="0" bIns="0" rtlCol="0">
+              <a:spAutoFit/>
+            </a:bodyPr>
+            <a:lstStyle/>
+            <a:p>
+              <a:r>
+                <a:rPr lang="en-US" sz="1400" dirty="0" smtClean="0">
+                  <a:solidFill>
+                    <a:schemeClr val="accent6">
+                      <a:lumMod val="75000"/>
+                    </a:schemeClr>
+                  </a:solidFill>
+                </a:rPr>
+                <a:t>load from location</a:t>
+              </a:r>
+              <a:endParaRPr lang="en-US" sz="1400" dirty="0">
+                <a:solidFill>
+                  <a:schemeClr val="accent6">
+                    <a:lumMod val="75000"/>
+                  </a:schemeClr>
+                </a:solidFill>
+              </a:endParaRPr>
+            </a:p>
+          </p:txBody>
+        </p:sp>
+        <p:sp>
+          <p:nvSpPr>
+            <p:cNvPr id="36" name="TextBox 35"/>
+            <p:cNvSpPr txBox="1"/>
+            <p:nvPr/>
+          </p:nvSpPr>
+          <p:spPr>
+            <a:xfrm>
+              <a:off x="5108103" y="3962400"/>
+              <a:ext cx="2336673" cy="215444"/>
+            </a:xfrm>
+            <a:prstGeom prst="rect">
+              <a:avLst/>
+            </a:prstGeom>
+            <a:noFill/>
+          </p:spPr>
+          <p:txBody>
+            <a:bodyPr wrap="square" lIns="0" tIns="0" rIns="0" bIns="0" rtlCol="0">
+              <a:spAutoFit/>
+            </a:bodyPr>
+            <a:lstStyle/>
+            <a:p>
+              <a:pPr algn="ctr"/>
+              <a:r>
+                <a:rPr lang="en-US" sz="1400" dirty="0">
+                  <a:solidFill>
+                    <a:schemeClr val="accent6">
+                      <a:lumMod val="75000"/>
+                    </a:schemeClr>
+                  </a:solidFill>
+                </a:rPr>
+                <a:t>post(</a:t>
+              </a:r>
+              <a:r>
+                <a:rPr lang="en-US" sz="1400" dirty="0" err="1">
+                  <a:solidFill>
+                    <a:schemeClr val="accent6">
+                      <a:lumMod val="75000"/>
+                    </a:schemeClr>
+                  </a:solidFill>
+                </a:rPr>
+                <a:t>LoadDataCompleteEvent</a:t>
+              </a:r>
+              <a:r>
+                <a:rPr lang="en-US" sz="1400" dirty="0">
+                  <a:solidFill>
+                    <a:schemeClr val="accent6">
+                      <a:lumMod val="75000"/>
+                    </a:schemeClr>
+                  </a:solidFill>
+                </a:rPr>
+                <a:t>)</a:t>
+              </a:r>
+              <a:endParaRPr lang="en-US" sz="1400" dirty="0">
+                <a:solidFill>
+                  <a:schemeClr val="accent6">
+                    <a:lumMod val="75000"/>
+                  </a:schemeClr>
+                </a:solidFill>
+              </a:endParaRPr>
+            </a:p>
+          </p:txBody>
+        </p:sp>
+        <p:sp>
+          <p:nvSpPr>
+            <p:cNvPr id="39" name="TextBox 38"/>
+            <p:cNvSpPr txBox="1"/>
+            <p:nvPr/>
+          </p:nvSpPr>
+          <p:spPr>
+            <a:xfrm>
+              <a:off x="2319157" y="3895876"/>
+              <a:ext cx="1901084" cy="430887"/>
+            </a:xfrm>
+            <a:prstGeom prst="rect">
+              <a:avLst/>
+            </a:prstGeom>
+            <a:noFill/>
+          </p:spPr>
+          <p:txBody>
+            <a:bodyPr wrap="square" lIns="0" tIns="0" rIns="0" bIns="0" rtlCol="0">
+              <a:spAutoFit/>
+            </a:bodyPr>
+            <a:lstStyle/>
+            <a:p>
+              <a:pPr algn="ctr"/>
+              <a:r>
+                <a:rPr lang="en-US" sz="1400" dirty="0" err="1" smtClean="0">
+                  <a:solidFill>
+                    <a:srgbClr val="7030A0"/>
+                  </a:solidFill>
+                </a:rPr>
+                <a:t>handleLoadDataComplete</a:t>
+              </a:r>
+              <a:endParaRPr lang="en-US" sz="1400" dirty="0" smtClean="0">
+                <a:solidFill>
+                  <a:srgbClr val="7030A0"/>
+                </a:solidFill>
+              </a:endParaRPr>
+            </a:p>
+            <a:p>
+              <a:pPr algn="ctr"/>
+              <a:r>
+                <a:rPr lang="en-US" sz="1400" dirty="0" smtClean="0">
+                  <a:solidFill>
+                    <a:srgbClr val="7030A0"/>
+                  </a:solidFill>
+                </a:rPr>
+                <a:t>Event()</a:t>
+              </a:r>
+            </a:p>
+          </p:txBody>
+        </p:sp>
+        <p:grpSp>
+          <p:nvGrpSpPr>
+            <p:cNvPr id="45" name="Group 44"/>
+            <p:cNvGrpSpPr/>
+            <p:nvPr/>
+          </p:nvGrpSpPr>
+          <p:grpSpPr>
+            <a:xfrm>
+              <a:off x="921674" y="4200833"/>
+              <a:ext cx="1050921" cy="437533"/>
+              <a:chOff x="194562" y="5444571"/>
+              <a:chExt cx="1050921" cy="437533"/>
+            </a:xfrm>
+          </p:grpSpPr>
+          <p:grpSp>
+            <p:nvGrpSpPr>
+              <p:cNvPr id="44" name="Group 43"/>
+              <p:cNvGrpSpPr/>
+              <p:nvPr/>
+            </p:nvGrpSpPr>
+            <p:grpSpPr>
+              <a:xfrm>
+                <a:off x="1028134" y="5612032"/>
+                <a:ext cx="217349" cy="270072"/>
+                <a:chOff x="1028134" y="5612032"/>
+                <a:chExt cx="217349" cy="270072"/>
+              </a:xfrm>
+            </p:grpSpPr>
+            <p:sp>
+              <p:nvSpPr>
+                <p:cNvPr id="41" name="Freeform 40"/>
+                <p:cNvSpPr/>
+                <p:nvPr/>
+              </p:nvSpPr>
+              <p:spPr>
+                <a:xfrm rot="2600998" flipH="1" flipV="1">
+                  <a:off x="1028134" y="5612032"/>
+                  <a:ext cx="167452" cy="116880"/>
+                </a:xfrm>
+                <a:custGeom>
+                  <a:avLst/>
+                  <a:gdLst>
+                    <a:gd name="connsiteX0" fmla="*/ 0 w 226400"/>
+                    <a:gd name="connsiteY0" fmla="*/ 32920 h 171466"/>
+                    <a:gd name="connsiteX1" fmla="*/ 157018 w 226400"/>
+                    <a:gd name="connsiteY1" fmla="*/ 5211 h 171466"/>
+                    <a:gd name="connsiteX2" fmla="*/ 221673 w 226400"/>
+                    <a:gd name="connsiteY2" fmla="*/ 125284 h 171466"/>
+                    <a:gd name="connsiteX3" fmla="*/ 36945 w 226400"/>
+                    <a:gd name="connsiteY3" fmla="*/ 171466 h 171466"/>
+                  </a:gdLst>
+                  <a:ahLst/>
+                  <a:cxnLst>
+                    <a:cxn ang="0">
+                      <a:pos x="connsiteX0" y="connsiteY0"/>
+                    </a:cxn>
+                    <a:cxn ang="0">
+                      <a:pos x="connsiteX1" y="connsiteY1"/>
+                    </a:cxn>
+                    <a:cxn ang="0">
+                      <a:pos x="connsiteX2" y="connsiteY2"/>
+                    </a:cxn>
+                    <a:cxn ang="0">
+                      <a:pos x="connsiteX3" y="connsiteY3"/>
+                    </a:cxn>
+                  </a:cxnLst>
+                  <a:rect l="l" t="t" r="r" b="b"/>
+                  <a:pathLst>
+                    <a:path w="226400" h="171466">
+                      <a:moveTo>
+                        <a:pt x="0" y="32920"/>
+                      </a:moveTo>
+                      <a:cubicBezTo>
+                        <a:pt x="60036" y="11368"/>
+                        <a:pt x="120073" y="-10183"/>
+                        <a:pt x="157018" y="5211"/>
+                      </a:cubicBezTo>
+                      <a:cubicBezTo>
+                        <a:pt x="193963" y="20605"/>
+                        <a:pt x="241685" y="97575"/>
+                        <a:pt x="221673" y="125284"/>
+                      </a:cubicBezTo>
+                      <a:cubicBezTo>
+                        <a:pt x="201661" y="152993"/>
+                        <a:pt x="119303" y="162229"/>
+                        <a:pt x="36945" y="171466"/>
+                      </a:cubicBezTo>
+                    </a:path>
+                  </a:pathLst>
+                </a:custGeom>
+                <a:ln w="19050">
+                  <a:solidFill>
+                    <a:srgbClr val="7030A0"/>
+                  </a:solidFill>
+                  <a:headEnd type="arrow" w="med" len="med"/>
+                  <a:tailEnd type="none" w="med" len="med"/>
+                </a:ln>
+              </p:spPr>
+              <p:style>
+                <a:lnRef idx="1">
+                  <a:schemeClr val="accent1"/>
+                </a:lnRef>
+                <a:fillRef idx="0">
+                  <a:schemeClr val="accent1"/>
+                </a:fillRef>
+                <a:effectRef idx="0">
+                  <a:schemeClr val="accent1"/>
+                </a:effectRef>
+                <a:fontRef idx="minor">
+                  <a:schemeClr val="tx1"/>
+                </a:fontRef>
+              </p:style>
+              <p:txBody>
+                <a:bodyPr rtlCol="0" anchor="ctr"/>
+                <a:lstStyle/>
+                <a:p>
+                  <a:pPr algn="ctr"/>
+                  <a:endParaRPr lang="en-SG"/>
+                </a:p>
+              </p:txBody>
+            </p:sp>
+            <p:sp>
+              <p:nvSpPr>
+                <p:cNvPr id="42" name="Rectangle 41"/>
+                <p:cNvSpPr/>
+                <p:nvPr/>
+              </p:nvSpPr>
+              <p:spPr>
+                <a:xfrm>
+                  <a:off x="1147403" y="5712513"/>
+                  <a:ext cx="98080" cy="169591"/>
+                </a:xfrm>
+                <a:prstGeom prst="rect">
+                  <a:avLst/>
+                </a:prstGeom>
+                <a:solidFill>
+                  <a:srgbClr val="7030A0"/>
+                </a:solidFill>
+                <a:ln>
+                  <a:solidFill>
+                    <a:schemeClr val="bg1"/>
+                  </a:solidFill>
+                </a:ln>
+                <a:effectLst/>
+              </p:spPr>
+              <p:style>
+                <a:lnRef idx="1">
+                  <a:schemeClr val="accent3"/>
+                </a:lnRef>
+                <a:fillRef idx="2">
+                  <a:schemeClr val="accent3"/>
+                </a:fillRef>
+                <a:effectRef idx="1">
+                  <a:schemeClr val="accent3"/>
+                </a:effectRef>
+                <a:fontRef idx="minor">
+                  <a:schemeClr val="dk1"/>
+                </a:fontRef>
+              </p:style>
+              <p:txBody>
+                <a:bodyPr rtlCol="0" anchor="ctr"/>
+                <a:lstStyle/>
+                <a:p>
+                  <a:pPr algn="ctr"/>
+                  <a:endParaRPr lang="en-SG" sz="1400">
+                    <a:solidFill>
+                      <a:schemeClr val="dk1"/>
+                    </a:solidFill>
+                  </a:endParaRPr>
+                </a:p>
+              </p:txBody>
+            </p:sp>
+          </p:grpSp>
+          <p:sp>
+            <p:nvSpPr>
+              <p:cNvPr id="43" name="TextBox 42"/>
+              <p:cNvSpPr txBox="1"/>
+              <p:nvPr/>
+            </p:nvSpPr>
+            <p:spPr>
+              <a:xfrm>
+                <a:off x="194562" y="5444571"/>
+                <a:ext cx="794081" cy="430887"/>
+              </a:xfrm>
+              <a:prstGeom prst="rect">
+                <a:avLst/>
+              </a:prstGeom>
+              <a:noFill/>
+            </p:spPr>
+            <p:txBody>
+              <a:bodyPr wrap="square" lIns="0" tIns="0" rIns="0" bIns="0" rtlCol="0">
+                <a:spAutoFit/>
+              </a:bodyPr>
+              <a:lstStyle/>
+              <a:p>
+                <a:pPr algn="r"/>
+                <a:r>
+                  <a:rPr lang="en-US" sz="1400" dirty="0" smtClean="0">
+                    <a:solidFill>
+                      <a:srgbClr val="7030A0"/>
+                    </a:solidFill>
+                  </a:rPr>
+                  <a:t>Update </a:t>
+                </a:r>
+                <a:r>
+                  <a:rPr lang="en-US" sz="1400" dirty="0" smtClean="0">
+                    <a:solidFill>
+                      <a:srgbClr val="7030A0"/>
+                    </a:solidFill>
+                  </a:rPr>
+                  <a:t>task list</a:t>
+                </a:r>
+                <a:endParaRPr lang="en-US" sz="1400" dirty="0">
+                  <a:solidFill>
+                    <a:srgbClr val="7030A0"/>
+                  </a:solidFill>
+                </a:endParaRPr>
+              </a:p>
+            </p:txBody>
+          </p:sp>
+        </p:grpSp>
+        <p:sp>
+          <p:nvSpPr>
+            <p:cNvPr id="65" name="TextBox 64"/>
+            <p:cNvSpPr txBox="1"/>
+            <p:nvPr/>
+          </p:nvSpPr>
+          <p:spPr>
+            <a:xfrm>
+              <a:off x="2152640" y="4654580"/>
+              <a:ext cx="2438400" cy="215444"/>
+            </a:xfrm>
+            <a:prstGeom prst="rect">
+              <a:avLst/>
+            </a:prstGeom>
+            <a:noFill/>
+          </p:spPr>
+          <p:txBody>
+            <a:bodyPr wrap="square" lIns="0" tIns="0" rIns="0" bIns="0" rtlCol="0">
+              <a:spAutoFit/>
+            </a:bodyPr>
+            <a:lstStyle/>
+            <a:p>
+              <a:r>
+                <a:rPr lang="en-US" sz="1400" dirty="0" smtClean="0">
+                  <a:solidFill>
+                    <a:schemeClr val="accent5">
+                      <a:lumMod val="75000"/>
+                    </a:schemeClr>
+                  </a:solidFill>
+                </a:rPr>
+                <a:t>post(</a:t>
+              </a:r>
+              <a:r>
+                <a:rPr lang="en-US" sz="1400" dirty="0" err="1" smtClean="0">
+                  <a:solidFill>
+                    <a:schemeClr val="accent5">
+                      <a:lumMod val="75000"/>
+                    </a:schemeClr>
+                  </a:solidFill>
+                </a:rPr>
+                <a:t>ToDoListChangedEvent</a:t>
+              </a:r>
+              <a:r>
+                <a:rPr lang="en-US" sz="1400" dirty="0" smtClean="0">
+                  <a:solidFill>
+                    <a:schemeClr val="accent5">
+                      <a:lumMod val="75000"/>
+                    </a:schemeClr>
+                  </a:solidFill>
+                </a:rPr>
+                <a:t>)</a:t>
+              </a:r>
+              <a:endParaRPr lang="en-US" sz="1400" dirty="0">
+                <a:solidFill>
+                  <a:schemeClr val="accent5">
+                    <a:lumMod val="75000"/>
+                  </a:schemeClr>
+                </a:solidFill>
+              </a:endParaRPr>
+            </a:p>
+          </p:txBody>
+        </p:sp>
+        <p:cxnSp>
+          <p:nvCxnSpPr>
+            <p:cNvPr id="66" name="Straight Arrow Connector 65"/>
+            <p:cNvCxnSpPr/>
+            <p:nvPr/>
+          </p:nvCxnSpPr>
+          <p:spPr>
+            <a:xfrm>
+              <a:off x="2022602" y="4928126"/>
+              <a:ext cx="2396998" cy="0"/>
+            </a:xfrm>
+            <a:prstGeom prst="straightConnector1">
+              <a:avLst/>
+            </a:prstGeom>
+            <a:ln w="19050">
+              <a:solidFill>
+                <a:srgbClr val="7030A0"/>
+              </a:solidFill>
+              <a:tailEnd type="arrow"/>
+            </a:ln>
+          </p:spPr>
+          <p:style>
+            <a:lnRef idx="1">
+              <a:schemeClr val="accent1"/>
+            </a:lnRef>
+            <a:fillRef idx="0">
+              <a:schemeClr val="accent1"/>
+            </a:fillRef>
+            <a:effectRef idx="0">
+              <a:schemeClr val="accent1"/>
+            </a:effectRef>
+            <a:fontRef idx="minor">
+              <a:schemeClr val="tx1"/>
+            </a:fontRef>
+          </p:style>
+        </p:cxnSp>
+        <p:cxnSp>
+          <p:nvCxnSpPr>
+            <p:cNvPr id="67" name="Straight Arrow Connector 66"/>
+            <p:cNvCxnSpPr>
+              <a:endCxn id="13" idx="2"/>
+            </p:cNvCxnSpPr>
+            <p:nvPr/>
+          </p:nvCxnSpPr>
+          <p:spPr>
+            <a:xfrm>
+              <a:off x="2057792" y="5257800"/>
+              <a:ext cx="2438282" cy="0"/>
+            </a:xfrm>
+            <a:prstGeom prst="straightConnector1">
+              <a:avLst/>
+            </a:prstGeom>
+            <a:ln w="19050">
+              <a:solidFill>
+                <a:schemeClr val="accent5">
+                  <a:lumMod val="75000"/>
+                </a:schemeClr>
+              </a:solidFill>
+              <a:prstDash val="sysDash"/>
+              <a:headEnd type="arrow" w="med" len="med"/>
+              <a:tailEnd type="none" w="med" len="med"/>
+            </a:ln>
+          </p:spPr>
+          <p:style>
+            <a:lnRef idx="1">
+              <a:schemeClr val="accent1"/>
+            </a:lnRef>
+            <a:fillRef idx="0">
+              <a:schemeClr val="accent1"/>
+            </a:fillRef>
+            <a:effectRef idx="0">
+              <a:schemeClr val="accent1"/>
+            </a:effectRef>
+            <a:fontRef idx="minor">
+              <a:schemeClr val="tx1"/>
+            </a:fontRef>
+          </p:style>
+        </p:cxnSp>
+      </p:grpSp>
+    </p:spTree>
+    <p:extLst>
+      <p:ext uri="{BB962C8B-B14F-4D97-AF65-F5344CB8AC3E}">
+        <p14:creationId xmlns:p14="http://schemas.microsoft.com/office/powerpoint/2010/main" val="2018796629"/>
+      </p:ext>
+    </p:extLst>
+  </p:cSld>
+  <p:clrMapOvr>
+    <a:masterClrMapping/>
+  </p:clrMapOvr>
+</p:sld>
+</file>
+
 <file path=ppt/slides/slide2.xml><?xml version="1.0" encoding="utf-8"?>
 <p:sld xmlns:a="http://schemas.openxmlformats.org/drawingml/2006/main" xmlns:r="http://schemas.openxmlformats.org/officeDocument/2006/relationships" xmlns:p="http://schemas.openxmlformats.org/presentationml/2006/main">
   <p:cSld>
@@ -16465,6 +18053,553 @@
           <a:chExt cx="0" cy="0"/>
         </a:xfrm>
       </p:grpSpPr>
+      <p:grpSp>
+        <p:nvGrpSpPr>
+          <p:cNvPr id="57" name="Group 56"/>
+          <p:cNvGrpSpPr/>
+          <p:nvPr/>
+        </p:nvGrpSpPr>
+        <p:grpSpPr>
+          <a:xfrm>
+            <a:off x="2286000" y="1853540"/>
+            <a:ext cx="4644908" cy="2390743"/>
+            <a:chOff x="2419161" y="1981200"/>
+            <a:chExt cx="4644908" cy="2390743"/>
+          </a:xfrm>
+        </p:grpSpPr>
+        <p:sp>
+          <p:nvSpPr>
+            <p:cNvPr id="4" name="Rectangle 62"/>
+            <p:cNvSpPr/>
+            <p:nvPr/>
+          </p:nvSpPr>
+          <p:spPr>
+            <a:xfrm>
+              <a:off x="4003446" y="2819400"/>
+              <a:ext cx="1362038" cy="346760"/>
+            </a:xfrm>
+            <a:prstGeom prst="rect">
+              <a:avLst/>
+            </a:prstGeom>
+            <a:solidFill>
+              <a:schemeClr val="accent6">
+                <a:lumMod val="75000"/>
+              </a:schemeClr>
+            </a:solidFill>
+            <a:ln w="19050">
+              <a:solidFill>
+                <a:schemeClr val="accent6">
+                  <a:lumMod val="75000"/>
+                </a:schemeClr>
+              </a:solidFill>
+            </a:ln>
+            <a:effectLst/>
+          </p:spPr>
+          <p:style>
+            <a:lnRef idx="1">
+              <a:schemeClr val="accent2"/>
+            </a:lnRef>
+            <a:fillRef idx="2">
+              <a:schemeClr val="accent2"/>
+            </a:fillRef>
+            <a:effectRef idx="1">
+              <a:schemeClr val="accent2"/>
+            </a:effectRef>
+            <a:fontRef idx="minor">
+              <a:schemeClr val="dk1"/>
+            </a:fontRef>
+          </p:style>
+          <p:txBody>
+            <a:bodyPr rtlCol="0" anchor="ctr"/>
+            <a:lstStyle/>
+            <a:p>
+              <a:pPr algn="ctr"/>
+              <a:r>
+                <a:rPr lang="en-US" sz="1200" dirty="0" smtClean="0">
+                  <a:solidFill>
+                    <a:schemeClr val="bg1"/>
+                  </a:solidFill>
+                </a:rPr>
+                <a:t>: </a:t>
+              </a:r>
+              <a:r>
+                <a:rPr lang="en-US" sz="1200" dirty="0" err="1" smtClean="0">
+                  <a:solidFill>
+                    <a:schemeClr val="bg1"/>
+                  </a:solidFill>
+                </a:rPr>
+                <a:t>StorageManager</a:t>
+              </a:r>
+              <a:endParaRPr lang="en-SG" sz="1200" dirty="0">
+                <a:solidFill>
+                  <a:schemeClr val="bg1"/>
+                </a:solidFill>
+              </a:endParaRPr>
+            </a:p>
+          </p:txBody>
+        </p:sp>
+        <p:sp>
+          <p:nvSpPr>
+            <p:cNvPr id="13" name="Rectangle 8"/>
+            <p:cNvSpPr/>
+            <p:nvPr/>
+          </p:nvSpPr>
+          <p:spPr>
+            <a:xfrm>
+              <a:off x="5894234" y="4017562"/>
+              <a:ext cx="1169835" cy="346760"/>
+            </a:xfrm>
+            <a:prstGeom prst="rect">
+              <a:avLst/>
+            </a:prstGeom>
+            <a:ln/>
+          </p:spPr>
+          <p:style>
+            <a:lnRef idx="2">
+              <a:schemeClr val="accent6"/>
+            </a:lnRef>
+            <a:fillRef idx="1">
+              <a:schemeClr val="lt1"/>
+            </a:fillRef>
+            <a:effectRef idx="0">
+              <a:schemeClr val="accent6"/>
+            </a:effectRef>
+            <a:fontRef idx="minor">
+              <a:schemeClr val="dk1"/>
+            </a:fontRef>
+          </p:style>
+          <p:txBody>
+            <a:bodyPr rtlCol="0" anchor="ctr"/>
+            <a:lstStyle/>
+            <a:p>
+              <a:pPr algn="ctr"/>
+              <a:r>
+                <a:rPr lang="en-US" sz="1050" b="1" dirty="0" smtClean="0">
+                  <a:solidFill>
+                    <a:schemeClr val="accent6">
+                      <a:lumMod val="75000"/>
+                    </a:schemeClr>
+                  </a:solidFill>
+                </a:rPr>
+                <a:t>: </a:t>
+              </a:r>
+              <a:r>
+                <a:rPr lang="en-US" sz="1050" b="1" dirty="0" err="1" smtClean="0">
+                  <a:solidFill>
+                    <a:schemeClr val="accent6">
+                      <a:lumMod val="75000"/>
+                    </a:schemeClr>
+                  </a:solidFill>
+                </a:rPr>
+                <a:t>XmlToDoList</a:t>
+              </a:r>
+              <a:endParaRPr lang="en-US" sz="1050" b="1" dirty="0" smtClean="0">
+                <a:solidFill>
+                  <a:schemeClr val="accent6">
+                    <a:lumMod val="75000"/>
+                  </a:schemeClr>
+                </a:solidFill>
+              </a:endParaRPr>
+            </a:p>
+            <a:p>
+              <a:pPr algn="ctr"/>
+              <a:r>
+                <a:rPr lang="en-US" sz="1050" b="1" dirty="0" smtClean="0">
+                  <a:solidFill>
+                    <a:schemeClr val="accent6">
+                      <a:lumMod val="75000"/>
+                    </a:schemeClr>
+                  </a:solidFill>
+                </a:rPr>
+                <a:t>Storage</a:t>
+              </a:r>
+              <a:endParaRPr lang="en-SG" sz="1050" b="1" dirty="0">
+                <a:solidFill>
+                  <a:schemeClr val="accent6">
+                    <a:lumMod val="75000"/>
+                  </a:schemeClr>
+                </a:solidFill>
+              </a:endParaRPr>
+            </a:p>
+          </p:txBody>
+        </p:sp>
+        <p:sp>
+          <p:nvSpPr>
+            <p:cNvPr id="19" name="Rectangle 8"/>
+            <p:cNvSpPr/>
+            <p:nvPr/>
+          </p:nvSpPr>
+          <p:spPr>
+            <a:xfrm>
+              <a:off x="2419161" y="4025183"/>
+              <a:ext cx="1093635" cy="346760"/>
+            </a:xfrm>
+            <a:prstGeom prst="rect">
+              <a:avLst/>
+            </a:prstGeom>
+            <a:ln/>
+          </p:spPr>
+          <p:style>
+            <a:lnRef idx="2">
+              <a:schemeClr val="accent6"/>
+            </a:lnRef>
+            <a:fillRef idx="1">
+              <a:schemeClr val="lt1"/>
+            </a:fillRef>
+            <a:effectRef idx="0">
+              <a:schemeClr val="accent6"/>
+            </a:effectRef>
+            <a:fontRef idx="minor">
+              <a:schemeClr val="dk1"/>
+            </a:fontRef>
+          </p:style>
+          <p:txBody>
+            <a:bodyPr rtlCol="0" anchor="ctr"/>
+            <a:lstStyle/>
+            <a:p>
+              <a:pPr algn="ctr"/>
+              <a:r>
+                <a:rPr lang="en-US" sz="1050" b="1" dirty="0" smtClean="0">
+                  <a:solidFill>
+                    <a:schemeClr val="accent6">
+                      <a:lumMod val="75000"/>
+                    </a:schemeClr>
+                  </a:solidFill>
+                </a:rPr>
+                <a:t>: </a:t>
+              </a:r>
+              <a:r>
+                <a:rPr lang="en-US" sz="1050" b="1" dirty="0" err="1" smtClean="0">
+                  <a:solidFill>
+                    <a:schemeClr val="accent6">
+                      <a:lumMod val="75000"/>
+                    </a:schemeClr>
+                  </a:solidFill>
+                </a:rPr>
+                <a:t>JsonUserPrefs</a:t>
+              </a:r>
+              <a:r>
+                <a:rPr lang="en-US" sz="1050" b="1" dirty="0" smtClean="0">
+                  <a:solidFill>
+                    <a:schemeClr val="accent6">
+                      <a:lumMod val="75000"/>
+                    </a:schemeClr>
+                  </a:solidFill>
+                </a:rPr>
+                <a:t/>
+              </a:r>
+              <a:br>
+                <a:rPr lang="en-US" sz="1050" b="1" dirty="0" smtClean="0">
+                  <a:solidFill>
+                    <a:schemeClr val="accent6">
+                      <a:lumMod val="75000"/>
+                    </a:schemeClr>
+                  </a:solidFill>
+                </a:rPr>
+              </a:br>
+              <a:r>
+                <a:rPr lang="en-US" sz="1050" b="1" dirty="0" smtClean="0">
+                  <a:solidFill>
+                    <a:schemeClr val="accent6">
+                      <a:lumMod val="75000"/>
+                    </a:schemeClr>
+                  </a:solidFill>
+                </a:rPr>
+                <a:t>Storage</a:t>
+              </a:r>
+              <a:endParaRPr lang="en-SG" sz="1050" b="1" dirty="0">
+                <a:solidFill>
+                  <a:schemeClr val="accent6">
+                    <a:lumMod val="75000"/>
+                  </a:schemeClr>
+                </a:solidFill>
+              </a:endParaRPr>
+            </a:p>
+          </p:txBody>
+        </p:sp>
+        <p:sp>
+          <p:nvSpPr>
+            <p:cNvPr id="23" name="Rounded Rectangle 22"/>
+            <p:cNvSpPr/>
+            <p:nvPr/>
+          </p:nvSpPr>
+          <p:spPr>
+            <a:xfrm>
+              <a:off x="4003446" y="1981200"/>
+              <a:ext cx="1362038" cy="367582"/>
+            </a:xfrm>
+            <a:prstGeom prst="roundRect">
+              <a:avLst>
+                <a:gd name="adj" fmla="val 5768"/>
+              </a:avLst>
+            </a:prstGeom>
+            <a:solidFill>
+              <a:schemeClr val="bg1">
+                <a:lumMod val="95000"/>
+              </a:schemeClr>
+            </a:solidFill>
+            <a:ln>
+              <a:solidFill>
+                <a:schemeClr val="bg1">
+                  <a:lumMod val="85000"/>
+                </a:schemeClr>
+              </a:solidFill>
+            </a:ln>
+          </p:spPr>
+          <p:style>
+            <a:lnRef idx="2">
+              <a:schemeClr val="accent1">
+                <a:shade val="50000"/>
+              </a:schemeClr>
+            </a:lnRef>
+            <a:fillRef idx="1">
+              <a:schemeClr val="accent1"/>
+            </a:fillRef>
+            <a:effectRef idx="0">
+              <a:schemeClr val="accent1"/>
+            </a:effectRef>
+            <a:fontRef idx="minor">
+              <a:schemeClr val="lt1"/>
+            </a:fontRef>
+          </p:style>
+          <p:txBody>
+            <a:bodyPr rtlCol="0" anchor="ctr"/>
+            <a:lstStyle/>
+            <a:p>
+              <a:pPr algn="ctr"/>
+              <a:r>
+                <a:rPr lang="en-US" sz="1400" dirty="0" smtClean="0">
+                  <a:solidFill>
+                    <a:schemeClr val="tx1"/>
+                  </a:solidFill>
+                </a:rPr>
+                <a:t>: </a:t>
+              </a:r>
+              <a:r>
+                <a:rPr lang="en-US" sz="1400" dirty="0" err="1" smtClean="0">
+                  <a:solidFill>
+                    <a:schemeClr val="tx1"/>
+                  </a:solidFill>
+                </a:rPr>
+                <a:t>MainApp</a:t>
+              </a:r>
+              <a:endParaRPr lang="en-US" sz="1400" dirty="0">
+                <a:solidFill>
+                  <a:schemeClr val="tx1"/>
+                </a:solidFill>
+              </a:endParaRPr>
+            </a:p>
+          </p:txBody>
+        </p:sp>
+        <p:cxnSp>
+          <p:nvCxnSpPr>
+            <p:cNvPr id="30" name="Straight Connector 29"/>
+            <p:cNvCxnSpPr>
+              <a:stCxn id="23" idx="2"/>
+              <a:endCxn id="4" idx="0"/>
+            </p:cNvCxnSpPr>
+            <p:nvPr/>
+          </p:nvCxnSpPr>
+          <p:spPr>
+            <a:xfrm>
+              <a:off x="4684465" y="2348782"/>
+              <a:ext cx="0" cy="470618"/>
+            </a:xfrm>
+            <a:prstGeom prst="line">
+              <a:avLst/>
+            </a:prstGeom>
+            <a:ln w="28575">
+              <a:solidFill>
+                <a:schemeClr val="tx1"/>
+              </a:solidFill>
+            </a:ln>
+          </p:spPr>
+          <p:style>
+            <a:lnRef idx="1">
+              <a:schemeClr val="accent1"/>
+            </a:lnRef>
+            <a:fillRef idx="0">
+              <a:schemeClr val="accent1"/>
+            </a:fillRef>
+            <a:effectRef idx="0">
+              <a:schemeClr val="accent1"/>
+            </a:effectRef>
+            <a:fontRef idx="minor">
+              <a:schemeClr val="tx1"/>
+            </a:fontRef>
+          </p:style>
+        </p:cxnSp>
+        <p:cxnSp>
+          <p:nvCxnSpPr>
+            <p:cNvPr id="41" name="Straight Connector 40"/>
+            <p:cNvCxnSpPr>
+              <a:stCxn id="4" idx="2"/>
+            </p:cNvCxnSpPr>
+            <p:nvPr/>
+          </p:nvCxnSpPr>
+          <p:spPr>
+            <a:xfrm>
+              <a:off x="4684465" y="3166160"/>
+              <a:ext cx="1" cy="859022"/>
+            </a:xfrm>
+            <a:prstGeom prst="line">
+              <a:avLst/>
+            </a:prstGeom>
+            <a:ln w="28575">
+              <a:solidFill>
+                <a:schemeClr val="accent6"/>
+              </a:solidFill>
+            </a:ln>
+          </p:spPr>
+          <p:style>
+            <a:lnRef idx="1">
+              <a:schemeClr val="accent1"/>
+            </a:lnRef>
+            <a:fillRef idx="0">
+              <a:schemeClr val="accent1"/>
+            </a:fillRef>
+            <a:effectRef idx="0">
+              <a:schemeClr val="accent1"/>
+            </a:effectRef>
+            <a:fontRef idx="minor">
+              <a:schemeClr val="tx1"/>
+            </a:fontRef>
+          </p:style>
+        </p:cxnSp>
+        <p:cxnSp>
+          <p:nvCxnSpPr>
+            <p:cNvPr id="43" name="Elbow Connector 42"/>
+            <p:cNvCxnSpPr>
+              <a:endCxn id="19" idx="0"/>
+            </p:cNvCxnSpPr>
+            <p:nvPr/>
+          </p:nvCxnSpPr>
+          <p:spPr>
+            <a:xfrm rot="10800000" flipV="1">
+              <a:off x="2965979" y="3649979"/>
+              <a:ext cx="1718486" cy="375203"/>
+            </a:xfrm>
+            <a:prstGeom prst="bentConnector2">
+              <a:avLst/>
+            </a:prstGeom>
+            <a:ln w="28575">
+              <a:solidFill>
+                <a:schemeClr val="accent6"/>
+              </a:solidFill>
+            </a:ln>
+          </p:spPr>
+          <p:style>
+            <a:lnRef idx="1">
+              <a:schemeClr val="accent1"/>
+            </a:lnRef>
+            <a:fillRef idx="0">
+              <a:schemeClr val="accent1"/>
+            </a:fillRef>
+            <a:effectRef idx="0">
+              <a:schemeClr val="accent1"/>
+            </a:effectRef>
+            <a:fontRef idx="minor">
+              <a:schemeClr val="tx1"/>
+            </a:fontRef>
+          </p:style>
+        </p:cxnSp>
+        <p:cxnSp>
+          <p:nvCxnSpPr>
+            <p:cNvPr id="45" name="Elbow Connector 44"/>
+            <p:cNvCxnSpPr>
+              <a:endCxn id="13" idx="0"/>
+            </p:cNvCxnSpPr>
+            <p:nvPr/>
+          </p:nvCxnSpPr>
+          <p:spPr>
+            <a:xfrm>
+              <a:off x="4684466" y="3649980"/>
+              <a:ext cx="1794686" cy="367582"/>
+            </a:xfrm>
+            <a:prstGeom prst="bentConnector2">
+              <a:avLst/>
+            </a:prstGeom>
+            <a:ln w="28575">
+              <a:solidFill>
+                <a:schemeClr val="accent6"/>
+              </a:solidFill>
+            </a:ln>
+          </p:spPr>
+          <p:style>
+            <a:lnRef idx="1">
+              <a:schemeClr val="accent1"/>
+            </a:lnRef>
+            <a:fillRef idx="0">
+              <a:schemeClr val="accent1"/>
+            </a:fillRef>
+            <a:effectRef idx="0">
+              <a:schemeClr val="accent1"/>
+            </a:effectRef>
+            <a:fontRef idx="minor">
+              <a:schemeClr val="tx1"/>
+            </a:fontRef>
+          </p:style>
+        </p:cxnSp>
+        <p:sp>
+          <p:nvSpPr>
+            <p:cNvPr id="56" name="Rectangle 45"/>
+            <p:cNvSpPr/>
+            <p:nvPr/>
+          </p:nvSpPr>
+          <p:spPr>
+            <a:xfrm>
+              <a:off x="4011330" y="4017562"/>
+              <a:ext cx="1354154" cy="354381"/>
+            </a:xfrm>
+            <a:prstGeom prst="roundRect">
+              <a:avLst/>
+            </a:prstGeom>
+            <a:ln/>
+          </p:spPr>
+          <p:style>
+            <a:lnRef idx="2">
+              <a:schemeClr val="accent1"/>
+            </a:lnRef>
+            <a:fillRef idx="1">
+              <a:schemeClr val="lt1"/>
+            </a:fillRef>
+            <a:effectRef idx="0">
+              <a:schemeClr val="accent1"/>
+            </a:effectRef>
+            <a:fontRef idx="minor">
+              <a:schemeClr val="dk1"/>
+            </a:fontRef>
+          </p:style>
+          <p:txBody>
+            <a:bodyPr rtlCol="0" anchor="ctr"/>
+            <a:lstStyle/>
+            <a:p>
+              <a:pPr algn="ctr"/>
+              <a:r>
+                <a:rPr lang="en-US" sz="1200" dirty="0" smtClean="0">
+                  <a:solidFill>
+                    <a:schemeClr val="tx1"/>
+                  </a:solidFill>
+                </a:rPr>
+                <a:t>: </a:t>
+              </a:r>
+              <a:r>
+                <a:rPr lang="en-US" sz="1200" dirty="0" err="1" smtClean="0">
+                  <a:solidFill>
+                    <a:schemeClr val="tx1"/>
+                  </a:solidFill>
+                </a:rPr>
+                <a:t>Config</a:t>
+              </a:r>
+              <a:endParaRPr lang="en-SG" sz="1200" dirty="0">
+                <a:solidFill>
+                  <a:schemeClr val="tx1"/>
+                </a:solidFill>
+              </a:endParaRPr>
+            </a:p>
+          </p:txBody>
+        </p:sp>
+      </p:grpSp>
     </p:spTree>
     <p:extLst>
       <p:ext uri="{BB962C8B-B14F-4D97-AF65-F5344CB8AC3E}">

</xml_diff>

<commit_message>
Update diagrams for Model and Storage components
</commit_message>
<xml_diff>
--- a/docs/diagrams/Diagrams.pptx
+++ b/docs/diagrams/Diagrams.pptx
@@ -115,6 +115,22 @@
       </a:defRPr>
     </a:lvl9pPr>
   </p:defaultTextStyle>
+  <p:extLst>
+    <p:ext uri="{EFAFB233-063F-42B5-8137-9DF3F51BA10A}">
+      <p15:sldGuideLst xmlns:p15="http://schemas.microsoft.com/office/powerpoint/2012/main">
+        <p15:guide id="1" orient="horz" pos="1488">
+          <p15:clr>
+            <a:srgbClr val="A4A3A4"/>
+          </p15:clr>
+        </p15:guide>
+        <p15:guide id="2" pos="2880">
+          <p15:clr>
+            <a:srgbClr val="A4A3A4"/>
+          </p15:clr>
+        </p15:guide>
+      </p15:sldGuideLst>
+    </p:ext>
+  </p:extLst>
 </p:presentation>
 </file>
 
@@ -200,7 +216,7 @@
           <a:p>
             <a:fld id="{F5CC4B3F-88C1-4FFA-B1B6-F41C21DC6924}" type="datetimeFigureOut">
               <a:rPr lang="en-US" smtClean="0"/>
-              <a:t>9/30/2016</a:t>
+              <a:t>10/25/2016</a:t>
             </a:fld>
             <a:endParaRPr lang="en-US"/>
           </a:p>
@@ -264,38 +280,37 @@
           <a:p>
             <a:pPr lvl="0"/>
             <a:r>
-              <a:rPr lang="en-US" smtClean="0"/>
+              <a:rPr lang="en-US"/>
               <a:t>Click to edit Master text styles</a:t>
             </a:r>
           </a:p>
           <a:p>
             <a:pPr lvl="1"/>
             <a:r>
-              <a:rPr lang="en-US" smtClean="0"/>
+              <a:rPr lang="en-US"/>
               <a:t>Second level</a:t>
             </a:r>
           </a:p>
           <a:p>
             <a:pPr lvl="2"/>
             <a:r>
-              <a:rPr lang="en-US" smtClean="0"/>
+              <a:rPr lang="en-US"/>
               <a:t>Third level</a:t>
             </a:r>
           </a:p>
           <a:p>
             <a:pPr lvl="3"/>
             <a:r>
-              <a:rPr lang="en-US" smtClean="0"/>
+              <a:rPr lang="en-US"/>
               <a:t>Fourth level</a:t>
             </a:r>
           </a:p>
           <a:p>
             <a:pPr lvl="4"/>
             <a:r>
-              <a:rPr lang="en-US" smtClean="0"/>
+              <a:rPr lang="en-US"/>
               <a:t>Fifth level</a:t>
             </a:r>
-            <a:endParaRPr lang="en-US"/>
           </a:p>
         </p:txBody>
       </p:sp>
@@ -468,6 +483,90 @@
 </p:notesMaster>
 </file>
 
+<file path=ppt/notesSlides/notesSlide1.xml><?xml version="1.0" encoding="utf-8"?>
+<p:notes xmlns:a="http://schemas.openxmlformats.org/drawingml/2006/main" xmlns:r="http://schemas.openxmlformats.org/officeDocument/2006/relationships" xmlns:p="http://schemas.openxmlformats.org/presentationml/2006/main">
+  <p:cSld>
+    <p:spTree>
+      <p:nvGrpSpPr>
+        <p:cNvPr id="1" name=""/>
+        <p:cNvGrpSpPr/>
+        <p:nvPr/>
+      </p:nvGrpSpPr>
+      <p:grpSpPr>
+        <a:xfrm>
+          <a:off x="0" y="0"/>
+          <a:ext cx="0" cy="0"/>
+          <a:chOff x="0" y="0"/>
+          <a:chExt cx="0" cy="0"/>
+        </a:xfrm>
+      </p:grpSpPr>
+      <p:sp>
+        <p:nvSpPr>
+          <p:cNvPr id="2" name="Slide Image Placeholder 1"/>
+          <p:cNvSpPr>
+            <a:spLocks noGrp="1" noRot="1" noChangeAspect="1"/>
+          </p:cNvSpPr>
+          <p:nvPr>
+            <p:ph type="sldImg"/>
+          </p:nvPr>
+        </p:nvSpPr>
+        <p:spPr/>
+      </p:sp>
+      <p:sp>
+        <p:nvSpPr>
+          <p:cNvPr id="3" name="Notes Placeholder 2"/>
+          <p:cNvSpPr>
+            <a:spLocks noGrp="1"/>
+          </p:cNvSpPr>
+          <p:nvPr>
+            <p:ph type="body" idx="1"/>
+          </p:nvPr>
+        </p:nvSpPr>
+        <p:spPr/>
+        <p:txBody>
+          <a:bodyPr/>
+          <a:lstStyle/>
+          <a:p>
+            <a:endParaRPr lang="en-SG" dirty="0"/>
+          </a:p>
+        </p:txBody>
+      </p:sp>
+      <p:sp>
+        <p:nvSpPr>
+          <p:cNvPr id="4" name="Slide Number Placeholder 3"/>
+          <p:cNvSpPr>
+            <a:spLocks noGrp="1"/>
+          </p:cNvSpPr>
+          <p:nvPr>
+            <p:ph type="sldNum" sz="quarter" idx="10"/>
+          </p:nvPr>
+        </p:nvSpPr>
+        <p:spPr/>
+        <p:txBody>
+          <a:bodyPr/>
+          <a:lstStyle/>
+          <a:p>
+            <a:fld id="{5A7AB025-77E3-4BD1-A2FD-B3183DBA47A3}" type="slidenum">
+              <a:rPr lang="en-US" smtClean="0"/>
+              <a:t>7</a:t>
+            </a:fld>
+            <a:endParaRPr lang="en-US"/>
+          </a:p>
+        </p:txBody>
+      </p:sp>
+    </p:spTree>
+    <p:extLst>
+      <p:ext uri="{BB962C8B-B14F-4D97-AF65-F5344CB8AC3E}">
+        <p14:creationId xmlns:p14="http://schemas.microsoft.com/office/powerpoint/2010/main" val="533309416"/>
+      </p:ext>
+    </p:extLst>
+  </p:cSld>
+  <p:clrMapOvr>
+    <a:masterClrMapping/>
+  </p:clrMapOvr>
+</p:notes>
+</file>
+
 <file path=ppt/slideLayouts/slideLayout1.xml><?xml version="1.0" encoding="utf-8"?>
 <p:sldLayout xmlns:a="http://schemas.openxmlformats.org/drawingml/2006/main" xmlns:r="http://schemas.openxmlformats.org/officeDocument/2006/relationships" xmlns:p="http://schemas.openxmlformats.org/presentationml/2006/main" type="title" preserve="1">
   <p:cSld name="Title Slide">
@@ -506,10 +605,9 @@
           <a:lstStyle/>
           <a:p>
             <a:r>
-              <a:rPr lang="en-US" smtClean="0"/>
+              <a:rPr lang="en-US"/>
               <a:t>Click to edit Master title style</a:t>
             </a:r>
-            <a:endParaRPr lang="en-US"/>
           </a:p>
         </p:txBody>
       </p:sp>
@@ -625,10 +723,9 @@
           </a:lstStyle>
           <a:p>
             <a:r>
-              <a:rPr lang="en-US" smtClean="0"/>
+              <a:rPr lang="en-US"/>
               <a:t>Click to edit Master subtitle style</a:t>
             </a:r>
-            <a:endParaRPr lang="en-US"/>
           </a:p>
         </p:txBody>
       </p:sp>
@@ -649,7 +746,7 @@
           <a:p>
             <a:fld id="{78C97017-6FC3-485B-9764-EAC9E56C1D49}" type="datetimeFigureOut">
               <a:rPr lang="en-US" smtClean="0"/>
-              <a:t>9/30/2016</a:t>
+              <a:t>10/25/2016</a:t>
             </a:fld>
             <a:endParaRPr lang="en-US"/>
           </a:p>
@@ -743,10 +840,9 @@
           <a:lstStyle/>
           <a:p>
             <a:r>
-              <a:rPr lang="en-US" smtClean="0"/>
+              <a:rPr lang="en-US"/>
               <a:t>Click to edit Master title style</a:t>
             </a:r>
-            <a:endParaRPr lang="en-US"/>
           </a:p>
         </p:txBody>
       </p:sp>
@@ -767,38 +863,37 @@
           <a:p>
             <a:pPr lvl="0"/>
             <a:r>
-              <a:rPr lang="en-US" smtClean="0"/>
+              <a:rPr lang="en-US"/>
               <a:t>Click to edit Master text styles</a:t>
             </a:r>
           </a:p>
           <a:p>
             <a:pPr lvl="1"/>
             <a:r>
-              <a:rPr lang="en-US" smtClean="0"/>
+              <a:rPr lang="en-US"/>
               <a:t>Second level</a:t>
             </a:r>
           </a:p>
           <a:p>
             <a:pPr lvl="2"/>
             <a:r>
-              <a:rPr lang="en-US" smtClean="0"/>
+              <a:rPr lang="en-US"/>
               <a:t>Third level</a:t>
             </a:r>
           </a:p>
           <a:p>
             <a:pPr lvl="3"/>
             <a:r>
-              <a:rPr lang="en-US" smtClean="0"/>
+              <a:rPr lang="en-US"/>
               <a:t>Fourth level</a:t>
             </a:r>
           </a:p>
           <a:p>
             <a:pPr lvl="4"/>
             <a:r>
-              <a:rPr lang="en-US" smtClean="0"/>
+              <a:rPr lang="en-US"/>
               <a:t>Fifth level</a:t>
             </a:r>
-            <a:endParaRPr lang="en-US"/>
           </a:p>
         </p:txBody>
       </p:sp>
@@ -819,7 +914,7 @@
           <a:p>
             <a:fld id="{78C97017-6FC3-485B-9764-EAC9E56C1D49}" type="datetimeFigureOut">
               <a:rPr lang="en-US" smtClean="0"/>
-              <a:t>9/30/2016</a:t>
+              <a:t>10/25/2016</a:t>
             </a:fld>
             <a:endParaRPr lang="en-US"/>
           </a:p>
@@ -918,10 +1013,9 @@
           <a:lstStyle/>
           <a:p>
             <a:r>
-              <a:rPr lang="en-US" smtClean="0"/>
+              <a:rPr lang="en-US"/>
               <a:t>Click to edit Master title style</a:t>
             </a:r>
-            <a:endParaRPr lang="en-US"/>
           </a:p>
         </p:txBody>
       </p:sp>
@@ -947,38 +1041,37 @@
           <a:p>
             <a:pPr lvl="0"/>
             <a:r>
-              <a:rPr lang="en-US" smtClean="0"/>
+              <a:rPr lang="en-US"/>
               <a:t>Click to edit Master text styles</a:t>
             </a:r>
           </a:p>
           <a:p>
             <a:pPr lvl="1"/>
             <a:r>
-              <a:rPr lang="en-US" smtClean="0"/>
+              <a:rPr lang="en-US"/>
               <a:t>Second level</a:t>
             </a:r>
           </a:p>
           <a:p>
             <a:pPr lvl="2"/>
             <a:r>
-              <a:rPr lang="en-US" smtClean="0"/>
+              <a:rPr lang="en-US"/>
               <a:t>Third level</a:t>
             </a:r>
           </a:p>
           <a:p>
             <a:pPr lvl="3"/>
             <a:r>
-              <a:rPr lang="en-US" smtClean="0"/>
+              <a:rPr lang="en-US"/>
               <a:t>Fourth level</a:t>
             </a:r>
           </a:p>
           <a:p>
             <a:pPr lvl="4"/>
             <a:r>
-              <a:rPr lang="en-US" smtClean="0"/>
+              <a:rPr lang="en-US"/>
               <a:t>Fifth level</a:t>
             </a:r>
-            <a:endParaRPr lang="en-US"/>
           </a:p>
         </p:txBody>
       </p:sp>
@@ -999,7 +1092,7 @@
           <a:p>
             <a:fld id="{78C97017-6FC3-485B-9764-EAC9E56C1D49}" type="datetimeFigureOut">
               <a:rPr lang="en-US" smtClean="0"/>
-              <a:t>9/30/2016</a:t>
+              <a:t>10/25/2016</a:t>
             </a:fld>
             <a:endParaRPr lang="en-US"/>
           </a:p>
@@ -1093,10 +1186,9 @@
           <a:lstStyle/>
           <a:p>
             <a:r>
-              <a:rPr lang="en-US" smtClean="0"/>
+              <a:rPr lang="en-US"/>
               <a:t>Click to edit Master title style</a:t>
             </a:r>
-            <a:endParaRPr lang="en-US"/>
           </a:p>
         </p:txBody>
       </p:sp>
@@ -1117,38 +1209,37 @@
           <a:p>
             <a:pPr lvl="0"/>
             <a:r>
-              <a:rPr lang="en-US" smtClean="0"/>
+              <a:rPr lang="en-US"/>
               <a:t>Click to edit Master text styles</a:t>
             </a:r>
           </a:p>
           <a:p>
             <a:pPr lvl="1"/>
             <a:r>
-              <a:rPr lang="en-US" smtClean="0"/>
+              <a:rPr lang="en-US"/>
               <a:t>Second level</a:t>
             </a:r>
           </a:p>
           <a:p>
             <a:pPr lvl="2"/>
             <a:r>
-              <a:rPr lang="en-US" smtClean="0"/>
+              <a:rPr lang="en-US"/>
               <a:t>Third level</a:t>
             </a:r>
           </a:p>
           <a:p>
             <a:pPr lvl="3"/>
             <a:r>
-              <a:rPr lang="en-US" smtClean="0"/>
+              <a:rPr lang="en-US"/>
               <a:t>Fourth level</a:t>
             </a:r>
           </a:p>
           <a:p>
             <a:pPr lvl="4"/>
             <a:r>
-              <a:rPr lang="en-US" smtClean="0"/>
+              <a:rPr lang="en-US"/>
               <a:t>Fifth level</a:t>
             </a:r>
-            <a:endParaRPr lang="en-US"/>
           </a:p>
         </p:txBody>
       </p:sp>
@@ -1169,7 +1260,7 @@
           <a:p>
             <a:fld id="{78C97017-6FC3-485B-9764-EAC9E56C1D49}" type="datetimeFigureOut">
               <a:rPr lang="en-US" smtClean="0"/>
-              <a:t>9/30/2016</a:t>
+              <a:t>10/25/2016</a:t>
             </a:fld>
             <a:endParaRPr lang="en-US"/>
           </a:p>
@@ -1272,10 +1363,9 @@
           </a:lstStyle>
           <a:p>
             <a:r>
-              <a:rPr lang="en-US" smtClean="0"/>
+              <a:rPr lang="en-US"/>
               <a:t>Click to edit Master title style</a:t>
             </a:r>
-            <a:endParaRPr lang="en-US"/>
           </a:p>
         </p:txBody>
       </p:sp>
@@ -1392,7 +1482,7 @@
           <a:p>
             <a:pPr lvl="0"/>
             <a:r>
-              <a:rPr lang="en-US" smtClean="0"/>
+              <a:rPr lang="en-US"/>
               <a:t>Click to edit Master text styles</a:t>
             </a:r>
           </a:p>
@@ -1415,7 +1505,7 @@
           <a:p>
             <a:fld id="{78C97017-6FC3-485B-9764-EAC9E56C1D49}" type="datetimeFigureOut">
               <a:rPr lang="en-US" smtClean="0"/>
-              <a:t>9/30/2016</a:t>
+              <a:t>10/25/2016</a:t>
             </a:fld>
             <a:endParaRPr lang="en-US"/>
           </a:p>
@@ -1509,10 +1599,9 @@
           <a:lstStyle/>
           <a:p>
             <a:r>
-              <a:rPr lang="en-US" smtClean="0"/>
+              <a:rPr lang="en-US"/>
               <a:t>Click to edit Master title style</a:t>
             </a:r>
-            <a:endParaRPr lang="en-US"/>
           </a:p>
         </p:txBody>
       </p:sp>
@@ -1566,38 +1655,37 @@
           <a:p>
             <a:pPr lvl="0"/>
             <a:r>
-              <a:rPr lang="en-US" smtClean="0"/>
+              <a:rPr lang="en-US"/>
               <a:t>Click to edit Master text styles</a:t>
             </a:r>
           </a:p>
           <a:p>
             <a:pPr lvl="1"/>
             <a:r>
-              <a:rPr lang="en-US" smtClean="0"/>
+              <a:rPr lang="en-US"/>
               <a:t>Second level</a:t>
             </a:r>
           </a:p>
           <a:p>
             <a:pPr lvl="2"/>
             <a:r>
-              <a:rPr lang="en-US" smtClean="0"/>
+              <a:rPr lang="en-US"/>
               <a:t>Third level</a:t>
             </a:r>
           </a:p>
           <a:p>
             <a:pPr lvl="3"/>
             <a:r>
-              <a:rPr lang="en-US" smtClean="0"/>
+              <a:rPr lang="en-US"/>
               <a:t>Fourth level</a:t>
             </a:r>
           </a:p>
           <a:p>
             <a:pPr lvl="4"/>
             <a:r>
-              <a:rPr lang="en-US" smtClean="0"/>
+              <a:rPr lang="en-US"/>
               <a:t>Fifth level</a:t>
             </a:r>
-            <a:endParaRPr lang="en-US"/>
           </a:p>
         </p:txBody>
       </p:sp>
@@ -1651,38 +1739,37 @@
           <a:p>
             <a:pPr lvl="0"/>
             <a:r>
-              <a:rPr lang="en-US" smtClean="0"/>
+              <a:rPr lang="en-US"/>
               <a:t>Click to edit Master text styles</a:t>
             </a:r>
           </a:p>
           <a:p>
             <a:pPr lvl="1"/>
             <a:r>
-              <a:rPr lang="en-US" smtClean="0"/>
+              <a:rPr lang="en-US"/>
               <a:t>Second level</a:t>
             </a:r>
           </a:p>
           <a:p>
             <a:pPr lvl="2"/>
             <a:r>
-              <a:rPr lang="en-US" smtClean="0"/>
+              <a:rPr lang="en-US"/>
               <a:t>Third level</a:t>
             </a:r>
           </a:p>
           <a:p>
             <a:pPr lvl="3"/>
             <a:r>
-              <a:rPr lang="en-US" smtClean="0"/>
+              <a:rPr lang="en-US"/>
               <a:t>Fourth level</a:t>
             </a:r>
           </a:p>
           <a:p>
             <a:pPr lvl="4"/>
             <a:r>
-              <a:rPr lang="en-US" smtClean="0"/>
+              <a:rPr lang="en-US"/>
               <a:t>Fifth level</a:t>
             </a:r>
-            <a:endParaRPr lang="en-US"/>
           </a:p>
         </p:txBody>
       </p:sp>
@@ -1703,7 +1790,7 @@
           <a:p>
             <a:fld id="{78C97017-6FC3-485B-9764-EAC9E56C1D49}" type="datetimeFigureOut">
               <a:rPr lang="en-US" smtClean="0"/>
-              <a:t>9/30/2016</a:t>
+              <a:t>10/25/2016</a:t>
             </a:fld>
             <a:endParaRPr lang="en-US"/>
           </a:p>
@@ -1801,10 +1888,9 @@
           </a:lstStyle>
           <a:p>
             <a:r>
-              <a:rPr lang="en-US" smtClean="0"/>
+              <a:rPr lang="en-US"/>
               <a:t>Click to edit Master title style</a:t>
             </a:r>
-            <a:endParaRPr lang="en-US"/>
           </a:p>
         </p:txBody>
       </p:sp>
@@ -1867,7 +1953,7 @@
           <a:p>
             <a:pPr lvl="0"/>
             <a:r>
-              <a:rPr lang="en-US" smtClean="0"/>
+              <a:rPr lang="en-US"/>
               <a:t>Click to edit Master text styles</a:t>
             </a:r>
           </a:p>
@@ -1923,38 +2009,37 @@
           <a:p>
             <a:pPr lvl="0"/>
             <a:r>
-              <a:rPr lang="en-US" smtClean="0"/>
+              <a:rPr lang="en-US"/>
               <a:t>Click to edit Master text styles</a:t>
             </a:r>
           </a:p>
           <a:p>
             <a:pPr lvl="1"/>
             <a:r>
-              <a:rPr lang="en-US" smtClean="0"/>
+              <a:rPr lang="en-US"/>
               <a:t>Second level</a:t>
             </a:r>
           </a:p>
           <a:p>
             <a:pPr lvl="2"/>
             <a:r>
-              <a:rPr lang="en-US" smtClean="0"/>
+              <a:rPr lang="en-US"/>
               <a:t>Third level</a:t>
             </a:r>
           </a:p>
           <a:p>
             <a:pPr lvl="3"/>
             <a:r>
-              <a:rPr lang="en-US" smtClean="0"/>
+              <a:rPr lang="en-US"/>
               <a:t>Fourth level</a:t>
             </a:r>
           </a:p>
           <a:p>
             <a:pPr lvl="4"/>
             <a:r>
-              <a:rPr lang="en-US" smtClean="0"/>
+              <a:rPr lang="en-US"/>
               <a:t>Fifth level</a:t>
             </a:r>
-            <a:endParaRPr lang="en-US"/>
           </a:p>
         </p:txBody>
       </p:sp>
@@ -2017,7 +2102,7 @@
           <a:p>
             <a:pPr lvl="0"/>
             <a:r>
-              <a:rPr lang="en-US" smtClean="0"/>
+              <a:rPr lang="en-US"/>
               <a:t>Click to edit Master text styles</a:t>
             </a:r>
           </a:p>
@@ -2073,38 +2158,37 @@
           <a:p>
             <a:pPr lvl="0"/>
             <a:r>
-              <a:rPr lang="en-US" smtClean="0"/>
+              <a:rPr lang="en-US"/>
               <a:t>Click to edit Master text styles</a:t>
             </a:r>
           </a:p>
           <a:p>
             <a:pPr lvl="1"/>
             <a:r>
-              <a:rPr lang="en-US" smtClean="0"/>
+              <a:rPr lang="en-US"/>
               <a:t>Second level</a:t>
             </a:r>
           </a:p>
           <a:p>
             <a:pPr lvl="2"/>
             <a:r>
-              <a:rPr lang="en-US" smtClean="0"/>
+              <a:rPr lang="en-US"/>
               <a:t>Third level</a:t>
             </a:r>
           </a:p>
           <a:p>
             <a:pPr lvl="3"/>
             <a:r>
-              <a:rPr lang="en-US" smtClean="0"/>
+              <a:rPr lang="en-US"/>
               <a:t>Fourth level</a:t>
             </a:r>
           </a:p>
           <a:p>
             <a:pPr lvl="4"/>
             <a:r>
-              <a:rPr lang="en-US" smtClean="0"/>
+              <a:rPr lang="en-US"/>
               <a:t>Fifth level</a:t>
             </a:r>
-            <a:endParaRPr lang="en-US"/>
           </a:p>
         </p:txBody>
       </p:sp>
@@ -2125,7 +2209,7 @@
           <a:p>
             <a:fld id="{78C97017-6FC3-485B-9764-EAC9E56C1D49}" type="datetimeFigureOut">
               <a:rPr lang="en-US" smtClean="0"/>
-              <a:t>9/30/2016</a:t>
+              <a:t>10/25/2016</a:t>
             </a:fld>
             <a:endParaRPr lang="en-US"/>
           </a:p>
@@ -2219,10 +2303,9 @@
           <a:lstStyle/>
           <a:p>
             <a:r>
-              <a:rPr lang="en-US" smtClean="0"/>
+              <a:rPr lang="en-US"/>
               <a:t>Click to edit Master title style</a:t>
             </a:r>
-            <a:endParaRPr lang="en-US"/>
           </a:p>
         </p:txBody>
       </p:sp>
@@ -2243,7 +2326,7 @@
           <a:p>
             <a:fld id="{78C97017-6FC3-485B-9764-EAC9E56C1D49}" type="datetimeFigureOut">
               <a:rPr lang="en-US" smtClean="0"/>
-              <a:t>9/30/2016</a:t>
+              <a:t>10/25/2016</a:t>
             </a:fld>
             <a:endParaRPr lang="en-US"/>
           </a:p>
@@ -2338,7 +2421,7 @@
           <a:p>
             <a:fld id="{78C97017-6FC3-485B-9764-EAC9E56C1D49}" type="datetimeFigureOut">
               <a:rPr lang="en-US" smtClean="0"/>
-              <a:t>9/30/2016</a:t>
+              <a:t>10/25/2016</a:t>
             </a:fld>
             <a:endParaRPr lang="en-US"/>
           </a:p>
@@ -2441,10 +2524,9 @@
           </a:lstStyle>
           <a:p>
             <a:r>
-              <a:rPr lang="en-US" smtClean="0"/>
+              <a:rPr lang="en-US"/>
               <a:t>Click to edit Master title style</a:t>
             </a:r>
-            <a:endParaRPr lang="en-US"/>
           </a:p>
         </p:txBody>
       </p:sp>
@@ -2498,38 +2580,37 @@
           <a:p>
             <a:pPr lvl="0"/>
             <a:r>
-              <a:rPr lang="en-US" smtClean="0"/>
+              <a:rPr lang="en-US"/>
               <a:t>Click to edit Master text styles</a:t>
             </a:r>
           </a:p>
           <a:p>
             <a:pPr lvl="1"/>
             <a:r>
-              <a:rPr lang="en-US" smtClean="0"/>
+              <a:rPr lang="en-US"/>
               <a:t>Second level</a:t>
             </a:r>
           </a:p>
           <a:p>
             <a:pPr lvl="2"/>
             <a:r>
-              <a:rPr lang="en-US" smtClean="0"/>
+              <a:rPr lang="en-US"/>
               <a:t>Third level</a:t>
             </a:r>
           </a:p>
           <a:p>
             <a:pPr lvl="3"/>
             <a:r>
-              <a:rPr lang="en-US" smtClean="0"/>
+              <a:rPr lang="en-US"/>
               <a:t>Fourth level</a:t>
             </a:r>
           </a:p>
           <a:p>
             <a:pPr lvl="4"/>
             <a:r>
-              <a:rPr lang="en-US" smtClean="0"/>
+              <a:rPr lang="en-US"/>
               <a:t>Fifth level</a:t>
             </a:r>
-            <a:endParaRPr lang="en-US"/>
           </a:p>
         </p:txBody>
       </p:sp>
@@ -2592,7 +2673,7 @@
           <a:p>
             <a:pPr lvl="0"/>
             <a:r>
-              <a:rPr lang="en-US" smtClean="0"/>
+              <a:rPr lang="en-US"/>
               <a:t>Click to edit Master text styles</a:t>
             </a:r>
           </a:p>
@@ -2615,7 +2696,7 @@
           <a:p>
             <a:fld id="{78C97017-6FC3-485B-9764-EAC9E56C1D49}" type="datetimeFigureOut">
               <a:rPr lang="en-US" smtClean="0"/>
-              <a:t>9/30/2016</a:t>
+              <a:t>10/25/2016</a:t>
             </a:fld>
             <a:endParaRPr lang="en-US"/>
           </a:p>
@@ -2718,10 +2799,9 @@
           </a:lstStyle>
           <a:p>
             <a:r>
-              <a:rPr lang="en-US" smtClean="0"/>
+              <a:rPr lang="en-US"/>
               <a:t>Click to edit Master title style</a:t>
             </a:r>
-            <a:endParaRPr lang="en-US"/>
           </a:p>
         </p:txBody>
       </p:sp>
@@ -2845,7 +2925,7 @@
           <a:p>
             <a:pPr lvl="0"/>
             <a:r>
-              <a:rPr lang="en-US" smtClean="0"/>
+              <a:rPr lang="en-US"/>
               <a:t>Click to edit Master text styles</a:t>
             </a:r>
           </a:p>
@@ -2868,7 +2948,7 @@
           <a:p>
             <a:fld id="{78C97017-6FC3-485B-9764-EAC9E56C1D49}" type="datetimeFigureOut">
               <a:rPr lang="en-US" smtClean="0"/>
-              <a:t>9/30/2016</a:t>
+              <a:t>10/25/2016</a:t>
             </a:fld>
             <a:endParaRPr lang="en-US"/>
           </a:p>
@@ -2977,10 +3057,9 @@
           <a:lstStyle/>
           <a:p>
             <a:r>
-              <a:rPr lang="en-US" smtClean="0"/>
+              <a:rPr lang="en-US"/>
               <a:t>Click to edit Master title style</a:t>
             </a:r>
-            <a:endParaRPr lang="en-US"/>
           </a:p>
         </p:txBody>
       </p:sp>
@@ -3011,38 +3090,37 @@
           <a:p>
             <a:pPr lvl="0"/>
             <a:r>
-              <a:rPr lang="en-US" smtClean="0"/>
+              <a:rPr lang="en-US"/>
               <a:t>Click to edit Master text styles</a:t>
             </a:r>
           </a:p>
           <a:p>
             <a:pPr lvl="1"/>
             <a:r>
-              <a:rPr lang="en-US" smtClean="0"/>
+              <a:rPr lang="en-US"/>
               <a:t>Second level</a:t>
             </a:r>
           </a:p>
           <a:p>
             <a:pPr lvl="2"/>
             <a:r>
-              <a:rPr lang="en-US" smtClean="0"/>
+              <a:rPr lang="en-US"/>
               <a:t>Third level</a:t>
             </a:r>
           </a:p>
           <a:p>
             <a:pPr lvl="3"/>
             <a:r>
-              <a:rPr lang="en-US" smtClean="0"/>
+              <a:rPr lang="en-US"/>
               <a:t>Fourth level</a:t>
             </a:r>
           </a:p>
           <a:p>
             <a:pPr lvl="4"/>
             <a:r>
-              <a:rPr lang="en-US" smtClean="0"/>
+              <a:rPr lang="en-US"/>
               <a:t>Fifth level</a:t>
             </a:r>
-            <a:endParaRPr lang="en-US"/>
           </a:p>
         </p:txBody>
       </p:sp>
@@ -3081,7 +3159,7 @@
           <a:p>
             <a:fld id="{78C97017-6FC3-485B-9764-EAC9E56C1D49}" type="datetimeFigureOut">
               <a:rPr lang="en-US" smtClean="0"/>
-              <a:t>9/30/2016</a:t>
+              <a:t>10/25/2016</a:t>
             </a:fld>
             <a:endParaRPr lang="en-US"/>
           </a:p>
@@ -3472,14 +3550,13 @@
           <a:lstStyle/>
           <a:p>
             <a:r>
-              <a:rPr lang="en-US" dirty="0" err="1" smtClean="0"/>
+              <a:rPr lang="en-US" dirty="0" err="1"/>
               <a:t>AddressBook</a:t>
             </a:r>
             <a:r>
-              <a:rPr lang="en-US" dirty="0" smtClean="0"/>
+              <a:rPr lang="en-US" dirty="0"/>
               <a:t> – Level 4</a:t>
             </a:r>
-            <a:endParaRPr lang="en-US" dirty="0"/>
           </a:p>
         </p:txBody>
       </p:sp>
@@ -3499,10 +3576,9 @@
           <a:lstStyle/>
           <a:p>
             <a:r>
-              <a:rPr lang="en-US" dirty="0" smtClean="0"/>
+              <a:rPr lang="en-US" dirty="0"/>
               <a:t>Diagrams</a:t>
             </a:r>
-            <a:endParaRPr lang="en-US" dirty="0"/>
           </a:p>
         </p:txBody>
       </p:sp>
@@ -3634,7 +3710,7 @@
           <a:p>
             <a:pPr algn="ctr"/>
             <a:r>
-              <a:rPr lang="en-US" sz="1600" dirty="0" smtClean="0">
+              <a:rPr lang="en-US" sz="1600" dirty="0">
                 <a:solidFill>
                   <a:schemeClr val="bg1"/>
                 </a:solidFill>
@@ -3693,7 +3769,7 @@
           <a:p>
             <a:pPr algn="ctr"/>
             <a:r>
-              <a:rPr lang="en-US" sz="1600" dirty="0" smtClean="0">
+              <a:rPr lang="en-US" sz="1600" dirty="0">
                 <a:solidFill>
                   <a:schemeClr val="bg1"/>
                 </a:solidFill>
@@ -3756,7 +3832,7 @@
           <a:p>
             <a:pPr algn="ctr"/>
             <a:r>
-              <a:rPr lang="en-US" sz="1600" dirty="0" smtClean="0">
+              <a:rPr lang="en-US" sz="1600" dirty="0">
                 <a:solidFill>
                   <a:schemeClr val="bg1"/>
                 </a:solidFill>
@@ -3815,7 +3891,7 @@
           <a:p>
             <a:pPr algn="ctr"/>
             <a:r>
-              <a:rPr lang="en-US" sz="1600" dirty="0" smtClean="0">
+              <a:rPr lang="en-US" sz="1600" dirty="0">
                 <a:solidFill>
                   <a:schemeClr val="bg1"/>
                 </a:solidFill>
@@ -4401,7 +4477,7 @@
           <a:p>
             <a:pPr algn="ctr"/>
             <a:r>
-              <a:rPr lang="en-US" sz="1600" dirty="0" smtClean="0">
+              <a:rPr lang="en-US" sz="1600" dirty="0">
                 <a:solidFill>
                   <a:schemeClr val="bg1"/>
                 </a:solidFill>
@@ -4752,7 +4828,7 @@
           <a:p>
             <a:pPr algn="ctr"/>
             <a:r>
-              <a:rPr lang="en-US" sz="1600" dirty="0" smtClean="0">
+              <a:rPr lang="en-US" sz="1600" dirty="0">
                 <a:solidFill>
                   <a:schemeClr val="bg1"/>
                 </a:solidFill>
@@ -4760,25 +4836,20 @@
               <a:t>Logs</a:t>
             </a:r>
             <a:br>
-              <a:rPr lang="en-US" sz="1600" dirty="0" smtClean="0">
+              <a:rPr lang="en-US" sz="1600" dirty="0">
                 <a:solidFill>
                   <a:schemeClr val="bg1"/>
                 </a:solidFill>
               </a:rPr>
             </a:br>
             <a:r>
-              <a:rPr lang="en-US" sz="1600" dirty="0" smtClean="0">
+              <a:rPr lang="en-US" sz="1600" dirty="0">
                 <a:solidFill>
                   <a:schemeClr val="bg1"/>
                 </a:solidFill>
               </a:rPr>
               <a:t>Center</a:t>
             </a:r>
-            <a:endParaRPr lang="en-US" sz="1600" dirty="0">
-              <a:solidFill>
-                <a:schemeClr val="bg1"/>
-              </a:solidFill>
-            </a:endParaRPr>
           </a:p>
         </p:txBody>
       </p:sp>
@@ -4935,7 +5006,7 @@
           <a:p>
             <a:pPr algn="ctr"/>
             <a:r>
-              <a:rPr lang="en-US" sz="1600" dirty="0" smtClean="0">
+              <a:rPr lang="en-US" sz="1600" dirty="0">
                 <a:solidFill>
                   <a:schemeClr val="bg1"/>
                 </a:solidFill>
@@ -5299,7 +5370,7 @@
           <a:p>
             <a:pPr algn="ctr"/>
             <a:r>
-              <a:rPr lang="en-US" sz="1600" dirty="0" smtClean="0">
+              <a:rPr lang="en-US" sz="1600" dirty="0">
                 <a:solidFill>
                   <a:schemeClr val="bg1"/>
                 </a:solidFill>
@@ -5446,7 +5517,7 @@
           <a:p>
             <a:pPr algn="ctr"/>
             <a:r>
-              <a:rPr lang="en-US" sz="1600" dirty="0" smtClean="0">
+              <a:rPr lang="en-US" sz="1600" dirty="0">
                 <a:solidFill>
                   <a:schemeClr val="bg1"/>
                 </a:solidFill>
@@ -5608,10 +5679,9 @@
           <a:lstStyle/>
           <a:p>
             <a:r>
-              <a:rPr lang="en-US" sz="1400" dirty="0" smtClean="0"/>
+              <a:rPr lang="en-US" sz="1400" dirty="0"/>
               <a:t>delete 1</a:t>
             </a:r>
-            <a:endParaRPr lang="en-US" sz="1400" dirty="0"/>
           </a:p>
         </p:txBody>
       </p:sp>
@@ -5674,18 +5744,13 @@
           <a:lstStyle/>
           <a:p>
             <a:r>
-              <a:rPr lang="en-US" sz="1400" dirty="0" smtClean="0">
+              <a:rPr lang="en-US" sz="1400" dirty="0">
                 <a:solidFill>
                   <a:srgbClr val="0070C0"/>
                 </a:solidFill>
               </a:rPr>
               <a:t>execute(“delete 1”)</a:t>
             </a:r>
-            <a:endParaRPr lang="en-US" sz="1400" dirty="0">
-              <a:solidFill>
-                <a:srgbClr val="0070C0"/>
-              </a:solidFill>
-            </a:endParaRPr>
           </a:p>
         </p:txBody>
       </p:sp>
@@ -5748,7 +5813,7 @@
           <a:lstStyle/>
           <a:p>
             <a:r>
-              <a:rPr lang="en-US" sz="1400" dirty="0" err="1" smtClean="0">
+              <a:rPr lang="en-US" sz="1400" dirty="0" err="1">
                 <a:solidFill>
                   <a:srgbClr val="7030A0"/>
                 </a:solidFill>
@@ -5756,18 +5821,13 @@
               <a:t>deletePerson</a:t>
             </a:r>
             <a:r>
-              <a:rPr lang="en-US" sz="1400" dirty="0" smtClean="0">
+              <a:rPr lang="en-US" sz="1400" dirty="0">
                 <a:solidFill>
                   <a:srgbClr val="7030A0"/>
                 </a:solidFill>
               </a:rPr>
               <a:t>(p)</a:t>
             </a:r>
-            <a:endParaRPr lang="en-US" sz="1400" dirty="0">
-              <a:solidFill>
-                <a:srgbClr val="7030A0"/>
-              </a:solidFill>
-            </a:endParaRPr>
           </a:p>
         </p:txBody>
       </p:sp>
@@ -5794,7 +5854,7 @@
           <a:lstStyle/>
           <a:p>
             <a:r>
-              <a:rPr lang="en-US" sz="1400" dirty="0" smtClean="0">
+              <a:rPr lang="en-US" sz="1400" dirty="0">
                 <a:solidFill>
                   <a:schemeClr val="accent5">
                     <a:lumMod val="75000"/>
@@ -5804,7 +5864,7 @@
               <a:t>post(</a:t>
             </a:r>
             <a:r>
-              <a:rPr lang="en-US" sz="1400" dirty="0" err="1" smtClean="0">
+              <a:rPr lang="en-US" sz="1400" dirty="0" err="1">
                 <a:solidFill>
                   <a:schemeClr val="accent5">
                     <a:lumMod val="75000"/>
@@ -5814,7 +5874,7 @@
               <a:t>AddressBookChangedEvent</a:t>
             </a:r>
             <a:r>
-              <a:rPr lang="en-US" sz="1400" dirty="0" smtClean="0">
+              <a:rPr lang="en-US" sz="1400" dirty="0">
                 <a:solidFill>
                   <a:schemeClr val="accent5">
                     <a:lumMod val="75000"/>
@@ -5823,13 +5883,6 @@
               </a:rPr>
               <a:t>)</a:t>
             </a:r>
-            <a:endParaRPr lang="en-US" sz="1400" dirty="0">
-              <a:solidFill>
-                <a:schemeClr val="accent5">
-                  <a:lumMod val="75000"/>
-                </a:schemeClr>
-              </a:solidFill>
-            </a:endParaRPr>
           </a:p>
         </p:txBody>
       </p:sp>
@@ -5995,7 +6048,7 @@
           <a:p>
             <a:pPr algn="ctr"/>
             <a:r>
-              <a:rPr lang="en-US" sz="1600" dirty="0" smtClean="0">
+              <a:rPr lang="en-US" sz="1600" dirty="0">
                 <a:solidFill>
                   <a:schemeClr val="bg1"/>
                 </a:solidFill>
@@ -6003,7 +6056,7 @@
               <a:t>:</a:t>
             </a:r>
             <a:r>
-              <a:rPr lang="en-US" sz="1600" dirty="0" err="1" smtClean="0">
+              <a:rPr lang="en-US" sz="1600" dirty="0" err="1">
                 <a:solidFill>
                   <a:schemeClr val="bg1"/>
                 </a:solidFill>
@@ -6236,7 +6289,7 @@
           <a:p>
             <a:pPr algn="ctr"/>
             <a:r>
-              <a:rPr lang="en-US" sz="1600" dirty="0" smtClean="0">
+              <a:rPr lang="en-US" sz="1600" dirty="0">
                 <a:solidFill>
                   <a:schemeClr val="bg1"/>
                 </a:solidFill>
@@ -6368,7 +6421,7 @@
           <a:lstStyle/>
           <a:p>
             <a:r>
-              <a:rPr lang="en-US" sz="1400" dirty="0" smtClean="0">
+              <a:rPr lang="en-US" sz="1400" dirty="0">
                 <a:solidFill>
                   <a:schemeClr val="accent5">
                     <a:lumMod val="75000"/>
@@ -6378,7 +6431,7 @@
               <a:t>post(</a:t>
             </a:r>
             <a:r>
-              <a:rPr lang="en-US" sz="1400" dirty="0" err="1" smtClean="0">
+              <a:rPr lang="en-US" sz="1400" dirty="0" err="1">
                 <a:solidFill>
                   <a:schemeClr val="accent5">
                     <a:lumMod val="75000"/>
@@ -6388,7 +6441,7 @@
               <a:t>AddressBookChangedEvent</a:t>
             </a:r>
             <a:r>
-              <a:rPr lang="en-US" sz="1400" dirty="0" smtClean="0">
+              <a:rPr lang="en-US" sz="1400" dirty="0">
                 <a:solidFill>
                   <a:schemeClr val="accent5">
                     <a:lumMod val="75000"/>
@@ -6397,13 +6450,6 @@
               </a:rPr>
               <a:t>)</a:t>
             </a:r>
-            <a:endParaRPr lang="en-US" sz="1400" dirty="0">
-              <a:solidFill>
-                <a:schemeClr val="accent5">
-                  <a:lumMod val="75000"/>
-                </a:schemeClr>
-              </a:solidFill>
-            </a:endParaRPr>
           </a:p>
         </p:txBody>
       </p:sp>
@@ -6495,7 +6541,7 @@
           <a:p>
             <a:pPr algn="ctr"/>
             <a:r>
-              <a:rPr lang="en-US" sz="1600" dirty="0" smtClean="0">
+              <a:rPr lang="en-US" sz="1600" dirty="0">
                 <a:solidFill>
                   <a:schemeClr val="bg1"/>
                 </a:solidFill>
@@ -6503,7 +6549,7 @@
               <a:t>:</a:t>
             </a:r>
             <a:r>
-              <a:rPr lang="en-US" sz="1600" dirty="0" err="1" smtClean="0">
+              <a:rPr lang="en-US" sz="1600" dirty="0" err="1">
                 <a:solidFill>
                   <a:schemeClr val="bg1"/>
                 </a:solidFill>
@@ -6750,7 +6796,7 @@
           <a:lstStyle/>
           <a:p>
             <a:r>
-              <a:rPr lang="en-US" sz="1400" dirty="0" err="1" smtClean="0">
+              <a:rPr lang="en-US" sz="1400" dirty="0" err="1">
                 <a:solidFill>
                   <a:schemeClr val="accent6">
                     <a:lumMod val="75000"/>
@@ -6760,7 +6806,7 @@
               <a:t>handleAddresssBookChangedEvent</a:t>
             </a:r>
             <a:r>
-              <a:rPr lang="en-US" sz="1400" dirty="0" smtClean="0">
+              <a:rPr lang="en-US" sz="1400" dirty="0">
                 <a:solidFill>
                   <a:schemeClr val="accent6">
                     <a:lumMod val="75000"/>
@@ -6769,13 +6815,6 @@
               </a:rPr>
               <a:t>()</a:t>
             </a:r>
-            <a:endParaRPr lang="en-US" sz="1400" dirty="0">
-              <a:solidFill>
-                <a:schemeClr val="accent6">
-                  <a:lumMod val="75000"/>
-                </a:schemeClr>
-              </a:solidFill>
-            </a:endParaRPr>
           </a:p>
         </p:txBody>
       </p:sp>
@@ -6860,7 +6899,7 @@
           <a:p>
             <a:pPr algn="ctr"/>
             <a:r>
-              <a:rPr lang="en-US" sz="1600" dirty="0" smtClean="0">
+              <a:rPr lang="en-US" sz="1600" dirty="0">
                 <a:solidFill>
                   <a:schemeClr val="bg1"/>
                 </a:solidFill>
@@ -7063,7 +7102,7 @@
           <a:lstStyle/>
           <a:p>
             <a:r>
-              <a:rPr lang="en-US" sz="1400" dirty="0" err="1" smtClean="0">
+              <a:rPr lang="en-US" sz="1400" dirty="0" err="1">
                 <a:solidFill>
                   <a:srgbClr val="00B050"/>
                 </a:solidFill>
@@ -7071,18 +7110,13 @@
               <a:t>handleAddresssBookChangedEvent</a:t>
             </a:r>
             <a:r>
-              <a:rPr lang="en-US" sz="1400" dirty="0" smtClean="0">
+              <a:rPr lang="en-US" sz="1400" dirty="0">
                 <a:solidFill>
                   <a:srgbClr val="00B050"/>
                 </a:solidFill>
               </a:rPr>
               <a:t>()</a:t>
             </a:r>
-            <a:endParaRPr lang="en-US" sz="1400" dirty="0">
-              <a:solidFill>
-                <a:srgbClr val="00B050"/>
-              </a:solidFill>
-            </a:endParaRPr>
           </a:p>
         </p:txBody>
       </p:sp>
@@ -7269,18 +7303,13 @@
           <a:p>
             <a:pPr algn="r"/>
             <a:r>
-              <a:rPr lang="en-US" sz="1400" dirty="0" smtClean="0">
+              <a:rPr lang="en-US" sz="1400" dirty="0">
                 <a:solidFill>
                   <a:srgbClr val="00B050"/>
                 </a:solidFill>
               </a:rPr>
               <a:t>Update status bar</a:t>
             </a:r>
-            <a:endParaRPr lang="en-US" sz="1400" dirty="0">
-              <a:solidFill>
-                <a:srgbClr val="00B050"/>
-              </a:solidFill>
-            </a:endParaRPr>
           </a:p>
         </p:txBody>
       </p:sp>
@@ -7470,7 +7499,7 @@
           <a:lstStyle/>
           <a:p>
             <a:r>
-              <a:rPr lang="en-US" sz="1400" dirty="0" smtClean="0">
+              <a:rPr lang="en-US" sz="1400" dirty="0">
                 <a:solidFill>
                   <a:schemeClr val="accent6">
                     <a:lumMod val="75000"/>
@@ -7480,7 +7509,7 @@
               <a:t>Save </a:t>
             </a:r>
             <a:br>
-              <a:rPr lang="en-US" sz="1400" dirty="0" smtClean="0">
+              <a:rPr lang="en-US" sz="1400" dirty="0">
                 <a:solidFill>
                   <a:schemeClr val="accent6">
                     <a:lumMod val="75000"/>
@@ -7489,7 +7518,7 @@
               </a:rPr>
             </a:br>
             <a:r>
-              <a:rPr lang="en-US" sz="1400" dirty="0" smtClean="0">
+              <a:rPr lang="en-US" sz="1400" dirty="0">
                 <a:solidFill>
                   <a:schemeClr val="accent6">
                     <a:lumMod val="75000"/>
@@ -7498,13 +7527,6 @@
               </a:rPr>
               <a:t>to file</a:t>
             </a:r>
-            <a:endParaRPr lang="en-US" sz="1400" dirty="0">
-              <a:solidFill>
-                <a:schemeClr val="accent6">
-                  <a:lumMod val="75000"/>
-                </a:schemeClr>
-              </a:solidFill>
-            </a:endParaRPr>
           </a:p>
         </p:txBody>
       </p:sp>
@@ -7581,7 +7603,7 @@
           <a:lstStyle/>
           <a:p>
             <a:r>
-              <a:rPr lang="en-US" sz="1200" b="1" dirty="0" smtClean="0">
+              <a:rPr lang="en-US" sz="1200" b="1" dirty="0">
                 <a:solidFill>
                   <a:schemeClr val="accent3">
                     <a:lumMod val="75000"/>
@@ -7764,7 +7786,7 @@
           <a:p>
             <a:pPr algn="ctr"/>
             <a:r>
-              <a:rPr lang="en-US" sz="1050" dirty="0" err="1" smtClean="0">
+              <a:rPr lang="en-US" sz="1050" dirty="0" err="1">
                 <a:solidFill>
                   <a:schemeClr val="bg1"/>
                 </a:solidFill>
@@ -8626,7 +8648,7 @@
           <a:p>
             <a:pPr algn="ctr"/>
             <a:r>
-              <a:rPr lang="en-US" sz="1050" b="1" dirty="0" smtClean="0">
+              <a:rPr lang="en-US" sz="1050" b="1" dirty="0">
                 <a:solidFill>
                   <a:schemeClr val="accent3">
                     <a:lumMod val="75000"/>
@@ -8636,7 +8658,7 @@
               <a:t>{abstract}</a:t>
             </a:r>
             <a:br>
-              <a:rPr lang="en-US" sz="1050" b="1" dirty="0" smtClean="0">
+              <a:rPr lang="en-US" sz="1050" b="1" dirty="0">
                 <a:solidFill>
                   <a:schemeClr val="accent3">
                     <a:lumMod val="75000"/>
@@ -8645,7 +8667,7 @@
               </a:rPr>
             </a:br>
             <a:r>
-              <a:rPr lang="en-US" sz="1050" b="1" dirty="0" err="1" smtClean="0">
+              <a:rPr lang="en-US" sz="1050" b="1" dirty="0" err="1">
                 <a:solidFill>
                   <a:schemeClr val="accent3">
                     <a:lumMod val="75000"/>
@@ -9134,7 +9156,7 @@
           <a:p>
             <a:pPr algn="ctr"/>
             <a:r>
-              <a:rPr lang="en-US" sz="1100" b="1" dirty="0" smtClean="0">
+              <a:rPr lang="en-US" sz="1100" b="1" dirty="0">
                 <a:solidFill>
                   <a:schemeClr val="bg1"/>
                 </a:solidFill>
@@ -9193,7 +9215,7 @@
           <a:p>
             <a:pPr algn="ctr"/>
             <a:r>
-              <a:rPr lang="en-US" sz="1050" dirty="0" smtClean="0">
+              <a:rPr lang="en-US" sz="1050" dirty="0">
                 <a:solidFill>
                   <a:schemeClr val="bg1"/>
                 </a:solidFill>
@@ -9204,7 +9226,7 @@
           <a:p>
             <a:pPr algn="ctr"/>
             <a:r>
-              <a:rPr lang="en-US" sz="1050" dirty="0" err="1" smtClean="0">
+              <a:rPr lang="en-US" sz="1050" dirty="0" err="1">
                 <a:solidFill>
                   <a:schemeClr val="bg1"/>
                 </a:solidFill>
@@ -9753,13 +9775,6 @@
   <p:clrMapOvr>
     <a:masterClrMapping/>
   </p:clrMapOvr>
-  <p:timing>
-    <p:tnLst>
-      <p:par>
-        <p:cTn id="1" dur="indefinite" restart="never" nodeType="tmRoot"/>
-      </p:par>
-    </p:tnLst>
-  </p:timing>
 </p:sld>
 </file>
 
@@ -9826,7 +9841,7 @@
           <a:lstStyle/>
           <a:p>
             <a:r>
-              <a:rPr lang="en-US" sz="1200" b="1" dirty="0" smtClean="0">
+              <a:rPr lang="en-US" sz="1200" b="1" dirty="0">
                 <a:solidFill>
                   <a:srgbClr val="0070C0"/>
                 </a:solidFill>
@@ -10000,7 +10015,7 @@
           <a:p>
             <a:pPr algn="ctr"/>
             <a:r>
-              <a:rPr lang="en-US" sz="1050" dirty="0" err="1" smtClean="0">
+              <a:rPr lang="en-US" sz="1050" dirty="0" err="1">
                 <a:solidFill>
                   <a:schemeClr val="bg1"/>
                 </a:solidFill>
@@ -10362,7 +10377,7 @@
           <a:p>
             <a:pPr algn="ctr"/>
             <a:r>
-              <a:rPr lang="en-US" sz="1050" b="1" dirty="0" smtClean="0">
+              <a:rPr lang="en-US" sz="1050" b="1" dirty="0">
                 <a:solidFill>
                   <a:srgbClr val="0070C0"/>
                 </a:solidFill>
@@ -10370,14 +10385,14 @@
               <a:t>{abstract}</a:t>
             </a:r>
             <a:br>
-              <a:rPr lang="en-US" sz="1050" b="1" dirty="0" smtClean="0">
+              <a:rPr lang="en-US" sz="1050" b="1" dirty="0">
                 <a:solidFill>
                   <a:srgbClr val="0070C0"/>
                 </a:solidFill>
               </a:rPr>
             </a:br>
             <a:r>
-              <a:rPr lang="en-US" sz="1050" b="1" dirty="0" smtClean="0">
+              <a:rPr lang="en-US" sz="1050" b="1" dirty="0">
                 <a:solidFill>
                   <a:srgbClr val="0070C0"/>
                 </a:solidFill>
@@ -11038,7 +11053,7 @@
             <a:p>
               <a:pPr algn="r"/>
               <a:r>
-                <a:rPr lang="en-US" sz="1100" dirty="0" smtClean="0">
+                <a:rPr lang="en-US" sz="1100" dirty="0">
                   <a:solidFill>
                     <a:srgbClr val="0070C0"/>
                   </a:solidFill>
@@ -11137,7 +11152,7 @@
             <a:lstStyle/>
             <a:p>
               <a:r>
-                <a:rPr lang="en-US" sz="1100" dirty="0" smtClean="0">
+                <a:rPr lang="en-US" sz="1100" dirty="0">
                   <a:solidFill>
                     <a:srgbClr val="0070C0"/>
                   </a:solidFill>
@@ -11223,7 +11238,7 @@
           <a:p>
             <a:pPr algn="r"/>
             <a:r>
-              <a:rPr lang="en-US" sz="1100" dirty="0" smtClean="0">
+              <a:rPr lang="en-US" sz="1100" dirty="0">
                 <a:solidFill>
                   <a:srgbClr val="0070C0"/>
                 </a:solidFill>
@@ -11262,7 +11277,7 @@
           <a:p>
             <a:pPr algn="r"/>
             <a:r>
-              <a:rPr lang="en-US" sz="1100" dirty="0" smtClean="0">
+              <a:rPr lang="en-US" sz="1100" dirty="0">
                 <a:solidFill>
                   <a:srgbClr val="0070C0"/>
                 </a:solidFill>
@@ -11315,7 +11330,7 @@
             <a:p>
               <a:pPr algn="r"/>
               <a:r>
-                <a:rPr lang="en-US" sz="1100" dirty="0" smtClean="0">
+                <a:rPr lang="en-US" sz="1100" dirty="0">
                   <a:solidFill>
                     <a:srgbClr val="0070C0"/>
                   </a:solidFill>
@@ -11418,7 +11433,7 @@
           <a:p>
             <a:pPr algn="ctr"/>
             <a:r>
-              <a:rPr lang="en-US" sz="1050" b="1" dirty="0" smtClean="0">
+              <a:rPr lang="en-US" sz="1050" b="1" dirty="0">
                 <a:solidFill>
                   <a:srgbClr val="0070C0"/>
                 </a:solidFill>
@@ -11426,14 +11441,14 @@
               <a:t>Incorrect</a:t>
             </a:r>
             <a:br>
-              <a:rPr lang="en-US" sz="1050" b="1" dirty="0" smtClean="0">
+              <a:rPr lang="en-US" sz="1050" b="1" dirty="0">
                 <a:solidFill>
                   <a:srgbClr val="0070C0"/>
                 </a:solidFill>
               </a:rPr>
             </a:br>
             <a:r>
-              <a:rPr lang="en-US" sz="1050" b="1" dirty="0" smtClean="0">
+              <a:rPr lang="en-US" sz="1050" b="1" dirty="0">
                 <a:solidFill>
                   <a:srgbClr val="0070C0"/>
                 </a:solidFill>
@@ -11542,13 +11557,6 @@
   <p:clrMapOvr>
     <a:masterClrMapping/>
   </p:clrMapOvr>
-  <p:timing>
-    <p:tnLst>
-      <p:par>
-        <p:cTn id="1" dur="indefinite" restart="never" nodeType="tmRoot"/>
-      </p:par>
-    </p:tnLst>
-  </p:timing>
 </p:sld>
 </file>
 
@@ -11615,7 +11623,7 @@
           <a:lstStyle/>
           <a:p>
             <a:r>
-              <a:rPr lang="en-US" sz="1200" b="1" dirty="0" smtClean="0">
+              <a:rPr lang="en-US" sz="1200" b="1" dirty="0">
                 <a:solidFill>
                   <a:srgbClr val="0070C0"/>
                 </a:solidFill>
@@ -11825,7 +11833,7 @@
           <a:p>
             <a:pPr algn="ctr"/>
             <a:r>
-              <a:rPr lang="en-US" sz="1600" dirty="0" smtClean="0">
+              <a:rPr lang="en-US" sz="1600" dirty="0">
                 <a:solidFill>
                   <a:schemeClr val="bg1"/>
                 </a:solidFill>
@@ -11972,20 +11980,12 @@
           <a:p>
             <a:pPr algn="ctr"/>
             <a:r>
-              <a:rPr lang="en-US" sz="1600" dirty="0" smtClean="0">
+              <a:rPr lang="en-US" sz="1600" dirty="0">
                 <a:solidFill>
                   <a:schemeClr val="bg1"/>
                 </a:solidFill>
               </a:rPr>
               <a:t>d:Delete</a:t>
-            </a:r>
-            <a:r>
-              <a:rPr lang="en-US" sz="1600" dirty="0">
-                <a:solidFill>
-                  <a:schemeClr val="bg1"/>
-                </a:solidFill>
-              </a:rPr>
-              <a:t/>
             </a:r>
             <a:br>
               <a:rPr lang="en-US" sz="1600" dirty="0">
@@ -12190,18 +12190,13 @@
           <a:p>
             <a:pPr algn="r"/>
             <a:r>
-              <a:rPr lang="en-US" sz="1400" dirty="0" smtClean="0">
+              <a:rPr lang="en-US" sz="1400" dirty="0">
                 <a:solidFill>
                   <a:srgbClr val="0070C0"/>
                 </a:solidFill>
               </a:rPr>
               <a:t>execute(“delete 1”)</a:t>
             </a:r>
-            <a:endParaRPr lang="en-US" sz="1400" dirty="0">
-              <a:solidFill>
-                <a:srgbClr val="0070C0"/>
-              </a:solidFill>
-            </a:endParaRPr>
           </a:p>
         </p:txBody>
       </p:sp>
@@ -12280,7 +12275,6 @@
               <a:rPr lang="en-US" dirty="0"/>
               <a:t>execute()</a:t>
             </a:r>
-            <a:endParaRPr lang="en-US" dirty="0"/>
           </a:p>
         </p:txBody>
       </p:sp>
@@ -12792,7 +12786,7 @@
           </a:lstStyle>
           <a:p>
             <a:r>
-              <a:rPr lang="en-US" dirty="0" err="1" smtClean="0">
+              <a:rPr lang="en-US" dirty="0" err="1">
                 <a:solidFill>
                   <a:srgbClr val="7030A0"/>
                 </a:solidFill>
@@ -12800,18 +12794,13 @@
               <a:t>deletePerson</a:t>
             </a:r>
             <a:r>
-              <a:rPr lang="en-US" dirty="0" smtClean="0">
+              <a:rPr lang="en-US" dirty="0">
                 <a:solidFill>
                   <a:srgbClr val="7030A0"/>
                 </a:solidFill>
               </a:rPr>
               <a:t>(p)</a:t>
             </a:r>
-            <a:endParaRPr lang="en-US" dirty="0">
-              <a:solidFill>
-                <a:srgbClr val="7030A0"/>
-              </a:solidFill>
-            </a:endParaRPr>
           </a:p>
         </p:txBody>
       </p:sp>
@@ -12849,10 +12838,9 @@
           </a:lstStyle>
           <a:p>
             <a:r>
-              <a:rPr lang="en-US" dirty="0" smtClean="0"/>
+              <a:rPr lang="en-US" dirty="0"/>
               <a:t>create()</a:t>
             </a:r>
-            <a:endParaRPr lang="en-US" dirty="0"/>
           </a:p>
         </p:txBody>
       </p:sp>
@@ -12890,10 +12878,9 @@
           </a:lstStyle>
           <a:p>
             <a:r>
-              <a:rPr lang="en-US" dirty="0" smtClean="0"/>
+              <a:rPr lang="en-US" dirty="0"/>
               <a:t>parse(“delete 1”)</a:t>
             </a:r>
-            <a:endParaRPr lang="en-US" dirty="0"/>
           </a:p>
         </p:txBody>
       </p:sp>
@@ -12931,10 +12918,9 @@
           </a:lstStyle>
           <a:p>
             <a:r>
-              <a:rPr lang="en-US" dirty="0" smtClean="0"/>
+              <a:rPr lang="en-US" dirty="0"/>
               <a:t>result</a:t>
             </a:r>
-            <a:endParaRPr lang="en-US" dirty="0"/>
           </a:p>
         </p:txBody>
       </p:sp>
@@ -12972,10 +12958,9 @@
           </a:lstStyle>
           <a:p>
             <a:r>
-              <a:rPr lang="en-US" dirty="0" smtClean="0"/>
+              <a:rPr lang="en-US" dirty="0"/>
               <a:t>result</a:t>
             </a:r>
-            <a:endParaRPr lang="en-US" dirty="0"/>
           </a:p>
         </p:txBody>
       </p:sp>
@@ -13023,7 +13008,7 @@
           <a:p>
             <a:pPr algn="ctr"/>
             <a:r>
-              <a:rPr lang="en-US" sz="1600" dirty="0" smtClean="0">
+              <a:rPr lang="en-US" sz="1600" dirty="0">
                 <a:solidFill>
                   <a:schemeClr val="bg1"/>
                 </a:solidFill>
@@ -13031,14 +13016,14 @@
               <a:t>result:</a:t>
             </a:r>
             <a:br>
-              <a:rPr lang="en-US" sz="1600" dirty="0" smtClean="0">
+              <a:rPr lang="en-US" sz="1600" dirty="0">
                 <a:solidFill>
                   <a:schemeClr val="bg1"/>
                 </a:solidFill>
               </a:rPr>
             </a:br>
             <a:r>
-              <a:rPr lang="en-US" sz="1600" dirty="0" err="1" smtClean="0">
+              <a:rPr lang="en-US" sz="1600" dirty="0" err="1">
                 <a:solidFill>
                   <a:schemeClr val="bg1"/>
                 </a:solidFill>
@@ -13208,10 +13193,9 @@
           </a:lstStyle>
           <a:p>
             <a:r>
-              <a:rPr lang="en-US" dirty="0" smtClean="0"/>
+              <a:rPr lang="en-US" dirty="0"/>
               <a:t>d</a:t>
             </a:r>
-            <a:endParaRPr lang="en-US" dirty="0"/>
           </a:p>
         </p:txBody>
       </p:sp>
@@ -13253,7 +13237,7 @@
         </p:nvSpPr>
         <p:spPr>
           <a:xfrm>
-            <a:off x="1119865" y="1727200"/>
+            <a:off x="1119865" y="1741246"/>
             <a:ext cx="7490735" cy="2997200"/>
           </a:xfrm>
           <a:prstGeom prst="roundRect">
@@ -13291,7 +13275,7 @@
           <a:lstStyle/>
           <a:p>
             <a:r>
-              <a:rPr lang="en-US" sz="1200" b="1" dirty="0" smtClean="0">
+              <a:rPr lang="en-US" sz="1200" b="1" dirty="0">
                 <a:solidFill>
                   <a:srgbClr val="7030A0"/>
                 </a:solidFill>
@@ -13314,7 +13298,7 @@
         </p:nvSpPr>
         <p:spPr>
           <a:xfrm>
-            <a:off x="2877180" y="3158440"/>
+            <a:off x="2877180" y="2895600"/>
             <a:ext cx="1093635" cy="346760"/>
           </a:xfrm>
           <a:prstGeom prst="rect">
@@ -13350,7 +13334,7 @@
           <a:p>
             <a:pPr algn="ctr"/>
             <a:r>
-              <a:rPr lang="en-US" sz="1050" dirty="0" err="1" smtClean="0">
+              <a:rPr lang="en-US" sz="1050" dirty="0" err="1">
                 <a:solidFill>
                   <a:schemeClr val="bg1"/>
                 </a:solidFill>
@@ -13409,7 +13393,7 @@
           <a:p>
             <a:pPr algn="ctr"/>
             <a:r>
-              <a:rPr lang="en-US" sz="1050" dirty="0" err="1" smtClean="0">
+              <a:rPr lang="en-US" sz="1050" dirty="0" err="1">
                 <a:solidFill>
                   <a:schemeClr val="bg1"/>
                 </a:solidFill>
@@ -13435,8 +13419,8 @@
         </p:nvCxnSpPr>
         <p:spPr>
           <a:xfrm flipV="1">
-            <a:off x="6477000" y="3204826"/>
-            <a:ext cx="190770" cy="405819"/>
+            <a:off x="6470397" y="3065170"/>
+            <a:ext cx="197298" cy="928032"/>
           </a:xfrm>
           <a:prstGeom prst="bentConnector2">
             <a:avLst/>
@@ -13448,50 +13432,6 @@
             <a:prstDash val="sysDot"/>
             <a:headEnd type="none" w="med" len="med"/>
             <a:tailEnd type="none" w="med" len="med"/>
-          </a:ln>
-          <a:effectLst/>
-        </p:spPr>
-        <p:style>
-          <a:lnRef idx="1">
-            <a:schemeClr val="accent2"/>
-          </a:lnRef>
-          <a:fillRef idx="2">
-            <a:schemeClr val="accent2"/>
-          </a:fillRef>
-          <a:effectRef idx="1">
-            <a:schemeClr val="accent2"/>
-          </a:effectRef>
-          <a:fontRef idx="minor">
-            <a:schemeClr val="dk1"/>
-          </a:fontRef>
-        </p:style>
-      </p:cxnSp>
-      <p:cxnSp>
-        <p:nvCxnSpPr>
-          <p:cNvPr id="107" name="Elbow Connector 106"/>
-          <p:cNvCxnSpPr>
-            <a:stCxn id="9" idx="1"/>
-          </p:cNvCxnSpPr>
-          <p:nvPr/>
-        </p:nvCxnSpPr>
-        <p:spPr>
-          <a:xfrm rot="5400000" flipH="1" flipV="1">
-            <a:off x="4360065" y="1080909"/>
-            <a:ext cx="378691" cy="4637261"/>
-          </a:xfrm>
-          <a:prstGeom prst="bentConnector4">
-            <a:avLst>
-              <a:gd name="adj1" fmla="val -101829"/>
-              <a:gd name="adj2" fmla="val 99976"/>
-            </a:avLst>
-          </a:prstGeom>
-          <a:ln w="19050">
-            <a:solidFill>
-              <a:srgbClr val="7030A0"/>
-            </a:solidFill>
-            <a:prstDash val="solid"/>
-            <a:headEnd type="none" w="med" len="med"/>
-            <a:tailEnd type="arrow" w="med" len="med"/>
           </a:ln>
           <a:effectLst/>
         </p:spPr>
@@ -13565,7 +13505,7 @@
           <a:p>
             <a:pPr algn="ctr"/>
             <a:r>
-              <a:rPr lang="en-US" sz="1050" dirty="0" smtClean="0">
+              <a:rPr lang="en-US" sz="1050" dirty="0">
                 <a:solidFill>
                   <a:schemeClr val="bg1"/>
                 </a:solidFill>
@@ -13638,7 +13578,7 @@
         </p:nvCxnSpPr>
         <p:spPr>
           <a:xfrm flipV="1">
-            <a:off x="6667770" y="2632344"/>
+            <a:off x="6667695" y="2492688"/>
             <a:ext cx="1612" cy="225722"/>
           </a:xfrm>
           <a:prstGeom prst="straightConnector1">
@@ -13680,7 +13620,7 @@
         </p:nvCxnSpPr>
         <p:spPr>
           <a:xfrm>
-            <a:off x="2656370" y="3326536"/>
+            <a:off x="2656370" y="3063696"/>
             <a:ext cx="220810" cy="5284"/>
           </a:xfrm>
           <a:prstGeom prst="straightConnector1">
@@ -13718,7 +13658,7 @@
         </p:nvSpPr>
         <p:spPr>
           <a:xfrm rot="5400000" flipV="1">
-            <a:off x="6253986" y="3522883"/>
+            <a:off x="6247383" y="3905440"/>
             <a:ext cx="270504" cy="175523"/>
           </a:xfrm>
           <a:prstGeom prst="triangle">
@@ -13853,7 +13793,7 @@
         </p:nvSpPr>
         <p:spPr>
           <a:xfrm>
-            <a:off x="2420322" y="3239846"/>
+            <a:off x="2420322" y="2977006"/>
             <a:ext cx="236048" cy="173380"/>
           </a:xfrm>
           <a:prstGeom prst="flowChartDecision">
@@ -13898,7 +13838,7 @@
         </p:nvSpPr>
         <p:spPr>
           <a:xfrm>
-            <a:off x="2879490" y="2627420"/>
+            <a:off x="2879415" y="2487764"/>
             <a:ext cx="1093635" cy="346760"/>
           </a:xfrm>
           <a:prstGeom prst="rect">
@@ -13931,12 +13871,12 @@
           <a:p>
             <a:pPr algn="ctr"/>
             <a:r>
-              <a:rPr lang="en-US" sz="1050" dirty="0" err="1" smtClean="0">
+              <a:rPr lang="en-US" sz="1050" dirty="0" err="1">
                 <a:solidFill>
                   <a:srgbClr val="7030A0"/>
                 </a:solidFill>
               </a:rPr>
-              <a:t>AddressBook</a:t>
+              <a:t>TaskManager</a:t>
             </a:r>
             <a:endParaRPr lang="en-SG" sz="1050" dirty="0">
               <a:solidFill>
@@ -13957,7 +13897,7 @@
         </p:nvCxnSpPr>
         <p:spPr>
           <a:xfrm>
-            <a:off x="2658680" y="2795516"/>
+            <a:off x="2658605" y="2655860"/>
             <a:ext cx="220810" cy="5284"/>
           </a:xfrm>
           <a:prstGeom prst="straightConnector1">
@@ -13995,7 +13935,7 @@
         </p:nvSpPr>
         <p:spPr>
           <a:xfrm>
-            <a:off x="2422632" y="2708826"/>
+            <a:off x="2422557" y="2569170"/>
             <a:ext cx="236048" cy="173380"/>
           </a:xfrm>
           <a:prstGeom prst="flowChartDecision">
@@ -14040,7 +13980,7 @@
         </p:nvSpPr>
         <p:spPr>
           <a:xfrm>
-            <a:off x="4487017" y="2847371"/>
+            <a:off x="4486942" y="2707715"/>
             <a:ext cx="1156969" cy="346760"/>
           </a:xfrm>
           <a:prstGeom prst="rect">
@@ -14073,12 +14013,12 @@
           <a:p>
             <a:pPr algn="ctr"/>
             <a:r>
-              <a:rPr lang="en-US" sz="1050" dirty="0" err="1" smtClean="0">
+              <a:rPr lang="en-US" sz="1050" dirty="0" err="1">
                 <a:solidFill>
                   <a:srgbClr val="7030A0"/>
                 </a:solidFill>
               </a:rPr>
-              <a:t>UniquePersonList</a:t>
+              <a:t>UniqueTaskList</a:t>
             </a:r>
             <a:endParaRPr lang="en-SG" sz="1050" dirty="0">
               <a:solidFill>
@@ -14096,7 +14036,7 @@
         </p:nvSpPr>
         <p:spPr>
           <a:xfrm>
-            <a:off x="3984303" y="2673991"/>
+            <a:off x="3984228" y="2534335"/>
             <a:ext cx="236048" cy="173380"/>
           </a:xfrm>
           <a:prstGeom prst="flowChartDecision">
@@ -14146,7 +14086,7 @@
         </p:nvCxnSpPr>
         <p:spPr>
           <a:xfrm>
-            <a:off x="4220351" y="2760681"/>
+            <a:off x="4220276" y="2621025"/>
             <a:ext cx="266666" cy="260070"/>
           </a:xfrm>
           <a:prstGeom prst="bentConnector3">
@@ -14184,7 +14124,7 @@
         </p:nvSpPr>
         <p:spPr>
           <a:xfrm>
-            <a:off x="4503204" y="2280569"/>
+            <a:off x="4503129" y="2140913"/>
             <a:ext cx="1156969" cy="346760"/>
           </a:xfrm>
           <a:prstGeom prst="rect">
@@ -14217,7 +14157,7 @@
           <a:p>
             <a:pPr algn="ctr"/>
             <a:r>
-              <a:rPr lang="en-US" sz="1050" dirty="0" err="1" smtClean="0">
+              <a:rPr lang="en-US" sz="1050" dirty="0" err="1">
                 <a:solidFill>
                   <a:srgbClr val="7030A0"/>
                 </a:solidFill>
@@ -14243,7 +14183,7 @@
         </p:nvCxnSpPr>
         <p:spPr>
           <a:xfrm flipV="1">
-            <a:off x="4220351" y="2453949"/>
+            <a:off x="4220276" y="2314293"/>
             <a:ext cx="282853" cy="306732"/>
           </a:xfrm>
           <a:prstGeom prst="bentConnector3">
@@ -14283,7 +14223,7 @@
         </p:nvSpPr>
         <p:spPr>
           <a:xfrm>
-            <a:off x="6313677" y="2858066"/>
+            <a:off x="6313602" y="2718410"/>
             <a:ext cx="708186" cy="346760"/>
           </a:xfrm>
           <a:prstGeom prst="rect">
@@ -14316,12 +14256,12 @@
           <a:p>
             <a:pPr algn="ctr"/>
             <a:r>
-              <a:rPr lang="en-US" sz="1050" dirty="0" smtClean="0">
+              <a:rPr lang="en-US" sz="1050" dirty="0">
                 <a:solidFill>
                   <a:srgbClr val="7030A0"/>
                 </a:solidFill>
               </a:rPr>
-              <a:t>Person</a:t>
+              <a:t>Task</a:t>
             </a:r>
             <a:endParaRPr lang="en-SG" sz="1050" dirty="0">
               <a:solidFill>
@@ -14339,7 +14279,7 @@
         </p:nvSpPr>
         <p:spPr>
           <a:xfrm>
-            <a:off x="5643227" y="2943979"/>
+            <a:off x="5643227" y="2798420"/>
             <a:ext cx="236048" cy="173380"/>
           </a:xfrm>
           <a:prstGeom prst="flowChartDecision">
@@ -14380,14 +14320,13 @@
         <p:nvCxnSpPr>
           <p:cNvPr id="64" name="Elbow Connector 63"/>
           <p:cNvCxnSpPr>
-            <a:stCxn id="63" idx="3"/>
             <a:endCxn id="62" idx="1"/>
           </p:cNvCxnSpPr>
           <p:nvPr/>
         </p:nvCxnSpPr>
         <p:spPr>
           <a:xfrm>
-            <a:off x="5879275" y="3030669"/>
+            <a:off x="5879200" y="2891013"/>
             <a:ext cx="434402" cy="777"/>
           </a:xfrm>
           <a:prstGeom prst="bentConnector3">
@@ -14425,7 +14364,7 @@
         </p:nvSpPr>
         <p:spPr>
           <a:xfrm>
-            <a:off x="6315289" y="2285584"/>
+            <a:off x="6315214" y="2145928"/>
             <a:ext cx="708186" cy="346760"/>
           </a:xfrm>
           <a:prstGeom prst="rect">
@@ -14458,7 +14397,7 @@
           <a:p>
             <a:pPr algn="ctr"/>
             <a:r>
-              <a:rPr lang="en-US" sz="1050" dirty="0" smtClean="0">
+              <a:rPr lang="en-US" sz="1050" dirty="0">
                 <a:solidFill>
                   <a:srgbClr val="7030A0"/>
                 </a:solidFill>
@@ -14481,7 +14420,7 @@
         </p:nvSpPr>
         <p:spPr>
           <a:xfrm>
-            <a:off x="5672547" y="2371497"/>
+            <a:off x="5672472" y="2231841"/>
             <a:ext cx="236048" cy="173380"/>
           </a:xfrm>
           <a:prstGeom prst="flowChartDecision">
@@ -14529,7 +14468,7 @@
         </p:nvCxnSpPr>
         <p:spPr>
           <a:xfrm>
-            <a:off x="5908595" y="2458187"/>
+            <a:off x="5908520" y="2318531"/>
             <a:ext cx="406694" cy="777"/>
           </a:xfrm>
           <a:prstGeom prst="bentConnector3">
@@ -14567,7 +14506,7 @@
         </p:nvSpPr>
         <p:spPr>
           <a:xfrm>
-            <a:off x="5128257" y="3429000"/>
+            <a:off x="5092730" y="3796649"/>
             <a:ext cx="1156969" cy="346760"/>
           </a:xfrm>
           <a:prstGeom prst="rect">
@@ -14600,7 +14539,7 @@
           <a:p>
             <a:pPr algn="ctr"/>
             <a:r>
-              <a:rPr lang="en-US" sz="1050" dirty="0" smtClean="0">
+              <a:rPr lang="en-US" sz="1050" dirty="0">
                 <a:solidFill>
                   <a:srgbClr val="7030A0"/>
                 </a:solidFill>
@@ -14608,19 +14547,19 @@
               <a:t>&lt;&lt;interface&gt;&gt;</a:t>
             </a:r>
             <a:br>
-              <a:rPr lang="en-US" sz="1050" dirty="0" smtClean="0">
+              <a:rPr lang="en-US" sz="1050" dirty="0">
                 <a:solidFill>
                   <a:srgbClr val="7030A0"/>
                 </a:solidFill>
               </a:rPr>
             </a:br>
             <a:r>
-              <a:rPr lang="en-US" sz="1050" dirty="0" err="1" smtClean="0">
+              <a:rPr lang="en-US" sz="1050" dirty="0" err="1">
                 <a:solidFill>
                   <a:srgbClr val="7030A0"/>
                 </a:solidFill>
               </a:rPr>
-              <a:t>ReadOnlyPerson</a:t>
+              <a:t>ReadOnlyTask</a:t>
             </a:r>
             <a:endParaRPr lang="en-SG" sz="1050" dirty="0">
               <a:solidFill>
@@ -14638,7 +14577,7 @@
         </p:nvSpPr>
         <p:spPr>
           <a:xfrm>
-            <a:off x="7712397" y="2564238"/>
+            <a:off x="7712322" y="2424582"/>
             <a:ext cx="708186" cy="285783"/>
           </a:xfrm>
           <a:prstGeom prst="rect">
@@ -14671,7 +14610,7 @@
           <a:p>
             <a:pPr algn="ctr"/>
             <a:r>
-              <a:rPr lang="en-US" sz="1050" dirty="0" smtClean="0">
+              <a:rPr lang="en-US" sz="1050" dirty="0">
                 <a:solidFill>
                   <a:srgbClr val="7030A0"/>
                 </a:solidFill>
@@ -14694,7 +14633,7 @@
         </p:nvSpPr>
         <p:spPr>
           <a:xfrm>
-            <a:off x="7041947" y="2948201"/>
+            <a:off x="7041872" y="2808545"/>
             <a:ext cx="236048" cy="173380"/>
           </a:xfrm>
           <a:prstGeom prst="flowChartDecision">
@@ -14744,7 +14683,7 @@
         </p:nvCxnSpPr>
         <p:spPr>
           <a:xfrm flipV="1">
-            <a:off x="7277995" y="2707130"/>
+            <a:off x="7277920" y="2567474"/>
             <a:ext cx="434402" cy="327761"/>
           </a:xfrm>
           <a:prstGeom prst="bentConnector3">
@@ -14782,7 +14721,7 @@
         </p:nvSpPr>
         <p:spPr>
           <a:xfrm>
-            <a:off x="7712397" y="2887216"/>
+            <a:off x="7712322" y="2747560"/>
             <a:ext cx="708186" cy="285783"/>
           </a:xfrm>
           <a:prstGeom prst="rect">
@@ -14815,12 +14754,12 @@
           <a:p>
             <a:pPr algn="ctr"/>
             <a:r>
-              <a:rPr lang="en-US" sz="1050" dirty="0" smtClean="0">
+              <a:rPr lang="en-US" sz="1050" dirty="0">
                 <a:solidFill>
                   <a:srgbClr val="7030A0"/>
                 </a:solidFill>
               </a:rPr>
-              <a:t>Phone</a:t>
+              <a:t>Date</a:t>
             </a:r>
             <a:endParaRPr lang="en-SG" sz="1050" dirty="0">
               <a:solidFill>
@@ -14841,7 +14780,7 @@
         </p:nvCxnSpPr>
         <p:spPr>
           <a:xfrm flipV="1">
-            <a:off x="7277995" y="3030108"/>
+            <a:off x="7277920" y="2890452"/>
             <a:ext cx="434402" cy="4783"/>
           </a:xfrm>
           <a:prstGeom prst="bentConnector3">
@@ -14879,7 +14818,7 @@
         </p:nvSpPr>
         <p:spPr>
           <a:xfrm>
-            <a:off x="7712397" y="3210194"/>
+            <a:off x="7712322" y="3070538"/>
             <a:ext cx="708186" cy="285783"/>
           </a:xfrm>
           <a:prstGeom prst="rect">
@@ -14912,12 +14851,12 @@
           <a:p>
             <a:pPr algn="ctr"/>
             <a:r>
-              <a:rPr lang="en-US" sz="1050" dirty="0" smtClean="0">
+              <a:rPr lang="en-US" sz="1050" dirty="0">
                 <a:solidFill>
                   <a:srgbClr val="7030A0"/>
                 </a:solidFill>
               </a:rPr>
-              <a:t>Email</a:t>
+              <a:t>Recurring</a:t>
             </a:r>
             <a:endParaRPr lang="en-SG" sz="1050" dirty="0">
               <a:solidFill>
@@ -14938,105 +14877,8 @@
         </p:nvCxnSpPr>
         <p:spPr>
           <a:xfrm>
-            <a:off x="7277995" y="3034891"/>
+            <a:off x="7277920" y="2895235"/>
             <a:ext cx="434402" cy="318195"/>
-          </a:xfrm>
-          <a:prstGeom prst="bentConnector3">
-            <a:avLst/>
-          </a:prstGeom>
-          <a:ln w="19050">
-            <a:solidFill>
-              <a:srgbClr val="7030A0"/>
-            </a:solidFill>
-            <a:headEnd type="none" w="med" len="med"/>
-            <a:tailEnd type="arrow" w="med" len="med"/>
-          </a:ln>
-          <a:effectLst/>
-        </p:spPr>
-        <p:style>
-          <a:lnRef idx="1">
-            <a:schemeClr val="accent2"/>
-          </a:lnRef>
-          <a:fillRef idx="2">
-            <a:schemeClr val="accent2"/>
-          </a:fillRef>
-          <a:effectRef idx="1">
-            <a:schemeClr val="accent2"/>
-          </a:effectRef>
-          <a:fontRef idx="minor">
-            <a:schemeClr val="dk1"/>
-          </a:fontRef>
-        </p:style>
-      </p:cxnSp>
-      <p:sp>
-        <p:nvSpPr>
-          <p:cNvPr id="85" name="Rectangle 8"/>
-          <p:cNvSpPr/>
-          <p:nvPr/>
-        </p:nvSpPr>
-        <p:spPr>
-          <a:xfrm>
-            <a:off x="7712397" y="3533171"/>
-            <a:ext cx="708186" cy="285783"/>
-          </a:xfrm>
-          <a:prstGeom prst="rect">
-            <a:avLst/>
-          </a:prstGeom>
-          <a:ln w="19050">
-            <a:solidFill>
-              <a:srgbClr val="7030A0"/>
-            </a:solidFill>
-          </a:ln>
-          <a:effectLst/>
-        </p:spPr>
-        <p:style>
-          <a:lnRef idx="1">
-            <a:schemeClr val="accent4"/>
-          </a:lnRef>
-          <a:fillRef idx="2">
-            <a:schemeClr val="accent4"/>
-          </a:fillRef>
-          <a:effectRef idx="1">
-            <a:schemeClr val="accent4"/>
-          </a:effectRef>
-          <a:fontRef idx="minor">
-            <a:schemeClr val="dk1"/>
-          </a:fontRef>
-        </p:style>
-        <p:txBody>
-          <a:bodyPr rtlCol="0" anchor="ctr"/>
-          <a:lstStyle/>
-          <a:p>
-            <a:pPr algn="ctr"/>
-            <a:r>
-              <a:rPr lang="en-US" sz="1050" dirty="0" smtClean="0">
-                <a:solidFill>
-                  <a:srgbClr val="7030A0"/>
-                </a:solidFill>
-              </a:rPr>
-              <a:t>Address</a:t>
-            </a:r>
-            <a:endParaRPr lang="en-SG" sz="1050" dirty="0">
-              <a:solidFill>
-                <a:srgbClr val="7030A0"/>
-              </a:solidFill>
-            </a:endParaRPr>
-          </a:p>
-        </p:txBody>
-      </p:sp>
-      <p:cxnSp>
-        <p:nvCxnSpPr>
-          <p:cNvPr id="86" name="Elbow Connector 85"/>
-          <p:cNvCxnSpPr>
-            <a:stCxn id="78" idx="3"/>
-            <a:endCxn id="85" idx="1"/>
-          </p:cNvCxnSpPr>
-          <p:nvPr/>
-        </p:nvCxnSpPr>
-        <p:spPr>
-          <a:xfrm>
-            <a:off x="7277995" y="3034891"/>
-            <a:ext cx="434402" cy="641172"/>
           </a:xfrm>
           <a:prstGeom prst="bentConnector3">
             <a:avLst/>
@@ -15075,8 +14917,8 @@
         </p:nvCxnSpPr>
         <p:spPr>
           <a:xfrm rot="16200000" flipH="1">
-            <a:off x="3279321" y="2485431"/>
-            <a:ext cx="293825" cy="1"/>
+            <a:off x="3358194" y="2406559"/>
+            <a:ext cx="137790" cy="1712"/>
           </a:xfrm>
           <a:prstGeom prst="bentConnector3">
             <a:avLst>
@@ -15197,130 +15039,12 @@
           <a:p>
             <a:pPr algn="ctr"/>
             <a:r>
-              <a:rPr lang="en-US" sz="1050" dirty="0" smtClean="0">
+              <a:rPr lang="en-US" sz="1050" dirty="0">
                 <a:solidFill>
                   <a:srgbClr val="7030A0"/>
                 </a:solidFill>
               </a:rPr>
               <a:t>&lt;&lt;interface&gt;&gt;</a:t>
-            </a:r>
-            <a:br>
-              <a:rPr lang="en-US" sz="1050" dirty="0" smtClean="0">
-                <a:solidFill>
-                  <a:srgbClr val="7030A0"/>
-                </a:solidFill>
-              </a:rPr>
-            </a:br>
-            <a:r>
-              <a:rPr lang="en-US" sz="1050" dirty="0" err="1" smtClean="0">
-                <a:solidFill>
-                  <a:srgbClr val="7030A0"/>
-                </a:solidFill>
-              </a:rPr>
-              <a:t>ReadOnlyAddressBook</a:t>
-            </a:r>
-            <a:endParaRPr lang="en-SG" sz="1050" dirty="0">
-              <a:solidFill>
-                <a:srgbClr val="7030A0"/>
-              </a:solidFill>
-            </a:endParaRPr>
-          </a:p>
-        </p:txBody>
-      </p:sp>
-      <p:sp>
-        <p:nvSpPr>
-          <p:cNvPr id="114" name="TextBox 113"/>
-          <p:cNvSpPr txBox="1"/>
-          <p:nvPr/>
-        </p:nvSpPr>
-        <p:spPr>
-          <a:xfrm rot="16200000">
-            <a:off x="6581354" y="3514530"/>
-            <a:ext cx="881018" cy="261610"/>
-          </a:xfrm>
-          <a:prstGeom prst="rect">
-            <a:avLst/>
-          </a:prstGeom>
-          <a:noFill/>
-        </p:spPr>
-        <p:txBody>
-          <a:bodyPr wrap="square" rtlCol="0">
-            <a:spAutoFit/>
-          </a:bodyPr>
-          <a:lstStyle/>
-          <a:p>
-            <a:pPr algn="r"/>
-            <a:r>
-              <a:rPr lang="en-US" sz="1100" dirty="0" smtClean="0">
-                <a:solidFill>
-                  <a:srgbClr val="7030A0"/>
-                </a:solidFill>
-              </a:rPr>
-              <a:t>filtered list</a:t>
-            </a:r>
-            <a:endParaRPr lang="en-SG" sz="1100" dirty="0">
-              <a:solidFill>
-                <a:srgbClr val="7030A0"/>
-              </a:solidFill>
-            </a:endParaRPr>
-          </a:p>
-        </p:txBody>
-      </p:sp>
-      <p:sp>
-        <p:nvSpPr>
-          <p:cNvPr id="122" name="Rectangle 8"/>
-          <p:cNvSpPr/>
-          <p:nvPr/>
-        </p:nvSpPr>
-        <p:spPr>
-          <a:xfrm>
-            <a:off x="2057400" y="4239491"/>
-            <a:ext cx="1775949" cy="346760"/>
-          </a:xfrm>
-          <a:prstGeom prst="rect">
-            <a:avLst/>
-          </a:prstGeom>
-          <a:ln w="19050">
-            <a:solidFill>
-              <a:srgbClr val="7030A0"/>
-            </a:solidFill>
-          </a:ln>
-          <a:effectLst/>
-        </p:spPr>
-        <p:style>
-          <a:lnRef idx="1">
-            <a:schemeClr val="accent4"/>
-          </a:lnRef>
-          <a:fillRef idx="2">
-            <a:schemeClr val="accent4"/>
-          </a:fillRef>
-          <a:effectRef idx="1">
-            <a:schemeClr val="accent4"/>
-          </a:effectRef>
-          <a:fontRef idx="minor">
-            <a:schemeClr val="dk1"/>
-          </a:fontRef>
-        </p:style>
-        <p:txBody>
-          <a:bodyPr rtlCol="0" anchor="ctr"/>
-          <a:lstStyle/>
-          <a:p>
-            <a:pPr algn="ctr"/>
-            <a:r>
-              <a:rPr lang="en-US" sz="1050" dirty="0" smtClean="0">
-                <a:solidFill>
-                  <a:srgbClr val="7030A0"/>
-                </a:solidFill>
-              </a:rPr>
-              <a:t>&lt;&lt;interface&gt;&gt;</a:t>
-            </a:r>
-            <a:r>
-              <a:rPr lang="en-US" sz="1050" dirty="0">
-                <a:solidFill>
-                  <a:srgbClr val="7030A0"/>
-                </a:solidFill>
-              </a:rPr>
-              <a:t/>
             </a:r>
             <a:br>
               <a:rPr lang="en-US" sz="1050" dirty="0">
@@ -15330,7 +15054,117 @@
               </a:rPr>
             </a:br>
             <a:r>
-              <a:rPr lang="en-US" sz="1050" dirty="0" err="1" smtClean="0">
+              <a:rPr lang="en-US" sz="1050" dirty="0" err="1">
+                <a:solidFill>
+                  <a:srgbClr val="7030A0"/>
+                </a:solidFill>
+              </a:rPr>
+              <a:t>ReadOnlyTaskManager</a:t>
+            </a:r>
+            <a:endParaRPr lang="en-SG" sz="1050" dirty="0">
+              <a:solidFill>
+                <a:srgbClr val="7030A0"/>
+              </a:solidFill>
+            </a:endParaRPr>
+          </a:p>
+        </p:txBody>
+      </p:sp>
+      <p:sp>
+        <p:nvSpPr>
+          <p:cNvPr id="114" name="TextBox 113"/>
+          <p:cNvSpPr txBox="1"/>
+          <p:nvPr/>
+        </p:nvSpPr>
+        <p:spPr>
+          <a:xfrm rot="16200000">
+            <a:off x="6581354" y="3514530"/>
+            <a:ext cx="881018" cy="261610"/>
+          </a:xfrm>
+          <a:prstGeom prst="rect">
+            <a:avLst/>
+          </a:prstGeom>
+          <a:noFill/>
+        </p:spPr>
+        <p:txBody>
+          <a:bodyPr wrap="square" rtlCol="0">
+            <a:spAutoFit/>
+          </a:bodyPr>
+          <a:lstStyle/>
+          <a:p>
+            <a:pPr algn="r"/>
+            <a:r>
+              <a:rPr lang="en-US" sz="1100" dirty="0">
+                <a:solidFill>
+                  <a:srgbClr val="7030A0"/>
+                </a:solidFill>
+              </a:rPr>
+              <a:t>filtered list</a:t>
+            </a:r>
+            <a:endParaRPr lang="en-SG" sz="1100" dirty="0">
+              <a:solidFill>
+                <a:srgbClr val="7030A0"/>
+              </a:solidFill>
+            </a:endParaRPr>
+          </a:p>
+        </p:txBody>
+      </p:sp>
+      <p:sp>
+        <p:nvSpPr>
+          <p:cNvPr id="122" name="Rectangle 8"/>
+          <p:cNvSpPr/>
+          <p:nvPr/>
+        </p:nvSpPr>
+        <p:spPr>
+          <a:xfrm>
+            <a:off x="2057400" y="4343400"/>
+            <a:ext cx="1775949" cy="346760"/>
+          </a:xfrm>
+          <a:prstGeom prst="rect">
+            <a:avLst/>
+          </a:prstGeom>
+          <a:ln w="19050">
+            <a:solidFill>
+              <a:srgbClr val="7030A0"/>
+            </a:solidFill>
+          </a:ln>
+          <a:effectLst/>
+        </p:spPr>
+        <p:style>
+          <a:lnRef idx="1">
+            <a:schemeClr val="accent4"/>
+          </a:lnRef>
+          <a:fillRef idx="2">
+            <a:schemeClr val="accent4"/>
+          </a:fillRef>
+          <a:effectRef idx="1">
+            <a:schemeClr val="accent4"/>
+          </a:effectRef>
+          <a:fontRef idx="minor">
+            <a:schemeClr val="dk1"/>
+          </a:fontRef>
+        </p:style>
+        <p:txBody>
+          <a:bodyPr rtlCol="0" anchor="ctr"/>
+          <a:lstStyle/>
+          <a:p>
+            <a:pPr algn="ctr"/>
+            <a:r>
+              <a:rPr lang="en-US" sz="1050" dirty="0">
+                <a:solidFill>
+                  <a:srgbClr val="7030A0"/>
+                </a:solidFill>
+              </a:rPr>
+              <a:t>&lt;&lt;interface&gt;&gt;</a:t>
+            </a:r>
+            <a:br>
+              <a:rPr lang="en-US" sz="1050" dirty="0">
+                <a:solidFill>
+                  <a:srgbClr val="7030A0"/>
+                </a:solidFill>
+              </a:rPr>
+            </a:br>
+            <a:r>
+              <a:rPr lang="en-US" sz="1050" dirty="0" err="1">
                 <a:solidFill>
                   <a:srgbClr val="7030A0"/>
                 </a:solidFill>
@@ -15356,8 +15190,8 @@
         </p:nvCxnSpPr>
         <p:spPr>
           <a:xfrm rot="16200000" flipH="1">
-            <a:off x="1364475" y="3719945"/>
-            <a:ext cx="831471" cy="554380"/>
+            <a:off x="1312520" y="3771900"/>
+            <a:ext cx="935380" cy="554380"/>
           </a:xfrm>
           <a:prstGeom prst="bentConnector2">
             <a:avLst/>
@@ -15369,6 +15203,561 @@
             <a:prstDash val="sysDot"/>
             <a:headEnd type="none" w="med" len="med"/>
             <a:tailEnd type="arrow" w="med" len="med"/>
+          </a:ln>
+          <a:effectLst/>
+        </p:spPr>
+        <p:style>
+          <a:lnRef idx="1">
+            <a:schemeClr val="accent2"/>
+          </a:lnRef>
+          <a:fillRef idx="2">
+            <a:schemeClr val="accent2"/>
+          </a:fillRef>
+          <a:effectRef idx="1">
+            <a:schemeClr val="accent2"/>
+          </a:effectRef>
+          <a:fontRef idx="minor">
+            <a:schemeClr val="dk1"/>
+          </a:fontRef>
+        </p:style>
+      </p:cxnSp>
+      <p:sp>
+        <p:nvSpPr>
+          <p:cNvPr id="52" name="Flowchart: Decision 96"/>
+          <p:cNvSpPr/>
+          <p:nvPr/>
+        </p:nvSpPr>
+        <p:spPr>
+          <a:xfrm>
+            <a:off x="2430952" y="3358006"/>
+            <a:ext cx="236048" cy="173380"/>
+          </a:xfrm>
+          <a:prstGeom prst="flowChartDecision">
+            <a:avLst/>
+          </a:prstGeom>
+          <a:noFill/>
+          <a:ln w="19050">
+            <a:solidFill>
+              <a:srgbClr val="7030A0"/>
+            </a:solidFill>
+          </a:ln>
+          <a:effectLst/>
+        </p:spPr>
+        <p:style>
+          <a:lnRef idx="1">
+            <a:schemeClr val="accent6"/>
+          </a:lnRef>
+          <a:fillRef idx="2">
+            <a:schemeClr val="accent6"/>
+          </a:fillRef>
+          <a:effectRef idx="1">
+            <a:schemeClr val="accent6"/>
+          </a:effectRef>
+          <a:fontRef idx="minor">
+            <a:schemeClr val="dk1"/>
+          </a:fontRef>
+        </p:style>
+        <p:txBody>
+          <a:bodyPr rtlCol="0" anchor="ctr"/>
+          <a:lstStyle/>
+          <a:p>
+            <a:pPr algn="ctr"/>
+            <a:endParaRPr lang="en-US" sz="1050"/>
+          </a:p>
+        </p:txBody>
+      </p:sp>
+      <p:cxnSp>
+        <p:nvCxnSpPr>
+          <p:cNvPr id="60" name="Straight Arrow Connector 59"/>
+          <p:cNvCxnSpPr/>
+          <p:nvPr/>
+        </p:nvCxnSpPr>
+        <p:spPr>
+          <a:xfrm>
+            <a:off x="2667000" y="3429000"/>
+            <a:ext cx="220810" cy="5284"/>
+          </a:xfrm>
+          <a:prstGeom prst="straightConnector1">
+            <a:avLst/>
+          </a:prstGeom>
+          <a:ln w="19050">
+            <a:solidFill>
+              <a:srgbClr val="7030A0"/>
+            </a:solidFill>
+            <a:headEnd type="none" w="med" len="med"/>
+            <a:tailEnd type="arrow" w="med" len="med"/>
+          </a:ln>
+          <a:effectLst/>
+        </p:spPr>
+        <p:style>
+          <a:lnRef idx="1">
+            <a:schemeClr val="accent2"/>
+          </a:lnRef>
+          <a:fillRef idx="2">
+            <a:schemeClr val="accent2"/>
+          </a:fillRef>
+          <a:effectRef idx="1">
+            <a:schemeClr val="accent2"/>
+          </a:effectRef>
+          <a:fontRef idx="minor">
+            <a:schemeClr val="dk1"/>
+          </a:fontRef>
+        </p:style>
+      </p:cxnSp>
+      <p:sp>
+        <p:nvSpPr>
+          <p:cNvPr id="61" name="Rectangle 8"/>
+          <p:cNvSpPr/>
+          <p:nvPr/>
+        </p:nvSpPr>
+        <p:spPr>
+          <a:xfrm>
+            <a:off x="2858774" y="3284219"/>
+            <a:ext cx="1093635" cy="346760"/>
+          </a:xfrm>
+          <a:prstGeom prst="rect">
+            <a:avLst/>
+          </a:prstGeom>
+          <a:ln w="19050">
+            <a:solidFill>
+              <a:srgbClr val="7030A0"/>
+            </a:solidFill>
+          </a:ln>
+          <a:effectLst/>
+        </p:spPr>
+        <p:style>
+          <a:lnRef idx="1">
+            <a:schemeClr val="accent4"/>
+          </a:lnRef>
+          <a:fillRef idx="2">
+            <a:schemeClr val="accent4"/>
+          </a:fillRef>
+          <a:effectRef idx="1">
+            <a:schemeClr val="accent4"/>
+          </a:effectRef>
+          <a:fontRef idx="minor">
+            <a:schemeClr val="dk1"/>
+          </a:fontRef>
+        </p:style>
+        <p:txBody>
+          <a:bodyPr rtlCol="0" anchor="ctr"/>
+          <a:lstStyle/>
+          <a:p>
+            <a:pPr algn="ctr"/>
+            <a:r>
+              <a:rPr lang="en-US" sz="1050" dirty="0" err="1">
+                <a:solidFill>
+                  <a:srgbClr val="7030A0"/>
+                </a:solidFill>
+              </a:rPr>
+              <a:t>StateManager</a:t>
+            </a:r>
+            <a:endParaRPr lang="en-SG" sz="1050" dirty="0">
+              <a:solidFill>
+                <a:srgbClr val="7030A0"/>
+              </a:solidFill>
+            </a:endParaRPr>
+          </a:p>
+        </p:txBody>
+      </p:sp>
+      <p:sp>
+        <p:nvSpPr>
+          <p:cNvPr id="65" name="Flowchart: Decision 96"/>
+          <p:cNvSpPr/>
+          <p:nvPr/>
+        </p:nvSpPr>
+        <p:spPr>
+          <a:xfrm>
+            <a:off x="3949138" y="3387731"/>
+            <a:ext cx="236048" cy="173380"/>
+          </a:xfrm>
+          <a:prstGeom prst="flowChartDecision">
+            <a:avLst/>
+          </a:prstGeom>
+          <a:solidFill>
+            <a:srgbClr val="7030A0"/>
+          </a:solidFill>
+          <a:ln w="19050">
+            <a:solidFill>
+              <a:srgbClr val="7030A0"/>
+            </a:solidFill>
+          </a:ln>
+          <a:effectLst/>
+        </p:spPr>
+        <p:style>
+          <a:lnRef idx="1">
+            <a:schemeClr val="accent6"/>
+          </a:lnRef>
+          <a:fillRef idx="2">
+            <a:schemeClr val="accent6"/>
+          </a:fillRef>
+          <a:effectRef idx="1">
+            <a:schemeClr val="accent6"/>
+          </a:effectRef>
+          <a:fontRef idx="minor">
+            <a:schemeClr val="dk1"/>
+          </a:fontRef>
+        </p:style>
+        <p:txBody>
+          <a:bodyPr rtlCol="0" anchor="ctr"/>
+          <a:lstStyle/>
+          <a:p>
+            <a:pPr algn="ctr"/>
+            <a:endParaRPr lang="en-US" sz="1050"/>
+          </a:p>
+        </p:txBody>
+      </p:sp>
+      <p:sp>
+        <p:nvSpPr>
+          <p:cNvPr id="66" name="Rectangle 8"/>
+          <p:cNvSpPr/>
+          <p:nvPr/>
+        </p:nvSpPr>
+        <p:spPr>
+          <a:xfrm>
+            <a:off x="4618731" y="3356321"/>
+            <a:ext cx="1400212" cy="234365"/>
+          </a:xfrm>
+          <a:prstGeom prst="rect">
+            <a:avLst/>
+          </a:prstGeom>
+          <a:ln w="19050">
+            <a:solidFill>
+              <a:srgbClr val="7030A0"/>
+            </a:solidFill>
+          </a:ln>
+          <a:effectLst/>
+        </p:spPr>
+        <p:style>
+          <a:lnRef idx="1">
+            <a:schemeClr val="accent4"/>
+          </a:lnRef>
+          <a:fillRef idx="2">
+            <a:schemeClr val="accent4"/>
+          </a:fillRef>
+          <a:effectRef idx="1">
+            <a:schemeClr val="accent4"/>
+          </a:effectRef>
+          <a:fontRef idx="minor">
+            <a:schemeClr val="dk1"/>
+          </a:fontRef>
+        </p:style>
+        <p:txBody>
+          <a:bodyPr rtlCol="0" anchor="ctr"/>
+          <a:lstStyle/>
+          <a:p>
+            <a:pPr algn="ctr"/>
+            <a:r>
+              <a:rPr lang="en-US" sz="1050" dirty="0" err="1">
+                <a:solidFill>
+                  <a:srgbClr val="7030A0"/>
+                </a:solidFill>
+              </a:rPr>
+              <a:t>TaskManagerState</a:t>
+            </a:r>
+            <a:endParaRPr lang="en-SG" sz="1050" dirty="0">
+              <a:solidFill>
+                <a:srgbClr val="7030A0"/>
+              </a:solidFill>
+            </a:endParaRPr>
+          </a:p>
+        </p:txBody>
+      </p:sp>
+      <p:cxnSp>
+        <p:nvCxnSpPr>
+          <p:cNvPr id="70" name="Elbow Connector 80"/>
+          <p:cNvCxnSpPr>
+            <a:stCxn id="65" idx="3"/>
+            <a:endCxn id="66" idx="1"/>
+          </p:cNvCxnSpPr>
+          <p:nvPr/>
+        </p:nvCxnSpPr>
+        <p:spPr>
+          <a:xfrm flipV="1">
+            <a:off x="4185186" y="3473504"/>
+            <a:ext cx="433545" cy="917"/>
+          </a:xfrm>
+          <a:prstGeom prst="bentConnector3">
+            <a:avLst/>
+          </a:prstGeom>
+          <a:ln w="19050">
+            <a:solidFill>
+              <a:srgbClr val="7030A0"/>
+            </a:solidFill>
+            <a:headEnd type="none" w="med" len="med"/>
+            <a:tailEnd type="arrow" w="med" len="med"/>
+          </a:ln>
+          <a:effectLst/>
+        </p:spPr>
+        <p:style>
+          <a:lnRef idx="1">
+            <a:schemeClr val="accent2"/>
+          </a:lnRef>
+          <a:fillRef idx="2">
+            <a:schemeClr val="accent2"/>
+          </a:fillRef>
+          <a:effectRef idx="1">
+            <a:schemeClr val="accent2"/>
+          </a:effectRef>
+          <a:fontRef idx="minor">
+            <a:schemeClr val="dk1"/>
+          </a:fontRef>
+        </p:style>
+      </p:cxnSp>
+      <p:cxnSp>
+        <p:nvCxnSpPr>
+          <p:cNvPr id="31" name="Straight Connector 30"/>
+          <p:cNvCxnSpPr/>
+          <p:nvPr/>
+        </p:nvCxnSpPr>
+        <p:spPr>
+          <a:xfrm>
+            <a:off x="2230780" y="3610644"/>
+            <a:ext cx="0" cy="656556"/>
+          </a:xfrm>
+          <a:prstGeom prst="line">
+            <a:avLst/>
+          </a:prstGeom>
+          <a:ln>
+            <a:solidFill>
+              <a:srgbClr val="7030A0"/>
+            </a:solidFill>
+          </a:ln>
+          <a:effectLst/>
+        </p:spPr>
+        <p:style>
+          <a:lnRef idx="2">
+            <a:schemeClr val="accent4"/>
+          </a:lnRef>
+          <a:fillRef idx="0">
+            <a:schemeClr val="accent4"/>
+          </a:fillRef>
+          <a:effectRef idx="1">
+            <a:schemeClr val="accent4"/>
+          </a:effectRef>
+          <a:fontRef idx="minor">
+            <a:schemeClr val="tx1"/>
+          </a:fontRef>
+        </p:style>
+      </p:cxnSp>
+      <p:cxnSp>
+        <p:nvCxnSpPr>
+          <p:cNvPr id="82" name="Straight Connector 81"/>
+          <p:cNvCxnSpPr/>
+          <p:nvPr/>
+        </p:nvCxnSpPr>
+        <p:spPr>
+          <a:xfrm flipH="1" flipV="1">
+            <a:off x="2209800" y="4267200"/>
+            <a:ext cx="4660278" cy="12468"/>
+          </a:xfrm>
+          <a:prstGeom prst="line">
+            <a:avLst/>
+          </a:prstGeom>
+          <a:ln>
+            <a:solidFill>
+              <a:srgbClr val="7030A0"/>
+            </a:solidFill>
+          </a:ln>
+          <a:effectLst/>
+        </p:spPr>
+        <p:style>
+          <a:lnRef idx="2">
+            <a:schemeClr val="accent4"/>
+          </a:lnRef>
+          <a:fillRef idx="0">
+            <a:schemeClr val="accent4"/>
+          </a:fillRef>
+          <a:effectRef idx="1">
+            <a:schemeClr val="accent4"/>
+          </a:effectRef>
+          <a:fontRef idx="minor">
+            <a:schemeClr val="tx1"/>
+          </a:fontRef>
+        </p:style>
+      </p:cxnSp>
+      <p:cxnSp>
+        <p:nvCxnSpPr>
+          <p:cNvPr id="91" name="Elbow Connector 80"/>
+          <p:cNvCxnSpPr/>
+          <p:nvPr/>
+        </p:nvCxnSpPr>
+        <p:spPr>
+          <a:xfrm rot="16200000" flipV="1">
+            <a:off x="6261490" y="3663816"/>
+            <a:ext cx="1225336" cy="6367"/>
+          </a:xfrm>
+          <a:prstGeom prst="bentConnector3">
+            <a:avLst>
+              <a:gd name="adj1" fmla="val 50602"/>
+            </a:avLst>
+          </a:prstGeom>
+          <a:ln w="19050">
+            <a:solidFill>
+              <a:srgbClr val="7030A0"/>
+            </a:solidFill>
+            <a:headEnd type="none" w="med" len="med"/>
+            <a:tailEnd type="arrow" w="med" len="med"/>
+          </a:ln>
+          <a:effectLst/>
+        </p:spPr>
+        <p:style>
+          <a:lnRef idx="1">
+            <a:schemeClr val="accent2"/>
+          </a:lnRef>
+          <a:fillRef idx="2">
+            <a:schemeClr val="accent2"/>
+          </a:fillRef>
+          <a:effectRef idx="1">
+            <a:schemeClr val="accent2"/>
+          </a:effectRef>
+          <a:fontRef idx="minor">
+            <a:schemeClr val="dk1"/>
+          </a:fontRef>
+        </p:style>
+      </p:cxnSp>
+      <p:sp>
+        <p:nvSpPr>
+          <p:cNvPr id="101" name="Isosceles Triangle 102"/>
+          <p:cNvSpPr/>
+          <p:nvPr/>
+        </p:nvSpPr>
+        <p:spPr>
+          <a:xfrm flipV="1">
+            <a:off x="3313922" y="3710677"/>
+            <a:ext cx="270504" cy="175523"/>
+          </a:xfrm>
+          <a:prstGeom prst="triangle">
+            <a:avLst/>
+          </a:prstGeom>
+          <a:ln w="19050">
+            <a:solidFill>
+              <a:srgbClr val="7030A0"/>
+            </a:solidFill>
+          </a:ln>
+          <a:effectLst/>
+        </p:spPr>
+        <p:style>
+          <a:lnRef idx="1">
+            <a:schemeClr val="accent4"/>
+          </a:lnRef>
+          <a:fillRef idx="2">
+            <a:schemeClr val="accent4"/>
+          </a:fillRef>
+          <a:effectRef idx="1">
+            <a:schemeClr val="accent4"/>
+          </a:effectRef>
+          <a:fontRef idx="minor">
+            <a:schemeClr val="dk1"/>
+          </a:fontRef>
+        </p:style>
+        <p:txBody>
+          <a:bodyPr rtlCol="0" anchor="ctr"/>
+          <a:lstStyle/>
+          <a:p>
+            <a:pPr algn="ctr"/>
+            <a:endParaRPr lang="en-SG" sz="1050" b="1">
+              <a:solidFill>
+                <a:srgbClr val="92D050"/>
+              </a:solidFill>
+            </a:endParaRPr>
+          </a:p>
+        </p:txBody>
+      </p:sp>
+      <p:sp>
+        <p:nvSpPr>
+          <p:cNvPr id="102" name="Rectangle 8"/>
+          <p:cNvSpPr/>
+          <p:nvPr/>
+        </p:nvSpPr>
+        <p:spPr>
+          <a:xfrm>
+            <a:off x="2679211" y="3886200"/>
+            <a:ext cx="1539926" cy="346760"/>
+          </a:xfrm>
+          <a:prstGeom prst="rect">
+            <a:avLst/>
+          </a:prstGeom>
+          <a:ln w="19050">
+            <a:solidFill>
+              <a:srgbClr val="7030A0"/>
+            </a:solidFill>
+          </a:ln>
+          <a:effectLst/>
+        </p:spPr>
+        <p:style>
+          <a:lnRef idx="1">
+            <a:schemeClr val="accent4"/>
+          </a:lnRef>
+          <a:fillRef idx="2">
+            <a:schemeClr val="accent4"/>
+          </a:fillRef>
+          <a:effectRef idx="1">
+            <a:schemeClr val="accent4"/>
+          </a:effectRef>
+          <a:fontRef idx="minor">
+            <a:schemeClr val="dk1"/>
+          </a:fontRef>
+        </p:style>
+        <p:txBody>
+          <a:bodyPr rtlCol="0" anchor="ctr"/>
+          <a:lstStyle/>
+          <a:p>
+            <a:pPr algn="ctr"/>
+            <a:r>
+              <a:rPr lang="en-US" sz="1050" dirty="0">
+                <a:solidFill>
+                  <a:srgbClr val="7030A0"/>
+                </a:solidFill>
+              </a:rPr>
+              <a:t>&lt;&lt;interface&gt;&gt;</a:t>
+            </a:r>
+            <a:br>
+              <a:rPr lang="en-US" sz="1050" dirty="0">
+                <a:solidFill>
+                  <a:srgbClr val="7030A0"/>
+                </a:solidFill>
+              </a:rPr>
+            </a:br>
+            <a:r>
+              <a:rPr lang="en-US" sz="1050" dirty="0">
+                <a:solidFill>
+                  <a:srgbClr val="7030A0"/>
+                </a:solidFill>
+              </a:rPr>
+              <a:t>State</a:t>
+            </a:r>
+            <a:endParaRPr lang="en-SG" sz="1050" dirty="0">
+              <a:solidFill>
+                <a:srgbClr val="7030A0"/>
+              </a:solidFill>
+            </a:endParaRPr>
+          </a:p>
+        </p:txBody>
+      </p:sp>
+      <p:cxnSp>
+        <p:nvCxnSpPr>
+          <p:cNvPr id="113" name="Elbow Connector 63"/>
+          <p:cNvCxnSpPr/>
+          <p:nvPr/>
+        </p:nvCxnSpPr>
+        <p:spPr>
+          <a:xfrm rot="16200000" flipH="1">
+            <a:off x="3360961" y="3664049"/>
+            <a:ext cx="137790" cy="1712"/>
+          </a:xfrm>
+          <a:prstGeom prst="bentConnector3">
+            <a:avLst>
+              <a:gd name="adj1" fmla="val 49999"/>
+            </a:avLst>
+          </a:prstGeom>
+          <a:ln w="19050">
+            <a:solidFill>
+              <a:srgbClr val="7030A0"/>
+            </a:solidFill>
+            <a:prstDash val="sysDot"/>
+            <a:headEnd type="none" w="med" len="med"/>
+            <a:tailEnd type="none" w="med" len="med"/>
           </a:ln>
           <a:effectLst/>
         </p:spPr>
@@ -15397,13 +15786,6 @@
   <p:clrMapOvr>
     <a:masterClrMapping/>
   </p:clrMapOvr>
-  <p:timing>
-    <p:tnLst>
-      <p:par>
-        <p:cTn id="1" dur="indefinite" restart="never" nodeType="tmRoot"/>
-      </p:par>
-    </p:tnLst>
-  </p:timing>
 </p:sld>
 </file>
 
@@ -15470,7 +15852,7 @@
           <a:lstStyle/>
           <a:p>
             <a:r>
-              <a:rPr lang="en-US" sz="1200" b="1" dirty="0" smtClean="0">
+              <a:rPr lang="en-US" sz="1200" b="1" dirty="0">
                 <a:solidFill>
                   <a:schemeClr val="accent6">
                     <a:lumMod val="75000"/>
@@ -15497,149 +15879,8 @@
         </p:nvSpPr>
         <p:spPr>
           <a:xfrm>
-            <a:off x="2877180" y="3158440"/>
-            <a:ext cx="1323049" cy="346760"/>
-          </a:xfrm>
-          <a:prstGeom prst="rect">
-            <a:avLst/>
-          </a:prstGeom>
-          <a:solidFill>
-            <a:schemeClr val="accent6">
-              <a:lumMod val="75000"/>
-            </a:schemeClr>
-          </a:solidFill>
-          <a:ln w="19050">
-            <a:solidFill>
-              <a:schemeClr val="accent6">
-                <a:lumMod val="75000"/>
-              </a:schemeClr>
-            </a:solidFill>
-          </a:ln>
-          <a:effectLst/>
-        </p:spPr>
-        <p:style>
-          <a:lnRef idx="1">
-            <a:schemeClr val="accent2"/>
-          </a:lnRef>
-          <a:fillRef idx="2">
-            <a:schemeClr val="accent2"/>
-          </a:fillRef>
-          <a:effectRef idx="1">
-            <a:schemeClr val="accent2"/>
-          </a:effectRef>
-          <a:fontRef idx="minor">
-            <a:schemeClr val="dk1"/>
-          </a:fontRef>
-        </p:style>
-        <p:txBody>
-          <a:bodyPr rtlCol="0" anchor="ctr"/>
-          <a:lstStyle/>
-          <a:p>
-            <a:pPr algn="ctr"/>
-            <a:r>
-              <a:rPr lang="en-US" sz="1050" dirty="0" smtClean="0">
-                <a:solidFill>
-                  <a:schemeClr val="bg1"/>
-                </a:solidFill>
-              </a:rPr>
-              <a:t>&lt;&lt;interface&gt;&gt;</a:t>
-            </a:r>
-            <a:br>
-              <a:rPr lang="en-US" sz="1050" dirty="0" smtClean="0">
-                <a:solidFill>
-                  <a:schemeClr val="bg1"/>
-                </a:solidFill>
-              </a:rPr>
-            </a:br>
-            <a:r>
-              <a:rPr lang="en-US" sz="1050" dirty="0" err="1" smtClean="0">
-                <a:solidFill>
-                  <a:schemeClr val="bg1"/>
-                </a:solidFill>
-              </a:rPr>
-              <a:t>AddressBookStorage</a:t>
-            </a:r>
-            <a:endParaRPr lang="en-SG" sz="1050" dirty="0">
-              <a:solidFill>
-                <a:schemeClr val="bg1"/>
-              </a:solidFill>
-            </a:endParaRPr>
-          </a:p>
-        </p:txBody>
-      </p:sp>
-      <p:sp>
-        <p:nvSpPr>
-          <p:cNvPr id="9" name="Rectangle 62"/>
-          <p:cNvSpPr/>
-          <p:nvPr/>
-        </p:nvSpPr>
-        <p:spPr>
-          <a:xfrm rot="16200000">
-            <a:off x="1683963" y="2868687"/>
-            <a:ext cx="1093635" cy="346760"/>
-          </a:xfrm>
-          <a:prstGeom prst="rect">
-            <a:avLst/>
-          </a:prstGeom>
-          <a:solidFill>
-            <a:schemeClr val="accent6">
-              <a:lumMod val="75000"/>
-            </a:schemeClr>
-          </a:solidFill>
-          <a:ln w="19050">
-            <a:solidFill>
-              <a:schemeClr val="accent6">
-                <a:lumMod val="75000"/>
-              </a:schemeClr>
-            </a:solidFill>
-          </a:ln>
-          <a:effectLst/>
-        </p:spPr>
-        <p:style>
-          <a:lnRef idx="1">
-            <a:schemeClr val="accent2"/>
-          </a:lnRef>
-          <a:fillRef idx="2">
-            <a:schemeClr val="accent2"/>
-          </a:fillRef>
-          <a:effectRef idx="1">
-            <a:schemeClr val="accent2"/>
-          </a:effectRef>
-          <a:fontRef idx="minor">
-            <a:schemeClr val="dk1"/>
-          </a:fontRef>
-        </p:style>
-        <p:txBody>
-          <a:bodyPr rtlCol="0" anchor="ctr"/>
-          <a:lstStyle/>
-          <a:p>
-            <a:pPr algn="ctr"/>
-            <a:r>
-              <a:rPr lang="en-US" sz="1050" dirty="0" err="1" smtClean="0">
-                <a:solidFill>
-                  <a:schemeClr val="bg1"/>
-                </a:solidFill>
-              </a:rPr>
-              <a:t>StorageManager</a:t>
-            </a:r>
-            <a:endParaRPr lang="en-SG" sz="1050" dirty="0">
-              <a:solidFill>
-                <a:schemeClr val="bg1"/>
-              </a:solidFill>
-            </a:endParaRPr>
-          </a:p>
-        </p:txBody>
-      </p:sp>
-      <p:sp>
-        <p:nvSpPr>
-          <p:cNvPr id="119" name="Rectangle 62"/>
-          <p:cNvSpPr/>
-          <p:nvPr/>
-        </p:nvSpPr>
-        <p:spPr>
-          <a:xfrm rot="16200000">
-            <a:off x="956202" y="2861202"/>
-            <a:ext cx="1093635" cy="346760"/>
+            <a:off x="2846236" y="3158440"/>
+            <a:ext cx="1353994" cy="346760"/>
           </a:xfrm>
           <a:prstGeom prst="rect">
             <a:avLst/>
@@ -15685,11 +15926,152 @@
               </a:rPr>
               <a:t>&lt;&lt;interface&gt;&gt;</a:t>
             </a:r>
-          </a:p>
+            <a:br>
+              <a:rPr lang="en-US" sz="1050" dirty="0">
+                <a:solidFill>
+                  <a:schemeClr val="bg1"/>
+                </a:solidFill>
+              </a:rPr>
+            </a:br>
+            <a:r>
+              <a:rPr lang="en-US" sz="1050" dirty="0" err="1">
+                <a:solidFill>
+                  <a:schemeClr val="bg1"/>
+                </a:solidFill>
+              </a:rPr>
+              <a:t>TaskManagerStorage</a:t>
+            </a:r>
+            <a:endParaRPr lang="en-SG" sz="1050" dirty="0">
+              <a:solidFill>
+                <a:schemeClr val="bg1"/>
+              </a:solidFill>
+            </a:endParaRPr>
+          </a:p>
+        </p:txBody>
+      </p:sp>
+      <p:sp>
+        <p:nvSpPr>
+          <p:cNvPr id="9" name="Rectangle 62"/>
+          <p:cNvSpPr/>
+          <p:nvPr/>
+        </p:nvSpPr>
+        <p:spPr>
+          <a:xfrm rot="16200000">
+            <a:off x="1683963" y="2868687"/>
+            <a:ext cx="1093635" cy="346760"/>
+          </a:xfrm>
+          <a:prstGeom prst="rect">
+            <a:avLst/>
+          </a:prstGeom>
+          <a:solidFill>
+            <a:schemeClr val="accent6">
+              <a:lumMod val="75000"/>
+            </a:schemeClr>
+          </a:solidFill>
+          <a:ln w="19050">
+            <a:solidFill>
+              <a:schemeClr val="accent6">
+                <a:lumMod val="75000"/>
+              </a:schemeClr>
+            </a:solidFill>
+          </a:ln>
+          <a:effectLst/>
+        </p:spPr>
+        <p:style>
+          <a:lnRef idx="1">
+            <a:schemeClr val="accent2"/>
+          </a:lnRef>
+          <a:fillRef idx="2">
+            <a:schemeClr val="accent2"/>
+          </a:fillRef>
+          <a:effectRef idx="1">
+            <a:schemeClr val="accent2"/>
+          </a:effectRef>
+          <a:fontRef idx="minor">
+            <a:schemeClr val="dk1"/>
+          </a:fontRef>
+        </p:style>
+        <p:txBody>
+          <a:bodyPr rtlCol="0" anchor="ctr"/>
+          <a:lstStyle/>
           <a:p>
             <a:pPr algn="ctr"/>
             <a:r>
-              <a:rPr lang="en-US" sz="1050" dirty="0" smtClean="0">
+              <a:rPr lang="en-US" sz="1050" dirty="0" err="1">
+                <a:solidFill>
+                  <a:schemeClr val="bg1"/>
+                </a:solidFill>
+              </a:rPr>
+              <a:t>StorageManager</a:t>
+            </a:r>
+            <a:endParaRPr lang="en-SG" sz="1050" dirty="0">
+              <a:solidFill>
+                <a:schemeClr val="bg1"/>
+              </a:solidFill>
+            </a:endParaRPr>
+          </a:p>
+        </p:txBody>
+      </p:sp>
+      <p:sp>
+        <p:nvSpPr>
+          <p:cNvPr id="119" name="Rectangle 62"/>
+          <p:cNvSpPr/>
+          <p:nvPr/>
+        </p:nvSpPr>
+        <p:spPr>
+          <a:xfrm rot="16200000">
+            <a:off x="956202" y="2861202"/>
+            <a:ext cx="1093635" cy="346760"/>
+          </a:xfrm>
+          <a:prstGeom prst="rect">
+            <a:avLst/>
+          </a:prstGeom>
+          <a:solidFill>
+            <a:schemeClr val="accent6">
+              <a:lumMod val="75000"/>
+            </a:schemeClr>
+          </a:solidFill>
+          <a:ln w="19050">
+            <a:solidFill>
+              <a:schemeClr val="accent6">
+                <a:lumMod val="75000"/>
+              </a:schemeClr>
+            </a:solidFill>
+          </a:ln>
+          <a:effectLst/>
+        </p:spPr>
+        <p:style>
+          <a:lnRef idx="1">
+            <a:schemeClr val="accent2"/>
+          </a:lnRef>
+          <a:fillRef idx="2">
+            <a:schemeClr val="accent2"/>
+          </a:fillRef>
+          <a:effectRef idx="1">
+            <a:schemeClr val="accent2"/>
+          </a:effectRef>
+          <a:fontRef idx="minor">
+            <a:schemeClr val="dk1"/>
+          </a:fontRef>
+        </p:style>
+        <p:txBody>
+          <a:bodyPr rtlCol="0" anchor="ctr"/>
+          <a:lstStyle/>
+          <a:p>
+            <a:pPr algn="ctr"/>
+            <a:r>
+              <a:rPr lang="en-US" sz="1050" dirty="0">
+                <a:solidFill>
+                  <a:schemeClr val="bg1"/>
+                </a:solidFill>
+              </a:rPr>
+              <a:t>&lt;&lt;interface&gt;&gt;</a:t>
+            </a:r>
+          </a:p>
+          <a:p>
+            <a:pPr algn="ctr"/>
+            <a:r>
+              <a:rPr lang="en-US" sz="1050" dirty="0">
                 <a:solidFill>
                   <a:schemeClr val="bg1"/>
                 </a:solidFill>
@@ -15771,7 +16153,7 @@
         <p:spPr>
           <a:xfrm>
             <a:off x="2656370" y="3326536"/>
-            <a:ext cx="220810" cy="5284"/>
+            <a:ext cx="189866" cy="5284"/>
           </a:xfrm>
           <a:prstGeom prst="straightConnector1">
             <a:avLst/>
@@ -16123,27 +16505,17 @@
           <a:p>
             <a:pPr algn="ctr"/>
             <a:r>
-              <a:rPr lang="en-US" sz="1050" b="1" dirty="0" err="1" smtClean="0">
+              <a:rPr lang="en-US" sz="1050" b="1" dirty="0" err="1">
                 <a:solidFill>
                   <a:schemeClr val="accent6">
                     <a:lumMod val="75000"/>
                   </a:schemeClr>
                 </a:solidFill>
               </a:rPr>
-              <a:t>XmlAddressBook</a:t>
-            </a:r>
-            <a:r>
-              <a:rPr lang="en-US" sz="1050" b="1" dirty="0" smtClean="0">
-                <a:solidFill>
-                  <a:schemeClr val="accent6">
-                    <a:lumMod val="75000"/>
-                  </a:schemeClr>
-                </a:solidFill>
-              </a:rPr>
-              <a:t/>
+              <a:t>XmlTaskManager</a:t>
             </a:r>
             <a:br>
-              <a:rPr lang="en-US" sz="1050" b="1" dirty="0" smtClean="0">
+              <a:rPr lang="en-US" sz="1050" b="1" dirty="0">
                 <a:solidFill>
                   <a:schemeClr val="accent6">
                     <a:lumMod val="75000"/>
@@ -16152,7 +16524,7 @@
               </a:rPr>
             </a:br>
             <a:r>
-              <a:rPr lang="en-US" sz="1050" b="1" dirty="0" smtClean="0">
+              <a:rPr lang="en-US" sz="1050" b="1" dirty="0">
                 <a:solidFill>
                   <a:schemeClr val="accent6">
                     <a:lumMod val="75000"/>
@@ -16219,7 +16591,7 @@
           <a:p>
             <a:pPr algn="ctr"/>
             <a:r>
-              <a:rPr lang="en-US" sz="1050" dirty="0" smtClean="0">
+              <a:rPr lang="en-US" sz="1050" dirty="0">
                 <a:solidFill>
                   <a:schemeClr val="bg1"/>
                 </a:solidFill>
@@ -16227,14 +16599,14 @@
               <a:t>&lt;&lt;interface&gt;&gt;</a:t>
             </a:r>
             <a:br>
-              <a:rPr lang="en-US" sz="1050" dirty="0" smtClean="0">
+              <a:rPr lang="en-US" sz="1050" dirty="0">
                 <a:solidFill>
                   <a:schemeClr val="bg1"/>
                 </a:solidFill>
               </a:rPr>
             </a:br>
             <a:r>
-              <a:rPr lang="en-US" sz="1050" dirty="0" err="1" smtClean="0">
+              <a:rPr lang="en-US" sz="1050" dirty="0" err="1">
                 <a:solidFill>
                   <a:schemeClr val="bg1"/>
                 </a:solidFill>
@@ -16492,30 +16864,22 @@
           <a:p>
             <a:pPr algn="ctr"/>
             <a:r>
-              <a:rPr lang="en-US" sz="1050" dirty="0" err="1" smtClean="0">
+              <a:rPr lang="en-US" sz="1050" dirty="0" err="1">
                 <a:solidFill>
                   <a:schemeClr val="bg1"/>
                 </a:solidFill>
               </a:rPr>
               <a:t>JsonUserPrefs</a:t>
             </a:r>
-            <a:r>
-              <a:rPr lang="en-US" sz="1050" dirty="0" smtClean="0">
-                <a:solidFill>
-                  <a:schemeClr val="bg1"/>
-                </a:solidFill>
-              </a:rPr>
-              <a:t/>
-            </a:r>
             <a:br>
-              <a:rPr lang="en-US" sz="1050" dirty="0" smtClean="0">
+              <a:rPr lang="en-US" sz="1050" dirty="0">
                 <a:solidFill>
                   <a:schemeClr val="bg1"/>
                 </a:solidFill>
               </a:rPr>
             </a:br>
             <a:r>
-              <a:rPr lang="en-US" sz="1050" dirty="0" smtClean="0">
+              <a:rPr lang="en-US" sz="1050" dirty="0">
                 <a:solidFill>
                   <a:schemeClr val="bg1"/>
                 </a:solidFill>
@@ -16567,7 +16931,7 @@
           <a:p>
             <a:pPr algn="ctr"/>
             <a:r>
-              <a:rPr lang="en-US" sz="1050" b="1" dirty="0" err="1" smtClean="0">
+              <a:rPr lang="en-US" sz="1050" b="1" dirty="0" err="1">
                 <a:solidFill>
                   <a:schemeClr val="accent6">
                     <a:lumMod val="75000"/>
@@ -16576,18 +16940,8 @@
               </a:rPr>
               <a:t>XmlSerializable</a:t>
             </a:r>
-            <a:r>
-              <a:rPr lang="en-US" sz="1050" b="1" dirty="0" smtClean="0">
-                <a:solidFill>
-                  <a:schemeClr val="accent6">
-                    <a:lumMod val="75000"/>
-                  </a:schemeClr>
-                </a:solidFill>
-              </a:rPr>
-              <a:t/>
-            </a:r>
             <a:br>
-              <a:rPr lang="en-US" sz="1050" b="1" dirty="0" smtClean="0">
+              <a:rPr lang="en-US" sz="1050" b="1" dirty="0">
                 <a:solidFill>
                   <a:schemeClr val="accent6">
                     <a:lumMod val="75000"/>
@@ -16596,14 +16950,14 @@
               </a:rPr>
             </a:br>
             <a:r>
-              <a:rPr lang="en-US" sz="1050" b="1" dirty="0" err="1" smtClean="0">
+              <a:rPr lang="en-US" sz="1050" b="1" dirty="0" err="1">
                 <a:solidFill>
                   <a:schemeClr val="accent6">
                     <a:lumMod val="75000"/>
                   </a:schemeClr>
                 </a:solidFill>
               </a:rPr>
-              <a:t>AddressBook</a:t>
+              <a:t>TaskManager</a:t>
             </a:r>
             <a:endParaRPr lang="en-SG" sz="1050" b="1" dirty="0">
               <a:solidFill>
@@ -16693,7 +17047,7 @@
           <a:p>
             <a:pPr algn="ctr"/>
             <a:r>
-              <a:rPr lang="en-US" sz="1050" b="1" dirty="0" err="1" smtClean="0">
+              <a:rPr lang="en-US" sz="1050" b="1" dirty="0" err="1">
                 <a:solidFill>
                   <a:schemeClr val="accent6">
                     <a:lumMod val="75000"/>
@@ -16749,14 +17103,14 @@
           <a:p>
             <a:pPr algn="ctr"/>
             <a:r>
-              <a:rPr lang="en-US" sz="1050" b="1" dirty="0" err="1" smtClean="0">
+              <a:rPr lang="en-US" sz="1050" b="1" dirty="0" err="1">
                 <a:solidFill>
                   <a:schemeClr val="accent6">
                     <a:lumMod val="75000"/>
                   </a:schemeClr>
                 </a:solidFill>
               </a:rPr>
-              <a:t>XmlAdaptedPerson</a:t>
+              <a:t>XmlAdaptedTask</a:t>
             </a:r>
             <a:endParaRPr lang="en-SG" sz="1050" b="1" dirty="0">
               <a:solidFill>
@@ -16819,13 +17173,6 @@
   <p:clrMapOvr>
     <a:masterClrMapping/>
   </p:clrMapOvr>
-  <p:timing>
-    <p:tnLst>
-      <p:par>
-        <p:cTn id="1" dur="indefinite" restart="never" nodeType="tmRoot"/>
-      </p:par>
-    </p:tnLst>
-  </p:timing>
 </p:sld>
 </file>
 

</xml_diff>

<commit_message>
Update other diagrams in Developer Guide
</commit_message>
<xml_diff>
--- a/docs/diagrams/Diagrams.pptx
+++ b/docs/diagrams/Diagrams.pptx
@@ -5818,7 +5818,7 @@
                   <a:srgbClr val="7030A0"/>
                 </a:solidFill>
               </a:rPr>
-              <a:t>deletePerson</a:t>
+              <a:t>deleteTask</a:t>
             </a:r>
             <a:r>
               <a:rPr lang="en-US" sz="1400" dirty="0">
@@ -5871,7 +5871,7 @@
                   </a:schemeClr>
                 </a:solidFill>
               </a:rPr>
-              <a:t>AddressBookChangedEvent</a:t>
+              <a:t>TaskManagerChangedEvent</a:t>
             </a:r>
             <a:r>
               <a:rPr lang="en-US" sz="1400" dirty="0">
@@ -6438,7 +6438,7 @@
                   </a:schemeClr>
                 </a:solidFill>
               </a:rPr>
-              <a:t>AddressBookChangedEvent</a:t>
+              <a:t>TaskManagerChangedEvent</a:t>
             </a:r>
             <a:r>
               <a:rPr lang="en-US" sz="1400" dirty="0">
@@ -6803,7 +6803,7 @@
                   </a:schemeClr>
                 </a:solidFill>
               </a:rPr>
-              <a:t>handleAddresssBookChangedEvent</a:t>
+              <a:t>handleTaskManagerChangedEvent</a:t>
             </a:r>
             <a:r>
               <a:rPr lang="en-US" sz="1400" dirty="0">
@@ -7107,7 +7107,7 @@
                   <a:srgbClr val="00B050"/>
                 </a:solidFill>
               </a:rPr>
-              <a:t>handleAddresssBookChangedEvent</a:t>
+              <a:t>handleTaskManagerChangedEvent</a:t>
             </a:r>
             <a:r>
               <a:rPr lang="en-US" sz="1400" dirty="0">
@@ -8163,7 +8163,7 @@
                   </a:schemeClr>
                 </a:solidFill>
               </a:rPr>
-              <a:t>PersonListPanel</a:t>
+              <a:t>TaskListPanel</a:t>
             </a:r>
             <a:endParaRPr lang="en-SG" sz="1050" b="1" dirty="0">
               <a:solidFill>
@@ -8223,7 +8223,7 @@
                   </a:schemeClr>
                 </a:solidFill>
               </a:rPr>
-              <a:t>PersonCard</a:t>
+              <a:t>TaskCard</a:t>
             </a:r>
             <a:endParaRPr lang="en-SG" sz="1050" b="1" dirty="0">
               <a:solidFill>
@@ -12791,7 +12791,7 @@
                   <a:srgbClr val="7030A0"/>
                 </a:solidFill>
               </a:rPr>
-              <a:t>deletePerson</a:t>
+              <a:t>deleteTask</a:t>
             </a:r>
             <a:r>
               <a:rPr lang="en-US" dirty="0">

</xml_diff>

<commit_message>
Updated Diagrams powerpoint file
</commit_message>
<xml_diff>
--- a/docs/diagrams/Diagrams.pptx
+++ b/docs/diagrams/Diagrams.pptx
@@ -200,7 +200,7 @@
           <a:p>
             <a:fld id="{F5CC4B3F-88C1-4FFA-B1B6-F41C21DC6924}" type="datetimeFigureOut">
               <a:rPr lang="en-US" smtClean="0"/>
-              <a:t>9/30/2016</a:t>
+              <a:t>10/26/2016</a:t>
             </a:fld>
             <a:endParaRPr lang="en-US"/>
           </a:p>
@@ -649,7 +649,7 @@
           <a:p>
             <a:fld id="{78C97017-6FC3-485B-9764-EAC9E56C1D49}" type="datetimeFigureOut">
               <a:rPr lang="en-US" smtClean="0"/>
-              <a:t>9/30/2016</a:t>
+              <a:t>10/26/2016</a:t>
             </a:fld>
             <a:endParaRPr lang="en-US"/>
           </a:p>
@@ -819,7 +819,7 @@
           <a:p>
             <a:fld id="{78C97017-6FC3-485B-9764-EAC9E56C1D49}" type="datetimeFigureOut">
               <a:rPr lang="en-US" smtClean="0"/>
-              <a:t>9/30/2016</a:t>
+              <a:t>10/26/2016</a:t>
             </a:fld>
             <a:endParaRPr lang="en-US"/>
           </a:p>
@@ -999,7 +999,7 @@
           <a:p>
             <a:fld id="{78C97017-6FC3-485B-9764-EAC9E56C1D49}" type="datetimeFigureOut">
               <a:rPr lang="en-US" smtClean="0"/>
-              <a:t>9/30/2016</a:t>
+              <a:t>10/26/2016</a:t>
             </a:fld>
             <a:endParaRPr lang="en-US"/>
           </a:p>
@@ -1169,7 +1169,7 @@
           <a:p>
             <a:fld id="{78C97017-6FC3-485B-9764-EAC9E56C1D49}" type="datetimeFigureOut">
               <a:rPr lang="en-US" smtClean="0"/>
-              <a:t>9/30/2016</a:t>
+              <a:t>10/26/2016</a:t>
             </a:fld>
             <a:endParaRPr lang="en-US"/>
           </a:p>
@@ -1415,7 +1415,7 @@
           <a:p>
             <a:fld id="{78C97017-6FC3-485B-9764-EAC9E56C1D49}" type="datetimeFigureOut">
               <a:rPr lang="en-US" smtClean="0"/>
-              <a:t>9/30/2016</a:t>
+              <a:t>10/26/2016</a:t>
             </a:fld>
             <a:endParaRPr lang="en-US"/>
           </a:p>
@@ -1703,7 +1703,7 @@
           <a:p>
             <a:fld id="{78C97017-6FC3-485B-9764-EAC9E56C1D49}" type="datetimeFigureOut">
               <a:rPr lang="en-US" smtClean="0"/>
-              <a:t>9/30/2016</a:t>
+              <a:t>10/26/2016</a:t>
             </a:fld>
             <a:endParaRPr lang="en-US"/>
           </a:p>
@@ -2125,7 +2125,7 @@
           <a:p>
             <a:fld id="{78C97017-6FC3-485B-9764-EAC9E56C1D49}" type="datetimeFigureOut">
               <a:rPr lang="en-US" smtClean="0"/>
-              <a:t>9/30/2016</a:t>
+              <a:t>10/26/2016</a:t>
             </a:fld>
             <a:endParaRPr lang="en-US"/>
           </a:p>
@@ -2243,7 +2243,7 @@
           <a:p>
             <a:fld id="{78C97017-6FC3-485B-9764-EAC9E56C1D49}" type="datetimeFigureOut">
               <a:rPr lang="en-US" smtClean="0"/>
-              <a:t>9/30/2016</a:t>
+              <a:t>10/26/2016</a:t>
             </a:fld>
             <a:endParaRPr lang="en-US"/>
           </a:p>
@@ -2338,7 +2338,7 @@
           <a:p>
             <a:fld id="{78C97017-6FC3-485B-9764-EAC9E56C1D49}" type="datetimeFigureOut">
               <a:rPr lang="en-US" smtClean="0"/>
-              <a:t>9/30/2016</a:t>
+              <a:t>10/26/2016</a:t>
             </a:fld>
             <a:endParaRPr lang="en-US"/>
           </a:p>
@@ -2615,7 +2615,7 @@
           <a:p>
             <a:fld id="{78C97017-6FC3-485B-9764-EAC9E56C1D49}" type="datetimeFigureOut">
               <a:rPr lang="en-US" smtClean="0"/>
-              <a:t>9/30/2016</a:t>
+              <a:t>10/26/2016</a:t>
             </a:fld>
             <a:endParaRPr lang="en-US"/>
           </a:p>
@@ -2868,7 +2868,7 @@
           <a:p>
             <a:fld id="{78C97017-6FC3-485B-9764-EAC9E56C1D49}" type="datetimeFigureOut">
               <a:rPr lang="en-US" smtClean="0"/>
-              <a:t>9/30/2016</a:t>
+              <a:t>10/26/2016</a:t>
             </a:fld>
             <a:endParaRPr lang="en-US"/>
           </a:p>
@@ -3081,7 +3081,7 @@
           <a:p>
             <a:fld id="{78C97017-6FC3-485B-9764-EAC9E56C1D49}" type="datetimeFigureOut">
               <a:rPr lang="en-US" smtClean="0"/>
-              <a:t>9/30/2016</a:t>
+              <a:t>10/26/2016</a:t>
             </a:fld>
             <a:endParaRPr lang="en-US"/>
           </a:p>
@@ -3473,11 +3473,11 @@
           <a:p>
             <a:r>
               <a:rPr lang="en-US" dirty="0" err="1" smtClean="0"/>
-              <a:t>AddressBook</a:t>
+              <a:t>SaavyTasker</a:t>
             </a:r>
             <a:r>
               <a:rPr lang="en-US" dirty="0" smtClean="0"/>
-              <a:t> – Level 4</a:t>
+              <a:t> – V4.0</a:t>
             </a:r>
             <a:endParaRPr lang="en-US" dirty="0"/>
           </a:p>
@@ -5753,7 +5753,7 @@
                   <a:srgbClr val="7030A0"/>
                 </a:solidFill>
               </a:rPr>
-              <a:t>deletePerson</a:t>
+              <a:t>deleteTask</a:t>
             </a:r>
             <a:r>
               <a:rPr lang="en-US" sz="1400" dirty="0" smtClean="0">
@@ -5811,7 +5811,7 @@
                   </a:schemeClr>
                 </a:solidFill>
               </a:rPr>
-              <a:t>AddressBookChangedEvent</a:t>
+              <a:t>SaavyTaskerChangedEvent</a:t>
             </a:r>
             <a:r>
               <a:rPr lang="en-US" sz="1400" dirty="0" smtClean="0">
@@ -6385,7 +6385,7 @@
                   </a:schemeClr>
                 </a:solidFill>
               </a:rPr>
-              <a:t>AddressBookChangedEvent</a:t>
+              <a:t>SaavyTaskerChangedEvent</a:t>
             </a:r>
             <a:r>
               <a:rPr lang="en-US" sz="1400" dirty="0" smtClean="0">
@@ -6757,7 +6757,7 @@
                   </a:schemeClr>
                 </a:solidFill>
               </a:rPr>
-              <a:t>handleAddresssBookChangedEvent</a:t>
+              <a:t>handleSaavyTaskerChangedEvent</a:t>
             </a:r>
             <a:r>
               <a:rPr lang="en-US" sz="1400" dirty="0" smtClean="0">
@@ -7068,7 +7068,7 @@
                   <a:srgbClr val="00B050"/>
                 </a:solidFill>
               </a:rPr>
-              <a:t>handleAddresssBookChangedEvent</a:t>
+              <a:t>handleSaavyTaskerChangedEvent</a:t>
             </a:r>
             <a:r>
               <a:rPr lang="en-US" sz="1400" dirty="0" smtClean="0">
@@ -8134,14 +8134,14 @@
           <a:p>
             <a:pPr algn="ctr"/>
             <a:r>
-              <a:rPr lang="en-US" sz="1050" b="1" dirty="0" err="1">
+              <a:rPr lang="en-US" sz="1050" b="1" dirty="0" err="1" smtClean="0">
                 <a:solidFill>
                   <a:schemeClr val="accent3">
                     <a:lumMod val="75000"/>
                   </a:schemeClr>
                 </a:solidFill>
               </a:rPr>
-              <a:t>PersonListPanel</a:t>
+              <a:t>TaskListPanel</a:t>
             </a:r>
             <a:endParaRPr lang="en-SG" sz="1050" b="1" dirty="0">
               <a:solidFill>
@@ -12280,7 +12280,6 @@
               <a:rPr lang="en-US" dirty="0"/>
               <a:t>execute()</a:t>
             </a:r>
-            <a:endParaRPr lang="en-US" dirty="0"/>
           </a:p>
         </p:txBody>
       </p:sp>
@@ -12797,7 +12796,7 @@
                   <a:srgbClr val="7030A0"/>
                 </a:solidFill>
               </a:rPr>
-              <a:t>deletePerson</a:t>
+              <a:t>deleteTask</a:t>
             </a:r>
             <a:r>
               <a:rPr lang="en-US" dirty="0" smtClean="0">
@@ -13254,7 +13253,7 @@
         <p:spPr>
           <a:xfrm>
             <a:off x="1119865" y="1727200"/>
-            <a:ext cx="7490735" cy="2997200"/>
+            <a:ext cx="6423936" cy="2997200"/>
           </a:xfrm>
           <a:prstGeom prst="roundRect">
             <a:avLst>
@@ -13936,7 +13935,7 @@
                   <a:srgbClr val="7030A0"/>
                 </a:solidFill>
               </a:rPr>
-              <a:t>AddressBook</a:t>
+              <a:t>SaavyTasker</a:t>
             </a:r>
             <a:endParaRPr lang="en-SG" sz="1050" dirty="0">
               <a:solidFill>
@@ -14078,7 +14077,7 @@
                   <a:srgbClr val="7030A0"/>
                 </a:solidFill>
               </a:rPr>
-              <a:t>UniquePersonList</a:t>
+              <a:t>UniqueTaskList</a:t>
             </a:r>
             <a:endParaRPr lang="en-SG" sz="1050" dirty="0">
               <a:solidFill>
@@ -14321,7 +14320,7 @@
                   <a:srgbClr val="7030A0"/>
                 </a:solidFill>
               </a:rPr>
-              <a:t>Person</a:t>
+              <a:t>Task</a:t>
             </a:r>
             <a:endParaRPr lang="en-SG" sz="1050" dirty="0">
               <a:solidFill>
@@ -14620,7 +14619,7 @@
                   <a:srgbClr val="7030A0"/>
                 </a:solidFill>
               </a:rPr>
-              <a:t>ReadOnlyPerson</a:t>
+              <a:t>ReadOnlyTask</a:t>
             </a:r>
             <a:endParaRPr lang="en-SG" sz="1050" dirty="0">
               <a:solidFill>
@@ -14630,441 +14629,6 @@
           </a:p>
         </p:txBody>
       </p:sp>
-      <p:sp>
-        <p:nvSpPr>
-          <p:cNvPr id="76" name="Rectangle 8"/>
-          <p:cNvSpPr/>
-          <p:nvPr/>
-        </p:nvSpPr>
-        <p:spPr>
-          <a:xfrm>
-            <a:off x="7712397" y="2564238"/>
-            <a:ext cx="708186" cy="285783"/>
-          </a:xfrm>
-          <a:prstGeom prst="rect">
-            <a:avLst/>
-          </a:prstGeom>
-          <a:ln w="19050">
-            <a:solidFill>
-              <a:srgbClr val="7030A0"/>
-            </a:solidFill>
-          </a:ln>
-          <a:effectLst/>
-        </p:spPr>
-        <p:style>
-          <a:lnRef idx="1">
-            <a:schemeClr val="accent4"/>
-          </a:lnRef>
-          <a:fillRef idx="2">
-            <a:schemeClr val="accent4"/>
-          </a:fillRef>
-          <a:effectRef idx="1">
-            <a:schemeClr val="accent4"/>
-          </a:effectRef>
-          <a:fontRef idx="minor">
-            <a:schemeClr val="dk1"/>
-          </a:fontRef>
-        </p:style>
-        <p:txBody>
-          <a:bodyPr rtlCol="0" anchor="ctr"/>
-          <a:lstStyle/>
-          <a:p>
-            <a:pPr algn="ctr"/>
-            <a:r>
-              <a:rPr lang="en-US" sz="1050" dirty="0" smtClean="0">
-                <a:solidFill>
-                  <a:srgbClr val="7030A0"/>
-                </a:solidFill>
-              </a:rPr>
-              <a:t>Name</a:t>
-            </a:r>
-            <a:endParaRPr lang="en-SG" sz="1050" dirty="0">
-              <a:solidFill>
-                <a:srgbClr val="7030A0"/>
-              </a:solidFill>
-            </a:endParaRPr>
-          </a:p>
-        </p:txBody>
-      </p:sp>
-      <p:sp>
-        <p:nvSpPr>
-          <p:cNvPr id="78" name="Flowchart: Decision 96"/>
-          <p:cNvSpPr/>
-          <p:nvPr/>
-        </p:nvSpPr>
-        <p:spPr>
-          <a:xfrm>
-            <a:off x="7041947" y="2948201"/>
-            <a:ext cx="236048" cy="173380"/>
-          </a:xfrm>
-          <a:prstGeom prst="flowChartDecision">
-            <a:avLst/>
-          </a:prstGeom>
-          <a:solidFill>
-            <a:srgbClr val="7030A0"/>
-          </a:solidFill>
-          <a:ln w="19050">
-            <a:solidFill>
-              <a:srgbClr val="7030A0"/>
-            </a:solidFill>
-          </a:ln>
-          <a:effectLst/>
-        </p:spPr>
-        <p:style>
-          <a:lnRef idx="1">
-            <a:schemeClr val="accent6"/>
-          </a:lnRef>
-          <a:fillRef idx="2">
-            <a:schemeClr val="accent6"/>
-          </a:fillRef>
-          <a:effectRef idx="1">
-            <a:schemeClr val="accent6"/>
-          </a:effectRef>
-          <a:fontRef idx="minor">
-            <a:schemeClr val="dk1"/>
-          </a:fontRef>
-        </p:style>
-        <p:txBody>
-          <a:bodyPr rtlCol="0" anchor="ctr"/>
-          <a:lstStyle/>
-          <a:p>
-            <a:pPr algn="ctr"/>
-            <a:endParaRPr lang="en-US" sz="1050"/>
-          </a:p>
-        </p:txBody>
-      </p:sp>
-      <p:cxnSp>
-        <p:nvCxnSpPr>
-          <p:cNvPr id="79" name="Elbow Connector 78"/>
-          <p:cNvCxnSpPr>
-            <a:stCxn id="78" idx="3"/>
-            <a:endCxn id="76" idx="1"/>
-          </p:cNvCxnSpPr>
-          <p:nvPr/>
-        </p:nvCxnSpPr>
-        <p:spPr>
-          <a:xfrm flipV="1">
-            <a:off x="7277995" y="2707130"/>
-            <a:ext cx="434402" cy="327761"/>
-          </a:xfrm>
-          <a:prstGeom prst="bentConnector3">
-            <a:avLst/>
-          </a:prstGeom>
-          <a:ln w="19050">
-            <a:solidFill>
-              <a:srgbClr val="7030A0"/>
-            </a:solidFill>
-            <a:headEnd type="none" w="med" len="med"/>
-            <a:tailEnd type="arrow" w="med" len="med"/>
-          </a:ln>
-          <a:effectLst/>
-        </p:spPr>
-        <p:style>
-          <a:lnRef idx="1">
-            <a:schemeClr val="accent2"/>
-          </a:lnRef>
-          <a:fillRef idx="2">
-            <a:schemeClr val="accent2"/>
-          </a:fillRef>
-          <a:effectRef idx="1">
-            <a:schemeClr val="accent2"/>
-          </a:effectRef>
-          <a:fontRef idx="minor">
-            <a:schemeClr val="dk1"/>
-          </a:fontRef>
-        </p:style>
-      </p:cxnSp>
-      <p:sp>
-        <p:nvSpPr>
-          <p:cNvPr id="80" name="Rectangle 8"/>
-          <p:cNvSpPr/>
-          <p:nvPr/>
-        </p:nvSpPr>
-        <p:spPr>
-          <a:xfrm>
-            <a:off x="7712397" y="2887216"/>
-            <a:ext cx="708186" cy="285783"/>
-          </a:xfrm>
-          <a:prstGeom prst="rect">
-            <a:avLst/>
-          </a:prstGeom>
-          <a:ln w="19050">
-            <a:solidFill>
-              <a:srgbClr val="7030A0"/>
-            </a:solidFill>
-          </a:ln>
-          <a:effectLst/>
-        </p:spPr>
-        <p:style>
-          <a:lnRef idx="1">
-            <a:schemeClr val="accent4"/>
-          </a:lnRef>
-          <a:fillRef idx="2">
-            <a:schemeClr val="accent4"/>
-          </a:fillRef>
-          <a:effectRef idx="1">
-            <a:schemeClr val="accent4"/>
-          </a:effectRef>
-          <a:fontRef idx="minor">
-            <a:schemeClr val="dk1"/>
-          </a:fontRef>
-        </p:style>
-        <p:txBody>
-          <a:bodyPr rtlCol="0" anchor="ctr"/>
-          <a:lstStyle/>
-          <a:p>
-            <a:pPr algn="ctr"/>
-            <a:r>
-              <a:rPr lang="en-US" sz="1050" dirty="0" smtClean="0">
-                <a:solidFill>
-                  <a:srgbClr val="7030A0"/>
-                </a:solidFill>
-              </a:rPr>
-              <a:t>Phone</a:t>
-            </a:r>
-            <a:endParaRPr lang="en-SG" sz="1050" dirty="0">
-              <a:solidFill>
-                <a:srgbClr val="7030A0"/>
-              </a:solidFill>
-            </a:endParaRPr>
-          </a:p>
-        </p:txBody>
-      </p:sp>
-      <p:cxnSp>
-        <p:nvCxnSpPr>
-          <p:cNvPr id="81" name="Elbow Connector 80"/>
-          <p:cNvCxnSpPr>
-            <a:stCxn id="78" idx="3"/>
-            <a:endCxn id="80" idx="1"/>
-          </p:cNvCxnSpPr>
-          <p:nvPr/>
-        </p:nvCxnSpPr>
-        <p:spPr>
-          <a:xfrm flipV="1">
-            <a:off x="7277995" y="3030108"/>
-            <a:ext cx="434402" cy="4783"/>
-          </a:xfrm>
-          <a:prstGeom prst="bentConnector3">
-            <a:avLst/>
-          </a:prstGeom>
-          <a:ln w="19050">
-            <a:solidFill>
-              <a:srgbClr val="7030A0"/>
-            </a:solidFill>
-            <a:headEnd type="none" w="med" len="med"/>
-            <a:tailEnd type="arrow" w="med" len="med"/>
-          </a:ln>
-          <a:effectLst/>
-        </p:spPr>
-        <p:style>
-          <a:lnRef idx="1">
-            <a:schemeClr val="accent2"/>
-          </a:lnRef>
-          <a:fillRef idx="2">
-            <a:schemeClr val="accent2"/>
-          </a:fillRef>
-          <a:effectRef idx="1">
-            <a:schemeClr val="accent2"/>
-          </a:effectRef>
-          <a:fontRef idx="minor">
-            <a:schemeClr val="dk1"/>
-          </a:fontRef>
-        </p:style>
-      </p:cxnSp>
-      <p:sp>
-        <p:nvSpPr>
-          <p:cNvPr id="83" name="Rectangle 8"/>
-          <p:cNvSpPr/>
-          <p:nvPr/>
-        </p:nvSpPr>
-        <p:spPr>
-          <a:xfrm>
-            <a:off x="7712397" y="3210194"/>
-            <a:ext cx="708186" cy="285783"/>
-          </a:xfrm>
-          <a:prstGeom prst="rect">
-            <a:avLst/>
-          </a:prstGeom>
-          <a:ln w="19050">
-            <a:solidFill>
-              <a:srgbClr val="7030A0"/>
-            </a:solidFill>
-          </a:ln>
-          <a:effectLst/>
-        </p:spPr>
-        <p:style>
-          <a:lnRef idx="1">
-            <a:schemeClr val="accent4"/>
-          </a:lnRef>
-          <a:fillRef idx="2">
-            <a:schemeClr val="accent4"/>
-          </a:fillRef>
-          <a:effectRef idx="1">
-            <a:schemeClr val="accent4"/>
-          </a:effectRef>
-          <a:fontRef idx="minor">
-            <a:schemeClr val="dk1"/>
-          </a:fontRef>
-        </p:style>
-        <p:txBody>
-          <a:bodyPr rtlCol="0" anchor="ctr"/>
-          <a:lstStyle/>
-          <a:p>
-            <a:pPr algn="ctr"/>
-            <a:r>
-              <a:rPr lang="en-US" sz="1050" dirty="0" smtClean="0">
-                <a:solidFill>
-                  <a:srgbClr val="7030A0"/>
-                </a:solidFill>
-              </a:rPr>
-              <a:t>Email</a:t>
-            </a:r>
-            <a:endParaRPr lang="en-SG" sz="1050" dirty="0">
-              <a:solidFill>
-                <a:srgbClr val="7030A0"/>
-              </a:solidFill>
-            </a:endParaRPr>
-          </a:p>
-        </p:txBody>
-      </p:sp>
-      <p:cxnSp>
-        <p:nvCxnSpPr>
-          <p:cNvPr id="84" name="Elbow Connector 83"/>
-          <p:cNvCxnSpPr>
-            <a:stCxn id="78" idx="3"/>
-            <a:endCxn id="83" idx="1"/>
-          </p:cNvCxnSpPr>
-          <p:nvPr/>
-        </p:nvCxnSpPr>
-        <p:spPr>
-          <a:xfrm>
-            <a:off x="7277995" y="3034891"/>
-            <a:ext cx="434402" cy="318195"/>
-          </a:xfrm>
-          <a:prstGeom prst="bentConnector3">
-            <a:avLst/>
-          </a:prstGeom>
-          <a:ln w="19050">
-            <a:solidFill>
-              <a:srgbClr val="7030A0"/>
-            </a:solidFill>
-            <a:headEnd type="none" w="med" len="med"/>
-            <a:tailEnd type="arrow" w="med" len="med"/>
-          </a:ln>
-          <a:effectLst/>
-        </p:spPr>
-        <p:style>
-          <a:lnRef idx="1">
-            <a:schemeClr val="accent2"/>
-          </a:lnRef>
-          <a:fillRef idx="2">
-            <a:schemeClr val="accent2"/>
-          </a:fillRef>
-          <a:effectRef idx="1">
-            <a:schemeClr val="accent2"/>
-          </a:effectRef>
-          <a:fontRef idx="minor">
-            <a:schemeClr val="dk1"/>
-          </a:fontRef>
-        </p:style>
-      </p:cxnSp>
-      <p:sp>
-        <p:nvSpPr>
-          <p:cNvPr id="85" name="Rectangle 8"/>
-          <p:cNvSpPr/>
-          <p:nvPr/>
-        </p:nvSpPr>
-        <p:spPr>
-          <a:xfrm>
-            <a:off x="7712397" y="3533171"/>
-            <a:ext cx="708186" cy="285783"/>
-          </a:xfrm>
-          <a:prstGeom prst="rect">
-            <a:avLst/>
-          </a:prstGeom>
-          <a:ln w="19050">
-            <a:solidFill>
-              <a:srgbClr val="7030A0"/>
-            </a:solidFill>
-          </a:ln>
-          <a:effectLst/>
-        </p:spPr>
-        <p:style>
-          <a:lnRef idx="1">
-            <a:schemeClr val="accent4"/>
-          </a:lnRef>
-          <a:fillRef idx="2">
-            <a:schemeClr val="accent4"/>
-          </a:fillRef>
-          <a:effectRef idx="1">
-            <a:schemeClr val="accent4"/>
-          </a:effectRef>
-          <a:fontRef idx="minor">
-            <a:schemeClr val="dk1"/>
-          </a:fontRef>
-        </p:style>
-        <p:txBody>
-          <a:bodyPr rtlCol="0" anchor="ctr"/>
-          <a:lstStyle/>
-          <a:p>
-            <a:pPr algn="ctr"/>
-            <a:r>
-              <a:rPr lang="en-US" sz="1050" dirty="0" smtClean="0">
-                <a:solidFill>
-                  <a:srgbClr val="7030A0"/>
-                </a:solidFill>
-              </a:rPr>
-              <a:t>Address</a:t>
-            </a:r>
-            <a:endParaRPr lang="en-SG" sz="1050" dirty="0">
-              <a:solidFill>
-                <a:srgbClr val="7030A0"/>
-              </a:solidFill>
-            </a:endParaRPr>
-          </a:p>
-        </p:txBody>
-      </p:sp>
-      <p:cxnSp>
-        <p:nvCxnSpPr>
-          <p:cNvPr id="86" name="Elbow Connector 85"/>
-          <p:cNvCxnSpPr>
-            <a:stCxn id="78" idx="3"/>
-            <a:endCxn id="85" idx="1"/>
-          </p:cNvCxnSpPr>
-          <p:nvPr/>
-        </p:nvCxnSpPr>
-        <p:spPr>
-          <a:xfrm>
-            <a:off x="7277995" y="3034891"/>
-            <a:ext cx="434402" cy="641172"/>
-          </a:xfrm>
-          <a:prstGeom prst="bentConnector3">
-            <a:avLst/>
-          </a:prstGeom>
-          <a:ln w="19050">
-            <a:solidFill>
-              <a:srgbClr val="7030A0"/>
-            </a:solidFill>
-            <a:headEnd type="none" w="med" len="med"/>
-            <a:tailEnd type="arrow" w="med" len="med"/>
-          </a:ln>
-          <a:effectLst/>
-        </p:spPr>
-        <p:style>
-          <a:lnRef idx="1">
-            <a:schemeClr val="accent2"/>
-          </a:lnRef>
-          <a:fillRef idx="2">
-            <a:schemeClr val="accent2"/>
-          </a:fillRef>
-          <a:effectRef idx="1">
-            <a:schemeClr val="accent2"/>
-          </a:effectRef>
-          <a:fontRef idx="minor">
-            <a:schemeClr val="dk1"/>
-          </a:fontRef>
-        </p:style>
-      </p:cxnSp>
       <p:cxnSp>
         <p:nvCxnSpPr>
           <p:cNvPr id="97" name="Elbow Connector 63"/>
@@ -15217,7 +14781,7 @@
                   <a:srgbClr val="7030A0"/>
                 </a:solidFill>
               </a:rPr>
-              <a:t>ReadOnlyAddressBook</a:t>
+              <a:t>ReadOnlySaavyTasker</a:t>
             </a:r>
             <a:endParaRPr lang="en-SG" sz="1050" dirty="0">
               <a:solidFill>
@@ -15234,9 +14798,9 @@
           <p:nvPr/>
         </p:nvSpPr>
         <p:spPr>
-          <a:xfrm rot="16200000">
-            <a:off x="6581354" y="3514530"/>
-            <a:ext cx="881018" cy="261610"/>
+          <a:xfrm>
+            <a:off x="4767990" y="3997135"/>
+            <a:ext cx="1547299" cy="261610"/>
           </a:xfrm>
           <a:prstGeom prst="rect">
             <a:avLst/>
@@ -15256,7 +14820,15 @@
                   <a:srgbClr val="7030A0"/>
                 </a:solidFill>
               </a:rPr>
-              <a:t>filtered list</a:t>
+              <a:t>filtered and sorted </a:t>
+            </a:r>
+            <a:r>
+              <a:rPr lang="en-US" sz="1100" dirty="0" smtClean="0">
+                <a:solidFill>
+                  <a:srgbClr val="7030A0"/>
+                </a:solidFill>
+              </a:rPr>
+              <a:t>list</a:t>
             </a:r>
             <a:endParaRPr lang="en-SG" sz="1100" dirty="0">
               <a:solidFill>
@@ -15557,7 +15129,7 @@
                   <a:schemeClr val="bg1"/>
                 </a:solidFill>
               </a:rPr>
-              <a:t>AddressBookStorage</a:t>
+              <a:t>SaavyTaskerStorage</a:t>
             </a:r>
             <a:endParaRPr lang="en-SG" sz="1050" dirty="0">
               <a:solidFill>
@@ -16130,7 +15702,7 @@
                   </a:schemeClr>
                 </a:solidFill>
               </a:rPr>
-              <a:t>XmlAddressBook</a:t>
+              <a:t>XmlSaavyTasker</a:t>
             </a:r>
             <a:r>
               <a:rPr lang="en-US" sz="1050" b="1" dirty="0" smtClean="0">
@@ -16603,7 +16175,7 @@
                   </a:schemeClr>
                 </a:solidFill>
               </a:rPr>
-              <a:t>AddressBook</a:t>
+              <a:t>SaavyTasker</a:t>
             </a:r>
             <a:endParaRPr lang="en-SG" sz="1050" b="1" dirty="0">
               <a:solidFill>
@@ -16756,7 +16328,7 @@
                   </a:schemeClr>
                 </a:solidFill>
               </a:rPr>
-              <a:t>XmlAdaptedPerson</a:t>
+              <a:t>XmlAdaptedTask</a:t>
             </a:r>
             <a:endParaRPr lang="en-SG" sz="1050" b="1" dirty="0">
               <a:solidFill>

</xml_diff>

<commit_message>
Changed the SD for Logic from delete to add
</commit_message>
<xml_diff>
--- a/docs/diagrams/Diagrams.pptx
+++ b/docs/diagrams/Diagrams.pptx
@@ -117,7 +117,7 @@
   </p:defaultTextStyle>
   <p:extLst>
     <p:ext uri="{EFAFB233-063F-42B5-8137-9DF3F51BA10A}">
-      <p15:sldGuideLst xmlns="" xmlns:p15="http://schemas.microsoft.com/office/powerpoint/2012/main">
+      <p15:sldGuideLst xmlns:p15="http://schemas.microsoft.com/office/powerpoint/2012/main" xmlns="">
         <p15:guide id="1" orient="horz" pos="1488">
           <p15:clr>
             <a:srgbClr val="A4A3A4"/>
@@ -3493,11 +3493,7 @@
             </a:r>
             <a:r>
               <a:rPr lang="en-US" dirty="0" smtClean="0"/>
-              <a:t> – Level </a:t>
-            </a:r>
-            <a:r>
-              <a:rPr lang="en-US" dirty="0" smtClean="0"/>
-              <a:t>4</a:t>
+              <a:t> – Level 4</a:t>
             </a:r>
             <a:endParaRPr lang="en-US" dirty="0"/>
           </a:p>
@@ -11992,12 +11988,20 @@
           <a:p>
             <a:pPr algn="ctr"/>
             <a:r>
+              <a:rPr lang="en-US" sz="1600" dirty="0">
+                <a:solidFill>
+                  <a:schemeClr val="bg1"/>
+                </a:solidFill>
+              </a:rPr>
+              <a:t>c</a:t>
+            </a:r>
+            <a:r>
               <a:rPr lang="en-US" sz="1600" dirty="0" smtClean="0">
                 <a:solidFill>
                   <a:schemeClr val="bg1"/>
                 </a:solidFill>
               </a:rPr>
-              <a:t>d:Delete</a:t>
+              <a:t>:Add</a:t>
             </a:r>
             <a:r>
               <a:rPr lang="en-US" sz="1600" dirty="0">
@@ -12194,8 +12198,8 @@
         </p:nvSpPr>
         <p:spPr>
           <a:xfrm>
-            <a:off x="152400" y="2743200"/>
-            <a:ext cx="1424846" cy="215444"/>
+            <a:off x="-228600" y="2743200"/>
+            <a:ext cx="1805846" cy="215444"/>
           </a:xfrm>
           <a:prstGeom prst="rect">
             <a:avLst/>
@@ -12215,7 +12219,47 @@
                   <a:srgbClr val="0070C0"/>
                 </a:solidFill>
               </a:rPr>
-              <a:t>execute(“delete 1”)</a:t>
+              <a:t>execute</a:t>
+            </a:r>
+            <a:r>
+              <a:rPr lang="en-US" sz="1400" dirty="0" smtClean="0">
+                <a:solidFill>
+                  <a:srgbClr val="0070C0"/>
+                </a:solidFill>
+              </a:rPr>
+              <a:t>(“</a:t>
+            </a:r>
+            <a:r>
+              <a:rPr lang="en-US" sz="1400" dirty="0" smtClean="0">
+                <a:solidFill>
+                  <a:srgbClr val="0070C0"/>
+                </a:solidFill>
+              </a:rPr>
+              <a:t>add</a:t>
+            </a:r>
+            <a:r>
+              <a:rPr lang="en-US" sz="1400" dirty="0" smtClean="0">
+                <a:solidFill>
+                  <a:srgbClr val="0070C0"/>
+                </a:solidFill>
+              </a:rPr>
+              <a:t> </a:t>
+            </a:r>
+            <a:r>
+              <a:rPr lang="en-US" sz="1400" dirty="0" smtClean="0">
+                <a:solidFill>
+                  <a:srgbClr val="0070C0"/>
+                </a:solidFill>
+              </a:rPr>
+              <a:t>Activity1</a:t>
+            </a:r>
+            <a:r>
+              <a:rPr lang="en-US" sz="1400" dirty="0" smtClean="0">
+                <a:solidFill>
+                  <a:srgbClr val="0070C0"/>
+                </a:solidFill>
+              </a:rPr>
+              <a:t>”)</a:t>
             </a:r>
             <a:endParaRPr lang="en-US" sz="1400" dirty="0">
               <a:solidFill>
@@ -12816,7 +12860,7 @@
                   <a:srgbClr val="7030A0"/>
                 </a:solidFill>
               </a:rPr>
-              <a:t>deleteTask</a:t>
+              <a:t>deleteActivity</a:t>
             </a:r>
             <a:r>
               <a:rPr lang="en-US" dirty="0" smtClean="0">
@@ -12824,7 +12868,7 @@
                   <a:srgbClr val="7030A0"/>
                 </a:solidFill>
               </a:rPr>
-              <a:t>(p)</a:t>
+              <a:t>(a)</a:t>
             </a:r>
             <a:endParaRPr lang="en-US" dirty="0">
               <a:solidFill>
@@ -12883,8 +12927,8 @@
         </p:nvSpPr>
         <p:spPr>
           <a:xfrm>
-            <a:off x="2131905" y="2850922"/>
-            <a:ext cx="1424846" cy="215444"/>
+            <a:off x="1992318" y="2850922"/>
+            <a:ext cx="1741482" cy="215444"/>
           </a:xfrm>
           <a:prstGeom prst="rect">
             <a:avLst/>
@@ -12910,7 +12954,23 @@
           <a:p>
             <a:r>
               <a:rPr lang="en-US" dirty="0" smtClean="0"/>
-              <a:t>parse(“delete 1”)</a:t>
+              <a:t>parse</a:t>
+            </a:r>
+            <a:r>
+              <a:rPr lang="en-US" dirty="0" smtClean="0"/>
+              <a:t>(“</a:t>
+            </a:r>
+            <a:r>
+              <a:rPr lang="en-US" dirty="0" smtClean="0"/>
+              <a:t>add</a:t>
+            </a:r>
+            <a:r>
+              <a:rPr lang="en-US" dirty="0" smtClean="0"/>
+              <a:t> Activity1</a:t>
+            </a:r>
+            <a:r>
+              <a:rPr lang="en-US" dirty="0" smtClean="0"/>
+              <a:t>”)</a:t>
             </a:r>
             <a:endParaRPr lang="en-US" dirty="0"/>
           </a:p>
@@ -13228,7 +13288,7 @@
           <a:p>
             <a:r>
               <a:rPr lang="en-US" dirty="0" smtClean="0"/>
-              <a:t>d</a:t>
+              <a:t>c</a:t>
             </a:r>
             <a:endParaRPr lang="en-US" dirty="0"/>
           </a:p>

</xml_diff>

<commit_message>
update developer guide diagram and use case
</commit_message>
<xml_diff>
--- a/docs/diagrams/Diagrams.pptx
+++ b/docs/diagrams/Diagrams.pptx
@@ -122,7 +122,7 @@
   </p:defaultTextStyle>
   <p:extLst>
     <p:ext uri="{EFAFB233-063F-42B5-8137-9DF3F51BA10A}">
-      <p15:sldGuideLst xmlns:p15="http://schemas.microsoft.com/office/powerpoint/2012/main">
+      <p15:sldGuideLst xmlns:p15="http://schemas.microsoft.com/office/powerpoint/2012/main" xmlns="">
         <p15:guide id="1" orient="horz" pos="1488">
           <p15:clr>
             <a:srgbClr val="A4A3A4"/>
@@ -221,7 +221,7 @@
           <a:p>
             <a:fld id="{F5CC4B3F-88C1-4FFA-B1B6-F41C21DC6924}" type="datetimeFigureOut">
               <a:rPr lang="en-US" smtClean="0"/>
-              <a:t>10/22/2016</a:t>
+              <a:t>10/26/2016</a:t>
             </a:fld>
             <a:endParaRPr lang="en-US"/>
           </a:p>
@@ -751,7 +751,7 @@
           <a:p>
             <a:fld id="{78C97017-6FC3-485B-9764-EAC9E56C1D49}" type="datetimeFigureOut">
               <a:rPr lang="en-US" smtClean="0"/>
-              <a:t>10/22/2016</a:t>
+              <a:t>10/26/2016</a:t>
             </a:fld>
             <a:endParaRPr lang="en-US"/>
           </a:p>
@@ -919,7 +919,7 @@
           <a:p>
             <a:fld id="{78C97017-6FC3-485B-9764-EAC9E56C1D49}" type="datetimeFigureOut">
               <a:rPr lang="en-US" smtClean="0"/>
-              <a:t>10/22/2016</a:t>
+              <a:t>10/26/2016</a:t>
             </a:fld>
             <a:endParaRPr lang="en-US"/>
           </a:p>
@@ -1097,7 +1097,7 @@
           <a:p>
             <a:fld id="{78C97017-6FC3-485B-9764-EAC9E56C1D49}" type="datetimeFigureOut">
               <a:rPr lang="en-US" smtClean="0"/>
-              <a:t>10/22/2016</a:t>
+              <a:t>10/26/2016</a:t>
             </a:fld>
             <a:endParaRPr lang="en-US"/>
           </a:p>
@@ -1265,7 +1265,7 @@
           <a:p>
             <a:fld id="{78C97017-6FC3-485B-9764-EAC9E56C1D49}" type="datetimeFigureOut">
               <a:rPr lang="en-US" smtClean="0"/>
-              <a:t>10/22/2016</a:t>
+              <a:t>10/26/2016</a:t>
             </a:fld>
             <a:endParaRPr lang="en-US"/>
           </a:p>
@@ -1510,7 +1510,7 @@
           <a:p>
             <a:fld id="{78C97017-6FC3-485B-9764-EAC9E56C1D49}" type="datetimeFigureOut">
               <a:rPr lang="en-US" smtClean="0"/>
-              <a:t>10/22/2016</a:t>
+              <a:t>10/26/2016</a:t>
             </a:fld>
             <a:endParaRPr lang="en-US"/>
           </a:p>
@@ -1795,7 +1795,7 @@
           <a:p>
             <a:fld id="{78C97017-6FC3-485B-9764-EAC9E56C1D49}" type="datetimeFigureOut">
               <a:rPr lang="en-US" smtClean="0"/>
-              <a:t>10/22/2016</a:t>
+              <a:t>10/26/2016</a:t>
             </a:fld>
             <a:endParaRPr lang="en-US"/>
           </a:p>
@@ -2214,7 +2214,7 @@
           <a:p>
             <a:fld id="{78C97017-6FC3-485B-9764-EAC9E56C1D49}" type="datetimeFigureOut">
               <a:rPr lang="en-US" smtClean="0"/>
-              <a:t>10/22/2016</a:t>
+              <a:t>10/26/2016</a:t>
             </a:fld>
             <a:endParaRPr lang="en-US"/>
           </a:p>
@@ -2331,7 +2331,7 @@
           <a:p>
             <a:fld id="{78C97017-6FC3-485B-9764-EAC9E56C1D49}" type="datetimeFigureOut">
               <a:rPr lang="en-US" smtClean="0"/>
-              <a:t>10/22/2016</a:t>
+              <a:t>10/26/2016</a:t>
             </a:fld>
             <a:endParaRPr lang="en-US"/>
           </a:p>
@@ -2426,7 +2426,7 @@
           <a:p>
             <a:fld id="{78C97017-6FC3-485B-9764-EAC9E56C1D49}" type="datetimeFigureOut">
               <a:rPr lang="en-US" smtClean="0"/>
-              <a:t>10/22/2016</a:t>
+              <a:t>10/26/2016</a:t>
             </a:fld>
             <a:endParaRPr lang="en-US"/>
           </a:p>
@@ -2701,7 +2701,7 @@
           <a:p>
             <a:fld id="{78C97017-6FC3-485B-9764-EAC9E56C1D49}" type="datetimeFigureOut">
               <a:rPr lang="en-US" smtClean="0"/>
-              <a:t>10/22/2016</a:t>
+              <a:t>10/26/2016</a:t>
             </a:fld>
             <a:endParaRPr lang="en-US"/>
           </a:p>
@@ -2953,7 +2953,7 @@
           <a:p>
             <a:fld id="{78C97017-6FC3-485B-9764-EAC9E56C1D49}" type="datetimeFigureOut">
               <a:rPr lang="en-US" smtClean="0"/>
-              <a:t>10/22/2016</a:t>
+              <a:t>10/26/2016</a:t>
             </a:fld>
             <a:endParaRPr lang="en-US"/>
           </a:p>
@@ -3164,7 +3164,7 @@
           <a:p>
             <a:fld id="{78C97017-6FC3-485B-9764-EAC9E56C1D49}" type="datetimeFigureOut">
               <a:rPr lang="en-US" smtClean="0"/>
-              <a:t>10/22/2016</a:t>
+              <a:t>10/26/2016</a:t>
             </a:fld>
             <a:endParaRPr lang="en-US"/>
           </a:p>
@@ -3593,6 +3593,13 @@
   <p:clrMapOvr>
     <a:masterClrMapping/>
   </p:clrMapOvr>
+  <p:timing>
+    <p:tnLst>
+      <p:par>
+        <p:cTn id="1" dur="indefinite" restart="never" nodeType="tmRoot"/>
+      </p:par>
+    </p:tnLst>
+  </p:timing>
 </p:sld>
 </file>
 
@@ -3613,6 +3620,102 @@
           <a:chExt cx="0" cy="0"/>
         </a:xfrm>
       </p:grpSpPr>
+      <p:sp>
+        <p:nvSpPr>
+          <p:cNvPr id="64" name="Rounded Rectangle 63"/>
+          <p:cNvSpPr/>
+          <p:nvPr/>
+        </p:nvSpPr>
+        <p:spPr>
+          <a:xfrm>
+            <a:off x="0" y="0"/>
+            <a:ext cx="9144000" cy="2895600"/>
+          </a:xfrm>
+          <a:prstGeom prst="roundRect">
+            <a:avLst/>
+          </a:prstGeom>
+          <a:solidFill>
+            <a:schemeClr val="bg1">
+              <a:lumMod val="95000"/>
+            </a:schemeClr>
+          </a:solidFill>
+          <a:ln>
+            <a:solidFill>
+              <a:schemeClr val="bg1">
+                <a:lumMod val="65000"/>
+              </a:schemeClr>
+            </a:solidFill>
+          </a:ln>
+        </p:spPr>
+        <p:style>
+          <a:lnRef idx="2">
+            <a:schemeClr val="accent1">
+              <a:shade val="50000"/>
+            </a:schemeClr>
+          </a:lnRef>
+          <a:fillRef idx="1">
+            <a:schemeClr val="accent1"/>
+          </a:fillRef>
+          <a:effectRef idx="0">
+            <a:schemeClr val="accent1"/>
+          </a:effectRef>
+          <a:fontRef idx="minor">
+            <a:schemeClr val="lt1"/>
+          </a:fontRef>
+        </p:style>
+        <p:txBody>
+          <a:bodyPr rtlCol="0" anchor="ctr"/>
+          <a:lstStyle/>
+          <a:p>
+            <a:pPr algn="ctr"/>
+            <a:endParaRPr lang="en-US"/>
+          </a:p>
+        </p:txBody>
+      </p:sp>
+      <p:sp>
+        <p:nvSpPr>
+          <p:cNvPr id="65" name="TextBox 64"/>
+          <p:cNvSpPr txBox="1"/>
+          <p:nvPr/>
+        </p:nvSpPr>
+        <p:spPr>
+          <a:xfrm>
+            <a:off x="280822" y="113808"/>
+            <a:ext cx="1101858" cy="369332"/>
+          </a:xfrm>
+          <a:prstGeom prst="rect">
+            <a:avLst/>
+          </a:prstGeom>
+          <a:noFill/>
+        </p:spPr>
+        <p:txBody>
+          <a:bodyPr wrap="square" rtlCol="0">
+            <a:spAutoFit/>
+          </a:bodyPr>
+          <a:lstStyle/>
+          <a:p>
+            <a:r>
+              <a:rPr lang="en-US" dirty="0" smtClean="0">
+                <a:solidFill>
+                  <a:schemeClr val="tx1">
+                    <a:lumMod val="50000"/>
+                    <a:lumOff val="50000"/>
+                  </a:schemeClr>
+                </a:solidFill>
+              </a:rPr>
+              <a:t>Undo</a:t>
+            </a:r>
+            <a:endParaRPr lang="en-US" dirty="0">
+              <a:solidFill>
+                <a:schemeClr val="tx1">
+                  <a:lumMod val="50000"/>
+                  <a:lumOff val="50000"/>
+                </a:schemeClr>
+              </a:solidFill>
+            </a:endParaRPr>
+          </a:p>
+        </p:txBody>
+      </p:sp>
       <p:sp>
         <p:nvSpPr>
           <p:cNvPr id="2" name="Rectangle 62"/>
@@ -4475,6 +4578,14 @@
               </a:rPr>
               <a:t>performUndo</a:t>
             </a:r>
+            <a:r>
+              <a:rPr lang="en-US" sz="1400" dirty="0">
+                <a:solidFill>
+                  <a:srgbClr val="7030A0"/>
+                </a:solidFill>
+              </a:rPr>
+              <a:t/>
+            </a:r>
             <a:br>
               <a:rPr lang="en-US" sz="1400" dirty="0">
                 <a:solidFill>
@@ -6271,6 +6382,13 @@
   <p:clrMapOvr>
     <a:masterClrMapping/>
   </p:clrMapOvr>
+  <p:timing>
+    <p:tnLst>
+      <p:par>
+        <p:cTn id="1" dur="indefinite" restart="never" nodeType="tmRoot"/>
+      </p:par>
+    </p:tnLst>
+  </p:timing>
 </p:sld>
 </file>
 
@@ -6293,13 +6411,109 @@
       </p:grpSpPr>
       <p:sp>
         <p:nvSpPr>
+          <p:cNvPr id="51" name="Rounded Rectangle 50"/>
+          <p:cNvSpPr/>
+          <p:nvPr/>
+        </p:nvSpPr>
+        <p:spPr>
+          <a:xfrm>
+            <a:off x="609600" y="304800"/>
+            <a:ext cx="7848600" cy="4520278"/>
+          </a:xfrm>
+          <a:prstGeom prst="roundRect">
+            <a:avLst/>
+          </a:prstGeom>
+          <a:solidFill>
+            <a:schemeClr val="bg1">
+              <a:lumMod val="95000"/>
+            </a:schemeClr>
+          </a:solidFill>
+          <a:ln>
+            <a:solidFill>
+              <a:schemeClr val="bg1">
+                <a:lumMod val="65000"/>
+              </a:schemeClr>
+            </a:solidFill>
+          </a:ln>
+        </p:spPr>
+        <p:style>
+          <a:lnRef idx="2">
+            <a:schemeClr val="accent1">
+              <a:shade val="50000"/>
+            </a:schemeClr>
+          </a:lnRef>
+          <a:fillRef idx="1">
+            <a:schemeClr val="accent1"/>
+          </a:fillRef>
+          <a:effectRef idx="0">
+            <a:schemeClr val="accent1"/>
+          </a:effectRef>
+          <a:fontRef idx="minor">
+            <a:schemeClr val="lt1"/>
+          </a:fontRef>
+        </p:style>
+        <p:txBody>
+          <a:bodyPr rtlCol="0" anchor="ctr"/>
+          <a:lstStyle/>
+          <a:p>
+            <a:pPr algn="ctr"/>
+            <a:endParaRPr lang="en-US"/>
+          </a:p>
+        </p:txBody>
+      </p:sp>
+      <p:sp>
+        <p:nvSpPr>
+          <p:cNvPr id="52" name="TextBox 51"/>
+          <p:cNvSpPr txBox="1"/>
+          <p:nvPr/>
+        </p:nvSpPr>
+        <p:spPr>
+          <a:xfrm>
+            <a:off x="1232986" y="468868"/>
+            <a:ext cx="945762" cy="369332"/>
+          </a:xfrm>
+          <a:prstGeom prst="rect">
+            <a:avLst/>
+          </a:prstGeom>
+          <a:noFill/>
+        </p:spPr>
+        <p:txBody>
+          <a:bodyPr wrap="square" rtlCol="0">
+            <a:spAutoFit/>
+          </a:bodyPr>
+          <a:lstStyle/>
+          <a:p>
+            <a:r>
+              <a:rPr lang="en-US" dirty="0" smtClean="0">
+                <a:solidFill>
+                  <a:schemeClr val="tx1">
+                    <a:lumMod val="50000"/>
+                    <a:lumOff val="50000"/>
+                  </a:schemeClr>
+                </a:solidFill>
+              </a:rPr>
+              <a:t>Exit</a:t>
+            </a:r>
+            <a:endParaRPr lang="en-US" dirty="0">
+              <a:solidFill>
+                <a:schemeClr val="tx1">
+                  <a:lumMod val="50000"/>
+                  <a:lumOff val="50000"/>
+                </a:schemeClr>
+              </a:solidFill>
+            </a:endParaRPr>
+          </a:p>
+        </p:txBody>
+      </p:sp>
+      <p:sp>
+        <p:nvSpPr>
           <p:cNvPr id="2" name="Rectangle 62"/>
           <p:cNvSpPr/>
           <p:nvPr/>
         </p:nvSpPr>
         <p:spPr>
           <a:xfrm>
-            <a:off x="1127044" y="614714"/>
+            <a:off x="2117644" y="1014764"/>
             <a:ext cx="1093635" cy="346760"/>
           </a:xfrm>
           <a:prstGeom prst="rect">
@@ -6361,7 +6575,7 @@
         </p:nvCxnSpPr>
         <p:spPr>
           <a:xfrm>
-            <a:off x="1673862" y="961474"/>
+            <a:off x="2664462" y="1361524"/>
             <a:ext cx="1" cy="360818"/>
           </a:xfrm>
           <a:prstGeom prst="line">
@@ -6398,7 +6612,7 @@
         </p:nvSpPr>
         <p:spPr>
           <a:xfrm>
-            <a:off x="1600200" y="1322292"/>
+            <a:off x="2590800" y="1722342"/>
             <a:ext cx="147325" cy="864128"/>
           </a:xfrm>
           <a:prstGeom prst="rect">
@@ -6449,7 +6663,7 @@
         </p:nvGrpSpPr>
         <p:grpSpPr>
           <a:xfrm>
-            <a:off x="152400" y="533400"/>
+            <a:off x="1143000" y="933450"/>
             <a:ext cx="324036" cy="573410"/>
             <a:chOff x="3239901" y="4149080"/>
             <a:chExt cx="648072" cy="1146820"/>
@@ -6666,7 +6880,7 @@
         </p:nvSpPr>
         <p:spPr>
           <a:xfrm>
-            <a:off x="3335583" y="611613"/>
+            <a:off x="4326183" y="1011663"/>
             <a:ext cx="1093635" cy="346760"/>
           </a:xfrm>
           <a:prstGeom prst="rect">
@@ -6727,7 +6941,7 @@
         </p:nvCxnSpPr>
         <p:spPr>
           <a:xfrm>
-            <a:off x="3882400" y="975284"/>
+            <a:off x="4873000" y="1375334"/>
             <a:ext cx="10390" cy="458194"/>
           </a:xfrm>
           <a:prstGeom prst="line">
@@ -6764,7 +6978,7 @@
         </p:nvSpPr>
         <p:spPr>
           <a:xfrm>
-            <a:off x="3823180" y="1433478"/>
+            <a:off x="4813780" y="1833528"/>
             <a:ext cx="139220" cy="705364"/>
           </a:xfrm>
           <a:prstGeom prst="rect">
@@ -6815,7 +7029,7 @@
         </p:nvCxnSpPr>
         <p:spPr>
           <a:xfrm>
-            <a:off x="466818" y="1325979"/>
+            <a:off x="1457418" y="1726029"/>
             <a:ext cx="1181996" cy="0"/>
           </a:xfrm>
           <a:prstGeom prst="straightConnector1">
@@ -6851,7 +7065,7 @@
         </p:nvSpPr>
         <p:spPr>
           <a:xfrm>
-            <a:off x="466818" y="1345879"/>
+            <a:off x="1457418" y="1745929"/>
             <a:ext cx="907904" cy="215444"/>
           </a:xfrm>
           <a:prstGeom prst="rect">
@@ -6880,7 +7094,7 @@
         </p:nvCxnSpPr>
         <p:spPr>
           <a:xfrm>
-            <a:off x="1739069" y="1433478"/>
+            <a:off x="2729669" y="1833528"/>
             <a:ext cx="2186269" cy="0"/>
           </a:xfrm>
           <a:prstGeom prst="straightConnector1">
@@ -6916,7 +7130,7 @@
         </p:nvSpPr>
         <p:spPr>
           <a:xfrm>
-            <a:off x="2166172" y="1453379"/>
+            <a:off x="3156772" y="1853429"/>
             <a:ext cx="1503916" cy="215444"/>
           </a:xfrm>
           <a:prstGeom prst="rect">
@@ -6949,7 +7163,7 @@
         </p:nvCxnSpPr>
         <p:spPr>
           <a:xfrm>
-            <a:off x="3954408" y="1538409"/>
+            <a:off x="4945008" y="1938459"/>
             <a:ext cx="2408938" cy="22692"/>
           </a:xfrm>
           <a:prstGeom prst="straightConnector1">
@@ -6985,7 +7199,7 @@
         </p:nvSpPr>
         <p:spPr>
           <a:xfrm>
-            <a:off x="4037343" y="1572987"/>
+            <a:off x="5027943" y="1973037"/>
             <a:ext cx="2000712" cy="215444"/>
           </a:xfrm>
           <a:prstGeom prst="rect">
@@ -7040,7 +7254,7 @@
         </p:nvCxnSpPr>
         <p:spPr>
           <a:xfrm>
-            <a:off x="1753007" y="1969747"/>
+            <a:off x="2743607" y="2369797"/>
             <a:ext cx="2172331" cy="0"/>
           </a:xfrm>
           <a:prstGeom prst="straightConnector1">
@@ -7078,7 +7292,7 @@
         </p:nvCxnSpPr>
         <p:spPr>
           <a:xfrm>
-            <a:off x="337776" y="2150594"/>
+            <a:off x="1328376" y="2550644"/>
             <a:ext cx="1262424" cy="0"/>
           </a:xfrm>
           <a:prstGeom prst="straightConnector1">
@@ -7116,7 +7330,7 @@
         </p:nvSpPr>
         <p:spPr>
           <a:xfrm>
-            <a:off x="5677546" y="626976"/>
+            <a:off x="6668146" y="1027026"/>
             <a:ext cx="1371600" cy="346760"/>
           </a:xfrm>
           <a:prstGeom prst="rect">
@@ -7190,7 +7404,7 @@
         </p:nvCxnSpPr>
         <p:spPr>
           <a:xfrm>
-            <a:off x="6363346" y="973736"/>
+            <a:off x="7353946" y="1373786"/>
             <a:ext cx="0" cy="715893"/>
           </a:xfrm>
           <a:prstGeom prst="line">
@@ -7229,7 +7443,7 @@
         </p:nvSpPr>
         <p:spPr>
           <a:xfrm>
-            <a:off x="6288403" y="1689629"/>
+            <a:off x="7279003" y="2089679"/>
             <a:ext cx="149886" cy="262016"/>
           </a:xfrm>
           <a:prstGeom prst="rect">
@@ -7284,7 +7498,7 @@
         </p:nvCxnSpPr>
         <p:spPr>
           <a:xfrm>
-            <a:off x="3962400" y="1820637"/>
+            <a:off x="4953000" y="2220687"/>
             <a:ext cx="2400946" cy="0"/>
           </a:xfrm>
           <a:prstGeom prst="straightConnector1">
@@ -7324,7 +7538,7 @@
         </p:nvSpPr>
         <p:spPr>
           <a:xfrm>
-            <a:off x="2274028" y="4807398"/>
+            <a:off x="4274082" y="3423821"/>
             <a:ext cx="2072306" cy="215444"/>
           </a:xfrm>
           <a:prstGeom prst="rect">
@@ -7379,7 +7593,7 @@
         </p:nvSpPr>
         <p:spPr>
           <a:xfrm>
-            <a:off x="3791146" y="4295233"/>
+            <a:off x="5791200" y="2911656"/>
             <a:ext cx="1371600" cy="346760"/>
           </a:xfrm>
           <a:prstGeom prst="rect">
@@ -7452,7 +7666,7 @@
         </p:nvCxnSpPr>
         <p:spPr>
           <a:xfrm flipH="1">
-            <a:off x="4455726" y="4648287"/>
+            <a:off x="6455780" y="3264710"/>
             <a:ext cx="1005" cy="1459690"/>
           </a:xfrm>
           <a:prstGeom prst="line">
@@ -7491,7 +7705,7 @@
         </p:nvSpPr>
         <p:spPr>
           <a:xfrm>
-            <a:off x="4384723" y="5071220"/>
+            <a:off x="6384777" y="3687643"/>
             <a:ext cx="142006" cy="1036757"/>
           </a:xfrm>
           <a:prstGeom prst="rect">
@@ -7546,7 +7760,7 @@
         </p:nvCxnSpPr>
         <p:spPr>
           <a:xfrm>
-            <a:off x="3078929" y="5071220"/>
+            <a:off x="5078983" y="3687643"/>
             <a:ext cx="1295400" cy="0"/>
           </a:xfrm>
           <a:prstGeom prst="straightConnector1">
@@ -7584,7 +7798,7 @@
         </p:nvCxnSpPr>
         <p:spPr>
           <a:xfrm flipH="1">
-            <a:off x="308154" y="1151580"/>
+            <a:off x="1298754" y="1551630"/>
             <a:ext cx="6264" cy="1039170"/>
           </a:xfrm>
           <a:prstGeom prst="line">
@@ -7621,7 +7835,7 @@
         </p:nvSpPr>
         <p:spPr>
           <a:xfrm>
-            <a:off x="721634" y="4278322"/>
+            <a:off x="2721688" y="2894745"/>
             <a:ext cx="1093635" cy="346760"/>
           </a:xfrm>
           <a:prstGeom prst="rect">
@@ -7680,7 +7894,7 @@
         </p:nvCxnSpPr>
         <p:spPr>
           <a:xfrm flipH="1">
-            <a:off x="1261716" y="4641993"/>
+            <a:off x="3261770" y="3258416"/>
             <a:ext cx="6735" cy="1301607"/>
           </a:xfrm>
           <a:prstGeom prst="line">
@@ -7717,7 +7931,7 @@
         </p:nvSpPr>
         <p:spPr>
           <a:xfrm>
-            <a:off x="1196443" y="5670472"/>
+            <a:off x="3196497" y="4286895"/>
             <a:ext cx="130545" cy="273128"/>
           </a:xfrm>
           <a:prstGeom prst="rect">
@@ -7768,7 +7982,7 @@
         </p:nvCxnSpPr>
         <p:spPr>
           <a:xfrm>
-            <a:off x="1348843" y="5670472"/>
+            <a:off x="3348897" y="4286895"/>
             <a:ext cx="3061841" cy="0"/>
           </a:xfrm>
           <a:prstGeom prst="straightConnector1">
@@ -7807,7 +8021,7 @@
         </p:nvSpPr>
         <p:spPr>
           <a:xfrm>
-            <a:off x="1416276" y="5395369"/>
+            <a:off x="3416330" y="4011792"/>
             <a:ext cx="2774724" cy="215444"/>
           </a:xfrm>
           <a:prstGeom prst="rect">
@@ -7848,7 +8062,7 @@
         </p:nvGrpSpPr>
         <p:grpSpPr>
           <a:xfrm>
-            <a:off x="1028134" y="5612032"/>
+            <a:off x="3028188" y="4228455"/>
             <a:ext cx="217349" cy="270072"/>
             <a:chOff x="1028134" y="5612032"/>
             <a:chExt cx="217349" cy="270072"/>
@@ -8007,7 +8221,7 @@
         </p:nvSpPr>
         <p:spPr>
           <a:xfrm>
-            <a:off x="194562" y="5444571"/>
+            <a:off x="2194616" y="4060994"/>
             <a:ext cx="794081" cy="215444"/>
           </a:xfrm>
           <a:prstGeom prst="rect">
@@ -8046,6 +8260,13 @@
   <p:clrMapOvr>
     <a:masterClrMapping/>
   </p:clrMapOvr>
+  <p:timing>
+    <p:tnLst>
+      <p:par>
+        <p:cTn id="1" dur="indefinite" restart="never" nodeType="tmRoot"/>
+      </p:par>
+    </p:tnLst>
+  </p:timing>
 </p:sld>
 </file>
 
@@ -8066,6 +8287,102 @@
           <a:chExt cx="0" cy="0"/>
         </a:xfrm>
       </p:grpSpPr>
+      <p:sp>
+        <p:nvSpPr>
+          <p:cNvPr id="64" name="Rounded Rectangle 63"/>
+          <p:cNvSpPr/>
+          <p:nvPr/>
+        </p:nvSpPr>
+        <p:spPr>
+          <a:xfrm>
+            <a:off x="0" y="0"/>
+            <a:ext cx="9144000" cy="2895600"/>
+          </a:xfrm>
+          <a:prstGeom prst="roundRect">
+            <a:avLst/>
+          </a:prstGeom>
+          <a:solidFill>
+            <a:schemeClr val="bg1">
+              <a:lumMod val="95000"/>
+            </a:schemeClr>
+          </a:solidFill>
+          <a:ln>
+            <a:solidFill>
+              <a:schemeClr val="bg1">
+                <a:lumMod val="65000"/>
+              </a:schemeClr>
+            </a:solidFill>
+          </a:ln>
+        </p:spPr>
+        <p:style>
+          <a:lnRef idx="2">
+            <a:schemeClr val="accent1">
+              <a:shade val="50000"/>
+            </a:schemeClr>
+          </a:lnRef>
+          <a:fillRef idx="1">
+            <a:schemeClr val="accent1"/>
+          </a:fillRef>
+          <a:effectRef idx="0">
+            <a:schemeClr val="accent1"/>
+          </a:effectRef>
+          <a:fontRef idx="minor">
+            <a:schemeClr val="lt1"/>
+          </a:fontRef>
+        </p:style>
+        <p:txBody>
+          <a:bodyPr rtlCol="0" anchor="ctr"/>
+          <a:lstStyle/>
+          <a:p>
+            <a:pPr algn="ctr"/>
+            <a:endParaRPr lang="en-US"/>
+          </a:p>
+        </p:txBody>
+      </p:sp>
+      <p:sp>
+        <p:nvSpPr>
+          <p:cNvPr id="65" name="TextBox 64"/>
+          <p:cNvSpPr txBox="1"/>
+          <p:nvPr/>
+        </p:nvSpPr>
+        <p:spPr>
+          <a:xfrm>
+            <a:off x="280822" y="113808"/>
+            <a:ext cx="1101858" cy="369332"/>
+          </a:xfrm>
+          <a:prstGeom prst="rect">
+            <a:avLst/>
+          </a:prstGeom>
+          <a:noFill/>
+        </p:spPr>
+        <p:txBody>
+          <a:bodyPr wrap="square" rtlCol="0">
+            <a:spAutoFit/>
+          </a:bodyPr>
+          <a:lstStyle/>
+          <a:p>
+            <a:r>
+              <a:rPr lang="en-US" dirty="0" smtClean="0">
+                <a:solidFill>
+                  <a:schemeClr val="tx1">
+                    <a:lumMod val="50000"/>
+                    <a:lumOff val="50000"/>
+                  </a:schemeClr>
+                </a:solidFill>
+              </a:rPr>
+              <a:t>Mark</a:t>
+            </a:r>
+            <a:endParaRPr lang="en-US" dirty="0">
+              <a:solidFill>
+                <a:schemeClr val="tx1">
+                  <a:lumMod val="50000"/>
+                  <a:lumOff val="50000"/>
+                </a:schemeClr>
+              </a:solidFill>
+            </a:endParaRPr>
+          </a:p>
+        </p:txBody>
+      </p:sp>
       <p:sp>
         <p:nvSpPr>
           <p:cNvPr id="2" name="Rectangle 62"/>
@@ -10701,12 +11018,20 @@
           <a:lstStyle/>
           <a:p>
             <a:r>
-              <a:rPr lang="en-US" sz="1400" dirty="0" err="1">
+              <a:rPr lang="en-US" sz="1400" dirty="0" err="1" smtClean="0">
                 <a:solidFill>
                   <a:srgbClr val="0070C0"/>
                 </a:solidFill>
               </a:rPr>
-              <a:t>addMutateCmd</a:t>
+              <a:t>addExecutedCmd</a:t>
+            </a:r>
+            <a:r>
+              <a:rPr lang="en-US" sz="1400" dirty="0">
+                <a:solidFill>
+                  <a:srgbClr val="0070C0"/>
+                </a:solidFill>
+              </a:rPr>
+              <a:t/>
             </a:r>
             <a:br>
               <a:rPr lang="en-US" sz="1400" dirty="0">
@@ -10716,13 +11041,18 @@
               </a:rPr>
             </a:br>
             <a:r>
-              <a:rPr lang="en-US" sz="1400" dirty="0">
+              <a:rPr lang="en-US" sz="1400" dirty="0" smtClean="0">
                 <a:solidFill>
                   <a:srgbClr val="0070C0"/>
                 </a:solidFill>
               </a:rPr>
-              <a:t>(“mark”, 1 , task)</a:t>
-            </a:r>
+              <a:t>(this command)</a:t>
+            </a:r>
+            <a:endParaRPr lang="en-US" sz="1400" dirty="0">
+              <a:solidFill>
+                <a:srgbClr val="0070C0"/>
+              </a:solidFill>
+            </a:endParaRPr>
           </a:p>
         </p:txBody>
       </p:sp>
@@ -10774,6 +11104,13 @@
   <p:clrMapOvr>
     <a:masterClrMapping/>
   </p:clrMapOvr>
+  <p:timing>
+    <p:tnLst>
+      <p:par>
+        <p:cTn id="1" dur="indefinite" restart="never" nodeType="tmRoot"/>
+      </p:par>
+    </p:tnLst>
+  </p:timing>
 </p:sld>
 </file>
 
@@ -10796,13 +11133,109 @@
       </p:grpSpPr>
       <p:sp>
         <p:nvSpPr>
+          <p:cNvPr id="64" name="Rounded Rectangle 63"/>
+          <p:cNvSpPr/>
+          <p:nvPr/>
+        </p:nvSpPr>
+        <p:spPr>
+          <a:xfrm>
+            <a:off x="253953" y="457200"/>
+            <a:ext cx="8661447" cy="4582470"/>
+          </a:xfrm>
+          <a:prstGeom prst="roundRect">
+            <a:avLst/>
+          </a:prstGeom>
+          <a:solidFill>
+            <a:schemeClr val="bg1">
+              <a:lumMod val="95000"/>
+            </a:schemeClr>
+          </a:solidFill>
+          <a:ln>
+            <a:solidFill>
+              <a:schemeClr val="bg1">
+                <a:lumMod val="65000"/>
+              </a:schemeClr>
+            </a:solidFill>
+          </a:ln>
+        </p:spPr>
+        <p:style>
+          <a:lnRef idx="2">
+            <a:schemeClr val="accent1">
+              <a:shade val="50000"/>
+            </a:schemeClr>
+          </a:lnRef>
+          <a:fillRef idx="1">
+            <a:schemeClr val="accent1"/>
+          </a:fillRef>
+          <a:effectRef idx="0">
+            <a:schemeClr val="accent1"/>
+          </a:effectRef>
+          <a:fontRef idx="minor">
+            <a:schemeClr val="lt1"/>
+          </a:fontRef>
+        </p:style>
+        <p:txBody>
+          <a:bodyPr rtlCol="0" anchor="ctr"/>
+          <a:lstStyle/>
+          <a:p>
+            <a:pPr algn="ctr"/>
+            <a:endParaRPr lang="en-US"/>
+          </a:p>
+        </p:txBody>
+      </p:sp>
+      <p:sp>
+        <p:nvSpPr>
+          <p:cNvPr id="65" name="TextBox 64"/>
+          <p:cNvSpPr txBox="1"/>
+          <p:nvPr/>
+        </p:nvSpPr>
+        <p:spPr>
+          <a:xfrm>
+            <a:off x="881514" y="457200"/>
+            <a:ext cx="1101858" cy="369332"/>
+          </a:xfrm>
+          <a:prstGeom prst="rect">
+            <a:avLst/>
+          </a:prstGeom>
+          <a:noFill/>
+        </p:spPr>
+        <p:txBody>
+          <a:bodyPr wrap="square" rtlCol="0">
+            <a:spAutoFit/>
+          </a:bodyPr>
+          <a:lstStyle/>
+          <a:p>
+            <a:r>
+              <a:rPr lang="en-US" dirty="0" err="1" smtClean="0">
+                <a:solidFill>
+                  <a:schemeClr val="tx1">
+                    <a:lumMod val="50000"/>
+                    <a:lumOff val="50000"/>
+                  </a:schemeClr>
+                </a:solidFill>
+              </a:rPr>
+              <a:t>SetPath</a:t>
+            </a:r>
+            <a:endParaRPr lang="en-US" dirty="0">
+              <a:solidFill>
+                <a:schemeClr val="tx1">
+                  <a:lumMod val="50000"/>
+                  <a:lumOff val="50000"/>
+                </a:schemeClr>
+              </a:solidFill>
+            </a:endParaRPr>
+          </a:p>
+        </p:txBody>
+      </p:sp>
+      <p:sp>
+        <p:nvSpPr>
           <p:cNvPr id="53" name="Rectangle 62"/>
           <p:cNvSpPr/>
           <p:nvPr/>
         </p:nvSpPr>
         <p:spPr>
           <a:xfrm>
-            <a:off x="7370178" y="4278322"/>
+            <a:off x="7370178" y="3051424"/>
             <a:ext cx="1093635" cy="346760"/>
           </a:xfrm>
           <a:prstGeom prst="rect">
@@ -10867,7 +11300,7 @@
         </p:nvCxnSpPr>
         <p:spPr>
           <a:xfrm flipH="1">
-            <a:off x="7907226" y="4641993"/>
+            <a:off x="7907226" y="3415095"/>
             <a:ext cx="9769" cy="981078"/>
           </a:xfrm>
           <a:prstGeom prst="line">
@@ -10906,7 +11339,7 @@
         </p:nvSpPr>
         <p:spPr>
           <a:xfrm>
-            <a:off x="7844987" y="5335662"/>
+            <a:off x="7844987" y="4108764"/>
             <a:ext cx="124478" cy="287409"/>
           </a:xfrm>
           <a:prstGeom prst="rect">
@@ -10961,7 +11394,7 @@
         </p:nvSpPr>
         <p:spPr>
           <a:xfrm>
-            <a:off x="1810094" y="4797674"/>
+            <a:off x="1810094" y="3570776"/>
             <a:ext cx="2716635" cy="215444"/>
           </a:xfrm>
           <a:prstGeom prst="rect">
@@ -11016,7 +11449,7 @@
         </p:nvCxnSpPr>
         <p:spPr>
           <a:xfrm flipH="1">
-            <a:off x="4526729" y="5623071"/>
+            <a:off x="4526729" y="4396173"/>
             <a:ext cx="3383941" cy="0"/>
           </a:xfrm>
           <a:prstGeom prst="straightConnector1">
@@ -11056,7 +11489,7 @@
         </p:nvSpPr>
         <p:spPr>
           <a:xfrm>
-            <a:off x="3791146" y="4295233"/>
+            <a:off x="3791146" y="3068335"/>
             <a:ext cx="1371600" cy="346760"/>
           </a:xfrm>
           <a:prstGeom prst="rect">
@@ -11129,7 +11562,7 @@
         </p:nvCxnSpPr>
         <p:spPr>
           <a:xfrm flipH="1">
-            <a:off x="4455726" y="4648287"/>
+            <a:off x="4455726" y="3421389"/>
             <a:ext cx="1005" cy="1459690"/>
           </a:xfrm>
           <a:prstGeom prst="line">
@@ -11168,7 +11601,7 @@
         </p:nvSpPr>
         <p:spPr>
           <a:xfrm>
-            <a:off x="4384723" y="5071220"/>
+            <a:off x="4384723" y="3844322"/>
             <a:ext cx="142006" cy="1036757"/>
           </a:xfrm>
           <a:prstGeom prst="rect">
@@ -11223,7 +11656,7 @@
         </p:nvCxnSpPr>
         <p:spPr>
           <a:xfrm>
-            <a:off x="3078929" y="5071220"/>
+            <a:off x="3078929" y="3844322"/>
             <a:ext cx="1295400" cy="0"/>
           </a:xfrm>
           <a:prstGeom prst="straightConnector1">
@@ -11261,7 +11694,7 @@
         </p:nvCxnSpPr>
         <p:spPr>
           <a:xfrm>
-            <a:off x="2975642" y="6107977"/>
+            <a:off x="2975642" y="4881079"/>
             <a:ext cx="1448755" cy="0"/>
           </a:xfrm>
           <a:prstGeom prst="straightConnector1">
@@ -11301,7 +11734,7 @@
         </p:nvCxnSpPr>
         <p:spPr>
           <a:xfrm>
-            <a:off x="4526729" y="5341014"/>
+            <a:off x="4526729" y="4114116"/>
             <a:ext cx="3318258" cy="0"/>
           </a:xfrm>
           <a:prstGeom prst="straightConnector1">
@@ -11340,7 +11773,7 @@
         </p:nvSpPr>
         <p:spPr>
           <a:xfrm>
-            <a:off x="4833686" y="5065911"/>
+            <a:off x="4833686" y="3839013"/>
             <a:ext cx="2862514" cy="215444"/>
           </a:xfrm>
           <a:prstGeom prst="rect">
@@ -11362,37 +11795,17 @@
                   </a:schemeClr>
                 </a:solidFill>
               </a:rPr>
-              <a:t>handle</a:t>
-            </a:r>
-            <a:r>
-              <a:rPr lang="en-US" sz="1400" dirty="0" err="1">
+              <a:t>handleFilePathChangedEvent</a:t>
+            </a:r>
+            <a:r>
+              <a:rPr lang="en-US" sz="1400" dirty="0">
                 <a:solidFill>
                   <a:schemeClr val="accent6">
                     <a:lumMod val="75000"/>
                   </a:schemeClr>
                 </a:solidFill>
               </a:rPr>
-              <a:t>FilePathChangedEvent</a:t>
-            </a:r>
-            <a:r>
-              <a:rPr lang="en-US" sz="1400" dirty="0">
-                <a:solidFill>
-                  <a:schemeClr val="accent6">
-                    <a:lumMod val="75000"/>
-                  </a:schemeClr>
-                </a:solidFill>
-              </a:rPr>
-              <a:t> </a:t>
-            </a:r>
-            <a:r>
-              <a:rPr lang="en-US" sz="1400" dirty="0">
-                <a:solidFill>
-                  <a:schemeClr val="accent6">
-                    <a:lumMod val="75000"/>
-                  </a:schemeClr>
-                </a:solidFill>
-              </a:rPr>
-              <a:t>()</a:t>
+              <a:t> ()</a:t>
             </a:r>
           </a:p>
         </p:txBody>
@@ -11405,7 +11818,7 @@
         </p:nvGrpSpPr>
         <p:grpSpPr>
           <a:xfrm flipH="1">
-            <a:off x="7936842" y="5335662"/>
+            <a:off x="7936842" y="4108764"/>
             <a:ext cx="217349" cy="270072"/>
             <a:chOff x="1028134" y="5612032"/>
             <a:chExt cx="217349" cy="270072"/>
@@ -11568,7 +11981,7 @@
         </p:nvSpPr>
         <p:spPr>
           <a:xfrm>
-            <a:off x="8223953" y="5180992"/>
+            <a:off x="8223953" y="3954094"/>
             <a:ext cx="539047" cy="430887"/>
           </a:xfrm>
           <a:prstGeom prst="rect">
@@ -11622,7 +12035,7 @@
         </p:nvSpPr>
         <p:spPr>
           <a:xfrm>
-            <a:off x="1127044" y="614714"/>
+            <a:off x="2117644" y="1090964"/>
             <a:ext cx="1093635" cy="346760"/>
           </a:xfrm>
           <a:prstGeom prst="rect">
@@ -11684,7 +12097,7 @@
         </p:nvCxnSpPr>
         <p:spPr>
           <a:xfrm>
-            <a:off x="1673862" y="961474"/>
+            <a:off x="2664462" y="1437724"/>
             <a:ext cx="1" cy="360818"/>
           </a:xfrm>
           <a:prstGeom prst="line">
@@ -11721,7 +12134,7 @@
         </p:nvSpPr>
         <p:spPr>
           <a:xfrm>
-            <a:off x="1600200" y="1322292"/>
+            <a:off x="2590800" y="1798542"/>
             <a:ext cx="147325" cy="864128"/>
           </a:xfrm>
           <a:prstGeom prst="rect">
@@ -11772,7 +12185,7 @@
         </p:nvGrpSpPr>
         <p:grpSpPr>
           <a:xfrm>
-            <a:off x="152400" y="533400"/>
+            <a:off x="1143000" y="1009650"/>
             <a:ext cx="324036" cy="573410"/>
             <a:chOff x="3239901" y="4149080"/>
             <a:chExt cx="648072" cy="1146820"/>
@@ -11989,7 +12402,7 @@
         </p:nvSpPr>
         <p:spPr>
           <a:xfrm>
-            <a:off x="3335583" y="611613"/>
+            <a:off x="4326183" y="1087863"/>
             <a:ext cx="1093635" cy="346760"/>
           </a:xfrm>
           <a:prstGeom prst="rect">
@@ -12050,7 +12463,7 @@
         </p:nvCxnSpPr>
         <p:spPr>
           <a:xfrm>
-            <a:off x="3882400" y="975284"/>
+            <a:off x="4873000" y="1451534"/>
             <a:ext cx="10390" cy="458194"/>
           </a:xfrm>
           <a:prstGeom prst="line">
@@ -12087,7 +12500,7 @@
         </p:nvSpPr>
         <p:spPr>
           <a:xfrm>
-            <a:off x="3823180" y="1433478"/>
+            <a:off x="4813780" y="1909728"/>
             <a:ext cx="139220" cy="705364"/>
           </a:xfrm>
           <a:prstGeom prst="rect">
@@ -12138,7 +12551,7 @@
         </p:nvCxnSpPr>
         <p:spPr>
           <a:xfrm>
-            <a:off x="466818" y="1325979"/>
+            <a:off x="1457418" y="1802229"/>
             <a:ext cx="1181996" cy="0"/>
           </a:xfrm>
           <a:prstGeom prst="straightConnector1">
@@ -12174,7 +12587,7 @@
         </p:nvSpPr>
         <p:spPr>
           <a:xfrm>
-            <a:off x="466818" y="1345879"/>
+            <a:off x="1457418" y="1822129"/>
             <a:ext cx="907904" cy="430887"/>
           </a:xfrm>
           <a:prstGeom prst="rect">
@@ -12207,7 +12620,7 @@
         </p:nvCxnSpPr>
         <p:spPr>
           <a:xfrm>
-            <a:off x="1739069" y="1433478"/>
+            <a:off x="2729669" y="1909728"/>
             <a:ext cx="2186269" cy="0"/>
           </a:xfrm>
           <a:prstGeom prst="straightConnector1">
@@ -12243,7 +12656,7 @@
         </p:nvSpPr>
         <p:spPr>
           <a:xfrm>
-            <a:off x="2166172" y="1453379"/>
+            <a:off x="3156772" y="1929629"/>
             <a:ext cx="1503916" cy="430887"/>
           </a:xfrm>
           <a:prstGeom prst="rect">
@@ -12292,7 +12705,7 @@
         </p:nvCxnSpPr>
         <p:spPr>
           <a:xfrm>
-            <a:off x="3954408" y="1538409"/>
+            <a:off x="4945008" y="2014659"/>
             <a:ext cx="2408938" cy="22692"/>
           </a:xfrm>
           <a:prstGeom prst="straightConnector1">
@@ -12328,7 +12741,7 @@
         </p:nvSpPr>
         <p:spPr>
           <a:xfrm>
-            <a:off x="4037342" y="1572987"/>
+            <a:off x="5027942" y="2049237"/>
             <a:ext cx="2070753" cy="215444"/>
           </a:xfrm>
           <a:prstGeom prst="rect">
@@ -12383,7 +12796,7 @@
         </p:nvCxnSpPr>
         <p:spPr>
           <a:xfrm>
-            <a:off x="1753007" y="1969747"/>
+            <a:off x="2743607" y="2445997"/>
             <a:ext cx="2172331" cy="0"/>
           </a:xfrm>
           <a:prstGeom prst="straightConnector1">
@@ -12421,7 +12834,7 @@
         </p:nvCxnSpPr>
         <p:spPr>
           <a:xfrm>
-            <a:off x="337776" y="2150594"/>
+            <a:off x="1328376" y="2626844"/>
             <a:ext cx="1262424" cy="0"/>
           </a:xfrm>
           <a:prstGeom prst="straightConnector1">
@@ -12459,7 +12872,7 @@
         </p:nvSpPr>
         <p:spPr>
           <a:xfrm>
-            <a:off x="5677546" y="626976"/>
+            <a:off x="6668146" y="1103226"/>
             <a:ext cx="1371600" cy="346760"/>
           </a:xfrm>
           <a:prstGeom prst="rect">
@@ -12533,7 +12946,7 @@
         </p:nvCxnSpPr>
         <p:spPr>
           <a:xfrm>
-            <a:off x="6363346" y="973736"/>
+            <a:off x="7353946" y="1449986"/>
             <a:ext cx="0" cy="715893"/>
           </a:xfrm>
           <a:prstGeom prst="line">
@@ -12572,7 +12985,7 @@
         </p:nvSpPr>
         <p:spPr>
           <a:xfrm>
-            <a:off x="6288403" y="1689629"/>
+            <a:off x="7279003" y="2165879"/>
             <a:ext cx="149886" cy="262016"/>
           </a:xfrm>
           <a:prstGeom prst="rect">
@@ -12627,7 +13040,7 @@
         </p:nvCxnSpPr>
         <p:spPr>
           <a:xfrm>
-            <a:off x="3962400" y="1820637"/>
+            <a:off x="4953000" y="2296887"/>
             <a:ext cx="2400946" cy="0"/>
           </a:xfrm>
           <a:prstGeom prst="straightConnector1">
@@ -12667,7 +13080,7 @@
         </p:nvCxnSpPr>
         <p:spPr>
           <a:xfrm flipH="1">
-            <a:off x="308154" y="1151580"/>
+            <a:off x="1298754" y="1627830"/>
             <a:ext cx="6264" cy="1039170"/>
           </a:xfrm>
           <a:prstGeom prst="line">
@@ -12704,7 +13117,7 @@
         </p:nvSpPr>
         <p:spPr>
           <a:xfrm>
-            <a:off x="955240" y="4274898"/>
+            <a:off x="955240" y="3048000"/>
             <a:ext cx="1093635" cy="346760"/>
           </a:xfrm>
           <a:prstGeom prst="rect">
@@ -12766,7 +13179,7 @@
         </p:nvCxnSpPr>
         <p:spPr>
           <a:xfrm>
-            <a:off x="1502058" y="4621658"/>
+            <a:off x="1502058" y="3394760"/>
             <a:ext cx="1" cy="360818"/>
           </a:xfrm>
           <a:prstGeom prst="line">
@@ -12803,7 +13216,7 @@
         </p:nvSpPr>
         <p:spPr>
           <a:xfrm>
-            <a:off x="1428396" y="4982476"/>
+            <a:off x="1428396" y="3755578"/>
             <a:ext cx="147325" cy="864128"/>
           </a:xfrm>
           <a:prstGeom prst="rect">
@@ -12854,7 +13267,7 @@
         </p:nvCxnSpPr>
         <p:spPr>
           <a:xfrm flipH="1" flipV="1">
-            <a:off x="1575721" y="5326353"/>
+            <a:off x="1575721" y="4099455"/>
             <a:ext cx="2798608" cy="9309"/>
           </a:xfrm>
           <a:prstGeom prst="straightConnector1">
@@ -12893,7 +13306,7 @@
         </p:nvSpPr>
         <p:spPr>
           <a:xfrm>
-            <a:off x="1845733" y="5071072"/>
+            <a:off x="1845733" y="3844174"/>
             <a:ext cx="2862514" cy="215444"/>
           </a:xfrm>
           <a:prstGeom prst="rect">
@@ -12915,37 +13328,17 @@
                   </a:schemeClr>
                 </a:solidFill>
               </a:rPr>
-              <a:t>handle</a:t>
-            </a:r>
-            <a:r>
-              <a:rPr lang="en-US" sz="1400" dirty="0" err="1">
+              <a:t>handleFilePathChangedEvent</a:t>
+            </a:r>
+            <a:r>
+              <a:rPr lang="en-US" sz="1400" dirty="0">
                 <a:solidFill>
                   <a:schemeClr val="accent6">
                     <a:lumMod val="75000"/>
                   </a:schemeClr>
                 </a:solidFill>
               </a:rPr>
-              <a:t>FilePathChangedEvent</a:t>
-            </a:r>
-            <a:r>
-              <a:rPr lang="en-US" sz="1400" dirty="0">
-                <a:solidFill>
-                  <a:schemeClr val="accent6">
-                    <a:lumMod val="75000"/>
-                  </a:schemeClr>
-                </a:solidFill>
-              </a:rPr>
-              <a:t> </a:t>
-            </a:r>
-            <a:r>
-              <a:rPr lang="en-US" sz="1400" dirty="0">
-                <a:solidFill>
-                  <a:schemeClr val="accent6">
-                    <a:lumMod val="75000"/>
-                  </a:schemeClr>
-                </a:solidFill>
-              </a:rPr>
-              <a:t>()</a:t>
+              <a:t> ()</a:t>
             </a:r>
           </a:p>
         </p:txBody>
@@ -12958,7 +13351,7 @@
         </p:nvSpPr>
         <p:spPr>
           <a:xfrm>
-            <a:off x="1428396" y="5349943"/>
+            <a:off x="1428396" y="4123045"/>
             <a:ext cx="130545" cy="273128"/>
           </a:xfrm>
           <a:prstGeom prst="rect">
@@ -13009,7 +13402,7 @@
         </p:nvGrpSpPr>
         <p:grpSpPr>
           <a:xfrm>
-            <a:off x="1260087" y="5291503"/>
+            <a:off x="1260087" y="4064605"/>
             <a:ext cx="217349" cy="270072"/>
             <a:chOff x="1028134" y="5612032"/>
             <a:chExt cx="217349" cy="270072"/>
@@ -13168,7 +13561,7 @@
         </p:nvSpPr>
         <p:spPr>
           <a:xfrm>
-            <a:off x="426515" y="5124042"/>
+            <a:off x="426515" y="3897144"/>
             <a:ext cx="794081" cy="430887"/>
           </a:xfrm>
           <a:prstGeom prst="rect">
@@ -13204,7 +13597,7 @@
         </p:nvCxnSpPr>
         <p:spPr>
           <a:xfrm flipH="1">
-            <a:off x="1493669" y="5623071"/>
+            <a:off x="1493669" y="4396173"/>
             <a:ext cx="2891055" cy="0"/>
           </a:xfrm>
           <a:prstGeom prst="straightConnector1">
@@ -13244,6 +13637,13 @@
   <p:clrMapOvr>
     <a:masterClrMapping/>
   </p:clrMapOvr>
+  <p:timing>
+    <p:tnLst>
+      <p:par>
+        <p:cTn id="1" dur="indefinite" restart="never" nodeType="tmRoot"/>
+      </p:par>
+    </p:tnLst>
+  </p:timing>
 </p:sld>
 </file>
 
@@ -13274,6 +13674,13 @@
   <p:clrMapOvr>
     <a:masterClrMapping/>
   </p:clrMapOvr>
+  <p:timing>
+    <p:tnLst>
+      <p:par>
+        <p:cTn id="1" dur="indefinite" restart="never" nodeType="tmRoot"/>
+      </p:par>
+    </p:tnLst>
+  </p:timing>
 </p:sld>
 </file>
 
@@ -14624,6 +15031,13 @@
   <p:clrMapOvr>
     <a:masterClrMapping/>
   </p:clrMapOvr>
+  <p:timing>
+    <p:tnLst>
+      <p:par>
+        <p:cTn id="1" dur="indefinite" restart="never" nodeType="tmRoot"/>
+      </p:par>
+    </p:tnLst>
+  </p:timing>
 </p:sld>
 </file>
 
@@ -14646,13 +15060,161 @@
       </p:grpSpPr>
       <p:sp>
         <p:nvSpPr>
+          <p:cNvPr id="65" name="Rounded Rectangle 64"/>
+          <p:cNvSpPr/>
+          <p:nvPr/>
+        </p:nvSpPr>
+        <p:spPr>
+          <a:xfrm>
+            <a:off x="0" y="3657600"/>
+            <a:ext cx="9144000" cy="2895600"/>
+          </a:xfrm>
+          <a:prstGeom prst="roundRect">
+            <a:avLst/>
+          </a:prstGeom>
+          <a:solidFill>
+            <a:schemeClr val="bg1">
+              <a:lumMod val="95000"/>
+            </a:schemeClr>
+          </a:solidFill>
+          <a:ln>
+            <a:solidFill>
+              <a:schemeClr val="bg1">
+                <a:lumMod val="65000"/>
+              </a:schemeClr>
+            </a:solidFill>
+          </a:ln>
+        </p:spPr>
+        <p:style>
+          <a:lnRef idx="2">
+            <a:schemeClr val="accent1">
+              <a:shade val="50000"/>
+            </a:schemeClr>
+          </a:lnRef>
+          <a:fillRef idx="1">
+            <a:schemeClr val="accent1"/>
+          </a:fillRef>
+          <a:effectRef idx="0">
+            <a:schemeClr val="accent1"/>
+          </a:effectRef>
+          <a:fontRef idx="minor">
+            <a:schemeClr val="lt1"/>
+          </a:fontRef>
+        </p:style>
+        <p:txBody>
+          <a:bodyPr rtlCol="0" anchor="ctr"/>
+          <a:lstStyle/>
+          <a:p>
+            <a:pPr algn="ctr"/>
+            <a:endParaRPr lang="en-US"/>
+          </a:p>
+        </p:txBody>
+      </p:sp>
+      <p:sp>
+        <p:nvSpPr>
+          <p:cNvPr id="71" name="TextBox 70"/>
+          <p:cNvSpPr txBox="1"/>
+          <p:nvPr/>
+        </p:nvSpPr>
+        <p:spPr>
+          <a:xfrm>
+            <a:off x="280822" y="3771408"/>
+            <a:ext cx="1101858" cy="369332"/>
+          </a:xfrm>
+          <a:prstGeom prst="rect">
+            <a:avLst/>
+          </a:prstGeom>
+          <a:noFill/>
+        </p:spPr>
+        <p:txBody>
+          <a:bodyPr wrap="square" rtlCol="0">
+            <a:spAutoFit/>
+          </a:bodyPr>
+          <a:lstStyle/>
+          <a:p>
+            <a:r>
+              <a:rPr lang="en-US" dirty="0" smtClean="0">
+                <a:solidFill>
+                  <a:schemeClr val="tx1">
+                    <a:lumMod val="50000"/>
+                    <a:lumOff val="50000"/>
+                  </a:schemeClr>
+                </a:solidFill>
+              </a:rPr>
+              <a:t>Delete</a:t>
+            </a:r>
+            <a:endParaRPr lang="en-US" dirty="0">
+              <a:solidFill>
+                <a:schemeClr val="tx1">
+                  <a:lumMod val="50000"/>
+                  <a:lumOff val="50000"/>
+                </a:schemeClr>
+              </a:solidFill>
+            </a:endParaRPr>
+          </a:p>
+        </p:txBody>
+      </p:sp>
+      <p:sp>
+        <p:nvSpPr>
+          <p:cNvPr id="14" name="Rounded Rectangle 13"/>
+          <p:cNvSpPr/>
+          <p:nvPr/>
+        </p:nvSpPr>
+        <p:spPr>
+          <a:xfrm>
+            <a:off x="0" y="457200"/>
+            <a:ext cx="9144000" cy="2895600"/>
+          </a:xfrm>
+          <a:prstGeom prst="roundRect">
+            <a:avLst/>
+          </a:prstGeom>
+          <a:solidFill>
+            <a:schemeClr val="bg1">
+              <a:lumMod val="95000"/>
+            </a:schemeClr>
+          </a:solidFill>
+          <a:ln>
+            <a:solidFill>
+              <a:schemeClr val="bg1">
+                <a:lumMod val="65000"/>
+              </a:schemeClr>
+            </a:solidFill>
+          </a:ln>
+        </p:spPr>
+        <p:style>
+          <a:lnRef idx="2">
+            <a:schemeClr val="accent1">
+              <a:shade val="50000"/>
+            </a:schemeClr>
+          </a:lnRef>
+          <a:fillRef idx="1">
+            <a:schemeClr val="accent1"/>
+          </a:fillRef>
+          <a:effectRef idx="0">
+            <a:schemeClr val="accent1"/>
+          </a:effectRef>
+          <a:fontRef idx="minor">
+            <a:schemeClr val="lt1"/>
+          </a:fontRef>
+        </p:style>
+        <p:txBody>
+          <a:bodyPr rtlCol="0" anchor="ctr"/>
+          <a:lstStyle/>
+          <a:p>
+            <a:pPr algn="ctr"/>
+            <a:endParaRPr lang="en-US"/>
+          </a:p>
+        </p:txBody>
+      </p:sp>
+      <p:sp>
+        <p:nvSpPr>
           <p:cNvPr id="2" name="Rectangle 62"/>
           <p:cNvSpPr/>
           <p:nvPr/>
         </p:nvSpPr>
         <p:spPr>
           <a:xfrm>
-            <a:off x="1111860" y="607926"/>
+            <a:off x="1111860" y="1141326"/>
             <a:ext cx="1093635" cy="346760"/>
           </a:xfrm>
           <a:prstGeom prst="rect">
@@ -14711,7 +15273,7 @@
         </p:nvCxnSpPr>
         <p:spPr>
           <a:xfrm>
-            <a:off x="1658677" y="971597"/>
+            <a:off x="1658677" y="1504997"/>
             <a:ext cx="0" cy="1723059"/>
           </a:xfrm>
           <a:prstGeom prst="line">
@@ -14748,7 +15310,7 @@
         </p:nvSpPr>
         <p:spPr>
           <a:xfrm>
-            <a:off x="1586669" y="1322292"/>
+            <a:off x="1586669" y="1855692"/>
             <a:ext cx="152400" cy="1019910"/>
           </a:xfrm>
           <a:prstGeom prst="rect">
@@ -14799,7 +15361,7 @@
         </p:nvGrpSpPr>
         <p:grpSpPr>
           <a:xfrm>
-            <a:off x="152400" y="533400"/>
+            <a:off x="152400" y="1066800"/>
             <a:ext cx="324036" cy="573410"/>
             <a:chOff x="3239901" y="4149080"/>
             <a:chExt cx="648072" cy="1146820"/>
@@ -15016,7 +15578,7 @@
         </p:nvSpPr>
         <p:spPr>
           <a:xfrm>
-            <a:off x="3335583" y="611613"/>
+            <a:off x="3335583" y="1145013"/>
             <a:ext cx="1093635" cy="346760"/>
           </a:xfrm>
           <a:prstGeom prst="rect">
@@ -15075,7 +15637,7 @@
         </p:nvCxnSpPr>
         <p:spPr>
           <a:xfrm>
-            <a:off x="3882400" y="975284"/>
+            <a:off x="3882400" y="1508684"/>
             <a:ext cx="0" cy="1723059"/>
           </a:xfrm>
           <a:prstGeom prst="line">
@@ -15112,7 +15674,7 @@
         </p:nvSpPr>
         <p:spPr>
           <a:xfrm>
-            <a:off x="3810392" y="1433477"/>
+            <a:off x="3810392" y="1966877"/>
             <a:ext cx="144016" cy="832525"/>
           </a:xfrm>
           <a:prstGeom prst="rect">
@@ -15163,7 +15725,7 @@
         </p:nvSpPr>
         <p:spPr>
           <a:xfrm>
-            <a:off x="5316783" y="607926"/>
+            <a:off x="5316783" y="1141326"/>
             <a:ext cx="1093635" cy="346760"/>
           </a:xfrm>
           <a:prstGeom prst="rect">
@@ -15222,7 +15784,7 @@
         </p:nvCxnSpPr>
         <p:spPr>
           <a:xfrm>
-            <a:off x="5863600" y="971597"/>
+            <a:off x="5863600" y="1504997"/>
             <a:ext cx="0" cy="1723059"/>
           </a:xfrm>
           <a:prstGeom prst="line">
@@ -15259,7 +15821,7 @@
         </p:nvSpPr>
         <p:spPr>
           <a:xfrm>
-            <a:off x="5791592" y="1538408"/>
+            <a:off x="5791592" y="2071808"/>
             <a:ext cx="142006" cy="651394"/>
           </a:xfrm>
           <a:prstGeom prst="rect">
@@ -15310,7 +15872,7 @@
         </p:nvCxnSpPr>
         <p:spPr>
           <a:xfrm>
-            <a:off x="466818" y="1325979"/>
+            <a:off x="466818" y="1859379"/>
             <a:ext cx="1119851" cy="0"/>
           </a:xfrm>
           <a:prstGeom prst="straightConnector1">
@@ -15346,7 +15908,7 @@
         </p:nvSpPr>
         <p:spPr>
           <a:xfrm>
-            <a:off x="466818" y="1345880"/>
+            <a:off x="466818" y="1879280"/>
             <a:ext cx="860170" cy="215444"/>
           </a:xfrm>
           <a:prstGeom prst="rect">
@@ -15375,7 +15937,7 @@
         </p:nvCxnSpPr>
         <p:spPr>
           <a:xfrm>
-            <a:off x="1739069" y="1433478"/>
+            <a:off x="1739069" y="1966878"/>
             <a:ext cx="2071323" cy="0"/>
           </a:xfrm>
           <a:prstGeom prst="straightConnector1">
@@ -15411,7 +15973,7 @@
         </p:nvSpPr>
         <p:spPr>
           <a:xfrm>
-            <a:off x="2166172" y="1453379"/>
+            <a:off x="2166172" y="1986779"/>
             <a:ext cx="1424846" cy="215444"/>
           </a:xfrm>
           <a:prstGeom prst="rect">
@@ -15444,7 +16006,7 @@
         </p:nvCxnSpPr>
         <p:spPr>
           <a:xfrm>
-            <a:off x="3954408" y="1538409"/>
+            <a:off x="3954408" y="2071809"/>
             <a:ext cx="1837184" cy="0"/>
           </a:xfrm>
           <a:prstGeom prst="straightConnector1">
@@ -15480,7 +16042,7 @@
         </p:nvSpPr>
         <p:spPr>
           <a:xfrm>
-            <a:off x="4299772" y="1542583"/>
+            <a:off x="4299772" y="2075983"/>
             <a:ext cx="1424846" cy="215444"/>
           </a:xfrm>
           <a:prstGeom prst="rect">
@@ -15521,7 +16083,7 @@
         </p:nvSpPr>
         <p:spPr>
           <a:xfrm>
-            <a:off x="6074030" y="1687656"/>
+            <a:off x="6074030" y="2221056"/>
             <a:ext cx="2438400" cy="430887"/>
           </a:xfrm>
           <a:prstGeom prst="rect">
@@ -15576,7 +16138,7 @@
         </p:nvCxnSpPr>
         <p:spPr>
           <a:xfrm>
-            <a:off x="3954408" y="2190681"/>
+            <a:off x="3954408" y="2724081"/>
             <a:ext cx="1837184" cy="0"/>
           </a:xfrm>
           <a:prstGeom prst="straightConnector1">
@@ -15614,7 +16176,7 @@
         </p:nvCxnSpPr>
         <p:spPr>
           <a:xfrm>
-            <a:off x="1739069" y="2266002"/>
+            <a:off x="1739069" y="2799402"/>
             <a:ext cx="2058118" cy="0"/>
           </a:xfrm>
           <a:prstGeom prst="straightConnector1">
@@ -15652,7 +16214,7 @@
         </p:nvCxnSpPr>
         <p:spPr>
           <a:xfrm>
-            <a:off x="390618" y="2342202"/>
+            <a:off x="390618" y="2875602"/>
             <a:ext cx="1196051" cy="0"/>
           </a:xfrm>
           <a:prstGeom prst="straightConnector1">
@@ -15690,7 +16252,7 @@
         </p:nvSpPr>
         <p:spPr>
           <a:xfrm>
-            <a:off x="7696200" y="591251"/>
+            <a:off x="7696200" y="1124651"/>
             <a:ext cx="1371600" cy="346760"/>
           </a:xfrm>
           <a:prstGeom prst="rect">
@@ -15761,7 +16323,7 @@
         </p:nvCxnSpPr>
         <p:spPr>
           <a:xfrm>
-            <a:off x="8616802" y="944305"/>
+            <a:off x="8616802" y="1477705"/>
             <a:ext cx="0" cy="1723059"/>
           </a:xfrm>
           <a:prstGeom prst="line">
@@ -15800,7 +16362,7 @@
         </p:nvSpPr>
         <p:spPr>
           <a:xfrm>
-            <a:off x="8544794" y="1961202"/>
+            <a:off x="8544794" y="2494602"/>
             <a:ext cx="142006" cy="176787"/>
           </a:xfrm>
           <a:prstGeom prst="rect">
@@ -15855,7 +16417,7 @@
         </p:nvCxnSpPr>
         <p:spPr>
           <a:xfrm>
-            <a:off x="5943992" y="1961202"/>
+            <a:off x="5943992" y="2494602"/>
             <a:ext cx="2568438" cy="0"/>
           </a:xfrm>
           <a:prstGeom prst="straightConnector1">
@@ -15891,7 +16453,7 @@
         </p:nvCxnSpPr>
         <p:spPr>
           <a:xfrm>
-            <a:off x="5943992" y="2137989"/>
+            <a:off x="5943992" y="2671389"/>
             <a:ext cx="2549946" cy="0"/>
           </a:xfrm>
           <a:prstGeom prst="straightConnector1">
@@ -16508,7 +17070,7 @@
         </p:nvCxnSpPr>
         <p:spPr>
           <a:xfrm flipH="1">
-            <a:off x="314394" y="1099672"/>
+            <a:off x="314394" y="1633072"/>
             <a:ext cx="24" cy="1598671"/>
           </a:xfrm>
           <a:prstGeom prst="line">
@@ -17212,6 +17774,50 @@
           </a:p>
         </p:txBody>
       </p:sp>
+      <p:sp>
+        <p:nvSpPr>
+          <p:cNvPr id="15" name="TextBox 14"/>
+          <p:cNvSpPr txBox="1"/>
+          <p:nvPr/>
+        </p:nvSpPr>
+        <p:spPr>
+          <a:xfrm>
+            <a:off x="280822" y="571008"/>
+            <a:ext cx="1101858" cy="369332"/>
+          </a:xfrm>
+          <a:prstGeom prst="rect">
+            <a:avLst/>
+          </a:prstGeom>
+          <a:noFill/>
+        </p:spPr>
+        <p:txBody>
+          <a:bodyPr wrap="square" rtlCol="0">
+            <a:spAutoFit/>
+          </a:bodyPr>
+          <a:lstStyle/>
+          <a:p>
+            <a:r>
+              <a:rPr lang="en-US" dirty="0" smtClean="0">
+                <a:solidFill>
+                  <a:schemeClr val="tx1">
+                    <a:lumMod val="50000"/>
+                    <a:lumOff val="50000"/>
+                  </a:schemeClr>
+                </a:solidFill>
+              </a:rPr>
+              <a:t>Delete</a:t>
+            </a:r>
+            <a:endParaRPr lang="en-US" dirty="0">
+              <a:solidFill>
+                <a:schemeClr val="tx1">
+                  <a:lumMod val="50000"/>
+                  <a:lumOff val="50000"/>
+                </a:schemeClr>
+              </a:solidFill>
+            </a:endParaRPr>
+          </a:p>
+        </p:txBody>
+      </p:sp>
     </p:spTree>
     <p:extLst>
       <p:ext uri="{BB962C8B-B14F-4D97-AF65-F5344CB8AC3E}">
@@ -17222,6 +17828,13 @@
   <p:clrMapOvr>
     <a:masterClrMapping/>
   </p:clrMapOvr>
+  <p:timing>
+    <p:tnLst>
+      <p:par>
+        <p:cTn id="1" dur="indefinite" restart="never" nodeType="tmRoot"/>
+      </p:par>
+    </p:tnLst>
+  </p:timing>
 </p:sld>
 </file>
 
@@ -19457,6 +20070,13 @@
   <p:clrMapOvr>
     <a:masterClrMapping/>
   </p:clrMapOvr>
+  <p:timing>
+    <p:tnLst>
+      <p:par>
+        <p:cTn id="1" dur="indefinite" restart="never" nodeType="tmRoot"/>
+      </p:par>
+    </p:tnLst>
+  </p:timing>
 </p:sld>
 </file>
 
@@ -24725,6 +25345,14 @@
               </a:rPr>
               <a:t>TaskScheduler</a:t>
             </a:r>
+            <a:r>
+              <a:rPr lang="en-US" sz="1050" dirty="0">
+                <a:solidFill>
+                  <a:schemeClr val="bg1"/>
+                </a:solidFill>
+              </a:rPr>
+              <a:t/>
+            </a:r>
             <a:br>
               <a:rPr lang="en-US" sz="1050" dirty="0">
                 <a:solidFill>
@@ -25313,6 +25941,16 @@
               </a:rPr>
               <a:t>XmlTaskScheduler</a:t>
             </a:r>
+            <a:r>
+              <a:rPr lang="en-US" sz="1050" b="1" dirty="0">
+                <a:solidFill>
+                  <a:schemeClr val="accent6">
+                    <a:lumMod val="75000"/>
+                  </a:schemeClr>
+                </a:solidFill>
+              </a:rPr>
+              <a:t/>
+            </a:r>
             <a:br>
               <a:rPr lang="en-US" sz="1050" b="1" dirty="0">
                 <a:solidFill>
@@ -25670,6 +26308,14 @@
               </a:rPr>
               <a:t>JsonUserPrefs</a:t>
             </a:r>
+            <a:r>
+              <a:rPr lang="en-US" sz="1050" dirty="0">
+                <a:solidFill>
+                  <a:schemeClr val="bg1"/>
+                </a:solidFill>
+              </a:rPr>
+              <a:t/>
+            </a:r>
             <a:br>
               <a:rPr lang="en-US" sz="1050" dirty="0">
                 <a:solidFill>
@@ -25738,6 +26384,16 @@
                 </a:solidFill>
               </a:rPr>
               <a:t>XmlSerializable</a:t>
+            </a:r>
+            <a:r>
+              <a:rPr lang="en-US" sz="1050" b="1" dirty="0">
+                <a:solidFill>
+                  <a:schemeClr val="accent6">
+                    <a:lumMod val="75000"/>
+                  </a:schemeClr>
+                </a:solidFill>
+              </a:rPr>
+              <a:t/>
             </a:r>
             <a:br>
               <a:rPr lang="en-US" sz="1050" b="1" dirty="0">
@@ -25992,6 +26648,102 @@
           <a:chExt cx="0" cy="0"/>
         </a:xfrm>
       </p:grpSpPr>
+      <p:sp>
+        <p:nvSpPr>
+          <p:cNvPr id="64" name="Rounded Rectangle 63"/>
+          <p:cNvSpPr/>
+          <p:nvPr/>
+        </p:nvSpPr>
+        <p:spPr>
+          <a:xfrm>
+            <a:off x="0" y="0"/>
+            <a:ext cx="9144000" cy="2895600"/>
+          </a:xfrm>
+          <a:prstGeom prst="roundRect">
+            <a:avLst/>
+          </a:prstGeom>
+          <a:solidFill>
+            <a:schemeClr val="bg1">
+              <a:lumMod val="95000"/>
+            </a:schemeClr>
+          </a:solidFill>
+          <a:ln>
+            <a:solidFill>
+              <a:schemeClr val="bg1">
+                <a:lumMod val="65000"/>
+              </a:schemeClr>
+            </a:solidFill>
+          </a:ln>
+        </p:spPr>
+        <p:style>
+          <a:lnRef idx="2">
+            <a:schemeClr val="accent1">
+              <a:shade val="50000"/>
+            </a:schemeClr>
+          </a:lnRef>
+          <a:fillRef idx="1">
+            <a:schemeClr val="accent1"/>
+          </a:fillRef>
+          <a:effectRef idx="0">
+            <a:schemeClr val="accent1"/>
+          </a:effectRef>
+          <a:fontRef idx="minor">
+            <a:schemeClr val="lt1"/>
+          </a:fontRef>
+        </p:style>
+        <p:txBody>
+          <a:bodyPr rtlCol="0" anchor="ctr"/>
+          <a:lstStyle/>
+          <a:p>
+            <a:pPr algn="ctr"/>
+            <a:endParaRPr lang="en-US"/>
+          </a:p>
+        </p:txBody>
+      </p:sp>
+      <p:sp>
+        <p:nvSpPr>
+          <p:cNvPr id="65" name="TextBox 64"/>
+          <p:cNvSpPr txBox="1"/>
+          <p:nvPr/>
+        </p:nvSpPr>
+        <p:spPr>
+          <a:xfrm>
+            <a:off x="280822" y="113808"/>
+            <a:ext cx="1101858" cy="369332"/>
+          </a:xfrm>
+          <a:prstGeom prst="rect">
+            <a:avLst/>
+          </a:prstGeom>
+          <a:noFill/>
+        </p:spPr>
+        <p:txBody>
+          <a:bodyPr wrap="square" rtlCol="0">
+            <a:spAutoFit/>
+          </a:bodyPr>
+          <a:lstStyle/>
+          <a:p>
+            <a:r>
+              <a:rPr lang="en-US" dirty="0" smtClean="0">
+                <a:solidFill>
+                  <a:schemeClr val="tx1">
+                    <a:lumMod val="50000"/>
+                    <a:lumOff val="50000"/>
+                  </a:schemeClr>
+                </a:solidFill>
+              </a:rPr>
+              <a:t>Recur</a:t>
+            </a:r>
+            <a:endParaRPr lang="en-US" dirty="0">
+              <a:solidFill>
+                <a:schemeClr val="tx1">
+                  <a:lumMod val="50000"/>
+                  <a:lumOff val="50000"/>
+                </a:schemeClr>
+              </a:solidFill>
+            </a:endParaRPr>
+          </a:p>
+        </p:txBody>
+      </p:sp>
       <p:sp>
         <p:nvSpPr>
           <p:cNvPr id="2" name="Rectangle 62"/>
@@ -28643,12 +29395,12 @@
           <a:lstStyle/>
           <a:p>
             <a:r>
-              <a:rPr lang="en-US" sz="1400" dirty="0" err="1">
+              <a:rPr lang="en-US" sz="1400" dirty="0" err="1" smtClean="0">
                 <a:solidFill>
                   <a:srgbClr val="0070C0"/>
                 </a:solidFill>
               </a:rPr>
-              <a:t>addMutateCmd</a:t>
+              <a:t>addExecutedCmd</a:t>
             </a:r>
             <a:r>
               <a:rPr lang="en-US" sz="1400" dirty="0">
@@ -28666,29 +29418,26 @@
               </a:rPr>
             </a:br>
             <a:r>
-              <a:rPr lang="en-US" sz="1400" dirty="0">
+              <a:rPr lang="en-US" sz="1400" dirty="0" smtClean="0">
                 <a:solidFill>
                   <a:srgbClr val="0070C0"/>
                 </a:solidFill>
               </a:rPr>
-              <a:t>“recur”, </a:t>
-            </a:r>
-            <a:r>
-              <a:rPr lang="en-US" sz="1400" dirty="0" err="1">
-                <a:solidFill>
-                  <a:srgbClr val="0070C0"/>
-                </a:solidFill>
-              </a:rPr>
-              <a:t>taskArray</a:t>
-            </a:r>
-            <a:r>
-              <a:rPr lang="en-US" sz="1400" dirty="0">
+              <a:t>this command</a:t>
+            </a:r>
+            <a:r>
+              <a:rPr lang="en-US" sz="1400" dirty="0" smtClean="0">
                 <a:solidFill>
                   <a:srgbClr val="0070C0"/>
                 </a:solidFill>
               </a:rPr>
               <a:t>)</a:t>
             </a:r>
+            <a:endParaRPr lang="en-US" sz="1400" dirty="0">
+              <a:solidFill>
+                <a:srgbClr val="0070C0"/>
+              </a:solidFill>
+            </a:endParaRPr>
           </a:p>
         </p:txBody>
       </p:sp>
@@ -28740,6 +29489,13 @@
   <p:clrMapOvr>
     <a:masterClrMapping/>
   </p:clrMapOvr>
+  <p:timing>
+    <p:tnLst>
+      <p:par>
+        <p:cTn id="1" dur="indefinite" restart="never" nodeType="tmRoot"/>
+      </p:par>
+    </p:tnLst>
+  </p:timing>
 </p:sld>
 </file>
 
@@ -28760,6 +29516,102 @@
           <a:chExt cx="0" cy="0"/>
         </a:xfrm>
       </p:grpSpPr>
+      <p:sp>
+        <p:nvSpPr>
+          <p:cNvPr id="64" name="Rounded Rectangle 63"/>
+          <p:cNvSpPr/>
+          <p:nvPr/>
+        </p:nvSpPr>
+        <p:spPr>
+          <a:xfrm>
+            <a:off x="0" y="76200"/>
+            <a:ext cx="9144000" cy="2895600"/>
+          </a:xfrm>
+          <a:prstGeom prst="roundRect">
+            <a:avLst/>
+          </a:prstGeom>
+          <a:solidFill>
+            <a:schemeClr val="bg1">
+              <a:lumMod val="95000"/>
+            </a:schemeClr>
+          </a:solidFill>
+          <a:ln>
+            <a:solidFill>
+              <a:schemeClr val="bg1">
+                <a:lumMod val="65000"/>
+              </a:schemeClr>
+            </a:solidFill>
+          </a:ln>
+        </p:spPr>
+        <p:style>
+          <a:lnRef idx="2">
+            <a:schemeClr val="accent1">
+              <a:shade val="50000"/>
+            </a:schemeClr>
+          </a:lnRef>
+          <a:fillRef idx="1">
+            <a:schemeClr val="accent1"/>
+          </a:fillRef>
+          <a:effectRef idx="0">
+            <a:schemeClr val="accent1"/>
+          </a:effectRef>
+          <a:fontRef idx="minor">
+            <a:schemeClr val="lt1"/>
+          </a:fontRef>
+        </p:style>
+        <p:txBody>
+          <a:bodyPr rtlCol="0" anchor="ctr"/>
+          <a:lstStyle/>
+          <a:p>
+            <a:pPr algn="ctr"/>
+            <a:endParaRPr lang="en-US"/>
+          </a:p>
+        </p:txBody>
+      </p:sp>
+      <p:sp>
+        <p:nvSpPr>
+          <p:cNvPr id="65" name="TextBox 64"/>
+          <p:cNvSpPr txBox="1"/>
+          <p:nvPr/>
+        </p:nvSpPr>
+        <p:spPr>
+          <a:xfrm>
+            <a:off x="280822" y="190008"/>
+            <a:ext cx="1101858" cy="369332"/>
+          </a:xfrm>
+          <a:prstGeom prst="rect">
+            <a:avLst/>
+          </a:prstGeom>
+          <a:noFill/>
+        </p:spPr>
+        <p:txBody>
+          <a:bodyPr wrap="square" rtlCol="0">
+            <a:spAutoFit/>
+          </a:bodyPr>
+          <a:lstStyle/>
+          <a:p>
+            <a:r>
+              <a:rPr lang="en-US" dirty="0" smtClean="0">
+                <a:solidFill>
+                  <a:schemeClr val="tx1">
+                    <a:lumMod val="50000"/>
+                    <a:lumOff val="50000"/>
+                  </a:schemeClr>
+                </a:solidFill>
+              </a:rPr>
+              <a:t>Replace</a:t>
+            </a:r>
+            <a:endParaRPr lang="en-US" dirty="0">
+              <a:solidFill>
+                <a:schemeClr val="tx1">
+                  <a:lumMod val="50000"/>
+                  <a:lumOff val="50000"/>
+                </a:schemeClr>
+              </a:solidFill>
+            </a:endParaRPr>
+          </a:p>
+        </p:txBody>
+      </p:sp>
       <p:sp>
         <p:nvSpPr>
           <p:cNvPr id="2" name="Rectangle 62"/>
@@ -29481,8 +30333,16 @@
           <a:lstStyle/>
           <a:p>
             <a:r>
+              <a:rPr lang="en-US" sz="1400" dirty="0" smtClean="0"/>
+              <a:t>replace</a:t>
+            </a:r>
+            <a:r>
+              <a:rPr lang="en-US" sz="1400" dirty="0" smtClean="0"/>
+              <a:t> </a:t>
+            </a:r>
+            <a:r>
               <a:rPr lang="en-US" sz="1400" dirty="0"/>
-              <a:t>edit 1 do homework by today</a:t>
+              <a:t>1 do homework by today</a:t>
             </a:r>
           </a:p>
         </p:txBody>
@@ -29532,7 +30392,7 @@
         <p:spPr>
           <a:xfrm>
             <a:off x="2166172" y="1453379"/>
-            <a:ext cx="1503916" cy="646331"/>
+            <a:ext cx="1503916" cy="861774"/>
           </a:xfrm>
           <a:prstGeom prst="rect">
             <a:avLst/>
@@ -29551,7 +30411,31 @@
                   <a:srgbClr val="0070C0"/>
                 </a:solidFill>
               </a:rPr>
-              <a:t>execute(“</a:t>
+              <a:t>execute</a:t>
+            </a:r>
+            <a:r>
+              <a:rPr lang="en-US" sz="1400" dirty="0" smtClean="0">
+                <a:solidFill>
+                  <a:srgbClr val="0070C0"/>
+                </a:solidFill>
+              </a:rPr>
+              <a:t>(“</a:t>
+            </a:r>
+            <a:r>
+              <a:rPr lang="en-SG" sz="1400" dirty="0" smtClean="0">
+                <a:solidFill>
+                  <a:srgbClr val="0070C0"/>
+                </a:solidFill>
+              </a:rPr>
+              <a:t>replace</a:t>
+            </a:r>
+            <a:r>
+              <a:rPr lang="en-SG" sz="1400" dirty="0" smtClean="0">
+                <a:solidFill>
+                  <a:srgbClr val="0070C0"/>
+                </a:solidFill>
+              </a:rPr>
+              <a:t> </a:t>
             </a:r>
             <a:r>
               <a:rPr lang="en-SG" sz="1400" dirty="0">
@@ -29559,7 +30443,7 @@
                   <a:srgbClr val="0070C0"/>
                 </a:solidFill>
               </a:rPr>
-              <a:t>edit 1 do homework by today</a:t>
+              <a:t>1 do homework by today</a:t>
             </a:r>
           </a:p>
           <a:p>
@@ -29618,8 +30502,8 @@
         </p:nvSpPr>
         <p:spPr>
           <a:xfrm>
-            <a:off x="4198667" y="1542898"/>
-            <a:ext cx="1503916" cy="215444"/>
+            <a:off x="4198666" y="1542898"/>
+            <a:ext cx="1694877" cy="215444"/>
           </a:xfrm>
           <a:prstGeom prst="rect">
             <a:avLst/>
@@ -29633,12 +30517,28 @@
           <a:lstStyle/>
           <a:p>
             <a:r>
-              <a:rPr lang="en-US" sz="1400" dirty="0" err="1">
+              <a:rPr lang="en-US" sz="1400" dirty="0" err="1" smtClean="0">
                 <a:solidFill>
                   <a:srgbClr val="7030A0"/>
                 </a:solidFill>
               </a:rPr>
-              <a:t>editTask</a:t>
+              <a:t>replace</a:t>
+            </a:r>
+            <a:r>
+              <a:rPr lang="en-US" sz="1400" dirty="0" err="1" smtClean="0">
+                <a:solidFill>
+                  <a:srgbClr val="7030A0"/>
+                </a:solidFill>
+              </a:rPr>
+              <a:t>Task</a:t>
+            </a:r>
+            <a:r>
+              <a:rPr lang="en-US" sz="1400" dirty="0" smtClean="0">
+                <a:solidFill>
+                  <a:srgbClr val="7030A0"/>
+                </a:solidFill>
+              </a:rPr>
+              <a:t> </a:t>
             </a:r>
             <a:r>
               <a:rPr lang="en-US" sz="1400" dirty="0">
@@ -29646,7 +30546,7 @@
                   <a:srgbClr val="7030A0"/>
                 </a:solidFill>
               </a:rPr>
-              <a:t> (old, new)</a:t>
+              <a:t>(old, new)</a:t>
             </a:r>
           </a:p>
         </p:txBody>
@@ -31413,36 +32313,26 @@
           <a:lstStyle/>
           <a:p>
             <a:r>
-              <a:rPr lang="en-US" sz="1400" dirty="0" err="1">
+              <a:rPr lang="en-US" sz="1400" dirty="0" err="1" smtClean="0">
                 <a:solidFill>
                   <a:srgbClr val="0070C0"/>
                 </a:solidFill>
               </a:rPr>
-              <a:t>addMutateCmd</a:t>
-            </a:r>
-            <a:r>
-              <a:rPr lang="en-US" sz="1400" dirty="0">
+              <a:t>addExecutedCmd</a:t>
+            </a:r>
+            <a:r>
+              <a:rPr lang="en-US" sz="1400" dirty="0" smtClean="0">
                 <a:solidFill>
                   <a:srgbClr val="0070C0"/>
                 </a:solidFill>
               </a:rPr>
-              <a:t>(</a:t>
-            </a:r>
-            <a:br>
-              <a:rPr lang="en-US" sz="1400" dirty="0">
-                <a:solidFill>
-                  <a:srgbClr val="0070C0"/>
-                </a:solidFill>
-              </a:rPr>
-            </a:br>
-            <a:r>
-              <a:rPr lang="en-US" sz="1400" dirty="0">
-                <a:solidFill>
-                  <a:srgbClr val="0070C0"/>
-                </a:solidFill>
-              </a:rPr>
-              <a:t>“edit”, old)</a:t>
-            </a:r>
+              <a:t> (this command)</a:t>
+            </a:r>
+            <a:endParaRPr lang="en-US" sz="1400" dirty="0">
+              <a:solidFill>
+                <a:srgbClr val="0070C0"/>
+              </a:solidFill>
+            </a:endParaRPr>
           </a:p>
         </p:txBody>
       </p:sp>
@@ -31494,6 +32384,13 @@
   <p:clrMapOvr>
     <a:masterClrMapping/>
   </p:clrMapOvr>
+  <p:timing>
+    <p:tnLst>
+      <p:par>
+        <p:cTn id="1" dur="indefinite" restart="never" nodeType="tmRoot"/>
+      </p:par>
+    </p:tnLst>
+  </p:timing>
 </p:sld>
 </file>
 

</xml_diff>

<commit_message>
Update Diagrams to suit scenario in DeveloperGuide
</commit_message>
<xml_diff>
--- a/docs/diagrams/Diagrams.pptx
+++ b/docs/diagrams/Diagrams.pptx
@@ -200,7 +200,7 @@
           <a:p>
             <a:fld id="{F5CC4B3F-88C1-4FFA-B1B6-F41C21DC6924}" type="datetimeFigureOut">
               <a:rPr lang="en-US" smtClean="0"/>
-              <a:t>13-Oct-16</a:t>
+              <a:t>10/27/2016</a:t>
             </a:fld>
             <a:endParaRPr lang="en-US"/>
           </a:p>
@@ -649,7 +649,7 @@
           <a:p>
             <a:fld id="{78C97017-6FC3-485B-9764-EAC9E56C1D49}" type="datetimeFigureOut">
               <a:rPr lang="en-US" smtClean="0"/>
-              <a:t>13-Oct-16</a:t>
+              <a:t>10/27/2016</a:t>
             </a:fld>
             <a:endParaRPr lang="en-US"/>
           </a:p>
@@ -819,7 +819,7 @@
           <a:p>
             <a:fld id="{78C97017-6FC3-485B-9764-EAC9E56C1D49}" type="datetimeFigureOut">
               <a:rPr lang="en-US" smtClean="0"/>
-              <a:t>13-Oct-16</a:t>
+              <a:t>10/27/2016</a:t>
             </a:fld>
             <a:endParaRPr lang="en-US"/>
           </a:p>
@@ -999,7 +999,7 @@
           <a:p>
             <a:fld id="{78C97017-6FC3-485B-9764-EAC9E56C1D49}" type="datetimeFigureOut">
               <a:rPr lang="en-US" smtClean="0"/>
-              <a:t>13-Oct-16</a:t>
+              <a:t>10/27/2016</a:t>
             </a:fld>
             <a:endParaRPr lang="en-US"/>
           </a:p>
@@ -1169,7 +1169,7 @@
           <a:p>
             <a:fld id="{78C97017-6FC3-485B-9764-EAC9E56C1D49}" type="datetimeFigureOut">
               <a:rPr lang="en-US" smtClean="0"/>
-              <a:t>13-Oct-16</a:t>
+              <a:t>10/27/2016</a:t>
             </a:fld>
             <a:endParaRPr lang="en-US"/>
           </a:p>
@@ -1415,7 +1415,7 @@
           <a:p>
             <a:fld id="{78C97017-6FC3-485B-9764-EAC9E56C1D49}" type="datetimeFigureOut">
               <a:rPr lang="en-US" smtClean="0"/>
-              <a:t>13-Oct-16</a:t>
+              <a:t>10/27/2016</a:t>
             </a:fld>
             <a:endParaRPr lang="en-US"/>
           </a:p>
@@ -1703,7 +1703,7 @@
           <a:p>
             <a:fld id="{78C97017-6FC3-485B-9764-EAC9E56C1D49}" type="datetimeFigureOut">
               <a:rPr lang="en-US" smtClean="0"/>
-              <a:t>13-Oct-16</a:t>
+              <a:t>10/27/2016</a:t>
             </a:fld>
             <a:endParaRPr lang="en-US"/>
           </a:p>
@@ -2125,7 +2125,7 @@
           <a:p>
             <a:fld id="{78C97017-6FC3-485B-9764-EAC9E56C1D49}" type="datetimeFigureOut">
               <a:rPr lang="en-US" smtClean="0"/>
-              <a:t>13-Oct-16</a:t>
+              <a:t>10/27/2016</a:t>
             </a:fld>
             <a:endParaRPr lang="en-US"/>
           </a:p>
@@ -2243,7 +2243,7 @@
           <a:p>
             <a:fld id="{78C97017-6FC3-485B-9764-EAC9E56C1D49}" type="datetimeFigureOut">
               <a:rPr lang="en-US" smtClean="0"/>
-              <a:t>13-Oct-16</a:t>
+              <a:t>10/27/2016</a:t>
             </a:fld>
             <a:endParaRPr lang="en-US"/>
           </a:p>
@@ -2338,7 +2338,7 @@
           <a:p>
             <a:fld id="{78C97017-6FC3-485B-9764-EAC9E56C1D49}" type="datetimeFigureOut">
               <a:rPr lang="en-US" smtClean="0"/>
-              <a:t>13-Oct-16</a:t>
+              <a:t>10/27/2016</a:t>
             </a:fld>
             <a:endParaRPr lang="en-US"/>
           </a:p>
@@ -2615,7 +2615,7 @@
           <a:p>
             <a:fld id="{78C97017-6FC3-485B-9764-EAC9E56C1D49}" type="datetimeFigureOut">
               <a:rPr lang="en-US" smtClean="0"/>
-              <a:t>13-Oct-16</a:t>
+              <a:t>10/27/2016</a:t>
             </a:fld>
             <a:endParaRPr lang="en-US"/>
           </a:p>
@@ -2868,7 +2868,7 @@
           <a:p>
             <a:fld id="{78C97017-6FC3-485B-9764-EAC9E56C1D49}" type="datetimeFigureOut">
               <a:rPr lang="en-US" smtClean="0"/>
-              <a:t>13-Oct-16</a:t>
+              <a:t>10/27/2016</a:t>
             </a:fld>
             <a:endParaRPr lang="en-US"/>
           </a:p>
@@ -3081,7 +3081,7 @@
           <a:p>
             <a:fld id="{78C97017-6FC3-485B-9764-EAC9E56C1D49}" type="datetimeFigureOut">
               <a:rPr lang="en-US" smtClean="0"/>
-              <a:t>13-Oct-16</a:t>
+              <a:t>10/27/2016</a:t>
             </a:fld>
             <a:endParaRPr lang="en-US"/>
           </a:p>
@@ -5564,8 +5564,8 @@
         </p:nvSpPr>
         <p:spPr>
           <a:xfrm>
-            <a:off x="2166172" y="1453379"/>
-            <a:ext cx="1424846" cy="215444"/>
+            <a:off x="1981200" y="1453379"/>
+            <a:ext cx="1609818" cy="215444"/>
           </a:xfrm>
           <a:prstGeom prst="rect">
             <a:avLst/>
@@ -5584,7 +5584,23 @@
                   <a:srgbClr val="0070C0"/>
                 </a:solidFill>
               </a:rPr>
-              <a:t>execute(“delete 1”)</a:t>
+              <a:t>execute(“delete </a:t>
+            </a:r>
+            <a:r>
+              <a:rPr lang="en-US" sz="1400" dirty="0" smtClean="0">
+                <a:solidFill>
+                  <a:srgbClr val="0070C0"/>
+                </a:solidFill>
+              </a:rPr>
+              <a:t>t1</a:t>
+            </a:r>
+            <a:r>
+              <a:rPr lang="en-US" sz="1400" dirty="0" smtClean="0">
+                <a:solidFill>
+                  <a:srgbClr val="0070C0"/>
+                </a:solidFill>
+              </a:rPr>
+              <a:t>”)</a:t>
             </a:r>
             <a:endParaRPr lang="en-US" sz="1400" dirty="0">
               <a:solidFill>

</xml_diff>

<commit_message>
edit model class diagram
</commit_message>
<xml_diff>
--- a/docs/diagrams/Diagrams.pptx
+++ b/docs/diagrams/Diagrams.pptx
@@ -116,7 +116,7 @@
   </p:defaultTextStyle>
   <p:extLst>
     <p:ext uri="{EFAFB233-063F-42B5-8137-9DF3F51BA10A}">
-      <p15:sldGuideLst xmlns:p15="http://schemas.microsoft.com/office/powerpoint/2012/main">
+      <p15:sldGuideLst xmlns:p15="http://schemas.microsoft.com/office/powerpoint/2012/main" xmlns="">
         <p15:guide id="1" orient="horz" pos="1488">
           <p15:clr>
             <a:srgbClr val="A4A3A4"/>
@@ -215,7 +215,7 @@
           <a:p>
             <a:fld id="{F5CC4B3F-88C1-4FFA-B1B6-F41C21DC6924}" type="datetimeFigureOut">
               <a:rPr lang="en-US" smtClean="0"/>
-              <a:t>10/21/2016</a:t>
+              <a:t>27/10/16</a:t>
             </a:fld>
             <a:endParaRPr lang="en-US"/>
           </a:p>
@@ -661,7 +661,7 @@
           <a:p>
             <a:fld id="{78C97017-6FC3-485B-9764-EAC9E56C1D49}" type="datetimeFigureOut">
               <a:rPr lang="en-US" smtClean="0"/>
-              <a:t>10/21/2016</a:t>
+              <a:t>27/10/16</a:t>
             </a:fld>
             <a:endParaRPr lang="en-US"/>
           </a:p>
@@ -829,7 +829,7 @@
           <a:p>
             <a:fld id="{78C97017-6FC3-485B-9764-EAC9E56C1D49}" type="datetimeFigureOut">
               <a:rPr lang="en-US" smtClean="0"/>
-              <a:t>10/21/2016</a:t>
+              <a:t>27/10/16</a:t>
             </a:fld>
             <a:endParaRPr lang="en-US"/>
           </a:p>
@@ -1007,7 +1007,7 @@
           <a:p>
             <a:fld id="{78C97017-6FC3-485B-9764-EAC9E56C1D49}" type="datetimeFigureOut">
               <a:rPr lang="en-US" smtClean="0"/>
-              <a:t>10/21/2016</a:t>
+              <a:t>27/10/16</a:t>
             </a:fld>
             <a:endParaRPr lang="en-US"/>
           </a:p>
@@ -1175,7 +1175,7 @@
           <a:p>
             <a:fld id="{78C97017-6FC3-485B-9764-EAC9E56C1D49}" type="datetimeFigureOut">
               <a:rPr lang="en-US" smtClean="0"/>
-              <a:t>10/21/2016</a:t>
+              <a:t>27/10/16</a:t>
             </a:fld>
             <a:endParaRPr lang="en-US"/>
           </a:p>
@@ -1420,7 +1420,7 @@
           <a:p>
             <a:fld id="{78C97017-6FC3-485B-9764-EAC9E56C1D49}" type="datetimeFigureOut">
               <a:rPr lang="en-US" smtClean="0"/>
-              <a:t>10/21/2016</a:t>
+              <a:t>27/10/16</a:t>
             </a:fld>
             <a:endParaRPr lang="en-US"/>
           </a:p>
@@ -1705,7 +1705,7 @@
           <a:p>
             <a:fld id="{78C97017-6FC3-485B-9764-EAC9E56C1D49}" type="datetimeFigureOut">
               <a:rPr lang="en-US" smtClean="0"/>
-              <a:t>10/21/2016</a:t>
+              <a:t>27/10/16</a:t>
             </a:fld>
             <a:endParaRPr lang="en-US"/>
           </a:p>
@@ -2124,7 +2124,7 @@
           <a:p>
             <a:fld id="{78C97017-6FC3-485B-9764-EAC9E56C1D49}" type="datetimeFigureOut">
               <a:rPr lang="en-US" smtClean="0"/>
-              <a:t>10/21/2016</a:t>
+              <a:t>27/10/16</a:t>
             </a:fld>
             <a:endParaRPr lang="en-US"/>
           </a:p>
@@ -2241,7 +2241,7 @@
           <a:p>
             <a:fld id="{78C97017-6FC3-485B-9764-EAC9E56C1D49}" type="datetimeFigureOut">
               <a:rPr lang="en-US" smtClean="0"/>
-              <a:t>10/21/2016</a:t>
+              <a:t>27/10/16</a:t>
             </a:fld>
             <a:endParaRPr lang="en-US"/>
           </a:p>
@@ -2336,7 +2336,7 @@
           <a:p>
             <a:fld id="{78C97017-6FC3-485B-9764-EAC9E56C1D49}" type="datetimeFigureOut">
               <a:rPr lang="en-US" smtClean="0"/>
-              <a:t>10/21/2016</a:t>
+              <a:t>27/10/16</a:t>
             </a:fld>
             <a:endParaRPr lang="en-US"/>
           </a:p>
@@ -2611,7 +2611,7 @@
           <a:p>
             <a:fld id="{78C97017-6FC3-485B-9764-EAC9E56C1D49}" type="datetimeFigureOut">
               <a:rPr lang="en-US" smtClean="0"/>
-              <a:t>10/21/2016</a:t>
+              <a:t>27/10/16</a:t>
             </a:fld>
             <a:endParaRPr lang="en-US"/>
           </a:p>
@@ -2863,7 +2863,7 @@
           <a:p>
             <a:fld id="{78C97017-6FC3-485B-9764-EAC9E56C1D49}" type="datetimeFigureOut">
               <a:rPr lang="en-US" smtClean="0"/>
-              <a:t>10/21/2016</a:t>
+              <a:t>27/10/16</a:t>
             </a:fld>
             <a:endParaRPr lang="en-US"/>
           </a:p>
@@ -3074,7 +3074,7 @@
           <a:p>
             <a:fld id="{78C97017-6FC3-485B-9764-EAC9E56C1D49}" type="datetimeFigureOut">
               <a:rPr lang="en-US" smtClean="0"/>
-              <a:t>10/21/2016</a:t>
+              <a:t>27/10/16</a:t>
             </a:fld>
             <a:endParaRPr lang="en-US"/>
           </a:p>
@@ -3465,13 +3465,10 @@
           <a:lstStyle/>
           <a:p>
             <a:r>
-              <a:rPr lang="en-US" dirty="0" err="1"/>
-              <a:t>AddressBook</a:t>
-            </a:r>
-            <a:r>
-              <a:rPr lang="en-US" dirty="0"/>
-              <a:t> – Level 4</a:t>
-            </a:r>
+              <a:rPr lang="en-US" dirty="0" err="1" smtClean="0"/>
+              <a:t>Task!t</a:t>
+            </a:r>
+            <a:endParaRPr lang="en-US" dirty="0"/>
           </a:p>
         </p:txBody>
       </p:sp>
@@ -12877,12 +12874,12 @@
           <a:p>
             <a:pPr algn="ctr"/>
             <a:r>
-              <a:rPr lang="en-US" sz="1050" dirty="0" err="1">
+              <a:rPr lang="en-US" sz="1050" dirty="0" err="1" smtClean="0">
                 <a:solidFill>
                   <a:srgbClr val="7030A0"/>
                 </a:solidFill>
               </a:rPr>
-              <a:t>AddressBook</a:t>
+              <a:t>ToDoList</a:t>
             </a:r>
             <a:endParaRPr lang="en-SG" sz="1050" dirty="0">
               <a:solidFill>
@@ -13019,12 +13016,12 @@
           <a:p>
             <a:pPr algn="ctr"/>
             <a:r>
-              <a:rPr lang="en-US" sz="1050" dirty="0" err="1">
+              <a:rPr lang="en-US" sz="1050" dirty="0" err="1" smtClean="0">
                 <a:solidFill>
                   <a:srgbClr val="7030A0"/>
                 </a:solidFill>
               </a:rPr>
-              <a:t>UniquePersonList</a:t>
+              <a:t>UniqueTaskList</a:t>
             </a:r>
             <a:endParaRPr lang="en-SG" sz="1050" dirty="0">
               <a:solidFill>
@@ -13162,12 +13159,12 @@
           <a:p>
             <a:pPr algn="ctr"/>
             <a:r>
-              <a:rPr lang="en-US" sz="1050" dirty="0">
+              <a:rPr lang="en-US" sz="1050" dirty="0" smtClean="0">
                 <a:solidFill>
                   <a:srgbClr val="7030A0"/>
                 </a:solidFill>
               </a:rPr>
-              <a:t>Person</a:t>
+              <a:t>Task</a:t>
             </a:r>
             <a:endParaRPr lang="en-SG" sz="1050" dirty="0">
               <a:solidFill>
@@ -13319,12 +13316,12 @@
               </a:rPr>
             </a:br>
             <a:r>
-              <a:rPr lang="en-US" sz="1050" dirty="0" err="1">
+              <a:rPr lang="en-US" sz="1050" dirty="0" err="1" smtClean="0">
                 <a:solidFill>
                   <a:srgbClr val="7030A0"/>
                 </a:solidFill>
               </a:rPr>
-              <a:t>ReadOnlyPerson</a:t>
+              <a:t>ReadOnlyTask</a:t>
             </a:r>
             <a:endParaRPr lang="en-SG" sz="1050" dirty="0">
               <a:solidFill>
@@ -13916,12 +13913,12 @@
               </a:rPr>
             </a:br>
             <a:r>
-              <a:rPr lang="en-US" sz="1050" dirty="0" err="1">
+              <a:rPr lang="en-US" sz="1050" dirty="0" err="1" smtClean="0">
                 <a:solidFill>
                   <a:srgbClr val="7030A0"/>
                 </a:solidFill>
               </a:rPr>
-              <a:t>ReadOnlyAddressBook</a:t>
+              <a:t>ReadOnlyTask</a:t>
             </a:r>
             <a:endParaRPr lang="en-SG" sz="1050" dirty="0">
               <a:solidFill>
@@ -14918,6 +14915,16 @@
               </a:rPr>
               <a:t>XmlAddressBook</a:t>
             </a:r>
+            <a:r>
+              <a:rPr lang="en-US" sz="1050" b="1" dirty="0">
+                <a:solidFill>
+                  <a:schemeClr val="accent6">
+                    <a:lumMod val="75000"/>
+                  </a:schemeClr>
+                </a:solidFill>
+              </a:rPr>
+              <a:t/>
+            </a:r>
             <a:br>
               <a:rPr lang="en-US" sz="1050" b="1" dirty="0">
                 <a:solidFill>
@@ -15275,6 +15282,14 @@
               </a:rPr>
               <a:t>JsonUserPrefs</a:t>
             </a:r>
+            <a:r>
+              <a:rPr lang="en-US" sz="1050" dirty="0">
+                <a:solidFill>
+                  <a:schemeClr val="bg1"/>
+                </a:solidFill>
+              </a:rPr>
+              <a:t/>
+            </a:r>
             <a:br>
               <a:rPr lang="en-US" sz="1050" dirty="0">
                 <a:solidFill>
@@ -15343,6 +15358,16 @@
                 </a:solidFill>
               </a:rPr>
               <a:t>XmlSerializable</a:t>
+            </a:r>
+            <a:r>
+              <a:rPr lang="en-US" sz="1050" b="1" dirty="0">
+                <a:solidFill>
+                  <a:schemeClr val="accent6">
+                    <a:lumMod val="75000"/>
+                  </a:schemeClr>
+                </a:solidFill>
+              </a:rPr>
+              <a:t/>
             </a:r>
             <a:br>
               <a:rPr lang="en-US" sz="1050" b="1" dirty="0">

</xml_diff>

<commit_message>
Update UI class diagram and remove old ui class diagram
</commit_message>
<xml_diff>
--- a/docs/diagrams/Diagrams.pptx
+++ b/docs/diagrams/Diagrams.pptx
@@ -216,7 +216,7 @@
           <a:p>
             <a:fld id="{F5CC4B3F-88C1-4FFA-B1B6-F41C21DC6924}" type="datetimeFigureOut">
               <a:rPr lang="en-US" smtClean="0"/>
-              <a:t>10/26/2016</a:t>
+              <a:t>10/30/16</a:t>
             </a:fld>
             <a:endParaRPr lang="en-US"/>
           </a:p>
@@ -665,7 +665,7 @@
           <a:p>
             <a:fld id="{78C97017-6FC3-485B-9764-EAC9E56C1D49}" type="datetimeFigureOut">
               <a:rPr lang="en-US" smtClean="0"/>
-              <a:t>10/26/2016</a:t>
+              <a:t>10/30/16</a:t>
             </a:fld>
             <a:endParaRPr lang="en-US"/>
           </a:p>
@@ -835,7 +835,7 @@
           <a:p>
             <a:fld id="{78C97017-6FC3-485B-9764-EAC9E56C1D49}" type="datetimeFigureOut">
               <a:rPr lang="en-US" smtClean="0"/>
-              <a:t>10/26/2016</a:t>
+              <a:t>10/30/16</a:t>
             </a:fld>
             <a:endParaRPr lang="en-US"/>
           </a:p>
@@ -1015,7 +1015,7 @@
           <a:p>
             <a:fld id="{78C97017-6FC3-485B-9764-EAC9E56C1D49}" type="datetimeFigureOut">
               <a:rPr lang="en-US" smtClean="0"/>
-              <a:t>10/26/2016</a:t>
+              <a:t>10/30/16</a:t>
             </a:fld>
             <a:endParaRPr lang="en-US"/>
           </a:p>
@@ -1185,7 +1185,7 @@
           <a:p>
             <a:fld id="{78C97017-6FC3-485B-9764-EAC9E56C1D49}" type="datetimeFigureOut">
               <a:rPr lang="en-US" smtClean="0"/>
-              <a:t>10/26/2016</a:t>
+              <a:t>10/30/16</a:t>
             </a:fld>
             <a:endParaRPr lang="en-US"/>
           </a:p>
@@ -1431,7 +1431,7 @@
           <a:p>
             <a:fld id="{78C97017-6FC3-485B-9764-EAC9E56C1D49}" type="datetimeFigureOut">
               <a:rPr lang="en-US" smtClean="0"/>
-              <a:t>10/26/2016</a:t>
+              <a:t>10/30/16</a:t>
             </a:fld>
             <a:endParaRPr lang="en-US"/>
           </a:p>
@@ -1719,7 +1719,7 @@
           <a:p>
             <a:fld id="{78C97017-6FC3-485B-9764-EAC9E56C1D49}" type="datetimeFigureOut">
               <a:rPr lang="en-US" smtClean="0"/>
-              <a:t>10/26/2016</a:t>
+              <a:t>10/30/16</a:t>
             </a:fld>
             <a:endParaRPr lang="en-US"/>
           </a:p>
@@ -2141,7 +2141,7 @@
           <a:p>
             <a:fld id="{78C97017-6FC3-485B-9764-EAC9E56C1D49}" type="datetimeFigureOut">
               <a:rPr lang="en-US" smtClean="0"/>
-              <a:t>10/26/2016</a:t>
+              <a:t>10/30/16</a:t>
             </a:fld>
             <a:endParaRPr lang="en-US"/>
           </a:p>
@@ -2259,7 +2259,7 @@
           <a:p>
             <a:fld id="{78C97017-6FC3-485B-9764-EAC9E56C1D49}" type="datetimeFigureOut">
               <a:rPr lang="en-US" smtClean="0"/>
-              <a:t>10/26/2016</a:t>
+              <a:t>10/30/16</a:t>
             </a:fld>
             <a:endParaRPr lang="en-US"/>
           </a:p>
@@ -2354,7 +2354,7 @@
           <a:p>
             <a:fld id="{78C97017-6FC3-485B-9764-EAC9E56C1D49}" type="datetimeFigureOut">
               <a:rPr lang="en-US" smtClean="0"/>
-              <a:t>10/26/2016</a:t>
+              <a:t>10/30/16</a:t>
             </a:fld>
             <a:endParaRPr lang="en-US"/>
           </a:p>
@@ -2631,7 +2631,7 @@
           <a:p>
             <a:fld id="{78C97017-6FC3-485B-9764-EAC9E56C1D49}" type="datetimeFigureOut">
               <a:rPr lang="en-US" smtClean="0"/>
-              <a:t>10/26/2016</a:t>
+              <a:t>10/30/16</a:t>
             </a:fld>
             <a:endParaRPr lang="en-US"/>
           </a:p>
@@ -2884,7 +2884,7 @@
           <a:p>
             <a:fld id="{78C97017-6FC3-485B-9764-EAC9E56C1D49}" type="datetimeFigureOut">
               <a:rPr lang="en-US" smtClean="0"/>
-              <a:t>10/26/2016</a:t>
+              <a:t>10/30/16</a:t>
             </a:fld>
             <a:endParaRPr lang="en-US"/>
           </a:p>
@@ -3097,7 +3097,7 @@
           <a:p>
             <a:fld id="{78C97017-6FC3-485B-9764-EAC9E56C1D49}" type="datetimeFigureOut">
               <a:rPr lang="en-US" smtClean="0"/>
-              <a:t>10/26/2016</a:t>
+              <a:t>10/30/16</a:t>
             </a:fld>
             <a:endParaRPr lang="en-US"/>
           </a:p>
@@ -5600,23 +5600,7 @@
                   <a:srgbClr val="0070C0"/>
                 </a:solidFill>
               </a:rPr>
-              <a:t>execute(“delete </a:t>
-            </a:r>
-            <a:r>
-              <a:rPr lang="en-US" sz="1400" dirty="0" smtClean="0">
-                <a:solidFill>
-                  <a:srgbClr val="0070C0"/>
-                </a:solidFill>
-              </a:rPr>
-              <a:t>d1</a:t>
-            </a:r>
-            <a:r>
-              <a:rPr lang="en-US" sz="1400" dirty="0" smtClean="0">
-                <a:solidFill>
-                  <a:srgbClr val="0070C0"/>
-                </a:solidFill>
-              </a:rPr>
-              <a:t>”)</a:t>
+              <a:t>execute(“delete d1”)</a:t>
             </a:r>
             <a:endParaRPr lang="en-US" sz="1400" dirty="0">
               <a:solidFill>
@@ -7486,8 +7470,8 @@
         </p:nvSpPr>
         <p:spPr>
           <a:xfrm>
-            <a:off x="1171902" y="914400"/>
-            <a:ext cx="5265750" cy="4912158"/>
+            <a:off x="1256240" y="762000"/>
+            <a:ext cx="5265750" cy="5638799"/>
           </a:xfrm>
           <a:prstGeom prst="roundRect">
             <a:avLst>
@@ -7960,7 +7944,7 @@
                   </a:schemeClr>
                 </a:solidFill>
               </a:rPr>
-              <a:t>DeadlinesListPanel</a:t>
+              <a:t>DeadlineListPanel</a:t>
             </a:r>
             <a:endParaRPr lang="en-SG" sz="1050" b="1" dirty="0">
               <a:solidFill>
@@ -7980,7 +7964,7 @@
         </p:nvSpPr>
         <p:spPr>
           <a:xfrm>
-            <a:off x="2602995" y="5073316"/>
+            <a:off x="2602995" y="5421867"/>
             <a:ext cx="1093635" cy="236841"/>
           </a:xfrm>
           <a:prstGeom prst="rect">
@@ -8080,7 +8064,7 @@
                   </a:schemeClr>
                 </a:solidFill>
               </a:rPr>
-              <a:t>TodoTaskListPanel</a:t>
+              <a:t>TodoListPanel</a:t>
             </a:r>
             <a:endParaRPr lang="en-SG" sz="1050" b="1" dirty="0">
               <a:solidFill>
@@ -8100,7 +8084,7 @@
         </p:nvSpPr>
         <p:spPr>
           <a:xfrm>
-            <a:off x="4189931" y="4264493"/>
+            <a:off x="4338712" y="4276226"/>
             <a:ext cx="1040906" cy="236841"/>
           </a:xfrm>
           <a:prstGeom prst="rect">
@@ -8133,14 +8117,24 @@
           <a:p>
             <a:pPr algn="ctr"/>
             <a:r>
-              <a:rPr lang="en-US" sz="1050" b="1" smtClean="0">
+              <a:rPr lang="en-US" sz="1050" b="1" dirty="0" err="1" smtClean="0">
                 <a:solidFill>
                   <a:schemeClr val="accent3">
                     <a:lumMod val="75000"/>
                   </a:schemeClr>
                 </a:solidFill>
               </a:rPr>
-              <a:t>TaskCard</a:t>
+              <a:t>Todo</a:t>
+            </a:r>
+            <a:r>
+              <a:rPr lang="en-US" sz="1050" b="1" dirty="0" err="1" smtClean="0">
+                <a:solidFill>
+                  <a:schemeClr val="accent3">
+                    <a:lumMod val="75000"/>
+                  </a:schemeClr>
+                </a:solidFill>
+              </a:rPr>
+              <a:t>Card</a:t>
             </a:r>
             <a:endParaRPr lang="en-SG" sz="1050" b="1" dirty="0">
               <a:solidFill>
@@ -8160,7 +8154,7 @@
         </p:nvSpPr>
         <p:spPr>
           <a:xfrm>
-            <a:off x="2604907" y="5436993"/>
+            <a:off x="2602995" y="5825795"/>
             <a:ext cx="1093635" cy="236841"/>
           </a:xfrm>
           <a:prstGeom prst="rect">
@@ -8454,8 +8448,8 @@
         </p:nvCxnSpPr>
         <p:spPr>
           <a:xfrm rot="16200000" flipH="1">
-            <a:off x="1347704" y="3936446"/>
-            <a:ext cx="2323712" cy="186869"/>
+            <a:off x="1173429" y="4110721"/>
+            <a:ext cx="2672263" cy="186869"/>
           </a:xfrm>
           <a:prstGeom prst="bentConnector2">
             <a:avLst/>
@@ -8487,13 +8481,15 @@
       <p:cxnSp>
         <p:nvCxnSpPr>
           <p:cNvPr id="53" name="Elbow Connector 63"/>
-          <p:cNvCxnSpPr/>
+          <p:cNvCxnSpPr>
+            <a:endCxn id="38" idx="1"/>
+          </p:cNvCxnSpPr>
           <p:nvPr/>
         </p:nvCxnSpPr>
         <p:spPr>
           <a:xfrm rot="16200000" flipH="1">
-            <a:off x="973637" y="3924145"/>
-            <a:ext cx="2867432" cy="395107"/>
+            <a:off x="1379764" y="4720985"/>
+            <a:ext cx="2260102" cy="186359"/>
           </a:xfrm>
           <a:prstGeom prst="bentConnector2">
             <a:avLst/>
@@ -8653,51 +8649,11 @@
         </p:nvCxnSpPr>
         <p:spPr>
           <a:xfrm rot="5400000">
-            <a:off x="4292444" y="3149712"/>
-            <a:ext cx="2171596" cy="294809"/>
+            <a:off x="4360968" y="3229968"/>
+            <a:ext cx="2183329" cy="146028"/>
           </a:xfrm>
           <a:prstGeom prst="bentConnector2">
             <a:avLst/>
-          </a:prstGeom>
-          <a:ln w="6350">
-            <a:solidFill>
-              <a:schemeClr val="accent3"/>
-            </a:solidFill>
-            <a:headEnd type="none" w="med" len="med"/>
-            <a:tailEnd type="none" w="med" len="med"/>
-          </a:ln>
-          <a:effectLst/>
-        </p:spPr>
-        <p:style>
-          <a:lnRef idx="1">
-            <a:schemeClr val="accent2"/>
-          </a:lnRef>
-          <a:fillRef idx="2">
-            <a:schemeClr val="accent2"/>
-          </a:fillRef>
-          <a:effectRef idx="1">
-            <a:schemeClr val="accent2"/>
-          </a:effectRef>
-          <a:fontRef idx="minor">
-            <a:schemeClr val="dk1"/>
-          </a:fontRef>
-        </p:style>
-      </p:cxnSp>
-      <p:cxnSp>
-        <p:nvCxnSpPr>
-          <p:cNvPr id="82" name="Elbow Connector 63"/>
-          <p:cNvCxnSpPr/>
-          <p:nvPr/>
-        </p:nvCxnSpPr>
-        <p:spPr>
-          <a:xfrm rot="10800000" flipV="1">
-            <a:off x="4022004" y="2299879"/>
-            <a:ext cx="1480728" cy="1412134"/>
-          </a:xfrm>
-          <a:prstGeom prst="bentConnector3">
-            <a:avLst>
-              <a:gd name="adj1" fmla="val -2003"/>
-            </a:avLst>
           </a:prstGeom>
           <a:ln w="6350">
             <a:solidFill>
@@ -8766,46 +8722,6 @@
       </p:cxnSp>
       <p:cxnSp>
         <p:nvCxnSpPr>
-          <p:cNvPr id="91" name="Elbow Connector 63"/>
-          <p:cNvCxnSpPr>
-            <a:endCxn id="68" idx="3"/>
-          </p:cNvCxnSpPr>
-          <p:nvPr/>
-        </p:nvCxnSpPr>
-        <p:spPr>
-          <a:xfrm rot="5400000">
-            <a:off x="3604319" y="2727431"/>
-            <a:ext cx="2342484" cy="1487386"/>
-          </a:xfrm>
-          <a:prstGeom prst="bentConnector2">
-            <a:avLst/>
-          </a:prstGeom>
-          <a:ln w="6350">
-            <a:solidFill>
-              <a:schemeClr val="accent3"/>
-            </a:solidFill>
-            <a:headEnd type="none" w="med" len="med"/>
-            <a:tailEnd type="none" w="med" len="med"/>
-          </a:ln>
-          <a:effectLst/>
-        </p:spPr>
-        <p:style>
-          <a:lnRef idx="1">
-            <a:schemeClr val="accent2"/>
-          </a:lnRef>
-          <a:fillRef idx="2">
-            <a:schemeClr val="accent2"/>
-          </a:fillRef>
-          <a:effectRef idx="1">
-            <a:schemeClr val="accent2"/>
-          </a:effectRef>
-          <a:fontRef idx="minor">
-            <a:schemeClr val="dk1"/>
-          </a:fontRef>
-        </p:style>
-      </p:cxnSp>
-      <p:cxnSp>
-        <p:nvCxnSpPr>
           <p:cNvPr id="94" name="Elbow Connector 63"/>
           <p:cNvCxnSpPr>
             <a:stCxn id="16" idx="3"/>
@@ -8815,8 +8731,8 @@
         </p:nvCxnSpPr>
         <p:spPr>
           <a:xfrm rot="5400000">
-            <a:off x="2940046" y="2969814"/>
-            <a:ext cx="3344096" cy="1827104"/>
+            <a:off x="2744689" y="3163259"/>
+            <a:ext cx="3732898" cy="1829016"/>
           </a:xfrm>
           <a:prstGeom prst="bentConnector2">
             <a:avLst/>
@@ -8912,7 +8828,7 @@
         </p:nvCxnSpPr>
         <p:spPr>
           <a:xfrm rot="5400000" flipH="1" flipV="1">
-            <a:off x="4617706" y="-500671"/>
+            <a:off x="4617705" y="-481135"/>
             <a:ext cx="170724" cy="4081246"/>
           </a:xfrm>
           <a:prstGeom prst="bentConnector2">
@@ -8951,7 +8867,7 @@
         </p:nvCxnSpPr>
         <p:spPr>
           <a:xfrm flipV="1">
-            <a:off x="3212182" y="1823048"/>
+            <a:off x="3182659" y="1832442"/>
             <a:ext cx="484448" cy="2308"/>
           </a:xfrm>
           <a:prstGeom prst="straightConnector1">
@@ -9028,8 +8944,8 @@
         </p:nvSpPr>
         <p:spPr>
           <a:xfrm rot="16200000">
-            <a:off x="5924985" y="4702965"/>
-            <a:ext cx="1943192" cy="328045"/>
+            <a:off x="5865098" y="4619416"/>
+            <a:ext cx="2084712" cy="328045"/>
           </a:xfrm>
           <a:prstGeom prst="roundRect">
             <a:avLst/>
@@ -9333,8 +9249,8 @@
         </p:nvCxnSpPr>
         <p:spPr>
           <a:xfrm rot="16200000" flipH="1">
-            <a:off x="3704777" y="3897760"/>
-            <a:ext cx="93676" cy="876631"/>
+            <a:off x="3773302" y="3829236"/>
+            <a:ext cx="105409" cy="1025412"/>
           </a:xfrm>
           <a:prstGeom prst="bentConnector2">
             <a:avLst/>
@@ -9345,44 +9261,6 @@
             </a:solidFill>
             <a:headEnd type="none" w="med" len="med"/>
             <a:tailEnd type="arrow" w="med" len="med"/>
-          </a:ln>
-          <a:effectLst/>
-        </p:spPr>
-        <p:style>
-          <a:lnRef idx="1">
-            <a:schemeClr val="accent2"/>
-          </a:lnRef>
-          <a:fillRef idx="2">
-            <a:schemeClr val="accent2"/>
-          </a:fillRef>
-          <a:effectRef idx="1">
-            <a:schemeClr val="accent2"/>
-          </a:effectRef>
-          <a:fontRef idx="minor">
-            <a:schemeClr val="dk1"/>
-          </a:fontRef>
-        </p:style>
-      </p:cxnSp>
-      <p:cxnSp>
-        <p:nvCxnSpPr>
-          <p:cNvPr id="140" name="Elbow Connector 63"/>
-          <p:cNvCxnSpPr/>
-          <p:nvPr/>
-        </p:nvCxnSpPr>
-        <p:spPr>
-          <a:xfrm rot="5400000">
-            <a:off x="3854329" y="2479626"/>
-            <a:ext cx="1865218" cy="1505727"/>
-          </a:xfrm>
-          <a:prstGeom prst="bentConnector2">
-            <a:avLst/>
-          </a:prstGeom>
-          <a:ln w="6350">
-            <a:solidFill>
-              <a:schemeClr val="accent3"/>
-            </a:solidFill>
-            <a:headEnd type="none" w="med" len="med"/>
-            <a:tailEnd type="none" w="med" len="med"/>
           </a:ln>
           <a:effectLst/>
         </p:spPr>
@@ -9597,8 +9475,8 @@
         </p:nvSpPr>
         <p:spPr>
           <a:xfrm flipV="1">
-            <a:off x="4710384" y="4535681"/>
-            <a:ext cx="2022174" cy="45719"/>
+            <a:off x="4786508" y="4525442"/>
+            <a:ext cx="1946050" cy="55957"/>
           </a:xfrm>
           <a:custGeom>
             <a:avLst/>
@@ -9674,13 +9552,16 @@
       <p:cxnSp>
         <p:nvCxnSpPr>
           <p:cNvPr id="62" name="Elbow Connector 61"/>
-          <p:cNvCxnSpPr/>
+          <p:cNvCxnSpPr>
+            <a:stCxn id="34" idx="2"/>
+            <a:endCxn id="52" idx="1"/>
+          </p:cNvCxnSpPr>
           <p:nvPr/>
         </p:nvCxnSpPr>
         <p:spPr>
-          <a:xfrm>
-            <a:off x="4022786" y="3793487"/>
-            <a:ext cx="661233" cy="473087"/>
+          <a:xfrm rot="16200000" flipH="1">
+            <a:off x="3781784" y="3424336"/>
+            <a:ext cx="80440" cy="1019612"/>
           </a:xfrm>
           <a:prstGeom prst="bentConnector2">
             <a:avLst/>
@@ -9750,14 +9631,14 @@
           <a:p>
             <a:pPr algn="ctr"/>
             <a:r>
-              <a:rPr lang="en-US" sz="1050" b="1" smtClean="0">
+              <a:rPr lang="en-US" sz="1050" b="1" dirty="0" err="1" smtClean="0">
                 <a:solidFill>
                   <a:schemeClr val="accent3">
                     <a:lumMod val="75000"/>
                   </a:schemeClr>
                 </a:solidFill>
               </a:rPr>
-              <a:t>EventsListPanel</a:t>
+              <a:t>EventListPanel</a:t>
             </a:r>
             <a:endParaRPr lang="en-SG" sz="1050" b="1" dirty="0">
               <a:solidFill>
@@ -9777,8 +9658,8 @@
         </p:nvSpPr>
         <p:spPr>
           <a:xfrm flipV="1">
-            <a:off x="4711427" y="5033003"/>
-            <a:ext cx="2021131" cy="45719"/>
+            <a:off x="4786508" y="5029804"/>
+            <a:ext cx="1946050" cy="48917"/>
           </a:xfrm>
           <a:custGeom>
             <a:avLst/>
@@ -9851,16 +9732,117 @@
           </a:p>
         </p:txBody>
       </p:sp>
+      <p:sp>
+        <p:nvSpPr>
+          <p:cNvPr id="97" name="Rectangle 11"/>
+          <p:cNvSpPr/>
+          <p:nvPr/>
+        </p:nvSpPr>
+        <p:spPr>
+          <a:xfrm>
+            <a:off x="4331810" y="4755628"/>
+            <a:ext cx="1049778" cy="247870"/>
+          </a:xfrm>
+          <a:prstGeom prst="rect">
+            <a:avLst/>
+          </a:prstGeom>
+          <a:ln w="19050">
+            <a:solidFill>
+              <a:schemeClr val="accent3"/>
+            </a:solidFill>
+          </a:ln>
+          <a:effectLst/>
+        </p:spPr>
+        <p:style>
+          <a:lnRef idx="1">
+            <a:schemeClr val="accent3"/>
+          </a:lnRef>
+          <a:fillRef idx="2">
+            <a:schemeClr val="accent3"/>
+          </a:fillRef>
+          <a:effectRef idx="1">
+            <a:schemeClr val="accent3"/>
+          </a:effectRef>
+          <a:fontRef idx="minor">
+            <a:schemeClr val="dk1"/>
+          </a:fontRef>
+        </p:style>
+        <p:txBody>
+          <a:bodyPr rtlCol="0" anchor="ctr"/>
+          <a:lstStyle/>
+          <a:p>
+            <a:pPr algn="ctr"/>
+            <a:r>
+              <a:rPr lang="en-US" sz="1050" b="1" dirty="0" err="1" smtClean="0">
+                <a:solidFill>
+                  <a:schemeClr val="accent3">
+                    <a:lumMod val="75000"/>
+                  </a:schemeClr>
+                </a:solidFill>
+              </a:rPr>
+              <a:t>EventCard</a:t>
+            </a:r>
+            <a:endParaRPr lang="en-SG" sz="1050" b="1" dirty="0">
+              <a:solidFill>
+                <a:schemeClr val="accent3">
+                  <a:lumMod val="75000"/>
+                </a:schemeClr>
+              </a:solidFill>
+            </a:endParaRPr>
+          </a:p>
+        </p:txBody>
+      </p:sp>
       <p:cxnSp>
         <p:nvCxnSpPr>
-          <p:cNvPr id="85" name="Elbow Connector 63"/>
+          <p:cNvPr id="165" name="Elbow Connector 63"/>
           <p:cNvCxnSpPr/>
           <p:nvPr/>
         </p:nvCxnSpPr>
         <p:spPr>
+          <a:xfrm rot="5400000">
+            <a:off x="3429566" y="3432712"/>
+            <a:ext cx="2358826" cy="1832212"/>
+          </a:xfrm>
+          <a:prstGeom prst="bentConnector2">
+            <a:avLst/>
+          </a:prstGeom>
+          <a:ln w="6350">
+            <a:solidFill>
+              <a:schemeClr val="accent3"/>
+            </a:solidFill>
+            <a:headEnd type="none" w="med" len="med"/>
+            <a:tailEnd type="none" w="med" len="med"/>
+          </a:ln>
+          <a:effectLst/>
+        </p:spPr>
+        <p:style>
+          <a:lnRef idx="1">
+            <a:schemeClr val="accent2"/>
+          </a:lnRef>
+          <a:fillRef idx="2">
+            <a:schemeClr val="accent2"/>
+          </a:fillRef>
+          <a:effectRef idx="1">
+            <a:schemeClr val="accent2"/>
+          </a:effectRef>
+          <a:fontRef idx="minor">
+            <a:schemeClr val="dk1"/>
+          </a:fontRef>
+        </p:style>
+      </p:cxnSp>
+      <p:cxnSp>
+        <p:nvCxnSpPr>
+          <p:cNvPr id="75" name="Elbow Connector 74"/>
+          <p:cNvCxnSpPr>
+            <a:stCxn id="68" idx="2"/>
+            <a:endCxn id="97" idx="1"/>
+          </p:cNvCxnSpPr>
+          <p:nvPr/>
+        </p:nvCxnSpPr>
+        <p:spPr>
           <a:xfrm rot="16200000" flipH="1">
-            <a:off x="1977993" y="4018940"/>
-            <a:ext cx="1064370" cy="182483"/>
+            <a:off x="3761837" y="4309589"/>
+            <a:ext cx="124781" cy="1015166"/>
           </a:xfrm>
           <a:prstGeom prst="bentConnector2">
             <a:avLst/>
@@ -9891,14 +9873,74 @@
       </p:cxnSp>
       <p:sp>
         <p:nvSpPr>
-          <p:cNvPr id="97" name="Rectangle 11"/>
+          <p:cNvPr id="52" name="Rectangle 11"/>
           <p:cNvSpPr/>
           <p:nvPr/>
         </p:nvSpPr>
         <p:spPr>
           <a:xfrm>
-            <a:off x="4166609" y="4743053"/>
-            <a:ext cx="1077944" cy="247870"/>
+            <a:off x="4331810" y="3855941"/>
+            <a:ext cx="1040906" cy="236841"/>
+          </a:xfrm>
+          <a:prstGeom prst="rect">
+            <a:avLst/>
+          </a:prstGeom>
+          <a:ln w="19050">
+            <a:solidFill>
+              <a:schemeClr val="accent3"/>
+            </a:solidFill>
+          </a:ln>
+          <a:effectLst/>
+        </p:spPr>
+        <p:style>
+          <a:lnRef idx="1">
+            <a:schemeClr val="accent3"/>
+          </a:lnRef>
+          <a:fillRef idx="2">
+            <a:schemeClr val="accent3"/>
+          </a:fillRef>
+          <a:effectRef idx="1">
+            <a:schemeClr val="accent3"/>
+          </a:effectRef>
+          <a:fontRef idx="minor">
+            <a:schemeClr val="dk1"/>
+          </a:fontRef>
+        </p:style>
+        <p:txBody>
+          <a:bodyPr rtlCol="0" anchor="ctr"/>
+          <a:lstStyle/>
+          <a:p>
+            <a:pPr algn="ctr"/>
+            <a:r>
+              <a:rPr lang="en-US" sz="1050" b="1" dirty="0" err="1" smtClean="0">
+                <a:solidFill>
+                  <a:schemeClr val="accent3">
+                    <a:lumMod val="75000"/>
+                  </a:schemeClr>
+                </a:solidFill>
+              </a:rPr>
+              <a:t>DeadlineCard</a:t>
+            </a:r>
+            <a:endParaRPr lang="en-SG" sz="1050" b="1" dirty="0">
+              <a:solidFill>
+                <a:schemeClr val="accent3">
+                  <a:lumMod val="75000"/>
+                </a:schemeClr>
+              </a:solidFill>
+            </a:endParaRPr>
+          </a:p>
+        </p:txBody>
+      </p:sp>
+      <p:sp>
+        <p:nvSpPr>
+          <p:cNvPr id="64" name="Rectangle 11"/>
+          <p:cNvSpPr/>
+          <p:nvPr/>
+        </p:nvSpPr>
+        <p:spPr>
+          <a:xfrm>
+            <a:off x="2662444" y="5015094"/>
+            <a:ext cx="1040895" cy="336691"/>
           </a:xfrm>
           <a:prstGeom prst="rect">
             <a:avLst/>
@@ -9937,7 +9979,30 @@
                   </a:schemeClr>
                 </a:solidFill>
               </a:rPr>
-              <a:t>EventsTaskCard</a:t>
+              <a:t>{abstract}</a:t>
+            </a:r>
+          </a:p>
+          <a:p>
+            <a:pPr algn="ctr"/>
+            <a:r>
+              <a:rPr lang="en-US" sz="1050" b="1" dirty="0" err="1" smtClean="0">
+                <a:solidFill>
+                  <a:schemeClr val="accent3">
+                    <a:lumMod val="75000"/>
+                  </a:schemeClr>
+                </a:solidFill>
+              </a:rPr>
+              <a:t>Task</a:t>
+            </a:r>
+            <a:r>
+              <a:rPr lang="en-US" sz="1050" b="1" dirty="0" err="1" smtClean="0">
+                <a:solidFill>
+                  <a:schemeClr val="accent3">
+                    <a:lumMod val="75000"/>
+                  </a:schemeClr>
+                </a:solidFill>
+              </a:rPr>
+              <a:t>ListPanel</a:t>
             </a:r>
             <a:endParaRPr lang="en-SG" sz="1050" b="1" dirty="0">
               <a:solidFill>
@@ -9949,19 +10014,74 @@
           </a:p>
         </p:txBody>
       </p:sp>
+      <p:sp>
+        <p:nvSpPr>
+          <p:cNvPr id="70" name="Isosceles Triangle 102"/>
+          <p:cNvSpPr/>
+          <p:nvPr/>
+        </p:nvSpPr>
+        <p:spPr>
+          <a:xfrm rot="5400000" flipV="1">
+            <a:off x="3652894" y="5050158"/>
+            <a:ext cx="205354" cy="116802"/>
+          </a:xfrm>
+          <a:prstGeom prst="triangle">
+            <a:avLst>
+              <a:gd name="adj" fmla="val 51641"/>
+            </a:avLst>
+          </a:prstGeom>
+          <a:ln w="6350">
+            <a:solidFill>
+              <a:schemeClr val="accent3"/>
+            </a:solidFill>
+          </a:ln>
+          <a:effectLst/>
+        </p:spPr>
+        <p:style>
+          <a:lnRef idx="1">
+            <a:schemeClr val="accent3"/>
+          </a:lnRef>
+          <a:fillRef idx="2">
+            <a:schemeClr val="accent3"/>
+          </a:fillRef>
+          <a:effectRef idx="1">
+            <a:schemeClr val="accent3"/>
+          </a:effectRef>
+          <a:fontRef idx="minor">
+            <a:schemeClr val="dk1"/>
+          </a:fontRef>
+        </p:style>
+        <p:txBody>
+          <a:bodyPr rtlCol="0" anchor="ctr"/>
+          <a:lstStyle/>
+          <a:p>
+            <a:pPr algn="ctr"/>
+            <a:endParaRPr lang="en-SG" sz="1050" b="1">
+              <a:solidFill>
+                <a:srgbClr val="92D050"/>
+              </a:solidFill>
+            </a:endParaRPr>
+          </a:p>
+        </p:txBody>
+      </p:sp>
       <p:cxnSp>
         <p:nvCxnSpPr>
-          <p:cNvPr id="165" name="Elbow Connector 63"/>
-          <p:cNvCxnSpPr/>
+          <p:cNvPr id="71" name="Elbow Connector 63"/>
+          <p:cNvCxnSpPr>
+            <a:stCxn id="68" idx="3"/>
+          </p:cNvCxnSpPr>
           <p:nvPr/>
         </p:nvCxnSpPr>
         <p:spPr>
-          <a:xfrm rot="5400000">
-            <a:off x="3433323" y="3096218"/>
-            <a:ext cx="2358826" cy="1832212"/>
-          </a:xfrm>
-          <a:prstGeom prst="bentConnector2">
-            <a:avLst/>
+          <a:xfrm flipH="1">
+            <a:off x="3817729" y="4642366"/>
+            <a:ext cx="214139" cy="466193"/>
+          </a:xfrm>
+          <a:prstGeom prst="bentConnector4">
+            <a:avLst>
+              <a:gd name="adj1" fmla="val -32130"/>
+              <a:gd name="adj2" fmla="val 100143"/>
+            </a:avLst>
           </a:prstGeom>
           <a:ln w="6350">
             <a:solidFill>
@@ -9989,27 +10109,267 @@
       </p:cxnSp>
       <p:cxnSp>
         <p:nvCxnSpPr>
-          <p:cNvPr id="75" name="Elbow Connector 74"/>
+          <p:cNvPr id="72" name="Straight Arrow Connector 71"/>
           <p:cNvCxnSpPr>
-            <a:stCxn id="68" idx="2"/>
-            <a:endCxn id="97" idx="1"/>
+            <a:endCxn id="64" idx="1"/>
           </p:cNvCxnSpPr>
           <p:nvPr/>
         </p:nvCxnSpPr>
         <p:spPr>
-          <a:xfrm rot="16200000" flipH="1">
-            <a:off x="3685523" y="4385902"/>
-            <a:ext cx="112206" cy="849965"/>
-          </a:xfrm>
-          <a:prstGeom prst="bentConnector2">
+          <a:xfrm>
+            <a:off x="2412150" y="5174718"/>
+            <a:ext cx="250294" cy="8722"/>
+          </a:xfrm>
+          <a:prstGeom prst="straightConnector1">
             <a:avLst/>
           </a:prstGeom>
           <a:ln w="19050">
             <a:solidFill>
               <a:schemeClr val="accent3"/>
             </a:solidFill>
+            <a:prstDash val="sysDot"/>
             <a:headEnd type="none" w="med" len="med"/>
             <a:tailEnd type="arrow" w="med" len="med"/>
+          </a:ln>
+          <a:effectLst/>
+        </p:spPr>
+        <p:style>
+          <a:lnRef idx="1">
+            <a:schemeClr val="accent2"/>
+          </a:lnRef>
+          <a:fillRef idx="2">
+            <a:schemeClr val="accent2"/>
+          </a:fillRef>
+          <a:effectRef idx="1">
+            <a:schemeClr val="accent2"/>
+          </a:effectRef>
+          <a:fontRef idx="minor">
+            <a:schemeClr val="dk1"/>
+          </a:fontRef>
+        </p:style>
+      </p:cxnSp>
+      <p:cxnSp>
+        <p:nvCxnSpPr>
+          <p:cNvPr id="76" name="Elbow Connector 63"/>
+          <p:cNvCxnSpPr/>
+          <p:nvPr/>
+        </p:nvCxnSpPr>
+        <p:spPr>
+          <a:xfrm rot="16200000" flipH="1">
+            <a:off x="1861149" y="3891027"/>
+            <a:ext cx="1297073" cy="176400"/>
+          </a:xfrm>
+          <a:prstGeom prst="bentConnector2">
+            <a:avLst/>
+          </a:prstGeom>
+          <a:ln w="19050">
+            <a:solidFill>
+              <a:schemeClr val="accent3"/>
+            </a:solidFill>
+            <a:headEnd type="none" w="med" len="med"/>
+            <a:tailEnd type="arrow" w="med" len="med"/>
+          </a:ln>
+          <a:effectLst/>
+        </p:spPr>
+        <p:style>
+          <a:lnRef idx="1">
+            <a:schemeClr val="accent2"/>
+          </a:lnRef>
+          <a:fillRef idx="2">
+            <a:schemeClr val="accent2"/>
+          </a:fillRef>
+          <a:effectRef idx="1">
+            <a:schemeClr val="accent2"/>
+          </a:effectRef>
+          <a:fontRef idx="minor">
+            <a:schemeClr val="dk1"/>
+          </a:fontRef>
+        </p:style>
+      </p:cxnSp>
+      <p:cxnSp>
+        <p:nvCxnSpPr>
+          <p:cNvPr id="78" name="Elbow Connector 63"/>
+          <p:cNvCxnSpPr>
+            <a:stCxn id="36" idx="3"/>
+          </p:cNvCxnSpPr>
+          <p:nvPr/>
+        </p:nvCxnSpPr>
+        <p:spPr>
+          <a:xfrm>
+            <a:off x="4034074" y="4165098"/>
+            <a:ext cx="65549" cy="573693"/>
+          </a:xfrm>
+          <a:prstGeom prst="bentConnector2">
+            <a:avLst/>
+          </a:prstGeom>
+          <a:ln w="6350">
+            <a:solidFill>
+              <a:schemeClr val="accent3"/>
+            </a:solidFill>
+            <a:headEnd type="none" w="med" len="med"/>
+            <a:tailEnd type="none" w="med" len="med"/>
+          </a:ln>
+          <a:effectLst/>
+        </p:spPr>
+        <p:style>
+          <a:lnRef idx="1">
+            <a:schemeClr val="accent2"/>
+          </a:lnRef>
+          <a:fillRef idx="2">
+            <a:schemeClr val="accent2"/>
+          </a:fillRef>
+          <a:effectRef idx="1">
+            <a:schemeClr val="accent2"/>
+          </a:effectRef>
+          <a:fontRef idx="minor">
+            <a:schemeClr val="dk1"/>
+          </a:fontRef>
+        </p:style>
+      </p:cxnSp>
+      <p:cxnSp>
+        <p:nvCxnSpPr>
+          <p:cNvPr id="79" name="Elbow Connector 63"/>
+          <p:cNvCxnSpPr>
+            <a:stCxn id="34" idx="3"/>
+          </p:cNvCxnSpPr>
+          <p:nvPr/>
+        </p:nvCxnSpPr>
+        <p:spPr>
+          <a:xfrm>
+            <a:off x="4031868" y="3772463"/>
+            <a:ext cx="66517" cy="508309"/>
+          </a:xfrm>
+          <a:prstGeom prst="bentConnector2">
+            <a:avLst/>
+          </a:prstGeom>
+          <a:ln w="6350">
+            <a:solidFill>
+              <a:schemeClr val="accent3"/>
+            </a:solidFill>
+            <a:headEnd type="none" w="med" len="med"/>
+            <a:tailEnd type="none" w="med" len="med"/>
+          </a:ln>
+          <a:effectLst/>
+        </p:spPr>
+        <p:style>
+          <a:lnRef idx="1">
+            <a:schemeClr val="accent2"/>
+          </a:lnRef>
+          <a:fillRef idx="2">
+            <a:schemeClr val="accent2"/>
+          </a:fillRef>
+          <a:effectRef idx="1">
+            <a:schemeClr val="accent2"/>
+          </a:effectRef>
+          <a:fontRef idx="minor">
+            <a:schemeClr val="dk1"/>
+          </a:fontRef>
+        </p:style>
+      </p:cxnSp>
+      <p:sp>
+        <p:nvSpPr>
+          <p:cNvPr id="96" name="Freeform 95"/>
+          <p:cNvSpPr/>
+          <p:nvPr/>
+        </p:nvSpPr>
+        <p:spPr>
+          <a:xfrm flipV="1">
+            <a:off x="4786508" y="4092252"/>
+            <a:ext cx="1946050" cy="55957"/>
+          </a:xfrm>
+          <a:custGeom>
+            <a:avLst/>
+            <a:gdLst>
+              <a:gd name="connsiteX0" fmla="*/ 0 w 3048000"/>
+              <a:gd name="connsiteY0" fmla="*/ 203200 h 203200"/>
+              <a:gd name="connsiteX1" fmla="*/ 221673 w 3048000"/>
+              <a:gd name="connsiteY1" fmla="*/ 0 h 203200"/>
+              <a:gd name="connsiteX2" fmla="*/ 3048000 w 3048000"/>
+              <a:gd name="connsiteY2" fmla="*/ 0 h 203200"/>
+            </a:gdLst>
+            <a:ahLst/>
+            <a:cxnLst>
+              <a:cxn ang="0">
+                <a:pos x="connsiteX0" y="connsiteY0"/>
+              </a:cxn>
+              <a:cxn ang="0">
+                <a:pos x="connsiteX1" y="connsiteY1"/>
+              </a:cxn>
+              <a:cxn ang="0">
+                <a:pos x="connsiteX2" y="connsiteY2"/>
+              </a:cxn>
+            </a:cxnLst>
+            <a:rect l="l" t="t" r="r" b="b"/>
+            <a:pathLst>
+              <a:path w="3048000" h="203200">
+                <a:moveTo>
+                  <a:pt x="0" y="203200"/>
+                </a:moveTo>
+                <a:lnTo>
+                  <a:pt x="221673" y="0"/>
+                </a:lnTo>
+                <a:lnTo>
+                  <a:pt x="3048000" y="0"/>
+                </a:lnTo>
+              </a:path>
+            </a:pathLst>
+          </a:custGeom>
+          <a:noFill/>
+          <a:ln w="19050">
+            <a:solidFill>
+              <a:schemeClr val="accent3"/>
+            </a:solidFill>
+            <a:prstDash val="sysDot"/>
+            <a:headEnd type="none" w="med" len="med"/>
+            <a:tailEnd type="arrow" w="med" len="med"/>
+          </a:ln>
+          <a:effectLst/>
+        </p:spPr>
+        <p:style>
+          <a:lnRef idx="1">
+            <a:schemeClr val="accent2"/>
+          </a:lnRef>
+          <a:fillRef idx="2">
+            <a:schemeClr val="accent2"/>
+          </a:fillRef>
+          <a:effectRef idx="1">
+            <a:schemeClr val="accent2"/>
+          </a:effectRef>
+          <a:fontRef idx="minor">
+            <a:schemeClr val="dk1"/>
+          </a:fontRef>
+        </p:style>
+        <p:txBody>
+          <a:bodyPr rtlCol="0" anchor="ctr"/>
+          <a:lstStyle/>
+          <a:p>
+            <a:pPr algn="ctr"/>
+            <a:endParaRPr lang="en-SG"/>
+          </a:p>
+        </p:txBody>
+      </p:sp>
+      <p:cxnSp>
+        <p:nvCxnSpPr>
+          <p:cNvPr id="103" name="Elbow Connector 63"/>
+          <p:cNvCxnSpPr/>
+          <p:nvPr/>
+        </p:nvCxnSpPr>
+        <p:spPr>
+          <a:xfrm rot="5400000">
+            <a:off x="3457530" y="3189508"/>
+            <a:ext cx="2323876" cy="1805488"/>
+          </a:xfrm>
+          <a:prstGeom prst="bentConnector3">
+            <a:avLst>
+              <a:gd name="adj1" fmla="val 100349"/>
+            </a:avLst>
+          </a:prstGeom>
+          <a:ln w="6350">
+            <a:solidFill>
+              <a:schemeClr val="accent3"/>
+            </a:solidFill>
+            <a:headEnd type="none" w="med" len="med"/>
+            <a:tailEnd type="none" w="med" len="med"/>
           </a:ln>
           <a:effectLst/>
         </p:spPr>
@@ -12482,23 +12842,7 @@
                   <a:srgbClr val="0070C0"/>
                 </a:solidFill>
               </a:rPr>
-              <a:t>execute(“delete </a:t>
-            </a:r>
-            <a:r>
-              <a:rPr lang="en-US" sz="1400" dirty="0" smtClean="0">
-                <a:solidFill>
-                  <a:srgbClr val="0070C0"/>
-                </a:solidFill>
-              </a:rPr>
-              <a:t>d1</a:t>
-            </a:r>
-            <a:r>
-              <a:rPr lang="en-US" sz="1400" dirty="0" smtClean="0">
-                <a:solidFill>
-                  <a:srgbClr val="0070C0"/>
-                </a:solidFill>
-              </a:rPr>
-              <a:t>”)</a:t>
+              <a:t>execute(“delete d1”)</a:t>
             </a:r>
             <a:endParaRPr lang="en-US" sz="1400" dirty="0">
               <a:solidFill>
@@ -13209,15 +13553,7 @@
           <a:p>
             <a:r>
               <a:rPr lang="en-US" dirty="0" smtClean="0"/>
-              <a:t>parse(“delete </a:t>
-            </a:r>
-            <a:r>
-              <a:rPr lang="en-US" dirty="0" smtClean="0"/>
-              <a:t>d1</a:t>
-            </a:r>
-            <a:r>
-              <a:rPr lang="en-US" dirty="0" smtClean="0"/>
-              <a:t>”)</a:t>
+              <a:t>parse(“delete d1”)</a:t>
             </a:r>
             <a:endParaRPr lang="en-US" dirty="0"/>
           </a:p>
@@ -13789,7 +14125,7 @@
             <a:effectLst/>
             <a:extLst>
               <a:ext uri="{C572A759-6A51-4108-AA02-DFA0A04FC94B}">
-                <ma14:wrappingTextBoxFlag xmlns:ma14="http://schemas.microsoft.com/office/mac/drawingml/2011/main" xmlns="" val="1"/>
+                <ma14:wrappingTextBoxFlag xmlns:ma14="http://schemas.microsoft.com/office/mac/drawingml/2011/main" val="1"/>
               </a:ext>
             </a:extLst>
           </p:spPr>
@@ -13893,7 +14229,7 @@
             <a:effectLst/>
             <a:extLst>
               <a:ext uri="{C572A759-6A51-4108-AA02-DFA0A04FC94B}">
-                <ma14:wrappingTextBoxFlag xmlns:ma14="http://schemas.microsoft.com/office/mac/drawingml/2011/main" xmlns="" val="1"/>
+                <ma14:wrappingTextBoxFlag xmlns:ma14="http://schemas.microsoft.com/office/mac/drawingml/2011/main" val="1"/>
               </a:ext>
             </a:extLst>
           </p:spPr>
@@ -13997,7 +14333,7 @@
             <a:effectLst/>
             <a:extLst>
               <a:ext uri="{C572A759-6A51-4108-AA02-DFA0A04FC94B}">
-                <ma14:wrappingTextBoxFlag xmlns:ma14="http://schemas.microsoft.com/office/mac/drawingml/2011/main" xmlns="" val="1"/>
+                <ma14:wrappingTextBoxFlag xmlns:ma14="http://schemas.microsoft.com/office/mac/drawingml/2011/main" val="1"/>
               </a:ext>
             </a:extLst>
           </p:spPr>
@@ -14225,7 +14561,7 @@
             <a:effectLst/>
             <a:extLst>
               <a:ext uri="{C572A759-6A51-4108-AA02-DFA0A04FC94B}">
-                <ma14:wrappingTextBoxFlag xmlns:ma14="http://schemas.microsoft.com/office/mac/drawingml/2011/main" xmlns="" val="1"/>
+                <ma14:wrappingTextBoxFlag xmlns:ma14="http://schemas.microsoft.com/office/mac/drawingml/2011/main" val="1"/>
               </a:ext>
             </a:extLst>
           </p:spPr>
@@ -14727,7 +15063,7 @@
             <a:effectLst/>
             <a:extLst>
               <a:ext uri="{C572A759-6A51-4108-AA02-DFA0A04FC94B}">
-                <ma14:wrappingTextBoxFlag xmlns:ma14="http://schemas.microsoft.com/office/mac/drawingml/2011/main" xmlns="" val="1"/>
+                <ma14:wrappingTextBoxFlag xmlns:ma14="http://schemas.microsoft.com/office/mac/drawingml/2011/main" val="1"/>
               </a:ext>
             </a:extLst>
           </p:spPr>
@@ -14973,7 +15309,7 @@
             <a:effectLst/>
             <a:extLst>
               <a:ext uri="{C572A759-6A51-4108-AA02-DFA0A04FC94B}">
-                <ma14:wrappingTextBoxFlag xmlns:ma14="http://schemas.microsoft.com/office/mac/drawingml/2011/main" xmlns="" val="1"/>
+                <ma14:wrappingTextBoxFlag xmlns:ma14="http://schemas.microsoft.com/office/mac/drawingml/2011/main" val="1"/>
               </a:ext>
             </a:extLst>
           </p:spPr>
@@ -15229,7 +15565,7 @@
             <a:effectLst/>
             <a:extLst>
               <a:ext uri="{C572A759-6A51-4108-AA02-DFA0A04FC94B}">
-                <ma14:wrappingTextBoxFlag xmlns:ma14="http://schemas.microsoft.com/office/mac/drawingml/2011/main" xmlns="" val="1"/>
+                <ma14:wrappingTextBoxFlag xmlns:ma14="http://schemas.microsoft.com/office/mac/drawingml/2011/main" val="1"/>
               </a:ext>
             </a:extLst>
           </p:spPr>
@@ -15417,7 +15753,7 @@
             <a:effectLst/>
             <a:extLst>
               <a:ext uri="{C572A759-6A51-4108-AA02-DFA0A04FC94B}">
-                <ma14:wrappingTextBoxFlag xmlns:ma14="http://schemas.microsoft.com/office/mac/drawingml/2011/main" xmlns="" val="1"/>
+                <ma14:wrappingTextBoxFlag xmlns:ma14="http://schemas.microsoft.com/office/mac/drawingml/2011/main" val="1"/>
               </a:ext>
             </a:extLst>
           </p:spPr>
@@ -15670,7 +16006,7 @@
             <a:effectLst/>
             <a:extLst>
               <a:ext uri="{C572A759-6A51-4108-AA02-DFA0A04FC94B}">
-                <ma14:wrappingTextBoxFlag xmlns:ma14="http://schemas.microsoft.com/office/mac/drawingml/2011/main" xmlns="" val="1"/>
+                <ma14:wrappingTextBoxFlag xmlns:ma14="http://schemas.microsoft.com/office/mac/drawingml/2011/main" val="1"/>
               </a:ext>
             </a:extLst>
           </p:spPr>
@@ -15923,7 +16259,7 @@
             <a:effectLst/>
             <a:extLst>
               <a:ext uri="{C572A759-6A51-4108-AA02-DFA0A04FC94B}">
-                <ma14:wrappingTextBoxFlag xmlns:ma14="http://schemas.microsoft.com/office/mac/drawingml/2011/main" xmlns="" val="1"/>
+                <ma14:wrappingTextBoxFlag xmlns:ma14="http://schemas.microsoft.com/office/mac/drawingml/2011/main" val="1"/>
               </a:ext>
             </a:extLst>
           </p:spPr>
@@ -16054,7 +16390,7 @@
             <a:effectLst/>
             <a:extLst>
               <a:ext uri="{C572A759-6A51-4108-AA02-DFA0A04FC94B}">
-                <ma14:wrappingTextBoxFlag xmlns:ma14="http://schemas.microsoft.com/office/mac/drawingml/2011/main" xmlns="" val="1"/>
+                <ma14:wrappingTextBoxFlag xmlns:ma14="http://schemas.microsoft.com/office/mac/drawingml/2011/main" val="1"/>
               </a:ext>
             </a:extLst>
           </p:spPr>
@@ -16310,7 +16646,7 @@
             <a:effectLst/>
             <a:extLst>
               <a:ext uri="{C572A759-6A51-4108-AA02-DFA0A04FC94B}">
-                <ma14:wrappingTextBoxFlag xmlns:ma14="http://schemas.microsoft.com/office/mac/drawingml/2011/main" xmlns="" val="1"/>
+                <ma14:wrappingTextBoxFlag xmlns:ma14="http://schemas.microsoft.com/office/mac/drawingml/2011/main" val="1"/>
               </a:ext>
             </a:extLst>
           </p:spPr>
@@ -16505,7 +16841,7 @@
             <a:effectLst/>
             <a:extLst>
               <a:ext uri="{C572A759-6A51-4108-AA02-DFA0A04FC94B}">
-                <ma14:wrappingTextBoxFlag xmlns:ma14="http://schemas.microsoft.com/office/mac/drawingml/2011/main" xmlns="" val="1"/>
+                <ma14:wrappingTextBoxFlag xmlns:ma14="http://schemas.microsoft.com/office/mac/drawingml/2011/main" val="1"/>
               </a:ext>
             </a:extLst>
           </p:spPr>
@@ -16747,7 +17083,7 @@
             <a:effectLst/>
             <a:extLst>
               <a:ext uri="{C572A759-6A51-4108-AA02-DFA0A04FC94B}">
-                <ma14:wrappingTextBoxFlag xmlns:ma14="http://schemas.microsoft.com/office/mac/drawingml/2011/main" xmlns="" val="1"/>
+                <ma14:wrappingTextBoxFlag xmlns:ma14="http://schemas.microsoft.com/office/mac/drawingml/2011/main" val="1"/>
               </a:ext>
             </a:extLst>
           </p:spPr>
@@ -16794,7 +17130,7 @@
           </a:ln>
           <a:extLst>
             <a:ext uri="{C572A759-6A51-4108-AA02-DFA0A04FC94B}">
-              <ma14:wrappingTextBoxFlag xmlns:ma14="http://schemas.microsoft.com/office/mac/drawingml/2011/main" xmlns="" val="1"/>
+              <ma14:wrappingTextBoxFlag xmlns:ma14="http://schemas.microsoft.com/office/mac/drawingml/2011/main" val="1"/>
             </a:ext>
           </a:extLst>
         </p:spPr>
@@ -16916,7 +17252,7 @@
             <a:effectLst/>
             <a:extLst>
               <a:ext uri="{C572A759-6A51-4108-AA02-DFA0A04FC94B}">
-                <ma14:wrappingTextBoxFlag xmlns:ma14="http://schemas.microsoft.com/office/mac/drawingml/2011/main" xmlns="" val="1"/>
+                <ma14:wrappingTextBoxFlag xmlns:ma14="http://schemas.microsoft.com/office/mac/drawingml/2011/main" val="1"/>
               </a:ext>
             </a:extLst>
           </p:spPr>
@@ -17102,7 +17438,7 @@
             <a:effectLst/>
             <a:extLst>
               <a:ext uri="{C572A759-6A51-4108-AA02-DFA0A04FC94B}">
-                <ma14:wrappingTextBoxFlag xmlns:ma14="http://schemas.microsoft.com/office/mac/drawingml/2011/main" xmlns="" val="1"/>
+                <ma14:wrappingTextBoxFlag xmlns:ma14="http://schemas.microsoft.com/office/mac/drawingml/2011/main" val="1"/>
               </a:ext>
             </a:extLst>
           </p:spPr>

</xml_diff>

<commit_message>
Update Diagrams ppt and remove obsolete UIClassDiagram again
</commit_message>
<xml_diff>
--- a/docs/diagrams/Diagrams.pptx
+++ b/docs/diagrams/Diagrams.pptx
@@ -7470,8 +7470,8 @@
         </p:nvSpPr>
         <p:spPr>
           <a:xfrm>
-            <a:off x="1256240" y="762000"/>
-            <a:ext cx="5265750" cy="5638799"/>
+            <a:off x="1256240" y="919792"/>
+            <a:ext cx="5296960" cy="5481007"/>
           </a:xfrm>
           <a:prstGeom prst="roundRect">
             <a:avLst>
@@ -8944,8 +8944,8 @@
         </p:nvSpPr>
         <p:spPr>
           <a:xfrm rot="16200000">
-            <a:off x="5865098" y="4619416"/>
-            <a:ext cx="2084712" cy="328045"/>
+            <a:off x="5559665" y="4924851"/>
+            <a:ext cx="2659716" cy="292180"/>
           </a:xfrm>
           <a:prstGeom prst="roundRect">
             <a:avLst/>
@@ -10156,8 +10156,8 @@
         </p:nvCxnSpPr>
         <p:spPr>
           <a:xfrm rot="16200000" flipH="1">
-            <a:off x="1861149" y="3891027"/>
-            <a:ext cx="1297073" cy="176400"/>
+            <a:off x="1855819" y="3910618"/>
+            <a:ext cx="1305028" cy="188084"/>
           </a:xfrm>
           <a:prstGeom prst="bentConnector2">
             <a:avLst/>
@@ -10189,14 +10189,12 @@
       <p:cxnSp>
         <p:nvCxnSpPr>
           <p:cNvPr id="78" name="Elbow Connector 63"/>
-          <p:cNvCxnSpPr>
-            <a:stCxn id="36" idx="3"/>
-          </p:cNvCxnSpPr>
+          <p:cNvCxnSpPr/>
           <p:nvPr/>
         </p:nvCxnSpPr>
         <p:spPr>
           <a:xfrm>
-            <a:off x="4034074" y="4165098"/>
+            <a:off x="4029854" y="4181087"/>
             <a:ext cx="65549" cy="573693"/>
           </a:xfrm>
           <a:prstGeom prst="bentConnector2">
@@ -10363,6 +10361,84 @@
             <a:avLst>
               <a:gd name="adj1" fmla="val 100349"/>
             </a:avLst>
+          </a:prstGeom>
+          <a:ln w="6350">
+            <a:solidFill>
+              <a:schemeClr val="accent3"/>
+            </a:solidFill>
+            <a:headEnd type="none" w="med" len="med"/>
+            <a:tailEnd type="none" w="med" len="med"/>
+          </a:ln>
+          <a:effectLst/>
+        </p:spPr>
+        <p:style>
+          <a:lnRef idx="1">
+            <a:schemeClr val="accent2"/>
+          </a:lnRef>
+          <a:fillRef idx="2">
+            <a:schemeClr val="accent2"/>
+          </a:fillRef>
+          <a:effectRef idx="1">
+            <a:schemeClr val="accent2"/>
+          </a:effectRef>
+          <a:fontRef idx="minor">
+            <a:schemeClr val="dk1"/>
+          </a:fontRef>
+        </p:style>
+      </p:cxnSp>
+      <p:cxnSp>
+        <p:nvCxnSpPr>
+          <p:cNvPr id="108" name="Elbow Connector 63"/>
+          <p:cNvCxnSpPr/>
+          <p:nvPr/>
+        </p:nvCxnSpPr>
+        <p:spPr>
+          <a:xfrm rot="5400000">
+            <a:off x="4364981" y="3758121"/>
+            <a:ext cx="2183329" cy="146028"/>
+          </a:xfrm>
+          <a:prstGeom prst="bentConnector2">
+            <a:avLst/>
+          </a:prstGeom>
+          <a:ln w="6350">
+            <a:solidFill>
+              <a:schemeClr val="accent3"/>
+            </a:solidFill>
+            <a:headEnd type="none" w="med" len="med"/>
+            <a:tailEnd type="none" w="med" len="med"/>
+          </a:ln>
+          <a:effectLst/>
+        </p:spPr>
+        <p:style>
+          <a:lnRef idx="1">
+            <a:schemeClr val="accent2"/>
+          </a:lnRef>
+          <a:fillRef idx="2">
+            <a:schemeClr val="accent2"/>
+          </a:fillRef>
+          <a:effectRef idx="1">
+            <a:schemeClr val="accent2"/>
+          </a:effectRef>
+          <a:fontRef idx="minor">
+            <a:schemeClr val="dk1"/>
+          </a:fontRef>
+        </p:style>
+      </p:cxnSp>
+      <p:cxnSp>
+        <p:nvCxnSpPr>
+          <p:cNvPr id="112" name="Elbow Connector 63"/>
+          <p:cNvCxnSpPr>
+            <a:stCxn id="52" idx="3"/>
+          </p:cNvCxnSpPr>
+          <p:nvPr/>
+        </p:nvCxnSpPr>
+        <p:spPr>
+          <a:xfrm flipV="1">
+            <a:off x="5372716" y="2645452"/>
+            <a:ext cx="156157" cy="1328910"/>
+          </a:xfrm>
+          <a:prstGeom prst="bentConnector2">
+            <a:avLst/>
           </a:prstGeom>
           <a:ln w="6350">
             <a:solidFill>

</xml_diff>

<commit_message>
Somw ui enhancement (#173)
* Refactor ui task panel code

* Allow listview to resize according to text length

* Update task card padding

* Update task card layout

* Update ui diagrams

* Set max width to result pop up window

* Show message after find command

* Remove some borders

* Set default window size to full screen

* Allow test to get screen size

* Refocus mainwindow after closing helpwindow
Set message to be left alignment

* Remove unnecessary constructors

* Update guy tests references
</commit_message>
<xml_diff>
--- a/docs/diagrams/Diagrams.pptx
+++ b/docs/diagrams/Diagrams.pptx
@@ -118,7 +118,7 @@
   </p:defaultTextStyle>
   <p:extLst>
     <p:ext uri="{EFAFB233-063F-42B5-8137-9DF3F51BA10A}">
-      <p15:sldGuideLst xmlns:p15="http://schemas.microsoft.com/office/powerpoint/2012/main" xmlns="">
+      <p15:sldGuideLst xmlns:p15="http://schemas.microsoft.com/office/powerpoint/2012/main">
         <p15:guide id="1" orient="horz" pos="1488">
           <p15:clr>
             <a:srgbClr val="A4A3A4"/>
@@ -217,7 +217,7 @@
           <a:p>
             <a:fld id="{F5CC4B3F-88C1-4FFA-B1B6-F41C21DC6924}" type="datetimeFigureOut">
               <a:rPr lang="en-US" smtClean="0"/>
-              <a:t>10/22/2016</a:t>
+              <a:t>10/29/16</a:t>
             </a:fld>
             <a:endParaRPr lang="en-US"/>
           </a:p>
@@ -666,7 +666,7 @@
           <a:p>
             <a:fld id="{78C97017-6FC3-485B-9764-EAC9E56C1D49}" type="datetimeFigureOut">
               <a:rPr lang="en-US" smtClean="0"/>
-              <a:t>10/22/2016</a:t>
+              <a:t>10/29/16</a:t>
             </a:fld>
             <a:endParaRPr lang="en-US"/>
           </a:p>
@@ -836,7 +836,7 @@
           <a:p>
             <a:fld id="{78C97017-6FC3-485B-9764-EAC9E56C1D49}" type="datetimeFigureOut">
               <a:rPr lang="en-US" smtClean="0"/>
-              <a:t>10/22/2016</a:t>
+              <a:t>10/29/16</a:t>
             </a:fld>
             <a:endParaRPr lang="en-US"/>
           </a:p>
@@ -1016,7 +1016,7 @@
           <a:p>
             <a:fld id="{78C97017-6FC3-485B-9764-EAC9E56C1D49}" type="datetimeFigureOut">
               <a:rPr lang="en-US" smtClean="0"/>
-              <a:t>10/22/2016</a:t>
+              <a:t>10/29/16</a:t>
             </a:fld>
             <a:endParaRPr lang="en-US"/>
           </a:p>
@@ -1186,7 +1186,7 @@
           <a:p>
             <a:fld id="{78C97017-6FC3-485B-9764-EAC9E56C1D49}" type="datetimeFigureOut">
               <a:rPr lang="en-US" smtClean="0"/>
-              <a:t>10/22/2016</a:t>
+              <a:t>10/29/16</a:t>
             </a:fld>
             <a:endParaRPr lang="en-US"/>
           </a:p>
@@ -1432,7 +1432,7 @@
           <a:p>
             <a:fld id="{78C97017-6FC3-485B-9764-EAC9E56C1D49}" type="datetimeFigureOut">
               <a:rPr lang="en-US" smtClean="0"/>
-              <a:t>10/22/2016</a:t>
+              <a:t>10/29/16</a:t>
             </a:fld>
             <a:endParaRPr lang="en-US"/>
           </a:p>
@@ -1720,7 +1720,7 @@
           <a:p>
             <a:fld id="{78C97017-6FC3-485B-9764-EAC9E56C1D49}" type="datetimeFigureOut">
               <a:rPr lang="en-US" smtClean="0"/>
-              <a:t>10/22/2016</a:t>
+              <a:t>10/29/16</a:t>
             </a:fld>
             <a:endParaRPr lang="en-US"/>
           </a:p>
@@ -2142,7 +2142,7 @@
           <a:p>
             <a:fld id="{78C97017-6FC3-485B-9764-EAC9E56C1D49}" type="datetimeFigureOut">
               <a:rPr lang="en-US" smtClean="0"/>
-              <a:t>10/22/2016</a:t>
+              <a:t>10/29/16</a:t>
             </a:fld>
             <a:endParaRPr lang="en-US"/>
           </a:p>
@@ -2260,7 +2260,7 @@
           <a:p>
             <a:fld id="{78C97017-6FC3-485B-9764-EAC9E56C1D49}" type="datetimeFigureOut">
               <a:rPr lang="en-US" smtClean="0"/>
-              <a:t>10/22/2016</a:t>
+              <a:t>10/29/16</a:t>
             </a:fld>
             <a:endParaRPr lang="en-US"/>
           </a:p>
@@ -2355,7 +2355,7 @@
           <a:p>
             <a:fld id="{78C97017-6FC3-485B-9764-EAC9E56C1D49}" type="datetimeFigureOut">
               <a:rPr lang="en-US" smtClean="0"/>
-              <a:t>10/22/2016</a:t>
+              <a:t>10/29/16</a:t>
             </a:fld>
             <a:endParaRPr lang="en-US"/>
           </a:p>
@@ -2632,7 +2632,7 @@
           <a:p>
             <a:fld id="{78C97017-6FC3-485B-9764-EAC9E56C1D49}" type="datetimeFigureOut">
               <a:rPr lang="en-US" smtClean="0"/>
-              <a:t>10/22/2016</a:t>
+              <a:t>10/29/16</a:t>
             </a:fld>
             <a:endParaRPr lang="en-US"/>
           </a:p>
@@ -2885,7 +2885,7 @@
           <a:p>
             <a:fld id="{78C97017-6FC3-485B-9764-EAC9E56C1D49}" type="datetimeFigureOut">
               <a:rPr lang="en-US" smtClean="0"/>
-              <a:t>10/22/2016</a:t>
+              <a:t>10/29/16</a:t>
             </a:fld>
             <a:endParaRPr lang="en-US"/>
           </a:p>
@@ -3098,7 +3098,7 @@
           <a:p>
             <a:fld id="{78C97017-6FC3-485B-9764-EAC9E56C1D49}" type="datetimeFigureOut">
               <a:rPr lang="en-US" smtClean="0"/>
-              <a:t>10/22/2016</a:t>
+              <a:t>10/29/16</a:t>
             </a:fld>
             <a:endParaRPr lang="en-US"/>
           </a:p>
@@ -4014,13 +4014,6 @@
                   </a:rPr>
                   <a:t>)</a:t>
                 </a:r>
-                <a:endParaRPr lang="en-US" sz="1400" dirty="0">
-                  <a:solidFill>
-                    <a:schemeClr val="accent5">
-                      <a:lumMod val="75000"/>
-                    </a:schemeClr>
-                  </a:solidFill>
-                </a:endParaRPr>
               </a:p>
             </p:txBody>
           </p:sp>
@@ -4688,13 +4681,6 @@
                 </a:rPr>
                 <a:t>)</a:t>
               </a:r>
-              <a:endParaRPr lang="en-US" sz="1400" dirty="0">
-                <a:solidFill>
-                  <a:schemeClr val="accent6">
-                    <a:lumMod val="75000"/>
-                  </a:schemeClr>
-                </a:solidFill>
-              </a:endParaRPr>
             </a:p>
           </p:txBody>
         </p:sp>
@@ -4950,15 +4936,7 @@
                       <a:srgbClr val="7030A0"/>
                     </a:solidFill>
                   </a:rPr>
-                  <a:t>Update </a:t>
-                </a:r>
-                <a:r>
-                  <a:rPr lang="en-US" sz="1400" dirty="0" smtClean="0">
-                    <a:solidFill>
-                      <a:srgbClr val="7030A0"/>
-                    </a:solidFill>
-                  </a:rPr>
-                  <a:t>task list</a:t>
+                  <a:t>Update task list</a:t>
                 </a:r>
                 <a:endParaRPr lang="en-US" sz="1400" dirty="0">
                   <a:solidFill>
@@ -5866,101 +5844,6 @@
           </a:p>
         </p:txBody>
       </p:sp>
-      <p:sp>
-        <p:nvSpPr>
-          <p:cNvPr id="51" name="Cloud 50"/>
-          <p:cNvSpPr/>
-          <p:nvPr/>
-        </p:nvSpPr>
-        <p:spPr>
-          <a:xfrm>
-            <a:off x="2650069" y="1447800"/>
-            <a:ext cx="914400" cy="533400"/>
-          </a:xfrm>
-          <a:prstGeom prst="cloud">
-            <a:avLst/>
-          </a:prstGeom>
-          <a:solidFill>
-            <a:schemeClr val="bg1"/>
-          </a:solidFill>
-          <a:ln>
-            <a:solidFill>
-              <a:schemeClr val="tx1"/>
-            </a:solidFill>
-          </a:ln>
-        </p:spPr>
-        <p:style>
-          <a:lnRef idx="2">
-            <a:schemeClr val="accent1">
-              <a:shade val="50000"/>
-            </a:schemeClr>
-          </a:lnRef>
-          <a:fillRef idx="1">
-            <a:schemeClr val="accent1"/>
-          </a:fillRef>
-          <a:effectRef idx="0">
-            <a:schemeClr val="accent1"/>
-          </a:effectRef>
-          <a:fontRef idx="minor">
-            <a:schemeClr val="lt1"/>
-          </a:fontRef>
-        </p:style>
-        <p:txBody>
-          <a:bodyPr rtlCol="0" anchor="ctr"/>
-          <a:lstStyle/>
-          <a:p>
-            <a:pPr algn="ctr"/>
-            <a:r>
-              <a:rPr lang="en-US" sz="1400" dirty="0">
-                <a:solidFill>
-                  <a:schemeClr val="tx1"/>
-                </a:solidFill>
-              </a:rPr>
-              <a:t>Web</a:t>
-            </a:r>
-          </a:p>
-        </p:txBody>
-      </p:sp>
-      <p:cxnSp>
-        <p:nvCxnSpPr>
-          <p:cNvPr id="52" name="Elbow Connector 51"/>
-          <p:cNvCxnSpPr>
-            <a:stCxn id="2" idx="0"/>
-            <a:endCxn id="51" idx="2"/>
-          </p:cNvCxnSpPr>
-          <p:nvPr/>
-        </p:nvCxnSpPr>
-        <p:spPr>
-          <a:xfrm rot="5400000" flipH="1" flipV="1">
-            <a:off x="2222648" y="1760922"/>
-            <a:ext cx="476678" cy="383835"/>
-          </a:xfrm>
-          <a:prstGeom prst="bentConnector2">
-            <a:avLst/>
-          </a:prstGeom>
-          <a:ln w="28575">
-            <a:solidFill>
-              <a:srgbClr val="00B050"/>
-            </a:solidFill>
-            <a:prstDash val="sysDot"/>
-            <a:tailEnd type="arrow"/>
-          </a:ln>
-        </p:spPr>
-        <p:style>
-          <a:lnRef idx="1">
-            <a:schemeClr val="accent1"/>
-          </a:lnRef>
-          <a:fillRef idx="0">
-            <a:schemeClr val="accent1"/>
-          </a:fillRef>
-          <a:effectRef idx="0">
-            <a:schemeClr val="accent1"/>
-          </a:effectRef>
-          <a:fontRef idx="minor">
-            <a:schemeClr val="tx1"/>
-          </a:fontRef>
-        </p:style>
-      </p:cxnSp>
       <p:sp>
         <p:nvSpPr>
           <p:cNvPr id="23" name="Rectangle 62"/>
@@ -9175,7 +9058,7 @@
         <p:spPr>
           <a:xfrm>
             <a:off x="1217465" y="1447800"/>
-            <a:ext cx="4917083" cy="3962400"/>
+            <a:ext cx="6021535" cy="3962400"/>
           </a:xfrm>
           <a:prstGeom prst="roundRect">
             <a:avLst>
@@ -9549,7 +9432,7 @@
         </p:nvSpPr>
         <p:spPr>
           <a:xfrm rot="16200000">
-            <a:off x="5703829" y="2464877"/>
+            <a:off x="6511670" y="2405430"/>
             <a:ext cx="2362201" cy="328045"/>
           </a:xfrm>
           <a:prstGeom prst="roundRect">
@@ -9609,7 +9492,7 @@
         </p:nvSpPr>
         <p:spPr>
           <a:xfrm>
-            <a:off x="2592528" y="3649359"/>
+            <a:off x="3984435" y="3703833"/>
             <a:ext cx="1093635" cy="236841"/>
           </a:xfrm>
           <a:prstGeom prst="rect">
@@ -9642,14 +9525,14 @@
           <a:p>
             <a:pPr algn="ctr"/>
             <a:r>
-              <a:rPr lang="en-US" sz="1050" b="1" dirty="0" err="1">
+              <a:rPr lang="en-US" altLang="zh-CN" sz="1050" b="1" dirty="0" err="1">
                 <a:solidFill>
                   <a:schemeClr val="accent3">
                     <a:lumMod val="75000"/>
                   </a:schemeClr>
                 </a:solidFill>
               </a:rPr>
-              <a:t>BrowserPanel</a:t>
+              <a:t>AllTasksPanel</a:t>
             </a:r>
             <a:endParaRPr lang="en-SG" sz="1050" b="1" dirty="0">
               <a:solidFill>
@@ -9663,14 +9546,14 @@
       </p:sp>
       <p:sp>
         <p:nvSpPr>
-          <p:cNvPr id="35" name="Rectangle 11"/>
+          <p:cNvPr id="36" name="Rectangle 11"/>
           <p:cNvSpPr/>
           <p:nvPr/>
         </p:nvSpPr>
         <p:spPr>
           <a:xfrm>
-            <a:off x="2592527" y="4563759"/>
-            <a:ext cx="1093635" cy="236841"/>
+            <a:off x="3984435" y="3985696"/>
+            <a:ext cx="1446074" cy="236841"/>
           </a:xfrm>
           <a:prstGeom prst="rect">
             <a:avLst/>
@@ -9702,14 +9585,14 @@
           <a:p>
             <a:pPr algn="ctr"/>
             <a:r>
-              <a:rPr lang="en-US" sz="1050" b="1" dirty="0" err="1">
+              <a:rPr lang="en-US" altLang="zh-CN" sz="1050" b="1" dirty="0" err="1">
                 <a:solidFill>
                   <a:schemeClr val="accent3">
                     <a:lumMod val="75000"/>
                   </a:schemeClr>
                 </a:solidFill>
               </a:rPr>
-              <a:t>StatusBarFooter</a:t>
+              <a:t>CompletedTasksPanel</a:t>
             </a:r>
             <a:endParaRPr lang="en-SG" sz="1050" b="1" dirty="0">
               <a:solidFill>
@@ -9723,73 +9606,13 @@
       </p:sp>
       <p:sp>
         <p:nvSpPr>
-          <p:cNvPr id="36" name="Rectangle 11"/>
-          <p:cNvSpPr/>
-          <p:nvPr/>
-        </p:nvSpPr>
-        <p:spPr>
-          <a:xfrm>
-            <a:off x="2592526" y="3991960"/>
-            <a:ext cx="1093635" cy="236841"/>
-          </a:xfrm>
-          <a:prstGeom prst="rect">
-            <a:avLst/>
-          </a:prstGeom>
-          <a:ln w="19050">
-            <a:solidFill>
-              <a:schemeClr val="accent3"/>
-            </a:solidFill>
-          </a:ln>
-          <a:effectLst/>
-        </p:spPr>
-        <p:style>
-          <a:lnRef idx="1">
-            <a:schemeClr val="accent3"/>
-          </a:lnRef>
-          <a:fillRef idx="2">
-            <a:schemeClr val="accent3"/>
-          </a:fillRef>
-          <a:effectRef idx="1">
-            <a:schemeClr val="accent3"/>
-          </a:effectRef>
-          <a:fontRef idx="minor">
-            <a:schemeClr val="dk1"/>
-          </a:fontRef>
-        </p:style>
-        <p:txBody>
-          <a:bodyPr rtlCol="0" anchor="ctr"/>
-          <a:lstStyle/>
-          <a:p>
-            <a:pPr algn="ctr"/>
-            <a:r>
-              <a:rPr lang="en-US" sz="1050" b="1" dirty="0" err="1" smtClean="0">
-                <a:solidFill>
-                  <a:schemeClr val="accent3">
-                    <a:lumMod val="75000"/>
-                  </a:schemeClr>
-                </a:solidFill>
-              </a:rPr>
-              <a:t>TaskListPanel</a:t>
-            </a:r>
-            <a:endParaRPr lang="en-SG" sz="1050" b="1" dirty="0">
-              <a:solidFill>
-                <a:schemeClr val="accent3">
-                  <a:lumMod val="75000"/>
-                </a:schemeClr>
-              </a:solidFill>
-            </a:endParaRPr>
-          </a:p>
-        </p:txBody>
-      </p:sp>
-      <p:sp>
-        <p:nvSpPr>
           <p:cNvPr id="37" name="Rectangle 11"/>
           <p:cNvSpPr/>
           <p:nvPr/>
         </p:nvSpPr>
         <p:spPr>
           <a:xfrm>
-            <a:off x="3839323" y="4228801"/>
+            <a:off x="6102419" y="3954832"/>
             <a:ext cx="1040906" cy="236841"/>
           </a:xfrm>
           <a:prstGeom prst="rect">
@@ -10038,7 +9861,17 @@
                   </a:schemeClr>
                 </a:solidFill>
               </a:rPr>
-              <a:t>ResultsDisplay</a:t>
+              <a:t>Result</a:t>
+            </a:r>
+            <a:r>
+              <a:rPr lang="en-US" altLang="zh-CN" sz="1050" b="1" dirty="0" err="1">
+                <a:solidFill>
+                  <a:schemeClr val="accent3">
+                    <a:lumMod val="75000"/>
+                  </a:schemeClr>
+                </a:solidFill>
+              </a:rPr>
+              <a:t>PopUp</a:t>
             </a:r>
             <a:endParaRPr lang="en-SG" sz="1050" b="1" dirty="0">
               <a:solidFill>
@@ -10050,88 +9883,6 @@
           </a:p>
         </p:txBody>
       </p:sp>
-      <p:cxnSp>
-        <p:nvCxnSpPr>
-          <p:cNvPr id="44" name="Elbow Connector 63"/>
-          <p:cNvCxnSpPr>
-            <a:stCxn id="39" idx="2"/>
-            <a:endCxn id="34" idx="1"/>
-          </p:cNvCxnSpPr>
-          <p:nvPr/>
-        </p:nvCxnSpPr>
-        <p:spPr>
-          <a:xfrm rot="16200000" flipH="1">
-            <a:off x="2054450" y="3229701"/>
-            <a:ext cx="899755" cy="176402"/>
-          </a:xfrm>
-          <a:prstGeom prst="bentConnector2">
-            <a:avLst/>
-          </a:prstGeom>
-          <a:ln w="19050">
-            <a:solidFill>
-              <a:schemeClr val="accent3"/>
-            </a:solidFill>
-            <a:headEnd type="none" w="med" len="med"/>
-            <a:tailEnd type="arrow" w="med" len="med"/>
-          </a:ln>
-          <a:effectLst/>
-        </p:spPr>
-        <p:style>
-          <a:lnRef idx="1">
-            <a:schemeClr val="accent2"/>
-          </a:lnRef>
-          <a:fillRef idx="2">
-            <a:schemeClr val="accent2"/>
-          </a:fillRef>
-          <a:effectRef idx="1">
-            <a:schemeClr val="accent2"/>
-          </a:effectRef>
-          <a:fontRef idx="minor">
-            <a:schemeClr val="dk1"/>
-          </a:fontRef>
-        </p:style>
-      </p:cxnSp>
-      <p:cxnSp>
-        <p:nvCxnSpPr>
-          <p:cNvPr id="47" name="Elbow Connector 63"/>
-          <p:cNvCxnSpPr>
-            <a:stCxn id="39" idx="2"/>
-            <a:endCxn id="36" idx="1"/>
-          </p:cNvCxnSpPr>
-          <p:nvPr/>
-        </p:nvCxnSpPr>
-        <p:spPr>
-          <a:xfrm rot="16200000" flipH="1">
-            <a:off x="1883148" y="3401003"/>
-            <a:ext cx="1242356" cy="176400"/>
-          </a:xfrm>
-          <a:prstGeom prst="bentConnector2">
-            <a:avLst/>
-          </a:prstGeom>
-          <a:ln w="19050">
-            <a:solidFill>
-              <a:schemeClr val="accent3"/>
-            </a:solidFill>
-            <a:headEnd type="none" w="med" len="med"/>
-            <a:tailEnd type="arrow" w="med" len="med"/>
-          </a:ln>
-          <a:effectLst/>
-        </p:spPr>
-        <p:style>
-          <a:lnRef idx="1">
-            <a:schemeClr val="accent2"/>
-          </a:lnRef>
-          <a:fillRef idx="2">
-            <a:schemeClr val="accent2"/>
-          </a:fillRef>
-          <a:effectRef idx="1">
-            <a:schemeClr val="accent2"/>
-          </a:effectRef>
-          <a:fontRef idx="minor">
-            <a:schemeClr val="dk1"/>
-          </a:fontRef>
-        </p:style>
-      </p:cxnSp>
       <p:cxnSp>
         <p:nvCxnSpPr>
           <p:cNvPr id="50" name="Elbow Connector 63"/>
@@ -10338,17 +10089,19 @@
           <p:cNvPr id="77" name="Elbow Connector 63"/>
           <p:cNvCxnSpPr>
             <a:stCxn id="16" idx="3"/>
-            <a:endCxn id="37" idx="3"/>
+            <a:endCxn id="37" idx="0"/>
           </p:cNvCxnSpPr>
           <p:nvPr/>
         </p:nvCxnSpPr>
         <p:spPr>
-          <a:xfrm rot="5400000">
-            <a:off x="4174488" y="2991741"/>
-            <a:ext cx="2061222" cy="649740"/>
-          </a:xfrm>
-          <a:prstGeom prst="bentConnector2">
-            <a:avLst/>
+          <a:xfrm rot="16200000" flipH="1">
+            <a:off x="5242004" y="2573964"/>
+            <a:ext cx="1668832" cy="1092903"/>
+          </a:xfrm>
+          <a:prstGeom prst="bentConnector3">
+            <a:avLst>
+              <a:gd name="adj1" fmla="val 50000"/>
+            </a:avLst>
           </a:prstGeom>
           <a:ln w="6350">
             <a:solidFill>
@@ -10379,17 +10132,19 @@
           <p:cNvPr id="82" name="Elbow Connector 63"/>
           <p:cNvCxnSpPr>
             <a:stCxn id="16" idx="3"/>
-            <a:endCxn id="34" idx="3"/>
+            <a:endCxn id="60" idx="0"/>
           </p:cNvCxnSpPr>
           <p:nvPr/>
         </p:nvCxnSpPr>
         <p:spPr>
           <a:xfrm rot="5400000">
-            <a:off x="3867176" y="2104987"/>
-            <a:ext cx="1481780" cy="1843806"/>
-          </a:xfrm>
-          <a:prstGeom prst="bentConnector2">
-            <a:avLst/>
+            <a:off x="3425990" y="1845877"/>
+            <a:ext cx="1663856" cy="2544102"/>
+          </a:xfrm>
+          <a:prstGeom prst="bentConnector3">
+            <a:avLst>
+              <a:gd name="adj1" fmla="val 83564"/>
+            </a:avLst>
           </a:prstGeom>
           <a:ln w="6350">
             <a:solidFill>
@@ -10607,8 +10362,8 @@
         </p:nvCxnSpPr>
         <p:spPr>
           <a:xfrm rot="5400000" flipH="1" flipV="1">
-            <a:off x="4594921" y="-355061"/>
-            <a:ext cx="170724" cy="4081246"/>
+            <a:off x="5004332" y="-761016"/>
+            <a:ext cx="167268" cy="4896612"/>
           </a:xfrm>
           <a:prstGeom prst="bentConnector2">
             <a:avLst/>
@@ -10725,7 +10480,7 @@
         </p:nvSpPr>
         <p:spPr>
           <a:xfrm rot="16200000">
-            <a:off x="6213739" y="4560376"/>
+            <a:off x="7014495" y="4560378"/>
             <a:ext cx="1371599" cy="328045"/>
           </a:xfrm>
           <a:prstGeom prst="roundRect">
@@ -11021,47 +10776,6 @@
       </p:cxnSp>
       <p:cxnSp>
         <p:nvCxnSpPr>
-          <p:cNvPr id="137" name="Elbow Connector 136"/>
-          <p:cNvCxnSpPr>
-            <a:stCxn id="36" idx="2"/>
-            <a:endCxn id="37" idx="1"/>
-          </p:cNvCxnSpPr>
-          <p:nvPr/>
-        </p:nvCxnSpPr>
-        <p:spPr>
-          <a:xfrm rot="16200000" flipH="1">
-            <a:off x="3430123" y="3938021"/>
-            <a:ext cx="118421" cy="699979"/>
-          </a:xfrm>
-          <a:prstGeom prst="bentConnector2">
-            <a:avLst/>
-          </a:prstGeom>
-          <a:ln w="19050">
-            <a:solidFill>
-              <a:schemeClr val="accent3"/>
-            </a:solidFill>
-            <a:headEnd type="none" w="med" len="med"/>
-            <a:tailEnd type="arrow" w="med" len="med"/>
-          </a:ln>
-          <a:effectLst/>
-        </p:spPr>
-        <p:style>
-          <a:lnRef idx="1">
-            <a:schemeClr val="accent2"/>
-          </a:lnRef>
-          <a:fillRef idx="2">
-            <a:schemeClr val="accent2"/>
-          </a:fillRef>
-          <a:effectRef idx="1">
-            <a:schemeClr val="accent2"/>
-          </a:effectRef>
-          <a:fontRef idx="minor">
-            <a:schemeClr val="dk1"/>
-          </a:fontRef>
-        </p:style>
-      </p:cxnSp>
-      <p:cxnSp>
-        <p:nvCxnSpPr>
           <p:cNvPr id="140" name="Elbow Connector 63"/>
           <p:cNvCxnSpPr>
             <a:stCxn id="16" idx="3"/>
@@ -11071,8 +10785,8 @@
         </p:nvCxnSpPr>
         <p:spPr>
           <a:xfrm rot="5400000">
-            <a:off x="3695875" y="2276286"/>
-            <a:ext cx="1824381" cy="1843808"/>
+            <a:off x="4571181" y="3145328"/>
+            <a:ext cx="1818117" cy="99460"/>
           </a:xfrm>
           <a:prstGeom prst="bentConnector2">
             <a:avLst/>
@@ -11162,8 +10876,8 @@
         </p:nvSpPr>
         <p:spPr>
           <a:xfrm>
-            <a:off x="3687515" y="2981202"/>
-            <a:ext cx="3048000" cy="203200"/>
+            <a:off x="3687514" y="2971801"/>
+            <a:ext cx="3841233" cy="212601"/>
           </a:xfrm>
           <a:custGeom>
             <a:avLst/>
@@ -11291,58 +11005,145 @@
       </p:sp>
       <p:sp>
         <p:nvSpPr>
-          <p:cNvPr id="118" name="Freeform 117"/>
+          <p:cNvPr id="56" name="Rectangle 11"/>
           <p:cNvSpPr/>
           <p:nvPr/>
         </p:nvSpPr>
         <p:spPr>
-          <a:xfrm flipV="1">
-            <a:off x="4114799" y="4472708"/>
-            <a:ext cx="2642195" cy="101600"/>
-          </a:xfrm>
-          <a:custGeom>
-            <a:avLst/>
-            <a:gdLst>
-              <a:gd name="connsiteX0" fmla="*/ 0 w 3048000"/>
-              <a:gd name="connsiteY0" fmla="*/ 203200 h 203200"/>
-              <a:gd name="connsiteX1" fmla="*/ 221673 w 3048000"/>
-              <a:gd name="connsiteY1" fmla="*/ 0 h 203200"/>
-              <a:gd name="connsiteX2" fmla="*/ 3048000 w 3048000"/>
-              <a:gd name="connsiteY2" fmla="*/ 0 h 203200"/>
-            </a:gdLst>
-            <a:ahLst/>
-            <a:cxnLst>
-              <a:cxn ang="0">
-                <a:pos x="connsiteX0" y="connsiteY0"/>
-              </a:cxn>
-              <a:cxn ang="0">
-                <a:pos x="connsiteX1" y="connsiteY1"/>
-              </a:cxn>
-              <a:cxn ang="0">
-                <a:pos x="connsiteX2" y="connsiteY2"/>
-              </a:cxn>
-            </a:cxnLst>
-            <a:rect l="l" t="t" r="r" b="b"/>
-            <a:pathLst>
-              <a:path w="3048000" h="203200">
-                <a:moveTo>
-                  <a:pt x="0" y="203200"/>
-                </a:moveTo>
-                <a:lnTo>
-                  <a:pt x="221673" y="0"/>
-                </a:lnTo>
-                <a:lnTo>
-                  <a:pt x="3048000" y="0"/>
-                </a:lnTo>
-              </a:path>
-            </a:pathLst>
-          </a:custGeom>
-          <a:noFill/>
+          <a:xfrm>
+            <a:off x="3983295" y="4273117"/>
+            <a:ext cx="1181577" cy="236841"/>
+          </a:xfrm>
+          <a:prstGeom prst="rect">
+            <a:avLst/>
+          </a:prstGeom>
           <a:ln w="19050">
             <a:solidFill>
               <a:schemeClr val="accent3"/>
             </a:solidFill>
-            <a:prstDash val="sysDot"/>
+          </a:ln>
+          <a:effectLst/>
+        </p:spPr>
+        <p:style>
+          <a:lnRef idx="1">
+            <a:schemeClr val="accent3"/>
+          </a:lnRef>
+          <a:fillRef idx="2">
+            <a:schemeClr val="accent3"/>
+          </a:fillRef>
+          <a:effectRef idx="1">
+            <a:schemeClr val="accent3"/>
+          </a:effectRef>
+          <a:fontRef idx="minor">
+            <a:schemeClr val="dk1"/>
+          </a:fontRef>
+        </p:style>
+        <p:txBody>
+          <a:bodyPr rtlCol="0" anchor="ctr"/>
+          <a:lstStyle/>
+          <a:p>
+            <a:pPr algn="ctr"/>
+            <a:r>
+              <a:rPr lang="en-US" altLang="zh-CN" sz="1050" b="1" dirty="0" err="1">
+                <a:solidFill>
+                  <a:schemeClr val="accent3">
+                    <a:lumMod val="75000"/>
+                  </a:schemeClr>
+                </a:solidFill>
+              </a:rPr>
+              <a:t>OtherTasksPanel</a:t>
+            </a:r>
+            <a:endParaRPr lang="en-SG" sz="1050" b="1" dirty="0">
+              <a:solidFill>
+                <a:schemeClr val="accent3">
+                  <a:lumMod val="75000"/>
+                </a:schemeClr>
+              </a:solidFill>
+            </a:endParaRPr>
+          </a:p>
+        </p:txBody>
+      </p:sp>
+      <p:sp>
+        <p:nvSpPr>
+          <p:cNvPr id="60" name="Rectangle 11"/>
+          <p:cNvSpPr/>
+          <p:nvPr/>
+        </p:nvSpPr>
+        <p:spPr>
+          <a:xfrm>
+            <a:off x="2573658" y="3949856"/>
+            <a:ext cx="824418" cy="236841"/>
+          </a:xfrm>
+          <a:prstGeom prst="rect">
+            <a:avLst/>
+          </a:prstGeom>
+          <a:ln w="19050">
+            <a:solidFill>
+              <a:schemeClr val="accent3"/>
+            </a:solidFill>
+          </a:ln>
+          <a:effectLst/>
+        </p:spPr>
+        <p:style>
+          <a:lnRef idx="1">
+            <a:schemeClr val="accent3"/>
+          </a:lnRef>
+          <a:fillRef idx="2">
+            <a:schemeClr val="accent3"/>
+          </a:fillRef>
+          <a:effectRef idx="1">
+            <a:schemeClr val="accent3"/>
+          </a:effectRef>
+          <a:fontRef idx="minor">
+            <a:schemeClr val="dk1"/>
+          </a:fontRef>
+        </p:style>
+        <p:txBody>
+          <a:bodyPr rtlCol="0" anchor="ctr"/>
+          <a:lstStyle/>
+          <a:p>
+            <a:pPr algn="ctr"/>
+            <a:r>
+              <a:rPr lang="en-US" altLang="zh-CN" sz="1050" b="1" dirty="0" err="1">
+                <a:solidFill>
+                  <a:schemeClr val="accent3">
+                    <a:lumMod val="75000"/>
+                  </a:schemeClr>
+                </a:solidFill>
+              </a:rPr>
+              <a:t>TasksPanel</a:t>
+            </a:r>
+            <a:endParaRPr lang="en-SG" sz="1050" b="1" dirty="0">
+              <a:solidFill>
+                <a:schemeClr val="accent3">
+                  <a:lumMod val="75000"/>
+                </a:schemeClr>
+              </a:solidFill>
+            </a:endParaRPr>
+          </a:p>
+        </p:txBody>
+      </p:sp>
+      <p:cxnSp>
+        <p:nvCxnSpPr>
+          <p:cNvPr id="61" name="Elbow Connector 63"/>
+          <p:cNvCxnSpPr>
+            <a:stCxn id="39" idx="2"/>
+            <a:endCxn id="60" idx="1"/>
+          </p:cNvCxnSpPr>
+          <p:nvPr/>
+        </p:nvCxnSpPr>
+        <p:spPr>
+          <a:xfrm rot="16200000" flipH="1">
+            <a:off x="1894766" y="3389385"/>
+            <a:ext cx="1200252" cy="157532"/>
+          </a:xfrm>
+          <a:prstGeom prst="bentConnector2">
+            <a:avLst/>
+          </a:prstGeom>
+          <a:ln w="19050">
+            <a:solidFill>
+              <a:schemeClr val="accent3"/>
+            </a:solidFill>
             <a:headEnd type="none" w="med" len="med"/>
             <a:tailEnd type="arrow" w="med" len="med"/>
           </a:ln>
@@ -11362,15 +11163,535 @@
             <a:schemeClr val="dk1"/>
           </a:fontRef>
         </p:style>
+      </p:cxnSp>
+      <p:sp>
+        <p:nvSpPr>
+          <p:cNvPr id="75" name="Isosceles Triangle 102"/>
+          <p:cNvSpPr/>
+          <p:nvPr/>
+        </p:nvSpPr>
+        <p:spPr>
+          <a:xfrm rot="5400000" flipV="1">
+            <a:off x="3370178" y="4013800"/>
+            <a:ext cx="160849" cy="96644"/>
+          </a:xfrm>
+          <a:prstGeom prst="triangle">
+            <a:avLst/>
+          </a:prstGeom>
+          <a:ln w="6350">
+            <a:solidFill>
+              <a:schemeClr val="accent3"/>
+            </a:solidFill>
+          </a:ln>
+          <a:effectLst/>
+        </p:spPr>
+        <p:style>
+          <a:lnRef idx="1">
+            <a:schemeClr val="accent3"/>
+          </a:lnRef>
+          <a:fillRef idx="2">
+            <a:schemeClr val="accent3"/>
+          </a:fillRef>
+          <a:effectRef idx="1">
+            <a:schemeClr val="accent3"/>
+          </a:effectRef>
+          <a:fontRef idx="minor">
+            <a:schemeClr val="dk1"/>
+          </a:fontRef>
+        </p:style>
         <p:txBody>
           <a:bodyPr rtlCol="0" anchor="ctr"/>
           <a:lstStyle/>
           <a:p>
             <a:pPr algn="ctr"/>
+            <a:endParaRPr lang="en-SG" sz="1050" b="1">
+              <a:solidFill>
+                <a:srgbClr val="92D050"/>
+              </a:solidFill>
+            </a:endParaRPr>
+          </a:p>
+        </p:txBody>
+      </p:sp>
+      <p:cxnSp>
+        <p:nvCxnSpPr>
+          <p:cNvPr id="54" name="Elbow Connector 53"/>
+          <p:cNvCxnSpPr>
+            <a:stCxn id="75" idx="3"/>
+            <a:endCxn id="34" idx="1"/>
+          </p:cNvCxnSpPr>
+          <p:nvPr/>
+        </p:nvCxnSpPr>
+        <p:spPr>
+          <a:xfrm flipV="1">
+            <a:off x="3498925" y="3822254"/>
+            <a:ext cx="485510" cy="239869"/>
+          </a:xfrm>
+          <a:prstGeom prst="bentConnector3">
+            <a:avLst/>
+          </a:prstGeom>
+        </p:spPr>
+        <p:style>
+          <a:lnRef idx="1">
+            <a:schemeClr val="accent3"/>
+          </a:lnRef>
+          <a:fillRef idx="0">
+            <a:schemeClr val="accent3"/>
+          </a:fillRef>
+          <a:effectRef idx="0">
+            <a:schemeClr val="accent3"/>
+          </a:effectRef>
+          <a:fontRef idx="minor">
+            <a:schemeClr val="tx1"/>
+          </a:fontRef>
+        </p:style>
+      </p:cxnSp>
+      <p:cxnSp>
+        <p:nvCxnSpPr>
+          <p:cNvPr id="83" name="Elbow Connector 82"/>
+          <p:cNvCxnSpPr>
+            <a:endCxn id="36" idx="1"/>
+          </p:cNvCxnSpPr>
+          <p:nvPr/>
+        </p:nvCxnSpPr>
+        <p:spPr>
+          <a:xfrm>
+            <a:off x="3498925" y="4062123"/>
+            <a:ext cx="485510" cy="41994"/>
+          </a:xfrm>
+          <a:prstGeom prst="bentConnector3">
+            <a:avLst/>
+          </a:prstGeom>
+        </p:spPr>
+        <p:style>
+          <a:lnRef idx="1">
+            <a:schemeClr val="accent3"/>
+          </a:lnRef>
+          <a:fillRef idx="0">
+            <a:schemeClr val="accent3"/>
+          </a:fillRef>
+          <a:effectRef idx="0">
+            <a:schemeClr val="accent3"/>
+          </a:effectRef>
+          <a:fontRef idx="minor">
+            <a:schemeClr val="tx1"/>
+          </a:fontRef>
+        </p:style>
+      </p:cxnSp>
+      <p:cxnSp>
+        <p:nvCxnSpPr>
+          <p:cNvPr id="85" name="Elbow Connector 84"/>
+          <p:cNvCxnSpPr>
+            <a:endCxn id="56" idx="1"/>
+          </p:cNvCxnSpPr>
+          <p:nvPr/>
+        </p:nvCxnSpPr>
+        <p:spPr>
+          <a:xfrm>
+            <a:off x="3498925" y="4062123"/>
+            <a:ext cx="484370" cy="329415"/>
+          </a:xfrm>
+          <a:prstGeom prst="bentConnector3">
+            <a:avLst/>
+          </a:prstGeom>
+        </p:spPr>
+        <p:style>
+          <a:lnRef idx="1">
+            <a:schemeClr val="accent3"/>
+          </a:lnRef>
+          <a:fillRef idx="0">
+            <a:schemeClr val="accent3"/>
+          </a:fillRef>
+          <a:effectRef idx="0">
+            <a:schemeClr val="accent3"/>
+          </a:effectRef>
+          <a:fontRef idx="minor">
+            <a:schemeClr val="tx1"/>
+          </a:fontRef>
+        </p:style>
+      </p:cxnSp>
+      <p:sp>
+        <p:nvSpPr>
+          <p:cNvPr id="35" name="Rectangle 11"/>
+          <p:cNvSpPr/>
+          <p:nvPr/>
+        </p:nvSpPr>
+        <p:spPr>
+          <a:xfrm>
+            <a:off x="2592527" y="4563759"/>
+            <a:ext cx="1093635" cy="236841"/>
+          </a:xfrm>
+          <a:prstGeom prst="rect">
+            <a:avLst/>
+          </a:prstGeom>
+          <a:ln w="19050">
+            <a:solidFill>
+              <a:schemeClr val="accent3"/>
+            </a:solidFill>
+          </a:ln>
+          <a:effectLst/>
+        </p:spPr>
+        <p:style>
+          <a:lnRef idx="1">
+            <a:schemeClr val="accent3"/>
+          </a:lnRef>
+          <a:fillRef idx="2">
+            <a:schemeClr val="accent3"/>
+          </a:fillRef>
+          <a:effectRef idx="1">
+            <a:schemeClr val="accent3"/>
+          </a:effectRef>
+          <a:fontRef idx="minor">
+            <a:schemeClr val="dk1"/>
+          </a:fontRef>
+        </p:style>
+        <p:txBody>
+          <a:bodyPr rtlCol="0" anchor="ctr"/>
+          <a:lstStyle/>
+          <a:p>
+            <a:pPr algn="ctr"/>
+            <a:r>
+              <a:rPr lang="en-US" sz="1050" b="1" dirty="0" err="1">
+                <a:solidFill>
+                  <a:schemeClr val="accent3">
+                    <a:lumMod val="75000"/>
+                  </a:schemeClr>
+                </a:solidFill>
+              </a:rPr>
+              <a:t>StatusBarFooter</a:t>
+            </a:r>
+            <a:endParaRPr lang="en-SG" sz="1050" b="1" dirty="0">
+              <a:solidFill>
+                <a:schemeClr val="accent3">
+                  <a:lumMod val="75000"/>
+                </a:schemeClr>
+              </a:solidFill>
+            </a:endParaRPr>
+          </a:p>
+        </p:txBody>
+      </p:sp>
+      <p:cxnSp>
+        <p:nvCxnSpPr>
+          <p:cNvPr id="96" name="Elbow Connector 95"/>
+          <p:cNvCxnSpPr>
+            <a:stCxn id="60" idx="2"/>
+          </p:cNvCxnSpPr>
+          <p:nvPr/>
+        </p:nvCxnSpPr>
+        <p:spPr>
+          <a:xfrm rot="16200000" flipH="1">
+            <a:off x="5088258" y="2084305"/>
+            <a:ext cx="345624" cy="4550407"/>
+          </a:xfrm>
+          <a:prstGeom prst="bentConnector2">
+            <a:avLst/>
+          </a:prstGeom>
+          <a:ln w="19050">
+            <a:solidFill>
+              <a:schemeClr val="accent3"/>
+            </a:solidFill>
+            <a:prstDash val="sysDash"/>
+            <a:headEnd type="none" w="med" len="med"/>
+            <a:tailEnd type="arrow" w="med" len="med"/>
+          </a:ln>
+          <a:effectLst/>
+        </p:spPr>
+        <p:style>
+          <a:lnRef idx="1">
+            <a:schemeClr val="accent2"/>
+          </a:lnRef>
+          <a:fillRef idx="2">
+            <a:schemeClr val="accent2"/>
+          </a:fillRef>
+          <a:effectRef idx="1">
+            <a:schemeClr val="accent2"/>
+          </a:effectRef>
+          <a:fontRef idx="minor">
+            <a:schemeClr val="dk1"/>
+          </a:fontRef>
+        </p:style>
+      </p:cxnSp>
+      <p:cxnSp>
+        <p:nvCxnSpPr>
+          <p:cNvPr id="109" name="Elbow Connector 108"/>
+          <p:cNvCxnSpPr>
+            <a:stCxn id="56" idx="3"/>
+            <a:endCxn id="37" idx="1"/>
+          </p:cNvCxnSpPr>
+          <p:nvPr/>
+        </p:nvCxnSpPr>
+        <p:spPr>
+          <a:xfrm flipV="1">
+            <a:off x="5164872" y="4073253"/>
+            <a:ext cx="937547" cy="318285"/>
+          </a:xfrm>
+          <a:prstGeom prst="bentConnector3">
+            <a:avLst>
+              <a:gd name="adj1" fmla="val 50000"/>
+            </a:avLst>
+          </a:prstGeom>
+          <a:ln w="19050">
+            <a:solidFill>
+              <a:schemeClr val="accent3"/>
+            </a:solidFill>
+            <a:headEnd type="none" w="med" len="med"/>
+            <a:tailEnd type="arrow" w="med" len="med"/>
+          </a:ln>
+          <a:effectLst/>
+        </p:spPr>
+        <p:style>
+          <a:lnRef idx="1">
+            <a:schemeClr val="accent2"/>
+          </a:lnRef>
+          <a:fillRef idx="2">
+            <a:schemeClr val="accent2"/>
+          </a:fillRef>
+          <a:effectRef idx="1">
+            <a:schemeClr val="accent2"/>
+          </a:effectRef>
+          <a:fontRef idx="minor">
+            <a:schemeClr val="dk1"/>
+          </a:fontRef>
+        </p:style>
+      </p:cxnSp>
+      <p:cxnSp>
+        <p:nvCxnSpPr>
+          <p:cNvPr id="112" name="Elbow Connector 111"/>
+          <p:cNvCxnSpPr>
+            <a:endCxn id="37" idx="1"/>
+          </p:cNvCxnSpPr>
+          <p:nvPr/>
+        </p:nvCxnSpPr>
+        <p:spPr>
+          <a:xfrm>
+            <a:off x="5415616" y="4069923"/>
+            <a:ext cx="686803" cy="3330"/>
+          </a:xfrm>
+          <a:prstGeom prst="bentConnector3">
+            <a:avLst>
+              <a:gd name="adj1" fmla="val 50000"/>
+            </a:avLst>
+          </a:prstGeom>
+          <a:ln w="19050">
+            <a:solidFill>
+              <a:schemeClr val="accent3"/>
+            </a:solidFill>
+            <a:headEnd type="none" w="med" len="med"/>
+            <a:tailEnd type="arrow" w="med" len="med"/>
+          </a:ln>
+          <a:effectLst/>
+        </p:spPr>
+        <p:style>
+          <a:lnRef idx="1">
+            <a:schemeClr val="accent2"/>
+          </a:lnRef>
+          <a:fillRef idx="2">
+            <a:schemeClr val="accent2"/>
+          </a:fillRef>
+          <a:effectRef idx="1">
+            <a:schemeClr val="accent2"/>
+          </a:effectRef>
+          <a:fontRef idx="minor">
+            <a:schemeClr val="dk1"/>
+          </a:fontRef>
+        </p:style>
+      </p:cxnSp>
+      <p:sp>
+        <p:nvSpPr>
+          <p:cNvPr id="123" name="Rectangle 122"/>
+          <p:cNvSpPr/>
+          <p:nvPr/>
+        </p:nvSpPr>
+        <p:spPr>
+          <a:xfrm>
+            <a:off x="5421784" y="3975582"/>
+            <a:ext cx="229325" cy="166560"/>
+          </a:xfrm>
+          <a:prstGeom prst="rect">
+            <a:avLst/>
+          </a:prstGeom>
+          <a:solidFill>
+            <a:schemeClr val="accent3">
+              <a:lumMod val="20000"/>
+              <a:lumOff val="80000"/>
+              <a:alpha val="80000"/>
+            </a:schemeClr>
+          </a:solidFill>
+          <a:ln>
+            <a:noFill/>
+          </a:ln>
+          <a:effectLst>
+            <a:softEdge rad="31750"/>
+          </a:effectLst>
+        </p:spPr>
+        <p:style>
+          <a:lnRef idx="2">
+            <a:schemeClr val="accent1">
+              <a:shade val="50000"/>
+            </a:schemeClr>
+          </a:lnRef>
+          <a:fillRef idx="1">
+            <a:schemeClr val="accent1"/>
+          </a:fillRef>
+          <a:effectRef idx="0">
+            <a:schemeClr val="accent1"/>
+          </a:effectRef>
+          <a:fontRef idx="minor">
+            <a:schemeClr val="lt1"/>
+          </a:fontRef>
+        </p:style>
+        <p:txBody>
+          <a:bodyPr rtlCol="0" anchor="ctr"/>
+          <a:lstStyle/>
+          <a:p>
+            <a:pPr algn="ctr"/>
             <a:endParaRPr lang="en-SG"/>
           </a:p>
         </p:txBody>
       </p:sp>
+      <p:cxnSp>
+        <p:nvCxnSpPr>
+          <p:cNvPr id="125" name="Elbow Connector 124"/>
+          <p:cNvCxnSpPr>
+            <a:stCxn id="34" idx="3"/>
+            <a:endCxn id="37" idx="1"/>
+          </p:cNvCxnSpPr>
+          <p:nvPr/>
+        </p:nvCxnSpPr>
+        <p:spPr>
+          <a:xfrm>
+            <a:off x="5078070" y="3822254"/>
+            <a:ext cx="1024349" cy="250999"/>
+          </a:xfrm>
+          <a:prstGeom prst="bentConnector3">
+            <a:avLst>
+              <a:gd name="adj1" fmla="val 50000"/>
+            </a:avLst>
+          </a:prstGeom>
+          <a:ln w="19050">
+            <a:solidFill>
+              <a:schemeClr val="accent3"/>
+            </a:solidFill>
+            <a:headEnd type="none" w="med" len="med"/>
+            <a:tailEnd type="arrow" w="med" len="med"/>
+          </a:ln>
+          <a:effectLst/>
+        </p:spPr>
+        <p:style>
+          <a:lnRef idx="1">
+            <a:schemeClr val="accent2"/>
+          </a:lnRef>
+          <a:fillRef idx="2">
+            <a:schemeClr val="accent2"/>
+          </a:fillRef>
+          <a:effectRef idx="1">
+            <a:schemeClr val="accent2"/>
+          </a:effectRef>
+          <a:fontRef idx="minor">
+            <a:schemeClr val="dk1"/>
+          </a:fontRef>
+        </p:style>
+      </p:cxnSp>
+      <p:sp>
+        <p:nvSpPr>
+          <p:cNvPr id="133" name="Rectangle 62"/>
+          <p:cNvSpPr/>
+          <p:nvPr/>
+        </p:nvSpPr>
+        <p:spPr>
+          <a:xfrm>
+            <a:off x="3340087" y="2599727"/>
+            <a:ext cx="1410784" cy="270031"/>
+          </a:xfrm>
+          <a:prstGeom prst="rect">
+            <a:avLst/>
+          </a:prstGeom>
+          <a:solidFill>
+            <a:srgbClr val="00B050"/>
+          </a:solidFill>
+          <a:ln w="19050">
+            <a:solidFill>
+              <a:srgbClr val="00B050"/>
+            </a:solidFill>
+          </a:ln>
+          <a:effectLst/>
+        </p:spPr>
+        <p:style>
+          <a:lnRef idx="1">
+            <a:schemeClr val="accent2"/>
+          </a:lnRef>
+          <a:fillRef idx="2">
+            <a:schemeClr val="accent2"/>
+          </a:fillRef>
+          <a:effectRef idx="1">
+            <a:schemeClr val="accent2"/>
+          </a:effectRef>
+          <a:fontRef idx="minor">
+            <a:schemeClr val="dk1"/>
+          </a:fontRef>
+        </p:style>
+        <p:txBody>
+          <a:bodyPr rtlCol="0" anchor="ctr"/>
+          <a:lstStyle/>
+          <a:p>
+            <a:pPr algn="ctr"/>
+            <a:r>
+              <a:rPr lang="en-US" altLang="zh-CN" sz="1050" dirty="0" err="1">
+                <a:solidFill>
+                  <a:schemeClr val="bg1"/>
+                </a:solidFill>
+              </a:rPr>
+              <a:t>CommandBoxHistory</a:t>
+            </a:r>
+            <a:endParaRPr lang="en-SG" sz="1050" dirty="0">
+              <a:solidFill>
+                <a:schemeClr val="bg1"/>
+              </a:solidFill>
+            </a:endParaRPr>
+          </a:p>
+        </p:txBody>
+      </p:sp>
+      <p:cxnSp>
+        <p:nvCxnSpPr>
+          <p:cNvPr id="134" name="Elbow Connector 133"/>
+          <p:cNvCxnSpPr>
+            <a:stCxn id="3" idx="0"/>
+            <a:endCxn id="133" idx="1"/>
+          </p:cNvCxnSpPr>
+          <p:nvPr/>
+        </p:nvCxnSpPr>
+        <p:spPr>
+          <a:xfrm rot="5400000" flipH="1" flipV="1">
+            <a:off x="3017508" y="2856582"/>
+            <a:ext cx="444417" cy="200741"/>
+          </a:xfrm>
+          <a:prstGeom prst="bentConnector2">
+            <a:avLst/>
+          </a:prstGeom>
+          <a:ln w="19050">
+            <a:solidFill>
+              <a:srgbClr val="00B050"/>
+            </a:solidFill>
+            <a:prstDash val="solid"/>
+            <a:headEnd type="none" w="med" len="med"/>
+            <a:tailEnd type="arrow" w="med" len="med"/>
+          </a:ln>
+          <a:effectLst/>
+        </p:spPr>
+        <p:style>
+          <a:lnRef idx="1">
+            <a:schemeClr val="accent2"/>
+          </a:lnRef>
+          <a:fillRef idx="2">
+            <a:schemeClr val="accent2"/>
+          </a:fillRef>
+          <a:effectRef idx="1">
+            <a:schemeClr val="accent2"/>
+          </a:effectRef>
+          <a:fontRef idx="minor">
+            <a:schemeClr val="dk1"/>
+          </a:fontRef>
+        </p:style>
+      </p:cxnSp>
     </p:spTree>
     <p:extLst>
       <p:ext uri="{BB962C8B-B14F-4D97-AF65-F5344CB8AC3E}">

</xml_diff>

<commit_message>
Update diagrams in DevGuide.
</commit_message>
<xml_diff>
--- a/docs/diagrams/Diagrams.pptx
+++ b/docs/diagrams/Diagrams.pptx
@@ -5806,24 +5806,14 @@
           <a:lstStyle/>
           <a:p>
             <a:r>
-              <a:rPr lang="en-US" sz="1400" dirty="0" err="1" smtClean="0">
+              <a:rPr lang="en-US" sz="1400" dirty="0" smtClean="0">
                 <a:solidFill>
                   <a:schemeClr val="accent5">
                     <a:lumMod val="75000"/>
                   </a:schemeClr>
                 </a:solidFill>
               </a:rPr>
-              <a:t>postToDoListChangedEvent</a:t>
-            </a:r>
-            <a:r>
-              <a:rPr lang="en-US" sz="1400" dirty="0" smtClean="0">
-                <a:solidFill>
-                  <a:schemeClr val="accent5">
-                    <a:lumMod val="75000"/>
-                  </a:schemeClr>
-                </a:solidFill>
-              </a:rPr>
-              <a:t>()</a:t>
+              <a:t>postToDoListChangedEvent()</a:t>
             </a:r>
             <a:endParaRPr lang="en-US" sz="1400" dirty="0">
               <a:solidFill>
@@ -6370,7 +6360,7 @@
           <a:lstStyle/>
           <a:p>
             <a:r>
-              <a:rPr lang="en-US" sz="1400" dirty="0" err="1" smtClean="0">
+              <a:rPr lang="en-US" sz="1400" dirty="0" smtClean="0">
                 <a:solidFill>
                   <a:schemeClr val="accent5">
                     <a:lumMod val="75000"/>

</xml_diff>

<commit_message>
Update Logic sequence and Model diagram images
</commit_message>
<xml_diff>
--- a/docs/diagrams/Diagrams.pptx
+++ b/docs/diagrams/Diagrams.pptx
@@ -216,7 +216,7 @@
           <a:p>
             <a:fld id="{F5CC4B3F-88C1-4FFA-B1B6-F41C21DC6924}" type="datetimeFigureOut">
               <a:rPr lang="en-US" smtClean="0"/>
-              <a:t>10/30/16</a:t>
+              <a:t>10/31/2016</a:t>
             </a:fld>
             <a:endParaRPr lang="en-US"/>
           </a:p>
@@ -665,7 +665,7 @@
           <a:p>
             <a:fld id="{78C97017-6FC3-485B-9764-EAC9E56C1D49}" type="datetimeFigureOut">
               <a:rPr lang="en-US" smtClean="0"/>
-              <a:t>10/30/16</a:t>
+              <a:t>10/31/2016</a:t>
             </a:fld>
             <a:endParaRPr lang="en-US"/>
           </a:p>
@@ -835,7 +835,7 @@
           <a:p>
             <a:fld id="{78C97017-6FC3-485B-9764-EAC9E56C1D49}" type="datetimeFigureOut">
               <a:rPr lang="en-US" smtClean="0"/>
-              <a:t>10/30/16</a:t>
+              <a:t>10/31/2016</a:t>
             </a:fld>
             <a:endParaRPr lang="en-US"/>
           </a:p>
@@ -1015,7 +1015,7 @@
           <a:p>
             <a:fld id="{78C97017-6FC3-485B-9764-EAC9E56C1D49}" type="datetimeFigureOut">
               <a:rPr lang="en-US" smtClean="0"/>
-              <a:t>10/30/16</a:t>
+              <a:t>10/31/2016</a:t>
             </a:fld>
             <a:endParaRPr lang="en-US"/>
           </a:p>
@@ -1185,7 +1185,7 @@
           <a:p>
             <a:fld id="{78C97017-6FC3-485B-9764-EAC9E56C1D49}" type="datetimeFigureOut">
               <a:rPr lang="en-US" smtClean="0"/>
-              <a:t>10/30/16</a:t>
+              <a:t>10/31/2016</a:t>
             </a:fld>
             <a:endParaRPr lang="en-US"/>
           </a:p>
@@ -1431,7 +1431,7 @@
           <a:p>
             <a:fld id="{78C97017-6FC3-485B-9764-EAC9E56C1D49}" type="datetimeFigureOut">
               <a:rPr lang="en-US" smtClean="0"/>
-              <a:t>10/30/16</a:t>
+              <a:t>10/31/2016</a:t>
             </a:fld>
             <a:endParaRPr lang="en-US"/>
           </a:p>
@@ -1719,7 +1719,7 @@
           <a:p>
             <a:fld id="{78C97017-6FC3-485B-9764-EAC9E56C1D49}" type="datetimeFigureOut">
               <a:rPr lang="en-US" smtClean="0"/>
-              <a:t>10/30/16</a:t>
+              <a:t>10/31/2016</a:t>
             </a:fld>
             <a:endParaRPr lang="en-US"/>
           </a:p>
@@ -2141,7 +2141,7 @@
           <a:p>
             <a:fld id="{78C97017-6FC3-485B-9764-EAC9E56C1D49}" type="datetimeFigureOut">
               <a:rPr lang="en-US" smtClean="0"/>
-              <a:t>10/30/16</a:t>
+              <a:t>10/31/2016</a:t>
             </a:fld>
             <a:endParaRPr lang="en-US"/>
           </a:p>
@@ -2259,7 +2259,7 @@
           <a:p>
             <a:fld id="{78C97017-6FC3-485B-9764-EAC9E56C1D49}" type="datetimeFigureOut">
               <a:rPr lang="en-US" smtClean="0"/>
-              <a:t>10/30/16</a:t>
+              <a:t>10/31/2016</a:t>
             </a:fld>
             <a:endParaRPr lang="en-US"/>
           </a:p>
@@ -2354,7 +2354,7 @@
           <a:p>
             <a:fld id="{78C97017-6FC3-485B-9764-EAC9E56C1D49}" type="datetimeFigureOut">
               <a:rPr lang="en-US" smtClean="0"/>
-              <a:t>10/30/16</a:t>
+              <a:t>10/31/2016</a:t>
             </a:fld>
             <a:endParaRPr lang="en-US"/>
           </a:p>
@@ -2631,7 +2631,7 @@
           <a:p>
             <a:fld id="{78C97017-6FC3-485B-9764-EAC9E56C1D49}" type="datetimeFigureOut">
               <a:rPr lang="en-US" smtClean="0"/>
-              <a:t>10/30/16</a:t>
+              <a:t>10/31/2016</a:t>
             </a:fld>
             <a:endParaRPr lang="en-US"/>
           </a:p>
@@ -2884,7 +2884,7 @@
           <a:p>
             <a:fld id="{78C97017-6FC3-485B-9764-EAC9E56C1D49}" type="datetimeFigureOut">
               <a:rPr lang="en-US" smtClean="0"/>
-              <a:t>10/30/16</a:t>
+              <a:t>10/31/2016</a:t>
             </a:fld>
             <a:endParaRPr lang="en-US"/>
           </a:p>
@@ -3097,7 +3097,7 @@
           <a:p>
             <a:fld id="{78C97017-6FC3-485B-9764-EAC9E56C1D49}" type="datetimeFigureOut">
               <a:rPr lang="en-US" smtClean="0"/>
-              <a:t>10/30/16</a:t>
+              <a:t>10/31/2016</a:t>
             </a:fld>
             <a:endParaRPr lang="en-US"/>
           </a:p>
@@ -8124,17 +8124,7 @@
                   </a:schemeClr>
                 </a:solidFill>
               </a:rPr>
-              <a:t>Todo</a:t>
-            </a:r>
-            <a:r>
-              <a:rPr lang="en-US" sz="1050" b="1" dirty="0" err="1" smtClean="0">
-                <a:solidFill>
-                  <a:schemeClr val="accent3">
-                    <a:lumMod val="75000"/>
-                  </a:schemeClr>
-                </a:solidFill>
-              </a:rPr>
-              <a:t>Card</a:t>
+              <a:t>TodoCard</a:t>
             </a:r>
             <a:endParaRPr lang="en-SG" sz="1050" b="1" dirty="0">
               <a:solidFill>
@@ -9992,17 +9982,7 @@
                   </a:schemeClr>
                 </a:solidFill>
               </a:rPr>
-              <a:t>Task</a:t>
-            </a:r>
-            <a:r>
-              <a:rPr lang="en-US" sz="1050" b="1" dirty="0" err="1" smtClean="0">
-                <a:solidFill>
-                  <a:schemeClr val="accent3">
-                    <a:lumMod val="75000"/>
-                  </a:schemeClr>
-                </a:solidFill>
-              </a:rPr>
-              <a:t>ListPanel</a:t>
+              <a:t>TaskListPanel</a:t>
             </a:r>
             <a:endParaRPr lang="en-SG" sz="1050" b="1" dirty="0">
               <a:solidFill>
@@ -12779,7 +12759,7 @@
         <p:spPr>
           <a:xfrm>
             <a:off x="5447899" y="3376025"/>
-            <a:ext cx="151796" cy="717208"/>
+            <a:ext cx="132310" cy="353586"/>
           </a:xfrm>
           <a:prstGeom prst="rect">
             <a:avLst/>
@@ -12834,42 +12814,6 @@
           <a:ln w="19050">
             <a:solidFill>
               <a:srgbClr val="00B050"/>
-            </a:solidFill>
-            <a:tailEnd type="arrow"/>
-          </a:ln>
-        </p:spPr>
-        <p:style>
-          <a:lnRef idx="1">
-            <a:schemeClr val="accent1"/>
-          </a:lnRef>
-          <a:fillRef idx="0">
-            <a:schemeClr val="accent1"/>
-          </a:fillRef>
-          <a:effectRef idx="0">
-            <a:schemeClr val="accent1"/>
-          </a:effectRef>
-          <a:fontRef idx="minor">
-            <a:schemeClr val="tx1"/>
-          </a:fontRef>
-        </p:style>
-      </p:cxnSp>
-      <p:cxnSp>
-        <p:nvCxnSpPr>
-          <p:cNvPr id="111" name="Straight Arrow Connector 110"/>
-          <p:cNvCxnSpPr/>
-          <p:nvPr/>
-        </p:nvCxnSpPr>
-        <p:spPr>
-          <a:xfrm>
-            <a:off x="1845084" y="4023529"/>
-            <a:ext cx="3621554" cy="0"/>
-          </a:xfrm>
-          <a:prstGeom prst="straightConnector1">
-            <a:avLst/>
-          </a:prstGeom>
-          <a:ln w="19050">
-            <a:solidFill>
-              <a:srgbClr val="0070C0"/>
             </a:solidFill>
             <a:tailEnd type="arrow"/>
           </a:ln>
@@ -12974,7 +12918,7 @@
         </p:nvSpPr>
         <p:spPr>
           <a:xfrm>
-            <a:off x="4162073" y="4386825"/>
+            <a:off x="3923537" y="3992984"/>
             <a:ext cx="855809" cy="215444"/>
           </a:xfrm>
           <a:prstGeom prst="rect">
@@ -13193,7 +13137,7 @@
         </p:nvCxnSpPr>
         <p:spPr>
           <a:xfrm>
-            <a:off x="1828119" y="4665695"/>
+            <a:off x="1815269" y="4270555"/>
             <a:ext cx="3612540" cy="0"/>
           </a:xfrm>
           <a:prstGeom prst="straightConnector1">
@@ -13229,8 +13173,8 @@
         </p:nvSpPr>
         <p:spPr>
           <a:xfrm>
-            <a:off x="5427809" y="4495317"/>
-            <a:ext cx="152400" cy="1191256"/>
+            <a:off x="5427809" y="4066657"/>
+            <a:ext cx="162786" cy="1619916"/>
           </a:xfrm>
           <a:prstGeom prst="rect">
             <a:avLst/>
@@ -13488,7 +13432,7 @@
         </p:nvSpPr>
         <p:spPr>
           <a:xfrm>
-            <a:off x="6688358" y="4397897"/>
+            <a:off x="6231178" y="4005047"/>
             <a:ext cx="1424846" cy="215444"/>
           </a:xfrm>
           <a:prstGeom prst="rect">
@@ -13955,61 +13899,14 @@
       </p:sp>
       <p:sp>
         <p:nvSpPr>
-          <p:cNvPr id="136" name="TextBox 135"/>
-          <p:cNvSpPr txBox="1"/>
-          <p:nvPr/>
-        </p:nvSpPr>
-        <p:spPr>
-          <a:xfrm>
-            <a:off x="2971260" y="3777003"/>
-            <a:ext cx="2362201" cy="215444"/>
-          </a:xfrm>
-          <a:prstGeom prst="rect">
-            <a:avLst/>
-          </a:prstGeom>
-          <a:noFill/>
-        </p:spPr>
-        <p:txBody>
-          <a:bodyPr wrap="square" lIns="0" tIns="0" rIns="0" bIns="0" rtlCol="0">
-            <a:spAutoFit/>
-          </a:bodyPr>
-          <a:lstStyle/>
-          <a:p>
-            <a:pPr algn="r"/>
-            <a:r>
-              <a:rPr lang="en-US" sz="1400" dirty="0" err="1" smtClean="0">
-                <a:solidFill>
-                  <a:srgbClr val="0070C0"/>
-                </a:solidFill>
-              </a:rPr>
-              <a:t>saveStateIfNeeded</a:t>
-            </a:r>
-            <a:r>
-              <a:rPr lang="en-US" sz="1400" dirty="0" smtClean="0">
-                <a:solidFill>
-                  <a:srgbClr val="0070C0"/>
-                </a:solidFill>
-              </a:rPr>
-              <a:t>(“delete d1”)</a:t>
-            </a:r>
-            <a:endParaRPr lang="en-US" sz="1400" dirty="0">
-              <a:solidFill>
-                <a:srgbClr val="0070C0"/>
-              </a:solidFill>
-            </a:endParaRPr>
-          </a:p>
-        </p:txBody>
-      </p:sp>
-      <p:sp>
-        <p:nvSpPr>
           <p:cNvPr id="137" name="TextBox 136"/>
           <p:cNvSpPr txBox="1"/>
           <p:nvPr/>
         </p:nvSpPr>
         <p:spPr>
           <a:xfrm>
-            <a:off x="6264436" y="3752277"/>
-            <a:ext cx="1706478" cy="215444"/>
+            <a:off x="6000989" y="4375982"/>
+            <a:ext cx="2076211" cy="215444"/>
           </a:xfrm>
           <a:prstGeom prst="rect">
             <a:avLst/>
@@ -14039,7 +13936,7 @@
                   <a:srgbClr val="7030A0"/>
                 </a:solidFill>
               </a:rPr>
-              <a:t>saveState</a:t>
+              <a:t>storeCommandInfo</a:t>
             </a:r>
             <a:r>
               <a:rPr lang="en-US" dirty="0" smtClean="0">
@@ -14047,7 +13944,7 @@
                   <a:srgbClr val="7030A0"/>
                 </a:solidFill>
               </a:rPr>
-              <a:t>(“delete d1”)</a:t>
+              <a:t>(“d1, t”)</a:t>
             </a:r>
             <a:endParaRPr lang="en-US" dirty="0">
               <a:solidFill>
@@ -14065,7 +13962,7 @@
         </p:nvCxnSpPr>
         <p:spPr>
           <a:xfrm flipV="1">
-            <a:off x="5590595" y="4016387"/>
+            <a:off x="5589948" y="4259156"/>
             <a:ext cx="2815658" cy="1604"/>
           </a:xfrm>
           <a:prstGeom prst="straightConnector1">
@@ -14131,8 +14028,8 @@
         </p:nvGrpSpPr>
         <p:grpSpPr>
           <a:xfrm>
-            <a:off x="1119864" y="1727200"/>
-            <a:ext cx="7719336" cy="2997200"/>
+            <a:off x="685800" y="1600200"/>
+            <a:ext cx="8153400" cy="3124200"/>
             <a:chOff x="0" y="0"/>
             <a:chExt cx="7490735" cy="2997200"/>
           </a:xfrm>
@@ -14201,7 +14098,7 @@
             <a:effectLst/>
             <a:extLst>
               <a:ext uri="{C572A759-6A51-4108-AA02-DFA0A04FC94B}">
-                <ma14:wrappingTextBoxFlag xmlns:ma14="http://schemas.microsoft.com/office/mac/drawingml/2011/main" val="1"/>
+                <ma14:wrappingTextBoxFlag xmlns="" xmlns:ma14="http://schemas.microsoft.com/office/mac/drawingml/2011/main" val="1"/>
               </a:ext>
             </a:extLst>
           </p:spPr>
@@ -14220,6 +14117,7 @@
             </a:lstStyle>
             <a:p>
               <a:r>
+                <a:rPr dirty="0"/>
                 <a:t>Model</a:t>
               </a:r>
             </a:p>
@@ -14305,7 +14203,7 @@
             <a:effectLst/>
             <a:extLst>
               <a:ext uri="{C572A759-6A51-4108-AA02-DFA0A04FC94B}">
-                <ma14:wrappingTextBoxFlag xmlns:ma14="http://schemas.microsoft.com/office/mac/drawingml/2011/main" val="1"/>
+                <ma14:wrappingTextBoxFlag xmlns="" xmlns:ma14="http://schemas.microsoft.com/office/mac/drawingml/2011/main" val="1"/>
               </a:ext>
             </a:extLst>
           </p:spPr>
@@ -14409,7 +14307,7 @@
             <a:effectLst/>
             <a:extLst>
               <a:ext uri="{C572A759-6A51-4108-AA02-DFA0A04FC94B}">
-                <ma14:wrappingTextBoxFlag xmlns:ma14="http://schemas.microsoft.com/office/mac/drawingml/2011/main" val="1"/>
+                <ma14:wrappingTextBoxFlag xmlns="" xmlns:ma14="http://schemas.microsoft.com/office/mac/drawingml/2011/main" val="1"/>
               </a:ext>
             </a:extLst>
           </p:spPr>
@@ -14428,8 +14326,10 @@
             </a:lstStyle>
             <a:p>
               <a:r>
+                <a:rPr dirty="0" err="1"/>
                 <a:t>ModelManager</a:t>
               </a:r>
+              <a:endParaRPr dirty="0"/>
             </a:p>
           </p:txBody>
         </p:sp>
@@ -14637,7 +14537,7 @@
             <a:effectLst/>
             <a:extLst>
               <a:ext uri="{C572A759-6A51-4108-AA02-DFA0A04FC94B}">
-                <ma14:wrappingTextBoxFlag xmlns:ma14="http://schemas.microsoft.com/office/mac/drawingml/2011/main" val="1"/>
+                <ma14:wrappingTextBoxFlag xmlns="" xmlns:ma14="http://schemas.microsoft.com/office/mac/drawingml/2011/main" val="1"/>
               </a:ext>
             </a:extLst>
           </p:spPr>
@@ -15139,7 +15039,7 @@
             <a:effectLst/>
             <a:extLst>
               <a:ext uri="{C572A759-6A51-4108-AA02-DFA0A04FC94B}">
-                <ma14:wrappingTextBoxFlag xmlns:ma14="http://schemas.microsoft.com/office/mac/drawingml/2011/main" val="1"/>
+                <ma14:wrappingTextBoxFlag xmlns="" xmlns:ma14="http://schemas.microsoft.com/office/mac/drawingml/2011/main" val="1"/>
               </a:ext>
             </a:extLst>
           </p:spPr>
@@ -15385,7 +15285,7 @@
             <a:effectLst/>
             <a:extLst>
               <a:ext uri="{C572A759-6A51-4108-AA02-DFA0A04FC94B}">
-                <ma14:wrappingTextBoxFlag xmlns:ma14="http://schemas.microsoft.com/office/mac/drawingml/2011/main" val="1"/>
+                <ma14:wrappingTextBoxFlag xmlns="" xmlns:ma14="http://schemas.microsoft.com/office/mac/drawingml/2011/main" val="1"/>
               </a:ext>
             </a:extLst>
           </p:spPr>
@@ -15641,7 +15541,7 @@
             <a:effectLst/>
             <a:extLst>
               <a:ext uri="{C572A759-6A51-4108-AA02-DFA0A04FC94B}">
-                <ma14:wrappingTextBoxFlag xmlns:ma14="http://schemas.microsoft.com/office/mac/drawingml/2011/main" val="1"/>
+                <ma14:wrappingTextBoxFlag xmlns="" xmlns:ma14="http://schemas.microsoft.com/office/mac/drawingml/2011/main" val="1"/>
               </a:ext>
             </a:extLst>
           </p:spPr>
@@ -15829,7 +15729,7 @@
             <a:effectLst/>
             <a:extLst>
               <a:ext uri="{C572A759-6A51-4108-AA02-DFA0A04FC94B}">
-                <ma14:wrappingTextBoxFlag xmlns:ma14="http://schemas.microsoft.com/office/mac/drawingml/2011/main" val="1"/>
+                <ma14:wrappingTextBoxFlag xmlns="" xmlns:ma14="http://schemas.microsoft.com/office/mac/drawingml/2011/main" val="1"/>
               </a:ext>
             </a:extLst>
           </p:spPr>
@@ -16082,7 +15982,7 @@
             <a:effectLst/>
             <a:extLst>
               <a:ext uri="{C572A759-6A51-4108-AA02-DFA0A04FC94B}">
-                <ma14:wrappingTextBoxFlag xmlns:ma14="http://schemas.microsoft.com/office/mac/drawingml/2011/main" val="1"/>
+                <ma14:wrappingTextBoxFlag xmlns="" xmlns:ma14="http://schemas.microsoft.com/office/mac/drawingml/2011/main" val="1"/>
               </a:ext>
             </a:extLst>
           </p:spPr>
@@ -16335,7 +16235,7 @@
             <a:effectLst/>
             <a:extLst>
               <a:ext uri="{C572A759-6A51-4108-AA02-DFA0A04FC94B}">
-                <ma14:wrappingTextBoxFlag xmlns:ma14="http://schemas.microsoft.com/office/mac/drawingml/2011/main" val="1"/>
+                <ma14:wrappingTextBoxFlag xmlns="" xmlns:ma14="http://schemas.microsoft.com/office/mac/drawingml/2011/main" val="1"/>
               </a:ext>
             </a:extLst>
           </p:spPr>
@@ -16466,7 +16366,7 @@
             <a:effectLst/>
             <a:extLst>
               <a:ext uri="{C572A759-6A51-4108-AA02-DFA0A04FC94B}">
-                <ma14:wrappingTextBoxFlag xmlns:ma14="http://schemas.microsoft.com/office/mac/drawingml/2011/main" val="1"/>
+                <ma14:wrappingTextBoxFlag xmlns="" xmlns:ma14="http://schemas.microsoft.com/office/mac/drawingml/2011/main" val="1"/>
               </a:ext>
             </a:extLst>
           </p:spPr>
@@ -16722,7 +16622,7 @@
             <a:effectLst/>
             <a:extLst>
               <a:ext uri="{C572A759-6A51-4108-AA02-DFA0A04FC94B}">
-                <ma14:wrappingTextBoxFlag xmlns:ma14="http://schemas.microsoft.com/office/mac/drawingml/2011/main" val="1"/>
+                <ma14:wrappingTextBoxFlag xmlns="" xmlns:ma14="http://schemas.microsoft.com/office/mac/drawingml/2011/main" val="1"/>
               </a:ext>
             </a:extLst>
           </p:spPr>
@@ -16917,7 +16817,7 @@
             <a:effectLst/>
             <a:extLst>
               <a:ext uri="{C572A759-6A51-4108-AA02-DFA0A04FC94B}">
-                <ma14:wrappingTextBoxFlag xmlns:ma14="http://schemas.microsoft.com/office/mac/drawingml/2011/main" val="1"/>
+                <ma14:wrappingTextBoxFlag xmlns="" xmlns:ma14="http://schemas.microsoft.com/office/mac/drawingml/2011/main" val="1"/>
               </a:ext>
             </a:extLst>
           </p:spPr>
@@ -17159,7 +17059,7 @@
             <a:effectLst/>
             <a:extLst>
               <a:ext uri="{C572A759-6A51-4108-AA02-DFA0A04FC94B}">
-                <ma14:wrappingTextBoxFlag xmlns:ma14="http://schemas.microsoft.com/office/mac/drawingml/2011/main" val="1"/>
+                <ma14:wrappingTextBoxFlag xmlns="" xmlns:ma14="http://schemas.microsoft.com/office/mac/drawingml/2011/main" val="1"/>
               </a:ext>
             </a:extLst>
           </p:spPr>
@@ -17177,12 +17077,17 @@
                 </a:defRPr>
               </a:pPr>
               <a:r>
+                <a:rPr dirty="0"/>
                 <a:t>&lt;&lt;interface&gt;&gt;</a:t>
               </a:r>
-              <a:br/>
+              <a:br>
+                <a:rPr dirty="0"/>
+              </a:br>
               <a:r>
+                <a:rPr dirty="0" err="1"/>
                 <a:t>ReadOnlyTaskManager</a:t>
               </a:r>
+              <a:endParaRPr dirty="0"/>
             </a:p>
           </p:txBody>
         </p:sp>
@@ -17206,7 +17111,7 @@
           </a:ln>
           <a:extLst>
             <a:ext uri="{C572A759-6A51-4108-AA02-DFA0A04FC94B}">
-              <ma14:wrappingTextBoxFlag xmlns:ma14="http://schemas.microsoft.com/office/mac/drawingml/2011/main" val="1"/>
+              <ma14:wrappingTextBoxFlag xmlns="" xmlns:ma14="http://schemas.microsoft.com/office/mac/drawingml/2011/main" val="1"/>
             </a:ext>
           </a:extLst>
         </p:spPr>
@@ -17328,7 +17233,7 @@
             <a:effectLst/>
             <a:extLst>
               <a:ext uri="{C572A759-6A51-4108-AA02-DFA0A04FC94B}">
-                <ma14:wrappingTextBoxFlag xmlns:ma14="http://schemas.microsoft.com/office/mac/drawingml/2011/main" val="1"/>
+                <ma14:wrappingTextBoxFlag xmlns="" xmlns:ma14="http://schemas.microsoft.com/office/mac/drawingml/2011/main" val="1"/>
               </a:ext>
             </a:extLst>
           </p:spPr>
@@ -17514,7 +17419,7 @@
             <a:effectLst/>
             <a:extLst>
               <a:ext uri="{C572A759-6A51-4108-AA02-DFA0A04FC94B}">
-                <ma14:wrappingTextBoxFlag xmlns:ma14="http://schemas.microsoft.com/office/mac/drawingml/2011/main" val="1"/>
+                <ma14:wrappingTextBoxFlag xmlns="" xmlns:ma14="http://schemas.microsoft.com/office/mac/drawingml/2011/main" val="1"/>
               </a:ext>
             </a:extLst>
           </p:spPr>
@@ -17679,6 +17584,233 @@
           </a:p>
         </p:txBody>
       </p:sp>
+      <p:sp>
+        <p:nvSpPr>
+          <p:cNvPr id="79" name="Shape 479"/>
+          <p:cNvSpPr/>
+          <p:nvPr/>
+        </p:nvSpPr>
+        <p:spPr>
+          <a:xfrm>
+            <a:off x="2120039" y="2334320"/>
+            <a:ext cx="236049" cy="173381"/>
+          </a:xfrm>
+          <a:custGeom>
+            <a:avLst/>
+            <a:gdLst/>
+            <a:ahLst/>
+            <a:cxnLst>
+              <a:cxn ang="0">
+                <a:pos x="wd2" y="hd2"/>
+              </a:cxn>
+              <a:cxn ang="5400000">
+                <a:pos x="wd2" y="hd2"/>
+              </a:cxn>
+              <a:cxn ang="10800000">
+                <a:pos x="wd2" y="hd2"/>
+              </a:cxn>
+              <a:cxn ang="16200000">
+                <a:pos x="wd2" y="hd2"/>
+              </a:cxn>
+            </a:cxnLst>
+            <a:rect l="0" t="0" r="r" b="b"/>
+            <a:pathLst>
+              <a:path w="21600" h="21600" extrusionOk="0">
+                <a:moveTo>
+                  <a:pt x="0" y="10800"/>
+                </a:moveTo>
+                <a:lnTo>
+                  <a:pt x="10800" y="0"/>
+                </a:lnTo>
+                <a:lnTo>
+                  <a:pt x="21600" y="10800"/>
+                </a:lnTo>
+                <a:lnTo>
+                  <a:pt x="10800" y="21600"/>
+                </a:lnTo>
+                <a:close/>
+              </a:path>
+            </a:pathLst>
+          </a:custGeom>
+          <a:ln w="19050">
+            <a:solidFill>
+              <a:srgbClr val="7030A0"/>
+            </a:solidFill>
+          </a:ln>
+        </p:spPr>
+        <p:txBody>
+          <a:bodyPr lIns="45719" rIns="45719" anchor="ctr"/>
+          <a:lstStyle/>
+          <a:p>
+            <a:pPr algn="ctr">
+              <a:defRPr sz="1000"/>
+            </a:pPr>
+            <a:endParaRPr/>
+          </a:p>
+        </p:txBody>
+      </p:sp>
+      <p:cxnSp>
+        <p:nvCxnSpPr>
+          <p:cNvPr id="4" name="Straight Arrow Connector 3"/>
+          <p:cNvCxnSpPr/>
+          <p:nvPr/>
+        </p:nvCxnSpPr>
+        <p:spPr>
+          <a:xfrm flipH="1" flipV="1">
+            <a:off x="2230779" y="2153230"/>
+            <a:ext cx="7284" cy="176336"/>
+          </a:xfrm>
+          <a:prstGeom prst="straightConnector1">
+            <a:avLst/>
+          </a:prstGeom>
+          <a:ln>
+            <a:tailEnd type="triangle"/>
+          </a:ln>
+        </p:spPr>
+        <p:style>
+          <a:lnRef idx="2">
+            <a:schemeClr val="accent4"/>
+          </a:lnRef>
+          <a:fillRef idx="0">
+            <a:schemeClr val="accent4"/>
+          </a:fillRef>
+          <a:effectRef idx="1">
+            <a:schemeClr val="accent4"/>
+          </a:effectRef>
+          <a:fontRef idx="minor">
+            <a:schemeClr val="tx1"/>
+          </a:fontRef>
+        </p:style>
+      </p:cxnSp>
+      <p:grpSp>
+        <p:nvGrpSpPr>
+          <p:cNvPr id="93" name="Group 477"/>
+          <p:cNvGrpSpPr/>
+          <p:nvPr/>
+        </p:nvGrpSpPr>
+        <p:grpSpPr>
+          <a:xfrm>
+            <a:off x="1486773" y="1775352"/>
+            <a:ext cx="1093637" cy="400108"/>
+            <a:chOff x="0" y="-26672"/>
+            <a:chExt cx="1093635" cy="400107"/>
+          </a:xfrm>
+        </p:grpSpPr>
+        <p:sp>
+          <p:nvSpPr>
+            <p:cNvPr id="94" name="Shape 475"/>
+            <p:cNvSpPr/>
+            <p:nvPr/>
+          </p:nvSpPr>
+          <p:spPr>
+            <a:xfrm>
+              <a:off x="0" y="-1"/>
+              <a:ext cx="1093635" cy="346762"/>
+            </a:xfrm>
+            <a:prstGeom prst="rect">
+              <a:avLst/>
+            </a:prstGeom>
+            <a:gradFill flip="none" rotWithShape="1">
+              <a:gsLst>
+                <a:gs pos="0">
+                  <a:schemeClr val="accent4">
+                    <a:hueOff val="-206663"/>
+                    <a:satOff val="29896"/>
+                    <a:lumOff val="29240"/>
+                  </a:schemeClr>
+                </a:gs>
+                <a:gs pos="35000">
+                  <a:srgbClr val="D8C9EE"/>
+                </a:gs>
+                <a:gs pos="100000">
+                  <a:schemeClr val="accent4">
+                    <a:hueOff val="-242556"/>
+                    <a:satOff val="32941"/>
+                    <a:lumOff val="43328"/>
+                  </a:schemeClr>
+                </a:gs>
+              </a:gsLst>
+              <a:lin ang="16200000" scaled="0"/>
+            </a:gradFill>
+            <a:ln w="19050" cap="flat">
+              <a:solidFill>
+                <a:srgbClr val="7030A0"/>
+              </a:solidFill>
+              <a:prstDash val="solid"/>
+              <a:round/>
+            </a:ln>
+            <a:effectLst/>
+          </p:spPr>
+          <p:txBody>
+            <a:bodyPr wrap="square" lIns="45719" tIns="45719" rIns="45719" bIns="45719" numCol="1" anchor="ctr">
+              <a:noAutofit/>
+            </a:bodyPr>
+            <a:lstStyle/>
+            <a:p>
+              <a:pPr algn="ctr">
+                <a:defRPr sz="1000">
+                  <a:solidFill>
+                    <a:srgbClr val="7030A0"/>
+                  </a:solidFill>
+                </a:defRPr>
+              </a:pPr>
+              <a:endParaRPr/>
+            </a:p>
+          </p:txBody>
+        </p:sp>
+        <p:sp>
+          <p:nvSpPr>
+            <p:cNvPr id="96" name="Shape 476"/>
+            <p:cNvSpPr/>
+            <p:nvPr/>
+          </p:nvSpPr>
+          <p:spPr>
+            <a:xfrm>
+              <a:off x="0" y="-26672"/>
+              <a:ext cx="1093635" cy="400107"/>
+            </a:xfrm>
+            <a:prstGeom prst="rect">
+              <a:avLst/>
+            </a:prstGeom>
+            <a:noFill/>
+            <a:ln w="12700" cap="flat">
+              <a:noFill/>
+              <a:miter lim="400000"/>
+            </a:ln>
+            <a:effectLst/>
+            <a:extLst>
+              <a:ext uri="{C572A759-6A51-4108-AA02-DFA0A04FC94B}">
+                <ma14:wrappingTextBoxFlag xmlns="" xmlns:ma14="http://schemas.microsoft.com/office/mac/drawingml/2011/main" val="1"/>
+              </a:ext>
+            </a:extLst>
+          </p:spPr>
+          <p:txBody>
+            <a:bodyPr wrap="square" lIns="45719" tIns="45719" rIns="45719" bIns="45719" numCol="1" anchor="ctr">
+              <a:spAutoFit/>
+            </a:bodyPr>
+            <a:lstStyle>
+              <a:lvl1pPr algn="ctr">
+                <a:defRPr sz="1000">
+                  <a:solidFill>
+                    <a:srgbClr val="7030A0"/>
+                  </a:solidFill>
+                </a:defRPr>
+              </a:lvl1pPr>
+            </a:lstStyle>
+            <a:p>
+              <a:r>
+                <a:rPr lang="en-SG" dirty="0" err="1" smtClean="0"/>
+                <a:t>CommandHistory</a:t>
+              </a:r>
+              <a:r>
+                <a:rPr dirty="0" smtClean="0"/>
+                <a:t>Manager</a:t>
+              </a:r>
+              <a:endParaRPr dirty="0"/>
+            </a:p>
+          </p:txBody>
+        </p:sp>
+      </p:grpSp>
     </p:spTree>
     <p:extLst>
       <p:ext uri="{BB962C8B-B14F-4D97-AF65-F5344CB8AC3E}">

</xml_diff>

<commit_message>
modify LogicClassDiagram to include RedoCommand
</commit_message>
<xml_diff>
--- a/docs/diagrams/Diagrams.pptx
+++ b/docs/diagrams/Diagrams.pptx
@@ -215,7 +215,7 @@
           <a:p>
             <a:fld id="{F5CC4B3F-88C1-4FFA-B1B6-F41C21DC6924}" type="datetimeFigureOut">
               <a:rPr lang="en-US" smtClean="0"/>
-              <a:t>10/28/2016</a:t>
+              <a:t>11/3/2016</a:t>
             </a:fld>
             <a:endParaRPr lang="en-US"/>
           </a:p>
@@ -661,7 +661,7 @@
           <a:p>
             <a:fld id="{78C97017-6FC3-485B-9764-EAC9E56C1D49}" type="datetimeFigureOut">
               <a:rPr lang="en-US" smtClean="0"/>
-              <a:t>10/28/2016</a:t>
+              <a:t>11/3/2016</a:t>
             </a:fld>
             <a:endParaRPr lang="en-US"/>
           </a:p>
@@ -829,7 +829,7 @@
           <a:p>
             <a:fld id="{78C97017-6FC3-485B-9764-EAC9E56C1D49}" type="datetimeFigureOut">
               <a:rPr lang="en-US" smtClean="0"/>
-              <a:t>10/28/2016</a:t>
+              <a:t>11/3/2016</a:t>
             </a:fld>
             <a:endParaRPr lang="en-US"/>
           </a:p>
@@ -1007,7 +1007,7 @@
           <a:p>
             <a:fld id="{78C97017-6FC3-485B-9764-EAC9E56C1D49}" type="datetimeFigureOut">
               <a:rPr lang="en-US" smtClean="0"/>
-              <a:t>10/28/2016</a:t>
+              <a:t>11/3/2016</a:t>
             </a:fld>
             <a:endParaRPr lang="en-US"/>
           </a:p>
@@ -1175,7 +1175,7 @@
           <a:p>
             <a:fld id="{78C97017-6FC3-485B-9764-EAC9E56C1D49}" type="datetimeFigureOut">
               <a:rPr lang="en-US" smtClean="0"/>
-              <a:t>10/28/2016</a:t>
+              <a:t>11/3/2016</a:t>
             </a:fld>
             <a:endParaRPr lang="en-US"/>
           </a:p>
@@ -1420,7 +1420,7 @@
           <a:p>
             <a:fld id="{78C97017-6FC3-485B-9764-EAC9E56C1D49}" type="datetimeFigureOut">
               <a:rPr lang="en-US" smtClean="0"/>
-              <a:t>10/28/2016</a:t>
+              <a:t>11/3/2016</a:t>
             </a:fld>
             <a:endParaRPr lang="en-US"/>
           </a:p>
@@ -1705,7 +1705,7 @@
           <a:p>
             <a:fld id="{78C97017-6FC3-485B-9764-EAC9E56C1D49}" type="datetimeFigureOut">
               <a:rPr lang="en-US" smtClean="0"/>
-              <a:t>10/28/2016</a:t>
+              <a:t>11/3/2016</a:t>
             </a:fld>
             <a:endParaRPr lang="en-US"/>
           </a:p>
@@ -2124,7 +2124,7 @@
           <a:p>
             <a:fld id="{78C97017-6FC3-485B-9764-EAC9E56C1D49}" type="datetimeFigureOut">
               <a:rPr lang="en-US" smtClean="0"/>
-              <a:t>10/28/2016</a:t>
+              <a:t>11/3/2016</a:t>
             </a:fld>
             <a:endParaRPr lang="en-US"/>
           </a:p>
@@ -2241,7 +2241,7 @@
           <a:p>
             <a:fld id="{78C97017-6FC3-485B-9764-EAC9E56C1D49}" type="datetimeFigureOut">
               <a:rPr lang="en-US" smtClean="0"/>
-              <a:t>10/28/2016</a:t>
+              <a:t>11/3/2016</a:t>
             </a:fld>
             <a:endParaRPr lang="en-US"/>
           </a:p>
@@ -2336,7 +2336,7 @@
           <a:p>
             <a:fld id="{78C97017-6FC3-485B-9764-EAC9E56C1D49}" type="datetimeFigureOut">
               <a:rPr lang="en-US" smtClean="0"/>
-              <a:t>10/28/2016</a:t>
+              <a:t>11/3/2016</a:t>
             </a:fld>
             <a:endParaRPr lang="en-US"/>
           </a:p>
@@ -2611,7 +2611,7 @@
           <a:p>
             <a:fld id="{78C97017-6FC3-485B-9764-EAC9E56C1D49}" type="datetimeFigureOut">
               <a:rPr lang="en-US" smtClean="0"/>
-              <a:t>10/28/2016</a:t>
+              <a:t>11/3/2016</a:t>
             </a:fld>
             <a:endParaRPr lang="en-US"/>
           </a:p>
@@ -2863,7 +2863,7 @@
           <a:p>
             <a:fld id="{78C97017-6FC3-485B-9764-EAC9E56C1D49}" type="datetimeFigureOut">
               <a:rPr lang="en-US" smtClean="0"/>
-              <a:t>10/28/2016</a:t>
+              <a:t>11/3/2016</a:t>
             </a:fld>
             <a:endParaRPr lang="en-US"/>
           </a:p>
@@ -3074,7 +3074,7 @@
           <a:p>
             <a:fld id="{78C97017-6FC3-485B-9764-EAC9E56C1D49}" type="datetimeFigureOut">
               <a:rPr lang="en-US" smtClean="0"/>
-              <a:t>10/28/2016</a:t>
+              <a:t>11/3/2016</a:t>
             </a:fld>
             <a:endParaRPr lang="en-US"/>
           </a:p>
@@ -3465,7 +3465,7 @@
           <a:lstStyle/>
           <a:p>
             <a:r>
-              <a:rPr lang="en-US" dirty="0" err="1" smtClean="0"/>
+              <a:rPr lang="en-US" dirty="0" err="1"/>
               <a:t>Task!t</a:t>
             </a:r>
             <a:endParaRPr lang="en-US" dirty="0"/>
@@ -5725,7 +5725,7 @@
           <a:lstStyle/>
           <a:p>
             <a:r>
-              <a:rPr lang="en-US" sz="1400" dirty="0" err="1" smtClean="0">
+              <a:rPr lang="en-US" sz="1400" dirty="0" err="1">
                 <a:solidFill>
                   <a:srgbClr val="7030A0"/>
                 </a:solidFill>
@@ -5733,20 +5733,12 @@
               <a:t>deleteTask</a:t>
             </a:r>
             <a:r>
-              <a:rPr lang="en-US" sz="1400" dirty="0" smtClean="0">
-                <a:solidFill>
-                  <a:srgbClr val="7030A0"/>
-                </a:solidFill>
-              </a:rPr>
-              <a:t>(p</a:t>
-            </a:r>
-            <a:r>
               <a:rPr lang="en-US" sz="1400" dirty="0">
                 <a:solidFill>
                   <a:srgbClr val="7030A0"/>
                 </a:solidFill>
               </a:rPr>
-              <a:t>)</a:t>
+              <a:t>(p)</a:t>
             </a:r>
           </a:p>
         </p:txBody>
@@ -5774,7 +5766,7 @@
           <a:lstStyle/>
           <a:p>
             <a:r>
-              <a:rPr lang="en-US" sz="1400" dirty="0" smtClean="0">
+              <a:rPr lang="en-US" sz="1400" dirty="0">
                 <a:solidFill>
                   <a:schemeClr val="accent5">
                     <a:lumMod val="75000"/>
@@ -5784,24 +5776,14 @@
               <a:t>post(</a:t>
             </a:r>
             <a:r>
-              <a:rPr lang="en-US" sz="1400" dirty="0" err="1" smtClean="0">
+              <a:rPr lang="en-US" sz="1400" dirty="0" err="1">
                 <a:solidFill>
                   <a:schemeClr val="accent5">
                     <a:lumMod val="75000"/>
                   </a:schemeClr>
                 </a:solidFill>
               </a:rPr>
-              <a:t>ToDoList</a:t>
-            </a:r>
-            <a:r>
-              <a:rPr lang="en-US" sz="1400" dirty="0" err="1" smtClean="0">
-                <a:solidFill>
-                  <a:schemeClr val="accent5">
-                    <a:lumMod val="75000"/>
-                  </a:schemeClr>
-                </a:solidFill>
-              </a:rPr>
-              <a:t>ChangedEvent</a:t>
+              <a:t>ToDoListChangedEvent</a:t>
             </a:r>
             <a:r>
               <a:rPr lang="en-US" sz="1400" dirty="0">
@@ -6351,7 +6333,7 @@
           <a:lstStyle/>
           <a:p>
             <a:r>
-              <a:rPr lang="en-US" sz="1400" dirty="0" smtClean="0">
+              <a:rPr lang="en-US" sz="1400" dirty="0">
                 <a:solidFill>
                   <a:schemeClr val="accent5">
                     <a:lumMod val="75000"/>
@@ -6361,24 +6343,14 @@
               <a:t>post(</a:t>
             </a:r>
             <a:r>
-              <a:rPr lang="en-US" sz="1400" dirty="0" err="1" smtClean="0">
+              <a:rPr lang="en-US" sz="1400" dirty="0" err="1">
                 <a:solidFill>
                   <a:schemeClr val="accent5">
                     <a:lumMod val="75000"/>
                   </a:schemeClr>
                 </a:solidFill>
               </a:rPr>
-              <a:t>ToDoList</a:t>
-            </a:r>
-            <a:r>
-              <a:rPr lang="en-US" sz="1400" dirty="0" err="1" smtClean="0">
-                <a:solidFill>
-                  <a:schemeClr val="accent5">
-                    <a:lumMod val="75000"/>
-                  </a:schemeClr>
-                </a:solidFill>
-              </a:rPr>
-              <a:t>ChangedEvent</a:t>
+              <a:t>ToDoListChangedEvent</a:t>
             </a:r>
             <a:r>
               <a:rPr lang="en-US" sz="1400" dirty="0">
@@ -6736,7 +6708,7 @@
           <a:lstStyle/>
           <a:p>
             <a:r>
-              <a:rPr lang="en-US" sz="1400" dirty="0" err="1" smtClean="0">
+              <a:rPr lang="en-US" sz="1400" dirty="0" err="1">
                 <a:solidFill>
                   <a:schemeClr val="accent6">
                     <a:lumMod val="75000"/>
@@ -7042,7 +7014,7 @@
           <a:lstStyle/>
           <a:p>
             <a:r>
-              <a:rPr lang="en-US" sz="1400" dirty="0" err="1" smtClean="0">
+              <a:rPr lang="en-US" sz="1400" dirty="0" err="1">
                 <a:solidFill>
                   <a:srgbClr val="00B050"/>
                 </a:solidFill>
@@ -8096,24 +8068,14 @@
           <a:p>
             <a:pPr algn="ctr"/>
             <a:r>
-              <a:rPr lang="en-US" sz="1050" b="1" dirty="0" err="1" smtClean="0">
+              <a:rPr lang="en-US" sz="1050" b="1" dirty="0" err="1">
                 <a:solidFill>
                   <a:schemeClr val="accent3">
                     <a:lumMod val="75000"/>
                   </a:schemeClr>
                 </a:solidFill>
               </a:rPr>
-              <a:t>Task</a:t>
-            </a:r>
-            <a:r>
-              <a:rPr lang="en-US" sz="1050" b="1" dirty="0" err="1" smtClean="0">
-                <a:solidFill>
-                  <a:schemeClr val="accent3">
-                    <a:lumMod val="75000"/>
-                  </a:schemeClr>
-                </a:solidFill>
-              </a:rPr>
-              <a:t>ListPanel</a:t>
+              <a:t>TaskListPanel</a:t>
             </a:r>
             <a:endParaRPr lang="en-SG" sz="1050" b="1" dirty="0">
               <a:solidFill>
@@ -8166,24 +8128,14 @@
           <a:p>
             <a:pPr algn="ctr"/>
             <a:r>
-              <a:rPr lang="en-US" sz="1050" b="1" dirty="0" err="1" smtClean="0">
+              <a:rPr lang="en-US" sz="1050" b="1" dirty="0" err="1">
                 <a:solidFill>
                   <a:schemeClr val="accent3">
                     <a:lumMod val="75000"/>
                   </a:schemeClr>
                 </a:solidFill>
               </a:rPr>
-              <a:t>Task</a:t>
-            </a:r>
-            <a:r>
-              <a:rPr lang="en-US" sz="1050" b="1" dirty="0" err="1" smtClean="0">
-                <a:solidFill>
-                  <a:schemeClr val="accent3">
-                    <a:lumMod val="75000"/>
-                  </a:schemeClr>
-                </a:solidFill>
-              </a:rPr>
-              <a:t>Card</a:t>
+              <a:t>TaskCard</a:t>
             </a:r>
             <a:endParaRPr lang="en-SG" sz="1050" b="1" dirty="0">
               <a:solidFill>
@@ -11773,7 +11725,7 @@
                   <a:srgbClr val="0070C0"/>
                 </a:solidFill>
               </a:rPr>
-              <a:t>SelectCommand</a:t>
+              <a:t>RedoCommand</a:t>
             </a:r>
             <a:endParaRPr lang="en-SG" sz="1050" b="1" dirty="0">
               <a:solidFill>
@@ -12922,7 +12874,7 @@
           <a:p>
             <a:pPr algn="ctr"/>
             <a:r>
-              <a:rPr lang="en-US" sz="1050" dirty="0" err="1" smtClean="0">
+              <a:rPr lang="en-US" sz="1050" dirty="0" err="1">
                 <a:solidFill>
                   <a:srgbClr val="7030A0"/>
                 </a:solidFill>
@@ -13064,7 +13016,7 @@
           <a:p>
             <a:pPr algn="ctr"/>
             <a:r>
-              <a:rPr lang="en-US" sz="1050" dirty="0" err="1" smtClean="0">
+              <a:rPr lang="en-US" sz="1050" dirty="0" err="1">
                 <a:solidFill>
                   <a:srgbClr val="7030A0"/>
                 </a:solidFill>
@@ -13207,7 +13159,7 @@
           <a:p>
             <a:pPr algn="ctr"/>
             <a:r>
-              <a:rPr lang="en-US" sz="1050" dirty="0" smtClean="0">
+              <a:rPr lang="en-US" sz="1050" dirty="0">
                 <a:solidFill>
                   <a:srgbClr val="7030A0"/>
                 </a:solidFill>
@@ -13364,7 +13316,7 @@
               </a:rPr>
             </a:br>
             <a:r>
-              <a:rPr lang="en-US" sz="1050" dirty="0" err="1" smtClean="0">
+              <a:rPr lang="en-US" sz="1050" dirty="0" err="1">
                 <a:solidFill>
                   <a:srgbClr val="7030A0"/>
                 </a:solidFill>
@@ -13961,7 +13913,7 @@
               </a:rPr>
             </a:br>
             <a:r>
-              <a:rPr lang="en-US" sz="1050" dirty="0" err="1" smtClean="0">
+              <a:rPr lang="en-US" sz="1050" dirty="0" err="1">
                 <a:solidFill>
                   <a:srgbClr val="7030A0"/>
                 </a:solidFill>
@@ -14963,16 +14915,6 @@
               </a:rPr>
               <a:t>XmlAddressBook</a:t>
             </a:r>
-            <a:r>
-              <a:rPr lang="en-US" sz="1050" b="1" dirty="0">
-                <a:solidFill>
-                  <a:schemeClr val="accent6">
-                    <a:lumMod val="75000"/>
-                  </a:schemeClr>
-                </a:solidFill>
-              </a:rPr>
-              <a:t/>
-            </a:r>
             <a:br>
               <a:rPr lang="en-US" sz="1050" b="1" dirty="0">
                 <a:solidFill>
@@ -15330,14 +15272,6 @@
               </a:rPr>
               <a:t>JsonUserPrefs</a:t>
             </a:r>
-            <a:r>
-              <a:rPr lang="en-US" sz="1050" dirty="0">
-                <a:solidFill>
-                  <a:schemeClr val="bg1"/>
-                </a:solidFill>
-              </a:rPr>
-              <a:t/>
-            </a:r>
             <a:br>
               <a:rPr lang="en-US" sz="1050" dirty="0">
                 <a:solidFill>
@@ -15406,16 +15340,6 @@
                 </a:solidFill>
               </a:rPr>
               <a:t>XmlSerializable</a:t>
-            </a:r>
-            <a:r>
-              <a:rPr lang="en-US" sz="1050" b="1" dirty="0">
-                <a:solidFill>
-                  <a:schemeClr val="accent6">
-                    <a:lumMod val="75000"/>
-                  </a:schemeClr>
-                </a:solidFill>
-              </a:rPr>
-              <a:t/>
             </a:r>
             <a:br>
               <a:rPr lang="en-US" sz="1050" b="1" dirty="0">

</xml_diff>

<commit_message>
implemented offline help + redid a diagram
</commit_message>
<xml_diff>
--- a/docs/diagrams/Diagrams.pptx
+++ b/docs/diagrams/Diagrams.pptx
@@ -200,7 +200,7 @@
           <a:p>
             <a:fld id="{F5CC4B3F-88C1-4FFA-B1B6-F41C21DC6924}" type="datetimeFigureOut">
               <a:rPr lang="en-US" smtClean="0"/>
-              <a:t>19/10/16</a:t>
+              <a:t>3/11/16</a:t>
             </a:fld>
             <a:endParaRPr lang="en-US"/>
           </a:p>
@@ -649,7 +649,7 @@
           <a:p>
             <a:fld id="{78C97017-6FC3-485B-9764-EAC9E56C1D49}" type="datetimeFigureOut">
               <a:rPr lang="en-US" smtClean="0"/>
-              <a:t>19/10/16</a:t>
+              <a:t>3/11/16</a:t>
             </a:fld>
             <a:endParaRPr lang="en-US"/>
           </a:p>
@@ -819,7 +819,7 @@
           <a:p>
             <a:fld id="{78C97017-6FC3-485B-9764-EAC9E56C1D49}" type="datetimeFigureOut">
               <a:rPr lang="en-US" smtClean="0"/>
-              <a:t>19/10/16</a:t>
+              <a:t>3/11/16</a:t>
             </a:fld>
             <a:endParaRPr lang="en-US"/>
           </a:p>
@@ -999,7 +999,7 @@
           <a:p>
             <a:fld id="{78C97017-6FC3-485B-9764-EAC9E56C1D49}" type="datetimeFigureOut">
               <a:rPr lang="en-US" smtClean="0"/>
-              <a:t>19/10/16</a:t>
+              <a:t>3/11/16</a:t>
             </a:fld>
             <a:endParaRPr lang="en-US"/>
           </a:p>
@@ -1169,7 +1169,7 @@
           <a:p>
             <a:fld id="{78C97017-6FC3-485B-9764-EAC9E56C1D49}" type="datetimeFigureOut">
               <a:rPr lang="en-US" smtClean="0"/>
-              <a:t>19/10/16</a:t>
+              <a:t>3/11/16</a:t>
             </a:fld>
             <a:endParaRPr lang="en-US"/>
           </a:p>
@@ -1415,7 +1415,7 @@
           <a:p>
             <a:fld id="{78C97017-6FC3-485B-9764-EAC9E56C1D49}" type="datetimeFigureOut">
               <a:rPr lang="en-US" smtClean="0"/>
-              <a:t>19/10/16</a:t>
+              <a:t>3/11/16</a:t>
             </a:fld>
             <a:endParaRPr lang="en-US"/>
           </a:p>
@@ -1703,7 +1703,7 @@
           <a:p>
             <a:fld id="{78C97017-6FC3-485B-9764-EAC9E56C1D49}" type="datetimeFigureOut">
               <a:rPr lang="en-US" smtClean="0"/>
-              <a:t>19/10/16</a:t>
+              <a:t>3/11/16</a:t>
             </a:fld>
             <a:endParaRPr lang="en-US"/>
           </a:p>
@@ -2125,7 +2125,7 @@
           <a:p>
             <a:fld id="{78C97017-6FC3-485B-9764-EAC9E56C1D49}" type="datetimeFigureOut">
               <a:rPr lang="en-US" smtClean="0"/>
-              <a:t>19/10/16</a:t>
+              <a:t>3/11/16</a:t>
             </a:fld>
             <a:endParaRPr lang="en-US"/>
           </a:p>
@@ -2243,7 +2243,7 @@
           <a:p>
             <a:fld id="{78C97017-6FC3-485B-9764-EAC9E56C1D49}" type="datetimeFigureOut">
               <a:rPr lang="en-US" smtClean="0"/>
-              <a:t>19/10/16</a:t>
+              <a:t>3/11/16</a:t>
             </a:fld>
             <a:endParaRPr lang="en-US"/>
           </a:p>
@@ -2338,7 +2338,7 @@
           <a:p>
             <a:fld id="{78C97017-6FC3-485B-9764-EAC9E56C1D49}" type="datetimeFigureOut">
               <a:rPr lang="en-US" smtClean="0"/>
-              <a:t>19/10/16</a:t>
+              <a:t>3/11/16</a:t>
             </a:fld>
             <a:endParaRPr lang="en-US"/>
           </a:p>
@@ -2615,7 +2615,7 @@
           <a:p>
             <a:fld id="{78C97017-6FC3-485B-9764-EAC9E56C1D49}" type="datetimeFigureOut">
               <a:rPr lang="en-US" smtClean="0"/>
-              <a:t>19/10/16</a:t>
+              <a:t>3/11/16</a:t>
             </a:fld>
             <a:endParaRPr lang="en-US"/>
           </a:p>
@@ -2868,7 +2868,7 @@
           <a:p>
             <a:fld id="{78C97017-6FC3-485B-9764-EAC9E56C1D49}" type="datetimeFigureOut">
               <a:rPr lang="en-US" smtClean="0"/>
-              <a:t>19/10/16</a:t>
+              <a:t>3/11/16</a:t>
             </a:fld>
             <a:endParaRPr lang="en-US"/>
           </a:p>
@@ -3081,7 +3081,7 @@
           <a:p>
             <a:fld id="{78C97017-6FC3-485B-9764-EAC9E56C1D49}" type="datetimeFigureOut">
               <a:rPr lang="en-US" smtClean="0"/>
-              <a:t>19/10/16</a:t>
+              <a:t>3/11/16</a:t>
             </a:fld>
             <a:endParaRPr lang="en-US"/>
           </a:p>
@@ -5548,15 +5548,7 @@
                   <a:srgbClr val="7030A0"/>
                 </a:solidFill>
               </a:rPr>
-              <a:t>(</a:t>
-            </a:r>
-            <a:r>
-              <a:rPr lang="en-US" sz="1400" dirty="0" smtClean="0">
-                <a:solidFill>
-                  <a:srgbClr val="7030A0"/>
-                </a:solidFill>
-              </a:rPr>
-              <a:t>p)</a:t>
+              <a:t>(p)</a:t>
             </a:r>
             <a:endParaRPr lang="en-US" sz="1400" dirty="0">
               <a:solidFill>
@@ -5606,17 +5598,7 @@
                   </a:schemeClr>
                 </a:solidFill>
               </a:rPr>
-              <a:t>TaskManager</a:t>
-            </a:r>
-            <a:r>
-              <a:rPr lang="en-US" sz="1400" dirty="0" err="1" smtClean="0">
-                <a:solidFill>
-                  <a:schemeClr val="accent5">
-                    <a:lumMod val="75000"/>
-                  </a:schemeClr>
-                </a:solidFill>
-              </a:rPr>
-              <a:t>ChangedEvent</a:t>
+              <a:t>TaskManagerChangedEvent</a:t>
             </a:r>
             <a:r>
               <a:rPr lang="en-US" sz="1400" dirty="0" smtClean="0">
@@ -6190,17 +6172,7 @@
                   </a:schemeClr>
                 </a:solidFill>
               </a:rPr>
-              <a:t>TaskManager</a:t>
-            </a:r>
-            <a:r>
-              <a:rPr lang="en-US" sz="1400" dirty="0" err="1" smtClean="0">
-                <a:solidFill>
-                  <a:schemeClr val="accent5">
-                    <a:lumMod val="75000"/>
-                  </a:schemeClr>
-                </a:solidFill>
-              </a:rPr>
-              <a:t>ChangedEvent</a:t>
+              <a:t>TaskManagerChangedEvent</a:t>
             </a:r>
             <a:r>
               <a:rPr lang="en-US" sz="1400" dirty="0" smtClean="0">
@@ -7325,13 +7297,13 @@
       </p:sp>
       <p:pic>
         <p:nvPicPr>
-          <p:cNvPr id="3" name="Picture 2" descr="noun_396626_cc.png"/>
+          <p:cNvPr id="4" name="Picture 3" descr="noun_127765_cc.png"/>
           <p:cNvPicPr>
             <a:picLocks noChangeAspect="1"/>
           </p:cNvPicPr>
           <p:nvPr/>
         </p:nvPicPr>
-        <p:blipFill rotWithShape="1">
+        <p:blipFill>
           <a:blip r:embed="rId2">
             <a:extLst>
               <a:ext uri="{28A0092B-C50C-407E-A947-70E740481C1C}">
@@ -7339,13 +7311,14 @@
               </a:ext>
             </a:extLst>
           </a:blip>
-          <a:srcRect t="-2" b="13385"/>
-          <a:stretch/>
+          <a:stretch>
+            <a:fillRect/>
+          </a:stretch>
         </p:blipFill>
         <p:spPr>
           <a:xfrm>
-            <a:off x="-152400" y="385762"/>
-            <a:ext cx="990600" cy="681038"/>
+            <a:off x="-76200" y="381000"/>
+            <a:ext cx="990600" cy="666014"/>
           </a:xfrm>
           <a:prstGeom prst="rect">
             <a:avLst/>
@@ -7985,8 +7958,58 @@
                   </a:schemeClr>
                 </a:solidFill>
               </a:rPr>
-              <a:t>Task</a:t>
-            </a:r>
+              <a:t>TaskListPanel</a:t>
+            </a:r>
+            <a:endParaRPr lang="en-SG" sz="1050" b="1" dirty="0">
+              <a:solidFill>
+                <a:schemeClr val="accent3">
+                  <a:lumMod val="75000"/>
+                </a:schemeClr>
+              </a:solidFill>
+            </a:endParaRPr>
+          </a:p>
+        </p:txBody>
+      </p:sp>
+      <p:sp>
+        <p:nvSpPr>
+          <p:cNvPr id="37" name="Rectangle 11"/>
+          <p:cNvSpPr/>
+          <p:nvPr/>
+        </p:nvSpPr>
+        <p:spPr>
+          <a:xfrm>
+            <a:off x="3839323" y="4228801"/>
+            <a:ext cx="1040906" cy="236841"/>
+          </a:xfrm>
+          <a:prstGeom prst="rect">
+            <a:avLst/>
+          </a:prstGeom>
+          <a:ln w="19050">
+            <a:solidFill>
+              <a:schemeClr val="accent3"/>
+            </a:solidFill>
+          </a:ln>
+          <a:effectLst/>
+        </p:spPr>
+        <p:style>
+          <a:lnRef idx="1">
+            <a:schemeClr val="accent3"/>
+          </a:lnRef>
+          <a:fillRef idx="2">
+            <a:schemeClr val="accent3"/>
+          </a:fillRef>
+          <a:effectRef idx="1">
+            <a:schemeClr val="accent3"/>
+          </a:effectRef>
+          <a:fontRef idx="minor">
+            <a:schemeClr val="dk1"/>
+          </a:fontRef>
+        </p:style>
+        <p:txBody>
+          <a:bodyPr rtlCol="0" anchor="ctr"/>
+          <a:lstStyle/>
+          <a:p>
+            <a:pPr algn="ctr"/>
             <a:r>
               <a:rPr lang="en-US" sz="1050" b="1" dirty="0" err="1" smtClean="0">
                 <a:solidFill>
@@ -7995,77 +8018,7 @@
                   </a:schemeClr>
                 </a:solidFill>
               </a:rPr>
-              <a:t>ListPanel</a:t>
-            </a:r>
-            <a:endParaRPr lang="en-SG" sz="1050" b="1" dirty="0">
-              <a:solidFill>
-                <a:schemeClr val="accent3">
-                  <a:lumMod val="75000"/>
-                </a:schemeClr>
-              </a:solidFill>
-            </a:endParaRPr>
-          </a:p>
-        </p:txBody>
-      </p:sp>
-      <p:sp>
-        <p:nvSpPr>
-          <p:cNvPr id="37" name="Rectangle 11"/>
-          <p:cNvSpPr/>
-          <p:nvPr/>
-        </p:nvSpPr>
-        <p:spPr>
-          <a:xfrm>
-            <a:off x="3839323" y="4228801"/>
-            <a:ext cx="1040906" cy="236841"/>
-          </a:xfrm>
-          <a:prstGeom prst="rect">
-            <a:avLst/>
-          </a:prstGeom>
-          <a:ln w="19050">
-            <a:solidFill>
-              <a:schemeClr val="accent3"/>
-            </a:solidFill>
-          </a:ln>
-          <a:effectLst/>
-        </p:spPr>
-        <p:style>
-          <a:lnRef idx="1">
-            <a:schemeClr val="accent3"/>
-          </a:lnRef>
-          <a:fillRef idx="2">
-            <a:schemeClr val="accent3"/>
-          </a:fillRef>
-          <a:effectRef idx="1">
-            <a:schemeClr val="accent3"/>
-          </a:effectRef>
-          <a:fontRef idx="minor">
-            <a:schemeClr val="dk1"/>
-          </a:fontRef>
-        </p:style>
-        <p:txBody>
-          <a:bodyPr rtlCol="0" anchor="ctr"/>
-          <a:lstStyle/>
-          <a:p>
-            <a:pPr algn="ctr"/>
-            <a:r>
-              <a:rPr lang="en-US" sz="1050" b="1" dirty="0" err="1" smtClean="0">
-                <a:solidFill>
-                  <a:schemeClr val="accent3">
-                    <a:lumMod val="75000"/>
-                  </a:schemeClr>
-                </a:solidFill>
-              </a:rPr>
-              <a:t>Task</a:t>
-            </a:r>
-            <a:r>
-              <a:rPr lang="en-US" sz="1050" b="1" dirty="0" err="1" smtClean="0">
-                <a:solidFill>
-                  <a:schemeClr val="accent3">
-                    <a:lumMod val="75000"/>
-                  </a:schemeClr>
-                </a:solidFill>
-              </a:rPr>
-              <a:t>Card</a:t>
+              <a:t>TaskCard</a:t>
             </a:r>
             <a:endParaRPr lang="en-SG" sz="1050" b="1" dirty="0">
               <a:solidFill>
@@ -12668,15 +12621,7 @@
                   <a:srgbClr val="7030A0"/>
                 </a:solidFill>
               </a:rPr>
-              <a:t>(</a:t>
-            </a:r>
-            <a:r>
-              <a:rPr lang="en-US" dirty="0" smtClean="0">
-                <a:solidFill>
-                  <a:srgbClr val="7030A0"/>
-                </a:solidFill>
-              </a:rPr>
-              <a:t>p)</a:t>
+              <a:t>(p)</a:t>
             </a:r>
             <a:endParaRPr lang="en-US" dirty="0">
               <a:solidFill>
@@ -15428,15 +15373,7 @@
                   <a:schemeClr val="bg1"/>
                 </a:solidFill>
               </a:rPr>
-              <a:t>TaskManager</a:t>
-            </a:r>
-            <a:r>
-              <a:rPr lang="en-US" sz="1050" dirty="0" err="1" smtClean="0">
-                <a:solidFill>
-                  <a:schemeClr val="bg1"/>
-                </a:solidFill>
-              </a:rPr>
-              <a:t>Storage</a:t>
+              <a:t>TaskManagerStorage</a:t>
             </a:r>
             <a:endParaRPr lang="en-SG" sz="1050" dirty="0">
               <a:solidFill>

</xml_diff>

<commit_message>
Edited UI class diagram
</commit_message>
<xml_diff>
--- a/docs/diagrams/Diagrams.pptx
+++ b/docs/diagrams/Diagrams.pptx
@@ -215,7 +215,7 @@
           <a:p>
             <a:fld id="{F5CC4B3F-88C1-4FFA-B1B6-F41C21DC6924}" type="datetimeFigureOut">
               <a:rPr lang="en-US" smtClean="0"/>
-              <a:t>10/20/2016</a:t>
+              <a:t>11/3/2016</a:t>
             </a:fld>
             <a:endParaRPr lang="en-US"/>
           </a:p>
@@ -279,38 +279,37 @@
           <a:p>
             <a:pPr lvl="0"/>
             <a:r>
-              <a:rPr lang="en-US" smtClean="0"/>
+              <a:rPr lang="en-US"/>
               <a:t>Click to edit Master text styles</a:t>
             </a:r>
           </a:p>
           <a:p>
             <a:pPr lvl="1"/>
             <a:r>
-              <a:rPr lang="en-US" smtClean="0"/>
+              <a:rPr lang="en-US"/>
               <a:t>Second level</a:t>
             </a:r>
           </a:p>
           <a:p>
             <a:pPr lvl="2"/>
             <a:r>
-              <a:rPr lang="en-US" smtClean="0"/>
+              <a:rPr lang="en-US"/>
               <a:t>Third level</a:t>
             </a:r>
           </a:p>
           <a:p>
             <a:pPr lvl="3"/>
             <a:r>
-              <a:rPr lang="en-US" smtClean="0"/>
+              <a:rPr lang="en-US"/>
               <a:t>Fourth level</a:t>
             </a:r>
           </a:p>
           <a:p>
             <a:pPr lvl="4"/>
             <a:r>
-              <a:rPr lang="en-US" smtClean="0"/>
+              <a:rPr lang="en-US"/>
               <a:t>Fifth level</a:t>
             </a:r>
-            <a:endParaRPr lang="en-US"/>
           </a:p>
         </p:txBody>
       </p:sp>
@@ -521,10 +520,9 @@
           <a:lstStyle/>
           <a:p>
             <a:r>
-              <a:rPr lang="en-US" smtClean="0"/>
+              <a:rPr lang="en-US"/>
               <a:t>Click to edit Master title style</a:t>
             </a:r>
-            <a:endParaRPr lang="en-US"/>
           </a:p>
         </p:txBody>
       </p:sp>
@@ -640,10 +638,9 @@
           </a:lstStyle>
           <a:p>
             <a:r>
-              <a:rPr lang="en-US" smtClean="0"/>
+              <a:rPr lang="en-US"/>
               <a:t>Click to edit Master subtitle style</a:t>
             </a:r>
-            <a:endParaRPr lang="en-US"/>
           </a:p>
         </p:txBody>
       </p:sp>
@@ -664,7 +661,7 @@
           <a:p>
             <a:fld id="{78C97017-6FC3-485B-9764-EAC9E56C1D49}" type="datetimeFigureOut">
               <a:rPr lang="en-US" smtClean="0"/>
-              <a:t>10/20/2016</a:t>
+              <a:t>11/3/2016</a:t>
             </a:fld>
             <a:endParaRPr lang="en-US"/>
           </a:p>
@@ -758,10 +755,9 @@
           <a:lstStyle/>
           <a:p>
             <a:r>
-              <a:rPr lang="en-US" smtClean="0"/>
+              <a:rPr lang="en-US"/>
               <a:t>Click to edit Master title style</a:t>
             </a:r>
-            <a:endParaRPr lang="en-US"/>
           </a:p>
         </p:txBody>
       </p:sp>
@@ -782,38 +778,37 @@
           <a:p>
             <a:pPr lvl="0"/>
             <a:r>
-              <a:rPr lang="en-US" smtClean="0"/>
+              <a:rPr lang="en-US"/>
               <a:t>Click to edit Master text styles</a:t>
             </a:r>
           </a:p>
           <a:p>
             <a:pPr lvl="1"/>
             <a:r>
-              <a:rPr lang="en-US" smtClean="0"/>
+              <a:rPr lang="en-US"/>
               <a:t>Second level</a:t>
             </a:r>
           </a:p>
           <a:p>
             <a:pPr lvl="2"/>
             <a:r>
-              <a:rPr lang="en-US" smtClean="0"/>
+              <a:rPr lang="en-US"/>
               <a:t>Third level</a:t>
             </a:r>
           </a:p>
           <a:p>
             <a:pPr lvl="3"/>
             <a:r>
-              <a:rPr lang="en-US" smtClean="0"/>
+              <a:rPr lang="en-US"/>
               <a:t>Fourth level</a:t>
             </a:r>
           </a:p>
           <a:p>
             <a:pPr lvl="4"/>
             <a:r>
-              <a:rPr lang="en-US" smtClean="0"/>
+              <a:rPr lang="en-US"/>
               <a:t>Fifth level</a:t>
             </a:r>
-            <a:endParaRPr lang="en-US"/>
           </a:p>
         </p:txBody>
       </p:sp>
@@ -834,7 +829,7 @@
           <a:p>
             <a:fld id="{78C97017-6FC3-485B-9764-EAC9E56C1D49}" type="datetimeFigureOut">
               <a:rPr lang="en-US" smtClean="0"/>
-              <a:t>10/20/2016</a:t>
+              <a:t>11/3/2016</a:t>
             </a:fld>
             <a:endParaRPr lang="en-US"/>
           </a:p>
@@ -933,10 +928,9 @@
           <a:lstStyle/>
           <a:p>
             <a:r>
-              <a:rPr lang="en-US" smtClean="0"/>
+              <a:rPr lang="en-US"/>
               <a:t>Click to edit Master title style</a:t>
             </a:r>
-            <a:endParaRPr lang="en-US"/>
           </a:p>
         </p:txBody>
       </p:sp>
@@ -962,38 +956,37 @@
           <a:p>
             <a:pPr lvl="0"/>
             <a:r>
-              <a:rPr lang="en-US" smtClean="0"/>
+              <a:rPr lang="en-US"/>
               <a:t>Click to edit Master text styles</a:t>
             </a:r>
           </a:p>
           <a:p>
             <a:pPr lvl="1"/>
             <a:r>
-              <a:rPr lang="en-US" smtClean="0"/>
+              <a:rPr lang="en-US"/>
               <a:t>Second level</a:t>
             </a:r>
           </a:p>
           <a:p>
             <a:pPr lvl="2"/>
             <a:r>
-              <a:rPr lang="en-US" smtClean="0"/>
+              <a:rPr lang="en-US"/>
               <a:t>Third level</a:t>
             </a:r>
           </a:p>
           <a:p>
             <a:pPr lvl="3"/>
             <a:r>
-              <a:rPr lang="en-US" smtClean="0"/>
+              <a:rPr lang="en-US"/>
               <a:t>Fourth level</a:t>
             </a:r>
           </a:p>
           <a:p>
             <a:pPr lvl="4"/>
             <a:r>
-              <a:rPr lang="en-US" smtClean="0"/>
+              <a:rPr lang="en-US"/>
               <a:t>Fifth level</a:t>
             </a:r>
-            <a:endParaRPr lang="en-US"/>
           </a:p>
         </p:txBody>
       </p:sp>
@@ -1014,7 +1007,7 @@
           <a:p>
             <a:fld id="{78C97017-6FC3-485B-9764-EAC9E56C1D49}" type="datetimeFigureOut">
               <a:rPr lang="en-US" smtClean="0"/>
-              <a:t>10/20/2016</a:t>
+              <a:t>11/3/2016</a:t>
             </a:fld>
             <a:endParaRPr lang="en-US"/>
           </a:p>
@@ -1108,10 +1101,9 @@
           <a:lstStyle/>
           <a:p>
             <a:r>
-              <a:rPr lang="en-US" smtClean="0"/>
+              <a:rPr lang="en-US"/>
               <a:t>Click to edit Master title style</a:t>
             </a:r>
-            <a:endParaRPr lang="en-US"/>
           </a:p>
         </p:txBody>
       </p:sp>
@@ -1132,38 +1124,37 @@
           <a:p>
             <a:pPr lvl="0"/>
             <a:r>
-              <a:rPr lang="en-US" smtClean="0"/>
+              <a:rPr lang="en-US"/>
               <a:t>Click to edit Master text styles</a:t>
             </a:r>
           </a:p>
           <a:p>
             <a:pPr lvl="1"/>
             <a:r>
-              <a:rPr lang="en-US" smtClean="0"/>
+              <a:rPr lang="en-US"/>
               <a:t>Second level</a:t>
             </a:r>
           </a:p>
           <a:p>
             <a:pPr lvl="2"/>
             <a:r>
-              <a:rPr lang="en-US" smtClean="0"/>
+              <a:rPr lang="en-US"/>
               <a:t>Third level</a:t>
             </a:r>
           </a:p>
           <a:p>
             <a:pPr lvl="3"/>
             <a:r>
-              <a:rPr lang="en-US" smtClean="0"/>
+              <a:rPr lang="en-US"/>
               <a:t>Fourth level</a:t>
             </a:r>
           </a:p>
           <a:p>
             <a:pPr lvl="4"/>
             <a:r>
-              <a:rPr lang="en-US" smtClean="0"/>
+              <a:rPr lang="en-US"/>
               <a:t>Fifth level</a:t>
             </a:r>
-            <a:endParaRPr lang="en-US"/>
           </a:p>
         </p:txBody>
       </p:sp>
@@ -1184,7 +1175,7 @@
           <a:p>
             <a:fld id="{78C97017-6FC3-485B-9764-EAC9E56C1D49}" type="datetimeFigureOut">
               <a:rPr lang="en-US" smtClean="0"/>
-              <a:t>10/20/2016</a:t>
+              <a:t>11/3/2016</a:t>
             </a:fld>
             <a:endParaRPr lang="en-US"/>
           </a:p>
@@ -1287,10 +1278,9 @@
           </a:lstStyle>
           <a:p>
             <a:r>
-              <a:rPr lang="en-US" smtClean="0"/>
+              <a:rPr lang="en-US"/>
               <a:t>Click to edit Master title style</a:t>
             </a:r>
-            <a:endParaRPr lang="en-US"/>
           </a:p>
         </p:txBody>
       </p:sp>
@@ -1407,7 +1397,7 @@
           <a:p>
             <a:pPr lvl="0"/>
             <a:r>
-              <a:rPr lang="en-US" smtClean="0"/>
+              <a:rPr lang="en-US"/>
               <a:t>Click to edit Master text styles</a:t>
             </a:r>
           </a:p>
@@ -1430,7 +1420,7 @@
           <a:p>
             <a:fld id="{78C97017-6FC3-485B-9764-EAC9E56C1D49}" type="datetimeFigureOut">
               <a:rPr lang="en-US" smtClean="0"/>
-              <a:t>10/20/2016</a:t>
+              <a:t>11/3/2016</a:t>
             </a:fld>
             <a:endParaRPr lang="en-US"/>
           </a:p>
@@ -1524,10 +1514,9 @@
           <a:lstStyle/>
           <a:p>
             <a:r>
-              <a:rPr lang="en-US" smtClean="0"/>
+              <a:rPr lang="en-US"/>
               <a:t>Click to edit Master title style</a:t>
             </a:r>
-            <a:endParaRPr lang="en-US"/>
           </a:p>
         </p:txBody>
       </p:sp>
@@ -1581,38 +1570,37 @@
           <a:p>
             <a:pPr lvl="0"/>
             <a:r>
-              <a:rPr lang="en-US" smtClean="0"/>
+              <a:rPr lang="en-US"/>
               <a:t>Click to edit Master text styles</a:t>
             </a:r>
           </a:p>
           <a:p>
             <a:pPr lvl="1"/>
             <a:r>
-              <a:rPr lang="en-US" smtClean="0"/>
+              <a:rPr lang="en-US"/>
               <a:t>Second level</a:t>
             </a:r>
           </a:p>
           <a:p>
             <a:pPr lvl="2"/>
             <a:r>
-              <a:rPr lang="en-US" smtClean="0"/>
+              <a:rPr lang="en-US"/>
               <a:t>Third level</a:t>
             </a:r>
           </a:p>
           <a:p>
             <a:pPr lvl="3"/>
             <a:r>
-              <a:rPr lang="en-US" smtClean="0"/>
+              <a:rPr lang="en-US"/>
               <a:t>Fourth level</a:t>
             </a:r>
           </a:p>
           <a:p>
             <a:pPr lvl="4"/>
             <a:r>
-              <a:rPr lang="en-US" smtClean="0"/>
+              <a:rPr lang="en-US"/>
               <a:t>Fifth level</a:t>
             </a:r>
-            <a:endParaRPr lang="en-US"/>
           </a:p>
         </p:txBody>
       </p:sp>
@@ -1666,38 +1654,37 @@
           <a:p>
             <a:pPr lvl="0"/>
             <a:r>
-              <a:rPr lang="en-US" smtClean="0"/>
+              <a:rPr lang="en-US"/>
               <a:t>Click to edit Master text styles</a:t>
             </a:r>
           </a:p>
           <a:p>
             <a:pPr lvl="1"/>
             <a:r>
-              <a:rPr lang="en-US" smtClean="0"/>
+              <a:rPr lang="en-US"/>
               <a:t>Second level</a:t>
             </a:r>
           </a:p>
           <a:p>
             <a:pPr lvl="2"/>
             <a:r>
-              <a:rPr lang="en-US" smtClean="0"/>
+              <a:rPr lang="en-US"/>
               <a:t>Third level</a:t>
             </a:r>
           </a:p>
           <a:p>
             <a:pPr lvl="3"/>
             <a:r>
-              <a:rPr lang="en-US" smtClean="0"/>
+              <a:rPr lang="en-US"/>
               <a:t>Fourth level</a:t>
             </a:r>
           </a:p>
           <a:p>
             <a:pPr lvl="4"/>
             <a:r>
-              <a:rPr lang="en-US" smtClean="0"/>
+              <a:rPr lang="en-US"/>
               <a:t>Fifth level</a:t>
             </a:r>
-            <a:endParaRPr lang="en-US"/>
           </a:p>
         </p:txBody>
       </p:sp>
@@ -1718,7 +1705,7 @@
           <a:p>
             <a:fld id="{78C97017-6FC3-485B-9764-EAC9E56C1D49}" type="datetimeFigureOut">
               <a:rPr lang="en-US" smtClean="0"/>
-              <a:t>10/20/2016</a:t>
+              <a:t>11/3/2016</a:t>
             </a:fld>
             <a:endParaRPr lang="en-US"/>
           </a:p>
@@ -1816,10 +1803,9 @@
           </a:lstStyle>
           <a:p>
             <a:r>
-              <a:rPr lang="en-US" smtClean="0"/>
+              <a:rPr lang="en-US"/>
               <a:t>Click to edit Master title style</a:t>
             </a:r>
-            <a:endParaRPr lang="en-US"/>
           </a:p>
         </p:txBody>
       </p:sp>
@@ -1882,7 +1868,7 @@
           <a:p>
             <a:pPr lvl="0"/>
             <a:r>
-              <a:rPr lang="en-US" smtClean="0"/>
+              <a:rPr lang="en-US"/>
               <a:t>Click to edit Master text styles</a:t>
             </a:r>
           </a:p>
@@ -1938,38 +1924,37 @@
           <a:p>
             <a:pPr lvl="0"/>
             <a:r>
-              <a:rPr lang="en-US" smtClean="0"/>
+              <a:rPr lang="en-US"/>
               <a:t>Click to edit Master text styles</a:t>
             </a:r>
           </a:p>
           <a:p>
             <a:pPr lvl="1"/>
             <a:r>
-              <a:rPr lang="en-US" smtClean="0"/>
+              <a:rPr lang="en-US"/>
               <a:t>Second level</a:t>
             </a:r>
           </a:p>
           <a:p>
             <a:pPr lvl="2"/>
             <a:r>
-              <a:rPr lang="en-US" smtClean="0"/>
+              <a:rPr lang="en-US"/>
               <a:t>Third level</a:t>
             </a:r>
           </a:p>
           <a:p>
             <a:pPr lvl="3"/>
             <a:r>
-              <a:rPr lang="en-US" smtClean="0"/>
+              <a:rPr lang="en-US"/>
               <a:t>Fourth level</a:t>
             </a:r>
           </a:p>
           <a:p>
             <a:pPr lvl="4"/>
             <a:r>
-              <a:rPr lang="en-US" smtClean="0"/>
+              <a:rPr lang="en-US"/>
               <a:t>Fifth level</a:t>
             </a:r>
-            <a:endParaRPr lang="en-US"/>
           </a:p>
         </p:txBody>
       </p:sp>
@@ -2032,7 +2017,7 @@
           <a:p>
             <a:pPr lvl="0"/>
             <a:r>
-              <a:rPr lang="en-US" smtClean="0"/>
+              <a:rPr lang="en-US"/>
               <a:t>Click to edit Master text styles</a:t>
             </a:r>
           </a:p>
@@ -2088,38 +2073,37 @@
           <a:p>
             <a:pPr lvl="0"/>
             <a:r>
-              <a:rPr lang="en-US" smtClean="0"/>
+              <a:rPr lang="en-US"/>
               <a:t>Click to edit Master text styles</a:t>
             </a:r>
           </a:p>
           <a:p>
             <a:pPr lvl="1"/>
             <a:r>
-              <a:rPr lang="en-US" smtClean="0"/>
+              <a:rPr lang="en-US"/>
               <a:t>Second level</a:t>
             </a:r>
           </a:p>
           <a:p>
             <a:pPr lvl="2"/>
             <a:r>
-              <a:rPr lang="en-US" smtClean="0"/>
+              <a:rPr lang="en-US"/>
               <a:t>Third level</a:t>
             </a:r>
           </a:p>
           <a:p>
             <a:pPr lvl="3"/>
             <a:r>
-              <a:rPr lang="en-US" smtClean="0"/>
+              <a:rPr lang="en-US"/>
               <a:t>Fourth level</a:t>
             </a:r>
           </a:p>
           <a:p>
             <a:pPr lvl="4"/>
             <a:r>
-              <a:rPr lang="en-US" smtClean="0"/>
+              <a:rPr lang="en-US"/>
               <a:t>Fifth level</a:t>
             </a:r>
-            <a:endParaRPr lang="en-US"/>
           </a:p>
         </p:txBody>
       </p:sp>
@@ -2140,7 +2124,7 @@
           <a:p>
             <a:fld id="{78C97017-6FC3-485B-9764-EAC9E56C1D49}" type="datetimeFigureOut">
               <a:rPr lang="en-US" smtClean="0"/>
-              <a:t>10/20/2016</a:t>
+              <a:t>11/3/2016</a:t>
             </a:fld>
             <a:endParaRPr lang="en-US"/>
           </a:p>
@@ -2234,10 +2218,9 @@
           <a:lstStyle/>
           <a:p>
             <a:r>
-              <a:rPr lang="en-US" smtClean="0"/>
+              <a:rPr lang="en-US"/>
               <a:t>Click to edit Master title style</a:t>
             </a:r>
-            <a:endParaRPr lang="en-US"/>
           </a:p>
         </p:txBody>
       </p:sp>
@@ -2258,7 +2241,7 @@
           <a:p>
             <a:fld id="{78C97017-6FC3-485B-9764-EAC9E56C1D49}" type="datetimeFigureOut">
               <a:rPr lang="en-US" smtClean="0"/>
-              <a:t>10/20/2016</a:t>
+              <a:t>11/3/2016</a:t>
             </a:fld>
             <a:endParaRPr lang="en-US"/>
           </a:p>
@@ -2353,7 +2336,7 @@
           <a:p>
             <a:fld id="{78C97017-6FC3-485B-9764-EAC9E56C1D49}" type="datetimeFigureOut">
               <a:rPr lang="en-US" smtClean="0"/>
-              <a:t>10/20/2016</a:t>
+              <a:t>11/3/2016</a:t>
             </a:fld>
             <a:endParaRPr lang="en-US"/>
           </a:p>
@@ -2456,10 +2439,9 @@
           </a:lstStyle>
           <a:p>
             <a:r>
-              <a:rPr lang="en-US" smtClean="0"/>
+              <a:rPr lang="en-US"/>
               <a:t>Click to edit Master title style</a:t>
             </a:r>
-            <a:endParaRPr lang="en-US"/>
           </a:p>
         </p:txBody>
       </p:sp>
@@ -2513,38 +2495,37 @@
           <a:p>
             <a:pPr lvl="0"/>
             <a:r>
-              <a:rPr lang="en-US" smtClean="0"/>
+              <a:rPr lang="en-US"/>
               <a:t>Click to edit Master text styles</a:t>
             </a:r>
           </a:p>
           <a:p>
             <a:pPr lvl="1"/>
             <a:r>
-              <a:rPr lang="en-US" smtClean="0"/>
+              <a:rPr lang="en-US"/>
               <a:t>Second level</a:t>
             </a:r>
           </a:p>
           <a:p>
             <a:pPr lvl="2"/>
             <a:r>
-              <a:rPr lang="en-US" smtClean="0"/>
+              <a:rPr lang="en-US"/>
               <a:t>Third level</a:t>
             </a:r>
           </a:p>
           <a:p>
             <a:pPr lvl="3"/>
             <a:r>
-              <a:rPr lang="en-US" smtClean="0"/>
+              <a:rPr lang="en-US"/>
               <a:t>Fourth level</a:t>
             </a:r>
           </a:p>
           <a:p>
             <a:pPr lvl="4"/>
             <a:r>
-              <a:rPr lang="en-US" smtClean="0"/>
+              <a:rPr lang="en-US"/>
               <a:t>Fifth level</a:t>
             </a:r>
-            <a:endParaRPr lang="en-US"/>
           </a:p>
         </p:txBody>
       </p:sp>
@@ -2607,7 +2588,7 @@
           <a:p>
             <a:pPr lvl="0"/>
             <a:r>
-              <a:rPr lang="en-US" smtClean="0"/>
+              <a:rPr lang="en-US"/>
               <a:t>Click to edit Master text styles</a:t>
             </a:r>
           </a:p>
@@ -2630,7 +2611,7 @@
           <a:p>
             <a:fld id="{78C97017-6FC3-485B-9764-EAC9E56C1D49}" type="datetimeFigureOut">
               <a:rPr lang="en-US" smtClean="0"/>
-              <a:t>10/20/2016</a:t>
+              <a:t>11/3/2016</a:t>
             </a:fld>
             <a:endParaRPr lang="en-US"/>
           </a:p>
@@ -2733,10 +2714,9 @@
           </a:lstStyle>
           <a:p>
             <a:r>
-              <a:rPr lang="en-US" smtClean="0"/>
+              <a:rPr lang="en-US"/>
               <a:t>Click to edit Master title style</a:t>
             </a:r>
-            <a:endParaRPr lang="en-US"/>
           </a:p>
         </p:txBody>
       </p:sp>
@@ -2860,7 +2840,7 @@
           <a:p>
             <a:pPr lvl="0"/>
             <a:r>
-              <a:rPr lang="en-US" smtClean="0"/>
+              <a:rPr lang="en-US"/>
               <a:t>Click to edit Master text styles</a:t>
             </a:r>
           </a:p>
@@ -2883,7 +2863,7 @@
           <a:p>
             <a:fld id="{78C97017-6FC3-485B-9764-EAC9E56C1D49}" type="datetimeFigureOut">
               <a:rPr lang="en-US" smtClean="0"/>
-              <a:t>10/20/2016</a:t>
+              <a:t>11/3/2016</a:t>
             </a:fld>
             <a:endParaRPr lang="en-US"/>
           </a:p>
@@ -2992,10 +2972,9 @@
           <a:lstStyle/>
           <a:p>
             <a:r>
-              <a:rPr lang="en-US" smtClean="0"/>
+              <a:rPr lang="en-US"/>
               <a:t>Click to edit Master title style</a:t>
             </a:r>
-            <a:endParaRPr lang="en-US"/>
           </a:p>
         </p:txBody>
       </p:sp>
@@ -3026,38 +3005,37 @@
           <a:p>
             <a:pPr lvl="0"/>
             <a:r>
-              <a:rPr lang="en-US" smtClean="0"/>
+              <a:rPr lang="en-US"/>
               <a:t>Click to edit Master text styles</a:t>
             </a:r>
           </a:p>
           <a:p>
             <a:pPr lvl="1"/>
             <a:r>
-              <a:rPr lang="en-US" smtClean="0"/>
+              <a:rPr lang="en-US"/>
               <a:t>Second level</a:t>
             </a:r>
           </a:p>
           <a:p>
             <a:pPr lvl="2"/>
             <a:r>
-              <a:rPr lang="en-US" smtClean="0"/>
+              <a:rPr lang="en-US"/>
               <a:t>Third level</a:t>
             </a:r>
           </a:p>
           <a:p>
             <a:pPr lvl="3"/>
             <a:r>
-              <a:rPr lang="en-US" smtClean="0"/>
+              <a:rPr lang="en-US"/>
               <a:t>Fourth level</a:t>
             </a:r>
           </a:p>
           <a:p>
             <a:pPr lvl="4"/>
             <a:r>
-              <a:rPr lang="en-US" smtClean="0"/>
+              <a:rPr lang="en-US"/>
               <a:t>Fifth level</a:t>
             </a:r>
-            <a:endParaRPr lang="en-US"/>
           </a:p>
         </p:txBody>
       </p:sp>
@@ -3096,7 +3074,7 @@
           <a:p>
             <a:fld id="{78C97017-6FC3-485B-9764-EAC9E56C1D49}" type="datetimeFigureOut">
               <a:rPr lang="en-US" smtClean="0"/>
-              <a:t>10/20/2016</a:t>
+              <a:t>11/3/2016</a:t>
             </a:fld>
             <a:endParaRPr lang="en-US"/>
           </a:p>
@@ -3488,17 +3466,12 @@
           <a:p>
             <a:r>
               <a:rPr lang="en-US" dirty="0" err="1"/>
-              <a:t>d</a:t>
-            </a:r>
-            <a:r>
-              <a:rPr lang="en-US" dirty="0" err="1" smtClean="0"/>
-              <a:t>owat</a:t>
-            </a:r>
-            <a:r>
-              <a:rPr lang="en-US" dirty="0" smtClean="0"/>
+              <a:t>dowat</a:t>
+            </a:r>
+            <a:r>
+              <a:rPr lang="en-US" dirty="0"/>
               <a:t>!</a:t>
             </a:r>
-            <a:endParaRPr lang="en-US" dirty="0"/>
           </a:p>
         </p:txBody>
       </p:sp>
@@ -3518,10 +3491,9 @@
           <a:lstStyle/>
           <a:p>
             <a:r>
-              <a:rPr lang="en-US" dirty="0" smtClean="0"/>
+              <a:rPr lang="en-US" dirty="0"/>
               <a:t>Diagrams</a:t>
             </a:r>
-            <a:endParaRPr lang="en-US" dirty="0"/>
           </a:p>
         </p:txBody>
       </p:sp>
@@ -3653,7 +3625,7 @@
           <a:p>
             <a:pPr algn="ctr"/>
             <a:r>
-              <a:rPr lang="en-US" sz="1600" dirty="0" smtClean="0">
+              <a:rPr lang="en-US" sz="1600" dirty="0">
                 <a:solidFill>
                   <a:schemeClr val="bg1"/>
                 </a:solidFill>
@@ -3712,7 +3684,7 @@
           <a:p>
             <a:pPr algn="ctr"/>
             <a:r>
-              <a:rPr lang="en-US" sz="1600" dirty="0" smtClean="0">
+              <a:rPr lang="en-US" sz="1600" dirty="0">
                 <a:solidFill>
                   <a:schemeClr val="bg1"/>
                 </a:solidFill>
@@ -3775,7 +3747,7 @@
           <a:p>
             <a:pPr algn="ctr"/>
             <a:r>
-              <a:rPr lang="en-US" sz="1600" dirty="0" smtClean="0">
+              <a:rPr lang="en-US" sz="1600" dirty="0">
                 <a:solidFill>
                   <a:schemeClr val="bg1"/>
                 </a:solidFill>
@@ -3834,7 +3806,7 @@
           <a:p>
             <a:pPr algn="ctr"/>
             <a:r>
-              <a:rPr lang="en-US" sz="1600" dirty="0" smtClean="0">
+              <a:rPr lang="en-US" sz="1600" dirty="0">
                 <a:solidFill>
                   <a:schemeClr val="bg1"/>
                 </a:solidFill>
@@ -4420,7 +4392,7 @@
           <a:p>
             <a:pPr algn="ctr"/>
             <a:r>
-              <a:rPr lang="en-US" sz="1600" dirty="0" smtClean="0">
+              <a:rPr lang="en-US" sz="1600" dirty="0">
                 <a:solidFill>
                   <a:schemeClr val="bg1"/>
                 </a:solidFill>
@@ -4771,7 +4743,7 @@
           <a:p>
             <a:pPr algn="ctr"/>
             <a:r>
-              <a:rPr lang="en-US" sz="1600" dirty="0" smtClean="0">
+              <a:rPr lang="en-US" sz="1600" dirty="0">
                 <a:solidFill>
                   <a:schemeClr val="bg1"/>
                 </a:solidFill>
@@ -4779,25 +4751,20 @@
               <a:t>Logs</a:t>
             </a:r>
             <a:br>
-              <a:rPr lang="en-US" sz="1600" dirty="0" smtClean="0">
+              <a:rPr lang="en-US" sz="1600" dirty="0">
                 <a:solidFill>
                   <a:schemeClr val="bg1"/>
                 </a:solidFill>
               </a:rPr>
             </a:br>
             <a:r>
-              <a:rPr lang="en-US" sz="1600" dirty="0" smtClean="0">
+              <a:rPr lang="en-US" sz="1600" dirty="0">
                 <a:solidFill>
                   <a:schemeClr val="bg1"/>
                 </a:solidFill>
               </a:rPr>
               <a:t>Center</a:t>
             </a:r>
-            <a:endParaRPr lang="en-US" sz="1600" dirty="0">
-              <a:solidFill>
-                <a:schemeClr val="bg1"/>
-              </a:solidFill>
-            </a:endParaRPr>
           </a:p>
         </p:txBody>
       </p:sp>
@@ -4954,7 +4921,7 @@
           <a:p>
             <a:pPr algn="ctr"/>
             <a:r>
-              <a:rPr lang="en-US" sz="1600" dirty="0" smtClean="0">
+              <a:rPr lang="en-US" sz="1600" dirty="0">
                 <a:solidFill>
                   <a:schemeClr val="bg1"/>
                 </a:solidFill>
@@ -5318,7 +5285,7 @@
           <a:p>
             <a:pPr algn="ctr"/>
             <a:r>
-              <a:rPr lang="en-US" sz="1600" dirty="0" smtClean="0">
+              <a:rPr lang="en-US" sz="1600" dirty="0">
                 <a:solidFill>
                   <a:schemeClr val="bg1"/>
                 </a:solidFill>
@@ -5465,7 +5432,7 @@
           <a:p>
             <a:pPr algn="ctr"/>
             <a:r>
-              <a:rPr lang="en-US" sz="1600" dirty="0" smtClean="0">
+              <a:rPr lang="en-US" sz="1600" dirty="0">
                 <a:solidFill>
                   <a:schemeClr val="bg1"/>
                 </a:solidFill>
@@ -5627,10 +5594,9 @@
           <a:lstStyle/>
           <a:p>
             <a:r>
-              <a:rPr lang="en-US" sz="1400" dirty="0" smtClean="0"/>
+              <a:rPr lang="en-US" sz="1400" dirty="0"/>
               <a:t>delete task 1</a:t>
             </a:r>
-            <a:endParaRPr lang="en-US" sz="1400" dirty="0"/>
           </a:p>
         </p:txBody>
       </p:sp>
@@ -5693,18 +5659,13 @@
           <a:lstStyle/>
           <a:p>
             <a:r>
-              <a:rPr lang="en-US" sz="1400" dirty="0" smtClean="0">
+              <a:rPr lang="en-US" sz="1400" dirty="0">
                 <a:solidFill>
                   <a:srgbClr val="0070C0"/>
                 </a:solidFill>
               </a:rPr>
               <a:t>execute(“delete task 1”)</a:t>
             </a:r>
-            <a:endParaRPr lang="en-US" sz="1400" dirty="0">
-              <a:solidFill>
-                <a:srgbClr val="0070C0"/>
-              </a:solidFill>
-            </a:endParaRPr>
           </a:p>
         </p:txBody>
       </p:sp>
@@ -5767,7 +5728,7 @@
           <a:lstStyle/>
           <a:p>
             <a:r>
-              <a:rPr lang="en-US" sz="1400" dirty="0" err="1" smtClean="0">
+              <a:rPr lang="en-US" sz="1400" dirty="0" err="1">
                 <a:solidFill>
                   <a:srgbClr val="7030A0"/>
                 </a:solidFill>
@@ -5775,18 +5736,13 @@
               <a:t>deleteTask</a:t>
             </a:r>
             <a:r>
-              <a:rPr lang="en-US" sz="1400" dirty="0" smtClean="0">
+              <a:rPr lang="en-US" sz="1400" dirty="0">
                 <a:solidFill>
                   <a:srgbClr val="7030A0"/>
                 </a:solidFill>
               </a:rPr>
               <a:t>(t)</a:t>
             </a:r>
-            <a:endParaRPr lang="en-US" sz="1400" dirty="0">
-              <a:solidFill>
-                <a:srgbClr val="7030A0"/>
-              </a:solidFill>
-            </a:endParaRPr>
           </a:p>
         </p:txBody>
       </p:sp>
@@ -5813,7 +5769,7 @@
           <a:lstStyle/>
           <a:p>
             <a:r>
-              <a:rPr lang="en-US" sz="1400" dirty="0" smtClean="0">
+              <a:rPr lang="en-US" sz="1400" dirty="0">
                 <a:solidFill>
                   <a:schemeClr val="accent5">
                     <a:lumMod val="75000"/>
@@ -5823,7 +5779,7 @@
               <a:t>post(</a:t>
             </a:r>
             <a:r>
-              <a:rPr lang="en-US" sz="1400" dirty="0" err="1" smtClean="0">
+              <a:rPr lang="en-US" sz="1400" dirty="0" err="1">
                 <a:solidFill>
                   <a:schemeClr val="accent5">
                     <a:lumMod val="75000"/>
@@ -5833,7 +5789,7 @@
               <a:t>TaskBookChangedEvent</a:t>
             </a:r>
             <a:r>
-              <a:rPr lang="en-US" sz="1400" dirty="0" smtClean="0">
+              <a:rPr lang="en-US" sz="1400" dirty="0">
                 <a:solidFill>
                   <a:schemeClr val="accent5">
                     <a:lumMod val="75000"/>
@@ -5842,13 +5798,6 @@
               </a:rPr>
               <a:t>)</a:t>
             </a:r>
-            <a:endParaRPr lang="en-US" sz="1400" dirty="0">
-              <a:solidFill>
-                <a:schemeClr val="accent5">
-                  <a:lumMod val="75000"/>
-                </a:schemeClr>
-              </a:solidFill>
-            </a:endParaRPr>
           </a:p>
         </p:txBody>
       </p:sp>
@@ -6014,7 +5963,7 @@
           <a:p>
             <a:pPr algn="ctr"/>
             <a:r>
-              <a:rPr lang="en-US" sz="1600" dirty="0" smtClean="0">
+              <a:rPr lang="en-US" sz="1600" dirty="0">
                 <a:solidFill>
                   <a:schemeClr val="bg1"/>
                 </a:solidFill>
@@ -6022,7 +5971,7 @@
               <a:t>:</a:t>
             </a:r>
             <a:r>
-              <a:rPr lang="en-US" sz="1600" dirty="0" err="1" smtClean="0">
+              <a:rPr lang="en-US" sz="1600" dirty="0" err="1">
                 <a:solidFill>
                   <a:schemeClr val="bg1"/>
                 </a:solidFill>
@@ -6255,7 +6204,7 @@
           <a:p>
             <a:pPr algn="ctr"/>
             <a:r>
-              <a:rPr lang="en-US" sz="1600" dirty="0" smtClean="0">
+              <a:rPr lang="en-US" sz="1600" dirty="0">
                 <a:solidFill>
                   <a:schemeClr val="bg1"/>
                 </a:solidFill>
@@ -6387,7 +6336,7 @@
           <a:lstStyle/>
           <a:p>
             <a:r>
-              <a:rPr lang="en-US" sz="1400" dirty="0" smtClean="0">
+              <a:rPr lang="en-US" sz="1400" dirty="0">
                 <a:solidFill>
                   <a:schemeClr val="accent5">
                     <a:lumMod val="75000"/>
@@ -6397,7 +6346,7 @@
               <a:t>post(</a:t>
             </a:r>
             <a:r>
-              <a:rPr lang="en-US" sz="1400" dirty="0" err="1" smtClean="0">
+              <a:rPr lang="en-US" sz="1400" dirty="0" err="1">
                 <a:solidFill>
                   <a:schemeClr val="accent5">
                     <a:lumMod val="75000"/>
@@ -6407,7 +6356,7 @@
               <a:t>TaskBookChangedEvent</a:t>
             </a:r>
             <a:r>
-              <a:rPr lang="en-US" sz="1400" dirty="0" smtClean="0">
+              <a:rPr lang="en-US" sz="1400" dirty="0">
                 <a:solidFill>
                   <a:schemeClr val="accent5">
                     <a:lumMod val="75000"/>
@@ -6416,13 +6365,6 @@
               </a:rPr>
               <a:t>)</a:t>
             </a:r>
-            <a:endParaRPr lang="en-US" sz="1400" dirty="0">
-              <a:solidFill>
-                <a:schemeClr val="accent5">
-                  <a:lumMod val="75000"/>
-                </a:schemeClr>
-              </a:solidFill>
-            </a:endParaRPr>
           </a:p>
         </p:txBody>
       </p:sp>
@@ -6514,7 +6456,7 @@
           <a:p>
             <a:pPr algn="ctr"/>
             <a:r>
-              <a:rPr lang="en-US" sz="1600" dirty="0" smtClean="0">
+              <a:rPr lang="en-US" sz="1600" dirty="0">
                 <a:solidFill>
                   <a:schemeClr val="bg1"/>
                 </a:solidFill>
@@ -6522,7 +6464,7 @@
               <a:t>:</a:t>
             </a:r>
             <a:r>
-              <a:rPr lang="en-US" sz="1600" dirty="0" err="1" smtClean="0">
+              <a:rPr lang="en-US" sz="1600" dirty="0" err="1">
                 <a:solidFill>
                   <a:schemeClr val="bg1"/>
                 </a:solidFill>
@@ -6769,7 +6711,7 @@
           <a:lstStyle/>
           <a:p>
             <a:r>
-              <a:rPr lang="en-US" sz="1400" dirty="0" err="1" smtClean="0">
+              <a:rPr lang="en-US" sz="1400" dirty="0" err="1">
                 <a:solidFill>
                   <a:schemeClr val="accent6">
                     <a:lumMod val="75000"/>
@@ -6779,7 +6721,7 @@
               <a:t>handleTaskBookChangedEvent</a:t>
             </a:r>
             <a:r>
-              <a:rPr lang="en-US" sz="1400" dirty="0" smtClean="0">
+              <a:rPr lang="en-US" sz="1400" dirty="0">
                 <a:solidFill>
                   <a:schemeClr val="accent6">
                     <a:lumMod val="75000"/>
@@ -6788,13 +6730,6 @@
               </a:rPr>
               <a:t>()</a:t>
             </a:r>
-            <a:endParaRPr lang="en-US" sz="1400" dirty="0">
-              <a:solidFill>
-                <a:schemeClr val="accent6">
-                  <a:lumMod val="75000"/>
-                </a:schemeClr>
-              </a:solidFill>
-            </a:endParaRPr>
           </a:p>
         </p:txBody>
       </p:sp>
@@ -6879,7 +6814,7 @@
           <a:p>
             <a:pPr algn="ctr"/>
             <a:r>
-              <a:rPr lang="en-US" sz="1600" dirty="0" smtClean="0">
+              <a:rPr lang="en-US" sz="1600" dirty="0">
                 <a:solidFill>
                   <a:schemeClr val="bg1"/>
                 </a:solidFill>
@@ -7082,7 +7017,7 @@
           <a:lstStyle/>
           <a:p>
             <a:r>
-              <a:rPr lang="en-US" sz="1400" dirty="0" err="1" smtClean="0">
+              <a:rPr lang="en-US" sz="1400" dirty="0" err="1">
                 <a:solidFill>
                   <a:srgbClr val="00B050"/>
                 </a:solidFill>
@@ -7090,18 +7025,13 @@
               <a:t>handleTaskBookChangedEvent</a:t>
             </a:r>
             <a:r>
-              <a:rPr lang="en-US" sz="1400" dirty="0" smtClean="0">
+              <a:rPr lang="en-US" sz="1400" dirty="0">
                 <a:solidFill>
                   <a:srgbClr val="00B050"/>
                 </a:solidFill>
               </a:rPr>
               <a:t>()</a:t>
             </a:r>
-            <a:endParaRPr lang="en-US" sz="1400" dirty="0">
-              <a:solidFill>
-                <a:srgbClr val="00B050"/>
-              </a:solidFill>
-            </a:endParaRPr>
           </a:p>
         </p:txBody>
       </p:sp>
@@ -7288,18 +7218,13 @@
           <a:p>
             <a:pPr algn="r"/>
             <a:r>
-              <a:rPr lang="en-US" sz="1400" dirty="0" smtClean="0">
+              <a:rPr lang="en-US" sz="1400" dirty="0">
                 <a:solidFill>
                   <a:srgbClr val="00B050"/>
                 </a:solidFill>
               </a:rPr>
               <a:t>Update status bar</a:t>
             </a:r>
-            <a:endParaRPr lang="en-US" sz="1400" dirty="0">
-              <a:solidFill>
-                <a:srgbClr val="00B050"/>
-              </a:solidFill>
-            </a:endParaRPr>
           </a:p>
         </p:txBody>
       </p:sp>
@@ -7489,7 +7414,7 @@
           <a:lstStyle/>
           <a:p>
             <a:r>
-              <a:rPr lang="en-US" sz="1400" dirty="0" smtClean="0">
+              <a:rPr lang="en-US" sz="1400" dirty="0">
                 <a:solidFill>
                   <a:schemeClr val="accent6">
                     <a:lumMod val="75000"/>
@@ -7499,7 +7424,7 @@
               <a:t>Save </a:t>
             </a:r>
             <a:br>
-              <a:rPr lang="en-US" sz="1400" dirty="0" smtClean="0">
+              <a:rPr lang="en-US" sz="1400" dirty="0">
                 <a:solidFill>
                   <a:schemeClr val="accent6">
                     <a:lumMod val="75000"/>
@@ -7508,7 +7433,7 @@
               </a:rPr>
             </a:br>
             <a:r>
-              <a:rPr lang="en-US" sz="1400" dirty="0" smtClean="0">
+              <a:rPr lang="en-US" sz="1400" dirty="0">
                 <a:solidFill>
                   <a:schemeClr val="accent6">
                     <a:lumMod val="75000"/>
@@ -7517,13 +7442,6 @@
               </a:rPr>
               <a:t>to file</a:t>
             </a:r>
-            <a:endParaRPr lang="en-US" sz="1400" dirty="0">
-              <a:solidFill>
-                <a:schemeClr val="accent6">
-                  <a:lumMod val="75000"/>
-                </a:schemeClr>
-              </a:solidFill>
-            </a:endParaRPr>
           </a:p>
         </p:txBody>
       </p:sp>
@@ -7566,7 +7484,7 @@
         <p:spPr>
           <a:xfrm>
             <a:off x="1219200" y="1295400"/>
-            <a:ext cx="5791200" cy="4648200"/>
+            <a:ext cx="5791200" cy="4572000"/>
           </a:xfrm>
           <a:prstGeom prst="roundRect">
             <a:avLst>
@@ -7600,7 +7518,7 @@
           <a:lstStyle/>
           <a:p>
             <a:r>
-              <a:rPr lang="en-US" sz="1200" b="1" dirty="0" smtClean="0">
+              <a:rPr lang="en-US" sz="1200" b="1" dirty="0">
                 <a:solidFill>
                   <a:schemeClr val="accent3">
                     <a:lumMod val="75000"/>
@@ -7783,7 +7701,7 @@
           <a:p>
             <a:pPr algn="ctr"/>
             <a:r>
-              <a:rPr lang="en-US" sz="1050" dirty="0" err="1" smtClean="0">
+              <a:rPr lang="en-US" sz="1050" dirty="0" err="1">
                 <a:solidFill>
                   <a:schemeClr val="bg1"/>
                 </a:solidFill>
@@ -7940,8 +7858,8 @@
         </p:nvSpPr>
         <p:spPr>
           <a:xfrm rot="16200000">
-            <a:off x="6107867" y="2312477"/>
-            <a:ext cx="2362201" cy="328045"/>
+            <a:off x="6222167" y="2198176"/>
+            <a:ext cx="2133601" cy="328045"/>
           </a:xfrm>
           <a:prstGeom prst="roundRect">
             <a:avLst/>
@@ -7994,13 +7912,13 @@
       </p:sp>
       <p:sp>
         <p:nvSpPr>
-          <p:cNvPr id="34" name="Rectangle 11"/>
+          <p:cNvPr id="35" name="Rectangle 11"/>
           <p:cNvSpPr/>
           <p:nvPr/>
         </p:nvSpPr>
         <p:spPr>
           <a:xfrm>
-            <a:off x="2819399" y="3496959"/>
+            <a:off x="2819399" y="5173359"/>
             <a:ext cx="1093635" cy="236841"/>
           </a:xfrm>
           <a:prstGeom prst="rect">
@@ -8040,7 +7958,7 @@
                   </a:schemeClr>
                 </a:solidFill>
               </a:rPr>
-              <a:t>BrowserPanel</a:t>
+              <a:t>StatusBarFooter</a:t>
             </a:r>
             <a:endParaRPr lang="en-SG" sz="1050" b="1" dirty="0">
               <a:solidFill>
@@ -8054,14 +7972,14 @@
       </p:sp>
       <p:sp>
         <p:nvSpPr>
-          <p:cNvPr id="35" name="Rectangle 11"/>
+          <p:cNvPr id="36" name="Rectangle 11"/>
           <p:cNvSpPr/>
           <p:nvPr/>
         </p:nvSpPr>
         <p:spPr>
           <a:xfrm>
-            <a:off x="2819399" y="5020959"/>
-            <a:ext cx="1093635" cy="236841"/>
+            <a:off x="2819400" y="3534762"/>
+            <a:ext cx="1093635" cy="275239"/>
           </a:xfrm>
           <a:prstGeom prst="rect">
             <a:avLst/>
@@ -8100,7 +8018,7 @@
                   </a:schemeClr>
                 </a:solidFill>
               </a:rPr>
-              <a:t>StatusBarFooter</a:t>
+              <a:t>EventListPanel</a:t>
             </a:r>
             <a:endParaRPr lang="en-SG" sz="1050" b="1" dirty="0">
               <a:solidFill>
@@ -8114,14 +8032,14 @@
       </p:sp>
       <p:sp>
         <p:nvSpPr>
-          <p:cNvPr id="36" name="Rectangle 11"/>
+          <p:cNvPr id="37" name="Rectangle 11"/>
           <p:cNvSpPr/>
           <p:nvPr/>
         </p:nvSpPr>
         <p:spPr>
           <a:xfrm>
-            <a:off x="2819400" y="3915762"/>
-            <a:ext cx="1093635" cy="275239"/>
+            <a:off x="4521694" y="3801759"/>
+            <a:ext cx="1040906" cy="236841"/>
           </a:xfrm>
           <a:prstGeom prst="rect">
             <a:avLst/>
@@ -8153,14 +8071,14 @@
           <a:p>
             <a:pPr algn="ctr"/>
             <a:r>
-              <a:rPr lang="en-US" sz="1050" b="1" dirty="0" err="1" smtClean="0">
+              <a:rPr lang="en-US" sz="1050" b="1" dirty="0" err="1">
                 <a:solidFill>
                   <a:schemeClr val="accent3">
                     <a:lumMod val="75000"/>
                   </a:schemeClr>
                 </a:solidFill>
               </a:rPr>
-              <a:t>EventListPanel</a:t>
+              <a:t>EventCard</a:t>
             </a:r>
             <a:endParaRPr lang="en-SG" sz="1050" b="1" dirty="0">
               <a:solidFill>
@@ -8174,14 +8092,14 @@
       </p:sp>
       <p:sp>
         <p:nvSpPr>
-          <p:cNvPr id="37" name="Rectangle 11"/>
+          <p:cNvPr id="38" name="Rectangle 11"/>
           <p:cNvSpPr/>
           <p:nvPr/>
         </p:nvSpPr>
         <p:spPr>
           <a:xfrm>
-            <a:off x="4521694" y="4182759"/>
-            <a:ext cx="1040906" cy="236841"/>
+            <a:off x="2819399" y="5554359"/>
+            <a:ext cx="1093635" cy="236841"/>
           </a:xfrm>
           <a:prstGeom prst="rect">
             <a:avLst/>
@@ -8213,14 +8131,14 @@
           <a:p>
             <a:pPr algn="ctr"/>
             <a:r>
-              <a:rPr lang="en-US" sz="1050" b="1" dirty="0" err="1" smtClean="0">
+              <a:rPr lang="en-US" sz="1050" b="1" dirty="0" err="1">
                 <a:solidFill>
                   <a:schemeClr val="accent3">
                     <a:lumMod val="75000"/>
                   </a:schemeClr>
                 </a:solidFill>
               </a:rPr>
-              <a:t>EventCard</a:t>
+              <a:t>HelpWindow</a:t>
             </a:r>
             <a:endParaRPr lang="en-SG" sz="1050" b="1" dirty="0">
               <a:solidFill>
@@ -8234,14 +8152,103 @@
       </p:sp>
       <p:sp>
         <p:nvSpPr>
-          <p:cNvPr id="38" name="Rectangle 11"/>
+          <p:cNvPr id="39" name="Flowchart: Decision 38"/>
           <p:cNvSpPr/>
           <p:nvPr/>
         </p:nvSpPr>
         <p:spPr>
           <a:xfrm>
-            <a:off x="2819399" y="5410200"/>
-            <a:ext cx="1093635" cy="236841"/>
+            <a:off x="2517705" y="2611928"/>
+            <a:ext cx="183156" cy="161573"/>
+          </a:xfrm>
+          <a:prstGeom prst="flowChartDecision">
+            <a:avLst/>
+          </a:prstGeom>
+          <a:solidFill>
+            <a:schemeClr val="accent3"/>
+          </a:solidFill>
+          <a:ln>
+            <a:solidFill>
+              <a:schemeClr val="accent3"/>
+            </a:solidFill>
+          </a:ln>
+        </p:spPr>
+        <p:style>
+          <a:lnRef idx="2">
+            <a:schemeClr val="accent1">
+              <a:shade val="50000"/>
+            </a:schemeClr>
+          </a:lnRef>
+          <a:fillRef idx="1">
+            <a:schemeClr val="accent1"/>
+          </a:fillRef>
+          <a:effectRef idx="0">
+            <a:schemeClr val="accent1"/>
+          </a:effectRef>
+          <a:fontRef idx="minor">
+            <a:schemeClr val="lt1"/>
+          </a:fontRef>
+        </p:style>
+        <p:txBody>
+          <a:bodyPr rtlCol="0" anchor="ctr"/>
+          <a:lstStyle/>
+          <a:p>
+            <a:pPr algn="ctr"/>
+            <a:endParaRPr lang="en-SG"/>
+          </a:p>
+        </p:txBody>
+      </p:sp>
+      <p:cxnSp>
+        <p:nvCxnSpPr>
+          <p:cNvPr id="40" name="Elbow Connector 63"/>
+          <p:cNvCxnSpPr>
+            <a:stCxn id="39" idx="2"/>
+            <a:endCxn id="3" idx="1"/>
+          </p:cNvCxnSpPr>
+          <p:nvPr/>
+        </p:nvCxnSpPr>
+        <p:spPr>
+          <a:xfrm rot="16200000" flipH="1">
+            <a:off x="2517881" y="2864903"/>
+            <a:ext cx="392920" cy="210116"/>
+          </a:xfrm>
+          <a:prstGeom prst="bentConnector2">
+            <a:avLst/>
+          </a:prstGeom>
+          <a:ln w="19050">
+            <a:solidFill>
+              <a:schemeClr val="accent3"/>
+            </a:solidFill>
+            <a:headEnd type="none" w="med" len="med"/>
+            <a:tailEnd type="arrow" w="med" len="med"/>
+          </a:ln>
+          <a:effectLst/>
+        </p:spPr>
+        <p:style>
+          <a:lnRef idx="1">
+            <a:schemeClr val="accent2"/>
+          </a:lnRef>
+          <a:fillRef idx="2">
+            <a:schemeClr val="accent2"/>
+          </a:fillRef>
+          <a:effectRef idx="1">
+            <a:schemeClr val="accent2"/>
+          </a:effectRef>
+          <a:fontRef idx="minor">
+            <a:schemeClr val="dk1"/>
+          </a:fontRef>
+        </p:style>
+      </p:cxnSp>
+      <p:sp>
+        <p:nvSpPr>
+          <p:cNvPr id="43" name="Rectangle 11"/>
+          <p:cNvSpPr/>
+          <p:nvPr/>
+        </p:nvSpPr>
+        <p:spPr>
+          <a:xfrm>
+            <a:off x="4445493" y="3264561"/>
+            <a:ext cx="1040906" cy="236841"/>
           </a:xfrm>
           <a:prstGeom prst="rect">
             <a:avLst/>
@@ -8280,7 +8287,7 @@
                   </a:schemeClr>
                 </a:solidFill>
               </a:rPr>
-              <a:t>HelpWindow</a:t>
+              <a:t>ResultsDisplay</a:t>
             </a:r>
             <a:endParaRPr lang="en-SG" sz="1050" b="1" dirty="0">
               <a:solidFill>
@@ -8292,196 +8299,6 @@
           </a:p>
         </p:txBody>
       </p:sp>
-      <p:sp>
-        <p:nvSpPr>
-          <p:cNvPr id="39" name="Flowchart: Decision 38"/>
-          <p:cNvSpPr/>
-          <p:nvPr/>
-        </p:nvSpPr>
-        <p:spPr>
-          <a:xfrm>
-            <a:off x="2517705" y="2611928"/>
-            <a:ext cx="183156" cy="161573"/>
-          </a:xfrm>
-          <a:prstGeom prst="flowChartDecision">
-            <a:avLst/>
-          </a:prstGeom>
-          <a:solidFill>
-            <a:schemeClr val="accent3"/>
-          </a:solidFill>
-          <a:ln>
-            <a:solidFill>
-              <a:schemeClr val="accent3"/>
-            </a:solidFill>
-          </a:ln>
-        </p:spPr>
-        <p:style>
-          <a:lnRef idx="2">
-            <a:schemeClr val="accent1">
-              <a:shade val="50000"/>
-            </a:schemeClr>
-          </a:lnRef>
-          <a:fillRef idx="1">
-            <a:schemeClr val="accent1"/>
-          </a:fillRef>
-          <a:effectRef idx="0">
-            <a:schemeClr val="accent1"/>
-          </a:effectRef>
-          <a:fontRef idx="minor">
-            <a:schemeClr val="lt1"/>
-          </a:fontRef>
-        </p:style>
-        <p:txBody>
-          <a:bodyPr rtlCol="0" anchor="ctr"/>
-          <a:lstStyle/>
-          <a:p>
-            <a:pPr algn="ctr"/>
-            <a:endParaRPr lang="en-SG"/>
-          </a:p>
-        </p:txBody>
-      </p:sp>
-      <p:cxnSp>
-        <p:nvCxnSpPr>
-          <p:cNvPr id="40" name="Elbow Connector 63"/>
-          <p:cNvCxnSpPr>
-            <a:stCxn id="39" idx="2"/>
-            <a:endCxn id="3" idx="1"/>
-          </p:cNvCxnSpPr>
-          <p:nvPr/>
-        </p:nvCxnSpPr>
-        <p:spPr>
-          <a:xfrm rot="16200000" flipH="1">
-            <a:off x="2517881" y="2864903"/>
-            <a:ext cx="392920" cy="210116"/>
-          </a:xfrm>
-          <a:prstGeom prst="bentConnector2">
-            <a:avLst/>
-          </a:prstGeom>
-          <a:ln w="19050">
-            <a:solidFill>
-              <a:schemeClr val="accent3"/>
-            </a:solidFill>
-            <a:headEnd type="none" w="med" len="med"/>
-            <a:tailEnd type="arrow" w="med" len="med"/>
-          </a:ln>
-          <a:effectLst/>
-        </p:spPr>
-        <p:style>
-          <a:lnRef idx="1">
-            <a:schemeClr val="accent2"/>
-          </a:lnRef>
-          <a:fillRef idx="2">
-            <a:schemeClr val="accent2"/>
-          </a:fillRef>
-          <a:effectRef idx="1">
-            <a:schemeClr val="accent2"/>
-          </a:effectRef>
-          <a:fontRef idx="minor">
-            <a:schemeClr val="dk1"/>
-          </a:fontRef>
-        </p:style>
-      </p:cxnSp>
-      <p:sp>
-        <p:nvSpPr>
-          <p:cNvPr id="43" name="Rectangle 11"/>
-          <p:cNvSpPr/>
-          <p:nvPr/>
-        </p:nvSpPr>
-        <p:spPr>
-          <a:xfrm>
-            <a:off x="4445493" y="3264561"/>
-            <a:ext cx="1040906" cy="236841"/>
-          </a:xfrm>
-          <a:prstGeom prst="rect">
-            <a:avLst/>
-          </a:prstGeom>
-          <a:ln w="19050">
-            <a:solidFill>
-              <a:schemeClr val="accent3"/>
-            </a:solidFill>
-          </a:ln>
-          <a:effectLst/>
-        </p:spPr>
-        <p:style>
-          <a:lnRef idx="1">
-            <a:schemeClr val="accent3"/>
-          </a:lnRef>
-          <a:fillRef idx="2">
-            <a:schemeClr val="accent3"/>
-          </a:fillRef>
-          <a:effectRef idx="1">
-            <a:schemeClr val="accent3"/>
-          </a:effectRef>
-          <a:fontRef idx="minor">
-            <a:schemeClr val="dk1"/>
-          </a:fontRef>
-        </p:style>
-        <p:txBody>
-          <a:bodyPr rtlCol="0" anchor="ctr"/>
-          <a:lstStyle/>
-          <a:p>
-            <a:pPr algn="ctr"/>
-            <a:r>
-              <a:rPr lang="en-US" sz="1050" b="1" dirty="0" err="1">
-                <a:solidFill>
-                  <a:schemeClr val="accent3">
-                    <a:lumMod val="75000"/>
-                  </a:schemeClr>
-                </a:solidFill>
-              </a:rPr>
-              <a:t>ResultsDisplay</a:t>
-            </a:r>
-            <a:endParaRPr lang="en-SG" sz="1050" b="1" dirty="0">
-              <a:solidFill>
-                <a:schemeClr val="accent3">
-                  <a:lumMod val="75000"/>
-                </a:schemeClr>
-              </a:solidFill>
-            </a:endParaRPr>
-          </a:p>
-        </p:txBody>
-      </p:sp>
-      <p:cxnSp>
-        <p:nvCxnSpPr>
-          <p:cNvPr id="44" name="Elbow Connector 63"/>
-          <p:cNvCxnSpPr>
-            <a:stCxn id="39" idx="2"/>
-            <a:endCxn id="34" idx="1"/>
-          </p:cNvCxnSpPr>
-          <p:nvPr/>
-        </p:nvCxnSpPr>
-        <p:spPr>
-          <a:xfrm rot="16200000" flipH="1">
-            <a:off x="2293402" y="3089382"/>
-            <a:ext cx="841879" cy="210116"/>
-          </a:xfrm>
-          <a:prstGeom prst="bentConnector2">
-            <a:avLst/>
-          </a:prstGeom>
-          <a:ln w="19050">
-            <a:solidFill>
-              <a:schemeClr val="accent3"/>
-            </a:solidFill>
-            <a:headEnd type="none" w="med" len="med"/>
-            <a:tailEnd type="arrow" w="med" len="med"/>
-          </a:ln>
-          <a:effectLst/>
-        </p:spPr>
-        <p:style>
-          <a:lnRef idx="1">
-            <a:schemeClr val="accent2"/>
-          </a:lnRef>
-          <a:fillRef idx="2">
-            <a:schemeClr val="accent2"/>
-          </a:fillRef>
-          <a:effectRef idx="1">
-            <a:schemeClr val="accent2"/>
-          </a:effectRef>
-          <a:fontRef idx="minor">
-            <a:schemeClr val="dk1"/>
-          </a:fontRef>
-        </p:style>
-      </p:cxnSp>
       <p:cxnSp>
         <p:nvCxnSpPr>
           <p:cNvPr id="50" name="Elbow Connector 63"/>
@@ -8493,8 +8310,8 @@
         </p:nvCxnSpPr>
         <p:spPr>
           <a:xfrm rot="16200000" flipH="1">
-            <a:off x="1531402" y="3851382"/>
-            <a:ext cx="2365879" cy="210116"/>
+            <a:off x="1455202" y="3927582"/>
+            <a:ext cx="2518279" cy="210116"/>
           </a:xfrm>
           <a:prstGeom prst="bentConnector2">
             <a:avLst/>
@@ -8533,8 +8350,8 @@
         </p:nvCxnSpPr>
         <p:spPr>
           <a:xfrm rot="16200000" flipH="1">
-            <a:off x="1133106" y="3842328"/>
-            <a:ext cx="2956144" cy="416441"/>
+            <a:off x="859310" y="3712691"/>
+            <a:ext cx="3462978" cy="457199"/>
           </a:xfrm>
           <a:prstGeom prst="bentConnector2">
             <a:avLst/>
@@ -8604,7 +8421,7 @@
           <a:p>
             <a:pPr algn="ctr"/>
             <a:r>
-              <a:rPr lang="en-US" sz="1050" b="1" dirty="0" smtClean="0">
+              <a:rPr lang="en-US" sz="1050" b="1" dirty="0">
                 <a:solidFill>
                   <a:schemeClr val="accent3">
                     <a:lumMod val="75000"/>
@@ -8614,7 +8431,7 @@
               <a:t>{abstract}</a:t>
             </a:r>
             <a:br>
-              <a:rPr lang="en-US" sz="1050" b="1" dirty="0" smtClean="0">
+              <a:rPr lang="en-US" sz="1050" b="1" dirty="0">
                 <a:solidFill>
                   <a:schemeClr val="accent3">
                     <a:lumMod val="75000"/>
@@ -8623,7 +8440,7 @@
               </a:rPr>
             </a:br>
             <a:r>
-              <a:rPr lang="en-US" sz="1050" b="1" dirty="0" err="1" smtClean="0">
+              <a:rPr lang="en-US" sz="1050" b="1" dirty="0" err="1">
                 <a:solidFill>
                   <a:schemeClr val="accent3">
                     <a:lumMod val="75000"/>
@@ -8694,49 +8511,8 @@
         </p:nvCxnSpPr>
         <p:spPr>
           <a:xfrm rot="5400000">
-            <a:off x="4995894" y="2700306"/>
-            <a:ext cx="2167580" cy="1034168"/>
-          </a:xfrm>
-          <a:prstGeom prst="bentConnector2">
-            <a:avLst/>
-          </a:prstGeom>
-          <a:ln w="6350">
-            <a:solidFill>
-              <a:schemeClr val="accent3"/>
-            </a:solidFill>
-            <a:headEnd type="none" w="med" len="med"/>
-            <a:tailEnd type="none" w="med" len="med"/>
-          </a:ln>
-          <a:effectLst/>
-        </p:spPr>
-        <p:style>
-          <a:lnRef idx="1">
-            <a:schemeClr val="accent2"/>
-          </a:lnRef>
-          <a:fillRef idx="2">
-            <a:schemeClr val="accent2"/>
-          </a:fillRef>
-          <a:effectRef idx="1">
-            <a:schemeClr val="accent2"/>
-          </a:effectRef>
-          <a:fontRef idx="minor">
-            <a:schemeClr val="dk1"/>
-          </a:fontRef>
-        </p:style>
-      </p:cxnSp>
-      <p:cxnSp>
-        <p:nvCxnSpPr>
-          <p:cNvPr id="82" name="Elbow Connector 63"/>
-          <p:cNvCxnSpPr>
-            <a:stCxn id="16" idx="3"/>
-            <a:endCxn id="34" idx="3"/>
-          </p:cNvCxnSpPr>
-          <p:nvPr/>
-        </p:nvCxnSpPr>
-        <p:spPr>
-          <a:xfrm rot="5400000">
-            <a:off x="4514011" y="1532623"/>
-            <a:ext cx="1481780" cy="2683734"/>
+            <a:off x="5186394" y="2509806"/>
+            <a:ext cx="1786580" cy="1034168"/>
           </a:xfrm>
           <a:prstGeom prst="bentConnector2">
             <a:avLst/>
@@ -8817,8 +8593,8 @@
         </p:nvCxnSpPr>
         <p:spPr>
           <a:xfrm rot="5400000">
-            <a:off x="3752011" y="2294623"/>
-            <a:ext cx="3005780" cy="2683734"/>
+            <a:off x="3675811" y="2370823"/>
+            <a:ext cx="3158180" cy="2683734"/>
           </a:xfrm>
           <a:prstGeom prst="bentConnector2">
             <a:avLst/>
@@ -8858,8 +8634,8 @@
         </p:nvCxnSpPr>
         <p:spPr>
           <a:xfrm rot="5400000">
-            <a:off x="3557391" y="2489243"/>
-            <a:ext cx="3395021" cy="2683734"/>
+            <a:off x="3485311" y="2561323"/>
+            <a:ext cx="3539180" cy="2683734"/>
           </a:xfrm>
           <a:prstGeom prst="bentConnector2">
             <a:avLst/>
@@ -9079,8 +8855,8 @@
         </p:nvSpPr>
         <p:spPr>
           <a:xfrm rot="16200000">
-            <a:off x="6351076" y="4674676"/>
-            <a:ext cx="1905001" cy="328045"/>
+            <a:off x="6160576" y="4484175"/>
+            <a:ext cx="2286002" cy="328045"/>
           </a:xfrm>
           <a:prstGeom prst="roundRect">
             <a:avLst/>
@@ -9116,7 +8892,7 @@
           <a:p>
             <a:pPr algn="ctr"/>
             <a:r>
-              <a:rPr lang="en-US" sz="1100" b="1" dirty="0" smtClean="0">
+              <a:rPr lang="en-US" sz="1100" b="1" dirty="0">
                 <a:solidFill>
                   <a:schemeClr val="bg1"/>
                 </a:solidFill>
@@ -9175,7 +8951,7 @@
           <a:p>
             <a:pPr algn="ctr"/>
             <a:r>
-              <a:rPr lang="en-US" sz="1050" dirty="0" smtClean="0">
+              <a:rPr lang="en-US" sz="1050" dirty="0">
                 <a:solidFill>
                   <a:schemeClr val="bg1"/>
                 </a:solidFill>
@@ -9186,7 +8962,7 @@
           <a:p>
             <a:pPr algn="ctr"/>
             <a:r>
-              <a:rPr lang="en-US" sz="1050" dirty="0" err="1" smtClean="0">
+              <a:rPr lang="en-US" sz="1050" dirty="0" err="1">
                 <a:solidFill>
                   <a:schemeClr val="bg1"/>
                 </a:solidFill>
@@ -9384,7 +9160,7 @@
         </p:nvCxnSpPr>
         <p:spPr>
           <a:xfrm rot="16200000" flipH="1">
-            <a:off x="3888867" y="3668352"/>
+            <a:off x="3888867" y="3287352"/>
             <a:ext cx="110179" cy="1155476"/>
           </a:xfrm>
           <a:prstGeom prst="bentConnector2">
@@ -9425,8 +9201,8 @@
         </p:nvCxnSpPr>
         <p:spPr>
           <a:xfrm rot="5400000">
-            <a:off x="4295011" y="1751625"/>
-            <a:ext cx="1919782" cy="2683733"/>
+            <a:off x="4485511" y="1561125"/>
+            <a:ext cx="1538782" cy="2683733"/>
           </a:xfrm>
           <a:prstGeom prst="bentConnector2">
             <a:avLst/>
@@ -9598,7 +9374,7 @@
         </p:nvSpPr>
         <p:spPr>
           <a:xfrm>
-            <a:off x="6498372" y="4335738"/>
+            <a:off x="6498372" y="3954738"/>
             <a:ext cx="229325" cy="160062"/>
           </a:xfrm>
           <a:prstGeom prst="rect">
@@ -9651,7 +9427,7 @@
         </p:nvSpPr>
         <p:spPr>
           <a:xfrm flipV="1">
-            <a:off x="5181600" y="4419600"/>
+            <a:off x="5181600" y="4038600"/>
             <a:ext cx="1981199" cy="76200"/>
           </a:xfrm>
           <a:custGeom>
@@ -9733,7 +9509,7 @@
         </p:nvSpPr>
         <p:spPr>
           <a:xfrm>
-            <a:off x="2819400" y="4419601"/>
+            <a:off x="2819400" y="4038601"/>
             <a:ext cx="1093635" cy="304799"/>
           </a:xfrm>
           <a:prstGeom prst="rect">
@@ -9766,7 +9542,7 @@
           <a:p>
             <a:pPr algn="ctr"/>
             <a:r>
-              <a:rPr lang="en-US" sz="1050" b="1" dirty="0" err="1" smtClean="0">
+              <a:rPr lang="en-US" sz="1050" b="1" dirty="0" err="1">
                 <a:solidFill>
                   <a:schemeClr val="accent3">
                     <a:lumMod val="75000"/>
@@ -9793,7 +9569,7 @@
         </p:nvSpPr>
         <p:spPr>
           <a:xfrm>
-            <a:off x="4521694" y="4716159"/>
+            <a:off x="4521694" y="4335159"/>
             <a:ext cx="1040906" cy="236841"/>
           </a:xfrm>
           <a:prstGeom prst="rect">
@@ -9826,7 +9602,7 @@
           <a:p>
             <a:pPr algn="ctr"/>
             <a:r>
-              <a:rPr lang="en-US" sz="1050" b="1" dirty="0" err="1" smtClean="0">
+              <a:rPr lang="en-US" sz="1050" b="1" dirty="0" err="1">
                 <a:solidFill>
                   <a:schemeClr val="accent3">
                     <a:lumMod val="75000"/>
@@ -9856,7 +9632,7 @@
         </p:nvCxnSpPr>
         <p:spPr>
           <a:xfrm rot="16200000" flipH="1">
-            <a:off x="3888866" y="4201752"/>
+            <a:off x="3888866" y="3820752"/>
             <a:ext cx="110180" cy="1155476"/>
           </a:xfrm>
           <a:prstGeom prst="bentConnector2">
@@ -9894,7 +9670,7 @@
         </p:nvSpPr>
         <p:spPr>
           <a:xfrm flipV="1">
-            <a:off x="5181600" y="4953000"/>
+            <a:off x="5181600" y="4572000"/>
             <a:ext cx="1981200" cy="76200"/>
           </a:xfrm>
           <a:custGeom>
@@ -9979,8 +9755,8 @@
         </p:nvCxnSpPr>
         <p:spPr>
           <a:xfrm rot="5400000">
-            <a:off x="4729194" y="2967006"/>
-            <a:ext cx="2700980" cy="1034168"/>
+            <a:off x="4919694" y="2776506"/>
+            <a:ext cx="2319980" cy="1034168"/>
           </a:xfrm>
           <a:prstGeom prst="bentConnector2">
             <a:avLst/>
@@ -10020,8 +9796,8 @@
         </p:nvCxnSpPr>
         <p:spPr>
           <a:xfrm rot="16200000" flipH="1">
-            <a:off x="1815091" y="3567692"/>
-            <a:ext cx="1798500" cy="210117"/>
+            <a:off x="2005591" y="3377192"/>
+            <a:ext cx="1417500" cy="210117"/>
           </a:xfrm>
           <a:prstGeom prst="bentConnector2">
             <a:avLst/>
@@ -10061,8 +9837,8 @@
         </p:nvCxnSpPr>
         <p:spPr>
           <a:xfrm rot="16200000" flipH="1">
-            <a:off x="2074401" y="3308382"/>
-            <a:ext cx="1279881" cy="210117"/>
+            <a:off x="2264901" y="3117882"/>
+            <a:ext cx="898881" cy="210117"/>
           </a:xfrm>
           <a:prstGeom prst="bentConnector2">
             <a:avLst/>
@@ -10102,8 +9878,150 @@
         </p:nvCxnSpPr>
         <p:spPr>
           <a:xfrm rot="5400000">
-            <a:off x="4035702" y="2010934"/>
-            <a:ext cx="2438401" cy="2683733"/>
+            <a:off x="4226202" y="1820434"/>
+            <a:ext cx="2057401" cy="2683733"/>
+          </a:xfrm>
+          <a:prstGeom prst="bentConnector2">
+            <a:avLst/>
+          </a:prstGeom>
+          <a:ln w="6350">
+            <a:solidFill>
+              <a:schemeClr val="accent3"/>
+            </a:solidFill>
+            <a:headEnd type="none" w="med" len="med"/>
+            <a:tailEnd type="none" w="med" len="med"/>
+          </a:ln>
+          <a:effectLst/>
+        </p:spPr>
+        <p:style>
+          <a:lnRef idx="1">
+            <a:schemeClr val="accent2"/>
+          </a:lnRef>
+          <a:fillRef idx="2">
+            <a:schemeClr val="accent2"/>
+          </a:fillRef>
+          <a:effectRef idx="1">
+            <a:schemeClr val="accent2"/>
+          </a:effectRef>
+          <a:fontRef idx="minor">
+            <a:schemeClr val="dk1"/>
+          </a:fontRef>
+        </p:style>
+      </p:cxnSp>
+      <p:sp>
+        <p:nvSpPr>
+          <p:cNvPr id="59" name="Rectangle 11"/>
+          <p:cNvSpPr/>
+          <p:nvPr/>
+        </p:nvSpPr>
+        <p:spPr>
+          <a:xfrm>
+            <a:off x="2819400" y="4724400"/>
+            <a:ext cx="1093635" cy="236841"/>
+          </a:xfrm>
+          <a:prstGeom prst="rect">
+            <a:avLst/>
+          </a:prstGeom>
+          <a:ln w="19050">
+            <a:solidFill>
+              <a:schemeClr val="accent3"/>
+            </a:solidFill>
+          </a:ln>
+          <a:effectLst/>
+        </p:spPr>
+        <p:style>
+          <a:lnRef idx="1">
+            <a:schemeClr val="accent3"/>
+          </a:lnRef>
+          <a:fillRef idx="2">
+            <a:schemeClr val="accent3"/>
+          </a:fillRef>
+          <a:effectRef idx="1">
+            <a:schemeClr val="accent3"/>
+          </a:effectRef>
+          <a:fontRef idx="minor">
+            <a:schemeClr val="dk1"/>
+          </a:fontRef>
+        </p:style>
+        <p:txBody>
+          <a:bodyPr rtlCol="0" anchor="ctr"/>
+          <a:lstStyle/>
+          <a:p>
+            <a:pPr algn="ctr"/>
+            <a:r>
+              <a:rPr lang="en-US" sz="1050" b="1" dirty="0" err="1">
+                <a:solidFill>
+                  <a:schemeClr val="accent3">
+                    <a:lumMod val="75000"/>
+                  </a:schemeClr>
+                </a:solidFill>
+              </a:rPr>
+              <a:t>CalendarPanel</a:t>
+            </a:r>
+            <a:endParaRPr lang="en-SG" sz="1050" b="1" dirty="0">
+              <a:solidFill>
+                <a:schemeClr val="accent3">
+                  <a:lumMod val="75000"/>
+                </a:schemeClr>
+              </a:solidFill>
+            </a:endParaRPr>
+          </a:p>
+        </p:txBody>
+      </p:sp>
+      <p:cxnSp>
+        <p:nvCxnSpPr>
+          <p:cNvPr id="60" name="Elbow Connector 63"/>
+          <p:cNvCxnSpPr>
+            <a:stCxn id="39" idx="2"/>
+            <a:endCxn id="59" idx="1"/>
+          </p:cNvCxnSpPr>
+          <p:nvPr/>
+        </p:nvCxnSpPr>
+        <p:spPr>
+          <a:xfrm rot="16200000" flipH="1">
+            <a:off x="1679681" y="3703102"/>
+            <a:ext cx="2069320" cy="210117"/>
+          </a:xfrm>
+          <a:prstGeom prst="bentConnector2">
+            <a:avLst/>
+          </a:prstGeom>
+          <a:ln w="19050">
+            <a:solidFill>
+              <a:schemeClr val="accent3"/>
+            </a:solidFill>
+            <a:headEnd type="none" w="med" len="med"/>
+            <a:tailEnd type="arrow" w="med" len="med"/>
+          </a:ln>
+          <a:effectLst/>
+        </p:spPr>
+        <p:style>
+          <a:lnRef idx="1">
+            <a:schemeClr val="accent2"/>
+          </a:lnRef>
+          <a:fillRef idx="2">
+            <a:schemeClr val="accent2"/>
+          </a:fillRef>
+          <a:effectRef idx="1">
+            <a:schemeClr val="accent2"/>
+          </a:effectRef>
+          <a:fontRef idx="minor">
+            <a:schemeClr val="dk1"/>
+          </a:fontRef>
+        </p:style>
+      </p:cxnSp>
+      <p:cxnSp>
+        <p:nvCxnSpPr>
+          <p:cNvPr id="61" name="Elbow Connector 63"/>
+          <p:cNvCxnSpPr>
+            <a:stCxn id="16" idx="3"/>
+            <a:endCxn id="59" idx="3"/>
+          </p:cNvCxnSpPr>
+          <p:nvPr/>
+        </p:nvCxnSpPr>
+        <p:spPr>
+          <a:xfrm rot="5400000">
+            <a:off x="3900292" y="2146344"/>
+            <a:ext cx="2709221" cy="2683733"/>
           </a:xfrm>
           <a:prstGeom prst="bentConnector2">
             <a:avLst/>
@@ -10142,13 +10060,6 @@
   <p:clrMapOvr>
     <a:masterClrMapping/>
   </p:clrMapOvr>
-  <p:timing>
-    <p:tnLst>
-      <p:par>
-        <p:cTn id="1" dur="indefinite" restart="never" nodeType="tmRoot"/>
-      </p:par>
-    </p:tnLst>
-  </p:timing>
 </p:sld>
 </file>
 
@@ -10215,7 +10126,7 @@
           <a:lstStyle/>
           <a:p>
             <a:r>
-              <a:rPr lang="en-US" sz="1200" b="1" dirty="0" smtClean="0">
+              <a:rPr lang="en-US" sz="1200" b="1" dirty="0">
                 <a:solidFill>
                   <a:srgbClr val="0070C0"/>
                 </a:solidFill>
@@ -10333,7 +10244,7 @@
           <a:p>
             <a:pPr algn="ctr"/>
             <a:r>
-              <a:rPr lang="en-US" sz="1050" dirty="0" err="1" smtClean="0">
+              <a:rPr lang="en-US" sz="1050" dirty="0" err="1">
                 <a:solidFill>
                   <a:schemeClr val="bg1"/>
                 </a:solidFill>
@@ -10535,7 +10446,7 @@
           <a:p>
             <a:pPr algn="ctr"/>
             <a:r>
-              <a:rPr lang="en-US" sz="1050" b="1" dirty="0" smtClean="0">
+              <a:rPr lang="en-US" sz="1050" b="1" dirty="0">
                 <a:solidFill>
                   <a:srgbClr val="0070C0"/>
                 </a:solidFill>
@@ -10543,14 +10454,14 @@
               <a:t>{abstract}</a:t>
             </a:r>
             <a:br>
-              <a:rPr lang="en-US" sz="1050" b="1" dirty="0" smtClean="0">
+              <a:rPr lang="en-US" sz="1050" b="1" dirty="0">
                 <a:solidFill>
                   <a:srgbClr val="0070C0"/>
                 </a:solidFill>
               </a:rPr>
             </a:br>
             <a:r>
-              <a:rPr lang="en-US" sz="1050" b="1" dirty="0" smtClean="0">
+              <a:rPr lang="en-US" sz="1050" b="1" dirty="0">
                 <a:solidFill>
                   <a:srgbClr val="0070C0"/>
                 </a:solidFill>
@@ -10606,7 +10517,7 @@
           <a:p>
             <a:pPr algn="ctr"/>
             <a:r>
-              <a:rPr lang="en-US" sz="1050" b="1" dirty="0" err="1" smtClean="0">
+              <a:rPr lang="en-US" sz="1050" b="1" dirty="0" err="1">
                 <a:solidFill>
                   <a:srgbClr val="0070C0"/>
                 </a:solidFill>
@@ -11079,7 +10990,7 @@
             <a:p>
               <a:pPr algn="r"/>
               <a:r>
-                <a:rPr lang="en-US" sz="1100" dirty="0" smtClean="0">
+                <a:rPr lang="en-US" sz="1100" dirty="0">
                   <a:solidFill>
                     <a:srgbClr val="0070C0"/>
                   </a:solidFill>
@@ -11178,7 +11089,7 @@
             <a:lstStyle/>
             <a:p>
               <a:r>
-                <a:rPr lang="en-US" sz="1100" dirty="0" smtClean="0">
+                <a:rPr lang="en-US" sz="1100" dirty="0">
                   <a:solidFill>
                     <a:srgbClr val="0070C0"/>
                   </a:solidFill>
@@ -11264,7 +11175,7 @@
           <a:p>
             <a:pPr algn="r"/>
             <a:r>
-              <a:rPr lang="en-US" sz="1100" dirty="0" smtClean="0">
+              <a:rPr lang="en-US" sz="1100" dirty="0">
                 <a:solidFill>
                   <a:srgbClr val="0070C0"/>
                 </a:solidFill>
@@ -11303,7 +11214,7 @@
           <a:p>
             <a:pPr algn="r"/>
             <a:r>
-              <a:rPr lang="en-US" sz="1100" dirty="0" smtClean="0">
+              <a:rPr lang="en-US" sz="1100" dirty="0">
                 <a:solidFill>
                   <a:srgbClr val="0070C0"/>
                 </a:solidFill>
@@ -11356,7 +11267,7 @@
             <a:p>
               <a:pPr algn="r"/>
               <a:r>
-                <a:rPr lang="en-US" sz="1100" dirty="0" smtClean="0">
+                <a:rPr lang="en-US" sz="1100" dirty="0">
                   <a:solidFill>
                     <a:srgbClr val="0070C0"/>
                   </a:solidFill>
@@ -11459,7 +11370,7 @@
           <a:p>
             <a:pPr algn="ctr"/>
             <a:r>
-              <a:rPr lang="en-US" sz="900" b="1" dirty="0" err="1" smtClean="0">
+              <a:rPr lang="en-US" sz="900" b="1" dirty="0" err="1">
                 <a:solidFill>
                   <a:srgbClr val="0070C0"/>
                 </a:solidFill>
@@ -11563,7 +11474,7 @@
           <a:p>
             <a:pPr algn="ctr"/>
             <a:r>
-              <a:rPr lang="en-US" sz="900" b="1" dirty="0" err="1" smtClean="0">
+              <a:rPr lang="en-US" sz="900" b="1" dirty="0" err="1">
                 <a:solidFill>
                   <a:srgbClr val="0070C0"/>
                 </a:solidFill>
@@ -11705,20 +11616,12 @@
           <a:p>
             <a:pPr algn="ctr"/>
             <a:r>
-              <a:rPr lang="en-US" sz="900" b="1" dirty="0" err="1" smtClean="0">
+              <a:rPr lang="en-US" sz="900" b="1" dirty="0" err="1">
                 <a:solidFill>
                   <a:srgbClr val="0070C0"/>
                 </a:solidFill>
               </a:rPr>
-              <a:t>Find</a:t>
-            </a:r>
-            <a:r>
-              <a:rPr lang="en-US" sz="900" b="1" dirty="0" err="1" smtClean="0">
-                <a:solidFill>
-                  <a:srgbClr val="0070C0"/>
-                </a:solidFill>
-              </a:rPr>
-              <a:t>Command</a:t>
+              <a:t>FindCommand</a:t>
             </a:r>
             <a:endParaRPr lang="en-SG" sz="900" b="1" dirty="0">
               <a:solidFill>
@@ -11812,7 +11715,7 @@
           <a:p>
             <a:pPr algn="ctr"/>
             <a:r>
-              <a:rPr lang="en-US" sz="900" b="1" dirty="0" err="1" smtClean="0">
+              <a:rPr lang="en-US" sz="900" b="1" dirty="0" err="1">
                 <a:solidFill>
                   <a:srgbClr val="0070C0"/>
                 </a:solidFill>
@@ -11868,7 +11771,7 @@
           <a:p>
             <a:pPr algn="ctr"/>
             <a:r>
-              <a:rPr lang="en-US" sz="900" b="1" dirty="0" err="1" smtClean="0">
+              <a:rPr lang="en-US" sz="900" b="1" dirty="0" err="1">
                 <a:solidFill>
                   <a:srgbClr val="0070C0"/>
                 </a:solidFill>
@@ -12051,7 +11954,7 @@
           <a:p>
             <a:pPr algn="ctr"/>
             <a:r>
-              <a:rPr lang="en-US" sz="900" b="1" dirty="0" err="1" smtClean="0">
+              <a:rPr lang="en-US" sz="900" b="1" dirty="0" err="1">
                 <a:solidFill>
                   <a:srgbClr val="0070C0"/>
                 </a:solidFill>
@@ -12107,7 +12010,7 @@
           <a:p>
             <a:pPr algn="ctr"/>
             <a:r>
-              <a:rPr lang="en-US" sz="900" b="1" dirty="0" err="1" smtClean="0">
+              <a:rPr lang="en-US" sz="900" b="1" dirty="0" err="1">
                 <a:solidFill>
                   <a:srgbClr val="0070C0"/>
                 </a:solidFill>
@@ -12163,7 +12066,7 @@
           <a:p>
             <a:pPr algn="ctr"/>
             <a:r>
-              <a:rPr lang="en-US" sz="900" b="1" dirty="0" err="1" smtClean="0">
+              <a:rPr lang="en-US" sz="900" b="1" dirty="0" err="1">
                 <a:solidFill>
                   <a:srgbClr val="0070C0"/>
                 </a:solidFill>
@@ -12219,7 +12122,7 @@
           <a:p>
             <a:pPr algn="ctr"/>
             <a:r>
-              <a:rPr lang="en-US" sz="900" b="1" dirty="0" err="1" smtClean="0">
+              <a:rPr lang="en-US" sz="900" b="1" dirty="0" err="1">
                 <a:solidFill>
                   <a:srgbClr val="0070C0"/>
                 </a:solidFill>
@@ -12275,7 +12178,7 @@
           <a:p>
             <a:pPr algn="ctr"/>
             <a:r>
-              <a:rPr lang="en-US" sz="900" b="1" dirty="0" err="1" smtClean="0">
+              <a:rPr lang="en-US" sz="900" b="1" dirty="0" err="1">
                 <a:solidFill>
                   <a:srgbClr val="0070C0"/>
                 </a:solidFill>
@@ -12503,7 +12406,7 @@
           <a:p>
             <a:pPr algn="ctr"/>
             <a:r>
-              <a:rPr lang="en-US" sz="900" b="1" dirty="0" err="1" smtClean="0">
+              <a:rPr lang="en-US" sz="900" b="1" dirty="0" err="1">
                 <a:solidFill>
                   <a:srgbClr val="0070C0"/>
                 </a:solidFill>
@@ -12559,7 +12462,7 @@
           <a:p>
             <a:pPr algn="ctr"/>
             <a:r>
-              <a:rPr lang="en-US" sz="900" b="1" dirty="0" err="1" smtClean="0">
+              <a:rPr lang="en-US" sz="900" b="1" dirty="0" err="1">
                 <a:solidFill>
                   <a:srgbClr val="0070C0"/>
                 </a:solidFill>
@@ -12615,7 +12518,7 @@
           <a:p>
             <a:pPr algn="ctr"/>
             <a:r>
-              <a:rPr lang="en-US" sz="900" b="1" dirty="0" err="1" smtClean="0">
+              <a:rPr lang="en-US" sz="900" b="1" dirty="0" err="1">
                 <a:solidFill>
                   <a:srgbClr val="0070C0"/>
                 </a:solidFill>
@@ -12671,7 +12574,7 @@
           <a:p>
             <a:pPr algn="ctr"/>
             <a:r>
-              <a:rPr lang="en-US" sz="900" b="1" dirty="0" err="1" smtClean="0">
+              <a:rPr lang="en-US" sz="900" b="1" dirty="0" err="1">
                 <a:solidFill>
                   <a:srgbClr val="0070C0"/>
                 </a:solidFill>
@@ -12727,7 +12630,7 @@
           <a:p>
             <a:pPr algn="ctr"/>
             <a:r>
-              <a:rPr lang="en-US" sz="900" b="1" dirty="0" err="1" smtClean="0">
+              <a:rPr lang="en-US" sz="900" b="1" dirty="0" err="1">
                 <a:solidFill>
                   <a:srgbClr val="0070C0"/>
                 </a:solidFill>
@@ -12783,7 +12686,7 @@
           <a:p>
             <a:pPr algn="ctr"/>
             <a:r>
-              <a:rPr lang="en-US" sz="900" b="1" dirty="0" err="1" smtClean="0">
+              <a:rPr lang="en-US" sz="900" b="1" dirty="0" err="1">
                 <a:solidFill>
                   <a:srgbClr val="0070C0"/>
                 </a:solidFill>
@@ -12839,7 +12742,7 @@
           <a:p>
             <a:pPr algn="ctr"/>
             <a:r>
-              <a:rPr lang="en-US" sz="900" b="1" dirty="0" err="1" smtClean="0">
+              <a:rPr lang="en-US" sz="900" b="1" dirty="0" err="1">
                 <a:solidFill>
                   <a:srgbClr val="0070C0"/>
                 </a:solidFill>
@@ -12895,7 +12798,7 @@
           <a:p>
             <a:pPr algn="ctr"/>
             <a:r>
-              <a:rPr lang="en-US" sz="900" b="1" dirty="0" err="1" smtClean="0">
+              <a:rPr lang="en-US" sz="900" b="1" dirty="0" err="1">
                 <a:solidFill>
                   <a:srgbClr val="0070C0"/>
                 </a:solidFill>
@@ -13265,7 +13168,7 @@
           <a:p>
             <a:pPr algn="ctr"/>
             <a:r>
-              <a:rPr lang="en-US" sz="1050" b="1" dirty="0" err="1" smtClean="0">
+              <a:rPr lang="en-US" sz="1050" b="1" dirty="0" err="1">
                 <a:solidFill>
                   <a:srgbClr val="0070C0"/>
                 </a:solidFill>
@@ -13321,7 +13224,7 @@
           <a:p>
             <a:pPr algn="ctr"/>
             <a:r>
-              <a:rPr lang="en-US" sz="1050" b="1" dirty="0" err="1" smtClean="0">
+              <a:rPr lang="en-US" sz="1050" b="1" dirty="0" err="1">
                 <a:solidFill>
                   <a:srgbClr val="0070C0"/>
                 </a:solidFill>
@@ -13377,7 +13280,7 @@
           <a:p>
             <a:pPr algn="ctr"/>
             <a:r>
-              <a:rPr lang="en-US" sz="1050" b="1" dirty="0" err="1" smtClean="0">
+              <a:rPr lang="en-US" sz="1050" b="1" dirty="0" err="1">
                 <a:solidFill>
                   <a:srgbClr val="0070C0"/>
                 </a:solidFill>
@@ -13433,7 +13336,7 @@
           <a:p>
             <a:pPr algn="ctr"/>
             <a:r>
-              <a:rPr lang="en-US" sz="1200" b="1" dirty="0" smtClean="0">
+              <a:rPr lang="en-US" sz="1200" b="1" dirty="0">
                 <a:solidFill>
                   <a:srgbClr val="0070C0"/>
                 </a:solidFill>
@@ -13733,23 +13636,18 @@
           <a:p>
             <a:pPr algn="ctr"/>
             <a:r>
-              <a:rPr lang="en-US" sz="1050" b="1" dirty="0" smtClean="0">
+              <a:rPr lang="en-US" sz="1050" b="1" dirty="0">
                 <a:solidFill>
                   <a:srgbClr val="0070C0"/>
                 </a:solidFill>
               </a:rPr>
               <a:t>&lt;&lt;interface&gt;&gt;</a:t>
             </a:r>
-            <a:endParaRPr lang="en-US" sz="1050" b="1" dirty="0">
-              <a:solidFill>
-                <a:srgbClr val="0070C0"/>
-              </a:solidFill>
-            </a:endParaRPr>
           </a:p>
           <a:p>
             <a:pPr algn="ctr"/>
             <a:r>
-              <a:rPr lang="en-US" sz="1050" b="1" dirty="0" smtClean="0">
+              <a:rPr lang="en-US" sz="1050" b="1" dirty="0">
                 <a:solidFill>
                   <a:srgbClr val="0070C0"/>
                 </a:solidFill>
@@ -13918,13 +13816,6 @@
   <p:clrMapOvr>
     <a:masterClrMapping/>
   </p:clrMapOvr>
-  <p:timing>
-    <p:tnLst>
-      <p:par>
-        <p:cTn id="1" dur="indefinite" restart="never" nodeType="tmRoot"/>
-      </p:par>
-    </p:tnLst>
-  </p:timing>
 </p:sld>
 </file>
 
@@ -13991,7 +13882,7 @@
           <a:lstStyle/>
           <a:p>
             <a:r>
-              <a:rPr lang="en-US" sz="1200" b="1" dirty="0" smtClean="0">
+              <a:rPr lang="en-US" sz="1200" b="1" dirty="0">
                 <a:solidFill>
                   <a:srgbClr val="7030A0"/>
                 </a:solidFill>
@@ -14050,7 +13941,7 @@
           <a:p>
             <a:pPr algn="ctr"/>
             <a:r>
-              <a:rPr lang="en-US" sz="1050" dirty="0" err="1" smtClean="0">
+              <a:rPr lang="en-US" sz="1050" dirty="0" err="1">
                 <a:solidFill>
                   <a:schemeClr val="bg1"/>
                 </a:solidFill>
@@ -14109,7 +14000,7 @@
           <a:p>
             <a:pPr algn="ctr"/>
             <a:r>
-              <a:rPr lang="en-US" sz="1050" dirty="0" err="1" smtClean="0">
+              <a:rPr lang="en-US" sz="1050" dirty="0" err="1">
                 <a:solidFill>
                   <a:schemeClr val="bg1"/>
                 </a:solidFill>
@@ -14265,7 +14156,7 @@
           <a:p>
             <a:pPr algn="ctr"/>
             <a:r>
-              <a:rPr lang="en-US" sz="1050" dirty="0" smtClean="0">
+              <a:rPr lang="en-US" sz="1050" dirty="0">
                 <a:solidFill>
                   <a:schemeClr val="bg1"/>
                 </a:solidFill>
@@ -14589,7 +14480,7 @@
           <a:p>
             <a:pPr algn="ctr"/>
             <a:r>
-              <a:rPr lang="en-US" sz="1050" dirty="0" err="1" smtClean="0">
+              <a:rPr lang="en-US" sz="1050" dirty="0" err="1">
                 <a:solidFill>
                   <a:srgbClr val="7030A0"/>
                 </a:solidFill>
@@ -14731,7 +14622,7 @@
           <a:p>
             <a:pPr algn="ctr"/>
             <a:r>
-              <a:rPr lang="en-US" sz="1050" dirty="0" err="1" smtClean="0">
+              <a:rPr lang="en-US" sz="1050" dirty="0" err="1">
                 <a:solidFill>
                   <a:srgbClr val="7030A0"/>
                 </a:solidFill>
@@ -14875,7 +14766,7 @@
           <a:p>
             <a:pPr algn="ctr"/>
             <a:r>
-              <a:rPr lang="en-US" sz="1050" dirty="0" err="1" smtClean="0">
+              <a:rPr lang="en-US" sz="1050" dirty="0" err="1">
                 <a:solidFill>
                   <a:srgbClr val="7030A0"/>
                 </a:solidFill>
@@ -14974,18 +14865,13 @@
           <a:p>
             <a:pPr algn="ctr"/>
             <a:r>
-              <a:rPr lang="en-SG" sz="1050" dirty="0" smtClean="0">
+              <a:rPr lang="en-SG" sz="1050" dirty="0">
                 <a:solidFill>
                   <a:srgbClr val="7030A0"/>
                 </a:solidFill>
               </a:rPr>
               <a:t>Event</a:t>
             </a:r>
-            <a:endParaRPr lang="en-SG" sz="1050" dirty="0">
-              <a:solidFill>
-                <a:srgbClr val="7030A0"/>
-              </a:solidFill>
-            </a:endParaRPr>
           </a:p>
         </p:txBody>
       </p:sp>
@@ -15116,7 +15002,7 @@
           <a:p>
             <a:pPr algn="ctr"/>
             <a:r>
-              <a:rPr lang="en-US" sz="1050" dirty="0" smtClean="0">
+              <a:rPr lang="en-US" sz="1050" dirty="0">
                 <a:solidFill>
                   <a:srgbClr val="7030A0"/>
                 </a:solidFill>
@@ -15258,7 +15144,7 @@
           <a:p>
             <a:pPr algn="ctr"/>
             <a:r>
-              <a:rPr lang="en-US" sz="1050" dirty="0" smtClean="0">
+              <a:rPr lang="en-US" sz="1050" dirty="0">
                 <a:solidFill>
                   <a:srgbClr val="7030A0"/>
                 </a:solidFill>
@@ -15266,14 +15152,14 @@
               <a:t>&lt;&lt;interface&gt;&gt;</a:t>
             </a:r>
             <a:br>
-              <a:rPr lang="en-US" sz="1050" dirty="0" smtClean="0">
+              <a:rPr lang="en-US" sz="1050" dirty="0">
                 <a:solidFill>
                   <a:srgbClr val="7030A0"/>
                 </a:solidFill>
               </a:rPr>
             </a:br>
             <a:r>
-              <a:rPr lang="en-US" sz="1050" dirty="0" err="1" smtClean="0">
+              <a:rPr lang="en-US" sz="1050" dirty="0" err="1">
                 <a:solidFill>
                   <a:srgbClr val="7030A0"/>
                 </a:solidFill>
@@ -15376,7 +15262,7 @@
           <a:p>
             <a:pPr algn="ctr"/>
             <a:r>
-              <a:rPr lang="en-US" sz="1050" dirty="0" smtClean="0">
+              <a:rPr lang="en-US" sz="1050" dirty="0">
                 <a:solidFill>
                   <a:srgbClr val="7030A0"/>
                 </a:solidFill>
@@ -15529,7 +15415,7 @@
           <a:p>
             <a:pPr algn="ctr"/>
             <a:r>
-              <a:rPr lang="en-US" sz="1050" dirty="0" smtClean="0">
+              <a:rPr lang="en-US" sz="1050" dirty="0">
                 <a:solidFill>
                   <a:srgbClr val="7030A0"/>
                 </a:solidFill>
@@ -15717,7 +15603,7 @@
           <a:p>
             <a:pPr algn="ctr"/>
             <a:r>
-              <a:rPr lang="en-US" sz="1050" dirty="0" smtClean="0">
+              <a:rPr lang="en-US" sz="1050" dirty="0">
                 <a:solidFill>
                   <a:srgbClr val="7030A0"/>
                 </a:solidFill>
@@ -15725,14 +15611,14 @@
               <a:t>&lt;&lt;interface&gt;&gt;</a:t>
             </a:r>
             <a:br>
-              <a:rPr lang="en-US" sz="1050" dirty="0" smtClean="0">
+              <a:rPr lang="en-US" sz="1050" dirty="0">
                 <a:solidFill>
                   <a:srgbClr val="7030A0"/>
                 </a:solidFill>
               </a:rPr>
             </a:br>
             <a:r>
-              <a:rPr lang="en-US" sz="1050" dirty="0" err="1" smtClean="0">
+              <a:rPr lang="en-US" sz="1050" dirty="0" err="1">
                 <a:solidFill>
                   <a:srgbClr val="7030A0"/>
                 </a:solidFill>
@@ -15771,7 +15657,7 @@
           <a:p>
             <a:pPr algn="r"/>
             <a:r>
-              <a:rPr lang="en-US" sz="1100" dirty="0" smtClean="0">
+              <a:rPr lang="en-US" sz="1100" dirty="0">
                 <a:solidFill>
                   <a:srgbClr val="7030A0"/>
                 </a:solidFill>
@@ -15827,21 +15713,13 @@
           <a:p>
             <a:pPr algn="ctr"/>
             <a:r>
-              <a:rPr lang="en-US" sz="1050" dirty="0" smtClean="0">
+              <a:rPr lang="en-US" sz="1050" dirty="0">
                 <a:solidFill>
                   <a:srgbClr val="7030A0"/>
                 </a:solidFill>
               </a:rPr>
               <a:t>&lt;&lt;interface&gt;&gt;</a:t>
             </a:r>
-            <a:r>
-              <a:rPr lang="en-US" sz="1050" dirty="0">
-                <a:solidFill>
-                  <a:srgbClr val="7030A0"/>
-                </a:solidFill>
-              </a:rPr>
-              <a:t/>
-            </a:r>
             <a:br>
               <a:rPr lang="en-US" sz="1050" dirty="0">
                 <a:solidFill>
@@ -15850,7 +15728,7 @@
               </a:rPr>
             </a:br>
             <a:r>
-              <a:rPr lang="en-US" sz="1050" dirty="0" err="1" smtClean="0">
+              <a:rPr lang="en-US" sz="1050" dirty="0" err="1">
                 <a:solidFill>
                   <a:srgbClr val="7030A0"/>
                 </a:solidFill>
@@ -16033,7 +15911,7 @@
           <a:p>
             <a:pPr algn="ctr"/>
             <a:r>
-              <a:rPr lang="en-US" sz="1050" dirty="0" smtClean="0">
+              <a:rPr lang="en-US" sz="1050" dirty="0">
                 <a:solidFill>
                   <a:srgbClr val="7030A0"/>
                 </a:solidFill>
@@ -16041,14 +15919,14 @@
               <a:t>&lt;&lt;interface&gt;&gt;</a:t>
             </a:r>
             <a:br>
-              <a:rPr lang="en-US" sz="1050" dirty="0" smtClean="0">
+              <a:rPr lang="en-US" sz="1050" dirty="0">
                 <a:solidFill>
                   <a:srgbClr val="7030A0"/>
                 </a:solidFill>
               </a:rPr>
             </a:br>
             <a:r>
-              <a:rPr lang="en-US" sz="1050" dirty="0" err="1" smtClean="0">
+              <a:rPr lang="en-US" sz="1050" dirty="0" err="1">
                 <a:solidFill>
                   <a:srgbClr val="7030A0"/>
                 </a:solidFill>
@@ -16138,7 +16016,7 @@
           <a:p>
             <a:pPr algn="r"/>
             <a:r>
-              <a:rPr lang="en-US" sz="1100" dirty="0" smtClean="0">
+              <a:rPr lang="en-US" sz="1100" dirty="0">
                 <a:solidFill>
                   <a:srgbClr val="7030A0"/>
                 </a:solidFill>
@@ -16350,13 +16228,6 @@
   <p:clrMapOvr>
     <a:masterClrMapping/>
   </p:clrMapOvr>
-  <p:timing>
-    <p:tnLst>
-      <p:par>
-        <p:cTn id="1" dur="indefinite" restart="never" nodeType="tmRoot"/>
-      </p:par>
-    </p:tnLst>
-  </p:timing>
 </p:sld>
 </file>
 
@@ -16423,7 +16294,7 @@
           <a:lstStyle/>
           <a:p>
             <a:r>
-              <a:rPr lang="en-US" sz="1200" b="1" dirty="0" smtClean="0">
+              <a:rPr lang="en-US" sz="1200" b="1" dirty="0">
                 <a:solidFill>
                   <a:schemeClr val="accent6">
                     <a:lumMod val="75000"/>
@@ -16490,7 +16361,7 @@
           <a:p>
             <a:pPr algn="ctr"/>
             <a:r>
-              <a:rPr lang="en-US" sz="1050" dirty="0" smtClean="0">
+              <a:rPr lang="en-US" sz="1050" dirty="0">
                 <a:solidFill>
                   <a:schemeClr val="bg1"/>
                 </a:solidFill>
@@ -16498,14 +16369,14 @@
               <a:t>&lt;&lt;interface&gt;&gt;</a:t>
             </a:r>
             <a:br>
-              <a:rPr lang="en-US" sz="1050" dirty="0" smtClean="0">
+              <a:rPr lang="en-US" sz="1050" dirty="0">
                 <a:solidFill>
                   <a:schemeClr val="bg1"/>
                 </a:solidFill>
               </a:rPr>
             </a:br>
             <a:r>
-              <a:rPr lang="en-US" sz="1050" dirty="0" err="1" smtClean="0">
+              <a:rPr lang="en-US" sz="1050" dirty="0" err="1">
                 <a:solidFill>
                   <a:schemeClr val="bg1"/>
                 </a:solidFill>
@@ -16568,7 +16439,7 @@
           <a:p>
             <a:pPr algn="ctr"/>
             <a:r>
-              <a:rPr lang="en-US" sz="1050" dirty="0" err="1" smtClean="0">
+              <a:rPr lang="en-US" sz="1050" dirty="0" err="1">
                 <a:solidFill>
                   <a:schemeClr val="bg1"/>
                 </a:solidFill>
@@ -16642,7 +16513,7 @@
           <a:p>
             <a:pPr algn="ctr"/>
             <a:r>
-              <a:rPr lang="en-US" sz="1050" dirty="0" smtClean="0">
+              <a:rPr lang="en-US" sz="1050" dirty="0">
                 <a:solidFill>
                   <a:schemeClr val="bg1"/>
                 </a:solidFill>
@@ -17076,7 +16947,7 @@
           <a:p>
             <a:pPr algn="ctr"/>
             <a:r>
-              <a:rPr lang="en-US" sz="1050" b="1" dirty="0" err="1" smtClean="0">
+              <a:rPr lang="en-US" sz="1050" b="1" dirty="0" err="1">
                 <a:solidFill>
                   <a:schemeClr val="accent6">
                     <a:lumMod val="75000"/>
@@ -17085,27 +16956,17 @@
               </a:rPr>
               <a:t>XmlTaskBook</a:t>
             </a:r>
-            <a:r>
-              <a:rPr lang="en-US" sz="1050" b="1" dirty="0" smtClean="0">
+            <a:br>
+              <a:rPr lang="en-US" sz="1050" b="1" dirty="0">
                 <a:solidFill>
                   <a:schemeClr val="accent6">
                     <a:lumMod val="75000"/>
                   </a:schemeClr>
                 </a:solidFill>
               </a:rPr>
-              <a:t/>
-            </a:r>
-            <a:br>
-              <a:rPr lang="en-US" sz="1050" b="1" dirty="0" smtClean="0">
-                <a:solidFill>
-                  <a:schemeClr val="accent6">
-                    <a:lumMod val="75000"/>
-                  </a:schemeClr>
-                </a:solidFill>
-              </a:rPr>
             </a:br>
             <a:r>
-              <a:rPr lang="en-US" sz="1050" b="1" dirty="0" smtClean="0">
+              <a:rPr lang="en-US" sz="1050" b="1" dirty="0">
                 <a:solidFill>
                   <a:schemeClr val="accent6">
                     <a:lumMod val="75000"/>
@@ -17172,7 +17033,7 @@
           <a:p>
             <a:pPr algn="ctr"/>
             <a:r>
-              <a:rPr lang="en-US" sz="1050" dirty="0" smtClean="0">
+              <a:rPr lang="en-US" sz="1050" dirty="0">
                 <a:solidFill>
                   <a:schemeClr val="bg1"/>
                 </a:solidFill>
@@ -17180,14 +17041,14 @@
               <a:t>&lt;&lt;interface&gt;&gt;</a:t>
             </a:r>
             <a:br>
-              <a:rPr lang="en-US" sz="1050" dirty="0" smtClean="0">
+              <a:rPr lang="en-US" sz="1050" dirty="0">
                 <a:solidFill>
                   <a:schemeClr val="bg1"/>
                 </a:solidFill>
               </a:rPr>
             </a:br>
             <a:r>
-              <a:rPr lang="en-US" sz="1050" dirty="0" err="1" smtClean="0">
+              <a:rPr lang="en-US" sz="1050" dirty="0" err="1">
                 <a:solidFill>
                   <a:schemeClr val="bg1"/>
                 </a:solidFill>
@@ -17445,30 +17306,22 @@
           <a:p>
             <a:pPr algn="ctr"/>
             <a:r>
-              <a:rPr lang="en-US" sz="1050" dirty="0" err="1" smtClean="0">
+              <a:rPr lang="en-US" sz="1050" dirty="0" err="1">
                 <a:solidFill>
                   <a:schemeClr val="bg1"/>
                 </a:solidFill>
               </a:rPr>
               <a:t>JsonUserPrefs</a:t>
             </a:r>
-            <a:r>
-              <a:rPr lang="en-US" sz="1050" dirty="0" smtClean="0">
-                <a:solidFill>
-                  <a:schemeClr val="bg1"/>
-                </a:solidFill>
-              </a:rPr>
-              <a:t/>
-            </a:r>
             <a:br>
-              <a:rPr lang="en-US" sz="1050" dirty="0" smtClean="0">
+              <a:rPr lang="en-US" sz="1050" dirty="0">
                 <a:solidFill>
                   <a:schemeClr val="bg1"/>
                 </a:solidFill>
               </a:rPr>
             </a:br>
             <a:r>
-              <a:rPr lang="en-US" sz="1050" dirty="0" smtClean="0">
+              <a:rPr lang="en-US" sz="1050" dirty="0">
                 <a:solidFill>
                   <a:schemeClr val="bg1"/>
                 </a:solidFill>
@@ -17520,7 +17373,7 @@
           <a:p>
             <a:pPr algn="ctr"/>
             <a:r>
-              <a:rPr lang="en-US" sz="1050" b="1" dirty="0" err="1" smtClean="0">
+              <a:rPr lang="en-US" sz="1050" b="1" dirty="0" err="1">
                 <a:solidFill>
                   <a:schemeClr val="accent6">
                     <a:lumMod val="75000"/>
@@ -17529,27 +17382,17 @@
               </a:rPr>
               <a:t>XmlSerializable</a:t>
             </a:r>
-            <a:r>
-              <a:rPr lang="en-US" sz="1050" b="1" dirty="0" smtClean="0">
+            <a:br>
+              <a:rPr lang="en-US" sz="1050" b="1" dirty="0">
                 <a:solidFill>
                   <a:schemeClr val="accent6">
                     <a:lumMod val="75000"/>
                   </a:schemeClr>
                 </a:solidFill>
               </a:rPr>
-              <a:t/>
-            </a:r>
-            <a:br>
-              <a:rPr lang="en-US" sz="1050" b="1" dirty="0" smtClean="0">
-                <a:solidFill>
-                  <a:schemeClr val="accent6">
-                    <a:lumMod val="75000"/>
-                  </a:schemeClr>
-                </a:solidFill>
-              </a:rPr>
             </a:br>
             <a:r>
-              <a:rPr lang="en-US" sz="1050" b="1" dirty="0" err="1" smtClean="0">
+              <a:rPr lang="en-US" sz="1050" b="1" dirty="0" err="1">
                 <a:solidFill>
                   <a:schemeClr val="accent6">
                     <a:lumMod val="75000"/>
@@ -17646,7 +17489,7 @@
           <a:p>
             <a:pPr algn="ctr"/>
             <a:r>
-              <a:rPr lang="en-US" sz="1050" b="1" dirty="0" err="1" smtClean="0">
+              <a:rPr lang="en-US" sz="1050" b="1" dirty="0" err="1">
                 <a:solidFill>
                   <a:schemeClr val="accent6">
                     <a:lumMod val="75000"/>
@@ -17702,7 +17545,7 @@
           <a:p>
             <a:pPr algn="ctr"/>
             <a:r>
-              <a:rPr lang="en-US" sz="1050" b="1" dirty="0" err="1" smtClean="0">
+              <a:rPr lang="en-US" sz="1050" b="1" dirty="0" err="1">
                 <a:solidFill>
                   <a:schemeClr val="accent6">
                     <a:lumMod val="75000"/>
@@ -17772,13 +17615,6 @@
   <p:clrMapOvr>
     <a:masterClrMapping/>
   </p:clrMapOvr>
-  <p:timing>
-    <p:tnLst>
-      <p:par>
-        <p:cTn id="1" dur="indefinite" restart="never" nodeType="tmRoot"/>
-      </p:par>
-    </p:tnLst>
-  </p:timing>
 </p:sld>
 </file>
 
@@ -17908,19 +17744,8 @@
                 <a:latin typeface="+mj-lt"/>
                 <a:ea typeface="Adobe Heiti Std R" panose="020B0400000000000000" pitchFamily="34" charset="-128"/>
               </a:rPr>
-              <a:t>d</a:t>
-            </a:r>
-            <a:r>
-              <a:rPr lang="en-SG" sz="1600" dirty="0" smtClean="0">
-                <a:latin typeface="+mj-lt"/>
-                <a:ea typeface="Adobe Heiti Std R" panose="020B0400000000000000" pitchFamily="34" charset="-128"/>
-              </a:rPr>
-              <a:t>owat!</a:t>
-            </a:r>
-            <a:endParaRPr lang="en-SG" sz="1600" dirty="0">
-              <a:latin typeface="+mj-lt"/>
-              <a:ea typeface="Adobe Heiti Std R" panose="020B0400000000000000" pitchFamily="34" charset="-128"/>
-            </a:endParaRPr>
+              <a:t>dowat!</a:t>
+            </a:r>
           </a:p>
         </p:txBody>
       </p:sp>
@@ -18141,18 +17966,13 @@
           <a:lstStyle/>
           <a:p>
             <a:r>
-              <a:rPr lang="en-SG" sz="1400" dirty="0" smtClean="0">
+              <a:rPr lang="en-SG" sz="1400" dirty="0">
                 <a:solidFill>
                   <a:schemeClr val="bg1"/>
                 </a:solidFill>
               </a:rPr>
               <a:t>File     Help</a:t>
             </a:r>
-            <a:endParaRPr lang="en-SG" sz="1400" dirty="0">
-              <a:solidFill>
-                <a:schemeClr val="bg1"/>
-              </a:solidFill>
-            </a:endParaRPr>
           </a:p>
         </p:txBody>
       </p:sp>
@@ -18198,7 +18018,7 @@
           <a:lstStyle/>
           <a:p>
             <a:r>
-              <a:rPr lang="en-SG" sz="1400" dirty="0" smtClean="0">
+              <a:rPr lang="en-SG" sz="1400" dirty="0">
                 <a:solidFill>
                   <a:schemeClr val="bg1">
                     <a:lumMod val="75000"/>
@@ -18207,13 +18027,6 @@
               </a:rPr>
               <a:t>Enter command here…</a:t>
             </a:r>
-            <a:endParaRPr lang="en-SG" sz="1400" dirty="0">
-              <a:solidFill>
-                <a:schemeClr val="bg1">
-                  <a:lumMod val="75000"/>
-                </a:schemeClr>
-              </a:solidFill>
-            </a:endParaRPr>
           </a:p>
         </p:txBody>
       </p:sp>
@@ -18259,7 +18072,7 @@
           <a:lstStyle/>
           <a:p>
             <a:r>
-              <a:rPr lang="en-SG" sz="1400" dirty="0" smtClean="0">
+              <a:rPr lang="en-SG" sz="1400" dirty="0">
                 <a:solidFill>
                   <a:schemeClr val="tx1"/>
                 </a:solidFill>
@@ -18267,7 +18080,7 @@
               <a:t>Added </a:t>
             </a:r>
             <a:r>
-              <a:rPr lang="en-SG" sz="1400" dirty="0" smtClean="0">
+              <a:rPr lang="en-SG" sz="1400" dirty="0">
                 <a:solidFill>
                   <a:srgbClr val="00B0F0"/>
                 </a:solidFill>
@@ -18275,7 +18088,7 @@
               <a:t>Task</a:t>
             </a:r>
             <a:r>
-              <a:rPr lang="en-SG" sz="1400" dirty="0" smtClean="0">
+              <a:rPr lang="en-SG" sz="1400" dirty="0">
                 <a:solidFill>
                   <a:schemeClr val="tx1"/>
                 </a:solidFill>
@@ -18283,7 +18096,7 @@
               <a:t>: CS2103 Project </a:t>
             </a:r>
             <a:r>
-              <a:rPr lang="en-SG" sz="1400" dirty="0" smtClean="0">
+              <a:rPr lang="en-SG" sz="1400" dirty="0">
                 <a:solidFill>
                   <a:srgbClr val="00B0F0"/>
                 </a:solidFill>
@@ -18291,7 +18104,7 @@
               <a:t>Desc</a:t>
             </a:r>
             <a:r>
-              <a:rPr lang="en-SG" sz="1400" dirty="0" smtClean="0">
+              <a:rPr lang="en-SG" sz="1400" dirty="0">
                 <a:solidFill>
                   <a:schemeClr val="tx1"/>
                 </a:solidFill>
@@ -18299,7 +18112,7 @@
               <a:t>: Complete v0.0 </a:t>
             </a:r>
             <a:r>
-              <a:rPr lang="en-SG" sz="1400" dirty="0" smtClean="0">
+              <a:rPr lang="en-SG" sz="1400" dirty="0">
                 <a:solidFill>
                   <a:srgbClr val="00B0F0"/>
                 </a:solidFill>
@@ -18307,18 +18120,13 @@
               <a:t>By</a:t>
             </a:r>
             <a:r>
-              <a:rPr lang="en-SG" sz="1400" dirty="0" smtClean="0">
+              <a:rPr lang="en-SG" sz="1400" dirty="0">
                 <a:solidFill>
                   <a:schemeClr val="tx1"/>
                 </a:solidFill>
               </a:rPr>
               <a:t>: 7-10-16</a:t>
             </a:r>
-            <a:endParaRPr lang="en-SG" sz="1400" dirty="0">
-              <a:solidFill>
-                <a:schemeClr val="tx1"/>
-              </a:solidFill>
-            </a:endParaRPr>
           </a:p>
         </p:txBody>
       </p:sp>
@@ -18367,24 +18175,14 @@
           <a:lstStyle/>
           <a:p>
             <a:r>
-              <a:rPr lang="en-SG" u="sng" dirty="0" smtClean="0">
+              <a:rPr lang="en-SG" u="sng" dirty="0">
                 <a:solidFill>
                   <a:schemeClr val="accent3">
                     <a:lumMod val="75000"/>
                   </a:schemeClr>
                 </a:solidFill>
               </a:rPr>
-              <a:t>Event </a:t>
-            </a:r>
-            <a:r>
-              <a:rPr lang="en-SG" u="sng" dirty="0">
-                <a:solidFill>
-                  <a:schemeClr val="accent3">
-                    <a:lumMod val="75000"/>
-                  </a:schemeClr>
-                </a:solidFill>
-              </a:rPr>
-              <a:t>List</a:t>
+              <a:t>Event List</a:t>
             </a:r>
           </a:p>
         </p:txBody>
@@ -18441,25 +18239,12 @@
                   <a:schemeClr val="tx1"/>
                 </a:solidFill>
               </a:rPr>
-              <a:t> </a:t>
-            </a:r>
-            <a:r>
-              <a:rPr lang="en-SG" sz="1600" dirty="0" smtClean="0">
-                <a:solidFill>
-                  <a:schemeClr val="tx1"/>
-                </a:solidFill>
-              </a:rPr>
-              <a:t>High School Gathering</a:t>
-            </a:r>
-            <a:endParaRPr lang="en-SG" sz="1600" dirty="0">
-              <a:solidFill>
-                <a:schemeClr val="tx1"/>
-              </a:solidFill>
-            </a:endParaRPr>
-          </a:p>
-          <a:p>
-            <a:r>
-              <a:rPr lang="en-SG" sz="1100" dirty="0" smtClean="0">
+              <a:t> High School Gathering</a:t>
+            </a:r>
+          </a:p>
+          <a:p>
+            <a:r>
+              <a:rPr lang="en-SG" sz="1100" dirty="0">
                 <a:solidFill>
                   <a:schemeClr val="accent3">
                     <a:lumMod val="75000"/>
@@ -18469,7 +18254,7 @@
               <a:t>Desc</a:t>
             </a:r>
             <a:r>
-              <a:rPr lang="en-SG" sz="1100" dirty="0" smtClean="0">
+              <a:rPr lang="en-SG" sz="1100" dirty="0">
                 <a:solidFill>
                   <a:schemeClr val="tx2">
                     <a:lumMod val="60000"/>
@@ -18480,7 +18265,7 @@
               <a:t>     </a:t>
             </a:r>
             <a:r>
-              <a:rPr lang="en-SG" sz="1100" dirty="0" smtClean="0">
+              <a:rPr lang="en-SG" sz="1100" dirty="0">
                 <a:solidFill>
                   <a:schemeClr val="tx1"/>
                 </a:solidFill>
@@ -18490,7 +18275,7 @@
           </a:p>
           <a:p>
             <a:r>
-              <a:rPr lang="en-SG" sz="1100" dirty="0" smtClean="0">
+              <a:rPr lang="en-SG" sz="1100" dirty="0">
                 <a:solidFill>
                   <a:schemeClr val="accent3">
                     <a:lumMod val="75000"/>
@@ -18500,11 +18285,11 @@
               <a:t>From </a:t>
             </a:r>
             <a:r>
-              <a:rPr lang="en-SG" sz="1100" dirty="0" smtClean="0"/>
+              <a:rPr lang="en-SG" sz="1100" dirty="0"/>
               <a:t>   </a:t>
             </a:r>
             <a:r>
-              <a:rPr lang="en-SG" sz="1100" dirty="0" smtClean="0">
+              <a:rPr lang="en-SG" sz="1100" dirty="0">
                 <a:solidFill>
                   <a:schemeClr val="tx1"/>
                 </a:solidFill>
@@ -18522,7 +18307,7 @@
               <a:t>to</a:t>
             </a:r>
             <a:r>
-              <a:rPr lang="en-SG" sz="1100" dirty="0" smtClean="0">
+              <a:rPr lang="en-SG" sz="1100" dirty="0">
                 <a:solidFill>
                   <a:schemeClr val="tx1"/>
                 </a:solidFill>
@@ -18578,7 +18363,7 @@
           <a:lstStyle/>
           <a:p>
             <a:r>
-              <a:rPr lang="en-SG" u="sng" dirty="0" smtClean="0">
+              <a:rPr lang="en-SG" u="sng" dirty="0">
                 <a:solidFill>
                   <a:schemeClr val="tx2">
                     <a:lumMod val="60000"/>
@@ -18639,7 +18424,7 @@
               <a:buAutoNum type="arabicPeriod"/>
             </a:pPr>
             <a:r>
-              <a:rPr lang="en-SG" sz="1600" dirty="0" smtClean="0">
+              <a:rPr lang="en-SG" sz="1600" dirty="0">
                 <a:solidFill>
                   <a:schemeClr val="tx1"/>
                 </a:solidFill>
@@ -18649,7 +18434,7 @@
           </a:p>
           <a:p>
             <a:r>
-              <a:rPr lang="en-SG" sz="1100" dirty="0" smtClean="0">
+              <a:rPr lang="en-SG" sz="1100" dirty="0">
                 <a:solidFill>
                   <a:schemeClr val="tx2">
                     <a:lumMod val="60000"/>
@@ -18660,22 +18445,17 @@
               <a:t>By</a:t>
             </a:r>
             <a:r>
-              <a:rPr lang="en-SG" sz="1100" dirty="0" smtClean="0"/>
+              <a:rPr lang="en-SG" sz="1100" dirty="0"/>
               <a:t>         </a:t>
             </a:r>
             <a:r>
-              <a:rPr lang="en-SG" sz="1100" dirty="0" smtClean="0">
+              <a:rPr lang="en-SG" sz="1100" dirty="0">
                 <a:solidFill>
                   <a:schemeClr val="tx1"/>
                 </a:solidFill>
               </a:rPr>
               <a:t>20-10-16</a:t>
             </a:r>
-            <a:endParaRPr lang="en-SG" sz="1100" dirty="0">
-              <a:solidFill>
-                <a:schemeClr val="tx1"/>
-              </a:solidFill>
-            </a:endParaRPr>
           </a:p>
         </p:txBody>
       </p:sp>
@@ -18728,22 +18508,17 @@
               <a:buAutoNum type="arabicPeriod" startAt="2"/>
             </a:pPr>
             <a:r>
-              <a:rPr lang="en-SG" sz="1600" dirty="0" smtClean="0">
+              <a:rPr lang="en-SG" sz="1600" dirty="0">
                 <a:solidFill>
                   <a:schemeClr val="tx1"/>
                 </a:solidFill>
               </a:rPr>
               <a:t>  CS2103 Project</a:t>
             </a:r>
-            <a:endParaRPr lang="en-SG" sz="1600" dirty="0">
-              <a:solidFill>
-                <a:schemeClr val="tx1"/>
-              </a:solidFill>
-            </a:endParaRPr>
-          </a:p>
-          <a:p>
-            <a:r>
-              <a:rPr lang="en-SG" sz="1100" dirty="0" smtClean="0">
+          </a:p>
+          <a:p>
+            <a:r>
+              <a:rPr lang="en-SG" sz="1100" dirty="0">
                 <a:solidFill>
                   <a:schemeClr val="tx2">
                     <a:lumMod val="60000"/>
@@ -18754,11 +18529,11 @@
               <a:t>Desc</a:t>
             </a:r>
             <a:r>
-              <a:rPr lang="en-SG" sz="1100" dirty="0" smtClean="0"/>
+              <a:rPr lang="en-SG" sz="1100" dirty="0"/>
               <a:t>     </a:t>
             </a:r>
             <a:r>
-              <a:rPr lang="en-SG" sz="1100" dirty="0" smtClean="0">
+              <a:rPr lang="en-SG" sz="1100" dirty="0">
                 <a:solidFill>
                   <a:schemeClr val="tx1"/>
                 </a:solidFill>
@@ -18768,7 +18543,7 @@
           </a:p>
           <a:p>
             <a:r>
-              <a:rPr lang="en-SG" sz="1100" dirty="0" smtClean="0">
+              <a:rPr lang="en-SG" sz="1100" dirty="0">
                 <a:solidFill>
                   <a:schemeClr val="tx2">
                     <a:lumMod val="60000"/>
@@ -18779,22 +18554,17 @@
               <a:t>By</a:t>
             </a:r>
             <a:r>
-              <a:rPr lang="en-SG" sz="1100" dirty="0" smtClean="0"/>
+              <a:rPr lang="en-SG" sz="1100" dirty="0"/>
               <a:t>         </a:t>
             </a:r>
             <a:r>
-              <a:rPr lang="en-SG" sz="1100" dirty="0" smtClean="0">
+              <a:rPr lang="en-SG" sz="1100" dirty="0">
                 <a:solidFill>
                   <a:schemeClr val="tx1"/>
                 </a:solidFill>
               </a:rPr>
               <a:t>20-10-16</a:t>
             </a:r>
-            <a:endParaRPr lang="en-SG" sz="1100" dirty="0">
-              <a:solidFill>
-                <a:schemeClr val="tx1"/>
-              </a:solidFill>
-            </a:endParaRPr>
           </a:p>
         </p:txBody>
       </p:sp>

</xml_diff>

<commit_message>
Edited minor alighment error
</commit_message>
<xml_diff>
--- a/docs/diagrams/Diagrams.pptx
+++ b/docs/diagrams/Diagrams.pptx
@@ -8350,8 +8350,8 @@
         </p:nvCxnSpPr>
         <p:spPr>
           <a:xfrm rot="16200000" flipH="1">
-            <a:off x="859310" y="3712691"/>
-            <a:ext cx="3462978" cy="457199"/>
+            <a:off x="1049810" y="3903191"/>
+            <a:ext cx="3081978" cy="457199"/>
           </a:xfrm>
           <a:prstGeom prst="bentConnector2">
             <a:avLst/>

</xml_diff>

<commit_message>
update design and user story
</commit_message>
<xml_diff>
--- a/docs/diagrams/Diagrams.pptx
+++ b/docs/diagrams/Diagrams.pptx
@@ -122,7 +122,7 @@
   </p:defaultTextStyle>
   <p:extLst>
     <p:ext uri="{EFAFB233-063F-42B5-8137-9DF3F51BA10A}">
-      <p15:sldGuideLst xmlns:p15="http://schemas.microsoft.com/office/powerpoint/2012/main" xmlns="">
+      <p15:sldGuideLst xmlns="" xmlns:p15="http://schemas.microsoft.com/office/powerpoint/2012/main">
         <p15:guide id="1" orient="horz" pos="1488">
           <p15:clr>
             <a:srgbClr val="A4A3A4"/>
@@ -221,7 +221,7 @@
           <a:p>
             <a:fld id="{F5CC4B3F-88C1-4FFA-B1B6-F41C21DC6924}" type="datetimeFigureOut">
               <a:rPr lang="en-US" smtClean="0"/>
-              <a:t>10/28/2016</a:t>
+              <a:t>11/3/2016</a:t>
             </a:fld>
             <a:endParaRPr lang="en-US"/>
           </a:p>
@@ -751,7 +751,7 @@
           <a:p>
             <a:fld id="{78C97017-6FC3-485B-9764-EAC9E56C1D49}" type="datetimeFigureOut">
               <a:rPr lang="en-US" smtClean="0"/>
-              <a:t>10/28/2016</a:t>
+              <a:t>11/3/2016</a:t>
             </a:fld>
             <a:endParaRPr lang="en-US"/>
           </a:p>
@@ -919,7 +919,7 @@
           <a:p>
             <a:fld id="{78C97017-6FC3-485B-9764-EAC9E56C1D49}" type="datetimeFigureOut">
               <a:rPr lang="en-US" smtClean="0"/>
-              <a:t>10/28/2016</a:t>
+              <a:t>11/3/2016</a:t>
             </a:fld>
             <a:endParaRPr lang="en-US"/>
           </a:p>
@@ -1097,7 +1097,7 @@
           <a:p>
             <a:fld id="{78C97017-6FC3-485B-9764-EAC9E56C1D49}" type="datetimeFigureOut">
               <a:rPr lang="en-US" smtClean="0"/>
-              <a:t>10/28/2016</a:t>
+              <a:t>11/3/2016</a:t>
             </a:fld>
             <a:endParaRPr lang="en-US"/>
           </a:p>
@@ -1265,7 +1265,7 @@
           <a:p>
             <a:fld id="{78C97017-6FC3-485B-9764-EAC9E56C1D49}" type="datetimeFigureOut">
               <a:rPr lang="en-US" smtClean="0"/>
-              <a:t>10/28/2016</a:t>
+              <a:t>11/3/2016</a:t>
             </a:fld>
             <a:endParaRPr lang="en-US"/>
           </a:p>
@@ -1510,7 +1510,7 @@
           <a:p>
             <a:fld id="{78C97017-6FC3-485B-9764-EAC9E56C1D49}" type="datetimeFigureOut">
               <a:rPr lang="en-US" smtClean="0"/>
-              <a:t>10/28/2016</a:t>
+              <a:t>11/3/2016</a:t>
             </a:fld>
             <a:endParaRPr lang="en-US"/>
           </a:p>
@@ -1795,7 +1795,7 @@
           <a:p>
             <a:fld id="{78C97017-6FC3-485B-9764-EAC9E56C1D49}" type="datetimeFigureOut">
               <a:rPr lang="en-US" smtClean="0"/>
-              <a:t>10/28/2016</a:t>
+              <a:t>11/3/2016</a:t>
             </a:fld>
             <a:endParaRPr lang="en-US"/>
           </a:p>
@@ -2214,7 +2214,7 @@
           <a:p>
             <a:fld id="{78C97017-6FC3-485B-9764-EAC9E56C1D49}" type="datetimeFigureOut">
               <a:rPr lang="en-US" smtClean="0"/>
-              <a:t>10/28/2016</a:t>
+              <a:t>11/3/2016</a:t>
             </a:fld>
             <a:endParaRPr lang="en-US"/>
           </a:p>
@@ -2331,7 +2331,7 @@
           <a:p>
             <a:fld id="{78C97017-6FC3-485B-9764-EAC9E56C1D49}" type="datetimeFigureOut">
               <a:rPr lang="en-US" smtClean="0"/>
-              <a:t>10/28/2016</a:t>
+              <a:t>11/3/2016</a:t>
             </a:fld>
             <a:endParaRPr lang="en-US"/>
           </a:p>
@@ -2426,7 +2426,7 @@
           <a:p>
             <a:fld id="{78C97017-6FC3-485B-9764-EAC9E56C1D49}" type="datetimeFigureOut">
               <a:rPr lang="en-US" smtClean="0"/>
-              <a:t>10/28/2016</a:t>
+              <a:t>11/3/2016</a:t>
             </a:fld>
             <a:endParaRPr lang="en-US"/>
           </a:p>
@@ -2701,7 +2701,7 @@
           <a:p>
             <a:fld id="{78C97017-6FC3-485B-9764-EAC9E56C1D49}" type="datetimeFigureOut">
               <a:rPr lang="en-US" smtClean="0"/>
-              <a:t>10/28/2016</a:t>
+              <a:t>11/3/2016</a:t>
             </a:fld>
             <a:endParaRPr lang="en-US"/>
           </a:p>
@@ -2953,7 +2953,7 @@
           <a:p>
             <a:fld id="{78C97017-6FC3-485B-9764-EAC9E56C1D49}" type="datetimeFigureOut">
               <a:rPr lang="en-US" smtClean="0"/>
-              <a:t>10/28/2016</a:t>
+              <a:t>11/3/2016</a:t>
             </a:fld>
             <a:endParaRPr lang="en-US"/>
           </a:p>
@@ -3164,7 +3164,7 @@
           <a:p>
             <a:fld id="{78C97017-6FC3-485B-9764-EAC9E56C1D49}" type="datetimeFigureOut">
               <a:rPr lang="en-US" smtClean="0"/>
-              <a:t>10/28/2016</a:t>
+              <a:t>11/3/2016</a:t>
             </a:fld>
             <a:endParaRPr lang="en-US"/>
           </a:p>
@@ -14000,101 +14000,6 @@
           </a:p>
         </p:txBody>
       </p:sp>
-      <p:sp>
-        <p:nvSpPr>
-          <p:cNvPr id="51" name="Cloud 50"/>
-          <p:cNvSpPr/>
-          <p:nvPr/>
-        </p:nvSpPr>
-        <p:spPr>
-          <a:xfrm>
-            <a:off x="2650069" y="1447800"/>
-            <a:ext cx="914400" cy="533400"/>
-          </a:xfrm>
-          <a:prstGeom prst="cloud">
-            <a:avLst/>
-          </a:prstGeom>
-          <a:solidFill>
-            <a:schemeClr val="bg1"/>
-          </a:solidFill>
-          <a:ln>
-            <a:solidFill>
-              <a:schemeClr val="tx1"/>
-            </a:solidFill>
-          </a:ln>
-        </p:spPr>
-        <p:style>
-          <a:lnRef idx="2">
-            <a:schemeClr val="accent1">
-              <a:shade val="50000"/>
-            </a:schemeClr>
-          </a:lnRef>
-          <a:fillRef idx="1">
-            <a:schemeClr val="accent1"/>
-          </a:fillRef>
-          <a:effectRef idx="0">
-            <a:schemeClr val="accent1"/>
-          </a:effectRef>
-          <a:fontRef idx="minor">
-            <a:schemeClr val="lt1"/>
-          </a:fontRef>
-        </p:style>
-        <p:txBody>
-          <a:bodyPr rtlCol="0" anchor="ctr"/>
-          <a:lstStyle/>
-          <a:p>
-            <a:pPr algn="ctr"/>
-            <a:r>
-              <a:rPr lang="en-US" sz="1400" dirty="0">
-                <a:solidFill>
-                  <a:schemeClr val="tx1"/>
-                </a:solidFill>
-              </a:rPr>
-              <a:t>Web</a:t>
-            </a:r>
-          </a:p>
-        </p:txBody>
-      </p:sp>
-      <p:cxnSp>
-        <p:nvCxnSpPr>
-          <p:cNvPr id="52" name="Elbow Connector 51"/>
-          <p:cNvCxnSpPr>
-            <a:stCxn id="2" idx="0"/>
-            <a:endCxn id="51" idx="2"/>
-          </p:cNvCxnSpPr>
-          <p:nvPr/>
-        </p:nvCxnSpPr>
-        <p:spPr>
-          <a:xfrm rot="5400000" flipH="1" flipV="1">
-            <a:off x="2222648" y="1760922"/>
-            <a:ext cx="476678" cy="383835"/>
-          </a:xfrm>
-          <a:prstGeom prst="bentConnector2">
-            <a:avLst/>
-          </a:prstGeom>
-          <a:ln w="28575">
-            <a:solidFill>
-              <a:srgbClr val="00B050"/>
-            </a:solidFill>
-            <a:prstDash val="sysDot"/>
-            <a:tailEnd type="arrow"/>
-          </a:ln>
-        </p:spPr>
-        <p:style>
-          <a:lnRef idx="1">
-            <a:schemeClr val="accent1"/>
-          </a:lnRef>
-          <a:fillRef idx="0">
-            <a:schemeClr val="accent1"/>
-          </a:fillRef>
-          <a:effectRef idx="0">
-            <a:schemeClr val="accent1"/>
-          </a:effectRef>
-          <a:fontRef idx="minor">
-            <a:schemeClr val="tx1"/>
-          </a:fontRef>
-        </p:style>
-      </p:cxnSp>
       <p:sp>
         <p:nvSpPr>
           <p:cNvPr id="23" name="Rectangle 62"/>

</xml_diff>

<commit_message>
updated Diagram.pptx and UI.png
</commit_message>
<xml_diff>
--- a/docs/diagrams/Diagrams.pptx
+++ b/docs/diagrams/Diagrams.pptx
@@ -216,7 +216,7 @@
           <a:p>
             <a:fld id="{F5CC4B3F-88C1-4FFA-B1B6-F41C21DC6924}" type="datetimeFigureOut">
               <a:rPr lang="en-US" smtClean="0"/>
-              <a:t>10/21/16</a:t>
+              <a:t>11/5/16</a:t>
             </a:fld>
             <a:endParaRPr lang="en-US"/>
           </a:p>
@@ -665,7 +665,7 @@
           <a:p>
             <a:fld id="{78C97017-6FC3-485B-9764-EAC9E56C1D49}" type="datetimeFigureOut">
               <a:rPr lang="en-US" smtClean="0"/>
-              <a:t>10/21/16</a:t>
+              <a:t>11/5/16</a:t>
             </a:fld>
             <a:endParaRPr lang="en-US"/>
           </a:p>
@@ -835,7 +835,7 @@
           <a:p>
             <a:fld id="{78C97017-6FC3-485B-9764-EAC9E56C1D49}" type="datetimeFigureOut">
               <a:rPr lang="en-US" smtClean="0"/>
-              <a:t>10/21/16</a:t>
+              <a:t>11/5/16</a:t>
             </a:fld>
             <a:endParaRPr lang="en-US"/>
           </a:p>
@@ -1015,7 +1015,7 @@
           <a:p>
             <a:fld id="{78C97017-6FC3-485B-9764-EAC9E56C1D49}" type="datetimeFigureOut">
               <a:rPr lang="en-US" smtClean="0"/>
-              <a:t>10/21/16</a:t>
+              <a:t>11/5/16</a:t>
             </a:fld>
             <a:endParaRPr lang="en-US"/>
           </a:p>
@@ -1185,7 +1185,7 @@
           <a:p>
             <a:fld id="{78C97017-6FC3-485B-9764-EAC9E56C1D49}" type="datetimeFigureOut">
               <a:rPr lang="en-US" smtClean="0"/>
-              <a:t>10/21/16</a:t>
+              <a:t>11/5/16</a:t>
             </a:fld>
             <a:endParaRPr lang="en-US"/>
           </a:p>
@@ -1431,7 +1431,7 @@
           <a:p>
             <a:fld id="{78C97017-6FC3-485B-9764-EAC9E56C1D49}" type="datetimeFigureOut">
               <a:rPr lang="en-US" smtClean="0"/>
-              <a:t>10/21/16</a:t>
+              <a:t>11/5/16</a:t>
             </a:fld>
             <a:endParaRPr lang="en-US"/>
           </a:p>
@@ -1719,7 +1719,7 @@
           <a:p>
             <a:fld id="{78C97017-6FC3-485B-9764-EAC9E56C1D49}" type="datetimeFigureOut">
               <a:rPr lang="en-US" smtClean="0"/>
-              <a:t>10/21/16</a:t>
+              <a:t>11/5/16</a:t>
             </a:fld>
             <a:endParaRPr lang="en-US"/>
           </a:p>
@@ -2141,7 +2141,7 @@
           <a:p>
             <a:fld id="{78C97017-6FC3-485B-9764-EAC9E56C1D49}" type="datetimeFigureOut">
               <a:rPr lang="en-US" smtClean="0"/>
-              <a:t>10/21/16</a:t>
+              <a:t>11/5/16</a:t>
             </a:fld>
             <a:endParaRPr lang="en-US"/>
           </a:p>
@@ -2259,7 +2259,7 @@
           <a:p>
             <a:fld id="{78C97017-6FC3-485B-9764-EAC9E56C1D49}" type="datetimeFigureOut">
               <a:rPr lang="en-US" smtClean="0"/>
-              <a:t>10/21/16</a:t>
+              <a:t>11/5/16</a:t>
             </a:fld>
             <a:endParaRPr lang="en-US"/>
           </a:p>
@@ -2354,7 +2354,7 @@
           <a:p>
             <a:fld id="{78C97017-6FC3-485B-9764-EAC9E56C1D49}" type="datetimeFigureOut">
               <a:rPr lang="en-US" smtClean="0"/>
-              <a:t>10/21/16</a:t>
+              <a:t>11/5/16</a:t>
             </a:fld>
             <a:endParaRPr lang="en-US"/>
           </a:p>
@@ -2631,7 +2631,7 @@
           <a:p>
             <a:fld id="{78C97017-6FC3-485B-9764-EAC9E56C1D49}" type="datetimeFigureOut">
               <a:rPr lang="en-US" smtClean="0"/>
-              <a:t>10/21/16</a:t>
+              <a:t>11/5/16</a:t>
             </a:fld>
             <a:endParaRPr lang="en-US"/>
           </a:p>
@@ -2884,7 +2884,7 @@
           <a:p>
             <a:fld id="{78C97017-6FC3-485B-9764-EAC9E56C1D49}" type="datetimeFigureOut">
               <a:rPr lang="en-US" smtClean="0"/>
-              <a:t>10/21/16</a:t>
+              <a:t>11/5/16</a:t>
             </a:fld>
             <a:endParaRPr lang="en-US"/>
           </a:p>
@@ -3097,7 +3097,7 @@
           <a:p>
             <a:fld id="{78C97017-6FC3-485B-9764-EAC9E56C1D49}" type="datetimeFigureOut">
               <a:rPr lang="en-US" smtClean="0"/>
-              <a:t>10/21/16</a:t>
+              <a:t>11/5/16</a:t>
             </a:fld>
             <a:endParaRPr lang="en-US"/>
           </a:p>
@@ -5827,7 +5827,7 @@
                   </a:schemeClr>
                 </a:solidFill>
               </a:rPr>
-              <a:t>TaskManagerChangedEvent</a:t>
+              <a:t>TaskBookChangedEvent</a:t>
             </a:r>
             <a:r>
               <a:rPr lang="en-US" sz="1400" dirty="0" smtClean="0">
@@ -6401,7 +6401,7 @@
                   </a:schemeClr>
                 </a:solidFill>
               </a:rPr>
-              <a:t>TaskManagerChangedEvent</a:t>
+              <a:t>TaskBookChangedEvent</a:t>
             </a:r>
             <a:r>
               <a:rPr lang="en-US" sz="1400" dirty="0" smtClean="0">
@@ -6773,7 +6773,7 @@
                   </a:schemeClr>
                 </a:solidFill>
               </a:rPr>
-              <a:t>handleTaskManagerChangedEvent</a:t>
+              <a:t>handleTaskBookChangedEvent</a:t>
             </a:r>
             <a:r>
               <a:rPr lang="en-US" sz="1400" dirty="0" smtClean="0">
@@ -7084,7 +7084,7 @@
                   <a:srgbClr val="00B050"/>
                 </a:solidFill>
               </a:rPr>
-              <a:t>handleTaskManagerChangedEvent</a:t>
+              <a:t>handleTaskBookChangedEvent</a:t>
             </a:r>
             <a:r>
               <a:rPr lang="en-US" sz="1400" dirty="0" smtClean="0">
@@ -8037,7 +8037,7 @@
                   </a:schemeClr>
                 </a:solidFill>
               </a:rPr>
-              <a:t>DatedPanel</a:t>
+              <a:t>DatedListPanel</a:t>
             </a:r>
             <a:endParaRPr lang="en-SG" sz="1050" b="1" dirty="0">
               <a:solidFill>
@@ -8117,8 +8117,8 @@
         </p:nvSpPr>
         <p:spPr>
           <a:xfrm>
-            <a:off x="2604983" y="4087029"/>
-            <a:ext cx="1093635" cy="236841"/>
+            <a:off x="2537882" y="4099217"/>
+            <a:ext cx="1198163" cy="274549"/>
           </a:xfrm>
           <a:prstGeom prst="rect">
             <a:avLst/>
@@ -8150,14 +8150,14 @@
           <a:p>
             <a:pPr algn="ctr"/>
             <a:r>
-              <a:rPr lang="en-SG" sz="1050" b="1" dirty="0" err="1" smtClean="0">
+              <a:rPr lang="en-SG" sz="1050" b="1" smtClean="0">
                 <a:solidFill>
                   <a:schemeClr val="accent3">
                     <a:lumMod val="75000"/>
                   </a:schemeClr>
                 </a:solidFill>
               </a:rPr>
-              <a:t>UndatedPanel</a:t>
+              <a:t>UndatedListPanel</a:t>
             </a:r>
             <a:endParaRPr lang="en-SG" sz="1050" b="1" dirty="0">
               <a:solidFill>
@@ -8217,7 +8217,7 @@
                   </a:schemeClr>
                 </a:solidFill>
               </a:rPr>
-              <a:t>UndatedTaskCard</a:t>
+              <a:t>TaskCard</a:t>
             </a:r>
             <a:endParaRPr lang="en-SG" sz="1050" b="1" dirty="0">
               <a:solidFill>
@@ -8490,8 +8490,8 @@
         </p:nvCxnSpPr>
         <p:spPr>
           <a:xfrm rot="16200000" flipH="1">
-            <a:off x="1841842" y="3442308"/>
-            <a:ext cx="1337425" cy="188857"/>
+            <a:off x="1792771" y="3491380"/>
+            <a:ext cx="1368467" cy="121756"/>
           </a:xfrm>
           <a:prstGeom prst="bentConnector2">
             <a:avLst/>
@@ -9377,8 +9377,8 @@
         </p:nvCxnSpPr>
         <p:spPr>
           <a:xfrm rot="16200000" flipH="1">
-            <a:off x="3421633" y="4054037"/>
-            <a:ext cx="179831" cy="719495"/>
+            <a:off x="3439163" y="4071567"/>
+            <a:ext cx="129935" cy="734332"/>
           </a:xfrm>
           <a:prstGeom prst="bentConnector2">
             <a:avLst/>
@@ -9418,8 +9418,8 @@
         </p:nvCxnSpPr>
         <p:spPr>
           <a:xfrm rot="5400000">
-            <a:off x="3654569" y="2330050"/>
-            <a:ext cx="1919450" cy="1831351"/>
+            <a:off x="3657761" y="2364284"/>
+            <a:ext cx="1950492" cy="1793924"/>
           </a:xfrm>
           <a:prstGeom prst="bentConnector2">
             <a:avLst/>
@@ -9721,17 +9721,20 @@
       <p:cxnSp>
         <p:nvCxnSpPr>
           <p:cNvPr id="59" name="Elbow Connector 58"/>
-          <p:cNvCxnSpPr/>
+          <p:cNvCxnSpPr>
+            <a:stCxn id="34" idx="2"/>
+            <a:endCxn id="37" idx="0"/>
+          </p:cNvCxnSpPr>
           <p:nvPr/>
         </p:nvCxnSpPr>
         <p:spPr>
-          <a:xfrm>
-            <a:off x="2986316" y="3885205"/>
-            <a:ext cx="901982" cy="91393"/>
+          <a:xfrm rot="16200000" flipH="1">
+            <a:off x="3573530" y="3452015"/>
+            <a:ext cx="487567" cy="1355935"/>
           </a:xfrm>
           <a:prstGeom prst="bentConnector3">
             <a:avLst>
-              <a:gd name="adj1" fmla="val 50000"/>
+              <a:gd name="adj1" fmla="val 25644"/>
             </a:avLst>
           </a:prstGeom>
           <a:ln w="19050">
@@ -9758,158 +9761,6 @@
           </a:fontRef>
         </p:style>
       </p:cxnSp>
-      <p:sp>
-        <p:nvSpPr>
-          <p:cNvPr id="61" name="Rectangle 11"/>
-          <p:cNvSpPr/>
-          <p:nvPr/>
-        </p:nvSpPr>
-        <p:spPr>
-          <a:xfrm>
-            <a:off x="3874718" y="3853382"/>
-            <a:ext cx="1244547" cy="269970"/>
-          </a:xfrm>
-          <a:prstGeom prst="rect">
-            <a:avLst/>
-          </a:prstGeom>
-          <a:ln w="19050">
-            <a:solidFill>
-              <a:schemeClr val="accent3"/>
-            </a:solidFill>
-          </a:ln>
-          <a:effectLst/>
-        </p:spPr>
-        <p:style>
-          <a:lnRef idx="1">
-            <a:schemeClr val="accent3"/>
-          </a:lnRef>
-          <a:fillRef idx="2">
-            <a:schemeClr val="accent3"/>
-          </a:fillRef>
-          <a:effectRef idx="1">
-            <a:schemeClr val="accent3"/>
-          </a:effectRef>
-          <a:fontRef idx="minor">
-            <a:schemeClr val="dk1"/>
-          </a:fontRef>
-        </p:style>
-        <p:txBody>
-          <a:bodyPr rtlCol="0" anchor="ctr"/>
-          <a:lstStyle/>
-          <a:p>
-            <a:pPr algn="ctr"/>
-            <a:r>
-              <a:rPr lang="en-US" sz="1050" b="1" dirty="0" err="1">
-                <a:solidFill>
-                  <a:schemeClr val="accent3">
-                    <a:lumMod val="75000"/>
-                  </a:schemeClr>
-                </a:solidFill>
-              </a:rPr>
-              <a:t>D</a:t>
-            </a:r>
-            <a:r>
-              <a:rPr lang="en-US" sz="1050" b="1" dirty="0" err="1" smtClean="0">
-                <a:solidFill>
-                  <a:schemeClr val="accent3">
-                    <a:lumMod val="75000"/>
-                  </a:schemeClr>
-                </a:solidFill>
-              </a:rPr>
-              <a:t>atedTaskCard</a:t>
-            </a:r>
-            <a:endParaRPr lang="en-SG" sz="1050" b="1" dirty="0">
-              <a:solidFill>
-                <a:schemeClr val="accent3">
-                  <a:lumMod val="75000"/>
-                </a:schemeClr>
-              </a:solidFill>
-            </a:endParaRPr>
-          </a:p>
-        </p:txBody>
-      </p:sp>
-      <p:sp>
-        <p:nvSpPr>
-          <p:cNvPr id="64" name="Freeform 63"/>
-          <p:cNvSpPr/>
-          <p:nvPr/>
-        </p:nvSpPr>
-        <p:spPr>
-          <a:xfrm flipV="1">
-            <a:off x="5119264" y="3915692"/>
-            <a:ext cx="1584403" cy="356743"/>
-          </a:xfrm>
-          <a:custGeom>
-            <a:avLst/>
-            <a:gdLst>
-              <a:gd name="connsiteX0" fmla="*/ 0 w 3048000"/>
-              <a:gd name="connsiteY0" fmla="*/ 203200 h 203200"/>
-              <a:gd name="connsiteX1" fmla="*/ 221673 w 3048000"/>
-              <a:gd name="connsiteY1" fmla="*/ 0 h 203200"/>
-              <a:gd name="connsiteX2" fmla="*/ 3048000 w 3048000"/>
-              <a:gd name="connsiteY2" fmla="*/ 0 h 203200"/>
-            </a:gdLst>
-            <a:ahLst/>
-            <a:cxnLst>
-              <a:cxn ang="0">
-                <a:pos x="connsiteX0" y="connsiteY0"/>
-              </a:cxn>
-              <a:cxn ang="0">
-                <a:pos x="connsiteX1" y="connsiteY1"/>
-              </a:cxn>
-              <a:cxn ang="0">
-                <a:pos x="connsiteX2" y="connsiteY2"/>
-              </a:cxn>
-            </a:cxnLst>
-            <a:rect l="l" t="t" r="r" b="b"/>
-            <a:pathLst>
-              <a:path w="3048000" h="203200">
-                <a:moveTo>
-                  <a:pt x="0" y="203200"/>
-                </a:moveTo>
-                <a:lnTo>
-                  <a:pt x="221673" y="0"/>
-                </a:lnTo>
-                <a:lnTo>
-                  <a:pt x="3048000" y="0"/>
-                </a:lnTo>
-              </a:path>
-            </a:pathLst>
-          </a:custGeom>
-          <a:noFill/>
-          <a:ln w="19050">
-            <a:solidFill>
-              <a:schemeClr val="accent3"/>
-            </a:solidFill>
-            <a:prstDash val="sysDot"/>
-            <a:headEnd type="none" w="med" len="med"/>
-            <a:tailEnd type="arrow" w="med" len="med"/>
-          </a:ln>
-          <a:effectLst/>
-        </p:spPr>
-        <p:style>
-          <a:lnRef idx="1">
-            <a:schemeClr val="accent2"/>
-          </a:lnRef>
-          <a:fillRef idx="2">
-            <a:schemeClr val="accent2"/>
-          </a:fillRef>
-          <a:effectRef idx="1">
-            <a:schemeClr val="accent2"/>
-          </a:effectRef>
-          <a:fontRef idx="minor">
-            <a:schemeClr val="dk1"/>
-          </a:fontRef>
-        </p:style>
-        <p:txBody>
-          <a:bodyPr rtlCol="0" anchor="ctr"/>
-          <a:lstStyle/>
-          <a:p>
-            <a:pPr algn="ctr"/>
-            <a:endParaRPr lang="en-SG"/>
-          </a:p>
-        </p:txBody>
-      </p:sp>
     </p:spTree>
     <p:extLst>
       <p:ext uri="{BB962C8B-B14F-4D97-AF65-F5344CB8AC3E}">
@@ -10478,15 +10329,7 @@
                   <a:srgbClr val="0070C0"/>
                 </a:solidFill>
               </a:rPr>
-              <a:t>Delete</a:t>
-            </a:r>
-            <a:r>
-              <a:rPr lang="en-US" sz="1050" b="1" smtClean="0">
-                <a:solidFill>
-                  <a:srgbClr val="0070C0"/>
-                </a:solidFill>
-              </a:rPr>
-              <a:t>Command</a:t>
+              <a:t>DeleteCommand</a:t>
             </a:r>
             <a:endParaRPr lang="en-SG" sz="1050" b="1" dirty="0">
               <a:solidFill>

</xml_diff>

<commit_message>
updated storage part of DG
</commit_message>
<xml_diff>
--- a/docs/diagrams/Diagrams.pptx
+++ b/docs/diagrams/Diagrams.pptx
@@ -201,7 +201,7 @@
           <a:p>
             <a:fld id="{F5CC4B3F-88C1-4FFA-B1B6-F41C21DC6924}" type="datetimeFigureOut">
               <a:rPr lang="en-US" smtClean="0"/>
-              <a:t>3/11/16</a:t>
+              <a:t>4/11/16</a:t>
             </a:fld>
             <a:endParaRPr lang="en-US"/>
           </a:p>
@@ -650,7 +650,7 @@
           <a:p>
             <a:fld id="{78C97017-6FC3-485B-9764-EAC9E56C1D49}" type="datetimeFigureOut">
               <a:rPr lang="en-US" smtClean="0"/>
-              <a:t>3/11/16</a:t>
+              <a:t>4/11/16</a:t>
             </a:fld>
             <a:endParaRPr lang="en-US"/>
           </a:p>
@@ -820,7 +820,7 @@
           <a:p>
             <a:fld id="{78C97017-6FC3-485B-9764-EAC9E56C1D49}" type="datetimeFigureOut">
               <a:rPr lang="en-US" smtClean="0"/>
-              <a:t>3/11/16</a:t>
+              <a:t>4/11/16</a:t>
             </a:fld>
             <a:endParaRPr lang="en-US"/>
           </a:p>
@@ -1000,7 +1000,7 @@
           <a:p>
             <a:fld id="{78C97017-6FC3-485B-9764-EAC9E56C1D49}" type="datetimeFigureOut">
               <a:rPr lang="en-US" smtClean="0"/>
-              <a:t>3/11/16</a:t>
+              <a:t>4/11/16</a:t>
             </a:fld>
             <a:endParaRPr lang="en-US"/>
           </a:p>
@@ -1170,7 +1170,7 @@
           <a:p>
             <a:fld id="{78C97017-6FC3-485B-9764-EAC9E56C1D49}" type="datetimeFigureOut">
               <a:rPr lang="en-US" smtClean="0"/>
-              <a:t>3/11/16</a:t>
+              <a:t>4/11/16</a:t>
             </a:fld>
             <a:endParaRPr lang="en-US"/>
           </a:p>
@@ -1416,7 +1416,7 @@
           <a:p>
             <a:fld id="{78C97017-6FC3-485B-9764-EAC9E56C1D49}" type="datetimeFigureOut">
               <a:rPr lang="en-US" smtClean="0"/>
-              <a:t>3/11/16</a:t>
+              <a:t>4/11/16</a:t>
             </a:fld>
             <a:endParaRPr lang="en-US"/>
           </a:p>
@@ -1704,7 +1704,7 @@
           <a:p>
             <a:fld id="{78C97017-6FC3-485B-9764-EAC9E56C1D49}" type="datetimeFigureOut">
               <a:rPr lang="en-US" smtClean="0"/>
-              <a:t>3/11/16</a:t>
+              <a:t>4/11/16</a:t>
             </a:fld>
             <a:endParaRPr lang="en-US"/>
           </a:p>
@@ -2126,7 +2126,7 @@
           <a:p>
             <a:fld id="{78C97017-6FC3-485B-9764-EAC9E56C1D49}" type="datetimeFigureOut">
               <a:rPr lang="en-US" smtClean="0"/>
-              <a:t>3/11/16</a:t>
+              <a:t>4/11/16</a:t>
             </a:fld>
             <a:endParaRPr lang="en-US"/>
           </a:p>
@@ -2244,7 +2244,7 @@
           <a:p>
             <a:fld id="{78C97017-6FC3-485B-9764-EAC9E56C1D49}" type="datetimeFigureOut">
               <a:rPr lang="en-US" smtClean="0"/>
-              <a:t>3/11/16</a:t>
+              <a:t>4/11/16</a:t>
             </a:fld>
             <a:endParaRPr lang="en-US"/>
           </a:p>
@@ -2339,7 +2339,7 @@
           <a:p>
             <a:fld id="{78C97017-6FC3-485B-9764-EAC9E56C1D49}" type="datetimeFigureOut">
               <a:rPr lang="en-US" smtClean="0"/>
-              <a:t>3/11/16</a:t>
+              <a:t>4/11/16</a:t>
             </a:fld>
             <a:endParaRPr lang="en-US"/>
           </a:p>
@@ -2616,7 +2616,7 @@
           <a:p>
             <a:fld id="{78C97017-6FC3-485B-9764-EAC9E56C1D49}" type="datetimeFigureOut">
               <a:rPr lang="en-US" smtClean="0"/>
-              <a:t>3/11/16</a:t>
+              <a:t>4/11/16</a:t>
             </a:fld>
             <a:endParaRPr lang="en-US"/>
           </a:p>
@@ -2869,7 +2869,7 @@
           <a:p>
             <a:fld id="{78C97017-6FC3-485B-9764-EAC9E56C1D49}" type="datetimeFigureOut">
               <a:rPr lang="en-US" smtClean="0"/>
-              <a:t>3/11/16</a:t>
+              <a:t>4/11/16</a:t>
             </a:fld>
             <a:endParaRPr lang="en-US"/>
           </a:p>
@@ -3082,7 +3082,7 @@
           <a:p>
             <a:fld id="{78C97017-6FC3-485B-9764-EAC9E56C1D49}" type="datetimeFigureOut">
               <a:rPr lang="en-US" smtClean="0"/>
-              <a:t>3/11/16</a:t>
+              <a:t>4/11/16</a:t>
             </a:fld>
             <a:endParaRPr lang="en-US"/>
           </a:p>
@@ -3473,12 +3473,8 @@
           <a:lstStyle/>
           <a:p>
             <a:r>
-              <a:rPr lang="en-US" dirty="0" err="1" smtClean="0"/>
-              <a:t>TaskManager</a:t>
-            </a:r>
-            <a:r>
               <a:rPr lang="en-US" dirty="0" smtClean="0"/>
-              <a:t> – </a:t>
+              <a:t>TaskManager – </a:t>
             </a:r>
             <a:r>
               <a:rPr lang="en-US" dirty="0" err="1" smtClean="0"/>
@@ -4299,101 +4295,6 @@
       </p:sp>
       <p:sp>
         <p:nvSpPr>
-          <p:cNvPr id="51" name="Cloud 50"/>
-          <p:cNvSpPr/>
-          <p:nvPr/>
-        </p:nvSpPr>
-        <p:spPr>
-          <a:xfrm>
-            <a:off x="2650069" y="1447800"/>
-            <a:ext cx="914400" cy="533400"/>
-          </a:xfrm>
-          <a:prstGeom prst="cloud">
-            <a:avLst/>
-          </a:prstGeom>
-          <a:solidFill>
-            <a:schemeClr val="bg1"/>
-          </a:solidFill>
-          <a:ln>
-            <a:solidFill>
-              <a:schemeClr val="tx1"/>
-            </a:solidFill>
-          </a:ln>
-        </p:spPr>
-        <p:style>
-          <a:lnRef idx="2">
-            <a:schemeClr val="accent1">
-              <a:shade val="50000"/>
-            </a:schemeClr>
-          </a:lnRef>
-          <a:fillRef idx="1">
-            <a:schemeClr val="accent1"/>
-          </a:fillRef>
-          <a:effectRef idx="0">
-            <a:schemeClr val="accent1"/>
-          </a:effectRef>
-          <a:fontRef idx="minor">
-            <a:schemeClr val="lt1"/>
-          </a:fontRef>
-        </p:style>
-        <p:txBody>
-          <a:bodyPr rtlCol="0" anchor="ctr"/>
-          <a:lstStyle/>
-          <a:p>
-            <a:pPr algn="ctr"/>
-            <a:r>
-              <a:rPr lang="en-US" sz="1400" dirty="0">
-                <a:solidFill>
-                  <a:schemeClr val="tx1"/>
-                </a:solidFill>
-              </a:rPr>
-              <a:t>Web</a:t>
-            </a:r>
-          </a:p>
-        </p:txBody>
-      </p:sp>
-      <p:cxnSp>
-        <p:nvCxnSpPr>
-          <p:cNvPr id="52" name="Elbow Connector 51"/>
-          <p:cNvCxnSpPr>
-            <a:stCxn id="2" idx="0"/>
-            <a:endCxn id="51" idx="2"/>
-          </p:cNvCxnSpPr>
-          <p:nvPr/>
-        </p:nvCxnSpPr>
-        <p:spPr>
-          <a:xfrm rot="5400000" flipH="1" flipV="1">
-            <a:off x="2222648" y="1760922"/>
-            <a:ext cx="476678" cy="383835"/>
-          </a:xfrm>
-          <a:prstGeom prst="bentConnector2">
-            <a:avLst/>
-          </a:prstGeom>
-          <a:ln w="28575">
-            <a:solidFill>
-              <a:srgbClr val="00B050"/>
-            </a:solidFill>
-            <a:prstDash val="sysDot"/>
-            <a:tailEnd type="arrow"/>
-          </a:ln>
-        </p:spPr>
-        <p:style>
-          <a:lnRef idx="1">
-            <a:schemeClr val="accent1"/>
-          </a:lnRef>
-          <a:fillRef idx="0">
-            <a:schemeClr val="accent1"/>
-          </a:fillRef>
-          <a:effectRef idx="0">
-            <a:schemeClr val="accent1"/>
-          </a:effectRef>
-          <a:fontRef idx="minor">
-            <a:schemeClr val="tx1"/>
-          </a:fontRef>
-        </p:style>
-      </p:cxnSp>
-      <p:sp>
-        <p:nvSpPr>
           <p:cNvPr id="23" name="Rectangle 62"/>
           <p:cNvSpPr/>
           <p:nvPr/>
@@ -5425,6 +5326,7 @@
           </a:bodyPr>
           <a:lstStyle/>
           <a:p>
+            <a:pPr algn="ctr"/>
             <a:r>
               <a:rPr lang="en-US" sz="1400" dirty="0" smtClean="0"/>
               <a:t>delete 1</a:t>
@@ -5566,20 +5468,12 @@
           <a:lstStyle/>
           <a:p>
             <a:r>
-              <a:rPr lang="en-US" sz="1400" dirty="0" err="1" smtClean="0">
-                <a:solidFill>
-                  <a:srgbClr val="7030A0"/>
-                </a:solidFill>
-              </a:rPr>
-              <a:t>deleteTask</a:t>
-            </a:r>
-            <a:r>
               <a:rPr lang="en-US" sz="1400" dirty="0" smtClean="0">
                 <a:solidFill>
                   <a:srgbClr val="7030A0"/>
                 </a:solidFill>
               </a:rPr>
-              <a:t>(p)</a:t>
+              <a:t>deleteTask(p)</a:t>
             </a:r>
             <a:endParaRPr lang="en-US" sz="1400" dirty="0">
               <a:solidFill>
@@ -5597,7 +5491,7 @@
         </p:nvSpPr>
         <p:spPr>
           <a:xfrm>
-            <a:off x="6074030" y="1687656"/>
+            <a:off x="6074030" y="1765756"/>
             <a:ext cx="2438400" cy="215444"/>
           </a:xfrm>
           <a:prstGeom prst="rect">
@@ -5619,18 +5513,544 @@
                   </a:schemeClr>
                 </a:solidFill>
               </a:rPr>
-              <a:t>Post(</a:t>
-            </a:r>
-            <a:r>
-              <a:rPr lang="en-US" sz="1400" dirty="0" err="1" smtClean="0">
+              <a:t>Post(TaskManagerChangedEvent)</a:t>
+            </a:r>
+            <a:endParaRPr lang="en-US" sz="1400" dirty="0">
+              <a:solidFill>
+                <a:schemeClr val="accent5">
+                  <a:lumMod val="75000"/>
+                </a:schemeClr>
+              </a:solidFill>
+            </a:endParaRPr>
+          </a:p>
+        </p:txBody>
+      </p:sp>
+      <p:cxnSp>
+        <p:nvCxnSpPr>
+          <p:cNvPr id="34" name="Straight Arrow Connector 33"/>
+          <p:cNvCxnSpPr/>
+          <p:nvPr/>
+        </p:nvCxnSpPr>
+        <p:spPr>
+          <a:xfrm>
+            <a:off x="3954408" y="2190681"/>
+            <a:ext cx="1837184" cy="0"/>
+          </a:xfrm>
+          <a:prstGeom prst="straightConnector1">
+            <a:avLst/>
+          </a:prstGeom>
+          <a:ln w="19050">
+            <a:solidFill>
+              <a:srgbClr val="7030A0"/>
+            </a:solidFill>
+            <a:prstDash val="sysDash"/>
+            <a:headEnd type="arrow" w="med" len="med"/>
+            <a:tailEnd type="none" w="med" len="med"/>
+          </a:ln>
+        </p:spPr>
+        <p:style>
+          <a:lnRef idx="1">
+            <a:schemeClr val="accent1"/>
+          </a:lnRef>
+          <a:fillRef idx="0">
+            <a:schemeClr val="accent1"/>
+          </a:fillRef>
+          <a:effectRef idx="0">
+            <a:schemeClr val="accent1"/>
+          </a:effectRef>
+          <a:fontRef idx="minor">
+            <a:schemeClr val="tx1"/>
+          </a:fontRef>
+        </p:style>
+      </p:cxnSp>
+      <p:cxnSp>
+        <p:nvCxnSpPr>
+          <p:cNvPr id="35" name="Straight Arrow Connector 34"/>
+          <p:cNvCxnSpPr/>
+          <p:nvPr/>
+        </p:nvCxnSpPr>
+        <p:spPr>
+          <a:xfrm>
+            <a:off x="1739069" y="2266002"/>
+            <a:ext cx="2058118" cy="0"/>
+          </a:xfrm>
+          <a:prstGeom prst="straightConnector1">
+            <a:avLst/>
+          </a:prstGeom>
+          <a:ln w="19050">
+            <a:solidFill>
+              <a:srgbClr val="0070C0"/>
+            </a:solidFill>
+            <a:prstDash val="sysDash"/>
+            <a:headEnd type="arrow" w="med" len="med"/>
+            <a:tailEnd type="none" w="med" len="med"/>
+          </a:ln>
+        </p:spPr>
+        <p:style>
+          <a:lnRef idx="1">
+            <a:schemeClr val="accent1"/>
+          </a:lnRef>
+          <a:fillRef idx="0">
+            <a:schemeClr val="accent1"/>
+          </a:fillRef>
+          <a:effectRef idx="0">
+            <a:schemeClr val="accent1"/>
+          </a:effectRef>
+          <a:fontRef idx="minor">
+            <a:schemeClr val="tx1"/>
+          </a:fontRef>
+        </p:style>
+      </p:cxnSp>
+      <p:cxnSp>
+        <p:nvCxnSpPr>
+          <p:cNvPr id="37" name="Straight Arrow Connector 36"/>
+          <p:cNvCxnSpPr/>
+          <p:nvPr/>
+        </p:nvCxnSpPr>
+        <p:spPr>
+          <a:xfrm>
+            <a:off x="390618" y="2342202"/>
+            <a:ext cx="1196051" cy="0"/>
+          </a:xfrm>
+          <a:prstGeom prst="straightConnector1">
+            <a:avLst/>
+          </a:prstGeom>
+          <a:ln w="19050">
+            <a:solidFill>
+              <a:srgbClr val="00B050"/>
+            </a:solidFill>
+            <a:prstDash val="sysDash"/>
+            <a:headEnd type="arrow" w="med" len="med"/>
+            <a:tailEnd type="none" w="med" len="med"/>
+          </a:ln>
+        </p:spPr>
+        <p:style>
+          <a:lnRef idx="1">
+            <a:schemeClr val="accent1"/>
+          </a:lnRef>
+          <a:fillRef idx="0">
+            <a:schemeClr val="accent1"/>
+          </a:fillRef>
+          <a:effectRef idx="0">
+            <a:schemeClr val="accent1"/>
+          </a:effectRef>
+          <a:fontRef idx="minor">
+            <a:schemeClr val="tx1"/>
+          </a:fontRef>
+        </p:style>
+      </p:cxnSp>
+      <p:sp>
+        <p:nvSpPr>
+          <p:cNvPr id="39" name="Rectangle 62"/>
+          <p:cNvSpPr/>
+          <p:nvPr/>
+        </p:nvSpPr>
+        <p:spPr>
+          <a:xfrm>
+            <a:off x="7696200" y="591251"/>
+            <a:ext cx="1371600" cy="346760"/>
+          </a:xfrm>
+          <a:prstGeom prst="rect">
+            <a:avLst/>
+          </a:prstGeom>
+          <a:solidFill>
+            <a:schemeClr val="accent5">
+              <a:lumMod val="75000"/>
+            </a:schemeClr>
+          </a:solidFill>
+          <a:ln w="19050">
+            <a:solidFill>
+              <a:schemeClr val="accent5">
+                <a:lumMod val="75000"/>
+              </a:schemeClr>
+            </a:solidFill>
+          </a:ln>
+          <a:effectLst/>
+        </p:spPr>
+        <p:style>
+          <a:lnRef idx="1">
+            <a:schemeClr val="accent2"/>
+          </a:lnRef>
+          <a:fillRef idx="2">
+            <a:schemeClr val="accent2"/>
+          </a:fillRef>
+          <a:effectRef idx="1">
+            <a:schemeClr val="accent2"/>
+          </a:effectRef>
+          <a:fontRef idx="minor">
+            <a:schemeClr val="dk1"/>
+          </a:fontRef>
+        </p:style>
+        <p:txBody>
+          <a:bodyPr rtlCol="0" anchor="ctr"/>
+          <a:lstStyle/>
+          <a:p>
+            <a:pPr algn="ctr"/>
+            <a:r>
+              <a:rPr lang="en-US" sz="1600" dirty="0" smtClean="0">
                 <a:solidFill>
-                  <a:schemeClr val="accent5">
-                    <a:lumMod val="75000"/>
-                  </a:schemeClr>
+                  <a:schemeClr val="bg1"/>
                 </a:solidFill>
               </a:rPr>
-              <a:t>TaskManagerChangedEvent</a:t>
-            </a:r>
+              <a:t>:EventsCenter</a:t>
+            </a:r>
+            <a:endParaRPr lang="en-SG" sz="1600" dirty="0">
+              <a:solidFill>
+                <a:schemeClr val="bg1"/>
+              </a:solidFill>
+            </a:endParaRPr>
+          </a:p>
+        </p:txBody>
+      </p:sp>
+      <p:cxnSp>
+        <p:nvCxnSpPr>
+          <p:cNvPr id="40" name="Straight Connector 39"/>
+          <p:cNvCxnSpPr/>
+          <p:nvPr/>
+        </p:nvCxnSpPr>
+        <p:spPr>
+          <a:xfrm>
+            <a:off x="8616802" y="944305"/>
+            <a:ext cx="0" cy="1723059"/>
+          </a:xfrm>
+          <a:prstGeom prst="line">
+            <a:avLst/>
+          </a:prstGeom>
+          <a:ln w="19050">
+            <a:solidFill>
+              <a:schemeClr val="accent5">
+                <a:lumMod val="75000"/>
+              </a:schemeClr>
+            </a:solidFill>
+            <a:prstDash val="sysDash"/>
+          </a:ln>
+          <a:effectLst/>
+        </p:spPr>
+        <p:style>
+          <a:lnRef idx="1">
+            <a:schemeClr val="accent1"/>
+          </a:lnRef>
+          <a:fillRef idx="2">
+            <a:schemeClr val="accent1"/>
+          </a:fillRef>
+          <a:effectRef idx="1">
+            <a:schemeClr val="accent1"/>
+          </a:effectRef>
+          <a:fontRef idx="minor">
+            <a:schemeClr val="dk1"/>
+          </a:fontRef>
+        </p:style>
+      </p:cxnSp>
+      <p:sp>
+        <p:nvSpPr>
+          <p:cNvPr id="41" name="Rectangle 40"/>
+          <p:cNvSpPr/>
+          <p:nvPr/>
+        </p:nvSpPr>
+        <p:spPr>
+          <a:xfrm>
+            <a:off x="8544794" y="1961202"/>
+            <a:ext cx="142006" cy="176787"/>
+          </a:xfrm>
+          <a:prstGeom prst="rect">
+            <a:avLst/>
+          </a:prstGeom>
+          <a:solidFill>
+            <a:schemeClr val="accent5">
+              <a:lumMod val="75000"/>
+            </a:schemeClr>
+          </a:solidFill>
+          <a:ln>
+            <a:solidFill>
+              <a:schemeClr val="accent5">
+                <a:lumMod val="75000"/>
+              </a:schemeClr>
+            </a:solidFill>
+          </a:ln>
+          <a:effectLst/>
+        </p:spPr>
+        <p:style>
+          <a:lnRef idx="1">
+            <a:schemeClr val="accent3"/>
+          </a:lnRef>
+          <a:fillRef idx="2">
+            <a:schemeClr val="accent3"/>
+          </a:fillRef>
+          <a:effectRef idx="1">
+            <a:schemeClr val="accent3"/>
+          </a:effectRef>
+          <a:fontRef idx="minor">
+            <a:schemeClr val="dk1"/>
+          </a:fontRef>
+        </p:style>
+        <p:txBody>
+          <a:bodyPr rtlCol="0" anchor="ctr"/>
+          <a:lstStyle/>
+          <a:p>
+            <a:pPr algn="ctr"/>
+            <a:endParaRPr lang="en-SG" sz="1400">
+              <a:solidFill>
+                <a:schemeClr val="dk1"/>
+              </a:solidFill>
+            </a:endParaRPr>
+          </a:p>
+        </p:txBody>
+      </p:sp>
+      <p:cxnSp>
+        <p:nvCxnSpPr>
+          <p:cNvPr id="42" name="Straight Arrow Connector 41"/>
+          <p:cNvCxnSpPr/>
+          <p:nvPr/>
+        </p:nvCxnSpPr>
+        <p:spPr>
+          <a:xfrm>
+            <a:off x="5943992" y="2057400"/>
+            <a:ext cx="2568438" cy="0"/>
+          </a:xfrm>
+          <a:prstGeom prst="straightConnector1">
+            <a:avLst/>
+          </a:prstGeom>
+          <a:ln w="19050">
+            <a:solidFill>
+              <a:srgbClr val="7030A0"/>
+            </a:solidFill>
+            <a:tailEnd type="arrow"/>
+          </a:ln>
+        </p:spPr>
+        <p:style>
+          <a:lnRef idx="1">
+            <a:schemeClr val="accent1"/>
+          </a:lnRef>
+          <a:fillRef idx="0">
+            <a:schemeClr val="accent1"/>
+          </a:fillRef>
+          <a:effectRef idx="0">
+            <a:schemeClr val="accent1"/>
+          </a:effectRef>
+          <a:fontRef idx="minor">
+            <a:schemeClr val="tx1"/>
+          </a:fontRef>
+        </p:style>
+      </p:cxnSp>
+      <p:cxnSp>
+        <p:nvCxnSpPr>
+          <p:cNvPr id="44" name="Straight Arrow Connector 43"/>
+          <p:cNvCxnSpPr/>
+          <p:nvPr/>
+        </p:nvCxnSpPr>
+        <p:spPr>
+          <a:xfrm>
+            <a:off x="5943992" y="2137989"/>
+            <a:ext cx="2549946" cy="0"/>
+          </a:xfrm>
+          <a:prstGeom prst="straightConnector1">
+            <a:avLst/>
+          </a:prstGeom>
+          <a:ln w="19050">
+            <a:solidFill>
+              <a:schemeClr val="accent5">
+                <a:lumMod val="75000"/>
+              </a:schemeClr>
+            </a:solidFill>
+            <a:prstDash val="sysDash"/>
+            <a:headEnd type="arrow" w="med" len="med"/>
+            <a:tailEnd type="none" w="med" len="med"/>
+          </a:ln>
+        </p:spPr>
+        <p:style>
+          <a:lnRef idx="1">
+            <a:schemeClr val="accent1"/>
+          </a:lnRef>
+          <a:fillRef idx="0">
+            <a:schemeClr val="accent1"/>
+          </a:fillRef>
+          <a:effectRef idx="0">
+            <a:schemeClr val="accent1"/>
+          </a:effectRef>
+          <a:fontRef idx="minor">
+            <a:schemeClr val="tx1"/>
+          </a:fontRef>
+        </p:style>
+      </p:cxnSp>
+      <p:sp>
+        <p:nvSpPr>
+          <p:cNvPr id="53" name="Rectangle 62"/>
+          <p:cNvSpPr/>
+          <p:nvPr/>
+        </p:nvSpPr>
+        <p:spPr>
+          <a:xfrm>
+            <a:off x="7370178" y="4278322"/>
+            <a:ext cx="1093635" cy="346760"/>
+          </a:xfrm>
+          <a:prstGeom prst="rect">
+            <a:avLst/>
+          </a:prstGeom>
+          <a:solidFill>
+            <a:schemeClr val="accent6">
+              <a:lumMod val="75000"/>
+            </a:schemeClr>
+          </a:solidFill>
+          <a:ln w="19050">
+            <a:solidFill>
+              <a:schemeClr val="accent6">
+                <a:lumMod val="75000"/>
+              </a:schemeClr>
+            </a:solidFill>
+          </a:ln>
+          <a:effectLst/>
+        </p:spPr>
+        <p:style>
+          <a:lnRef idx="1">
+            <a:schemeClr val="accent2"/>
+          </a:lnRef>
+          <a:fillRef idx="2">
+            <a:schemeClr val="accent2"/>
+          </a:fillRef>
+          <a:effectRef idx="1">
+            <a:schemeClr val="accent2"/>
+          </a:effectRef>
+          <a:fontRef idx="minor">
+            <a:schemeClr val="dk1"/>
+          </a:fontRef>
+        </p:style>
+        <p:txBody>
+          <a:bodyPr rtlCol="0" anchor="ctr"/>
+          <a:lstStyle/>
+          <a:p>
+            <a:pPr algn="ctr"/>
+            <a:r>
+              <a:rPr lang="en-US" sz="1600" dirty="0" smtClean="0">
+                <a:solidFill>
+                  <a:schemeClr val="bg1"/>
+                </a:solidFill>
+              </a:rPr>
+              <a:t>:Storage</a:t>
+            </a:r>
+            <a:endParaRPr lang="en-SG" sz="1600" dirty="0">
+              <a:solidFill>
+                <a:schemeClr val="bg1"/>
+              </a:solidFill>
+            </a:endParaRPr>
+          </a:p>
+        </p:txBody>
+      </p:sp>
+      <p:cxnSp>
+        <p:nvCxnSpPr>
+          <p:cNvPr id="54" name="Straight Connector 53"/>
+          <p:cNvCxnSpPr/>
+          <p:nvPr/>
+        </p:nvCxnSpPr>
+        <p:spPr>
+          <a:xfrm>
+            <a:off x="7916995" y="4641993"/>
+            <a:ext cx="0" cy="1723059"/>
+          </a:xfrm>
+          <a:prstGeom prst="line">
+            <a:avLst/>
+          </a:prstGeom>
+          <a:ln w="19050">
+            <a:solidFill>
+              <a:schemeClr val="accent6">
+                <a:lumMod val="75000"/>
+              </a:schemeClr>
+            </a:solidFill>
+            <a:prstDash val="sysDash"/>
+          </a:ln>
+          <a:effectLst/>
+        </p:spPr>
+        <p:style>
+          <a:lnRef idx="1">
+            <a:schemeClr val="accent1"/>
+          </a:lnRef>
+          <a:fillRef idx="2">
+            <a:schemeClr val="accent1"/>
+          </a:fillRef>
+          <a:effectRef idx="1">
+            <a:schemeClr val="accent1"/>
+          </a:effectRef>
+          <a:fontRef idx="minor">
+            <a:schemeClr val="dk1"/>
+          </a:fontRef>
+        </p:style>
+      </p:cxnSp>
+      <p:sp>
+        <p:nvSpPr>
+          <p:cNvPr id="55" name="Rectangle 54"/>
+          <p:cNvSpPr/>
+          <p:nvPr/>
+        </p:nvSpPr>
+        <p:spPr>
+          <a:xfrm>
+            <a:off x="7844987" y="5335662"/>
+            <a:ext cx="124478" cy="287409"/>
+          </a:xfrm>
+          <a:prstGeom prst="rect">
+            <a:avLst/>
+          </a:prstGeom>
+          <a:solidFill>
+            <a:schemeClr val="accent6">
+              <a:lumMod val="75000"/>
+            </a:schemeClr>
+          </a:solidFill>
+          <a:ln>
+            <a:solidFill>
+              <a:schemeClr val="accent6">
+                <a:lumMod val="75000"/>
+              </a:schemeClr>
+            </a:solidFill>
+          </a:ln>
+          <a:effectLst/>
+        </p:spPr>
+        <p:style>
+          <a:lnRef idx="1">
+            <a:schemeClr val="accent3"/>
+          </a:lnRef>
+          <a:fillRef idx="2">
+            <a:schemeClr val="accent3"/>
+          </a:fillRef>
+          <a:effectRef idx="1">
+            <a:schemeClr val="accent3"/>
+          </a:effectRef>
+          <a:fontRef idx="minor">
+            <a:schemeClr val="dk1"/>
+          </a:fontRef>
+        </p:style>
+        <p:txBody>
+          <a:bodyPr rtlCol="0" anchor="ctr"/>
+          <a:lstStyle/>
+          <a:p>
+            <a:pPr algn="ctr"/>
+            <a:endParaRPr lang="en-SG" sz="1400">
+              <a:solidFill>
+                <a:schemeClr val="dk1"/>
+              </a:solidFill>
+            </a:endParaRPr>
+          </a:p>
+        </p:txBody>
+      </p:sp>
+      <p:sp>
+        <p:nvSpPr>
+          <p:cNvPr id="62" name="TextBox 61"/>
+          <p:cNvSpPr txBox="1"/>
+          <p:nvPr/>
+        </p:nvSpPr>
+        <p:spPr>
+          <a:xfrm>
+            <a:off x="1810094" y="4797674"/>
+            <a:ext cx="2716635" cy="215444"/>
+          </a:xfrm>
+          <a:prstGeom prst="rect">
+            <a:avLst/>
+          </a:prstGeom>
+          <a:noFill/>
+        </p:spPr>
+        <p:txBody>
+          <a:bodyPr wrap="square" lIns="0" tIns="0" rIns="0" bIns="0" rtlCol="0">
+            <a:spAutoFit/>
+          </a:bodyPr>
+          <a:lstStyle/>
+          <a:p>
             <a:r>
               <a:rPr lang="en-US" sz="1400" dirty="0" smtClean="0">
                 <a:solidFill>
@@ -5639,7 +6059,7 @@
                   </a:schemeClr>
                 </a:solidFill>
               </a:rPr>
-              <a:t>)</a:t>
+              <a:t>Post(TaskManagerChangedEvent)</a:t>
             </a:r>
             <a:endParaRPr lang="en-US" sz="1400" dirty="0">
               <a:solidFill>
@@ -5653,25 +6073,27 @@
       </p:sp>
       <p:cxnSp>
         <p:nvCxnSpPr>
-          <p:cNvPr id="34" name="Straight Arrow Connector 33"/>
+          <p:cNvPr id="63" name="Straight Arrow Connector 62"/>
           <p:cNvCxnSpPr/>
           <p:nvPr/>
         </p:nvCxnSpPr>
         <p:spPr>
-          <a:xfrm>
-            <a:off x="3954408" y="2190681"/>
-            <a:ext cx="1837184" cy="0"/>
+          <a:xfrm flipH="1">
+            <a:off x="4526729" y="5623071"/>
+            <a:ext cx="3383941" cy="0"/>
           </a:xfrm>
           <a:prstGeom prst="straightConnector1">
             <a:avLst/>
           </a:prstGeom>
           <a:ln w="19050">
             <a:solidFill>
-              <a:srgbClr val="7030A0"/>
+              <a:schemeClr val="accent6">
+                <a:lumMod val="75000"/>
+              </a:schemeClr>
             </a:solidFill>
             <a:prstDash val="sysDash"/>
-            <a:headEnd type="arrow" w="med" len="med"/>
-            <a:tailEnd type="none" w="med" len="med"/>
+            <a:headEnd type="none" w="med" len="med"/>
+            <a:tailEnd type="arrow" w="med" len="med"/>
           </a:ln>
         </p:spPr>
         <p:style>
@@ -5689,91 +6111,15 @@
           </a:fontRef>
         </p:style>
       </p:cxnSp>
-      <p:cxnSp>
-        <p:nvCxnSpPr>
-          <p:cNvPr id="35" name="Straight Arrow Connector 34"/>
-          <p:cNvCxnSpPr/>
-          <p:nvPr/>
-        </p:nvCxnSpPr>
-        <p:spPr>
-          <a:xfrm>
-            <a:off x="1739069" y="2266002"/>
-            <a:ext cx="2058118" cy="0"/>
-          </a:xfrm>
-          <a:prstGeom prst="straightConnector1">
-            <a:avLst/>
-          </a:prstGeom>
-          <a:ln w="19050">
-            <a:solidFill>
-              <a:srgbClr val="0070C0"/>
-            </a:solidFill>
-            <a:prstDash val="sysDash"/>
-            <a:headEnd type="arrow" w="med" len="med"/>
-            <a:tailEnd type="none" w="med" len="med"/>
-          </a:ln>
-        </p:spPr>
-        <p:style>
-          <a:lnRef idx="1">
-            <a:schemeClr val="accent1"/>
-          </a:lnRef>
-          <a:fillRef idx="0">
-            <a:schemeClr val="accent1"/>
-          </a:fillRef>
-          <a:effectRef idx="0">
-            <a:schemeClr val="accent1"/>
-          </a:effectRef>
-          <a:fontRef idx="minor">
-            <a:schemeClr val="tx1"/>
-          </a:fontRef>
-        </p:style>
-      </p:cxnSp>
-      <p:cxnSp>
-        <p:nvCxnSpPr>
-          <p:cNvPr id="37" name="Straight Arrow Connector 36"/>
-          <p:cNvCxnSpPr/>
-          <p:nvPr/>
-        </p:nvCxnSpPr>
-        <p:spPr>
-          <a:xfrm>
-            <a:off x="390618" y="2342202"/>
-            <a:ext cx="1196051" cy="0"/>
-          </a:xfrm>
-          <a:prstGeom prst="straightConnector1">
-            <a:avLst/>
-          </a:prstGeom>
-          <a:ln w="19050">
-            <a:solidFill>
-              <a:srgbClr val="00B050"/>
-            </a:solidFill>
-            <a:prstDash val="sysDash"/>
-            <a:headEnd type="arrow" w="med" len="med"/>
-            <a:tailEnd type="none" w="med" len="med"/>
-          </a:ln>
-        </p:spPr>
-        <p:style>
-          <a:lnRef idx="1">
-            <a:schemeClr val="accent1"/>
-          </a:lnRef>
-          <a:fillRef idx="0">
-            <a:schemeClr val="accent1"/>
-          </a:fillRef>
-          <a:effectRef idx="0">
-            <a:schemeClr val="accent1"/>
-          </a:effectRef>
-          <a:fontRef idx="minor">
-            <a:schemeClr val="tx1"/>
-          </a:fontRef>
-        </p:style>
-      </p:cxnSp>
-      <p:sp>
-        <p:nvSpPr>
-          <p:cNvPr id="39" name="Rectangle 62"/>
+      <p:sp>
+        <p:nvSpPr>
+          <p:cNvPr id="66" name="Rectangle 62"/>
           <p:cNvSpPr/>
           <p:nvPr/>
         </p:nvSpPr>
         <p:spPr>
           <a:xfrm>
-            <a:off x="7696200" y="591251"/>
+            <a:off x="3791146" y="4295233"/>
             <a:ext cx="1371600" cy="346760"/>
           </a:xfrm>
           <a:prstGeom prst="rect">
@@ -5818,515 +6164,7 @@
                   <a:schemeClr val="bg1"/>
                 </a:solidFill>
               </a:rPr>
-              <a:t>:</a:t>
-            </a:r>
-            <a:r>
-              <a:rPr lang="en-US" sz="1600" dirty="0" err="1" smtClean="0">
-                <a:solidFill>
-                  <a:schemeClr val="bg1"/>
-                </a:solidFill>
-              </a:rPr>
-              <a:t>EventsCenter</a:t>
-            </a:r>
-            <a:endParaRPr lang="en-SG" sz="1600" dirty="0">
-              <a:solidFill>
-                <a:schemeClr val="bg1"/>
-              </a:solidFill>
-            </a:endParaRPr>
-          </a:p>
-        </p:txBody>
-      </p:sp>
-      <p:cxnSp>
-        <p:nvCxnSpPr>
-          <p:cNvPr id="40" name="Straight Connector 39"/>
-          <p:cNvCxnSpPr/>
-          <p:nvPr/>
-        </p:nvCxnSpPr>
-        <p:spPr>
-          <a:xfrm>
-            <a:off x="8616802" y="944305"/>
-            <a:ext cx="0" cy="1723059"/>
-          </a:xfrm>
-          <a:prstGeom prst="line">
-            <a:avLst/>
-          </a:prstGeom>
-          <a:ln w="19050">
-            <a:solidFill>
-              <a:schemeClr val="accent5">
-                <a:lumMod val="75000"/>
-              </a:schemeClr>
-            </a:solidFill>
-            <a:prstDash val="sysDash"/>
-          </a:ln>
-          <a:effectLst/>
-        </p:spPr>
-        <p:style>
-          <a:lnRef idx="1">
-            <a:schemeClr val="accent1"/>
-          </a:lnRef>
-          <a:fillRef idx="2">
-            <a:schemeClr val="accent1"/>
-          </a:fillRef>
-          <a:effectRef idx="1">
-            <a:schemeClr val="accent1"/>
-          </a:effectRef>
-          <a:fontRef idx="minor">
-            <a:schemeClr val="dk1"/>
-          </a:fontRef>
-        </p:style>
-      </p:cxnSp>
-      <p:sp>
-        <p:nvSpPr>
-          <p:cNvPr id="41" name="Rectangle 40"/>
-          <p:cNvSpPr/>
-          <p:nvPr/>
-        </p:nvSpPr>
-        <p:spPr>
-          <a:xfrm>
-            <a:off x="8544794" y="1961202"/>
-            <a:ext cx="142006" cy="176787"/>
-          </a:xfrm>
-          <a:prstGeom prst="rect">
-            <a:avLst/>
-          </a:prstGeom>
-          <a:solidFill>
-            <a:schemeClr val="accent5">
-              <a:lumMod val="75000"/>
-            </a:schemeClr>
-          </a:solidFill>
-          <a:ln>
-            <a:solidFill>
-              <a:schemeClr val="accent5">
-                <a:lumMod val="75000"/>
-              </a:schemeClr>
-            </a:solidFill>
-          </a:ln>
-          <a:effectLst/>
-        </p:spPr>
-        <p:style>
-          <a:lnRef idx="1">
-            <a:schemeClr val="accent3"/>
-          </a:lnRef>
-          <a:fillRef idx="2">
-            <a:schemeClr val="accent3"/>
-          </a:fillRef>
-          <a:effectRef idx="1">
-            <a:schemeClr val="accent3"/>
-          </a:effectRef>
-          <a:fontRef idx="minor">
-            <a:schemeClr val="dk1"/>
-          </a:fontRef>
-        </p:style>
-        <p:txBody>
-          <a:bodyPr rtlCol="0" anchor="ctr"/>
-          <a:lstStyle/>
-          <a:p>
-            <a:pPr algn="ctr"/>
-            <a:endParaRPr lang="en-SG" sz="1400">
-              <a:solidFill>
-                <a:schemeClr val="dk1"/>
-              </a:solidFill>
-            </a:endParaRPr>
-          </a:p>
-        </p:txBody>
-      </p:sp>
-      <p:cxnSp>
-        <p:nvCxnSpPr>
-          <p:cNvPr id="42" name="Straight Arrow Connector 41"/>
-          <p:cNvCxnSpPr/>
-          <p:nvPr/>
-        </p:nvCxnSpPr>
-        <p:spPr>
-          <a:xfrm>
-            <a:off x="5943992" y="1961202"/>
-            <a:ext cx="2568438" cy="0"/>
-          </a:xfrm>
-          <a:prstGeom prst="straightConnector1">
-            <a:avLst/>
-          </a:prstGeom>
-          <a:ln w="19050">
-            <a:solidFill>
-              <a:srgbClr val="7030A0"/>
-            </a:solidFill>
-            <a:tailEnd type="arrow"/>
-          </a:ln>
-        </p:spPr>
-        <p:style>
-          <a:lnRef idx="1">
-            <a:schemeClr val="accent1"/>
-          </a:lnRef>
-          <a:fillRef idx="0">
-            <a:schemeClr val="accent1"/>
-          </a:fillRef>
-          <a:effectRef idx="0">
-            <a:schemeClr val="accent1"/>
-          </a:effectRef>
-          <a:fontRef idx="minor">
-            <a:schemeClr val="tx1"/>
-          </a:fontRef>
-        </p:style>
-      </p:cxnSp>
-      <p:cxnSp>
-        <p:nvCxnSpPr>
-          <p:cNvPr id="44" name="Straight Arrow Connector 43"/>
-          <p:cNvCxnSpPr/>
-          <p:nvPr/>
-        </p:nvCxnSpPr>
-        <p:spPr>
-          <a:xfrm>
-            <a:off x="5943992" y="2137989"/>
-            <a:ext cx="2549946" cy="0"/>
-          </a:xfrm>
-          <a:prstGeom prst="straightConnector1">
-            <a:avLst/>
-          </a:prstGeom>
-          <a:ln w="19050">
-            <a:solidFill>
-              <a:schemeClr val="accent5">
-                <a:lumMod val="75000"/>
-              </a:schemeClr>
-            </a:solidFill>
-            <a:prstDash val="sysDash"/>
-            <a:headEnd type="arrow" w="med" len="med"/>
-            <a:tailEnd type="none" w="med" len="med"/>
-          </a:ln>
-        </p:spPr>
-        <p:style>
-          <a:lnRef idx="1">
-            <a:schemeClr val="accent1"/>
-          </a:lnRef>
-          <a:fillRef idx="0">
-            <a:schemeClr val="accent1"/>
-          </a:fillRef>
-          <a:effectRef idx="0">
-            <a:schemeClr val="accent1"/>
-          </a:effectRef>
-          <a:fontRef idx="minor">
-            <a:schemeClr val="tx1"/>
-          </a:fontRef>
-        </p:style>
-      </p:cxnSp>
-      <p:sp>
-        <p:nvSpPr>
-          <p:cNvPr id="53" name="Rectangle 62"/>
-          <p:cNvSpPr/>
-          <p:nvPr/>
-        </p:nvSpPr>
-        <p:spPr>
-          <a:xfrm>
-            <a:off x="7370178" y="4278322"/>
-            <a:ext cx="1093635" cy="346760"/>
-          </a:xfrm>
-          <a:prstGeom prst="rect">
-            <a:avLst/>
-          </a:prstGeom>
-          <a:solidFill>
-            <a:schemeClr val="accent6">
-              <a:lumMod val="75000"/>
-            </a:schemeClr>
-          </a:solidFill>
-          <a:ln w="19050">
-            <a:solidFill>
-              <a:schemeClr val="accent6">
-                <a:lumMod val="75000"/>
-              </a:schemeClr>
-            </a:solidFill>
-          </a:ln>
-          <a:effectLst/>
-        </p:spPr>
-        <p:style>
-          <a:lnRef idx="1">
-            <a:schemeClr val="accent2"/>
-          </a:lnRef>
-          <a:fillRef idx="2">
-            <a:schemeClr val="accent2"/>
-          </a:fillRef>
-          <a:effectRef idx="1">
-            <a:schemeClr val="accent2"/>
-          </a:effectRef>
-          <a:fontRef idx="minor">
-            <a:schemeClr val="dk1"/>
-          </a:fontRef>
-        </p:style>
-        <p:txBody>
-          <a:bodyPr rtlCol="0" anchor="ctr"/>
-          <a:lstStyle/>
-          <a:p>
-            <a:pPr algn="ctr"/>
-            <a:r>
-              <a:rPr lang="en-US" sz="1600" dirty="0" smtClean="0">
-                <a:solidFill>
-                  <a:schemeClr val="bg1"/>
-                </a:solidFill>
-              </a:rPr>
-              <a:t>:Storage</a:t>
-            </a:r>
-            <a:endParaRPr lang="en-SG" sz="1600" dirty="0">
-              <a:solidFill>
-                <a:schemeClr val="bg1"/>
-              </a:solidFill>
-            </a:endParaRPr>
-          </a:p>
-        </p:txBody>
-      </p:sp>
-      <p:cxnSp>
-        <p:nvCxnSpPr>
-          <p:cNvPr id="54" name="Straight Connector 53"/>
-          <p:cNvCxnSpPr/>
-          <p:nvPr/>
-        </p:nvCxnSpPr>
-        <p:spPr>
-          <a:xfrm>
-            <a:off x="7916995" y="4641993"/>
-            <a:ext cx="0" cy="1723059"/>
-          </a:xfrm>
-          <a:prstGeom prst="line">
-            <a:avLst/>
-          </a:prstGeom>
-          <a:ln w="19050">
-            <a:solidFill>
-              <a:schemeClr val="accent6">
-                <a:lumMod val="75000"/>
-              </a:schemeClr>
-            </a:solidFill>
-            <a:prstDash val="sysDash"/>
-          </a:ln>
-          <a:effectLst/>
-        </p:spPr>
-        <p:style>
-          <a:lnRef idx="1">
-            <a:schemeClr val="accent1"/>
-          </a:lnRef>
-          <a:fillRef idx="2">
-            <a:schemeClr val="accent1"/>
-          </a:fillRef>
-          <a:effectRef idx="1">
-            <a:schemeClr val="accent1"/>
-          </a:effectRef>
-          <a:fontRef idx="minor">
-            <a:schemeClr val="dk1"/>
-          </a:fontRef>
-        </p:style>
-      </p:cxnSp>
-      <p:sp>
-        <p:nvSpPr>
-          <p:cNvPr id="55" name="Rectangle 54"/>
-          <p:cNvSpPr/>
-          <p:nvPr/>
-        </p:nvSpPr>
-        <p:spPr>
-          <a:xfrm>
-            <a:off x="7844987" y="5335662"/>
-            <a:ext cx="124478" cy="287409"/>
-          </a:xfrm>
-          <a:prstGeom prst="rect">
-            <a:avLst/>
-          </a:prstGeom>
-          <a:solidFill>
-            <a:schemeClr val="accent6">
-              <a:lumMod val="75000"/>
-            </a:schemeClr>
-          </a:solidFill>
-          <a:ln>
-            <a:solidFill>
-              <a:schemeClr val="accent6">
-                <a:lumMod val="75000"/>
-              </a:schemeClr>
-            </a:solidFill>
-          </a:ln>
-          <a:effectLst/>
-        </p:spPr>
-        <p:style>
-          <a:lnRef idx="1">
-            <a:schemeClr val="accent3"/>
-          </a:lnRef>
-          <a:fillRef idx="2">
-            <a:schemeClr val="accent3"/>
-          </a:fillRef>
-          <a:effectRef idx="1">
-            <a:schemeClr val="accent3"/>
-          </a:effectRef>
-          <a:fontRef idx="minor">
-            <a:schemeClr val="dk1"/>
-          </a:fontRef>
-        </p:style>
-        <p:txBody>
-          <a:bodyPr rtlCol="0" anchor="ctr"/>
-          <a:lstStyle/>
-          <a:p>
-            <a:pPr algn="ctr"/>
-            <a:endParaRPr lang="en-SG" sz="1400">
-              <a:solidFill>
-                <a:schemeClr val="dk1"/>
-              </a:solidFill>
-            </a:endParaRPr>
-          </a:p>
-        </p:txBody>
-      </p:sp>
-      <p:sp>
-        <p:nvSpPr>
-          <p:cNvPr id="62" name="TextBox 61"/>
-          <p:cNvSpPr txBox="1"/>
-          <p:nvPr/>
-        </p:nvSpPr>
-        <p:spPr>
-          <a:xfrm>
-            <a:off x="1810094" y="4797674"/>
-            <a:ext cx="2716635" cy="215444"/>
-          </a:xfrm>
-          <a:prstGeom prst="rect">
-            <a:avLst/>
-          </a:prstGeom>
-          <a:noFill/>
-        </p:spPr>
-        <p:txBody>
-          <a:bodyPr wrap="square" lIns="0" tIns="0" rIns="0" bIns="0" rtlCol="0">
-            <a:spAutoFit/>
-          </a:bodyPr>
-          <a:lstStyle/>
-          <a:p>
-            <a:r>
-              <a:rPr lang="en-US" sz="1400" dirty="0" smtClean="0">
-                <a:solidFill>
-                  <a:schemeClr val="accent5">
-                    <a:lumMod val="75000"/>
-                  </a:schemeClr>
-                </a:solidFill>
-              </a:rPr>
-              <a:t>Post(</a:t>
-            </a:r>
-            <a:r>
-              <a:rPr lang="en-US" sz="1400" dirty="0" err="1" smtClean="0">
-                <a:solidFill>
-                  <a:schemeClr val="accent5">
-                    <a:lumMod val="75000"/>
-                  </a:schemeClr>
-                </a:solidFill>
-              </a:rPr>
-              <a:t>TaskManagerChangedEvent</a:t>
-            </a:r>
-            <a:r>
-              <a:rPr lang="en-US" sz="1400" dirty="0" smtClean="0">
-                <a:solidFill>
-                  <a:schemeClr val="accent5">
-                    <a:lumMod val="75000"/>
-                  </a:schemeClr>
-                </a:solidFill>
-              </a:rPr>
-              <a:t>)</a:t>
-            </a:r>
-            <a:endParaRPr lang="en-US" sz="1400" dirty="0">
-              <a:solidFill>
-                <a:schemeClr val="accent5">
-                  <a:lumMod val="75000"/>
-                </a:schemeClr>
-              </a:solidFill>
-            </a:endParaRPr>
-          </a:p>
-        </p:txBody>
-      </p:sp>
-      <p:cxnSp>
-        <p:nvCxnSpPr>
-          <p:cNvPr id="63" name="Straight Arrow Connector 62"/>
-          <p:cNvCxnSpPr/>
-          <p:nvPr/>
-        </p:nvCxnSpPr>
-        <p:spPr>
-          <a:xfrm flipH="1">
-            <a:off x="4526729" y="5623071"/>
-            <a:ext cx="3383941" cy="0"/>
-          </a:xfrm>
-          <a:prstGeom prst="straightConnector1">
-            <a:avLst/>
-          </a:prstGeom>
-          <a:ln w="19050">
-            <a:solidFill>
-              <a:schemeClr val="accent6">
-                <a:lumMod val="75000"/>
-              </a:schemeClr>
-            </a:solidFill>
-            <a:prstDash val="sysDash"/>
-            <a:headEnd type="none" w="med" len="med"/>
-            <a:tailEnd type="arrow" w="med" len="med"/>
-          </a:ln>
-        </p:spPr>
-        <p:style>
-          <a:lnRef idx="1">
-            <a:schemeClr val="accent1"/>
-          </a:lnRef>
-          <a:fillRef idx="0">
-            <a:schemeClr val="accent1"/>
-          </a:fillRef>
-          <a:effectRef idx="0">
-            <a:schemeClr val="accent1"/>
-          </a:effectRef>
-          <a:fontRef idx="minor">
-            <a:schemeClr val="tx1"/>
-          </a:fontRef>
-        </p:style>
-      </p:cxnSp>
-      <p:sp>
-        <p:nvSpPr>
-          <p:cNvPr id="66" name="Rectangle 62"/>
-          <p:cNvSpPr/>
-          <p:nvPr/>
-        </p:nvSpPr>
-        <p:spPr>
-          <a:xfrm>
-            <a:off x="3791146" y="4295233"/>
-            <a:ext cx="1371600" cy="346760"/>
-          </a:xfrm>
-          <a:prstGeom prst="rect">
-            <a:avLst/>
-          </a:prstGeom>
-          <a:solidFill>
-            <a:schemeClr val="accent5">
-              <a:lumMod val="75000"/>
-            </a:schemeClr>
-          </a:solidFill>
-          <a:ln w="19050">
-            <a:solidFill>
-              <a:schemeClr val="accent5">
-                <a:lumMod val="75000"/>
-              </a:schemeClr>
-            </a:solidFill>
-          </a:ln>
-          <a:effectLst/>
-        </p:spPr>
-        <p:style>
-          <a:lnRef idx="1">
-            <a:schemeClr val="accent2"/>
-          </a:lnRef>
-          <a:fillRef idx="2">
-            <a:schemeClr val="accent2"/>
-          </a:fillRef>
-          <a:effectRef idx="1">
-            <a:schemeClr val="accent2"/>
-          </a:effectRef>
-          <a:fontRef idx="minor">
-            <a:schemeClr val="dk1"/>
-          </a:fontRef>
-        </p:style>
-        <p:txBody>
-          <a:bodyPr rtlCol="0" anchor="ctr"/>
-          <a:lstStyle/>
-          <a:p>
-            <a:pPr algn="ctr"/>
-            <a:r>
-              <a:rPr lang="en-US" sz="1600" dirty="0" smtClean="0">
-                <a:solidFill>
-                  <a:schemeClr val="bg1"/>
-                </a:solidFill>
-              </a:rPr>
-              <a:t>:</a:t>
-            </a:r>
-            <a:r>
-              <a:rPr lang="en-US" sz="1600" dirty="0" err="1" smtClean="0">
-                <a:solidFill>
-                  <a:schemeClr val="bg1"/>
-                </a:solidFill>
-              </a:rPr>
-              <a:t>EventsCenter</a:t>
+              <a:t>:EventsCenter</a:t>
             </a:r>
             <a:endParaRPr lang="en-SG" sz="1600" dirty="0">
               <a:solidFill>
@@ -7110,7 +6948,7 @@
         </p:nvGrpSpPr>
         <p:grpSpPr>
           <a:xfrm flipH="1">
-            <a:off x="7936842" y="5335662"/>
+            <a:off x="7924800" y="5335662"/>
             <a:ext cx="217349" cy="270072"/>
             <a:chOff x="1028134" y="5612032"/>
             <a:chExt cx="217349" cy="270072"/>
@@ -7356,6 +7194,241 @@
           </a:prstGeom>
         </p:spPr>
       </p:pic>
+      <p:sp>
+        <p:nvSpPr>
+          <p:cNvPr id="75" name="TextBox 74"/>
+          <p:cNvSpPr txBox="1"/>
+          <p:nvPr/>
+        </p:nvSpPr>
+        <p:spPr>
+          <a:xfrm>
+            <a:off x="4267200" y="1295400"/>
+            <a:ext cx="1424846" cy="215444"/>
+          </a:xfrm>
+          <a:prstGeom prst="rect">
+            <a:avLst/>
+          </a:prstGeom>
+          <a:noFill/>
+        </p:spPr>
+        <p:txBody>
+          <a:bodyPr wrap="square" lIns="0" tIns="0" rIns="0" bIns="0" rtlCol="0">
+            <a:spAutoFit/>
+          </a:bodyPr>
+          <a:lstStyle/>
+          <a:p>
+            <a:r>
+              <a:rPr lang="en-US" sz="1400" dirty="0" smtClean="0">
+                <a:solidFill>
+                  <a:srgbClr val="7030A0"/>
+                </a:solidFill>
+              </a:rPr>
+              <a:t>saveToHistory()</a:t>
+            </a:r>
+            <a:endParaRPr lang="en-US" sz="1400" dirty="0">
+              <a:solidFill>
+                <a:srgbClr val="7030A0"/>
+              </a:solidFill>
+            </a:endParaRPr>
+          </a:p>
+        </p:txBody>
+      </p:sp>
+      <p:grpSp>
+        <p:nvGrpSpPr>
+          <p:cNvPr id="76" name="Group 75"/>
+          <p:cNvGrpSpPr/>
+          <p:nvPr/>
+        </p:nvGrpSpPr>
+        <p:grpSpPr>
+          <a:xfrm flipH="1">
+            <a:off x="5867400" y="1406328"/>
+            <a:ext cx="304802" cy="346272"/>
+            <a:chOff x="1028134" y="5612032"/>
+            <a:chExt cx="217349" cy="270072"/>
+          </a:xfrm>
+        </p:grpSpPr>
+        <p:sp>
+          <p:nvSpPr>
+            <p:cNvPr id="77" name="Freeform 76"/>
+            <p:cNvSpPr/>
+            <p:nvPr/>
+          </p:nvSpPr>
+          <p:spPr>
+            <a:xfrm rot="2600998" flipH="1" flipV="1">
+              <a:off x="1028134" y="5612032"/>
+              <a:ext cx="167452" cy="116880"/>
+            </a:xfrm>
+            <a:custGeom>
+              <a:avLst/>
+              <a:gdLst>
+                <a:gd name="connsiteX0" fmla="*/ 0 w 226400"/>
+                <a:gd name="connsiteY0" fmla="*/ 32920 h 171466"/>
+                <a:gd name="connsiteX1" fmla="*/ 157018 w 226400"/>
+                <a:gd name="connsiteY1" fmla="*/ 5211 h 171466"/>
+                <a:gd name="connsiteX2" fmla="*/ 221673 w 226400"/>
+                <a:gd name="connsiteY2" fmla="*/ 125284 h 171466"/>
+                <a:gd name="connsiteX3" fmla="*/ 36945 w 226400"/>
+                <a:gd name="connsiteY3" fmla="*/ 171466 h 171466"/>
+              </a:gdLst>
+              <a:ahLst/>
+              <a:cxnLst>
+                <a:cxn ang="0">
+                  <a:pos x="connsiteX0" y="connsiteY0"/>
+                </a:cxn>
+                <a:cxn ang="0">
+                  <a:pos x="connsiteX1" y="connsiteY1"/>
+                </a:cxn>
+                <a:cxn ang="0">
+                  <a:pos x="connsiteX2" y="connsiteY2"/>
+                </a:cxn>
+                <a:cxn ang="0">
+                  <a:pos x="connsiteX3" y="connsiteY3"/>
+                </a:cxn>
+              </a:cxnLst>
+              <a:rect l="l" t="t" r="r" b="b"/>
+              <a:pathLst>
+                <a:path w="226400" h="171466">
+                  <a:moveTo>
+                    <a:pt x="0" y="32920"/>
+                  </a:moveTo>
+                  <a:cubicBezTo>
+                    <a:pt x="60036" y="11368"/>
+                    <a:pt x="120073" y="-10183"/>
+                    <a:pt x="157018" y="5211"/>
+                  </a:cubicBezTo>
+                  <a:cubicBezTo>
+                    <a:pt x="193963" y="20605"/>
+                    <a:pt x="241685" y="97575"/>
+                    <a:pt x="221673" y="125284"/>
+                  </a:cubicBezTo>
+                  <a:cubicBezTo>
+                    <a:pt x="201661" y="152993"/>
+                    <a:pt x="119303" y="162229"/>
+                    <a:pt x="36945" y="171466"/>
+                  </a:cubicBezTo>
+                </a:path>
+              </a:pathLst>
+            </a:custGeom>
+            <a:ln w="19050">
+              <a:solidFill>
+                <a:srgbClr val="1F497D"/>
+              </a:solidFill>
+              <a:headEnd type="arrow" w="med" len="med"/>
+              <a:tailEnd type="none" w="med" len="med"/>
+            </a:ln>
+          </p:spPr>
+          <p:style>
+            <a:lnRef idx="1">
+              <a:schemeClr val="accent1"/>
+            </a:lnRef>
+            <a:fillRef idx="0">
+              <a:schemeClr val="accent1"/>
+            </a:fillRef>
+            <a:effectRef idx="0">
+              <a:schemeClr val="accent1"/>
+            </a:effectRef>
+            <a:fontRef idx="minor">
+              <a:schemeClr val="tx1"/>
+            </a:fontRef>
+          </p:style>
+          <p:txBody>
+            <a:bodyPr rtlCol="0" anchor="ctr"/>
+            <a:lstStyle/>
+            <a:p>
+              <a:pPr algn="ctr"/>
+              <a:endParaRPr lang="en-SG"/>
+            </a:p>
+          </p:txBody>
+        </p:sp>
+        <p:sp>
+          <p:nvSpPr>
+            <p:cNvPr id="78" name="Rectangle 77"/>
+            <p:cNvSpPr/>
+            <p:nvPr/>
+          </p:nvSpPr>
+          <p:spPr>
+            <a:xfrm>
+              <a:off x="1147403" y="5712513"/>
+              <a:ext cx="98080" cy="169591"/>
+            </a:xfrm>
+            <a:prstGeom prst="rect">
+              <a:avLst/>
+            </a:prstGeom>
+            <a:solidFill>
+              <a:srgbClr val="1F497D"/>
+            </a:solidFill>
+            <a:ln>
+              <a:solidFill>
+                <a:srgbClr val="1F497D"/>
+              </a:solidFill>
+            </a:ln>
+            <a:effectLst/>
+          </p:spPr>
+          <p:style>
+            <a:lnRef idx="1">
+              <a:schemeClr val="accent3"/>
+            </a:lnRef>
+            <a:fillRef idx="2">
+              <a:schemeClr val="accent3"/>
+            </a:fillRef>
+            <a:effectRef idx="1">
+              <a:schemeClr val="accent3"/>
+            </a:effectRef>
+            <a:fontRef idx="minor">
+              <a:schemeClr val="dk1"/>
+            </a:fontRef>
+          </p:style>
+          <p:txBody>
+            <a:bodyPr rtlCol="0" anchor="ctr"/>
+            <a:lstStyle/>
+            <a:p>
+              <a:pPr algn="ctr"/>
+              <a:endParaRPr lang="en-SG" sz="1400">
+                <a:solidFill>
+                  <a:schemeClr val="dk1"/>
+                </a:solidFill>
+              </a:endParaRPr>
+            </a:p>
+          </p:txBody>
+        </p:sp>
+      </p:grpSp>
+      <p:sp>
+        <p:nvSpPr>
+          <p:cNvPr id="79" name="TextBox 78"/>
+          <p:cNvSpPr txBox="1"/>
+          <p:nvPr/>
+        </p:nvSpPr>
+        <p:spPr>
+          <a:xfrm>
+            <a:off x="6172200" y="990600"/>
+            <a:ext cx="1295400" cy="646331"/>
+          </a:xfrm>
+          <a:prstGeom prst="rect">
+            <a:avLst/>
+          </a:prstGeom>
+          <a:noFill/>
+        </p:spPr>
+        <p:txBody>
+          <a:bodyPr wrap="square" lIns="0" tIns="0" rIns="0" bIns="0" rtlCol="0">
+            <a:spAutoFit/>
+          </a:bodyPr>
+          <a:lstStyle/>
+          <a:p>
+            <a:r>
+              <a:rPr lang="en-US" sz="1400" dirty="0" smtClean="0">
+                <a:solidFill>
+                  <a:srgbClr val="7030A0"/>
+                </a:solidFill>
+              </a:rPr>
+              <a:t>Saves a copy of TaskManager before delete</a:t>
+            </a:r>
+            <a:endParaRPr lang="en-US" sz="1400" dirty="0">
+              <a:solidFill>
+                <a:srgbClr val="7030A0"/>
+              </a:solidFill>
+            </a:endParaRPr>
+          </a:p>
+        </p:txBody>
+      </p:sp>
     </p:spTree>
     <p:extLst>
       <p:ext uri="{BB962C8B-B14F-4D97-AF65-F5344CB8AC3E}">
@@ -7885,9 +7958,10 @@
           </a:bodyPr>
           <a:lstStyle/>
           <a:p>
+            <a:pPr algn="ctr"/>
             <a:r>
               <a:rPr lang="en-US" sz="1400" dirty="0" smtClean="0"/>
-              <a:t>add new task</a:t>
+              <a:t>undo</a:t>
             </a:r>
             <a:endParaRPr lang="en-US" sz="1400" dirty="0"/>
           </a:p>
@@ -7957,7 +8031,23 @@
                   <a:srgbClr val="0070C0"/>
                 </a:solidFill>
               </a:rPr>
-              <a:t>execute(“delete 1”)</a:t>
+              <a:t>execute(</a:t>
+            </a:r>
+            <a:r>
+              <a:rPr lang="en-US" sz="1400" dirty="0" smtClean="0">
+                <a:solidFill>
+                  <a:srgbClr val="0070C0"/>
+                </a:solidFill>
+              </a:rPr>
+              <a:t>“undo”</a:t>
+            </a:r>
+            <a:r>
+              <a:rPr lang="en-US" sz="1400" dirty="0" smtClean="0">
+                <a:solidFill>
+                  <a:srgbClr val="0070C0"/>
+                </a:solidFill>
+              </a:rPr>
+              <a:t>)</a:t>
             </a:r>
             <a:endParaRPr lang="en-US" sz="1400" dirty="0">
               <a:solidFill>
@@ -8011,7 +8101,7 @@
         </p:nvSpPr>
         <p:spPr>
           <a:xfrm>
-            <a:off x="4299772" y="1542583"/>
+            <a:off x="4137754" y="1542583"/>
             <a:ext cx="1424846" cy="215444"/>
           </a:xfrm>
           <a:prstGeom prst="rect">
@@ -8025,21 +8115,13 @@
           </a:bodyPr>
           <a:lstStyle/>
           <a:p>
-            <a:r>
-              <a:rPr lang="en-US" sz="1400" dirty="0" err="1" smtClean="0">
-                <a:solidFill>
-                  <a:srgbClr val="7030A0"/>
-                </a:solidFill>
-              </a:rPr>
-              <a:t>deleteTask</a:t>
-            </a:r>
             <a:r>
               <a:rPr lang="en-US" sz="1400" dirty="0" smtClean="0">
                 <a:solidFill>
                   <a:srgbClr val="7030A0"/>
                 </a:solidFill>
               </a:rPr>
-              <a:t>(p)</a:t>
+              <a:t>loadFromHistory()</a:t>
             </a:r>
             <a:endParaRPr lang="en-US" sz="1400" dirty="0">
               <a:solidFill>
@@ -8079,27 +8161,7 @@
                   </a:schemeClr>
                 </a:solidFill>
               </a:rPr>
-              <a:t>Post(</a:t>
-            </a:r>
-            <a:r>
-              <a:rPr lang="en-US" sz="1400" dirty="0" err="1" smtClean="0">
-                <a:solidFill>
-                  <a:schemeClr val="accent5">
-                    <a:lumMod val="75000"/>
-                  </a:schemeClr>
-                </a:solidFill>
-              </a:rPr>
-              <a:t>TaskManagerChangedEvent</a:t>
-            </a:r>
-            <a:r>
-              <a:rPr lang="en-US" sz="1400" dirty="0" smtClean="0">
-                <a:solidFill>
-                  <a:schemeClr val="accent5">
-                    <a:lumMod val="75000"/>
-                  </a:schemeClr>
-                </a:solidFill>
-              </a:rPr>
-              <a:t>)</a:t>
+              <a:t>Post(TaskManagerChangedEvent)</a:t>
             </a:r>
             <a:endParaRPr lang="en-US" sz="1400" dirty="0">
               <a:solidFill>
@@ -8278,15 +8340,7 @@
                   <a:schemeClr val="bg1"/>
                 </a:solidFill>
               </a:rPr>
-              <a:t>:</a:t>
-            </a:r>
-            <a:r>
-              <a:rPr lang="en-US" sz="1600" dirty="0" err="1" smtClean="0">
-                <a:solidFill>
-                  <a:schemeClr val="bg1"/>
-                </a:solidFill>
-              </a:rPr>
-              <a:t>EventsCenter</a:t>
+              <a:t>:EventsCenter</a:t>
             </a:r>
             <a:endParaRPr lang="en-SG" sz="1600" dirty="0">
               <a:solidFill>
@@ -8533,6 +8587,203 @@
           </a:prstGeom>
         </p:spPr>
       </p:pic>
+      <p:grpSp>
+        <p:nvGrpSpPr>
+          <p:cNvPr id="28" name="Group 27"/>
+          <p:cNvGrpSpPr/>
+          <p:nvPr/>
+        </p:nvGrpSpPr>
+        <p:grpSpPr>
+          <a:xfrm flipH="1">
+            <a:off x="5867400" y="1406328"/>
+            <a:ext cx="304802" cy="346272"/>
+            <a:chOff x="1028134" y="5612032"/>
+            <a:chExt cx="217349" cy="270072"/>
+          </a:xfrm>
+        </p:grpSpPr>
+        <p:sp>
+          <p:nvSpPr>
+            <p:cNvPr id="29" name="Freeform 28"/>
+            <p:cNvSpPr/>
+            <p:nvPr/>
+          </p:nvSpPr>
+          <p:spPr>
+            <a:xfrm rot="2600998" flipH="1" flipV="1">
+              <a:off x="1028134" y="5612032"/>
+              <a:ext cx="167452" cy="116880"/>
+            </a:xfrm>
+            <a:custGeom>
+              <a:avLst/>
+              <a:gdLst>
+                <a:gd name="connsiteX0" fmla="*/ 0 w 226400"/>
+                <a:gd name="connsiteY0" fmla="*/ 32920 h 171466"/>
+                <a:gd name="connsiteX1" fmla="*/ 157018 w 226400"/>
+                <a:gd name="connsiteY1" fmla="*/ 5211 h 171466"/>
+                <a:gd name="connsiteX2" fmla="*/ 221673 w 226400"/>
+                <a:gd name="connsiteY2" fmla="*/ 125284 h 171466"/>
+                <a:gd name="connsiteX3" fmla="*/ 36945 w 226400"/>
+                <a:gd name="connsiteY3" fmla="*/ 171466 h 171466"/>
+              </a:gdLst>
+              <a:ahLst/>
+              <a:cxnLst>
+                <a:cxn ang="0">
+                  <a:pos x="connsiteX0" y="connsiteY0"/>
+                </a:cxn>
+                <a:cxn ang="0">
+                  <a:pos x="connsiteX1" y="connsiteY1"/>
+                </a:cxn>
+                <a:cxn ang="0">
+                  <a:pos x="connsiteX2" y="connsiteY2"/>
+                </a:cxn>
+                <a:cxn ang="0">
+                  <a:pos x="connsiteX3" y="connsiteY3"/>
+                </a:cxn>
+              </a:cxnLst>
+              <a:rect l="l" t="t" r="r" b="b"/>
+              <a:pathLst>
+                <a:path w="226400" h="171466">
+                  <a:moveTo>
+                    <a:pt x="0" y="32920"/>
+                  </a:moveTo>
+                  <a:cubicBezTo>
+                    <a:pt x="60036" y="11368"/>
+                    <a:pt x="120073" y="-10183"/>
+                    <a:pt x="157018" y="5211"/>
+                  </a:cubicBezTo>
+                  <a:cubicBezTo>
+                    <a:pt x="193963" y="20605"/>
+                    <a:pt x="241685" y="97575"/>
+                    <a:pt x="221673" y="125284"/>
+                  </a:cubicBezTo>
+                  <a:cubicBezTo>
+                    <a:pt x="201661" y="152993"/>
+                    <a:pt x="119303" y="162229"/>
+                    <a:pt x="36945" y="171466"/>
+                  </a:cubicBezTo>
+                </a:path>
+              </a:pathLst>
+            </a:custGeom>
+            <a:ln w="19050">
+              <a:solidFill>
+                <a:srgbClr val="1F497D"/>
+              </a:solidFill>
+              <a:headEnd type="arrow" w="med" len="med"/>
+              <a:tailEnd type="none" w="med" len="med"/>
+            </a:ln>
+          </p:spPr>
+          <p:style>
+            <a:lnRef idx="1">
+              <a:schemeClr val="accent1"/>
+            </a:lnRef>
+            <a:fillRef idx="0">
+              <a:schemeClr val="accent1"/>
+            </a:fillRef>
+            <a:effectRef idx="0">
+              <a:schemeClr val="accent1"/>
+            </a:effectRef>
+            <a:fontRef idx="minor">
+              <a:schemeClr val="tx1"/>
+            </a:fontRef>
+          </p:style>
+          <p:txBody>
+            <a:bodyPr rtlCol="0" anchor="ctr"/>
+            <a:lstStyle/>
+            <a:p>
+              <a:pPr algn="ctr"/>
+              <a:endParaRPr lang="en-SG"/>
+            </a:p>
+          </p:txBody>
+        </p:sp>
+        <p:sp>
+          <p:nvSpPr>
+            <p:cNvPr id="30" name="Rectangle 29"/>
+            <p:cNvSpPr/>
+            <p:nvPr/>
+          </p:nvSpPr>
+          <p:spPr>
+            <a:xfrm>
+              <a:off x="1147403" y="5712513"/>
+              <a:ext cx="98080" cy="169591"/>
+            </a:xfrm>
+            <a:prstGeom prst="rect">
+              <a:avLst/>
+            </a:prstGeom>
+            <a:solidFill>
+              <a:srgbClr val="1F497D"/>
+            </a:solidFill>
+            <a:ln>
+              <a:solidFill>
+                <a:srgbClr val="1F497D"/>
+              </a:solidFill>
+            </a:ln>
+            <a:effectLst/>
+          </p:spPr>
+          <p:style>
+            <a:lnRef idx="1">
+              <a:schemeClr val="accent3"/>
+            </a:lnRef>
+            <a:fillRef idx="2">
+              <a:schemeClr val="accent3"/>
+            </a:fillRef>
+            <a:effectRef idx="1">
+              <a:schemeClr val="accent3"/>
+            </a:effectRef>
+            <a:fontRef idx="minor">
+              <a:schemeClr val="dk1"/>
+            </a:fontRef>
+          </p:style>
+          <p:txBody>
+            <a:bodyPr rtlCol="0" anchor="ctr"/>
+            <a:lstStyle/>
+            <a:p>
+              <a:pPr algn="ctr"/>
+              <a:endParaRPr lang="en-SG" sz="1400">
+                <a:solidFill>
+                  <a:schemeClr val="dk1"/>
+                </a:solidFill>
+              </a:endParaRPr>
+            </a:p>
+          </p:txBody>
+        </p:sp>
+      </p:grpSp>
+      <p:sp>
+        <p:nvSpPr>
+          <p:cNvPr id="31" name="TextBox 30"/>
+          <p:cNvSpPr txBox="1"/>
+          <p:nvPr/>
+        </p:nvSpPr>
+        <p:spPr>
+          <a:xfrm>
+            <a:off x="6172200" y="990600"/>
+            <a:ext cx="1295400" cy="430887"/>
+          </a:xfrm>
+          <a:prstGeom prst="rect">
+            <a:avLst/>
+          </a:prstGeom>
+          <a:noFill/>
+        </p:spPr>
+        <p:txBody>
+          <a:bodyPr wrap="square" lIns="0" tIns="0" rIns="0" bIns="0" rtlCol="0">
+            <a:spAutoFit/>
+          </a:bodyPr>
+          <a:lstStyle/>
+          <a:p>
+            <a:r>
+              <a:rPr lang="en-US" sz="1400" dirty="0" smtClean="0">
+                <a:solidFill>
+                  <a:srgbClr val="7030A0"/>
+                </a:solidFill>
+              </a:rPr>
+              <a:t>Loads a copy of TaskManager</a:t>
+            </a:r>
+            <a:endParaRPr lang="en-US" sz="1400" dirty="0">
+              <a:solidFill>
+                <a:srgbClr val="7030A0"/>
+              </a:solidFill>
+            </a:endParaRPr>
+          </a:p>
+        </p:txBody>
+      </p:sp>
     </p:spTree>
     <p:extLst>
       <p:ext uri="{BB962C8B-B14F-4D97-AF65-F5344CB8AC3E}">
@@ -13816,20 +14067,12 @@
           </a:lstStyle>
           <a:p>
             <a:r>
-              <a:rPr lang="en-US" dirty="0" err="1" smtClean="0">
-                <a:solidFill>
-                  <a:srgbClr val="7030A0"/>
-                </a:solidFill>
-              </a:rPr>
-              <a:t>deleteTask</a:t>
-            </a:r>
-            <a:r>
               <a:rPr lang="en-US" dirty="0" smtClean="0">
                 <a:solidFill>
                   <a:srgbClr val="7030A0"/>
                 </a:solidFill>
               </a:rPr>
-              <a:t>(p)</a:t>
+              <a:t>deleteTask(p)</a:t>
             </a:r>
             <a:endParaRPr lang="en-US" dirty="0">
               <a:solidFill>
@@ -14955,7 +15198,7 @@
           <a:p>
             <a:pPr algn="ctr"/>
             <a:r>
-              <a:rPr lang="en-US" sz="1050" dirty="0" err="1" smtClean="0">
+              <a:rPr lang="en-US" sz="1050" dirty="0" smtClean="0">
                 <a:solidFill>
                   <a:srgbClr val="7030A0"/>
                 </a:solidFill>
@@ -16576,7 +16819,7 @@
               </a:rPr>
             </a:br>
             <a:r>
-              <a:rPr lang="en-US" sz="1050" dirty="0" err="1" smtClean="0">
+              <a:rPr lang="en-US" sz="1050" dirty="0" smtClean="0">
                 <a:solidFill>
                   <a:schemeClr val="bg1"/>
                 </a:solidFill>
@@ -16639,7 +16882,7 @@
           <a:p>
             <a:pPr algn="ctr"/>
             <a:r>
-              <a:rPr lang="en-US" sz="1050" dirty="0" err="1" smtClean="0">
+              <a:rPr lang="en-US" sz="1050" dirty="0" smtClean="0">
                 <a:solidFill>
                   <a:schemeClr val="bg1"/>
                 </a:solidFill>
@@ -17147,7 +17390,7 @@
           <a:p>
             <a:pPr algn="ctr"/>
             <a:r>
-              <a:rPr lang="en-US" sz="1050" b="1" dirty="0" err="1" smtClean="0">
+              <a:rPr lang="en-US" sz="1050" b="1" dirty="0" smtClean="0">
                 <a:solidFill>
                   <a:schemeClr val="accent6">
                     <a:lumMod val="75000"/>
@@ -17155,16 +17398,6 @@
                 </a:solidFill>
               </a:rPr>
               <a:t>XmlTaskManager</a:t>
-            </a:r>
-            <a:r>
-              <a:rPr lang="en-US" sz="1050" b="1" dirty="0" smtClean="0">
-                <a:solidFill>
-                  <a:schemeClr val="accent6">
-                    <a:lumMod val="75000"/>
-                  </a:schemeClr>
-                </a:solidFill>
-              </a:rPr>
-              <a:t/>
             </a:r>
             <a:br>
               <a:rPr lang="en-US" sz="1050" b="1" dirty="0" smtClean="0">
@@ -17258,7 +17491,7 @@
               </a:rPr>
             </a:br>
             <a:r>
-              <a:rPr lang="en-US" sz="1050" dirty="0" err="1" smtClean="0">
+              <a:rPr lang="en-US" sz="1050" dirty="0" smtClean="0">
                 <a:solidFill>
                   <a:schemeClr val="bg1"/>
                 </a:solidFill>
@@ -17516,20 +17749,12 @@
           <a:p>
             <a:pPr algn="ctr"/>
             <a:r>
-              <a:rPr lang="en-US" sz="1050" dirty="0" err="1" smtClean="0">
+              <a:rPr lang="en-US" sz="1050" dirty="0" smtClean="0">
                 <a:solidFill>
                   <a:schemeClr val="bg1"/>
                 </a:solidFill>
               </a:rPr>
               <a:t>JsonUserPrefs</a:t>
-            </a:r>
-            <a:r>
-              <a:rPr lang="en-US" sz="1050" dirty="0" smtClean="0">
-                <a:solidFill>
-                  <a:schemeClr val="bg1"/>
-                </a:solidFill>
-              </a:rPr>
-              <a:t/>
             </a:r>
             <a:br>
               <a:rPr lang="en-US" sz="1050" dirty="0" smtClean="0">
@@ -17591,7 +17816,7 @@
           <a:p>
             <a:pPr algn="ctr"/>
             <a:r>
-              <a:rPr lang="en-US" sz="1050" b="1" dirty="0" err="1" smtClean="0">
+              <a:rPr lang="en-US" sz="1050" b="1" dirty="0" smtClean="0">
                 <a:solidFill>
                   <a:schemeClr val="accent6">
                     <a:lumMod val="75000"/>
@@ -17599,16 +17824,6 @@
                 </a:solidFill>
               </a:rPr>
               <a:t>XmlSerializable</a:t>
-            </a:r>
-            <a:r>
-              <a:rPr lang="en-US" sz="1050" b="1" dirty="0" smtClean="0">
-                <a:solidFill>
-                  <a:schemeClr val="accent6">
-                    <a:lumMod val="75000"/>
-                  </a:schemeClr>
-                </a:solidFill>
-              </a:rPr>
-              <a:t/>
             </a:r>
             <a:br>
               <a:rPr lang="en-US" sz="1050" b="1" dirty="0" smtClean="0">
@@ -17620,7 +17835,7 @@
               </a:rPr>
             </a:br>
             <a:r>
-              <a:rPr lang="en-US" sz="1050" b="1" dirty="0" err="1" smtClean="0">
+              <a:rPr lang="en-US" sz="1050" b="1" dirty="0" smtClean="0">
                 <a:solidFill>
                   <a:schemeClr val="accent6">
                     <a:lumMod val="75000"/>
@@ -17639,103 +17854,6 @@
           </a:p>
         </p:txBody>
       </p:sp>
-      <p:cxnSp>
-        <p:nvCxnSpPr>
-          <p:cNvPr id="70" name="Elbow Connector 122"/>
-          <p:cNvCxnSpPr>
-            <a:stCxn id="74" idx="0"/>
-            <a:endCxn id="73" idx="2"/>
-          </p:cNvCxnSpPr>
-          <p:nvPr/>
-        </p:nvCxnSpPr>
-        <p:spPr>
-          <a:xfrm rot="5400000" flipH="1" flipV="1">
-            <a:off x="8077993" y="2992020"/>
-            <a:ext cx="335208" cy="12700"/>
-          </a:xfrm>
-          <a:prstGeom prst="bentConnector3">
-            <a:avLst>
-              <a:gd name="adj1" fmla="val 50000"/>
-            </a:avLst>
-          </a:prstGeom>
-          <a:ln w="19050">
-            <a:prstDash val="sysDot"/>
-            <a:headEnd type="none" w="med" len="med"/>
-            <a:tailEnd type="arrow" w="med" len="med"/>
-          </a:ln>
-          <a:effectLst/>
-        </p:spPr>
-        <p:style>
-          <a:lnRef idx="1">
-            <a:schemeClr val="accent6"/>
-          </a:lnRef>
-          <a:fillRef idx="2">
-            <a:schemeClr val="accent6"/>
-          </a:fillRef>
-          <a:effectRef idx="1">
-            <a:schemeClr val="accent6"/>
-          </a:effectRef>
-          <a:fontRef idx="minor">
-            <a:schemeClr val="dk1"/>
-          </a:fontRef>
-        </p:style>
-      </p:cxnSp>
-      <p:sp>
-        <p:nvSpPr>
-          <p:cNvPr id="73" name="Rectangle 8"/>
-          <p:cNvSpPr/>
-          <p:nvPr/>
-        </p:nvSpPr>
-        <p:spPr>
-          <a:xfrm>
-            <a:off x="7615738" y="2477656"/>
-            <a:ext cx="1259718" cy="346760"/>
-          </a:xfrm>
-          <a:prstGeom prst="rect">
-            <a:avLst/>
-          </a:prstGeom>
-          <a:ln w="19050"/>
-          <a:effectLst/>
-        </p:spPr>
-        <p:style>
-          <a:lnRef idx="1">
-            <a:schemeClr val="accent6"/>
-          </a:lnRef>
-          <a:fillRef idx="2">
-            <a:schemeClr val="accent6"/>
-          </a:fillRef>
-          <a:effectRef idx="1">
-            <a:schemeClr val="accent6"/>
-          </a:effectRef>
-          <a:fontRef idx="minor">
-            <a:schemeClr val="dk1"/>
-          </a:fontRef>
-        </p:style>
-        <p:txBody>
-          <a:bodyPr rtlCol="0" anchor="ctr"/>
-          <a:lstStyle/>
-          <a:p>
-            <a:pPr algn="ctr"/>
-            <a:r>
-              <a:rPr lang="en-US" sz="1050" b="1" dirty="0" err="1" smtClean="0">
-                <a:solidFill>
-                  <a:schemeClr val="accent6">
-                    <a:lumMod val="75000"/>
-                  </a:schemeClr>
-                </a:solidFill>
-              </a:rPr>
-              <a:t>XmlAdaptedTag</a:t>
-            </a:r>
-            <a:endParaRPr lang="en-SG" sz="1050" b="1" dirty="0">
-              <a:solidFill>
-                <a:schemeClr val="accent6">
-                  <a:lumMod val="75000"/>
-                </a:schemeClr>
-              </a:solidFill>
-            </a:endParaRPr>
-          </a:p>
-        </p:txBody>
-      </p:sp>
       <p:sp>
         <p:nvSpPr>
           <p:cNvPr id="74" name="Rectangle 8"/>
@@ -17773,7 +17891,7 @@
           <a:p>
             <a:pPr algn="ctr"/>
             <a:r>
-              <a:rPr lang="en-US" sz="1050" b="1" dirty="0" err="1" smtClean="0">
+              <a:rPr lang="en-US" sz="1050" b="1" dirty="0" smtClean="0">
                 <a:solidFill>
                   <a:schemeClr val="accent6">
                     <a:lumMod val="75000"/>

</xml_diff>

<commit_message>
[Docs] Update Dev Guide
</commit_message>
<xml_diff>
--- a/docs/diagrams/Diagrams.pptx
+++ b/docs/diagrams/Diagrams.pptx
@@ -215,7 +215,7 @@
           <a:p>
             <a:fld id="{F5CC4B3F-88C1-4FFA-B1B6-F41C21DC6924}" type="datetimeFigureOut">
               <a:rPr lang="en-US" smtClean="0"/>
-              <a:t>10/19/16</a:t>
+              <a:t>11/5/16</a:t>
             </a:fld>
             <a:endParaRPr lang="en-US"/>
           </a:p>
@@ -664,7 +664,7 @@
           <a:p>
             <a:fld id="{78C97017-6FC3-485B-9764-EAC9E56C1D49}" type="datetimeFigureOut">
               <a:rPr lang="en-US" smtClean="0"/>
-              <a:t>10/19/16</a:t>
+              <a:t>11/5/16</a:t>
             </a:fld>
             <a:endParaRPr lang="en-US"/>
           </a:p>
@@ -834,7 +834,7 @@
           <a:p>
             <a:fld id="{78C97017-6FC3-485B-9764-EAC9E56C1D49}" type="datetimeFigureOut">
               <a:rPr lang="en-US" smtClean="0"/>
-              <a:t>10/19/16</a:t>
+              <a:t>11/5/16</a:t>
             </a:fld>
             <a:endParaRPr lang="en-US"/>
           </a:p>
@@ -1014,7 +1014,7 @@
           <a:p>
             <a:fld id="{78C97017-6FC3-485B-9764-EAC9E56C1D49}" type="datetimeFigureOut">
               <a:rPr lang="en-US" smtClean="0"/>
-              <a:t>10/19/16</a:t>
+              <a:t>11/5/16</a:t>
             </a:fld>
             <a:endParaRPr lang="en-US"/>
           </a:p>
@@ -1184,7 +1184,7 @@
           <a:p>
             <a:fld id="{78C97017-6FC3-485B-9764-EAC9E56C1D49}" type="datetimeFigureOut">
               <a:rPr lang="en-US" smtClean="0"/>
-              <a:t>10/19/16</a:t>
+              <a:t>11/5/16</a:t>
             </a:fld>
             <a:endParaRPr lang="en-US"/>
           </a:p>
@@ -1430,7 +1430,7 @@
           <a:p>
             <a:fld id="{78C97017-6FC3-485B-9764-EAC9E56C1D49}" type="datetimeFigureOut">
               <a:rPr lang="en-US" smtClean="0"/>
-              <a:t>10/19/16</a:t>
+              <a:t>11/5/16</a:t>
             </a:fld>
             <a:endParaRPr lang="en-US"/>
           </a:p>
@@ -1718,7 +1718,7 @@
           <a:p>
             <a:fld id="{78C97017-6FC3-485B-9764-EAC9E56C1D49}" type="datetimeFigureOut">
               <a:rPr lang="en-US" smtClean="0"/>
-              <a:t>10/19/16</a:t>
+              <a:t>11/5/16</a:t>
             </a:fld>
             <a:endParaRPr lang="en-US"/>
           </a:p>
@@ -2140,7 +2140,7 @@
           <a:p>
             <a:fld id="{78C97017-6FC3-485B-9764-EAC9E56C1D49}" type="datetimeFigureOut">
               <a:rPr lang="en-US" smtClean="0"/>
-              <a:t>10/19/16</a:t>
+              <a:t>11/5/16</a:t>
             </a:fld>
             <a:endParaRPr lang="en-US"/>
           </a:p>
@@ -2258,7 +2258,7 @@
           <a:p>
             <a:fld id="{78C97017-6FC3-485B-9764-EAC9E56C1D49}" type="datetimeFigureOut">
               <a:rPr lang="en-US" smtClean="0"/>
-              <a:t>10/19/16</a:t>
+              <a:t>11/5/16</a:t>
             </a:fld>
             <a:endParaRPr lang="en-US"/>
           </a:p>
@@ -2353,7 +2353,7 @@
           <a:p>
             <a:fld id="{78C97017-6FC3-485B-9764-EAC9E56C1D49}" type="datetimeFigureOut">
               <a:rPr lang="en-US" smtClean="0"/>
-              <a:t>10/19/16</a:t>
+              <a:t>11/5/16</a:t>
             </a:fld>
             <a:endParaRPr lang="en-US"/>
           </a:p>
@@ -2630,7 +2630,7 @@
           <a:p>
             <a:fld id="{78C97017-6FC3-485B-9764-EAC9E56C1D49}" type="datetimeFigureOut">
               <a:rPr lang="en-US" smtClean="0"/>
-              <a:t>10/19/16</a:t>
+              <a:t>11/5/16</a:t>
             </a:fld>
             <a:endParaRPr lang="en-US"/>
           </a:p>
@@ -2883,7 +2883,7 @@
           <a:p>
             <a:fld id="{78C97017-6FC3-485B-9764-EAC9E56C1D49}" type="datetimeFigureOut">
               <a:rPr lang="en-US" smtClean="0"/>
-              <a:t>10/19/16</a:t>
+              <a:t>11/5/16</a:t>
             </a:fld>
             <a:endParaRPr lang="en-US"/>
           </a:p>
@@ -3101,7 +3101,7 @@
           <a:p>
             <a:fld id="{78C97017-6FC3-485B-9764-EAC9E56C1D49}" type="datetimeFigureOut">
               <a:rPr lang="en-US" smtClean="0"/>
-              <a:t>10/19/16</a:t>
+              <a:t>11/5/16</a:t>
             </a:fld>
             <a:endParaRPr lang="en-US"/>
           </a:p>
@@ -11720,12 +11720,12 @@
         </p:nvCxnSpPr>
         <p:spPr>
           <a:xfrm rot="5400000" flipH="1" flipV="1">
-            <a:off x="1807196" y="3315772"/>
+            <a:off x="1795665" y="3314829"/>
             <a:ext cx="882304" cy="12700"/>
           </a:xfrm>
           <a:prstGeom prst="bentConnector3">
             <a:avLst>
-              <a:gd name="adj1" fmla="val 50000"/>
+              <a:gd name="adj1" fmla="val -1501"/>
             </a:avLst>
           </a:prstGeom>
           <a:ln w="19050">

</xml_diff>

<commit_message>
Change model and logic class diagrams
</commit_message>
<xml_diff>
--- a/docs/diagrams/Diagrams.pptx
+++ b/docs/diagrams/Diagrams.pptx
@@ -11145,7 +11145,7 @@
           <a:p>
             <a:pPr algn="ctr"/>
             <a:r>
-              <a:rPr lang="en-US" sz="1050" dirty="0" err="1">
+              <a:rPr lang="en-US" sz="1050" dirty="0">
                 <a:solidFill>
                   <a:schemeClr val="bg1"/>
                 </a:solidFill>
@@ -11201,7 +11201,7 @@
           <a:p>
             <a:pPr algn="ctr"/>
             <a:r>
-              <a:rPr lang="en-US" sz="1050" b="1" dirty="0" err="1">
+              <a:rPr lang="en-US" sz="1050" b="1" dirty="0">
                 <a:solidFill>
                   <a:srgbClr val="0070C0"/>
                 </a:solidFill>
@@ -11260,7 +11260,7 @@
           <a:p>
             <a:pPr algn="ctr"/>
             <a:r>
-              <a:rPr lang="en-US" sz="1050" dirty="0" err="1" smtClean="0">
+              <a:rPr lang="en-US" sz="1050" dirty="0" smtClean="0">
                 <a:solidFill>
                   <a:schemeClr val="bg1"/>
                 </a:solidFill>
@@ -11510,12 +11510,20 @@
           <a:p>
             <a:pPr algn="ctr"/>
             <a:r>
-              <a:rPr lang="en-US" sz="1050" b="1" dirty="0" err="1">
+              <a:rPr lang="en-US" sz="1050" b="1" dirty="0" smtClean="0">
                 <a:solidFill>
                   <a:srgbClr val="0070C0"/>
                 </a:solidFill>
               </a:rPr>
-              <a:t>ListCommand</a:t>
+              <a:t>Show</a:t>
+            </a:r>
+            <a:r>
+              <a:rPr lang="en-US" sz="1050" b="1" dirty="0" smtClean="0">
+                <a:solidFill>
+                  <a:srgbClr val="0070C0"/>
+                </a:solidFill>
+              </a:rPr>
+              <a:t>Command</a:t>
             </a:r>
             <a:endParaRPr lang="en-SG" sz="1050" b="1" dirty="0">
               <a:solidFill>
@@ -12939,15 +12947,7 @@
                   <a:schemeClr val="bg1"/>
                 </a:solidFill>
               </a:rPr>
-              <a:t>:</a:t>
-            </a:r>
-            <a:r>
-              <a:rPr lang="en-US" sz="1600" dirty="0" err="1">
-                <a:solidFill>
-                  <a:schemeClr val="bg1"/>
-                </a:solidFill>
-              </a:rPr>
-              <a:t>LogicManager</a:t>
+              <a:t>:LogicManager</a:t>
             </a:r>
             <a:endParaRPr lang="en-SG" sz="1600" dirty="0">
               <a:solidFill>
@@ -14289,7 +14289,7 @@
               </a:rPr>
             </a:br>
             <a:r>
-              <a:rPr lang="en-US" sz="1600" dirty="0" err="1" smtClean="0">
+              <a:rPr lang="en-US" sz="1600" dirty="0" smtClean="0">
                 <a:solidFill>
                   <a:schemeClr val="bg1"/>
                 </a:solidFill>
@@ -14504,8 +14504,8 @@
         </p:nvSpPr>
         <p:spPr>
           <a:xfrm>
-            <a:off x="838200" y="1676400"/>
-            <a:ext cx="7848600" cy="2997200"/>
+            <a:off x="838200" y="1600200"/>
+            <a:ext cx="8153400" cy="2997200"/>
           </a:xfrm>
           <a:prstGeom prst="roundRect">
             <a:avLst>
@@ -15741,62 +15741,6 @@
           </a:fontRef>
         </p:style>
       </p:cxnSp>
-      <p:sp>
-        <p:nvSpPr>
-          <p:cNvPr id="80" name="Rectangle 8"/>
-          <p:cNvSpPr/>
-          <p:nvPr/>
-        </p:nvSpPr>
-        <p:spPr>
-          <a:xfrm>
-            <a:off x="7712396" y="2895600"/>
-            <a:ext cx="822003" cy="277399"/>
-          </a:xfrm>
-          <a:prstGeom prst="rect">
-            <a:avLst/>
-          </a:prstGeom>
-          <a:ln w="19050">
-            <a:solidFill>
-              <a:srgbClr val="7030A0"/>
-            </a:solidFill>
-          </a:ln>
-          <a:effectLst/>
-        </p:spPr>
-        <p:style>
-          <a:lnRef idx="1">
-            <a:schemeClr val="accent4"/>
-          </a:lnRef>
-          <a:fillRef idx="2">
-            <a:schemeClr val="accent4"/>
-          </a:fillRef>
-          <a:effectRef idx="1">
-            <a:schemeClr val="accent4"/>
-          </a:effectRef>
-          <a:fontRef idx="minor">
-            <a:schemeClr val="dk1"/>
-          </a:fontRef>
-        </p:style>
-        <p:txBody>
-          <a:bodyPr rtlCol="0" anchor="ctr"/>
-          <a:lstStyle/>
-          <a:p>
-            <a:pPr algn="ctr"/>
-            <a:r>
-              <a:rPr lang="en-US" sz="1050" dirty="0" smtClean="0">
-                <a:solidFill>
-                  <a:srgbClr val="7030A0"/>
-                </a:solidFill>
-              </a:rPr>
-              <a:t>Time</a:t>
-            </a:r>
-            <a:endParaRPr lang="en-SG" sz="1050" dirty="0">
-              <a:solidFill>
-                <a:srgbClr val="7030A0"/>
-              </a:solidFill>
-            </a:endParaRPr>
-          </a:p>
-        </p:txBody>
-      </p:sp>
       <p:cxnSp>
         <p:nvCxnSpPr>
           <p:cNvPr id="81" name="Elbow Connector 80"/>
@@ -16354,6 +16298,193 @@
           </a:fontRef>
         </p:style>
       </p:cxnSp>
+      <p:sp>
+        <p:nvSpPr>
+          <p:cNvPr id="87" name="Rectangle 8"/>
+          <p:cNvSpPr/>
+          <p:nvPr/>
+        </p:nvSpPr>
+        <p:spPr>
+          <a:xfrm>
+            <a:off x="5791200" y="4267200"/>
+            <a:ext cx="1524000" cy="313754"/>
+          </a:xfrm>
+          <a:prstGeom prst="rect">
+            <a:avLst/>
+          </a:prstGeom>
+          <a:ln w="19050">
+            <a:solidFill>
+              <a:srgbClr val="7030A0"/>
+            </a:solidFill>
+          </a:ln>
+          <a:effectLst/>
+        </p:spPr>
+        <p:style>
+          <a:lnRef idx="1">
+            <a:schemeClr val="accent4"/>
+          </a:lnRef>
+          <a:fillRef idx="2">
+            <a:schemeClr val="accent4"/>
+          </a:fillRef>
+          <a:effectRef idx="1">
+            <a:schemeClr val="accent4"/>
+          </a:effectRef>
+          <a:fontRef idx="minor">
+            <a:schemeClr val="dk1"/>
+          </a:fontRef>
+        </p:style>
+        <p:txBody>
+          <a:bodyPr rtlCol="0" anchor="ctr"/>
+          <a:lstStyle/>
+          <a:p>
+            <a:pPr algn="ctr"/>
+            <a:r>
+              <a:rPr lang="en-US" sz="1050" dirty="0" smtClean="0">
+                <a:solidFill>
+                  <a:srgbClr val="7030A0"/>
+                </a:solidFill>
+              </a:rPr>
+              <a:t>DatePreParse</a:t>
+            </a:r>
+            <a:endParaRPr lang="en-SG" sz="1050" dirty="0">
+              <a:solidFill>
+                <a:srgbClr val="7030A0"/>
+              </a:solidFill>
+            </a:endParaRPr>
+          </a:p>
+        </p:txBody>
+      </p:sp>
+      <p:cxnSp>
+        <p:nvCxnSpPr>
+          <p:cNvPr id="60" name="Straight Arrow Connector 59"/>
+          <p:cNvCxnSpPr>
+            <a:endCxn id="87" idx="3"/>
+          </p:cNvCxnSpPr>
+          <p:nvPr/>
+        </p:nvCxnSpPr>
+        <p:spPr>
+          <a:xfrm flipH="1">
+            <a:off x="7315200" y="4419600"/>
+            <a:ext cx="1371600" cy="4477"/>
+          </a:xfrm>
+          <a:prstGeom prst="straightConnector1">
+            <a:avLst/>
+          </a:prstGeom>
+          <a:ln>
+            <a:solidFill>
+              <a:srgbClr val="8064A2"/>
+            </a:solidFill>
+            <a:tailEnd type="arrow"/>
+          </a:ln>
+        </p:spPr>
+        <p:style>
+          <a:lnRef idx="2">
+            <a:schemeClr val="accent1"/>
+          </a:lnRef>
+          <a:fillRef idx="0">
+            <a:schemeClr val="accent1"/>
+          </a:fillRef>
+          <a:effectRef idx="1">
+            <a:schemeClr val="accent1"/>
+          </a:effectRef>
+          <a:fontRef idx="minor">
+            <a:schemeClr val="tx1"/>
+          </a:fontRef>
+        </p:style>
+      </p:cxnSp>
+      <p:cxnSp>
+        <p:nvCxnSpPr>
+          <p:cNvPr id="73" name="Elbow Connector 72"/>
+          <p:cNvCxnSpPr/>
+          <p:nvPr/>
+        </p:nvCxnSpPr>
+        <p:spPr>
+          <a:xfrm rot="16200000" flipH="1">
+            <a:off x="7886700" y="3619500"/>
+            <a:ext cx="1295400" cy="304800"/>
+          </a:xfrm>
+          <a:prstGeom prst="bentConnector3">
+            <a:avLst>
+              <a:gd name="adj1" fmla="val 338"/>
+            </a:avLst>
+          </a:prstGeom>
+          <a:ln>
+            <a:solidFill>
+              <a:schemeClr val="accent4"/>
+            </a:solidFill>
+          </a:ln>
+        </p:spPr>
+        <p:style>
+          <a:lnRef idx="2">
+            <a:schemeClr val="accent1"/>
+          </a:lnRef>
+          <a:fillRef idx="0">
+            <a:schemeClr val="accent1"/>
+          </a:fillRef>
+          <a:effectRef idx="1">
+            <a:schemeClr val="accent1"/>
+          </a:effectRef>
+          <a:fontRef idx="minor">
+            <a:schemeClr val="tx1"/>
+          </a:fontRef>
+        </p:style>
+      </p:cxnSp>
+      <p:sp>
+        <p:nvSpPr>
+          <p:cNvPr id="80" name="Rectangle 8"/>
+          <p:cNvSpPr/>
+          <p:nvPr/>
+        </p:nvSpPr>
+        <p:spPr>
+          <a:xfrm>
+            <a:off x="7712396" y="2895600"/>
+            <a:ext cx="822003" cy="277399"/>
+          </a:xfrm>
+          <a:prstGeom prst="rect">
+            <a:avLst/>
+          </a:prstGeom>
+          <a:ln w="19050">
+            <a:solidFill>
+              <a:srgbClr val="7030A0"/>
+            </a:solidFill>
+          </a:ln>
+          <a:effectLst/>
+        </p:spPr>
+        <p:style>
+          <a:lnRef idx="1">
+            <a:schemeClr val="accent4"/>
+          </a:lnRef>
+          <a:fillRef idx="2">
+            <a:schemeClr val="accent4"/>
+          </a:fillRef>
+          <a:effectRef idx="1">
+            <a:schemeClr val="accent4"/>
+          </a:effectRef>
+          <a:fontRef idx="minor">
+            <a:schemeClr val="dk1"/>
+          </a:fontRef>
+        </p:style>
+        <p:txBody>
+          <a:bodyPr rtlCol="0" anchor="ctr"/>
+          <a:lstStyle/>
+          <a:p>
+            <a:pPr algn="ctr"/>
+            <a:r>
+              <a:rPr lang="en-US" sz="1050" dirty="0" smtClean="0">
+                <a:solidFill>
+                  <a:srgbClr val="7030A0"/>
+                </a:solidFill>
+              </a:rPr>
+              <a:t>Time</a:t>
+            </a:r>
+            <a:endParaRPr lang="en-SG" sz="1050" dirty="0">
+              <a:solidFill>
+                <a:srgbClr val="7030A0"/>
+              </a:solidFill>
+            </a:endParaRPr>
+          </a:p>
+        </p:txBody>
+      </p:sp>
     </p:spTree>
     <p:extLst>
       <p:ext uri="{BB962C8B-B14F-4D97-AF65-F5344CB8AC3E}">

</xml_diff>

<commit_message>
Fix random colors for tag list
</commit_message>
<xml_diff>
--- a/docs/diagrams/Diagrams.pptx
+++ b/docs/diagrams/Diagrams.pptx
@@ -217,7 +217,7 @@
           <a:p>
             <a:fld id="{F5CC4B3F-88C1-4FFA-B1B6-F41C21DC6924}" type="datetimeFigureOut">
               <a:rPr lang="en-US" smtClean="0"/>
-              <a:t>10/26/2016</a:t>
+              <a:t>11/5/2016</a:t>
             </a:fld>
             <a:endParaRPr lang="en-US"/>
           </a:p>
@@ -663,7 +663,7 @@
           <a:p>
             <a:fld id="{78C97017-6FC3-485B-9764-EAC9E56C1D49}" type="datetimeFigureOut">
               <a:rPr lang="en-US" smtClean="0"/>
-              <a:t>10/26/2016</a:t>
+              <a:t>11/5/2016</a:t>
             </a:fld>
             <a:endParaRPr lang="en-US"/>
           </a:p>
@@ -831,7 +831,7 @@
           <a:p>
             <a:fld id="{78C97017-6FC3-485B-9764-EAC9E56C1D49}" type="datetimeFigureOut">
               <a:rPr lang="en-US" smtClean="0"/>
-              <a:t>10/26/2016</a:t>
+              <a:t>11/5/2016</a:t>
             </a:fld>
             <a:endParaRPr lang="en-US"/>
           </a:p>
@@ -1009,7 +1009,7 @@
           <a:p>
             <a:fld id="{78C97017-6FC3-485B-9764-EAC9E56C1D49}" type="datetimeFigureOut">
               <a:rPr lang="en-US" smtClean="0"/>
-              <a:t>10/26/2016</a:t>
+              <a:t>11/5/2016</a:t>
             </a:fld>
             <a:endParaRPr lang="en-US"/>
           </a:p>
@@ -1177,7 +1177,7 @@
           <a:p>
             <a:fld id="{78C97017-6FC3-485B-9764-EAC9E56C1D49}" type="datetimeFigureOut">
               <a:rPr lang="en-US" smtClean="0"/>
-              <a:t>10/26/2016</a:t>
+              <a:t>11/5/2016</a:t>
             </a:fld>
             <a:endParaRPr lang="en-US"/>
           </a:p>
@@ -1422,7 +1422,7 @@
           <a:p>
             <a:fld id="{78C97017-6FC3-485B-9764-EAC9E56C1D49}" type="datetimeFigureOut">
               <a:rPr lang="en-US" smtClean="0"/>
-              <a:t>10/26/2016</a:t>
+              <a:t>11/5/2016</a:t>
             </a:fld>
             <a:endParaRPr lang="en-US"/>
           </a:p>
@@ -1707,7 +1707,7 @@
           <a:p>
             <a:fld id="{78C97017-6FC3-485B-9764-EAC9E56C1D49}" type="datetimeFigureOut">
               <a:rPr lang="en-US" smtClean="0"/>
-              <a:t>10/26/2016</a:t>
+              <a:t>11/5/2016</a:t>
             </a:fld>
             <a:endParaRPr lang="en-US"/>
           </a:p>
@@ -2126,7 +2126,7 @@
           <a:p>
             <a:fld id="{78C97017-6FC3-485B-9764-EAC9E56C1D49}" type="datetimeFigureOut">
               <a:rPr lang="en-US" smtClean="0"/>
-              <a:t>10/26/2016</a:t>
+              <a:t>11/5/2016</a:t>
             </a:fld>
             <a:endParaRPr lang="en-US"/>
           </a:p>
@@ -2243,7 +2243,7 @@
           <a:p>
             <a:fld id="{78C97017-6FC3-485B-9764-EAC9E56C1D49}" type="datetimeFigureOut">
               <a:rPr lang="en-US" smtClean="0"/>
-              <a:t>10/26/2016</a:t>
+              <a:t>11/5/2016</a:t>
             </a:fld>
             <a:endParaRPr lang="en-US"/>
           </a:p>
@@ -2338,7 +2338,7 @@
           <a:p>
             <a:fld id="{78C97017-6FC3-485B-9764-EAC9E56C1D49}" type="datetimeFigureOut">
               <a:rPr lang="en-US" smtClean="0"/>
-              <a:t>10/26/2016</a:t>
+              <a:t>11/5/2016</a:t>
             </a:fld>
             <a:endParaRPr lang="en-US"/>
           </a:p>
@@ -2613,7 +2613,7 @@
           <a:p>
             <a:fld id="{78C97017-6FC3-485B-9764-EAC9E56C1D49}" type="datetimeFigureOut">
               <a:rPr lang="en-US" smtClean="0"/>
-              <a:t>10/26/2016</a:t>
+              <a:t>11/5/2016</a:t>
             </a:fld>
             <a:endParaRPr lang="en-US"/>
           </a:p>
@@ -2865,7 +2865,7 @@
           <a:p>
             <a:fld id="{78C97017-6FC3-485B-9764-EAC9E56C1D49}" type="datetimeFigureOut">
               <a:rPr lang="en-US" smtClean="0"/>
-              <a:t>10/26/2016</a:t>
+              <a:t>11/5/2016</a:t>
             </a:fld>
             <a:endParaRPr lang="en-US"/>
           </a:p>
@@ -3076,7 +3076,7 @@
           <a:p>
             <a:fld id="{78C97017-6FC3-485B-9764-EAC9E56C1D49}" type="datetimeFigureOut">
               <a:rPr lang="en-US" smtClean="0"/>
-              <a:t>10/26/2016</a:t>
+              <a:t>11/5/2016</a:t>
             </a:fld>
             <a:endParaRPr lang="en-US"/>
           </a:p>
@@ -14404,7 +14404,7 @@
         </p:nvSpPr>
         <p:spPr>
           <a:xfrm>
-            <a:off x="1119865" y="1727200"/>
+            <a:off x="1119865" y="1659840"/>
             <a:ext cx="7490735" cy="2997200"/>
           </a:xfrm>
           <a:prstGeom prst="roundRect">
@@ -16620,7 +16620,7 @@
         </p:nvSpPr>
         <p:spPr>
           <a:xfrm>
-            <a:off x="7434200" y="3656220"/>
+            <a:off x="7420759" y="3456812"/>
             <a:ext cx="253596" cy="253916"/>
           </a:xfrm>
           <a:prstGeom prst="rect">
@@ -16724,6 +16724,381 @@
             <a:r>
               <a:rPr lang="en-SG" sz="1050" dirty="0"/>
               <a:t>1..*</a:t>
+            </a:r>
+          </a:p>
+        </p:txBody>
+      </p:sp>
+      <p:sp>
+        <p:nvSpPr>
+          <p:cNvPr id="60" name="Rectangle 8"/>
+          <p:cNvSpPr/>
+          <p:nvPr/>
+        </p:nvSpPr>
+        <p:spPr>
+          <a:xfrm>
+            <a:off x="7712397" y="3843002"/>
+            <a:ext cx="708186" cy="285783"/>
+          </a:xfrm>
+          <a:prstGeom prst="rect">
+            <a:avLst/>
+          </a:prstGeom>
+          <a:ln w="19050">
+            <a:solidFill>
+              <a:srgbClr val="7030A0"/>
+            </a:solidFill>
+          </a:ln>
+          <a:effectLst/>
+        </p:spPr>
+        <p:style>
+          <a:lnRef idx="1">
+            <a:schemeClr val="accent4"/>
+          </a:lnRef>
+          <a:fillRef idx="2">
+            <a:schemeClr val="accent4"/>
+          </a:fillRef>
+          <a:effectRef idx="1">
+            <a:schemeClr val="accent4"/>
+          </a:effectRef>
+          <a:fontRef idx="minor">
+            <a:schemeClr val="dk1"/>
+          </a:fontRef>
+        </p:style>
+        <p:txBody>
+          <a:bodyPr rtlCol="0" anchor="ctr"/>
+          <a:lstStyle/>
+          <a:p>
+            <a:pPr algn="ctr"/>
+            <a:r>
+              <a:rPr lang="en-US" sz="1050" dirty="0">
+                <a:solidFill>
+                  <a:srgbClr val="7030A0"/>
+                </a:solidFill>
+              </a:rPr>
+              <a:t>Priority</a:t>
+            </a:r>
+            <a:endParaRPr lang="en-SG" sz="1050" dirty="0">
+              <a:solidFill>
+                <a:srgbClr val="7030A0"/>
+              </a:solidFill>
+            </a:endParaRPr>
+          </a:p>
+        </p:txBody>
+      </p:sp>
+      <p:sp>
+        <p:nvSpPr>
+          <p:cNvPr id="70" name="Rectangle 8"/>
+          <p:cNvSpPr/>
+          <p:nvPr/>
+        </p:nvSpPr>
+        <p:spPr>
+          <a:xfrm>
+            <a:off x="7722634" y="4158846"/>
+            <a:ext cx="697949" cy="285783"/>
+          </a:xfrm>
+          <a:prstGeom prst="rect">
+            <a:avLst/>
+          </a:prstGeom>
+          <a:ln w="19050">
+            <a:solidFill>
+              <a:srgbClr val="7030A0"/>
+            </a:solidFill>
+          </a:ln>
+          <a:effectLst/>
+        </p:spPr>
+        <p:style>
+          <a:lnRef idx="1">
+            <a:schemeClr val="accent4"/>
+          </a:lnRef>
+          <a:fillRef idx="2">
+            <a:schemeClr val="accent4"/>
+          </a:fillRef>
+          <a:effectRef idx="1">
+            <a:schemeClr val="accent4"/>
+          </a:effectRef>
+          <a:fontRef idx="minor">
+            <a:schemeClr val="dk1"/>
+          </a:fontRef>
+        </p:style>
+        <p:txBody>
+          <a:bodyPr rtlCol="0" anchor="ctr"/>
+          <a:lstStyle/>
+          <a:p>
+            <a:pPr algn="ctr"/>
+            <a:r>
+              <a:rPr lang="en-US" sz="800" dirty="0">
+                <a:solidFill>
+                  <a:srgbClr val="7030A0"/>
+                </a:solidFill>
+              </a:rPr>
+              <a:t>Recurrence</a:t>
+            </a:r>
+            <a:endParaRPr lang="en-SG" sz="800" dirty="0">
+              <a:solidFill>
+                <a:srgbClr val="7030A0"/>
+              </a:solidFill>
+            </a:endParaRPr>
+          </a:p>
+        </p:txBody>
+      </p:sp>
+      <p:cxnSp>
+        <p:nvCxnSpPr>
+          <p:cNvPr id="73" name="Elbow Connector 85"/>
+          <p:cNvCxnSpPr>
+            <a:endCxn id="60" idx="1"/>
+          </p:cNvCxnSpPr>
+          <p:nvPr/>
+        </p:nvCxnSpPr>
+        <p:spPr>
+          <a:xfrm rot="16200000" flipH="1">
+            <a:off x="7433516" y="3707013"/>
+            <a:ext cx="340560" cy="217201"/>
+          </a:xfrm>
+          <a:prstGeom prst="bentConnector2">
+            <a:avLst/>
+          </a:prstGeom>
+          <a:ln w="19050">
+            <a:solidFill>
+              <a:srgbClr val="7030A0"/>
+            </a:solidFill>
+            <a:headEnd type="none" w="med" len="med"/>
+            <a:tailEnd type="arrow" w="med" len="med"/>
+          </a:ln>
+          <a:effectLst/>
+        </p:spPr>
+        <p:style>
+          <a:lnRef idx="1">
+            <a:schemeClr val="accent2"/>
+          </a:lnRef>
+          <a:fillRef idx="2">
+            <a:schemeClr val="accent2"/>
+          </a:fillRef>
+          <a:effectRef idx="1">
+            <a:schemeClr val="accent2"/>
+          </a:effectRef>
+          <a:fontRef idx="minor">
+            <a:schemeClr val="dk1"/>
+          </a:fontRef>
+        </p:style>
+      </p:cxnSp>
+      <p:cxnSp>
+        <p:nvCxnSpPr>
+          <p:cNvPr id="74" name="Elbow Connector 85"/>
+          <p:cNvCxnSpPr>
+            <a:endCxn id="70" idx="1"/>
+          </p:cNvCxnSpPr>
+          <p:nvPr/>
+        </p:nvCxnSpPr>
+        <p:spPr>
+          <a:xfrm rot="16200000" flipH="1">
+            <a:off x="7419547" y="3998651"/>
+            <a:ext cx="386362" cy="219811"/>
+          </a:xfrm>
+          <a:prstGeom prst="bentConnector2">
+            <a:avLst/>
+          </a:prstGeom>
+          <a:ln w="19050">
+            <a:solidFill>
+              <a:srgbClr val="7030A0"/>
+            </a:solidFill>
+            <a:headEnd type="none" w="med" len="med"/>
+            <a:tailEnd type="arrow" w="med" len="med"/>
+          </a:ln>
+          <a:effectLst/>
+        </p:spPr>
+        <p:style>
+          <a:lnRef idx="1">
+            <a:schemeClr val="accent2"/>
+          </a:lnRef>
+          <a:fillRef idx="2">
+            <a:schemeClr val="accent2"/>
+          </a:fillRef>
+          <a:effectRef idx="1">
+            <a:schemeClr val="accent2"/>
+          </a:effectRef>
+          <a:fontRef idx="minor">
+            <a:schemeClr val="dk1"/>
+          </a:fontRef>
+        </p:style>
+      </p:cxnSp>
+      <p:sp>
+        <p:nvSpPr>
+          <p:cNvPr id="77" name="TextBox 76"/>
+          <p:cNvSpPr txBox="1"/>
+          <p:nvPr/>
+        </p:nvSpPr>
+        <p:spPr>
+          <a:xfrm>
+            <a:off x="7436766" y="4067820"/>
+            <a:ext cx="221582" cy="253916"/>
+          </a:xfrm>
+          <a:prstGeom prst="rect">
+            <a:avLst/>
+          </a:prstGeom>
+          <a:noFill/>
+        </p:spPr>
+        <p:txBody>
+          <a:bodyPr wrap="square" rtlCol="0">
+            <a:spAutoFit/>
+          </a:bodyPr>
+          <a:lstStyle/>
+          <a:p>
+            <a:r>
+              <a:rPr lang="en-SG" sz="1050" dirty="0"/>
+              <a:t>1</a:t>
+            </a:r>
+          </a:p>
+        </p:txBody>
+      </p:sp>
+      <p:sp>
+        <p:nvSpPr>
+          <p:cNvPr id="82" name="TextBox 81"/>
+          <p:cNvSpPr txBox="1"/>
+          <p:nvPr/>
+        </p:nvSpPr>
+        <p:spPr>
+          <a:xfrm>
+            <a:off x="7442668" y="3762316"/>
+            <a:ext cx="237748" cy="253916"/>
+          </a:xfrm>
+          <a:prstGeom prst="rect">
+            <a:avLst/>
+          </a:prstGeom>
+          <a:noFill/>
+        </p:spPr>
+        <p:txBody>
+          <a:bodyPr wrap="square" rtlCol="0">
+            <a:spAutoFit/>
+          </a:bodyPr>
+          <a:lstStyle/>
+          <a:p>
+            <a:r>
+              <a:rPr lang="en-SG" sz="1050" dirty="0"/>
+              <a:t>1</a:t>
+            </a:r>
+          </a:p>
+        </p:txBody>
+      </p:sp>
+      <p:sp>
+        <p:nvSpPr>
+          <p:cNvPr id="87" name="Rectangle 8"/>
+          <p:cNvSpPr/>
+          <p:nvPr/>
+        </p:nvSpPr>
+        <p:spPr>
+          <a:xfrm>
+            <a:off x="7700494" y="2199648"/>
+            <a:ext cx="697949" cy="285783"/>
+          </a:xfrm>
+          <a:prstGeom prst="rect">
+            <a:avLst/>
+          </a:prstGeom>
+          <a:ln w="19050">
+            <a:solidFill>
+              <a:srgbClr val="7030A0"/>
+            </a:solidFill>
+          </a:ln>
+          <a:effectLst/>
+        </p:spPr>
+        <p:style>
+          <a:lnRef idx="1">
+            <a:schemeClr val="accent4"/>
+          </a:lnRef>
+          <a:fillRef idx="2">
+            <a:schemeClr val="accent4"/>
+          </a:fillRef>
+          <a:effectRef idx="1">
+            <a:schemeClr val="accent4"/>
+          </a:effectRef>
+          <a:fontRef idx="minor">
+            <a:schemeClr val="dk1"/>
+          </a:fontRef>
+        </p:style>
+        <p:txBody>
+          <a:bodyPr rtlCol="0" anchor="ctr"/>
+          <a:lstStyle/>
+          <a:p>
+            <a:pPr algn="ctr"/>
+            <a:r>
+              <a:rPr lang="en-US" sz="800" dirty="0">
+                <a:solidFill>
+                  <a:srgbClr val="7030A0"/>
+                </a:solidFill>
+              </a:rPr>
+              <a:t>Completion</a:t>
+            </a:r>
+            <a:endParaRPr lang="en-SG" sz="800" dirty="0">
+              <a:solidFill>
+                <a:srgbClr val="7030A0"/>
+              </a:solidFill>
+            </a:endParaRPr>
+          </a:p>
+        </p:txBody>
+      </p:sp>
+      <p:cxnSp>
+        <p:nvCxnSpPr>
+          <p:cNvPr id="89" name="Elbow Connector 78"/>
+          <p:cNvCxnSpPr>
+            <a:endCxn id="87" idx="1"/>
+          </p:cNvCxnSpPr>
+          <p:nvPr/>
+        </p:nvCxnSpPr>
+        <p:spPr>
+          <a:xfrm rot="5400000" flipH="1" flipV="1">
+            <a:off x="7253606" y="2585887"/>
+            <a:ext cx="690234" cy="203541"/>
+          </a:xfrm>
+          <a:prstGeom prst="bentConnector2">
+            <a:avLst/>
+          </a:prstGeom>
+          <a:ln w="19050">
+            <a:solidFill>
+              <a:srgbClr val="7030A0"/>
+            </a:solidFill>
+            <a:headEnd type="none" w="med" len="med"/>
+            <a:tailEnd type="arrow" w="med" len="med"/>
+          </a:ln>
+          <a:effectLst/>
+        </p:spPr>
+        <p:style>
+          <a:lnRef idx="1">
+            <a:schemeClr val="accent2"/>
+          </a:lnRef>
+          <a:fillRef idx="2">
+            <a:schemeClr val="accent2"/>
+          </a:fillRef>
+          <a:effectRef idx="1">
+            <a:schemeClr val="accent2"/>
+          </a:effectRef>
+          <a:fontRef idx="minor">
+            <a:schemeClr val="dk1"/>
+          </a:fontRef>
+        </p:style>
+      </p:cxnSp>
+      <p:sp>
+        <p:nvSpPr>
+          <p:cNvPr id="90" name="TextBox 89"/>
+          <p:cNvSpPr txBox="1"/>
+          <p:nvPr/>
+        </p:nvSpPr>
+        <p:spPr>
+          <a:xfrm>
+            <a:off x="7458801" y="2108975"/>
+            <a:ext cx="253596" cy="253916"/>
+          </a:xfrm>
+          <a:prstGeom prst="rect">
+            <a:avLst/>
+          </a:prstGeom>
+          <a:noFill/>
+        </p:spPr>
+        <p:txBody>
+          <a:bodyPr wrap="none" rtlCol="0">
+            <a:spAutoFit/>
+          </a:bodyPr>
+          <a:lstStyle/>
+          <a:p>
+            <a:r>
+              <a:rPr lang="en-SG" sz="1050" dirty="0"/>
+              <a:t>1</a:t>
             </a:r>
           </a:p>
         </p:txBody>

</xml_diff>

<commit_message>
[Docs] Edit Diagrams for DevGuide
</commit_message>
<xml_diff>
--- a/docs/diagrams/Diagrams.pptx
+++ b/docs/diagrams/Diagrams.pptx
@@ -11798,8 +11798,8 @@
         </p:nvSpPr>
         <p:spPr>
           <a:xfrm>
-            <a:off x="685800" y="1981200"/>
-            <a:ext cx="7086600" cy="4000286"/>
+            <a:off x="76199" y="1186487"/>
+            <a:ext cx="10431557" cy="5139109"/>
           </a:xfrm>
           <a:prstGeom prst="roundRect">
             <a:avLst>
@@ -11859,7 +11859,7 @@
         </p:nvSpPr>
         <p:spPr>
           <a:xfrm>
-            <a:off x="1007063" y="2296546"/>
+            <a:off x="381000" y="2296546"/>
             <a:ext cx="1455629" cy="346760"/>
           </a:xfrm>
           <a:prstGeom prst="rect">
@@ -11926,7 +11926,7 @@
         </p:nvCxnSpPr>
         <p:spPr>
           <a:xfrm>
-            <a:off x="1734877" y="2660217"/>
+            <a:off x="1108814" y="2660217"/>
             <a:ext cx="0" cy="2597583"/>
           </a:xfrm>
           <a:prstGeom prst="line">
@@ -11963,7 +11963,7 @@
         </p:nvSpPr>
         <p:spPr>
           <a:xfrm>
-            <a:off x="1662869" y="3010911"/>
+            <a:off x="1036806" y="3010911"/>
             <a:ext cx="152400" cy="2780287"/>
           </a:xfrm>
           <a:prstGeom prst="rect">
@@ -12010,8 +12010,8 @@
         </p:nvSpPr>
         <p:spPr>
           <a:xfrm>
-            <a:off x="3411783" y="2300233"/>
-            <a:ext cx="1093635" cy="346760"/>
+            <a:off x="4271392" y="2303103"/>
+            <a:ext cx="1465017" cy="346760"/>
           </a:xfrm>
           <a:prstGeom prst="rect">
             <a:avLst/>
@@ -12046,12 +12046,20 @@
           <a:p>
             <a:pPr algn="ctr"/>
             <a:r>
-              <a:rPr lang="en-US" sz="1600" dirty="0" smtClean="0">
+              <a:rPr lang="en-US" sz="1600" smtClean="0">
                 <a:solidFill>
                   <a:schemeClr val="bg1"/>
                 </a:solidFill>
               </a:rPr>
-              <a:t>:Parser</a:t>
+              <a:t>:</a:t>
+            </a:r>
+            <a:r>
+              <a:rPr lang="en-US" sz="1600" dirty="0" err="1" smtClean="0">
+                <a:solidFill>
+                  <a:schemeClr val="bg1"/>
+                </a:solidFill>
+              </a:rPr>
+              <a:t>ParserSelector</a:t>
             </a:r>
             <a:endParaRPr lang="en-SG" sz="1600" dirty="0">
               <a:solidFill>
@@ -12069,7 +12077,7 @@
         </p:nvCxnSpPr>
         <p:spPr>
           <a:xfrm>
-            <a:off x="3958600" y="2663904"/>
+            <a:off x="5075909" y="2663904"/>
             <a:ext cx="0" cy="1587652"/>
           </a:xfrm>
           <a:prstGeom prst="line">
@@ -12106,8 +12114,8 @@
         </p:nvSpPr>
         <p:spPr>
           <a:xfrm>
-            <a:off x="3886592" y="3122097"/>
-            <a:ext cx="144016" cy="832525"/>
+            <a:off x="5023927" y="3123741"/>
+            <a:ext cx="144016" cy="751307"/>
           </a:xfrm>
           <a:prstGeom prst="rect">
             <a:avLst/>
@@ -12157,7 +12165,7 @@
         </p:nvSpPr>
         <p:spPr>
           <a:xfrm>
-            <a:off x="4953000" y="2996259"/>
+            <a:off x="7570419" y="3093609"/>
             <a:ext cx="1093635" cy="461538"/>
           </a:xfrm>
           <a:prstGeom prst="rect">
@@ -12193,7 +12201,7 @@
           <a:p>
             <a:pPr algn="ctr"/>
             <a:r>
-              <a:rPr lang="en-US" sz="1600" dirty="0" smtClean="0">
+              <a:rPr lang="en-US" sz="1600" dirty="0" err="1" smtClean="0">
                 <a:solidFill>
                   <a:schemeClr val="bg1"/>
                 </a:solidFill>
@@ -12206,17 +12214,10 @@
                   <a:schemeClr val="bg1"/>
                 </a:solidFill>
               </a:rPr>
-              <a:t/>
-            </a:r>
-            <a:br>
-              <a:rPr lang="en-US" sz="1600" dirty="0">
-                <a:solidFill>
-                  <a:schemeClr val="bg1"/>
-                </a:solidFill>
-              </a:rPr>
-            </a:br>
-            <a:r>
-              <a:rPr lang="en-US" sz="1600" dirty="0">
+              <a:t> </a:t>
+            </a:r>
+            <a:r>
+              <a:rPr lang="en-US" sz="1600" dirty="0" smtClean="0">
                 <a:solidFill>
                   <a:schemeClr val="bg1"/>
                 </a:solidFill>
@@ -12239,8 +12240,8 @@
         </p:nvCxnSpPr>
         <p:spPr>
           <a:xfrm>
-            <a:off x="5499817" y="3417319"/>
-            <a:ext cx="0" cy="2450081"/>
+            <a:off x="8127709" y="3831150"/>
+            <a:ext cx="0" cy="1752600"/>
           </a:xfrm>
           <a:prstGeom prst="line">
             <a:avLst/>
@@ -12276,8 +12277,8 @@
         </p:nvSpPr>
         <p:spPr>
           <a:xfrm>
-            <a:off x="5427809" y="3457797"/>
-            <a:ext cx="152400" cy="276003"/>
+            <a:off x="8045228" y="3555147"/>
+            <a:ext cx="152400" cy="212675"/>
           </a:xfrm>
           <a:prstGeom prst="rect">
             <a:avLst/>
@@ -12323,7 +12324,7 @@
         </p:nvCxnSpPr>
         <p:spPr>
           <a:xfrm>
-            <a:off x="543018" y="3014599"/>
+            <a:off x="-142782" y="3014599"/>
             <a:ext cx="1119851" cy="0"/>
           </a:xfrm>
           <a:prstGeom prst="straightConnector1">
@@ -12359,8 +12360,8 @@
         </p:nvCxnSpPr>
         <p:spPr>
           <a:xfrm>
-            <a:off x="1815269" y="3122098"/>
-            <a:ext cx="2071323" cy="0"/>
+            <a:off x="1189206" y="3122098"/>
+            <a:ext cx="1850065" cy="0"/>
           </a:xfrm>
           <a:prstGeom prst="straightConnector1">
             <a:avLst/>
@@ -12395,7 +12396,7 @@
         </p:nvSpPr>
         <p:spPr>
           <a:xfrm>
-            <a:off x="76200" y="2819400"/>
+            <a:off x="-609600" y="2819400"/>
             <a:ext cx="1424846" cy="184666"/>
           </a:xfrm>
           <a:prstGeom prst="rect">
@@ -12435,9 +12436,9 @@
           <p:nvPr/>
         </p:nvCxnSpPr>
         <p:spPr>
-          <a:xfrm flipV="1">
-            <a:off x="4030608" y="3227028"/>
-            <a:ext cx="922392" cy="1"/>
+          <a:xfrm>
+            <a:off x="6818049" y="3324378"/>
+            <a:ext cx="752370" cy="0"/>
           </a:xfrm>
           <a:prstGeom prst="straightConnector1">
             <a:avLst/>
@@ -12472,7 +12473,7 @@
         </p:nvSpPr>
         <p:spPr>
           <a:xfrm>
-            <a:off x="4343400" y="4311134"/>
+            <a:off x="5801649" y="4299879"/>
             <a:ext cx="855809" cy="184666"/>
           </a:xfrm>
           <a:prstGeom prst="rect">
@@ -12512,8 +12513,8 @@
         </p:nvCxnSpPr>
         <p:spPr>
           <a:xfrm>
-            <a:off x="4030608" y="3733800"/>
-            <a:ext cx="1406215" cy="0"/>
+            <a:off x="6818049" y="3773077"/>
+            <a:ext cx="1236193" cy="0"/>
           </a:xfrm>
           <a:prstGeom prst="straightConnector1">
             <a:avLst/>
@@ -12550,8 +12551,8 @@
         </p:nvCxnSpPr>
         <p:spPr>
           <a:xfrm>
-            <a:off x="1815269" y="3954622"/>
-            <a:ext cx="2058118" cy="0"/>
+            <a:off x="1189206" y="3879715"/>
+            <a:ext cx="1970050" cy="0"/>
           </a:xfrm>
           <a:prstGeom prst="straightConnector1">
             <a:avLst/>
@@ -12588,7 +12589,7 @@
         </p:nvCxnSpPr>
         <p:spPr>
           <a:xfrm>
-            <a:off x="466818" y="5791200"/>
+            <a:off x="-218982" y="5791200"/>
             <a:ext cx="1196051" cy="0"/>
           </a:xfrm>
           <a:prstGeom prst="straightConnector1">
@@ -12626,7 +12627,7 @@
         </p:nvSpPr>
         <p:spPr>
           <a:xfrm>
-            <a:off x="7938756" y="2317144"/>
+            <a:off x="10588147" y="2317144"/>
             <a:ext cx="1030504" cy="346760"/>
           </a:xfrm>
           <a:prstGeom prst="rect">
@@ -12691,8 +12692,8 @@
         </p:nvCxnSpPr>
         <p:spPr>
           <a:xfrm>
-            <a:off x="1815269" y="4495317"/>
-            <a:ext cx="3612540" cy="0"/>
+            <a:off x="1189206" y="4495317"/>
+            <a:ext cx="6865036" cy="0"/>
           </a:xfrm>
           <a:prstGeom prst="straightConnector1">
             <a:avLst/>
@@ -12727,7 +12728,7 @@
         </p:nvSpPr>
         <p:spPr>
           <a:xfrm>
-            <a:off x="5427809" y="4495317"/>
+            <a:off x="8077200" y="4495317"/>
             <a:ext cx="152400" cy="1191256"/>
           </a:xfrm>
           <a:prstGeom prst="rect">
@@ -12774,7 +12775,7 @@
         </p:nvCxnSpPr>
         <p:spPr>
           <a:xfrm>
-            <a:off x="8454008" y="2655802"/>
+            <a:off x="11103399" y="2655802"/>
             <a:ext cx="0" cy="2830598"/>
           </a:xfrm>
           <a:prstGeom prst="line">
@@ -12814,7 +12815,7 @@
         </p:nvSpPr>
         <p:spPr>
           <a:xfrm>
-            <a:off x="8382000" y="4524597"/>
+            <a:off x="11031391" y="4524597"/>
             <a:ext cx="152400" cy="276003"/>
           </a:xfrm>
           <a:prstGeom prst="rect">
@@ -12871,8 +12872,8 @@
         </p:nvCxnSpPr>
         <p:spPr>
           <a:xfrm>
-            <a:off x="5580209" y="4542759"/>
-            <a:ext cx="2787374" cy="0"/>
+            <a:off x="8229600" y="4542759"/>
+            <a:ext cx="2801791" cy="0"/>
           </a:xfrm>
           <a:prstGeom prst="straightConnector1">
             <a:avLst/>
@@ -12907,7 +12908,7 @@
         </p:nvCxnSpPr>
         <p:spPr>
           <a:xfrm>
-            <a:off x="5580209" y="4800600"/>
+            <a:off x="8229600" y="4800600"/>
             <a:ext cx="2873799" cy="0"/>
           </a:xfrm>
           <a:prstGeom prst="straightConnector1">
@@ -12948,8 +12949,8 @@
         </p:nvCxnSpPr>
         <p:spPr>
           <a:xfrm>
-            <a:off x="1815269" y="5661173"/>
-            <a:ext cx="3651369" cy="0"/>
+            <a:off x="1189206" y="5661173"/>
+            <a:ext cx="6856022" cy="0"/>
           </a:xfrm>
           <a:prstGeom prst="straightConnector1">
             <a:avLst/>
@@ -12986,7 +12987,7 @@
         </p:nvSpPr>
         <p:spPr>
           <a:xfrm>
-            <a:off x="6786723" y="4311134"/>
+            <a:off x="9436114" y="4311134"/>
             <a:ext cx="1424846" cy="184666"/>
           </a:xfrm>
           <a:prstGeom prst="rect">
@@ -13043,7 +13044,7 @@
         </p:nvSpPr>
         <p:spPr>
           <a:xfrm>
-            <a:off x="4114800" y="3015734"/>
+            <a:off x="6732219" y="3113084"/>
             <a:ext cx="640023" cy="184666"/>
           </a:xfrm>
           <a:prstGeom prst="rect">
@@ -13084,7 +13085,7 @@
         </p:nvSpPr>
         <p:spPr>
           <a:xfrm>
-            <a:off x="2107569" y="2910441"/>
+            <a:off x="1277429" y="2911733"/>
             <a:ext cx="1424846" cy="184666"/>
           </a:xfrm>
           <a:prstGeom prst="rect">
@@ -13125,7 +13126,7 @@
         </p:nvSpPr>
         <p:spPr>
           <a:xfrm>
-            <a:off x="3101175" y="5454134"/>
+            <a:off x="3842746" y="5480845"/>
             <a:ext cx="621216" cy="184666"/>
           </a:xfrm>
           <a:prstGeom prst="rect">
@@ -13166,7 +13167,7 @@
         </p:nvSpPr>
         <p:spPr>
           <a:xfrm>
-            <a:off x="678782" y="5585914"/>
+            <a:off x="-7018" y="5585914"/>
             <a:ext cx="762000" cy="184666"/>
           </a:xfrm>
           <a:prstGeom prst="rect">
@@ -13207,7 +13208,7 @@
         </p:nvSpPr>
         <p:spPr>
           <a:xfrm>
-            <a:off x="6029646" y="4953000"/>
+            <a:off x="8656697" y="4953000"/>
             <a:ext cx="1666554" cy="461538"/>
           </a:xfrm>
           <a:prstGeom prst="rect">
@@ -13281,7 +13282,7 @@
         </p:nvSpPr>
         <p:spPr>
           <a:xfrm>
-            <a:off x="6786723" y="5414538"/>
+            <a:off x="9372600" y="5414538"/>
             <a:ext cx="152400" cy="171376"/>
           </a:xfrm>
           <a:prstGeom prst="rect">
@@ -13328,7 +13329,7 @@
         </p:nvCxnSpPr>
         <p:spPr>
           <a:xfrm>
-            <a:off x="5580209" y="5165675"/>
+            <a:off x="8229600" y="5165675"/>
             <a:ext cx="447975" cy="0"/>
           </a:xfrm>
           <a:prstGeom prst="straightConnector1">
@@ -13364,7 +13365,7 @@
         </p:nvCxnSpPr>
         <p:spPr>
           <a:xfrm>
-            <a:off x="5580209" y="5585914"/>
+            <a:off x="8229600" y="5585914"/>
             <a:ext cx="1253815" cy="0"/>
           </a:xfrm>
           <a:prstGeom prst="straightConnector1">
@@ -13402,7 +13403,649 @@
         </p:nvSpPr>
         <p:spPr>
           <a:xfrm>
-            <a:off x="2818928" y="3733800"/>
+            <a:off x="2547262" y="3657600"/>
+            <a:ext cx="220343" cy="215444"/>
+          </a:xfrm>
+          <a:prstGeom prst="rect">
+            <a:avLst/>
+          </a:prstGeom>
+          <a:noFill/>
+        </p:spPr>
+        <p:txBody>
+          <a:bodyPr wrap="square" lIns="0" tIns="0" rIns="0" bIns="0" rtlCol="0">
+            <a:spAutoFit/>
+          </a:bodyPr>
+          <a:lstStyle>
+            <a:defPPr>
+              <a:defRPr lang="en-US"/>
+            </a:defPPr>
+            <a:lvl1pPr algn="r">
+              <a:defRPr sz="1400">
+                <a:solidFill>
+                  <a:srgbClr val="0070C0"/>
+                </a:solidFill>
+              </a:defRPr>
+            </a:lvl1pPr>
+          </a:lstStyle>
+          <a:p>
+            <a:r>
+              <a:rPr lang="en-US" dirty="0" smtClean="0"/>
+              <a:t>d</a:t>
+            </a:r>
+            <a:endParaRPr lang="en-US" dirty="0"/>
+          </a:p>
+        </p:txBody>
+      </p:sp>
+      <p:sp>
+        <p:nvSpPr>
+          <p:cNvPr id="38" name="Rectangle 62"/>
+          <p:cNvSpPr/>
+          <p:nvPr/>
+        </p:nvSpPr>
+        <p:spPr>
+          <a:xfrm>
+            <a:off x="5913588" y="2160088"/>
+            <a:ext cx="1688559" cy="490177"/>
+          </a:xfrm>
+          <a:prstGeom prst="rect">
+            <a:avLst/>
+          </a:prstGeom>
+          <a:solidFill>
+            <a:srgbClr val="0070C0"/>
+          </a:solidFill>
+          <a:ln w="19050">
+            <a:solidFill>
+              <a:srgbClr val="0070C0"/>
+            </a:solidFill>
+          </a:ln>
+          <a:effectLst/>
+        </p:spPr>
+        <p:style>
+          <a:lnRef idx="1">
+            <a:schemeClr val="accent2"/>
+          </a:lnRef>
+          <a:fillRef idx="2">
+            <a:schemeClr val="accent2"/>
+          </a:fillRef>
+          <a:effectRef idx="1">
+            <a:schemeClr val="accent2"/>
+          </a:effectRef>
+          <a:fontRef idx="minor">
+            <a:schemeClr val="dk1"/>
+          </a:fontRef>
+        </p:style>
+        <p:txBody>
+          <a:bodyPr rtlCol="0" anchor="ctr"/>
+          <a:lstStyle/>
+          <a:p>
+            <a:pPr algn="ctr"/>
+            <a:r>
+              <a:rPr lang="en-US" sz="1600" dirty="0" smtClean="0">
+                <a:solidFill>
+                  <a:schemeClr val="bg1"/>
+                </a:solidFill>
+              </a:rPr>
+              <a:t>:</a:t>
+            </a:r>
+            <a:r>
+              <a:rPr lang="en-US" sz="1600" dirty="0" err="1" smtClean="0">
+                <a:solidFill>
+                  <a:schemeClr val="bg1"/>
+                </a:solidFill>
+              </a:rPr>
+              <a:t>DeleteCommand</a:t>
+            </a:r>
+            <a:r>
+              <a:rPr lang="en-US" sz="1600" dirty="0" smtClean="0">
+                <a:solidFill>
+                  <a:schemeClr val="bg1"/>
+                </a:solidFill>
+              </a:rPr>
+              <a:t> Parser</a:t>
+            </a:r>
+            <a:endParaRPr lang="en-SG" sz="1600" dirty="0">
+              <a:solidFill>
+                <a:schemeClr val="bg1"/>
+              </a:solidFill>
+            </a:endParaRPr>
+          </a:p>
+        </p:txBody>
+      </p:sp>
+      <p:sp>
+        <p:nvSpPr>
+          <p:cNvPr id="40" name="Rectangle 39"/>
+          <p:cNvSpPr/>
+          <p:nvPr/>
+        </p:nvSpPr>
+        <p:spPr>
+          <a:xfrm>
+            <a:off x="6705600" y="3203315"/>
+            <a:ext cx="132027" cy="646001"/>
+          </a:xfrm>
+          <a:prstGeom prst="rect">
+            <a:avLst/>
+          </a:prstGeom>
+          <a:solidFill>
+            <a:srgbClr val="0070C0"/>
+          </a:solidFill>
+          <a:ln>
+            <a:solidFill>
+              <a:srgbClr val="0070C0"/>
+            </a:solidFill>
+          </a:ln>
+          <a:effectLst/>
+        </p:spPr>
+        <p:style>
+          <a:lnRef idx="1">
+            <a:schemeClr val="accent3"/>
+          </a:lnRef>
+          <a:fillRef idx="2">
+            <a:schemeClr val="accent3"/>
+          </a:fillRef>
+          <a:effectRef idx="1">
+            <a:schemeClr val="accent3"/>
+          </a:effectRef>
+          <a:fontRef idx="minor">
+            <a:schemeClr val="dk1"/>
+          </a:fontRef>
+        </p:style>
+        <p:txBody>
+          <a:bodyPr rtlCol="0" anchor="ctr"/>
+          <a:lstStyle/>
+          <a:p>
+            <a:pPr algn="ctr"/>
+            <a:endParaRPr lang="en-SG" sz="1400">
+              <a:solidFill>
+                <a:schemeClr val="dk1"/>
+              </a:solidFill>
+            </a:endParaRPr>
+          </a:p>
+        </p:txBody>
+      </p:sp>
+      <p:cxnSp>
+        <p:nvCxnSpPr>
+          <p:cNvPr id="41" name="Straight Arrow Connector 40"/>
+          <p:cNvCxnSpPr/>
+          <p:nvPr/>
+        </p:nvCxnSpPr>
+        <p:spPr>
+          <a:xfrm>
+            <a:off x="5147917" y="3203315"/>
+            <a:ext cx="1538105" cy="0"/>
+          </a:xfrm>
+          <a:prstGeom prst="straightConnector1">
+            <a:avLst/>
+          </a:prstGeom>
+          <a:ln w="19050">
+            <a:solidFill>
+              <a:srgbClr val="0070C0"/>
+            </a:solidFill>
+            <a:tailEnd type="arrow"/>
+          </a:ln>
+        </p:spPr>
+        <p:style>
+          <a:lnRef idx="1">
+            <a:schemeClr val="accent1"/>
+          </a:lnRef>
+          <a:fillRef idx="0">
+            <a:schemeClr val="accent1"/>
+          </a:fillRef>
+          <a:effectRef idx="0">
+            <a:schemeClr val="accent1"/>
+          </a:effectRef>
+          <a:fontRef idx="minor">
+            <a:schemeClr val="tx1"/>
+          </a:fontRef>
+        </p:style>
+      </p:cxnSp>
+      <p:cxnSp>
+        <p:nvCxnSpPr>
+          <p:cNvPr id="47" name="Straight Arrow Connector 46"/>
+          <p:cNvCxnSpPr/>
+          <p:nvPr/>
+        </p:nvCxnSpPr>
+        <p:spPr>
+          <a:xfrm>
+            <a:off x="5147917" y="3831150"/>
+            <a:ext cx="1538105" cy="0"/>
+          </a:xfrm>
+          <a:prstGeom prst="straightConnector1">
+            <a:avLst/>
+          </a:prstGeom>
+          <a:ln w="19050">
+            <a:solidFill>
+              <a:srgbClr val="0070C0"/>
+            </a:solidFill>
+            <a:prstDash val="sysDash"/>
+            <a:headEnd type="arrow" w="med" len="med"/>
+            <a:tailEnd type="none" w="med" len="med"/>
+          </a:ln>
+        </p:spPr>
+        <p:style>
+          <a:lnRef idx="1">
+            <a:schemeClr val="accent1"/>
+          </a:lnRef>
+          <a:fillRef idx="0">
+            <a:schemeClr val="accent1"/>
+          </a:fillRef>
+          <a:effectRef idx="0">
+            <a:schemeClr val="accent1"/>
+          </a:effectRef>
+          <a:fontRef idx="minor">
+            <a:schemeClr val="tx1"/>
+          </a:fontRef>
+        </p:style>
+      </p:cxnSp>
+      <p:cxnSp>
+        <p:nvCxnSpPr>
+          <p:cNvPr id="49" name="Straight Connector 48"/>
+          <p:cNvCxnSpPr/>
+          <p:nvPr/>
+        </p:nvCxnSpPr>
+        <p:spPr>
+          <a:xfrm>
+            <a:off x="6756109" y="2667000"/>
+            <a:ext cx="0" cy="1587652"/>
+          </a:xfrm>
+          <a:prstGeom prst="line">
+            <a:avLst/>
+          </a:prstGeom>
+          <a:ln w="19050">
+            <a:solidFill>
+              <a:srgbClr val="0070C0"/>
+            </a:solidFill>
+            <a:prstDash val="sysDash"/>
+          </a:ln>
+          <a:effectLst/>
+        </p:spPr>
+        <p:style>
+          <a:lnRef idx="1">
+            <a:schemeClr val="accent1"/>
+          </a:lnRef>
+          <a:fillRef idx="2">
+            <a:schemeClr val="accent1"/>
+          </a:fillRef>
+          <a:effectRef idx="1">
+            <a:schemeClr val="accent1"/>
+          </a:effectRef>
+          <a:fontRef idx="minor">
+            <a:schemeClr val="dk1"/>
+          </a:fontRef>
+        </p:style>
+      </p:cxnSp>
+      <p:sp>
+        <p:nvSpPr>
+          <p:cNvPr id="56" name="Rectangle 62"/>
+          <p:cNvSpPr/>
+          <p:nvPr/>
+        </p:nvSpPr>
+        <p:spPr>
+          <a:xfrm>
+            <a:off x="2130197" y="2198921"/>
+            <a:ext cx="1981021" cy="461296"/>
+          </a:xfrm>
+          <a:prstGeom prst="rect">
+            <a:avLst/>
+          </a:prstGeom>
+          <a:solidFill>
+            <a:srgbClr val="0070C0"/>
+          </a:solidFill>
+          <a:ln w="19050">
+            <a:solidFill>
+              <a:srgbClr val="0070C0"/>
+            </a:solidFill>
+          </a:ln>
+          <a:effectLst/>
+        </p:spPr>
+        <p:style>
+          <a:lnRef idx="1">
+            <a:schemeClr val="accent2"/>
+          </a:lnRef>
+          <a:fillRef idx="2">
+            <a:schemeClr val="accent2"/>
+          </a:fillRef>
+          <a:effectRef idx="1">
+            <a:schemeClr val="accent2"/>
+          </a:effectRef>
+          <a:fontRef idx="minor">
+            <a:schemeClr val="dk1"/>
+          </a:fontRef>
+        </p:style>
+        <p:txBody>
+          <a:bodyPr rtlCol="0" anchor="ctr"/>
+          <a:lstStyle/>
+          <a:p>
+            <a:pPr algn="ctr"/>
+            <a:r>
+              <a:rPr lang="en-US" sz="1600" dirty="0" smtClean="0">
+                <a:solidFill>
+                  <a:schemeClr val="bg1"/>
+                </a:solidFill>
+              </a:rPr>
+              <a:t>:</a:t>
+            </a:r>
+            <a:r>
+              <a:rPr lang="en-US" sz="1600" dirty="0" err="1" smtClean="0">
+                <a:solidFill>
+                  <a:schemeClr val="bg1"/>
+                </a:solidFill>
+              </a:rPr>
+              <a:t>TaskCommand</a:t>
+            </a:r>
+            <a:r>
+              <a:rPr lang="en-US" sz="1600" dirty="0" smtClean="0">
+                <a:solidFill>
+                  <a:schemeClr val="bg1"/>
+                </a:solidFill>
+              </a:rPr>
+              <a:t> Parser</a:t>
+            </a:r>
+            <a:endParaRPr lang="en-SG" sz="1600" dirty="0">
+              <a:solidFill>
+                <a:schemeClr val="bg1"/>
+              </a:solidFill>
+            </a:endParaRPr>
+          </a:p>
+        </p:txBody>
+      </p:sp>
+      <p:cxnSp>
+        <p:nvCxnSpPr>
+          <p:cNvPr id="57" name="Straight Connector 56"/>
+          <p:cNvCxnSpPr/>
+          <p:nvPr/>
+        </p:nvCxnSpPr>
+        <p:spPr>
+          <a:xfrm>
+            <a:off x="3142570" y="2571600"/>
+            <a:ext cx="0" cy="1587652"/>
+          </a:xfrm>
+          <a:prstGeom prst="line">
+            <a:avLst/>
+          </a:prstGeom>
+          <a:ln w="19050">
+            <a:solidFill>
+              <a:srgbClr val="0070C0"/>
+            </a:solidFill>
+            <a:prstDash val="sysDash"/>
+          </a:ln>
+          <a:effectLst/>
+        </p:spPr>
+        <p:style>
+          <a:lnRef idx="1">
+            <a:schemeClr val="accent1"/>
+          </a:lnRef>
+          <a:fillRef idx="2">
+            <a:schemeClr val="accent1"/>
+          </a:fillRef>
+          <a:effectRef idx="1">
+            <a:schemeClr val="accent1"/>
+          </a:effectRef>
+          <a:fontRef idx="minor">
+            <a:schemeClr val="dk1"/>
+          </a:fontRef>
+        </p:style>
+      </p:cxnSp>
+      <p:sp>
+        <p:nvSpPr>
+          <p:cNvPr id="58" name="Rectangle 57"/>
+          <p:cNvSpPr/>
+          <p:nvPr/>
+        </p:nvSpPr>
+        <p:spPr>
+          <a:xfrm>
+            <a:off x="3056384" y="3047190"/>
+            <a:ext cx="144016" cy="832525"/>
+          </a:xfrm>
+          <a:prstGeom prst="rect">
+            <a:avLst/>
+          </a:prstGeom>
+          <a:solidFill>
+            <a:srgbClr val="0070C0"/>
+          </a:solidFill>
+          <a:ln>
+            <a:solidFill>
+              <a:srgbClr val="0070C0"/>
+            </a:solidFill>
+          </a:ln>
+          <a:effectLst/>
+        </p:spPr>
+        <p:style>
+          <a:lnRef idx="1">
+            <a:schemeClr val="accent3"/>
+          </a:lnRef>
+          <a:fillRef idx="2">
+            <a:schemeClr val="accent3"/>
+          </a:fillRef>
+          <a:effectRef idx="1">
+            <a:schemeClr val="accent3"/>
+          </a:effectRef>
+          <a:fontRef idx="minor">
+            <a:schemeClr val="dk1"/>
+          </a:fontRef>
+        </p:style>
+        <p:txBody>
+          <a:bodyPr rtlCol="0" anchor="ctr"/>
+          <a:lstStyle/>
+          <a:p>
+            <a:pPr algn="ctr"/>
+            <a:endParaRPr lang="en-SG" sz="1400">
+              <a:solidFill>
+                <a:schemeClr val="dk1"/>
+              </a:solidFill>
+            </a:endParaRPr>
+          </a:p>
+        </p:txBody>
+      </p:sp>
+      <p:cxnSp>
+        <p:nvCxnSpPr>
+          <p:cNvPr id="63" name="Straight Arrow Connector 62"/>
+          <p:cNvCxnSpPr/>
+          <p:nvPr/>
+        </p:nvCxnSpPr>
+        <p:spPr>
+          <a:xfrm>
+            <a:off x="3200400" y="3113084"/>
+            <a:ext cx="1850065" cy="0"/>
+          </a:xfrm>
+          <a:prstGeom prst="straightConnector1">
+            <a:avLst/>
+          </a:prstGeom>
+          <a:ln w="19050">
+            <a:solidFill>
+              <a:srgbClr val="0070C0"/>
+            </a:solidFill>
+            <a:tailEnd type="arrow"/>
+          </a:ln>
+        </p:spPr>
+        <p:style>
+          <a:lnRef idx="1">
+            <a:schemeClr val="accent1"/>
+          </a:lnRef>
+          <a:fillRef idx="0">
+            <a:schemeClr val="accent1"/>
+          </a:fillRef>
+          <a:effectRef idx="0">
+            <a:schemeClr val="accent1"/>
+          </a:effectRef>
+          <a:fontRef idx="minor">
+            <a:schemeClr val="tx1"/>
+          </a:fontRef>
+        </p:style>
+      </p:cxnSp>
+      <p:cxnSp>
+        <p:nvCxnSpPr>
+          <p:cNvPr id="66" name="Straight Arrow Connector 65"/>
+          <p:cNvCxnSpPr/>
+          <p:nvPr/>
+        </p:nvCxnSpPr>
+        <p:spPr>
+          <a:xfrm>
+            <a:off x="3200400" y="3875048"/>
+            <a:ext cx="1823527" cy="0"/>
+          </a:xfrm>
+          <a:prstGeom prst="straightConnector1">
+            <a:avLst/>
+          </a:prstGeom>
+          <a:ln w="19050">
+            <a:solidFill>
+              <a:srgbClr val="0070C0"/>
+            </a:solidFill>
+            <a:prstDash val="sysDash"/>
+            <a:headEnd type="arrow" w="med" len="med"/>
+            <a:tailEnd type="none" w="med" len="med"/>
+          </a:ln>
+        </p:spPr>
+        <p:style>
+          <a:lnRef idx="1">
+            <a:schemeClr val="accent1"/>
+          </a:lnRef>
+          <a:fillRef idx="0">
+            <a:schemeClr val="accent1"/>
+          </a:fillRef>
+          <a:effectRef idx="0">
+            <a:schemeClr val="accent1"/>
+          </a:effectRef>
+          <a:fontRef idx="minor">
+            <a:schemeClr val="tx1"/>
+          </a:fontRef>
+        </p:style>
+      </p:cxnSp>
+      <p:sp>
+        <p:nvSpPr>
+          <p:cNvPr id="72" name="TextBox 71"/>
+          <p:cNvSpPr txBox="1"/>
+          <p:nvPr/>
+        </p:nvSpPr>
+        <p:spPr>
+          <a:xfrm>
+            <a:off x="3399464" y="2928418"/>
+            <a:ext cx="1294337" cy="184666"/>
+          </a:xfrm>
+          <a:prstGeom prst="rect">
+            <a:avLst/>
+          </a:prstGeom>
+          <a:noFill/>
+        </p:spPr>
+        <p:txBody>
+          <a:bodyPr wrap="square" lIns="0" tIns="0" rIns="0" bIns="0" rtlCol="0">
+            <a:spAutoFit/>
+          </a:bodyPr>
+          <a:lstStyle>
+            <a:defPPr>
+              <a:defRPr lang="en-US"/>
+            </a:defPPr>
+            <a:lvl1pPr algn="r">
+              <a:defRPr sz="1400">
+                <a:solidFill>
+                  <a:srgbClr val="0070C0"/>
+                </a:solidFill>
+              </a:defRPr>
+            </a:lvl1pPr>
+          </a:lstStyle>
+          <a:p>
+            <a:r>
+              <a:rPr lang="en-US" sz="1200" smtClean="0"/>
+              <a:t>getParser</a:t>
+            </a:r>
+            <a:r>
+              <a:rPr lang="en-US" sz="1200" dirty="0" smtClean="0"/>
+              <a:t>(“delete”)</a:t>
+            </a:r>
+            <a:endParaRPr lang="en-US" sz="1200" dirty="0"/>
+          </a:p>
+        </p:txBody>
+      </p:sp>
+      <p:sp>
+        <p:nvSpPr>
+          <p:cNvPr id="74" name="TextBox 73"/>
+          <p:cNvSpPr txBox="1"/>
+          <p:nvPr/>
+        </p:nvSpPr>
+        <p:spPr>
+          <a:xfrm>
+            <a:off x="4967016" y="2985928"/>
+            <a:ext cx="1221253" cy="184666"/>
+          </a:xfrm>
+          <a:prstGeom prst="rect">
+            <a:avLst/>
+          </a:prstGeom>
+          <a:noFill/>
+        </p:spPr>
+        <p:txBody>
+          <a:bodyPr wrap="square" lIns="0" tIns="0" rIns="0" bIns="0" rtlCol="0">
+            <a:spAutoFit/>
+          </a:bodyPr>
+          <a:lstStyle>
+            <a:defPPr>
+              <a:defRPr lang="en-US"/>
+            </a:defPPr>
+            <a:lvl1pPr algn="r">
+              <a:defRPr sz="1400">
+                <a:solidFill>
+                  <a:srgbClr val="0070C0"/>
+                </a:solidFill>
+              </a:defRPr>
+            </a:lvl1pPr>
+          </a:lstStyle>
+          <a:p>
+            <a:r>
+              <a:rPr lang="en-US" sz="1200" smtClean="0"/>
+              <a:t>parse(“1”)</a:t>
+            </a:r>
+            <a:endParaRPr lang="en-US" sz="1200" dirty="0"/>
+          </a:p>
+        </p:txBody>
+      </p:sp>
+      <p:sp>
+        <p:nvSpPr>
+          <p:cNvPr id="85" name="TextBox 84"/>
+          <p:cNvSpPr txBox="1"/>
+          <p:nvPr/>
+        </p:nvSpPr>
+        <p:spPr>
+          <a:xfrm>
+            <a:off x="4205490" y="3620963"/>
+            <a:ext cx="220343" cy="215444"/>
+          </a:xfrm>
+          <a:prstGeom prst="rect">
+            <a:avLst/>
+          </a:prstGeom>
+          <a:noFill/>
+        </p:spPr>
+        <p:txBody>
+          <a:bodyPr wrap="square" lIns="0" tIns="0" rIns="0" bIns="0" rtlCol="0">
+            <a:spAutoFit/>
+          </a:bodyPr>
+          <a:lstStyle>
+            <a:defPPr>
+              <a:defRPr lang="en-US"/>
+            </a:defPPr>
+            <a:lvl1pPr algn="r">
+              <a:defRPr sz="1400">
+                <a:solidFill>
+                  <a:srgbClr val="0070C0"/>
+                </a:solidFill>
+              </a:defRPr>
+            </a:lvl1pPr>
+          </a:lstStyle>
+          <a:p>
+            <a:r>
+              <a:rPr lang="en-US" dirty="0" smtClean="0"/>
+              <a:t>d</a:t>
+            </a:r>
+            <a:endParaRPr lang="en-US" dirty="0"/>
+          </a:p>
+        </p:txBody>
+      </p:sp>
+      <p:sp>
+        <p:nvSpPr>
+          <p:cNvPr id="88" name="TextBox 87"/>
+          <p:cNvSpPr txBox="1"/>
+          <p:nvPr/>
+        </p:nvSpPr>
+        <p:spPr>
+          <a:xfrm>
+            <a:off x="5951375" y="3611690"/>
             <a:ext cx="220343" cy="215444"/>
           </a:xfrm>
           <a:prstGeom prst="rect">

</xml_diff>

<commit_message>
Change sequence diagram for event handling for add task
</commit_message>
<xml_diff>
--- a/docs/diagrams/Diagrams.pptx
+++ b/docs/diagrams/Diagrams.pptx
@@ -217,7 +217,7 @@
           <a:p>
             <a:fld id="{F5CC4B3F-88C1-4FFA-B1B6-F41C21DC6924}" type="datetimeFigureOut">
               <a:rPr lang="en-US" smtClean="0"/>
-              <a:t>10/9/16</a:t>
+              <a:t>11/6/16</a:t>
             </a:fld>
             <a:endParaRPr lang="en-US"/>
           </a:p>
@@ -616,7 +616,7 @@
           <a:p>
             <a:fld id="{78C97017-6FC3-485B-9764-EAC9E56C1D49}" type="datetimeFigureOut">
               <a:rPr lang="en-US" smtClean="0"/>
-              <a:t>10/9/16</a:t>
+              <a:t>11/6/16</a:t>
             </a:fld>
             <a:endParaRPr lang="en-US"/>
           </a:p>
@@ -786,7 +786,7 @@
           <a:p>
             <a:fld id="{78C97017-6FC3-485B-9764-EAC9E56C1D49}" type="datetimeFigureOut">
               <a:rPr lang="en-US" smtClean="0"/>
-              <a:t>10/9/16</a:t>
+              <a:t>11/6/16</a:t>
             </a:fld>
             <a:endParaRPr lang="en-US"/>
           </a:p>
@@ -966,7 +966,7 @@
           <a:p>
             <a:fld id="{78C97017-6FC3-485B-9764-EAC9E56C1D49}" type="datetimeFigureOut">
               <a:rPr lang="en-US" smtClean="0"/>
-              <a:t>10/9/16</a:t>
+              <a:t>11/6/16</a:t>
             </a:fld>
             <a:endParaRPr lang="en-US"/>
           </a:p>
@@ -1136,7 +1136,7 @@
           <a:p>
             <a:fld id="{78C97017-6FC3-485B-9764-EAC9E56C1D49}" type="datetimeFigureOut">
               <a:rPr lang="en-US" smtClean="0"/>
-              <a:t>10/9/16</a:t>
+              <a:t>11/6/16</a:t>
             </a:fld>
             <a:endParaRPr lang="en-US"/>
           </a:p>
@@ -1380,7 +1380,7 @@
           <a:p>
             <a:fld id="{78C97017-6FC3-485B-9764-EAC9E56C1D49}" type="datetimeFigureOut">
               <a:rPr lang="en-US" smtClean="0"/>
-              <a:t>10/9/16</a:t>
+              <a:t>11/6/16</a:t>
             </a:fld>
             <a:endParaRPr lang="en-US"/>
           </a:p>
@@ -1612,7 +1612,7 @@
           <a:p>
             <a:fld id="{78C97017-6FC3-485B-9764-EAC9E56C1D49}" type="datetimeFigureOut">
               <a:rPr lang="en-US" smtClean="0"/>
-              <a:t>10/9/16</a:t>
+              <a:t>11/6/16</a:t>
             </a:fld>
             <a:endParaRPr lang="en-US"/>
           </a:p>
@@ -1979,7 +1979,7 @@
           <a:p>
             <a:fld id="{78C97017-6FC3-485B-9764-EAC9E56C1D49}" type="datetimeFigureOut">
               <a:rPr lang="en-US" smtClean="0"/>
-              <a:t>10/9/16</a:t>
+              <a:t>11/6/16</a:t>
             </a:fld>
             <a:endParaRPr lang="en-US"/>
           </a:p>
@@ -2097,7 +2097,7 @@
           <a:p>
             <a:fld id="{78C97017-6FC3-485B-9764-EAC9E56C1D49}" type="datetimeFigureOut">
               <a:rPr lang="en-US" smtClean="0"/>
-              <a:t>10/9/16</a:t>
+              <a:t>11/6/16</a:t>
             </a:fld>
             <a:endParaRPr lang="en-US"/>
           </a:p>
@@ -2192,7 +2192,7 @@
           <a:p>
             <a:fld id="{78C97017-6FC3-485B-9764-EAC9E56C1D49}" type="datetimeFigureOut">
               <a:rPr lang="en-US" smtClean="0"/>
-              <a:t>10/9/16</a:t>
+              <a:t>11/6/16</a:t>
             </a:fld>
             <a:endParaRPr lang="en-US"/>
           </a:p>
@@ -2469,7 +2469,7 @@
           <a:p>
             <a:fld id="{78C97017-6FC3-485B-9764-EAC9E56C1D49}" type="datetimeFigureOut">
               <a:rPr lang="en-US" smtClean="0"/>
-              <a:t>10/9/16</a:t>
+              <a:t>11/6/16</a:t>
             </a:fld>
             <a:endParaRPr lang="en-US"/>
           </a:p>
@@ -2726,7 +2726,7 @@
           <a:p>
             <a:fld id="{78C97017-6FC3-485B-9764-EAC9E56C1D49}" type="datetimeFigureOut">
               <a:rPr lang="en-US" smtClean="0"/>
-              <a:t>10/9/16</a:t>
+              <a:t>11/6/16</a:t>
             </a:fld>
             <a:endParaRPr lang="en-US"/>
           </a:p>
@@ -2939,7 +2939,7 @@
           <a:p>
             <a:fld id="{78C97017-6FC3-485B-9764-EAC9E56C1D49}" type="datetimeFigureOut">
               <a:rPr lang="en-US" smtClean="0"/>
-              <a:t>10/9/16</a:t>
+              <a:t>11/6/16</a:t>
             </a:fld>
             <a:endParaRPr lang="en-US"/>
           </a:p>
@@ -6181,7 +6181,7 @@
         </p:nvSpPr>
         <p:spPr>
           <a:xfrm>
-            <a:off x="7370178" y="2667000"/>
+            <a:off x="4858091" y="1068315"/>
             <a:ext cx="1093635" cy="346760"/>
           </a:xfrm>
           <a:prstGeom prst="rect">
@@ -6239,13 +6239,15 @@
       <p:cxnSp>
         <p:nvCxnSpPr>
           <p:cNvPr id="3" name="Straight Connector 2"/>
-          <p:cNvCxnSpPr/>
+          <p:cNvCxnSpPr>
+            <a:stCxn id="2" idx="2"/>
+          </p:cNvCxnSpPr>
           <p:nvPr/>
         </p:nvCxnSpPr>
         <p:spPr>
           <a:xfrm>
-            <a:off x="7916995" y="3030671"/>
-            <a:ext cx="0" cy="1723059"/>
+            <a:off x="5404909" y="1415075"/>
+            <a:ext cx="5291" cy="4455635"/>
           </a:xfrm>
           <a:prstGeom prst="line">
             <a:avLst/>
@@ -6283,8 +6285,8 @@
         </p:nvSpPr>
         <p:spPr>
           <a:xfrm>
-            <a:off x="7844987" y="3724340"/>
-            <a:ext cx="124478" cy="287409"/>
+            <a:off x="5336638" y="3715903"/>
+            <a:ext cx="136543" cy="856098"/>
           </a:xfrm>
           <a:prstGeom prst="rect">
             <a:avLst/>
@@ -6338,7 +6340,7 @@
         </p:nvSpPr>
         <p:spPr>
           <a:xfrm>
-            <a:off x="1810094" y="3186352"/>
+            <a:off x="810005" y="2644102"/>
             <a:ext cx="2716635" cy="215444"/>
           </a:xfrm>
           <a:prstGeom prst="rect">
@@ -6352,6 +6354,16 @@
           </a:bodyPr>
           <a:lstStyle/>
           <a:p>
+            <a:r>
+              <a:rPr lang="en-US" sz="1400" dirty="0">
+                <a:solidFill>
+                  <a:schemeClr val="accent5">
+                    <a:lumMod val="75000"/>
+                  </a:schemeClr>
+                </a:solidFill>
+              </a:rPr>
+              <a:t>p</a:t>
+            </a:r>
             <a:r>
               <a:rPr lang="en-US" sz="1400" dirty="0" smtClean="0">
                 <a:solidFill>
@@ -6360,7 +6372,7 @@
                   </a:schemeClr>
                 </a:solidFill>
               </a:rPr>
-              <a:t>Post(</a:t>
+              <a:t>ost(</a:t>
             </a:r>
             <a:r>
               <a:rPr lang="en-US" sz="1400" dirty="0" err="1" smtClean="0">
@@ -6370,7 +6382,7 @@
                   </a:schemeClr>
                 </a:solidFill>
               </a:rPr>
-              <a:t>TaskChangedEvent</a:t>
+              <a:t>TaskManagerChangedEvent</a:t>
             </a:r>
             <a:r>
               <a:rPr lang="en-US" sz="1400" dirty="0" smtClean="0">
@@ -6400,8 +6412,8 @@
         </p:nvCxnSpPr>
         <p:spPr>
           <a:xfrm flipH="1">
-            <a:off x="4526729" y="4011749"/>
-            <a:ext cx="3383941" cy="0"/>
+            <a:off x="3402554" y="4572000"/>
+            <a:ext cx="2007646" cy="0"/>
           </a:xfrm>
           <a:prstGeom prst="straightConnector1">
             <a:avLst/>
@@ -6440,7 +6452,7 @@
         </p:nvSpPr>
         <p:spPr>
           <a:xfrm>
-            <a:off x="3791146" y="2683911"/>
+            <a:off x="2667000" y="1090637"/>
             <a:ext cx="1371600" cy="346760"/>
           </a:xfrm>
           <a:prstGeom prst="rect">
@@ -6506,13 +6518,15 @@
       <p:cxnSp>
         <p:nvCxnSpPr>
           <p:cNvPr id="8" name="Straight Connector 7"/>
-          <p:cNvCxnSpPr/>
+          <p:cNvCxnSpPr>
+            <a:stCxn id="7" idx="2"/>
+          </p:cNvCxnSpPr>
           <p:nvPr/>
         </p:nvCxnSpPr>
         <p:spPr>
           <a:xfrm>
-            <a:off x="4456731" y="3036965"/>
-            <a:ext cx="0" cy="1723059"/>
+            <a:off x="3352800" y="1437397"/>
+            <a:ext cx="4281" cy="2328290"/>
           </a:xfrm>
           <a:prstGeom prst="line">
             <a:avLst/>
@@ -6550,8 +6564,8 @@
         </p:nvSpPr>
         <p:spPr>
           <a:xfrm>
-            <a:off x="4384723" y="3459898"/>
-            <a:ext cx="142006" cy="1036757"/>
+            <a:off x="3312528" y="2057400"/>
+            <a:ext cx="73507" cy="3733801"/>
           </a:xfrm>
           <a:prstGeom prst="rect">
             <a:avLst/>
@@ -6605,8 +6619,8 @@
         </p:nvCxnSpPr>
         <p:spPr>
           <a:xfrm>
-            <a:off x="3078929" y="3459898"/>
-            <a:ext cx="1295400" cy="0"/>
+            <a:off x="727040" y="2918773"/>
+            <a:ext cx="2585488" cy="0"/>
           </a:xfrm>
           <a:prstGeom prst="straightConnector1">
             <a:avLst/>
@@ -6640,9 +6654,9 @@
           <p:nvPr/>
         </p:nvCxnSpPr>
         <p:spPr>
-          <a:xfrm>
-            <a:off x="2975642" y="4496655"/>
-            <a:ext cx="1448755" cy="0"/>
+          <a:xfrm flipV="1">
+            <a:off x="718278" y="5776428"/>
+            <a:ext cx="2672226" cy="14772"/>
           </a:xfrm>
           <a:prstGeom prst="straightConnector1">
             <a:avLst/>
@@ -6680,9 +6694,9 @@
           <p:nvPr/>
         </p:nvCxnSpPr>
         <p:spPr>
-          <a:xfrm>
-            <a:off x="4526729" y="3729692"/>
-            <a:ext cx="3318258" cy="0"/>
+          <a:xfrm flipV="1">
+            <a:off x="3401634" y="3729211"/>
+            <a:ext cx="2008566" cy="3692"/>
           </a:xfrm>
           <a:prstGeom prst="straightConnector1">
             <a:avLst/>
@@ -6720,8 +6734,8 @@
         </p:nvSpPr>
         <p:spPr>
           <a:xfrm>
-            <a:off x="5036330" y="3454589"/>
-            <a:ext cx="2659870" cy="215444"/>
+            <a:off x="3503414" y="2984438"/>
+            <a:ext cx="1805006" cy="646331"/>
           </a:xfrm>
           <a:prstGeom prst="rect">
             <a:avLst/>
@@ -6752,7 +6766,27 @@
                   </a:schemeClr>
                 </a:solidFill>
               </a:rPr>
-              <a:t>()</a:t>
+              <a:t>(</a:t>
+            </a:r>
+            <a:r>
+              <a:rPr lang="en-US" sz="1400" dirty="0" err="1" smtClean="0">
+                <a:solidFill>
+                  <a:schemeClr val="accent6">
+                    <a:lumMod val="75000"/>
+                  </a:schemeClr>
+                </a:solidFill>
+              </a:rPr>
+              <a:t>TaskManagerChangedEvent</a:t>
+            </a:r>
+            <a:r>
+              <a:rPr lang="en-US" sz="1400" dirty="0" smtClean="0">
+                <a:solidFill>
+                  <a:schemeClr val="accent6">
+                    <a:lumMod val="75000"/>
+                  </a:schemeClr>
+                </a:solidFill>
+              </a:rPr>
+              <a:t>)</a:t>
             </a:r>
             <a:endParaRPr lang="en-US" sz="1400" dirty="0">
               <a:solidFill>
@@ -6772,7 +6806,7 @@
         </p:nvSpPr>
         <p:spPr>
           <a:xfrm>
-            <a:off x="721634" y="2667000"/>
+            <a:off x="7985142" y="1066217"/>
             <a:ext cx="1093635" cy="346760"/>
           </a:xfrm>
           <a:prstGeom prst="rect">
@@ -6826,13 +6860,15 @@
       <p:cxnSp>
         <p:nvCxnSpPr>
           <p:cNvPr id="15" name="Straight Connector 14"/>
-          <p:cNvCxnSpPr/>
+          <p:cNvCxnSpPr>
+            <a:stCxn id="14" idx="2"/>
+          </p:cNvCxnSpPr>
           <p:nvPr/>
         </p:nvCxnSpPr>
         <p:spPr>
           <a:xfrm>
-            <a:off x="1268451" y="3030671"/>
-            <a:ext cx="0" cy="1723059"/>
+            <a:off x="8531960" y="1412977"/>
+            <a:ext cx="32902" cy="4481702"/>
           </a:xfrm>
           <a:prstGeom prst="line">
             <a:avLst/>
@@ -6867,9 +6903,9 @@
           <p:nvPr/>
         </p:nvSpPr>
         <p:spPr>
-          <a:xfrm>
-            <a:off x="1196443" y="4059150"/>
-            <a:ext cx="130545" cy="273128"/>
+          <a:xfrm flipH="1">
+            <a:off x="8453318" y="2183487"/>
+            <a:ext cx="174711" cy="713330"/>
           </a:xfrm>
           <a:prstGeom prst="rect">
             <a:avLst/>
@@ -6918,9 +6954,9 @@
           <p:nvPr/>
         </p:nvCxnSpPr>
         <p:spPr>
-          <a:xfrm flipH="1">
-            <a:off x="1348843" y="4332278"/>
-            <a:ext cx="3061842" cy="0"/>
+          <a:xfrm>
+            <a:off x="3371010" y="2896817"/>
+            <a:ext cx="5143350" cy="0"/>
           </a:xfrm>
           <a:prstGeom prst="straightConnector1">
             <a:avLst/>
@@ -6956,9 +6992,9 @@
           <p:nvPr/>
         </p:nvCxnSpPr>
         <p:spPr>
-          <a:xfrm>
-            <a:off x="1348843" y="4059150"/>
-            <a:ext cx="3061841" cy="0"/>
+          <a:xfrm flipH="1" flipV="1">
+            <a:off x="3406697" y="2168845"/>
+            <a:ext cx="5049107" cy="14439"/>
           </a:xfrm>
           <a:prstGeom prst="straightConnector1">
             <a:avLst/>
@@ -6996,8 +7032,8 @@
         </p:nvSpPr>
         <p:spPr>
           <a:xfrm>
-            <a:off x="1416276" y="3784047"/>
-            <a:ext cx="2659870" cy="215444"/>
+            <a:off x="5645215" y="1752600"/>
+            <a:ext cx="2533875" cy="430887"/>
           </a:xfrm>
           <a:prstGeom prst="rect">
             <a:avLst/>
@@ -7024,7 +7060,23 @@
                   <a:srgbClr val="00B050"/>
                 </a:solidFill>
               </a:rPr>
-              <a:t>()</a:t>
+              <a:t>(</a:t>
+            </a:r>
+            <a:r>
+              <a:rPr lang="en-US" sz="1400" dirty="0" err="1" smtClean="0">
+                <a:solidFill>
+                  <a:srgbClr val="00B050"/>
+                </a:solidFill>
+              </a:rPr>
+              <a:t>TaskManagerChangedEvent</a:t>
+            </a:r>
+            <a:r>
+              <a:rPr lang="en-US" sz="1400" dirty="0" smtClean="0">
+                <a:solidFill>
+                  <a:srgbClr val="00B050"/>
+                </a:solidFill>
+              </a:rPr>
+              <a:t>)</a:t>
             </a:r>
             <a:endParaRPr lang="en-US" sz="1400" dirty="0">
               <a:solidFill>
@@ -7042,8 +7094,8 @@
         </p:nvGrpSpPr>
         <p:grpSpPr>
           <a:xfrm>
-            <a:off x="1028134" y="4000710"/>
-            <a:ext cx="217349" cy="270072"/>
+            <a:off x="8278302" y="2446428"/>
+            <a:ext cx="215241" cy="373734"/>
             <a:chOff x="1028134" y="5612032"/>
             <a:chExt cx="217349" cy="270072"/>
           </a:xfrm>
@@ -7201,8 +7253,8 @@
         </p:nvSpPr>
         <p:spPr>
           <a:xfrm>
-            <a:off x="194562" y="3833249"/>
-            <a:ext cx="794081" cy="430887"/>
+            <a:off x="7460804" y="2408106"/>
+            <a:ext cx="718286" cy="430887"/>
           </a:xfrm>
           <a:prstGeom prst="rect">
             <a:avLst/>
@@ -7240,7 +7292,7 @@
         </p:nvGrpSpPr>
         <p:grpSpPr>
           <a:xfrm flipH="1">
-            <a:off x="7936842" y="3724340"/>
+            <a:off x="5440559" y="3733916"/>
             <a:ext cx="217349" cy="270072"/>
             <a:chOff x="1028134" y="5612032"/>
             <a:chExt cx="217349" cy="270072"/>
@@ -7403,7 +7455,7 @@
         </p:nvSpPr>
         <p:spPr>
           <a:xfrm>
-            <a:off x="8223953" y="3569670"/>
+            <a:off x="5727670" y="3579246"/>
             <a:ext cx="539047" cy="430887"/>
           </a:xfrm>
           <a:prstGeom prst="rect">
@@ -7451,6 +7503,659 @@
                 <a:schemeClr val="accent6">
                   <a:lumMod val="75000"/>
                 </a:schemeClr>
+              </a:solidFill>
+            </a:endParaRPr>
+          </a:p>
+        </p:txBody>
+      </p:sp>
+      <p:sp>
+        <p:nvSpPr>
+          <p:cNvPr id="28" name="Rectangle 62"/>
+          <p:cNvSpPr/>
+          <p:nvPr/>
+        </p:nvSpPr>
+        <p:spPr>
+          <a:xfrm>
+            <a:off x="171460" y="1090637"/>
+            <a:ext cx="1093635" cy="346760"/>
+          </a:xfrm>
+          <a:prstGeom prst="rect">
+            <a:avLst/>
+          </a:prstGeom>
+          <a:solidFill>
+            <a:srgbClr val="7030A0"/>
+          </a:solidFill>
+          <a:ln w="19050">
+            <a:solidFill>
+              <a:srgbClr val="7030A0"/>
+            </a:solidFill>
+          </a:ln>
+          <a:effectLst/>
+        </p:spPr>
+        <p:style>
+          <a:lnRef idx="1">
+            <a:schemeClr val="accent2"/>
+          </a:lnRef>
+          <a:fillRef idx="2">
+            <a:schemeClr val="accent2"/>
+          </a:fillRef>
+          <a:effectRef idx="1">
+            <a:schemeClr val="accent2"/>
+          </a:effectRef>
+          <a:fontRef idx="minor">
+            <a:schemeClr val="dk1"/>
+          </a:fontRef>
+        </p:style>
+        <p:txBody>
+          <a:bodyPr rtlCol="0" anchor="ctr"/>
+          <a:lstStyle/>
+          <a:p>
+            <a:pPr algn="ctr"/>
+            <a:r>
+              <a:rPr lang="en-US" sz="1600" dirty="0" smtClean="0">
+                <a:solidFill>
+                  <a:schemeClr val="bg1"/>
+                </a:solidFill>
+              </a:rPr>
+              <a:t>:Model</a:t>
+            </a:r>
+            <a:endParaRPr lang="en-SG" sz="1600" dirty="0">
+              <a:solidFill>
+                <a:schemeClr val="bg1"/>
+              </a:solidFill>
+            </a:endParaRPr>
+          </a:p>
+        </p:txBody>
+      </p:sp>
+      <p:cxnSp>
+        <p:nvCxnSpPr>
+          <p:cNvPr id="29" name="Straight Connector 28"/>
+          <p:cNvCxnSpPr>
+            <a:stCxn id="28" idx="2"/>
+          </p:cNvCxnSpPr>
+          <p:nvPr/>
+        </p:nvCxnSpPr>
+        <p:spPr>
+          <a:xfrm flipH="1">
+            <a:off x="685800" y="1437397"/>
+            <a:ext cx="32478" cy="2342906"/>
+          </a:xfrm>
+          <a:prstGeom prst="line">
+            <a:avLst/>
+          </a:prstGeom>
+          <a:ln w="19050">
+            <a:solidFill>
+              <a:srgbClr val="7030A0"/>
+            </a:solidFill>
+            <a:prstDash val="sysDash"/>
+          </a:ln>
+          <a:effectLst/>
+        </p:spPr>
+        <p:style>
+          <a:lnRef idx="1">
+            <a:schemeClr val="accent1"/>
+          </a:lnRef>
+          <a:fillRef idx="2">
+            <a:schemeClr val="accent1"/>
+          </a:fillRef>
+          <a:effectRef idx="1">
+            <a:schemeClr val="accent1"/>
+          </a:effectRef>
+          <a:fontRef idx="minor">
+            <a:schemeClr val="dk1"/>
+          </a:fontRef>
+        </p:style>
+      </p:cxnSp>
+      <p:sp>
+        <p:nvSpPr>
+          <p:cNvPr id="30" name="Rectangle 29"/>
+          <p:cNvSpPr/>
+          <p:nvPr/>
+        </p:nvSpPr>
+        <p:spPr>
+          <a:xfrm flipH="1">
+            <a:off x="603398" y="2378604"/>
+            <a:ext cx="154352" cy="3427368"/>
+          </a:xfrm>
+          <a:prstGeom prst="rect">
+            <a:avLst/>
+          </a:prstGeom>
+          <a:solidFill>
+            <a:srgbClr val="7030A0"/>
+          </a:solidFill>
+          <a:ln>
+            <a:solidFill>
+              <a:srgbClr val="7030A0"/>
+            </a:solidFill>
+          </a:ln>
+          <a:effectLst/>
+        </p:spPr>
+        <p:style>
+          <a:lnRef idx="1">
+            <a:schemeClr val="accent3"/>
+          </a:lnRef>
+          <a:fillRef idx="2">
+            <a:schemeClr val="accent3"/>
+          </a:fillRef>
+          <a:effectRef idx="1">
+            <a:schemeClr val="accent3"/>
+          </a:effectRef>
+          <a:fontRef idx="minor">
+            <a:schemeClr val="dk1"/>
+          </a:fontRef>
+        </p:style>
+        <p:txBody>
+          <a:bodyPr rtlCol="0" anchor="ctr"/>
+          <a:lstStyle/>
+          <a:p>
+            <a:pPr algn="ctr"/>
+            <a:endParaRPr lang="en-SG" sz="1400">
+              <a:solidFill>
+                <a:schemeClr val="dk1"/>
+              </a:solidFill>
+            </a:endParaRPr>
+          </a:p>
+        </p:txBody>
+      </p:sp>
+      <p:cxnSp>
+        <p:nvCxnSpPr>
+          <p:cNvPr id="37" name="Straight Arrow Connector 36"/>
+          <p:cNvCxnSpPr/>
+          <p:nvPr/>
+        </p:nvCxnSpPr>
+        <p:spPr>
+          <a:xfrm>
+            <a:off x="767312" y="5257800"/>
+            <a:ext cx="2585488" cy="0"/>
+          </a:xfrm>
+          <a:prstGeom prst="straightConnector1">
+            <a:avLst/>
+          </a:prstGeom>
+          <a:ln w="19050">
+            <a:solidFill>
+              <a:srgbClr val="7030A0"/>
+            </a:solidFill>
+            <a:tailEnd type="arrow"/>
+          </a:ln>
+        </p:spPr>
+        <p:style>
+          <a:lnRef idx="1">
+            <a:schemeClr val="accent1"/>
+          </a:lnRef>
+          <a:fillRef idx="0">
+            <a:schemeClr val="accent1"/>
+          </a:fillRef>
+          <a:effectRef idx="0">
+            <a:schemeClr val="accent1"/>
+          </a:effectRef>
+          <a:fontRef idx="minor">
+            <a:schemeClr val="tx1"/>
+          </a:fontRef>
+        </p:style>
+      </p:cxnSp>
+      <p:sp>
+        <p:nvSpPr>
+          <p:cNvPr id="38" name="TextBox 37"/>
+          <p:cNvSpPr txBox="1"/>
+          <p:nvPr/>
+        </p:nvSpPr>
+        <p:spPr>
+          <a:xfrm>
+            <a:off x="864765" y="4966156"/>
+            <a:ext cx="2716635" cy="215444"/>
+          </a:xfrm>
+          <a:prstGeom prst="rect">
+            <a:avLst/>
+          </a:prstGeom>
+          <a:noFill/>
+        </p:spPr>
+        <p:txBody>
+          <a:bodyPr wrap="square" lIns="0" tIns="0" rIns="0" bIns="0" rtlCol="0">
+            <a:spAutoFit/>
+          </a:bodyPr>
+          <a:lstStyle/>
+          <a:p>
+            <a:r>
+              <a:rPr lang="en-US" sz="1400" dirty="0" smtClean="0">
+                <a:solidFill>
+                  <a:schemeClr val="accent5">
+                    <a:lumMod val="75000"/>
+                  </a:schemeClr>
+                </a:solidFill>
+              </a:rPr>
+              <a:t>p</a:t>
+            </a:r>
+            <a:r>
+              <a:rPr lang="en-US" sz="1400" dirty="0" smtClean="0">
+                <a:solidFill>
+                  <a:schemeClr val="accent5">
+                    <a:lumMod val="75000"/>
+                  </a:schemeClr>
+                </a:solidFill>
+              </a:rPr>
+              <a:t>ost(</a:t>
+            </a:r>
+            <a:r>
+              <a:rPr lang="en-US" sz="1400" dirty="0" err="1" smtClean="0">
+                <a:solidFill>
+                  <a:schemeClr val="accent5">
+                    <a:lumMod val="75000"/>
+                  </a:schemeClr>
+                </a:solidFill>
+              </a:rPr>
+              <a:t>JumpToListRequestEvent</a:t>
+            </a:r>
+            <a:r>
+              <a:rPr lang="en-US" sz="1400" dirty="0" smtClean="0">
+                <a:solidFill>
+                  <a:schemeClr val="accent5">
+                    <a:lumMod val="75000"/>
+                  </a:schemeClr>
+                </a:solidFill>
+              </a:rPr>
+              <a:t>)</a:t>
+            </a:r>
+            <a:endParaRPr lang="en-US" sz="1400" dirty="0">
+              <a:solidFill>
+                <a:schemeClr val="accent5">
+                  <a:lumMod val="75000"/>
+                </a:schemeClr>
+              </a:solidFill>
+            </a:endParaRPr>
+          </a:p>
+        </p:txBody>
+      </p:sp>
+      <p:sp>
+        <p:nvSpPr>
+          <p:cNvPr id="59" name="Rectangle 58"/>
+          <p:cNvSpPr/>
+          <p:nvPr/>
+        </p:nvSpPr>
+        <p:spPr>
+          <a:xfrm flipH="1">
+            <a:off x="8477506" y="4910413"/>
+            <a:ext cx="174711" cy="713330"/>
+          </a:xfrm>
+          <a:prstGeom prst="rect">
+            <a:avLst/>
+          </a:prstGeom>
+          <a:solidFill>
+            <a:srgbClr val="00B050"/>
+          </a:solidFill>
+          <a:ln>
+            <a:solidFill>
+              <a:srgbClr val="00B050"/>
+            </a:solidFill>
+          </a:ln>
+          <a:effectLst/>
+        </p:spPr>
+        <p:style>
+          <a:lnRef idx="1">
+            <a:schemeClr val="accent3"/>
+          </a:lnRef>
+          <a:fillRef idx="2">
+            <a:schemeClr val="accent3"/>
+          </a:fillRef>
+          <a:effectRef idx="1">
+            <a:schemeClr val="accent3"/>
+          </a:effectRef>
+          <a:fontRef idx="minor">
+            <a:schemeClr val="dk1"/>
+          </a:fontRef>
+        </p:style>
+        <p:txBody>
+          <a:bodyPr rtlCol="0" anchor="ctr"/>
+          <a:lstStyle/>
+          <a:p>
+            <a:pPr algn="ctr"/>
+            <a:endParaRPr lang="en-SG" sz="1400">
+              <a:solidFill>
+                <a:schemeClr val="dk1"/>
+              </a:solidFill>
+            </a:endParaRPr>
+          </a:p>
+        </p:txBody>
+      </p:sp>
+      <p:grpSp>
+        <p:nvGrpSpPr>
+          <p:cNvPr id="60" name="Group 59"/>
+          <p:cNvGrpSpPr/>
+          <p:nvPr/>
+        </p:nvGrpSpPr>
+        <p:grpSpPr>
+          <a:xfrm>
+            <a:off x="8302490" y="5173354"/>
+            <a:ext cx="215241" cy="373734"/>
+            <a:chOff x="1028134" y="5612032"/>
+            <a:chExt cx="217349" cy="270072"/>
+          </a:xfrm>
+        </p:grpSpPr>
+        <p:sp>
+          <p:nvSpPr>
+            <p:cNvPr id="61" name="Freeform 60"/>
+            <p:cNvSpPr/>
+            <p:nvPr/>
+          </p:nvSpPr>
+          <p:spPr>
+            <a:xfrm rot="2600998" flipH="1" flipV="1">
+              <a:off x="1028134" y="5612032"/>
+              <a:ext cx="167452" cy="116880"/>
+            </a:xfrm>
+            <a:custGeom>
+              <a:avLst/>
+              <a:gdLst>
+                <a:gd name="connsiteX0" fmla="*/ 0 w 226400"/>
+                <a:gd name="connsiteY0" fmla="*/ 32920 h 171466"/>
+                <a:gd name="connsiteX1" fmla="*/ 157018 w 226400"/>
+                <a:gd name="connsiteY1" fmla="*/ 5211 h 171466"/>
+                <a:gd name="connsiteX2" fmla="*/ 221673 w 226400"/>
+                <a:gd name="connsiteY2" fmla="*/ 125284 h 171466"/>
+                <a:gd name="connsiteX3" fmla="*/ 36945 w 226400"/>
+                <a:gd name="connsiteY3" fmla="*/ 171466 h 171466"/>
+              </a:gdLst>
+              <a:ahLst/>
+              <a:cxnLst>
+                <a:cxn ang="0">
+                  <a:pos x="connsiteX0" y="connsiteY0"/>
+                </a:cxn>
+                <a:cxn ang="0">
+                  <a:pos x="connsiteX1" y="connsiteY1"/>
+                </a:cxn>
+                <a:cxn ang="0">
+                  <a:pos x="connsiteX2" y="connsiteY2"/>
+                </a:cxn>
+                <a:cxn ang="0">
+                  <a:pos x="connsiteX3" y="connsiteY3"/>
+                </a:cxn>
+              </a:cxnLst>
+              <a:rect l="l" t="t" r="r" b="b"/>
+              <a:pathLst>
+                <a:path w="226400" h="171466">
+                  <a:moveTo>
+                    <a:pt x="0" y="32920"/>
+                  </a:moveTo>
+                  <a:cubicBezTo>
+                    <a:pt x="60036" y="11368"/>
+                    <a:pt x="120073" y="-10183"/>
+                    <a:pt x="157018" y="5211"/>
+                  </a:cubicBezTo>
+                  <a:cubicBezTo>
+                    <a:pt x="193963" y="20605"/>
+                    <a:pt x="241685" y="97575"/>
+                    <a:pt x="221673" y="125284"/>
+                  </a:cubicBezTo>
+                  <a:cubicBezTo>
+                    <a:pt x="201661" y="152993"/>
+                    <a:pt x="119303" y="162229"/>
+                    <a:pt x="36945" y="171466"/>
+                  </a:cubicBezTo>
+                </a:path>
+              </a:pathLst>
+            </a:custGeom>
+            <a:ln w="19050">
+              <a:solidFill>
+                <a:srgbClr val="00B050"/>
+              </a:solidFill>
+              <a:headEnd type="arrow" w="med" len="med"/>
+              <a:tailEnd type="none" w="med" len="med"/>
+            </a:ln>
+          </p:spPr>
+          <p:style>
+            <a:lnRef idx="1">
+              <a:schemeClr val="accent1"/>
+            </a:lnRef>
+            <a:fillRef idx="0">
+              <a:schemeClr val="accent1"/>
+            </a:fillRef>
+            <a:effectRef idx="0">
+              <a:schemeClr val="accent1"/>
+            </a:effectRef>
+            <a:fontRef idx="minor">
+              <a:schemeClr val="tx1"/>
+            </a:fontRef>
+          </p:style>
+          <p:txBody>
+            <a:bodyPr rtlCol="0" anchor="ctr"/>
+            <a:lstStyle/>
+            <a:p>
+              <a:pPr algn="ctr"/>
+              <a:endParaRPr lang="en-SG"/>
+            </a:p>
+          </p:txBody>
+        </p:sp>
+        <p:sp>
+          <p:nvSpPr>
+            <p:cNvPr id="62" name="Rectangle 61"/>
+            <p:cNvSpPr/>
+            <p:nvPr/>
+          </p:nvSpPr>
+          <p:spPr>
+            <a:xfrm>
+              <a:off x="1147403" y="5712513"/>
+              <a:ext cx="98080" cy="169591"/>
+            </a:xfrm>
+            <a:prstGeom prst="rect">
+              <a:avLst/>
+            </a:prstGeom>
+            <a:solidFill>
+              <a:srgbClr val="00B050"/>
+            </a:solidFill>
+            <a:ln>
+              <a:solidFill>
+                <a:schemeClr val="bg1"/>
+              </a:solidFill>
+            </a:ln>
+            <a:effectLst/>
+          </p:spPr>
+          <p:style>
+            <a:lnRef idx="1">
+              <a:schemeClr val="accent3"/>
+            </a:lnRef>
+            <a:fillRef idx="2">
+              <a:schemeClr val="accent3"/>
+            </a:fillRef>
+            <a:effectRef idx="1">
+              <a:schemeClr val="accent3"/>
+            </a:effectRef>
+            <a:fontRef idx="minor">
+              <a:schemeClr val="dk1"/>
+            </a:fontRef>
+          </p:style>
+          <p:txBody>
+            <a:bodyPr rtlCol="0" anchor="ctr"/>
+            <a:lstStyle/>
+            <a:p>
+              <a:pPr algn="ctr"/>
+              <a:endParaRPr lang="en-SG" sz="1400">
+                <a:solidFill>
+                  <a:schemeClr val="dk1"/>
+                </a:solidFill>
+              </a:endParaRPr>
+            </a:p>
+          </p:txBody>
+        </p:sp>
+      </p:grpSp>
+      <p:sp>
+        <p:nvSpPr>
+          <p:cNvPr id="63" name="TextBox 62"/>
+          <p:cNvSpPr txBox="1"/>
+          <p:nvPr/>
+        </p:nvSpPr>
+        <p:spPr>
+          <a:xfrm>
+            <a:off x="7010400" y="5138501"/>
+            <a:ext cx="1219875" cy="430887"/>
+          </a:xfrm>
+          <a:prstGeom prst="rect">
+            <a:avLst/>
+          </a:prstGeom>
+          <a:noFill/>
+        </p:spPr>
+        <p:txBody>
+          <a:bodyPr wrap="square" lIns="0" tIns="0" rIns="0" bIns="0" rtlCol="0">
+            <a:spAutoFit/>
+          </a:bodyPr>
+          <a:lstStyle/>
+          <a:p>
+            <a:pPr algn="r"/>
+            <a:r>
+              <a:rPr lang="en-US" sz="1400" dirty="0" smtClean="0">
+                <a:solidFill>
+                  <a:srgbClr val="00B050"/>
+                </a:solidFill>
+              </a:rPr>
+              <a:t>Update </a:t>
+            </a:r>
+            <a:r>
+              <a:rPr lang="en-US" sz="1400" dirty="0" smtClean="0">
+                <a:solidFill>
+                  <a:srgbClr val="00B050"/>
+                </a:solidFill>
+              </a:rPr>
+              <a:t>Task List Panel view</a:t>
+            </a:r>
+            <a:endParaRPr lang="en-US" sz="1400" dirty="0">
+              <a:solidFill>
+                <a:srgbClr val="00B050"/>
+              </a:solidFill>
+            </a:endParaRPr>
+          </a:p>
+        </p:txBody>
+      </p:sp>
+      <p:cxnSp>
+        <p:nvCxnSpPr>
+          <p:cNvPr id="64" name="Straight Arrow Connector 63"/>
+          <p:cNvCxnSpPr/>
+          <p:nvPr/>
+        </p:nvCxnSpPr>
+        <p:spPr>
+          <a:xfrm flipH="1">
+            <a:off x="3402191" y="4966681"/>
+            <a:ext cx="5087142" cy="14620"/>
+          </a:xfrm>
+          <a:prstGeom prst="straightConnector1">
+            <a:avLst/>
+          </a:prstGeom>
+          <a:ln w="19050">
+            <a:solidFill>
+              <a:schemeClr val="accent5">
+                <a:lumMod val="75000"/>
+              </a:schemeClr>
+            </a:solidFill>
+            <a:headEnd type="arrow" w="med" len="med"/>
+            <a:tailEnd type="none" w="med" len="med"/>
+          </a:ln>
+        </p:spPr>
+        <p:style>
+          <a:lnRef idx="1">
+            <a:schemeClr val="accent1"/>
+          </a:lnRef>
+          <a:fillRef idx="0">
+            <a:schemeClr val="accent1"/>
+          </a:fillRef>
+          <a:effectRef idx="0">
+            <a:schemeClr val="accent1"/>
+          </a:effectRef>
+          <a:fontRef idx="minor">
+            <a:schemeClr val="tx1"/>
+          </a:fontRef>
+        </p:style>
+      </p:cxnSp>
+      <p:cxnSp>
+        <p:nvCxnSpPr>
+          <p:cNvPr id="65" name="Straight Arrow Connector 64"/>
+          <p:cNvCxnSpPr/>
+          <p:nvPr/>
+        </p:nvCxnSpPr>
+        <p:spPr>
+          <a:xfrm>
+            <a:off x="3405061" y="5623743"/>
+            <a:ext cx="5143350" cy="0"/>
+          </a:xfrm>
+          <a:prstGeom prst="straightConnector1">
+            <a:avLst/>
+          </a:prstGeom>
+          <a:ln w="19050">
+            <a:solidFill>
+              <a:srgbClr val="00B050"/>
+            </a:solidFill>
+            <a:prstDash val="sysDash"/>
+            <a:headEnd type="arrow" w="med" len="med"/>
+            <a:tailEnd type="none" w="med" len="med"/>
+          </a:ln>
+        </p:spPr>
+        <p:style>
+          <a:lnRef idx="1">
+            <a:schemeClr val="accent1"/>
+          </a:lnRef>
+          <a:fillRef idx="0">
+            <a:schemeClr val="accent1"/>
+          </a:fillRef>
+          <a:effectRef idx="0">
+            <a:schemeClr val="accent1"/>
+          </a:effectRef>
+          <a:fontRef idx="minor">
+            <a:schemeClr val="tx1"/>
+          </a:fontRef>
+        </p:style>
+      </p:cxnSp>
+      <p:sp>
+        <p:nvSpPr>
+          <p:cNvPr id="66" name="TextBox 65"/>
+          <p:cNvSpPr txBox="1"/>
+          <p:nvPr/>
+        </p:nvSpPr>
+        <p:spPr>
+          <a:xfrm>
+            <a:off x="5743462" y="4497442"/>
+            <a:ext cx="2309953" cy="430887"/>
+          </a:xfrm>
+          <a:prstGeom prst="rect">
+            <a:avLst/>
+          </a:prstGeom>
+          <a:noFill/>
+        </p:spPr>
+        <p:txBody>
+          <a:bodyPr wrap="square" lIns="0" tIns="0" rIns="0" bIns="0" rtlCol="0">
+            <a:spAutoFit/>
+          </a:bodyPr>
+          <a:lstStyle/>
+          <a:p>
+            <a:r>
+              <a:rPr lang="en-US" sz="1400" dirty="0" err="1" smtClean="0">
+                <a:solidFill>
+                  <a:srgbClr val="00B050"/>
+                </a:solidFill>
+              </a:rPr>
+              <a:t>handleJumpToListRequestEvent</a:t>
+            </a:r>
+            <a:r>
+              <a:rPr lang="en-US" sz="1400" dirty="0" smtClean="0">
+                <a:solidFill>
+                  <a:srgbClr val="00B050"/>
+                </a:solidFill>
+              </a:rPr>
+              <a:t>(</a:t>
+            </a:r>
+            <a:r>
+              <a:rPr lang="en-US" sz="1400" dirty="0" err="1" smtClean="0">
+                <a:solidFill>
+                  <a:srgbClr val="00B050"/>
+                </a:solidFill>
+              </a:rPr>
+              <a:t>JumpToListRequestEvent</a:t>
+            </a:r>
+            <a:r>
+              <a:rPr lang="en-US" sz="1400" dirty="0" smtClean="0">
+                <a:solidFill>
+                  <a:srgbClr val="00B050"/>
+                </a:solidFill>
+              </a:rPr>
+              <a:t>)</a:t>
+            </a:r>
+            <a:endParaRPr lang="en-US" sz="1400" dirty="0">
+              <a:solidFill>
+                <a:srgbClr val="00B050"/>
               </a:solidFill>
             </a:endParaRPr>
           </a:p>

</xml_diff>

<commit_message>
change pictures in DG
</commit_message>
<xml_diff>
--- a/docs/diagrams/Diagrams.pptx
+++ b/docs/diagrams/Diagrams.pptx
@@ -217,7 +217,7 @@
           <a:p>
             <a:fld id="{F5CC4B3F-88C1-4FFA-B1B6-F41C21DC6924}" type="datetimeFigureOut">
               <a:rPr lang="en-US" smtClean="0"/>
-              <a:t>10/9/16</a:t>
+              <a:t>11/6/16</a:t>
             </a:fld>
             <a:endParaRPr lang="en-US"/>
           </a:p>
@@ -485,6 +485,90 @@
 </p:notesMaster>
 </file>
 
+<file path=ppt/notesSlides/notesSlide1.xml><?xml version="1.0" encoding="utf-8"?>
+<p:notes xmlns:a="http://schemas.openxmlformats.org/drawingml/2006/main" xmlns:r="http://schemas.openxmlformats.org/officeDocument/2006/relationships" xmlns:p="http://schemas.openxmlformats.org/presentationml/2006/main">
+  <p:cSld>
+    <p:spTree>
+      <p:nvGrpSpPr>
+        <p:cNvPr id="1" name=""/>
+        <p:cNvGrpSpPr/>
+        <p:nvPr/>
+      </p:nvGrpSpPr>
+      <p:grpSpPr>
+        <a:xfrm>
+          <a:off x="0" y="0"/>
+          <a:ext cx="0" cy="0"/>
+          <a:chOff x="0" y="0"/>
+          <a:chExt cx="0" cy="0"/>
+        </a:xfrm>
+      </p:grpSpPr>
+      <p:sp>
+        <p:nvSpPr>
+          <p:cNvPr id="2" name="Slide Image Placeholder 1"/>
+          <p:cNvSpPr>
+            <a:spLocks noGrp="1" noRot="1" noChangeAspect="1"/>
+          </p:cNvSpPr>
+          <p:nvPr>
+            <p:ph type="sldImg"/>
+          </p:nvPr>
+        </p:nvSpPr>
+        <p:spPr/>
+      </p:sp>
+      <p:sp>
+        <p:nvSpPr>
+          <p:cNvPr id="3" name="Notes Placeholder 2"/>
+          <p:cNvSpPr>
+            <a:spLocks noGrp="1"/>
+          </p:cNvSpPr>
+          <p:nvPr>
+            <p:ph type="body" idx="1"/>
+          </p:nvPr>
+        </p:nvSpPr>
+        <p:spPr/>
+        <p:txBody>
+          <a:bodyPr/>
+          <a:lstStyle/>
+          <a:p>
+            <a:endParaRPr lang="en-US" dirty="0"/>
+          </a:p>
+        </p:txBody>
+      </p:sp>
+      <p:sp>
+        <p:nvSpPr>
+          <p:cNvPr id="4" name="Slide Number Placeholder 3"/>
+          <p:cNvSpPr>
+            <a:spLocks noGrp="1"/>
+          </p:cNvSpPr>
+          <p:nvPr>
+            <p:ph type="sldNum" sz="quarter" idx="10"/>
+          </p:nvPr>
+        </p:nvSpPr>
+        <p:spPr/>
+        <p:txBody>
+          <a:bodyPr/>
+          <a:lstStyle/>
+          <a:p>
+            <a:fld id="{5A7AB025-77E3-4BD1-A2FD-B3183DBA47A3}" type="slidenum">
+              <a:rPr lang="en-US" smtClean="0"/>
+              <a:t>5</a:t>
+            </a:fld>
+            <a:endParaRPr lang="en-US"/>
+          </a:p>
+        </p:txBody>
+      </p:sp>
+    </p:spTree>
+    <p:extLst>
+      <p:ext uri="{BB962C8B-B14F-4D97-AF65-F5344CB8AC3E}">
+        <p14:creationId xmlns:p14="http://schemas.microsoft.com/office/powerpoint/2010/main" val="1572389241"/>
+      </p:ext>
+    </p:extLst>
+  </p:cSld>
+  <p:clrMapOvr>
+    <a:masterClrMapping/>
+  </p:clrMapOvr>
+</p:notes>
+</file>
+
 <file path=ppt/slideLayouts/slideLayout1.xml><?xml version="1.0" encoding="utf-8"?>
 <p:sldLayout xmlns:a="http://schemas.openxmlformats.org/drawingml/2006/main" xmlns:r="http://schemas.openxmlformats.org/officeDocument/2006/relationships" xmlns:p="http://schemas.openxmlformats.org/presentationml/2006/main" type="title" preserve="1">
   <p:cSld name="Title Slide">
@@ -616,7 +700,7 @@
           <a:p>
             <a:fld id="{78C97017-6FC3-485B-9764-EAC9E56C1D49}" type="datetimeFigureOut">
               <a:rPr lang="en-US" smtClean="0"/>
-              <a:t>10/9/16</a:t>
+              <a:t>11/6/16</a:t>
             </a:fld>
             <a:endParaRPr lang="en-US"/>
           </a:p>
@@ -786,7 +870,7 @@
           <a:p>
             <a:fld id="{78C97017-6FC3-485B-9764-EAC9E56C1D49}" type="datetimeFigureOut">
               <a:rPr lang="en-US" smtClean="0"/>
-              <a:t>10/9/16</a:t>
+              <a:t>11/6/16</a:t>
             </a:fld>
             <a:endParaRPr lang="en-US"/>
           </a:p>
@@ -966,7 +1050,7 @@
           <a:p>
             <a:fld id="{78C97017-6FC3-485B-9764-EAC9E56C1D49}" type="datetimeFigureOut">
               <a:rPr lang="en-US" smtClean="0"/>
-              <a:t>10/9/16</a:t>
+              <a:t>11/6/16</a:t>
             </a:fld>
             <a:endParaRPr lang="en-US"/>
           </a:p>
@@ -1136,7 +1220,7 @@
           <a:p>
             <a:fld id="{78C97017-6FC3-485B-9764-EAC9E56C1D49}" type="datetimeFigureOut">
               <a:rPr lang="en-US" smtClean="0"/>
-              <a:t>10/9/16</a:t>
+              <a:t>11/6/16</a:t>
             </a:fld>
             <a:endParaRPr lang="en-US"/>
           </a:p>
@@ -1380,7 +1464,7 @@
           <a:p>
             <a:fld id="{78C97017-6FC3-485B-9764-EAC9E56C1D49}" type="datetimeFigureOut">
               <a:rPr lang="en-US" smtClean="0"/>
-              <a:t>10/9/16</a:t>
+              <a:t>11/6/16</a:t>
             </a:fld>
             <a:endParaRPr lang="en-US"/>
           </a:p>
@@ -1612,7 +1696,7 @@
           <a:p>
             <a:fld id="{78C97017-6FC3-485B-9764-EAC9E56C1D49}" type="datetimeFigureOut">
               <a:rPr lang="en-US" smtClean="0"/>
-              <a:t>10/9/16</a:t>
+              <a:t>11/6/16</a:t>
             </a:fld>
             <a:endParaRPr lang="en-US"/>
           </a:p>
@@ -1979,7 +2063,7 @@
           <a:p>
             <a:fld id="{78C97017-6FC3-485B-9764-EAC9E56C1D49}" type="datetimeFigureOut">
               <a:rPr lang="en-US" smtClean="0"/>
-              <a:t>10/9/16</a:t>
+              <a:t>11/6/16</a:t>
             </a:fld>
             <a:endParaRPr lang="en-US"/>
           </a:p>
@@ -2097,7 +2181,7 @@
           <a:p>
             <a:fld id="{78C97017-6FC3-485B-9764-EAC9E56C1D49}" type="datetimeFigureOut">
               <a:rPr lang="en-US" smtClean="0"/>
-              <a:t>10/9/16</a:t>
+              <a:t>11/6/16</a:t>
             </a:fld>
             <a:endParaRPr lang="en-US"/>
           </a:p>
@@ -2192,7 +2276,7 @@
           <a:p>
             <a:fld id="{78C97017-6FC3-485B-9764-EAC9E56C1D49}" type="datetimeFigureOut">
               <a:rPr lang="en-US" smtClean="0"/>
-              <a:t>10/9/16</a:t>
+              <a:t>11/6/16</a:t>
             </a:fld>
             <a:endParaRPr lang="en-US"/>
           </a:p>
@@ -2469,7 +2553,7 @@
           <a:p>
             <a:fld id="{78C97017-6FC3-485B-9764-EAC9E56C1D49}" type="datetimeFigureOut">
               <a:rPr lang="en-US" smtClean="0"/>
-              <a:t>10/9/16</a:t>
+              <a:t>11/6/16</a:t>
             </a:fld>
             <a:endParaRPr lang="en-US"/>
           </a:p>
@@ -2726,7 +2810,7 @@
           <a:p>
             <a:fld id="{78C97017-6FC3-485B-9764-EAC9E56C1D49}" type="datetimeFigureOut">
               <a:rPr lang="en-US" smtClean="0"/>
-              <a:t>10/9/16</a:t>
+              <a:t>11/6/16</a:t>
             </a:fld>
             <a:endParaRPr lang="en-US"/>
           </a:p>
@@ -2939,7 +3023,7 @@
           <a:p>
             <a:fld id="{78C97017-6FC3-485B-9764-EAC9E56C1D49}" type="datetimeFigureOut">
               <a:rPr lang="en-US" smtClean="0"/>
-              <a:t>10/9/16</a:t>
+              <a:t>11/6/16</a:t>
             </a:fld>
             <a:endParaRPr lang="en-US"/>
           </a:p>
@@ -4877,7 +4961,7 @@
         <p:spPr>
           <a:xfrm>
             <a:off x="1658677" y="2769054"/>
-            <a:ext cx="0" cy="1723059"/>
+            <a:ext cx="17723" cy="2031546"/>
           </a:xfrm>
           <a:prstGeom prst="line">
             <a:avLst/>
@@ -4913,8 +4997,8 @@
         </p:nvSpPr>
         <p:spPr>
           <a:xfrm>
-            <a:off x="1586669" y="3119749"/>
-            <a:ext cx="152400" cy="1019910"/>
+            <a:off x="1586669" y="3119748"/>
+            <a:ext cx="152400" cy="1223651"/>
           </a:xfrm>
           <a:prstGeom prst="rect">
             <a:avLst/>
@@ -4964,7 +5048,7 @@
         </p:nvGrpSpPr>
         <p:grpSpPr>
           <a:xfrm>
-            <a:off x="152400" y="2330857"/>
+            <a:off x="62277" y="2323719"/>
             <a:ext cx="324036" cy="573410"/>
             <a:chOff x="3239901" y="4149080"/>
             <a:chExt cx="648072" cy="1146820"/>
@@ -5235,13 +5319,15 @@
       <p:cxnSp>
         <p:nvCxnSpPr>
           <p:cNvPr id="17" name="Straight Connector 16"/>
-          <p:cNvCxnSpPr/>
+          <p:cNvCxnSpPr>
+            <a:stCxn id="16" idx="2"/>
+          </p:cNvCxnSpPr>
           <p:nvPr/>
         </p:nvCxnSpPr>
         <p:spPr>
-          <a:xfrm>
-            <a:off x="3882400" y="2772741"/>
-            <a:ext cx="0" cy="1723059"/>
+          <a:xfrm flipH="1">
+            <a:off x="3881290" y="2755830"/>
+            <a:ext cx="1111" cy="2044770"/>
           </a:xfrm>
           <a:prstGeom prst="line">
             <a:avLst/>
@@ -5278,7 +5364,7 @@
         <p:spPr>
           <a:xfrm>
             <a:off x="3810392" y="3230934"/>
-            <a:ext cx="144016" cy="832525"/>
+            <a:ext cx="138982" cy="1112466"/>
           </a:xfrm>
           <a:prstGeom prst="rect">
             <a:avLst/>
@@ -5388,7 +5474,7 @@
         <p:spPr>
           <a:xfrm>
             <a:off x="5863600" y="2769054"/>
-            <a:ext cx="0" cy="1723059"/>
+            <a:ext cx="3800" cy="2031546"/>
           </a:xfrm>
           <a:prstGeom prst="line">
             <a:avLst/>
@@ -5425,7 +5511,7 @@
         <p:spPr>
           <a:xfrm>
             <a:off x="5791592" y="3335865"/>
-            <a:ext cx="142006" cy="651394"/>
+            <a:ext cx="148926" cy="803794"/>
           </a:xfrm>
           <a:prstGeom prst="rect">
             <a:avLst/>
@@ -5474,9 +5560,9 @@
           <p:nvPr/>
         </p:nvCxnSpPr>
         <p:spPr>
-          <a:xfrm>
-            <a:off x="466818" y="3123436"/>
-            <a:ext cx="1119851" cy="0"/>
+          <a:xfrm flipV="1">
+            <a:off x="293630" y="3123437"/>
+            <a:ext cx="1293039" cy="28105"/>
           </a:xfrm>
           <a:prstGeom prst="straightConnector1">
             <a:avLst/>
@@ -5511,8 +5597,8 @@
         </p:nvSpPr>
         <p:spPr>
           <a:xfrm>
-            <a:off x="466818" y="3143337"/>
-            <a:ext cx="860170" cy="215444"/>
+            <a:off x="293630" y="3160700"/>
+            <a:ext cx="1282645" cy="215444"/>
           </a:xfrm>
           <a:prstGeom prst="rect">
             <a:avLst/>
@@ -5527,7 +5613,7 @@
           <a:p>
             <a:r>
               <a:rPr lang="en-US" sz="1400" dirty="0" smtClean="0"/>
-              <a:t>delete 1</a:t>
+              <a:t>Add floating task</a:t>
             </a:r>
             <a:endParaRPr lang="en-US" sz="1400" dirty="0"/>
           </a:p>
@@ -5577,8 +5663,8 @@
         </p:nvSpPr>
         <p:spPr>
           <a:xfrm>
-            <a:off x="2166172" y="3250836"/>
-            <a:ext cx="1424846" cy="215444"/>
+            <a:off x="1797660" y="3250835"/>
+            <a:ext cx="2084740" cy="215444"/>
           </a:xfrm>
           <a:prstGeom prst="rect">
             <a:avLst/>
@@ -5597,7 +5683,31 @@
                   <a:srgbClr val="0070C0"/>
                 </a:solidFill>
               </a:rPr>
-              <a:t>execute(“delete 1”)</a:t>
+              <a:t>execute</a:t>
+            </a:r>
+            <a:r>
+              <a:rPr lang="en-US" sz="1400" dirty="0" smtClean="0">
+                <a:solidFill>
+                  <a:srgbClr val="0070C0"/>
+                </a:solidFill>
+              </a:rPr>
+              <a:t>(“</a:t>
+            </a:r>
+            <a:r>
+              <a:rPr lang="en-US" sz="1400" dirty="0" smtClean="0">
+                <a:solidFill>
+                  <a:srgbClr val="0070C0"/>
+                </a:solidFill>
+              </a:rPr>
+              <a:t>add floating task</a:t>
+            </a:r>
+            <a:r>
+              <a:rPr lang="en-US" sz="1400" dirty="0" smtClean="0">
+                <a:solidFill>
+                  <a:srgbClr val="0070C0"/>
+                </a:solidFill>
+              </a:rPr>
+              <a:t>”)</a:t>
             </a:r>
             <a:endParaRPr lang="en-US" sz="1400" dirty="0">
               <a:solidFill>
@@ -5651,8 +5761,8 @@
         </p:nvSpPr>
         <p:spPr>
           <a:xfrm>
-            <a:off x="4299772" y="3340040"/>
-            <a:ext cx="1424846" cy="215444"/>
+            <a:off x="3986772" y="3340040"/>
+            <a:ext cx="1737846" cy="215444"/>
           </a:xfrm>
           <a:prstGeom prst="rect">
             <a:avLst/>
@@ -5671,7 +5781,7 @@
                   <a:srgbClr val="7030A0"/>
                 </a:solidFill>
               </a:rPr>
-              <a:t>deleteTask</a:t>
+              <a:t>addTask</a:t>
             </a:r>
             <a:r>
               <a:rPr lang="en-US" sz="1400" dirty="0" smtClean="0">
@@ -5679,7 +5789,7 @@
                   <a:srgbClr val="7030A0"/>
                 </a:solidFill>
               </a:rPr>
-              <a:t>(p)</a:t>
+              <a:t>(“floating task”)</a:t>
             </a:r>
             <a:endParaRPr lang="en-US" sz="1400" dirty="0">
               <a:solidFill>
@@ -5689,68 +5799,6 @@
           </a:p>
         </p:txBody>
       </p:sp>
-      <p:sp>
-        <p:nvSpPr>
-          <p:cNvPr id="33" name="TextBox 32"/>
-          <p:cNvSpPr txBox="1"/>
-          <p:nvPr/>
-        </p:nvSpPr>
-        <p:spPr>
-          <a:xfrm>
-            <a:off x="6074030" y="3485113"/>
-            <a:ext cx="2438400" cy="215444"/>
-          </a:xfrm>
-          <a:prstGeom prst="rect">
-            <a:avLst/>
-          </a:prstGeom>
-          <a:noFill/>
-        </p:spPr>
-        <p:txBody>
-          <a:bodyPr wrap="square" lIns="0" tIns="0" rIns="0" bIns="0" rtlCol="0">
-            <a:spAutoFit/>
-          </a:bodyPr>
-          <a:lstStyle/>
-          <a:p>
-            <a:r>
-              <a:rPr lang="en-US" sz="1400" dirty="0" smtClean="0">
-                <a:solidFill>
-                  <a:schemeClr val="accent5">
-                    <a:lumMod val="75000"/>
-                  </a:schemeClr>
-                </a:solidFill>
-              </a:rPr>
-              <a:t>Post(</a:t>
-            </a:r>
-            <a:r>
-              <a:rPr lang="en-US" sz="1400" dirty="0" err="1" smtClean="0">
-                <a:solidFill>
-                  <a:schemeClr val="accent5">
-                    <a:lumMod val="75000"/>
-                  </a:schemeClr>
-                </a:solidFill>
-              </a:rPr>
-              <a:t>TaskManagerChangedEvent</a:t>
-            </a:r>
-            <a:r>
-              <a:rPr lang="en-US" sz="1400" dirty="0" smtClean="0">
-                <a:solidFill>
-                  <a:schemeClr val="accent5">
-                    <a:lumMod val="75000"/>
-                  </a:schemeClr>
-                </a:solidFill>
-              </a:rPr>
-              <a:t>)</a:t>
-            </a:r>
-            <a:endParaRPr lang="en-US" sz="1400" dirty="0">
-              <a:solidFill>
-                <a:schemeClr val="accent5">
-                  <a:lumMod val="75000"/>
-                </a:schemeClr>
-              </a:solidFill>
-            </a:endParaRPr>
-          </a:p>
-        </p:txBody>
-      </p:sp>
       <p:cxnSp>
         <p:nvCxnSpPr>
           <p:cNvPr id="34" name="Straight Arrow Connector 33"/>
@@ -5759,7 +5807,7 @@
         </p:nvCxnSpPr>
         <p:spPr>
           <a:xfrm>
-            <a:off x="3954408" y="3988138"/>
+            <a:off x="3949374" y="4043801"/>
             <a:ext cx="1837184" cy="0"/>
           </a:xfrm>
           <a:prstGeom prst="straightConnector1">
@@ -5797,7 +5845,7 @@
         </p:nvCxnSpPr>
         <p:spPr>
           <a:xfrm>
-            <a:off x="1739069" y="4063459"/>
+            <a:off x="1739069" y="4114800"/>
             <a:ext cx="2058118" cy="0"/>
           </a:xfrm>
           <a:prstGeom prst="straightConnector1">
@@ -5835,8 +5883,8 @@
         </p:nvCxnSpPr>
         <p:spPr>
           <a:xfrm>
-            <a:off x="390618" y="4139659"/>
-            <a:ext cx="1196051" cy="0"/>
+            <a:off x="152263" y="4191000"/>
+            <a:ext cx="1434406" cy="0"/>
           </a:xfrm>
           <a:prstGeom prst="straightConnector1">
             <a:avLst/>
@@ -5873,7 +5921,7 @@
         </p:nvSpPr>
         <p:spPr>
           <a:xfrm>
-            <a:off x="7696200" y="2388708"/>
+            <a:off x="6734849" y="2369394"/>
             <a:ext cx="1371600" cy="346760"/>
           </a:xfrm>
           <a:prstGeom prst="rect">
@@ -5944,8 +5992,8 @@
         </p:nvCxnSpPr>
         <p:spPr>
           <a:xfrm>
-            <a:off x="8616802" y="2741762"/>
-            <a:ext cx="0" cy="1723059"/>
+            <a:off x="7315200" y="2716154"/>
+            <a:ext cx="0" cy="2160646"/>
           </a:xfrm>
           <a:prstGeom prst="line">
             <a:avLst/>
@@ -5972,137 +6020,6 @@
           </a:effectRef>
           <a:fontRef idx="minor">
             <a:schemeClr val="dk1"/>
-          </a:fontRef>
-        </p:style>
-      </p:cxnSp>
-      <p:sp>
-        <p:nvSpPr>
-          <p:cNvPr id="41" name="Rectangle 40"/>
-          <p:cNvSpPr/>
-          <p:nvPr/>
-        </p:nvSpPr>
-        <p:spPr>
-          <a:xfrm>
-            <a:off x="8544794" y="3758659"/>
-            <a:ext cx="142006" cy="176787"/>
-          </a:xfrm>
-          <a:prstGeom prst="rect">
-            <a:avLst/>
-          </a:prstGeom>
-          <a:solidFill>
-            <a:schemeClr val="accent5">
-              <a:lumMod val="75000"/>
-            </a:schemeClr>
-          </a:solidFill>
-          <a:ln>
-            <a:solidFill>
-              <a:schemeClr val="accent5">
-                <a:lumMod val="75000"/>
-              </a:schemeClr>
-            </a:solidFill>
-          </a:ln>
-          <a:effectLst/>
-        </p:spPr>
-        <p:style>
-          <a:lnRef idx="1">
-            <a:schemeClr val="accent3"/>
-          </a:lnRef>
-          <a:fillRef idx="2">
-            <a:schemeClr val="accent3"/>
-          </a:fillRef>
-          <a:effectRef idx="1">
-            <a:schemeClr val="accent3"/>
-          </a:effectRef>
-          <a:fontRef idx="minor">
-            <a:schemeClr val="dk1"/>
-          </a:fontRef>
-        </p:style>
-        <p:txBody>
-          <a:bodyPr rtlCol="0" anchor="ctr"/>
-          <a:lstStyle/>
-          <a:p>
-            <a:pPr algn="ctr"/>
-            <a:endParaRPr lang="en-SG" sz="1400">
-              <a:solidFill>
-                <a:schemeClr val="dk1"/>
-              </a:solidFill>
-            </a:endParaRPr>
-          </a:p>
-        </p:txBody>
-      </p:sp>
-      <p:cxnSp>
-        <p:nvCxnSpPr>
-          <p:cNvPr id="42" name="Straight Arrow Connector 41"/>
-          <p:cNvCxnSpPr/>
-          <p:nvPr/>
-        </p:nvCxnSpPr>
-        <p:spPr>
-          <a:xfrm>
-            <a:off x="5943992" y="3758659"/>
-            <a:ext cx="2568438" cy="0"/>
-          </a:xfrm>
-          <a:prstGeom prst="straightConnector1">
-            <a:avLst/>
-          </a:prstGeom>
-          <a:ln w="19050">
-            <a:solidFill>
-              <a:srgbClr val="7030A0"/>
-            </a:solidFill>
-            <a:tailEnd type="arrow"/>
-          </a:ln>
-        </p:spPr>
-        <p:style>
-          <a:lnRef idx="1">
-            <a:schemeClr val="accent1"/>
-          </a:lnRef>
-          <a:fillRef idx="0">
-            <a:schemeClr val="accent1"/>
-          </a:fillRef>
-          <a:effectRef idx="0">
-            <a:schemeClr val="accent1"/>
-          </a:effectRef>
-          <a:fontRef idx="minor">
-            <a:schemeClr val="tx1"/>
-          </a:fontRef>
-        </p:style>
-      </p:cxnSp>
-      <p:cxnSp>
-        <p:nvCxnSpPr>
-          <p:cNvPr id="44" name="Straight Arrow Connector 43"/>
-          <p:cNvCxnSpPr/>
-          <p:nvPr/>
-        </p:nvCxnSpPr>
-        <p:spPr>
-          <a:xfrm>
-            <a:off x="5943992" y="3935446"/>
-            <a:ext cx="2549946" cy="0"/>
-          </a:xfrm>
-          <a:prstGeom prst="straightConnector1">
-            <a:avLst/>
-          </a:prstGeom>
-          <a:ln w="19050">
-            <a:solidFill>
-              <a:schemeClr val="accent5">
-                <a:lumMod val="75000"/>
-              </a:schemeClr>
-            </a:solidFill>
-            <a:prstDash val="sysDash"/>
-            <a:headEnd type="arrow" w="med" len="med"/>
-            <a:tailEnd type="none" w="med" len="med"/>
-          </a:ln>
-        </p:spPr>
-        <p:style>
-          <a:lnRef idx="1">
-            <a:schemeClr val="accent1"/>
-          </a:lnRef>
-          <a:fillRef idx="0">
-            <a:schemeClr val="accent1"/>
-          </a:fillRef>
-          <a:effectRef idx="0">
-            <a:schemeClr val="accent1"/>
-          </a:effectRef>
-          <a:fontRef idx="minor">
-            <a:schemeClr val="tx1"/>
           </a:fontRef>
         </p:style>
       </p:cxnSp>
@@ -6114,7 +6031,7 @@
         </p:nvCxnSpPr>
         <p:spPr>
           <a:xfrm flipH="1">
-            <a:off x="314394" y="2897129"/>
+            <a:off x="224873" y="2897129"/>
             <a:ext cx="24" cy="1598671"/>
           </a:xfrm>
           <a:prstGeom prst="line">
@@ -6143,6 +6060,86 @@
           </a:fontRef>
         </p:style>
       </p:cxnSp>
+      <p:sp>
+        <p:nvSpPr>
+          <p:cNvPr id="12" name="Rectangle 11"/>
+          <p:cNvSpPr/>
+          <p:nvPr/>
+        </p:nvSpPr>
+        <p:spPr>
+          <a:xfrm>
+            <a:off x="5410200" y="3536475"/>
+            <a:ext cx="2514601" cy="319977"/>
+          </a:xfrm>
+          <a:prstGeom prst="rect">
+            <a:avLst/>
+          </a:prstGeom>
+          <a:solidFill>
+            <a:schemeClr val="bg1"/>
+          </a:solidFill>
+          <a:ln>
+            <a:solidFill>
+              <a:schemeClr val="tx1"/>
+            </a:solidFill>
+          </a:ln>
+        </p:spPr>
+        <p:style>
+          <a:lnRef idx="2">
+            <a:schemeClr val="accent1">
+              <a:shade val="50000"/>
+            </a:schemeClr>
+          </a:lnRef>
+          <a:fillRef idx="1">
+            <a:schemeClr val="accent1"/>
+          </a:fillRef>
+          <a:effectRef idx="0">
+            <a:schemeClr val="accent1"/>
+          </a:effectRef>
+          <a:fontRef idx="minor">
+            <a:schemeClr val="lt1"/>
+          </a:fontRef>
+        </p:style>
+        <p:txBody>
+          <a:bodyPr rtlCol="0" anchor="ctr"/>
+          <a:lstStyle/>
+          <a:p>
+            <a:pPr algn="ctr"/>
+            <a:r>
+              <a:rPr lang="en-US" b="1" dirty="0">
+                <a:solidFill>
+                  <a:srgbClr val="7030A0"/>
+                </a:solidFill>
+              </a:rPr>
+              <a:t>r</a:t>
+            </a:r>
+            <a:r>
+              <a:rPr lang="en-US" b="1" dirty="0" smtClean="0">
+                <a:solidFill>
+                  <a:srgbClr val="7030A0"/>
+                </a:solidFill>
+              </a:rPr>
+              <a:t>ef</a:t>
+            </a:r>
+            <a:r>
+              <a:rPr lang="en-US" dirty="0" smtClean="0">
+                <a:solidFill>
+                  <a:schemeClr val="accent6">
+                    <a:lumMod val="75000"/>
+                  </a:schemeClr>
+                </a:solidFill>
+              </a:rPr>
+              <a:t> indicate task changes</a:t>
+            </a:r>
+            <a:endParaRPr lang="en-US" dirty="0">
+              <a:solidFill>
+                <a:schemeClr val="accent6">
+                  <a:lumMod val="75000"/>
+                </a:schemeClr>
+              </a:solidFill>
+            </a:endParaRPr>
+          </a:p>
+        </p:txBody>
+      </p:sp>
     </p:spTree>
     <p:extLst>
       <p:ext uri="{BB962C8B-B14F-4D97-AF65-F5344CB8AC3E}">
@@ -7494,7 +7491,7 @@
         </p:nvSpPr>
         <p:spPr>
           <a:xfrm>
-            <a:off x="1217465" y="1447800"/>
+            <a:off x="457200" y="1447800"/>
             <a:ext cx="4917083" cy="3962400"/>
           </a:xfrm>
           <a:prstGeom prst="roundRect">
@@ -7556,7 +7553,7 @@
         </p:nvSpPr>
         <p:spPr>
           <a:xfrm>
-            <a:off x="2095948" y="2341220"/>
+            <a:off x="1335683" y="2341220"/>
             <a:ext cx="1093635" cy="346760"/>
           </a:xfrm>
           <a:prstGeom prst="rect">
@@ -7616,7 +7613,7 @@
         </p:nvSpPr>
         <p:spPr>
           <a:xfrm>
-            <a:off x="2592528" y="3179160"/>
+            <a:off x="1832263" y="3179160"/>
             <a:ext cx="1093635" cy="236841"/>
           </a:xfrm>
           <a:prstGeom prst="rect">
@@ -7676,7 +7673,7 @@
         </p:nvSpPr>
         <p:spPr>
           <a:xfrm>
-            <a:off x="2092842" y="1770924"/>
+            <a:off x="1332577" y="1770924"/>
             <a:ext cx="1093635" cy="346760"/>
           </a:xfrm>
           <a:prstGeom prst="rect">
@@ -7738,7 +7735,7 @@
         </p:nvCxnSpPr>
         <p:spPr>
           <a:xfrm rot="16200000" flipH="1">
-            <a:off x="2529445" y="2227899"/>
+            <a:off x="1769180" y="2227899"/>
             <a:ext cx="223536" cy="3106"/>
           </a:xfrm>
           <a:prstGeom prst="bentConnector3">
@@ -7778,7 +7775,7 @@
         </p:nvSpPr>
         <p:spPr>
           <a:xfrm rot="10800000" flipV="1">
-            <a:off x="5394717" y="2110477"/>
+            <a:off x="4634452" y="2110477"/>
             <a:ext cx="270504" cy="175523"/>
           </a:xfrm>
           <a:prstGeom prst="triangle">
@@ -7869,8 +7866,8 @@
         </p:nvSpPr>
         <p:spPr>
           <a:xfrm rot="16200000">
-            <a:off x="5703829" y="2464877"/>
-            <a:ext cx="2362201" cy="328045"/>
+            <a:off x="5414553" y="1993888"/>
+            <a:ext cx="1420226" cy="328045"/>
           </a:xfrm>
           <a:prstGeom prst="roundRect">
             <a:avLst/>
@@ -7929,7 +7926,7 @@
         </p:nvSpPr>
         <p:spPr>
           <a:xfrm>
-            <a:off x="2592528" y="3649359"/>
+            <a:off x="1817442" y="3664719"/>
             <a:ext cx="1093635" cy="236841"/>
           </a:xfrm>
           <a:prstGeom prst="rect">
@@ -7962,14 +7959,14 @@
           <a:p>
             <a:pPr algn="ctr"/>
             <a:r>
-              <a:rPr lang="en-US" sz="1050" b="1" dirty="0" err="1">
+              <a:rPr lang="en-US" sz="1050" b="1" dirty="0" err="1" smtClean="0">
                 <a:solidFill>
                   <a:schemeClr val="accent3">
                     <a:lumMod val="75000"/>
                   </a:schemeClr>
                 </a:solidFill>
               </a:rPr>
-              <a:t>BrowserPanel</a:t>
+              <a:t>ListingHeader</a:t>
             </a:r>
             <a:endParaRPr lang="en-SG" sz="1050" b="1" dirty="0">
               <a:solidFill>
@@ -7989,7 +7986,7 @@
         </p:nvSpPr>
         <p:spPr>
           <a:xfrm>
-            <a:off x="2592527" y="4563759"/>
+            <a:off x="1832262" y="4563759"/>
             <a:ext cx="1093635" cy="236841"/>
           </a:xfrm>
           <a:prstGeom prst="rect">
@@ -8049,8 +8046,8 @@
         </p:nvSpPr>
         <p:spPr>
           <a:xfrm>
-            <a:off x="2592526" y="3991960"/>
-            <a:ext cx="1093635" cy="236841"/>
+            <a:off x="1832261" y="4067345"/>
+            <a:ext cx="1093635" cy="216896"/>
           </a:xfrm>
           <a:prstGeom prst="rect">
             <a:avLst/>
@@ -8109,7 +8106,7 @@
         </p:nvSpPr>
         <p:spPr>
           <a:xfrm>
-            <a:off x="3839323" y="4228801"/>
+            <a:off x="3109273" y="4295173"/>
             <a:ext cx="1040906" cy="236841"/>
           </a:xfrm>
           <a:prstGeom prst="rect">
@@ -8169,7 +8166,7 @@
         </p:nvSpPr>
         <p:spPr>
           <a:xfrm>
-            <a:off x="2592528" y="4966000"/>
+            <a:off x="1821006" y="4961697"/>
             <a:ext cx="1093635" cy="236841"/>
           </a:xfrm>
           <a:prstGeom prst="rect">
@@ -8229,7 +8226,7 @@
         </p:nvSpPr>
         <p:spPr>
           <a:xfrm>
-            <a:off x="2324548" y="2706452"/>
+            <a:off x="1564283" y="2706452"/>
             <a:ext cx="183156" cy="161573"/>
           </a:xfrm>
           <a:prstGeom prst="flowChartDecision">
@@ -8280,7 +8277,7 @@
         </p:nvCxnSpPr>
         <p:spPr>
           <a:xfrm rot="16200000" flipH="1">
-            <a:off x="2289549" y="2994602"/>
+            <a:off x="1529284" y="2994602"/>
             <a:ext cx="429556" cy="176402"/>
           </a:xfrm>
           <a:prstGeom prst="bentConnector2">
@@ -8318,7 +8315,7 @@
         </p:nvSpPr>
         <p:spPr>
           <a:xfrm>
-            <a:off x="3759694" y="3416961"/>
+            <a:off x="2999429" y="3416961"/>
             <a:ext cx="1040906" cy="236841"/>
           </a:xfrm>
           <a:prstGeom prst="rect">
@@ -8381,8 +8378,8 @@
         </p:nvCxnSpPr>
         <p:spPr>
           <a:xfrm rot="16200000" flipH="1">
-            <a:off x="2054450" y="3229701"/>
-            <a:ext cx="899755" cy="176402"/>
+            <a:off x="1279094" y="3244791"/>
+            <a:ext cx="915115" cy="161581"/>
           </a:xfrm>
           <a:prstGeom prst="bentConnector2">
             <a:avLst/>
@@ -8422,8 +8419,8 @@
         </p:nvCxnSpPr>
         <p:spPr>
           <a:xfrm rot="16200000" flipH="1">
-            <a:off x="1883148" y="3401003"/>
-            <a:ext cx="1242356" cy="176400"/>
+            <a:off x="1090177" y="3433709"/>
+            <a:ext cx="1307768" cy="176400"/>
           </a:xfrm>
           <a:prstGeom prst="bentConnector2">
             <a:avLst/>
@@ -8463,7 +8460,7 @@
         </p:nvCxnSpPr>
         <p:spPr>
           <a:xfrm rot="16200000" flipH="1">
-            <a:off x="1597249" y="3686901"/>
+            <a:off x="836984" y="3686901"/>
             <a:ext cx="1814155" cy="176401"/>
           </a:xfrm>
           <a:prstGeom prst="bentConnector2">
@@ -8503,7 +8500,7 @@
         </p:nvCxnSpPr>
         <p:spPr>
           <a:xfrm rot="16200000" flipH="1">
-            <a:off x="1184119" y="3676012"/>
+            <a:off x="412597" y="3671709"/>
             <a:ext cx="2396440" cy="420377"/>
           </a:xfrm>
           <a:prstGeom prst="bentConnector2">
@@ -8541,7 +8538,7 @@
         </p:nvSpPr>
         <p:spPr>
           <a:xfrm>
-            <a:off x="5143948" y="1770924"/>
+            <a:off x="4383683" y="1770924"/>
             <a:ext cx="772043" cy="346760"/>
           </a:xfrm>
           <a:prstGeom prst="rect">
@@ -8623,7 +8620,7 @@
         </p:nvCxnSpPr>
         <p:spPr>
           <a:xfrm flipV="1">
-            <a:off x="4800600" y="2286000"/>
+            <a:off x="4040335" y="2286000"/>
             <a:ext cx="729369" cy="1249382"/>
           </a:xfrm>
           <a:prstGeom prst="bentConnector2">
@@ -8664,8 +8661,8 @@
         </p:nvCxnSpPr>
         <p:spPr>
           <a:xfrm rot="5400000">
-            <a:off x="4174488" y="2991741"/>
-            <a:ext cx="2061222" cy="649740"/>
+            <a:off x="3396145" y="3040035"/>
+            <a:ext cx="2127594" cy="619525"/>
           </a:xfrm>
           <a:prstGeom prst="bentConnector2">
             <a:avLst/>
@@ -8705,8 +8702,8 @@
         </p:nvCxnSpPr>
         <p:spPr>
           <a:xfrm rot="5400000">
-            <a:off x="3867176" y="2104987"/>
-            <a:ext cx="1481780" cy="1843806"/>
+            <a:off x="3091821" y="2105257"/>
+            <a:ext cx="1497140" cy="1858627"/>
           </a:xfrm>
           <a:prstGeom prst="bentConnector2">
             <a:avLst/>
@@ -8738,19 +8735,18 @@
       <p:cxnSp>
         <p:nvCxnSpPr>
           <p:cNvPr id="88" name="Elbow Connector 63"/>
-          <p:cNvCxnSpPr>
-            <a:stCxn id="2" idx="3"/>
-            <a:endCxn id="16" idx="3"/>
-          </p:cNvCxnSpPr>
+          <p:cNvCxnSpPr/>
           <p:nvPr/>
         </p:nvCxnSpPr>
         <p:spPr>
-          <a:xfrm flipV="1">
-            <a:off x="3189583" y="2286000"/>
-            <a:ext cx="2340386" cy="228600"/>
-          </a:xfrm>
-          <a:prstGeom prst="bentConnector2">
-            <a:avLst/>
+          <a:xfrm>
+            <a:off x="2419350" y="2504534"/>
+            <a:ext cx="2356652" cy="2517"/>
+          </a:xfrm>
+          <a:prstGeom prst="bentConnector3">
+            <a:avLst>
+              <a:gd name="adj1" fmla="val 50000"/>
+            </a:avLst>
           </a:prstGeom>
           <a:ln w="6350">
             <a:solidFill>
@@ -8779,15 +8775,12 @@
       <p:cxnSp>
         <p:nvCxnSpPr>
           <p:cNvPr id="91" name="Elbow Connector 63"/>
-          <p:cNvCxnSpPr>
-            <a:stCxn id="16" idx="3"/>
-            <a:endCxn id="35" idx="3"/>
-          </p:cNvCxnSpPr>
+          <p:cNvCxnSpPr/>
           <p:nvPr/>
         </p:nvCxnSpPr>
         <p:spPr>
           <a:xfrm rot="5400000">
-            <a:off x="3409976" y="2562187"/>
+            <a:off x="2639807" y="2573274"/>
             <a:ext cx="2396180" cy="1843807"/>
           </a:xfrm>
           <a:prstGeom prst="bentConnector2">
@@ -8828,8 +8821,8 @@
         </p:nvCxnSpPr>
         <p:spPr>
           <a:xfrm rot="5400000">
-            <a:off x="3208856" y="2763307"/>
-            <a:ext cx="2798421" cy="1843806"/>
+            <a:off x="2445114" y="2755528"/>
+            <a:ext cx="2794118" cy="1855063"/>
           </a:xfrm>
           <a:prstGeom prst="bentConnector2">
             <a:avLst/>
@@ -8866,7 +8859,7 @@
         </p:nvSpPr>
         <p:spPr>
           <a:xfrm>
-            <a:off x="3657600" y="1770924"/>
+            <a:off x="2897335" y="1770924"/>
             <a:ext cx="1031399" cy="346760"/>
           </a:xfrm>
           <a:prstGeom prst="rect">
@@ -8927,7 +8920,7 @@
         </p:nvCxnSpPr>
         <p:spPr>
           <a:xfrm rot="5400000" flipH="1" flipV="1">
-            <a:off x="4594921" y="-355061"/>
+            <a:off x="3834656" y="-355061"/>
             <a:ext cx="170724" cy="4081246"/>
           </a:xfrm>
           <a:prstGeom prst="bentConnector2">
@@ -8966,7 +8959,7 @@
         </p:nvCxnSpPr>
         <p:spPr>
           <a:xfrm flipV="1">
-            <a:off x="3198609" y="1944304"/>
+            <a:off x="2438344" y="1944304"/>
             <a:ext cx="484448" cy="2308"/>
           </a:xfrm>
           <a:prstGeom prst="straightConnector1">
@@ -9006,7 +8999,7 @@
         </p:nvCxnSpPr>
         <p:spPr>
           <a:xfrm flipV="1">
-            <a:off x="4714456" y="1944304"/>
+            <a:off x="3954191" y="1944304"/>
             <a:ext cx="429492" cy="2308"/>
           </a:xfrm>
           <a:prstGeom prst="straightConnector1">
@@ -9045,7 +9038,7 @@
         </p:nvSpPr>
         <p:spPr>
           <a:xfrm rot="16200000">
-            <a:off x="6213739" y="4560376"/>
+            <a:off x="5447499" y="4816950"/>
             <a:ext cx="1371599" cy="328045"/>
           </a:xfrm>
           <a:prstGeom prst="roundRect">
@@ -9105,7 +9098,7 @@
         </p:nvSpPr>
         <p:spPr>
           <a:xfrm rot="16200000">
-            <a:off x="956202" y="2861202"/>
+            <a:off x="195937" y="2861202"/>
             <a:ext cx="1093635" cy="346760"/>
           </a:xfrm>
           <a:prstGeom prst="rect">
@@ -9175,7 +9168,7 @@
         </p:nvSpPr>
         <p:spPr>
           <a:xfrm flipV="1">
-            <a:off x="1367767" y="2286001"/>
+            <a:off x="607502" y="2286001"/>
             <a:ext cx="270504" cy="175523"/>
           </a:xfrm>
           <a:prstGeom prst="triangle">
@@ -9226,7 +9219,7 @@
         </p:nvCxnSpPr>
         <p:spPr>
           <a:xfrm rot="10800000" flipV="1">
-            <a:off x="1503020" y="1944303"/>
+            <a:off x="742755" y="1944303"/>
             <a:ext cx="589823" cy="341697"/>
           </a:xfrm>
           <a:prstGeom prst="bentConnector2">
@@ -9268,7 +9261,7 @@
         </p:nvCxnSpPr>
         <p:spPr>
           <a:xfrm rot="16200000" flipH="1">
-            <a:off x="3389830" y="3165517"/>
+            <a:off x="2629565" y="3165517"/>
             <a:ext cx="119381" cy="620348"/>
           </a:xfrm>
           <a:prstGeom prst="bentConnector2">
@@ -9309,7 +9302,7 @@
         </p:nvCxnSpPr>
         <p:spPr>
           <a:xfrm rot="5400000">
-            <a:off x="4102276" y="1869887"/>
+            <a:off x="3342011" y="1869887"/>
             <a:ext cx="1011581" cy="1843806"/>
           </a:xfrm>
           <a:prstGeom prst="bentConnector2">
@@ -9350,8 +9343,8 @@
         </p:nvCxnSpPr>
         <p:spPr>
           <a:xfrm rot="16200000" flipH="1">
-            <a:off x="3430123" y="3938021"/>
-            <a:ext cx="118421" cy="699979"/>
+            <a:off x="2679500" y="3983820"/>
+            <a:ext cx="129353" cy="730194"/>
           </a:xfrm>
           <a:prstGeom prst="bentConnector2">
             <a:avLst/>
@@ -9391,8 +9384,8 @@
         </p:nvCxnSpPr>
         <p:spPr>
           <a:xfrm rot="5400000">
-            <a:off x="3695875" y="2276286"/>
-            <a:ext cx="1824381" cy="1843808"/>
+            <a:off x="2902904" y="2308992"/>
+            <a:ext cx="1889793" cy="1843808"/>
           </a:xfrm>
           <a:prstGeom prst="bentConnector2">
             <a:avLst/>
@@ -9429,7 +9422,7 @@
         </p:nvSpPr>
         <p:spPr>
           <a:xfrm>
-            <a:off x="5435896" y="2895600"/>
+            <a:off x="4634452" y="2613437"/>
             <a:ext cx="229325" cy="166560"/>
           </a:xfrm>
           <a:prstGeom prst="rect">
@@ -9482,8 +9475,8 @@
         </p:nvSpPr>
         <p:spPr>
           <a:xfrm>
-            <a:off x="3687515" y="2981202"/>
-            <a:ext cx="3048000" cy="203200"/>
+            <a:off x="2927250" y="2687980"/>
+            <a:ext cx="3048000" cy="496422"/>
           </a:xfrm>
           <a:custGeom>
             <a:avLst/>
@@ -9564,7 +9557,7 @@
         </p:nvSpPr>
         <p:spPr>
           <a:xfrm>
-            <a:off x="5431573" y="4488138"/>
+            <a:off x="4658191" y="4566148"/>
             <a:ext cx="229325" cy="160062"/>
           </a:xfrm>
           <a:prstGeom prst="rect">
@@ -9617,8 +9610,8 @@
         </p:nvSpPr>
         <p:spPr>
           <a:xfrm flipV="1">
-            <a:off x="4114799" y="4472708"/>
-            <a:ext cx="2642195" cy="101600"/>
+            <a:off x="3341230" y="4532535"/>
+            <a:ext cx="2642195" cy="108666"/>
           </a:xfrm>
           <a:custGeom>
             <a:avLst/>
@@ -9691,6 +9684,183 @@
           </a:p>
         </p:txBody>
       </p:sp>
+      <p:sp>
+        <p:nvSpPr>
+          <p:cNvPr id="83" name="Rectangle 65"/>
+          <p:cNvSpPr/>
+          <p:nvPr/>
+        </p:nvSpPr>
+        <p:spPr>
+          <a:xfrm rot="16200000">
+            <a:off x="5530773" y="3445350"/>
+            <a:ext cx="1212341" cy="328045"/>
+          </a:xfrm>
+          <a:prstGeom prst="roundRect">
+            <a:avLst/>
+          </a:prstGeom>
+          <a:solidFill>
+            <a:schemeClr val="accent1">
+              <a:lumMod val="20000"/>
+              <a:lumOff val="80000"/>
+            </a:schemeClr>
+          </a:solidFill>
+          <a:ln w="19050">
+            <a:noFill/>
+          </a:ln>
+          <a:effectLst/>
+        </p:spPr>
+        <p:style>
+          <a:lnRef idx="1">
+            <a:schemeClr val="accent2"/>
+          </a:lnRef>
+          <a:fillRef idx="2">
+            <a:schemeClr val="accent2"/>
+          </a:fillRef>
+          <a:effectRef idx="1">
+            <a:schemeClr val="accent2"/>
+          </a:effectRef>
+          <a:fontRef idx="minor">
+            <a:schemeClr val="dk1"/>
+          </a:fontRef>
+        </p:style>
+        <p:txBody>
+          <a:bodyPr rtlCol="0" anchor="ctr"/>
+          <a:lstStyle/>
+          <a:p>
+            <a:pPr algn="ctr"/>
+            <a:r>
+              <a:rPr lang="en-US" sz="1100" b="1" dirty="0" smtClean="0">
+                <a:solidFill>
+                  <a:schemeClr val="bg1"/>
+                </a:solidFill>
+              </a:rPr>
+              <a:t>Commons</a:t>
+            </a:r>
+            <a:endParaRPr lang="en-SG" sz="1100" b="1" dirty="0">
+              <a:solidFill>
+                <a:schemeClr val="bg1"/>
+              </a:solidFill>
+            </a:endParaRPr>
+          </a:p>
+        </p:txBody>
+      </p:sp>
+      <p:cxnSp>
+        <p:nvCxnSpPr>
+          <p:cNvPr id="84" name="Straight Arrow Connector 83"/>
+          <p:cNvCxnSpPr/>
+          <p:nvPr/>
+        </p:nvCxnSpPr>
+        <p:spPr>
+          <a:xfrm>
+            <a:off x="5384186" y="3581400"/>
+            <a:ext cx="607525" cy="0"/>
+          </a:xfrm>
+          <a:prstGeom prst="straightConnector1">
+            <a:avLst/>
+          </a:prstGeom>
+          <a:ln w="19050">
+            <a:solidFill>
+              <a:schemeClr val="accent3"/>
+            </a:solidFill>
+            <a:prstDash val="sysDot"/>
+            <a:headEnd type="none" w="med" len="med"/>
+            <a:tailEnd type="arrow" w="med" len="med"/>
+          </a:ln>
+          <a:effectLst/>
+        </p:spPr>
+        <p:style>
+          <a:lnRef idx="1">
+            <a:schemeClr val="accent2"/>
+          </a:lnRef>
+          <a:fillRef idx="2">
+            <a:schemeClr val="accent2"/>
+          </a:fillRef>
+          <a:effectRef idx="1">
+            <a:schemeClr val="accent2"/>
+          </a:effectRef>
+          <a:fontRef idx="minor">
+            <a:schemeClr val="dk1"/>
+          </a:fontRef>
+        </p:style>
+      </p:cxnSp>
+      <p:cxnSp>
+        <p:nvCxnSpPr>
+          <p:cNvPr id="86" name="Straight Arrow Connector 85"/>
+          <p:cNvCxnSpPr/>
+          <p:nvPr/>
+        </p:nvCxnSpPr>
+        <p:spPr>
+          <a:xfrm>
+            <a:off x="5384186" y="3923704"/>
+            <a:ext cx="609802" cy="575"/>
+          </a:xfrm>
+          <a:prstGeom prst="straightConnector1">
+            <a:avLst/>
+          </a:prstGeom>
+          <a:ln w="19050">
+            <a:solidFill>
+              <a:schemeClr val="accent3"/>
+            </a:solidFill>
+            <a:prstDash val="sysDot"/>
+            <a:headEnd type="none" w="med" len="med"/>
+            <a:tailEnd type="arrow" w="med" len="med"/>
+          </a:ln>
+          <a:effectLst/>
+        </p:spPr>
+        <p:style>
+          <a:lnRef idx="1">
+            <a:schemeClr val="accent2"/>
+          </a:lnRef>
+          <a:fillRef idx="2">
+            <a:schemeClr val="accent2"/>
+          </a:fillRef>
+          <a:effectRef idx="1">
+            <a:schemeClr val="accent2"/>
+          </a:effectRef>
+          <a:fontRef idx="minor">
+            <a:schemeClr val="dk1"/>
+          </a:fontRef>
+        </p:style>
+      </p:cxnSp>
+      <p:cxnSp>
+        <p:nvCxnSpPr>
+          <p:cNvPr id="93" name="Straight Arrow Connector 92"/>
+          <p:cNvCxnSpPr/>
+          <p:nvPr/>
+        </p:nvCxnSpPr>
+        <p:spPr>
+          <a:xfrm>
+            <a:off x="5361708" y="3743078"/>
+            <a:ext cx="632280" cy="7745"/>
+          </a:xfrm>
+          <a:prstGeom prst="straightConnector1">
+            <a:avLst/>
+          </a:prstGeom>
+          <a:ln w="19050">
+            <a:solidFill>
+              <a:schemeClr val="accent3"/>
+            </a:solidFill>
+            <a:prstDash val="sysDot"/>
+            <a:headEnd type="none" w="med" len="med"/>
+            <a:tailEnd type="arrow" w="med" len="med"/>
+          </a:ln>
+          <a:effectLst/>
+        </p:spPr>
+        <p:style>
+          <a:lnRef idx="1">
+            <a:schemeClr val="accent2"/>
+          </a:lnRef>
+          <a:fillRef idx="2">
+            <a:schemeClr val="accent2"/>
+          </a:fillRef>
+          <a:effectRef idx="1">
+            <a:schemeClr val="accent2"/>
+          </a:effectRef>
+          <a:fontRef idx="minor">
+            <a:schemeClr val="dk1"/>
+          </a:fontRef>
+        </p:style>
+      </p:cxnSp>
     </p:spTree>
     <p:extLst>
       <p:ext uri="{BB962C8B-B14F-4D97-AF65-F5344CB8AC3E}">
@@ -9736,8 +9906,8 @@
         </p:nvSpPr>
         <p:spPr>
           <a:xfrm>
-            <a:off x="1103085" y="2057399"/>
-            <a:ext cx="6288315" cy="2272167"/>
+            <a:off x="582616" y="2087087"/>
+            <a:ext cx="6781800" cy="2971801"/>
           </a:xfrm>
           <a:prstGeom prst="roundRect">
             <a:avLst>
@@ -9918,7 +10088,7 @@
         </p:nvSpPr>
         <p:spPr>
           <a:xfrm>
-            <a:off x="2015218" y="3763620"/>
+            <a:off x="2004663" y="3423768"/>
             <a:ext cx="1093635" cy="346760"/>
           </a:xfrm>
           <a:prstGeom prst="rect">
@@ -9978,13 +10148,13 @@
           <p:nvPr/>
         </p:nvCxnSpPr>
         <p:spPr>
-          <a:xfrm rot="10800000">
-            <a:off x="3189584" y="2722220"/>
-            <a:ext cx="2296817" cy="1187104"/>
+          <a:xfrm rot="10800000" flipV="1">
+            <a:off x="3189583" y="2716746"/>
+            <a:ext cx="2990642" cy="5474"/>
           </a:xfrm>
           <a:prstGeom prst="bentConnector3">
             <a:avLst>
-              <a:gd name="adj1" fmla="val -267"/>
+              <a:gd name="adj1" fmla="val 50000"/>
             </a:avLst>
           </a:prstGeom>
           <a:ln w="19050">
@@ -10020,7 +10190,7 @@
         </p:nvSpPr>
         <p:spPr>
           <a:xfrm rot="5400000" flipV="1">
-            <a:off x="5563388" y="3813212"/>
+            <a:off x="5622391" y="3542624"/>
             <a:ext cx="270504" cy="175523"/>
           </a:xfrm>
           <a:prstGeom prst="triangle">
@@ -10076,8 +10246,8 @@
         </p:nvCxnSpPr>
         <p:spPr>
           <a:xfrm>
-            <a:off x="1676400" y="2719360"/>
-            <a:ext cx="419548" cy="2860"/>
+            <a:off x="1277983" y="2716746"/>
+            <a:ext cx="817965" cy="5474"/>
           </a:xfrm>
           <a:prstGeom prst="bentConnector3">
             <a:avLst>
@@ -10117,8 +10287,8 @@
         </p:nvSpPr>
         <p:spPr>
           <a:xfrm>
-            <a:off x="1103085" y="4548755"/>
-            <a:ext cx="6288315" cy="328045"/>
+            <a:off x="609601" y="5204307"/>
+            <a:ext cx="6780813" cy="328045"/>
           </a:xfrm>
           <a:prstGeom prst="roundRect">
             <a:avLst/>
@@ -10239,7 +10409,7 @@
         </p:nvSpPr>
         <p:spPr>
           <a:xfrm flipH="1">
-            <a:off x="6180590" y="3860800"/>
+            <a:off x="6173092" y="3457827"/>
             <a:ext cx="1093635" cy="346760"/>
           </a:xfrm>
           <a:prstGeom prst="rect">
@@ -10278,12 +10448,12 @@
           <a:p>
             <a:pPr algn="ctr"/>
             <a:r>
-              <a:rPr lang="en-US" sz="1050" b="1" dirty="0">
+              <a:rPr lang="en-SG" sz="1050" b="1" smtClean="0">
                 <a:solidFill>
                   <a:srgbClr val="0070C0"/>
                 </a:solidFill>
               </a:rPr>
-              <a:t>…</a:t>
+              <a:t>EditCommand</a:t>
             </a:r>
             <a:endParaRPr lang="en-SG" sz="1050" b="1" dirty="0">
               <a:solidFill>
@@ -10301,7 +10471,7 @@
         </p:nvSpPr>
         <p:spPr>
           <a:xfrm>
-            <a:off x="4815685" y="3765721"/>
+            <a:off x="4891984" y="3423767"/>
             <a:ext cx="772043" cy="346760"/>
           </a:xfrm>
           <a:prstGeom prst="rect">
@@ -10381,8 +10551,8 @@
         </p:nvCxnSpPr>
         <p:spPr>
           <a:xfrm rot="10800000" flipV="1">
-            <a:off x="5786402" y="2821908"/>
-            <a:ext cx="394190" cy="1079066"/>
+            <a:off x="5845406" y="2821908"/>
+            <a:ext cx="335187" cy="808478"/>
           </a:xfrm>
           <a:prstGeom prst="bentConnector3">
             <a:avLst>
@@ -10424,8 +10594,8 @@
         </p:nvCxnSpPr>
         <p:spPr>
           <a:xfrm>
-            <a:off x="5786402" y="3900974"/>
-            <a:ext cx="394188" cy="133206"/>
+            <a:off x="5845405" y="3630386"/>
+            <a:ext cx="327687" cy="821"/>
           </a:xfrm>
           <a:prstGeom prst="bentConnector3">
             <a:avLst>
@@ -10467,8 +10637,8 @@
         </p:nvCxnSpPr>
         <p:spPr>
           <a:xfrm flipV="1">
-            <a:off x="5786402" y="3228308"/>
-            <a:ext cx="394190" cy="672666"/>
+            <a:off x="5845405" y="3228308"/>
+            <a:ext cx="335187" cy="402078"/>
           </a:xfrm>
           <a:prstGeom prst="bentConnector3">
             <a:avLst>
@@ -10507,7 +10677,7 @@
         </p:nvSpPr>
         <p:spPr>
           <a:xfrm>
-            <a:off x="3527828" y="3766159"/>
+            <a:off x="3553336" y="3423767"/>
             <a:ext cx="585450" cy="346760"/>
           </a:xfrm>
           <a:prstGeom prst="rect">
@@ -10568,9 +10738,9 @@
           <p:nvPr/>
         </p:nvCxnSpPr>
         <p:spPr>
-          <a:xfrm>
-            <a:off x="3108853" y="3937000"/>
-            <a:ext cx="418975" cy="2539"/>
+          <a:xfrm flipV="1">
+            <a:off x="3098298" y="3597147"/>
+            <a:ext cx="455038" cy="1"/>
           </a:xfrm>
           <a:prstGeom prst="bentConnector3">
             <a:avLst>
@@ -10611,9 +10781,9 @@
           <p:nvPr/>
         </p:nvCxnSpPr>
         <p:spPr>
-          <a:xfrm>
-            <a:off x="5201707" y="4112481"/>
-            <a:ext cx="1" cy="436274"/>
+          <a:xfrm flipH="1">
+            <a:off x="5278005" y="3770527"/>
+            <a:ext cx="1" cy="1465665"/>
           </a:xfrm>
           <a:prstGeom prst="straightConnector1">
             <a:avLst/>
@@ -10651,8 +10821,8 @@
         </p:nvSpPr>
         <p:spPr>
           <a:xfrm rot="16200000">
-            <a:off x="956202" y="2861202"/>
-            <a:ext cx="1093635" cy="346760"/>
+            <a:off x="-51816" y="3470802"/>
+            <a:ext cx="2312838" cy="346760"/>
           </a:xfrm>
           <a:prstGeom prst="rect">
             <a:avLst/>
@@ -10720,8 +10890,8 @@
           <p:nvPr/>
         </p:nvSpPr>
         <p:spPr>
-          <a:xfrm>
-            <a:off x="1359039" y="3581400"/>
+          <a:xfrm rot="16200000">
+            <a:off x="1233066" y="3505062"/>
             <a:ext cx="270504" cy="175523"/>
           </a:xfrm>
           <a:prstGeom prst="triangle">
@@ -10778,11 +10948,13 @@
         </p:nvCxnSpPr>
         <p:spPr>
           <a:xfrm rot="10800000">
-            <a:off x="1494292" y="3756924"/>
-            <a:ext cx="520927" cy="180077"/>
-          </a:xfrm>
-          <a:prstGeom prst="bentConnector2">
-            <a:avLst/>
+            <a:off x="1456081" y="3592824"/>
+            <a:ext cx="548583" cy="4324"/>
+          </a:xfrm>
+          <a:prstGeom prst="bentConnector3">
+            <a:avLst>
+              <a:gd name="adj1" fmla="val 50000"/>
+            </a:avLst>
           </a:prstGeom>
           <a:ln w="19050">
             <a:solidFill>
@@ -10819,9 +10991,9 @@
           <p:nvPr/>
         </p:nvCxnSpPr>
         <p:spPr>
-          <a:xfrm flipV="1">
-            <a:off x="4113278" y="3939101"/>
-            <a:ext cx="702407" cy="438"/>
+          <a:xfrm>
+            <a:off x="4138786" y="3597147"/>
+            <a:ext cx="753198" cy="0"/>
           </a:xfrm>
           <a:prstGeom prst="straightConnector1">
             <a:avLst/>
@@ -10860,9 +11032,9 @@
           <p:nvPr/>
         </p:nvCxnSpPr>
         <p:spPr>
-          <a:xfrm flipH="1">
-            <a:off x="2562035" y="4110380"/>
-            <a:ext cx="1" cy="438375"/>
+          <a:xfrm>
+            <a:off x="2551481" y="3770528"/>
+            <a:ext cx="0" cy="1433779"/>
           </a:xfrm>
           <a:prstGeom prst="straightConnector1">
             <a:avLst/>
@@ -10899,8 +11071,8 @@
         </p:nvCxnSpPr>
         <p:spPr>
           <a:xfrm>
-            <a:off x="893311" y="2984905"/>
-            <a:ext cx="419548" cy="2860"/>
+            <a:off x="394067" y="2986335"/>
+            <a:ext cx="918792" cy="1430"/>
           </a:xfrm>
           <a:prstGeom prst="bentConnector3">
             <a:avLst>
@@ -10944,13 +11116,13 @@
           <p:nvPr/>
         </p:nvCxnSpPr>
         <p:spPr>
-          <a:xfrm rot="16200000" flipH="1">
-            <a:off x="3880820" y="2444835"/>
-            <a:ext cx="2101" cy="2639671"/>
+          <a:xfrm rot="5400000" flipH="1" flipV="1">
+            <a:off x="3914743" y="2060506"/>
+            <a:ext cx="1" cy="2726525"/>
           </a:xfrm>
           <a:prstGeom prst="bentConnector3">
             <a:avLst>
-              <a:gd name="adj1" fmla="val -10880533"/>
+              <a:gd name="adj1" fmla="val 22860100000"/>
             </a:avLst>
           </a:prstGeom>
           <a:ln w="19050">
@@ -10986,7 +11158,7 @@
         </p:nvGrpSpPr>
         <p:grpSpPr>
           <a:xfrm>
-            <a:off x="4064583" y="3334635"/>
+            <a:off x="3888599" y="2986335"/>
             <a:ext cx="889000" cy="230832"/>
             <a:chOff x="2895600" y="807932"/>
             <a:chExt cx="889000" cy="230832"/>
@@ -11224,7 +11396,7 @@
         </p:nvSpPr>
         <p:spPr>
           <a:xfrm>
-            <a:off x="3341296" y="3700114"/>
+            <a:off x="3330351" y="3342156"/>
             <a:ext cx="131116" cy="230832"/>
           </a:xfrm>
           <a:prstGeom prst="rect">
@@ -11263,7 +11435,7 @@
         </p:nvGrpSpPr>
         <p:grpSpPr>
           <a:xfrm>
-            <a:off x="4038600" y="3962400"/>
+            <a:off x="4100153" y="3413471"/>
             <a:ext cx="685800" cy="230832"/>
             <a:chOff x="2797314" y="807932"/>
             <a:chExt cx="685800" cy="230832"/>
@@ -11363,7 +11535,7 @@
         </p:nvSpPr>
         <p:spPr>
           <a:xfrm flipH="1">
-            <a:off x="6185390" y="3458098"/>
+            <a:off x="6173092" y="3874265"/>
             <a:ext cx="1093635" cy="346760"/>
           </a:xfrm>
           <a:prstGeom prst="rect">
@@ -11434,17 +11606,14 @@
       </p:sp>
       <p:cxnSp>
         <p:nvCxnSpPr>
-          <p:cNvPr id="45" name="Elbow Connector 63"/>
-          <p:cNvCxnSpPr>
-            <a:stCxn id="8" idx="3"/>
-            <a:endCxn id="44" idx="3"/>
-          </p:cNvCxnSpPr>
+          <p:cNvPr id="46" name="Elbow Connector 122"/>
+          <p:cNvCxnSpPr/>
           <p:nvPr/>
         </p:nvCxnSpPr>
         <p:spPr>
-          <a:xfrm flipV="1">
-            <a:off x="5786402" y="3631478"/>
-            <a:ext cx="398988" cy="269496"/>
+          <a:xfrm rot="5400000" flipH="1" flipV="1">
+            <a:off x="1806509" y="3291587"/>
+            <a:ext cx="882304" cy="12700"/>
           </a:xfrm>
           <a:prstGeom prst="bentConnector3">
             <a:avLst>
@@ -11455,6 +11624,109 @@
             <a:solidFill>
               <a:srgbClr val="0070C0"/>
             </a:solidFill>
+            <a:prstDash val="sysDot"/>
+            <a:headEnd type="none" w="med" len="med"/>
+            <a:tailEnd type="arrow" w="med" len="med"/>
+          </a:ln>
+          <a:effectLst/>
+        </p:spPr>
+        <p:style>
+          <a:lnRef idx="1">
+            <a:schemeClr val="accent2"/>
+          </a:lnRef>
+          <a:fillRef idx="2">
+            <a:schemeClr val="accent2"/>
+          </a:fillRef>
+          <a:effectRef idx="1">
+            <a:schemeClr val="accent2"/>
+          </a:effectRef>
+          <a:fontRef idx="minor">
+            <a:schemeClr val="dk1"/>
+          </a:fontRef>
+        </p:style>
+      </p:cxnSp>
+      <p:sp>
+        <p:nvSpPr>
+          <p:cNvPr id="48" name="Rectangle 8"/>
+          <p:cNvSpPr/>
+          <p:nvPr/>
+        </p:nvSpPr>
+        <p:spPr>
+          <a:xfrm>
+            <a:off x="3325817" y="4324871"/>
+            <a:ext cx="1093635" cy="367739"/>
+          </a:xfrm>
+          <a:prstGeom prst="rect">
+            <a:avLst/>
+          </a:prstGeom>
+          <a:solidFill>
+            <a:schemeClr val="accent1">
+              <a:lumMod val="20000"/>
+              <a:lumOff val="80000"/>
+            </a:schemeClr>
+          </a:solidFill>
+          <a:ln w="19050">
+            <a:solidFill>
+              <a:srgbClr val="0070C0"/>
+            </a:solidFill>
+          </a:ln>
+          <a:effectLst/>
+        </p:spPr>
+        <p:style>
+          <a:lnRef idx="1">
+            <a:schemeClr val="accent2"/>
+          </a:lnRef>
+          <a:fillRef idx="2">
+            <a:schemeClr val="accent2"/>
+          </a:fillRef>
+          <a:effectRef idx="1">
+            <a:schemeClr val="accent2"/>
+          </a:effectRef>
+          <a:fontRef idx="minor">
+            <a:schemeClr val="dk1"/>
+          </a:fontRef>
+        </p:style>
+        <p:txBody>
+          <a:bodyPr rtlCol="0" anchor="ctr"/>
+          <a:lstStyle/>
+          <a:p>
+            <a:pPr algn="ctr"/>
+            <a:r>
+              <a:rPr lang="en-US" sz="1050" b="1" dirty="0" err="1" smtClean="0">
+                <a:solidFill>
+                  <a:srgbClr val="0070C0"/>
+                </a:solidFill>
+              </a:rPr>
+              <a:t>DateTimeParser</a:t>
+            </a:r>
+            <a:endParaRPr lang="en-SG" sz="1050" b="1" dirty="0">
+              <a:solidFill>
+                <a:srgbClr val="0070C0"/>
+              </a:solidFill>
+            </a:endParaRPr>
+          </a:p>
+        </p:txBody>
+      </p:sp>
+      <p:cxnSp>
+        <p:nvCxnSpPr>
+          <p:cNvPr id="66" name="Elbow Connector 63"/>
+          <p:cNvCxnSpPr>
+            <a:endCxn id="44" idx="3"/>
+          </p:cNvCxnSpPr>
+          <p:nvPr/>
+        </p:nvCxnSpPr>
+        <p:spPr>
+          <a:xfrm rot="16200000" flipH="1">
+            <a:off x="5881939" y="3756491"/>
+            <a:ext cx="418463" cy="163844"/>
+          </a:xfrm>
+          <a:prstGeom prst="bentConnector2">
+            <a:avLst/>
+          </a:prstGeom>
+          <a:ln w="19050">
+            <a:solidFill>
+              <a:srgbClr val="0070C0"/>
+            </a:solidFill>
             <a:headEnd type="none" w="med" len="med"/>
             <a:tailEnd type="none" w="med" len="med"/>
           </a:ln>
@@ -11477,27 +11749,177 @@
       </p:cxnSp>
       <p:cxnSp>
         <p:nvCxnSpPr>
-          <p:cNvPr id="46" name="Elbow Connector 122"/>
+          <p:cNvPr id="69" name="Straight Arrow Connector 57"/>
+          <p:cNvCxnSpPr>
+            <a:stCxn id="71" idx="2"/>
+            <a:endCxn id="48" idx="0"/>
+          </p:cNvCxnSpPr>
+          <p:nvPr/>
+        </p:nvCxnSpPr>
+        <p:spPr>
+          <a:xfrm>
+            <a:off x="3870016" y="4029833"/>
+            <a:ext cx="2619" cy="295038"/>
+          </a:xfrm>
+          <a:prstGeom prst="straightConnector1">
+            <a:avLst/>
+          </a:prstGeom>
+          <a:ln w="19050">
+            <a:solidFill>
+              <a:srgbClr val="0070C0"/>
+            </a:solidFill>
+            <a:headEnd type="none" w="med" len="med"/>
+            <a:tailEnd type="arrow" w="med" len="med"/>
+          </a:ln>
+          <a:effectLst/>
+        </p:spPr>
+        <p:style>
+          <a:lnRef idx="1">
+            <a:schemeClr val="accent2"/>
+          </a:lnRef>
+          <a:fillRef idx="2">
+            <a:schemeClr val="accent2"/>
+          </a:fillRef>
+          <a:effectRef idx="1">
+            <a:schemeClr val="accent2"/>
+          </a:effectRef>
+          <a:fontRef idx="minor">
+            <a:schemeClr val="dk1"/>
+          </a:fontRef>
+        </p:style>
+      </p:cxnSp>
+      <p:sp>
+        <p:nvSpPr>
+          <p:cNvPr id="71" name="Diamond 70"/>
+          <p:cNvSpPr/>
+          <p:nvPr/>
+        </p:nvSpPr>
+        <p:spPr>
+          <a:xfrm flipH="1">
+            <a:off x="3739168" y="3765637"/>
+            <a:ext cx="261696" cy="264196"/>
+          </a:xfrm>
+          <a:prstGeom prst="diamond">
+            <a:avLst/>
+          </a:prstGeom>
+          <a:solidFill>
+            <a:srgbClr val="0070C0"/>
+          </a:solidFill>
+          <a:ln>
+            <a:solidFill>
+              <a:srgbClr val="0070C0"/>
+            </a:solidFill>
+          </a:ln>
+        </p:spPr>
+        <p:style>
+          <a:lnRef idx="2">
+            <a:schemeClr val="accent1">
+              <a:shade val="50000"/>
+            </a:schemeClr>
+          </a:lnRef>
+          <a:fillRef idx="1">
+            <a:schemeClr val="accent1"/>
+          </a:fillRef>
+          <a:effectRef idx="0">
+            <a:schemeClr val="accent1"/>
+          </a:effectRef>
+          <a:fontRef idx="minor">
+            <a:schemeClr val="lt1"/>
+          </a:fontRef>
+        </p:style>
+        <p:txBody>
+          <a:bodyPr rtlCol="0" anchor="ctr"/>
+          <a:lstStyle/>
+          <a:p>
+            <a:pPr algn="ctr"/>
+            <a:endParaRPr lang="en-US"/>
+          </a:p>
+        </p:txBody>
+      </p:sp>
+      <p:sp>
+        <p:nvSpPr>
+          <p:cNvPr id="77" name="Rectangle 76"/>
+          <p:cNvSpPr/>
+          <p:nvPr/>
+        </p:nvSpPr>
+        <p:spPr>
+          <a:xfrm flipH="1">
+            <a:off x="6180225" y="4288542"/>
+            <a:ext cx="1093635" cy="346760"/>
+          </a:xfrm>
+          <a:prstGeom prst="rect">
+            <a:avLst/>
+          </a:prstGeom>
+          <a:solidFill>
+            <a:schemeClr val="accent3">
+              <a:lumMod val="40000"/>
+              <a:lumOff val="60000"/>
+            </a:schemeClr>
+          </a:solidFill>
+          <a:ln w="19050">
+            <a:solidFill>
+              <a:srgbClr val="0070C0"/>
+            </a:solidFill>
+          </a:ln>
+          <a:effectLst/>
+        </p:spPr>
+        <p:style>
+          <a:lnRef idx="1">
+            <a:schemeClr val="accent1"/>
+          </a:lnRef>
+          <a:fillRef idx="2">
+            <a:schemeClr val="accent1"/>
+          </a:fillRef>
+          <a:effectRef idx="1">
+            <a:schemeClr val="accent1"/>
+          </a:effectRef>
+          <a:fontRef idx="minor">
+            <a:schemeClr val="dk1"/>
+          </a:fontRef>
+        </p:style>
+        <p:txBody>
+          <a:bodyPr rtlCol="0" anchor="ctr"/>
+          <a:lstStyle/>
+          <a:p>
+            <a:pPr algn="ctr"/>
+            <a:r>
+              <a:rPr lang="en-US" sz="1050" b="1" dirty="0">
+                <a:solidFill>
+                  <a:srgbClr val="0070C0"/>
+                </a:solidFill>
+              </a:rPr>
+              <a:t>…</a:t>
+            </a:r>
+            <a:endParaRPr lang="en-SG" sz="1050" b="1" dirty="0">
+              <a:solidFill>
+                <a:srgbClr val="0070C0"/>
+              </a:solidFill>
+            </a:endParaRPr>
+          </a:p>
+        </p:txBody>
+      </p:sp>
+      <p:cxnSp>
+        <p:nvCxnSpPr>
+          <p:cNvPr id="83" name="Elbow Connector 63"/>
           <p:cNvCxnSpPr/>
           <p:nvPr/>
         </p:nvCxnSpPr>
         <p:spPr>
-          <a:xfrm rot="5400000" flipH="1" flipV="1">
-            <a:off x="1807196" y="3315772"/>
-            <a:ext cx="882304" cy="12700"/>
+          <a:xfrm rot="16200000" flipH="1">
+            <a:off x="5891817" y="4165076"/>
+            <a:ext cx="392230" cy="157368"/>
           </a:xfrm>
           <a:prstGeom prst="bentConnector3">
             <a:avLst>
-              <a:gd name="adj1" fmla="val 50000"/>
+              <a:gd name="adj1" fmla="val 104562"/>
             </a:avLst>
           </a:prstGeom>
           <a:ln w="19050">
             <a:solidFill>
               <a:srgbClr val="0070C0"/>
             </a:solidFill>
-            <a:prstDash val="sysDot"/>
             <a:headEnd type="none" w="med" len="med"/>
-            <a:tailEnd type="arrow" w="med" len="med"/>
+            <a:tailEnd type="none" w="med" len="med"/>
           </a:ln>
           <a:effectLst/>
         </p:spPr>
@@ -11561,8 +11983,8 @@
         </p:nvSpPr>
         <p:spPr>
           <a:xfrm>
-            <a:off x="685800" y="1981200"/>
-            <a:ext cx="7086600" cy="4000286"/>
+            <a:off x="690560" y="1676400"/>
+            <a:ext cx="7086600" cy="4272987"/>
           </a:xfrm>
           <a:prstGeom prst="roundRect">
             <a:avLst>
@@ -11833,7 +12255,7 @@
         <p:spPr>
           <a:xfrm>
             <a:off x="3958600" y="2663904"/>
-            <a:ext cx="0" cy="1587652"/>
+            <a:ext cx="0" cy="1878855"/>
           </a:xfrm>
           <a:prstGeom prst="line">
             <a:avLst/>
@@ -11956,12 +12378,12 @@
           <a:p>
             <a:pPr algn="ctr"/>
             <a:r>
-              <a:rPr lang="en-US" sz="1600" dirty="0" smtClean="0">
+              <a:rPr lang="en-US" sz="1600" dirty="0" err="1" smtClean="0">
                 <a:solidFill>
                   <a:schemeClr val="bg1"/>
                 </a:solidFill>
               </a:rPr>
-              <a:t>d:Delete</a:t>
+              <a:t>d:Edit</a:t>
             </a:r>
             <a:r>
               <a:rPr lang="en-US" sz="1600" dirty="0">
@@ -12086,7 +12508,7 @@
         </p:nvCxnSpPr>
         <p:spPr>
           <a:xfrm>
-            <a:off x="152400" y="3010911"/>
+            <a:off x="152400" y="3136962"/>
             <a:ext cx="1510469" cy="3688"/>
           </a:xfrm>
           <a:prstGeom prst="straightConnector1">
@@ -12122,7 +12544,7 @@
         </p:nvCxnSpPr>
         <p:spPr>
           <a:xfrm>
-            <a:off x="1815269" y="3122098"/>
+            <a:off x="1815269" y="3227028"/>
             <a:ext cx="2071323" cy="0"/>
           </a:xfrm>
           <a:prstGeom prst="straightConnector1">
@@ -12158,8 +12580,8 @@
         </p:nvSpPr>
         <p:spPr>
           <a:xfrm>
-            <a:off x="152400" y="2743200"/>
-            <a:ext cx="1424846" cy="215444"/>
+            <a:off x="-60816" y="2888537"/>
+            <a:ext cx="1936899" cy="430887"/>
           </a:xfrm>
           <a:prstGeom prst="rect">
             <a:avLst/>
@@ -12172,14 +12594,41 @@
           </a:bodyPr>
           <a:lstStyle/>
           <a:p>
-            <a:pPr algn="r"/>
+            <a:pPr algn="ctr"/>
             <a:r>
               <a:rPr lang="en-US" sz="1400" dirty="0" smtClean="0">
                 <a:solidFill>
                   <a:srgbClr val="0070C0"/>
                 </a:solidFill>
               </a:rPr>
-              <a:t>execute(“delete 1”)</a:t>
+              <a:t>Execute</a:t>
+            </a:r>
+          </a:p>
+          <a:p>
+            <a:pPr algn="ctr"/>
+            <a:r>
+              <a:rPr lang="en-US" sz="1400" dirty="0" smtClean="0">
+                <a:solidFill>
+                  <a:srgbClr val="0070C0"/>
+                </a:solidFill>
+              </a:rPr>
+              <a:t>(“</a:t>
+            </a:r>
+            <a:r>
+              <a:rPr lang="en-US" sz="1400" dirty="0" smtClean="0">
+                <a:solidFill>
+                  <a:srgbClr val="0070C0"/>
+                </a:solidFill>
+              </a:rPr>
+              <a:t>edit</a:t>
+            </a:r>
+            <a:r>
+              <a:rPr lang="en-US" sz="1400" dirty="0" smtClean="0">
+                <a:solidFill>
+                  <a:srgbClr val="0070C0"/>
+                </a:solidFill>
+              </a:rPr>
+              <a:t> 1 start date today”)</a:t>
             </a:r>
             <a:endParaRPr lang="en-US" sz="1400" dirty="0">
               <a:solidFill>
@@ -12768,7 +13217,15 @@
                   <a:srgbClr val="7030A0"/>
                 </a:solidFill>
               </a:rPr>
-              <a:t>deleteTask</a:t>
+              <a:t>edit</a:t>
+            </a:r>
+            <a:r>
+              <a:rPr lang="en-US" dirty="0" err="1" smtClean="0">
+                <a:solidFill>
+                  <a:srgbClr val="7030A0"/>
+                </a:solidFill>
+              </a:rPr>
+              <a:t>Task</a:t>
             </a:r>
             <a:r>
               <a:rPr lang="en-US" dirty="0" smtClean="0">
@@ -12776,7 +13233,15 @@
                   <a:srgbClr val="7030A0"/>
                 </a:solidFill>
               </a:rPr>
-              <a:t>(p)</a:t>
+              <a:t>(p</a:t>
+            </a:r>
+            <a:r>
+              <a:rPr lang="en-US" dirty="0" smtClean="0">
+                <a:solidFill>
+                  <a:srgbClr val="7030A0"/>
+                </a:solidFill>
+              </a:rPr>
+              <a:t>)</a:t>
             </a:r>
             <a:endParaRPr lang="en-US" dirty="0">
               <a:solidFill>
@@ -12794,7 +13259,7 @@
         </p:nvSpPr>
         <p:spPr>
           <a:xfrm>
-            <a:off x="4191000" y="2996259"/>
+            <a:off x="4123398" y="2996258"/>
             <a:ext cx="640023" cy="215444"/>
           </a:xfrm>
           <a:prstGeom prst="rect">
@@ -12835,8 +13300,8 @@
         </p:nvSpPr>
         <p:spPr>
           <a:xfrm>
-            <a:off x="2131905" y="2850922"/>
-            <a:ext cx="1424846" cy="215444"/>
+            <a:off x="1804866" y="3025373"/>
+            <a:ext cx="2093362" cy="430887"/>
           </a:xfrm>
           <a:prstGeom prst="rect">
             <a:avLst/>
@@ -12860,9 +13325,25 @@
             </a:lvl1pPr>
           </a:lstStyle>
           <a:p>
+            <a:pPr algn="ctr"/>
             <a:r>
               <a:rPr lang="en-US" dirty="0" smtClean="0"/>
-              <a:t>parse(“delete 1”)</a:t>
+              <a:t>Parse</a:t>
+            </a:r>
+          </a:p>
+          <a:p>
+            <a:pPr algn="ctr"/>
+            <a:r>
+              <a:rPr lang="en-US" dirty="0" smtClean="0"/>
+              <a:t>(‘</a:t>
+            </a:r>
+            <a:r>
+              <a:rPr lang="en-US" dirty="0" smtClean="0"/>
+              <a:t>edit’ </a:t>
+            </a:r>
+            <a:r>
+              <a:rPr lang="en-US" dirty="0" smtClean="0"/>
+              <a:t>‘1’ ‘start date’ ‘today’)</a:t>
             </a:r>
             <a:endParaRPr lang="en-US" dirty="0"/>
           </a:p>
@@ -13181,6 +13662,282 @@
             <a:r>
               <a:rPr lang="en-US" dirty="0" smtClean="0"/>
               <a:t>d</a:t>
+            </a:r>
+            <a:endParaRPr lang="en-US" dirty="0"/>
+          </a:p>
+        </p:txBody>
+      </p:sp>
+      <p:sp>
+        <p:nvSpPr>
+          <p:cNvPr id="41" name="Rectangle 8"/>
+          <p:cNvSpPr/>
+          <p:nvPr/>
+        </p:nvSpPr>
+        <p:spPr>
+          <a:xfrm>
+            <a:off x="5847803" y="2294634"/>
+            <a:ext cx="1093635" cy="367739"/>
+          </a:xfrm>
+          <a:prstGeom prst="rect">
+            <a:avLst/>
+          </a:prstGeom>
+          <a:solidFill>
+            <a:schemeClr val="accent1">
+              <a:lumMod val="20000"/>
+              <a:lumOff val="80000"/>
+            </a:schemeClr>
+          </a:solidFill>
+          <a:ln w="19050">
+            <a:solidFill>
+              <a:srgbClr val="0070C0"/>
+            </a:solidFill>
+          </a:ln>
+          <a:effectLst/>
+        </p:spPr>
+        <p:style>
+          <a:lnRef idx="1">
+            <a:schemeClr val="accent2"/>
+          </a:lnRef>
+          <a:fillRef idx="2">
+            <a:schemeClr val="accent2"/>
+          </a:fillRef>
+          <a:effectRef idx="1">
+            <a:schemeClr val="accent2"/>
+          </a:effectRef>
+          <a:fontRef idx="minor">
+            <a:schemeClr val="dk1"/>
+          </a:fontRef>
+        </p:style>
+        <p:txBody>
+          <a:bodyPr rtlCol="0" anchor="ctr"/>
+          <a:lstStyle/>
+          <a:p>
+            <a:pPr algn="ctr"/>
+            <a:r>
+              <a:rPr lang="en-US" sz="1050" b="1" dirty="0" err="1" smtClean="0">
+                <a:solidFill>
+                  <a:srgbClr val="0070C0"/>
+                </a:solidFill>
+              </a:rPr>
+              <a:t>DateTimeParser</a:t>
+            </a:r>
+            <a:endParaRPr lang="en-SG" sz="1050" b="1" dirty="0">
+              <a:solidFill>
+                <a:srgbClr val="0070C0"/>
+              </a:solidFill>
+            </a:endParaRPr>
+          </a:p>
+        </p:txBody>
+      </p:sp>
+      <p:cxnSp>
+        <p:nvCxnSpPr>
+          <p:cNvPr id="42" name="Straight Arrow Connector 57"/>
+          <p:cNvCxnSpPr>
+            <a:endCxn id="41" idx="1"/>
+          </p:cNvCxnSpPr>
+          <p:nvPr/>
+        </p:nvCxnSpPr>
+        <p:spPr>
+          <a:xfrm flipV="1">
+            <a:off x="4760641" y="2478504"/>
+            <a:ext cx="1087162" cy="9177"/>
+          </a:xfrm>
+          <a:prstGeom prst="straightConnector1">
+            <a:avLst/>
+          </a:prstGeom>
+          <a:ln w="19050">
+            <a:solidFill>
+              <a:srgbClr val="0070C0"/>
+            </a:solidFill>
+            <a:headEnd type="none" w="med" len="med"/>
+            <a:tailEnd type="arrow" w="med" len="med"/>
+          </a:ln>
+          <a:effectLst/>
+        </p:spPr>
+        <p:style>
+          <a:lnRef idx="1">
+            <a:schemeClr val="accent2"/>
+          </a:lnRef>
+          <a:fillRef idx="2">
+            <a:schemeClr val="accent2"/>
+          </a:fillRef>
+          <a:effectRef idx="1">
+            <a:schemeClr val="accent2"/>
+          </a:effectRef>
+          <a:fontRef idx="minor">
+            <a:schemeClr val="dk1"/>
+          </a:fontRef>
+        </p:style>
+      </p:cxnSp>
+      <p:sp>
+        <p:nvSpPr>
+          <p:cNvPr id="43" name="Diamond 42"/>
+          <p:cNvSpPr/>
+          <p:nvPr/>
+        </p:nvSpPr>
+        <p:spPr>
+          <a:xfrm flipH="1">
+            <a:off x="4498945" y="2346406"/>
+            <a:ext cx="261696" cy="264196"/>
+          </a:xfrm>
+          <a:prstGeom prst="diamond">
+            <a:avLst/>
+          </a:prstGeom>
+          <a:solidFill>
+            <a:srgbClr val="0070C0"/>
+          </a:solidFill>
+          <a:ln>
+            <a:solidFill>
+              <a:srgbClr val="0070C0"/>
+            </a:solidFill>
+          </a:ln>
+        </p:spPr>
+        <p:style>
+          <a:lnRef idx="2">
+            <a:schemeClr val="accent1">
+              <a:shade val="50000"/>
+            </a:schemeClr>
+          </a:lnRef>
+          <a:fillRef idx="1">
+            <a:schemeClr val="accent1"/>
+          </a:fillRef>
+          <a:effectRef idx="0">
+            <a:schemeClr val="accent1"/>
+          </a:effectRef>
+          <a:fontRef idx="minor">
+            <a:schemeClr val="lt1"/>
+          </a:fontRef>
+        </p:style>
+        <p:txBody>
+          <a:bodyPr rtlCol="0" anchor="ctr"/>
+          <a:lstStyle/>
+          <a:p>
+            <a:pPr algn="ctr"/>
+            <a:endParaRPr lang="en-US"/>
+          </a:p>
+        </p:txBody>
+      </p:sp>
+      <p:sp>
+        <p:nvSpPr>
+          <p:cNvPr id="53" name="TextBox 52"/>
+          <p:cNvSpPr txBox="1"/>
+          <p:nvPr/>
+        </p:nvSpPr>
+        <p:spPr>
+          <a:xfrm>
+            <a:off x="4623305" y="2241597"/>
+            <a:ext cx="1245958" cy="215444"/>
+          </a:xfrm>
+          <a:prstGeom prst="rect">
+            <a:avLst/>
+          </a:prstGeom>
+          <a:noFill/>
+        </p:spPr>
+        <p:txBody>
+          <a:bodyPr wrap="square" lIns="0" tIns="0" rIns="0" bIns="0" rtlCol="0">
+            <a:spAutoFit/>
+          </a:bodyPr>
+          <a:lstStyle>
+            <a:defPPr>
+              <a:defRPr lang="en-US"/>
+            </a:defPPr>
+            <a:lvl1pPr algn="r">
+              <a:defRPr sz="1400">
+                <a:solidFill>
+                  <a:srgbClr val="0070C0"/>
+                </a:solidFill>
+              </a:defRPr>
+            </a:lvl1pPr>
+          </a:lstStyle>
+          <a:p>
+            <a:r>
+              <a:rPr lang="en-US" dirty="0" smtClean="0"/>
+              <a:t>Convert “today”</a:t>
+            </a:r>
+            <a:endParaRPr lang="en-US" dirty="0"/>
+          </a:p>
+        </p:txBody>
+      </p:sp>
+      <p:cxnSp>
+        <p:nvCxnSpPr>
+          <p:cNvPr id="54" name="Elbow Connector 63"/>
+          <p:cNvCxnSpPr>
+            <a:stCxn id="41" idx="0"/>
+            <a:endCxn id="16" idx="0"/>
+          </p:cNvCxnSpPr>
+          <p:nvPr/>
+        </p:nvCxnSpPr>
+        <p:spPr>
+          <a:xfrm rot="16200000" flipH="1" flipV="1">
+            <a:off x="5173811" y="1079423"/>
+            <a:ext cx="5599" cy="2436020"/>
+          </a:xfrm>
+          <a:prstGeom prst="bentConnector3">
+            <a:avLst>
+              <a:gd name="adj1" fmla="val -4082872"/>
+            </a:avLst>
+          </a:prstGeom>
+          <a:ln w="19050">
+            <a:solidFill>
+              <a:srgbClr val="0070C0"/>
+            </a:solidFill>
+            <a:prstDash val="sysDot"/>
+            <a:headEnd type="none" w="med" len="med"/>
+            <a:tailEnd type="arrow" w="med" len="med"/>
+          </a:ln>
+          <a:effectLst/>
+        </p:spPr>
+        <p:style>
+          <a:lnRef idx="1">
+            <a:schemeClr val="accent2"/>
+          </a:lnRef>
+          <a:fillRef idx="2">
+            <a:schemeClr val="accent2"/>
+          </a:fillRef>
+          <a:effectRef idx="1">
+            <a:schemeClr val="accent2"/>
+          </a:effectRef>
+          <a:fontRef idx="minor">
+            <a:schemeClr val="dk1"/>
+          </a:fontRef>
+        </p:style>
+      </p:cxnSp>
+      <p:sp>
+        <p:nvSpPr>
+          <p:cNvPr id="61" name="TextBox 60"/>
+          <p:cNvSpPr txBox="1"/>
+          <p:nvPr/>
+        </p:nvSpPr>
+        <p:spPr>
+          <a:xfrm>
+            <a:off x="4303374" y="1837646"/>
+            <a:ext cx="1356924" cy="215444"/>
+          </a:xfrm>
+          <a:prstGeom prst="rect">
+            <a:avLst/>
+          </a:prstGeom>
+          <a:noFill/>
+        </p:spPr>
+        <p:txBody>
+          <a:bodyPr wrap="square" lIns="0" tIns="0" rIns="0" bIns="0" rtlCol="0">
+            <a:spAutoFit/>
+          </a:bodyPr>
+          <a:lstStyle>
+            <a:defPPr>
+              <a:defRPr lang="en-US"/>
+            </a:defPPr>
+            <a:lvl1pPr algn="r">
+              <a:defRPr sz="1400">
+                <a:solidFill>
+                  <a:srgbClr val="0070C0"/>
+                </a:solidFill>
+              </a:defRPr>
+            </a:lvl1pPr>
+          </a:lstStyle>
+          <a:p>
+            <a:r>
+              <a:rPr lang="en-US" dirty="0" smtClean="0"/>
+              <a:t>Reflect date </a:t>
             </a:r>
             <a:endParaRPr lang="en-US" dirty="0"/>
           </a:p>
@@ -15403,8 +16160,8 @@
         </p:nvSpPr>
         <p:spPr>
           <a:xfrm>
-            <a:off x="1119865" y="2086382"/>
-            <a:ext cx="7871735" cy="1723618"/>
+            <a:off x="274728" y="2094217"/>
+            <a:ext cx="8686800" cy="2638018"/>
           </a:xfrm>
           <a:prstGeom prst="roundRect">
             <a:avLst>

</xml_diff>

<commit_message>
added updates to UI diagrams
</commit_message>
<xml_diff>
--- a/docs/diagrams/Diagrams.pptx
+++ b/docs/diagrams/Diagrams.pptx
@@ -201,7 +201,7 @@
           <a:p>
             <a:fld id="{F5CC4B3F-88C1-4FFA-B1B6-F41C21DC6924}" type="datetimeFigureOut">
               <a:rPr lang="en-US" smtClean="0"/>
-              <a:t>05/11/16</a:t>
+              <a:t>11/6/2016</a:t>
             </a:fld>
             <a:endParaRPr lang="en-US"/>
           </a:p>
@@ -650,7 +650,7 @@
           <a:p>
             <a:fld id="{78C97017-6FC3-485B-9764-EAC9E56C1D49}" type="datetimeFigureOut">
               <a:rPr lang="en-US" smtClean="0"/>
-              <a:t>05/11/16</a:t>
+              <a:t>11/6/2016</a:t>
             </a:fld>
             <a:endParaRPr lang="en-US"/>
           </a:p>
@@ -820,7 +820,7 @@
           <a:p>
             <a:fld id="{78C97017-6FC3-485B-9764-EAC9E56C1D49}" type="datetimeFigureOut">
               <a:rPr lang="en-US" smtClean="0"/>
-              <a:t>05/11/16</a:t>
+              <a:t>11/6/2016</a:t>
             </a:fld>
             <a:endParaRPr lang="en-US"/>
           </a:p>
@@ -1000,7 +1000,7 @@
           <a:p>
             <a:fld id="{78C97017-6FC3-485B-9764-EAC9E56C1D49}" type="datetimeFigureOut">
               <a:rPr lang="en-US" smtClean="0"/>
-              <a:t>05/11/16</a:t>
+              <a:t>11/6/2016</a:t>
             </a:fld>
             <a:endParaRPr lang="en-US"/>
           </a:p>
@@ -1170,7 +1170,7 @@
           <a:p>
             <a:fld id="{78C97017-6FC3-485B-9764-EAC9E56C1D49}" type="datetimeFigureOut">
               <a:rPr lang="en-US" smtClean="0"/>
-              <a:t>05/11/16</a:t>
+              <a:t>11/6/2016</a:t>
             </a:fld>
             <a:endParaRPr lang="en-US"/>
           </a:p>
@@ -1416,7 +1416,7 @@
           <a:p>
             <a:fld id="{78C97017-6FC3-485B-9764-EAC9E56C1D49}" type="datetimeFigureOut">
               <a:rPr lang="en-US" smtClean="0"/>
-              <a:t>05/11/16</a:t>
+              <a:t>11/6/2016</a:t>
             </a:fld>
             <a:endParaRPr lang="en-US"/>
           </a:p>
@@ -1704,7 +1704,7 @@
           <a:p>
             <a:fld id="{78C97017-6FC3-485B-9764-EAC9E56C1D49}" type="datetimeFigureOut">
               <a:rPr lang="en-US" smtClean="0"/>
-              <a:t>05/11/16</a:t>
+              <a:t>11/6/2016</a:t>
             </a:fld>
             <a:endParaRPr lang="en-US"/>
           </a:p>
@@ -2126,7 +2126,7 @@
           <a:p>
             <a:fld id="{78C97017-6FC3-485B-9764-EAC9E56C1D49}" type="datetimeFigureOut">
               <a:rPr lang="en-US" smtClean="0"/>
-              <a:t>05/11/16</a:t>
+              <a:t>11/6/2016</a:t>
             </a:fld>
             <a:endParaRPr lang="en-US"/>
           </a:p>
@@ -2244,7 +2244,7 @@
           <a:p>
             <a:fld id="{78C97017-6FC3-485B-9764-EAC9E56C1D49}" type="datetimeFigureOut">
               <a:rPr lang="en-US" smtClean="0"/>
-              <a:t>05/11/16</a:t>
+              <a:t>11/6/2016</a:t>
             </a:fld>
             <a:endParaRPr lang="en-US"/>
           </a:p>
@@ -2339,7 +2339,7 @@
           <a:p>
             <a:fld id="{78C97017-6FC3-485B-9764-EAC9E56C1D49}" type="datetimeFigureOut">
               <a:rPr lang="en-US" smtClean="0"/>
-              <a:t>05/11/16</a:t>
+              <a:t>11/6/2016</a:t>
             </a:fld>
             <a:endParaRPr lang="en-US"/>
           </a:p>
@@ -2616,7 +2616,7 @@
           <a:p>
             <a:fld id="{78C97017-6FC3-485B-9764-EAC9E56C1D49}" type="datetimeFigureOut">
               <a:rPr lang="en-US" smtClean="0"/>
-              <a:t>05/11/16</a:t>
+              <a:t>11/6/2016</a:t>
             </a:fld>
             <a:endParaRPr lang="en-US"/>
           </a:p>
@@ -2869,7 +2869,7 @@
           <a:p>
             <a:fld id="{78C97017-6FC3-485B-9764-EAC9E56C1D49}" type="datetimeFigureOut">
               <a:rPr lang="en-US" smtClean="0"/>
-              <a:t>05/11/16</a:t>
+              <a:t>11/6/2016</a:t>
             </a:fld>
             <a:endParaRPr lang="en-US"/>
           </a:p>
@@ -3082,7 +3082,7 @@
           <a:p>
             <a:fld id="{78C97017-6FC3-485B-9764-EAC9E56C1D49}" type="datetimeFigureOut">
               <a:rPr lang="en-US" smtClean="0"/>
-              <a:t>05/11/16</a:t>
+              <a:t>11/6/2016</a:t>
             </a:fld>
             <a:endParaRPr lang="en-US"/>
           </a:p>
@@ -8806,8 +8806,8 @@
         </p:nvSpPr>
         <p:spPr>
           <a:xfrm>
-            <a:off x="1217465" y="1447800"/>
-            <a:ext cx="4917083" cy="3962400"/>
+            <a:off x="1224515" y="1477360"/>
+            <a:ext cx="4917083" cy="5029200"/>
           </a:xfrm>
           <a:prstGeom prst="roundRect">
             <a:avLst>
@@ -9295,66 +9295,6 @@
       </p:sp>
       <p:sp>
         <p:nvSpPr>
-          <p:cNvPr id="35" name="Rectangle 11"/>
-          <p:cNvSpPr/>
-          <p:nvPr/>
-        </p:nvSpPr>
-        <p:spPr>
-          <a:xfrm>
-            <a:off x="2592527" y="4563759"/>
-            <a:ext cx="1093635" cy="236841"/>
-          </a:xfrm>
-          <a:prstGeom prst="rect">
-            <a:avLst/>
-          </a:prstGeom>
-          <a:ln w="19050">
-            <a:solidFill>
-              <a:schemeClr val="accent3"/>
-            </a:solidFill>
-          </a:ln>
-          <a:effectLst/>
-        </p:spPr>
-        <p:style>
-          <a:lnRef idx="1">
-            <a:schemeClr val="accent3"/>
-          </a:lnRef>
-          <a:fillRef idx="2">
-            <a:schemeClr val="accent3"/>
-          </a:fillRef>
-          <a:effectRef idx="1">
-            <a:schemeClr val="accent3"/>
-          </a:effectRef>
-          <a:fontRef idx="minor">
-            <a:schemeClr val="dk1"/>
-          </a:fontRef>
-        </p:style>
-        <p:txBody>
-          <a:bodyPr rtlCol="0" anchor="ctr"/>
-          <a:lstStyle/>
-          <a:p>
-            <a:pPr algn="ctr"/>
-            <a:r>
-              <a:rPr lang="en-US" sz="1050" b="1" dirty="0" err="1">
-                <a:solidFill>
-                  <a:schemeClr val="accent3">
-                    <a:lumMod val="75000"/>
-                  </a:schemeClr>
-                </a:solidFill>
-              </a:rPr>
-              <a:t>StatusBarFooter</a:t>
-            </a:r>
-            <a:endParaRPr lang="en-SG" sz="1050" b="1" dirty="0">
-              <a:solidFill>
-                <a:schemeClr val="accent3">
-                  <a:lumMod val="75000"/>
-                </a:schemeClr>
-              </a:solidFill>
-            </a:endParaRPr>
-          </a:p>
-        </p:txBody>
-      </p:sp>
-      <p:sp>
-        <p:nvSpPr>
           <p:cNvPr id="36" name="Rectangle 11"/>
           <p:cNvSpPr/>
           <p:nvPr/>
@@ -9481,7 +9421,7 @@
         </p:nvSpPr>
         <p:spPr>
           <a:xfrm>
-            <a:off x="2592528" y="4966000"/>
+            <a:off x="2582371" y="5993513"/>
             <a:ext cx="1093635" cy="236841"/>
           </a:xfrm>
           <a:prstGeom prst="rect">
@@ -9769,7 +9709,6 @@
           <p:cNvPr id="50" name="Elbow Connector 63"/>
           <p:cNvCxnSpPr>
             <a:stCxn id="39" idx="2"/>
-            <a:endCxn id="35" idx="1"/>
           </p:cNvCxnSpPr>
           <p:nvPr/>
         </p:nvCxnSpPr>
@@ -9782,26 +9721,22 @@
             <a:avLst/>
           </a:prstGeom>
           <a:ln w="19050">
-            <a:solidFill>
-              <a:schemeClr val="accent3"/>
-            </a:solidFill>
             <a:headEnd type="none" w="med" len="med"/>
             <a:tailEnd type="arrow" w="med" len="med"/>
           </a:ln>
-          <a:effectLst/>
-        </p:spPr>
-        <p:style>
-          <a:lnRef idx="1">
-            <a:schemeClr val="accent2"/>
-          </a:lnRef>
-          <a:fillRef idx="2">
-            <a:schemeClr val="accent2"/>
-          </a:fillRef>
-          <a:effectRef idx="1">
-            <a:schemeClr val="accent2"/>
-          </a:effectRef>
-          <a:fontRef idx="minor">
-            <a:schemeClr val="dk1"/>
+        </p:spPr>
+        <p:style>
+          <a:lnRef idx="1">
+            <a:schemeClr val="accent3"/>
+          </a:lnRef>
+          <a:fillRef idx="0">
+            <a:schemeClr val="accent3"/>
+          </a:fillRef>
+          <a:effectRef idx="0">
+            <a:schemeClr val="accent3"/>
+          </a:effectRef>
+          <a:fontRef idx="minor">
+            <a:schemeClr val="tx1"/>
           </a:fontRef>
         </p:style>
       </p:cxnSp>
@@ -9815,33 +9750,29 @@
         </p:nvCxnSpPr>
         <p:spPr>
           <a:xfrm rot="16200000" flipH="1">
-            <a:off x="1184119" y="3676012"/>
-            <a:ext cx="2396440" cy="420377"/>
+            <a:off x="673490" y="4203052"/>
+            <a:ext cx="3423953" cy="393810"/>
           </a:xfrm>
           <a:prstGeom prst="bentConnector2">
             <a:avLst/>
           </a:prstGeom>
-          <a:ln w="19050">
-            <a:solidFill>
-              <a:schemeClr val="accent3"/>
-            </a:solidFill>
+          <a:ln>
             <a:headEnd type="none" w="med" len="med"/>
             <a:tailEnd type="arrow" w="med" len="med"/>
           </a:ln>
-          <a:effectLst/>
-        </p:spPr>
-        <p:style>
-          <a:lnRef idx="1">
-            <a:schemeClr val="accent2"/>
-          </a:lnRef>
-          <a:fillRef idx="2">
-            <a:schemeClr val="accent2"/>
-          </a:fillRef>
-          <a:effectRef idx="1">
-            <a:schemeClr val="accent2"/>
-          </a:effectRef>
-          <a:fontRef idx="minor">
-            <a:schemeClr val="dk1"/>
+        </p:spPr>
+        <p:style>
+          <a:lnRef idx="1">
+            <a:schemeClr val="accent3"/>
+          </a:lnRef>
+          <a:fillRef idx="0">
+            <a:schemeClr val="accent3"/>
+          </a:fillRef>
+          <a:effectRef idx="0">
+            <a:schemeClr val="accent3"/>
+          </a:effectRef>
+          <a:fontRef idx="minor">
+            <a:schemeClr val="tx1"/>
           </a:fontRef>
         </p:style>
       </p:cxnSp>
@@ -10093,7 +10024,6 @@
           <p:cNvPr id="91" name="Elbow Connector 63"/>
           <p:cNvCxnSpPr>
             <a:stCxn id="16" idx="3"/>
-            <a:endCxn id="35" idx="3"/>
           </p:cNvCxnSpPr>
           <p:nvPr/>
         </p:nvCxnSpPr>
@@ -10140,8 +10070,8 @@
         </p:nvCxnSpPr>
         <p:spPr>
           <a:xfrm rot="5400000">
-            <a:off x="3208856" y="2763307"/>
-            <a:ext cx="2798421" cy="1843806"/>
+            <a:off x="2690021" y="3271986"/>
+            <a:ext cx="3825934" cy="1853963"/>
           </a:xfrm>
           <a:prstGeom prst="bentConnector2">
             <a:avLst/>
@@ -11003,6 +10933,664 @@
           </a:p>
         </p:txBody>
       </p:sp>
+      <p:cxnSp>
+        <p:nvCxnSpPr>
+          <p:cNvPr id="20" name="Straight Connector 19"/>
+          <p:cNvCxnSpPr/>
+          <p:nvPr/>
+        </p:nvCxnSpPr>
+        <p:spPr>
+          <a:xfrm>
+            <a:off x="2416126" y="2895600"/>
+            <a:ext cx="0" cy="2133600"/>
+          </a:xfrm>
+          <a:prstGeom prst="line">
+            <a:avLst/>
+          </a:prstGeom>
+          <a:ln w="19050"/>
+        </p:spPr>
+        <p:style>
+          <a:lnRef idx="1">
+            <a:schemeClr val="accent3"/>
+          </a:lnRef>
+          <a:fillRef idx="0">
+            <a:schemeClr val="accent3"/>
+          </a:fillRef>
+          <a:effectRef idx="0">
+            <a:schemeClr val="accent3"/>
+          </a:effectRef>
+          <a:fontRef idx="minor">
+            <a:schemeClr val="tx1"/>
+          </a:fontRef>
+        </p:style>
+      </p:cxnSp>
+      <p:cxnSp>
+        <p:nvCxnSpPr>
+          <p:cNvPr id="24" name="Straight Arrow Connector 23"/>
+          <p:cNvCxnSpPr/>
+          <p:nvPr/>
+        </p:nvCxnSpPr>
+        <p:spPr>
+          <a:xfrm>
+            <a:off x="2416126" y="5029200"/>
+            <a:ext cx="166246" cy="0"/>
+          </a:xfrm>
+          <a:prstGeom prst="straightConnector1">
+            <a:avLst/>
+          </a:prstGeom>
+          <a:ln w="19050">
+            <a:tailEnd type="arrow"/>
+          </a:ln>
+        </p:spPr>
+        <p:style>
+          <a:lnRef idx="1">
+            <a:schemeClr val="accent3"/>
+          </a:lnRef>
+          <a:fillRef idx="0">
+            <a:schemeClr val="accent3"/>
+          </a:fillRef>
+          <a:effectRef idx="0">
+            <a:schemeClr val="accent3"/>
+          </a:effectRef>
+          <a:fontRef idx="minor">
+            <a:schemeClr val="tx1"/>
+          </a:fontRef>
+        </p:style>
+      </p:cxnSp>
+      <p:cxnSp>
+        <p:nvCxnSpPr>
+          <p:cNvPr id="26" name="Straight Connector 25"/>
+          <p:cNvCxnSpPr/>
+          <p:nvPr/>
+        </p:nvCxnSpPr>
+        <p:spPr>
+          <a:xfrm>
+            <a:off x="3683057" y="5029200"/>
+            <a:ext cx="1846913" cy="0"/>
+          </a:xfrm>
+          <a:prstGeom prst="line">
+            <a:avLst/>
+          </a:prstGeom>
+        </p:spPr>
+        <p:style>
+          <a:lnRef idx="1">
+            <a:schemeClr val="accent3"/>
+          </a:lnRef>
+          <a:fillRef idx="0">
+            <a:schemeClr val="accent3"/>
+          </a:fillRef>
+          <a:effectRef idx="0">
+            <a:schemeClr val="accent3"/>
+          </a:effectRef>
+          <a:fontRef idx="minor">
+            <a:schemeClr val="tx1"/>
+          </a:fontRef>
+        </p:style>
+      </p:cxnSp>
+      <p:cxnSp>
+        <p:nvCxnSpPr>
+          <p:cNvPr id="30" name="Straight Connector 29"/>
+          <p:cNvCxnSpPr/>
+          <p:nvPr/>
+        </p:nvCxnSpPr>
+        <p:spPr>
+          <a:xfrm flipH="1">
+            <a:off x="3136239" y="5147620"/>
+            <a:ext cx="1" cy="110180"/>
+          </a:xfrm>
+          <a:prstGeom prst="line">
+            <a:avLst/>
+          </a:prstGeom>
+        </p:spPr>
+        <p:style>
+          <a:lnRef idx="1">
+            <a:schemeClr val="accent3"/>
+          </a:lnRef>
+          <a:fillRef idx="0">
+            <a:schemeClr val="accent3"/>
+          </a:fillRef>
+          <a:effectRef idx="0">
+            <a:schemeClr val="accent3"/>
+          </a:effectRef>
+          <a:fontRef idx="minor">
+            <a:schemeClr val="tx1"/>
+          </a:fontRef>
+        </p:style>
+      </p:cxnSp>
+      <p:cxnSp>
+        <p:nvCxnSpPr>
+          <p:cNvPr id="32" name="Straight Arrow Connector 31"/>
+          <p:cNvCxnSpPr/>
+          <p:nvPr/>
+        </p:nvCxnSpPr>
+        <p:spPr>
+          <a:xfrm>
+            <a:off x="3136239" y="5257800"/>
+            <a:ext cx="623455" cy="0"/>
+          </a:xfrm>
+          <a:prstGeom prst="straightConnector1">
+            <a:avLst/>
+          </a:prstGeom>
+          <a:ln>
+            <a:tailEnd type="arrow"/>
+          </a:ln>
+        </p:spPr>
+        <p:style>
+          <a:lnRef idx="1">
+            <a:schemeClr val="accent3"/>
+          </a:lnRef>
+          <a:fillRef idx="0">
+            <a:schemeClr val="accent3"/>
+          </a:fillRef>
+          <a:effectRef idx="0">
+            <a:schemeClr val="accent3"/>
+          </a:effectRef>
+          <a:fontRef idx="minor">
+            <a:schemeClr val="tx1"/>
+          </a:fontRef>
+        </p:style>
+      </p:cxnSp>
+      <p:sp>
+        <p:nvSpPr>
+          <p:cNvPr id="70" name="Rectangle 11"/>
+          <p:cNvSpPr/>
+          <p:nvPr/>
+        </p:nvSpPr>
+        <p:spPr>
+          <a:xfrm>
+            <a:off x="2609131" y="4910779"/>
+            <a:ext cx="1093635" cy="236841"/>
+          </a:xfrm>
+          <a:prstGeom prst="rect">
+            <a:avLst/>
+          </a:prstGeom>
+          <a:ln w="19050">
+            <a:solidFill>
+              <a:schemeClr val="accent3"/>
+            </a:solidFill>
+          </a:ln>
+          <a:effectLst/>
+        </p:spPr>
+        <p:style>
+          <a:lnRef idx="1">
+            <a:schemeClr val="accent3"/>
+          </a:lnRef>
+          <a:fillRef idx="2">
+            <a:schemeClr val="accent3"/>
+          </a:fillRef>
+          <a:effectRef idx="1">
+            <a:schemeClr val="accent3"/>
+          </a:effectRef>
+          <a:fontRef idx="minor">
+            <a:schemeClr val="dk1"/>
+          </a:fontRef>
+        </p:style>
+        <p:txBody>
+          <a:bodyPr rtlCol="0" anchor="ctr"/>
+          <a:lstStyle/>
+          <a:p>
+            <a:pPr algn="ctr"/>
+            <a:r>
+              <a:rPr lang="en-US" sz="1050" b="1" dirty="0" err="1" smtClean="0">
+                <a:solidFill>
+                  <a:schemeClr val="accent3">
+                    <a:lumMod val="75000"/>
+                  </a:schemeClr>
+                </a:solidFill>
+              </a:rPr>
+              <a:t>FloatingPanel</a:t>
+            </a:r>
+            <a:endParaRPr lang="en-SG" sz="1050" b="1" dirty="0">
+              <a:solidFill>
+                <a:schemeClr val="accent3">
+                  <a:lumMod val="75000"/>
+                </a:schemeClr>
+              </a:solidFill>
+            </a:endParaRPr>
+          </a:p>
+        </p:txBody>
+      </p:sp>
+      <p:sp>
+        <p:nvSpPr>
+          <p:cNvPr id="71" name="Rectangle 11"/>
+          <p:cNvSpPr/>
+          <p:nvPr/>
+        </p:nvSpPr>
+        <p:spPr>
+          <a:xfrm>
+            <a:off x="3751381" y="5145048"/>
+            <a:ext cx="1093635" cy="236841"/>
+          </a:xfrm>
+          <a:prstGeom prst="rect">
+            <a:avLst/>
+          </a:prstGeom>
+          <a:ln w="19050">
+            <a:solidFill>
+              <a:schemeClr val="accent3"/>
+            </a:solidFill>
+          </a:ln>
+          <a:effectLst/>
+        </p:spPr>
+        <p:style>
+          <a:lnRef idx="1">
+            <a:schemeClr val="accent3"/>
+          </a:lnRef>
+          <a:fillRef idx="2">
+            <a:schemeClr val="accent3"/>
+          </a:fillRef>
+          <a:effectRef idx="1">
+            <a:schemeClr val="accent3"/>
+          </a:effectRef>
+          <a:fontRef idx="minor">
+            <a:schemeClr val="dk1"/>
+          </a:fontRef>
+        </p:style>
+        <p:txBody>
+          <a:bodyPr rtlCol="0" anchor="ctr"/>
+          <a:lstStyle/>
+          <a:p>
+            <a:pPr algn="ctr"/>
+            <a:r>
+              <a:rPr lang="en-US" sz="1050" b="1" dirty="0" err="1" smtClean="0">
+                <a:solidFill>
+                  <a:schemeClr val="accent3">
+                    <a:lumMod val="75000"/>
+                  </a:schemeClr>
+                </a:solidFill>
+              </a:rPr>
+              <a:t>FloatingCard</a:t>
+            </a:r>
+            <a:endParaRPr lang="en-SG" sz="1050" b="1" dirty="0">
+              <a:solidFill>
+                <a:schemeClr val="accent3">
+                  <a:lumMod val="75000"/>
+                </a:schemeClr>
+              </a:solidFill>
+            </a:endParaRPr>
+          </a:p>
+        </p:txBody>
+      </p:sp>
+      <p:cxnSp>
+        <p:nvCxnSpPr>
+          <p:cNvPr id="41" name="Straight Connector 40"/>
+          <p:cNvCxnSpPr/>
+          <p:nvPr/>
+        </p:nvCxnSpPr>
+        <p:spPr>
+          <a:xfrm>
+            <a:off x="4845016" y="5263468"/>
+            <a:ext cx="684953" cy="0"/>
+          </a:xfrm>
+          <a:prstGeom prst="line">
+            <a:avLst/>
+          </a:prstGeom>
+        </p:spPr>
+        <p:style>
+          <a:lnRef idx="1">
+            <a:schemeClr val="accent3"/>
+          </a:lnRef>
+          <a:fillRef idx="0">
+            <a:schemeClr val="accent3"/>
+          </a:fillRef>
+          <a:effectRef idx="0">
+            <a:schemeClr val="accent3"/>
+          </a:effectRef>
+          <a:fontRef idx="minor">
+            <a:schemeClr val="tx1"/>
+          </a:fontRef>
+        </p:style>
+      </p:cxnSp>
+      <p:cxnSp>
+        <p:nvCxnSpPr>
+          <p:cNvPr id="46" name="Straight Arrow Connector 45"/>
+          <p:cNvCxnSpPr/>
+          <p:nvPr/>
+        </p:nvCxnSpPr>
+        <p:spPr>
+          <a:xfrm>
+            <a:off x="4845016" y="5202710"/>
+            <a:ext cx="1875890" cy="0"/>
+          </a:xfrm>
+          <a:prstGeom prst="straightConnector1">
+            <a:avLst/>
+          </a:prstGeom>
+          <a:ln w="19050">
+            <a:prstDash val="sysDot"/>
+            <a:tailEnd type="arrow"/>
+          </a:ln>
+        </p:spPr>
+        <p:style>
+          <a:lnRef idx="1">
+            <a:schemeClr val="accent3"/>
+          </a:lnRef>
+          <a:fillRef idx="0">
+            <a:schemeClr val="accent3"/>
+          </a:fillRef>
+          <a:effectRef idx="0">
+            <a:schemeClr val="accent3"/>
+          </a:effectRef>
+          <a:fontRef idx="minor">
+            <a:schemeClr val="tx1"/>
+          </a:fontRef>
+        </p:style>
+      </p:cxnSp>
+      <p:cxnSp>
+        <p:nvCxnSpPr>
+          <p:cNvPr id="49" name="Straight Connector 48"/>
+          <p:cNvCxnSpPr/>
+          <p:nvPr/>
+        </p:nvCxnSpPr>
+        <p:spPr>
+          <a:xfrm>
+            <a:off x="2416126" y="5029199"/>
+            <a:ext cx="0" cy="609601"/>
+          </a:xfrm>
+          <a:prstGeom prst="line">
+            <a:avLst/>
+          </a:prstGeom>
+          <a:ln w="19050"/>
+        </p:spPr>
+        <p:style>
+          <a:lnRef idx="1">
+            <a:schemeClr val="accent3"/>
+          </a:lnRef>
+          <a:fillRef idx="0">
+            <a:schemeClr val="accent3"/>
+          </a:fillRef>
+          <a:effectRef idx="0">
+            <a:schemeClr val="accent3"/>
+          </a:effectRef>
+          <a:fontRef idx="minor">
+            <a:schemeClr val="tx1"/>
+          </a:fontRef>
+        </p:style>
+      </p:cxnSp>
+      <p:cxnSp>
+        <p:nvCxnSpPr>
+          <p:cNvPr id="52" name="Straight Connector 51"/>
+          <p:cNvCxnSpPr/>
+          <p:nvPr/>
+        </p:nvCxnSpPr>
+        <p:spPr>
+          <a:xfrm>
+            <a:off x="3683056" y="5638800"/>
+            <a:ext cx="1846913" cy="0"/>
+          </a:xfrm>
+          <a:prstGeom prst="line">
+            <a:avLst/>
+          </a:prstGeom>
+          <a:ln/>
+        </p:spPr>
+        <p:style>
+          <a:lnRef idx="1">
+            <a:schemeClr val="accent3"/>
+          </a:lnRef>
+          <a:fillRef idx="0">
+            <a:schemeClr val="accent3"/>
+          </a:fillRef>
+          <a:effectRef idx="0">
+            <a:schemeClr val="accent3"/>
+          </a:effectRef>
+          <a:fontRef idx="minor">
+            <a:schemeClr val="tx1"/>
+          </a:fontRef>
+        </p:style>
+      </p:cxnSp>
+      <p:sp>
+        <p:nvSpPr>
+          <p:cNvPr id="84" name="Rectangle 11"/>
+          <p:cNvSpPr/>
+          <p:nvPr/>
+        </p:nvSpPr>
+        <p:spPr>
+          <a:xfrm>
+            <a:off x="2579503" y="5520379"/>
+            <a:ext cx="1093635" cy="236841"/>
+          </a:xfrm>
+          <a:prstGeom prst="rect">
+            <a:avLst/>
+          </a:prstGeom>
+          <a:ln w="19050">
+            <a:solidFill>
+              <a:schemeClr val="accent3"/>
+            </a:solidFill>
+          </a:ln>
+          <a:effectLst/>
+        </p:spPr>
+        <p:style>
+          <a:lnRef idx="1">
+            <a:schemeClr val="accent3"/>
+          </a:lnRef>
+          <a:fillRef idx="2">
+            <a:schemeClr val="accent3"/>
+          </a:fillRef>
+          <a:effectRef idx="1">
+            <a:schemeClr val="accent3"/>
+          </a:effectRef>
+          <a:fontRef idx="minor">
+            <a:schemeClr val="dk1"/>
+          </a:fontRef>
+        </p:style>
+        <p:txBody>
+          <a:bodyPr rtlCol="0" anchor="ctr"/>
+          <a:lstStyle/>
+          <a:p>
+            <a:pPr algn="ctr"/>
+            <a:r>
+              <a:rPr lang="en-US" sz="1050" b="1" dirty="0" err="1" smtClean="0">
+                <a:solidFill>
+                  <a:schemeClr val="accent3">
+                    <a:lumMod val="75000"/>
+                  </a:schemeClr>
+                </a:solidFill>
+              </a:rPr>
+              <a:t>ContentBox</a:t>
+            </a:r>
+            <a:endParaRPr lang="en-SG" sz="1050" b="1" dirty="0">
+              <a:solidFill>
+                <a:schemeClr val="accent3">
+                  <a:lumMod val="75000"/>
+                </a:schemeClr>
+              </a:solidFill>
+            </a:endParaRPr>
+          </a:p>
+        </p:txBody>
+      </p:sp>
+      <p:cxnSp>
+        <p:nvCxnSpPr>
+          <p:cNvPr id="57" name="Straight Arrow Connector 56"/>
+          <p:cNvCxnSpPr>
+            <a:endCxn id="84" idx="1"/>
+          </p:cNvCxnSpPr>
+          <p:nvPr/>
+        </p:nvCxnSpPr>
+        <p:spPr>
+          <a:xfrm>
+            <a:off x="2416126" y="5638799"/>
+            <a:ext cx="163377" cy="1"/>
+          </a:xfrm>
+          <a:prstGeom prst="straightConnector1">
+            <a:avLst/>
+          </a:prstGeom>
+          <a:ln w="19050">
+            <a:tailEnd type="arrow"/>
+          </a:ln>
+        </p:spPr>
+        <p:style>
+          <a:lnRef idx="1">
+            <a:schemeClr val="accent3"/>
+          </a:lnRef>
+          <a:fillRef idx="0">
+            <a:schemeClr val="accent3"/>
+          </a:fillRef>
+          <a:effectRef idx="0">
+            <a:schemeClr val="accent3"/>
+          </a:effectRef>
+          <a:fontRef idx="minor">
+            <a:schemeClr val="tx1"/>
+          </a:fontRef>
+        </p:style>
+      </p:cxnSp>
+      <p:cxnSp>
+        <p:nvCxnSpPr>
+          <p:cNvPr id="59" name="Straight Connector 58"/>
+          <p:cNvCxnSpPr/>
+          <p:nvPr/>
+        </p:nvCxnSpPr>
+        <p:spPr>
+          <a:xfrm flipV="1">
+            <a:off x="4845016" y="5334001"/>
+            <a:ext cx="815882" cy="186378"/>
+          </a:xfrm>
+          <a:prstGeom prst="line">
+            <a:avLst/>
+          </a:prstGeom>
+          <a:ln w="19050">
+            <a:prstDash val="sysDot"/>
+          </a:ln>
+        </p:spPr>
+        <p:style>
+          <a:lnRef idx="1">
+            <a:schemeClr val="accent3"/>
+          </a:lnRef>
+          <a:fillRef idx="0">
+            <a:schemeClr val="accent3"/>
+          </a:fillRef>
+          <a:effectRef idx="0">
+            <a:schemeClr val="accent3"/>
+          </a:effectRef>
+          <a:fontRef idx="minor">
+            <a:schemeClr val="tx1"/>
+          </a:fontRef>
+        </p:style>
+      </p:cxnSp>
+      <p:cxnSp>
+        <p:nvCxnSpPr>
+          <p:cNvPr id="62" name="Straight Arrow Connector 61"/>
+          <p:cNvCxnSpPr/>
+          <p:nvPr/>
+        </p:nvCxnSpPr>
+        <p:spPr>
+          <a:xfrm>
+            <a:off x="5660898" y="5333999"/>
+            <a:ext cx="1060008" cy="0"/>
+          </a:xfrm>
+          <a:prstGeom prst="straightConnector1">
+            <a:avLst/>
+          </a:prstGeom>
+          <a:ln w="19050">
+            <a:prstDash val="sysDot"/>
+            <a:tailEnd type="arrow"/>
+          </a:ln>
+        </p:spPr>
+        <p:style>
+          <a:lnRef idx="1">
+            <a:schemeClr val="accent3"/>
+          </a:lnRef>
+          <a:fillRef idx="0">
+            <a:schemeClr val="accent3"/>
+          </a:fillRef>
+          <a:effectRef idx="0">
+            <a:schemeClr val="accent3"/>
+          </a:effectRef>
+          <a:fontRef idx="minor">
+            <a:schemeClr val="tx1"/>
+          </a:fontRef>
+        </p:style>
+      </p:cxnSp>
+      <p:cxnSp>
+        <p:nvCxnSpPr>
+          <p:cNvPr id="66" name="Straight Connector 65"/>
+          <p:cNvCxnSpPr/>
+          <p:nvPr/>
+        </p:nvCxnSpPr>
+        <p:spPr>
+          <a:xfrm flipH="1">
+            <a:off x="3657600" y="5520379"/>
+            <a:ext cx="1187416" cy="0"/>
+          </a:xfrm>
+          <a:prstGeom prst="line">
+            <a:avLst/>
+          </a:prstGeom>
+          <a:ln w="19050">
+            <a:prstDash val="sysDot"/>
+          </a:ln>
+        </p:spPr>
+        <p:style>
+          <a:lnRef idx="1">
+            <a:schemeClr val="accent3"/>
+          </a:lnRef>
+          <a:fillRef idx="0">
+            <a:schemeClr val="accent3"/>
+          </a:fillRef>
+          <a:effectRef idx="0">
+            <a:schemeClr val="accent3"/>
+          </a:effectRef>
+          <a:fontRef idx="minor">
+            <a:schemeClr val="tx1"/>
+          </a:fontRef>
+        </p:style>
+      </p:cxnSp>
+      <p:sp>
+        <p:nvSpPr>
+          <p:cNvPr id="95" name="Rectangle 11"/>
+          <p:cNvSpPr/>
+          <p:nvPr/>
+        </p:nvSpPr>
+        <p:spPr>
+          <a:xfrm>
+            <a:off x="2579502" y="4568169"/>
+            <a:ext cx="1093635" cy="236841"/>
+          </a:xfrm>
+          <a:prstGeom prst="rect">
+            <a:avLst/>
+          </a:prstGeom>
+          <a:ln w="19050">
+            <a:solidFill>
+              <a:schemeClr val="accent3"/>
+            </a:solidFill>
+          </a:ln>
+          <a:effectLst/>
+        </p:spPr>
+        <p:style>
+          <a:lnRef idx="1">
+            <a:schemeClr val="accent3"/>
+          </a:lnRef>
+          <a:fillRef idx="2">
+            <a:schemeClr val="accent3"/>
+          </a:fillRef>
+          <a:effectRef idx="1">
+            <a:schemeClr val="accent3"/>
+          </a:effectRef>
+          <a:fontRef idx="minor">
+            <a:schemeClr val="dk1"/>
+          </a:fontRef>
+        </p:style>
+        <p:txBody>
+          <a:bodyPr rtlCol="0" anchor="ctr"/>
+          <a:lstStyle/>
+          <a:p>
+            <a:pPr algn="ctr"/>
+            <a:r>
+              <a:rPr lang="en-US" sz="1050" b="1" dirty="0" err="1" smtClean="0">
+                <a:solidFill>
+                  <a:schemeClr val="accent3">
+                    <a:lumMod val="75000"/>
+                  </a:schemeClr>
+                </a:solidFill>
+              </a:rPr>
+              <a:t>StatusBarFooter</a:t>
+            </a:r>
+            <a:endParaRPr lang="en-SG" sz="1050" b="1" dirty="0">
+              <a:solidFill>
+                <a:schemeClr val="accent3">
+                  <a:lumMod val="75000"/>
+                </a:schemeClr>
+              </a:solidFill>
+            </a:endParaRPr>
+          </a:p>
+        </p:txBody>
+      </p:sp>
     </p:spTree>
     <p:extLst>
       <p:ext uri="{BB962C8B-B14F-4D97-AF65-F5344CB8AC3E}">
@@ -11016,7 +11604,7 @@
   <p:timing>
     <p:tnLst>
       <p:par>
-        <p:cTn xmlns:p14="http://schemas.microsoft.com/office/powerpoint/2010/main" id="1" dur="indefinite" restart="never" nodeType="tmRoot"/>
+        <p:cTn id="1" dur="indefinite" restart="never" nodeType="tmRoot"/>
       </p:par>
     </p:tnLst>
   </p:timing>
@@ -11515,15 +12103,7 @@
                   <a:srgbClr val="0070C0"/>
                 </a:solidFill>
               </a:rPr>
-              <a:t>Show</a:t>
-            </a:r>
-            <a:r>
-              <a:rPr lang="en-US" sz="1050" b="1" dirty="0" smtClean="0">
-                <a:solidFill>
-                  <a:srgbClr val="0070C0"/>
-                </a:solidFill>
-              </a:rPr>
-              <a:t>Command</a:t>
+              <a:t>ShowCommand</a:t>
             </a:r>
             <a:endParaRPr lang="en-SG" sz="1050" b="1" dirty="0">
               <a:solidFill>
@@ -12813,7 +13393,7 @@
   <p:timing>
     <p:tnLst>
       <p:par>
-        <p:cTn xmlns:p14="http://schemas.microsoft.com/office/powerpoint/2010/main" id="1" dur="indefinite" restart="never" nodeType="tmRoot"/>
+        <p:cTn id="1" dur="indefinite" restart="never" nodeType="tmRoot"/>
       </p:par>
     </p:tnLst>
   </p:timing>
@@ -16498,7 +17078,7 @@
   <p:timing>
     <p:tnLst>
       <p:par>
-        <p:cTn xmlns:p14="http://schemas.microsoft.com/office/powerpoint/2010/main" id="1" dur="indefinite" restart="never" nodeType="tmRoot"/>
+        <p:cTn id="1" dur="indefinite" restart="never" nodeType="tmRoot"/>
       </p:par>
     </p:tnLst>
   </p:timing>
@@ -17795,7 +18375,7 @@
   <p:timing>
     <p:tnLst>
       <p:par>
-        <p:cTn xmlns:p14="http://schemas.microsoft.com/office/powerpoint/2010/main" id="1" dur="indefinite" restart="never" nodeType="tmRoot"/>
+        <p:cTn id="1" dur="indefinite" restart="never" nodeType="tmRoot"/>
       </p:par>
     </p:tnLst>
   </p:timing>

</xml_diff>

<commit_message>
change logic manager diagram
</commit_message>
<xml_diff>
--- a/docs/diagrams/Diagrams.pptx
+++ b/docs/diagrams/Diagrams.pptx
@@ -8178,11 +8178,6 @@
               </a:rPr>
               <a:t> indicate task changes</a:t>
             </a:r>
-            <a:endParaRPr lang="en-US" dirty="0">
-              <a:solidFill>
-                <a:schemeClr val="tx1"/>
-              </a:solidFill>
-            </a:endParaRPr>
           </a:p>
         </p:txBody>
       </p:sp>
@@ -11554,8 +11549,8 @@
         </p:nvSpPr>
         <p:spPr>
           <a:xfrm rot="16200000">
-            <a:off x="-445883" y="3470802"/>
-            <a:ext cx="2312838" cy="346760"/>
+            <a:off x="-551187" y="3736870"/>
+            <a:ext cx="2523446" cy="346760"/>
           </a:xfrm>
           <a:prstGeom prst="rect">
             <a:avLst/>
@@ -11804,7 +11799,7 @@
         </p:nvCxnSpPr>
         <p:spPr>
           <a:xfrm>
-            <a:off x="0" y="2986335"/>
+            <a:off x="-408902" y="3588400"/>
             <a:ext cx="918792" cy="1430"/>
           </a:xfrm>
           <a:prstGeom prst="bentConnector3">

</xml_diff>

<commit_message>
add updates to UIClassDiagram.png
</commit_message>
<xml_diff>
--- a/docs/diagrams/Diagrams.pptx
+++ b/docs/diagrams/Diagrams.pptx
@@ -8901,7 +8901,7 @@
           <a:p>
             <a:pPr algn="ctr"/>
             <a:r>
-              <a:rPr lang="en-US" sz="1050" b="1" dirty="0" err="1">
+              <a:rPr lang="en-US" sz="1050" b="1" dirty="0">
                 <a:solidFill>
                   <a:schemeClr val="accent3">
                     <a:lumMod val="75000"/>
@@ -8961,7 +8961,7 @@
           <a:p>
             <a:pPr algn="ctr"/>
             <a:r>
-              <a:rPr lang="en-US" sz="1050" b="1" dirty="0" err="1">
+              <a:rPr lang="en-US" sz="1050" b="1" dirty="0">
                 <a:solidFill>
                   <a:schemeClr val="accent3">
                     <a:lumMod val="75000"/>
@@ -9024,7 +9024,7 @@
           <a:p>
             <a:pPr algn="ctr"/>
             <a:r>
-              <a:rPr lang="en-US" sz="1050" dirty="0" err="1" smtClean="0">
+              <a:rPr lang="en-US" sz="1050" dirty="0" smtClean="0">
                 <a:solidFill>
                   <a:schemeClr val="bg1"/>
                 </a:solidFill>
@@ -9274,7 +9274,7 @@
           <a:p>
             <a:pPr algn="ctr"/>
             <a:r>
-              <a:rPr lang="en-US" sz="1050" b="1" dirty="0" err="1">
+              <a:rPr lang="en-US" sz="1050" b="1" dirty="0">
                 <a:solidFill>
                   <a:schemeClr val="accent3">
                     <a:lumMod val="75000"/>
@@ -9334,7 +9334,7 @@
           <a:p>
             <a:pPr algn="ctr"/>
             <a:r>
-              <a:rPr lang="en-US" sz="1050" b="1" dirty="0" err="1" smtClean="0">
+              <a:rPr lang="en-US" sz="1050" b="1" dirty="0" smtClean="0">
                 <a:solidFill>
                   <a:schemeClr val="accent3">
                     <a:lumMod val="75000"/>
@@ -9394,7 +9394,7 @@
           <a:p>
             <a:pPr algn="ctr"/>
             <a:r>
-              <a:rPr lang="en-US" sz="1050" b="1" dirty="0" err="1" smtClean="0">
+              <a:rPr lang="en-US" sz="1050" b="1" dirty="0" smtClean="0">
                 <a:solidFill>
                   <a:schemeClr val="accent3">
                     <a:lumMod val="75000"/>
@@ -9454,7 +9454,7 @@
           <a:p>
             <a:pPr algn="ctr"/>
             <a:r>
-              <a:rPr lang="en-US" sz="1050" b="1" dirty="0" err="1">
+              <a:rPr lang="en-US" sz="1050" b="1" dirty="0">
                 <a:solidFill>
                   <a:schemeClr val="accent3">
                     <a:lumMod val="75000"/>
@@ -9603,7 +9603,7 @@
           <a:p>
             <a:pPr algn="ctr"/>
             <a:r>
-              <a:rPr lang="en-US" sz="1050" b="1" dirty="0" err="1">
+              <a:rPr lang="en-US" sz="1050" b="1" dirty="0">
                 <a:solidFill>
                   <a:schemeClr val="accent3">
                     <a:lumMod val="75000"/>
@@ -9836,7 +9836,7 @@
               </a:rPr>
             </a:br>
             <a:r>
-              <a:rPr lang="en-US" sz="1050" b="1" dirty="0" err="1" smtClean="0">
+              <a:rPr lang="en-US" sz="1050" b="1" dirty="0" smtClean="0">
                 <a:solidFill>
                   <a:schemeClr val="accent3">
                     <a:lumMod val="75000"/>
@@ -10144,7 +10144,7 @@
           <a:p>
             <a:pPr algn="ctr"/>
             <a:r>
-              <a:rPr lang="en-US" sz="1050" dirty="0" err="1">
+              <a:rPr lang="en-US" sz="1050" dirty="0">
                 <a:solidFill>
                   <a:schemeClr val="bg1"/>
                 </a:solidFill>
@@ -10394,7 +10394,7 @@
           <a:p>
             <a:pPr algn="ctr"/>
             <a:r>
-              <a:rPr lang="en-US" sz="1050" dirty="0" err="1" smtClean="0">
+              <a:rPr lang="en-US" sz="1050" dirty="0" smtClean="0">
                 <a:solidFill>
                   <a:schemeClr val="bg1"/>
                 </a:solidFill>
@@ -11131,7 +11131,7 @@
           <a:p>
             <a:pPr algn="ctr"/>
             <a:r>
-              <a:rPr lang="en-US" sz="1050" b="1" dirty="0" err="1" smtClean="0">
+              <a:rPr lang="en-US" sz="1050" b="1" dirty="0" smtClean="0">
                 <a:solidFill>
                   <a:schemeClr val="accent3">
                     <a:lumMod val="75000"/>
@@ -11191,7 +11191,7 @@
           <a:p>
             <a:pPr algn="ctr"/>
             <a:r>
-              <a:rPr lang="en-US" sz="1050" b="1" dirty="0" err="1" smtClean="0">
+              <a:rPr lang="en-US" sz="1050" b="1" dirty="0" smtClean="0">
                 <a:solidFill>
                   <a:schemeClr val="accent3">
                     <a:lumMod val="75000"/>
@@ -11377,7 +11377,7 @@
           <a:p>
             <a:pPr algn="ctr"/>
             <a:r>
-              <a:rPr lang="en-US" sz="1050" b="1" dirty="0" err="1" smtClean="0">
+              <a:rPr lang="en-US" sz="1050" b="1" dirty="0" smtClean="0">
                 <a:solidFill>
                   <a:schemeClr val="accent3">
                     <a:lumMod val="75000"/>
@@ -11572,7 +11572,7 @@
           <a:p>
             <a:pPr algn="ctr"/>
             <a:r>
-              <a:rPr lang="en-US" sz="1050" b="1" dirty="0" err="1" smtClean="0">
+              <a:rPr lang="en-US" sz="1050" b="1" dirty="0" smtClean="0">
                 <a:solidFill>
                   <a:schemeClr val="accent3">
                     <a:lumMod val="75000"/>

</xml_diff>

<commit_message>
Minor refactoring (jimi, indices, agendaPanel)
</commit_message>
<xml_diff>
--- a/docs/diagrams/Diagrams.pptx
+++ b/docs/diagrams/Diagrams.pptx
@@ -115,6 +115,22 @@
       </a:defRPr>
     </a:lvl9pPr>
   </p:defaultTextStyle>
+  <p:extLst>
+    <p:ext uri="{EFAFB233-063F-42B5-8137-9DF3F51BA10A}">
+      <p15:sldGuideLst xmlns:p15="http://schemas.microsoft.com/office/powerpoint/2012/main">
+        <p15:guide id="1" orient="horz" pos="1488">
+          <p15:clr>
+            <a:srgbClr val="A4A3A4"/>
+          </p15:clr>
+        </p15:guide>
+        <p15:guide id="2" pos="2880">
+          <p15:clr>
+            <a:srgbClr val="A4A3A4"/>
+          </p15:clr>
+        </p15:guide>
+      </p15:sldGuideLst>
+    </p:ext>
+  </p:extLst>
 </p:presentation>
 </file>
 
@@ -200,7 +216,7 @@
           <a:p>
             <a:fld id="{F5CC4B3F-88C1-4FFA-B1B6-F41C21DC6924}" type="datetimeFigureOut">
               <a:rPr lang="en-US" smtClean="0"/>
-              <a:t>10/27/2016</a:t>
+              <a:t>11/6/2016</a:t>
             </a:fld>
             <a:endParaRPr lang="en-US"/>
           </a:p>
@@ -264,38 +280,37 @@
           <a:p>
             <a:pPr lvl="0"/>
             <a:r>
-              <a:rPr lang="en-US" smtClean="0"/>
+              <a:rPr lang="en-US"/>
               <a:t>Click to edit Master text styles</a:t>
             </a:r>
           </a:p>
           <a:p>
             <a:pPr lvl="1"/>
             <a:r>
-              <a:rPr lang="en-US" smtClean="0"/>
+              <a:rPr lang="en-US"/>
               <a:t>Second level</a:t>
             </a:r>
           </a:p>
           <a:p>
             <a:pPr lvl="2"/>
             <a:r>
-              <a:rPr lang="en-US" smtClean="0"/>
+              <a:rPr lang="en-US"/>
               <a:t>Third level</a:t>
             </a:r>
           </a:p>
           <a:p>
             <a:pPr lvl="3"/>
             <a:r>
-              <a:rPr lang="en-US" smtClean="0"/>
+              <a:rPr lang="en-US"/>
               <a:t>Fourth level</a:t>
             </a:r>
           </a:p>
           <a:p>
             <a:pPr lvl="4"/>
             <a:r>
-              <a:rPr lang="en-US" smtClean="0"/>
+              <a:rPr lang="en-US"/>
               <a:t>Fifth level</a:t>
             </a:r>
-            <a:endParaRPr lang="en-US"/>
           </a:p>
         </p:txBody>
       </p:sp>
@@ -506,10 +521,9 @@
           <a:lstStyle/>
           <a:p>
             <a:r>
-              <a:rPr lang="en-US" smtClean="0"/>
+              <a:rPr lang="en-US"/>
               <a:t>Click to edit Master title style</a:t>
             </a:r>
-            <a:endParaRPr lang="en-US"/>
           </a:p>
         </p:txBody>
       </p:sp>
@@ -625,10 +639,9 @@
           </a:lstStyle>
           <a:p>
             <a:r>
-              <a:rPr lang="en-US" smtClean="0"/>
+              <a:rPr lang="en-US"/>
               <a:t>Click to edit Master subtitle style</a:t>
             </a:r>
-            <a:endParaRPr lang="en-US"/>
           </a:p>
         </p:txBody>
       </p:sp>
@@ -649,7 +662,7 @@
           <a:p>
             <a:fld id="{78C97017-6FC3-485B-9764-EAC9E56C1D49}" type="datetimeFigureOut">
               <a:rPr lang="en-US" smtClean="0"/>
-              <a:t>10/27/2016</a:t>
+              <a:t>11/6/2016</a:t>
             </a:fld>
             <a:endParaRPr lang="en-US"/>
           </a:p>
@@ -743,10 +756,9 @@
           <a:lstStyle/>
           <a:p>
             <a:r>
-              <a:rPr lang="en-US" smtClean="0"/>
+              <a:rPr lang="en-US"/>
               <a:t>Click to edit Master title style</a:t>
             </a:r>
-            <a:endParaRPr lang="en-US"/>
           </a:p>
         </p:txBody>
       </p:sp>
@@ -767,38 +779,37 @@
           <a:p>
             <a:pPr lvl="0"/>
             <a:r>
-              <a:rPr lang="en-US" smtClean="0"/>
+              <a:rPr lang="en-US"/>
               <a:t>Click to edit Master text styles</a:t>
             </a:r>
           </a:p>
           <a:p>
             <a:pPr lvl="1"/>
             <a:r>
-              <a:rPr lang="en-US" smtClean="0"/>
+              <a:rPr lang="en-US"/>
               <a:t>Second level</a:t>
             </a:r>
           </a:p>
           <a:p>
             <a:pPr lvl="2"/>
             <a:r>
-              <a:rPr lang="en-US" smtClean="0"/>
+              <a:rPr lang="en-US"/>
               <a:t>Third level</a:t>
             </a:r>
           </a:p>
           <a:p>
             <a:pPr lvl="3"/>
             <a:r>
-              <a:rPr lang="en-US" smtClean="0"/>
+              <a:rPr lang="en-US"/>
               <a:t>Fourth level</a:t>
             </a:r>
           </a:p>
           <a:p>
             <a:pPr lvl="4"/>
             <a:r>
-              <a:rPr lang="en-US" smtClean="0"/>
+              <a:rPr lang="en-US"/>
               <a:t>Fifth level</a:t>
             </a:r>
-            <a:endParaRPr lang="en-US"/>
           </a:p>
         </p:txBody>
       </p:sp>
@@ -819,7 +830,7 @@
           <a:p>
             <a:fld id="{78C97017-6FC3-485B-9764-EAC9E56C1D49}" type="datetimeFigureOut">
               <a:rPr lang="en-US" smtClean="0"/>
-              <a:t>10/27/2016</a:t>
+              <a:t>11/6/2016</a:t>
             </a:fld>
             <a:endParaRPr lang="en-US"/>
           </a:p>
@@ -918,10 +929,9 @@
           <a:lstStyle/>
           <a:p>
             <a:r>
-              <a:rPr lang="en-US" smtClean="0"/>
+              <a:rPr lang="en-US"/>
               <a:t>Click to edit Master title style</a:t>
             </a:r>
-            <a:endParaRPr lang="en-US"/>
           </a:p>
         </p:txBody>
       </p:sp>
@@ -947,38 +957,37 @@
           <a:p>
             <a:pPr lvl="0"/>
             <a:r>
-              <a:rPr lang="en-US" smtClean="0"/>
+              <a:rPr lang="en-US"/>
               <a:t>Click to edit Master text styles</a:t>
             </a:r>
           </a:p>
           <a:p>
             <a:pPr lvl="1"/>
             <a:r>
-              <a:rPr lang="en-US" smtClean="0"/>
+              <a:rPr lang="en-US"/>
               <a:t>Second level</a:t>
             </a:r>
           </a:p>
           <a:p>
             <a:pPr lvl="2"/>
             <a:r>
-              <a:rPr lang="en-US" smtClean="0"/>
+              <a:rPr lang="en-US"/>
               <a:t>Third level</a:t>
             </a:r>
           </a:p>
           <a:p>
             <a:pPr lvl="3"/>
             <a:r>
-              <a:rPr lang="en-US" smtClean="0"/>
+              <a:rPr lang="en-US"/>
               <a:t>Fourth level</a:t>
             </a:r>
           </a:p>
           <a:p>
             <a:pPr lvl="4"/>
             <a:r>
-              <a:rPr lang="en-US" smtClean="0"/>
+              <a:rPr lang="en-US"/>
               <a:t>Fifth level</a:t>
             </a:r>
-            <a:endParaRPr lang="en-US"/>
           </a:p>
         </p:txBody>
       </p:sp>
@@ -999,7 +1008,7 @@
           <a:p>
             <a:fld id="{78C97017-6FC3-485B-9764-EAC9E56C1D49}" type="datetimeFigureOut">
               <a:rPr lang="en-US" smtClean="0"/>
-              <a:t>10/27/2016</a:t>
+              <a:t>11/6/2016</a:t>
             </a:fld>
             <a:endParaRPr lang="en-US"/>
           </a:p>
@@ -1093,10 +1102,9 @@
           <a:lstStyle/>
           <a:p>
             <a:r>
-              <a:rPr lang="en-US" smtClean="0"/>
+              <a:rPr lang="en-US"/>
               <a:t>Click to edit Master title style</a:t>
             </a:r>
-            <a:endParaRPr lang="en-US"/>
           </a:p>
         </p:txBody>
       </p:sp>
@@ -1117,38 +1125,37 @@
           <a:p>
             <a:pPr lvl="0"/>
             <a:r>
-              <a:rPr lang="en-US" smtClean="0"/>
+              <a:rPr lang="en-US"/>
               <a:t>Click to edit Master text styles</a:t>
             </a:r>
           </a:p>
           <a:p>
             <a:pPr lvl="1"/>
             <a:r>
-              <a:rPr lang="en-US" smtClean="0"/>
+              <a:rPr lang="en-US"/>
               <a:t>Second level</a:t>
             </a:r>
           </a:p>
           <a:p>
             <a:pPr lvl="2"/>
             <a:r>
-              <a:rPr lang="en-US" smtClean="0"/>
+              <a:rPr lang="en-US"/>
               <a:t>Third level</a:t>
             </a:r>
           </a:p>
           <a:p>
             <a:pPr lvl="3"/>
             <a:r>
-              <a:rPr lang="en-US" smtClean="0"/>
+              <a:rPr lang="en-US"/>
               <a:t>Fourth level</a:t>
             </a:r>
           </a:p>
           <a:p>
             <a:pPr lvl="4"/>
             <a:r>
-              <a:rPr lang="en-US" smtClean="0"/>
+              <a:rPr lang="en-US"/>
               <a:t>Fifth level</a:t>
             </a:r>
-            <a:endParaRPr lang="en-US"/>
           </a:p>
         </p:txBody>
       </p:sp>
@@ -1169,7 +1176,7 @@
           <a:p>
             <a:fld id="{78C97017-6FC3-485B-9764-EAC9E56C1D49}" type="datetimeFigureOut">
               <a:rPr lang="en-US" smtClean="0"/>
-              <a:t>10/27/2016</a:t>
+              <a:t>11/6/2016</a:t>
             </a:fld>
             <a:endParaRPr lang="en-US"/>
           </a:p>
@@ -1272,10 +1279,9 @@
           </a:lstStyle>
           <a:p>
             <a:r>
-              <a:rPr lang="en-US" smtClean="0"/>
+              <a:rPr lang="en-US"/>
               <a:t>Click to edit Master title style</a:t>
             </a:r>
-            <a:endParaRPr lang="en-US"/>
           </a:p>
         </p:txBody>
       </p:sp>
@@ -1392,7 +1398,7 @@
           <a:p>
             <a:pPr lvl="0"/>
             <a:r>
-              <a:rPr lang="en-US" smtClean="0"/>
+              <a:rPr lang="en-US"/>
               <a:t>Click to edit Master text styles</a:t>
             </a:r>
           </a:p>
@@ -1415,7 +1421,7 @@
           <a:p>
             <a:fld id="{78C97017-6FC3-485B-9764-EAC9E56C1D49}" type="datetimeFigureOut">
               <a:rPr lang="en-US" smtClean="0"/>
-              <a:t>10/27/2016</a:t>
+              <a:t>11/6/2016</a:t>
             </a:fld>
             <a:endParaRPr lang="en-US"/>
           </a:p>
@@ -1509,10 +1515,9 @@
           <a:lstStyle/>
           <a:p>
             <a:r>
-              <a:rPr lang="en-US" smtClean="0"/>
+              <a:rPr lang="en-US"/>
               <a:t>Click to edit Master title style</a:t>
             </a:r>
-            <a:endParaRPr lang="en-US"/>
           </a:p>
         </p:txBody>
       </p:sp>
@@ -1566,38 +1571,37 @@
           <a:p>
             <a:pPr lvl="0"/>
             <a:r>
-              <a:rPr lang="en-US" smtClean="0"/>
+              <a:rPr lang="en-US"/>
               <a:t>Click to edit Master text styles</a:t>
             </a:r>
           </a:p>
           <a:p>
             <a:pPr lvl="1"/>
             <a:r>
-              <a:rPr lang="en-US" smtClean="0"/>
+              <a:rPr lang="en-US"/>
               <a:t>Second level</a:t>
             </a:r>
           </a:p>
           <a:p>
             <a:pPr lvl="2"/>
             <a:r>
-              <a:rPr lang="en-US" smtClean="0"/>
+              <a:rPr lang="en-US"/>
               <a:t>Third level</a:t>
             </a:r>
           </a:p>
           <a:p>
             <a:pPr lvl="3"/>
             <a:r>
-              <a:rPr lang="en-US" smtClean="0"/>
+              <a:rPr lang="en-US"/>
               <a:t>Fourth level</a:t>
             </a:r>
           </a:p>
           <a:p>
             <a:pPr lvl="4"/>
             <a:r>
-              <a:rPr lang="en-US" smtClean="0"/>
+              <a:rPr lang="en-US"/>
               <a:t>Fifth level</a:t>
             </a:r>
-            <a:endParaRPr lang="en-US"/>
           </a:p>
         </p:txBody>
       </p:sp>
@@ -1651,38 +1655,37 @@
           <a:p>
             <a:pPr lvl="0"/>
             <a:r>
-              <a:rPr lang="en-US" smtClean="0"/>
+              <a:rPr lang="en-US"/>
               <a:t>Click to edit Master text styles</a:t>
             </a:r>
           </a:p>
           <a:p>
             <a:pPr lvl="1"/>
             <a:r>
-              <a:rPr lang="en-US" smtClean="0"/>
+              <a:rPr lang="en-US"/>
               <a:t>Second level</a:t>
             </a:r>
           </a:p>
           <a:p>
             <a:pPr lvl="2"/>
             <a:r>
-              <a:rPr lang="en-US" smtClean="0"/>
+              <a:rPr lang="en-US"/>
               <a:t>Third level</a:t>
             </a:r>
           </a:p>
           <a:p>
             <a:pPr lvl="3"/>
             <a:r>
-              <a:rPr lang="en-US" smtClean="0"/>
+              <a:rPr lang="en-US"/>
               <a:t>Fourth level</a:t>
             </a:r>
           </a:p>
           <a:p>
             <a:pPr lvl="4"/>
             <a:r>
-              <a:rPr lang="en-US" smtClean="0"/>
+              <a:rPr lang="en-US"/>
               <a:t>Fifth level</a:t>
             </a:r>
-            <a:endParaRPr lang="en-US"/>
           </a:p>
         </p:txBody>
       </p:sp>
@@ -1703,7 +1706,7 @@
           <a:p>
             <a:fld id="{78C97017-6FC3-485B-9764-EAC9E56C1D49}" type="datetimeFigureOut">
               <a:rPr lang="en-US" smtClean="0"/>
-              <a:t>10/27/2016</a:t>
+              <a:t>11/6/2016</a:t>
             </a:fld>
             <a:endParaRPr lang="en-US"/>
           </a:p>
@@ -1801,10 +1804,9 @@
           </a:lstStyle>
           <a:p>
             <a:r>
-              <a:rPr lang="en-US" smtClean="0"/>
+              <a:rPr lang="en-US"/>
               <a:t>Click to edit Master title style</a:t>
             </a:r>
-            <a:endParaRPr lang="en-US"/>
           </a:p>
         </p:txBody>
       </p:sp>
@@ -1867,7 +1869,7 @@
           <a:p>
             <a:pPr lvl="0"/>
             <a:r>
-              <a:rPr lang="en-US" smtClean="0"/>
+              <a:rPr lang="en-US"/>
               <a:t>Click to edit Master text styles</a:t>
             </a:r>
           </a:p>
@@ -1923,38 +1925,37 @@
           <a:p>
             <a:pPr lvl="0"/>
             <a:r>
-              <a:rPr lang="en-US" smtClean="0"/>
+              <a:rPr lang="en-US"/>
               <a:t>Click to edit Master text styles</a:t>
             </a:r>
           </a:p>
           <a:p>
             <a:pPr lvl="1"/>
             <a:r>
-              <a:rPr lang="en-US" smtClean="0"/>
+              <a:rPr lang="en-US"/>
               <a:t>Second level</a:t>
             </a:r>
           </a:p>
           <a:p>
             <a:pPr lvl="2"/>
             <a:r>
-              <a:rPr lang="en-US" smtClean="0"/>
+              <a:rPr lang="en-US"/>
               <a:t>Third level</a:t>
             </a:r>
           </a:p>
           <a:p>
             <a:pPr lvl="3"/>
             <a:r>
-              <a:rPr lang="en-US" smtClean="0"/>
+              <a:rPr lang="en-US"/>
               <a:t>Fourth level</a:t>
             </a:r>
           </a:p>
           <a:p>
             <a:pPr lvl="4"/>
             <a:r>
-              <a:rPr lang="en-US" smtClean="0"/>
+              <a:rPr lang="en-US"/>
               <a:t>Fifth level</a:t>
             </a:r>
-            <a:endParaRPr lang="en-US"/>
           </a:p>
         </p:txBody>
       </p:sp>
@@ -2017,7 +2018,7 @@
           <a:p>
             <a:pPr lvl="0"/>
             <a:r>
-              <a:rPr lang="en-US" smtClean="0"/>
+              <a:rPr lang="en-US"/>
               <a:t>Click to edit Master text styles</a:t>
             </a:r>
           </a:p>
@@ -2073,38 +2074,37 @@
           <a:p>
             <a:pPr lvl="0"/>
             <a:r>
-              <a:rPr lang="en-US" smtClean="0"/>
+              <a:rPr lang="en-US"/>
               <a:t>Click to edit Master text styles</a:t>
             </a:r>
           </a:p>
           <a:p>
             <a:pPr lvl="1"/>
             <a:r>
-              <a:rPr lang="en-US" smtClean="0"/>
+              <a:rPr lang="en-US"/>
               <a:t>Second level</a:t>
             </a:r>
           </a:p>
           <a:p>
             <a:pPr lvl="2"/>
             <a:r>
-              <a:rPr lang="en-US" smtClean="0"/>
+              <a:rPr lang="en-US"/>
               <a:t>Third level</a:t>
             </a:r>
           </a:p>
           <a:p>
             <a:pPr lvl="3"/>
             <a:r>
-              <a:rPr lang="en-US" smtClean="0"/>
+              <a:rPr lang="en-US"/>
               <a:t>Fourth level</a:t>
             </a:r>
           </a:p>
           <a:p>
             <a:pPr lvl="4"/>
             <a:r>
-              <a:rPr lang="en-US" smtClean="0"/>
+              <a:rPr lang="en-US"/>
               <a:t>Fifth level</a:t>
             </a:r>
-            <a:endParaRPr lang="en-US"/>
           </a:p>
         </p:txBody>
       </p:sp>
@@ -2125,7 +2125,7 @@
           <a:p>
             <a:fld id="{78C97017-6FC3-485B-9764-EAC9E56C1D49}" type="datetimeFigureOut">
               <a:rPr lang="en-US" smtClean="0"/>
-              <a:t>10/27/2016</a:t>
+              <a:t>11/6/2016</a:t>
             </a:fld>
             <a:endParaRPr lang="en-US"/>
           </a:p>
@@ -2219,10 +2219,9 @@
           <a:lstStyle/>
           <a:p>
             <a:r>
-              <a:rPr lang="en-US" smtClean="0"/>
+              <a:rPr lang="en-US"/>
               <a:t>Click to edit Master title style</a:t>
             </a:r>
-            <a:endParaRPr lang="en-US"/>
           </a:p>
         </p:txBody>
       </p:sp>
@@ -2243,7 +2242,7 @@
           <a:p>
             <a:fld id="{78C97017-6FC3-485B-9764-EAC9E56C1D49}" type="datetimeFigureOut">
               <a:rPr lang="en-US" smtClean="0"/>
-              <a:t>10/27/2016</a:t>
+              <a:t>11/6/2016</a:t>
             </a:fld>
             <a:endParaRPr lang="en-US"/>
           </a:p>
@@ -2338,7 +2337,7 @@
           <a:p>
             <a:fld id="{78C97017-6FC3-485B-9764-EAC9E56C1D49}" type="datetimeFigureOut">
               <a:rPr lang="en-US" smtClean="0"/>
-              <a:t>10/27/2016</a:t>
+              <a:t>11/6/2016</a:t>
             </a:fld>
             <a:endParaRPr lang="en-US"/>
           </a:p>
@@ -2441,10 +2440,9 @@
           </a:lstStyle>
           <a:p>
             <a:r>
-              <a:rPr lang="en-US" smtClean="0"/>
+              <a:rPr lang="en-US"/>
               <a:t>Click to edit Master title style</a:t>
             </a:r>
-            <a:endParaRPr lang="en-US"/>
           </a:p>
         </p:txBody>
       </p:sp>
@@ -2498,38 +2496,37 @@
           <a:p>
             <a:pPr lvl="0"/>
             <a:r>
-              <a:rPr lang="en-US" smtClean="0"/>
+              <a:rPr lang="en-US"/>
               <a:t>Click to edit Master text styles</a:t>
             </a:r>
           </a:p>
           <a:p>
             <a:pPr lvl="1"/>
             <a:r>
-              <a:rPr lang="en-US" smtClean="0"/>
+              <a:rPr lang="en-US"/>
               <a:t>Second level</a:t>
             </a:r>
           </a:p>
           <a:p>
             <a:pPr lvl="2"/>
             <a:r>
-              <a:rPr lang="en-US" smtClean="0"/>
+              <a:rPr lang="en-US"/>
               <a:t>Third level</a:t>
             </a:r>
           </a:p>
           <a:p>
             <a:pPr lvl="3"/>
             <a:r>
-              <a:rPr lang="en-US" smtClean="0"/>
+              <a:rPr lang="en-US"/>
               <a:t>Fourth level</a:t>
             </a:r>
           </a:p>
           <a:p>
             <a:pPr lvl="4"/>
             <a:r>
-              <a:rPr lang="en-US" smtClean="0"/>
+              <a:rPr lang="en-US"/>
               <a:t>Fifth level</a:t>
             </a:r>
-            <a:endParaRPr lang="en-US"/>
           </a:p>
         </p:txBody>
       </p:sp>
@@ -2592,7 +2589,7 @@
           <a:p>
             <a:pPr lvl="0"/>
             <a:r>
-              <a:rPr lang="en-US" smtClean="0"/>
+              <a:rPr lang="en-US"/>
               <a:t>Click to edit Master text styles</a:t>
             </a:r>
           </a:p>
@@ -2615,7 +2612,7 @@
           <a:p>
             <a:fld id="{78C97017-6FC3-485B-9764-EAC9E56C1D49}" type="datetimeFigureOut">
               <a:rPr lang="en-US" smtClean="0"/>
-              <a:t>10/27/2016</a:t>
+              <a:t>11/6/2016</a:t>
             </a:fld>
             <a:endParaRPr lang="en-US"/>
           </a:p>
@@ -2718,10 +2715,9 @@
           </a:lstStyle>
           <a:p>
             <a:r>
-              <a:rPr lang="en-US" smtClean="0"/>
+              <a:rPr lang="en-US"/>
               <a:t>Click to edit Master title style</a:t>
             </a:r>
-            <a:endParaRPr lang="en-US"/>
           </a:p>
         </p:txBody>
       </p:sp>
@@ -2845,7 +2841,7 @@
           <a:p>
             <a:pPr lvl="0"/>
             <a:r>
-              <a:rPr lang="en-US" smtClean="0"/>
+              <a:rPr lang="en-US"/>
               <a:t>Click to edit Master text styles</a:t>
             </a:r>
           </a:p>
@@ -2868,7 +2864,7 @@
           <a:p>
             <a:fld id="{78C97017-6FC3-485B-9764-EAC9E56C1D49}" type="datetimeFigureOut">
               <a:rPr lang="en-US" smtClean="0"/>
-              <a:t>10/27/2016</a:t>
+              <a:t>11/6/2016</a:t>
             </a:fld>
             <a:endParaRPr lang="en-US"/>
           </a:p>
@@ -2977,10 +2973,9 @@
           <a:lstStyle/>
           <a:p>
             <a:r>
-              <a:rPr lang="en-US" smtClean="0"/>
+              <a:rPr lang="en-US"/>
               <a:t>Click to edit Master title style</a:t>
             </a:r>
-            <a:endParaRPr lang="en-US"/>
           </a:p>
         </p:txBody>
       </p:sp>
@@ -3011,38 +3006,37 @@
           <a:p>
             <a:pPr lvl="0"/>
             <a:r>
-              <a:rPr lang="en-US" smtClean="0"/>
+              <a:rPr lang="en-US"/>
               <a:t>Click to edit Master text styles</a:t>
             </a:r>
           </a:p>
           <a:p>
             <a:pPr lvl="1"/>
             <a:r>
-              <a:rPr lang="en-US" smtClean="0"/>
+              <a:rPr lang="en-US"/>
               <a:t>Second level</a:t>
             </a:r>
           </a:p>
           <a:p>
             <a:pPr lvl="2"/>
             <a:r>
-              <a:rPr lang="en-US" smtClean="0"/>
+              <a:rPr lang="en-US"/>
               <a:t>Third level</a:t>
             </a:r>
           </a:p>
           <a:p>
             <a:pPr lvl="3"/>
             <a:r>
-              <a:rPr lang="en-US" smtClean="0"/>
+              <a:rPr lang="en-US"/>
               <a:t>Fourth level</a:t>
             </a:r>
           </a:p>
           <a:p>
             <a:pPr lvl="4"/>
             <a:r>
-              <a:rPr lang="en-US" smtClean="0"/>
+              <a:rPr lang="en-US"/>
               <a:t>Fifth level</a:t>
             </a:r>
-            <a:endParaRPr lang="en-US"/>
           </a:p>
         </p:txBody>
       </p:sp>
@@ -3081,7 +3075,7 @@
           <a:p>
             <a:fld id="{78C97017-6FC3-485B-9764-EAC9E56C1D49}" type="datetimeFigureOut">
               <a:rPr lang="en-US" smtClean="0"/>
-              <a:t>10/27/2016</a:t>
+              <a:t>11/6/2016</a:t>
             </a:fld>
             <a:endParaRPr lang="en-US"/>
           </a:p>
@@ -3472,14 +3466,9 @@
           <a:lstStyle/>
           <a:p>
             <a:r>
-              <a:rPr lang="en-US" dirty="0" err="1" smtClean="0"/>
-              <a:t>AddressBook</a:t>
-            </a:r>
-            <a:r>
-              <a:rPr lang="en-US" dirty="0" smtClean="0"/>
-              <a:t> – Level 4</a:t>
-            </a:r>
-            <a:endParaRPr lang="en-US" dirty="0"/>
+              <a:rPr lang="en-US" dirty="0"/>
+              <a:t>Jimi v0.5</a:t>
+            </a:r>
           </a:p>
         </p:txBody>
       </p:sp>
@@ -3499,10 +3488,9 @@
           <a:lstStyle/>
           <a:p>
             <a:r>
-              <a:rPr lang="en-US" dirty="0" smtClean="0"/>
+              <a:rPr lang="en-US" dirty="0"/>
               <a:t>Diagrams</a:t>
             </a:r>
-            <a:endParaRPr lang="en-US" dirty="0"/>
           </a:p>
         </p:txBody>
       </p:sp>
@@ -3634,7 +3622,7 @@
           <a:p>
             <a:pPr algn="ctr"/>
             <a:r>
-              <a:rPr lang="en-US" sz="1600" dirty="0" smtClean="0">
+              <a:rPr lang="en-US" sz="1600" dirty="0">
                 <a:solidFill>
                   <a:schemeClr val="bg1"/>
                 </a:solidFill>
@@ -3693,7 +3681,7 @@
           <a:p>
             <a:pPr algn="ctr"/>
             <a:r>
-              <a:rPr lang="en-US" sz="1600" dirty="0" smtClean="0">
+              <a:rPr lang="en-US" sz="1600" dirty="0">
                 <a:solidFill>
                   <a:schemeClr val="bg1"/>
                 </a:solidFill>
@@ -3756,7 +3744,7 @@
           <a:p>
             <a:pPr algn="ctr"/>
             <a:r>
-              <a:rPr lang="en-US" sz="1600" dirty="0" smtClean="0">
+              <a:rPr lang="en-US" sz="1600" dirty="0">
                 <a:solidFill>
                   <a:schemeClr val="bg1"/>
                 </a:solidFill>
@@ -3815,7 +3803,7 @@
           <a:p>
             <a:pPr algn="ctr"/>
             <a:r>
-              <a:rPr lang="en-US" sz="1600" dirty="0" smtClean="0">
+              <a:rPr lang="en-US" sz="1600" dirty="0">
                 <a:solidFill>
                   <a:schemeClr val="bg1"/>
                 </a:solidFill>
@@ -4306,7 +4294,7 @@
           <a:p>
             <a:pPr algn="ctr"/>
             <a:r>
-              <a:rPr lang="en-US" sz="1600" dirty="0" smtClean="0">
+              <a:rPr lang="en-US" sz="1600" dirty="0">
                 <a:solidFill>
                   <a:schemeClr val="bg1"/>
                 </a:solidFill>
@@ -4657,7 +4645,7 @@
           <a:p>
             <a:pPr algn="ctr"/>
             <a:r>
-              <a:rPr lang="en-US" sz="1600" dirty="0" smtClean="0">
+              <a:rPr lang="en-US" sz="1600" dirty="0">
                 <a:solidFill>
                   <a:schemeClr val="bg1"/>
                 </a:solidFill>
@@ -4665,25 +4653,20 @@
               <a:t>Logs</a:t>
             </a:r>
             <a:br>
-              <a:rPr lang="en-US" sz="1600" dirty="0" smtClean="0">
+              <a:rPr lang="en-US" sz="1600" dirty="0">
                 <a:solidFill>
                   <a:schemeClr val="bg1"/>
                 </a:solidFill>
               </a:rPr>
             </a:br>
             <a:r>
-              <a:rPr lang="en-US" sz="1600" dirty="0" smtClean="0">
+              <a:rPr lang="en-US" sz="1600" dirty="0">
                 <a:solidFill>
                   <a:schemeClr val="bg1"/>
                 </a:solidFill>
               </a:rPr>
               <a:t>Center</a:t>
             </a:r>
-            <a:endParaRPr lang="en-US" sz="1600" dirty="0">
-              <a:solidFill>
-                <a:schemeClr val="bg1"/>
-              </a:solidFill>
-            </a:endParaRPr>
           </a:p>
         </p:txBody>
       </p:sp>
@@ -4840,7 +4823,7 @@
           <a:p>
             <a:pPr algn="ctr"/>
             <a:r>
-              <a:rPr lang="en-US" sz="1600" dirty="0" smtClean="0">
+              <a:rPr lang="en-US" sz="1600" dirty="0">
                 <a:solidFill>
                   <a:schemeClr val="bg1"/>
                 </a:solidFill>
@@ -5204,7 +5187,7 @@
           <a:p>
             <a:pPr algn="ctr"/>
             <a:r>
-              <a:rPr lang="en-US" sz="1600" dirty="0" smtClean="0">
+              <a:rPr lang="en-US" sz="1600" dirty="0">
                 <a:solidFill>
                   <a:schemeClr val="bg1"/>
                 </a:solidFill>
@@ -5351,7 +5334,7 @@
           <a:p>
             <a:pPr algn="ctr"/>
             <a:r>
-              <a:rPr lang="en-US" sz="1600" dirty="0" smtClean="0">
+              <a:rPr lang="en-US" sz="1600" dirty="0">
                 <a:solidFill>
                   <a:schemeClr val="bg1"/>
                 </a:solidFill>
@@ -5513,10 +5496,9 @@
           <a:lstStyle/>
           <a:p>
             <a:r>
-              <a:rPr lang="en-US" sz="1400" dirty="0" smtClean="0"/>
-              <a:t>delete 1</a:t>
-            </a:r>
-            <a:endParaRPr lang="en-US" sz="1400" dirty="0"/>
+              <a:rPr lang="en-US" sz="1400" dirty="0"/>
+              <a:t>delete t1</a:t>
+            </a:r>
           </a:p>
         </p:txBody>
       </p:sp>
@@ -5579,34 +5561,13 @@
           <a:lstStyle/>
           <a:p>
             <a:r>
-              <a:rPr lang="en-US" sz="1400" dirty="0" smtClean="0">
+              <a:rPr lang="en-US" sz="1400" dirty="0">
                 <a:solidFill>
                   <a:srgbClr val="0070C0"/>
                 </a:solidFill>
               </a:rPr>
-              <a:t>execute(“delete </a:t>
-            </a:r>
-            <a:r>
-              <a:rPr lang="en-US" sz="1400" dirty="0" smtClean="0">
-                <a:solidFill>
-                  <a:srgbClr val="0070C0"/>
-                </a:solidFill>
-              </a:rPr>
-              <a:t>t1</a:t>
-            </a:r>
-            <a:r>
-              <a:rPr lang="en-US" sz="1400" dirty="0" smtClean="0">
-                <a:solidFill>
-                  <a:srgbClr val="0070C0"/>
-                </a:solidFill>
-              </a:rPr>
-              <a:t>”)</a:t>
-            </a:r>
-            <a:endParaRPr lang="en-US" sz="1400" dirty="0">
-              <a:solidFill>
-                <a:srgbClr val="0070C0"/>
-              </a:solidFill>
-            </a:endParaRPr>
+              <a:t>execute(“delete t1”)</a:t>
+            </a:r>
           </a:p>
         </p:txBody>
       </p:sp>
@@ -5669,7 +5630,7 @@
           <a:lstStyle/>
           <a:p>
             <a:r>
-              <a:rPr lang="en-US" sz="1400" dirty="0" err="1" smtClean="0">
+              <a:rPr lang="en-US" sz="1400" dirty="0" err="1">
                 <a:solidFill>
                   <a:srgbClr val="7030A0"/>
                 </a:solidFill>
@@ -5677,18 +5638,13 @@
               <a:t>deleteTask</a:t>
             </a:r>
             <a:r>
-              <a:rPr lang="en-US" sz="1400" dirty="0" smtClean="0">
+              <a:rPr lang="en-US" sz="1400" dirty="0">
                 <a:solidFill>
                   <a:srgbClr val="7030A0"/>
                 </a:solidFill>
               </a:rPr>
-              <a:t>(p)</a:t>
-            </a:r>
-            <a:endParaRPr lang="en-US" sz="1400" dirty="0">
-              <a:solidFill>
-                <a:srgbClr val="7030A0"/>
-              </a:solidFill>
-            </a:endParaRPr>
+              <a:t>(t)</a:t>
+            </a:r>
           </a:p>
         </p:txBody>
       </p:sp>
@@ -5702,580 +5658,6 @@
           <a:xfrm>
             <a:off x="6074030" y="1687656"/>
             <a:ext cx="2438400" cy="215444"/>
-          </a:xfrm>
-          <a:prstGeom prst="rect">
-            <a:avLst/>
-          </a:prstGeom>
-          <a:noFill/>
-        </p:spPr>
-        <p:txBody>
-          <a:bodyPr wrap="square" lIns="0" tIns="0" rIns="0" bIns="0" rtlCol="0">
-            <a:spAutoFit/>
-          </a:bodyPr>
-          <a:lstStyle/>
-          <a:p>
-            <a:r>
-              <a:rPr lang="en-US" sz="1400" dirty="0" smtClean="0">
-                <a:solidFill>
-                  <a:schemeClr val="accent5">
-                    <a:lumMod val="75000"/>
-                  </a:schemeClr>
-                </a:solidFill>
-              </a:rPr>
-              <a:t>post(</a:t>
-            </a:r>
-            <a:r>
-              <a:rPr lang="en-US" sz="1400" dirty="0" err="1" smtClean="0">
-                <a:solidFill>
-                  <a:schemeClr val="accent5">
-                    <a:lumMod val="75000"/>
-                  </a:schemeClr>
-                </a:solidFill>
-              </a:rPr>
-              <a:t>TaskBookChangedEvent</a:t>
-            </a:r>
-            <a:r>
-              <a:rPr lang="en-US" sz="1400" dirty="0" smtClean="0">
-                <a:solidFill>
-                  <a:schemeClr val="accent5">
-                    <a:lumMod val="75000"/>
-                  </a:schemeClr>
-                </a:solidFill>
-              </a:rPr>
-              <a:t>)</a:t>
-            </a:r>
-            <a:endParaRPr lang="en-US" sz="1400" dirty="0">
-              <a:solidFill>
-                <a:schemeClr val="accent5">
-                  <a:lumMod val="75000"/>
-                </a:schemeClr>
-              </a:solidFill>
-            </a:endParaRPr>
-          </a:p>
-        </p:txBody>
-      </p:sp>
-      <p:cxnSp>
-        <p:nvCxnSpPr>
-          <p:cNvPr id="34" name="Straight Arrow Connector 33"/>
-          <p:cNvCxnSpPr/>
-          <p:nvPr/>
-        </p:nvCxnSpPr>
-        <p:spPr>
-          <a:xfrm>
-            <a:off x="3954408" y="2190681"/>
-            <a:ext cx="1837184" cy="0"/>
-          </a:xfrm>
-          <a:prstGeom prst="straightConnector1">
-            <a:avLst/>
-          </a:prstGeom>
-          <a:ln w="19050">
-            <a:solidFill>
-              <a:srgbClr val="7030A0"/>
-            </a:solidFill>
-            <a:prstDash val="sysDash"/>
-            <a:headEnd type="arrow" w="med" len="med"/>
-            <a:tailEnd type="none" w="med" len="med"/>
-          </a:ln>
-        </p:spPr>
-        <p:style>
-          <a:lnRef idx="1">
-            <a:schemeClr val="accent1"/>
-          </a:lnRef>
-          <a:fillRef idx="0">
-            <a:schemeClr val="accent1"/>
-          </a:fillRef>
-          <a:effectRef idx="0">
-            <a:schemeClr val="accent1"/>
-          </a:effectRef>
-          <a:fontRef idx="minor">
-            <a:schemeClr val="tx1"/>
-          </a:fontRef>
-        </p:style>
-      </p:cxnSp>
-      <p:cxnSp>
-        <p:nvCxnSpPr>
-          <p:cNvPr id="35" name="Straight Arrow Connector 34"/>
-          <p:cNvCxnSpPr/>
-          <p:nvPr/>
-        </p:nvCxnSpPr>
-        <p:spPr>
-          <a:xfrm>
-            <a:off x="1739069" y="2266002"/>
-            <a:ext cx="2058118" cy="0"/>
-          </a:xfrm>
-          <a:prstGeom prst="straightConnector1">
-            <a:avLst/>
-          </a:prstGeom>
-          <a:ln w="19050">
-            <a:solidFill>
-              <a:srgbClr val="0070C0"/>
-            </a:solidFill>
-            <a:prstDash val="sysDash"/>
-            <a:headEnd type="arrow" w="med" len="med"/>
-            <a:tailEnd type="none" w="med" len="med"/>
-          </a:ln>
-        </p:spPr>
-        <p:style>
-          <a:lnRef idx="1">
-            <a:schemeClr val="accent1"/>
-          </a:lnRef>
-          <a:fillRef idx="0">
-            <a:schemeClr val="accent1"/>
-          </a:fillRef>
-          <a:effectRef idx="0">
-            <a:schemeClr val="accent1"/>
-          </a:effectRef>
-          <a:fontRef idx="minor">
-            <a:schemeClr val="tx1"/>
-          </a:fontRef>
-        </p:style>
-      </p:cxnSp>
-      <p:cxnSp>
-        <p:nvCxnSpPr>
-          <p:cNvPr id="37" name="Straight Arrow Connector 36"/>
-          <p:cNvCxnSpPr/>
-          <p:nvPr/>
-        </p:nvCxnSpPr>
-        <p:spPr>
-          <a:xfrm>
-            <a:off x="390618" y="2342202"/>
-            <a:ext cx="1196051" cy="0"/>
-          </a:xfrm>
-          <a:prstGeom prst="straightConnector1">
-            <a:avLst/>
-          </a:prstGeom>
-          <a:ln w="19050">
-            <a:solidFill>
-              <a:srgbClr val="00B050"/>
-            </a:solidFill>
-            <a:prstDash val="sysDash"/>
-            <a:headEnd type="arrow" w="med" len="med"/>
-            <a:tailEnd type="none" w="med" len="med"/>
-          </a:ln>
-        </p:spPr>
-        <p:style>
-          <a:lnRef idx="1">
-            <a:schemeClr val="accent1"/>
-          </a:lnRef>
-          <a:fillRef idx="0">
-            <a:schemeClr val="accent1"/>
-          </a:fillRef>
-          <a:effectRef idx="0">
-            <a:schemeClr val="accent1"/>
-          </a:effectRef>
-          <a:fontRef idx="minor">
-            <a:schemeClr val="tx1"/>
-          </a:fontRef>
-        </p:style>
-      </p:cxnSp>
-      <p:sp>
-        <p:nvSpPr>
-          <p:cNvPr id="39" name="Rectangle 62"/>
-          <p:cNvSpPr/>
-          <p:nvPr/>
-        </p:nvSpPr>
-        <p:spPr>
-          <a:xfrm>
-            <a:off x="7696200" y="591251"/>
-            <a:ext cx="1371600" cy="346760"/>
-          </a:xfrm>
-          <a:prstGeom prst="rect">
-            <a:avLst/>
-          </a:prstGeom>
-          <a:solidFill>
-            <a:schemeClr val="accent5">
-              <a:lumMod val="75000"/>
-            </a:schemeClr>
-          </a:solidFill>
-          <a:ln w="19050">
-            <a:solidFill>
-              <a:schemeClr val="accent5">
-                <a:lumMod val="75000"/>
-              </a:schemeClr>
-            </a:solidFill>
-          </a:ln>
-          <a:effectLst/>
-        </p:spPr>
-        <p:style>
-          <a:lnRef idx="1">
-            <a:schemeClr val="accent2"/>
-          </a:lnRef>
-          <a:fillRef idx="2">
-            <a:schemeClr val="accent2"/>
-          </a:fillRef>
-          <a:effectRef idx="1">
-            <a:schemeClr val="accent2"/>
-          </a:effectRef>
-          <a:fontRef idx="minor">
-            <a:schemeClr val="dk1"/>
-          </a:fontRef>
-        </p:style>
-        <p:txBody>
-          <a:bodyPr rtlCol="0" anchor="ctr"/>
-          <a:lstStyle/>
-          <a:p>
-            <a:pPr algn="ctr"/>
-            <a:r>
-              <a:rPr lang="en-US" sz="1600" dirty="0" smtClean="0">
-                <a:solidFill>
-                  <a:schemeClr val="bg1"/>
-                </a:solidFill>
-              </a:rPr>
-              <a:t>:</a:t>
-            </a:r>
-            <a:r>
-              <a:rPr lang="en-US" sz="1600" dirty="0" err="1" smtClean="0">
-                <a:solidFill>
-                  <a:schemeClr val="bg1"/>
-                </a:solidFill>
-              </a:rPr>
-              <a:t>EventsCenter</a:t>
-            </a:r>
-            <a:endParaRPr lang="en-SG" sz="1600" dirty="0">
-              <a:solidFill>
-                <a:schemeClr val="bg1"/>
-              </a:solidFill>
-            </a:endParaRPr>
-          </a:p>
-        </p:txBody>
-      </p:sp>
-      <p:cxnSp>
-        <p:nvCxnSpPr>
-          <p:cNvPr id="40" name="Straight Connector 39"/>
-          <p:cNvCxnSpPr/>
-          <p:nvPr/>
-        </p:nvCxnSpPr>
-        <p:spPr>
-          <a:xfrm>
-            <a:off x="8616802" y="944305"/>
-            <a:ext cx="0" cy="1723059"/>
-          </a:xfrm>
-          <a:prstGeom prst="line">
-            <a:avLst/>
-          </a:prstGeom>
-          <a:ln w="19050">
-            <a:solidFill>
-              <a:schemeClr val="accent5">
-                <a:lumMod val="75000"/>
-              </a:schemeClr>
-            </a:solidFill>
-            <a:prstDash val="sysDash"/>
-          </a:ln>
-          <a:effectLst/>
-        </p:spPr>
-        <p:style>
-          <a:lnRef idx="1">
-            <a:schemeClr val="accent1"/>
-          </a:lnRef>
-          <a:fillRef idx="2">
-            <a:schemeClr val="accent1"/>
-          </a:fillRef>
-          <a:effectRef idx="1">
-            <a:schemeClr val="accent1"/>
-          </a:effectRef>
-          <a:fontRef idx="minor">
-            <a:schemeClr val="dk1"/>
-          </a:fontRef>
-        </p:style>
-      </p:cxnSp>
-      <p:sp>
-        <p:nvSpPr>
-          <p:cNvPr id="41" name="Rectangle 40"/>
-          <p:cNvSpPr/>
-          <p:nvPr/>
-        </p:nvSpPr>
-        <p:spPr>
-          <a:xfrm>
-            <a:off x="8544794" y="1961202"/>
-            <a:ext cx="142006" cy="176787"/>
-          </a:xfrm>
-          <a:prstGeom prst="rect">
-            <a:avLst/>
-          </a:prstGeom>
-          <a:solidFill>
-            <a:schemeClr val="accent5">
-              <a:lumMod val="75000"/>
-            </a:schemeClr>
-          </a:solidFill>
-          <a:ln>
-            <a:solidFill>
-              <a:schemeClr val="accent5">
-                <a:lumMod val="75000"/>
-              </a:schemeClr>
-            </a:solidFill>
-          </a:ln>
-          <a:effectLst/>
-        </p:spPr>
-        <p:style>
-          <a:lnRef idx="1">
-            <a:schemeClr val="accent3"/>
-          </a:lnRef>
-          <a:fillRef idx="2">
-            <a:schemeClr val="accent3"/>
-          </a:fillRef>
-          <a:effectRef idx="1">
-            <a:schemeClr val="accent3"/>
-          </a:effectRef>
-          <a:fontRef idx="minor">
-            <a:schemeClr val="dk1"/>
-          </a:fontRef>
-        </p:style>
-        <p:txBody>
-          <a:bodyPr rtlCol="0" anchor="ctr"/>
-          <a:lstStyle/>
-          <a:p>
-            <a:pPr algn="ctr"/>
-            <a:endParaRPr lang="en-SG" sz="1400">
-              <a:solidFill>
-                <a:schemeClr val="dk1"/>
-              </a:solidFill>
-            </a:endParaRPr>
-          </a:p>
-        </p:txBody>
-      </p:sp>
-      <p:cxnSp>
-        <p:nvCxnSpPr>
-          <p:cNvPr id="42" name="Straight Arrow Connector 41"/>
-          <p:cNvCxnSpPr/>
-          <p:nvPr/>
-        </p:nvCxnSpPr>
-        <p:spPr>
-          <a:xfrm>
-            <a:off x="5943992" y="1961202"/>
-            <a:ext cx="2568438" cy="0"/>
-          </a:xfrm>
-          <a:prstGeom prst="straightConnector1">
-            <a:avLst/>
-          </a:prstGeom>
-          <a:ln w="19050">
-            <a:solidFill>
-              <a:srgbClr val="7030A0"/>
-            </a:solidFill>
-            <a:tailEnd type="arrow"/>
-          </a:ln>
-        </p:spPr>
-        <p:style>
-          <a:lnRef idx="1">
-            <a:schemeClr val="accent1"/>
-          </a:lnRef>
-          <a:fillRef idx="0">
-            <a:schemeClr val="accent1"/>
-          </a:fillRef>
-          <a:effectRef idx="0">
-            <a:schemeClr val="accent1"/>
-          </a:effectRef>
-          <a:fontRef idx="minor">
-            <a:schemeClr val="tx1"/>
-          </a:fontRef>
-        </p:style>
-      </p:cxnSp>
-      <p:cxnSp>
-        <p:nvCxnSpPr>
-          <p:cNvPr id="44" name="Straight Arrow Connector 43"/>
-          <p:cNvCxnSpPr/>
-          <p:nvPr/>
-        </p:nvCxnSpPr>
-        <p:spPr>
-          <a:xfrm>
-            <a:off x="5943992" y="2137989"/>
-            <a:ext cx="2549946" cy="0"/>
-          </a:xfrm>
-          <a:prstGeom prst="straightConnector1">
-            <a:avLst/>
-          </a:prstGeom>
-          <a:ln w="19050">
-            <a:solidFill>
-              <a:schemeClr val="accent5">
-                <a:lumMod val="75000"/>
-              </a:schemeClr>
-            </a:solidFill>
-            <a:prstDash val="sysDash"/>
-            <a:headEnd type="arrow" w="med" len="med"/>
-            <a:tailEnd type="none" w="med" len="med"/>
-          </a:ln>
-        </p:spPr>
-        <p:style>
-          <a:lnRef idx="1">
-            <a:schemeClr val="accent1"/>
-          </a:lnRef>
-          <a:fillRef idx="0">
-            <a:schemeClr val="accent1"/>
-          </a:fillRef>
-          <a:effectRef idx="0">
-            <a:schemeClr val="accent1"/>
-          </a:effectRef>
-          <a:fontRef idx="minor">
-            <a:schemeClr val="tx1"/>
-          </a:fontRef>
-        </p:style>
-      </p:cxnSp>
-      <p:sp>
-        <p:nvSpPr>
-          <p:cNvPr id="53" name="Rectangle 62"/>
-          <p:cNvSpPr/>
-          <p:nvPr/>
-        </p:nvSpPr>
-        <p:spPr>
-          <a:xfrm>
-            <a:off x="7370178" y="4278322"/>
-            <a:ext cx="1093635" cy="346760"/>
-          </a:xfrm>
-          <a:prstGeom prst="rect">
-            <a:avLst/>
-          </a:prstGeom>
-          <a:solidFill>
-            <a:schemeClr val="accent6">
-              <a:lumMod val="75000"/>
-            </a:schemeClr>
-          </a:solidFill>
-          <a:ln w="19050">
-            <a:solidFill>
-              <a:schemeClr val="accent6">
-                <a:lumMod val="75000"/>
-              </a:schemeClr>
-            </a:solidFill>
-          </a:ln>
-          <a:effectLst/>
-        </p:spPr>
-        <p:style>
-          <a:lnRef idx="1">
-            <a:schemeClr val="accent2"/>
-          </a:lnRef>
-          <a:fillRef idx="2">
-            <a:schemeClr val="accent2"/>
-          </a:fillRef>
-          <a:effectRef idx="1">
-            <a:schemeClr val="accent2"/>
-          </a:effectRef>
-          <a:fontRef idx="minor">
-            <a:schemeClr val="dk1"/>
-          </a:fontRef>
-        </p:style>
-        <p:txBody>
-          <a:bodyPr rtlCol="0" anchor="ctr"/>
-          <a:lstStyle/>
-          <a:p>
-            <a:pPr algn="ctr"/>
-            <a:r>
-              <a:rPr lang="en-US" sz="1600" dirty="0" smtClean="0">
-                <a:solidFill>
-                  <a:schemeClr val="bg1"/>
-                </a:solidFill>
-              </a:rPr>
-              <a:t>:Storage</a:t>
-            </a:r>
-            <a:endParaRPr lang="en-SG" sz="1600" dirty="0">
-              <a:solidFill>
-                <a:schemeClr val="bg1"/>
-              </a:solidFill>
-            </a:endParaRPr>
-          </a:p>
-        </p:txBody>
-      </p:sp>
-      <p:cxnSp>
-        <p:nvCxnSpPr>
-          <p:cNvPr id="54" name="Straight Connector 53"/>
-          <p:cNvCxnSpPr/>
-          <p:nvPr/>
-        </p:nvCxnSpPr>
-        <p:spPr>
-          <a:xfrm>
-            <a:off x="7916995" y="4641993"/>
-            <a:ext cx="0" cy="1723059"/>
-          </a:xfrm>
-          <a:prstGeom prst="line">
-            <a:avLst/>
-          </a:prstGeom>
-          <a:ln w="19050">
-            <a:solidFill>
-              <a:schemeClr val="accent6">
-                <a:lumMod val="75000"/>
-              </a:schemeClr>
-            </a:solidFill>
-            <a:prstDash val="sysDash"/>
-          </a:ln>
-          <a:effectLst/>
-        </p:spPr>
-        <p:style>
-          <a:lnRef idx="1">
-            <a:schemeClr val="accent1"/>
-          </a:lnRef>
-          <a:fillRef idx="2">
-            <a:schemeClr val="accent1"/>
-          </a:fillRef>
-          <a:effectRef idx="1">
-            <a:schemeClr val="accent1"/>
-          </a:effectRef>
-          <a:fontRef idx="minor">
-            <a:schemeClr val="dk1"/>
-          </a:fontRef>
-        </p:style>
-      </p:cxnSp>
-      <p:sp>
-        <p:nvSpPr>
-          <p:cNvPr id="55" name="Rectangle 54"/>
-          <p:cNvSpPr/>
-          <p:nvPr/>
-        </p:nvSpPr>
-        <p:spPr>
-          <a:xfrm>
-            <a:off x="7844987" y="5335662"/>
-            <a:ext cx="124478" cy="287409"/>
-          </a:xfrm>
-          <a:prstGeom prst="rect">
-            <a:avLst/>
-          </a:prstGeom>
-          <a:solidFill>
-            <a:schemeClr val="accent6">
-              <a:lumMod val="75000"/>
-            </a:schemeClr>
-          </a:solidFill>
-          <a:ln>
-            <a:solidFill>
-              <a:schemeClr val="accent6">
-                <a:lumMod val="75000"/>
-              </a:schemeClr>
-            </a:solidFill>
-          </a:ln>
-          <a:effectLst/>
-        </p:spPr>
-        <p:style>
-          <a:lnRef idx="1">
-            <a:schemeClr val="accent3"/>
-          </a:lnRef>
-          <a:fillRef idx="2">
-            <a:schemeClr val="accent3"/>
-          </a:fillRef>
-          <a:effectRef idx="1">
-            <a:schemeClr val="accent3"/>
-          </a:effectRef>
-          <a:fontRef idx="minor">
-            <a:schemeClr val="dk1"/>
-          </a:fontRef>
-        </p:style>
-        <p:txBody>
-          <a:bodyPr rtlCol="0" anchor="ctr"/>
-          <a:lstStyle/>
-          <a:p>
-            <a:pPr algn="ctr"/>
-            <a:endParaRPr lang="en-SG" sz="1400">
-              <a:solidFill>
-                <a:schemeClr val="dk1"/>
-              </a:solidFill>
-            </a:endParaRPr>
-          </a:p>
-        </p:txBody>
-      </p:sp>
-      <p:sp>
-        <p:nvSpPr>
-          <p:cNvPr id="62" name="TextBox 61"/>
-          <p:cNvSpPr txBox="1"/>
-          <p:nvPr/>
-        </p:nvSpPr>
-        <p:spPr>
-          <a:xfrm>
-            <a:off x="1810094" y="4797674"/>
-            <a:ext cx="2716635" cy="215444"/>
           </a:xfrm>
           <a:prstGeom prst="rect">
             <a:avLst/>
@@ -6323,27 +5705,25 @@
       </p:sp>
       <p:cxnSp>
         <p:nvCxnSpPr>
-          <p:cNvPr id="63" name="Straight Arrow Connector 62"/>
+          <p:cNvPr id="34" name="Straight Arrow Connector 33"/>
           <p:cNvCxnSpPr/>
           <p:nvPr/>
         </p:nvCxnSpPr>
         <p:spPr>
-          <a:xfrm flipH="1">
-            <a:off x="4526729" y="5623071"/>
-            <a:ext cx="3383941" cy="0"/>
+          <a:xfrm>
+            <a:off x="3954408" y="2190681"/>
+            <a:ext cx="1837184" cy="0"/>
           </a:xfrm>
           <a:prstGeom prst="straightConnector1">
             <a:avLst/>
           </a:prstGeom>
           <a:ln w="19050">
             <a:solidFill>
-              <a:schemeClr val="accent6">
-                <a:lumMod val="75000"/>
-              </a:schemeClr>
+              <a:srgbClr val="7030A0"/>
             </a:solidFill>
             <a:prstDash val="sysDash"/>
-            <a:headEnd type="none" w="med" len="med"/>
-            <a:tailEnd type="arrow" w="med" len="med"/>
+            <a:headEnd type="arrow" w="med" len="med"/>
+            <a:tailEnd type="none" w="med" len="med"/>
           </a:ln>
         </p:spPr>
         <p:style>
@@ -6361,15 +5741,91 @@
           </a:fontRef>
         </p:style>
       </p:cxnSp>
-      <p:sp>
-        <p:nvSpPr>
-          <p:cNvPr id="66" name="Rectangle 62"/>
+      <p:cxnSp>
+        <p:nvCxnSpPr>
+          <p:cNvPr id="35" name="Straight Arrow Connector 34"/>
+          <p:cNvCxnSpPr/>
+          <p:nvPr/>
+        </p:nvCxnSpPr>
+        <p:spPr>
+          <a:xfrm>
+            <a:off x="1739069" y="2266002"/>
+            <a:ext cx="2058118" cy="0"/>
+          </a:xfrm>
+          <a:prstGeom prst="straightConnector1">
+            <a:avLst/>
+          </a:prstGeom>
+          <a:ln w="19050">
+            <a:solidFill>
+              <a:srgbClr val="0070C0"/>
+            </a:solidFill>
+            <a:prstDash val="sysDash"/>
+            <a:headEnd type="arrow" w="med" len="med"/>
+            <a:tailEnd type="none" w="med" len="med"/>
+          </a:ln>
+        </p:spPr>
+        <p:style>
+          <a:lnRef idx="1">
+            <a:schemeClr val="accent1"/>
+          </a:lnRef>
+          <a:fillRef idx="0">
+            <a:schemeClr val="accent1"/>
+          </a:fillRef>
+          <a:effectRef idx="0">
+            <a:schemeClr val="accent1"/>
+          </a:effectRef>
+          <a:fontRef idx="minor">
+            <a:schemeClr val="tx1"/>
+          </a:fontRef>
+        </p:style>
+      </p:cxnSp>
+      <p:cxnSp>
+        <p:nvCxnSpPr>
+          <p:cNvPr id="37" name="Straight Arrow Connector 36"/>
+          <p:cNvCxnSpPr/>
+          <p:nvPr/>
+        </p:nvCxnSpPr>
+        <p:spPr>
+          <a:xfrm>
+            <a:off x="390618" y="2342202"/>
+            <a:ext cx="1196051" cy="0"/>
+          </a:xfrm>
+          <a:prstGeom prst="straightConnector1">
+            <a:avLst/>
+          </a:prstGeom>
+          <a:ln w="19050">
+            <a:solidFill>
+              <a:srgbClr val="00B050"/>
+            </a:solidFill>
+            <a:prstDash val="sysDash"/>
+            <a:headEnd type="arrow" w="med" len="med"/>
+            <a:tailEnd type="none" w="med" len="med"/>
+          </a:ln>
+        </p:spPr>
+        <p:style>
+          <a:lnRef idx="1">
+            <a:schemeClr val="accent1"/>
+          </a:lnRef>
+          <a:fillRef idx="0">
+            <a:schemeClr val="accent1"/>
+          </a:fillRef>
+          <a:effectRef idx="0">
+            <a:schemeClr val="accent1"/>
+          </a:effectRef>
+          <a:fontRef idx="minor">
+            <a:schemeClr val="tx1"/>
+          </a:fontRef>
+        </p:style>
+      </p:cxnSp>
+      <p:sp>
+        <p:nvSpPr>
+          <p:cNvPr id="39" name="Rectangle 62"/>
           <p:cNvSpPr/>
           <p:nvPr/>
         </p:nvSpPr>
         <p:spPr>
           <a:xfrm>
-            <a:off x="3791146" y="4295233"/>
+            <a:off x="7696200" y="591251"/>
             <a:ext cx="1371600" cy="346760"/>
           </a:xfrm>
           <a:prstGeom prst="rect">
@@ -6409,7 +5865,7 @@
           <a:p>
             <a:pPr algn="ctr"/>
             <a:r>
-              <a:rPr lang="en-US" sz="1600" dirty="0" smtClean="0">
+              <a:rPr lang="en-US" sz="1600" dirty="0">
                 <a:solidFill>
                   <a:schemeClr val="bg1"/>
                 </a:solidFill>
@@ -6417,7 +5873,7 @@
               <a:t>:</a:t>
             </a:r>
             <a:r>
-              <a:rPr lang="en-US" sz="1600" dirty="0" err="1" smtClean="0">
+              <a:rPr lang="en-US" sz="1600" dirty="0" err="1">
                 <a:solidFill>
                   <a:schemeClr val="bg1"/>
                 </a:solidFill>
@@ -6434,13 +5890,13 @@
       </p:sp>
       <p:cxnSp>
         <p:nvCxnSpPr>
-          <p:cNvPr id="67" name="Straight Connector 66"/>
+          <p:cNvPr id="40" name="Straight Connector 39"/>
           <p:cNvCxnSpPr/>
           <p:nvPr/>
         </p:nvCxnSpPr>
         <p:spPr>
           <a:xfrm>
-            <a:off x="4456731" y="4648287"/>
+            <a:off x="8616802" y="944305"/>
             <a:ext cx="0" cy="1723059"/>
           </a:xfrm>
           <a:prstGeom prst="line">
@@ -6473,14 +5929,14 @@
       </p:cxnSp>
       <p:sp>
         <p:nvSpPr>
-          <p:cNvPr id="68" name="Rectangle 67"/>
+          <p:cNvPr id="41" name="Rectangle 40"/>
           <p:cNvSpPr/>
           <p:nvPr/>
         </p:nvSpPr>
         <p:spPr>
           <a:xfrm>
-            <a:off x="4384723" y="5071220"/>
-            <a:ext cx="142006" cy="1036757"/>
+            <a:off x="8544794" y="1961202"/>
+            <a:ext cx="142006" cy="176787"/>
           </a:xfrm>
           <a:prstGeom prst="rect">
             <a:avLst/>
@@ -6528,6 +5984,499 @@
       </p:sp>
       <p:cxnSp>
         <p:nvCxnSpPr>
+          <p:cNvPr id="42" name="Straight Arrow Connector 41"/>
+          <p:cNvCxnSpPr/>
+          <p:nvPr/>
+        </p:nvCxnSpPr>
+        <p:spPr>
+          <a:xfrm>
+            <a:off x="5943992" y="1961202"/>
+            <a:ext cx="2568438" cy="0"/>
+          </a:xfrm>
+          <a:prstGeom prst="straightConnector1">
+            <a:avLst/>
+          </a:prstGeom>
+          <a:ln w="19050">
+            <a:solidFill>
+              <a:srgbClr val="7030A0"/>
+            </a:solidFill>
+            <a:tailEnd type="arrow"/>
+          </a:ln>
+        </p:spPr>
+        <p:style>
+          <a:lnRef idx="1">
+            <a:schemeClr val="accent1"/>
+          </a:lnRef>
+          <a:fillRef idx="0">
+            <a:schemeClr val="accent1"/>
+          </a:fillRef>
+          <a:effectRef idx="0">
+            <a:schemeClr val="accent1"/>
+          </a:effectRef>
+          <a:fontRef idx="minor">
+            <a:schemeClr val="tx1"/>
+          </a:fontRef>
+        </p:style>
+      </p:cxnSp>
+      <p:cxnSp>
+        <p:nvCxnSpPr>
+          <p:cNvPr id="44" name="Straight Arrow Connector 43"/>
+          <p:cNvCxnSpPr/>
+          <p:nvPr/>
+        </p:nvCxnSpPr>
+        <p:spPr>
+          <a:xfrm>
+            <a:off x="5943992" y="2137989"/>
+            <a:ext cx="2549946" cy="0"/>
+          </a:xfrm>
+          <a:prstGeom prst="straightConnector1">
+            <a:avLst/>
+          </a:prstGeom>
+          <a:ln w="19050">
+            <a:solidFill>
+              <a:schemeClr val="accent5">
+                <a:lumMod val="75000"/>
+              </a:schemeClr>
+            </a:solidFill>
+            <a:prstDash val="sysDash"/>
+            <a:headEnd type="arrow" w="med" len="med"/>
+            <a:tailEnd type="none" w="med" len="med"/>
+          </a:ln>
+        </p:spPr>
+        <p:style>
+          <a:lnRef idx="1">
+            <a:schemeClr val="accent1"/>
+          </a:lnRef>
+          <a:fillRef idx="0">
+            <a:schemeClr val="accent1"/>
+          </a:fillRef>
+          <a:effectRef idx="0">
+            <a:schemeClr val="accent1"/>
+          </a:effectRef>
+          <a:fontRef idx="minor">
+            <a:schemeClr val="tx1"/>
+          </a:fontRef>
+        </p:style>
+      </p:cxnSp>
+      <p:sp>
+        <p:nvSpPr>
+          <p:cNvPr id="53" name="Rectangle 62"/>
+          <p:cNvSpPr/>
+          <p:nvPr/>
+        </p:nvSpPr>
+        <p:spPr>
+          <a:xfrm>
+            <a:off x="7370178" y="4278322"/>
+            <a:ext cx="1093635" cy="346760"/>
+          </a:xfrm>
+          <a:prstGeom prst="rect">
+            <a:avLst/>
+          </a:prstGeom>
+          <a:solidFill>
+            <a:schemeClr val="accent6">
+              <a:lumMod val="75000"/>
+            </a:schemeClr>
+          </a:solidFill>
+          <a:ln w="19050">
+            <a:solidFill>
+              <a:schemeClr val="accent6">
+                <a:lumMod val="75000"/>
+              </a:schemeClr>
+            </a:solidFill>
+          </a:ln>
+          <a:effectLst/>
+        </p:spPr>
+        <p:style>
+          <a:lnRef idx="1">
+            <a:schemeClr val="accent2"/>
+          </a:lnRef>
+          <a:fillRef idx="2">
+            <a:schemeClr val="accent2"/>
+          </a:fillRef>
+          <a:effectRef idx="1">
+            <a:schemeClr val="accent2"/>
+          </a:effectRef>
+          <a:fontRef idx="minor">
+            <a:schemeClr val="dk1"/>
+          </a:fontRef>
+        </p:style>
+        <p:txBody>
+          <a:bodyPr rtlCol="0" anchor="ctr"/>
+          <a:lstStyle/>
+          <a:p>
+            <a:pPr algn="ctr"/>
+            <a:r>
+              <a:rPr lang="en-US" sz="1600" dirty="0">
+                <a:solidFill>
+                  <a:schemeClr val="bg1"/>
+                </a:solidFill>
+              </a:rPr>
+              <a:t>:Storage</a:t>
+            </a:r>
+            <a:endParaRPr lang="en-SG" sz="1600" dirty="0">
+              <a:solidFill>
+                <a:schemeClr val="bg1"/>
+              </a:solidFill>
+            </a:endParaRPr>
+          </a:p>
+        </p:txBody>
+      </p:sp>
+      <p:cxnSp>
+        <p:nvCxnSpPr>
+          <p:cNvPr id="54" name="Straight Connector 53"/>
+          <p:cNvCxnSpPr/>
+          <p:nvPr/>
+        </p:nvCxnSpPr>
+        <p:spPr>
+          <a:xfrm>
+            <a:off x="7916995" y="4641993"/>
+            <a:ext cx="0" cy="1723059"/>
+          </a:xfrm>
+          <a:prstGeom prst="line">
+            <a:avLst/>
+          </a:prstGeom>
+          <a:ln w="19050">
+            <a:solidFill>
+              <a:schemeClr val="accent6">
+                <a:lumMod val="75000"/>
+              </a:schemeClr>
+            </a:solidFill>
+            <a:prstDash val="sysDash"/>
+          </a:ln>
+          <a:effectLst/>
+        </p:spPr>
+        <p:style>
+          <a:lnRef idx="1">
+            <a:schemeClr val="accent1"/>
+          </a:lnRef>
+          <a:fillRef idx="2">
+            <a:schemeClr val="accent1"/>
+          </a:fillRef>
+          <a:effectRef idx="1">
+            <a:schemeClr val="accent1"/>
+          </a:effectRef>
+          <a:fontRef idx="minor">
+            <a:schemeClr val="dk1"/>
+          </a:fontRef>
+        </p:style>
+      </p:cxnSp>
+      <p:sp>
+        <p:nvSpPr>
+          <p:cNvPr id="55" name="Rectangle 54"/>
+          <p:cNvSpPr/>
+          <p:nvPr/>
+        </p:nvSpPr>
+        <p:spPr>
+          <a:xfrm>
+            <a:off x="7844987" y="5335662"/>
+            <a:ext cx="124478" cy="287409"/>
+          </a:xfrm>
+          <a:prstGeom prst="rect">
+            <a:avLst/>
+          </a:prstGeom>
+          <a:solidFill>
+            <a:schemeClr val="accent6">
+              <a:lumMod val="75000"/>
+            </a:schemeClr>
+          </a:solidFill>
+          <a:ln>
+            <a:solidFill>
+              <a:schemeClr val="accent6">
+                <a:lumMod val="75000"/>
+              </a:schemeClr>
+            </a:solidFill>
+          </a:ln>
+          <a:effectLst/>
+        </p:spPr>
+        <p:style>
+          <a:lnRef idx="1">
+            <a:schemeClr val="accent3"/>
+          </a:lnRef>
+          <a:fillRef idx="2">
+            <a:schemeClr val="accent3"/>
+          </a:fillRef>
+          <a:effectRef idx="1">
+            <a:schemeClr val="accent3"/>
+          </a:effectRef>
+          <a:fontRef idx="minor">
+            <a:schemeClr val="dk1"/>
+          </a:fontRef>
+        </p:style>
+        <p:txBody>
+          <a:bodyPr rtlCol="0" anchor="ctr"/>
+          <a:lstStyle/>
+          <a:p>
+            <a:pPr algn="ctr"/>
+            <a:endParaRPr lang="en-SG" sz="1400">
+              <a:solidFill>
+                <a:schemeClr val="dk1"/>
+              </a:solidFill>
+            </a:endParaRPr>
+          </a:p>
+        </p:txBody>
+      </p:sp>
+      <p:sp>
+        <p:nvSpPr>
+          <p:cNvPr id="62" name="TextBox 61"/>
+          <p:cNvSpPr txBox="1"/>
+          <p:nvPr/>
+        </p:nvSpPr>
+        <p:spPr>
+          <a:xfrm>
+            <a:off x="1810094" y="4797674"/>
+            <a:ext cx="2716635" cy="215444"/>
+          </a:xfrm>
+          <a:prstGeom prst="rect">
+            <a:avLst/>
+          </a:prstGeom>
+          <a:noFill/>
+        </p:spPr>
+        <p:txBody>
+          <a:bodyPr wrap="square" lIns="0" tIns="0" rIns="0" bIns="0" rtlCol="0">
+            <a:spAutoFit/>
+          </a:bodyPr>
+          <a:lstStyle/>
+          <a:p>
+            <a:r>
+              <a:rPr lang="en-US" sz="1400" dirty="0">
+                <a:solidFill>
+                  <a:schemeClr val="accent5">
+                    <a:lumMod val="75000"/>
+                  </a:schemeClr>
+                </a:solidFill>
+              </a:rPr>
+              <a:t>post(</a:t>
+            </a:r>
+            <a:r>
+              <a:rPr lang="en-US" sz="1400" dirty="0" err="1">
+                <a:solidFill>
+                  <a:schemeClr val="accent5">
+                    <a:lumMod val="75000"/>
+                  </a:schemeClr>
+                </a:solidFill>
+              </a:rPr>
+              <a:t>TaskBookChangedEvent</a:t>
+            </a:r>
+            <a:r>
+              <a:rPr lang="en-US" sz="1400" dirty="0">
+                <a:solidFill>
+                  <a:schemeClr val="accent5">
+                    <a:lumMod val="75000"/>
+                  </a:schemeClr>
+                </a:solidFill>
+              </a:rPr>
+              <a:t>)</a:t>
+            </a:r>
+          </a:p>
+        </p:txBody>
+      </p:sp>
+      <p:cxnSp>
+        <p:nvCxnSpPr>
+          <p:cNvPr id="63" name="Straight Arrow Connector 62"/>
+          <p:cNvCxnSpPr/>
+          <p:nvPr/>
+        </p:nvCxnSpPr>
+        <p:spPr>
+          <a:xfrm flipH="1">
+            <a:off x="4526729" y="5623071"/>
+            <a:ext cx="3383941" cy="0"/>
+          </a:xfrm>
+          <a:prstGeom prst="straightConnector1">
+            <a:avLst/>
+          </a:prstGeom>
+          <a:ln w="19050">
+            <a:solidFill>
+              <a:schemeClr val="accent6">
+                <a:lumMod val="75000"/>
+              </a:schemeClr>
+            </a:solidFill>
+            <a:prstDash val="sysDash"/>
+            <a:headEnd type="none" w="med" len="med"/>
+            <a:tailEnd type="arrow" w="med" len="med"/>
+          </a:ln>
+        </p:spPr>
+        <p:style>
+          <a:lnRef idx="1">
+            <a:schemeClr val="accent1"/>
+          </a:lnRef>
+          <a:fillRef idx="0">
+            <a:schemeClr val="accent1"/>
+          </a:fillRef>
+          <a:effectRef idx="0">
+            <a:schemeClr val="accent1"/>
+          </a:effectRef>
+          <a:fontRef idx="minor">
+            <a:schemeClr val="tx1"/>
+          </a:fontRef>
+        </p:style>
+      </p:cxnSp>
+      <p:sp>
+        <p:nvSpPr>
+          <p:cNvPr id="66" name="Rectangle 62"/>
+          <p:cNvSpPr/>
+          <p:nvPr/>
+        </p:nvSpPr>
+        <p:spPr>
+          <a:xfrm>
+            <a:off x="3791146" y="4295233"/>
+            <a:ext cx="1371600" cy="346760"/>
+          </a:xfrm>
+          <a:prstGeom prst="rect">
+            <a:avLst/>
+          </a:prstGeom>
+          <a:solidFill>
+            <a:schemeClr val="accent5">
+              <a:lumMod val="75000"/>
+            </a:schemeClr>
+          </a:solidFill>
+          <a:ln w="19050">
+            <a:solidFill>
+              <a:schemeClr val="accent5">
+                <a:lumMod val="75000"/>
+              </a:schemeClr>
+            </a:solidFill>
+          </a:ln>
+          <a:effectLst/>
+        </p:spPr>
+        <p:style>
+          <a:lnRef idx="1">
+            <a:schemeClr val="accent2"/>
+          </a:lnRef>
+          <a:fillRef idx="2">
+            <a:schemeClr val="accent2"/>
+          </a:fillRef>
+          <a:effectRef idx="1">
+            <a:schemeClr val="accent2"/>
+          </a:effectRef>
+          <a:fontRef idx="minor">
+            <a:schemeClr val="dk1"/>
+          </a:fontRef>
+        </p:style>
+        <p:txBody>
+          <a:bodyPr rtlCol="0" anchor="ctr"/>
+          <a:lstStyle/>
+          <a:p>
+            <a:pPr algn="ctr"/>
+            <a:r>
+              <a:rPr lang="en-US" sz="1600" dirty="0">
+                <a:solidFill>
+                  <a:schemeClr val="bg1"/>
+                </a:solidFill>
+              </a:rPr>
+              <a:t>:</a:t>
+            </a:r>
+            <a:r>
+              <a:rPr lang="en-US" sz="1600" dirty="0" err="1">
+                <a:solidFill>
+                  <a:schemeClr val="bg1"/>
+                </a:solidFill>
+              </a:rPr>
+              <a:t>EventsCenter</a:t>
+            </a:r>
+            <a:endParaRPr lang="en-SG" sz="1600" dirty="0">
+              <a:solidFill>
+                <a:schemeClr val="bg1"/>
+              </a:solidFill>
+            </a:endParaRPr>
+          </a:p>
+        </p:txBody>
+      </p:sp>
+      <p:cxnSp>
+        <p:nvCxnSpPr>
+          <p:cNvPr id="67" name="Straight Connector 66"/>
+          <p:cNvCxnSpPr/>
+          <p:nvPr/>
+        </p:nvCxnSpPr>
+        <p:spPr>
+          <a:xfrm>
+            <a:off x="4456731" y="4648287"/>
+            <a:ext cx="0" cy="1723059"/>
+          </a:xfrm>
+          <a:prstGeom prst="line">
+            <a:avLst/>
+          </a:prstGeom>
+          <a:ln w="19050">
+            <a:solidFill>
+              <a:schemeClr val="accent5">
+                <a:lumMod val="75000"/>
+              </a:schemeClr>
+            </a:solidFill>
+            <a:prstDash val="sysDash"/>
+          </a:ln>
+          <a:effectLst/>
+        </p:spPr>
+        <p:style>
+          <a:lnRef idx="1">
+            <a:schemeClr val="accent1"/>
+          </a:lnRef>
+          <a:fillRef idx="2">
+            <a:schemeClr val="accent1"/>
+          </a:fillRef>
+          <a:effectRef idx="1">
+            <a:schemeClr val="accent1"/>
+          </a:effectRef>
+          <a:fontRef idx="minor">
+            <a:schemeClr val="dk1"/>
+          </a:fontRef>
+        </p:style>
+      </p:cxnSp>
+      <p:sp>
+        <p:nvSpPr>
+          <p:cNvPr id="68" name="Rectangle 67"/>
+          <p:cNvSpPr/>
+          <p:nvPr/>
+        </p:nvSpPr>
+        <p:spPr>
+          <a:xfrm>
+            <a:off x="4384723" y="5071220"/>
+            <a:ext cx="142006" cy="1036757"/>
+          </a:xfrm>
+          <a:prstGeom prst="rect">
+            <a:avLst/>
+          </a:prstGeom>
+          <a:solidFill>
+            <a:schemeClr val="accent5">
+              <a:lumMod val="75000"/>
+            </a:schemeClr>
+          </a:solidFill>
+          <a:ln>
+            <a:solidFill>
+              <a:schemeClr val="accent5">
+                <a:lumMod val="75000"/>
+              </a:schemeClr>
+            </a:solidFill>
+          </a:ln>
+          <a:effectLst/>
+        </p:spPr>
+        <p:style>
+          <a:lnRef idx="1">
+            <a:schemeClr val="accent3"/>
+          </a:lnRef>
+          <a:fillRef idx="2">
+            <a:schemeClr val="accent3"/>
+          </a:fillRef>
+          <a:effectRef idx="1">
+            <a:schemeClr val="accent3"/>
+          </a:effectRef>
+          <a:fontRef idx="minor">
+            <a:schemeClr val="dk1"/>
+          </a:fontRef>
+        </p:style>
+        <p:txBody>
+          <a:bodyPr rtlCol="0" anchor="ctr"/>
+          <a:lstStyle/>
+          <a:p>
+            <a:pPr algn="ctr"/>
+            <a:endParaRPr lang="en-SG" sz="1400">
+              <a:solidFill>
+                <a:schemeClr val="dk1"/>
+              </a:solidFill>
+            </a:endParaRPr>
+          </a:p>
+        </p:txBody>
+      </p:sp>
+      <p:cxnSp>
+        <p:nvCxnSpPr>
           <p:cNvPr id="69" name="Straight Arrow Connector 68"/>
           <p:cNvCxnSpPr/>
           <p:nvPr/>
@@ -6664,7 +6613,7 @@
           <a:lstStyle/>
           <a:p>
             <a:r>
-              <a:rPr lang="en-US" sz="1400" dirty="0" err="1" smtClean="0">
+              <a:rPr lang="en-US" sz="1400" dirty="0" err="1">
                 <a:solidFill>
                   <a:schemeClr val="accent6">
                     <a:lumMod val="75000"/>
@@ -6674,7 +6623,7 @@
               <a:t>handleTaskBookChangedEvent</a:t>
             </a:r>
             <a:r>
-              <a:rPr lang="en-US" sz="1400" dirty="0" smtClean="0">
+              <a:rPr lang="en-US" sz="1400" dirty="0">
                 <a:solidFill>
                   <a:schemeClr val="accent6">
                     <a:lumMod val="75000"/>
@@ -6683,13 +6632,6 @@
               </a:rPr>
               <a:t>()</a:t>
             </a:r>
-            <a:endParaRPr lang="en-US" sz="1400" dirty="0">
-              <a:solidFill>
-                <a:schemeClr val="accent6">
-                  <a:lumMod val="75000"/>
-                </a:schemeClr>
-              </a:solidFill>
-            </a:endParaRPr>
           </a:p>
         </p:txBody>
       </p:sp>
@@ -6774,7 +6716,7 @@
           <a:p>
             <a:pPr algn="ctr"/>
             <a:r>
-              <a:rPr lang="en-US" sz="1600" dirty="0" smtClean="0">
+              <a:rPr lang="en-US" sz="1600" dirty="0">
                 <a:solidFill>
                   <a:schemeClr val="bg1"/>
                 </a:solidFill>
@@ -6977,7 +6919,7 @@
           <a:lstStyle/>
           <a:p>
             <a:r>
-              <a:rPr lang="en-US" sz="1400" dirty="0" err="1" smtClean="0">
+              <a:rPr lang="en-US" sz="1400" dirty="0" err="1">
                 <a:solidFill>
                   <a:srgbClr val="00B050"/>
                 </a:solidFill>
@@ -6985,18 +6927,13 @@
               <a:t>handleTaskBookChangedEvent</a:t>
             </a:r>
             <a:r>
-              <a:rPr lang="en-US" sz="1400" dirty="0" smtClean="0">
+              <a:rPr lang="en-US" sz="1400" dirty="0">
                 <a:solidFill>
                   <a:srgbClr val="00B050"/>
                 </a:solidFill>
               </a:rPr>
               <a:t>()</a:t>
             </a:r>
-            <a:endParaRPr lang="en-US" sz="1400" dirty="0">
-              <a:solidFill>
-                <a:srgbClr val="00B050"/>
-              </a:solidFill>
-            </a:endParaRPr>
           </a:p>
         </p:txBody>
       </p:sp>
@@ -7183,18 +7120,13 @@
           <a:p>
             <a:pPr algn="r"/>
             <a:r>
-              <a:rPr lang="en-US" sz="1400" dirty="0" smtClean="0">
+              <a:rPr lang="en-US" sz="1400" dirty="0">
                 <a:solidFill>
                   <a:srgbClr val="00B050"/>
                 </a:solidFill>
               </a:rPr>
               <a:t>Update status bar</a:t>
             </a:r>
-            <a:endParaRPr lang="en-US" sz="1400" dirty="0">
-              <a:solidFill>
-                <a:srgbClr val="00B050"/>
-              </a:solidFill>
-            </a:endParaRPr>
           </a:p>
         </p:txBody>
       </p:sp>
@@ -7384,7 +7316,7 @@
           <a:lstStyle/>
           <a:p>
             <a:r>
-              <a:rPr lang="en-US" sz="1400" dirty="0" smtClean="0">
+              <a:rPr lang="en-US" sz="1400" dirty="0">
                 <a:solidFill>
                   <a:schemeClr val="accent6">
                     <a:lumMod val="75000"/>
@@ -7394,7 +7326,7 @@
               <a:t>Save </a:t>
             </a:r>
             <a:br>
-              <a:rPr lang="en-US" sz="1400" dirty="0" smtClean="0">
+              <a:rPr lang="en-US" sz="1400" dirty="0">
                 <a:solidFill>
                   <a:schemeClr val="accent6">
                     <a:lumMod val="75000"/>
@@ -7403,7 +7335,7 @@
               </a:rPr>
             </a:br>
             <a:r>
-              <a:rPr lang="en-US" sz="1400" dirty="0" smtClean="0">
+              <a:rPr lang="en-US" sz="1400" dirty="0">
                 <a:solidFill>
                   <a:schemeClr val="accent6">
                     <a:lumMod val="75000"/>
@@ -7412,13 +7344,6 @@
               </a:rPr>
               <a:t>to file</a:t>
             </a:r>
-            <a:endParaRPr lang="en-US" sz="1400" dirty="0">
-              <a:solidFill>
-                <a:schemeClr val="accent6">
-                  <a:lumMod val="75000"/>
-                </a:schemeClr>
-              </a:solidFill>
-            </a:endParaRPr>
           </a:p>
         </p:txBody>
       </p:sp>
@@ -7495,7 +7420,7 @@
           <a:lstStyle/>
           <a:p>
             <a:r>
-              <a:rPr lang="en-US" sz="1200" b="1" dirty="0" smtClean="0">
+              <a:rPr lang="en-US" sz="1200" b="1" dirty="0">
                 <a:solidFill>
                   <a:schemeClr val="accent3">
                     <a:lumMod val="75000"/>
@@ -7678,7 +7603,7 @@
           <a:p>
             <a:pPr algn="ctr"/>
             <a:r>
-              <a:rPr lang="en-US" sz="1050" dirty="0" err="1" smtClean="0">
+              <a:rPr lang="en-US" sz="1050" dirty="0" err="1">
                 <a:solidFill>
                   <a:schemeClr val="bg1"/>
                 </a:solidFill>
@@ -7935,7 +7860,7 @@
                   </a:schemeClr>
                 </a:solidFill>
               </a:rPr>
-              <a:t>BrowserPanel</a:t>
+              <a:t>AgendaPanel</a:t>
             </a:r>
             <a:endParaRPr lang="en-SG" sz="1050" b="1" dirty="0">
               <a:solidFill>
@@ -8048,7 +7973,7 @@
           <a:p>
             <a:pPr algn="ctr"/>
             <a:r>
-              <a:rPr lang="en-US" sz="1050" b="1" dirty="0" err="1" smtClean="0">
+              <a:rPr lang="en-US" sz="1050" b="1" dirty="0" err="1">
                 <a:solidFill>
                   <a:schemeClr val="accent3">
                     <a:lumMod val="75000"/>
@@ -8108,7 +8033,7 @@
           <a:p>
             <a:pPr algn="ctr"/>
             <a:r>
-              <a:rPr lang="en-US" sz="1050" b="1" dirty="0" err="1" smtClean="0">
+              <a:rPr lang="en-US" sz="1050" b="1" dirty="0" err="1">
                 <a:solidFill>
                   <a:schemeClr val="accent3">
                     <a:lumMod val="75000"/>
@@ -8540,7 +8465,7 @@
           <a:p>
             <a:pPr algn="ctr"/>
             <a:r>
-              <a:rPr lang="en-US" sz="1050" b="1" dirty="0" smtClean="0">
+              <a:rPr lang="en-US" sz="1050" b="1" dirty="0">
                 <a:solidFill>
                   <a:schemeClr val="accent3">
                     <a:lumMod val="75000"/>
@@ -8550,7 +8475,7 @@
               <a:t>{abstract}</a:t>
             </a:r>
             <a:br>
-              <a:rPr lang="en-US" sz="1050" b="1" dirty="0" smtClean="0">
+              <a:rPr lang="en-US" sz="1050" b="1" dirty="0">
                 <a:solidFill>
                   <a:schemeClr val="accent3">
                     <a:lumMod val="75000"/>
@@ -8559,7 +8484,7 @@
               </a:rPr>
             </a:br>
             <a:r>
-              <a:rPr lang="en-US" sz="1050" b="1" dirty="0" err="1" smtClean="0">
+              <a:rPr lang="en-US" sz="1050" b="1" dirty="0" err="1">
                 <a:solidFill>
                   <a:schemeClr val="accent3">
                     <a:lumMod val="75000"/>
@@ -9048,7 +8973,7 @@
           <a:p>
             <a:pPr algn="ctr"/>
             <a:r>
-              <a:rPr lang="en-US" sz="1100" b="1" dirty="0" smtClean="0">
+              <a:rPr lang="en-US" sz="1100" b="1" dirty="0">
                 <a:solidFill>
                   <a:schemeClr val="bg1"/>
                 </a:solidFill>
@@ -9107,7 +9032,7 @@
           <a:p>
             <a:pPr algn="ctr"/>
             <a:r>
-              <a:rPr lang="en-US" sz="1050" dirty="0" smtClean="0">
+              <a:rPr lang="en-US" sz="1050" dirty="0">
                 <a:solidFill>
                   <a:schemeClr val="bg1"/>
                 </a:solidFill>
@@ -9118,7 +9043,7 @@
           <a:p>
             <a:pPr algn="ctr"/>
             <a:r>
-              <a:rPr lang="en-US" sz="1050" dirty="0" err="1" smtClean="0">
+              <a:rPr lang="en-US" sz="1050" dirty="0" err="1">
                 <a:solidFill>
                   <a:schemeClr val="bg1"/>
                 </a:solidFill>
@@ -9667,13 +9592,6 @@
   <p:clrMapOvr>
     <a:masterClrMapping/>
   </p:clrMapOvr>
-  <p:timing>
-    <p:tnLst>
-      <p:par>
-        <p:cTn id="1" dur="indefinite" restart="never" nodeType="tmRoot"/>
-      </p:par>
-    </p:tnLst>
-  </p:timing>
 </p:sld>
 </file>
 
@@ -9740,7 +9658,7 @@
           <a:lstStyle/>
           <a:p>
             <a:r>
-              <a:rPr lang="en-US" sz="1200" b="1" dirty="0" smtClean="0">
+              <a:rPr lang="en-US" sz="1200" b="1" dirty="0">
                 <a:solidFill>
                   <a:srgbClr val="0070C0"/>
                 </a:solidFill>
@@ -9763,7 +9681,7 @@
         </p:nvSpPr>
         <p:spPr>
           <a:xfrm>
-            <a:off x="2095948" y="2548840"/>
+            <a:off x="2106765" y="2548840"/>
             <a:ext cx="1093635" cy="346760"/>
           </a:xfrm>
           <a:prstGeom prst="rect">
@@ -9914,7 +9832,7 @@
           <a:p>
             <a:pPr algn="ctr"/>
             <a:r>
-              <a:rPr lang="en-US" sz="1050" dirty="0" err="1" smtClean="0">
+              <a:rPr lang="en-US" sz="1050" dirty="0" err="1">
                 <a:solidFill>
                   <a:schemeClr val="bg1"/>
                 </a:solidFill>
@@ -9939,7 +9857,7 @@
         </p:nvCxnSpPr>
         <p:spPr>
           <a:xfrm rot="10800000">
-            <a:off x="3189584" y="2722220"/>
+            <a:off x="3200401" y="2722220"/>
             <a:ext cx="2296817" cy="1187104"/>
           </a:xfrm>
           <a:prstGeom prst="bentConnector3">
@@ -10030,7 +9948,7 @@
         </p:nvCxnSpPr>
         <p:spPr>
           <a:xfrm>
-            <a:off x="1676400" y="2719360"/>
+            <a:off x="1687217" y="2719360"/>
             <a:ext cx="419548" cy="2860"/>
           </a:xfrm>
           <a:prstGeom prst="bentConnector3">
@@ -10276,7 +10194,7 @@
           <a:p>
             <a:pPr algn="ctr"/>
             <a:r>
-              <a:rPr lang="en-US" sz="1050" b="1" dirty="0" smtClean="0">
+              <a:rPr lang="en-US" sz="1050" b="1" dirty="0">
                 <a:solidFill>
                   <a:srgbClr val="0070C0"/>
                 </a:solidFill>
@@ -10284,14 +10202,14 @@
               <a:t>{abstract}</a:t>
             </a:r>
             <a:br>
-              <a:rPr lang="en-US" sz="1050" b="1" dirty="0" smtClean="0">
+              <a:rPr lang="en-US" sz="1050" b="1" dirty="0">
                 <a:solidFill>
                   <a:srgbClr val="0070C0"/>
                 </a:solidFill>
               </a:rPr>
             </a:br>
             <a:r>
-              <a:rPr lang="en-US" sz="1050" b="1" dirty="0" smtClean="0">
+              <a:rPr lang="en-US" sz="1050" b="1" dirty="0">
                 <a:solidFill>
                   <a:srgbClr val="0070C0"/>
                 </a:solidFill>
@@ -10952,7 +10870,7 @@
             <a:p>
               <a:pPr algn="r"/>
               <a:r>
-                <a:rPr lang="en-US" sz="1100" dirty="0" smtClean="0">
+                <a:rPr lang="en-US" sz="1100" dirty="0">
                   <a:solidFill>
                     <a:srgbClr val="0070C0"/>
                   </a:solidFill>
@@ -11051,7 +10969,7 @@
             <a:lstStyle/>
             <a:p>
               <a:r>
-                <a:rPr lang="en-US" sz="1100" dirty="0" smtClean="0">
+                <a:rPr lang="en-US" sz="1100" dirty="0">
                   <a:solidFill>
                     <a:srgbClr val="0070C0"/>
                   </a:solidFill>
@@ -11137,7 +11055,7 @@
           <a:p>
             <a:pPr algn="r"/>
             <a:r>
-              <a:rPr lang="en-US" sz="1100" dirty="0" smtClean="0">
+              <a:rPr lang="en-US" sz="1100" dirty="0">
                 <a:solidFill>
                   <a:srgbClr val="0070C0"/>
                 </a:solidFill>
@@ -11176,7 +11094,7 @@
           <a:p>
             <a:pPr algn="r"/>
             <a:r>
-              <a:rPr lang="en-US" sz="1100" dirty="0" smtClean="0">
+              <a:rPr lang="en-US" sz="1100" dirty="0">
                 <a:solidFill>
                   <a:srgbClr val="0070C0"/>
                 </a:solidFill>
@@ -11229,7 +11147,7 @@
             <a:p>
               <a:pPr algn="r"/>
               <a:r>
-                <a:rPr lang="en-US" sz="1100" dirty="0" smtClean="0">
+                <a:rPr lang="en-US" sz="1100" dirty="0">
                   <a:solidFill>
                     <a:srgbClr val="0070C0"/>
                   </a:solidFill>
@@ -11332,7 +11250,7 @@
           <a:p>
             <a:pPr algn="ctr"/>
             <a:r>
-              <a:rPr lang="en-US" sz="1050" b="1" dirty="0" smtClean="0">
+              <a:rPr lang="en-US" sz="1050" b="1" dirty="0">
                 <a:solidFill>
                   <a:srgbClr val="0070C0"/>
                 </a:solidFill>
@@ -11340,14 +11258,14 @@
               <a:t>Incorrect</a:t>
             </a:r>
             <a:br>
-              <a:rPr lang="en-US" sz="1050" b="1" dirty="0" smtClean="0">
+              <a:rPr lang="en-US" sz="1050" b="1" dirty="0">
                 <a:solidFill>
                   <a:srgbClr val="0070C0"/>
                 </a:solidFill>
               </a:rPr>
             </a:br>
             <a:r>
-              <a:rPr lang="en-US" sz="1050" b="1" dirty="0" smtClean="0">
+              <a:rPr lang="en-US" sz="1050" b="1" dirty="0">
                 <a:solidFill>
                   <a:srgbClr val="0070C0"/>
                 </a:solidFill>
@@ -11413,8 +11331,8 @@
         </p:nvCxnSpPr>
         <p:spPr>
           <a:xfrm rot="5400000" flipH="1" flipV="1">
-            <a:off x="1807196" y="3315772"/>
-            <a:ext cx="882304" cy="12700"/>
+            <a:off x="1855338" y="3326263"/>
+            <a:ext cx="861325" cy="12700"/>
           </a:xfrm>
           <a:prstGeom prst="bentConnector3">
             <a:avLst>
@@ -11456,13 +11374,6 @@
   <p:clrMapOvr>
     <a:masterClrMapping/>
   </p:clrMapOvr>
-  <p:timing>
-    <p:tnLst>
-      <p:par>
-        <p:cTn id="1" dur="indefinite" restart="never" nodeType="tmRoot"/>
-      </p:par>
-    </p:tnLst>
-  </p:timing>
 </p:sld>
 </file>
 
@@ -11529,7 +11440,7 @@
           <a:lstStyle/>
           <a:p>
             <a:r>
-              <a:rPr lang="en-US" sz="1200" b="1" dirty="0" smtClean="0">
+              <a:rPr lang="en-US" sz="1200" b="1" dirty="0">
                 <a:solidFill>
                   <a:srgbClr val="0070C0"/>
                 </a:solidFill>
@@ -11739,12 +11650,20 @@
           <a:p>
             <a:pPr algn="ctr"/>
             <a:r>
-              <a:rPr lang="en-US" sz="1600" dirty="0" smtClean="0">
+              <a:rPr lang="en-US" sz="1600" dirty="0">
                 <a:solidFill>
                   <a:schemeClr val="bg1"/>
                 </a:solidFill>
               </a:rPr>
-              <a:t>:Parser</a:t>
+              <a:t>:</a:t>
+            </a:r>
+            <a:r>
+              <a:rPr lang="en-US" sz="1600" dirty="0" err="1">
+                <a:solidFill>
+                  <a:schemeClr val="bg1"/>
+                </a:solidFill>
+              </a:rPr>
+              <a:t>JimiParser</a:t>
             </a:r>
             <a:endParaRPr lang="en-SG" sz="1600" dirty="0">
               <a:solidFill>
@@ -11851,7 +11770,7 @@
         <p:spPr>
           <a:xfrm>
             <a:off x="4953000" y="2996259"/>
-            <a:ext cx="1093635" cy="461538"/>
+            <a:ext cx="1220939" cy="461538"/>
           </a:xfrm>
           <a:prstGeom prst="rect">
             <a:avLst/>
@@ -11886,20 +11805,12 @@
           <a:p>
             <a:pPr algn="ctr"/>
             <a:r>
-              <a:rPr lang="en-US" sz="1600" dirty="0" smtClean="0">
+              <a:rPr lang="en-US" sz="1600" dirty="0">
                 <a:solidFill>
                   <a:schemeClr val="bg1"/>
                 </a:solidFill>
               </a:rPr>
               <a:t>d:Delete</a:t>
-            </a:r>
-            <a:r>
-              <a:rPr lang="en-US" sz="1600" dirty="0">
-                <a:solidFill>
-                  <a:schemeClr val="bg1"/>
-                </a:solidFill>
-              </a:rPr>
-              <a:t/>
             </a:r>
             <a:br>
               <a:rPr lang="en-US" sz="1600" dirty="0">
@@ -12088,8 +11999,8 @@
         </p:nvSpPr>
         <p:spPr>
           <a:xfrm>
-            <a:off x="152400" y="2743200"/>
-            <a:ext cx="1424846" cy="215444"/>
+            <a:off x="4192" y="2743200"/>
+            <a:ext cx="1573054" cy="215444"/>
           </a:xfrm>
           <a:prstGeom prst="rect">
             <a:avLst/>
@@ -12104,18 +12015,13 @@
           <a:p>
             <a:pPr algn="r"/>
             <a:r>
-              <a:rPr lang="en-US" sz="1400" dirty="0" smtClean="0">
+              <a:rPr lang="en-US" sz="1400" dirty="0">
                 <a:solidFill>
                   <a:srgbClr val="0070C0"/>
                 </a:solidFill>
               </a:rPr>
-              <a:t>execute(“delete 1”)</a:t>
-            </a:r>
-            <a:endParaRPr lang="en-US" sz="1400" dirty="0">
-              <a:solidFill>
-                <a:srgbClr val="0070C0"/>
-              </a:solidFill>
-            </a:endParaRPr>
+              <a:t>execute(“delete t1”)</a:t>
+            </a:r>
           </a:p>
         </p:txBody>
       </p:sp>
@@ -12130,7 +12036,7 @@
         <p:spPr>
           <a:xfrm flipV="1">
             <a:off x="4030608" y="3227028"/>
-            <a:ext cx="922392" cy="1"/>
+            <a:ext cx="922392" cy="2"/>
           </a:xfrm>
           <a:prstGeom prst="straightConnector1">
             <a:avLst/>
@@ -12705,7 +12611,7 @@
           </a:lstStyle>
           <a:p>
             <a:r>
-              <a:rPr lang="en-US" dirty="0" err="1" smtClean="0">
+              <a:rPr lang="en-US" dirty="0" err="1">
                 <a:solidFill>
                   <a:srgbClr val="7030A0"/>
                 </a:solidFill>
@@ -12713,18 +12619,13 @@
               <a:t>deleteTask</a:t>
             </a:r>
             <a:r>
-              <a:rPr lang="en-US" dirty="0" smtClean="0">
+              <a:rPr lang="en-US" dirty="0">
                 <a:solidFill>
                   <a:srgbClr val="7030A0"/>
                 </a:solidFill>
               </a:rPr>
               <a:t>(p)</a:t>
             </a:r>
-            <a:endParaRPr lang="en-US" dirty="0">
-              <a:solidFill>
-                <a:srgbClr val="7030A0"/>
-              </a:solidFill>
-            </a:endParaRPr>
           </a:p>
         </p:txBody>
       </p:sp>
@@ -12762,10 +12663,9 @@
           </a:lstStyle>
           <a:p>
             <a:r>
-              <a:rPr lang="en-US" dirty="0" smtClean="0"/>
+              <a:rPr lang="en-US" dirty="0"/>
               <a:t>create()</a:t>
             </a:r>
-            <a:endParaRPr lang="en-US" dirty="0"/>
           </a:p>
         </p:txBody>
       </p:sp>
@@ -12803,10 +12703,9 @@
           </a:lstStyle>
           <a:p>
             <a:r>
-              <a:rPr lang="en-US" dirty="0" smtClean="0"/>
-              <a:t>parse(“delete 1”)</a:t>
-            </a:r>
-            <a:endParaRPr lang="en-US" dirty="0"/>
+              <a:rPr lang="en-US" dirty="0"/>
+              <a:t>parse(“delete t1”)</a:t>
+            </a:r>
           </a:p>
         </p:txBody>
       </p:sp>
@@ -12844,10 +12743,9 @@
           </a:lstStyle>
           <a:p>
             <a:r>
-              <a:rPr lang="en-US" dirty="0" smtClean="0"/>
+              <a:rPr lang="en-US" dirty="0"/>
               <a:t>result</a:t>
             </a:r>
-            <a:endParaRPr lang="en-US" dirty="0"/>
           </a:p>
         </p:txBody>
       </p:sp>
@@ -12885,10 +12783,9 @@
           </a:lstStyle>
           <a:p>
             <a:r>
-              <a:rPr lang="en-US" dirty="0" smtClean="0"/>
+              <a:rPr lang="en-US" dirty="0"/>
               <a:t>result</a:t>
             </a:r>
-            <a:endParaRPr lang="en-US" dirty="0"/>
           </a:p>
         </p:txBody>
       </p:sp>
@@ -12936,7 +12833,7 @@
           <a:p>
             <a:pPr algn="ctr"/>
             <a:r>
-              <a:rPr lang="en-US" sz="1600" dirty="0" smtClean="0">
+              <a:rPr lang="en-US" sz="1600" dirty="0">
                 <a:solidFill>
                   <a:schemeClr val="bg1"/>
                 </a:solidFill>
@@ -12944,14 +12841,14 @@
               <a:t>result:</a:t>
             </a:r>
             <a:br>
-              <a:rPr lang="en-US" sz="1600" dirty="0" smtClean="0">
+              <a:rPr lang="en-US" sz="1600" dirty="0">
                 <a:solidFill>
                   <a:schemeClr val="bg1"/>
                 </a:solidFill>
               </a:rPr>
             </a:br>
             <a:r>
-              <a:rPr lang="en-US" sz="1600" dirty="0" err="1" smtClean="0">
+              <a:rPr lang="en-US" sz="1600" dirty="0" err="1">
                 <a:solidFill>
                   <a:schemeClr val="bg1"/>
                 </a:solidFill>
@@ -13121,10 +13018,9 @@
           </a:lstStyle>
           <a:p>
             <a:r>
-              <a:rPr lang="en-US" dirty="0" smtClean="0"/>
+              <a:rPr lang="en-US" dirty="0"/>
               <a:t>d</a:t>
             </a:r>
-            <a:endParaRPr lang="en-US" dirty="0"/>
           </a:p>
         </p:txBody>
       </p:sp>
@@ -13204,7 +13100,7 @@
           <a:lstStyle/>
           <a:p>
             <a:r>
-              <a:rPr lang="en-US" sz="1200" b="1" dirty="0" smtClean="0">
+              <a:rPr lang="en-US" sz="1200" b="1" dirty="0">
                 <a:solidFill>
                   <a:srgbClr val="7030A0"/>
                 </a:solidFill>
@@ -13263,7 +13159,7 @@
           <a:p>
             <a:pPr algn="ctr"/>
             <a:r>
-              <a:rPr lang="en-US" sz="1050" dirty="0" err="1" smtClean="0">
+              <a:rPr lang="en-US" sz="1050" dirty="0" err="1">
                 <a:solidFill>
                   <a:schemeClr val="bg1"/>
                 </a:solidFill>
@@ -13322,7 +13218,7 @@
           <a:p>
             <a:pPr algn="ctr"/>
             <a:r>
-              <a:rPr lang="en-US" sz="1050" dirty="0" err="1" smtClean="0">
+              <a:rPr lang="en-US" sz="1050" dirty="0" err="1">
                 <a:solidFill>
                   <a:schemeClr val="bg1"/>
                 </a:solidFill>
@@ -13479,7 +13375,7 @@
           <a:p>
             <a:pPr algn="ctr"/>
             <a:r>
-              <a:rPr lang="en-US" sz="1050" dirty="0" smtClean="0">
+              <a:rPr lang="en-US" sz="1050" dirty="0">
                 <a:solidFill>
                   <a:schemeClr val="bg1"/>
                 </a:solidFill>
@@ -13844,7 +13740,7 @@
           <a:p>
             <a:pPr algn="ctr"/>
             <a:r>
-              <a:rPr lang="en-US" sz="1050" dirty="0" err="1" smtClean="0">
+              <a:rPr lang="en-US" sz="1050" dirty="0" err="1">
                 <a:solidFill>
                   <a:srgbClr val="7030A0"/>
                 </a:solidFill>
@@ -13986,7 +13882,7 @@
           <a:p>
             <a:pPr algn="ctr"/>
             <a:r>
-              <a:rPr lang="en-US" sz="1050" dirty="0" err="1" smtClean="0">
+              <a:rPr lang="en-US" sz="1050" dirty="0" err="1">
                 <a:solidFill>
                   <a:srgbClr val="7030A0"/>
                 </a:solidFill>
@@ -14130,7 +14026,7 @@
           <a:p>
             <a:pPr algn="ctr"/>
             <a:r>
-              <a:rPr lang="en-US" sz="1050" dirty="0" err="1" smtClean="0">
+              <a:rPr lang="en-US" sz="1050" dirty="0" err="1">
                 <a:solidFill>
                   <a:srgbClr val="7030A0"/>
                 </a:solidFill>
@@ -14229,7 +14125,7 @@
           <a:p>
             <a:pPr algn="ctr"/>
             <a:r>
-              <a:rPr lang="en-US" sz="1000" dirty="0" err="1" smtClean="0">
+              <a:rPr lang="en-US" sz="1000" dirty="0" err="1">
                 <a:solidFill>
                   <a:srgbClr val="7030A0"/>
                 </a:solidFill>
@@ -14371,7 +14267,7 @@
           <a:p>
             <a:pPr algn="ctr"/>
             <a:r>
-              <a:rPr lang="en-US" sz="1050" dirty="0" smtClean="0">
+              <a:rPr lang="en-US" sz="1050" dirty="0">
                 <a:solidFill>
                   <a:srgbClr val="7030A0"/>
                 </a:solidFill>
@@ -14513,7 +14409,7 @@
           <a:p>
             <a:pPr algn="ctr"/>
             <a:r>
-              <a:rPr lang="en-US" sz="1050" dirty="0" smtClean="0">
+              <a:rPr lang="en-US" sz="1050" dirty="0">
                 <a:solidFill>
                   <a:srgbClr val="7030A0"/>
                 </a:solidFill>
@@ -14521,14 +14417,14 @@
               <a:t>&lt;&lt;interface&gt;&gt;</a:t>
             </a:r>
             <a:br>
-              <a:rPr lang="en-US" sz="1050" dirty="0" smtClean="0">
+              <a:rPr lang="en-US" sz="1050" dirty="0">
                 <a:solidFill>
                   <a:srgbClr val="7030A0"/>
                 </a:solidFill>
               </a:rPr>
             </a:br>
             <a:r>
-              <a:rPr lang="en-US" sz="1050" dirty="0" err="1" smtClean="0">
+              <a:rPr lang="en-US" sz="1050" dirty="0" err="1">
                 <a:solidFill>
                   <a:srgbClr val="7030A0"/>
                 </a:solidFill>
@@ -14584,18 +14480,13 @@
           <a:p>
             <a:pPr algn="ctr"/>
             <a:r>
-              <a:rPr lang="en-SG" sz="1050" dirty="0" smtClean="0">
+              <a:rPr lang="en-SG" sz="1050" dirty="0">
                 <a:solidFill>
                   <a:srgbClr val="7030A0"/>
                 </a:solidFill>
               </a:rPr>
               <a:t>Name</a:t>
             </a:r>
-            <a:endParaRPr lang="en-SG" sz="1050" dirty="0">
-              <a:solidFill>
-                <a:srgbClr val="7030A0"/>
-              </a:solidFill>
-            </a:endParaRPr>
           </a:p>
         </p:txBody>
       </p:sp>
@@ -14728,7 +14619,7 @@
           <a:p>
             <a:pPr algn="ctr"/>
             <a:r>
-              <a:rPr lang="en-US" sz="1050" dirty="0" err="1" smtClean="0">
+              <a:rPr lang="en-US" sz="1050" dirty="0" err="1">
                 <a:solidFill>
                   <a:srgbClr val="7030A0"/>
                 </a:solidFill>
@@ -14916,130 +14807,12 @@
           <a:p>
             <a:pPr algn="ctr"/>
             <a:r>
-              <a:rPr lang="en-US" sz="1050" dirty="0" smtClean="0">
+              <a:rPr lang="en-US" sz="1050" dirty="0">
                 <a:solidFill>
                   <a:srgbClr val="7030A0"/>
                 </a:solidFill>
               </a:rPr>
               <a:t>&lt;&lt;interface&gt;&gt;</a:t>
-            </a:r>
-            <a:br>
-              <a:rPr lang="en-US" sz="1050" dirty="0" smtClean="0">
-                <a:solidFill>
-                  <a:srgbClr val="7030A0"/>
-                </a:solidFill>
-              </a:rPr>
-            </a:br>
-            <a:r>
-              <a:rPr lang="en-US" sz="1050" dirty="0" err="1" smtClean="0">
-                <a:solidFill>
-                  <a:srgbClr val="7030A0"/>
-                </a:solidFill>
-              </a:rPr>
-              <a:t>ReadOnlyTaskBook</a:t>
-            </a:r>
-            <a:endParaRPr lang="en-SG" sz="1050" dirty="0">
-              <a:solidFill>
-                <a:srgbClr val="7030A0"/>
-              </a:solidFill>
-            </a:endParaRPr>
-          </a:p>
-        </p:txBody>
-      </p:sp>
-      <p:sp>
-        <p:nvSpPr>
-          <p:cNvPr id="114" name="TextBox 113"/>
-          <p:cNvSpPr txBox="1"/>
-          <p:nvPr/>
-        </p:nvSpPr>
-        <p:spPr>
-          <a:xfrm>
-            <a:off x="5494951" y="3688744"/>
-            <a:ext cx="881018" cy="261610"/>
-          </a:xfrm>
-          <a:prstGeom prst="rect">
-            <a:avLst/>
-          </a:prstGeom>
-          <a:noFill/>
-        </p:spPr>
-        <p:txBody>
-          <a:bodyPr wrap="square" rtlCol="0">
-            <a:spAutoFit/>
-          </a:bodyPr>
-          <a:lstStyle/>
-          <a:p>
-            <a:pPr algn="r"/>
-            <a:r>
-              <a:rPr lang="en-US" sz="1100" dirty="0" smtClean="0">
-                <a:solidFill>
-                  <a:srgbClr val="7030A0"/>
-                </a:solidFill>
-              </a:rPr>
-              <a:t>filtered list</a:t>
-            </a:r>
-            <a:endParaRPr lang="en-SG" sz="1100" dirty="0">
-              <a:solidFill>
-                <a:srgbClr val="7030A0"/>
-              </a:solidFill>
-            </a:endParaRPr>
-          </a:p>
-        </p:txBody>
-      </p:sp>
-      <p:sp>
-        <p:nvSpPr>
-          <p:cNvPr id="122" name="Rectangle 8"/>
-          <p:cNvSpPr/>
-          <p:nvPr/>
-        </p:nvSpPr>
-        <p:spPr>
-          <a:xfrm>
-            <a:off x="1679184" y="4271241"/>
-            <a:ext cx="1775949" cy="346760"/>
-          </a:xfrm>
-          <a:prstGeom prst="rect">
-            <a:avLst/>
-          </a:prstGeom>
-          <a:ln w="19050">
-            <a:solidFill>
-              <a:srgbClr val="7030A0"/>
-            </a:solidFill>
-          </a:ln>
-          <a:effectLst/>
-        </p:spPr>
-        <p:style>
-          <a:lnRef idx="1">
-            <a:schemeClr val="accent4"/>
-          </a:lnRef>
-          <a:fillRef idx="2">
-            <a:schemeClr val="accent4"/>
-          </a:fillRef>
-          <a:effectRef idx="1">
-            <a:schemeClr val="accent4"/>
-          </a:effectRef>
-          <a:fontRef idx="minor">
-            <a:schemeClr val="dk1"/>
-          </a:fontRef>
-        </p:style>
-        <p:txBody>
-          <a:bodyPr rtlCol="0" anchor="ctr"/>
-          <a:lstStyle/>
-          <a:p>
-            <a:pPr algn="ctr"/>
-            <a:r>
-              <a:rPr lang="en-US" sz="1050" dirty="0" smtClean="0">
-                <a:solidFill>
-                  <a:srgbClr val="7030A0"/>
-                </a:solidFill>
-              </a:rPr>
-              <a:t>&lt;&lt;interface&gt;&gt;</a:t>
-            </a:r>
-            <a:r>
-              <a:rPr lang="en-US" sz="1050" dirty="0">
-                <a:solidFill>
-                  <a:srgbClr val="7030A0"/>
-                </a:solidFill>
-              </a:rPr>
-              <a:t/>
             </a:r>
             <a:br>
               <a:rPr lang="en-US" sz="1050" dirty="0">
@@ -15049,7 +14822,117 @@
               </a:rPr>
             </a:br>
             <a:r>
-              <a:rPr lang="en-US" sz="1050" dirty="0" err="1" smtClean="0">
+              <a:rPr lang="en-US" sz="1050" dirty="0" err="1">
+                <a:solidFill>
+                  <a:srgbClr val="7030A0"/>
+                </a:solidFill>
+              </a:rPr>
+              <a:t>ReadOnlyTaskBook</a:t>
+            </a:r>
+            <a:endParaRPr lang="en-SG" sz="1050" dirty="0">
+              <a:solidFill>
+                <a:srgbClr val="7030A0"/>
+              </a:solidFill>
+            </a:endParaRPr>
+          </a:p>
+        </p:txBody>
+      </p:sp>
+      <p:sp>
+        <p:nvSpPr>
+          <p:cNvPr id="114" name="TextBox 113"/>
+          <p:cNvSpPr txBox="1"/>
+          <p:nvPr/>
+        </p:nvSpPr>
+        <p:spPr>
+          <a:xfrm>
+            <a:off x="5494951" y="3688744"/>
+            <a:ext cx="881018" cy="261610"/>
+          </a:xfrm>
+          <a:prstGeom prst="rect">
+            <a:avLst/>
+          </a:prstGeom>
+          <a:noFill/>
+        </p:spPr>
+        <p:txBody>
+          <a:bodyPr wrap="square" rtlCol="0">
+            <a:spAutoFit/>
+          </a:bodyPr>
+          <a:lstStyle/>
+          <a:p>
+            <a:pPr algn="r"/>
+            <a:r>
+              <a:rPr lang="en-US" sz="1100" dirty="0">
+                <a:solidFill>
+                  <a:srgbClr val="7030A0"/>
+                </a:solidFill>
+              </a:rPr>
+              <a:t>filtered list</a:t>
+            </a:r>
+            <a:endParaRPr lang="en-SG" sz="1100" dirty="0">
+              <a:solidFill>
+                <a:srgbClr val="7030A0"/>
+              </a:solidFill>
+            </a:endParaRPr>
+          </a:p>
+        </p:txBody>
+      </p:sp>
+      <p:sp>
+        <p:nvSpPr>
+          <p:cNvPr id="122" name="Rectangle 8"/>
+          <p:cNvSpPr/>
+          <p:nvPr/>
+        </p:nvSpPr>
+        <p:spPr>
+          <a:xfrm>
+            <a:off x="1679184" y="4271241"/>
+            <a:ext cx="1775949" cy="346760"/>
+          </a:xfrm>
+          <a:prstGeom prst="rect">
+            <a:avLst/>
+          </a:prstGeom>
+          <a:ln w="19050">
+            <a:solidFill>
+              <a:srgbClr val="7030A0"/>
+            </a:solidFill>
+          </a:ln>
+          <a:effectLst/>
+        </p:spPr>
+        <p:style>
+          <a:lnRef idx="1">
+            <a:schemeClr val="accent4"/>
+          </a:lnRef>
+          <a:fillRef idx="2">
+            <a:schemeClr val="accent4"/>
+          </a:fillRef>
+          <a:effectRef idx="1">
+            <a:schemeClr val="accent4"/>
+          </a:effectRef>
+          <a:fontRef idx="minor">
+            <a:schemeClr val="dk1"/>
+          </a:fontRef>
+        </p:style>
+        <p:txBody>
+          <a:bodyPr rtlCol="0" anchor="ctr"/>
+          <a:lstStyle/>
+          <a:p>
+            <a:pPr algn="ctr"/>
+            <a:r>
+              <a:rPr lang="en-US" sz="1050" dirty="0">
+                <a:solidFill>
+                  <a:srgbClr val="7030A0"/>
+                </a:solidFill>
+              </a:rPr>
+              <a:t>&lt;&lt;interface&gt;&gt;</a:t>
+            </a:r>
+            <a:br>
+              <a:rPr lang="en-US" sz="1050" dirty="0">
+                <a:solidFill>
+                  <a:srgbClr val="7030A0"/>
+                </a:solidFill>
+              </a:rPr>
+            </a:br>
+            <a:r>
+              <a:rPr lang="en-US" sz="1050" dirty="0" err="1">
                 <a:solidFill>
                   <a:srgbClr val="7030A0"/>
                 </a:solidFill>
@@ -15236,7 +15119,7 @@
           <a:p>
             <a:pPr algn="ctr"/>
             <a:r>
-              <a:rPr lang="en-US" sz="1000" dirty="0" err="1" smtClean="0">
+              <a:rPr lang="en-US" sz="1000" dirty="0" err="1">
                 <a:solidFill>
                   <a:srgbClr val="7030A0"/>
                 </a:solidFill>
@@ -15465,18 +15348,13 @@
           <a:p>
             <a:pPr algn="ctr"/>
             <a:r>
-              <a:rPr lang="en-SG" sz="1050" dirty="0" smtClean="0">
+              <a:rPr lang="en-SG" sz="1050" dirty="0">
                 <a:solidFill>
                   <a:srgbClr val="7030A0"/>
                 </a:solidFill>
               </a:rPr>
               <a:t>Date</a:t>
             </a:r>
-            <a:endParaRPr lang="en-SG" sz="1050" dirty="0">
-              <a:solidFill>
-                <a:srgbClr val="7030A0"/>
-              </a:solidFill>
-            </a:endParaRPr>
           </a:p>
         </p:txBody>
       </p:sp>
@@ -15521,18 +15399,13 @@
           <a:p>
             <a:pPr algn="ctr"/>
             <a:r>
-              <a:rPr lang="en-SG" sz="1050" dirty="0" smtClean="0">
+              <a:rPr lang="en-SG" sz="1050" dirty="0">
                 <a:solidFill>
                   <a:srgbClr val="7030A0"/>
                 </a:solidFill>
               </a:rPr>
               <a:t>Time</a:t>
             </a:r>
-            <a:endParaRPr lang="en-SG" sz="1050" dirty="0">
-              <a:solidFill>
-                <a:srgbClr val="7030A0"/>
-              </a:solidFill>
-            </a:endParaRPr>
           </a:p>
         </p:txBody>
       </p:sp>
@@ -15671,7 +15544,7 @@
           <a:p>
             <a:pPr algn="ctr"/>
             <a:r>
-              <a:rPr lang="en-US" sz="1000" dirty="0" smtClean="0">
+              <a:rPr lang="en-US" sz="1000" dirty="0">
                 <a:solidFill>
                   <a:srgbClr val="7030A0"/>
                 </a:solidFill>
@@ -15727,18 +15600,13 @@
           <a:p>
             <a:pPr algn="ctr"/>
             <a:r>
-              <a:rPr lang="en-SG" sz="1050" dirty="0" smtClean="0">
+              <a:rPr lang="en-SG" sz="1050" dirty="0">
                 <a:solidFill>
                   <a:srgbClr val="7030A0"/>
                 </a:solidFill>
               </a:rPr>
               <a:t>Name</a:t>
             </a:r>
-            <a:endParaRPr lang="en-SG" sz="1050" dirty="0">
-              <a:solidFill>
-                <a:srgbClr val="7030A0"/>
-              </a:solidFill>
-            </a:endParaRPr>
           </a:p>
         </p:txBody>
       </p:sp>
@@ -15871,7 +15739,7 @@
           <a:p>
             <a:pPr algn="ctr"/>
             <a:r>
-              <a:rPr lang="en-US" sz="1050" dirty="0" err="1" smtClean="0">
+              <a:rPr lang="en-US" sz="1050" dirty="0" err="1">
                 <a:solidFill>
                   <a:srgbClr val="7030A0"/>
                 </a:solidFill>
@@ -16054,7 +15922,7 @@
           <a:p>
             <a:pPr algn="ctr"/>
             <a:r>
-              <a:rPr lang="en-US" sz="1050" dirty="0" smtClean="0">
+              <a:rPr lang="en-US" sz="1050" dirty="0">
                 <a:solidFill>
                   <a:srgbClr val="7030A0"/>
                 </a:solidFill>
@@ -16198,7 +16066,7 @@
           <a:p>
             <a:pPr algn="ctr"/>
             <a:r>
-              <a:rPr lang="en-US" sz="1000" dirty="0" err="1" smtClean="0">
+              <a:rPr lang="en-US" sz="1000" dirty="0" err="1">
                 <a:solidFill>
                   <a:srgbClr val="7030A0"/>
                 </a:solidFill>
@@ -16254,7 +16122,7 @@
           <a:p>
             <a:pPr algn="ctr"/>
             <a:r>
-              <a:rPr lang="en-US" sz="1000" dirty="0" err="1" smtClean="0">
+              <a:rPr lang="en-US" sz="1000" dirty="0" err="1">
                 <a:solidFill>
                   <a:srgbClr val="7030A0"/>
                 </a:solidFill>
@@ -16392,7 +16260,7 @@
           <a:p>
             <a:pPr algn="ctr"/>
             <a:r>
-              <a:rPr lang="en-US" sz="1000" dirty="0" err="1" smtClean="0">
+              <a:rPr lang="en-US" sz="1000" dirty="0" err="1">
                 <a:solidFill>
                   <a:srgbClr val="7030A0"/>
                 </a:solidFill>
@@ -16583,18 +16451,13 @@
           <a:p>
             <a:pPr algn="ctr"/>
             <a:r>
-              <a:rPr lang="en-SG" sz="1050" dirty="0" smtClean="0">
+              <a:rPr lang="en-SG" sz="1050" dirty="0">
                 <a:solidFill>
                   <a:srgbClr val="7030A0"/>
                 </a:solidFill>
               </a:rPr>
               <a:t>Date</a:t>
             </a:r>
-            <a:endParaRPr lang="en-SG" sz="1050" dirty="0">
-              <a:solidFill>
-                <a:srgbClr val="7030A0"/>
-              </a:solidFill>
-            </a:endParaRPr>
           </a:p>
         </p:txBody>
       </p:sp>
@@ -16639,18 +16502,13 @@
           <a:p>
             <a:pPr algn="ctr"/>
             <a:r>
-              <a:rPr lang="en-SG" sz="1050" dirty="0" smtClean="0">
+              <a:rPr lang="en-SG" sz="1050" dirty="0">
                 <a:solidFill>
                   <a:srgbClr val="7030A0"/>
                 </a:solidFill>
               </a:rPr>
               <a:t>Time</a:t>
             </a:r>
-            <a:endParaRPr lang="en-SG" sz="1050" dirty="0">
-              <a:solidFill>
-                <a:srgbClr val="7030A0"/>
-              </a:solidFill>
-            </a:endParaRPr>
           </a:p>
         </p:txBody>
       </p:sp>
@@ -16777,18 +16635,13 @@
           <a:p>
             <a:pPr algn="ctr"/>
             <a:r>
-              <a:rPr lang="en-SG" sz="1050" dirty="0" smtClean="0">
+              <a:rPr lang="en-SG" sz="1050" dirty="0">
                 <a:solidFill>
                   <a:srgbClr val="7030A0"/>
                 </a:solidFill>
               </a:rPr>
               <a:t>Date</a:t>
             </a:r>
-            <a:endParaRPr lang="en-SG" sz="1050" dirty="0">
-              <a:solidFill>
-                <a:srgbClr val="7030A0"/>
-              </a:solidFill>
-            </a:endParaRPr>
           </a:p>
         </p:txBody>
       </p:sp>
@@ -16833,18 +16686,13 @@
           <a:p>
             <a:pPr algn="ctr"/>
             <a:r>
-              <a:rPr lang="en-SG" sz="1050" dirty="0" smtClean="0">
+              <a:rPr lang="en-SG" sz="1050" dirty="0">
                 <a:solidFill>
                   <a:srgbClr val="7030A0"/>
                 </a:solidFill>
               </a:rPr>
               <a:t>Time</a:t>
             </a:r>
-            <a:endParaRPr lang="en-SG" sz="1050" dirty="0">
-              <a:solidFill>
-                <a:srgbClr val="7030A0"/>
-              </a:solidFill>
-            </a:endParaRPr>
           </a:p>
         </p:txBody>
       </p:sp>
@@ -16946,13 +16794,6 @@
   <p:clrMapOvr>
     <a:masterClrMapping/>
   </p:clrMapOvr>
-  <p:timing>
-    <p:tnLst>
-      <p:par>
-        <p:cTn id="1" dur="indefinite" restart="never" nodeType="tmRoot"/>
-      </p:par>
-    </p:tnLst>
-  </p:timing>
 </p:sld>
 </file>
 
@@ -17019,7 +16860,7 @@
           <a:lstStyle/>
           <a:p>
             <a:r>
-              <a:rPr lang="en-US" sz="1200" b="1" dirty="0" smtClean="0">
+              <a:rPr lang="en-US" sz="1200" b="1" dirty="0">
                 <a:solidFill>
                   <a:schemeClr val="accent6">
                     <a:lumMod val="75000"/>
@@ -17086,147 +16927,6 @@
           <a:p>
             <a:pPr algn="ctr"/>
             <a:r>
-              <a:rPr lang="en-US" sz="1050" dirty="0" smtClean="0">
-                <a:solidFill>
-                  <a:schemeClr val="bg1"/>
-                </a:solidFill>
-              </a:rPr>
-              <a:t>&lt;&lt;interface&gt;&gt;</a:t>
-            </a:r>
-            <a:br>
-              <a:rPr lang="en-US" sz="1050" dirty="0" smtClean="0">
-                <a:solidFill>
-                  <a:schemeClr val="bg1"/>
-                </a:solidFill>
-              </a:rPr>
-            </a:br>
-            <a:r>
-              <a:rPr lang="en-US" sz="1050" dirty="0" err="1" smtClean="0">
-                <a:solidFill>
-                  <a:schemeClr val="bg1"/>
-                </a:solidFill>
-              </a:rPr>
-              <a:t>TaskBookStorage</a:t>
-            </a:r>
-            <a:endParaRPr lang="en-SG" sz="1050" dirty="0">
-              <a:solidFill>
-                <a:schemeClr val="bg1"/>
-              </a:solidFill>
-            </a:endParaRPr>
-          </a:p>
-        </p:txBody>
-      </p:sp>
-      <p:sp>
-        <p:nvSpPr>
-          <p:cNvPr id="9" name="Rectangle 62"/>
-          <p:cNvSpPr/>
-          <p:nvPr/>
-        </p:nvSpPr>
-        <p:spPr>
-          <a:xfrm rot="16200000">
-            <a:off x="1683963" y="2868687"/>
-            <a:ext cx="1093635" cy="346760"/>
-          </a:xfrm>
-          <a:prstGeom prst="rect">
-            <a:avLst/>
-          </a:prstGeom>
-          <a:solidFill>
-            <a:schemeClr val="accent6">
-              <a:lumMod val="75000"/>
-            </a:schemeClr>
-          </a:solidFill>
-          <a:ln w="19050">
-            <a:solidFill>
-              <a:schemeClr val="accent6">
-                <a:lumMod val="75000"/>
-              </a:schemeClr>
-            </a:solidFill>
-          </a:ln>
-          <a:effectLst/>
-        </p:spPr>
-        <p:style>
-          <a:lnRef idx="1">
-            <a:schemeClr val="accent2"/>
-          </a:lnRef>
-          <a:fillRef idx="2">
-            <a:schemeClr val="accent2"/>
-          </a:fillRef>
-          <a:effectRef idx="1">
-            <a:schemeClr val="accent2"/>
-          </a:effectRef>
-          <a:fontRef idx="minor">
-            <a:schemeClr val="dk1"/>
-          </a:fontRef>
-        </p:style>
-        <p:txBody>
-          <a:bodyPr rtlCol="0" anchor="ctr"/>
-          <a:lstStyle/>
-          <a:p>
-            <a:pPr algn="ctr"/>
-            <a:r>
-              <a:rPr lang="en-US" sz="1050" dirty="0" err="1" smtClean="0">
-                <a:solidFill>
-                  <a:schemeClr val="bg1"/>
-                </a:solidFill>
-              </a:rPr>
-              <a:t>StorageManager</a:t>
-            </a:r>
-            <a:endParaRPr lang="en-SG" sz="1050" dirty="0">
-              <a:solidFill>
-                <a:schemeClr val="bg1"/>
-              </a:solidFill>
-            </a:endParaRPr>
-          </a:p>
-        </p:txBody>
-      </p:sp>
-      <p:sp>
-        <p:nvSpPr>
-          <p:cNvPr id="119" name="Rectangle 62"/>
-          <p:cNvSpPr/>
-          <p:nvPr/>
-        </p:nvSpPr>
-        <p:spPr>
-          <a:xfrm rot="16200000">
-            <a:off x="956202" y="2861202"/>
-            <a:ext cx="1093635" cy="346760"/>
-          </a:xfrm>
-          <a:prstGeom prst="rect">
-            <a:avLst/>
-          </a:prstGeom>
-          <a:solidFill>
-            <a:schemeClr val="accent6">
-              <a:lumMod val="75000"/>
-            </a:schemeClr>
-          </a:solidFill>
-          <a:ln w="19050">
-            <a:solidFill>
-              <a:schemeClr val="accent6">
-                <a:lumMod val="75000"/>
-              </a:schemeClr>
-            </a:solidFill>
-          </a:ln>
-          <a:effectLst/>
-        </p:spPr>
-        <p:style>
-          <a:lnRef idx="1">
-            <a:schemeClr val="accent2"/>
-          </a:lnRef>
-          <a:fillRef idx="2">
-            <a:schemeClr val="accent2"/>
-          </a:fillRef>
-          <a:effectRef idx="1">
-            <a:schemeClr val="accent2"/>
-          </a:effectRef>
-          <a:fontRef idx="minor">
-            <a:schemeClr val="dk1"/>
-          </a:fontRef>
-        </p:style>
-        <p:txBody>
-          <a:bodyPr rtlCol="0" anchor="ctr"/>
-          <a:lstStyle/>
-          <a:p>
-            <a:pPr algn="ctr"/>
-            <a:r>
               <a:rPr lang="en-US" sz="1050" dirty="0">
                 <a:solidFill>
                   <a:schemeClr val="bg1"/>
@@ -17234,11 +16934,152 @@
               </a:rPr>
               <a:t>&lt;&lt;interface&gt;&gt;</a:t>
             </a:r>
-          </a:p>
+            <a:br>
+              <a:rPr lang="en-US" sz="1050" dirty="0">
+                <a:solidFill>
+                  <a:schemeClr val="bg1"/>
+                </a:solidFill>
+              </a:rPr>
+            </a:br>
+            <a:r>
+              <a:rPr lang="en-US" sz="1050" dirty="0" err="1">
+                <a:solidFill>
+                  <a:schemeClr val="bg1"/>
+                </a:solidFill>
+              </a:rPr>
+              <a:t>TaskBookStorage</a:t>
+            </a:r>
+            <a:endParaRPr lang="en-SG" sz="1050" dirty="0">
+              <a:solidFill>
+                <a:schemeClr val="bg1"/>
+              </a:solidFill>
+            </a:endParaRPr>
+          </a:p>
+        </p:txBody>
+      </p:sp>
+      <p:sp>
+        <p:nvSpPr>
+          <p:cNvPr id="9" name="Rectangle 62"/>
+          <p:cNvSpPr/>
+          <p:nvPr/>
+        </p:nvSpPr>
+        <p:spPr>
+          <a:xfrm rot="16200000">
+            <a:off x="1683963" y="2868687"/>
+            <a:ext cx="1093635" cy="346760"/>
+          </a:xfrm>
+          <a:prstGeom prst="rect">
+            <a:avLst/>
+          </a:prstGeom>
+          <a:solidFill>
+            <a:schemeClr val="accent6">
+              <a:lumMod val="75000"/>
+            </a:schemeClr>
+          </a:solidFill>
+          <a:ln w="19050">
+            <a:solidFill>
+              <a:schemeClr val="accent6">
+                <a:lumMod val="75000"/>
+              </a:schemeClr>
+            </a:solidFill>
+          </a:ln>
+          <a:effectLst/>
+        </p:spPr>
+        <p:style>
+          <a:lnRef idx="1">
+            <a:schemeClr val="accent2"/>
+          </a:lnRef>
+          <a:fillRef idx="2">
+            <a:schemeClr val="accent2"/>
+          </a:fillRef>
+          <a:effectRef idx="1">
+            <a:schemeClr val="accent2"/>
+          </a:effectRef>
+          <a:fontRef idx="minor">
+            <a:schemeClr val="dk1"/>
+          </a:fontRef>
+        </p:style>
+        <p:txBody>
+          <a:bodyPr rtlCol="0" anchor="ctr"/>
+          <a:lstStyle/>
           <a:p>
             <a:pPr algn="ctr"/>
             <a:r>
-              <a:rPr lang="en-US" sz="1050" dirty="0" smtClean="0">
+              <a:rPr lang="en-US" sz="1050" dirty="0" err="1">
+                <a:solidFill>
+                  <a:schemeClr val="bg1"/>
+                </a:solidFill>
+              </a:rPr>
+              <a:t>StorageManager</a:t>
+            </a:r>
+            <a:endParaRPr lang="en-SG" sz="1050" dirty="0">
+              <a:solidFill>
+                <a:schemeClr val="bg1"/>
+              </a:solidFill>
+            </a:endParaRPr>
+          </a:p>
+        </p:txBody>
+      </p:sp>
+      <p:sp>
+        <p:nvSpPr>
+          <p:cNvPr id="119" name="Rectangle 62"/>
+          <p:cNvSpPr/>
+          <p:nvPr/>
+        </p:nvSpPr>
+        <p:spPr>
+          <a:xfrm rot="16200000">
+            <a:off x="956202" y="2861202"/>
+            <a:ext cx="1093635" cy="346760"/>
+          </a:xfrm>
+          <a:prstGeom prst="rect">
+            <a:avLst/>
+          </a:prstGeom>
+          <a:solidFill>
+            <a:schemeClr val="accent6">
+              <a:lumMod val="75000"/>
+            </a:schemeClr>
+          </a:solidFill>
+          <a:ln w="19050">
+            <a:solidFill>
+              <a:schemeClr val="accent6">
+                <a:lumMod val="75000"/>
+              </a:schemeClr>
+            </a:solidFill>
+          </a:ln>
+          <a:effectLst/>
+        </p:spPr>
+        <p:style>
+          <a:lnRef idx="1">
+            <a:schemeClr val="accent2"/>
+          </a:lnRef>
+          <a:fillRef idx="2">
+            <a:schemeClr val="accent2"/>
+          </a:fillRef>
+          <a:effectRef idx="1">
+            <a:schemeClr val="accent2"/>
+          </a:effectRef>
+          <a:fontRef idx="minor">
+            <a:schemeClr val="dk1"/>
+          </a:fontRef>
+        </p:style>
+        <p:txBody>
+          <a:bodyPr rtlCol="0" anchor="ctr"/>
+          <a:lstStyle/>
+          <a:p>
+            <a:pPr algn="ctr"/>
+            <a:r>
+              <a:rPr lang="en-US" sz="1050" dirty="0">
+                <a:solidFill>
+                  <a:schemeClr val="bg1"/>
+                </a:solidFill>
+              </a:rPr>
+              <a:t>&lt;&lt;interface&gt;&gt;</a:t>
+            </a:r>
+          </a:p>
+          <a:p>
+            <a:pPr algn="ctr"/>
+            <a:r>
+              <a:rPr lang="en-US" sz="1050" dirty="0">
                 <a:solidFill>
                   <a:schemeClr val="bg1"/>
                 </a:solidFill>
@@ -17672,7 +17513,7 @@
           <a:p>
             <a:pPr algn="ctr"/>
             <a:r>
-              <a:rPr lang="en-US" sz="1050" b="1" dirty="0" err="1" smtClean="0">
+              <a:rPr lang="en-US" sz="1050" b="1" dirty="0" err="1">
                 <a:solidFill>
                   <a:schemeClr val="accent6">
                     <a:lumMod val="75000"/>
@@ -17681,18 +17522,8 @@
               </a:rPr>
               <a:t>XmlTaskBook</a:t>
             </a:r>
-            <a:r>
-              <a:rPr lang="en-US" sz="1050" b="1" dirty="0" smtClean="0">
-                <a:solidFill>
-                  <a:schemeClr val="accent6">
-                    <a:lumMod val="75000"/>
-                  </a:schemeClr>
-                </a:solidFill>
-              </a:rPr>
-              <a:t/>
-            </a:r>
             <a:br>
-              <a:rPr lang="en-US" sz="1050" b="1" dirty="0" smtClean="0">
+              <a:rPr lang="en-US" sz="1050" b="1" dirty="0">
                 <a:solidFill>
                   <a:schemeClr val="accent6">
                     <a:lumMod val="75000"/>
@@ -17701,7 +17532,7 @@
               </a:rPr>
             </a:br>
             <a:r>
-              <a:rPr lang="en-US" sz="1050" b="1" dirty="0" smtClean="0">
+              <a:rPr lang="en-US" sz="1050" b="1" dirty="0">
                 <a:solidFill>
                   <a:schemeClr val="accent6">
                     <a:lumMod val="75000"/>
@@ -17768,7 +17599,7 @@
           <a:p>
             <a:pPr algn="ctr"/>
             <a:r>
-              <a:rPr lang="en-US" sz="1050" dirty="0" smtClean="0">
+              <a:rPr lang="en-US" sz="1050" dirty="0">
                 <a:solidFill>
                   <a:schemeClr val="bg1"/>
                 </a:solidFill>
@@ -17776,14 +17607,14 @@
               <a:t>&lt;&lt;interface&gt;&gt;</a:t>
             </a:r>
             <a:br>
-              <a:rPr lang="en-US" sz="1050" dirty="0" smtClean="0">
+              <a:rPr lang="en-US" sz="1050" dirty="0">
                 <a:solidFill>
                   <a:schemeClr val="bg1"/>
                 </a:solidFill>
               </a:rPr>
             </a:br>
             <a:r>
-              <a:rPr lang="en-US" sz="1050" dirty="0" err="1" smtClean="0">
+              <a:rPr lang="en-US" sz="1050" dirty="0" err="1">
                 <a:solidFill>
                   <a:schemeClr val="bg1"/>
                 </a:solidFill>
@@ -18041,30 +17872,22 @@
           <a:p>
             <a:pPr algn="ctr"/>
             <a:r>
-              <a:rPr lang="en-US" sz="1050" dirty="0" err="1" smtClean="0">
+              <a:rPr lang="en-US" sz="1050" dirty="0" err="1">
                 <a:solidFill>
                   <a:schemeClr val="bg1"/>
                 </a:solidFill>
               </a:rPr>
               <a:t>JsonUserPrefs</a:t>
             </a:r>
-            <a:r>
-              <a:rPr lang="en-US" sz="1050" dirty="0" smtClean="0">
-                <a:solidFill>
-                  <a:schemeClr val="bg1"/>
-                </a:solidFill>
-              </a:rPr>
-              <a:t/>
-            </a:r>
             <a:br>
-              <a:rPr lang="en-US" sz="1050" dirty="0" smtClean="0">
+              <a:rPr lang="en-US" sz="1050" dirty="0">
                 <a:solidFill>
                   <a:schemeClr val="bg1"/>
                 </a:solidFill>
               </a:rPr>
             </a:br>
             <a:r>
-              <a:rPr lang="en-US" sz="1050" dirty="0" smtClean="0">
+              <a:rPr lang="en-US" sz="1050" dirty="0">
                 <a:solidFill>
                   <a:schemeClr val="bg1"/>
                 </a:solidFill>
@@ -18116,7 +17939,7 @@
           <a:p>
             <a:pPr algn="ctr"/>
             <a:r>
-              <a:rPr lang="en-US" sz="1050" b="1" dirty="0" err="1" smtClean="0">
+              <a:rPr lang="en-US" sz="1050" b="1" dirty="0" err="1">
                 <a:solidFill>
                   <a:schemeClr val="accent6">
                     <a:lumMod val="75000"/>
@@ -18125,18 +17948,8 @@
               </a:rPr>
               <a:t>XmlSerializable</a:t>
             </a:r>
-            <a:r>
-              <a:rPr lang="en-US" sz="1050" b="1" dirty="0" smtClean="0">
-                <a:solidFill>
-                  <a:schemeClr val="accent6">
-                    <a:lumMod val="75000"/>
-                  </a:schemeClr>
-                </a:solidFill>
-              </a:rPr>
-              <a:t/>
-            </a:r>
             <a:br>
-              <a:rPr lang="en-US" sz="1050" b="1" dirty="0" smtClean="0">
+              <a:rPr lang="en-US" sz="1050" b="1" dirty="0">
                 <a:solidFill>
                   <a:schemeClr val="accent6">
                     <a:lumMod val="75000"/>
@@ -18145,7 +17958,7 @@
               </a:rPr>
             </a:br>
             <a:r>
-              <a:rPr lang="en-US" sz="1050" b="1" dirty="0" err="1" smtClean="0">
+              <a:rPr lang="en-US" sz="1050" b="1" dirty="0" err="1">
                 <a:solidFill>
                   <a:schemeClr val="accent6">
                     <a:lumMod val="75000"/>
@@ -18242,7 +18055,7 @@
           <a:p>
             <a:pPr algn="ctr"/>
             <a:r>
-              <a:rPr lang="en-US" sz="1050" b="1" dirty="0" err="1" smtClean="0">
+              <a:rPr lang="en-US" sz="1050" b="1" dirty="0" err="1">
                 <a:solidFill>
                   <a:schemeClr val="accent6">
                     <a:lumMod val="75000"/>
@@ -18298,7 +18111,7 @@
           <a:p>
             <a:pPr algn="ctr"/>
             <a:r>
-              <a:rPr lang="en-US" sz="1050" b="1" dirty="0" err="1" smtClean="0">
+              <a:rPr lang="en-US" sz="1050" b="1" dirty="0" err="1">
                 <a:solidFill>
                   <a:schemeClr val="accent6">
                     <a:lumMod val="75000"/>
@@ -18368,13 +18181,6 @@
   <p:clrMapOvr>
     <a:masterClrMapping/>
   </p:clrMapOvr>
-  <p:timing>
-    <p:tnLst>
-      <p:par>
-        <p:cTn id="1" dur="indefinite" restart="never" nodeType="tmRoot"/>
-      </p:par>
-    </p:tnLst>
-  </p:timing>
 </p:sld>
 </file>
 

</xml_diff>

<commit_message>
Update Model to include Priority
</commit_message>
<xml_diff>
--- a/docs/diagrams/Diagrams.pptx
+++ b/docs/diagrams/Diagrams.pptx
@@ -12624,7 +12624,7 @@
                   <a:srgbClr val="7030A0"/>
                 </a:solidFill>
               </a:rPr>
-              <a:t>(p)</a:t>
+              <a:t>(t)</a:t>
             </a:r>
           </a:p>
         </p:txBody>
@@ -13242,13 +13242,13 @@
           <p:nvPr/>
         </p:nvCxnSpPr>
         <p:spPr>
-          <a:xfrm rot="5400000">
-            <a:off x="6430591" y="2576902"/>
-            <a:ext cx="704297" cy="118895"/>
+          <a:xfrm rot="16200000" flipH="1">
+            <a:off x="6163544" y="2556462"/>
+            <a:ext cx="613117" cy="7081"/>
           </a:xfrm>
           <a:prstGeom prst="bentConnector3">
             <a:avLst>
-              <a:gd name="adj1" fmla="val 63524"/>
+              <a:gd name="adj1" fmla="val 50000"/>
             </a:avLst>
           </a:prstGeom>
           <a:ln w="19050">
@@ -13287,12 +13287,12 @@
         </p:nvCxnSpPr>
         <p:spPr>
           <a:xfrm rot="5400000" flipH="1" flipV="1">
-            <a:off x="3933313" y="1155827"/>
-            <a:ext cx="384059" cy="4545557"/>
+            <a:off x="3789346" y="1297363"/>
+            <a:ext cx="386490" cy="4260053"/>
           </a:xfrm>
           <a:prstGeom prst="bentConnector3">
             <a:avLst>
-              <a:gd name="adj1" fmla="val -81332"/>
+              <a:gd name="adj1" fmla="val 37475"/>
             </a:avLst>
           </a:prstGeom>
           <a:ln w="19050">
@@ -13447,7 +13447,7 @@
         </p:nvCxnSpPr>
         <p:spPr>
           <a:xfrm flipV="1">
-            <a:off x="6291166" y="2664094"/>
+            <a:off x="6002011" y="2663908"/>
             <a:ext cx="0" cy="258372"/>
           </a:xfrm>
           <a:prstGeom prst="straightConnector1">
@@ -13527,7 +13527,7 @@
         </p:nvSpPr>
         <p:spPr>
           <a:xfrm rot="10800000" flipV="1">
-            <a:off x="6706934" y="2108678"/>
+            <a:off x="6331310" y="2077922"/>
             <a:ext cx="270504" cy="175523"/>
           </a:xfrm>
           <a:prstGeom prst="triangle">
@@ -14092,7 +14092,7 @@
         </p:nvSpPr>
         <p:spPr>
           <a:xfrm>
-            <a:off x="5935460" y="2889816"/>
+            <a:off x="5649956" y="2887385"/>
             <a:ext cx="925323" cy="346760"/>
           </a:xfrm>
           <a:prstGeom prst="rect">
@@ -14195,9 +14195,9 @@
           <p:nvPr/>
         </p:nvCxnSpPr>
         <p:spPr>
-          <a:xfrm>
-            <a:off x="5501059" y="3062419"/>
-            <a:ext cx="434401" cy="777"/>
+          <a:xfrm flipV="1">
+            <a:off x="5501059" y="3060765"/>
+            <a:ext cx="148897" cy="1654"/>
           </a:xfrm>
           <a:prstGeom prst="bentConnector3">
             <a:avLst/>
@@ -14234,7 +14234,7 @@
         </p:nvSpPr>
         <p:spPr>
           <a:xfrm>
-            <a:off x="5937073" y="2317334"/>
+            <a:off x="5647918" y="2317148"/>
             <a:ext cx="708186" cy="346760"/>
           </a:xfrm>
           <a:prstGeom prst="rect">
@@ -14339,7 +14339,7 @@
         <p:spPr>
           <a:xfrm>
             <a:off x="5530379" y="2489937"/>
-            <a:ext cx="406694" cy="777"/>
+            <a:ext cx="117539" cy="591"/>
           </a:xfrm>
           <a:prstGeom prst="bentConnector3">
             <a:avLst/>
@@ -14376,7 +14376,7 @@
         </p:nvSpPr>
         <p:spPr>
           <a:xfrm>
-            <a:off x="5960011" y="1752597"/>
+            <a:off x="5738098" y="1707783"/>
             <a:ext cx="1156969" cy="346760"/>
           </a:xfrm>
           <a:prstGeom prst="rect">
@@ -14498,7 +14498,7 @@
         </p:nvSpPr>
         <p:spPr>
           <a:xfrm>
-            <a:off x="6880932" y="2979951"/>
+            <a:off x="6575279" y="2962465"/>
             <a:ext cx="236048" cy="173380"/>
           </a:xfrm>
           <a:prstGeom prst="flowChartDecision">
@@ -14548,8 +14548,8 @@
         </p:nvCxnSpPr>
         <p:spPr>
           <a:xfrm flipV="1">
-            <a:off x="7116980" y="2771792"/>
-            <a:ext cx="404434" cy="294849"/>
+            <a:off x="6811327" y="2771792"/>
+            <a:ext cx="710087" cy="277363"/>
           </a:xfrm>
           <a:prstGeom prst="bentConnector3">
             <a:avLst/>
@@ -14645,8 +14645,8 @@
         </p:nvCxnSpPr>
         <p:spPr>
           <a:xfrm>
-            <a:off x="7116980" y="3066641"/>
-            <a:ext cx="404434" cy="35773"/>
+            <a:off x="6811327" y="3049155"/>
+            <a:ext cx="710087" cy="53259"/>
           </a:xfrm>
           <a:prstGeom prst="bentConnector3">
             <a:avLst/>
@@ -14845,7 +14845,7 @@
         </p:nvSpPr>
         <p:spPr>
           <a:xfrm>
-            <a:off x="5494951" y="3688744"/>
+            <a:off x="5264439" y="3627551"/>
             <a:ext cx="881018" cy="261610"/>
           </a:xfrm>
           <a:prstGeom prst="rect">
@@ -14997,7 +14997,7 @@
         </p:nvSpPr>
         <p:spPr>
           <a:xfrm rot="10800000" flipV="1">
-            <a:off x="6571682" y="3245305"/>
+            <a:off x="6233983" y="3218330"/>
             <a:ext cx="270504" cy="175523"/>
           </a:xfrm>
           <a:prstGeom prst="triangle">
@@ -15045,17 +15045,19 @@
           <p:cNvPr id="24" name="Elbow Connector 23"/>
           <p:cNvCxnSpPr>
             <a:stCxn id="61" idx="3"/>
-            <a:endCxn id="73" idx="1"/>
+            <a:endCxn id="73" idx="0"/>
           </p:cNvCxnSpPr>
           <p:nvPr/>
         </p:nvCxnSpPr>
         <p:spPr>
           <a:xfrm rot="16200000" flipH="1">
-            <a:off x="6721224" y="3406538"/>
-            <a:ext cx="375117" cy="403696"/>
-          </a:xfrm>
-          <a:prstGeom prst="bentConnector2">
-            <a:avLst/>
+            <a:off x="6311339" y="3451748"/>
+            <a:ext cx="342633" cy="226841"/>
+          </a:xfrm>
+          <a:prstGeom prst="bentConnector3">
+            <a:avLst>
+              <a:gd name="adj1" fmla="val 50000"/>
+            </a:avLst>
           </a:prstGeom>
           <a:ln w="19050">
             <a:solidFill>
@@ -15086,7 +15088,7 @@
         </p:nvSpPr>
         <p:spPr>
           <a:xfrm>
-            <a:off x="7110630" y="3622565"/>
+            <a:off x="6133414" y="3736486"/>
             <a:ext cx="925323" cy="346760"/>
           </a:xfrm>
           <a:prstGeom prst="rect">
@@ -15142,7 +15144,7 @@
         </p:nvSpPr>
         <p:spPr>
           <a:xfrm rot="5400000">
-            <a:off x="7455267" y="4000659"/>
+            <a:off x="6312811" y="4123495"/>
             <a:ext cx="236048" cy="173380"/>
           </a:xfrm>
           <a:prstGeom prst="flowChartDecision">
@@ -15191,7 +15193,7 @@
         </p:nvCxnSpPr>
         <p:spPr>
           <a:xfrm flipH="1">
-            <a:off x="7570119" y="4205373"/>
+            <a:off x="6427663" y="4328209"/>
             <a:ext cx="3172" cy="214227"/>
           </a:xfrm>
           <a:prstGeom prst="straightConnector1">
@@ -15232,8 +15234,8 @@
         </p:nvCxnSpPr>
         <p:spPr>
           <a:xfrm rot="10800000">
-            <a:off x="6205514" y="4261128"/>
-            <a:ext cx="732654" cy="267657"/>
+            <a:off x="5195401" y="4271241"/>
+            <a:ext cx="579147" cy="346760"/>
           </a:xfrm>
           <a:prstGeom prst="bentConnector3">
             <a:avLst>
@@ -15274,9 +15276,9 @@
           <p:nvPr/>
         </p:nvCxnSpPr>
         <p:spPr>
-          <a:xfrm rot="10800000" flipV="1">
-            <a:off x="6205514" y="4528783"/>
-            <a:ext cx="732654" cy="87425"/>
+          <a:xfrm rot="10800000">
+            <a:off x="5193059" y="4528785"/>
+            <a:ext cx="581488" cy="89217"/>
           </a:xfrm>
           <a:prstGeom prst="bentConnector3">
             <a:avLst>
@@ -15315,7 +15317,7 @@
         </p:nvSpPr>
         <p:spPr>
           <a:xfrm>
-            <a:off x="5738098" y="4162431"/>
+            <a:off x="4727984" y="4172545"/>
             <a:ext cx="467416" cy="197392"/>
           </a:xfrm>
           <a:prstGeom prst="rect">
@@ -15366,7 +15368,7 @@
         </p:nvSpPr>
         <p:spPr>
           <a:xfrm>
-            <a:off x="5738098" y="4517513"/>
+            <a:off x="4725643" y="4430088"/>
             <a:ext cx="467416" cy="197392"/>
           </a:xfrm>
           <a:prstGeom prst="rect">
@@ -15417,7 +15419,7 @@
         </p:nvSpPr>
         <p:spPr>
           <a:xfrm flipV="1">
-            <a:off x="6405586" y="1577074"/>
+            <a:off x="6299490" y="1541930"/>
             <a:ext cx="270504" cy="175523"/>
           </a:xfrm>
           <a:prstGeom prst="triangle">
@@ -15470,8 +15472,8 @@
         </p:nvCxnSpPr>
         <p:spPr>
           <a:xfrm rot="16200000" flipV="1">
-            <a:off x="6381444" y="1417679"/>
-            <a:ext cx="316446" cy="2343"/>
+            <a:off x="6105495" y="1212682"/>
+            <a:ext cx="657235" cy="1261"/>
           </a:xfrm>
           <a:prstGeom prst="bentConnector3">
             <a:avLst>
@@ -15511,7 +15513,7 @@
         </p:nvSpPr>
         <p:spPr>
           <a:xfrm>
-            <a:off x="5964356" y="926470"/>
+            <a:off x="5654291" y="579494"/>
             <a:ext cx="925323" cy="346760"/>
           </a:xfrm>
           <a:prstGeom prst="rect">
@@ -15567,7 +15569,7 @@
         </p:nvSpPr>
         <p:spPr>
           <a:xfrm>
-            <a:off x="7521413" y="644223"/>
+            <a:off x="7436024" y="404497"/>
             <a:ext cx="708186" cy="285783"/>
           </a:xfrm>
           <a:prstGeom prst="rect">
@@ -15618,7 +15620,7 @@
         </p:nvSpPr>
         <p:spPr>
           <a:xfrm>
-            <a:off x="6887281" y="995274"/>
+            <a:off x="6575279" y="636220"/>
             <a:ext cx="236048" cy="173380"/>
           </a:xfrm>
           <a:prstGeom prst="flowChartDecision">
@@ -15668,8 +15670,8 @@
         </p:nvCxnSpPr>
         <p:spPr>
           <a:xfrm flipV="1">
-            <a:off x="7123329" y="787115"/>
-            <a:ext cx="398084" cy="294849"/>
+            <a:off x="6811327" y="547389"/>
+            <a:ext cx="624697" cy="175521"/>
           </a:xfrm>
           <a:prstGeom prst="bentConnector3">
             <a:avLst/>
@@ -15706,7 +15708,7 @@
         </p:nvSpPr>
         <p:spPr>
           <a:xfrm>
-            <a:off x="7521413" y="974845"/>
+            <a:off x="7431371" y="752874"/>
             <a:ext cx="898205" cy="285783"/>
           </a:xfrm>
           <a:prstGeom prst="rect">
@@ -15765,8 +15767,8 @@
         </p:nvCxnSpPr>
         <p:spPr>
           <a:xfrm>
-            <a:off x="7123329" y="1081964"/>
-            <a:ext cx="398084" cy="35773"/>
+            <a:off x="6811327" y="722910"/>
+            <a:ext cx="620044" cy="172856"/>
           </a:xfrm>
           <a:prstGeom prst="bentConnector3">
             <a:avLst/>
@@ -15940,18 +15942,18 @@
       <p:cxnSp>
         <p:nvCxnSpPr>
           <p:cNvPr id="192" name="Straight Arrow Connector 191"/>
-          <p:cNvCxnSpPr/>
+          <p:cNvCxnSpPr>
+            <a:stCxn id="153" idx="2"/>
+          </p:cNvCxnSpPr>
           <p:nvPr/>
         </p:nvCxnSpPr>
         <p:spPr>
-          <a:xfrm rot="10800000" flipV="1">
-            <a:off x="5038528" y="1273229"/>
-            <a:ext cx="1209872" cy="394885"/>
-          </a:xfrm>
-          <a:prstGeom prst="bentConnector3">
-            <a:avLst>
-              <a:gd name="adj1" fmla="val -779"/>
-            </a:avLst>
+          <a:xfrm rot="5400000">
+            <a:off x="5206811" y="757972"/>
+            <a:ext cx="741861" cy="1078424"/>
+          </a:xfrm>
+          <a:prstGeom prst="bentConnector2">
+            <a:avLst/>
           </a:prstGeom>
           <a:ln w="19050">
             <a:solidFill>
@@ -16089,7 +16091,7 @@
         </p:nvSpPr>
         <p:spPr>
           <a:xfrm>
-            <a:off x="7180743" y="4421355"/>
+            <a:off x="6020911" y="4520051"/>
             <a:ext cx="785096" cy="214858"/>
           </a:xfrm>
           <a:prstGeom prst="rect">
@@ -16745,7 +16747,7 @@
         </p:nvSpPr>
         <p:spPr>
           <a:xfrm>
-            <a:off x="6938168" y="4442094"/>
+            <a:off x="5774547" y="4531311"/>
             <a:ext cx="236048" cy="173380"/>
           </a:xfrm>
           <a:prstGeom prst="flowChartDecision">
@@ -16784,6 +16786,200 @@
           </a:p>
         </p:txBody>
       </p:sp>
+      <p:sp>
+        <p:nvSpPr>
+          <p:cNvPr id="95" name="Rectangle 8"/>
+          <p:cNvSpPr/>
+          <p:nvPr/>
+        </p:nvSpPr>
+        <p:spPr>
+          <a:xfrm>
+            <a:off x="7426404" y="1099634"/>
+            <a:ext cx="898205" cy="285783"/>
+          </a:xfrm>
+          <a:prstGeom prst="rect">
+            <a:avLst/>
+          </a:prstGeom>
+          <a:ln w="19050">
+            <a:solidFill>
+              <a:srgbClr val="7030A0"/>
+            </a:solidFill>
+          </a:ln>
+          <a:effectLst/>
+        </p:spPr>
+        <p:style>
+          <a:lnRef idx="1">
+            <a:schemeClr val="accent4"/>
+          </a:lnRef>
+          <a:fillRef idx="2">
+            <a:schemeClr val="accent4"/>
+          </a:fillRef>
+          <a:effectRef idx="1">
+            <a:schemeClr val="accent4"/>
+          </a:effectRef>
+          <a:fontRef idx="minor">
+            <a:schemeClr val="dk1"/>
+          </a:fontRef>
+        </p:style>
+        <p:txBody>
+          <a:bodyPr rtlCol="0" anchor="ctr"/>
+          <a:lstStyle/>
+          <a:p>
+            <a:pPr algn="ctr"/>
+            <a:r>
+              <a:rPr lang="en-US" sz="1050" dirty="0">
+                <a:solidFill>
+                  <a:srgbClr val="7030A0"/>
+                </a:solidFill>
+              </a:rPr>
+              <a:t>Priority</a:t>
+            </a:r>
+            <a:endParaRPr lang="en-SG" sz="1050" dirty="0">
+              <a:solidFill>
+                <a:srgbClr val="7030A0"/>
+              </a:solidFill>
+            </a:endParaRPr>
+          </a:p>
+        </p:txBody>
+      </p:sp>
+      <p:cxnSp>
+        <p:nvCxnSpPr>
+          <p:cNvPr id="96" name="Elbow Connector 162"/>
+          <p:cNvCxnSpPr>
+            <a:stCxn id="160" idx="3"/>
+            <a:endCxn id="95" idx="1"/>
+          </p:cNvCxnSpPr>
+          <p:nvPr/>
+        </p:nvCxnSpPr>
+        <p:spPr>
+          <a:xfrm>
+            <a:off x="6811327" y="722910"/>
+            <a:ext cx="615077" cy="519616"/>
+          </a:xfrm>
+          <a:prstGeom prst="bentConnector3">
+            <a:avLst/>
+          </a:prstGeom>
+          <a:ln w="19050">
+            <a:solidFill>
+              <a:srgbClr val="7030A0"/>
+            </a:solidFill>
+            <a:headEnd type="none" w="med" len="med"/>
+            <a:tailEnd type="arrow" w="med" len="med"/>
+          </a:ln>
+          <a:effectLst/>
+        </p:spPr>
+        <p:style>
+          <a:lnRef idx="1">
+            <a:schemeClr val="accent2"/>
+          </a:lnRef>
+          <a:fillRef idx="2">
+            <a:schemeClr val="accent2"/>
+          </a:fillRef>
+          <a:effectRef idx="1">
+            <a:schemeClr val="accent2"/>
+          </a:effectRef>
+          <a:fontRef idx="minor">
+            <a:schemeClr val="dk1"/>
+          </a:fontRef>
+        </p:style>
+      </p:cxnSp>
+      <p:sp>
+        <p:nvSpPr>
+          <p:cNvPr id="115" name="Rectangle 8"/>
+          <p:cNvSpPr/>
+          <p:nvPr/>
+        </p:nvSpPr>
+        <p:spPr>
+          <a:xfrm>
+            <a:off x="7521413" y="3326791"/>
+            <a:ext cx="898205" cy="285783"/>
+          </a:xfrm>
+          <a:prstGeom prst="rect">
+            <a:avLst/>
+          </a:prstGeom>
+          <a:ln w="19050">
+            <a:solidFill>
+              <a:srgbClr val="7030A0"/>
+            </a:solidFill>
+          </a:ln>
+          <a:effectLst/>
+        </p:spPr>
+        <p:style>
+          <a:lnRef idx="1">
+            <a:schemeClr val="accent4"/>
+          </a:lnRef>
+          <a:fillRef idx="2">
+            <a:schemeClr val="accent4"/>
+          </a:fillRef>
+          <a:effectRef idx="1">
+            <a:schemeClr val="accent4"/>
+          </a:effectRef>
+          <a:fontRef idx="minor">
+            <a:schemeClr val="dk1"/>
+          </a:fontRef>
+        </p:style>
+        <p:txBody>
+          <a:bodyPr rtlCol="0" anchor="ctr"/>
+          <a:lstStyle/>
+          <a:p>
+            <a:pPr algn="ctr"/>
+            <a:r>
+              <a:rPr lang="en-US" sz="1050" dirty="0">
+                <a:solidFill>
+                  <a:srgbClr val="7030A0"/>
+                </a:solidFill>
+              </a:rPr>
+              <a:t>Priority</a:t>
+            </a:r>
+            <a:endParaRPr lang="en-SG" sz="1050" dirty="0">
+              <a:solidFill>
+                <a:srgbClr val="7030A0"/>
+              </a:solidFill>
+            </a:endParaRPr>
+          </a:p>
+        </p:txBody>
+      </p:sp>
+      <p:cxnSp>
+        <p:nvCxnSpPr>
+          <p:cNvPr id="117" name="Elbow Connector 162"/>
+          <p:cNvCxnSpPr>
+            <a:stCxn id="78" idx="3"/>
+            <a:endCxn id="115" idx="1"/>
+          </p:cNvCxnSpPr>
+          <p:nvPr/>
+        </p:nvCxnSpPr>
+        <p:spPr>
+          <a:xfrm>
+            <a:off x="6811327" y="3049155"/>
+            <a:ext cx="710086" cy="420528"/>
+          </a:xfrm>
+          <a:prstGeom prst="bentConnector3">
+            <a:avLst/>
+          </a:prstGeom>
+          <a:ln w="19050">
+            <a:solidFill>
+              <a:srgbClr val="7030A0"/>
+            </a:solidFill>
+            <a:headEnd type="none" w="med" len="med"/>
+            <a:tailEnd type="arrow" w="med" len="med"/>
+          </a:ln>
+          <a:effectLst/>
+        </p:spPr>
+        <p:style>
+          <a:lnRef idx="1">
+            <a:schemeClr val="accent2"/>
+          </a:lnRef>
+          <a:fillRef idx="2">
+            <a:schemeClr val="accent2"/>
+          </a:fillRef>
+          <a:effectRef idx="1">
+            <a:schemeClr val="accent2"/>
+          </a:effectRef>
+          <a:fontRef idx="minor">
+            <a:schemeClr val="dk1"/>
+          </a:fontRef>
+        </p:style>
+      </p:cxnSp>
     </p:spTree>
     <p:extLst>
       <p:ext uri="{BB962C8B-B14F-4D97-AF65-F5344CB8AC3E}">

</xml_diff>

<commit_message>
Update diagrams for Logic to include History
</commit_message>
<xml_diff>
--- a/docs/diagrams/Diagrams.pptx
+++ b/docs/diagrams/Diagrams.pptx
@@ -11402,8 +11402,8 @@
         </p:nvSpPr>
         <p:spPr>
           <a:xfrm>
-            <a:off x="685800" y="1981200"/>
-            <a:ext cx="7086600" cy="4000286"/>
+            <a:off x="762000" y="304800"/>
+            <a:ext cx="7086600" cy="5334000"/>
           </a:xfrm>
           <a:prstGeom prst="roundRect">
             <a:avLst>
@@ -11463,7 +11463,7 @@
         </p:nvSpPr>
         <p:spPr>
           <a:xfrm>
-            <a:off x="1007063" y="2296546"/>
+            <a:off x="1083263" y="620146"/>
             <a:ext cx="1455629" cy="346760"/>
           </a:xfrm>
           <a:prstGeom prst="rect">
@@ -11530,7 +11530,7 @@
         </p:nvCxnSpPr>
         <p:spPr>
           <a:xfrm>
-            <a:off x="1734877" y="2660217"/>
+            <a:off x="1811077" y="983817"/>
             <a:ext cx="0" cy="2597583"/>
           </a:xfrm>
           <a:prstGeom prst="line">
@@ -11567,8 +11567,8 @@
         </p:nvSpPr>
         <p:spPr>
           <a:xfrm>
-            <a:off x="1662869" y="3010911"/>
-            <a:ext cx="152400" cy="2780287"/>
+            <a:off x="1739069" y="1334511"/>
+            <a:ext cx="117349" cy="4075689"/>
           </a:xfrm>
           <a:prstGeom prst="rect">
             <a:avLst/>
@@ -11614,7 +11614,7 @@
         </p:nvSpPr>
         <p:spPr>
           <a:xfrm>
-            <a:off x="3411783" y="2300233"/>
+            <a:off x="3487983" y="623833"/>
             <a:ext cx="1093635" cy="346760"/>
           </a:xfrm>
           <a:prstGeom prst="rect">
@@ -11676,13 +11676,15 @@
       <p:cxnSp>
         <p:nvCxnSpPr>
           <p:cNvPr id="17" name="Straight Connector 16"/>
-          <p:cNvCxnSpPr/>
+          <p:cNvCxnSpPr>
+            <a:endCxn id="18" idx="2"/>
+          </p:cNvCxnSpPr>
           <p:nvPr/>
         </p:nvCxnSpPr>
         <p:spPr>
           <a:xfrm>
-            <a:off x="3958600" y="2663904"/>
-            <a:ext cx="0" cy="1587652"/>
+            <a:off x="4034800" y="987504"/>
+            <a:ext cx="0" cy="1290718"/>
           </a:xfrm>
           <a:prstGeom prst="line">
             <a:avLst/>
@@ -11718,7 +11720,7 @@
         </p:nvSpPr>
         <p:spPr>
           <a:xfrm>
-            <a:off x="3886592" y="3122097"/>
+            <a:off x="3962792" y="1445697"/>
             <a:ext cx="144016" cy="832525"/>
           </a:xfrm>
           <a:prstGeom prst="rect">
@@ -11769,7 +11771,7 @@
         </p:nvSpPr>
         <p:spPr>
           <a:xfrm>
-            <a:off x="4953000" y="2996259"/>
+            <a:off x="5029200" y="1319859"/>
             <a:ext cx="1220939" cy="461538"/>
           </a:xfrm>
           <a:prstGeom prst="rect">
@@ -11838,13 +11840,15 @@
       <p:cxnSp>
         <p:nvCxnSpPr>
           <p:cNvPr id="20" name="Straight Connector 19"/>
-          <p:cNvCxnSpPr/>
+          <p:cNvCxnSpPr>
+            <a:endCxn id="65" idx="0"/>
+          </p:cNvCxnSpPr>
           <p:nvPr/>
         </p:nvCxnSpPr>
         <p:spPr>
           <a:xfrm>
-            <a:off x="5499817" y="3417319"/>
-            <a:ext cx="0" cy="2450081"/>
+            <a:off x="5576017" y="1740919"/>
+            <a:ext cx="4192" cy="1077998"/>
           </a:xfrm>
           <a:prstGeom prst="line">
             <a:avLst/>
@@ -11880,7 +11884,7 @@
         </p:nvSpPr>
         <p:spPr>
           <a:xfrm>
-            <a:off x="5427809" y="3457797"/>
+            <a:off x="5504009" y="1781397"/>
             <a:ext cx="152400" cy="276003"/>
           </a:xfrm>
           <a:prstGeom prst="rect">
@@ -11927,7 +11931,7 @@
         </p:nvCxnSpPr>
         <p:spPr>
           <a:xfrm>
-            <a:off x="543018" y="3014599"/>
+            <a:off x="619218" y="1338199"/>
             <a:ext cx="1119851" cy="0"/>
           </a:xfrm>
           <a:prstGeom prst="straightConnector1">
@@ -11963,7 +11967,7 @@
         </p:nvCxnSpPr>
         <p:spPr>
           <a:xfrm>
-            <a:off x="1815269" y="3122098"/>
+            <a:off x="1891469" y="1445698"/>
             <a:ext cx="2071323" cy="0"/>
           </a:xfrm>
           <a:prstGeom prst="straightConnector1">
@@ -11999,7 +12003,7 @@
         </p:nvSpPr>
         <p:spPr>
           <a:xfrm>
-            <a:off x="4192" y="2743200"/>
+            <a:off x="80392" y="1066800"/>
             <a:ext cx="1573054" cy="215444"/>
           </a:xfrm>
           <a:prstGeom prst="rect">
@@ -12035,7 +12039,7 @@
         </p:nvCxnSpPr>
         <p:spPr>
           <a:xfrm flipV="1">
-            <a:off x="4030608" y="3227028"/>
+            <a:off x="4106808" y="1550628"/>
             <a:ext cx="922392" cy="2"/>
           </a:xfrm>
           <a:prstGeom prst="straightConnector1">
@@ -12071,7 +12075,7 @@
         </p:nvSpPr>
         <p:spPr>
           <a:xfrm>
-            <a:off x="4419600" y="4251556"/>
+            <a:off x="4495800" y="2575156"/>
             <a:ext cx="855809" cy="215444"/>
           </a:xfrm>
           <a:prstGeom prst="rect">
@@ -12111,7 +12115,7 @@
         </p:nvCxnSpPr>
         <p:spPr>
           <a:xfrm>
-            <a:off x="4030608" y="3733800"/>
+            <a:off x="4106808" y="2057400"/>
             <a:ext cx="1406215" cy="0"/>
           </a:xfrm>
           <a:prstGeom prst="straightConnector1">
@@ -12149,7 +12153,7 @@
         </p:nvCxnSpPr>
         <p:spPr>
           <a:xfrm>
-            <a:off x="1815269" y="3954622"/>
+            <a:off x="1891469" y="2278222"/>
             <a:ext cx="2058118" cy="0"/>
           </a:xfrm>
           <a:prstGeom prst="straightConnector1">
@@ -12187,7 +12191,7 @@
         </p:nvCxnSpPr>
         <p:spPr>
           <a:xfrm>
-            <a:off x="466818" y="5791200"/>
+            <a:off x="543018" y="5334000"/>
             <a:ext cx="1196051" cy="0"/>
           </a:xfrm>
           <a:prstGeom prst="straightConnector1">
@@ -12225,7 +12229,7 @@
         </p:nvSpPr>
         <p:spPr>
           <a:xfrm>
-            <a:off x="7938756" y="2317144"/>
+            <a:off x="8014956" y="640744"/>
             <a:ext cx="1030504" cy="346760"/>
           </a:xfrm>
           <a:prstGeom prst="rect">
@@ -12290,7 +12294,7 @@
         </p:nvCxnSpPr>
         <p:spPr>
           <a:xfrm>
-            <a:off x="1815269" y="4495317"/>
+            <a:off x="1891469" y="2818917"/>
             <a:ext cx="3612540" cy="0"/>
           </a:xfrm>
           <a:prstGeom prst="straightConnector1">
@@ -12326,7 +12330,7 @@
         </p:nvSpPr>
         <p:spPr>
           <a:xfrm>
-            <a:off x="5427809" y="4495317"/>
+            <a:off x="5504009" y="2818917"/>
             <a:ext cx="152400" cy="1191256"/>
           </a:xfrm>
           <a:prstGeom prst="rect">
@@ -12368,13 +12372,15 @@
       <p:cxnSp>
         <p:nvCxnSpPr>
           <p:cNvPr id="71" name="Straight Connector 70"/>
-          <p:cNvCxnSpPr/>
+          <p:cNvCxnSpPr>
+            <a:endCxn id="73" idx="0"/>
+          </p:cNvCxnSpPr>
           <p:nvPr/>
         </p:nvCxnSpPr>
         <p:spPr>
           <a:xfrm>
-            <a:off x="8454008" y="2655802"/>
-            <a:ext cx="0" cy="2830598"/>
+            <a:off x="8530208" y="979402"/>
+            <a:ext cx="4192" cy="1868795"/>
           </a:xfrm>
           <a:prstGeom prst="line">
             <a:avLst/>
@@ -12413,7 +12419,7 @@
         </p:nvSpPr>
         <p:spPr>
           <a:xfrm>
-            <a:off x="8382000" y="4524597"/>
+            <a:off x="8458200" y="2848197"/>
             <a:ext cx="152400" cy="276003"/>
           </a:xfrm>
           <a:prstGeom prst="rect">
@@ -12470,7 +12476,7 @@
         </p:nvCxnSpPr>
         <p:spPr>
           <a:xfrm>
-            <a:off x="5580209" y="4542759"/>
+            <a:off x="5656409" y="2866359"/>
             <a:ext cx="2787374" cy="0"/>
           </a:xfrm>
           <a:prstGeom prst="straightConnector1">
@@ -12506,7 +12512,7 @@
         </p:nvCxnSpPr>
         <p:spPr>
           <a:xfrm>
-            <a:off x="5580209" y="4800600"/>
+            <a:off x="5656409" y="3124200"/>
             <a:ext cx="2873799" cy="0"/>
           </a:xfrm>
           <a:prstGeom prst="straightConnector1">
@@ -12547,7 +12553,7 @@
         </p:nvCxnSpPr>
         <p:spPr>
           <a:xfrm>
-            <a:off x="1815269" y="5661173"/>
+            <a:off x="1891469" y="3984773"/>
             <a:ext cx="3651369" cy="0"/>
           </a:xfrm>
           <a:prstGeom prst="straightConnector1">
@@ -12585,7 +12591,7 @@
         </p:nvSpPr>
         <p:spPr>
           <a:xfrm>
-            <a:off x="6858000" y="4278848"/>
+            <a:off x="6934200" y="2602448"/>
             <a:ext cx="1424846" cy="215444"/>
           </a:xfrm>
           <a:prstGeom prst="rect">
@@ -12637,7 +12643,7 @@
         </p:nvSpPr>
         <p:spPr>
           <a:xfrm>
-            <a:off x="4191000" y="2996259"/>
+            <a:off x="4267200" y="1319859"/>
             <a:ext cx="640023" cy="215444"/>
           </a:xfrm>
           <a:prstGeom prst="rect">
@@ -12677,8 +12683,8 @@
         </p:nvSpPr>
         <p:spPr>
           <a:xfrm>
-            <a:off x="2131905" y="2850922"/>
-            <a:ext cx="1424846" cy="215444"/>
+            <a:off x="1953860" y="1174522"/>
+            <a:ext cx="2045889" cy="215444"/>
           </a:xfrm>
           <a:prstGeom prst="rect">
             <a:avLst/>
@@ -12703,8 +12709,12 @@
           </a:lstStyle>
           <a:p>
             <a:r>
+              <a:rPr lang="en-US" dirty="0" err="1"/>
+              <a:t>parseCommand</a:t>
+            </a:r>
+            <a:r>
               <a:rPr lang="en-US" dirty="0"/>
-              <a:t>parse(“delete t1”)</a:t>
+              <a:t>(“delete t1”)</a:t>
             </a:r>
           </a:p>
         </p:txBody>
@@ -12717,7 +12727,7 @@
         </p:nvSpPr>
         <p:spPr>
           <a:xfrm>
-            <a:off x="3101175" y="5430096"/>
+            <a:off x="3177375" y="3753696"/>
             <a:ext cx="621216" cy="215444"/>
           </a:xfrm>
           <a:prstGeom prst="rect">
@@ -12757,7 +12767,7 @@
         </p:nvSpPr>
         <p:spPr>
           <a:xfrm>
-            <a:off x="762001" y="5538488"/>
+            <a:off x="936873" y="5118556"/>
             <a:ext cx="762000" cy="215444"/>
           </a:xfrm>
           <a:prstGeom prst="rect">
@@ -12797,7 +12807,7 @@
         </p:nvSpPr>
         <p:spPr>
           <a:xfrm>
-            <a:off x="6029646" y="4953000"/>
+            <a:off x="6105846" y="3276600"/>
             <a:ext cx="1666554" cy="461538"/>
           </a:xfrm>
           <a:prstGeom prst="rect">
@@ -12871,7 +12881,7 @@
         </p:nvSpPr>
         <p:spPr>
           <a:xfrm>
-            <a:off x="6786723" y="5414538"/>
+            <a:off x="6862923" y="3738138"/>
             <a:ext cx="152400" cy="171376"/>
           </a:xfrm>
           <a:prstGeom prst="rect">
@@ -12918,7 +12928,7 @@
         </p:nvCxnSpPr>
         <p:spPr>
           <a:xfrm>
-            <a:off x="5580209" y="5165675"/>
+            <a:off x="5656409" y="3489275"/>
             <a:ext cx="447975" cy="0"/>
           </a:xfrm>
           <a:prstGeom prst="straightConnector1">
@@ -12954,7 +12964,7 @@
         </p:nvCxnSpPr>
         <p:spPr>
           <a:xfrm>
-            <a:off x="5580209" y="5585914"/>
+            <a:off x="5656409" y="3909514"/>
             <a:ext cx="1253815" cy="0"/>
           </a:xfrm>
           <a:prstGeom prst="straightConnector1">
@@ -12992,7 +13002,7 @@
         </p:nvSpPr>
         <p:spPr>
           <a:xfrm>
-            <a:off x="2818928" y="3733800"/>
+            <a:off x="2895128" y="2057400"/>
             <a:ext cx="220343" cy="215444"/>
           </a:xfrm>
           <a:prstGeom prst="rect">
@@ -13024,6 +13034,238 @@
           </a:p>
         </p:txBody>
       </p:sp>
+      <p:cxnSp>
+        <p:nvCxnSpPr>
+          <p:cNvPr id="43" name="Straight Arrow Connector 42"/>
+          <p:cNvCxnSpPr/>
+          <p:nvPr/>
+        </p:nvCxnSpPr>
+        <p:spPr>
+          <a:xfrm>
+            <a:off x="1856418" y="4724400"/>
+            <a:ext cx="2486982" cy="0"/>
+          </a:xfrm>
+          <a:prstGeom prst="straightConnector1">
+            <a:avLst/>
+          </a:prstGeom>
+          <a:ln w="19050">
+            <a:solidFill>
+              <a:srgbClr val="0070C0"/>
+            </a:solidFill>
+            <a:tailEnd type="arrow"/>
+          </a:ln>
+        </p:spPr>
+        <p:style>
+          <a:lnRef idx="1">
+            <a:schemeClr val="accent1"/>
+          </a:lnRef>
+          <a:fillRef idx="0">
+            <a:schemeClr val="accent1"/>
+          </a:fillRef>
+          <a:effectRef idx="0">
+            <a:schemeClr val="accent1"/>
+          </a:effectRef>
+          <a:fontRef idx="minor">
+            <a:schemeClr val="tx1"/>
+          </a:fontRef>
+        </p:style>
+      </p:cxnSp>
+      <p:sp>
+        <p:nvSpPr>
+          <p:cNvPr id="45" name="Rectangle 62"/>
+          <p:cNvSpPr/>
+          <p:nvPr/>
+        </p:nvSpPr>
+        <p:spPr>
+          <a:xfrm>
+            <a:off x="3988043" y="4163818"/>
+            <a:ext cx="864465" cy="347297"/>
+          </a:xfrm>
+          <a:prstGeom prst="rect">
+            <a:avLst/>
+          </a:prstGeom>
+          <a:solidFill>
+            <a:srgbClr val="0070C0"/>
+          </a:solidFill>
+          <a:ln w="19050">
+            <a:solidFill>
+              <a:srgbClr val="0070C0"/>
+            </a:solidFill>
+          </a:ln>
+          <a:effectLst/>
+        </p:spPr>
+        <p:style>
+          <a:lnRef idx="1">
+            <a:schemeClr val="accent2"/>
+          </a:lnRef>
+          <a:fillRef idx="2">
+            <a:schemeClr val="accent2"/>
+          </a:fillRef>
+          <a:effectRef idx="1">
+            <a:schemeClr val="accent2"/>
+          </a:effectRef>
+          <a:fontRef idx="minor">
+            <a:schemeClr val="dk1"/>
+          </a:fontRef>
+        </p:style>
+        <p:txBody>
+          <a:bodyPr rtlCol="0" anchor="ctr"/>
+          <a:lstStyle/>
+          <a:p>
+            <a:pPr algn="ctr"/>
+            <a:r>
+              <a:rPr lang="en-US" sz="1600" dirty="0">
+                <a:solidFill>
+                  <a:schemeClr val="bg1"/>
+                </a:solidFill>
+              </a:rPr>
+              <a:t>:History</a:t>
+            </a:r>
+            <a:endParaRPr lang="en-SG" sz="1600" dirty="0">
+              <a:solidFill>
+                <a:schemeClr val="bg1"/>
+              </a:solidFill>
+            </a:endParaRPr>
+          </a:p>
+        </p:txBody>
+      </p:sp>
+      <p:sp>
+        <p:nvSpPr>
+          <p:cNvPr id="46" name="Rectangle 45"/>
+          <p:cNvSpPr/>
+          <p:nvPr/>
+        </p:nvSpPr>
+        <p:spPr>
+          <a:xfrm>
+            <a:off x="4307889" y="4506286"/>
+            <a:ext cx="152860" cy="751514"/>
+          </a:xfrm>
+          <a:prstGeom prst="rect">
+            <a:avLst/>
+          </a:prstGeom>
+          <a:solidFill>
+            <a:srgbClr val="0070C0"/>
+          </a:solidFill>
+          <a:ln>
+            <a:solidFill>
+              <a:srgbClr val="0070C0"/>
+            </a:solidFill>
+          </a:ln>
+          <a:effectLst/>
+        </p:spPr>
+        <p:style>
+          <a:lnRef idx="1">
+            <a:schemeClr val="accent3"/>
+          </a:lnRef>
+          <a:fillRef idx="2">
+            <a:schemeClr val="accent3"/>
+          </a:fillRef>
+          <a:effectRef idx="1">
+            <a:schemeClr val="accent3"/>
+          </a:effectRef>
+          <a:fontRef idx="minor">
+            <a:schemeClr val="dk1"/>
+          </a:fontRef>
+        </p:style>
+        <p:txBody>
+          <a:bodyPr rtlCol="0" anchor="ctr"/>
+          <a:lstStyle/>
+          <a:p>
+            <a:pPr algn="ctr"/>
+            <a:endParaRPr lang="en-SG" sz="1400">
+              <a:solidFill>
+                <a:schemeClr val="dk1"/>
+              </a:solidFill>
+            </a:endParaRPr>
+          </a:p>
+        </p:txBody>
+      </p:sp>
+      <p:sp>
+        <p:nvSpPr>
+          <p:cNvPr id="47" name="TextBox 46"/>
+          <p:cNvSpPr txBox="1"/>
+          <p:nvPr/>
+        </p:nvSpPr>
+        <p:spPr>
+          <a:xfrm>
+            <a:off x="2538026" y="4482276"/>
+            <a:ext cx="1378103" cy="215444"/>
+          </a:xfrm>
+          <a:prstGeom prst="rect">
+            <a:avLst/>
+          </a:prstGeom>
+          <a:noFill/>
+        </p:spPr>
+        <p:txBody>
+          <a:bodyPr wrap="square" lIns="0" tIns="0" rIns="0" bIns="0" rtlCol="0">
+            <a:spAutoFit/>
+          </a:bodyPr>
+          <a:lstStyle>
+            <a:defPPr>
+              <a:defRPr lang="en-US"/>
+            </a:defPPr>
+            <a:lvl1pPr algn="r">
+              <a:defRPr sz="1400">
+                <a:solidFill>
+                  <a:srgbClr val="0070C0"/>
+                </a:solidFill>
+              </a:defRPr>
+            </a:lvl1pPr>
+          </a:lstStyle>
+          <a:p>
+            <a:r>
+              <a:rPr lang="en-US" dirty="0"/>
+              <a:t>execute(</a:t>
+            </a:r>
+            <a:r>
+              <a:rPr lang="en-US" dirty="0" err="1"/>
+              <a:t>d,result</a:t>
+            </a:r>
+            <a:r>
+              <a:rPr lang="en-US" dirty="0"/>
+              <a:t>)</a:t>
+            </a:r>
+          </a:p>
+        </p:txBody>
+      </p:sp>
+      <p:cxnSp>
+        <p:nvCxnSpPr>
+          <p:cNvPr id="48" name="Straight Arrow Connector 47"/>
+          <p:cNvCxnSpPr/>
+          <p:nvPr/>
+        </p:nvCxnSpPr>
+        <p:spPr>
+          <a:xfrm>
+            <a:off x="1856418" y="5118556"/>
+            <a:ext cx="2451471" cy="0"/>
+          </a:xfrm>
+          <a:prstGeom prst="straightConnector1">
+            <a:avLst/>
+          </a:prstGeom>
+          <a:ln w="19050">
+            <a:solidFill>
+              <a:srgbClr val="0070C0"/>
+            </a:solidFill>
+            <a:prstDash val="sysDash"/>
+            <a:headEnd type="arrow" w="med" len="med"/>
+            <a:tailEnd type="none" w="med" len="med"/>
+          </a:ln>
+        </p:spPr>
+        <p:style>
+          <a:lnRef idx="1">
+            <a:schemeClr val="accent1"/>
+          </a:lnRef>
+          <a:fillRef idx="0">
+            <a:schemeClr val="accent1"/>
+          </a:fillRef>
+          <a:effectRef idx="0">
+            <a:schemeClr val="accent1"/>
+          </a:effectRef>
+          <a:fontRef idx="minor">
+            <a:schemeClr val="tx1"/>
+          </a:fontRef>
+        </p:style>
+      </p:cxnSp>
     </p:spTree>
     <p:extLst>
       <p:ext uri="{BB962C8B-B14F-4D97-AF65-F5344CB8AC3E}">

</xml_diff>

<commit_message>
Update diagram Model to include undoStack
</commit_message>
<xml_diff>
--- a/docs/diagrams/Diagrams.pptx
+++ b/docs/diagrams/Diagrams.pptx
@@ -13266,6 +13266,193 @@
           </a:fontRef>
         </p:style>
       </p:cxnSp>
+      <p:sp>
+        <p:nvSpPr>
+          <p:cNvPr id="53" name="Rectangle 52"/>
+          <p:cNvSpPr/>
+          <p:nvPr/>
+        </p:nvSpPr>
+        <p:spPr>
+          <a:xfrm>
+            <a:off x="4424766" y="4665222"/>
+            <a:ext cx="121329" cy="556617"/>
+          </